<commit_message>
beginning outline of basic presentation ideas, setting contact info and basic 'additional resources' at the end
</commit_message>
<xml_diff>
--- a/Decoupling Workflow With App Controler/Decoupling Workflow From Forms.pptx
+++ b/Decoupling Workflow With App Controler/Decoupling Workflow From Forms.pptx
@@ -5,34 +5,40 @@
     <p:sldMasterId id="2147483822" r:id="rId4"/>
   </p:sldMasterIdLst>
   <p:notesMasterIdLst>
-    <p:notesMasterId r:id="rId17"/>
+    <p:notesMasterId r:id="rId23"/>
   </p:notesMasterIdLst>
   <p:handoutMasterIdLst>
-    <p:handoutMasterId r:id="rId18"/>
+    <p:handoutMasterId r:id="rId24"/>
   </p:handoutMasterIdLst>
   <p:sldIdLst>
     <p:sldId id="256" r:id="rId5"/>
     <p:sldId id="257" r:id="rId6"/>
-    <p:sldId id="258" r:id="rId7"/>
-    <p:sldId id="275" r:id="rId8"/>
-    <p:sldId id="280" r:id="rId9"/>
-    <p:sldId id="281" r:id="rId10"/>
-    <p:sldId id="278" r:id="rId11"/>
-    <p:sldId id="279" r:id="rId12"/>
-    <p:sldId id="276" r:id="rId13"/>
-    <p:sldId id="277" r:id="rId14"/>
-    <p:sldId id="259" r:id="rId15"/>
-    <p:sldId id="274" r:id="rId16"/>
+    <p:sldId id="275" r:id="rId7"/>
+    <p:sldId id="258" r:id="rId8"/>
+    <p:sldId id="283" r:id="rId9"/>
+    <p:sldId id="282" r:id="rId10"/>
+    <p:sldId id="287" r:id="rId11"/>
+    <p:sldId id="280" r:id="rId12"/>
+    <p:sldId id="281" r:id="rId13"/>
+    <p:sldId id="286" r:id="rId14"/>
+    <p:sldId id="278" r:id="rId15"/>
+    <p:sldId id="279" r:id="rId16"/>
+    <p:sldId id="285" r:id="rId17"/>
+    <p:sldId id="276" r:id="rId18"/>
+    <p:sldId id="277" r:id="rId19"/>
+    <p:sldId id="284" r:id="rId20"/>
+    <p:sldId id="259" r:id="rId21"/>
+    <p:sldId id="274" r:id="rId22"/>
   </p:sldIdLst>
   <p:sldSz cx="9144000" cy="6858000" type="screen4x3"/>
   <p:notesSz cx="7010400" cy="9296400"/>
   <p:embeddedFontLst>
     <p:embeddedFont>
       <p:font typeface="Calibri" pitchFamily="34" charset="0"/>
-      <p:regular r:id="rId19"/>
-      <p:bold r:id="rId20"/>
-      <p:italic r:id="rId21"/>
-      <p:boldItalic r:id="rId22"/>
+      <p:regular r:id="rId25"/>
+      <p:bold r:id="rId26"/>
+      <p:italic r:id="rId27"/>
+      <p:boldItalic r:id="rId28"/>
     </p:embeddedFont>
   </p:embeddedFontLst>
   <p:defaultTextStyle>
@@ -823,6 +829,180 @@
 </p:notes>
 </file>
 
+<file path=ppt/notesSlides/notesSlide10.xml><?xml version="1.0" encoding="utf-8"?>
+<p:notes xmlns:a="http://schemas.openxmlformats.org/drawingml/2006/main" xmlns:r="http://schemas.openxmlformats.org/officeDocument/2006/relationships" xmlns:p="http://schemas.openxmlformats.org/presentationml/2006/main">
+  <p:cSld>
+    <p:spTree>
+      <p:nvGrpSpPr>
+        <p:cNvPr id="1" name=""/>
+        <p:cNvGrpSpPr/>
+        <p:nvPr/>
+      </p:nvGrpSpPr>
+      <p:grpSpPr>
+        <a:xfrm>
+          <a:off x="0" y="0"/>
+          <a:ext cx="0" cy="0"/>
+          <a:chOff x="0" y="0"/>
+          <a:chExt cx="0" cy="0"/>
+        </a:xfrm>
+      </p:grpSpPr>
+      <p:sp>
+        <p:nvSpPr>
+          <p:cNvPr id="2" name="Slide Image Placeholder 1"/>
+          <p:cNvSpPr>
+            <a:spLocks noGrp="1" noRot="1" noChangeAspect="1"/>
+          </p:cNvSpPr>
+          <p:nvPr>
+            <p:ph type="sldImg"/>
+          </p:nvPr>
+        </p:nvSpPr>
+        <p:spPr/>
+      </p:sp>
+      <p:sp>
+        <p:nvSpPr>
+          <p:cNvPr id="3" name="Notes Placeholder 2"/>
+          <p:cNvSpPr>
+            <a:spLocks noGrp="1"/>
+          </p:cNvSpPr>
+          <p:nvPr>
+            <p:ph type="body" idx="1"/>
+          </p:nvPr>
+        </p:nvSpPr>
+        <p:spPr/>
+        <p:txBody>
+          <a:bodyPr>
+            <a:normAutofit/>
+          </a:bodyPr>
+          <a:lstStyle/>
+          <a:p>
+            <a:endParaRPr lang="en-US" dirty="0"/>
+          </a:p>
+        </p:txBody>
+      </p:sp>
+      <p:sp>
+        <p:nvSpPr>
+          <p:cNvPr id="4" name="Slide Number Placeholder 3"/>
+          <p:cNvSpPr>
+            <a:spLocks noGrp="1"/>
+          </p:cNvSpPr>
+          <p:nvPr>
+            <p:ph type="sldNum" sz="quarter" idx="10"/>
+          </p:nvPr>
+        </p:nvSpPr>
+        <p:spPr/>
+        <p:txBody>
+          <a:bodyPr/>
+          <a:lstStyle/>
+          <a:p>
+            <a:pPr>
+              <a:defRPr/>
+            </a:pPr>
+            <a:fld id="{1931C8FD-CC35-423B-99F4-64D81D6A80AE}" type="slidenum">
+              <a:rPr lang="en-US" smtClean="0"/>
+              <a:pPr>
+                <a:defRPr/>
+              </a:pPr>
+              <a:t>15</a:t>
+            </a:fld>
+            <a:endParaRPr lang="en-US"/>
+          </a:p>
+        </p:txBody>
+      </p:sp>
+    </p:spTree>
+  </p:cSld>
+  <p:clrMapOvr>
+    <a:masterClrMapping/>
+  </p:clrMapOvr>
+</p:notes>
+</file>
+
+<file path=ppt/notesSlides/notesSlide11.xml><?xml version="1.0" encoding="utf-8"?>
+<p:notes xmlns:a="http://schemas.openxmlformats.org/drawingml/2006/main" xmlns:r="http://schemas.openxmlformats.org/officeDocument/2006/relationships" xmlns:p="http://schemas.openxmlformats.org/presentationml/2006/main">
+  <p:cSld>
+    <p:spTree>
+      <p:nvGrpSpPr>
+        <p:cNvPr id="1" name=""/>
+        <p:cNvGrpSpPr/>
+        <p:nvPr/>
+      </p:nvGrpSpPr>
+      <p:grpSpPr>
+        <a:xfrm>
+          <a:off x="0" y="0"/>
+          <a:ext cx="0" cy="0"/>
+          <a:chOff x="0" y="0"/>
+          <a:chExt cx="0" cy="0"/>
+        </a:xfrm>
+      </p:grpSpPr>
+      <p:sp>
+        <p:nvSpPr>
+          <p:cNvPr id="2" name="Slide Image Placeholder 1"/>
+          <p:cNvSpPr>
+            <a:spLocks noGrp="1" noRot="1" noChangeAspect="1"/>
+          </p:cNvSpPr>
+          <p:nvPr>
+            <p:ph type="sldImg"/>
+          </p:nvPr>
+        </p:nvSpPr>
+        <p:spPr/>
+      </p:sp>
+      <p:sp>
+        <p:nvSpPr>
+          <p:cNvPr id="3" name="Notes Placeholder 2"/>
+          <p:cNvSpPr>
+            <a:spLocks noGrp="1"/>
+          </p:cNvSpPr>
+          <p:nvPr>
+            <p:ph type="body" idx="1"/>
+          </p:nvPr>
+        </p:nvSpPr>
+        <p:spPr/>
+        <p:txBody>
+          <a:bodyPr>
+            <a:normAutofit/>
+          </a:bodyPr>
+          <a:lstStyle/>
+          <a:p>
+            <a:endParaRPr lang="en-US" dirty="0"/>
+          </a:p>
+        </p:txBody>
+      </p:sp>
+      <p:sp>
+        <p:nvSpPr>
+          <p:cNvPr id="4" name="Slide Number Placeholder 3"/>
+          <p:cNvSpPr>
+            <a:spLocks noGrp="1"/>
+          </p:cNvSpPr>
+          <p:nvPr>
+            <p:ph type="sldNum" sz="quarter" idx="10"/>
+          </p:nvPr>
+        </p:nvSpPr>
+        <p:spPr/>
+        <p:txBody>
+          <a:bodyPr/>
+          <a:lstStyle/>
+          <a:p>
+            <a:pPr>
+              <a:defRPr/>
+            </a:pPr>
+            <a:fld id="{1931C8FD-CC35-423B-99F4-64D81D6A80AE}" type="slidenum">
+              <a:rPr lang="en-US" smtClean="0"/>
+              <a:pPr>
+                <a:defRPr/>
+              </a:pPr>
+              <a:t>16</a:t>
+            </a:fld>
+            <a:endParaRPr lang="en-US"/>
+          </a:p>
+        </p:txBody>
+      </p:sp>
+    </p:spTree>
+  </p:cSld>
+  <p:clrMapOvr>
+    <a:masterClrMapping/>
+  </p:clrMapOvr>
+</p:notes>
+</file>
+
 <file path=ppt/notesSlides/notesSlide2.xml><?xml version="1.0" encoding="utf-8"?>
 <p:notes xmlns:a="http://schemas.openxmlformats.org/drawingml/2006/main" xmlns:r="http://schemas.openxmlformats.org/officeDocument/2006/relationships" xmlns:p="http://schemas.openxmlformats.org/presentationml/2006/main">
   <p:cSld>
@@ -896,7 +1076,7 @@
               <a:pPr>
                 <a:defRPr/>
               </a:pPr>
-              <a:t>4</a:t>
+              <a:t>3</a:t>
             </a:fld>
             <a:endParaRPr lang="en-US"/>
           </a:p>
@@ -983,7 +1163,7 @@
               <a:pPr>
                 <a:defRPr/>
               </a:pPr>
-              <a:t>6</a:t>
+              <a:t>5</a:t>
             </a:fld>
             <a:endParaRPr lang="en-US"/>
           </a:p>
@@ -1070,7 +1250,7 @@
               <a:pPr>
                 <a:defRPr/>
               </a:pPr>
-              <a:t>8</a:t>
+              <a:t>6</a:t>
             </a:fld>
             <a:endParaRPr lang="en-US"/>
           </a:p>
@@ -1157,7 +1337,355 @@
               <a:pPr>
                 <a:defRPr/>
               </a:pPr>
+              <a:t>7</a:t>
+            </a:fld>
+            <a:endParaRPr lang="en-US"/>
+          </a:p>
+        </p:txBody>
+      </p:sp>
+    </p:spTree>
+  </p:cSld>
+  <p:clrMapOvr>
+    <a:masterClrMapping/>
+  </p:clrMapOvr>
+</p:notes>
+</file>
+
+<file path=ppt/notesSlides/notesSlide6.xml><?xml version="1.0" encoding="utf-8"?>
+<p:notes xmlns:a="http://schemas.openxmlformats.org/drawingml/2006/main" xmlns:r="http://schemas.openxmlformats.org/officeDocument/2006/relationships" xmlns:p="http://schemas.openxmlformats.org/presentationml/2006/main">
+  <p:cSld>
+    <p:spTree>
+      <p:nvGrpSpPr>
+        <p:cNvPr id="1" name=""/>
+        <p:cNvGrpSpPr/>
+        <p:nvPr/>
+      </p:nvGrpSpPr>
+      <p:grpSpPr>
+        <a:xfrm>
+          <a:off x="0" y="0"/>
+          <a:ext cx="0" cy="0"/>
+          <a:chOff x="0" y="0"/>
+          <a:chExt cx="0" cy="0"/>
+        </a:xfrm>
+      </p:grpSpPr>
+      <p:sp>
+        <p:nvSpPr>
+          <p:cNvPr id="2" name="Slide Image Placeholder 1"/>
+          <p:cNvSpPr>
+            <a:spLocks noGrp="1" noRot="1" noChangeAspect="1"/>
+          </p:cNvSpPr>
+          <p:nvPr>
+            <p:ph type="sldImg"/>
+          </p:nvPr>
+        </p:nvSpPr>
+        <p:spPr/>
+      </p:sp>
+      <p:sp>
+        <p:nvSpPr>
+          <p:cNvPr id="3" name="Notes Placeholder 2"/>
+          <p:cNvSpPr>
+            <a:spLocks noGrp="1"/>
+          </p:cNvSpPr>
+          <p:nvPr>
+            <p:ph type="body" idx="1"/>
+          </p:nvPr>
+        </p:nvSpPr>
+        <p:spPr/>
+        <p:txBody>
+          <a:bodyPr>
+            <a:normAutofit/>
+          </a:bodyPr>
+          <a:lstStyle/>
+          <a:p>
+            <a:endParaRPr lang="en-US" dirty="0"/>
+          </a:p>
+        </p:txBody>
+      </p:sp>
+      <p:sp>
+        <p:nvSpPr>
+          <p:cNvPr id="4" name="Slide Number Placeholder 3"/>
+          <p:cNvSpPr>
+            <a:spLocks noGrp="1"/>
+          </p:cNvSpPr>
+          <p:nvPr>
+            <p:ph type="sldNum" sz="quarter" idx="10"/>
+          </p:nvPr>
+        </p:nvSpPr>
+        <p:spPr/>
+        <p:txBody>
+          <a:bodyPr/>
+          <a:lstStyle/>
+          <a:p>
+            <a:pPr>
+              <a:defRPr/>
+            </a:pPr>
+            <a:fld id="{1931C8FD-CC35-423B-99F4-64D81D6A80AE}" type="slidenum">
+              <a:rPr lang="en-US" smtClean="0"/>
+              <a:pPr>
+                <a:defRPr/>
+              </a:pPr>
+              <a:t>9</a:t>
+            </a:fld>
+            <a:endParaRPr lang="en-US"/>
+          </a:p>
+        </p:txBody>
+      </p:sp>
+    </p:spTree>
+  </p:cSld>
+  <p:clrMapOvr>
+    <a:masterClrMapping/>
+  </p:clrMapOvr>
+</p:notes>
+</file>
+
+<file path=ppt/notesSlides/notesSlide7.xml><?xml version="1.0" encoding="utf-8"?>
+<p:notes xmlns:a="http://schemas.openxmlformats.org/drawingml/2006/main" xmlns:r="http://schemas.openxmlformats.org/officeDocument/2006/relationships" xmlns:p="http://schemas.openxmlformats.org/presentationml/2006/main">
+  <p:cSld>
+    <p:spTree>
+      <p:nvGrpSpPr>
+        <p:cNvPr id="1" name=""/>
+        <p:cNvGrpSpPr/>
+        <p:nvPr/>
+      </p:nvGrpSpPr>
+      <p:grpSpPr>
+        <a:xfrm>
+          <a:off x="0" y="0"/>
+          <a:ext cx="0" cy="0"/>
+          <a:chOff x="0" y="0"/>
+          <a:chExt cx="0" cy="0"/>
+        </a:xfrm>
+      </p:grpSpPr>
+      <p:sp>
+        <p:nvSpPr>
+          <p:cNvPr id="2" name="Slide Image Placeholder 1"/>
+          <p:cNvSpPr>
+            <a:spLocks noGrp="1" noRot="1" noChangeAspect="1"/>
+          </p:cNvSpPr>
+          <p:nvPr>
+            <p:ph type="sldImg"/>
+          </p:nvPr>
+        </p:nvSpPr>
+        <p:spPr/>
+      </p:sp>
+      <p:sp>
+        <p:nvSpPr>
+          <p:cNvPr id="3" name="Notes Placeholder 2"/>
+          <p:cNvSpPr>
+            <a:spLocks noGrp="1"/>
+          </p:cNvSpPr>
+          <p:nvPr>
+            <p:ph type="body" idx="1"/>
+          </p:nvPr>
+        </p:nvSpPr>
+        <p:spPr/>
+        <p:txBody>
+          <a:bodyPr>
+            <a:normAutofit/>
+          </a:bodyPr>
+          <a:lstStyle/>
+          <a:p>
+            <a:endParaRPr lang="en-US" dirty="0"/>
+          </a:p>
+        </p:txBody>
+      </p:sp>
+      <p:sp>
+        <p:nvSpPr>
+          <p:cNvPr id="4" name="Slide Number Placeholder 3"/>
+          <p:cNvSpPr>
+            <a:spLocks noGrp="1"/>
+          </p:cNvSpPr>
+          <p:nvPr>
+            <p:ph type="sldNum" sz="quarter" idx="10"/>
+          </p:nvPr>
+        </p:nvSpPr>
+        <p:spPr/>
+        <p:txBody>
+          <a:bodyPr/>
+          <a:lstStyle/>
+          <a:p>
+            <a:pPr>
+              <a:defRPr/>
+            </a:pPr>
+            <a:fld id="{1931C8FD-CC35-423B-99F4-64D81D6A80AE}" type="slidenum">
+              <a:rPr lang="en-US" smtClean="0"/>
+              <a:pPr>
+                <a:defRPr/>
+              </a:pPr>
               <a:t>10</a:t>
+            </a:fld>
+            <a:endParaRPr lang="en-US"/>
+          </a:p>
+        </p:txBody>
+      </p:sp>
+    </p:spTree>
+  </p:cSld>
+  <p:clrMapOvr>
+    <a:masterClrMapping/>
+  </p:clrMapOvr>
+</p:notes>
+</file>
+
+<file path=ppt/notesSlides/notesSlide8.xml><?xml version="1.0" encoding="utf-8"?>
+<p:notes xmlns:a="http://schemas.openxmlformats.org/drawingml/2006/main" xmlns:r="http://schemas.openxmlformats.org/officeDocument/2006/relationships" xmlns:p="http://schemas.openxmlformats.org/presentationml/2006/main">
+  <p:cSld>
+    <p:spTree>
+      <p:nvGrpSpPr>
+        <p:cNvPr id="1" name=""/>
+        <p:cNvGrpSpPr/>
+        <p:nvPr/>
+      </p:nvGrpSpPr>
+      <p:grpSpPr>
+        <a:xfrm>
+          <a:off x="0" y="0"/>
+          <a:ext cx="0" cy="0"/>
+          <a:chOff x="0" y="0"/>
+          <a:chExt cx="0" cy="0"/>
+        </a:xfrm>
+      </p:grpSpPr>
+      <p:sp>
+        <p:nvSpPr>
+          <p:cNvPr id="2" name="Slide Image Placeholder 1"/>
+          <p:cNvSpPr>
+            <a:spLocks noGrp="1" noRot="1" noChangeAspect="1"/>
+          </p:cNvSpPr>
+          <p:nvPr>
+            <p:ph type="sldImg"/>
+          </p:nvPr>
+        </p:nvSpPr>
+        <p:spPr/>
+      </p:sp>
+      <p:sp>
+        <p:nvSpPr>
+          <p:cNvPr id="3" name="Notes Placeholder 2"/>
+          <p:cNvSpPr>
+            <a:spLocks noGrp="1"/>
+          </p:cNvSpPr>
+          <p:nvPr>
+            <p:ph type="body" idx="1"/>
+          </p:nvPr>
+        </p:nvSpPr>
+        <p:spPr/>
+        <p:txBody>
+          <a:bodyPr>
+            <a:normAutofit/>
+          </a:bodyPr>
+          <a:lstStyle/>
+          <a:p>
+            <a:endParaRPr lang="en-US" dirty="0"/>
+          </a:p>
+        </p:txBody>
+      </p:sp>
+      <p:sp>
+        <p:nvSpPr>
+          <p:cNvPr id="4" name="Slide Number Placeholder 3"/>
+          <p:cNvSpPr>
+            <a:spLocks noGrp="1"/>
+          </p:cNvSpPr>
+          <p:nvPr>
+            <p:ph type="sldNum" sz="quarter" idx="10"/>
+          </p:nvPr>
+        </p:nvSpPr>
+        <p:spPr/>
+        <p:txBody>
+          <a:bodyPr/>
+          <a:lstStyle/>
+          <a:p>
+            <a:pPr>
+              <a:defRPr/>
+            </a:pPr>
+            <a:fld id="{1931C8FD-CC35-423B-99F4-64D81D6A80AE}" type="slidenum">
+              <a:rPr lang="en-US" smtClean="0"/>
+              <a:pPr>
+                <a:defRPr/>
+              </a:pPr>
+              <a:t>12</a:t>
+            </a:fld>
+            <a:endParaRPr lang="en-US"/>
+          </a:p>
+        </p:txBody>
+      </p:sp>
+    </p:spTree>
+  </p:cSld>
+  <p:clrMapOvr>
+    <a:masterClrMapping/>
+  </p:clrMapOvr>
+</p:notes>
+</file>
+
+<file path=ppt/notesSlides/notesSlide9.xml><?xml version="1.0" encoding="utf-8"?>
+<p:notes xmlns:a="http://schemas.openxmlformats.org/drawingml/2006/main" xmlns:r="http://schemas.openxmlformats.org/officeDocument/2006/relationships" xmlns:p="http://schemas.openxmlformats.org/presentationml/2006/main">
+  <p:cSld>
+    <p:spTree>
+      <p:nvGrpSpPr>
+        <p:cNvPr id="1" name=""/>
+        <p:cNvGrpSpPr/>
+        <p:nvPr/>
+      </p:nvGrpSpPr>
+      <p:grpSpPr>
+        <a:xfrm>
+          <a:off x="0" y="0"/>
+          <a:ext cx="0" cy="0"/>
+          <a:chOff x="0" y="0"/>
+          <a:chExt cx="0" cy="0"/>
+        </a:xfrm>
+      </p:grpSpPr>
+      <p:sp>
+        <p:nvSpPr>
+          <p:cNvPr id="2" name="Slide Image Placeholder 1"/>
+          <p:cNvSpPr>
+            <a:spLocks noGrp="1" noRot="1" noChangeAspect="1"/>
+          </p:cNvSpPr>
+          <p:nvPr>
+            <p:ph type="sldImg"/>
+          </p:nvPr>
+        </p:nvSpPr>
+        <p:spPr/>
+      </p:sp>
+      <p:sp>
+        <p:nvSpPr>
+          <p:cNvPr id="3" name="Notes Placeholder 2"/>
+          <p:cNvSpPr>
+            <a:spLocks noGrp="1"/>
+          </p:cNvSpPr>
+          <p:nvPr>
+            <p:ph type="body" idx="1"/>
+          </p:nvPr>
+        </p:nvSpPr>
+        <p:spPr/>
+        <p:txBody>
+          <a:bodyPr>
+            <a:normAutofit/>
+          </a:bodyPr>
+          <a:lstStyle/>
+          <a:p>
+            <a:endParaRPr lang="en-US" dirty="0"/>
+          </a:p>
+        </p:txBody>
+      </p:sp>
+      <p:sp>
+        <p:nvSpPr>
+          <p:cNvPr id="4" name="Slide Number Placeholder 3"/>
+          <p:cNvSpPr>
+            <a:spLocks noGrp="1"/>
+          </p:cNvSpPr>
+          <p:nvPr>
+            <p:ph type="sldNum" sz="quarter" idx="10"/>
+          </p:nvPr>
+        </p:nvSpPr>
+        <p:spPr/>
+        <p:txBody>
+          <a:bodyPr/>
+          <a:lstStyle/>
+          <a:p>
+            <a:pPr>
+              <a:defRPr/>
+            </a:pPr>
+            <a:fld id="{1931C8FD-CC35-423B-99F4-64D81D6A80AE}" type="slidenum">
+              <a:rPr lang="en-US" smtClean="0"/>
+              <a:pPr>
+                <a:defRPr/>
+              </a:pPr>
+              <a:t>13</a:t>
             </a:fld>
             <a:endParaRPr lang="en-US"/>
           </a:p>
@@ -2290,25 +2818,7 @@
                 </a:solidFill>
                 <a:latin typeface="Calibri" pitchFamily="34" charset="0"/>
               </a:rPr>
-              <a:t>Copyright </a:t>
-            </a:r>
-            <a:r>
-              <a:rPr lang="en-US" sz="1200" dirty="0" smtClean="0">
-                <a:solidFill>
-                  <a:schemeClr val="bg1"/>
-                </a:solidFill>
-                <a:latin typeface="Calibri" pitchFamily="34" charset="0"/>
-              </a:rPr>
-              <a:t>2009 </a:t>
-            </a:r>
-            <a:r>
-              <a:rPr lang="en-US" sz="1200" dirty="0" smtClean="0">
-                <a:solidFill>
-                  <a:schemeClr val="bg1"/>
-                </a:solidFill>
-                <a:latin typeface="Calibri" pitchFamily="34" charset="0"/>
-              </a:rPr>
-              <a:t>McLane Advanced Technologies, LLC</a:t>
+              <a:t>Copyright 2009 McLane Advanced Technologies, LLC</a:t>
             </a:r>
             <a:endParaRPr lang="en-US" sz="1200" dirty="0">
               <a:solidFill>
@@ -2636,7 +3146,7 @@
       </p:grpSpPr>
       <p:sp>
         <p:nvSpPr>
-          <p:cNvPr id="6" name="Rectangle 5"/>
+          <p:cNvPr id="4" name="Rectangle 3"/>
           <p:cNvSpPr/>
           <p:nvPr/>
         </p:nvSpPr>
@@ -2682,174 +3192,9 @@
           </a:p>
         </p:txBody>
       </p:sp>
-      <p:sp>
-        <p:nvSpPr>
-          <p:cNvPr id="8" name="Rectangle 7"/>
-          <p:cNvSpPr/>
-          <p:nvPr/>
-        </p:nvSpPr>
-        <p:spPr>
-          <a:xfrm>
-            <a:off x="228600" y="0"/>
-            <a:ext cx="104775" cy="3581400"/>
-          </a:xfrm>
-          <a:prstGeom prst="rect">
-            <a:avLst/>
-          </a:prstGeom>
-          <a:solidFill>
-            <a:srgbClr val="E31937"/>
-          </a:solidFill>
-          <a:ln>
-            <a:noFill/>
-          </a:ln>
-        </p:spPr>
-        <p:style>
-          <a:lnRef idx="2">
-            <a:schemeClr val="accent1">
-              <a:shade val="50000"/>
-            </a:schemeClr>
-          </a:lnRef>
-          <a:fillRef idx="1">
-            <a:schemeClr val="accent1"/>
-          </a:fillRef>
-          <a:effectRef idx="0">
-            <a:schemeClr val="accent1"/>
-          </a:effectRef>
-          <a:fontRef idx="minor">
-            <a:schemeClr val="lt1"/>
-          </a:fontRef>
-        </p:style>
-        <p:txBody>
-          <a:bodyPr anchor="ctr"/>
-          <a:lstStyle/>
-          <a:p>
-            <a:pPr algn="ctr">
-              <a:defRPr/>
-            </a:pPr>
-            <a:endParaRPr lang="en-US"/>
-          </a:p>
-        </p:txBody>
-      </p:sp>
-      <p:sp>
-        <p:nvSpPr>
-          <p:cNvPr id="5127" name="Rectangle 8"/>
-          <p:cNvSpPr>
-            <a:spLocks noGrp="1" noChangeArrowheads="1"/>
-          </p:cNvSpPr>
-          <p:nvPr>
-            <p:ph type="title" idx="4294967295"/>
-          </p:nvPr>
-        </p:nvSpPr>
-        <p:spPr bwMode="auto">
-          <a:xfrm>
-            <a:off x="495300" y="200025"/>
-            <a:ext cx="8420100" cy="919163"/>
-          </a:xfrm>
-          <a:prstGeom prst="rect">
-            <a:avLst/>
-          </a:prstGeom>
-          <a:noFill/>
-          <a:ln>
-            <a:miter lim="800000"/>
-            <a:headEnd/>
-            <a:tailEnd/>
-          </a:ln>
-        </p:spPr>
-        <p:txBody>
-          <a:bodyPr/>
-          <a:lstStyle/>
-          <a:p>
-            <a:pPr eaLnBrk="1" hangingPunct="1"/>
-            <a:r>
-              <a:rPr lang="en-US" dirty="0" smtClean="0">
-                <a:solidFill>
-                  <a:schemeClr val="bg1"/>
-                </a:solidFill>
-              </a:rPr>
-              <a:t>Additional Resources</a:t>
-            </a:r>
-          </a:p>
-        </p:txBody>
-      </p:sp>
-      <p:sp>
-        <p:nvSpPr>
-          <p:cNvPr id="5128" name="Rectangle 9"/>
-          <p:cNvSpPr>
-            <a:spLocks noGrp="1" noChangeArrowheads="1"/>
-          </p:cNvSpPr>
-          <p:nvPr>
-            <p:ph idx="4294967295"/>
-          </p:nvPr>
-        </p:nvSpPr>
-        <p:spPr>
-          <a:xfrm>
-            <a:off x="514350" y="1143000"/>
-            <a:ext cx="8229600" cy="3048000"/>
-          </a:xfrm>
-        </p:spPr>
-        <p:txBody>
-          <a:bodyPr/>
-          <a:lstStyle/>
-          <a:p>
-            <a:pPr eaLnBrk="1" hangingPunct="1">
-              <a:lnSpc>
-                <a:spcPct val="80000"/>
-              </a:lnSpc>
-              <a:buNone/>
-            </a:pPr>
-            <a:r>
-              <a:rPr lang="en-US" sz="2000" dirty="0" smtClean="0">
-                <a:solidFill>
-                  <a:schemeClr val="bg1"/>
-                </a:solidFill>
-              </a:rPr>
-              <a:t>(Add resources here)</a:t>
-            </a:r>
-            <a:endParaRPr lang="en-US" sz="2000" dirty="0" smtClean="0">
-              <a:solidFill>
-                <a:schemeClr val="bg1"/>
-              </a:solidFill>
-            </a:endParaRPr>
-          </a:p>
-        </p:txBody>
-      </p:sp>
-      <p:sp>
-        <p:nvSpPr>
-          <p:cNvPr id="5129" name="Text Box 7"/>
-          <p:cNvSpPr txBox="1">
-            <a:spLocks noChangeArrowheads="1"/>
-          </p:cNvSpPr>
-          <p:nvPr/>
-        </p:nvSpPr>
-        <p:spPr bwMode="auto">
-          <a:xfrm>
-            <a:off x="5470525" y="1331913"/>
-            <a:ext cx="184150" cy="366712"/>
-          </a:xfrm>
-          <a:prstGeom prst="rect">
-            <a:avLst/>
-          </a:prstGeom>
-          <a:noFill/>
-          <a:ln w="9525">
-            <a:noFill/>
-            <a:miter lim="800000"/>
-            <a:headEnd/>
-            <a:tailEnd/>
-          </a:ln>
-        </p:spPr>
-        <p:txBody>
-          <a:bodyPr wrap="none">
-            <a:spAutoFit/>
-          </a:bodyPr>
-          <a:lstStyle/>
-          <a:p>
-            <a:endParaRPr lang="en-US"/>
-          </a:p>
-        </p:txBody>
-      </p:sp>
       <p:pic>
         <p:nvPicPr>
-          <p:cNvPr id="16" name="Picture 4" descr="MAT logo 1 CMYK"/>
+          <p:cNvPr id="4099" name="Picture 4" descr="MAT logo 1 CMYK"/>
           <p:cNvPicPr>
             <a:picLocks noChangeAspect="1" noChangeArrowheads="1"/>
           </p:cNvPicPr>
@@ -2892,7 +3237,7 @@
       </p:pic>
       <p:sp>
         <p:nvSpPr>
-          <p:cNvPr id="17" name="Rectangle 16"/>
+          <p:cNvPr id="5" name="Rectangle 4"/>
           <p:cNvSpPr/>
           <p:nvPr/>
         </p:nvSpPr>
@@ -2938,9 +3283,57 @@
           </a:p>
         </p:txBody>
       </p:sp>
+      <p:sp>
+        <p:nvSpPr>
+          <p:cNvPr id="10" name="Rectangle 9"/>
+          <p:cNvSpPr/>
+          <p:nvPr/>
+        </p:nvSpPr>
+        <p:spPr bwMode="auto">
+          <a:xfrm>
+            <a:off x="228600" y="0"/>
+            <a:ext cx="104775" cy="2325688"/>
+          </a:xfrm>
+          <a:prstGeom prst="rect">
+            <a:avLst/>
+          </a:prstGeom>
+          <a:solidFill>
+            <a:srgbClr val="E31937"/>
+          </a:solidFill>
+          <a:ln>
+            <a:noFill/>
+          </a:ln>
+        </p:spPr>
+        <p:style>
+          <a:lnRef idx="2">
+            <a:schemeClr val="accent1">
+              <a:shade val="50000"/>
+            </a:schemeClr>
+          </a:lnRef>
+          <a:fillRef idx="1">
+            <a:schemeClr val="accent1"/>
+          </a:fillRef>
+          <a:effectRef idx="0">
+            <a:schemeClr val="accent1"/>
+          </a:effectRef>
+          <a:fontRef idx="minor">
+            <a:schemeClr val="lt1"/>
+          </a:fontRef>
+        </p:style>
+        <p:txBody>
+          <a:bodyPr anchor="ctr"/>
+          <a:lstStyle/>
+          <a:p>
+            <a:pPr algn="ctr">
+              <a:defRPr/>
+            </a:pPr>
+            <a:endParaRPr lang="en-US"/>
+          </a:p>
+        </p:txBody>
+      </p:sp>
       <p:pic>
         <p:nvPicPr>
-          <p:cNvPr id="18" name="Picture 7" descr="MAT logo vertical_red.emf"/>
+          <p:cNvPr id="4103" name="Picture 7" descr="MAT logo vertical_red.emf"/>
           <p:cNvPicPr>
             <a:picLocks noChangeAspect="1"/>
           </p:cNvPicPr>
@@ -2970,6 +3363,92 @@
           </a:ln>
         </p:spPr>
       </p:pic>
+      <p:sp>
+        <p:nvSpPr>
+          <p:cNvPr id="9" name="TextBox 8"/>
+          <p:cNvSpPr txBox="1"/>
+          <p:nvPr/>
+        </p:nvSpPr>
+        <p:spPr>
+          <a:xfrm>
+            <a:off x="381000" y="1447800"/>
+            <a:ext cx="8610600" cy="646331"/>
+          </a:xfrm>
+          <a:prstGeom prst="rect">
+            <a:avLst/>
+          </a:prstGeom>
+          <a:noFill/>
+        </p:spPr>
+        <p:txBody>
+          <a:bodyPr>
+            <a:spAutoFit/>
+          </a:bodyPr>
+          <a:lstStyle/>
+          <a:p>
+            <a:pPr>
+              <a:defRPr/>
+            </a:pPr>
+            <a:r>
+              <a:rPr lang="en-US" sz="3600" spc="60" dirty="0" smtClean="0">
+                <a:solidFill>
+                  <a:schemeClr val="bg1"/>
+                </a:solidFill>
+                <a:latin typeface="Calibri" pitchFamily="34" charset="0"/>
+              </a:rPr>
+              <a:t>(Section Header)</a:t>
+            </a:r>
+            <a:endParaRPr lang="en-US" sz="3600" spc="60" dirty="0">
+              <a:solidFill>
+                <a:schemeClr val="bg1"/>
+              </a:solidFill>
+              <a:latin typeface="Calibri" pitchFamily="34" charset="0"/>
+            </a:endParaRPr>
+          </a:p>
+        </p:txBody>
+      </p:sp>
+      <p:sp>
+        <p:nvSpPr>
+          <p:cNvPr id="11" name="TextBox 10"/>
+          <p:cNvSpPr txBox="1"/>
+          <p:nvPr/>
+        </p:nvSpPr>
+        <p:spPr>
+          <a:xfrm>
+            <a:off x="381000" y="2057400"/>
+            <a:ext cx="7543800" cy="338554"/>
+          </a:xfrm>
+          <a:prstGeom prst="rect">
+            <a:avLst/>
+          </a:prstGeom>
+          <a:noFill/>
+        </p:spPr>
+        <p:txBody>
+          <a:bodyPr wrap="square">
+            <a:spAutoFit/>
+          </a:bodyPr>
+          <a:lstStyle/>
+          <a:p>
+            <a:pPr>
+              <a:defRPr/>
+            </a:pPr>
+            <a:r>
+              <a:rPr lang="en-US" sz="1600" dirty="0" smtClean="0">
+                <a:solidFill>
+                  <a:schemeClr val="bg1"/>
+                </a:solidFill>
+                <a:latin typeface="+mn-lt"/>
+              </a:rPr>
+              <a:t>(section sub title)</a:t>
+            </a:r>
+            <a:endParaRPr lang="en-US" sz="1600" dirty="0">
+              <a:solidFill>
+                <a:schemeClr val="bg1"/>
+              </a:solidFill>
+              <a:latin typeface="+mn-lt"/>
+            </a:endParaRPr>
+          </a:p>
+        </p:txBody>
+      </p:sp>
     </p:spTree>
   </p:cSld>
   <p:clrMapOvr>
@@ -3004,7 +3483,187 @@
       </p:grpSpPr>
       <p:sp>
         <p:nvSpPr>
-          <p:cNvPr id="6" name="Rectangle 5"/>
+          <p:cNvPr id="3075" name="Text Placeholder 2"/>
+          <p:cNvSpPr>
+            <a:spLocks noGrp="1"/>
+          </p:cNvSpPr>
+          <p:nvPr>
+            <p:ph type="body" sz="quarter" idx="10"/>
+          </p:nvPr>
+        </p:nvSpPr>
+        <p:spPr>
+          <a:xfrm>
+            <a:off x="685800" y="1066800"/>
+            <a:ext cx="8229600" cy="1219200"/>
+          </a:xfrm>
+        </p:spPr>
+        <p:txBody>
+          <a:bodyPr/>
+          <a:lstStyle/>
+          <a:p>
+            <a:pPr eaLnBrk="1" hangingPunct="1">
+              <a:buNone/>
+            </a:pPr>
+            <a:endParaRPr lang="en-US" sz="2000" dirty="0" smtClean="0"/>
+          </a:p>
+        </p:txBody>
+      </p:sp>
+      <p:sp>
+        <p:nvSpPr>
+          <p:cNvPr id="3074" name="Title 1"/>
+          <p:cNvSpPr>
+            <a:spLocks noGrp="1"/>
+          </p:cNvSpPr>
+          <p:nvPr>
+            <p:ph type="title"/>
+          </p:nvPr>
+        </p:nvSpPr>
+        <p:spPr bwMode="auto">
+          <a:noFill/>
+          <a:ln>
+            <a:miter lim="800000"/>
+            <a:headEnd/>
+            <a:tailEnd/>
+          </a:ln>
+        </p:spPr>
+        <p:txBody>
+          <a:bodyPr vert="horz" wrap="square" lIns="91440" tIns="45720" rIns="91440" bIns="45720" numCol="1" anchor="t" anchorCtr="0" compatLnSpc="1">
+            <a:prstTxWarp prst="textNoShape">
+              <a:avLst/>
+            </a:prstTxWarp>
+          </a:bodyPr>
+          <a:lstStyle/>
+          <a:p>
+            <a:pPr eaLnBrk="1" hangingPunct="1"/>
+            <a:endParaRPr lang="en-US" dirty="0" smtClean="0"/>
+          </a:p>
+        </p:txBody>
+      </p:sp>
+    </p:spTree>
+  </p:cSld>
+  <p:clrMapOvr>
+    <a:masterClrMapping/>
+  </p:clrMapOvr>
+  <p:timing>
+    <p:tnLst>
+      <p:par>
+        <p:cTn id="1" dur="indefinite" restart="never" nodeType="tmRoot"/>
+      </p:par>
+    </p:tnLst>
+  </p:timing>
+</p:sld>
+</file>
+
+<file path=ppt/slides/slide13.xml><?xml version="1.0" encoding="utf-8"?>
+<p:sld xmlns:a="http://schemas.openxmlformats.org/drawingml/2006/main" xmlns:r="http://schemas.openxmlformats.org/officeDocument/2006/relationships" xmlns:p="http://schemas.openxmlformats.org/presentationml/2006/main">
+  <p:cSld>
+    <p:spTree>
+      <p:nvGrpSpPr>
+        <p:cNvPr id="1" name=""/>
+        <p:cNvGrpSpPr/>
+        <p:nvPr/>
+      </p:nvGrpSpPr>
+      <p:grpSpPr>
+        <a:xfrm>
+          <a:off x="0" y="0"/>
+          <a:ext cx="0" cy="0"/>
+          <a:chOff x="0" y="0"/>
+          <a:chExt cx="0" cy="0"/>
+        </a:xfrm>
+      </p:grpSpPr>
+      <p:sp>
+        <p:nvSpPr>
+          <p:cNvPr id="3075" name="Text Placeholder 2"/>
+          <p:cNvSpPr>
+            <a:spLocks noGrp="1"/>
+          </p:cNvSpPr>
+          <p:nvPr>
+            <p:ph type="body" sz="quarter" idx="10"/>
+          </p:nvPr>
+        </p:nvSpPr>
+        <p:spPr>
+          <a:xfrm>
+            <a:off x="685800" y="1066800"/>
+            <a:ext cx="8229600" cy="1219200"/>
+          </a:xfrm>
+        </p:spPr>
+        <p:txBody>
+          <a:bodyPr/>
+          <a:lstStyle/>
+          <a:p>
+            <a:pPr eaLnBrk="1" hangingPunct="1">
+              <a:buNone/>
+            </a:pPr>
+            <a:endParaRPr lang="en-US" sz="2000" dirty="0" smtClean="0"/>
+          </a:p>
+        </p:txBody>
+      </p:sp>
+      <p:sp>
+        <p:nvSpPr>
+          <p:cNvPr id="3074" name="Title 1"/>
+          <p:cNvSpPr>
+            <a:spLocks noGrp="1"/>
+          </p:cNvSpPr>
+          <p:nvPr>
+            <p:ph type="title"/>
+          </p:nvPr>
+        </p:nvSpPr>
+        <p:spPr bwMode="auto">
+          <a:noFill/>
+          <a:ln>
+            <a:miter lim="800000"/>
+            <a:headEnd/>
+            <a:tailEnd/>
+          </a:ln>
+        </p:spPr>
+        <p:txBody>
+          <a:bodyPr vert="horz" wrap="square" lIns="91440" tIns="45720" rIns="91440" bIns="45720" numCol="1" anchor="t" anchorCtr="0" compatLnSpc="1">
+            <a:prstTxWarp prst="textNoShape">
+              <a:avLst/>
+            </a:prstTxWarp>
+          </a:bodyPr>
+          <a:lstStyle/>
+          <a:p>
+            <a:pPr eaLnBrk="1" hangingPunct="1"/>
+            <a:endParaRPr lang="en-US" dirty="0" smtClean="0"/>
+          </a:p>
+        </p:txBody>
+      </p:sp>
+    </p:spTree>
+  </p:cSld>
+  <p:clrMapOvr>
+    <a:masterClrMapping/>
+  </p:clrMapOvr>
+  <p:timing>
+    <p:tnLst>
+      <p:par>
+        <p:cTn id="1" dur="indefinite" restart="never" nodeType="tmRoot"/>
+      </p:par>
+    </p:tnLst>
+  </p:timing>
+</p:sld>
+</file>
+
+<file path=ppt/slides/slide14.xml><?xml version="1.0" encoding="utf-8"?>
+<p:sld xmlns:a="http://schemas.openxmlformats.org/drawingml/2006/main" xmlns:r="http://schemas.openxmlformats.org/officeDocument/2006/relationships" xmlns:p="http://schemas.openxmlformats.org/presentationml/2006/main">
+  <p:cSld>
+    <p:spTree>
+      <p:nvGrpSpPr>
+        <p:cNvPr id="1" name=""/>
+        <p:cNvGrpSpPr/>
+        <p:nvPr/>
+      </p:nvGrpSpPr>
+      <p:grpSpPr>
+        <a:xfrm>
+          <a:off x="0" y="0"/>
+          <a:ext cx="0" cy="0"/>
+          <a:chOff x="0" y="0"/>
+          <a:chExt cx="0" cy="0"/>
+        </a:xfrm>
+      </p:grpSpPr>
+      <p:sp>
+        <p:nvSpPr>
+          <p:cNvPr id="4" name="Rectangle 3"/>
           <p:cNvSpPr/>
           <p:nvPr/>
         </p:nvSpPr>
@@ -3050,16 +3709,59 @@
           </a:p>
         </p:txBody>
       </p:sp>
-      <p:sp>
-        <p:nvSpPr>
-          <p:cNvPr id="7" name="Rectangle 6"/>
+      <p:pic>
+        <p:nvPicPr>
+          <p:cNvPr id="4099" name="Picture 4" descr="MAT logo 1 CMYK"/>
+          <p:cNvPicPr>
+            <a:picLocks noChangeAspect="1" noChangeArrowheads="1"/>
+          </p:cNvPicPr>
+          <p:nvPr/>
+        </p:nvPicPr>
+        <p:blipFill>
+          <a:blip r:embed="rId2">
+            <a:clrChange>
+              <a:clrFrom>
+                <a:srgbClr val="FDFDFD"/>
+              </a:clrFrom>
+              <a:clrTo>
+                <a:srgbClr val="FDFDFD">
+                  <a:alpha val="0"/>
+                </a:srgbClr>
+              </a:clrTo>
+            </a:clrChange>
+          </a:blip>
+          <a:srcRect/>
+          <a:stretch>
+            <a:fillRect/>
+          </a:stretch>
+        </p:blipFill>
+        <p:spPr bwMode="auto">
+          <a:xfrm>
+            <a:off x="2971800" y="4800600"/>
+            <a:ext cx="2819400" cy="1338263"/>
+          </a:xfrm>
+          <a:prstGeom prst="rect">
+            <a:avLst/>
+          </a:prstGeom>
+          <a:noFill/>
+          <a:ln w="9525">
+            <a:noFill/>
+            <a:miter lim="800000"/>
+            <a:headEnd/>
+            <a:tailEnd/>
+          </a:ln>
+        </p:spPr>
+      </p:pic>
+      <p:sp>
+        <p:nvSpPr>
+          <p:cNvPr id="5" name="Rectangle 4"/>
           <p:cNvSpPr/>
           <p:nvPr/>
         </p:nvSpPr>
         <p:spPr>
           <a:xfrm>
             <a:off x="0" y="4724400"/>
-            <a:ext cx="9153525" cy="2133600"/>
+            <a:ext cx="9144000" cy="2133600"/>
           </a:xfrm>
           <a:prstGeom prst="rect">
             <a:avLst/>
@@ -3100,14 +3802,14 @@
       </p:sp>
       <p:sp>
         <p:nvSpPr>
-          <p:cNvPr id="8" name="Rectangle 7"/>
+          <p:cNvPr id="10" name="Rectangle 9"/>
           <p:cNvSpPr/>
           <p:nvPr/>
         </p:nvSpPr>
-        <p:spPr>
+        <p:spPr bwMode="auto">
           <a:xfrm>
             <a:off x="228600" y="0"/>
-            <a:ext cx="104775" cy="3581400"/>
+            <a:ext cx="104775" cy="2325688"/>
           </a:xfrm>
           <a:prstGeom prst="rect">
             <a:avLst/>
@@ -3146,25 +3848,355 @@
           </a:p>
         </p:txBody>
       </p:sp>
-      <p:sp>
-        <p:nvSpPr>
-          <p:cNvPr id="10" name="Rectangle 9"/>
-          <p:cNvSpPr/>
+      <p:pic>
+        <p:nvPicPr>
+          <p:cNvPr id="4103" name="Picture 7" descr="MAT logo vertical_red.emf"/>
+          <p:cNvPicPr>
+            <a:picLocks noChangeAspect="1"/>
+          </p:cNvPicPr>
           <p:nvPr/>
-        </p:nvSpPr>
-        <p:spPr>
-          <a:xfrm>
-            <a:off x="112713" y="4800600"/>
-            <a:ext cx="8907462" cy="1933575"/>
+        </p:nvPicPr>
+        <p:blipFill>
+          <a:blip r:embed="rId3"/>
+          <a:srcRect/>
+          <a:stretch>
+            <a:fillRect/>
+          </a:stretch>
+        </p:blipFill>
+        <p:spPr bwMode="auto">
+          <a:xfrm>
+            <a:off x="3600450" y="5334000"/>
+            <a:ext cx="1981200" cy="969963"/>
           </a:xfrm>
           <a:prstGeom prst="rect">
             <a:avLst/>
           </a:prstGeom>
           <a:noFill/>
-          <a:ln w="12700">
-            <a:solidFill>
-              <a:schemeClr val="bg1"/>
-            </a:solidFill>
+          <a:ln w="9525">
+            <a:noFill/>
+            <a:miter lim="800000"/>
+            <a:headEnd/>
+            <a:tailEnd/>
+          </a:ln>
+        </p:spPr>
+      </p:pic>
+      <p:sp>
+        <p:nvSpPr>
+          <p:cNvPr id="9" name="TextBox 8"/>
+          <p:cNvSpPr txBox="1"/>
+          <p:nvPr/>
+        </p:nvSpPr>
+        <p:spPr>
+          <a:xfrm>
+            <a:off x="381000" y="1447800"/>
+            <a:ext cx="8610600" cy="646331"/>
+          </a:xfrm>
+          <a:prstGeom prst="rect">
+            <a:avLst/>
+          </a:prstGeom>
+          <a:noFill/>
+        </p:spPr>
+        <p:txBody>
+          <a:bodyPr>
+            <a:spAutoFit/>
+          </a:bodyPr>
+          <a:lstStyle/>
+          <a:p>
+            <a:pPr>
+              <a:defRPr/>
+            </a:pPr>
+            <a:r>
+              <a:rPr lang="en-US" sz="3600" spc="60" dirty="0" smtClean="0">
+                <a:solidFill>
+                  <a:schemeClr val="bg1"/>
+                </a:solidFill>
+                <a:latin typeface="Calibri" pitchFamily="34" charset="0"/>
+              </a:rPr>
+              <a:t>(Section Header)</a:t>
+            </a:r>
+            <a:endParaRPr lang="en-US" sz="3600" spc="60" dirty="0">
+              <a:solidFill>
+                <a:schemeClr val="bg1"/>
+              </a:solidFill>
+              <a:latin typeface="Calibri" pitchFamily="34" charset="0"/>
+            </a:endParaRPr>
+          </a:p>
+        </p:txBody>
+      </p:sp>
+      <p:sp>
+        <p:nvSpPr>
+          <p:cNvPr id="11" name="TextBox 10"/>
+          <p:cNvSpPr txBox="1"/>
+          <p:nvPr/>
+        </p:nvSpPr>
+        <p:spPr>
+          <a:xfrm>
+            <a:off x="381000" y="2057400"/>
+            <a:ext cx="7543800" cy="338554"/>
+          </a:xfrm>
+          <a:prstGeom prst="rect">
+            <a:avLst/>
+          </a:prstGeom>
+          <a:noFill/>
+        </p:spPr>
+        <p:txBody>
+          <a:bodyPr wrap="square">
+            <a:spAutoFit/>
+          </a:bodyPr>
+          <a:lstStyle/>
+          <a:p>
+            <a:pPr>
+              <a:defRPr/>
+            </a:pPr>
+            <a:r>
+              <a:rPr lang="en-US" sz="1600" dirty="0" smtClean="0">
+                <a:solidFill>
+                  <a:schemeClr val="bg1"/>
+                </a:solidFill>
+                <a:latin typeface="+mn-lt"/>
+              </a:rPr>
+              <a:t>(section sub title)</a:t>
+            </a:r>
+            <a:endParaRPr lang="en-US" sz="1600" dirty="0">
+              <a:solidFill>
+                <a:schemeClr val="bg1"/>
+              </a:solidFill>
+              <a:latin typeface="+mn-lt"/>
+            </a:endParaRPr>
+          </a:p>
+        </p:txBody>
+      </p:sp>
+    </p:spTree>
+  </p:cSld>
+  <p:clrMapOvr>
+    <a:masterClrMapping/>
+  </p:clrMapOvr>
+  <p:timing>
+    <p:tnLst>
+      <p:par>
+        <p:cTn id="1" dur="indefinite" restart="never" nodeType="tmRoot"/>
+      </p:par>
+    </p:tnLst>
+  </p:timing>
+</p:sld>
+</file>
+
+<file path=ppt/slides/slide15.xml><?xml version="1.0" encoding="utf-8"?>
+<p:sld xmlns:a="http://schemas.openxmlformats.org/drawingml/2006/main" xmlns:r="http://schemas.openxmlformats.org/officeDocument/2006/relationships" xmlns:p="http://schemas.openxmlformats.org/presentationml/2006/main">
+  <p:cSld>
+    <p:spTree>
+      <p:nvGrpSpPr>
+        <p:cNvPr id="1" name=""/>
+        <p:cNvGrpSpPr/>
+        <p:nvPr/>
+      </p:nvGrpSpPr>
+      <p:grpSpPr>
+        <a:xfrm>
+          <a:off x="0" y="0"/>
+          <a:ext cx="0" cy="0"/>
+          <a:chOff x="0" y="0"/>
+          <a:chExt cx="0" cy="0"/>
+        </a:xfrm>
+      </p:grpSpPr>
+      <p:sp>
+        <p:nvSpPr>
+          <p:cNvPr id="3075" name="Text Placeholder 2"/>
+          <p:cNvSpPr>
+            <a:spLocks noGrp="1"/>
+          </p:cNvSpPr>
+          <p:nvPr>
+            <p:ph type="body" sz="quarter" idx="10"/>
+          </p:nvPr>
+        </p:nvSpPr>
+        <p:spPr>
+          <a:xfrm>
+            <a:off x="685800" y="1066800"/>
+            <a:ext cx="8229600" cy="1219200"/>
+          </a:xfrm>
+        </p:spPr>
+        <p:txBody>
+          <a:bodyPr/>
+          <a:lstStyle/>
+          <a:p>
+            <a:pPr eaLnBrk="1" hangingPunct="1">
+              <a:buNone/>
+            </a:pPr>
+            <a:endParaRPr lang="en-US" sz="2000" dirty="0" smtClean="0"/>
+          </a:p>
+        </p:txBody>
+      </p:sp>
+      <p:sp>
+        <p:nvSpPr>
+          <p:cNvPr id="3074" name="Title 1"/>
+          <p:cNvSpPr>
+            <a:spLocks noGrp="1"/>
+          </p:cNvSpPr>
+          <p:nvPr>
+            <p:ph type="title"/>
+          </p:nvPr>
+        </p:nvSpPr>
+        <p:spPr bwMode="auto">
+          <a:noFill/>
+          <a:ln>
+            <a:miter lim="800000"/>
+            <a:headEnd/>
+            <a:tailEnd/>
+          </a:ln>
+        </p:spPr>
+        <p:txBody>
+          <a:bodyPr vert="horz" wrap="square" lIns="91440" tIns="45720" rIns="91440" bIns="45720" numCol="1" anchor="t" anchorCtr="0" compatLnSpc="1">
+            <a:prstTxWarp prst="textNoShape">
+              <a:avLst/>
+            </a:prstTxWarp>
+          </a:bodyPr>
+          <a:lstStyle/>
+          <a:p>
+            <a:pPr eaLnBrk="1" hangingPunct="1"/>
+            <a:endParaRPr lang="en-US" dirty="0" smtClean="0"/>
+          </a:p>
+        </p:txBody>
+      </p:sp>
+    </p:spTree>
+  </p:cSld>
+  <p:clrMapOvr>
+    <a:masterClrMapping/>
+  </p:clrMapOvr>
+  <p:timing>
+    <p:tnLst>
+      <p:par>
+        <p:cTn id="1" dur="indefinite" restart="never" nodeType="tmRoot"/>
+      </p:par>
+    </p:tnLst>
+  </p:timing>
+</p:sld>
+</file>
+
+<file path=ppt/slides/slide16.xml><?xml version="1.0" encoding="utf-8"?>
+<p:sld xmlns:a="http://schemas.openxmlformats.org/drawingml/2006/main" xmlns:r="http://schemas.openxmlformats.org/officeDocument/2006/relationships" xmlns:p="http://schemas.openxmlformats.org/presentationml/2006/main">
+  <p:cSld>
+    <p:spTree>
+      <p:nvGrpSpPr>
+        <p:cNvPr id="1" name=""/>
+        <p:cNvGrpSpPr/>
+        <p:nvPr/>
+      </p:nvGrpSpPr>
+      <p:grpSpPr>
+        <a:xfrm>
+          <a:off x="0" y="0"/>
+          <a:ext cx="0" cy="0"/>
+          <a:chOff x="0" y="0"/>
+          <a:chExt cx="0" cy="0"/>
+        </a:xfrm>
+      </p:grpSpPr>
+      <p:sp>
+        <p:nvSpPr>
+          <p:cNvPr id="3075" name="Text Placeholder 2"/>
+          <p:cNvSpPr>
+            <a:spLocks noGrp="1"/>
+          </p:cNvSpPr>
+          <p:nvPr>
+            <p:ph type="body" sz="quarter" idx="10"/>
+          </p:nvPr>
+        </p:nvSpPr>
+        <p:spPr>
+          <a:xfrm>
+            <a:off x="685800" y="1066800"/>
+            <a:ext cx="8229600" cy="1219200"/>
+          </a:xfrm>
+        </p:spPr>
+        <p:txBody>
+          <a:bodyPr/>
+          <a:lstStyle/>
+          <a:p>
+            <a:pPr eaLnBrk="1" hangingPunct="1">
+              <a:buNone/>
+            </a:pPr>
+            <a:endParaRPr lang="en-US" sz="2000" dirty="0" smtClean="0"/>
+          </a:p>
+        </p:txBody>
+      </p:sp>
+      <p:sp>
+        <p:nvSpPr>
+          <p:cNvPr id="3074" name="Title 1"/>
+          <p:cNvSpPr>
+            <a:spLocks noGrp="1"/>
+          </p:cNvSpPr>
+          <p:nvPr>
+            <p:ph type="title"/>
+          </p:nvPr>
+        </p:nvSpPr>
+        <p:spPr bwMode="auto">
+          <a:noFill/>
+          <a:ln>
+            <a:miter lim="800000"/>
+            <a:headEnd/>
+            <a:tailEnd/>
+          </a:ln>
+        </p:spPr>
+        <p:txBody>
+          <a:bodyPr vert="horz" wrap="square" lIns="91440" tIns="45720" rIns="91440" bIns="45720" numCol="1" anchor="t" anchorCtr="0" compatLnSpc="1">
+            <a:prstTxWarp prst="textNoShape">
+              <a:avLst/>
+            </a:prstTxWarp>
+          </a:bodyPr>
+          <a:lstStyle/>
+          <a:p>
+            <a:pPr eaLnBrk="1" hangingPunct="1"/>
+            <a:endParaRPr lang="en-US" dirty="0" smtClean="0"/>
+          </a:p>
+        </p:txBody>
+      </p:sp>
+    </p:spTree>
+  </p:cSld>
+  <p:clrMapOvr>
+    <a:masterClrMapping/>
+  </p:clrMapOvr>
+  <p:timing>
+    <p:tnLst>
+      <p:par>
+        <p:cTn id="1" dur="indefinite" restart="never" nodeType="tmRoot"/>
+      </p:par>
+    </p:tnLst>
+  </p:timing>
+</p:sld>
+</file>
+
+<file path=ppt/slides/slide17.xml><?xml version="1.0" encoding="utf-8"?>
+<p:sld xmlns:a="http://schemas.openxmlformats.org/drawingml/2006/main" xmlns:r="http://schemas.openxmlformats.org/officeDocument/2006/relationships" xmlns:p="http://schemas.openxmlformats.org/presentationml/2006/main">
+  <p:cSld>
+    <p:spTree>
+      <p:nvGrpSpPr>
+        <p:cNvPr id="1" name=""/>
+        <p:cNvGrpSpPr/>
+        <p:nvPr/>
+      </p:nvGrpSpPr>
+      <p:grpSpPr>
+        <a:xfrm>
+          <a:off x="0" y="0"/>
+          <a:ext cx="0" cy="0"/>
+          <a:chOff x="0" y="0"/>
+          <a:chExt cx="0" cy="0"/>
+        </a:xfrm>
+      </p:grpSpPr>
+      <p:sp>
+        <p:nvSpPr>
+          <p:cNvPr id="6" name="Rectangle 5"/>
+          <p:cNvSpPr/>
+          <p:nvPr/>
+        </p:nvSpPr>
+        <p:spPr>
+          <a:xfrm>
+            <a:off x="0" y="0"/>
+            <a:ext cx="9144000" cy="4648200"/>
+          </a:xfrm>
+          <a:prstGeom prst="rect">
+            <a:avLst/>
+          </a:prstGeom>
+          <a:solidFill>
+            <a:srgbClr val="0069AA"/>
+          </a:solidFill>
+          <a:ln>
+            <a:noFill/>
           </a:ln>
         </p:spPr>
         <p:style>
@@ -3196,6 +4228,736 @@
       </p:sp>
       <p:sp>
         <p:nvSpPr>
+          <p:cNvPr id="8" name="Rectangle 7"/>
+          <p:cNvSpPr/>
+          <p:nvPr/>
+        </p:nvSpPr>
+        <p:spPr>
+          <a:xfrm>
+            <a:off x="228600" y="0"/>
+            <a:ext cx="104775" cy="3581400"/>
+          </a:xfrm>
+          <a:prstGeom prst="rect">
+            <a:avLst/>
+          </a:prstGeom>
+          <a:solidFill>
+            <a:srgbClr val="E31937"/>
+          </a:solidFill>
+          <a:ln>
+            <a:noFill/>
+          </a:ln>
+        </p:spPr>
+        <p:style>
+          <a:lnRef idx="2">
+            <a:schemeClr val="accent1">
+              <a:shade val="50000"/>
+            </a:schemeClr>
+          </a:lnRef>
+          <a:fillRef idx="1">
+            <a:schemeClr val="accent1"/>
+          </a:fillRef>
+          <a:effectRef idx="0">
+            <a:schemeClr val="accent1"/>
+          </a:effectRef>
+          <a:fontRef idx="minor">
+            <a:schemeClr val="lt1"/>
+          </a:fontRef>
+        </p:style>
+        <p:txBody>
+          <a:bodyPr anchor="ctr"/>
+          <a:lstStyle/>
+          <a:p>
+            <a:pPr algn="ctr">
+              <a:defRPr/>
+            </a:pPr>
+            <a:endParaRPr lang="en-US"/>
+          </a:p>
+        </p:txBody>
+      </p:sp>
+      <p:sp>
+        <p:nvSpPr>
+          <p:cNvPr id="5127" name="Rectangle 8"/>
+          <p:cNvSpPr>
+            <a:spLocks noGrp="1" noChangeArrowheads="1"/>
+          </p:cNvSpPr>
+          <p:nvPr>
+            <p:ph type="title" idx="4294967295"/>
+          </p:nvPr>
+        </p:nvSpPr>
+        <p:spPr bwMode="auto">
+          <a:xfrm>
+            <a:off x="495300" y="200025"/>
+            <a:ext cx="8420100" cy="919163"/>
+          </a:xfrm>
+          <a:prstGeom prst="rect">
+            <a:avLst/>
+          </a:prstGeom>
+          <a:noFill/>
+          <a:ln>
+            <a:miter lim="800000"/>
+            <a:headEnd/>
+            <a:tailEnd/>
+          </a:ln>
+        </p:spPr>
+        <p:txBody>
+          <a:bodyPr/>
+          <a:lstStyle/>
+          <a:p>
+            <a:pPr eaLnBrk="1" hangingPunct="1"/>
+            <a:r>
+              <a:rPr lang="en-US" dirty="0" smtClean="0">
+                <a:solidFill>
+                  <a:schemeClr val="bg1"/>
+                </a:solidFill>
+              </a:rPr>
+              <a:t>Additional Resources</a:t>
+            </a:r>
+          </a:p>
+        </p:txBody>
+      </p:sp>
+      <p:sp>
+        <p:nvSpPr>
+          <p:cNvPr id="5128" name="Rectangle 9"/>
+          <p:cNvSpPr>
+            <a:spLocks noGrp="1" noChangeArrowheads="1"/>
+          </p:cNvSpPr>
+          <p:nvPr>
+            <p:ph idx="4294967295"/>
+          </p:nvPr>
+        </p:nvSpPr>
+        <p:spPr>
+          <a:xfrm>
+            <a:off x="514350" y="1143000"/>
+            <a:ext cx="8229600" cy="3429000"/>
+          </a:xfrm>
+        </p:spPr>
+        <p:txBody>
+          <a:bodyPr/>
+          <a:lstStyle/>
+          <a:p>
+            <a:pPr eaLnBrk="1" hangingPunct="1">
+              <a:lnSpc>
+                <a:spcPct val="80000"/>
+              </a:lnSpc>
+              <a:buNone/>
+            </a:pPr>
+            <a:r>
+              <a:rPr lang="en-US" sz="2000" dirty="0" smtClean="0">
+                <a:solidFill>
+                  <a:schemeClr val="bg1"/>
+                </a:solidFill>
+              </a:rPr>
+              <a:t>Command Pattern</a:t>
+            </a:r>
+          </a:p>
+          <a:p>
+            <a:pPr eaLnBrk="1" hangingPunct="1">
+              <a:lnSpc>
+                <a:spcPct val="80000"/>
+              </a:lnSpc>
+              <a:buNone/>
+            </a:pPr>
+            <a:r>
+              <a:rPr lang="en-US" sz="2000" dirty="0" smtClean="0">
+                <a:solidFill>
+                  <a:schemeClr val="bg1"/>
+                </a:solidFill>
+              </a:rPr>
+              <a:t>	http://</a:t>
+            </a:r>
+            <a:r>
+              <a:rPr lang="en-US" sz="2000" dirty="0" smtClean="0">
+                <a:solidFill>
+                  <a:schemeClr val="bg1"/>
+                </a:solidFill>
+              </a:rPr>
+              <a:t>www.lostechies.com/blogs/derickbailey/archive/2008/11/19/ptom-command-and-conquer-your-ui-coupling-problems.aspx </a:t>
+            </a:r>
+            <a:br>
+              <a:rPr lang="en-US" sz="2000" dirty="0" smtClean="0">
+                <a:solidFill>
+                  <a:schemeClr val="bg1"/>
+                </a:solidFill>
+              </a:rPr>
+            </a:br>
+            <a:endParaRPr lang="en-US" sz="2000" dirty="0" smtClean="0">
+              <a:solidFill>
+                <a:schemeClr val="bg1"/>
+              </a:solidFill>
+            </a:endParaRPr>
+          </a:p>
+          <a:p>
+            <a:pPr eaLnBrk="1" hangingPunct="1">
+              <a:lnSpc>
+                <a:spcPct val="80000"/>
+              </a:lnSpc>
+              <a:buNone/>
+            </a:pPr>
+            <a:r>
+              <a:rPr lang="en-US" sz="2000" dirty="0" smtClean="0">
+                <a:solidFill>
+                  <a:schemeClr val="bg1"/>
+                </a:solidFill>
+              </a:rPr>
+              <a:t>Event </a:t>
+            </a:r>
+            <a:r>
+              <a:rPr lang="en-US" sz="2000" dirty="0" smtClean="0">
+                <a:solidFill>
+                  <a:schemeClr val="bg1"/>
+                </a:solidFill>
+              </a:rPr>
+              <a:t>Aggregator</a:t>
+            </a:r>
+            <a:br>
+              <a:rPr lang="en-US" sz="2000" dirty="0" smtClean="0">
+                <a:solidFill>
+                  <a:schemeClr val="bg1"/>
+                </a:solidFill>
+              </a:rPr>
+            </a:br>
+            <a:r>
+              <a:rPr lang="en-US" sz="2000" dirty="0" smtClean="0">
+                <a:solidFill>
+                  <a:schemeClr val="bg1"/>
+                </a:solidFill>
+              </a:rPr>
+              <a:t>http://</a:t>
+            </a:r>
+            <a:r>
+              <a:rPr lang="en-US" sz="2000" dirty="0" smtClean="0">
+                <a:solidFill>
+                  <a:schemeClr val="bg1"/>
+                </a:solidFill>
+              </a:rPr>
+              <a:t>www.martinfowler.com/eaaDev/EventAggregator.html</a:t>
+            </a:r>
+            <a:br>
+              <a:rPr lang="en-US" sz="2000" dirty="0" smtClean="0">
+                <a:solidFill>
+                  <a:schemeClr val="bg1"/>
+                </a:solidFill>
+              </a:rPr>
+            </a:br>
+            <a:endParaRPr lang="en-US" sz="2000" dirty="0" smtClean="0">
+              <a:solidFill>
+                <a:schemeClr val="bg1"/>
+              </a:solidFill>
+            </a:endParaRPr>
+          </a:p>
+          <a:p>
+            <a:pPr eaLnBrk="1" hangingPunct="1">
+              <a:lnSpc>
+                <a:spcPct val="80000"/>
+              </a:lnSpc>
+              <a:buNone/>
+            </a:pPr>
+            <a:r>
+              <a:rPr lang="en-US" sz="2000" dirty="0" err="1" smtClean="0">
+                <a:solidFill>
+                  <a:schemeClr val="bg1"/>
+                </a:solidFill>
+              </a:rPr>
+              <a:t>IoC</a:t>
+            </a:r>
+            <a:r>
+              <a:rPr lang="en-US" sz="2000" dirty="0" smtClean="0">
+                <a:solidFill>
+                  <a:schemeClr val="bg1"/>
+                </a:solidFill>
+              </a:rPr>
+              <a:t> Container (</a:t>
+            </a:r>
+            <a:r>
+              <a:rPr lang="en-US" sz="2000" dirty="0" err="1" smtClean="0">
+                <a:solidFill>
+                  <a:schemeClr val="bg1"/>
+                </a:solidFill>
+              </a:rPr>
+              <a:t>StructureMap</a:t>
+            </a:r>
+            <a:r>
+              <a:rPr lang="en-US" sz="2000" dirty="0" smtClean="0">
+                <a:solidFill>
+                  <a:schemeClr val="bg1"/>
+                </a:solidFill>
+              </a:rPr>
+              <a:t>)</a:t>
+            </a:r>
+          </a:p>
+          <a:p>
+            <a:pPr eaLnBrk="1" hangingPunct="1">
+              <a:lnSpc>
+                <a:spcPct val="80000"/>
+              </a:lnSpc>
+              <a:buNone/>
+            </a:pPr>
+            <a:r>
+              <a:rPr lang="en-US" sz="2000" dirty="0" smtClean="0">
+                <a:solidFill>
+                  <a:schemeClr val="bg1"/>
+                </a:solidFill>
+              </a:rPr>
+              <a:t>	http://</a:t>
+            </a:r>
+            <a:r>
+              <a:rPr lang="en-US" sz="2000" dirty="0" smtClean="0">
+                <a:solidFill>
+                  <a:schemeClr val="bg1"/>
+                </a:solidFill>
+              </a:rPr>
+              <a:t>structuremap.sourceforge.net</a:t>
+            </a:r>
+            <a:br>
+              <a:rPr lang="en-US" sz="2000" dirty="0" smtClean="0">
+                <a:solidFill>
+                  <a:schemeClr val="bg1"/>
+                </a:solidFill>
+              </a:rPr>
+            </a:br>
+            <a:endParaRPr lang="en-US" sz="2000" dirty="0" smtClean="0">
+              <a:solidFill>
+                <a:schemeClr val="bg1"/>
+              </a:solidFill>
+            </a:endParaRPr>
+          </a:p>
+          <a:p>
+            <a:pPr eaLnBrk="1" hangingPunct="1">
+              <a:lnSpc>
+                <a:spcPct val="80000"/>
+              </a:lnSpc>
+              <a:buNone/>
+            </a:pPr>
+            <a:r>
+              <a:rPr lang="en-US" sz="2000" dirty="0" smtClean="0">
+                <a:solidFill>
+                  <a:schemeClr val="bg1"/>
+                </a:solidFill>
+              </a:rPr>
+              <a:t>Application Controller</a:t>
+            </a:r>
+          </a:p>
+          <a:p>
+            <a:pPr eaLnBrk="1" hangingPunct="1">
+              <a:lnSpc>
+                <a:spcPct val="80000"/>
+              </a:lnSpc>
+              <a:buNone/>
+            </a:pPr>
+            <a:r>
+              <a:rPr lang="en-US" sz="2000" dirty="0" smtClean="0">
+                <a:solidFill>
+                  <a:schemeClr val="bg1"/>
+                </a:solidFill>
+              </a:rPr>
+              <a:t>	http://</a:t>
+            </a:r>
+            <a:r>
+              <a:rPr lang="en-US" sz="2000" dirty="0" smtClean="0">
+                <a:solidFill>
+                  <a:schemeClr val="bg1"/>
+                </a:solidFill>
+              </a:rPr>
+              <a:t>www.martinfowler.com/eaaCatalog/applicationController.html</a:t>
+            </a:r>
+            <a:br>
+              <a:rPr lang="en-US" sz="2000" dirty="0" smtClean="0">
+                <a:solidFill>
+                  <a:schemeClr val="bg1"/>
+                </a:solidFill>
+              </a:rPr>
+            </a:br>
+            <a:endParaRPr lang="en-US" sz="2000" dirty="0" smtClean="0">
+              <a:solidFill>
+                <a:schemeClr val="bg1"/>
+              </a:solidFill>
+            </a:endParaRPr>
+          </a:p>
+        </p:txBody>
+      </p:sp>
+      <p:sp>
+        <p:nvSpPr>
+          <p:cNvPr id="5129" name="Text Box 7"/>
+          <p:cNvSpPr txBox="1">
+            <a:spLocks noChangeArrowheads="1"/>
+          </p:cNvSpPr>
+          <p:nvPr/>
+        </p:nvSpPr>
+        <p:spPr bwMode="auto">
+          <a:xfrm>
+            <a:off x="5470525" y="1331913"/>
+            <a:ext cx="184150" cy="366712"/>
+          </a:xfrm>
+          <a:prstGeom prst="rect">
+            <a:avLst/>
+          </a:prstGeom>
+          <a:noFill/>
+          <a:ln w="9525">
+            <a:noFill/>
+            <a:miter lim="800000"/>
+            <a:headEnd/>
+            <a:tailEnd/>
+          </a:ln>
+        </p:spPr>
+        <p:txBody>
+          <a:bodyPr wrap="none">
+            <a:spAutoFit/>
+          </a:bodyPr>
+          <a:lstStyle/>
+          <a:p>
+            <a:endParaRPr lang="en-US"/>
+          </a:p>
+        </p:txBody>
+      </p:sp>
+      <p:pic>
+        <p:nvPicPr>
+          <p:cNvPr id="16" name="Picture 4" descr="MAT logo 1 CMYK"/>
+          <p:cNvPicPr>
+            <a:picLocks noChangeAspect="1" noChangeArrowheads="1"/>
+          </p:cNvPicPr>
+          <p:nvPr/>
+        </p:nvPicPr>
+        <p:blipFill>
+          <a:blip r:embed="rId2">
+            <a:clrChange>
+              <a:clrFrom>
+                <a:srgbClr val="FDFDFD"/>
+              </a:clrFrom>
+              <a:clrTo>
+                <a:srgbClr val="FDFDFD">
+                  <a:alpha val="0"/>
+                </a:srgbClr>
+              </a:clrTo>
+            </a:clrChange>
+          </a:blip>
+          <a:srcRect/>
+          <a:stretch>
+            <a:fillRect/>
+          </a:stretch>
+        </p:blipFill>
+        <p:spPr bwMode="auto">
+          <a:xfrm>
+            <a:off x="2971800" y="4800600"/>
+            <a:ext cx="2819400" cy="1338263"/>
+          </a:xfrm>
+          <a:prstGeom prst="rect">
+            <a:avLst/>
+          </a:prstGeom>
+          <a:noFill/>
+          <a:ln w="9525">
+            <a:noFill/>
+            <a:miter lim="800000"/>
+            <a:headEnd/>
+            <a:tailEnd/>
+          </a:ln>
+        </p:spPr>
+      </p:pic>
+      <p:sp>
+        <p:nvSpPr>
+          <p:cNvPr id="17" name="Rectangle 16"/>
+          <p:cNvSpPr/>
+          <p:nvPr/>
+        </p:nvSpPr>
+        <p:spPr>
+          <a:xfrm>
+            <a:off x="0" y="4724400"/>
+            <a:ext cx="9144000" cy="2133600"/>
+          </a:xfrm>
+          <a:prstGeom prst="rect">
+            <a:avLst/>
+          </a:prstGeom>
+          <a:solidFill>
+            <a:srgbClr val="E31937"/>
+          </a:solidFill>
+          <a:ln>
+            <a:noFill/>
+          </a:ln>
+        </p:spPr>
+        <p:style>
+          <a:lnRef idx="2">
+            <a:schemeClr val="accent1">
+              <a:shade val="50000"/>
+            </a:schemeClr>
+          </a:lnRef>
+          <a:fillRef idx="1">
+            <a:schemeClr val="accent1"/>
+          </a:fillRef>
+          <a:effectRef idx="0">
+            <a:schemeClr val="accent1"/>
+          </a:effectRef>
+          <a:fontRef idx="minor">
+            <a:schemeClr val="lt1"/>
+          </a:fontRef>
+        </p:style>
+        <p:txBody>
+          <a:bodyPr anchor="ctr"/>
+          <a:lstStyle/>
+          <a:p>
+            <a:pPr algn="ctr">
+              <a:defRPr/>
+            </a:pPr>
+            <a:endParaRPr lang="en-US"/>
+          </a:p>
+        </p:txBody>
+      </p:sp>
+      <p:pic>
+        <p:nvPicPr>
+          <p:cNvPr id="18" name="Picture 7" descr="MAT logo vertical_red.emf"/>
+          <p:cNvPicPr>
+            <a:picLocks noChangeAspect="1"/>
+          </p:cNvPicPr>
+          <p:nvPr/>
+        </p:nvPicPr>
+        <p:blipFill>
+          <a:blip r:embed="rId3"/>
+          <a:srcRect/>
+          <a:stretch>
+            <a:fillRect/>
+          </a:stretch>
+        </p:blipFill>
+        <p:spPr bwMode="auto">
+          <a:xfrm>
+            <a:off x="3600450" y="5334000"/>
+            <a:ext cx="1981200" cy="969963"/>
+          </a:xfrm>
+          <a:prstGeom prst="rect">
+            <a:avLst/>
+          </a:prstGeom>
+          <a:noFill/>
+          <a:ln w="9525">
+            <a:noFill/>
+            <a:miter lim="800000"/>
+            <a:headEnd/>
+            <a:tailEnd/>
+          </a:ln>
+        </p:spPr>
+      </p:pic>
+    </p:spTree>
+  </p:cSld>
+  <p:clrMapOvr>
+    <a:masterClrMapping/>
+  </p:clrMapOvr>
+  <p:timing>
+    <p:tnLst>
+      <p:par>
+        <p:cTn id="1" dur="indefinite" restart="never" nodeType="tmRoot"/>
+      </p:par>
+    </p:tnLst>
+  </p:timing>
+</p:sld>
+</file>
+
+<file path=ppt/slides/slide18.xml><?xml version="1.0" encoding="utf-8"?>
+<p:sld xmlns:a="http://schemas.openxmlformats.org/drawingml/2006/main" xmlns:r="http://schemas.openxmlformats.org/officeDocument/2006/relationships" xmlns:p="http://schemas.openxmlformats.org/presentationml/2006/main">
+  <p:cSld>
+    <p:spTree>
+      <p:nvGrpSpPr>
+        <p:cNvPr id="1" name=""/>
+        <p:cNvGrpSpPr/>
+        <p:nvPr/>
+      </p:nvGrpSpPr>
+      <p:grpSpPr>
+        <a:xfrm>
+          <a:off x="0" y="0"/>
+          <a:ext cx="0" cy="0"/>
+          <a:chOff x="0" y="0"/>
+          <a:chExt cx="0" cy="0"/>
+        </a:xfrm>
+      </p:grpSpPr>
+      <p:sp>
+        <p:nvSpPr>
+          <p:cNvPr id="6" name="Rectangle 5"/>
+          <p:cNvSpPr/>
+          <p:nvPr/>
+        </p:nvSpPr>
+        <p:spPr>
+          <a:xfrm>
+            <a:off x="0" y="0"/>
+            <a:ext cx="9144000" cy="4648200"/>
+          </a:xfrm>
+          <a:prstGeom prst="rect">
+            <a:avLst/>
+          </a:prstGeom>
+          <a:solidFill>
+            <a:srgbClr val="0069AA"/>
+          </a:solidFill>
+          <a:ln>
+            <a:noFill/>
+          </a:ln>
+        </p:spPr>
+        <p:style>
+          <a:lnRef idx="2">
+            <a:schemeClr val="accent1">
+              <a:shade val="50000"/>
+            </a:schemeClr>
+          </a:lnRef>
+          <a:fillRef idx="1">
+            <a:schemeClr val="accent1"/>
+          </a:fillRef>
+          <a:effectRef idx="0">
+            <a:schemeClr val="accent1"/>
+          </a:effectRef>
+          <a:fontRef idx="minor">
+            <a:schemeClr val="lt1"/>
+          </a:fontRef>
+        </p:style>
+        <p:txBody>
+          <a:bodyPr anchor="ctr"/>
+          <a:lstStyle/>
+          <a:p>
+            <a:pPr algn="ctr">
+              <a:defRPr/>
+            </a:pPr>
+            <a:endParaRPr lang="en-US"/>
+          </a:p>
+        </p:txBody>
+      </p:sp>
+      <p:sp>
+        <p:nvSpPr>
+          <p:cNvPr id="7" name="Rectangle 6"/>
+          <p:cNvSpPr/>
+          <p:nvPr/>
+        </p:nvSpPr>
+        <p:spPr>
+          <a:xfrm>
+            <a:off x="0" y="4724400"/>
+            <a:ext cx="9153525" cy="2133600"/>
+          </a:xfrm>
+          <a:prstGeom prst="rect">
+            <a:avLst/>
+          </a:prstGeom>
+          <a:solidFill>
+            <a:srgbClr val="E31937"/>
+          </a:solidFill>
+          <a:ln>
+            <a:noFill/>
+          </a:ln>
+        </p:spPr>
+        <p:style>
+          <a:lnRef idx="2">
+            <a:schemeClr val="accent1">
+              <a:shade val="50000"/>
+            </a:schemeClr>
+          </a:lnRef>
+          <a:fillRef idx="1">
+            <a:schemeClr val="accent1"/>
+          </a:fillRef>
+          <a:effectRef idx="0">
+            <a:schemeClr val="accent1"/>
+          </a:effectRef>
+          <a:fontRef idx="minor">
+            <a:schemeClr val="lt1"/>
+          </a:fontRef>
+        </p:style>
+        <p:txBody>
+          <a:bodyPr anchor="ctr"/>
+          <a:lstStyle/>
+          <a:p>
+            <a:pPr algn="ctr">
+              <a:defRPr/>
+            </a:pPr>
+            <a:endParaRPr lang="en-US"/>
+          </a:p>
+        </p:txBody>
+      </p:sp>
+      <p:sp>
+        <p:nvSpPr>
+          <p:cNvPr id="8" name="Rectangle 7"/>
+          <p:cNvSpPr/>
+          <p:nvPr/>
+        </p:nvSpPr>
+        <p:spPr>
+          <a:xfrm>
+            <a:off x="228600" y="0"/>
+            <a:ext cx="104775" cy="3581400"/>
+          </a:xfrm>
+          <a:prstGeom prst="rect">
+            <a:avLst/>
+          </a:prstGeom>
+          <a:solidFill>
+            <a:srgbClr val="E31937"/>
+          </a:solidFill>
+          <a:ln>
+            <a:noFill/>
+          </a:ln>
+        </p:spPr>
+        <p:style>
+          <a:lnRef idx="2">
+            <a:schemeClr val="accent1">
+              <a:shade val="50000"/>
+            </a:schemeClr>
+          </a:lnRef>
+          <a:fillRef idx="1">
+            <a:schemeClr val="accent1"/>
+          </a:fillRef>
+          <a:effectRef idx="0">
+            <a:schemeClr val="accent1"/>
+          </a:effectRef>
+          <a:fontRef idx="minor">
+            <a:schemeClr val="lt1"/>
+          </a:fontRef>
+        </p:style>
+        <p:txBody>
+          <a:bodyPr anchor="ctr"/>
+          <a:lstStyle/>
+          <a:p>
+            <a:pPr algn="ctr">
+              <a:defRPr/>
+            </a:pPr>
+            <a:endParaRPr lang="en-US"/>
+          </a:p>
+        </p:txBody>
+      </p:sp>
+      <p:sp>
+        <p:nvSpPr>
+          <p:cNvPr id="10" name="Rectangle 9"/>
+          <p:cNvSpPr/>
+          <p:nvPr/>
+        </p:nvSpPr>
+        <p:spPr>
+          <a:xfrm>
+            <a:off x="112713" y="4800600"/>
+            <a:ext cx="8907462" cy="1933575"/>
+          </a:xfrm>
+          <a:prstGeom prst="rect">
+            <a:avLst/>
+          </a:prstGeom>
+          <a:noFill/>
+          <a:ln w="12700">
+            <a:solidFill>
+              <a:schemeClr val="bg1"/>
+            </a:solidFill>
+          </a:ln>
+        </p:spPr>
+        <p:style>
+          <a:lnRef idx="2">
+            <a:schemeClr val="accent1">
+              <a:shade val="50000"/>
+            </a:schemeClr>
+          </a:lnRef>
+          <a:fillRef idx="1">
+            <a:schemeClr val="accent1"/>
+          </a:fillRef>
+          <a:effectRef idx="0">
+            <a:schemeClr val="accent1"/>
+          </a:effectRef>
+          <a:fontRef idx="minor">
+            <a:schemeClr val="lt1"/>
+          </a:fontRef>
+        </p:style>
+        <p:txBody>
+          <a:bodyPr anchor="ctr"/>
+          <a:lstStyle/>
+          <a:p>
+            <a:pPr algn="ctr">
+              <a:defRPr/>
+            </a:pPr>
+            <a:endParaRPr lang="en-US"/>
+          </a:p>
+        </p:txBody>
+      </p:sp>
+      <p:sp>
+        <p:nvSpPr>
           <p:cNvPr id="5126" name="TextBox 16"/>
           <p:cNvSpPr txBox="1">
             <a:spLocks noChangeArrowheads="1"/>
@@ -3351,14 +5113,6 @@
               </a:rPr>
               <a:t>Blog: </a:t>
             </a:r>
-            <a:r>
-              <a:rPr lang="en-US" sz="1800" dirty="0" smtClean="0">
-                <a:solidFill>
-                  <a:schemeClr val="bg1"/>
-                </a:solidFill>
-              </a:rPr>
-              <a:t/>
-            </a:r>
             <a:br>
               <a:rPr lang="en-US" sz="1800" dirty="0" smtClean="0">
                 <a:solidFill>
@@ -3374,11 +5128,6 @@
               </a:rPr>
               <a:t>derickbailey.lostechies.com</a:t>
             </a:r>
-            <a:endParaRPr lang="en-US" sz="1800" dirty="0" smtClean="0">
-              <a:solidFill>
-                <a:schemeClr val="bg1"/>
-              </a:solidFill>
-            </a:endParaRPr>
           </a:p>
           <a:p>
             <a:pPr eaLnBrk="1" hangingPunct="1">
@@ -3873,7 +5622,7 @@
         <p:spPr>
           <a:xfrm>
             <a:off x="685800" y="1066800"/>
-            <a:ext cx="8229600" cy="1219200"/>
+            <a:ext cx="8229600" cy="5334000"/>
           </a:xfrm>
         </p:spPr>
         <p:txBody>
@@ -3883,6 +5632,121 @@
             <a:pPr eaLnBrk="1" hangingPunct="1">
               <a:buNone/>
             </a:pPr>
+            <a:r>
+              <a:rPr lang="en-US" b="1" dirty="0" smtClean="0">
+                <a:solidFill>
+                  <a:schemeClr val="accent1">
+                    <a:lumMod val="75000"/>
+                  </a:schemeClr>
+                </a:solidFill>
+              </a:rPr>
+              <a:t>Topics Covered</a:t>
+            </a:r>
+          </a:p>
+          <a:p>
+            <a:pPr eaLnBrk="1" hangingPunct="1"/>
+            <a:r>
+              <a:rPr lang="en-US" sz="2000" dirty="0" smtClean="0"/>
+              <a:t>Event Aggregator</a:t>
+            </a:r>
+          </a:p>
+          <a:p>
+            <a:pPr eaLnBrk="1" hangingPunct="1"/>
+            <a:r>
+              <a:rPr lang="en-US" sz="2000" dirty="0" smtClean="0"/>
+              <a:t>Command Pattern</a:t>
+            </a:r>
+          </a:p>
+          <a:p>
+            <a:pPr eaLnBrk="1" hangingPunct="1"/>
+            <a:r>
+              <a:rPr lang="en-US" sz="2000" dirty="0" smtClean="0"/>
+              <a:t>Application Controller</a:t>
+            </a:r>
+          </a:p>
+          <a:p>
+            <a:pPr eaLnBrk="1" hangingPunct="1"/>
+            <a:r>
+              <a:rPr lang="en-US" sz="2000" dirty="0" smtClean="0"/>
+              <a:t>Wiring Together With </a:t>
+            </a:r>
+            <a:r>
+              <a:rPr lang="en-US" sz="2000" dirty="0" err="1" smtClean="0"/>
+              <a:t>IoC</a:t>
+            </a:r>
+            <a:r>
+              <a:rPr lang="en-US" sz="2000" dirty="0" smtClean="0"/>
+              <a:t> Container</a:t>
+            </a:r>
+          </a:p>
+          <a:p>
+            <a:pPr eaLnBrk="1" hangingPunct="1"/>
+            <a:endParaRPr lang="en-US" sz="2000" dirty="0" smtClean="0"/>
+          </a:p>
+          <a:p>
+            <a:pPr eaLnBrk="1" hangingPunct="1">
+              <a:buNone/>
+            </a:pPr>
+            <a:r>
+              <a:rPr lang="en-US" b="1" dirty="0" smtClean="0">
+                <a:solidFill>
+                  <a:schemeClr val="accent1">
+                    <a:lumMod val="75000"/>
+                  </a:schemeClr>
+                </a:solidFill>
+              </a:rPr>
+              <a:t>Topics Not Covered Directly</a:t>
+            </a:r>
+          </a:p>
+          <a:p>
+            <a:pPr eaLnBrk="1" hangingPunct="1"/>
+            <a:r>
+              <a:rPr lang="en-US" sz="2000" dirty="0" smtClean="0"/>
+              <a:t>Model-View-Presenter and Other View Implementation Patterns</a:t>
+            </a:r>
+          </a:p>
+          <a:p>
+            <a:pPr eaLnBrk="1" hangingPunct="1"/>
+            <a:r>
+              <a:rPr lang="en-US" sz="2000" dirty="0" smtClean="0"/>
+              <a:t>Repository and Other Persistence Patterns</a:t>
+            </a:r>
+          </a:p>
+          <a:p>
+            <a:pPr eaLnBrk="1" hangingPunct="1"/>
+            <a:r>
+              <a:rPr lang="en-US" sz="2000" dirty="0" smtClean="0"/>
+              <a:t>Business Logic and Rules Validation Patterns</a:t>
+            </a:r>
+          </a:p>
+          <a:p>
+            <a:pPr eaLnBrk="1" hangingPunct="1"/>
+            <a:r>
+              <a:rPr lang="en-US" sz="2000" dirty="0" smtClean="0"/>
+              <a:t>User Experience Design</a:t>
+            </a:r>
+          </a:p>
+          <a:p>
+            <a:pPr eaLnBrk="1" hangingPunct="1"/>
+            <a:r>
+              <a:rPr lang="en-US" sz="2000" dirty="0" smtClean="0"/>
+              <a:t>Error Handling and Other Real-World Needs</a:t>
+            </a:r>
+          </a:p>
+          <a:p>
+            <a:pPr eaLnBrk="1" hangingPunct="1"/>
+            <a:r>
+              <a:rPr lang="en-US" sz="2000" dirty="0" smtClean="0"/>
+              <a:t>Other Best Practices </a:t>
+            </a:r>
+            <a:r>
+              <a:rPr lang="en-US" sz="2000" dirty="0" smtClean="0"/>
+              <a:t>f</a:t>
+            </a:r>
+            <a:r>
+              <a:rPr lang="en-US" sz="2000" dirty="0" smtClean="0"/>
+              <a:t>or Division of UI and Organization of Code</a:t>
+            </a:r>
             <a:endParaRPr lang="en-US" sz="2000" dirty="0" smtClean="0"/>
           </a:p>
         </p:txBody>
@@ -3914,6 +5778,10 @@
           <a:lstStyle/>
           <a:p>
             <a:pPr eaLnBrk="1" hangingPunct="1"/>
+            <a:r>
+              <a:rPr lang="en-US" dirty="0" smtClean="0"/>
+              <a:t>Topics Of This Presentation</a:t>
+            </a:r>
             <a:endParaRPr lang="en-US" dirty="0" smtClean="0"/>
           </a:p>
         </p:txBody>
@@ -3952,306 +5820,59 @@
       </p:grpSpPr>
       <p:sp>
         <p:nvSpPr>
-          <p:cNvPr id="4" name="Rectangle 3"/>
-          <p:cNvSpPr/>
-          <p:nvPr/>
+          <p:cNvPr id="3075" name="Text Placeholder 2"/>
+          <p:cNvSpPr>
+            <a:spLocks noGrp="1"/>
+          </p:cNvSpPr>
+          <p:nvPr>
+            <p:ph type="body" sz="quarter" idx="10"/>
+          </p:nvPr>
         </p:nvSpPr>
         <p:spPr>
           <a:xfrm>
-            <a:off x="0" y="0"/>
-            <a:ext cx="9144000" cy="4648200"/>
-          </a:xfrm>
-          <a:prstGeom prst="rect">
-            <a:avLst/>
-          </a:prstGeom>
-          <a:solidFill>
-            <a:srgbClr val="0069AA"/>
-          </a:solidFill>
+            <a:off x="685800" y="1066800"/>
+            <a:ext cx="8229600" cy="1219200"/>
+          </a:xfrm>
+        </p:spPr>
+        <p:txBody>
+          <a:bodyPr/>
+          <a:lstStyle/>
+          <a:p>
+            <a:pPr eaLnBrk="1" hangingPunct="1">
+              <a:buNone/>
+            </a:pPr>
+            <a:endParaRPr lang="en-US" sz="2000" dirty="0" smtClean="0"/>
+          </a:p>
+        </p:txBody>
+      </p:sp>
+      <p:sp>
+        <p:nvSpPr>
+          <p:cNvPr id="3074" name="Title 1"/>
+          <p:cNvSpPr>
+            <a:spLocks noGrp="1"/>
+          </p:cNvSpPr>
+          <p:nvPr>
+            <p:ph type="title"/>
+          </p:nvPr>
+        </p:nvSpPr>
+        <p:spPr bwMode="auto">
+          <a:noFill/>
           <a:ln>
-            <a:noFill/>
-          </a:ln>
-        </p:spPr>
-        <p:style>
-          <a:lnRef idx="2">
-            <a:schemeClr val="accent1">
-              <a:shade val="50000"/>
-            </a:schemeClr>
-          </a:lnRef>
-          <a:fillRef idx="1">
-            <a:schemeClr val="accent1"/>
-          </a:fillRef>
-          <a:effectRef idx="0">
-            <a:schemeClr val="accent1"/>
-          </a:effectRef>
-          <a:fontRef idx="minor">
-            <a:schemeClr val="lt1"/>
-          </a:fontRef>
-        </p:style>
-        <p:txBody>
-          <a:bodyPr anchor="ctr"/>
-          <a:lstStyle/>
-          <a:p>
-            <a:pPr algn="ctr">
-              <a:defRPr/>
-            </a:pPr>
-            <a:endParaRPr lang="en-US"/>
-          </a:p>
-        </p:txBody>
-      </p:sp>
-      <p:pic>
-        <p:nvPicPr>
-          <p:cNvPr id="4099" name="Picture 4" descr="MAT logo 1 CMYK"/>
-          <p:cNvPicPr>
-            <a:picLocks noChangeAspect="1" noChangeArrowheads="1"/>
-          </p:cNvPicPr>
-          <p:nvPr/>
-        </p:nvPicPr>
-        <p:blipFill>
-          <a:blip r:embed="rId2">
-            <a:clrChange>
-              <a:clrFrom>
-                <a:srgbClr val="FDFDFD"/>
-              </a:clrFrom>
-              <a:clrTo>
-                <a:srgbClr val="FDFDFD">
-                  <a:alpha val="0"/>
-                </a:srgbClr>
-              </a:clrTo>
-            </a:clrChange>
-          </a:blip>
-          <a:srcRect/>
-          <a:stretch>
-            <a:fillRect/>
-          </a:stretch>
-        </p:blipFill>
-        <p:spPr bwMode="auto">
-          <a:xfrm>
-            <a:off x="2971800" y="4800600"/>
-            <a:ext cx="2819400" cy="1338263"/>
-          </a:xfrm>
-          <a:prstGeom prst="rect">
-            <a:avLst/>
-          </a:prstGeom>
-          <a:noFill/>
-          <a:ln w="9525">
-            <a:noFill/>
             <a:miter lim="800000"/>
             <a:headEnd/>
             <a:tailEnd/>
           </a:ln>
         </p:spPr>
-      </p:pic>
-      <p:sp>
-        <p:nvSpPr>
-          <p:cNvPr id="5" name="Rectangle 4"/>
-          <p:cNvSpPr/>
-          <p:nvPr/>
-        </p:nvSpPr>
-        <p:spPr>
-          <a:xfrm>
-            <a:off x="0" y="4724400"/>
-            <a:ext cx="9144000" cy="2133600"/>
-          </a:xfrm>
-          <a:prstGeom prst="rect">
-            <a:avLst/>
-          </a:prstGeom>
-          <a:solidFill>
-            <a:srgbClr val="E31937"/>
-          </a:solidFill>
-          <a:ln>
-            <a:noFill/>
-          </a:ln>
-        </p:spPr>
-        <p:style>
-          <a:lnRef idx="2">
-            <a:schemeClr val="accent1">
-              <a:shade val="50000"/>
-            </a:schemeClr>
-          </a:lnRef>
-          <a:fillRef idx="1">
-            <a:schemeClr val="accent1"/>
-          </a:fillRef>
-          <a:effectRef idx="0">
-            <a:schemeClr val="accent1"/>
-          </a:effectRef>
-          <a:fontRef idx="minor">
-            <a:schemeClr val="lt1"/>
-          </a:fontRef>
-        </p:style>
-        <p:txBody>
-          <a:bodyPr anchor="ctr"/>
-          <a:lstStyle/>
-          <a:p>
-            <a:pPr algn="ctr">
-              <a:defRPr/>
-            </a:pPr>
-            <a:endParaRPr lang="en-US"/>
-          </a:p>
-        </p:txBody>
-      </p:sp>
-      <p:sp>
-        <p:nvSpPr>
-          <p:cNvPr id="10" name="Rectangle 9"/>
-          <p:cNvSpPr/>
-          <p:nvPr/>
-        </p:nvSpPr>
-        <p:spPr bwMode="auto">
-          <a:xfrm>
-            <a:off x="228600" y="0"/>
-            <a:ext cx="104775" cy="2325688"/>
-          </a:xfrm>
-          <a:prstGeom prst="rect">
-            <a:avLst/>
-          </a:prstGeom>
-          <a:solidFill>
-            <a:srgbClr val="E31937"/>
-          </a:solidFill>
-          <a:ln>
-            <a:noFill/>
-          </a:ln>
-        </p:spPr>
-        <p:style>
-          <a:lnRef idx="2">
-            <a:schemeClr val="accent1">
-              <a:shade val="50000"/>
-            </a:schemeClr>
-          </a:lnRef>
-          <a:fillRef idx="1">
-            <a:schemeClr val="accent1"/>
-          </a:fillRef>
-          <a:effectRef idx="0">
-            <a:schemeClr val="accent1"/>
-          </a:effectRef>
-          <a:fontRef idx="minor">
-            <a:schemeClr val="lt1"/>
-          </a:fontRef>
-        </p:style>
-        <p:txBody>
-          <a:bodyPr anchor="ctr"/>
-          <a:lstStyle/>
-          <a:p>
-            <a:pPr algn="ctr">
-              <a:defRPr/>
-            </a:pPr>
-            <a:endParaRPr lang="en-US"/>
-          </a:p>
-        </p:txBody>
-      </p:sp>
-      <p:pic>
-        <p:nvPicPr>
-          <p:cNvPr id="4103" name="Picture 7" descr="MAT logo vertical_red.emf"/>
-          <p:cNvPicPr>
-            <a:picLocks noChangeAspect="1"/>
-          </p:cNvPicPr>
-          <p:nvPr/>
-        </p:nvPicPr>
-        <p:blipFill>
-          <a:blip r:embed="rId3"/>
-          <a:srcRect/>
-          <a:stretch>
-            <a:fillRect/>
-          </a:stretch>
-        </p:blipFill>
-        <p:spPr bwMode="auto">
-          <a:xfrm>
-            <a:off x="3600450" y="5334000"/>
-            <a:ext cx="1981200" cy="969963"/>
-          </a:xfrm>
-          <a:prstGeom prst="rect">
-            <a:avLst/>
-          </a:prstGeom>
-          <a:noFill/>
-          <a:ln w="9525">
-            <a:noFill/>
-            <a:miter lim="800000"/>
-            <a:headEnd/>
-            <a:tailEnd/>
-          </a:ln>
-        </p:spPr>
-      </p:pic>
-      <p:sp>
-        <p:nvSpPr>
-          <p:cNvPr id="9" name="TextBox 8"/>
-          <p:cNvSpPr txBox="1"/>
-          <p:nvPr/>
-        </p:nvSpPr>
-        <p:spPr>
-          <a:xfrm>
-            <a:off x="381000" y="1447800"/>
-            <a:ext cx="8610600" cy="646331"/>
-          </a:xfrm>
-          <a:prstGeom prst="rect">
-            <a:avLst/>
-          </a:prstGeom>
-          <a:noFill/>
-        </p:spPr>
-        <p:txBody>
-          <a:bodyPr>
-            <a:spAutoFit/>
+        <p:txBody>
+          <a:bodyPr vert="horz" wrap="square" lIns="91440" tIns="45720" rIns="91440" bIns="45720" numCol="1" anchor="t" anchorCtr="0" compatLnSpc="1">
+            <a:prstTxWarp prst="textNoShape">
+              <a:avLst/>
+            </a:prstTxWarp>
           </a:bodyPr>
           <a:lstStyle/>
           <a:p>
-            <a:pPr>
-              <a:defRPr/>
-            </a:pPr>
-            <a:r>
-              <a:rPr lang="en-US" sz="3600" spc="60" dirty="0" smtClean="0">
-                <a:solidFill>
-                  <a:schemeClr val="bg1"/>
-                </a:solidFill>
-                <a:latin typeface="Calibri" pitchFamily="34" charset="0"/>
-              </a:rPr>
-              <a:t>(Section Header)</a:t>
-            </a:r>
-            <a:endParaRPr lang="en-US" sz="3600" spc="60" dirty="0">
-              <a:solidFill>
-                <a:schemeClr val="bg1"/>
-              </a:solidFill>
-              <a:latin typeface="Calibri" pitchFamily="34" charset="0"/>
-            </a:endParaRPr>
-          </a:p>
-        </p:txBody>
-      </p:sp>
-      <p:sp>
-        <p:nvSpPr>
-          <p:cNvPr id="11" name="TextBox 10"/>
-          <p:cNvSpPr txBox="1"/>
-          <p:nvPr/>
-        </p:nvSpPr>
-        <p:spPr>
-          <a:xfrm>
-            <a:off x="381000" y="2057400"/>
-            <a:ext cx="7543800" cy="338554"/>
-          </a:xfrm>
-          <a:prstGeom prst="rect">
-            <a:avLst/>
-          </a:prstGeom>
-          <a:noFill/>
-        </p:spPr>
-        <p:txBody>
-          <a:bodyPr wrap="square">
-            <a:spAutoFit/>
-          </a:bodyPr>
-          <a:lstStyle/>
-          <a:p>
-            <a:pPr>
-              <a:defRPr/>
-            </a:pPr>
-            <a:r>
-              <a:rPr lang="en-US" sz="1600" dirty="0" smtClean="0">
-                <a:solidFill>
-                  <a:schemeClr val="bg1"/>
-                </a:solidFill>
-                <a:latin typeface="+mn-lt"/>
-              </a:rPr>
-              <a:t>(section sub title)</a:t>
-            </a:r>
-            <a:endParaRPr lang="en-US" sz="1600" dirty="0">
-              <a:solidFill>
-                <a:schemeClr val="bg1"/>
-              </a:solidFill>
-              <a:latin typeface="+mn-lt"/>
-            </a:endParaRPr>
+            <a:pPr eaLnBrk="1" hangingPunct="1"/>
+            <a:endParaRPr lang="en-US" dirty="0" smtClean="0"/>
           </a:p>
         </p:txBody>
       </p:sp>
@@ -4289,59 +5910,306 @@
       </p:grpSpPr>
       <p:sp>
         <p:nvSpPr>
-          <p:cNvPr id="3075" name="Text Placeholder 2"/>
-          <p:cNvSpPr>
-            <a:spLocks noGrp="1"/>
-          </p:cNvSpPr>
-          <p:nvPr>
-            <p:ph type="body" sz="quarter" idx="10"/>
-          </p:nvPr>
+          <p:cNvPr id="4" name="Rectangle 3"/>
+          <p:cNvSpPr/>
+          <p:nvPr/>
         </p:nvSpPr>
         <p:spPr>
           <a:xfrm>
-            <a:off x="685800" y="1066800"/>
-            <a:ext cx="8229600" cy="1219200"/>
-          </a:xfrm>
-        </p:spPr>
-        <p:txBody>
-          <a:bodyPr/>
-          <a:lstStyle/>
-          <a:p>
-            <a:pPr eaLnBrk="1" hangingPunct="1">
-              <a:buNone/>
-            </a:pPr>
-            <a:endParaRPr lang="en-US" sz="2000" dirty="0" smtClean="0"/>
-          </a:p>
-        </p:txBody>
-      </p:sp>
-      <p:sp>
-        <p:nvSpPr>
-          <p:cNvPr id="3074" name="Title 1"/>
-          <p:cNvSpPr>
-            <a:spLocks noGrp="1"/>
-          </p:cNvSpPr>
-          <p:nvPr>
-            <p:ph type="title"/>
-          </p:nvPr>
-        </p:nvSpPr>
+            <a:off x="0" y="0"/>
+            <a:ext cx="9144000" cy="4648200"/>
+          </a:xfrm>
+          <a:prstGeom prst="rect">
+            <a:avLst/>
+          </a:prstGeom>
+          <a:solidFill>
+            <a:srgbClr val="0069AA"/>
+          </a:solidFill>
+          <a:ln>
+            <a:noFill/>
+          </a:ln>
+        </p:spPr>
+        <p:style>
+          <a:lnRef idx="2">
+            <a:schemeClr val="accent1">
+              <a:shade val="50000"/>
+            </a:schemeClr>
+          </a:lnRef>
+          <a:fillRef idx="1">
+            <a:schemeClr val="accent1"/>
+          </a:fillRef>
+          <a:effectRef idx="0">
+            <a:schemeClr val="accent1"/>
+          </a:effectRef>
+          <a:fontRef idx="minor">
+            <a:schemeClr val="lt1"/>
+          </a:fontRef>
+        </p:style>
+        <p:txBody>
+          <a:bodyPr anchor="ctr"/>
+          <a:lstStyle/>
+          <a:p>
+            <a:pPr algn="ctr">
+              <a:defRPr/>
+            </a:pPr>
+            <a:endParaRPr lang="en-US"/>
+          </a:p>
+        </p:txBody>
+      </p:sp>
+      <p:pic>
+        <p:nvPicPr>
+          <p:cNvPr id="4099" name="Picture 4" descr="MAT logo 1 CMYK"/>
+          <p:cNvPicPr>
+            <a:picLocks noChangeAspect="1" noChangeArrowheads="1"/>
+          </p:cNvPicPr>
+          <p:nvPr/>
+        </p:nvPicPr>
+        <p:blipFill>
+          <a:blip r:embed="rId2">
+            <a:clrChange>
+              <a:clrFrom>
+                <a:srgbClr val="FDFDFD"/>
+              </a:clrFrom>
+              <a:clrTo>
+                <a:srgbClr val="FDFDFD">
+                  <a:alpha val="0"/>
+                </a:srgbClr>
+              </a:clrTo>
+            </a:clrChange>
+          </a:blip>
+          <a:srcRect/>
+          <a:stretch>
+            <a:fillRect/>
+          </a:stretch>
+        </p:blipFill>
         <p:spPr bwMode="auto">
+          <a:xfrm>
+            <a:off x="2971800" y="4800600"/>
+            <a:ext cx="2819400" cy="1338263"/>
+          </a:xfrm>
+          <a:prstGeom prst="rect">
+            <a:avLst/>
+          </a:prstGeom>
           <a:noFill/>
-          <a:ln>
+          <a:ln w="9525">
+            <a:noFill/>
             <a:miter lim="800000"/>
             <a:headEnd/>
             <a:tailEnd/>
           </a:ln>
         </p:spPr>
-        <p:txBody>
-          <a:bodyPr vert="horz" wrap="square" lIns="91440" tIns="45720" rIns="91440" bIns="45720" numCol="1" anchor="t" anchorCtr="0" compatLnSpc="1">
-            <a:prstTxWarp prst="textNoShape">
-              <a:avLst/>
-            </a:prstTxWarp>
+      </p:pic>
+      <p:sp>
+        <p:nvSpPr>
+          <p:cNvPr id="5" name="Rectangle 4"/>
+          <p:cNvSpPr/>
+          <p:nvPr/>
+        </p:nvSpPr>
+        <p:spPr>
+          <a:xfrm>
+            <a:off x="0" y="4724400"/>
+            <a:ext cx="9144000" cy="2133600"/>
+          </a:xfrm>
+          <a:prstGeom prst="rect">
+            <a:avLst/>
+          </a:prstGeom>
+          <a:solidFill>
+            <a:srgbClr val="E31937"/>
+          </a:solidFill>
+          <a:ln>
+            <a:noFill/>
+          </a:ln>
+        </p:spPr>
+        <p:style>
+          <a:lnRef idx="2">
+            <a:schemeClr val="accent1">
+              <a:shade val="50000"/>
+            </a:schemeClr>
+          </a:lnRef>
+          <a:fillRef idx="1">
+            <a:schemeClr val="accent1"/>
+          </a:fillRef>
+          <a:effectRef idx="0">
+            <a:schemeClr val="accent1"/>
+          </a:effectRef>
+          <a:fontRef idx="minor">
+            <a:schemeClr val="lt1"/>
+          </a:fontRef>
+        </p:style>
+        <p:txBody>
+          <a:bodyPr anchor="ctr"/>
+          <a:lstStyle/>
+          <a:p>
+            <a:pPr algn="ctr">
+              <a:defRPr/>
+            </a:pPr>
+            <a:endParaRPr lang="en-US"/>
+          </a:p>
+        </p:txBody>
+      </p:sp>
+      <p:sp>
+        <p:nvSpPr>
+          <p:cNvPr id="10" name="Rectangle 9"/>
+          <p:cNvSpPr/>
+          <p:nvPr/>
+        </p:nvSpPr>
+        <p:spPr bwMode="auto">
+          <a:xfrm>
+            <a:off x="228600" y="0"/>
+            <a:ext cx="104775" cy="2325688"/>
+          </a:xfrm>
+          <a:prstGeom prst="rect">
+            <a:avLst/>
+          </a:prstGeom>
+          <a:solidFill>
+            <a:srgbClr val="E31937"/>
+          </a:solidFill>
+          <a:ln>
+            <a:noFill/>
+          </a:ln>
+        </p:spPr>
+        <p:style>
+          <a:lnRef idx="2">
+            <a:schemeClr val="accent1">
+              <a:shade val="50000"/>
+            </a:schemeClr>
+          </a:lnRef>
+          <a:fillRef idx="1">
+            <a:schemeClr val="accent1"/>
+          </a:fillRef>
+          <a:effectRef idx="0">
+            <a:schemeClr val="accent1"/>
+          </a:effectRef>
+          <a:fontRef idx="minor">
+            <a:schemeClr val="lt1"/>
+          </a:fontRef>
+        </p:style>
+        <p:txBody>
+          <a:bodyPr anchor="ctr"/>
+          <a:lstStyle/>
+          <a:p>
+            <a:pPr algn="ctr">
+              <a:defRPr/>
+            </a:pPr>
+            <a:endParaRPr lang="en-US"/>
+          </a:p>
+        </p:txBody>
+      </p:sp>
+      <p:pic>
+        <p:nvPicPr>
+          <p:cNvPr id="4103" name="Picture 7" descr="MAT logo vertical_red.emf"/>
+          <p:cNvPicPr>
+            <a:picLocks noChangeAspect="1"/>
+          </p:cNvPicPr>
+          <p:nvPr/>
+        </p:nvPicPr>
+        <p:blipFill>
+          <a:blip r:embed="rId3"/>
+          <a:srcRect/>
+          <a:stretch>
+            <a:fillRect/>
+          </a:stretch>
+        </p:blipFill>
+        <p:spPr bwMode="auto">
+          <a:xfrm>
+            <a:off x="3600450" y="5334000"/>
+            <a:ext cx="1981200" cy="969963"/>
+          </a:xfrm>
+          <a:prstGeom prst="rect">
+            <a:avLst/>
+          </a:prstGeom>
+          <a:noFill/>
+          <a:ln w="9525">
+            <a:noFill/>
+            <a:miter lim="800000"/>
+            <a:headEnd/>
+            <a:tailEnd/>
+          </a:ln>
+        </p:spPr>
+      </p:pic>
+      <p:sp>
+        <p:nvSpPr>
+          <p:cNvPr id="9" name="TextBox 8"/>
+          <p:cNvSpPr txBox="1"/>
+          <p:nvPr/>
+        </p:nvSpPr>
+        <p:spPr>
+          <a:xfrm>
+            <a:off x="381000" y="1447800"/>
+            <a:ext cx="8610600" cy="646331"/>
+          </a:xfrm>
+          <a:prstGeom prst="rect">
+            <a:avLst/>
+          </a:prstGeom>
+          <a:noFill/>
+        </p:spPr>
+        <p:txBody>
+          <a:bodyPr>
+            <a:spAutoFit/>
           </a:bodyPr>
           <a:lstStyle/>
           <a:p>
-            <a:pPr eaLnBrk="1" hangingPunct="1"/>
-            <a:endParaRPr lang="en-US" dirty="0" smtClean="0"/>
+            <a:pPr>
+              <a:defRPr/>
+            </a:pPr>
+            <a:r>
+              <a:rPr lang="en-US" sz="3600" spc="60" dirty="0" smtClean="0">
+                <a:solidFill>
+                  <a:schemeClr val="bg1"/>
+                </a:solidFill>
+                <a:latin typeface="Calibri" pitchFamily="34" charset="0"/>
+              </a:rPr>
+              <a:t>Simple Org Chart</a:t>
+            </a:r>
+            <a:endParaRPr lang="en-US" sz="3600" spc="60" dirty="0">
+              <a:solidFill>
+                <a:schemeClr val="bg1"/>
+              </a:solidFill>
+              <a:latin typeface="Calibri" pitchFamily="34" charset="0"/>
+            </a:endParaRPr>
+          </a:p>
+        </p:txBody>
+      </p:sp>
+      <p:sp>
+        <p:nvSpPr>
+          <p:cNvPr id="11" name="TextBox 10"/>
+          <p:cNvSpPr txBox="1"/>
+          <p:nvPr/>
+        </p:nvSpPr>
+        <p:spPr>
+          <a:xfrm>
+            <a:off x="381000" y="2057400"/>
+            <a:ext cx="7543800" cy="338554"/>
+          </a:xfrm>
+          <a:prstGeom prst="rect">
+            <a:avLst/>
+          </a:prstGeom>
+          <a:noFill/>
+        </p:spPr>
+        <p:txBody>
+          <a:bodyPr wrap="square">
+            <a:spAutoFit/>
+          </a:bodyPr>
+          <a:lstStyle/>
+          <a:p>
+            <a:pPr>
+              <a:defRPr/>
+            </a:pPr>
+            <a:r>
+              <a:rPr lang="en-US" sz="1600" dirty="0" smtClean="0">
+                <a:solidFill>
+                  <a:schemeClr val="bg1"/>
+                </a:solidFill>
+                <a:latin typeface="+mn-lt"/>
+              </a:rPr>
+              <a:t>The Sample Application</a:t>
+            </a:r>
+            <a:endParaRPr lang="en-US" sz="1600" dirty="0">
+              <a:solidFill>
+                <a:schemeClr val="bg1"/>
+              </a:solidFill>
+              <a:latin typeface="+mn-lt"/>
+            </a:endParaRPr>
           </a:p>
         </p:txBody>
       </p:sp>
@@ -4379,196 +6247,67 @@
       </p:grpSpPr>
       <p:sp>
         <p:nvSpPr>
-          <p:cNvPr id="4" name="Rectangle 3"/>
-          <p:cNvSpPr/>
-          <p:nvPr/>
+          <p:cNvPr id="3075" name="Text Placeholder 2"/>
+          <p:cNvSpPr>
+            <a:spLocks noGrp="1"/>
+          </p:cNvSpPr>
+          <p:nvPr>
+            <p:ph type="body" sz="quarter" idx="10"/>
+          </p:nvPr>
         </p:nvSpPr>
         <p:spPr>
           <a:xfrm>
-            <a:off x="0" y="0"/>
-            <a:ext cx="9144000" cy="4648200"/>
-          </a:xfrm>
-          <a:prstGeom prst="rect">
-            <a:avLst/>
-          </a:prstGeom>
-          <a:solidFill>
-            <a:srgbClr val="0069AA"/>
-          </a:solidFill>
+            <a:off x="685800" y="1066800"/>
+            <a:ext cx="8229600" cy="1219200"/>
+          </a:xfrm>
+        </p:spPr>
+        <p:txBody>
+          <a:bodyPr/>
+          <a:lstStyle/>
+          <a:p>
+            <a:pPr eaLnBrk="1" hangingPunct="1">
+              <a:buNone/>
+            </a:pPr>
+            <a:endParaRPr lang="en-US" sz="2000" dirty="0" smtClean="0"/>
+          </a:p>
+        </p:txBody>
+      </p:sp>
+      <p:sp>
+        <p:nvSpPr>
+          <p:cNvPr id="3074" name="Title 1"/>
+          <p:cNvSpPr>
+            <a:spLocks noGrp="1"/>
+          </p:cNvSpPr>
+          <p:nvPr>
+            <p:ph type="title"/>
+          </p:nvPr>
+        </p:nvSpPr>
+        <p:spPr bwMode="auto">
+          <a:noFill/>
           <a:ln>
-            <a:noFill/>
-          </a:ln>
-        </p:spPr>
-        <p:style>
-          <a:lnRef idx="2">
-            <a:schemeClr val="accent1">
-              <a:shade val="50000"/>
-            </a:schemeClr>
-          </a:lnRef>
-          <a:fillRef idx="1">
-            <a:schemeClr val="accent1"/>
-          </a:fillRef>
-          <a:effectRef idx="0">
-            <a:schemeClr val="accent1"/>
-          </a:effectRef>
-          <a:fontRef idx="minor">
-            <a:schemeClr val="lt1"/>
-          </a:fontRef>
-        </p:style>
-        <p:txBody>
-          <a:bodyPr anchor="ctr"/>
-          <a:lstStyle/>
-          <a:p>
-            <a:pPr algn="ctr">
-              <a:defRPr/>
-            </a:pPr>
-            <a:endParaRPr lang="en-US"/>
-          </a:p>
-        </p:txBody>
-      </p:sp>
-      <p:pic>
-        <p:nvPicPr>
-          <p:cNvPr id="4099" name="Picture 4" descr="MAT logo 1 CMYK"/>
-          <p:cNvPicPr>
-            <a:picLocks noChangeAspect="1" noChangeArrowheads="1"/>
-          </p:cNvPicPr>
-          <p:nvPr/>
-        </p:nvPicPr>
-        <p:blipFill>
-          <a:blip r:embed="rId2">
-            <a:clrChange>
-              <a:clrFrom>
-                <a:srgbClr val="FDFDFD"/>
-              </a:clrFrom>
-              <a:clrTo>
-                <a:srgbClr val="FDFDFD">
-                  <a:alpha val="0"/>
-                </a:srgbClr>
-              </a:clrTo>
-            </a:clrChange>
-          </a:blip>
-          <a:srcRect/>
-          <a:stretch>
-            <a:fillRect/>
-          </a:stretch>
-        </p:blipFill>
-        <p:spPr bwMode="auto">
-          <a:xfrm>
-            <a:off x="2971800" y="4800600"/>
-            <a:ext cx="2819400" cy="1338263"/>
-          </a:xfrm>
-          <a:prstGeom prst="rect">
-            <a:avLst/>
-          </a:prstGeom>
-          <a:noFill/>
-          <a:ln w="9525">
-            <a:noFill/>
             <a:miter lim="800000"/>
             <a:headEnd/>
             <a:tailEnd/>
           </a:ln>
         </p:spPr>
-      </p:pic>
-      <p:sp>
-        <p:nvSpPr>
-          <p:cNvPr id="5" name="Rectangle 4"/>
-          <p:cNvSpPr/>
-          <p:nvPr/>
-        </p:nvSpPr>
-        <p:spPr>
-          <a:xfrm>
-            <a:off x="0" y="4724400"/>
-            <a:ext cx="9144000" cy="2133600"/>
-          </a:xfrm>
-          <a:prstGeom prst="rect">
-            <a:avLst/>
-          </a:prstGeom>
-          <a:solidFill>
-            <a:srgbClr val="E31937"/>
-          </a:solidFill>
-          <a:ln>
-            <a:noFill/>
-          </a:ln>
-        </p:spPr>
-        <p:style>
-          <a:lnRef idx="2">
-            <a:schemeClr val="accent1">
-              <a:shade val="50000"/>
-            </a:schemeClr>
-          </a:lnRef>
-          <a:fillRef idx="1">
-            <a:schemeClr val="accent1"/>
-          </a:fillRef>
-          <a:effectRef idx="0">
-            <a:schemeClr val="accent1"/>
-          </a:effectRef>
-          <a:fontRef idx="minor">
-            <a:schemeClr val="lt1"/>
-          </a:fontRef>
-        </p:style>
-        <p:txBody>
-          <a:bodyPr anchor="ctr"/>
-          <a:lstStyle/>
-          <a:p>
-            <a:pPr algn="ctr">
-              <a:defRPr/>
-            </a:pPr>
-            <a:endParaRPr lang="en-US"/>
-          </a:p>
-        </p:txBody>
-      </p:sp>
-      <p:sp>
-        <p:nvSpPr>
-          <p:cNvPr id="10" name="Rectangle 9"/>
-          <p:cNvSpPr/>
-          <p:nvPr/>
-        </p:nvSpPr>
-        <p:spPr bwMode="auto">
-          <a:xfrm>
-            <a:off x="228600" y="0"/>
-            <a:ext cx="104775" cy="2325688"/>
-          </a:xfrm>
-          <a:prstGeom prst="rect">
-            <a:avLst/>
-          </a:prstGeom>
-          <a:solidFill>
-            <a:srgbClr val="E31937"/>
-          </a:solidFill>
-          <a:ln>
-            <a:noFill/>
-          </a:ln>
-        </p:spPr>
-        <p:style>
-          <a:lnRef idx="2">
-            <a:schemeClr val="accent1">
-              <a:shade val="50000"/>
-            </a:schemeClr>
-          </a:lnRef>
-          <a:fillRef idx="1">
-            <a:schemeClr val="accent1"/>
-          </a:fillRef>
-          <a:effectRef idx="0">
-            <a:schemeClr val="accent1"/>
-          </a:effectRef>
-          <a:fontRef idx="minor">
-            <a:schemeClr val="lt1"/>
-          </a:fontRef>
-        </p:style>
-        <p:txBody>
-          <a:bodyPr anchor="ctr"/>
-          <a:lstStyle/>
-          <a:p>
-            <a:pPr algn="ctr">
-              <a:defRPr/>
-            </a:pPr>
-            <a:endParaRPr lang="en-US"/>
+        <p:txBody>
+          <a:bodyPr vert="horz" wrap="square" lIns="91440" tIns="45720" rIns="91440" bIns="45720" numCol="1" anchor="t" anchorCtr="0" compatLnSpc="1">
+            <a:prstTxWarp prst="textNoShape">
+              <a:avLst/>
+            </a:prstTxWarp>
+          </a:bodyPr>
+          <a:lstStyle/>
+          <a:p>
+            <a:pPr eaLnBrk="1" hangingPunct="1"/>
+            <a:endParaRPr lang="en-US" dirty="0" smtClean="0"/>
           </a:p>
         </p:txBody>
       </p:sp>
       <p:pic>
         <p:nvPicPr>
-          <p:cNvPr id="4103" name="Picture 7" descr="MAT logo vertical_red.emf"/>
+          <p:cNvPr id="1026" name="Picture 2" descr="X:\Derick-GitHub\Presentation And Training Material\Decoupling Workflow With App Controler\doc\Org Chart View.png"/>
           <p:cNvPicPr>
-            <a:picLocks noChangeAspect="1"/>
+            <a:picLocks noChangeAspect="1" noChangeArrowheads="1"/>
           </p:cNvPicPr>
           <p:nvPr/>
         </p:nvPicPr>
@@ -4581,107 +6320,15 @@
         </p:blipFill>
         <p:spPr bwMode="auto">
           <a:xfrm>
-            <a:off x="3600450" y="5334000"/>
-            <a:ext cx="1981200" cy="969963"/>
+            <a:off x="2514600" y="1676400"/>
+            <a:ext cx="4286251" cy="4048125"/>
           </a:xfrm>
           <a:prstGeom prst="rect">
             <a:avLst/>
           </a:prstGeom>
           <a:noFill/>
-          <a:ln w="9525">
-            <a:noFill/>
-            <a:miter lim="800000"/>
-            <a:headEnd/>
-            <a:tailEnd/>
-          </a:ln>
         </p:spPr>
       </p:pic>
-      <p:sp>
-        <p:nvSpPr>
-          <p:cNvPr id="9" name="TextBox 8"/>
-          <p:cNvSpPr txBox="1"/>
-          <p:nvPr/>
-        </p:nvSpPr>
-        <p:spPr>
-          <a:xfrm>
-            <a:off x="381000" y="1447800"/>
-            <a:ext cx="8610600" cy="646331"/>
-          </a:xfrm>
-          <a:prstGeom prst="rect">
-            <a:avLst/>
-          </a:prstGeom>
-          <a:noFill/>
-        </p:spPr>
-        <p:txBody>
-          <a:bodyPr>
-            <a:spAutoFit/>
-          </a:bodyPr>
-          <a:lstStyle/>
-          <a:p>
-            <a:pPr>
-              <a:defRPr/>
-            </a:pPr>
-            <a:r>
-              <a:rPr lang="en-US" sz="3600" spc="60" dirty="0" smtClean="0">
-                <a:solidFill>
-                  <a:schemeClr val="bg1"/>
-                </a:solidFill>
-                <a:latin typeface="Calibri" pitchFamily="34" charset="0"/>
-              </a:rPr>
-              <a:t>(Section Header)</a:t>
-            </a:r>
-            <a:endParaRPr lang="en-US" sz="3600" spc="60" dirty="0">
-              <a:solidFill>
-                <a:schemeClr val="bg1"/>
-              </a:solidFill>
-              <a:latin typeface="Calibri" pitchFamily="34" charset="0"/>
-            </a:endParaRPr>
-          </a:p>
-        </p:txBody>
-      </p:sp>
-      <p:sp>
-        <p:nvSpPr>
-          <p:cNvPr id="11" name="TextBox 10"/>
-          <p:cNvSpPr txBox="1"/>
-          <p:nvPr/>
-        </p:nvSpPr>
-        <p:spPr>
-          <a:xfrm>
-            <a:off x="381000" y="2057400"/>
-            <a:ext cx="7543800" cy="338554"/>
-          </a:xfrm>
-          <a:prstGeom prst="rect">
-            <a:avLst/>
-          </a:prstGeom>
-          <a:noFill/>
-        </p:spPr>
-        <p:txBody>
-          <a:bodyPr wrap="square">
-            <a:spAutoFit/>
-          </a:bodyPr>
-          <a:lstStyle/>
-          <a:p>
-            <a:pPr>
-              <a:defRPr/>
-            </a:pPr>
-            <a:r>
-              <a:rPr lang="en-US" sz="1600" dirty="0" smtClean="0">
-                <a:solidFill>
-                  <a:schemeClr val="bg1"/>
-                </a:solidFill>
-                <a:latin typeface="+mn-lt"/>
-              </a:rPr>
-              <a:t>(section sub title)</a:t>
-            </a:r>
-            <a:endParaRPr lang="en-US" sz="1600" dirty="0">
-              <a:solidFill>
-                <a:schemeClr val="bg1"/>
-              </a:solidFill>
-              <a:latin typeface="+mn-lt"/>
-            </a:endParaRPr>
-          </a:p>
-        </p:txBody>
-      </p:sp>
     </p:spTree>
   </p:cSld>
   <p:clrMapOvr>
@@ -4772,6 +6419,58 @@
           </a:p>
         </p:txBody>
       </p:sp>
+      <p:pic>
+        <p:nvPicPr>
+          <p:cNvPr id="4" name="Picture 3" descr="X:\Derick-GitHub\Presentation And Training Material\Decoupling Workflow With App Controler\doc\New Employee - Info.png"/>
+          <p:cNvPicPr>
+            <a:picLocks noChangeAspect="1" noChangeArrowheads="1"/>
+          </p:cNvPicPr>
+          <p:nvPr/>
+        </p:nvPicPr>
+        <p:blipFill>
+          <a:blip r:embed="rId3"/>
+          <a:srcRect/>
+          <a:stretch>
+            <a:fillRect/>
+          </a:stretch>
+        </p:blipFill>
+        <p:spPr bwMode="auto">
+          <a:xfrm>
+            <a:off x="304800" y="1828800"/>
+            <a:ext cx="4286250" cy="2257425"/>
+          </a:xfrm>
+          <a:prstGeom prst="rect">
+            <a:avLst/>
+          </a:prstGeom>
+          <a:noFill/>
+        </p:spPr>
+      </p:pic>
+      <p:pic>
+        <p:nvPicPr>
+          <p:cNvPr id="5" name="Picture 4" descr="X:\Derick-GitHub\Presentation And Training Material\Decoupling Workflow With App Controler\doc\New Employee - Manager.png"/>
+          <p:cNvPicPr>
+            <a:picLocks noChangeAspect="1" noChangeArrowheads="1"/>
+          </p:cNvPicPr>
+          <p:nvPr/>
+        </p:nvPicPr>
+        <p:blipFill>
+          <a:blip r:embed="rId4"/>
+          <a:srcRect/>
+          <a:stretch>
+            <a:fillRect/>
+          </a:stretch>
+        </p:blipFill>
+        <p:spPr bwMode="auto">
+          <a:xfrm>
+            <a:off x="3352800" y="4343400"/>
+            <a:ext cx="4286250" cy="1771650"/>
+          </a:xfrm>
+          <a:prstGeom prst="rect">
+            <a:avLst/>
+          </a:prstGeom>
+          <a:noFill/>
+        </p:spPr>
+      </p:pic>
     </p:spTree>
   </p:cSld>
   <p:clrMapOvr>
@@ -4806,306 +6505,59 @@
       </p:grpSpPr>
       <p:sp>
         <p:nvSpPr>
-          <p:cNvPr id="4" name="Rectangle 3"/>
-          <p:cNvSpPr/>
-          <p:nvPr/>
+          <p:cNvPr id="3075" name="Text Placeholder 2"/>
+          <p:cNvSpPr>
+            <a:spLocks noGrp="1"/>
+          </p:cNvSpPr>
+          <p:nvPr>
+            <p:ph type="body" sz="quarter" idx="10"/>
+          </p:nvPr>
         </p:nvSpPr>
         <p:spPr>
           <a:xfrm>
-            <a:off x="0" y="0"/>
-            <a:ext cx="9144000" cy="4648200"/>
-          </a:xfrm>
-          <a:prstGeom prst="rect">
-            <a:avLst/>
-          </a:prstGeom>
-          <a:solidFill>
-            <a:srgbClr val="0069AA"/>
-          </a:solidFill>
+            <a:off x="685800" y="1066800"/>
+            <a:ext cx="8229600" cy="1219200"/>
+          </a:xfrm>
+        </p:spPr>
+        <p:txBody>
+          <a:bodyPr/>
+          <a:lstStyle/>
+          <a:p>
+            <a:pPr eaLnBrk="1" hangingPunct="1">
+              <a:buNone/>
+            </a:pPr>
+            <a:endParaRPr lang="en-US" sz="2000" dirty="0" smtClean="0"/>
+          </a:p>
+        </p:txBody>
+      </p:sp>
+      <p:sp>
+        <p:nvSpPr>
+          <p:cNvPr id="3074" name="Title 1"/>
+          <p:cNvSpPr>
+            <a:spLocks noGrp="1"/>
+          </p:cNvSpPr>
+          <p:nvPr>
+            <p:ph type="title"/>
+          </p:nvPr>
+        </p:nvSpPr>
+        <p:spPr bwMode="auto">
+          <a:noFill/>
           <a:ln>
-            <a:noFill/>
-          </a:ln>
-        </p:spPr>
-        <p:style>
-          <a:lnRef idx="2">
-            <a:schemeClr val="accent1">
-              <a:shade val="50000"/>
-            </a:schemeClr>
-          </a:lnRef>
-          <a:fillRef idx="1">
-            <a:schemeClr val="accent1"/>
-          </a:fillRef>
-          <a:effectRef idx="0">
-            <a:schemeClr val="accent1"/>
-          </a:effectRef>
-          <a:fontRef idx="minor">
-            <a:schemeClr val="lt1"/>
-          </a:fontRef>
-        </p:style>
-        <p:txBody>
-          <a:bodyPr anchor="ctr"/>
-          <a:lstStyle/>
-          <a:p>
-            <a:pPr algn="ctr">
-              <a:defRPr/>
-            </a:pPr>
-            <a:endParaRPr lang="en-US"/>
-          </a:p>
-        </p:txBody>
-      </p:sp>
-      <p:pic>
-        <p:nvPicPr>
-          <p:cNvPr id="4099" name="Picture 4" descr="MAT logo 1 CMYK"/>
-          <p:cNvPicPr>
-            <a:picLocks noChangeAspect="1" noChangeArrowheads="1"/>
-          </p:cNvPicPr>
-          <p:nvPr/>
-        </p:nvPicPr>
-        <p:blipFill>
-          <a:blip r:embed="rId2">
-            <a:clrChange>
-              <a:clrFrom>
-                <a:srgbClr val="FDFDFD"/>
-              </a:clrFrom>
-              <a:clrTo>
-                <a:srgbClr val="FDFDFD">
-                  <a:alpha val="0"/>
-                </a:srgbClr>
-              </a:clrTo>
-            </a:clrChange>
-          </a:blip>
-          <a:srcRect/>
-          <a:stretch>
-            <a:fillRect/>
-          </a:stretch>
-        </p:blipFill>
-        <p:spPr bwMode="auto">
-          <a:xfrm>
-            <a:off x="2971800" y="4800600"/>
-            <a:ext cx="2819400" cy="1338263"/>
-          </a:xfrm>
-          <a:prstGeom prst="rect">
-            <a:avLst/>
-          </a:prstGeom>
-          <a:noFill/>
-          <a:ln w="9525">
-            <a:noFill/>
             <a:miter lim="800000"/>
             <a:headEnd/>
             <a:tailEnd/>
           </a:ln>
         </p:spPr>
-      </p:pic>
-      <p:sp>
-        <p:nvSpPr>
-          <p:cNvPr id="5" name="Rectangle 4"/>
-          <p:cNvSpPr/>
-          <p:nvPr/>
-        </p:nvSpPr>
-        <p:spPr>
-          <a:xfrm>
-            <a:off x="0" y="4724400"/>
-            <a:ext cx="9144000" cy="2133600"/>
-          </a:xfrm>
-          <a:prstGeom prst="rect">
-            <a:avLst/>
-          </a:prstGeom>
-          <a:solidFill>
-            <a:srgbClr val="E31937"/>
-          </a:solidFill>
-          <a:ln>
-            <a:noFill/>
-          </a:ln>
-        </p:spPr>
-        <p:style>
-          <a:lnRef idx="2">
-            <a:schemeClr val="accent1">
-              <a:shade val="50000"/>
-            </a:schemeClr>
-          </a:lnRef>
-          <a:fillRef idx="1">
-            <a:schemeClr val="accent1"/>
-          </a:fillRef>
-          <a:effectRef idx="0">
-            <a:schemeClr val="accent1"/>
-          </a:effectRef>
-          <a:fontRef idx="minor">
-            <a:schemeClr val="lt1"/>
-          </a:fontRef>
-        </p:style>
-        <p:txBody>
-          <a:bodyPr anchor="ctr"/>
-          <a:lstStyle/>
-          <a:p>
-            <a:pPr algn="ctr">
-              <a:defRPr/>
-            </a:pPr>
-            <a:endParaRPr lang="en-US"/>
-          </a:p>
-        </p:txBody>
-      </p:sp>
-      <p:sp>
-        <p:nvSpPr>
-          <p:cNvPr id="10" name="Rectangle 9"/>
-          <p:cNvSpPr/>
-          <p:nvPr/>
-        </p:nvSpPr>
-        <p:spPr bwMode="auto">
-          <a:xfrm>
-            <a:off x="228600" y="0"/>
-            <a:ext cx="104775" cy="2325688"/>
-          </a:xfrm>
-          <a:prstGeom prst="rect">
-            <a:avLst/>
-          </a:prstGeom>
-          <a:solidFill>
-            <a:srgbClr val="E31937"/>
-          </a:solidFill>
-          <a:ln>
-            <a:noFill/>
-          </a:ln>
-        </p:spPr>
-        <p:style>
-          <a:lnRef idx="2">
-            <a:schemeClr val="accent1">
-              <a:shade val="50000"/>
-            </a:schemeClr>
-          </a:lnRef>
-          <a:fillRef idx="1">
-            <a:schemeClr val="accent1"/>
-          </a:fillRef>
-          <a:effectRef idx="0">
-            <a:schemeClr val="accent1"/>
-          </a:effectRef>
-          <a:fontRef idx="minor">
-            <a:schemeClr val="lt1"/>
-          </a:fontRef>
-        </p:style>
-        <p:txBody>
-          <a:bodyPr anchor="ctr"/>
-          <a:lstStyle/>
-          <a:p>
-            <a:pPr algn="ctr">
-              <a:defRPr/>
-            </a:pPr>
-            <a:endParaRPr lang="en-US"/>
-          </a:p>
-        </p:txBody>
-      </p:sp>
-      <p:pic>
-        <p:nvPicPr>
-          <p:cNvPr id="4103" name="Picture 7" descr="MAT logo vertical_red.emf"/>
-          <p:cNvPicPr>
-            <a:picLocks noChangeAspect="1"/>
-          </p:cNvPicPr>
-          <p:nvPr/>
-        </p:nvPicPr>
-        <p:blipFill>
-          <a:blip r:embed="rId3"/>
-          <a:srcRect/>
-          <a:stretch>
-            <a:fillRect/>
-          </a:stretch>
-        </p:blipFill>
-        <p:spPr bwMode="auto">
-          <a:xfrm>
-            <a:off x="3600450" y="5334000"/>
-            <a:ext cx="1981200" cy="969963"/>
-          </a:xfrm>
-          <a:prstGeom prst="rect">
-            <a:avLst/>
-          </a:prstGeom>
-          <a:noFill/>
-          <a:ln w="9525">
-            <a:noFill/>
-            <a:miter lim="800000"/>
-            <a:headEnd/>
-            <a:tailEnd/>
-          </a:ln>
-        </p:spPr>
-      </p:pic>
-      <p:sp>
-        <p:nvSpPr>
-          <p:cNvPr id="9" name="TextBox 8"/>
-          <p:cNvSpPr txBox="1"/>
-          <p:nvPr/>
-        </p:nvSpPr>
-        <p:spPr>
-          <a:xfrm>
-            <a:off x="381000" y="1447800"/>
-            <a:ext cx="8610600" cy="646331"/>
-          </a:xfrm>
-          <a:prstGeom prst="rect">
-            <a:avLst/>
-          </a:prstGeom>
-          <a:noFill/>
-        </p:spPr>
-        <p:txBody>
-          <a:bodyPr>
-            <a:spAutoFit/>
+        <p:txBody>
+          <a:bodyPr vert="horz" wrap="square" lIns="91440" tIns="45720" rIns="91440" bIns="45720" numCol="1" anchor="t" anchorCtr="0" compatLnSpc="1">
+            <a:prstTxWarp prst="textNoShape">
+              <a:avLst/>
+            </a:prstTxWarp>
           </a:bodyPr>
           <a:lstStyle/>
           <a:p>
-            <a:pPr>
-              <a:defRPr/>
-            </a:pPr>
-            <a:r>
-              <a:rPr lang="en-US" sz="3600" spc="60" dirty="0" smtClean="0">
-                <a:solidFill>
-                  <a:schemeClr val="bg1"/>
-                </a:solidFill>
-                <a:latin typeface="Calibri" pitchFamily="34" charset="0"/>
-              </a:rPr>
-              <a:t>(Section Header)</a:t>
-            </a:r>
-            <a:endParaRPr lang="en-US" sz="3600" spc="60" dirty="0">
-              <a:solidFill>
-                <a:schemeClr val="bg1"/>
-              </a:solidFill>
-              <a:latin typeface="Calibri" pitchFamily="34" charset="0"/>
-            </a:endParaRPr>
-          </a:p>
-        </p:txBody>
-      </p:sp>
-      <p:sp>
-        <p:nvSpPr>
-          <p:cNvPr id="11" name="TextBox 10"/>
-          <p:cNvSpPr txBox="1"/>
-          <p:nvPr/>
-        </p:nvSpPr>
-        <p:spPr>
-          <a:xfrm>
-            <a:off x="381000" y="2057400"/>
-            <a:ext cx="7543800" cy="338554"/>
-          </a:xfrm>
-          <a:prstGeom prst="rect">
-            <a:avLst/>
-          </a:prstGeom>
-          <a:noFill/>
-        </p:spPr>
-        <p:txBody>
-          <a:bodyPr wrap="square">
-            <a:spAutoFit/>
-          </a:bodyPr>
-          <a:lstStyle/>
-          <a:p>
-            <a:pPr>
-              <a:defRPr/>
-            </a:pPr>
-            <a:r>
-              <a:rPr lang="en-US" sz="1600" dirty="0" smtClean="0">
-                <a:solidFill>
-                  <a:schemeClr val="bg1"/>
-                </a:solidFill>
-                <a:latin typeface="+mn-lt"/>
-              </a:rPr>
-              <a:t>(section sub title)</a:t>
-            </a:r>
-            <a:endParaRPr lang="en-US" sz="1600" dirty="0">
-              <a:solidFill>
-                <a:schemeClr val="bg1"/>
-              </a:solidFill>
-              <a:latin typeface="+mn-lt"/>
-            </a:endParaRPr>
+            <a:pPr eaLnBrk="1" hangingPunct="1"/>
+            <a:endParaRPr lang="en-US" dirty="0" smtClean="0"/>
           </a:p>
         </p:txBody>
       </p:sp>
@@ -5143,59 +6595,306 @@
       </p:grpSpPr>
       <p:sp>
         <p:nvSpPr>
-          <p:cNvPr id="3075" name="Text Placeholder 2"/>
-          <p:cNvSpPr>
-            <a:spLocks noGrp="1"/>
-          </p:cNvSpPr>
-          <p:nvPr>
-            <p:ph type="body" sz="quarter" idx="10"/>
-          </p:nvPr>
+          <p:cNvPr id="4" name="Rectangle 3"/>
+          <p:cNvSpPr/>
+          <p:nvPr/>
         </p:nvSpPr>
         <p:spPr>
           <a:xfrm>
-            <a:off x="685800" y="1066800"/>
-            <a:ext cx="8229600" cy="1219200"/>
-          </a:xfrm>
-        </p:spPr>
-        <p:txBody>
-          <a:bodyPr/>
-          <a:lstStyle/>
-          <a:p>
-            <a:pPr eaLnBrk="1" hangingPunct="1">
-              <a:buNone/>
-            </a:pPr>
-            <a:endParaRPr lang="en-US" sz="2000" dirty="0" smtClean="0"/>
-          </a:p>
-        </p:txBody>
-      </p:sp>
-      <p:sp>
-        <p:nvSpPr>
-          <p:cNvPr id="3074" name="Title 1"/>
-          <p:cNvSpPr>
-            <a:spLocks noGrp="1"/>
-          </p:cNvSpPr>
-          <p:nvPr>
-            <p:ph type="title"/>
-          </p:nvPr>
-        </p:nvSpPr>
+            <a:off x="0" y="0"/>
+            <a:ext cx="9144000" cy="4648200"/>
+          </a:xfrm>
+          <a:prstGeom prst="rect">
+            <a:avLst/>
+          </a:prstGeom>
+          <a:solidFill>
+            <a:srgbClr val="0069AA"/>
+          </a:solidFill>
+          <a:ln>
+            <a:noFill/>
+          </a:ln>
+        </p:spPr>
+        <p:style>
+          <a:lnRef idx="2">
+            <a:schemeClr val="accent1">
+              <a:shade val="50000"/>
+            </a:schemeClr>
+          </a:lnRef>
+          <a:fillRef idx="1">
+            <a:schemeClr val="accent1"/>
+          </a:fillRef>
+          <a:effectRef idx="0">
+            <a:schemeClr val="accent1"/>
+          </a:effectRef>
+          <a:fontRef idx="minor">
+            <a:schemeClr val="lt1"/>
+          </a:fontRef>
+        </p:style>
+        <p:txBody>
+          <a:bodyPr anchor="ctr"/>
+          <a:lstStyle/>
+          <a:p>
+            <a:pPr algn="ctr">
+              <a:defRPr/>
+            </a:pPr>
+            <a:endParaRPr lang="en-US"/>
+          </a:p>
+        </p:txBody>
+      </p:sp>
+      <p:pic>
+        <p:nvPicPr>
+          <p:cNvPr id="4099" name="Picture 4" descr="MAT logo 1 CMYK"/>
+          <p:cNvPicPr>
+            <a:picLocks noChangeAspect="1" noChangeArrowheads="1"/>
+          </p:cNvPicPr>
+          <p:nvPr/>
+        </p:nvPicPr>
+        <p:blipFill>
+          <a:blip r:embed="rId2">
+            <a:clrChange>
+              <a:clrFrom>
+                <a:srgbClr val="FDFDFD"/>
+              </a:clrFrom>
+              <a:clrTo>
+                <a:srgbClr val="FDFDFD">
+                  <a:alpha val="0"/>
+                </a:srgbClr>
+              </a:clrTo>
+            </a:clrChange>
+          </a:blip>
+          <a:srcRect/>
+          <a:stretch>
+            <a:fillRect/>
+          </a:stretch>
+        </p:blipFill>
         <p:spPr bwMode="auto">
+          <a:xfrm>
+            <a:off x="2971800" y="4800600"/>
+            <a:ext cx="2819400" cy="1338263"/>
+          </a:xfrm>
+          <a:prstGeom prst="rect">
+            <a:avLst/>
+          </a:prstGeom>
           <a:noFill/>
-          <a:ln>
+          <a:ln w="9525">
+            <a:noFill/>
             <a:miter lim="800000"/>
             <a:headEnd/>
             <a:tailEnd/>
           </a:ln>
         </p:spPr>
-        <p:txBody>
-          <a:bodyPr vert="horz" wrap="square" lIns="91440" tIns="45720" rIns="91440" bIns="45720" numCol="1" anchor="t" anchorCtr="0" compatLnSpc="1">
-            <a:prstTxWarp prst="textNoShape">
-              <a:avLst/>
-            </a:prstTxWarp>
+      </p:pic>
+      <p:sp>
+        <p:nvSpPr>
+          <p:cNvPr id="5" name="Rectangle 4"/>
+          <p:cNvSpPr/>
+          <p:nvPr/>
+        </p:nvSpPr>
+        <p:spPr>
+          <a:xfrm>
+            <a:off x="0" y="4724400"/>
+            <a:ext cx="9144000" cy="2133600"/>
+          </a:xfrm>
+          <a:prstGeom prst="rect">
+            <a:avLst/>
+          </a:prstGeom>
+          <a:solidFill>
+            <a:srgbClr val="E31937"/>
+          </a:solidFill>
+          <a:ln>
+            <a:noFill/>
+          </a:ln>
+        </p:spPr>
+        <p:style>
+          <a:lnRef idx="2">
+            <a:schemeClr val="accent1">
+              <a:shade val="50000"/>
+            </a:schemeClr>
+          </a:lnRef>
+          <a:fillRef idx="1">
+            <a:schemeClr val="accent1"/>
+          </a:fillRef>
+          <a:effectRef idx="0">
+            <a:schemeClr val="accent1"/>
+          </a:effectRef>
+          <a:fontRef idx="minor">
+            <a:schemeClr val="lt1"/>
+          </a:fontRef>
+        </p:style>
+        <p:txBody>
+          <a:bodyPr anchor="ctr"/>
+          <a:lstStyle/>
+          <a:p>
+            <a:pPr algn="ctr">
+              <a:defRPr/>
+            </a:pPr>
+            <a:endParaRPr lang="en-US"/>
+          </a:p>
+        </p:txBody>
+      </p:sp>
+      <p:sp>
+        <p:nvSpPr>
+          <p:cNvPr id="10" name="Rectangle 9"/>
+          <p:cNvSpPr/>
+          <p:nvPr/>
+        </p:nvSpPr>
+        <p:spPr bwMode="auto">
+          <a:xfrm>
+            <a:off x="228600" y="0"/>
+            <a:ext cx="104775" cy="2325688"/>
+          </a:xfrm>
+          <a:prstGeom prst="rect">
+            <a:avLst/>
+          </a:prstGeom>
+          <a:solidFill>
+            <a:srgbClr val="E31937"/>
+          </a:solidFill>
+          <a:ln>
+            <a:noFill/>
+          </a:ln>
+        </p:spPr>
+        <p:style>
+          <a:lnRef idx="2">
+            <a:schemeClr val="accent1">
+              <a:shade val="50000"/>
+            </a:schemeClr>
+          </a:lnRef>
+          <a:fillRef idx="1">
+            <a:schemeClr val="accent1"/>
+          </a:fillRef>
+          <a:effectRef idx="0">
+            <a:schemeClr val="accent1"/>
+          </a:effectRef>
+          <a:fontRef idx="minor">
+            <a:schemeClr val="lt1"/>
+          </a:fontRef>
+        </p:style>
+        <p:txBody>
+          <a:bodyPr anchor="ctr"/>
+          <a:lstStyle/>
+          <a:p>
+            <a:pPr algn="ctr">
+              <a:defRPr/>
+            </a:pPr>
+            <a:endParaRPr lang="en-US"/>
+          </a:p>
+        </p:txBody>
+      </p:sp>
+      <p:pic>
+        <p:nvPicPr>
+          <p:cNvPr id="4103" name="Picture 7" descr="MAT logo vertical_red.emf"/>
+          <p:cNvPicPr>
+            <a:picLocks noChangeAspect="1"/>
+          </p:cNvPicPr>
+          <p:nvPr/>
+        </p:nvPicPr>
+        <p:blipFill>
+          <a:blip r:embed="rId3"/>
+          <a:srcRect/>
+          <a:stretch>
+            <a:fillRect/>
+          </a:stretch>
+        </p:blipFill>
+        <p:spPr bwMode="auto">
+          <a:xfrm>
+            <a:off x="3600450" y="5334000"/>
+            <a:ext cx="1981200" cy="969963"/>
+          </a:xfrm>
+          <a:prstGeom prst="rect">
+            <a:avLst/>
+          </a:prstGeom>
+          <a:noFill/>
+          <a:ln w="9525">
+            <a:noFill/>
+            <a:miter lim="800000"/>
+            <a:headEnd/>
+            <a:tailEnd/>
+          </a:ln>
+        </p:spPr>
+      </p:pic>
+      <p:sp>
+        <p:nvSpPr>
+          <p:cNvPr id="9" name="TextBox 8"/>
+          <p:cNvSpPr txBox="1"/>
+          <p:nvPr/>
+        </p:nvSpPr>
+        <p:spPr>
+          <a:xfrm>
+            <a:off x="381000" y="1447800"/>
+            <a:ext cx="8610600" cy="646331"/>
+          </a:xfrm>
+          <a:prstGeom prst="rect">
+            <a:avLst/>
+          </a:prstGeom>
+          <a:noFill/>
+        </p:spPr>
+        <p:txBody>
+          <a:bodyPr>
+            <a:spAutoFit/>
           </a:bodyPr>
           <a:lstStyle/>
           <a:p>
-            <a:pPr eaLnBrk="1" hangingPunct="1"/>
-            <a:endParaRPr lang="en-US" dirty="0" smtClean="0"/>
+            <a:pPr>
+              <a:defRPr/>
+            </a:pPr>
+            <a:r>
+              <a:rPr lang="en-US" sz="3600" spc="60" dirty="0" smtClean="0">
+                <a:solidFill>
+                  <a:schemeClr val="bg1"/>
+                </a:solidFill>
+                <a:latin typeface="Calibri" pitchFamily="34" charset="0"/>
+              </a:rPr>
+              <a:t>(Section Header)</a:t>
+            </a:r>
+            <a:endParaRPr lang="en-US" sz="3600" spc="60" dirty="0">
+              <a:solidFill>
+                <a:schemeClr val="bg1"/>
+              </a:solidFill>
+              <a:latin typeface="Calibri" pitchFamily="34" charset="0"/>
+            </a:endParaRPr>
+          </a:p>
+        </p:txBody>
+      </p:sp>
+      <p:sp>
+        <p:nvSpPr>
+          <p:cNvPr id="11" name="TextBox 10"/>
+          <p:cNvSpPr txBox="1"/>
+          <p:nvPr/>
+        </p:nvSpPr>
+        <p:spPr>
+          <a:xfrm>
+            <a:off x="381000" y="2057400"/>
+            <a:ext cx="7543800" cy="338554"/>
+          </a:xfrm>
+          <a:prstGeom prst="rect">
+            <a:avLst/>
+          </a:prstGeom>
+          <a:noFill/>
+        </p:spPr>
+        <p:txBody>
+          <a:bodyPr wrap="square">
+            <a:spAutoFit/>
+          </a:bodyPr>
+          <a:lstStyle/>
+          <a:p>
+            <a:pPr>
+              <a:defRPr/>
+            </a:pPr>
+            <a:r>
+              <a:rPr lang="en-US" sz="1600" dirty="0" smtClean="0">
+                <a:solidFill>
+                  <a:schemeClr val="bg1"/>
+                </a:solidFill>
+                <a:latin typeface="+mn-lt"/>
+              </a:rPr>
+              <a:t>(section sub title)</a:t>
+            </a:r>
+            <a:endParaRPr lang="en-US" sz="1600" dirty="0">
+              <a:solidFill>
+                <a:schemeClr val="bg1"/>
+              </a:solidFill>
+              <a:latin typeface="+mn-lt"/>
+            </a:endParaRPr>
           </a:p>
         </p:txBody>
       </p:sp>
@@ -5233,306 +6932,59 @@
       </p:grpSpPr>
       <p:sp>
         <p:nvSpPr>
-          <p:cNvPr id="4" name="Rectangle 3"/>
-          <p:cNvSpPr/>
-          <p:nvPr/>
+          <p:cNvPr id="3075" name="Text Placeholder 2"/>
+          <p:cNvSpPr>
+            <a:spLocks noGrp="1"/>
+          </p:cNvSpPr>
+          <p:nvPr>
+            <p:ph type="body" sz="quarter" idx="10"/>
+          </p:nvPr>
         </p:nvSpPr>
         <p:spPr>
           <a:xfrm>
-            <a:off x="0" y="0"/>
-            <a:ext cx="9144000" cy="4648200"/>
-          </a:xfrm>
-          <a:prstGeom prst="rect">
-            <a:avLst/>
-          </a:prstGeom>
-          <a:solidFill>
-            <a:srgbClr val="0069AA"/>
-          </a:solidFill>
+            <a:off x="685800" y="1066800"/>
+            <a:ext cx="8229600" cy="1219200"/>
+          </a:xfrm>
+        </p:spPr>
+        <p:txBody>
+          <a:bodyPr/>
+          <a:lstStyle/>
+          <a:p>
+            <a:pPr eaLnBrk="1" hangingPunct="1">
+              <a:buNone/>
+            </a:pPr>
+            <a:endParaRPr lang="en-US" sz="2000" dirty="0" smtClean="0"/>
+          </a:p>
+        </p:txBody>
+      </p:sp>
+      <p:sp>
+        <p:nvSpPr>
+          <p:cNvPr id="3074" name="Title 1"/>
+          <p:cNvSpPr>
+            <a:spLocks noGrp="1"/>
+          </p:cNvSpPr>
+          <p:nvPr>
+            <p:ph type="title"/>
+          </p:nvPr>
+        </p:nvSpPr>
+        <p:spPr bwMode="auto">
+          <a:noFill/>
           <a:ln>
-            <a:noFill/>
-          </a:ln>
-        </p:spPr>
-        <p:style>
-          <a:lnRef idx="2">
-            <a:schemeClr val="accent1">
-              <a:shade val="50000"/>
-            </a:schemeClr>
-          </a:lnRef>
-          <a:fillRef idx="1">
-            <a:schemeClr val="accent1"/>
-          </a:fillRef>
-          <a:effectRef idx="0">
-            <a:schemeClr val="accent1"/>
-          </a:effectRef>
-          <a:fontRef idx="minor">
-            <a:schemeClr val="lt1"/>
-          </a:fontRef>
-        </p:style>
-        <p:txBody>
-          <a:bodyPr anchor="ctr"/>
-          <a:lstStyle/>
-          <a:p>
-            <a:pPr algn="ctr">
-              <a:defRPr/>
-            </a:pPr>
-            <a:endParaRPr lang="en-US"/>
-          </a:p>
-        </p:txBody>
-      </p:sp>
-      <p:pic>
-        <p:nvPicPr>
-          <p:cNvPr id="4099" name="Picture 4" descr="MAT logo 1 CMYK"/>
-          <p:cNvPicPr>
-            <a:picLocks noChangeAspect="1" noChangeArrowheads="1"/>
-          </p:cNvPicPr>
-          <p:nvPr/>
-        </p:nvPicPr>
-        <p:blipFill>
-          <a:blip r:embed="rId2">
-            <a:clrChange>
-              <a:clrFrom>
-                <a:srgbClr val="FDFDFD"/>
-              </a:clrFrom>
-              <a:clrTo>
-                <a:srgbClr val="FDFDFD">
-                  <a:alpha val="0"/>
-                </a:srgbClr>
-              </a:clrTo>
-            </a:clrChange>
-          </a:blip>
-          <a:srcRect/>
-          <a:stretch>
-            <a:fillRect/>
-          </a:stretch>
-        </p:blipFill>
-        <p:spPr bwMode="auto">
-          <a:xfrm>
-            <a:off x="2971800" y="4800600"/>
-            <a:ext cx="2819400" cy="1338263"/>
-          </a:xfrm>
-          <a:prstGeom prst="rect">
-            <a:avLst/>
-          </a:prstGeom>
-          <a:noFill/>
-          <a:ln w="9525">
-            <a:noFill/>
             <a:miter lim="800000"/>
             <a:headEnd/>
             <a:tailEnd/>
           </a:ln>
         </p:spPr>
-      </p:pic>
-      <p:sp>
-        <p:nvSpPr>
-          <p:cNvPr id="5" name="Rectangle 4"/>
-          <p:cNvSpPr/>
-          <p:nvPr/>
-        </p:nvSpPr>
-        <p:spPr>
-          <a:xfrm>
-            <a:off x="0" y="4724400"/>
-            <a:ext cx="9144000" cy="2133600"/>
-          </a:xfrm>
-          <a:prstGeom prst="rect">
-            <a:avLst/>
-          </a:prstGeom>
-          <a:solidFill>
-            <a:srgbClr val="E31937"/>
-          </a:solidFill>
-          <a:ln>
-            <a:noFill/>
-          </a:ln>
-        </p:spPr>
-        <p:style>
-          <a:lnRef idx="2">
-            <a:schemeClr val="accent1">
-              <a:shade val="50000"/>
-            </a:schemeClr>
-          </a:lnRef>
-          <a:fillRef idx="1">
-            <a:schemeClr val="accent1"/>
-          </a:fillRef>
-          <a:effectRef idx="0">
-            <a:schemeClr val="accent1"/>
-          </a:effectRef>
-          <a:fontRef idx="minor">
-            <a:schemeClr val="lt1"/>
-          </a:fontRef>
-        </p:style>
-        <p:txBody>
-          <a:bodyPr anchor="ctr"/>
-          <a:lstStyle/>
-          <a:p>
-            <a:pPr algn="ctr">
-              <a:defRPr/>
-            </a:pPr>
-            <a:endParaRPr lang="en-US"/>
-          </a:p>
-        </p:txBody>
-      </p:sp>
-      <p:sp>
-        <p:nvSpPr>
-          <p:cNvPr id="10" name="Rectangle 9"/>
-          <p:cNvSpPr/>
-          <p:nvPr/>
-        </p:nvSpPr>
-        <p:spPr bwMode="auto">
-          <a:xfrm>
-            <a:off x="228600" y="0"/>
-            <a:ext cx="104775" cy="2325688"/>
-          </a:xfrm>
-          <a:prstGeom prst="rect">
-            <a:avLst/>
-          </a:prstGeom>
-          <a:solidFill>
-            <a:srgbClr val="E31937"/>
-          </a:solidFill>
-          <a:ln>
-            <a:noFill/>
-          </a:ln>
-        </p:spPr>
-        <p:style>
-          <a:lnRef idx="2">
-            <a:schemeClr val="accent1">
-              <a:shade val="50000"/>
-            </a:schemeClr>
-          </a:lnRef>
-          <a:fillRef idx="1">
-            <a:schemeClr val="accent1"/>
-          </a:fillRef>
-          <a:effectRef idx="0">
-            <a:schemeClr val="accent1"/>
-          </a:effectRef>
-          <a:fontRef idx="minor">
-            <a:schemeClr val="lt1"/>
-          </a:fontRef>
-        </p:style>
-        <p:txBody>
-          <a:bodyPr anchor="ctr"/>
-          <a:lstStyle/>
-          <a:p>
-            <a:pPr algn="ctr">
-              <a:defRPr/>
-            </a:pPr>
-            <a:endParaRPr lang="en-US"/>
-          </a:p>
-        </p:txBody>
-      </p:sp>
-      <p:pic>
-        <p:nvPicPr>
-          <p:cNvPr id="4103" name="Picture 7" descr="MAT logo vertical_red.emf"/>
-          <p:cNvPicPr>
-            <a:picLocks noChangeAspect="1"/>
-          </p:cNvPicPr>
-          <p:nvPr/>
-        </p:nvPicPr>
-        <p:blipFill>
-          <a:blip r:embed="rId3"/>
-          <a:srcRect/>
-          <a:stretch>
-            <a:fillRect/>
-          </a:stretch>
-        </p:blipFill>
-        <p:spPr bwMode="auto">
-          <a:xfrm>
-            <a:off x="3600450" y="5334000"/>
-            <a:ext cx="1981200" cy="969963"/>
-          </a:xfrm>
-          <a:prstGeom prst="rect">
-            <a:avLst/>
-          </a:prstGeom>
-          <a:noFill/>
-          <a:ln w="9525">
-            <a:noFill/>
-            <a:miter lim="800000"/>
-            <a:headEnd/>
-            <a:tailEnd/>
-          </a:ln>
-        </p:spPr>
-      </p:pic>
-      <p:sp>
-        <p:nvSpPr>
-          <p:cNvPr id="9" name="TextBox 8"/>
-          <p:cNvSpPr txBox="1"/>
-          <p:nvPr/>
-        </p:nvSpPr>
-        <p:spPr>
-          <a:xfrm>
-            <a:off x="381000" y="1447800"/>
-            <a:ext cx="8610600" cy="646331"/>
-          </a:xfrm>
-          <a:prstGeom prst="rect">
-            <a:avLst/>
-          </a:prstGeom>
-          <a:noFill/>
-        </p:spPr>
-        <p:txBody>
-          <a:bodyPr>
-            <a:spAutoFit/>
+        <p:txBody>
+          <a:bodyPr vert="horz" wrap="square" lIns="91440" tIns="45720" rIns="91440" bIns="45720" numCol="1" anchor="t" anchorCtr="0" compatLnSpc="1">
+            <a:prstTxWarp prst="textNoShape">
+              <a:avLst/>
+            </a:prstTxWarp>
           </a:bodyPr>
           <a:lstStyle/>
           <a:p>
-            <a:pPr>
-              <a:defRPr/>
-            </a:pPr>
-            <a:r>
-              <a:rPr lang="en-US" sz="3600" spc="60" dirty="0" smtClean="0">
-                <a:solidFill>
-                  <a:schemeClr val="bg1"/>
-                </a:solidFill>
-                <a:latin typeface="Calibri" pitchFamily="34" charset="0"/>
-              </a:rPr>
-              <a:t>(Section Header)</a:t>
-            </a:r>
-            <a:endParaRPr lang="en-US" sz="3600" spc="60" dirty="0">
-              <a:solidFill>
-                <a:schemeClr val="bg1"/>
-              </a:solidFill>
-              <a:latin typeface="Calibri" pitchFamily="34" charset="0"/>
-            </a:endParaRPr>
-          </a:p>
-        </p:txBody>
-      </p:sp>
-      <p:sp>
-        <p:nvSpPr>
-          <p:cNvPr id="11" name="TextBox 10"/>
-          <p:cNvSpPr txBox="1"/>
-          <p:nvPr/>
-        </p:nvSpPr>
-        <p:spPr>
-          <a:xfrm>
-            <a:off x="381000" y="2057400"/>
-            <a:ext cx="7543800" cy="338554"/>
-          </a:xfrm>
-          <a:prstGeom prst="rect">
-            <a:avLst/>
-          </a:prstGeom>
-          <a:noFill/>
-        </p:spPr>
-        <p:txBody>
-          <a:bodyPr wrap="square">
-            <a:spAutoFit/>
-          </a:bodyPr>
-          <a:lstStyle/>
-          <a:p>
-            <a:pPr>
-              <a:defRPr/>
-            </a:pPr>
-            <a:r>
-              <a:rPr lang="en-US" sz="1600" dirty="0" smtClean="0">
-                <a:solidFill>
-                  <a:schemeClr val="bg1"/>
-                </a:solidFill>
-                <a:latin typeface="+mn-lt"/>
-              </a:rPr>
-              <a:t>(section sub title)</a:t>
-            </a:r>
-            <a:endParaRPr lang="en-US" sz="1600" dirty="0">
-              <a:solidFill>
-                <a:schemeClr val="bg1"/>
-              </a:solidFill>
-              <a:latin typeface="+mn-lt"/>
-            </a:endParaRPr>
+            <a:pPr eaLnBrk="1" hangingPunct="1"/>
+            <a:endParaRPr lang="en-US" dirty="0" smtClean="0"/>
           </a:p>
         </p:txBody>
       </p:sp>
@@ -6417,21 +7869,6 @@
 </file>
 
 <file path=customXml/item1.xml><?xml version="1.0" encoding="utf-8"?>
-<p:properties xmlns:p="http://schemas.microsoft.com/office/2006/metadata/properties" xmlns:xsi="http://www.w3.org/2001/XMLSchema-instance">
-  <documentManagement/>
-</p:properties>
-</file>
-
-<file path=customXml/item2.xml><?xml version="1.0" encoding="utf-8"?>
-<?mso-contentType ?>
-<FormTemplates xmlns="http://schemas.microsoft.com/sharepoint/v3/contenttype/forms">
-  <Display>DocumentLibraryForm</Display>
-  <Edit>DocumentLibraryForm</Edit>
-  <New>DocumentLibraryForm</New>
-</FormTemplates>
-</file>
-
-<file path=customXml/item3.xml><?xml version="1.0" encoding="utf-8"?>
 <ct:contentTypeSchema xmlns:ct="http://schemas.microsoft.com/office/2006/metadata/contentType" xmlns:ma="http://schemas.microsoft.com/office/2006/metadata/properties/metaAttributes" ct:_="" ma:_="" ma:contentTypeName="Document" ma:contentTypeID="0x0101005857B3975182FB47B67FAAA67052062C" ma:contentTypeVersion="0" ma:contentTypeDescription="Create a new document." ma:contentTypeScope="" ma:versionID="a1781edd533abf786dc62ee7dded643a">
   <xsd:schema xmlns:xsd="http://www.w3.org/2001/XMLSchema" xmlns:p="http://schemas.microsoft.com/office/2006/metadata/properties" targetNamespace="http://schemas.microsoft.com/office/2006/metadata/properties" ma:root="true" ma:fieldsID="4aeb20c0e3442673af7ee10786458764">
     <xsd:element name="properties">
@@ -6480,10 +7917,32 @@
 </ct:contentTypeSchema>
 </file>
 
+<file path=customXml/item2.xml><?xml version="1.0" encoding="utf-8"?>
+<?mso-contentType ?>
+<FormTemplates xmlns="http://schemas.microsoft.com/sharepoint/v3/contenttype/forms">
+  <Display>DocumentLibraryForm</Display>
+  <Edit>DocumentLibraryForm</Edit>
+  <New>DocumentLibraryForm</New>
+</FormTemplates>
+</file>
+
+<file path=customXml/item3.xml><?xml version="1.0" encoding="utf-8"?>
+<p:properties xmlns:p="http://schemas.microsoft.com/office/2006/metadata/properties" xmlns:xsi="http://www.w3.org/2001/XMLSchema-instance">
+  <documentManagement/>
+</p:properties>
+</file>
+
 <file path=customXml/itemProps1.xml><?xml version="1.0" encoding="utf-8"?>
-<ds:datastoreItem xmlns:ds="http://schemas.openxmlformats.org/officeDocument/2006/customXml" ds:itemID="{F8AADC7F-5DC4-46F2-A809-0679B041C012}">
+<ds:datastoreItem xmlns:ds="http://schemas.openxmlformats.org/officeDocument/2006/customXml" ds:itemID="{D3EBC05E-93E3-47EC-A4AA-B305F2941009}">
   <ds:schemaRefs>
+    <ds:schemaRef ds:uri="http://schemas.microsoft.com/office/2006/metadata/contentType"/>
+    <ds:schemaRef ds:uri="http://schemas.microsoft.com/office/2006/metadata/properties/metaAttributes"/>
+    <ds:schemaRef ds:uri="http://www.w3.org/2001/XMLSchema"/>
     <ds:schemaRef ds:uri="http://schemas.microsoft.com/office/2006/metadata/properties"/>
+    <ds:schemaRef ds:uri="http://schemas.openxmlformats.org/package/2006/metadata/core-properties"/>
+    <ds:schemaRef ds:uri="http://purl.org/dc/elements/1.1/"/>
+    <ds:schemaRef ds:uri="http://purl.org/dc/terms/"/>
+    <ds:schemaRef ds:uri="http://schemas.microsoft.com/office/internal/2005/internalDocumentation"/>
   </ds:schemaRefs>
 </ds:datastoreItem>
 </file>
@@ -6497,16 +7956,9 @@
 </file>
 
 <file path=customXml/itemProps3.xml><?xml version="1.0" encoding="utf-8"?>
-<ds:datastoreItem xmlns:ds="http://schemas.openxmlformats.org/officeDocument/2006/customXml" ds:itemID="{D3EBC05E-93E3-47EC-A4AA-B305F2941009}">
+<ds:datastoreItem xmlns:ds="http://schemas.openxmlformats.org/officeDocument/2006/customXml" ds:itemID="{F8AADC7F-5DC4-46F2-A809-0679B041C012}">
   <ds:schemaRefs>
-    <ds:schemaRef ds:uri="http://schemas.microsoft.com/office/2006/metadata/contentType"/>
-    <ds:schemaRef ds:uri="http://schemas.microsoft.com/office/2006/metadata/properties/metaAttributes"/>
-    <ds:schemaRef ds:uri="http://www.w3.org/2001/XMLSchema"/>
     <ds:schemaRef ds:uri="http://schemas.microsoft.com/office/2006/metadata/properties"/>
-    <ds:schemaRef ds:uri="http://schemas.openxmlformats.org/package/2006/metadata/core-properties"/>
-    <ds:schemaRef ds:uri="http://purl.org/dc/elements/1.1/"/>
-    <ds:schemaRef ds:uri="http://purl.org/dc/terms/"/>
-    <ds:schemaRef ds:uri="http://schemas.microsoft.com/office/internal/2005/internalDocumentation"/>
   </ds:schemaRefs>
 </ds:datastoreItem>
 </file>
</xml_diff>

<commit_message>
adding additional broken out views of the screen mocks. continuing work on the slides - added object oriented principles slides, basic overview of the sample org chart softare, and started on 'v1' of the 'bad' code slides
</commit_message>
<xml_diff>
--- a/Decoupling Workflow With App Controler/Decoupling Workflow From Forms.pptx
+++ b/Decoupling Workflow With App Controler/Decoupling Workflow From Forms.pptx
@@ -5,40 +5,43 @@
     <p:sldMasterId id="2147483822" r:id="rId4"/>
   </p:sldMasterIdLst>
   <p:notesMasterIdLst>
-    <p:notesMasterId r:id="rId23"/>
+    <p:notesMasterId r:id="rId26"/>
   </p:notesMasterIdLst>
   <p:handoutMasterIdLst>
-    <p:handoutMasterId r:id="rId24"/>
+    <p:handoutMasterId r:id="rId27"/>
   </p:handoutMasterIdLst>
   <p:sldIdLst>
     <p:sldId id="256" r:id="rId5"/>
     <p:sldId id="257" r:id="rId6"/>
-    <p:sldId id="275" r:id="rId7"/>
-    <p:sldId id="258" r:id="rId8"/>
-    <p:sldId id="283" r:id="rId9"/>
-    <p:sldId id="282" r:id="rId10"/>
-    <p:sldId id="287" r:id="rId11"/>
-    <p:sldId id="280" r:id="rId12"/>
-    <p:sldId id="281" r:id="rId13"/>
-    <p:sldId id="286" r:id="rId14"/>
-    <p:sldId id="278" r:id="rId15"/>
-    <p:sldId id="279" r:id="rId16"/>
-    <p:sldId id="285" r:id="rId17"/>
-    <p:sldId id="276" r:id="rId18"/>
-    <p:sldId id="277" r:id="rId19"/>
-    <p:sldId id="284" r:id="rId20"/>
-    <p:sldId id="259" r:id="rId21"/>
-    <p:sldId id="274" r:id="rId22"/>
+    <p:sldId id="288" r:id="rId7"/>
+    <p:sldId id="290" r:id="rId8"/>
+    <p:sldId id="289" r:id="rId9"/>
+    <p:sldId id="258" r:id="rId10"/>
+    <p:sldId id="283" r:id="rId11"/>
+    <p:sldId id="291" r:id="rId12"/>
+    <p:sldId id="282" r:id="rId13"/>
+    <p:sldId id="287" r:id="rId14"/>
+    <p:sldId id="280" r:id="rId15"/>
+    <p:sldId id="281" r:id="rId16"/>
+    <p:sldId id="286" r:id="rId17"/>
+    <p:sldId id="278" r:id="rId18"/>
+    <p:sldId id="279" r:id="rId19"/>
+    <p:sldId id="285" r:id="rId20"/>
+    <p:sldId id="276" r:id="rId21"/>
+    <p:sldId id="277" r:id="rId22"/>
+    <p:sldId id="284" r:id="rId23"/>
+    <p:sldId id="259" r:id="rId24"/>
+    <p:sldId id="274" r:id="rId25"/>
   </p:sldIdLst>
   <p:sldSz cx="9144000" cy="6858000" type="screen4x3"/>
   <p:notesSz cx="7010400" cy="9296400"/>
   <p:embeddedFontLst>
     <p:embeddedFont>
       <p:font typeface="Calibri" pitchFamily="34" charset="0"/>
-      <p:regular r:id="rId25"/>
-      <p:bold r:id="rId26"/>
-      <p:italic r:id="rId27"/>
-      <p:boldItalic r:id="rId28"/>
+      <p:regular r:id="rId28"/>
+      <p:bold r:id="rId29"/>
+      <p:italic r:id="rId30"/>
+      <p:boldItalic r:id="rId31"/>
     </p:embeddedFont>
   </p:embeddedFontLst>
   <p:defaultTextStyle>
@@ -902,7 +905,7 @@
               <a:pPr>
                 <a:defRPr/>
               </a:pPr>
-              <a:t>15</a:t>
+              <a:t>13</a:t>
             </a:fld>
             <a:endParaRPr lang="en-US"/>
           </a:p>
@@ -989,7 +992,268 @@
               <a:pPr>
                 <a:defRPr/>
               </a:pPr>
+              <a:t>15</a:t>
+            </a:fld>
+            <a:endParaRPr lang="en-US"/>
+          </a:p>
+        </p:txBody>
+      </p:sp>
+    </p:spTree>
+  </p:cSld>
+  <p:clrMapOvr>
+    <a:masterClrMapping/>
+  </p:clrMapOvr>
+</p:notes>
+</file>
+
+<file path=ppt/notesSlides/notesSlide12.xml><?xml version="1.0" encoding="utf-8"?>
+<p:notes xmlns:a="http://schemas.openxmlformats.org/drawingml/2006/main" xmlns:r="http://schemas.openxmlformats.org/officeDocument/2006/relationships" xmlns:p="http://schemas.openxmlformats.org/presentationml/2006/main">
+  <p:cSld>
+    <p:spTree>
+      <p:nvGrpSpPr>
+        <p:cNvPr id="1" name=""/>
+        <p:cNvGrpSpPr/>
+        <p:nvPr/>
+      </p:nvGrpSpPr>
+      <p:grpSpPr>
+        <a:xfrm>
+          <a:off x="0" y="0"/>
+          <a:ext cx="0" cy="0"/>
+          <a:chOff x="0" y="0"/>
+          <a:chExt cx="0" cy="0"/>
+        </a:xfrm>
+      </p:grpSpPr>
+      <p:sp>
+        <p:nvSpPr>
+          <p:cNvPr id="2" name="Slide Image Placeholder 1"/>
+          <p:cNvSpPr>
+            <a:spLocks noGrp="1" noRot="1" noChangeAspect="1"/>
+          </p:cNvSpPr>
+          <p:nvPr>
+            <p:ph type="sldImg"/>
+          </p:nvPr>
+        </p:nvSpPr>
+        <p:spPr/>
+      </p:sp>
+      <p:sp>
+        <p:nvSpPr>
+          <p:cNvPr id="3" name="Notes Placeholder 2"/>
+          <p:cNvSpPr>
+            <a:spLocks noGrp="1"/>
+          </p:cNvSpPr>
+          <p:nvPr>
+            <p:ph type="body" idx="1"/>
+          </p:nvPr>
+        </p:nvSpPr>
+        <p:spPr/>
+        <p:txBody>
+          <a:bodyPr>
+            <a:normAutofit/>
+          </a:bodyPr>
+          <a:lstStyle/>
+          <a:p>
+            <a:endParaRPr lang="en-US" dirty="0"/>
+          </a:p>
+        </p:txBody>
+      </p:sp>
+      <p:sp>
+        <p:nvSpPr>
+          <p:cNvPr id="4" name="Slide Number Placeholder 3"/>
+          <p:cNvSpPr>
+            <a:spLocks noGrp="1"/>
+          </p:cNvSpPr>
+          <p:nvPr>
+            <p:ph type="sldNum" sz="quarter" idx="10"/>
+          </p:nvPr>
+        </p:nvSpPr>
+        <p:spPr/>
+        <p:txBody>
+          <a:bodyPr/>
+          <a:lstStyle/>
+          <a:p>
+            <a:pPr>
+              <a:defRPr/>
+            </a:pPr>
+            <a:fld id="{1931C8FD-CC35-423B-99F4-64D81D6A80AE}" type="slidenum">
+              <a:rPr lang="en-US" smtClean="0"/>
+              <a:pPr>
+                <a:defRPr/>
+              </a:pPr>
               <a:t>16</a:t>
+            </a:fld>
+            <a:endParaRPr lang="en-US"/>
+          </a:p>
+        </p:txBody>
+      </p:sp>
+    </p:spTree>
+  </p:cSld>
+  <p:clrMapOvr>
+    <a:masterClrMapping/>
+  </p:clrMapOvr>
+</p:notes>
+</file>
+
+<file path=ppt/notesSlides/notesSlide13.xml><?xml version="1.0" encoding="utf-8"?>
+<p:notes xmlns:a="http://schemas.openxmlformats.org/drawingml/2006/main" xmlns:r="http://schemas.openxmlformats.org/officeDocument/2006/relationships" xmlns:p="http://schemas.openxmlformats.org/presentationml/2006/main">
+  <p:cSld>
+    <p:spTree>
+      <p:nvGrpSpPr>
+        <p:cNvPr id="1" name=""/>
+        <p:cNvGrpSpPr/>
+        <p:nvPr/>
+      </p:nvGrpSpPr>
+      <p:grpSpPr>
+        <a:xfrm>
+          <a:off x="0" y="0"/>
+          <a:ext cx="0" cy="0"/>
+          <a:chOff x="0" y="0"/>
+          <a:chExt cx="0" cy="0"/>
+        </a:xfrm>
+      </p:grpSpPr>
+      <p:sp>
+        <p:nvSpPr>
+          <p:cNvPr id="2" name="Slide Image Placeholder 1"/>
+          <p:cNvSpPr>
+            <a:spLocks noGrp="1" noRot="1" noChangeAspect="1"/>
+          </p:cNvSpPr>
+          <p:nvPr>
+            <p:ph type="sldImg"/>
+          </p:nvPr>
+        </p:nvSpPr>
+        <p:spPr/>
+      </p:sp>
+      <p:sp>
+        <p:nvSpPr>
+          <p:cNvPr id="3" name="Notes Placeholder 2"/>
+          <p:cNvSpPr>
+            <a:spLocks noGrp="1"/>
+          </p:cNvSpPr>
+          <p:nvPr>
+            <p:ph type="body" idx="1"/>
+          </p:nvPr>
+        </p:nvSpPr>
+        <p:spPr/>
+        <p:txBody>
+          <a:bodyPr>
+            <a:normAutofit/>
+          </a:bodyPr>
+          <a:lstStyle/>
+          <a:p>
+            <a:endParaRPr lang="en-US" dirty="0"/>
+          </a:p>
+        </p:txBody>
+      </p:sp>
+      <p:sp>
+        <p:nvSpPr>
+          <p:cNvPr id="4" name="Slide Number Placeholder 3"/>
+          <p:cNvSpPr>
+            <a:spLocks noGrp="1"/>
+          </p:cNvSpPr>
+          <p:nvPr>
+            <p:ph type="sldNum" sz="quarter" idx="10"/>
+          </p:nvPr>
+        </p:nvSpPr>
+        <p:spPr/>
+        <p:txBody>
+          <a:bodyPr/>
+          <a:lstStyle/>
+          <a:p>
+            <a:pPr>
+              <a:defRPr/>
+            </a:pPr>
+            <a:fld id="{1931C8FD-CC35-423B-99F4-64D81D6A80AE}" type="slidenum">
+              <a:rPr lang="en-US" smtClean="0"/>
+              <a:pPr>
+                <a:defRPr/>
+              </a:pPr>
+              <a:t>18</a:t>
+            </a:fld>
+            <a:endParaRPr lang="en-US"/>
+          </a:p>
+        </p:txBody>
+      </p:sp>
+    </p:spTree>
+  </p:cSld>
+  <p:clrMapOvr>
+    <a:masterClrMapping/>
+  </p:clrMapOvr>
+</p:notes>
+</file>
+
+<file path=ppt/notesSlides/notesSlide14.xml><?xml version="1.0" encoding="utf-8"?>
+<p:notes xmlns:a="http://schemas.openxmlformats.org/drawingml/2006/main" xmlns:r="http://schemas.openxmlformats.org/officeDocument/2006/relationships" xmlns:p="http://schemas.openxmlformats.org/presentationml/2006/main">
+  <p:cSld>
+    <p:spTree>
+      <p:nvGrpSpPr>
+        <p:cNvPr id="1" name=""/>
+        <p:cNvGrpSpPr/>
+        <p:nvPr/>
+      </p:nvGrpSpPr>
+      <p:grpSpPr>
+        <a:xfrm>
+          <a:off x="0" y="0"/>
+          <a:ext cx="0" cy="0"/>
+          <a:chOff x="0" y="0"/>
+          <a:chExt cx="0" cy="0"/>
+        </a:xfrm>
+      </p:grpSpPr>
+      <p:sp>
+        <p:nvSpPr>
+          <p:cNvPr id="2" name="Slide Image Placeholder 1"/>
+          <p:cNvSpPr>
+            <a:spLocks noGrp="1" noRot="1" noChangeAspect="1"/>
+          </p:cNvSpPr>
+          <p:nvPr>
+            <p:ph type="sldImg"/>
+          </p:nvPr>
+        </p:nvSpPr>
+        <p:spPr/>
+      </p:sp>
+      <p:sp>
+        <p:nvSpPr>
+          <p:cNvPr id="3" name="Notes Placeholder 2"/>
+          <p:cNvSpPr>
+            <a:spLocks noGrp="1"/>
+          </p:cNvSpPr>
+          <p:nvPr>
+            <p:ph type="body" idx="1"/>
+          </p:nvPr>
+        </p:nvSpPr>
+        <p:spPr/>
+        <p:txBody>
+          <a:bodyPr>
+            <a:normAutofit/>
+          </a:bodyPr>
+          <a:lstStyle/>
+          <a:p>
+            <a:endParaRPr lang="en-US" dirty="0"/>
+          </a:p>
+        </p:txBody>
+      </p:sp>
+      <p:sp>
+        <p:nvSpPr>
+          <p:cNvPr id="4" name="Slide Number Placeholder 3"/>
+          <p:cNvSpPr>
+            <a:spLocks noGrp="1"/>
+          </p:cNvSpPr>
+          <p:nvPr>
+            <p:ph type="sldNum" sz="quarter" idx="10"/>
+          </p:nvPr>
+        </p:nvSpPr>
+        <p:spPr/>
+        <p:txBody>
+          <a:bodyPr/>
+          <a:lstStyle/>
+          <a:p>
+            <a:pPr>
+              <a:defRPr/>
+            </a:pPr>
+            <a:fld id="{1931C8FD-CC35-423B-99F4-64D81D6A80AE}" type="slidenum">
+              <a:rPr lang="en-US" smtClean="0"/>
+              <a:pPr>
+                <a:defRPr/>
+              </a:pPr>
+              <a:t>19</a:t>
             </a:fld>
             <a:endParaRPr lang="en-US"/>
           </a:p>
@@ -1163,7 +1427,7 @@
               <a:pPr>
                 <a:defRPr/>
               </a:pPr>
-              <a:t>5</a:t>
+              <a:t>4</a:t>
             </a:fld>
             <a:endParaRPr lang="en-US"/>
           </a:p>
@@ -1250,7 +1514,7 @@
               <a:pPr>
                 <a:defRPr/>
               </a:pPr>
-              <a:t>6</a:t>
+              <a:t>5</a:t>
             </a:fld>
             <a:endParaRPr lang="en-US"/>
           </a:p>
@@ -1424,7 +1688,7 @@
               <a:pPr>
                 <a:defRPr/>
               </a:pPr>
-              <a:t>9</a:t>
+              <a:t>8</a:t>
             </a:fld>
             <a:endParaRPr lang="en-US"/>
           </a:p>
@@ -1511,7 +1775,7 @@
               <a:pPr>
                 <a:defRPr/>
               </a:pPr>
-              <a:t>10</a:t>
+              <a:t>9</a:t>
             </a:fld>
             <a:endParaRPr lang="en-US"/>
           </a:p>
@@ -1598,7 +1862,7 @@
               <a:pPr>
                 <a:defRPr/>
               </a:pPr>
-              <a:t>12</a:t>
+              <a:t>10</a:t>
             </a:fld>
             <a:endParaRPr lang="en-US"/>
           </a:p>
@@ -1685,7 +1949,7 @@
               <a:pPr>
                 <a:defRPr/>
               </a:pPr>
-              <a:t>13</a:t>
+              <a:t>12</a:t>
             </a:fld>
             <a:endParaRPr lang="en-US"/>
           </a:p>
@@ -3395,7 +3659,7 @@
                 </a:solidFill>
                 <a:latin typeface="Calibri" pitchFamily="34" charset="0"/>
               </a:rPr>
-              <a:t>(Section Header)</a:t>
+              <a:t>Simple Org Chart: Version 1</a:t>
             </a:r>
             <a:endParaRPr lang="en-US" sz="3600" spc="60" dirty="0">
               <a:solidFill>
@@ -3438,7 +3702,7 @@
                 </a:solidFill>
                 <a:latin typeface="+mn-lt"/>
               </a:rPr>
-              <a:t>(section sub title)</a:t>
+              <a:t>Tightly coupled forms: It works, but it doesn’t modify easily.</a:t>
             </a:r>
             <a:endParaRPr lang="en-US" sz="1600" dirty="0">
               <a:solidFill>
@@ -3504,6 +3768,10 @@
             <a:pPr eaLnBrk="1" hangingPunct="1">
               <a:buNone/>
             </a:pPr>
+            <a:r>
+              <a:rPr lang="en-US" sz="2000" dirty="0" smtClean="0"/>
+              <a:t>Tightly Coupled Workflow: Form Knows About Form, Presenter, and More</a:t>
+            </a:r>
             <a:endParaRPr lang="en-US" sz="2000" dirty="0" smtClean="0"/>
           </a:p>
         </p:txBody>
@@ -3535,10 +3803,160 @@
           <a:lstStyle/>
           <a:p>
             <a:pPr eaLnBrk="1" hangingPunct="1"/>
+            <a:r>
+              <a:rPr lang="en-US" dirty="0" smtClean="0"/>
+              <a:t>Simple Org Chart – v1</a:t>
+            </a:r>
             <a:endParaRPr lang="en-US" dirty="0" smtClean="0"/>
           </a:p>
         </p:txBody>
       </p:sp>
+      <p:grpSp>
+        <p:nvGrpSpPr>
+          <p:cNvPr id="14" name="Group 13"/>
+          <p:cNvGrpSpPr/>
+          <p:nvPr/>
+        </p:nvGrpSpPr>
+        <p:grpSpPr>
+          <a:xfrm>
+            <a:off x="904875" y="1819275"/>
+            <a:ext cx="7334250" cy="4048125"/>
+            <a:chOff x="685800" y="1819275"/>
+            <a:chExt cx="7334250" cy="4048125"/>
+          </a:xfrm>
+        </p:grpSpPr>
+        <p:pic>
+          <p:nvPicPr>
+            <p:cNvPr id="5" name="Picture 2" descr="X:\Derick-GitHub\Presentation And Training Material\Decoupling Workflow With App Controler\doc\Org Chart View.png"/>
+            <p:cNvPicPr>
+              <a:picLocks noChangeAspect="1" noChangeArrowheads="1"/>
+            </p:cNvPicPr>
+            <p:nvPr/>
+          </p:nvPicPr>
+          <p:blipFill>
+            <a:blip r:embed="rId3"/>
+            <a:srcRect/>
+            <a:stretch>
+              <a:fillRect/>
+            </a:stretch>
+          </p:blipFill>
+          <p:spPr bwMode="auto">
+            <a:xfrm>
+              <a:off x="685800" y="1819275"/>
+              <a:ext cx="4286251" cy="4048125"/>
+            </a:xfrm>
+            <a:prstGeom prst="rect">
+              <a:avLst/>
+            </a:prstGeom>
+            <a:noFill/>
+          </p:spPr>
+        </p:pic>
+        <p:pic>
+          <p:nvPicPr>
+            <p:cNvPr id="3" name="Picture 3"/>
+            <p:cNvPicPr>
+              <a:picLocks noChangeAspect="1" noChangeArrowheads="1"/>
+            </p:cNvPicPr>
+            <p:nvPr/>
+          </p:nvPicPr>
+          <p:blipFill>
+            <a:blip r:embed="rId4"/>
+            <a:srcRect/>
+            <a:stretch>
+              <a:fillRect/>
+            </a:stretch>
+          </p:blipFill>
+          <p:spPr bwMode="auto">
+            <a:xfrm>
+              <a:off x="2971800" y="3048000"/>
+              <a:ext cx="5048250" cy="1838325"/>
+            </a:xfrm>
+            <a:prstGeom prst="rect">
+              <a:avLst/>
+            </a:prstGeom>
+            <a:noFill/>
+            <a:ln w="38100">
+              <a:solidFill>
+                <a:schemeClr val="accent2"/>
+              </a:solidFill>
+              <a:miter lim="800000"/>
+              <a:headEnd/>
+              <a:tailEnd/>
+            </a:ln>
+            <a:effectLst/>
+          </p:spPr>
+        </p:pic>
+        <p:cxnSp>
+          <p:nvCxnSpPr>
+            <p:cNvPr id="8" name="Straight Connector 7"/>
+            <p:cNvCxnSpPr/>
+            <p:nvPr/>
+          </p:nvCxnSpPr>
+          <p:spPr>
+            <a:xfrm rot="5400000" flipH="1" flipV="1">
+              <a:off x="1409700" y="3771900"/>
+              <a:ext cx="2286000" cy="838200"/>
+            </a:xfrm>
+            <a:prstGeom prst="line">
+              <a:avLst/>
+            </a:prstGeom>
+            <a:ln w="38100">
+              <a:solidFill>
+                <a:schemeClr val="accent2"/>
+              </a:solidFill>
+            </a:ln>
+          </p:spPr>
+          <p:style>
+            <a:lnRef idx="1">
+              <a:schemeClr val="accent1"/>
+            </a:lnRef>
+            <a:fillRef idx="0">
+              <a:schemeClr val="accent1"/>
+            </a:fillRef>
+            <a:effectRef idx="0">
+              <a:schemeClr val="accent1"/>
+            </a:effectRef>
+            <a:fontRef idx="minor">
+              <a:schemeClr val="tx1"/>
+            </a:fontRef>
+          </p:style>
+        </p:cxnSp>
+        <p:cxnSp>
+          <p:nvCxnSpPr>
+            <p:cNvPr id="10" name="Straight Connector 9"/>
+            <p:cNvCxnSpPr/>
+            <p:nvPr/>
+          </p:nvCxnSpPr>
+          <p:spPr>
+            <a:xfrm flipV="1">
+              <a:off x="2133600" y="4876800"/>
+              <a:ext cx="838200" cy="685800"/>
+            </a:xfrm>
+            <a:prstGeom prst="line">
+              <a:avLst/>
+            </a:prstGeom>
+            <a:ln w="38100">
+              <a:solidFill>
+                <a:schemeClr val="accent2"/>
+              </a:solidFill>
+            </a:ln>
+          </p:spPr>
+          <p:style>
+            <a:lnRef idx="1">
+              <a:schemeClr val="accent1"/>
+            </a:lnRef>
+            <a:fillRef idx="0">
+              <a:schemeClr val="accent1"/>
+            </a:fillRef>
+            <a:effectRef idx="0">
+              <a:schemeClr val="accent1"/>
+            </a:effectRef>
+            <a:fontRef idx="minor">
+              <a:schemeClr val="tx1"/>
+            </a:fontRef>
+          </p:style>
+        </p:cxnSp>
+      </p:grpSp>
     </p:spTree>
   </p:cSld>
   <p:clrMapOvr>
@@ -4180,7 +4598,7 @@
       </p:grpSpPr>
       <p:sp>
         <p:nvSpPr>
-          <p:cNvPr id="6" name="Rectangle 5"/>
+          <p:cNvPr id="4" name="Rectangle 3"/>
           <p:cNvSpPr/>
           <p:nvPr/>
         </p:nvSpPr>
@@ -4226,6 +4644,769 @@
           </a:p>
         </p:txBody>
       </p:sp>
+      <p:pic>
+        <p:nvPicPr>
+          <p:cNvPr id="4099" name="Picture 4" descr="MAT logo 1 CMYK"/>
+          <p:cNvPicPr>
+            <a:picLocks noChangeAspect="1" noChangeArrowheads="1"/>
+          </p:cNvPicPr>
+          <p:nvPr/>
+        </p:nvPicPr>
+        <p:blipFill>
+          <a:blip r:embed="rId2">
+            <a:clrChange>
+              <a:clrFrom>
+                <a:srgbClr val="FDFDFD"/>
+              </a:clrFrom>
+              <a:clrTo>
+                <a:srgbClr val="FDFDFD">
+                  <a:alpha val="0"/>
+                </a:srgbClr>
+              </a:clrTo>
+            </a:clrChange>
+          </a:blip>
+          <a:srcRect/>
+          <a:stretch>
+            <a:fillRect/>
+          </a:stretch>
+        </p:blipFill>
+        <p:spPr bwMode="auto">
+          <a:xfrm>
+            <a:off x="2971800" y="4800600"/>
+            <a:ext cx="2819400" cy="1338263"/>
+          </a:xfrm>
+          <a:prstGeom prst="rect">
+            <a:avLst/>
+          </a:prstGeom>
+          <a:noFill/>
+          <a:ln w="9525">
+            <a:noFill/>
+            <a:miter lim="800000"/>
+            <a:headEnd/>
+            <a:tailEnd/>
+          </a:ln>
+        </p:spPr>
+      </p:pic>
+      <p:sp>
+        <p:nvSpPr>
+          <p:cNvPr id="5" name="Rectangle 4"/>
+          <p:cNvSpPr/>
+          <p:nvPr/>
+        </p:nvSpPr>
+        <p:spPr>
+          <a:xfrm>
+            <a:off x="0" y="4724400"/>
+            <a:ext cx="9144000" cy="2133600"/>
+          </a:xfrm>
+          <a:prstGeom prst="rect">
+            <a:avLst/>
+          </a:prstGeom>
+          <a:solidFill>
+            <a:srgbClr val="E31937"/>
+          </a:solidFill>
+          <a:ln>
+            <a:noFill/>
+          </a:ln>
+        </p:spPr>
+        <p:style>
+          <a:lnRef idx="2">
+            <a:schemeClr val="accent1">
+              <a:shade val="50000"/>
+            </a:schemeClr>
+          </a:lnRef>
+          <a:fillRef idx="1">
+            <a:schemeClr val="accent1"/>
+          </a:fillRef>
+          <a:effectRef idx="0">
+            <a:schemeClr val="accent1"/>
+          </a:effectRef>
+          <a:fontRef idx="minor">
+            <a:schemeClr val="lt1"/>
+          </a:fontRef>
+        </p:style>
+        <p:txBody>
+          <a:bodyPr anchor="ctr"/>
+          <a:lstStyle/>
+          <a:p>
+            <a:pPr algn="ctr">
+              <a:defRPr/>
+            </a:pPr>
+            <a:endParaRPr lang="en-US"/>
+          </a:p>
+        </p:txBody>
+      </p:sp>
+      <p:sp>
+        <p:nvSpPr>
+          <p:cNvPr id="10" name="Rectangle 9"/>
+          <p:cNvSpPr/>
+          <p:nvPr/>
+        </p:nvSpPr>
+        <p:spPr bwMode="auto">
+          <a:xfrm>
+            <a:off x="228600" y="0"/>
+            <a:ext cx="104775" cy="2325688"/>
+          </a:xfrm>
+          <a:prstGeom prst="rect">
+            <a:avLst/>
+          </a:prstGeom>
+          <a:solidFill>
+            <a:srgbClr val="E31937"/>
+          </a:solidFill>
+          <a:ln>
+            <a:noFill/>
+          </a:ln>
+        </p:spPr>
+        <p:style>
+          <a:lnRef idx="2">
+            <a:schemeClr val="accent1">
+              <a:shade val="50000"/>
+            </a:schemeClr>
+          </a:lnRef>
+          <a:fillRef idx="1">
+            <a:schemeClr val="accent1"/>
+          </a:fillRef>
+          <a:effectRef idx="0">
+            <a:schemeClr val="accent1"/>
+          </a:effectRef>
+          <a:fontRef idx="minor">
+            <a:schemeClr val="lt1"/>
+          </a:fontRef>
+        </p:style>
+        <p:txBody>
+          <a:bodyPr anchor="ctr"/>
+          <a:lstStyle/>
+          <a:p>
+            <a:pPr algn="ctr">
+              <a:defRPr/>
+            </a:pPr>
+            <a:endParaRPr lang="en-US"/>
+          </a:p>
+        </p:txBody>
+      </p:sp>
+      <p:pic>
+        <p:nvPicPr>
+          <p:cNvPr id="4103" name="Picture 7" descr="MAT logo vertical_red.emf"/>
+          <p:cNvPicPr>
+            <a:picLocks noChangeAspect="1"/>
+          </p:cNvPicPr>
+          <p:nvPr/>
+        </p:nvPicPr>
+        <p:blipFill>
+          <a:blip r:embed="rId3"/>
+          <a:srcRect/>
+          <a:stretch>
+            <a:fillRect/>
+          </a:stretch>
+        </p:blipFill>
+        <p:spPr bwMode="auto">
+          <a:xfrm>
+            <a:off x="3600450" y="5334000"/>
+            <a:ext cx="1981200" cy="969963"/>
+          </a:xfrm>
+          <a:prstGeom prst="rect">
+            <a:avLst/>
+          </a:prstGeom>
+          <a:noFill/>
+          <a:ln w="9525">
+            <a:noFill/>
+            <a:miter lim="800000"/>
+            <a:headEnd/>
+            <a:tailEnd/>
+          </a:ln>
+        </p:spPr>
+      </p:pic>
+      <p:sp>
+        <p:nvSpPr>
+          <p:cNvPr id="9" name="TextBox 8"/>
+          <p:cNvSpPr txBox="1"/>
+          <p:nvPr/>
+        </p:nvSpPr>
+        <p:spPr>
+          <a:xfrm>
+            <a:off x="381000" y="1447800"/>
+            <a:ext cx="8610600" cy="646331"/>
+          </a:xfrm>
+          <a:prstGeom prst="rect">
+            <a:avLst/>
+          </a:prstGeom>
+          <a:noFill/>
+        </p:spPr>
+        <p:txBody>
+          <a:bodyPr>
+            <a:spAutoFit/>
+          </a:bodyPr>
+          <a:lstStyle/>
+          <a:p>
+            <a:pPr>
+              <a:defRPr/>
+            </a:pPr>
+            <a:r>
+              <a:rPr lang="en-US" sz="3600" spc="60" dirty="0" smtClean="0">
+                <a:solidFill>
+                  <a:schemeClr val="bg1"/>
+                </a:solidFill>
+                <a:latin typeface="Calibri" pitchFamily="34" charset="0"/>
+              </a:rPr>
+              <a:t>(Section Header)</a:t>
+            </a:r>
+            <a:endParaRPr lang="en-US" sz="3600" spc="60" dirty="0">
+              <a:solidFill>
+                <a:schemeClr val="bg1"/>
+              </a:solidFill>
+              <a:latin typeface="Calibri" pitchFamily="34" charset="0"/>
+            </a:endParaRPr>
+          </a:p>
+        </p:txBody>
+      </p:sp>
+      <p:sp>
+        <p:nvSpPr>
+          <p:cNvPr id="11" name="TextBox 10"/>
+          <p:cNvSpPr txBox="1"/>
+          <p:nvPr/>
+        </p:nvSpPr>
+        <p:spPr>
+          <a:xfrm>
+            <a:off x="381000" y="2057400"/>
+            <a:ext cx="7543800" cy="338554"/>
+          </a:xfrm>
+          <a:prstGeom prst="rect">
+            <a:avLst/>
+          </a:prstGeom>
+          <a:noFill/>
+        </p:spPr>
+        <p:txBody>
+          <a:bodyPr wrap="square">
+            <a:spAutoFit/>
+          </a:bodyPr>
+          <a:lstStyle/>
+          <a:p>
+            <a:pPr>
+              <a:defRPr/>
+            </a:pPr>
+            <a:r>
+              <a:rPr lang="en-US" sz="1600" dirty="0" smtClean="0">
+                <a:solidFill>
+                  <a:schemeClr val="bg1"/>
+                </a:solidFill>
+                <a:latin typeface="+mn-lt"/>
+              </a:rPr>
+              <a:t>(section sub title)</a:t>
+            </a:r>
+            <a:endParaRPr lang="en-US" sz="1600" dirty="0">
+              <a:solidFill>
+                <a:schemeClr val="bg1"/>
+              </a:solidFill>
+              <a:latin typeface="+mn-lt"/>
+            </a:endParaRPr>
+          </a:p>
+        </p:txBody>
+      </p:sp>
+    </p:spTree>
+  </p:cSld>
+  <p:clrMapOvr>
+    <a:masterClrMapping/>
+  </p:clrMapOvr>
+  <p:timing>
+    <p:tnLst>
+      <p:par>
+        <p:cTn id="1" dur="indefinite" restart="never" nodeType="tmRoot"/>
+      </p:par>
+    </p:tnLst>
+  </p:timing>
+</p:sld>
+</file>
+
+<file path=ppt/slides/slide18.xml><?xml version="1.0" encoding="utf-8"?>
+<p:sld xmlns:a="http://schemas.openxmlformats.org/drawingml/2006/main" xmlns:r="http://schemas.openxmlformats.org/officeDocument/2006/relationships" xmlns:p="http://schemas.openxmlformats.org/presentationml/2006/main">
+  <p:cSld>
+    <p:spTree>
+      <p:nvGrpSpPr>
+        <p:cNvPr id="1" name=""/>
+        <p:cNvGrpSpPr/>
+        <p:nvPr/>
+      </p:nvGrpSpPr>
+      <p:grpSpPr>
+        <a:xfrm>
+          <a:off x="0" y="0"/>
+          <a:ext cx="0" cy="0"/>
+          <a:chOff x="0" y="0"/>
+          <a:chExt cx="0" cy="0"/>
+        </a:xfrm>
+      </p:grpSpPr>
+      <p:sp>
+        <p:nvSpPr>
+          <p:cNvPr id="3075" name="Text Placeholder 2"/>
+          <p:cNvSpPr>
+            <a:spLocks noGrp="1"/>
+          </p:cNvSpPr>
+          <p:nvPr>
+            <p:ph type="body" sz="quarter" idx="10"/>
+          </p:nvPr>
+        </p:nvSpPr>
+        <p:spPr>
+          <a:xfrm>
+            <a:off x="685800" y="1066800"/>
+            <a:ext cx="8229600" cy="1219200"/>
+          </a:xfrm>
+        </p:spPr>
+        <p:txBody>
+          <a:bodyPr/>
+          <a:lstStyle/>
+          <a:p>
+            <a:pPr eaLnBrk="1" hangingPunct="1">
+              <a:buNone/>
+            </a:pPr>
+            <a:endParaRPr lang="en-US" sz="2000" dirty="0" smtClean="0"/>
+          </a:p>
+        </p:txBody>
+      </p:sp>
+      <p:sp>
+        <p:nvSpPr>
+          <p:cNvPr id="3074" name="Title 1"/>
+          <p:cNvSpPr>
+            <a:spLocks noGrp="1"/>
+          </p:cNvSpPr>
+          <p:nvPr>
+            <p:ph type="title"/>
+          </p:nvPr>
+        </p:nvSpPr>
+        <p:spPr bwMode="auto">
+          <a:noFill/>
+          <a:ln>
+            <a:miter lim="800000"/>
+            <a:headEnd/>
+            <a:tailEnd/>
+          </a:ln>
+        </p:spPr>
+        <p:txBody>
+          <a:bodyPr vert="horz" wrap="square" lIns="91440" tIns="45720" rIns="91440" bIns="45720" numCol="1" anchor="t" anchorCtr="0" compatLnSpc="1">
+            <a:prstTxWarp prst="textNoShape">
+              <a:avLst/>
+            </a:prstTxWarp>
+          </a:bodyPr>
+          <a:lstStyle/>
+          <a:p>
+            <a:pPr eaLnBrk="1" hangingPunct="1"/>
+            <a:endParaRPr lang="en-US" dirty="0" smtClean="0"/>
+          </a:p>
+        </p:txBody>
+      </p:sp>
+    </p:spTree>
+  </p:cSld>
+  <p:clrMapOvr>
+    <a:masterClrMapping/>
+  </p:clrMapOvr>
+  <p:timing>
+    <p:tnLst>
+      <p:par>
+        <p:cTn id="1" dur="indefinite" restart="never" nodeType="tmRoot"/>
+      </p:par>
+    </p:tnLst>
+  </p:timing>
+</p:sld>
+</file>
+
+<file path=ppt/slides/slide19.xml><?xml version="1.0" encoding="utf-8"?>
+<p:sld xmlns:a="http://schemas.openxmlformats.org/drawingml/2006/main" xmlns:r="http://schemas.openxmlformats.org/officeDocument/2006/relationships" xmlns:p="http://schemas.openxmlformats.org/presentationml/2006/main">
+  <p:cSld>
+    <p:spTree>
+      <p:nvGrpSpPr>
+        <p:cNvPr id="1" name=""/>
+        <p:cNvGrpSpPr/>
+        <p:nvPr/>
+      </p:nvGrpSpPr>
+      <p:grpSpPr>
+        <a:xfrm>
+          <a:off x="0" y="0"/>
+          <a:ext cx="0" cy="0"/>
+          <a:chOff x="0" y="0"/>
+          <a:chExt cx="0" cy="0"/>
+        </a:xfrm>
+      </p:grpSpPr>
+      <p:sp>
+        <p:nvSpPr>
+          <p:cNvPr id="3075" name="Text Placeholder 2"/>
+          <p:cNvSpPr>
+            <a:spLocks noGrp="1"/>
+          </p:cNvSpPr>
+          <p:nvPr>
+            <p:ph type="body" sz="quarter" idx="10"/>
+          </p:nvPr>
+        </p:nvSpPr>
+        <p:spPr>
+          <a:xfrm>
+            <a:off x="685800" y="1066800"/>
+            <a:ext cx="8229600" cy="1219200"/>
+          </a:xfrm>
+        </p:spPr>
+        <p:txBody>
+          <a:bodyPr/>
+          <a:lstStyle/>
+          <a:p>
+            <a:pPr eaLnBrk="1" hangingPunct="1">
+              <a:buNone/>
+            </a:pPr>
+            <a:endParaRPr lang="en-US" sz="2000" dirty="0" smtClean="0"/>
+          </a:p>
+        </p:txBody>
+      </p:sp>
+      <p:sp>
+        <p:nvSpPr>
+          <p:cNvPr id="3074" name="Title 1"/>
+          <p:cNvSpPr>
+            <a:spLocks noGrp="1"/>
+          </p:cNvSpPr>
+          <p:nvPr>
+            <p:ph type="title"/>
+          </p:nvPr>
+        </p:nvSpPr>
+        <p:spPr bwMode="auto">
+          <a:noFill/>
+          <a:ln>
+            <a:miter lim="800000"/>
+            <a:headEnd/>
+            <a:tailEnd/>
+          </a:ln>
+        </p:spPr>
+        <p:txBody>
+          <a:bodyPr vert="horz" wrap="square" lIns="91440" tIns="45720" rIns="91440" bIns="45720" numCol="1" anchor="t" anchorCtr="0" compatLnSpc="1">
+            <a:prstTxWarp prst="textNoShape">
+              <a:avLst/>
+            </a:prstTxWarp>
+          </a:bodyPr>
+          <a:lstStyle/>
+          <a:p>
+            <a:pPr eaLnBrk="1" hangingPunct="1"/>
+            <a:endParaRPr lang="en-US" dirty="0" smtClean="0"/>
+          </a:p>
+        </p:txBody>
+      </p:sp>
+    </p:spTree>
+  </p:cSld>
+  <p:clrMapOvr>
+    <a:masterClrMapping/>
+  </p:clrMapOvr>
+  <p:timing>
+    <p:tnLst>
+      <p:par>
+        <p:cTn id="1" dur="indefinite" restart="never" nodeType="tmRoot"/>
+      </p:par>
+    </p:tnLst>
+  </p:timing>
+</p:sld>
+</file>
+
+<file path=ppt/slides/slide2.xml><?xml version="1.0" encoding="utf-8"?>
+<p:sld xmlns:a="http://schemas.openxmlformats.org/drawingml/2006/main" xmlns:r="http://schemas.openxmlformats.org/officeDocument/2006/relationships" xmlns:p="http://schemas.openxmlformats.org/presentationml/2006/main">
+  <p:cSld>
+    <p:spTree>
+      <p:nvGrpSpPr>
+        <p:cNvPr id="1" name=""/>
+        <p:cNvGrpSpPr/>
+        <p:nvPr/>
+      </p:nvGrpSpPr>
+      <p:grpSpPr>
+        <a:xfrm>
+          <a:off x="0" y="0"/>
+          <a:ext cx="0" cy="0"/>
+          <a:chOff x="0" y="0"/>
+          <a:chExt cx="0" cy="0"/>
+        </a:xfrm>
+      </p:grpSpPr>
+      <p:sp>
+        <p:nvSpPr>
+          <p:cNvPr id="3075" name="Text Placeholder 2"/>
+          <p:cNvSpPr>
+            <a:spLocks noGrp="1"/>
+          </p:cNvSpPr>
+          <p:nvPr>
+            <p:ph type="body" sz="quarter" idx="10"/>
+          </p:nvPr>
+        </p:nvSpPr>
+        <p:spPr>
+          <a:xfrm>
+            <a:off x="685800" y="1066800"/>
+            <a:ext cx="8229600" cy="5334000"/>
+          </a:xfrm>
+        </p:spPr>
+        <p:txBody>
+          <a:bodyPr/>
+          <a:lstStyle/>
+          <a:p>
+            <a:pPr eaLnBrk="1" hangingPunct="1">
+              <a:buNone/>
+            </a:pPr>
+            <a:endParaRPr lang="en-US" b="1" dirty="0" smtClean="0">
+              <a:solidFill>
+                <a:schemeClr val="accent1">
+                  <a:lumMod val="75000"/>
+                </a:schemeClr>
+              </a:solidFill>
+            </a:endParaRPr>
+          </a:p>
+          <a:p>
+            <a:pPr eaLnBrk="1" hangingPunct="1">
+              <a:buNone/>
+            </a:pPr>
+            <a:r>
+              <a:rPr lang="en-US" b="1" dirty="0" smtClean="0">
+                <a:solidFill>
+                  <a:schemeClr val="accent1">
+                    <a:lumMod val="75000"/>
+                  </a:schemeClr>
+                </a:solidFill>
+              </a:rPr>
+              <a:t>Topics </a:t>
+            </a:r>
+            <a:r>
+              <a:rPr lang="en-US" b="1" dirty="0" smtClean="0">
+                <a:solidFill>
+                  <a:schemeClr val="accent1">
+                    <a:lumMod val="75000"/>
+                  </a:schemeClr>
+                </a:solidFill>
+              </a:rPr>
+              <a:t>Covered</a:t>
+            </a:r>
+          </a:p>
+          <a:p>
+            <a:pPr eaLnBrk="1" hangingPunct="1"/>
+            <a:r>
+              <a:rPr lang="en-US" sz="2000" dirty="0" smtClean="0"/>
+              <a:t>Event Aggregator</a:t>
+            </a:r>
+          </a:p>
+          <a:p>
+            <a:pPr eaLnBrk="1" hangingPunct="1"/>
+            <a:r>
+              <a:rPr lang="en-US" sz="2000" dirty="0" smtClean="0"/>
+              <a:t>Command Pattern</a:t>
+            </a:r>
+          </a:p>
+          <a:p>
+            <a:pPr eaLnBrk="1" hangingPunct="1"/>
+            <a:r>
+              <a:rPr lang="en-US" sz="2000" dirty="0" smtClean="0"/>
+              <a:t>Application Controller</a:t>
+            </a:r>
+          </a:p>
+          <a:p>
+            <a:pPr eaLnBrk="1" hangingPunct="1"/>
+            <a:r>
+              <a:rPr lang="en-US" sz="2000" dirty="0" smtClean="0"/>
+              <a:t>Wiring Together With </a:t>
+            </a:r>
+            <a:r>
+              <a:rPr lang="en-US" sz="2000" dirty="0" err="1" smtClean="0"/>
+              <a:t>IoC</a:t>
+            </a:r>
+            <a:r>
+              <a:rPr lang="en-US" sz="2000" dirty="0" smtClean="0"/>
+              <a:t> </a:t>
+            </a:r>
+            <a:r>
+              <a:rPr lang="en-US" sz="2000" dirty="0" smtClean="0"/>
+              <a:t>Container</a:t>
+            </a:r>
+          </a:p>
+          <a:p>
+            <a:pPr eaLnBrk="1" hangingPunct="1"/>
+            <a:endParaRPr lang="en-US" sz="2000" dirty="0" smtClean="0"/>
+          </a:p>
+          <a:p>
+            <a:pPr eaLnBrk="1" hangingPunct="1">
+              <a:buNone/>
+            </a:pPr>
+            <a:r>
+              <a:rPr lang="en-US" b="1" dirty="0" smtClean="0">
+                <a:solidFill>
+                  <a:schemeClr val="accent1">
+                    <a:lumMod val="75000"/>
+                  </a:schemeClr>
+                </a:solidFill>
+              </a:rPr>
+              <a:t>Goals</a:t>
+            </a:r>
+          </a:p>
+          <a:p>
+            <a:pPr eaLnBrk="1" hangingPunct="1"/>
+            <a:r>
+              <a:rPr lang="en-US" sz="2000" dirty="0" smtClean="0"/>
+              <a:t>Object Oriented System</a:t>
+            </a:r>
+          </a:p>
+          <a:p>
+            <a:pPr eaLnBrk="1" hangingPunct="1"/>
+            <a:r>
+              <a:rPr lang="en-US" sz="2000" dirty="0" smtClean="0"/>
+              <a:t>Testability</a:t>
+            </a:r>
+            <a:endParaRPr lang="en-US" sz="2000" dirty="0" smtClean="0"/>
+          </a:p>
+          <a:p>
+            <a:pPr eaLnBrk="1" hangingPunct="1"/>
+            <a:r>
+              <a:rPr lang="en-US" sz="2000" dirty="0" smtClean="0"/>
+              <a:t>Flexibility</a:t>
+            </a:r>
+          </a:p>
+          <a:p>
+            <a:pPr eaLnBrk="1" hangingPunct="1"/>
+            <a:r>
+              <a:rPr lang="en-US" sz="2000" dirty="0" smtClean="0"/>
+              <a:t>Maintainability (</a:t>
+            </a:r>
+            <a:r>
+              <a:rPr lang="en-US" sz="2000" dirty="0" smtClean="0"/>
+              <a:t>Ease of </a:t>
+            </a:r>
+            <a:r>
+              <a:rPr lang="en-US" sz="2000" dirty="0" smtClean="0"/>
+              <a:t>Enhancement)</a:t>
+            </a:r>
+          </a:p>
+        </p:txBody>
+      </p:sp>
+      <p:sp>
+        <p:nvSpPr>
+          <p:cNvPr id="3074" name="Title 1"/>
+          <p:cNvSpPr>
+            <a:spLocks noGrp="1"/>
+          </p:cNvSpPr>
+          <p:nvPr>
+            <p:ph type="title"/>
+          </p:nvPr>
+        </p:nvSpPr>
+        <p:spPr bwMode="auto">
+          <a:noFill/>
+          <a:ln>
+            <a:miter lim="800000"/>
+            <a:headEnd/>
+            <a:tailEnd/>
+          </a:ln>
+        </p:spPr>
+        <p:txBody>
+          <a:bodyPr vert="horz" wrap="square" lIns="91440" tIns="45720" rIns="91440" bIns="45720" numCol="1" anchor="t" anchorCtr="0" compatLnSpc="1">
+            <a:prstTxWarp prst="textNoShape">
+              <a:avLst/>
+            </a:prstTxWarp>
+          </a:bodyPr>
+          <a:lstStyle/>
+          <a:p>
+            <a:pPr eaLnBrk="1" hangingPunct="1"/>
+            <a:r>
+              <a:rPr lang="en-US" dirty="0" smtClean="0"/>
+              <a:t>Topics Of This Presentation</a:t>
+            </a:r>
+          </a:p>
+        </p:txBody>
+      </p:sp>
+      <p:pic>
+        <p:nvPicPr>
+          <p:cNvPr id="1026" name="Picture 2" descr="C:\Users\derickb\AppData\Local\Microsoft\Windows\Temporary Internet Files\Content.IE5\AY104AXF\MPj04331790000[1].jpg"/>
+          <p:cNvPicPr>
+            <a:picLocks noChangeAspect="1" noChangeArrowheads="1"/>
+          </p:cNvPicPr>
+          <p:nvPr/>
+        </p:nvPicPr>
+        <p:blipFill>
+          <a:blip r:embed="rId3"/>
+          <a:srcRect/>
+          <a:stretch>
+            <a:fillRect/>
+          </a:stretch>
+        </p:blipFill>
+        <p:spPr bwMode="auto">
+          <a:xfrm>
+            <a:off x="5426075" y="990600"/>
+            <a:ext cx="3717925" cy="2790288"/>
+          </a:xfrm>
+          <a:prstGeom prst="rect">
+            <a:avLst/>
+          </a:prstGeom>
+          <a:noFill/>
+        </p:spPr>
+      </p:pic>
+    </p:spTree>
+  </p:cSld>
+  <p:clrMapOvr>
+    <a:masterClrMapping/>
+  </p:clrMapOvr>
+  <p:timing>
+    <p:tnLst>
+      <p:par>
+        <p:cTn id="1" dur="indefinite" restart="never" nodeType="tmRoot"/>
+      </p:par>
+    </p:tnLst>
+  </p:timing>
+</p:sld>
+</file>
+
+<file path=ppt/slides/slide20.xml><?xml version="1.0" encoding="utf-8"?>
+<p:sld xmlns:a="http://schemas.openxmlformats.org/drawingml/2006/main" xmlns:r="http://schemas.openxmlformats.org/officeDocument/2006/relationships" xmlns:p="http://schemas.openxmlformats.org/presentationml/2006/main">
+  <p:cSld>
+    <p:spTree>
+      <p:nvGrpSpPr>
+        <p:cNvPr id="1" name=""/>
+        <p:cNvGrpSpPr/>
+        <p:nvPr/>
+      </p:nvGrpSpPr>
+      <p:grpSpPr>
+        <a:xfrm>
+          <a:off x="0" y="0"/>
+          <a:ext cx="0" cy="0"/>
+          <a:chOff x="0" y="0"/>
+          <a:chExt cx="0" cy="0"/>
+        </a:xfrm>
+      </p:grpSpPr>
+      <p:sp>
+        <p:nvSpPr>
+          <p:cNvPr id="6" name="Rectangle 5"/>
+          <p:cNvSpPr/>
+          <p:nvPr/>
+        </p:nvSpPr>
+        <p:spPr>
+          <a:xfrm>
+            <a:off x="0" y="0"/>
+            <a:ext cx="9144000" cy="4648200"/>
+          </a:xfrm>
+          <a:prstGeom prst="rect">
+            <a:avLst/>
+          </a:prstGeom>
+          <a:solidFill>
+            <a:srgbClr val="0069AA"/>
+          </a:solidFill>
+          <a:ln>
+            <a:noFill/>
+          </a:ln>
+        </p:spPr>
+        <p:style>
+          <a:lnRef idx="2">
+            <a:schemeClr val="accent1">
+              <a:shade val="50000"/>
+            </a:schemeClr>
+          </a:lnRef>
+          <a:fillRef idx="1">
+            <a:schemeClr val="accent1"/>
+          </a:fillRef>
+          <a:effectRef idx="0">
+            <a:schemeClr val="accent1"/>
+          </a:effectRef>
+          <a:fontRef idx="minor">
+            <a:schemeClr val="lt1"/>
+          </a:fontRef>
+        </p:style>
+        <p:txBody>
+          <a:bodyPr anchor="ctr"/>
+          <a:lstStyle/>
+          <a:p>
+            <a:pPr algn="ctr">
+              <a:defRPr/>
+            </a:pPr>
+            <a:endParaRPr lang="en-US"/>
+          </a:p>
+        </p:txBody>
+      </p:sp>
       <p:sp>
         <p:nvSpPr>
           <p:cNvPr id="8" name="Rectangle 7"/>
@@ -4363,15 +5544,7 @@
                   <a:schemeClr val="bg1"/>
                 </a:solidFill>
               </a:rPr>
-              <a:t>	http://</a:t>
-            </a:r>
-            <a:r>
-              <a:rPr lang="en-US" sz="2000" dirty="0" smtClean="0">
-                <a:solidFill>
-                  <a:schemeClr val="bg1"/>
-                </a:solidFill>
-              </a:rPr>
-              <a:t>www.lostechies.com/blogs/derickbailey/archive/2008/11/19/ptom-command-and-conquer-your-ui-coupling-problems.aspx </a:t>
+              <a:t>	http://www.lostechies.com/blogs/derickbailey/archive/2008/11/19/ptom-command-and-conquer-your-ui-coupling-problems.aspx </a:t>
             </a:r>
             <a:br>
               <a:rPr lang="en-US" sz="2000" dirty="0" smtClean="0">
@@ -4399,15 +5572,7 @@
                   <a:schemeClr val="bg1"/>
                 </a:solidFill>
               </a:rPr>
-              <a:t>Event </a:t>
-            </a:r>
-            <a:r>
-              <a:rPr lang="en-US" sz="2000" dirty="0" smtClean="0">
-                <a:solidFill>
-                  <a:schemeClr val="bg1"/>
-                </a:solidFill>
-              </a:rPr>
-              <a:t>Aggregator</a:t>
+              <a:t>Event Aggregator</a:t>
             </a:r>
             <a:br>
               <a:rPr lang="en-US" sz="2000" dirty="0" smtClean="0">
@@ -4422,15 +5587,7 @@
                   <a:schemeClr val="bg1"/>
                 </a:solidFill>
               </a:rPr>
-              <a:t>http://</a:t>
-            </a:r>
-            <a:r>
-              <a:rPr lang="en-US" sz="2000" dirty="0" smtClean="0">
-                <a:solidFill>
-                  <a:schemeClr val="bg1"/>
-                </a:solidFill>
-              </a:rPr>
-              <a:t>www.martinfowler.com/eaaDev/EventAggregator.html</a:t>
+              <a:t>http://www.martinfowler.com/eaaDev/EventAggregator.html</a:t>
             </a:r>
             <a:br>
               <a:rPr lang="en-US" sz="2000" dirty="0" smtClean="0">
@@ -4498,15 +5655,7 @@
                   <a:schemeClr val="bg1"/>
                 </a:solidFill>
               </a:rPr>
-              <a:t>	http://</a:t>
-            </a:r>
-            <a:r>
-              <a:rPr lang="en-US" sz="2000" dirty="0" smtClean="0">
-                <a:solidFill>
-                  <a:schemeClr val="bg1"/>
-                </a:solidFill>
-              </a:rPr>
-              <a:t>structuremap.sourceforge.net</a:t>
+              <a:t>	http://structuremap.sourceforge.net</a:t>
             </a:r>
             <a:br>
               <a:rPr lang="en-US" sz="2000" dirty="0" smtClean="0">
@@ -4550,15 +5699,7 @@
                   <a:schemeClr val="bg1"/>
                 </a:solidFill>
               </a:rPr>
-              <a:t>	http://</a:t>
-            </a:r>
-            <a:r>
-              <a:rPr lang="en-US" sz="2000" dirty="0" smtClean="0">
-                <a:solidFill>
-                  <a:schemeClr val="bg1"/>
-                </a:solidFill>
-              </a:rPr>
-              <a:t>www.martinfowler.com/eaaCatalog/applicationController.html</a:t>
+              <a:t>	http://www.martinfowler.com/eaaCatalog/applicationController.html</a:t>
             </a:r>
             <a:br>
               <a:rPr lang="en-US" sz="2000" dirty="0" smtClean="0">
@@ -4747,7 +5888,7 @@
 </p:sld>
 </file>
 
-<file path=ppt/slides/slide18.xml><?xml version="1.0" encoding="utf-8"?>
+<file path=ppt/slides/slide21.xml><?xml version="1.0" encoding="utf-8"?>
 <p:sld xmlns:a="http://schemas.openxmlformats.org/drawingml/2006/main" xmlns:r="http://schemas.openxmlformats.org/officeDocument/2006/relationships" xmlns:p="http://schemas.openxmlformats.org/presentationml/2006/main">
   <p:cSld>
     <p:spTree>
@@ -5592,215 +6733,6 @@
 </p:sld>
 </file>
 
-<file path=ppt/slides/slide2.xml><?xml version="1.0" encoding="utf-8"?>
-<p:sld xmlns:a="http://schemas.openxmlformats.org/drawingml/2006/main" xmlns:r="http://schemas.openxmlformats.org/officeDocument/2006/relationships" xmlns:p="http://schemas.openxmlformats.org/presentationml/2006/main">
-  <p:cSld>
-    <p:spTree>
-      <p:nvGrpSpPr>
-        <p:cNvPr id="1" name=""/>
-        <p:cNvGrpSpPr/>
-        <p:nvPr/>
-      </p:nvGrpSpPr>
-      <p:grpSpPr>
-        <a:xfrm>
-          <a:off x="0" y="0"/>
-          <a:ext cx="0" cy="0"/>
-          <a:chOff x="0" y="0"/>
-          <a:chExt cx="0" cy="0"/>
-        </a:xfrm>
-      </p:grpSpPr>
-      <p:sp>
-        <p:nvSpPr>
-          <p:cNvPr id="3075" name="Text Placeholder 2"/>
-          <p:cNvSpPr>
-            <a:spLocks noGrp="1"/>
-          </p:cNvSpPr>
-          <p:nvPr>
-            <p:ph type="body" sz="quarter" idx="10"/>
-          </p:nvPr>
-        </p:nvSpPr>
-        <p:spPr>
-          <a:xfrm>
-            <a:off x="685800" y="1066800"/>
-            <a:ext cx="8229600" cy="5334000"/>
-          </a:xfrm>
-        </p:spPr>
-        <p:txBody>
-          <a:bodyPr/>
-          <a:lstStyle/>
-          <a:p>
-            <a:pPr eaLnBrk="1" hangingPunct="1">
-              <a:buNone/>
-            </a:pPr>
-            <a:r>
-              <a:rPr lang="en-US" b="1" dirty="0" smtClean="0">
-                <a:solidFill>
-                  <a:schemeClr val="accent1">
-                    <a:lumMod val="75000"/>
-                  </a:schemeClr>
-                </a:solidFill>
-              </a:rPr>
-              <a:t>Topics Covered</a:t>
-            </a:r>
-          </a:p>
-          <a:p>
-            <a:pPr eaLnBrk="1" hangingPunct="1"/>
-            <a:r>
-              <a:rPr lang="en-US" sz="2000" dirty="0" smtClean="0"/>
-              <a:t>Event Aggregator</a:t>
-            </a:r>
-          </a:p>
-          <a:p>
-            <a:pPr eaLnBrk="1" hangingPunct="1"/>
-            <a:r>
-              <a:rPr lang="en-US" sz="2000" dirty="0" smtClean="0"/>
-              <a:t>Command Pattern</a:t>
-            </a:r>
-          </a:p>
-          <a:p>
-            <a:pPr eaLnBrk="1" hangingPunct="1"/>
-            <a:r>
-              <a:rPr lang="en-US" sz="2000" dirty="0" smtClean="0"/>
-              <a:t>Application Controller</a:t>
-            </a:r>
-          </a:p>
-          <a:p>
-            <a:pPr eaLnBrk="1" hangingPunct="1"/>
-            <a:r>
-              <a:rPr lang="en-US" sz="2000" dirty="0" smtClean="0"/>
-              <a:t>Wiring Together With </a:t>
-            </a:r>
-            <a:r>
-              <a:rPr lang="en-US" sz="2000" dirty="0" err="1" smtClean="0"/>
-              <a:t>IoC</a:t>
-            </a:r>
-            <a:r>
-              <a:rPr lang="en-US" sz="2000" dirty="0" smtClean="0"/>
-              <a:t> Container</a:t>
-            </a:r>
-          </a:p>
-          <a:p>
-            <a:pPr eaLnBrk="1" hangingPunct="1"/>
-            <a:endParaRPr lang="en-US" sz="2000" dirty="0" smtClean="0"/>
-          </a:p>
-          <a:p>
-            <a:pPr eaLnBrk="1" hangingPunct="1">
-              <a:buNone/>
-            </a:pPr>
-            <a:r>
-              <a:rPr lang="en-US" b="1" dirty="0" smtClean="0">
-                <a:solidFill>
-                  <a:schemeClr val="accent1">
-                    <a:lumMod val="75000"/>
-                  </a:schemeClr>
-                </a:solidFill>
-              </a:rPr>
-              <a:t>Topics Not Covered Directly</a:t>
-            </a:r>
-          </a:p>
-          <a:p>
-            <a:pPr eaLnBrk="1" hangingPunct="1"/>
-            <a:r>
-              <a:rPr lang="en-US" sz="2000" dirty="0" smtClean="0"/>
-              <a:t>Model-View-Presenter and Other View Implementation Patterns</a:t>
-            </a:r>
-          </a:p>
-          <a:p>
-            <a:pPr eaLnBrk="1" hangingPunct="1"/>
-            <a:r>
-              <a:rPr lang="en-US" sz="2000" dirty="0" smtClean="0"/>
-              <a:t>Repository and Other Persistence Patterns</a:t>
-            </a:r>
-          </a:p>
-          <a:p>
-            <a:pPr eaLnBrk="1" hangingPunct="1"/>
-            <a:r>
-              <a:rPr lang="en-US" sz="2000" dirty="0" smtClean="0"/>
-              <a:t>Business Logic and Rules Validation Patterns</a:t>
-            </a:r>
-          </a:p>
-          <a:p>
-            <a:pPr eaLnBrk="1" hangingPunct="1"/>
-            <a:r>
-              <a:rPr lang="en-US" sz="2000" dirty="0" smtClean="0"/>
-              <a:t>User Experience Design</a:t>
-            </a:r>
-          </a:p>
-          <a:p>
-            <a:pPr eaLnBrk="1" hangingPunct="1"/>
-            <a:r>
-              <a:rPr lang="en-US" sz="2000" dirty="0" smtClean="0"/>
-              <a:t>Error Handling and Other Real-World Needs</a:t>
-            </a:r>
-          </a:p>
-          <a:p>
-            <a:pPr eaLnBrk="1" hangingPunct="1"/>
-            <a:r>
-              <a:rPr lang="en-US" sz="2000" dirty="0" smtClean="0"/>
-              <a:t>Other Best Practices </a:t>
-            </a:r>
-            <a:r>
-              <a:rPr lang="en-US" sz="2000" dirty="0" smtClean="0"/>
-              <a:t>f</a:t>
-            </a:r>
-            <a:r>
-              <a:rPr lang="en-US" sz="2000" dirty="0" smtClean="0"/>
-              <a:t>or Division of UI and Organization of Code</a:t>
-            </a:r>
-            <a:endParaRPr lang="en-US" sz="2000" dirty="0" smtClean="0"/>
-          </a:p>
-        </p:txBody>
-      </p:sp>
-      <p:sp>
-        <p:nvSpPr>
-          <p:cNvPr id="3074" name="Title 1"/>
-          <p:cNvSpPr>
-            <a:spLocks noGrp="1"/>
-          </p:cNvSpPr>
-          <p:nvPr>
-            <p:ph type="title"/>
-          </p:nvPr>
-        </p:nvSpPr>
-        <p:spPr bwMode="auto">
-          <a:noFill/>
-          <a:ln>
-            <a:miter lim="800000"/>
-            <a:headEnd/>
-            <a:tailEnd/>
-          </a:ln>
-        </p:spPr>
-        <p:txBody>
-          <a:bodyPr vert="horz" wrap="square" lIns="91440" tIns="45720" rIns="91440" bIns="45720" numCol="1" anchor="t" anchorCtr="0" compatLnSpc="1">
-            <a:prstTxWarp prst="textNoShape">
-              <a:avLst/>
-            </a:prstTxWarp>
-          </a:bodyPr>
-          <a:lstStyle/>
-          <a:p>
-            <a:pPr eaLnBrk="1" hangingPunct="1"/>
-            <a:r>
-              <a:rPr lang="en-US" dirty="0" smtClean="0"/>
-              <a:t>Topics Of This Presentation</a:t>
-            </a:r>
-            <a:endParaRPr lang="en-US" dirty="0" smtClean="0"/>
-          </a:p>
-        </p:txBody>
-      </p:sp>
-    </p:spTree>
-  </p:cSld>
-  <p:clrMapOvr>
-    <a:masterClrMapping/>
-  </p:clrMapOvr>
-  <p:timing>
-    <p:tnLst>
-      <p:par>
-        <p:cTn id="1" dur="indefinite" restart="never" nodeType="tmRoot"/>
-      </p:par>
-    </p:tnLst>
-  </p:timing>
-</p:sld>
-</file>
-
 <file path=ppt/slides/slide3.xml><?xml version="1.0" encoding="utf-8"?>
 <p:sld xmlns:a="http://schemas.openxmlformats.org/drawingml/2006/main" xmlns:r="http://schemas.openxmlformats.org/officeDocument/2006/relationships" xmlns:p="http://schemas.openxmlformats.org/presentationml/2006/main">
   <p:cSld>
@@ -5841,6 +6773,25 @@
             <a:pPr eaLnBrk="1" hangingPunct="1">
               <a:buNone/>
             </a:pPr>
+            <a:r>
+              <a:rPr lang="en-US" dirty="0" smtClean="0"/>
+              <a:t>Cohesion:</a:t>
+            </a:r>
+          </a:p>
+          <a:p>
+            <a:pPr lvl="1" eaLnBrk="1" hangingPunct="1">
+              <a:buNone/>
+            </a:pPr>
+            <a:r>
+              <a:rPr lang="en-US" sz="2000" dirty="0" smtClean="0"/>
+              <a:t>“A measure of how strongly-related and focused the various responsibilities of a software module are” - </a:t>
+            </a:r>
+            <a:r>
+              <a:rPr lang="en-US" sz="2000" dirty="0" smtClean="0">
+                <a:hlinkClick r:id="rId3"/>
+              </a:rPr>
+              <a:t>Wikipedia</a:t>
+            </a:r>
             <a:endParaRPr lang="en-US" sz="2000" dirty="0" smtClean="0"/>
           </a:p>
         </p:txBody>
@@ -5872,10 +6823,46 @@
           <a:lstStyle/>
           <a:p>
             <a:pPr eaLnBrk="1" hangingPunct="1"/>
-            <a:endParaRPr lang="en-US" dirty="0" smtClean="0"/>
-          </a:p>
-        </p:txBody>
-      </p:sp>
+            <a:r>
+              <a:rPr lang="en-US" dirty="0" smtClean="0"/>
+              <a:t>Object Oriented Principles</a:t>
+            </a:r>
+          </a:p>
+        </p:txBody>
+      </p:sp>
+      <p:pic>
+        <p:nvPicPr>
+          <p:cNvPr id="1026" name="Picture 2"/>
+          <p:cNvPicPr>
+            <a:picLocks noChangeAspect="1" noChangeArrowheads="1"/>
+          </p:cNvPicPr>
+          <p:nvPr/>
+        </p:nvPicPr>
+        <p:blipFill>
+          <a:blip r:embed="rId4"/>
+          <a:srcRect/>
+          <a:stretch>
+            <a:fillRect/>
+          </a:stretch>
+        </p:blipFill>
+        <p:spPr bwMode="auto">
+          <a:xfrm>
+            <a:off x="2428875" y="2762250"/>
+            <a:ext cx="4286250" cy="3333750"/>
+          </a:xfrm>
+          <a:prstGeom prst="rect">
+            <a:avLst/>
+          </a:prstGeom>
+          <a:noFill/>
+          <a:ln w="9525">
+            <a:noFill/>
+            <a:miter lim="800000"/>
+            <a:headEnd/>
+            <a:tailEnd/>
+          </a:ln>
+          <a:effectLst/>
+        </p:spPr>
+      </p:pic>
     </p:spTree>
   </p:cSld>
   <p:clrMapOvr>
@@ -5892,6 +6879,2308 @@
 </file>
 
 <file path=ppt/slides/slide4.xml><?xml version="1.0" encoding="utf-8"?>
+<p:sld xmlns:a="http://schemas.openxmlformats.org/drawingml/2006/main" xmlns:r="http://schemas.openxmlformats.org/officeDocument/2006/relationships" xmlns:p="http://schemas.openxmlformats.org/presentationml/2006/main">
+  <p:cSld>
+    <p:spTree>
+      <p:nvGrpSpPr>
+        <p:cNvPr id="1" name=""/>
+        <p:cNvGrpSpPr/>
+        <p:nvPr/>
+      </p:nvGrpSpPr>
+      <p:grpSpPr>
+        <a:xfrm>
+          <a:off x="0" y="0"/>
+          <a:ext cx="0" cy="0"/>
+          <a:chOff x="0" y="0"/>
+          <a:chExt cx="0" cy="0"/>
+        </a:xfrm>
+      </p:grpSpPr>
+      <p:sp>
+        <p:nvSpPr>
+          <p:cNvPr id="3075" name="Text Placeholder 2"/>
+          <p:cNvSpPr>
+            <a:spLocks noGrp="1"/>
+          </p:cNvSpPr>
+          <p:nvPr>
+            <p:ph type="body" sz="quarter" idx="10"/>
+          </p:nvPr>
+        </p:nvSpPr>
+        <p:spPr>
+          <a:xfrm>
+            <a:off x="685800" y="1066800"/>
+            <a:ext cx="8229600" cy="1219200"/>
+          </a:xfrm>
+        </p:spPr>
+        <p:txBody>
+          <a:bodyPr/>
+          <a:lstStyle/>
+          <a:p>
+            <a:pPr eaLnBrk="1" hangingPunct="1">
+              <a:buNone/>
+            </a:pPr>
+            <a:r>
+              <a:rPr lang="en-US" dirty="0" smtClean="0"/>
+              <a:t>Encapsulation:</a:t>
+            </a:r>
+          </a:p>
+          <a:p>
+            <a:pPr lvl="1" eaLnBrk="1" hangingPunct="1">
+              <a:buNone/>
+            </a:pPr>
+            <a:r>
+              <a:rPr lang="en-US" sz="2000" dirty="0" smtClean="0"/>
+              <a:t>“The hiding of </a:t>
+            </a:r>
+            <a:r>
+              <a:rPr lang="en-US" sz="2000" i="1" dirty="0" smtClean="0"/>
+              <a:t>design decisions</a:t>
+            </a:r>
+            <a:r>
+              <a:rPr lang="en-US" sz="2000" dirty="0" smtClean="0"/>
+              <a:t> in a computer program that are most likely to change” - </a:t>
+            </a:r>
+            <a:r>
+              <a:rPr lang="en-US" sz="2000" dirty="0" smtClean="0">
+                <a:hlinkClick r:id="rId3"/>
+              </a:rPr>
+              <a:t>Wikipedia</a:t>
+            </a:r>
+            <a:endParaRPr lang="en-US" sz="2000" dirty="0" smtClean="0"/>
+          </a:p>
+        </p:txBody>
+      </p:sp>
+      <p:sp>
+        <p:nvSpPr>
+          <p:cNvPr id="3074" name="Title 1"/>
+          <p:cNvSpPr>
+            <a:spLocks noGrp="1"/>
+          </p:cNvSpPr>
+          <p:nvPr>
+            <p:ph type="title"/>
+          </p:nvPr>
+        </p:nvSpPr>
+        <p:spPr bwMode="auto">
+          <a:noFill/>
+          <a:ln>
+            <a:miter lim="800000"/>
+            <a:headEnd/>
+            <a:tailEnd/>
+          </a:ln>
+        </p:spPr>
+        <p:txBody>
+          <a:bodyPr vert="horz" wrap="square" lIns="91440" tIns="45720" rIns="91440" bIns="45720" numCol="1" anchor="t" anchorCtr="0" compatLnSpc="1">
+            <a:prstTxWarp prst="textNoShape">
+              <a:avLst/>
+            </a:prstTxWarp>
+          </a:bodyPr>
+          <a:lstStyle/>
+          <a:p>
+            <a:pPr eaLnBrk="1" hangingPunct="1"/>
+            <a:r>
+              <a:rPr lang="en-US" dirty="0" smtClean="0"/>
+              <a:t>Object Oriented Principles</a:t>
+            </a:r>
+          </a:p>
+        </p:txBody>
+      </p:sp>
+      <p:grpSp>
+        <p:nvGrpSpPr>
+          <p:cNvPr id="2" name="Group 52"/>
+          <p:cNvGrpSpPr/>
+          <p:nvPr/>
+        </p:nvGrpSpPr>
+        <p:grpSpPr>
+          <a:xfrm>
+            <a:off x="1371600" y="2743200"/>
+            <a:ext cx="6400800" cy="3276600"/>
+            <a:chOff x="609600" y="2667000"/>
+            <a:chExt cx="6400800" cy="3276600"/>
+          </a:xfrm>
+          <a:scene3d>
+            <a:camera prst="perspectiveAbove"/>
+            <a:lightRig rig="threePt" dir="t"/>
+          </a:scene3d>
+        </p:grpSpPr>
+        <p:grpSp>
+          <p:nvGrpSpPr>
+            <p:cNvPr id="3" name="Group 23"/>
+            <p:cNvGrpSpPr/>
+            <p:nvPr/>
+          </p:nvGrpSpPr>
+          <p:grpSpPr>
+            <a:xfrm>
+              <a:off x="2514600" y="3886200"/>
+              <a:ext cx="2514600" cy="2057400"/>
+              <a:chOff x="3429000" y="3352800"/>
+              <a:chExt cx="2514600" cy="2057400"/>
+            </a:xfrm>
+          </p:grpSpPr>
+          <p:grpSp>
+            <p:nvGrpSpPr>
+              <p:cNvPr id="9" name="Group 22"/>
+              <p:cNvGrpSpPr/>
+              <p:nvPr/>
+            </p:nvGrpSpPr>
+            <p:grpSpPr>
+              <a:xfrm>
+                <a:off x="3429000" y="3352800"/>
+                <a:ext cx="2514600" cy="2057400"/>
+                <a:chOff x="3429000" y="3352800"/>
+                <a:chExt cx="2514600" cy="2057400"/>
+              </a:xfrm>
+            </p:grpSpPr>
+            <p:grpSp>
+              <p:nvGrpSpPr>
+                <p:cNvPr id="10" name="Group 9"/>
+                <p:cNvGrpSpPr/>
+                <p:nvPr/>
+              </p:nvGrpSpPr>
+              <p:grpSpPr>
+                <a:xfrm>
+                  <a:off x="3429000" y="3352800"/>
+                  <a:ext cx="2514600" cy="2057400"/>
+                  <a:chOff x="2286000" y="3505200"/>
+                  <a:chExt cx="2514600" cy="2057400"/>
+                </a:xfrm>
+              </p:grpSpPr>
+              <p:sp>
+                <p:nvSpPr>
+                  <p:cNvPr id="4" name="Frame 3"/>
+                  <p:cNvSpPr/>
+                  <p:nvPr/>
+                </p:nvSpPr>
+                <p:spPr>
+                  <a:xfrm>
+                    <a:off x="2286000" y="3505200"/>
+                    <a:ext cx="2514600" cy="2057400"/>
+                  </a:xfrm>
+                  <a:prstGeom prst="frame">
+                    <a:avLst/>
+                  </a:prstGeom>
+                </p:spPr>
+                <p:style>
+                  <a:lnRef idx="1">
+                    <a:schemeClr val="accent2"/>
+                  </a:lnRef>
+                  <a:fillRef idx="3">
+                    <a:schemeClr val="accent2"/>
+                  </a:fillRef>
+                  <a:effectRef idx="2">
+                    <a:schemeClr val="accent2"/>
+                  </a:effectRef>
+                  <a:fontRef idx="minor">
+                    <a:schemeClr val="lt1"/>
+                  </a:fontRef>
+                </p:style>
+                <p:txBody>
+                  <a:bodyPr rtlCol="0" anchor="ctr"/>
+                  <a:lstStyle/>
+                  <a:p>
+                    <a:pPr algn="ctr"/>
+                    <a:endParaRPr lang="en-US">
+                      <a:solidFill>
+                        <a:schemeClr val="tx1"/>
+                      </a:solidFill>
+                    </a:endParaRPr>
+                  </a:p>
+                </p:txBody>
+              </p:sp>
+              <p:sp>
+                <p:nvSpPr>
+                  <p:cNvPr id="5" name="Rectangle 4"/>
+                  <p:cNvSpPr/>
+                  <p:nvPr/>
+                </p:nvSpPr>
+                <p:spPr>
+                  <a:xfrm>
+                    <a:off x="2743200" y="3962400"/>
+                    <a:ext cx="685800" cy="457200"/>
+                  </a:xfrm>
+                  <a:prstGeom prst="rect">
+                    <a:avLst/>
+                  </a:prstGeom>
+                </p:spPr>
+                <p:style>
+                  <a:lnRef idx="2">
+                    <a:schemeClr val="dk1">
+                      <a:shade val="50000"/>
+                    </a:schemeClr>
+                  </a:lnRef>
+                  <a:fillRef idx="1">
+                    <a:schemeClr val="dk1"/>
+                  </a:fillRef>
+                  <a:effectRef idx="0">
+                    <a:schemeClr val="dk1"/>
+                  </a:effectRef>
+                  <a:fontRef idx="minor">
+                    <a:schemeClr val="lt1"/>
+                  </a:fontRef>
+                </p:style>
+                <p:txBody>
+                  <a:bodyPr rtlCol="0" anchor="ctr"/>
+                  <a:lstStyle/>
+                  <a:p>
+                    <a:pPr algn="ctr"/>
+                    <a:endParaRPr lang="en-US"/>
+                  </a:p>
+                </p:txBody>
+              </p:sp>
+              <p:sp>
+                <p:nvSpPr>
+                  <p:cNvPr id="6" name="Rectangle 5"/>
+                  <p:cNvSpPr/>
+                  <p:nvPr/>
+                </p:nvSpPr>
+                <p:spPr>
+                  <a:xfrm>
+                    <a:off x="3657600" y="3962400"/>
+                    <a:ext cx="685800" cy="457200"/>
+                  </a:xfrm>
+                  <a:prstGeom prst="rect">
+                    <a:avLst/>
+                  </a:prstGeom>
+                </p:spPr>
+                <p:style>
+                  <a:lnRef idx="2">
+                    <a:schemeClr val="dk1">
+                      <a:shade val="50000"/>
+                    </a:schemeClr>
+                  </a:lnRef>
+                  <a:fillRef idx="1">
+                    <a:schemeClr val="dk1"/>
+                  </a:fillRef>
+                  <a:effectRef idx="0">
+                    <a:schemeClr val="dk1"/>
+                  </a:effectRef>
+                  <a:fontRef idx="minor">
+                    <a:schemeClr val="lt1"/>
+                  </a:fontRef>
+                </p:style>
+                <p:txBody>
+                  <a:bodyPr rtlCol="0" anchor="ctr"/>
+                  <a:lstStyle/>
+                  <a:p>
+                    <a:pPr algn="ctr"/>
+                    <a:endParaRPr lang="en-US"/>
+                  </a:p>
+                </p:txBody>
+              </p:sp>
+              <p:sp>
+                <p:nvSpPr>
+                  <p:cNvPr id="7" name="Rectangle 6"/>
+                  <p:cNvSpPr/>
+                  <p:nvPr/>
+                </p:nvSpPr>
+                <p:spPr>
+                  <a:xfrm>
+                    <a:off x="2743200" y="4648200"/>
+                    <a:ext cx="685800" cy="457200"/>
+                  </a:xfrm>
+                  <a:prstGeom prst="rect">
+                    <a:avLst/>
+                  </a:prstGeom>
+                </p:spPr>
+                <p:style>
+                  <a:lnRef idx="2">
+                    <a:schemeClr val="dk1">
+                      <a:shade val="50000"/>
+                    </a:schemeClr>
+                  </a:lnRef>
+                  <a:fillRef idx="1">
+                    <a:schemeClr val="dk1"/>
+                  </a:fillRef>
+                  <a:effectRef idx="0">
+                    <a:schemeClr val="dk1"/>
+                  </a:effectRef>
+                  <a:fontRef idx="minor">
+                    <a:schemeClr val="lt1"/>
+                  </a:fontRef>
+                </p:style>
+                <p:txBody>
+                  <a:bodyPr rtlCol="0" anchor="ctr"/>
+                  <a:lstStyle/>
+                  <a:p>
+                    <a:pPr algn="ctr"/>
+                    <a:endParaRPr lang="en-US"/>
+                  </a:p>
+                </p:txBody>
+              </p:sp>
+              <p:sp>
+                <p:nvSpPr>
+                  <p:cNvPr id="8" name="Rectangle 7"/>
+                  <p:cNvSpPr/>
+                  <p:nvPr/>
+                </p:nvSpPr>
+                <p:spPr>
+                  <a:xfrm>
+                    <a:off x="3657600" y="4648200"/>
+                    <a:ext cx="685800" cy="457200"/>
+                  </a:xfrm>
+                  <a:prstGeom prst="rect">
+                    <a:avLst/>
+                  </a:prstGeom>
+                </p:spPr>
+                <p:style>
+                  <a:lnRef idx="2">
+                    <a:schemeClr val="dk1">
+                      <a:shade val="50000"/>
+                    </a:schemeClr>
+                  </a:lnRef>
+                  <a:fillRef idx="1">
+                    <a:schemeClr val="dk1"/>
+                  </a:fillRef>
+                  <a:effectRef idx="0">
+                    <a:schemeClr val="dk1"/>
+                  </a:effectRef>
+                  <a:fontRef idx="minor">
+                    <a:schemeClr val="lt1"/>
+                  </a:fontRef>
+                </p:style>
+                <p:txBody>
+                  <a:bodyPr rtlCol="0" anchor="ctr"/>
+                  <a:lstStyle/>
+                  <a:p>
+                    <a:pPr algn="ctr"/>
+                    <a:endParaRPr lang="en-US"/>
+                  </a:p>
+                </p:txBody>
+              </p:sp>
+            </p:grpSp>
+            <p:cxnSp>
+              <p:nvCxnSpPr>
+                <p:cNvPr id="15" name="Straight Arrow Connector 14"/>
+                <p:cNvCxnSpPr>
+                  <a:stCxn id="5" idx="3"/>
+                  <a:endCxn id="6" idx="1"/>
+                </p:cNvCxnSpPr>
+                <p:nvPr/>
+              </p:nvCxnSpPr>
+              <p:spPr>
+                <a:xfrm>
+                  <a:off x="4572000" y="4038600"/>
+                  <a:ext cx="228600" cy="1588"/>
+                </a:xfrm>
+                <a:prstGeom prst="straightConnector1">
+                  <a:avLst/>
+                </a:prstGeom>
+                <a:ln>
+                  <a:tailEnd type="arrow"/>
+                </a:ln>
+              </p:spPr>
+              <p:style>
+                <a:lnRef idx="1">
+                  <a:schemeClr val="dk1"/>
+                </a:lnRef>
+                <a:fillRef idx="0">
+                  <a:schemeClr val="dk1"/>
+                </a:fillRef>
+                <a:effectRef idx="0">
+                  <a:schemeClr val="dk1"/>
+                </a:effectRef>
+                <a:fontRef idx="minor">
+                  <a:schemeClr val="tx1"/>
+                </a:fontRef>
+              </p:style>
+            </p:cxnSp>
+            <p:cxnSp>
+              <p:nvCxnSpPr>
+                <p:cNvPr id="17" name="Straight Arrow Connector 16"/>
+                <p:cNvCxnSpPr>
+                  <a:stCxn id="5" idx="2"/>
+                  <a:endCxn id="7" idx="0"/>
+                </p:cNvCxnSpPr>
+                <p:nvPr/>
+              </p:nvCxnSpPr>
+              <p:spPr>
+                <a:xfrm rot="5400000">
+                  <a:off x="4114800" y="4381500"/>
+                  <a:ext cx="228600" cy="1588"/>
+                </a:xfrm>
+                <a:prstGeom prst="straightConnector1">
+                  <a:avLst/>
+                </a:prstGeom>
+                <a:ln>
+                  <a:tailEnd type="arrow"/>
+                </a:ln>
+              </p:spPr>
+              <p:style>
+                <a:lnRef idx="1">
+                  <a:schemeClr val="dk1"/>
+                </a:lnRef>
+                <a:fillRef idx="0">
+                  <a:schemeClr val="dk1"/>
+                </a:fillRef>
+                <a:effectRef idx="0">
+                  <a:schemeClr val="dk1"/>
+                </a:effectRef>
+                <a:fontRef idx="minor">
+                  <a:schemeClr val="tx1"/>
+                </a:fontRef>
+              </p:style>
+            </p:cxnSp>
+            <p:cxnSp>
+              <p:nvCxnSpPr>
+                <p:cNvPr id="19" name="Straight Arrow Connector 18"/>
+                <p:cNvCxnSpPr>
+                  <a:stCxn id="7" idx="3"/>
+                  <a:endCxn id="8" idx="1"/>
+                </p:cNvCxnSpPr>
+                <p:nvPr/>
+              </p:nvCxnSpPr>
+              <p:spPr>
+                <a:xfrm>
+                  <a:off x="4572000" y="4724400"/>
+                  <a:ext cx="228600" cy="1588"/>
+                </a:xfrm>
+                <a:prstGeom prst="straightConnector1">
+                  <a:avLst/>
+                </a:prstGeom>
+                <a:ln>
+                  <a:tailEnd type="arrow"/>
+                </a:ln>
+              </p:spPr>
+              <p:style>
+                <a:lnRef idx="1">
+                  <a:schemeClr val="dk1"/>
+                </a:lnRef>
+                <a:fillRef idx="0">
+                  <a:schemeClr val="dk1"/>
+                </a:fillRef>
+                <a:effectRef idx="0">
+                  <a:schemeClr val="dk1"/>
+                </a:effectRef>
+                <a:fontRef idx="minor">
+                  <a:schemeClr val="tx1"/>
+                </a:fontRef>
+              </p:style>
+            </p:cxnSp>
+            <p:cxnSp>
+              <p:nvCxnSpPr>
+                <p:cNvPr id="21" name="Straight Arrow Connector 20"/>
+                <p:cNvCxnSpPr/>
+                <p:nvPr/>
+              </p:nvCxnSpPr>
+              <p:spPr>
+                <a:xfrm rot="16200000" flipV="1">
+                  <a:off x="4572000" y="4267200"/>
+                  <a:ext cx="228600" cy="228600"/>
+                </a:xfrm>
+                <a:prstGeom prst="straightConnector1">
+                  <a:avLst/>
+                </a:prstGeom>
+                <a:ln>
+                  <a:tailEnd type="arrow"/>
+                </a:ln>
+              </p:spPr>
+              <p:style>
+                <a:lnRef idx="1">
+                  <a:schemeClr val="dk1"/>
+                </a:lnRef>
+                <a:fillRef idx="0">
+                  <a:schemeClr val="dk1"/>
+                </a:fillRef>
+                <a:effectRef idx="0">
+                  <a:schemeClr val="dk1"/>
+                </a:effectRef>
+                <a:fontRef idx="minor">
+                  <a:schemeClr val="tx1"/>
+                </a:fontRef>
+              </p:style>
+            </p:cxnSp>
+          </p:grpSp>
+          <p:sp>
+            <p:nvSpPr>
+              <p:cNvPr id="12" name="TextBox 11"/>
+              <p:cNvSpPr txBox="1"/>
+              <p:nvPr/>
+            </p:nvSpPr>
+            <p:spPr>
+              <a:xfrm>
+                <a:off x="3733800" y="3657600"/>
+                <a:ext cx="1905000" cy="1446550"/>
+              </a:xfrm>
+              <a:prstGeom prst="rect">
+                <a:avLst/>
+              </a:prstGeom>
+              <a:gradFill>
+                <a:gsLst>
+                  <a:gs pos="100000">
+                    <a:schemeClr val="accent1">
+                      <a:tint val="50000"/>
+                      <a:satMod val="300000"/>
+                      <a:alpha val="50000"/>
+                    </a:schemeClr>
+                  </a:gs>
+                  <a:gs pos="35000">
+                    <a:schemeClr val="accent1">
+                      <a:tint val="37000"/>
+                      <a:satMod val="300000"/>
+                    </a:schemeClr>
+                  </a:gs>
+                  <a:gs pos="100000">
+                    <a:schemeClr val="accent1">
+                      <a:tint val="15000"/>
+                      <a:satMod val="350000"/>
+                    </a:schemeClr>
+                  </a:gs>
+                </a:gsLst>
+              </a:gradFill>
+            </p:spPr>
+            <p:style>
+              <a:lnRef idx="1">
+                <a:schemeClr val="accent1"/>
+              </a:lnRef>
+              <a:fillRef idx="2">
+                <a:schemeClr val="accent1"/>
+              </a:fillRef>
+              <a:effectRef idx="1">
+                <a:schemeClr val="accent1"/>
+              </a:effectRef>
+              <a:fontRef idx="minor">
+                <a:schemeClr val="dk1"/>
+              </a:fontRef>
+            </p:style>
+            <p:txBody>
+              <a:bodyPr wrap="square" rtlCol="0">
+                <a:spAutoFit/>
+              </a:bodyPr>
+              <a:lstStyle/>
+              <a:p>
+                <a:pPr algn="ctr"/>
+                <a:r>
+                  <a:rPr lang="en-US" sz="8800" dirty="0" smtClean="0">
+                    <a:solidFill>
+                      <a:schemeClr val="accent2"/>
+                    </a:solidFill>
+                    <a:latin typeface="Arial" pitchFamily="34" charset="0"/>
+                    <a:cs typeface="Arial" pitchFamily="34" charset="0"/>
+                  </a:rPr>
+                  <a:t>?</a:t>
+                </a:r>
+              </a:p>
+            </p:txBody>
+          </p:sp>
+        </p:grpSp>
+        <p:sp>
+          <p:nvSpPr>
+            <p:cNvPr id="25" name="Rectangle 24"/>
+            <p:cNvSpPr/>
+            <p:nvPr/>
+          </p:nvSpPr>
+          <p:spPr>
+            <a:xfrm>
+              <a:off x="609600" y="3886200"/>
+              <a:ext cx="1447800" cy="762000"/>
+            </a:xfrm>
+            <a:prstGeom prst="rect">
+              <a:avLst/>
+            </a:prstGeom>
+          </p:spPr>
+          <p:style>
+            <a:lnRef idx="1">
+              <a:schemeClr val="accent1"/>
+            </a:lnRef>
+            <a:fillRef idx="3">
+              <a:schemeClr val="accent1"/>
+            </a:fillRef>
+            <a:effectRef idx="2">
+              <a:schemeClr val="accent1"/>
+            </a:effectRef>
+            <a:fontRef idx="minor">
+              <a:schemeClr val="lt1"/>
+            </a:fontRef>
+          </p:style>
+          <p:txBody>
+            <a:bodyPr rtlCol="0" anchor="ctr"/>
+            <a:lstStyle/>
+            <a:p>
+              <a:pPr algn="ctr"/>
+              <a:endParaRPr lang="en-US"/>
+            </a:p>
+          </p:txBody>
+        </p:sp>
+        <p:sp>
+          <p:nvSpPr>
+            <p:cNvPr id="26" name="Rectangle 25"/>
+            <p:cNvSpPr/>
+            <p:nvPr/>
+          </p:nvSpPr>
+          <p:spPr>
+            <a:xfrm>
+              <a:off x="5562600" y="3886200"/>
+              <a:ext cx="1447800" cy="762000"/>
+            </a:xfrm>
+            <a:prstGeom prst="rect">
+              <a:avLst/>
+            </a:prstGeom>
+          </p:spPr>
+          <p:style>
+            <a:lnRef idx="1">
+              <a:schemeClr val="accent1"/>
+            </a:lnRef>
+            <a:fillRef idx="3">
+              <a:schemeClr val="accent1"/>
+            </a:fillRef>
+            <a:effectRef idx="2">
+              <a:schemeClr val="accent1"/>
+            </a:effectRef>
+            <a:fontRef idx="minor">
+              <a:schemeClr val="lt1"/>
+            </a:fontRef>
+          </p:style>
+          <p:txBody>
+            <a:bodyPr rtlCol="0" anchor="ctr"/>
+            <a:lstStyle/>
+            <a:p>
+              <a:pPr algn="ctr"/>
+              <a:endParaRPr lang="en-US"/>
+            </a:p>
+          </p:txBody>
+        </p:sp>
+        <p:sp>
+          <p:nvSpPr>
+            <p:cNvPr id="27" name="Rectangle 26"/>
+            <p:cNvSpPr/>
+            <p:nvPr/>
+          </p:nvSpPr>
+          <p:spPr>
+            <a:xfrm>
+              <a:off x="3962400" y="2667000"/>
+              <a:ext cx="1447800" cy="762000"/>
+            </a:xfrm>
+            <a:prstGeom prst="rect">
+              <a:avLst/>
+            </a:prstGeom>
+          </p:spPr>
+          <p:style>
+            <a:lnRef idx="1">
+              <a:schemeClr val="accent1"/>
+            </a:lnRef>
+            <a:fillRef idx="3">
+              <a:schemeClr val="accent1"/>
+            </a:fillRef>
+            <a:effectRef idx="2">
+              <a:schemeClr val="accent1"/>
+            </a:effectRef>
+            <a:fontRef idx="minor">
+              <a:schemeClr val="lt1"/>
+            </a:fontRef>
+          </p:style>
+          <p:txBody>
+            <a:bodyPr rtlCol="0" anchor="ctr"/>
+            <a:lstStyle/>
+            <a:p>
+              <a:pPr algn="ctr"/>
+              <a:endParaRPr lang="en-US"/>
+            </a:p>
+          </p:txBody>
+        </p:sp>
+        <p:sp>
+          <p:nvSpPr>
+            <p:cNvPr id="28" name="Rectangle 27"/>
+            <p:cNvSpPr/>
+            <p:nvPr/>
+          </p:nvSpPr>
+          <p:spPr>
+            <a:xfrm>
+              <a:off x="2133600" y="2667000"/>
+              <a:ext cx="1447800" cy="762000"/>
+            </a:xfrm>
+            <a:prstGeom prst="rect">
+              <a:avLst/>
+            </a:prstGeom>
+          </p:spPr>
+          <p:style>
+            <a:lnRef idx="1">
+              <a:schemeClr val="accent1"/>
+            </a:lnRef>
+            <a:fillRef idx="3">
+              <a:schemeClr val="accent1"/>
+            </a:fillRef>
+            <a:effectRef idx="2">
+              <a:schemeClr val="accent1"/>
+            </a:effectRef>
+            <a:fontRef idx="minor">
+              <a:schemeClr val="lt1"/>
+            </a:fontRef>
+          </p:style>
+          <p:txBody>
+            <a:bodyPr rtlCol="0" anchor="ctr"/>
+            <a:lstStyle/>
+            <a:p>
+              <a:pPr algn="ctr"/>
+              <a:endParaRPr lang="en-US"/>
+            </a:p>
+          </p:txBody>
+        </p:sp>
+        <p:cxnSp>
+          <p:nvCxnSpPr>
+            <p:cNvPr id="37" name="Elbow Connector 36"/>
+            <p:cNvCxnSpPr>
+              <a:stCxn id="27" idx="2"/>
+            </p:cNvCxnSpPr>
+            <p:nvPr/>
+          </p:nvCxnSpPr>
+          <p:spPr>
+            <a:xfrm rot="5400000">
+              <a:off x="4000500" y="3200400"/>
+              <a:ext cx="457200" cy="914400"/>
+            </a:xfrm>
+            <a:prstGeom prst="bentConnector3">
+              <a:avLst>
+                <a:gd name="adj1" fmla="val 50000"/>
+              </a:avLst>
+            </a:prstGeom>
+            <a:ln>
+              <a:tailEnd type="arrow"/>
+            </a:ln>
+          </p:spPr>
+          <p:style>
+            <a:lnRef idx="1">
+              <a:schemeClr val="accent1"/>
+            </a:lnRef>
+            <a:fillRef idx="0">
+              <a:schemeClr val="accent1"/>
+            </a:fillRef>
+            <a:effectRef idx="0">
+              <a:schemeClr val="accent1"/>
+            </a:effectRef>
+            <a:fontRef idx="minor">
+              <a:schemeClr val="tx1"/>
+            </a:fontRef>
+          </p:style>
+        </p:cxnSp>
+        <p:cxnSp>
+          <p:nvCxnSpPr>
+            <p:cNvPr id="39" name="Shape 38"/>
+            <p:cNvCxnSpPr>
+              <a:stCxn id="28" idx="2"/>
+            </p:cNvCxnSpPr>
+            <p:nvPr/>
+          </p:nvCxnSpPr>
+          <p:spPr>
+            <a:xfrm rot="16200000" flipH="1">
+              <a:off x="3086100" y="3200400"/>
+              <a:ext cx="457200" cy="914400"/>
+            </a:xfrm>
+            <a:prstGeom prst="bentConnector3">
+              <a:avLst>
+                <a:gd name="adj1" fmla="val 50000"/>
+              </a:avLst>
+            </a:prstGeom>
+            <a:ln>
+              <a:tailEnd type="arrow"/>
+            </a:ln>
+          </p:spPr>
+          <p:style>
+            <a:lnRef idx="1">
+              <a:schemeClr val="accent1"/>
+            </a:lnRef>
+            <a:fillRef idx="0">
+              <a:schemeClr val="accent1"/>
+            </a:fillRef>
+            <a:effectRef idx="0">
+              <a:schemeClr val="accent1"/>
+            </a:effectRef>
+            <a:fontRef idx="minor">
+              <a:schemeClr val="tx1"/>
+            </a:fontRef>
+          </p:style>
+        </p:cxnSp>
+        <p:cxnSp>
+          <p:nvCxnSpPr>
+            <p:cNvPr id="47" name="Elbow Connector 46"/>
+            <p:cNvCxnSpPr>
+              <a:stCxn id="25" idx="3"/>
+            </p:cNvCxnSpPr>
+            <p:nvPr/>
+          </p:nvCxnSpPr>
+          <p:spPr>
+            <a:xfrm>
+              <a:off x="2057400" y="4267200"/>
+              <a:ext cx="457200" cy="571500"/>
+            </a:xfrm>
+            <a:prstGeom prst="bentConnector3">
+              <a:avLst>
+                <a:gd name="adj1" fmla="val 50000"/>
+              </a:avLst>
+            </a:prstGeom>
+            <a:ln>
+              <a:tailEnd type="arrow"/>
+            </a:ln>
+          </p:spPr>
+          <p:style>
+            <a:lnRef idx="1">
+              <a:schemeClr val="accent1"/>
+            </a:lnRef>
+            <a:fillRef idx="0">
+              <a:schemeClr val="accent1"/>
+            </a:fillRef>
+            <a:effectRef idx="0">
+              <a:schemeClr val="accent1"/>
+            </a:effectRef>
+            <a:fontRef idx="minor">
+              <a:schemeClr val="tx1"/>
+            </a:fontRef>
+          </p:style>
+        </p:cxnSp>
+        <p:cxnSp>
+          <p:nvCxnSpPr>
+            <p:cNvPr id="49" name="Elbow Connector 48"/>
+            <p:cNvCxnSpPr>
+              <a:stCxn id="26" idx="1"/>
+              <a:endCxn id="4" idx="3"/>
+            </p:cNvCxnSpPr>
+            <p:nvPr/>
+          </p:nvCxnSpPr>
+          <p:spPr>
+            <a:xfrm rot="10800000" flipV="1">
+              <a:off x="5029200" y="4267200"/>
+              <a:ext cx="533400" cy="647700"/>
+            </a:xfrm>
+            <a:prstGeom prst="bentConnector3">
+              <a:avLst>
+                <a:gd name="adj1" fmla="val 50000"/>
+              </a:avLst>
+            </a:prstGeom>
+            <a:ln>
+              <a:tailEnd type="arrow"/>
+            </a:ln>
+          </p:spPr>
+          <p:style>
+            <a:lnRef idx="1">
+              <a:schemeClr val="accent1"/>
+            </a:lnRef>
+            <a:fillRef idx="0">
+              <a:schemeClr val="accent1"/>
+            </a:fillRef>
+            <a:effectRef idx="0">
+              <a:schemeClr val="accent1"/>
+            </a:effectRef>
+            <a:fontRef idx="minor">
+              <a:schemeClr val="tx1"/>
+            </a:fontRef>
+          </p:style>
+        </p:cxnSp>
+      </p:grpSp>
+    </p:spTree>
+  </p:cSld>
+  <p:clrMapOvr>
+    <a:masterClrMapping/>
+  </p:clrMapOvr>
+  <p:timing>
+    <p:tnLst>
+      <p:par>
+        <p:cTn id="1" dur="indefinite" restart="never" nodeType="tmRoot"/>
+      </p:par>
+    </p:tnLst>
+  </p:timing>
+</p:sld>
+</file>
+
+<file path=ppt/slides/slide5.xml><?xml version="1.0" encoding="utf-8"?>
+<p:sld xmlns:a="http://schemas.openxmlformats.org/drawingml/2006/main" xmlns:r="http://schemas.openxmlformats.org/officeDocument/2006/relationships" xmlns:p="http://schemas.openxmlformats.org/presentationml/2006/main">
+  <p:cSld>
+    <p:spTree>
+      <p:nvGrpSpPr>
+        <p:cNvPr id="1" name=""/>
+        <p:cNvGrpSpPr/>
+        <p:nvPr/>
+      </p:nvGrpSpPr>
+      <p:grpSpPr>
+        <a:xfrm>
+          <a:off x="0" y="0"/>
+          <a:ext cx="0" cy="0"/>
+          <a:chOff x="0" y="0"/>
+          <a:chExt cx="0" cy="0"/>
+        </a:xfrm>
+      </p:grpSpPr>
+      <p:sp>
+        <p:nvSpPr>
+          <p:cNvPr id="3075" name="Text Placeholder 2"/>
+          <p:cNvSpPr>
+            <a:spLocks noGrp="1"/>
+          </p:cNvSpPr>
+          <p:nvPr>
+            <p:ph type="body" sz="quarter" idx="10"/>
+          </p:nvPr>
+        </p:nvSpPr>
+        <p:spPr>
+          <a:xfrm>
+            <a:off x="685800" y="1066800"/>
+            <a:ext cx="8229600" cy="1295400"/>
+          </a:xfrm>
+        </p:spPr>
+        <p:txBody>
+          <a:bodyPr/>
+          <a:lstStyle/>
+          <a:p>
+            <a:pPr eaLnBrk="1" hangingPunct="1">
+              <a:buNone/>
+            </a:pPr>
+            <a:r>
+              <a:rPr lang="en-US" dirty="0" smtClean="0"/>
+              <a:t>Coupling:</a:t>
+            </a:r>
+          </a:p>
+          <a:p>
+            <a:pPr lvl="1" eaLnBrk="1" hangingPunct="1">
+              <a:buNone/>
+            </a:pPr>
+            <a:r>
+              <a:rPr lang="en-US" sz="2000" dirty="0" smtClean="0"/>
+              <a:t>“The degree to which each program module relies on each one of the other modules” – </a:t>
+            </a:r>
+            <a:r>
+              <a:rPr lang="en-US" sz="2000" dirty="0" smtClean="0">
+                <a:hlinkClick r:id="rId3"/>
+              </a:rPr>
+              <a:t>Wikipedia</a:t>
+            </a:r>
+          </a:p>
+        </p:txBody>
+      </p:sp>
+      <p:sp>
+        <p:nvSpPr>
+          <p:cNvPr id="3074" name="Title 1"/>
+          <p:cNvSpPr>
+            <a:spLocks noGrp="1"/>
+          </p:cNvSpPr>
+          <p:nvPr>
+            <p:ph type="title"/>
+          </p:nvPr>
+        </p:nvSpPr>
+        <p:spPr bwMode="auto">
+          <a:noFill/>
+          <a:ln>
+            <a:miter lim="800000"/>
+            <a:headEnd/>
+            <a:tailEnd/>
+          </a:ln>
+        </p:spPr>
+        <p:txBody>
+          <a:bodyPr vert="horz" wrap="square" lIns="91440" tIns="45720" rIns="91440" bIns="45720" numCol="1" anchor="t" anchorCtr="0" compatLnSpc="1">
+            <a:prstTxWarp prst="textNoShape">
+              <a:avLst/>
+            </a:prstTxWarp>
+          </a:bodyPr>
+          <a:lstStyle/>
+          <a:p>
+            <a:pPr eaLnBrk="1" hangingPunct="1"/>
+            <a:r>
+              <a:rPr lang="en-US" dirty="0" smtClean="0"/>
+              <a:t>Object Oriented Principles</a:t>
+            </a:r>
+          </a:p>
+        </p:txBody>
+      </p:sp>
+      <p:grpSp>
+        <p:nvGrpSpPr>
+          <p:cNvPr id="2" name="Group 3"/>
+          <p:cNvGrpSpPr/>
+          <p:nvPr/>
+        </p:nvGrpSpPr>
+        <p:grpSpPr>
+          <a:xfrm>
+            <a:off x="1257300" y="2971800"/>
+            <a:ext cx="6629400" cy="2743200"/>
+            <a:chOff x="609600" y="3124200"/>
+            <a:chExt cx="6629400" cy="2743200"/>
+          </a:xfrm>
+          <a:scene3d>
+            <a:camera prst="perspectiveAbove"/>
+            <a:lightRig rig="threePt" dir="t"/>
+          </a:scene3d>
+        </p:grpSpPr>
+        <p:sp>
+          <p:nvSpPr>
+            <p:cNvPr id="5" name="Rectangle 4"/>
+            <p:cNvSpPr/>
+            <p:nvPr/>
+          </p:nvSpPr>
+          <p:spPr>
+            <a:xfrm>
+              <a:off x="1524000" y="3352800"/>
+              <a:ext cx="990600" cy="533400"/>
+            </a:xfrm>
+            <a:prstGeom prst="rect">
+              <a:avLst/>
+            </a:prstGeom>
+          </p:spPr>
+          <p:style>
+            <a:lnRef idx="1">
+              <a:schemeClr val="accent1"/>
+            </a:lnRef>
+            <a:fillRef idx="3">
+              <a:schemeClr val="accent1"/>
+            </a:fillRef>
+            <a:effectRef idx="2">
+              <a:schemeClr val="accent1"/>
+            </a:effectRef>
+            <a:fontRef idx="minor">
+              <a:schemeClr val="lt1"/>
+            </a:fontRef>
+          </p:style>
+          <p:txBody>
+            <a:bodyPr rtlCol="0" anchor="ctr"/>
+            <a:lstStyle/>
+            <a:p>
+              <a:pPr algn="ctr"/>
+              <a:endParaRPr lang="en-US"/>
+            </a:p>
+          </p:txBody>
+        </p:sp>
+        <p:sp>
+          <p:nvSpPr>
+            <p:cNvPr id="6" name="Rectangle 5"/>
+            <p:cNvSpPr/>
+            <p:nvPr/>
+          </p:nvSpPr>
+          <p:spPr>
+            <a:xfrm>
+              <a:off x="2667000" y="4495800"/>
+              <a:ext cx="990600" cy="533400"/>
+            </a:xfrm>
+            <a:prstGeom prst="rect">
+              <a:avLst/>
+            </a:prstGeom>
+          </p:spPr>
+          <p:style>
+            <a:lnRef idx="1">
+              <a:schemeClr val="accent2"/>
+            </a:lnRef>
+            <a:fillRef idx="3">
+              <a:schemeClr val="accent2"/>
+            </a:fillRef>
+            <a:effectRef idx="2">
+              <a:schemeClr val="accent2"/>
+            </a:effectRef>
+            <a:fontRef idx="minor">
+              <a:schemeClr val="lt1"/>
+            </a:fontRef>
+          </p:style>
+          <p:txBody>
+            <a:bodyPr rtlCol="0" anchor="ctr"/>
+            <a:lstStyle/>
+            <a:p>
+              <a:pPr algn="ctr"/>
+              <a:endParaRPr lang="en-US"/>
+            </a:p>
+          </p:txBody>
+        </p:sp>
+        <p:sp>
+          <p:nvSpPr>
+            <p:cNvPr id="7" name="Rectangle 6"/>
+            <p:cNvSpPr/>
+            <p:nvPr/>
+          </p:nvSpPr>
+          <p:spPr>
+            <a:xfrm>
+              <a:off x="3200400" y="3124200"/>
+              <a:ext cx="990600" cy="533400"/>
+            </a:xfrm>
+            <a:prstGeom prst="rect">
+              <a:avLst/>
+            </a:prstGeom>
+          </p:spPr>
+          <p:style>
+            <a:lnRef idx="1">
+              <a:schemeClr val="accent1"/>
+            </a:lnRef>
+            <a:fillRef idx="3">
+              <a:schemeClr val="accent1"/>
+            </a:fillRef>
+            <a:effectRef idx="2">
+              <a:schemeClr val="accent1"/>
+            </a:effectRef>
+            <a:fontRef idx="minor">
+              <a:schemeClr val="lt1"/>
+            </a:fontRef>
+          </p:style>
+          <p:txBody>
+            <a:bodyPr rtlCol="0" anchor="ctr"/>
+            <a:lstStyle/>
+            <a:p>
+              <a:pPr algn="ctr"/>
+              <a:endParaRPr lang="en-US"/>
+            </a:p>
+          </p:txBody>
+        </p:sp>
+        <p:sp>
+          <p:nvSpPr>
+            <p:cNvPr id="8" name="Rectangle 7"/>
+            <p:cNvSpPr/>
+            <p:nvPr/>
+          </p:nvSpPr>
+          <p:spPr>
+            <a:xfrm>
+              <a:off x="1447800" y="5181600"/>
+              <a:ext cx="990600" cy="533400"/>
+            </a:xfrm>
+            <a:prstGeom prst="rect">
+              <a:avLst/>
+            </a:prstGeom>
+          </p:spPr>
+          <p:style>
+            <a:lnRef idx="1">
+              <a:schemeClr val="accent1"/>
+            </a:lnRef>
+            <a:fillRef idx="3">
+              <a:schemeClr val="accent1"/>
+            </a:fillRef>
+            <a:effectRef idx="2">
+              <a:schemeClr val="accent1"/>
+            </a:effectRef>
+            <a:fontRef idx="minor">
+              <a:schemeClr val="lt1"/>
+            </a:fontRef>
+          </p:style>
+          <p:txBody>
+            <a:bodyPr rtlCol="0" anchor="ctr"/>
+            <a:lstStyle/>
+            <a:p>
+              <a:pPr algn="ctr"/>
+              <a:endParaRPr lang="en-US"/>
+            </a:p>
+          </p:txBody>
+        </p:sp>
+        <p:sp>
+          <p:nvSpPr>
+            <p:cNvPr id="9" name="Rectangle 8"/>
+            <p:cNvSpPr/>
+            <p:nvPr/>
+          </p:nvSpPr>
+          <p:spPr>
+            <a:xfrm>
+              <a:off x="3352800" y="5334000"/>
+              <a:ext cx="990600" cy="533400"/>
+            </a:xfrm>
+            <a:prstGeom prst="rect">
+              <a:avLst/>
+            </a:prstGeom>
+          </p:spPr>
+          <p:style>
+            <a:lnRef idx="1">
+              <a:schemeClr val="accent1"/>
+            </a:lnRef>
+            <a:fillRef idx="3">
+              <a:schemeClr val="accent1"/>
+            </a:fillRef>
+            <a:effectRef idx="2">
+              <a:schemeClr val="accent1"/>
+            </a:effectRef>
+            <a:fontRef idx="minor">
+              <a:schemeClr val="lt1"/>
+            </a:fontRef>
+          </p:style>
+          <p:txBody>
+            <a:bodyPr rtlCol="0" anchor="ctr"/>
+            <a:lstStyle/>
+            <a:p>
+              <a:pPr algn="ctr"/>
+              <a:endParaRPr lang="en-US"/>
+            </a:p>
+          </p:txBody>
+        </p:sp>
+        <p:sp>
+          <p:nvSpPr>
+            <p:cNvPr id="10" name="Rectangle 9"/>
+            <p:cNvSpPr/>
+            <p:nvPr/>
+          </p:nvSpPr>
+          <p:spPr>
+            <a:xfrm>
+              <a:off x="4038600" y="4191000"/>
+              <a:ext cx="990600" cy="533400"/>
+            </a:xfrm>
+            <a:prstGeom prst="rect">
+              <a:avLst/>
+            </a:prstGeom>
+          </p:spPr>
+          <p:style>
+            <a:lnRef idx="1">
+              <a:schemeClr val="accent1"/>
+            </a:lnRef>
+            <a:fillRef idx="3">
+              <a:schemeClr val="accent1"/>
+            </a:fillRef>
+            <a:effectRef idx="2">
+              <a:schemeClr val="accent1"/>
+            </a:effectRef>
+            <a:fontRef idx="minor">
+              <a:schemeClr val="lt1"/>
+            </a:fontRef>
+          </p:style>
+          <p:txBody>
+            <a:bodyPr rtlCol="0" anchor="ctr"/>
+            <a:lstStyle/>
+            <a:p>
+              <a:pPr algn="ctr"/>
+              <a:endParaRPr lang="en-US"/>
+            </a:p>
+          </p:txBody>
+        </p:sp>
+        <p:sp>
+          <p:nvSpPr>
+            <p:cNvPr id="11" name="Rectangle 10"/>
+            <p:cNvSpPr/>
+            <p:nvPr/>
+          </p:nvSpPr>
+          <p:spPr>
+            <a:xfrm>
+              <a:off x="5105400" y="3276600"/>
+              <a:ext cx="990600" cy="533400"/>
+            </a:xfrm>
+            <a:prstGeom prst="rect">
+              <a:avLst/>
+            </a:prstGeom>
+          </p:spPr>
+          <p:style>
+            <a:lnRef idx="1">
+              <a:schemeClr val="accent1"/>
+            </a:lnRef>
+            <a:fillRef idx="3">
+              <a:schemeClr val="accent1"/>
+            </a:fillRef>
+            <a:effectRef idx="2">
+              <a:schemeClr val="accent1"/>
+            </a:effectRef>
+            <a:fontRef idx="minor">
+              <a:schemeClr val="lt1"/>
+            </a:fontRef>
+          </p:style>
+          <p:txBody>
+            <a:bodyPr rtlCol="0" anchor="ctr"/>
+            <a:lstStyle/>
+            <a:p>
+              <a:pPr algn="ctr"/>
+              <a:endParaRPr lang="en-US"/>
+            </a:p>
+          </p:txBody>
+        </p:sp>
+        <p:sp>
+          <p:nvSpPr>
+            <p:cNvPr id="12" name="Rectangle 11"/>
+            <p:cNvSpPr/>
+            <p:nvPr/>
+          </p:nvSpPr>
+          <p:spPr>
+            <a:xfrm>
+              <a:off x="609600" y="4191000"/>
+              <a:ext cx="990600" cy="533400"/>
+            </a:xfrm>
+            <a:prstGeom prst="rect">
+              <a:avLst/>
+            </a:prstGeom>
+          </p:spPr>
+          <p:style>
+            <a:lnRef idx="1">
+              <a:schemeClr val="accent1"/>
+            </a:lnRef>
+            <a:fillRef idx="3">
+              <a:schemeClr val="accent1"/>
+            </a:fillRef>
+            <a:effectRef idx="2">
+              <a:schemeClr val="accent1"/>
+            </a:effectRef>
+            <a:fontRef idx="minor">
+              <a:schemeClr val="lt1"/>
+            </a:fontRef>
+          </p:style>
+          <p:txBody>
+            <a:bodyPr rtlCol="0" anchor="ctr"/>
+            <a:lstStyle/>
+            <a:p>
+              <a:pPr algn="ctr"/>
+              <a:endParaRPr lang="en-US"/>
+            </a:p>
+          </p:txBody>
+        </p:sp>
+        <p:sp>
+          <p:nvSpPr>
+            <p:cNvPr id="13" name="Rectangle 12"/>
+            <p:cNvSpPr/>
+            <p:nvPr/>
+          </p:nvSpPr>
+          <p:spPr>
+            <a:xfrm>
+              <a:off x="5257800" y="5181600"/>
+              <a:ext cx="990600" cy="533400"/>
+            </a:xfrm>
+            <a:prstGeom prst="rect">
+              <a:avLst/>
+            </a:prstGeom>
+          </p:spPr>
+          <p:style>
+            <a:lnRef idx="1">
+              <a:schemeClr val="accent1"/>
+            </a:lnRef>
+            <a:fillRef idx="3">
+              <a:schemeClr val="accent1"/>
+            </a:fillRef>
+            <a:effectRef idx="2">
+              <a:schemeClr val="accent1"/>
+            </a:effectRef>
+            <a:fontRef idx="minor">
+              <a:schemeClr val="lt1"/>
+            </a:fontRef>
+          </p:style>
+          <p:txBody>
+            <a:bodyPr rtlCol="0" anchor="ctr"/>
+            <a:lstStyle/>
+            <a:p>
+              <a:pPr algn="ctr"/>
+              <a:endParaRPr lang="en-US"/>
+            </a:p>
+          </p:txBody>
+        </p:sp>
+        <p:sp>
+          <p:nvSpPr>
+            <p:cNvPr id="14" name="Rectangle 13"/>
+            <p:cNvSpPr/>
+            <p:nvPr/>
+          </p:nvSpPr>
+          <p:spPr>
+            <a:xfrm>
+              <a:off x="6248400" y="4191000"/>
+              <a:ext cx="990600" cy="533400"/>
+            </a:xfrm>
+            <a:prstGeom prst="rect">
+              <a:avLst/>
+            </a:prstGeom>
+          </p:spPr>
+          <p:style>
+            <a:lnRef idx="1">
+              <a:schemeClr val="accent1"/>
+            </a:lnRef>
+            <a:fillRef idx="3">
+              <a:schemeClr val="accent1"/>
+            </a:fillRef>
+            <a:effectRef idx="2">
+              <a:schemeClr val="accent1"/>
+            </a:effectRef>
+            <a:fontRef idx="minor">
+              <a:schemeClr val="lt1"/>
+            </a:fontRef>
+          </p:style>
+          <p:txBody>
+            <a:bodyPr rtlCol="0" anchor="ctr"/>
+            <a:lstStyle/>
+            <a:p>
+              <a:pPr algn="ctr"/>
+              <a:endParaRPr lang="en-US"/>
+            </a:p>
+          </p:txBody>
+        </p:sp>
+        <p:cxnSp>
+          <p:nvCxnSpPr>
+            <p:cNvPr id="15" name="Elbow Connector 14"/>
+            <p:cNvCxnSpPr>
+              <a:stCxn id="5" idx="3"/>
+              <a:endCxn id="6" idx="0"/>
+            </p:cNvCxnSpPr>
+            <p:nvPr/>
+          </p:nvCxnSpPr>
+          <p:spPr>
+            <a:xfrm>
+              <a:off x="2514600" y="3619500"/>
+              <a:ext cx="647700" cy="876300"/>
+            </a:xfrm>
+            <a:prstGeom prst="bentConnector2">
+              <a:avLst/>
+            </a:prstGeom>
+            <a:ln>
+              <a:tailEnd type="arrow"/>
+            </a:ln>
+          </p:spPr>
+          <p:style>
+            <a:lnRef idx="1">
+              <a:schemeClr val="accent1"/>
+            </a:lnRef>
+            <a:fillRef idx="3">
+              <a:schemeClr val="accent1"/>
+            </a:fillRef>
+            <a:effectRef idx="2">
+              <a:schemeClr val="accent1"/>
+            </a:effectRef>
+            <a:fontRef idx="minor">
+              <a:schemeClr val="lt1"/>
+            </a:fontRef>
+          </p:style>
+        </p:cxnSp>
+        <p:cxnSp>
+          <p:nvCxnSpPr>
+            <p:cNvPr id="16" name="Elbow Connector 14"/>
+            <p:cNvCxnSpPr>
+              <a:stCxn id="5" idx="1"/>
+              <a:endCxn id="12" idx="0"/>
+            </p:cNvCxnSpPr>
+            <p:nvPr/>
+          </p:nvCxnSpPr>
+          <p:spPr>
+            <a:xfrm rot="10800000" flipV="1">
+              <a:off x="1104900" y="3619500"/>
+              <a:ext cx="419100" cy="571500"/>
+            </a:xfrm>
+            <a:prstGeom prst="bentConnector2">
+              <a:avLst/>
+            </a:prstGeom>
+            <a:ln>
+              <a:tailEnd type="arrow"/>
+            </a:ln>
+          </p:spPr>
+          <p:style>
+            <a:lnRef idx="1">
+              <a:schemeClr val="accent1"/>
+            </a:lnRef>
+            <a:fillRef idx="3">
+              <a:schemeClr val="accent1"/>
+            </a:fillRef>
+            <a:effectRef idx="2">
+              <a:schemeClr val="accent1"/>
+            </a:effectRef>
+            <a:fontRef idx="minor">
+              <a:schemeClr val="lt1"/>
+            </a:fontRef>
+          </p:style>
+        </p:cxnSp>
+        <p:cxnSp>
+          <p:nvCxnSpPr>
+            <p:cNvPr id="17" name="Elbow Connector 14"/>
+            <p:cNvCxnSpPr>
+              <a:stCxn id="6" idx="1"/>
+              <a:endCxn id="5" idx="2"/>
+            </p:cNvCxnSpPr>
+            <p:nvPr/>
+          </p:nvCxnSpPr>
+          <p:spPr>
+            <a:xfrm rot="10800000">
+              <a:off x="2019300" y="3886200"/>
+              <a:ext cx="647700" cy="876300"/>
+            </a:xfrm>
+            <a:prstGeom prst="bentConnector2">
+              <a:avLst/>
+            </a:prstGeom>
+            <a:ln>
+              <a:tailEnd type="arrow"/>
+            </a:ln>
+          </p:spPr>
+          <p:style>
+            <a:lnRef idx="1">
+              <a:schemeClr val="accent1"/>
+            </a:lnRef>
+            <a:fillRef idx="3">
+              <a:schemeClr val="accent1"/>
+            </a:fillRef>
+            <a:effectRef idx="2">
+              <a:schemeClr val="accent1"/>
+            </a:effectRef>
+            <a:fontRef idx="minor">
+              <a:schemeClr val="lt1"/>
+            </a:fontRef>
+          </p:style>
+        </p:cxnSp>
+        <p:cxnSp>
+          <p:nvCxnSpPr>
+            <p:cNvPr id="18" name="Elbow Connector 14"/>
+            <p:cNvCxnSpPr>
+              <a:stCxn id="7" idx="2"/>
+              <a:endCxn id="6" idx="0"/>
+            </p:cNvCxnSpPr>
+            <p:nvPr/>
+          </p:nvCxnSpPr>
+          <p:spPr>
+            <a:xfrm rot="5400000">
+              <a:off x="3009900" y="3810000"/>
+              <a:ext cx="838200" cy="533400"/>
+            </a:xfrm>
+            <a:prstGeom prst="bentConnector3">
+              <a:avLst>
+                <a:gd name="adj1" fmla="val 50000"/>
+              </a:avLst>
+            </a:prstGeom>
+            <a:ln>
+              <a:tailEnd type="arrow"/>
+            </a:ln>
+          </p:spPr>
+          <p:style>
+            <a:lnRef idx="1">
+              <a:schemeClr val="accent1"/>
+            </a:lnRef>
+            <a:fillRef idx="3">
+              <a:schemeClr val="accent1"/>
+            </a:fillRef>
+            <a:effectRef idx="2">
+              <a:schemeClr val="accent1"/>
+            </a:effectRef>
+            <a:fontRef idx="minor">
+              <a:schemeClr val="lt1"/>
+            </a:fontRef>
+          </p:style>
+        </p:cxnSp>
+        <p:cxnSp>
+          <p:nvCxnSpPr>
+            <p:cNvPr id="19" name="Elbow Connector 14"/>
+            <p:cNvCxnSpPr>
+              <a:stCxn id="10" idx="0"/>
+              <a:endCxn id="7" idx="3"/>
+            </p:cNvCxnSpPr>
+            <p:nvPr/>
+          </p:nvCxnSpPr>
+          <p:spPr>
+            <a:xfrm rot="16200000" flipV="1">
+              <a:off x="3962400" y="3619500"/>
+              <a:ext cx="800100" cy="342900"/>
+            </a:xfrm>
+            <a:prstGeom prst="bentConnector2">
+              <a:avLst/>
+            </a:prstGeom>
+            <a:ln>
+              <a:tailEnd type="arrow"/>
+            </a:ln>
+          </p:spPr>
+          <p:style>
+            <a:lnRef idx="1">
+              <a:schemeClr val="accent1"/>
+            </a:lnRef>
+            <a:fillRef idx="3">
+              <a:schemeClr val="accent1"/>
+            </a:fillRef>
+            <a:effectRef idx="2">
+              <a:schemeClr val="accent1"/>
+            </a:effectRef>
+            <a:fontRef idx="minor">
+              <a:schemeClr val="lt1"/>
+            </a:fontRef>
+          </p:style>
+        </p:cxnSp>
+        <p:cxnSp>
+          <p:nvCxnSpPr>
+            <p:cNvPr id="20" name="Elbow Connector 14"/>
+            <p:cNvCxnSpPr>
+              <a:stCxn id="8" idx="3"/>
+              <a:endCxn id="9" idx="1"/>
+            </p:cNvCxnSpPr>
+            <p:nvPr/>
+          </p:nvCxnSpPr>
+          <p:spPr>
+            <a:xfrm>
+              <a:off x="2438400" y="5448300"/>
+              <a:ext cx="914400" cy="152400"/>
+            </a:xfrm>
+            <a:prstGeom prst="bentConnector3">
+              <a:avLst>
+                <a:gd name="adj1" fmla="val 50000"/>
+              </a:avLst>
+            </a:prstGeom>
+            <a:ln>
+              <a:tailEnd type="arrow"/>
+            </a:ln>
+          </p:spPr>
+          <p:style>
+            <a:lnRef idx="1">
+              <a:schemeClr val="accent1"/>
+            </a:lnRef>
+            <a:fillRef idx="3">
+              <a:schemeClr val="accent1"/>
+            </a:fillRef>
+            <a:effectRef idx="2">
+              <a:schemeClr val="accent1"/>
+            </a:effectRef>
+            <a:fontRef idx="minor">
+              <a:schemeClr val="lt1"/>
+            </a:fontRef>
+          </p:style>
+        </p:cxnSp>
+        <p:cxnSp>
+          <p:nvCxnSpPr>
+            <p:cNvPr id="21" name="Elbow Connector 14"/>
+            <p:cNvCxnSpPr>
+              <a:stCxn id="9" idx="0"/>
+              <a:endCxn id="6" idx="2"/>
+            </p:cNvCxnSpPr>
+            <p:nvPr/>
+          </p:nvCxnSpPr>
+          <p:spPr>
+            <a:xfrm rot="16200000" flipV="1">
+              <a:off x="3352800" y="4838700"/>
+              <a:ext cx="304800" cy="685800"/>
+            </a:xfrm>
+            <a:prstGeom prst="bentConnector3">
+              <a:avLst>
+                <a:gd name="adj1" fmla="val 50000"/>
+              </a:avLst>
+            </a:prstGeom>
+            <a:ln>
+              <a:tailEnd type="arrow"/>
+            </a:ln>
+          </p:spPr>
+          <p:style>
+            <a:lnRef idx="1">
+              <a:schemeClr val="accent1"/>
+            </a:lnRef>
+            <a:fillRef idx="3">
+              <a:schemeClr val="accent1"/>
+            </a:fillRef>
+            <a:effectRef idx="2">
+              <a:schemeClr val="accent1"/>
+            </a:effectRef>
+            <a:fontRef idx="minor">
+              <a:schemeClr val="lt1"/>
+            </a:fontRef>
+          </p:style>
+        </p:cxnSp>
+        <p:cxnSp>
+          <p:nvCxnSpPr>
+            <p:cNvPr id="22" name="Elbow Connector 14"/>
+            <p:cNvCxnSpPr>
+              <a:stCxn id="12" idx="3"/>
+              <a:endCxn id="8" idx="0"/>
+            </p:cNvCxnSpPr>
+            <p:nvPr/>
+          </p:nvCxnSpPr>
+          <p:spPr>
+            <a:xfrm>
+              <a:off x="1600200" y="4457700"/>
+              <a:ext cx="342900" cy="723900"/>
+            </a:xfrm>
+            <a:prstGeom prst="bentConnector2">
+              <a:avLst/>
+            </a:prstGeom>
+            <a:ln>
+              <a:tailEnd type="arrow"/>
+            </a:ln>
+          </p:spPr>
+          <p:style>
+            <a:lnRef idx="1">
+              <a:schemeClr val="accent1"/>
+            </a:lnRef>
+            <a:fillRef idx="3">
+              <a:schemeClr val="accent1"/>
+            </a:fillRef>
+            <a:effectRef idx="2">
+              <a:schemeClr val="accent1"/>
+            </a:effectRef>
+            <a:fontRef idx="minor">
+              <a:schemeClr val="lt1"/>
+            </a:fontRef>
+          </p:style>
+        </p:cxnSp>
+        <p:cxnSp>
+          <p:nvCxnSpPr>
+            <p:cNvPr id="23" name="Elbow Connector 14"/>
+            <p:cNvCxnSpPr>
+              <a:stCxn id="6" idx="1"/>
+              <a:endCxn id="8" idx="0"/>
+            </p:cNvCxnSpPr>
+            <p:nvPr/>
+          </p:nvCxnSpPr>
+          <p:spPr>
+            <a:xfrm rot="10800000" flipV="1">
+              <a:off x="1943100" y="4762500"/>
+              <a:ext cx="723900" cy="419100"/>
+            </a:xfrm>
+            <a:prstGeom prst="bentConnector2">
+              <a:avLst/>
+            </a:prstGeom>
+            <a:ln>
+              <a:tailEnd type="arrow"/>
+            </a:ln>
+          </p:spPr>
+          <p:style>
+            <a:lnRef idx="1">
+              <a:schemeClr val="accent1"/>
+            </a:lnRef>
+            <a:fillRef idx="3">
+              <a:schemeClr val="accent1"/>
+            </a:fillRef>
+            <a:effectRef idx="2">
+              <a:schemeClr val="accent1"/>
+            </a:effectRef>
+            <a:fontRef idx="minor">
+              <a:schemeClr val="lt1"/>
+            </a:fontRef>
+          </p:style>
+        </p:cxnSp>
+        <p:cxnSp>
+          <p:nvCxnSpPr>
+            <p:cNvPr id="24" name="Elbow Connector 14"/>
+            <p:cNvCxnSpPr>
+              <a:stCxn id="10" idx="1"/>
+              <a:endCxn id="6" idx="3"/>
+            </p:cNvCxnSpPr>
+            <p:nvPr/>
+          </p:nvCxnSpPr>
+          <p:spPr>
+            <a:xfrm rot="10800000" flipV="1">
+              <a:off x="3657600" y="4457700"/>
+              <a:ext cx="381000" cy="304800"/>
+            </a:xfrm>
+            <a:prstGeom prst="bentConnector3">
+              <a:avLst>
+                <a:gd name="adj1" fmla="val 50000"/>
+              </a:avLst>
+            </a:prstGeom>
+            <a:ln>
+              <a:tailEnd type="arrow"/>
+            </a:ln>
+          </p:spPr>
+          <p:style>
+            <a:lnRef idx="1">
+              <a:schemeClr val="accent1"/>
+            </a:lnRef>
+            <a:fillRef idx="3">
+              <a:schemeClr val="accent1"/>
+            </a:fillRef>
+            <a:effectRef idx="2">
+              <a:schemeClr val="accent1"/>
+            </a:effectRef>
+            <a:fontRef idx="minor">
+              <a:schemeClr val="lt1"/>
+            </a:fontRef>
+          </p:style>
+        </p:cxnSp>
+        <p:cxnSp>
+          <p:nvCxnSpPr>
+            <p:cNvPr id="25" name="Elbow Connector 14"/>
+            <p:cNvCxnSpPr>
+              <a:stCxn id="10" idx="2"/>
+              <a:endCxn id="9" idx="3"/>
+            </p:cNvCxnSpPr>
+            <p:nvPr/>
+          </p:nvCxnSpPr>
+          <p:spPr>
+            <a:xfrm rot="5400000">
+              <a:off x="4000500" y="5067300"/>
+              <a:ext cx="876300" cy="190500"/>
+            </a:xfrm>
+            <a:prstGeom prst="bentConnector2">
+              <a:avLst/>
+            </a:prstGeom>
+            <a:ln>
+              <a:tailEnd type="arrow"/>
+            </a:ln>
+          </p:spPr>
+          <p:style>
+            <a:lnRef idx="1">
+              <a:schemeClr val="accent1"/>
+            </a:lnRef>
+            <a:fillRef idx="3">
+              <a:schemeClr val="accent1"/>
+            </a:fillRef>
+            <a:effectRef idx="2">
+              <a:schemeClr val="accent1"/>
+            </a:effectRef>
+            <a:fontRef idx="minor">
+              <a:schemeClr val="lt1"/>
+            </a:fontRef>
+          </p:style>
+        </p:cxnSp>
+        <p:cxnSp>
+          <p:nvCxnSpPr>
+            <p:cNvPr id="26" name="Elbow Connector 14"/>
+            <p:cNvCxnSpPr>
+              <a:stCxn id="13" idx="0"/>
+              <a:endCxn id="10" idx="3"/>
+            </p:cNvCxnSpPr>
+            <p:nvPr/>
+          </p:nvCxnSpPr>
+          <p:spPr>
+            <a:xfrm rot="16200000" flipV="1">
+              <a:off x="5029200" y="4457700"/>
+              <a:ext cx="723900" cy="723900"/>
+            </a:xfrm>
+            <a:prstGeom prst="bentConnector2">
+              <a:avLst/>
+            </a:prstGeom>
+            <a:ln>
+              <a:tailEnd type="arrow"/>
+            </a:ln>
+          </p:spPr>
+          <p:style>
+            <a:lnRef idx="1">
+              <a:schemeClr val="accent1"/>
+            </a:lnRef>
+            <a:fillRef idx="3">
+              <a:schemeClr val="accent1"/>
+            </a:fillRef>
+            <a:effectRef idx="2">
+              <a:schemeClr val="accent1"/>
+            </a:effectRef>
+            <a:fontRef idx="minor">
+              <a:schemeClr val="lt1"/>
+            </a:fontRef>
+          </p:style>
+        </p:cxnSp>
+        <p:cxnSp>
+          <p:nvCxnSpPr>
+            <p:cNvPr id="27" name="Elbow Connector 14"/>
+            <p:cNvCxnSpPr>
+              <a:stCxn id="11" idx="2"/>
+              <a:endCxn id="10" idx="3"/>
+            </p:cNvCxnSpPr>
+            <p:nvPr/>
+          </p:nvCxnSpPr>
+          <p:spPr>
+            <a:xfrm rot="5400000">
+              <a:off x="4991100" y="3848100"/>
+              <a:ext cx="647700" cy="571500"/>
+            </a:xfrm>
+            <a:prstGeom prst="bentConnector2">
+              <a:avLst/>
+            </a:prstGeom>
+            <a:ln>
+              <a:tailEnd type="arrow"/>
+            </a:ln>
+          </p:spPr>
+          <p:style>
+            <a:lnRef idx="1">
+              <a:schemeClr val="accent1"/>
+            </a:lnRef>
+            <a:fillRef idx="3">
+              <a:schemeClr val="accent1"/>
+            </a:fillRef>
+            <a:effectRef idx="2">
+              <a:schemeClr val="accent1"/>
+            </a:effectRef>
+            <a:fontRef idx="minor">
+              <a:schemeClr val="lt1"/>
+            </a:fontRef>
+          </p:style>
+        </p:cxnSp>
+        <p:cxnSp>
+          <p:nvCxnSpPr>
+            <p:cNvPr id="28" name="Elbow Connector 14"/>
+            <p:cNvCxnSpPr>
+              <a:stCxn id="14" idx="0"/>
+              <a:endCxn id="11" idx="3"/>
+            </p:cNvCxnSpPr>
+            <p:nvPr/>
+          </p:nvCxnSpPr>
+          <p:spPr>
+            <a:xfrm rot="16200000" flipV="1">
+              <a:off x="6096000" y="3543300"/>
+              <a:ext cx="647700" cy="647700"/>
+            </a:xfrm>
+            <a:prstGeom prst="bentConnector2">
+              <a:avLst/>
+            </a:prstGeom>
+            <a:ln>
+              <a:tailEnd type="arrow"/>
+            </a:ln>
+          </p:spPr>
+          <p:style>
+            <a:lnRef idx="1">
+              <a:schemeClr val="accent1"/>
+            </a:lnRef>
+            <a:fillRef idx="3">
+              <a:schemeClr val="accent1"/>
+            </a:fillRef>
+            <a:effectRef idx="2">
+              <a:schemeClr val="accent1"/>
+            </a:effectRef>
+            <a:fontRef idx="minor">
+              <a:schemeClr val="lt1"/>
+            </a:fontRef>
+          </p:style>
+        </p:cxnSp>
+        <p:cxnSp>
+          <p:nvCxnSpPr>
+            <p:cNvPr id="29" name="Elbow Connector 14"/>
+            <p:cNvCxnSpPr>
+              <a:stCxn id="13" idx="3"/>
+              <a:endCxn id="14" idx="2"/>
+            </p:cNvCxnSpPr>
+            <p:nvPr/>
+          </p:nvCxnSpPr>
+          <p:spPr>
+            <a:xfrm flipV="1">
+              <a:off x="6248400" y="4724400"/>
+              <a:ext cx="495300" cy="723900"/>
+            </a:xfrm>
+            <a:prstGeom prst="bentConnector2">
+              <a:avLst/>
+            </a:prstGeom>
+            <a:ln>
+              <a:tailEnd type="arrow"/>
+            </a:ln>
+          </p:spPr>
+          <p:style>
+            <a:lnRef idx="1">
+              <a:schemeClr val="accent1"/>
+            </a:lnRef>
+            <a:fillRef idx="3">
+              <a:schemeClr val="accent1"/>
+            </a:fillRef>
+            <a:effectRef idx="2">
+              <a:schemeClr val="accent1"/>
+            </a:effectRef>
+            <a:fontRef idx="minor">
+              <a:schemeClr val="lt1"/>
+            </a:fontRef>
+          </p:style>
+        </p:cxnSp>
+        <p:cxnSp>
+          <p:nvCxnSpPr>
+            <p:cNvPr id="30" name="Elbow Connector 14"/>
+            <p:cNvCxnSpPr>
+              <a:stCxn id="14" idx="1"/>
+              <a:endCxn id="10" idx="3"/>
+            </p:cNvCxnSpPr>
+            <p:nvPr/>
+          </p:nvCxnSpPr>
+          <p:spPr>
+            <a:xfrm rot="10800000">
+              <a:off x="5029200" y="4457700"/>
+              <a:ext cx="1219200" cy="1588"/>
+            </a:xfrm>
+            <a:prstGeom prst="bentConnector3">
+              <a:avLst>
+                <a:gd name="adj1" fmla="val 50000"/>
+              </a:avLst>
+            </a:prstGeom>
+            <a:ln>
+              <a:tailEnd type="arrow"/>
+            </a:ln>
+          </p:spPr>
+          <p:style>
+            <a:lnRef idx="1">
+              <a:schemeClr val="accent1"/>
+            </a:lnRef>
+            <a:fillRef idx="3">
+              <a:schemeClr val="accent1"/>
+            </a:fillRef>
+            <a:effectRef idx="2">
+              <a:schemeClr val="accent1"/>
+            </a:effectRef>
+            <a:fontRef idx="minor">
+              <a:schemeClr val="lt1"/>
+            </a:fontRef>
+          </p:style>
+        </p:cxnSp>
+        <p:cxnSp>
+          <p:nvCxnSpPr>
+            <p:cNvPr id="31" name="Elbow Connector 14"/>
+            <p:cNvCxnSpPr>
+              <a:stCxn id="14" idx="0"/>
+              <a:endCxn id="7" idx="0"/>
+            </p:cNvCxnSpPr>
+            <p:nvPr/>
+          </p:nvCxnSpPr>
+          <p:spPr>
+            <a:xfrm rot="16200000" flipV="1">
+              <a:off x="4686300" y="2133600"/>
+              <a:ext cx="1066800" cy="3048000"/>
+            </a:xfrm>
+            <a:prstGeom prst="bentConnector3">
+              <a:avLst>
+                <a:gd name="adj1" fmla="val 121429"/>
+              </a:avLst>
+            </a:prstGeom>
+            <a:ln>
+              <a:tailEnd type="arrow"/>
+            </a:ln>
+          </p:spPr>
+          <p:style>
+            <a:lnRef idx="1">
+              <a:schemeClr val="accent1"/>
+            </a:lnRef>
+            <a:fillRef idx="3">
+              <a:schemeClr val="accent1"/>
+            </a:fillRef>
+            <a:effectRef idx="2">
+              <a:schemeClr val="accent1"/>
+            </a:effectRef>
+            <a:fontRef idx="minor">
+              <a:schemeClr val="lt1"/>
+            </a:fontRef>
+          </p:style>
+        </p:cxnSp>
+        <p:cxnSp>
+          <p:nvCxnSpPr>
+            <p:cNvPr id="32" name="Elbow Connector 14"/>
+            <p:cNvCxnSpPr>
+              <a:stCxn id="9" idx="2"/>
+              <a:endCxn id="12" idx="2"/>
+            </p:cNvCxnSpPr>
+            <p:nvPr/>
+          </p:nvCxnSpPr>
+          <p:spPr>
+            <a:xfrm rot="5400000" flipH="1">
+              <a:off x="1905000" y="3924300"/>
+              <a:ext cx="1143000" cy="2743200"/>
+            </a:xfrm>
+            <a:prstGeom prst="bentConnector3">
+              <a:avLst>
+                <a:gd name="adj1" fmla="val -20000"/>
+              </a:avLst>
+            </a:prstGeom>
+            <a:ln>
+              <a:tailEnd type="arrow"/>
+            </a:ln>
+          </p:spPr>
+          <p:style>
+            <a:lnRef idx="1">
+              <a:schemeClr val="accent1"/>
+            </a:lnRef>
+            <a:fillRef idx="3">
+              <a:schemeClr val="accent1"/>
+            </a:fillRef>
+            <a:effectRef idx="2">
+              <a:schemeClr val="accent1"/>
+            </a:effectRef>
+            <a:fontRef idx="minor">
+              <a:schemeClr val="lt1"/>
+            </a:fontRef>
+          </p:style>
+        </p:cxnSp>
+        <p:cxnSp>
+          <p:nvCxnSpPr>
+            <p:cNvPr id="33" name="Elbow Connector 14"/>
+            <p:cNvCxnSpPr>
+              <a:stCxn id="9" idx="2"/>
+              <a:endCxn id="13" idx="2"/>
+            </p:cNvCxnSpPr>
+            <p:nvPr/>
+          </p:nvCxnSpPr>
+          <p:spPr>
+            <a:xfrm rot="5400000" flipH="1" flipV="1">
+              <a:off x="4724400" y="4838700"/>
+              <a:ext cx="152400" cy="1905000"/>
+            </a:xfrm>
+            <a:prstGeom prst="bentConnector3">
+              <a:avLst>
+                <a:gd name="adj1" fmla="val -150000"/>
+              </a:avLst>
+            </a:prstGeom>
+            <a:ln>
+              <a:tailEnd type="arrow"/>
+            </a:ln>
+          </p:spPr>
+          <p:style>
+            <a:lnRef idx="1">
+              <a:schemeClr val="accent1"/>
+            </a:lnRef>
+            <a:fillRef idx="3">
+              <a:schemeClr val="accent1"/>
+            </a:fillRef>
+            <a:effectRef idx="2">
+              <a:schemeClr val="accent1"/>
+            </a:effectRef>
+            <a:fontRef idx="minor">
+              <a:schemeClr val="lt1"/>
+            </a:fontRef>
+          </p:style>
+        </p:cxnSp>
+        <p:cxnSp>
+          <p:nvCxnSpPr>
+            <p:cNvPr id="34" name="Elbow Connector 14"/>
+            <p:cNvCxnSpPr>
+              <a:stCxn id="13" idx="1"/>
+              <a:endCxn id="9" idx="3"/>
+            </p:cNvCxnSpPr>
+            <p:nvPr/>
+          </p:nvCxnSpPr>
+          <p:spPr>
+            <a:xfrm rot="10800000" flipV="1">
+              <a:off x="4343400" y="5448300"/>
+              <a:ext cx="914400" cy="152400"/>
+            </a:xfrm>
+            <a:prstGeom prst="bentConnector3">
+              <a:avLst>
+                <a:gd name="adj1" fmla="val 50000"/>
+              </a:avLst>
+            </a:prstGeom>
+            <a:ln>
+              <a:tailEnd type="arrow"/>
+            </a:ln>
+          </p:spPr>
+          <p:style>
+            <a:lnRef idx="1">
+              <a:schemeClr val="accent1"/>
+            </a:lnRef>
+            <a:fillRef idx="3">
+              <a:schemeClr val="accent1"/>
+            </a:fillRef>
+            <a:effectRef idx="2">
+              <a:schemeClr val="accent1"/>
+            </a:effectRef>
+            <a:fontRef idx="minor">
+              <a:schemeClr val="lt1"/>
+            </a:fontRef>
+          </p:style>
+        </p:cxnSp>
+        <p:cxnSp>
+          <p:nvCxnSpPr>
+            <p:cNvPr id="35" name="Elbow Connector 14"/>
+            <p:cNvCxnSpPr>
+              <a:stCxn id="14" idx="3"/>
+              <a:endCxn id="13" idx="2"/>
+            </p:cNvCxnSpPr>
+            <p:nvPr/>
+          </p:nvCxnSpPr>
+          <p:spPr>
+            <a:xfrm flipH="1">
+              <a:off x="5753100" y="4457700"/>
+              <a:ext cx="1485900" cy="1257300"/>
+            </a:xfrm>
+            <a:prstGeom prst="bentConnector4">
+              <a:avLst>
+                <a:gd name="adj1" fmla="val -15385"/>
+                <a:gd name="adj2" fmla="val 118182"/>
+              </a:avLst>
+            </a:prstGeom>
+            <a:ln>
+              <a:tailEnd type="arrow"/>
+            </a:ln>
+          </p:spPr>
+          <p:style>
+            <a:lnRef idx="1">
+              <a:schemeClr val="accent1"/>
+            </a:lnRef>
+            <a:fillRef idx="3">
+              <a:schemeClr val="accent1"/>
+            </a:fillRef>
+            <a:effectRef idx="2">
+              <a:schemeClr val="accent1"/>
+            </a:effectRef>
+            <a:fontRef idx="minor">
+              <a:schemeClr val="lt1"/>
+            </a:fontRef>
+          </p:style>
+        </p:cxnSp>
+        <p:cxnSp>
+          <p:nvCxnSpPr>
+            <p:cNvPr id="36" name="Elbow Connector 14"/>
+            <p:cNvCxnSpPr>
+              <a:stCxn id="11" idx="1"/>
+              <a:endCxn id="7" idx="3"/>
+            </p:cNvCxnSpPr>
+            <p:nvPr/>
+          </p:nvCxnSpPr>
+          <p:spPr>
+            <a:xfrm rot="10800000">
+              <a:off x="4191000" y="3390900"/>
+              <a:ext cx="914400" cy="152400"/>
+            </a:xfrm>
+            <a:prstGeom prst="bentConnector3">
+              <a:avLst>
+                <a:gd name="adj1" fmla="val 50000"/>
+              </a:avLst>
+            </a:prstGeom>
+            <a:ln>
+              <a:tailEnd type="arrow"/>
+            </a:ln>
+          </p:spPr>
+          <p:style>
+            <a:lnRef idx="1">
+              <a:schemeClr val="accent1"/>
+            </a:lnRef>
+            <a:fillRef idx="3">
+              <a:schemeClr val="accent1"/>
+            </a:fillRef>
+            <a:effectRef idx="2">
+              <a:schemeClr val="accent1"/>
+            </a:effectRef>
+            <a:fontRef idx="minor">
+              <a:schemeClr val="lt1"/>
+            </a:fontRef>
+          </p:style>
+        </p:cxnSp>
+        <p:cxnSp>
+          <p:nvCxnSpPr>
+            <p:cNvPr id="37" name="Elbow Connector 14"/>
+            <p:cNvCxnSpPr>
+              <a:stCxn id="5" idx="0"/>
+              <a:endCxn id="11" idx="0"/>
+            </p:cNvCxnSpPr>
+            <p:nvPr/>
+          </p:nvCxnSpPr>
+          <p:spPr>
+            <a:xfrm rot="5400000" flipH="1" flipV="1">
+              <a:off x="3771900" y="1524000"/>
+              <a:ext cx="76200" cy="3581400"/>
+            </a:xfrm>
+            <a:prstGeom prst="bentConnector3">
+              <a:avLst>
+                <a:gd name="adj1" fmla="val 481554"/>
+              </a:avLst>
+            </a:prstGeom>
+            <a:ln>
+              <a:tailEnd type="arrow"/>
+            </a:ln>
+          </p:spPr>
+          <p:style>
+            <a:lnRef idx="1">
+              <a:schemeClr val="accent1"/>
+            </a:lnRef>
+            <a:fillRef idx="3">
+              <a:schemeClr val="accent1"/>
+            </a:fillRef>
+            <a:effectRef idx="2">
+              <a:schemeClr val="accent1"/>
+            </a:effectRef>
+            <a:fontRef idx="minor">
+              <a:schemeClr val="lt1"/>
+            </a:fontRef>
+          </p:style>
+        </p:cxnSp>
+        <p:cxnSp>
+          <p:nvCxnSpPr>
+            <p:cNvPr id="38" name="Elbow Connector 14"/>
+            <p:cNvCxnSpPr>
+              <a:stCxn id="7" idx="0"/>
+              <a:endCxn id="12" idx="1"/>
+            </p:cNvCxnSpPr>
+            <p:nvPr/>
+          </p:nvCxnSpPr>
+          <p:spPr>
+            <a:xfrm rot="16200000" flipH="1" flipV="1">
+              <a:off x="1485900" y="2247900"/>
+              <a:ext cx="1333500" cy="3086100"/>
+            </a:xfrm>
+            <a:prstGeom prst="bentConnector4">
+              <a:avLst>
+                <a:gd name="adj1" fmla="val -17143"/>
+                <a:gd name="adj2" fmla="val 107407"/>
+              </a:avLst>
+            </a:prstGeom>
+            <a:ln>
+              <a:tailEnd type="arrow"/>
+            </a:ln>
+          </p:spPr>
+          <p:style>
+            <a:lnRef idx="1">
+              <a:schemeClr val="accent1"/>
+            </a:lnRef>
+            <a:fillRef idx="3">
+              <a:schemeClr val="accent1"/>
+            </a:fillRef>
+            <a:effectRef idx="2">
+              <a:schemeClr val="accent1"/>
+            </a:effectRef>
+            <a:fontRef idx="minor">
+              <a:schemeClr val="lt1"/>
+            </a:fontRef>
+          </p:style>
+        </p:cxnSp>
+      </p:grpSp>
+    </p:spTree>
+  </p:cSld>
+  <p:clrMapOvr>
+    <a:masterClrMapping/>
+  </p:clrMapOvr>
+  <p:timing>
+    <p:tnLst>
+      <p:par>
+        <p:cTn id="1" dur="indefinite" restart="never" nodeType="tmRoot"/>
+      </p:par>
+    </p:tnLst>
+  </p:timing>
+</p:sld>
+</file>
+
+<file path=ppt/slides/slide6.xml><?xml version="1.0" encoding="utf-8"?>
 <p:sld xmlns:a="http://schemas.openxmlformats.org/drawingml/2006/main" xmlns:r="http://schemas.openxmlformats.org/officeDocument/2006/relationships" xmlns:p="http://schemas.openxmlformats.org/presentationml/2006/main">
   <p:cSld>
     <p:spTree>
@@ -6228,7 +9517,7 @@
 </p:sld>
 </file>
 
-<file path=ppt/slides/slide5.xml><?xml version="1.0" encoding="utf-8"?>
+<file path=ppt/slides/slide7.xml><?xml version="1.0" encoding="utf-8"?>
 <p:sld xmlns:a="http://schemas.openxmlformats.org/drawingml/2006/main" xmlns:r="http://schemas.openxmlformats.org/officeDocument/2006/relationships" xmlns:p="http://schemas.openxmlformats.org/presentationml/2006/main">
   <p:cSld>
     <p:spTree>
@@ -6268,6 +9557,10 @@
             <a:pPr eaLnBrk="1" hangingPunct="1">
               <a:buNone/>
             </a:pPr>
+            <a:r>
+              <a:rPr lang="en-US" sz="2000" dirty="0" smtClean="0"/>
+              <a:t>The Main Form</a:t>
+            </a:r>
             <a:endParaRPr lang="en-US" sz="2000" dirty="0" smtClean="0"/>
           </a:p>
         </p:txBody>
@@ -6299,6 +9592,10 @@
           <a:lstStyle/>
           <a:p>
             <a:pPr eaLnBrk="1" hangingPunct="1"/>
+            <a:r>
+              <a:rPr lang="en-US" dirty="0" smtClean="0"/>
+              <a:t>Simple Org Chart</a:t>
+            </a:r>
             <a:endParaRPr lang="en-US" dirty="0" smtClean="0"/>
           </a:p>
         </p:txBody>
@@ -6320,7 +9617,7 @@
         </p:blipFill>
         <p:spPr bwMode="auto">
           <a:xfrm>
-            <a:off x="2514600" y="1676400"/>
+            <a:off x="2428875" y="1819275"/>
             <a:ext cx="4286251" cy="4048125"/>
           </a:xfrm>
           <a:prstGeom prst="rect">
@@ -6329,238 +9626,6 @@
           <a:noFill/>
         </p:spPr>
       </p:pic>
-    </p:spTree>
-  </p:cSld>
-  <p:clrMapOvr>
-    <a:masterClrMapping/>
-  </p:clrMapOvr>
-  <p:timing>
-    <p:tnLst>
-      <p:par>
-        <p:cTn id="1" dur="indefinite" restart="never" nodeType="tmRoot"/>
-      </p:par>
-    </p:tnLst>
-  </p:timing>
-</p:sld>
-</file>
-
-<file path=ppt/slides/slide6.xml><?xml version="1.0" encoding="utf-8"?>
-<p:sld xmlns:a="http://schemas.openxmlformats.org/drawingml/2006/main" xmlns:r="http://schemas.openxmlformats.org/officeDocument/2006/relationships" xmlns:p="http://schemas.openxmlformats.org/presentationml/2006/main">
-  <p:cSld>
-    <p:spTree>
-      <p:nvGrpSpPr>
-        <p:cNvPr id="1" name=""/>
-        <p:cNvGrpSpPr/>
-        <p:nvPr/>
-      </p:nvGrpSpPr>
-      <p:grpSpPr>
-        <a:xfrm>
-          <a:off x="0" y="0"/>
-          <a:ext cx="0" cy="0"/>
-          <a:chOff x="0" y="0"/>
-          <a:chExt cx="0" cy="0"/>
-        </a:xfrm>
-      </p:grpSpPr>
-      <p:sp>
-        <p:nvSpPr>
-          <p:cNvPr id="3075" name="Text Placeholder 2"/>
-          <p:cNvSpPr>
-            <a:spLocks noGrp="1"/>
-          </p:cNvSpPr>
-          <p:nvPr>
-            <p:ph type="body" sz="quarter" idx="10"/>
-          </p:nvPr>
-        </p:nvSpPr>
-        <p:spPr>
-          <a:xfrm>
-            <a:off x="685800" y="1066800"/>
-            <a:ext cx="8229600" cy="1219200"/>
-          </a:xfrm>
-        </p:spPr>
-        <p:txBody>
-          <a:bodyPr/>
-          <a:lstStyle/>
-          <a:p>
-            <a:pPr eaLnBrk="1" hangingPunct="1">
-              <a:buNone/>
-            </a:pPr>
-            <a:endParaRPr lang="en-US" sz="2000" dirty="0" smtClean="0"/>
-          </a:p>
-        </p:txBody>
-      </p:sp>
-      <p:sp>
-        <p:nvSpPr>
-          <p:cNvPr id="3074" name="Title 1"/>
-          <p:cNvSpPr>
-            <a:spLocks noGrp="1"/>
-          </p:cNvSpPr>
-          <p:nvPr>
-            <p:ph type="title"/>
-          </p:nvPr>
-        </p:nvSpPr>
-        <p:spPr bwMode="auto">
-          <a:noFill/>
-          <a:ln>
-            <a:miter lim="800000"/>
-            <a:headEnd/>
-            <a:tailEnd/>
-          </a:ln>
-        </p:spPr>
-        <p:txBody>
-          <a:bodyPr vert="horz" wrap="square" lIns="91440" tIns="45720" rIns="91440" bIns="45720" numCol="1" anchor="t" anchorCtr="0" compatLnSpc="1">
-            <a:prstTxWarp prst="textNoShape">
-              <a:avLst/>
-            </a:prstTxWarp>
-          </a:bodyPr>
-          <a:lstStyle/>
-          <a:p>
-            <a:pPr eaLnBrk="1" hangingPunct="1"/>
-            <a:endParaRPr lang="en-US" dirty="0" smtClean="0"/>
-          </a:p>
-        </p:txBody>
-      </p:sp>
-      <p:pic>
-        <p:nvPicPr>
-          <p:cNvPr id="4" name="Picture 3" descr="X:\Derick-GitHub\Presentation And Training Material\Decoupling Workflow With App Controler\doc\New Employee - Info.png"/>
-          <p:cNvPicPr>
-            <a:picLocks noChangeAspect="1" noChangeArrowheads="1"/>
-          </p:cNvPicPr>
-          <p:nvPr/>
-        </p:nvPicPr>
-        <p:blipFill>
-          <a:blip r:embed="rId3"/>
-          <a:srcRect/>
-          <a:stretch>
-            <a:fillRect/>
-          </a:stretch>
-        </p:blipFill>
-        <p:spPr bwMode="auto">
-          <a:xfrm>
-            <a:off x="304800" y="1828800"/>
-            <a:ext cx="4286250" cy="2257425"/>
-          </a:xfrm>
-          <a:prstGeom prst="rect">
-            <a:avLst/>
-          </a:prstGeom>
-          <a:noFill/>
-        </p:spPr>
-      </p:pic>
-      <p:pic>
-        <p:nvPicPr>
-          <p:cNvPr id="5" name="Picture 4" descr="X:\Derick-GitHub\Presentation And Training Material\Decoupling Workflow With App Controler\doc\New Employee - Manager.png"/>
-          <p:cNvPicPr>
-            <a:picLocks noChangeAspect="1" noChangeArrowheads="1"/>
-          </p:cNvPicPr>
-          <p:nvPr/>
-        </p:nvPicPr>
-        <p:blipFill>
-          <a:blip r:embed="rId4"/>
-          <a:srcRect/>
-          <a:stretch>
-            <a:fillRect/>
-          </a:stretch>
-        </p:blipFill>
-        <p:spPr bwMode="auto">
-          <a:xfrm>
-            <a:off x="3352800" y="4343400"/>
-            <a:ext cx="4286250" cy="1771650"/>
-          </a:xfrm>
-          <a:prstGeom prst="rect">
-            <a:avLst/>
-          </a:prstGeom>
-          <a:noFill/>
-        </p:spPr>
-      </p:pic>
-    </p:spTree>
-  </p:cSld>
-  <p:clrMapOvr>
-    <a:masterClrMapping/>
-  </p:clrMapOvr>
-  <p:timing>
-    <p:tnLst>
-      <p:par>
-        <p:cTn id="1" dur="indefinite" restart="never" nodeType="tmRoot"/>
-      </p:par>
-    </p:tnLst>
-  </p:timing>
-</p:sld>
-</file>
-
-<file path=ppt/slides/slide7.xml><?xml version="1.0" encoding="utf-8"?>
-<p:sld xmlns:a="http://schemas.openxmlformats.org/drawingml/2006/main" xmlns:r="http://schemas.openxmlformats.org/officeDocument/2006/relationships" xmlns:p="http://schemas.openxmlformats.org/presentationml/2006/main">
-  <p:cSld>
-    <p:spTree>
-      <p:nvGrpSpPr>
-        <p:cNvPr id="1" name=""/>
-        <p:cNvGrpSpPr/>
-        <p:nvPr/>
-      </p:nvGrpSpPr>
-      <p:grpSpPr>
-        <a:xfrm>
-          <a:off x="0" y="0"/>
-          <a:ext cx="0" cy="0"/>
-          <a:chOff x="0" y="0"/>
-          <a:chExt cx="0" cy="0"/>
-        </a:xfrm>
-      </p:grpSpPr>
-      <p:sp>
-        <p:nvSpPr>
-          <p:cNvPr id="3075" name="Text Placeholder 2"/>
-          <p:cNvSpPr>
-            <a:spLocks noGrp="1"/>
-          </p:cNvSpPr>
-          <p:nvPr>
-            <p:ph type="body" sz="quarter" idx="10"/>
-          </p:nvPr>
-        </p:nvSpPr>
-        <p:spPr>
-          <a:xfrm>
-            <a:off x="685800" y="1066800"/>
-            <a:ext cx="8229600" cy="1219200"/>
-          </a:xfrm>
-        </p:spPr>
-        <p:txBody>
-          <a:bodyPr/>
-          <a:lstStyle/>
-          <a:p>
-            <a:pPr eaLnBrk="1" hangingPunct="1">
-              <a:buNone/>
-            </a:pPr>
-            <a:endParaRPr lang="en-US" sz="2000" dirty="0" smtClean="0"/>
-          </a:p>
-        </p:txBody>
-      </p:sp>
-      <p:sp>
-        <p:nvSpPr>
-          <p:cNvPr id="3074" name="Title 1"/>
-          <p:cNvSpPr>
-            <a:spLocks noGrp="1"/>
-          </p:cNvSpPr>
-          <p:nvPr>
-            <p:ph type="title"/>
-          </p:nvPr>
-        </p:nvSpPr>
-        <p:spPr bwMode="auto">
-          <a:noFill/>
-          <a:ln>
-            <a:miter lim="800000"/>
-            <a:headEnd/>
-            <a:tailEnd/>
-          </a:ln>
-        </p:spPr>
-        <p:txBody>
-          <a:bodyPr vert="horz" wrap="square" lIns="91440" tIns="45720" rIns="91440" bIns="45720" numCol="1" anchor="t" anchorCtr="0" compatLnSpc="1">
-            <a:prstTxWarp prst="textNoShape">
-              <a:avLst/>
-            </a:prstTxWarp>
-          </a:bodyPr>
-          <a:lstStyle/>
-          <a:p>
-            <a:pPr eaLnBrk="1" hangingPunct="1"/>
-            <a:endParaRPr lang="en-US" dirty="0" smtClean="0"/>
-          </a:p>
-        </p:txBody>
-      </p:sp>
     </p:spTree>
   </p:cSld>
   <p:clrMapOvr>
@@ -6595,196 +9660,75 @@
       </p:grpSpPr>
       <p:sp>
         <p:nvSpPr>
-          <p:cNvPr id="4" name="Rectangle 3"/>
-          <p:cNvSpPr/>
-          <p:nvPr/>
+          <p:cNvPr id="3075" name="Text Placeholder 2"/>
+          <p:cNvSpPr>
+            <a:spLocks noGrp="1"/>
+          </p:cNvSpPr>
+          <p:nvPr>
+            <p:ph type="body" sz="quarter" idx="10"/>
+          </p:nvPr>
         </p:nvSpPr>
         <p:spPr>
           <a:xfrm>
-            <a:off x="0" y="0"/>
-            <a:ext cx="9144000" cy="4648200"/>
+            <a:off x="685800" y="1066800"/>
+            <a:ext cx="8229600" cy="1219200"/>
           </a:xfrm>
-          <a:prstGeom prst="rect">
-            <a:avLst/>
-          </a:prstGeom>
-          <a:solidFill>
-            <a:srgbClr val="0069AA"/>
-          </a:solidFill>
+        </p:spPr>
+        <p:txBody>
+          <a:bodyPr/>
+          <a:lstStyle/>
+          <a:p>
+            <a:pPr eaLnBrk="1" hangingPunct="1">
+              <a:buNone/>
+            </a:pPr>
+            <a:r>
+              <a:rPr lang="en-US" sz="2000" dirty="0" smtClean="0"/>
+              <a:t>The Main Form’s Parts</a:t>
+            </a:r>
+            <a:endParaRPr lang="en-US" sz="2000" dirty="0" smtClean="0"/>
+          </a:p>
+        </p:txBody>
+      </p:sp>
+      <p:sp>
+        <p:nvSpPr>
+          <p:cNvPr id="3074" name="Title 1"/>
+          <p:cNvSpPr>
+            <a:spLocks noGrp="1"/>
+          </p:cNvSpPr>
+          <p:nvPr>
+            <p:ph type="title"/>
+          </p:nvPr>
+        </p:nvSpPr>
+        <p:spPr bwMode="auto">
+          <a:noFill/>
           <a:ln>
-            <a:noFill/>
-          </a:ln>
-        </p:spPr>
-        <p:style>
-          <a:lnRef idx="2">
-            <a:schemeClr val="accent1">
-              <a:shade val="50000"/>
-            </a:schemeClr>
-          </a:lnRef>
-          <a:fillRef idx="1">
-            <a:schemeClr val="accent1"/>
-          </a:fillRef>
-          <a:effectRef idx="0">
-            <a:schemeClr val="accent1"/>
-          </a:effectRef>
-          <a:fontRef idx="minor">
-            <a:schemeClr val="lt1"/>
-          </a:fontRef>
-        </p:style>
-        <p:txBody>
-          <a:bodyPr anchor="ctr"/>
-          <a:lstStyle/>
-          <a:p>
-            <a:pPr algn="ctr">
-              <a:defRPr/>
-            </a:pPr>
-            <a:endParaRPr lang="en-US"/>
-          </a:p>
-        </p:txBody>
-      </p:sp>
-      <p:pic>
-        <p:nvPicPr>
-          <p:cNvPr id="4099" name="Picture 4" descr="MAT logo 1 CMYK"/>
-          <p:cNvPicPr>
-            <a:picLocks noChangeAspect="1" noChangeArrowheads="1"/>
-          </p:cNvPicPr>
-          <p:nvPr/>
-        </p:nvPicPr>
-        <p:blipFill>
-          <a:blip r:embed="rId2">
-            <a:clrChange>
-              <a:clrFrom>
-                <a:srgbClr val="FDFDFD"/>
-              </a:clrFrom>
-              <a:clrTo>
-                <a:srgbClr val="FDFDFD">
-                  <a:alpha val="0"/>
-                </a:srgbClr>
-              </a:clrTo>
-            </a:clrChange>
-          </a:blip>
-          <a:srcRect/>
-          <a:stretch>
-            <a:fillRect/>
-          </a:stretch>
-        </p:blipFill>
-        <p:spPr bwMode="auto">
-          <a:xfrm>
-            <a:off x="2971800" y="4800600"/>
-            <a:ext cx="2819400" cy="1338263"/>
-          </a:xfrm>
-          <a:prstGeom prst="rect">
-            <a:avLst/>
-          </a:prstGeom>
-          <a:noFill/>
-          <a:ln w="9525">
-            <a:noFill/>
             <a:miter lim="800000"/>
             <a:headEnd/>
             <a:tailEnd/>
           </a:ln>
         </p:spPr>
-      </p:pic>
-      <p:sp>
-        <p:nvSpPr>
-          <p:cNvPr id="5" name="Rectangle 4"/>
-          <p:cNvSpPr/>
-          <p:nvPr/>
-        </p:nvSpPr>
-        <p:spPr>
-          <a:xfrm>
-            <a:off x="0" y="4724400"/>
-            <a:ext cx="9144000" cy="2133600"/>
-          </a:xfrm>
-          <a:prstGeom prst="rect">
-            <a:avLst/>
-          </a:prstGeom>
-          <a:solidFill>
-            <a:srgbClr val="E31937"/>
-          </a:solidFill>
-          <a:ln>
-            <a:noFill/>
-          </a:ln>
-        </p:spPr>
-        <p:style>
-          <a:lnRef idx="2">
-            <a:schemeClr val="accent1">
-              <a:shade val="50000"/>
-            </a:schemeClr>
-          </a:lnRef>
-          <a:fillRef idx="1">
-            <a:schemeClr val="accent1"/>
-          </a:fillRef>
-          <a:effectRef idx="0">
-            <a:schemeClr val="accent1"/>
-          </a:effectRef>
-          <a:fontRef idx="minor">
-            <a:schemeClr val="lt1"/>
-          </a:fontRef>
-        </p:style>
-        <p:txBody>
-          <a:bodyPr anchor="ctr"/>
+        <p:txBody>
+          <a:bodyPr vert="horz" wrap="square" lIns="91440" tIns="45720" rIns="91440" bIns="45720" numCol="1" anchor="t" anchorCtr="0" compatLnSpc="1">
+            <a:prstTxWarp prst="textNoShape">
+              <a:avLst/>
+            </a:prstTxWarp>
+          </a:bodyPr>
           <a:lstStyle/>
           <a:p>
-            <a:pPr algn="ctr">
-              <a:defRPr/>
-            </a:pPr>
-            <a:endParaRPr lang="en-US"/>
-          </a:p>
-        </p:txBody>
-      </p:sp>
-      <p:sp>
-        <p:nvSpPr>
-          <p:cNvPr id="10" name="Rectangle 9"/>
-          <p:cNvSpPr/>
-          <p:nvPr/>
-        </p:nvSpPr>
-        <p:spPr bwMode="auto">
-          <a:xfrm>
-            <a:off x="228600" y="0"/>
-            <a:ext cx="104775" cy="2325688"/>
-          </a:xfrm>
-          <a:prstGeom prst="rect">
-            <a:avLst/>
-          </a:prstGeom>
-          <a:solidFill>
-            <a:srgbClr val="E31937"/>
-          </a:solidFill>
-          <a:ln>
-            <a:noFill/>
-          </a:ln>
-        </p:spPr>
-        <p:style>
-          <a:lnRef idx="2">
-            <a:schemeClr val="accent1">
-              <a:shade val="50000"/>
-            </a:schemeClr>
-          </a:lnRef>
-          <a:fillRef idx="1">
-            <a:schemeClr val="accent1"/>
-          </a:fillRef>
-          <a:effectRef idx="0">
-            <a:schemeClr val="accent1"/>
-          </a:effectRef>
-          <a:fontRef idx="minor">
-            <a:schemeClr val="lt1"/>
-          </a:fontRef>
-        </p:style>
-        <p:txBody>
-          <a:bodyPr anchor="ctr"/>
-          <a:lstStyle/>
-          <a:p>
-            <a:pPr algn="ctr">
-              <a:defRPr/>
-            </a:pPr>
-            <a:endParaRPr lang="en-US"/>
+            <a:pPr eaLnBrk="1" hangingPunct="1"/>
+            <a:r>
+              <a:rPr lang="en-US" dirty="0" smtClean="0"/>
+              <a:t>Simple Org Chart</a:t>
+            </a:r>
+            <a:endParaRPr lang="en-US" dirty="0" smtClean="0"/>
           </a:p>
         </p:txBody>
       </p:sp>
       <p:pic>
         <p:nvPicPr>
-          <p:cNvPr id="4103" name="Picture 7" descr="MAT logo vertical_red.emf"/>
+          <p:cNvPr id="7" name="Picture 3" descr="X:\Derick-GitHub\Presentation And Training Material\Decoupling Workflow With App Controler\doc\Org Chart View - Org Chart Panel.png"/>
           <p:cNvPicPr>
-            <a:picLocks noChangeAspect="1"/>
+            <a:picLocks noChangeAspect="1" noChangeArrowheads="1"/>
           </p:cNvPicPr>
           <p:nvPr/>
         </p:nvPicPr>
@@ -6797,107 +9741,47 @@
         </p:blipFill>
         <p:spPr bwMode="auto">
           <a:xfrm>
-            <a:off x="3600450" y="5334000"/>
-            <a:ext cx="1981200" cy="969963"/>
-          </a:xfrm>
-          <a:prstGeom prst="rect">
-            <a:avLst/>
-          </a:prstGeom>
-          <a:noFill/>
-          <a:ln w="9525">
-            <a:noFill/>
-            <a:miter lim="800000"/>
-            <a:headEnd/>
-            <a:tailEnd/>
-          </a:ln>
-        </p:spPr>
-      </p:pic>
-      <p:sp>
-        <p:nvSpPr>
-          <p:cNvPr id="9" name="TextBox 8"/>
-          <p:cNvSpPr txBox="1"/>
-          <p:nvPr/>
-        </p:nvSpPr>
-        <p:spPr>
-          <a:xfrm>
-            <a:off x="381000" y="1447800"/>
-            <a:ext cx="8610600" cy="646331"/>
+            <a:off x="1104899" y="1828800"/>
+            <a:ext cx="4286251" cy="4048125"/>
           </a:xfrm>
           <a:prstGeom prst="rect">
             <a:avLst/>
           </a:prstGeom>
           <a:noFill/>
         </p:spPr>
-        <p:txBody>
-          <a:bodyPr>
-            <a:spAutoFit/>
-          </a:bodyPr>
-          <a:lstStyle/>
-          <a:p>
-            <a:pPr>
-              <a:defRPr/>
-            </a:pPr>
-            <a:r>
-              <a:rPr lang="en-US" sz="3600" spc="60" dirty="0" smtClean="0">
-                <a:solidFill>
-                  <a:schemeClr val="bg1"/>
-                </a:solidFill>
-                <a:latin typeface="Calibri" pitchFamily="34" charset="0"/>
-              </a:rPr>
-              <a:t>(Section Header)</a:t>
-            </a:r>
-            <a:endParaRPr lang="en-US" sz="3600" spc="60" dirty="0">
-              <a:solidFill>
-                <a:schemeClr val="bg1"/>
-              </a:solidFill>
-              <a:latin typeface="Calibri" pitchFamily="34" charset="0"/>
-            </a:endParaRPr>
-          </a:p>
-        </p:txBody>
-      </p:sp>
-      <p:sp>
-        <p:nvSpPr>
-          <p:cNvPr id="11" name="TextBox 10"/>
-          <p:cNvSpPr txBox="1"/>
+      </p:pic>
+      <p:pic>
+        <p:nvPicPr>
+          <p:cNvPr id="2050" name="Picture 2" descr="X:\Derick-GitHub\Presentation And Training Material\Decoupling Workflow With App Controler\doc\Org Chart View - Employee Info Panel.png"/>
+          <p:cNvPicPr>
+            <a:picLocks noChangeAspect="1" noChangeArrowheads="1"/>
+          </p:cNvPicPr>
           <p:nvPr/>
-        </p:nvSpPr>
-        <p:spPr>
+        </p:nvPicPr>
+        <p:blipFill>
+          <a:blip r:embed="rId4"/>
+          <a:srcRect/>
+          <a:stretch>
+            <a:fillRect/>
+          </a:stretch>
+        </p:blipFill>
+        <p:spPr bwMode="auto">
           <a:xfrm>
-            <a:off x="381000" y="2057400"/>
-            <a:ext cx="7543800" cy="338554"/>
+            <a:off x="4533899" y="4267200"/>
+            <a:ext cx="4000501" cy="952500"/>
           </a:xfrm>
           <a:prstGeom prst="rect">
             <a:avLst/>
           </a:prstGeom>
-          <a:noFill/>
+          <a:ln w="38100">
+            <a:solidFill>
+              <a:schemeClr val="accent2"/>
+            </a:solidFill>
+            <a:prstDash val="sysDash"/>
+          </a:ln>
+          <a:effectLst/>
         </p:spPr>
-        <p:txBody>
-          <a:bodyPr wrap="square">
-            <a:spAutoFit/>
-          </a:bodyPr>
-          <a:lstStyle/>
-          <a:p>
-            <a:pPr>
-              <a:defRPr/>
-            </a:pPr>
-            <a:r>
-              <a:rPr lang="en-US" sz="1600" dirty="0" smtClean="0">
-                <a:solidFill>
-                  <a:schemeClr val="bg1"/>
-                </a:solidFill>
-                <a:latin typeface="+mn-lt"/>
-              </a:rPr>
-              <a:t>(section sub title)</a:t>
-            </a:r>
-            <a:endParaRPr lang="en-US" sz="1600" dirty="0">
-              <a:solidFill>
-                <a:schemeClr val="bg1"/>
-              </a:solidFill>
-              <a:latin typeface="+mn-lt"/>
-            </a:endParaRPr>
-          </a:p>
-        </p:txBody>
-      </p:sp>
+      </p:pic>
     </p:spTree>
   </p:cSld>
   <p:clrMapOvr>
@@ -6953,7 +9837,10 @@
             <a:pPr eaLnBrk="1" hangingPunct="1">
               <a:buNone/>
             </a:pPr>
-            <a:endParaRPr lang="en-US" sz="2000" dirty="0" smtClean="0"/>
+            <a:r>
+              <a:rPr lang="en-US" sz="2000" dirty="0" smtClean="0"/>
+              <a:t>Add New Employee Workflow</a:t>
+            </a:r>
           </a:p>
         </p:txBody>
       </p:sp>
@@ -6984,7 +9871,110 @@
           <a:lstStyle/>
           <a:p>
             <a:pPr eaLnBrk="1" hangingPunct="1"/>
+            <a:r>
+              <a:rPr lang="en-US" dirty="0" smtClean="0"/>
+              <a:t>Simple Org Chart</a:t>
+            </a:r>
+            <a:br>
+              <a:rPr lang="en-US" dirty="0" smtClean="0"/>
+            </a:br>
             <a:endParaRPr lang="en-US" dirty="0" smtClean="0"/>
+          </a:p>
+        </p:txBody>
+      </p:sp>
+      <p:pic>
+        <p:nvPicPr>
+          <p:cNvPr id="4" name="Picture 3" descr="X:\Derick-GitHub\Presentation And Training Material\Decoupling Workflow With App Controler\doc\New Employee - Info.png"/>
+          <p:cNvPicPr>
+            <a:picLocks noChangeAspect="1" noChangeArrowheads="1"/>
+          </p:cNvPicPr>
+          <p:nvPr/>
+        </p:nvPicPr>
+        <p:blipFill>
+          <a:blip r:embed="rId3"/>
+          <a:srcRect/>
+          <a:stretch>
+            <a:fillRect/>
+          </a:stretch>
+        </p:blipFill>
+        <p:spPr bwMode="auto">
+          <a:xfrm>
+            <a:off x="742950" y="1752600"/>
+            <a:ext cx="4286250" cy="2257425"/>
+          </a:xfrm>
+          <a:prstGeom prst="rect">
+            <a:avLst/>
+          </a:prstGeom>
+          <a:noFill/>
+        </p:spPr>
+      </p:pic>
+      <p:pic>
+        <p:nvPicPr>
+          <p:cNvPr id="5" name="Picture 4" descr="X:\Derick-GitHub\Presentation And Training Material\Decoupling Workflow With App Controler\doc\New Employee - Manager.png"/>
+          <p:cNvPicPr>
+            <a:picLocks noChangeAspect="1" noChangeArrowheads="1"/>
+          </p:cNvPicPr>
+          <p:nvPr/>
+        </p:nvPicPr>
+        <p:blipFill>
+          <a:blip r:embed="rId4"/>
+          <a:srcRect/>
+          <a:stretch>
+            <a:fillRect/>
+          </a:stretch>
+        </p:blipFill>
+        <p:spPr bwMode="auto">
+          <a:xfrm>
+            <a:off x="4495800" y="4419600"/>
+            <a:ext cx="4286250" cy="1771650"/>
+          </a:xfrm>
+          <a:prstGeom prst="rect">
+            <a:avLst/>
+          </a:prstGeom>
+          <a:noFill/>
+        </p:spPr>
+      </p:pic>
+      <p:sp>
+        <p:nvSpPr>
+          <p:cNvPr id="6" name="Arc 5"/>
+          <p:cNvSpPr/>
+          <p:nvPr/>
+        </p:nvSpPr>
+        <p:spPr>
+          <a:xfrm>
+            <a:off x="3581400" y="3505200"/>
+            <a:ext cx="2209800" cy="2209800"/>
+          </a:xfrm>
+          <a:prstGeom prst="arc">
+            <a:avLst>
+              <a:gd name="adj1" fmla="val 16231089"/>
+              <a:gd name="adj2" fmla="val 0"/>
+            </a:avLst>
+          </a:prstGeom>
+          <a:ln>
+            <a:tailEnd type="triangle"/>
+          </a:ln>
+        </p:spPr>
+        <p:style>
+          <a:lnRef idx="3">
+            <a:schemeClr val="accent2"/>
+          </a:lnRef>
+          <a:fillRef idx="0">
+            <a:schemeClr val="accent2"/>
+          </a:fillRef>
+          <a:effectRef idx="2">
+            <a:schemeClr val="accent2"/>
+          </a:effectRef>
+          <a:fontRef idx="minor">
+            <a:schemeClr val="tx1"/>
+          </a:fontRef>
+        </p:style>
+        <p:txBody>
+          <a:bodyPr rtlCol="0" anchor="ctr"/>
+          <a:lstStyle/>
+          <a:p>
+            <a:pPr algn="ctr"/>
+            <a:endParaRPr lang="en-US"/>
           </a:p>
         </p:txBody>
       </p:sp>
@@ -7869,6 +10859,21 @@
 </file>
 
 <file path=customXml/item1.xml><?xml version="1.0" encoding="utf-8"?>
+<p:properties xmlns:p="http://schemas.microsoft.com/office/2006/metadata/properties" xmlns:xsi="http://www.w3.org/2001/XMLSchema-instance">
+  <documentManagement/>
+</p:properties>
+</file>
+
+<file path=customXml/item2.xml><?xml version="1.0" encoding="utf-8"?>
+<?mso-contentType ?>
+<FormTemplates xmlns="http://schemas.microsoft.com/sharepoint/v3/contenttype/forms">
+  <Display>DocumentLibraryForm</Display>
+  <Edit>DocumentLibraryForm</Edit>
+  <New>DocumentLibraryForm</New>
+</FormTemplates>
+</file>
+
+<file path=customXml/item3.xml><?xml version="1.0" encoding="utf-8"?>
 <ct:contentTypeSchema xmlns:ct="http://schemas.microsoft.com/office/2006/metadata/contentType" xmlns:ma="http://schemas.microsoft.com/office/2006/metadata/properties/metaAttributes" ct:_="" ma:_="" ma:contentTypeName="Document" ma:contentTypeID="0x0101005857B3975182FB47B67FAAA67052062C" ma:contentTypeVersion="0" ma:contentTypeDescription="Create a new document." ma:contentTypeScope="" ma:versionID="a1781edd533abf786dc62ee7dded643a">
   <xsd:schema xmlns:xsd="http://www.w3.org/2001/XMLSchema" xmlns:p="http://schemas.microsoft.com/office/2006/metadata/properties" targetNamespace="http://schemas.microsoft.com/office/2006/metadata/properties" ma:root="true" ma:fieldsID="4aeb20c0e3442673af7ee10786458764">
     <xsd:element name="properties">
@@ -7917,32 +10922,10 @@
 </ct:contentTypeSchema>
 </file>
 
-<file path=customXml/item2.xml><?xml version="1.0" encoding="utf-8"?>
-<?mso-contentType ?>
-<FormTemplates xmlns="http://schemas.microsoft.com/sharepoint/v3/contenttype/forms">
-  <Display>DocumentLibraryForm</Display>
-  <Edit>DocumentLibraryForm</Edit>
-  <New>DocumentLibraryForm</New>
-</FormTemplates>
-</file>
-
-<file path=customXml/item3.xml><?xml version="1.0" encoding="utf-8"?>
-<p:properties xmlns:p="http://schemas.microsoft.com/office/2006/metadata/properties" xmlns:xsi="http://www.w3.org/2001/XMLSchema-instance">
-  <documentManagement/>
-</p:properties>
-</file>
-
 <file path=customXml/itemProps1.xml><?xml version="1.0" encoding="utf-8"?>
-<ds:datastoreItem xmlns:ds="http://schemas.openxmlformats.org/officeDocument/2006/customXml" ds:itemID="{D3EBC05E-93E3-47EC-A4AA-B305F2941009}">
+<ds:datastoreItem xmlns:ds="http://schemas.openxmlformats.org/officeDocument/2006/customXml" ds:itemID="{F8AADC7F-5DC4-46F2-A809-0679B041C012}">
   <ds:schemaRefs>
-    <ds:schemaRef ds:uri="http://schemas.microsoft.com/office/2006/metadata/contentType"/>
-    <ds:schemaRef ds:uri="http://schemas.microsoft.com/office/2006/metadata/properties/metaAttributes"/>
-    <ds:schemaRef ds:uri="http://www.w3.org/2001/XMLSchema"/>
     <ds:schemaRef ds:uri="http://schemas.microsoft.com/office/2006/metadata/properties"/>
-    <ds:schemaRef ds:uri="http://schemas.openxmlformats.org/package/2006/metadata/core-properties"/>
-    <ds:schemaRef ds:uri="http://purl.org/dc/elements/1.1/"/>
-    <ds:schemaRef ds:uri="http://purl.org/dc/terms/"/>
-    <ds:schemaRef ds:uri="http://schemas.microsoft.com/office/internal/2005/internalDocumentation"/>
   </ds:schemaRefs>
 </ds:datastoreItem>
 </file>
@@ -7956,9 +10939,16 @@
 </file>
 
 <file path=customXml/itemProps3.xml><?xml version="1.0" encoding="utf-8"?>
-<ds:datastoreItem xmlns:ds="http://schemas.openxmlformats.org/officeDocument/2006/customXml" ds:itemID="{F8AADC7F-5DC4-46F2-A809-0679B041C012}">
+<ds:datastoreItem xmlns:ds="http://schemas.openxmlformats.org/officeDocument/2006/customXml" ds:itemID="{D3EBC05E-93E3-47EC-A4AA-B305F2941009}">
   <ds:schemaRefs>
+    <ds:schemaRef ds:uri="http://schemas.microsoft.com/office/2006/metadata/contentType"/>
+    <ds:schemaRef ds:uri="http://schemas.microsoft.com/office/2006/metadata/properties/metaAttributes"/>
+    <ds:schemaRef ds:uri="http://www.w3.org/2001/XMLSchema"/>
     <ds:schemaRef ds:uri="http://schemas.microsoft.com/office/2006/metadata/properties"/>
+    <ds:schemaRef ds:uri="http://schemas.openxmlformats.org/package/2006/metadata/core-properties"/>
+    <ds:schemaRef ds:uri="http://purl.org/dc/elements/1.1/"/>
+    <ds:schemaRef ds:uri="http://purl.org/dc/terms/"/>
+    <ds:schemaRef ds:uri="http://schemas.microsoft.com/office/internal/2005/internalDocumentation"/>
   </ds:schemaRefs>
 </ds:datastoreItem>
 </file>
</xml_diff>

<commit_message>
fleshing out some more of the presentation outline and parts of the 'v1' demo code slides
</commit_message>
<xml_diff>
--- a/Decoupling Workflow With App Controler/Decoupling Workflow From Forms.pptx
+++ b/Decoupling Workflow With App Controler/Decoupling Workflow From Forms.pptx
@@ -5,10 +5,10 @@
     <p:sldMasterId id="2147483822" r:id="rId4"/>
   </p:sldMasterIdLst>
   <p:notesMasterIdLst>
-    <p:notesMasterId r:id="rId26"/>
+    <p:notesMasterId r:id="rId29"/>
   </p:notesMasterIdLst>
   <p:handoutMasterIdLst>
-    <p:handoutMasterId r:id="rId27"/>
+    <p:handoutMasterId r:id="rId30"/>
   </p:handoutMasterIdLst>
   <p:sldIdLst>
     <p:sldId id="256" r:id="rId5"/>
@@ -30,18 +30,21 @@
     <p:sldId id="276" r:id="rId21"/>
     <p:sldId id="277" r:id="rId22"/>
     <p:sldId id="284" r:id="rId23"/>
-    <p:sldId id="259" r:id="rId24"/>
-    <p:sldId id="274" r:id="rId25"/>
+    <p:sldId id="292" r:id="rId24"/>
+    <p:sldId id="293" r:id="rId25"/>
+    <p:sldId id="294" r:id="rId26"/>
+    <p:sldId id="259" r:id="rId27"/>
+    <p:sldId id="274" r:id="rId28"/>
   </p:sldIdLst>
   <p:sldSz cx="9144000" cy="6858000" type="screen4x3"/>
   <p:notesSz cx="7010400" cy="9296400"/>
   <p:embeddedFontLst>
     <p:embeddedFont>
       <p:font typeface="Calibri" pitchFamily="34" charset="0"/>
-      <p:regular r:id="rId28"/>
-      <p:bold r:id="rId29"/>
-      <p:italic r:id="rId30"/>
-      <p:boldItalic r:id="rId31"/>
+      <p:regular r:id="rId31"/>
+      <p:bold r:id="rId32"/>
+      <p:italic r:id="rId33"/>
+      <p:boldItalic r:id="rId34"/>
     </p:embeddedFont>
   </p:embeddedFontLst>
   <p:defaultTextStyle>
@@ -1254,6 +1257,180 @@
                 <a:defRPr/>
               </a:pPr>
               <a:t>19</a:t>
+            </a:fld>
+            <a:endParaRPr lang="en-US"/>
+          </a:p>
+        </p:txBody>
+      </p:sp>
+    </p:spTree>
+  </p:cSld>
+  <p:clrMapOvr>
+    <a:masterClrMapping/>
+  </p:clrMapOvr>
+</p:notes>
+</file>
+
+<file path=ppt/notesSlides/notesSlide15.xml><?xml version="1.0" encoding="utf-8"?>
+<p:notes xmlns:a="http://schemas.openxmlformats.org/drawingml/2006/main" xmlns:r="http://schemas.openxmlformats.org/officeDocument/2006/relationships" xmlns:p="http://schemas.openxmlformats.org/presentationml/2006/main">
+  <p:cSld>
+    <p:spTree>
+      <p:nvGrpSpPr>
+        <p:cNvPr id="1" name=""/>
+        <p:cNvGrpSpPr/>
+        <p:nvPr/>
+      </p:nvGrpSpPr>
+      <p:grpSpPr>
+        <a:xfrm>
+          <a:off x="0" y="0"/>
+          <a:ext cx="0" cy="0"/>
+          <a:chOff x="0" y="0"/>
+          <a:chExt cx="0" cy="0"/>
+        </a:xfrm>
+      </p:grpSpPr>
+      <p:sp>
+        <p:nvSpPr>
+          <p:cNvPr id="2" name="Slide Image Placeholder 1"/>
+          <p:cNvSpPr>
+            <a:spLocks noGrp="1" noRot="1" noChangeAspect="1"/>
+          </p:cNvSpPr>
+          <p:nvPr>
+            <p:ph type="sldImg"/>
+          </p:nvPr>
+        </p:nvSpPr>
+        <p:spPr/>
+      </p:sp>
+      <p:sp>
+        <p:nvSpPr>
+          <p:cNvPr id="3" name="Notes Placeholder 2"/>
+          <p:cNvSpPr>
+            <a:spLocks noGrp="1"/>
+          </p:cNvSpPr>
+          <p:nvPr>
+            <p:ph type="body" idx="1"/>
+          </p:nvPr>
+        </p:nvSpPr>
+        <p:spPr/>
+        <p:txBody>
+          <a:bodyPr>
+            <a:normAutofit/>
+          </a:bodyPr>
+          <a:lstStyle/>
+          <a:p>
+            <a:endParaRPr lang="en-US" dirty="0"/>
+          </a:p>
+        </p:txBody>
+      </p:sp>
+      <p:sp>
+        <p:nvSpPr>
+          <p:cNvPr id="4" name="Slide Number Placeholder 3"/>
+          <p:cNvSpPr>
+            <a:spLocks noGrp="1"/>
+          </p:cNvSpPr>
+          <p:nvPr>
+            <p:ph type="sldNum" sz="quarter" idx="10"/>
+          </p:nvPr>
+        </p:nvSpPr>
+        <p:spPr/>
+        <p:txBody>
+          <a:bodyPr/>
+          <a:lstStyle/>
+          <a:p>
+            <a:pPr>
+              <a:defRPr/>
+            </a:pPr>
+            <a:fld id="{1931C8FD-CC35-423B-99F4-64D81D6A80AE}" type="slidenum">
+              <a:rPr lang="en-US" smtClean="0"/>
+              <a:pPr>
+                <a:defRPr/>
+              </a:pPr>
+              <a:t>21</a:t>
+            </a:fld>
+            <a:endParaRPr lang="en-US"/>
+          </a:p>
+        </p:txBody>
+      </p:sp>
+    </p:spTree>
+  </p:cSld>
+  <p:clrMapOvr>
+    <a:masterClrMapping/>
+  </p:clrMapOvr>
+</p:notes>
+</file>
+
+<file path=ppt/notesSlides/notesSlide16.xml><?xml version="1.0" encoding="utf-8"?>
+<p:notes xmlns:a="http://schemas.openxmlformats.org/drawingml/2006/main" xmlns:r="http://schemas.openxmlformats.org/officeDocument/2006/relationships" xmlns:p="http://schemas.openxmlformats.org/presentationml/2006/main">
+  <p:cSld>
+    <p:spTree>
+      <p:nvGrpSpPr>
+        <p:cNvPr id="1" name=""/>
+        <p:cNvGrpSpPr/>
+        <p:nvPr/>
+      </p:nvGrpSpPr>
+      <p:grpSpPr>
+        <a:xfrm>
+          <a:off x="0" y="0"/>
+          <a:ext cx="0" cy="0"/>
+          <a:chOff x="0" y="0"/>
+          <a:chExt cx="0" cy="0"/>
+        </a:xfrm>
+      </p:grpSpPr>
+      <p:sp>
+        <p:nvSpPr>
+          <p:cNvPr id="2" name="Slide Image Placeholder 1"/>
+          <p:cNvSpPr>
+            <a:spLocks noGrp="1" noRot="1" noChangeAspect="1"/>
+          </p:cNvSpPr>
+          <p:nvPr>
+            <p:ph type="sldImg"/>
+          </p:nvPr>
+        </p:nvSpPr>
+        <p:spPr/>
+      </p:sp>
+      <p:sp>
+        <p:nvSpPr>
+          <p:cNvPr id="3" name="Notes Placeholder 2"/>
+          <p:cNvSpPr>
+            <a:spLocks noGrp="1"/>
+          </p:cNvSpPr>
+          <p:nvPr>
+            <p:ph type="body" idx="1"/>
+          </p:nvPr>
+        </p:nvSpPr>
+        <p:spPr/>
+        <p:txBody>
+          <a:bodyPr>
+            <a:normAutofit/>
+          </a:bodyPr>
+          <a:lstStyle/>
+          <a:p>
+            <a:endParaRPr lang="en-US" dirty="0"/>
+          </a:p>
+        </p:txBody>
+      </p:sp>
+      <p:sp>
+        <p:nvSpPr>
+          <p:cNvPr id="4" name="Slide Number Placeholder 3"/>
+          <p:cNvSpPr>
+            <a:spLocks noGrp="1"/>
+          </p:cNvSpPr>
+          <p:nvPr>
+            <p:ph type="sldNum" sz="quarter" idx="10"/>
+          </p:nvPr>
+        </p:nvSpPr>
+        <p:spPr/>
+        <p:txBody>
+          <a:bodyPr/>
+          <a:lstStyle/>
+          <a:p>
+            <a:pPr>
+              <a:defRPr/>
+            </a:pPr>
+            <a:fld id="{1931C8FD-CC35-423B-99F4-64D81D6A80AE}" type="slidenum">
+              <a:rPr lang="en-US" smtClean="0"/>
+              <a:pPr>
+                <a:defRPr/>
+              </a:pPr>
+              <a:t>22</a:t>
             </a:fld>
             <a:endParaRPr lang="en-US"/>
           </a:p>
@@ -3772,7 +3949,6 @@
               <a:rPr lang="en-US" sz="2000" dirty="0" smtClean="0"/>
               <a:t>Tightly Coupled Workflow: Form Knows About Form, Presenter, and More</a:t>
             </a:r>
-            <a:endParaRPr lang="en-US" sz="2000" dirty="0" smtClean="0"/>
           </a:p>
         </p:txBody>
       </p:sp>
@@ -3807,7 +3983,6 @@
               <a:rPr lang="en-US" dirty="0" smtClean="0"/>
               <a:t>Simple Org Chart – v1</a:t>
             </a:r>
-            <a:endParaRPr lang="en-US" dirty="0" smtClean="0"/>
           </a:p>
         </p:txBody>
       </p:sp>
@@ -4012,6 +4187,10 @@
             <a:pPr eaLnBrk="1" hangingPunct="1">
               <a:buNone/>
             </a:pPr>
+            <a:r>
+              <a:rPr lang="en-US" sz="2000" dirty="0" smtClean="0"/>
+              <a:t>Tightly Coupled Presentation Logic: One Presenter Knows About Another</a:t>
+            </a:r>
             <a:endParaRPr lang="en-US" sz="2000" dirty="0" smtClean="0"/>
           </a:p>
         </p:txBody>
@@ -4043,10 +4222,371 @@
           <a:lstStyle/>
           <a:p>
             <a:pPr eaLnBrk="1" hangingPunct="1"/>
+            <a:r>
+              <a:rPr lang="en-US" dirty="0" smtClean="0"/>
+              <a:t>Simple Org Chart – v1</a:t>
+            </a:r>
             <a:endParaRPr lang="en-US" dirty="0" smtClean="0"/>
           </a:p>
         </p:txBody>
       </p:sp>
+      <p:grpSp>
+        <p:nvGrpSpPr>
+          <p:cNvPr id="23" name="Group 22"/>
+          <p:cNvGrpSpPr/>
+          <p:nvPr/>
+        </p:nvGrpSpPr>
+        <p:grpSpPr>
+          <a:xfrm>
+            <a:off x="904875" y="1819275"/>
+            <a:ext cx="8010525" cy="4048125"/>
+            <a:chOff x="904875" y="1819275"/>
+            <a:chExt cx="8010525" cy="4048125"/>
+          </a:xfrm>
+        </p:grpSpPr>
+        <p:grpSp>
+          <p:nvGrpSpPr>
+            <p:cNvPr id="15" name="Group 14"/>
+            <p:cNvGrpSpPr/>
+            <p:nvPr/>
+          </p:nvGrpSpPr>
+          <p:grpSpPr>
+            <a:xfrm>
+              <a:off x="904875" y="1819275"/>
+              <a:ext cx="8010525" cy="4048125"/>
+              <a:chOff x="904875" y="1819275"/>
+              <a:chExt cx="8010525" cy="4048125"/>
+            </a:xfrm>
+          </p:grpSpPr>
+          <p:pic>
+            <p:nvPicPr>
+              <p:cNvPr id="6" name="Picture 2" descr="X:\Derick-GitHub\Presentation And Training Material\Decoupling Workflow With App Controler\doc\Org Chart View.png"/>
+              <p:cNvPicPr>
+                <a:picLocks noChangeAspect="1" noChangeArrowheads="1"/>
+              </p:cNvPicPr>
+              <p:nvPr/>
+            </p:nvPicPr>
+            <p:blipFill>
+              <a:blip r:embed="rId3"/>
+              <a:srcRect/>
+              <a:stretch>
+                <a:fillRect/>
+              </a:stretch>
+            </p:blipFill>
+            <p:spPr bwMode="auto">
+              <a:xfrm>
+                <a:off x="904875" y="1819275"/>
+                <a:ext cx="4286251" cy="4048125"/>
+              </a:xfrm>
+              <a:prstGeom prst="rect">
+                <a:avLst/>
+              </a:prstGeom>
+              <a:noFill/>
+            </p:spPr>
+          </p:pic>
+          <p:cxnSp>
+            <p:nvCxnSpPr>
+              <p:cNvPr id="8" name="Straight Connector 7"/>
+              <p:cNvCxnSpPr/>
+              <p:nvPr/>
+            </p:nvCxnSpPr>
+            <p:spPr>
+              <a:xfrm>
+                <a:off x="2743200" y="2667000"/>
+                <a:ext cx="6172200" cy="609600"/>
+              </a:xfrm>
+              <a:prstGeom prst="line">
+                <a:avLst/>
+              </a:prstGeom>
+              <a:ln w="38100">
+                <a:solidFill>
+                  <a:schemeClr val="accent2"/>
+                </a:solidFill>
+              </a:ln>
+            </p:spPr>
+            <p:style>
+              <a:lnRef idx="1">
+                <a:schemeClr val="accent1"/>
+              </a:lnRef>
+              <a:fillRef idx="0">
+                <a:schemeClr val="accent1"/>
+              </a:fillRef>
+              <a:effectRef idx="0">
+                <a:schemeClr val="accent1"/>
+              </a:effectRef>
+              <a:fontRef idx="minor">
+                <a:schemeClr val="tx1"/>
+              </a:fontRef>
+            </p:style>
+          </p:cxnSp>
+          <p:cxnSp>
+            <p:nvCxnSpPr>
+              <p:cNvPr id="9" name="Straight Connector 8"/>
+              <p:cNvCxnSpPr/>
+              <p:nvPr/>
+            </p:nvCxnSpPr>
+            <p:spPr>
+              <a:xfrm rot="10800000" flipV="1">
+                <a:off x="1295400" y="2743200"/>
+                <a:ext cx="609600" cy="533400"/>
+              </a:xfrm>
+              <a:prstGeom prst="line">
+                <a:avLst/>
+              </a:prstGeom>
+              <a:ln w="38100">
+                <a:solidFill>
+                  <a:schemeClr val="accent2"/>
+                </a:solidFill>
+              </a:ln>
+            </p:spPr>
+            <p:style>
+              <a:lnRef idx="1">
+                <a:schemeClr val="accent1"/>
+              </a:lnRef>
+              <a:fillRef idx="0">
+                <a:schemeClr val="accent1"/>
+              </a:fillRef>
+              <a:effectRef idx="0">
+                <a:schemeClr val="accent1"/>
+              </a:effectRef>
+              <a:fontRef idx="minor">
+                <a:schemeClr val="tx1"/>
+              </a:fontRef>
+            </p:style>
+          </p:cxnSp>
+          <p:pic>
+            <p:nvPicPr>
+              <p:cNvPr id="1026" name="Picture 2"/>
+              <p:cNvPicPr>
+                <a:picLocks noChangeAspect="1" noChangeArrowheads="1"/>
+              </p:cNvPicPr>
+              <p:nvPr/>
+            </p:nvPicPr>
+            <p:blipFill>
+              <a:blip r:embed="rId4"/>
+              <a:srcRect/>
+              <a:stretch>
+                <a:fillRect/>
+              </a:stretch>
+            </p:blipFill>
+            <p:spPr bwMode="auto">
+              <a:xfrm>
+                <a:off x="1282184" y="3276600"/>
+                <a:ext cx="7595116" cy="1676400"/>
+              </a:xfrm>
+              <a:prstGeom prst="rect">
+                <a:avLst/>
+              </a:prstGeom>
+              <a:noFill/>
+              <a:ln w="38100">
+                <a:solidFill>
+                  <a:schemeClr val="accent2"/>
+                </a:solidFill>
+                <a:miter lim="800000"/>
+                <a:headEnd/>
+                <a:tailEnd/>
+              </a:ln>
+              <a:effectLst/>
+            </p:spPr>
+          </p:pic>
+          <p:sp>
+            <p:nvSpPr>
+              <p:cNvPr id="14" name="Rectangle 13"/>
+              <p:cNvSpPr/>
+              <p:nvPr/>
+            </p:nvSpPr>
+            <p:spPr>
+              <a:xfrm>
+                <a:off x="1828800" y="2514600"/>
+                <a:ext cx="914400" cy="228600"/>
+              </a:xfrm>
+              <a:prstGeom prst="rect">
+                <a:avLst/>
+              </a:prstGeom>
+              <a:noFill/>
+              <a:ln w="38100">
+                <a:solidFill>
+                  <a:schemeClr val="accent2"/>
+                </a:solidFill>
+              </a:ln>
+            </p:spPr>
+            <p:style>
+              <a:lnRef idx="2">
+                <a:schemeClr val="accent1">
+                  <a:shade val="50000"/>
+                </a:schemeClr>
+              </a:lnRef>
+              <a:fillRef idx="1">
+                <a:schemeClr val="accent1"/>
+              </a:fillRef>
+              <a:effectRef idx="0">
+                <a:schemeClr val="accent1"/>
+              </a:effectRef>
+              <a:fontRef idx="minor">
+                <a:schemeClr val="lt1"/>
+              </a:fontRef>
+            </p:style>
+            <p:txBody>
+              <a:bodyPr rtlCol="0" anchor="ctr"/>
+              <a:lstStyle/>
+              <a:p>
+                <a:pPr algn="ctr"/>
+                <a:endParaRPr lang="en-US"/>
+              </a:p>
+            </p:txBody>
+          </p:sp>
+        </p:grpSp>
+        <p:sp>
+          <p:nvSpPr>
+            <p:cNvPr id="16" name="Rectangle 15"/>
+            <p:cNvSpPr/>
+            <p:nvPr/>
+          </p:nvSpPr>
+          <p:spPr>
+            <a:xfrm>
+              <a:off x="5858774" y="3276600"/>
+              <a:ext cx="2980426" cy="152400"/>
+            </a:xfrm>
+            <a:prstGeom prst="rect">
+              <a:avLst/>
+            </a:prstGeom>
+            <a:solidFill>
+              <a:srgbClr val="FFFF00">
+                <a:alpha val="10196"/>
+              </a:srgbClr>
+            </a:solidFill>
+            <a:ln>
+              <a:solidFill>
+                <a:srgbClr val="FFFF00"/>
+              </a:solidFill>
+            </a:ln>
+          </p:spPr>
+          <p:style>
+            <a:lnRef idx="2">
+              <a:schemeClr val="accent1">
+                <a:shade val="50000"/>
+              </a:schemeClr>
+            </a:lnRef>
+            <a:fillRef idx="1">
+              <a:schemeClr val="accent1"/>
+            </a:fillRef>
+            <a:effectRef idx="0">
+              <a:schemeClr val="accent1"/>
+            </a:effectRef>
+            <a:fontRef idx="minor">
+              <a:schemeClr val="lt1"/>
+            </a:fontRef>
+          </p:style>
+          <p:txBody>
+            <a:bodyPr rtlCol="0" anchor="ctr"/>
+            <a:lstStyle/>
+            <a:p>
+              <a:pPr algn="ctr"/>
+              <a:endParaRPr lang="en-US"/>
+            </a:p>
+          </p:txBody>
+        </p:sp>
+        <p:sp>
+          <p:nvSpPr>
+            <p:cNvPr id="17" name="Rectangle 16"/>
+            <p:cNvSpPr/>
+            <p:nvPr/>
+          </p:nvSpPr>
+          <p:spPr>
+            <a:xfrm>
+              <a:off x="1371600" y="4648200"/>
+              <a:ext cx="3886200" cy="152400"/>
+            </a:xfrm>
+            <a:prstGeom prst="rect">
+              <a:avLst/>
+            </a:prstGeom>
+            <a:solidFill>
+              <a:srgbClr val="FFFF00">
+                <a:alpha val="10196"/>
+              </a:srgbClr>
+            </a:solidFill>
+            <a:ln>
+              <a:solidFill>
+                <a:srgbClr val="FFFF00"/>
+              </a:solidFill>
+            </a:ln>
+          </p:spPr>
+          <p:style>
+            <a:lnRef idx="2">
+              <a:schemeClr val="accent1">
+                <a:shade val="50000"/>
+              </a:schemeClr>
+            </a:lnRef>
+            <a:fillRef idx="1">
+              <a:schemeClr val="accent1"/>
+            </a:fillRef>
+            <a:effectRef idx="0">
+              <a:schemeClr val="accent1"/>
+            </a:effectRef>
+            <a:fontRef idx="minor">
+              <a:schemeClr val="lt1"/>
+            </a:fontRef>
+          </p:style>
+          <p:txBody>
+            <a:bodyPr rtlCol="0" anchor="ctr"/>
+            <a:lstStyle/>
+            <a:p>
+              <a:pPr algn="ctr"/>
+              <a:endParaRPr lang="en-US"/>
+            </a:p>
+          </p:txBody>
+        </p:sp>
+        <p:sp>
+          <p:nvSpPr>
+            <p:cNvPr id="22" name="Rectangle 21"/>
+            <p:cNvSpPr/>
+            <p:nvPr/>
+          </p:nvSpPr>
+          <p:spPr>
+            <a:xfrm>
+              <a:off x="1371600" y="3683478"/>
+              <a:ext cx="3124200" cy="152400"/>
+            </a:xfrm>
+            <a:prstGeom prst="rect">
+              <a:avLst/>
+            </a:prstGeom>
+            <a:solidFill>
+              <a:srgbClr val="FFFF00">
+                <a:alpha val="10196"/>
+              </a:srgbClr>
+            </a:solidFill>
+            <a:ln>
+              <a:solidFill>
+                <a:srgbClr val="FFFF00"/>
+              </a:solidFill>
+            </a:ln>
+          </p:spPr>
+          <p:style>
+            <a:lnRef idx="2">
+              <a:schemeClr val="accent1">
+                <a:shade val="50000"/>
+              </a:schemeClr>
+            </a:lnRef>
+            <a:fillRef idx="1">
+              <a:schemeClr val="accent1"/>
+            </a:fillRef>
+            <a:effectRef idx="0">
+              <a:schemeClr val="accent1"/>
+            </a:effectRef>
+            <a:fontRef idx="minor">
+              <a:schemeClr val="lt1"/>
+            </a:fontRef>
+          </p:style>
+          <p:txBody>
+            <a:bodyPr rtlCol="0" anchor="ctr"/>
+            <a:lstStyle/>
+            <a:p>
+              <a:pPr algn="ctr"/>
+              <a:endParaRPr lang="en-US"/>
+            </a:p>
+          </p:txBody>
+        </p:sp>
+      </p:grpSp>
     </p:spTree>
   </p:cSld>
   <p:clrMapOvr>
@@ -4330,7 +4870,7 @@
                 </a:solidFill>
                 <a:latin typeface="Calibri" pitchFamily="34" charset="0"/>
               </a:rPr>
-              <a:t>(Section Header)</a:t>
+              <a:t>Simple Org Chart Version 2</a:t>
             </a:r>
             <a:endParaRPr lang="en-US" sz="3600" spc="60" dirty="0">
               <a:solidFill>
@@ -4373,7 +4913,7 @@
                 </a:solidFill>
                 <a:latin typeface="+mn-lt"/>
               </a:rPr>
-              <a:t>(section sub title)</a:t>
+              <a:t>Introducing The Command Pattern</a:t>
             </a:r>
             <a:endParaRPr lang="en-US" sz="1600" dirty="0">
               <a:solidFill>
@@ -4847,7 +5387,7 @@
                 </a:solidFill>
                 <a:latin typeface="Calibri" pitchFamily="34" charset="0"/>
               </a:rPr>
-              <a:t>(Section Header)</a:t>
+              <a:t>Simple Org Chart Version 3</a:t>
             </a:r>
             <a:endParaRPr lang="en-US" sz="3600" spc="60" dirty="0">
               <a:solidFill>
@@ -4890,14 +5430,8 @@
                 </a:solidFill>
                 <a:latin typeface="+mn-lt"/>
               </a:rPr>
-              <a:t>(section sub title)</a:t>
+              <a:t>Introducing An Event Aggregator</a:t>
             </a:r>
-            <a:endParaRPr lang="en-US" sz="1600" dirty="0">
-              <a:solidFill>
-                <a:schemeClr val="bg1"/>
-              </a:solidFill>
-              <a:latin typeface="+mn-lt"/>
-            </a:endParaRPr>
           </a:p>
         </p:txBody>
       </p:sp>
@@ -5156,17 +5690,7 @@
                   </a:schemeClr>
                 </a:solidFill>
               </a:rPr>
-              <a:t>Topics </a:t>
-            </a:r>
-            <a:r>
-              <a:rPr lang="en-US" b="1" dirty="0" smtClean="0">
-                <a:solidFill>
-                  <a:schemeClr val="accent1">
-                    <a:lumMod val="75000"/>
-                  </a:schemeClr>
-                </a:solidFill>
-              </a:rPr>
-              <a:t>Covered</a:t>
+              <a:t>Topics Covered</a:t>
             </a:r>
           </a:p>
           <a:p>
@@ -5202,11 +5726,7 @@
             </a:r>
             <a:r>
               <a:rPr lang="en-US" sz="2000" dirty="0" smtClean="0"/>
-              <a:t> </a:t>
-            </a:r>
-            <a:r>
-              <a:rPr lang="en-US" sz="2000" dirty="0" smtClean="0"/>
-              <a:t>Container</a:t>
+              <a:t> Container</a:t>
             </a:r>
           </a:p>
           <a:p>
@@ -5241,7 +5761,6 @@
               <a:rPr lang="en-US" sz="2000" dirty="0" smtClean="0"/>
               <a:t>Testability</a:t>
             </a:r>
-            <a:endParaRPr lang="en-US" sz="2000" dirty="0" smtClean="0"/>
           </a:p>
           <a:p>
             <a:pPr eaLnBrk="1" hangingPunct="1"/>
@@ -5254,15 +5773,7 @@
             <a:pPr eaLnBrk="1" hangingPunct="1"/>
             <a:r>
               <a:rPr lang="en-US" sz="2000" dirty="0" smtClean="0"/>
-              <a:t>Maintainability (</a:t>
-            </a:r>
-            <a:r>
-              <a:rPr lang="en-US" sz="2000" dirty="0" smtClean="0"/>
-              <a:t>Ease of </a:t>
-            </a:r>
-            <a:r>
-              <a:rPr lang="en-US" sz="2000" dirty="0" smtClean="0"/>
-              <a:t>Enhancement)</a:t>
+              <a:t>Maintainability (Ease of Enhancement)</a:t>
             </a:r>
           </a:p>
         </p:txBody>
@@ -5361,6 +5872,544 @@
       </p:grpSpPr>
       <p:sp>
         <p:nvSpPr>
+          <p:cNvPr id="4" name="Rectangle 3"/>
+          <p:cNvSpPr/>
+          <p:nvPr/>
+        </p:nvSpPr>
+        <p:spPr>
+          <a:xfrm>
+            <a:off x="0" y="0"/>
+            <a:ext cx="9144000" cy="4648200"/>
+          </a:xfrm>
+          <a:prstGeom prst="rect">
+            <a:avLst/>
+          </a:prstGeom>
+          <a:solidFill>
+            <a:srgbClr val="0069AA"/>
+          </a:solidFill>
+          <a:ln>
+            <a:noFill/>
+          </a:ln>
+        </p:spPr>
+        <p:style>
+          <a:lnRef idx="2">
+            <a:schemeClr val="accent1">
+              <a:shade val="50000"/>
+            </a:schemeClr>
+          </a:lnRef>
+          <a:fillRef idx="1">
+            <a:schemeClr val="accent1"/>
+          </a:fillRef>
+          <a:effectRef idx="0">
+            <a:schemeClr val="accent1"/>
+          </a:effectRef>
+          <a:fontRef idx="minor">
+            <a:schemeClr val="lt1"/>
+          </a:fontRef>
+        </p:style>
+        <p:txBody>
+          <a:bodyPr anchor="ctr"/>
+          <a:lstStyle/>
+          <a:p>
+            <a:pPr algn="ctr">
+              <a:defRPr/>
+            </a:pPr>
+            <a:endParaRPr lang="en-US"/>
+          </a:p>
+        </p:txBody>
+      </p:sp>
+      <p:pic>
+        <p:nvPicPr>
+          <p:cNvPr id="4099" name="Picture 4" descr="MAT logo 1 CMYK"/>
+          <p:cNvPicPr>
+            <a:picLocks noChangeAspect="1" noChangeArrowheads="1"/>
+          </p:cNvPicPr>
+          <p:nvPr/>
+        </p:nvPicPr>
+        <p:blipFill>
+          <a:blip r:embed="rId2">
+            <a:clrChange>
+              <a:clrFrom>
+                <a:srgbClr val="FDFDFD"/>
+              </a:clrFrom>
+              <a:clrTo>
+                <a:srgbClr val="FDFDFD">
+                  <a:alpha val="0"/>
+                </a:srgbClr>
+              </a:clrTo>
+            </a:clrChange>
+          </a:blip>
+          <a:srcRect/>
+          <a:stretch>
+            <a:fillRect/>
+          </a:stretch>
+        </p:blipFill>
+        <p:spPr bwMode="auto">
+          <a:xfrm>
+            <a:off x="2971800" y="4800600"/>
+            <a:ext cx="2819400" cy="1338263"/>
+          </a:xfrm>
+          <a:prstGeom prst="rect">
+            <a:avLst/>
+          </a:prstGeom>
+          <a:noFill/>
+          <a:ln w="9525">
+            <a:noFill/>
+            <a:miter lim="800000"/>
+            <a:headEnd/>
+            <a:tailEnd/>
+          </a:ln>
+        </p:spPr>
+      </p:pic>
+      <p:sp>
+        <p:nvSpPr>
+          <p:cNvPr id="5" name="Rectangle 4"/>
+          <p:cNvSpPr/>
+          <p:nvPr/>
+        </p:nvSpPr>
+        <p:spPr>
+          <a:xfrm>
+            <a:off x="0" y="4724400"/>
+            <a:ext cx="9144000" cy="2133600"/>
+          </a:xfrm>
+          <a:prstGeom prst="rect">
+            <a:avLst/>
+          </a:prstGeom>
+          <a:solidFill>
+            <a:srgbClr val="E31937"/>
+          </a:solidFill>
+          <a:ln>
+            <a:noFill/>
+          </a:ln>
+        </p:spPr>
+        <p:style>
+          <a:lnRef idx="2">
+            <a:schemeClr val="accent1">
+              <a:shade val="50000"/>
+            </a:schemeClr>
+          </a:lnRef>
+          <a:fillRef idx="1">
+            <a:schemeClr val="accent1"/>
+          </a:fillRef>
+          <a:effectRef idx="0">
+            <a:schemeClr val="accent1"/>
+          </a:effectRef>
+          <a:fontRef idx="minor">
+            <a:schemeClr val="lt1"/>
+          </a:fontRef>
+        </p:style>
+        <p:txBody>
+          <a:bodyPr anchor="ctr"/>
+          <a:lstStyle/>
+          <a:p>
+            <a:pPr algn="ctr">
+              <a:defRPr/>
+            </a:pPr>
+            <a:endParaRPr lang="en-US"/>
+          </a:p>
+        </p:txBody>
+      </p:sp>
+      <p:sp>
+        <p:nvSpPr>
+          <p:cNvPr id="10" name="Rectangle 9"/>
+          <p:cNvSpPr/>
+          <p:nvPr/>
+        </p:nvSpPr>
+        <p:spPr bwMode="auto">
+          <a:xfrm>
+            <a:off x="228600" y="0"/>
+            <a:ext cx="104775" cy="2325688"/>
+          </a:xfrm>
+          <a:prstGeom prst="rect">
+            <a:avLst/>
+          </a:prstGeom>
+          <a:solidFill>
+            <a:srgbClr val="E31937"/>
+          </a:solidFill>
+          <a:ln>
+            <a:noFill/>
+          </a:ln>
+        </p:spPr>
+        <p:style>
+          <a:lnRef idx="2">
+            <a:schemeClr val="accent1">
+              <a:shade val="50000"/>
+            </a:schemeClr>
+          </a:lnRef>
+          <a:fillRef idx="1">
+            <a:schemeClr val="accent1"/>
+          </a:fillRef>
+          <a:effectRef idx="0">
+            <a:schemeClr val="accent1"/>
+          </a:effectRef>
+          <a:fontRef idx="minor">
+            <a:schemeClr val="lt1"/>
+          </a:fontRef>
+        </p:style>
+        <p:txBody>
+          <a:bodyPr anchor="ctr"/>
+          <a:lstStyle/>
+          <a:p>
+            <a:pPr algn="ctr">
+              <a:defRPr/>
+            </a:pPr>
+            <a:endParaRPr lang="en-US"/>
+          </a:p>
+        </p:txBody>
+      </p:sp>
+      <p:pic>
+        <p:nvPicPr>
+          <p:cNvPr id="4103" name="Picture 7" descr="MAT logo vertical_red.emf"/>
+          <p:cNvPicPr>
+            <a:picLocks noChangeAspect="1"/>
+          </p:cNvPicPr>
+          <p:nvPr/>
+        </p:nvPicPr>
+        <p:blipFill>
+          <a:blip r:embed="rId3"/>
+          <a:srcRect/>
+          <a:stretch>
+            <a:fillRect/>
+          </a:stretch>
+        </p:blipFill>
+        <p:spPr bwMode="auto">
+          <a:xfrm>
+            <a:off x="3600450" y="5334000"/>
+            <a:ext cx="1981200" cy="969963"/>
+          </a:xfrm>
+          <a:prstGeom prst="rect">
+            <a:avLst/>
+          </a:prstGeom>
+          <a:noFill/>
+          <a:ln w="9525">
+            <a:noFill/>
+            <a:miter lim="800000"/>
+            <a:headEnd/>
+            <a:tailEnd/>
+          </a:ln>
+        </p:spPr>
+      </p:pic>
+      <p:sp>
+        <p:nvSpPr>
+          <p:cNvPr id="9" name="TextBox 8"/>
+          <p:cNvSpPr txBox="1"/>
+          <p:nvPr/>
+        </p:nvSpPr>
+        <p:spPr>
+          <a:xfrm>
+            <a:off x="381000" y="1447800"/>
+            <a:ext cx="8610600" cy="646331"/>
+          </a:xfrm>
+          <a:prstGeom prst="rect">
+            <a:avLst/>
+          </a:prstGeom>
+          <a:noFill/>
+        </p:spPr>
+        <p:txBody>
+          <a:bodyPr>
+            <a:spAutoFit/>
+          </a:bodyPr>
+          <a:lstStyle/>
+          <a:p>
+            <a:pPr>
+              <a:defRPr/>
+            </a:pPr>
+            <a:r>
+              <a:rPr lang="en-US" sz="3600" spc="60" dirty="0" smtClean="0">
+                <a:solidFill>
+                  <a:schemeClr val="bg1"/>
+                </a:solidFill>
+                <a:latin typeface="Calibri" pitchFamily="34" charset="0"/>
+              </a:rPr>
+              <a:t>Simple Org Chart – Final Version</a:t>
+            </a:r>
+            <a:endParaRPr lang="en-US" sz="3600" spc="60" dirty="0">
+              <a:solidFill>
+                <a:schemeClr val="bg1"/>
+              </a:solidFill>
+              <a:latin typeface="Calibri" pitchFamily="34" charset="0"/>
+            </a:endParaRPr>
+          </a:p>
+        </p:txBody>
+      </p:sp>
+      <p:sp>
+        <p:nvSpPr>
+          <p:cNvPr id="11" name="TextBox 10"/>
+          <p:cNvSpPr txBox="1"/>
+          <p:nvPr/>
+        </p:nvSpPr>
+        <p:spPr>
+          <a:xfrm>
+            <a:off x="381000" y="2057400"/>
+            <a:ext cx="7543800" cy="338554"/>
+          </a:xfrm>
+          <a:prstGeom prst="rect">
+            <a:avLst/>
+          </a:prstGeom>
+          <a:noFill/>
+        </p:spPr>
+        <p:txBody>
+          <a:bodyPr wrap="square">
+            <a:spAutoFit/>
+          </a:bodyPr>
+          <a:lstStyle/>
+          <a:p>
+            <a:pPr>
+              <a:defRPr/>
+            </a:pPr>
+            <a:r>
+              <a:rPr lang="en-US" sz="1600" dirty="0" smtClean="0">
+                <a:solidFill>
+                  <a:schemeClr val="bg1"/>
+                </a:solidFill>
+                <a:latin typeface="+mn-lt"/>
+              </a:rPr>
+              <a:t>Orchestration</a:t>
+            </a:r>
+            <a:r>
+              <a:rPr lang="en-US" sz="1600" dirty="0" smtClean="0">
+                <a:solidFill>
+                  <a:schemeClr val="bg1"/>
+                </a:solidFill>
+                <a:latin typeface="+mn-lt"/>
+              </a:rPr>
+              <a:t> With An Application Controller And </a:t>
+            </a:r>
+            <a:r>
+              <a:rPr lang="en-US" sz="1600" dirty="0" err="1" smtClean="0">
+                <a:solidFill>
+                  <a:schemeClr val="bg1"/>
+                </a:solidFill>
+                <a:latin typeface="+mn-lt"/>
+              </a:rPr>
+              <a:t>IoC</a:t>
+            </a:r>
+            <a:r>
+              <a:rPr lang="en-US" sz="1600" dirty="0" smtClean="0">
+                <a:solidFill>
+                  <a:schemeClr val="bg1"/>
+                </a:solidFill>
+                <a:latin typeface="+mn-lt"/>
+              </a:rPr>
+              <a:t> Container</a:t>
+            </a:r>
+          </a:p>
+        </p:txBody>
+      </p:sp>
+    </p:spTree>
+  </p:cSld>
+  <p:clrMapOvr>
+    <a:masterClrMapping/>
+  </p:clrMapOvr>
+  <p:timing>
+    <p:tnLst>
+      <p:par>
+        <p:cTn id="1" dur="indefinite" restart="never" nodeType="tmRoot"/>
+      </p:par>
+    </p:tnLst>
+  </p:timing>
+</p:sld>
+</file>
+
+<file path=ppt/slides/slide21.xml><?xml version="1.0" encoding="utf-8"?>
+<p:sld xmlns:a="http://schemas.openxmlformats.org/drawingml/2006/main" xmlns:r="http://schemas.openxmlformats.org/officeDocument/2006/relationships" xmlns:p="http://schemas.openxmlformats.org/presentationml/2006/main">
+  <p:cSld>
+    <p:spTree>
+      <p:nvGrpSpPr>
+        <p:cNvPr id="1" name=""/>
+        <p:cNvGrpSpPr/>
+        <p:nvPr/>
+      </p:nvGrpSpPr>
+      <p:grpSpPr>
+        <a:xfrm>
+          <a:off x="0" y="0"/>
+          <a:ext cx="0" cy="0"/>
+          <a:chOff x="0" y="0"/>
+          <a:chExt cx="0" cy="0"/>
+        </a:xfrm>
+      </p:grpSpPr>
+      <p:sp>
+        <p:nvSpPr>
+          <p:cNvPr id="3075" name="Text Placeholder 2"/>
+          <p:cNvSpPr>
+            <a:spLocks noGrp="1"/>
+          </p:cNvSpPr>
+          <p:nvPr>
+            <p:ph type="body" sz="quarter" idx="10"/>
+          </p:nvPr>
+        </p:nvSpPr>
+        <p:spPr>
+          <a:xfrm>
+            <a:off x="685800" y="1066800"/>
+            <a:ext cx="8229600" cy="1219200"/>
+          </a:xfrm>
+        </p:spPr>
+        <p:txBody>
+          <a:bodyPr/>
+          <a:lstStyle/>
+          <a:p>
+            <a:pPr eaLnBrk="1" hangingPunct="1">
+              <a:buNone/>
+            </a:pPr>
+            <a:endParaRPr lang="en-US" sz="2000" dirty="0" smtClean="0"/>
+          </a:p>
+        </p:txBody>
+      </p:sp>
+      <p:sp>
+        <p:nvSpPr>
+          <p:cNvPr id="3074" name="Title 1"/>
+          <p:cNvSpPr>
+            <a:spLocks noGrp="1"/>
+          </p:cNvSpPr>
+          <p:nvPr>
+            <p:ph type="title"/>
+          </p:nvPr>
+        </p:nvSpPr>
+        <p:spPr bwMode="auto">
+          <a:noFill/>
+          <a:ln>
+            <a:miter lim="800000"/>
+            <a:headEnd/>
+            <a:tailEnd/>
+          </a:ln>
+        </p:spPr>
+        <p:txBody>
+          <a:bodyPr vert="horz" wrap="square" lIns="91440" tIns="45720" rIns="91440" bIns="45720" numCol="1" anchor="t" anchorCtr="0" compatLnSpc="1">
+            <a:prstTxWarp prst="textNoShape">
+              <a:avLst/>
+            </a:prstTxWarp>
+          </a:bodyPr>
+          <a:lstStyle/>
+          <a:p>
+            <a:pPr eaLnBrk="1" hangingPunct="1"/>
+            <a:endParaRPr lang="en-US" dirty="0" smtClean="0"/>
+          </a:p>
+        </p:txBody>
+      </p:sp>
+    </p:spTree>
+  </p:cSld>
+  <p:clrMapOvr>
+    <a:masterClrMapping/>
+  </p:clrMapOvr>
+  <p:timing>
+    <p:tnLst>
+      <p:par>
+        <p:cTn id="1" dur="indefinite" restart="never" nodeType="tmRoot"/>
+      </p:par>
+    </p:tnLst>
+  </p:timing>
+</p:sld>
+</file>
+
+<file path=ppt/slides/slide22.xml><?xml version="1.0" encoding="utf-8"?>
+<p:sld xmlns:a="http://schemas.openxmlformats.org/drawingml/2006/main" xmlns:r="http://schemas.openxmlformats.org/officeDocument/2006/relationships" xmlns:p="http://schemas.openxmlformats.org/presentationml/2006/main">
+  <p:cSld>
+    <p:spTree>
+      <p:nvGrpSpPr>
+        <p:cNvPr id="1" name=""/>
+        <p:cNvGrpSpPr/>
+        <p:nvPr/>
+      </p:nvGrpSpPr>
+      <p:grpSpPr>
+        <a:xfrm>
+          <a:off x="0" y="0"/>
+          <a:ext cx="0" cy="0"/>
+          <a:chOff x="0" y="0"/>
+          <a:chExt cx="0" cy="0"/>
+        </a:xfrm>
+      </p:grpSpPr>
+      <p:sp>
+        <p:nvSpPr>
+          <p:cNvPr id="3075" name="Text Placeholder 2"/>
+          <p:cNvSpPr>
+            <a:spLocks noGrp="1"/>
+          </p:cNvSpPr>
+          <p:nvPr>
+            <p:ph type="body" sz="quarter" idx="10"/>
+          </p:nvPr>
+        </p:nvSpPr>
+        <p:spPr>
+          <a:xfrm>
+            <a:off x="685800" y="1066800"/>
+            <a:ext cx="8229600" cy="1219200"/>
+          </a:xfrm>
+        </p:spPr>
+        <p:txBody>
+          <a:bodyPr/>
+          <a:lstStyle/>
+          <a:p>
+            <a:pPr eaLnBrk="1" hangingPunct="1">
+              <a:buNone/>
+            </a:pPr>
+            <a:endParaRPr lang="en-US" sz="2000" dirty="0" smtClean="0"/>
+          </a:p>
+        </p:txBody>
+      </p:sp>
+      <p:sp>
+        <p:nvSpPr>
+          <p:cNvPr id="3074" name="Title 1"/>
+          <p:cNvSpPr>
+            <a:spLocks noGrp="1"/>
+          </p:cNvSpPr>
+          <p:nvPr>
+            <p:ph type="title"/>
+          </p:nvPr>
+        </p:nvSpPr>
+        <p:spPr bwMode="auto">
+          <a:noFill/>
+          <a:ln>
+            <a:miter lim="800000"/>
+            <a:headEnd/>
+            <a:tailEnd/>
+          </a:ln>
+        </p:spPr>
+        <p:txBody>
+          <a:bodyPr vert="horz" wrap="square" lIns="91440" tIns="45720" rIns="91440" bIns="45720" numCol="1" anchor="t" anchorCtr="0" compatLnSpc="1">
+            <a:prstTxWarp prst="textNoShape">
+              <a:avLst/>
+            </a:prstTxWarp>
+          </a:bodyPr>
+          <a:lstStyle/>
+          <a:p>
+            <a:pPr eaLnBrk="1" hangingPunct="1"/>
+            <a:endParaRPr lang="en-US" dirty="0" smtClean="0"/>
+          </a:p>
+        </p:txBody>
+      </p:sp>
+    </p:spTree>
+  </p:cSld>
+  <p:clrMapOvr>
+    <a:masterClrMapping/>
+  </p:clrMapOvr>
+  <p:timing>
+    <p:tnLst>
+      <p:par>
+        <p:cTn id="1" dur="indefinite" restart="never" nodeType="tmRoot"/>
+      </p:par>
+    </p:tnLst>
+  </p:timing>
+</p:sld>
+</file>
+
+<file path=ppt/slides/slide23.xml><?xml version="1.0" encoding="utf-8"?>
+<p:sld xmlns:a="http://schemas.openxmlformats.org/drawingml/2006/main" xmlns:r="http://schemas.openxmlformats.org/officeDocument/2006/relationships" xmlns:p="http://schemas.openxmlformats.org/presentationml/2006/main">
+  <p:cSld>
+    <p:spTree>
+      <p:nvGrpSpPr>
+        <p:cNvPr id="1" name=""/>
+        <p:cNvGrpSpPr/>
+        <p:nvPr/>
+      </p:nvGrpSpPr>
+      <p:grpSpPr>
+        <a:xfrm>
+          <a:off x="0" y="0"/>
+          <a:ext cx="0" cy="0"/>
+          <a:chOff x="0" y="0"/>
+          <a:chExt cx="0" cy="0"/>
+        </a:xfrm>
+      </p:grpSpPr>
+      <p:sp>
+        <p:nvSpPr>
           <p:cNvPr id="6" name="Rectangle 5"/>
           <p:cNvSpPr/>
           <p:nvPr/>
@@ -5888,7 +6937,7 @@
 </p:sld>
 </file>
 
-<file path=ppt/slides/slide21.xml><?xml version="1.0" encoding="utf-8"?>
+<file path=ppt/slides/slide24.xml><?xml version="1.0" encoding="utf-8"?>
 <p:sld xmlns:a="http://schemas.openxmlformats.org/drawingml/2006/main" xmlns:r="http://schemas.openxmlformats.org/officeDocument/2006/relationships" xmlns:p="http://schemas.openxmlformats.org/presentationml/2006/main">
   <p:cSld>
     <p:spTree>
@@ -9561,7 +10610,6 @@
               <a:rPr lang="en-US" sz="2000" dirty="0" smtClean="0"/>
               <a:t>The Main Form</a:t>
             </a:r>
-            <a:endParaRPr lang="en-US" sz="2000" dirty="0" smtClean="0"/>
           </a:p>
         </p:txBody>
       </p:sp>
@@ -9596,7 +10644,6 @@
               <a:rPr lang="en-US" dirty="0" smtClean="0"/>
               <a:t>Simple Org Chart</a:t>
             </a:r>
-            <a:endParaRPr lang="en-US" dirty="0" smtClean="0"/>
           </a:p>
         </p:txBody>
       </p:sp>
@@ -9685,7 +10732,6 @@
               <a:rPr lang="en-US" sz="2000" dirty="0" smtClean="0"/>
               <a:t>The Main Form’s Parts</a:t>
             </a:r>
-            <a:endParaRPr lang="en-US" sz="2000" dirty="0" smtClean="0"/>
           </a:p>
         </p:txBody>
       </p:sp>
@@ -9720,7 +10766,6 @@
               <a:rPr lang="en-US" dirty="0" smtClean="0"/>
               <a:t>Simple Org Chart</a:t>
             </a:r>
-            <a:endParaRPr lang="en-US" dirty="0" smtClean="0"/>
           </a:p>
         </p:txBody>
       </p:sp>
@@ -10859,21 +11904,6 @@
 </file>
 
 <file path=customXml/item1.xml><?xml version="1.0" encoding="utf-8"?>
-<p:properties xmlns:p="http://schemas.microsoft.com/office/2006/metadata/properties" xmlns:xsi="http://www.w3.org/2001/XMLSchema-instance">
-  <documentManagement/>
-</p:properties>
-</file>
-
-<file path=customXml/item2.xml><?xml version="1.0" encoding="utf-8"?>
-<?mso-contentType ?>
-<FormTemplates xmlns="http://schemas.microsoft.com/sharepoint/v3/contenttype/forms">
-  <Display>DocumentLibraryForm</Display>
-  <Edit>DocumentLibraryForm</Edit>
-  <New>DocumentLibraryForm</New>
-</FormTemplates>
-</file>
-
-<file path=customXml/item3.xml><?xml version="1.0" encoding="utf-8"?>
 <ct:contentTypeSchema xmlns:ct="http://schemas.microsoft.com/office/2006/metadata/contentType" xmlns:ma="http://schemas.microsoft.com/office/2006/metadata/properties/metaAttributes" ct:_="" ma:_="" ma:contentTypeName="Document" ma:contentTypeID="0x0101005857B3975182FB47B67FAAA67052062C" ma:contentTypeVersion="0" ma:contentTypeDescription="Create a new document." ma:contentTypeScope="" ma:versionID="a1781edd533abf786dc62ee7dded643a">
   <xsd:schema xmlns:xsd="http://www.w3.org/2001/XMLSchema" xmlns:p="http://schemas.microsoft.com/office/2006/metadata/properties" targetNamespace="http://schemas.microsoft.com/office/2006/metadata/properties" ma:root="true" ma:fieldsID="4aeb20c0e3442673af7ee10786458764">
     <xsd:element name="properties">
@@ -10922,10 +11952,32 @@
 </ct:contentTypeSchema>
 </file>
 
+<file path=customXml/item2.xml><?xml version="1.0" encoding="utf-8"?>
+<?mso-contentType ?>
+<FormTemplates xmlns="http://schemas.microsoft.com/sharepoint/v3/contenttype/forms">
+  <Display>DocumentLibraryForm</Display>
+  <Edit>DocumentLibraryForm</Edit>
+  <New>DocumentLibraryForm</New>
+</FormTemplates>
+</file>
+
+<file path=customXml/item3.xml><?xml version="1.0" encoding="utf-8"?>
+<p:properties xmlns:p="http://schemas.microsoft.com/office/2006/metadata/properties" xmlns:xsi="http://www.w3.org/2001/XMLSchema-instance">
+  <documentManagement/>
+</p:properties>
+</file>
+
 <file path=customXml/itemProps1.xml><?xml version="1.0" encoding="utf-8"?>
-<ds:datastoreItem xmlns:ds="http://schemas.openxmlformats.org/officeDocument/2006/customXml" ds:itemID="{F8AADC7F-5DC4-46F2-A809-0679B041C012}">
+<ds:datastoreItem xmlns:ds="http://schemas.openxmlformats.org/officeDocument/2006/customXml" ds:itemID="{D3EBC05E-93E3-47EC-A4AA-B305F2941009}">
   <ds:schemaRefs>
+    <ds:schemaRef ds:uri="http://schemas.microsoft.com/office/2006/metadata/contentType"/>
+    <ds:schemaRef ds:uri="http://schemas.microsoft.com/office/2006/metadata/properties/metaAttributes"/>
+    <ds:schemaRef ds:uri="http://www.w3.org/2001/XMLSchema"/>
     <ds:schemaRef ds:uri="http://schemas.microsoft.com/office/2006/metadata/properties"/>
+    <ds:schemaRef ds:uri="http://schemas.openxmlformats.org/package/2006/metadata/core-properties"/>
+    <ds:schemaRef ds:uri="http://purl.org/dc/elements/1.1/"/>
+    <ds:schemaRef ds:uri="http://purl.org/dc/terms/"/>
+    <ds:schemaRef ds:uri="http://schemas.microsoft.com/office/internal/2005/internalDocumentation"/>
   </ds:schemaRefs>
 </ds:datastoreItem>
 </file>
@@ -10939,16 +11991,9 @@
 </file>
 
 <file path=customXml/itemProps3.xml><?xml version="1.0" encoding="utf-8"?>
-<ds:datastoreItem xmlns:ds="http://schemas.openxmlformats.org/officeDocument/2006/customXml" ds:itemID="{D3EBC05E-93E3-47EC-A4AA-B305F2941009}">
+<ds:datastoreItem xmlns:ds="http://schemas.openxmlformats.org/officeDocument/2006/customXml" ds:itemID="{F8AADC7F-5DC4-46F2-A809-0679B041C012}">
   <ds:schemaRefs>
-    <ds:schemaRef ds:uri="http://schemas.microsoft.com/office/2006/metadata/contentType"/>
-    <ds:schemaRef ds:uri="http://schemas.microsoft.com/office/2006/metadata/properties/metaAttributes"/>
-    <ds:schemaRef ds:uri="http://www.w3.org/2001/XMLSchema"/>
     <ds:schemaRef ds:uri="http://schemas.microsoft.com/office/2006/metadata/properties"/>
-    <ds:schemaRef ds:uri="http://schemas.openxmlformats.org/package/2006/metadata/core-properties"/>
-    <ds:schemaRef ds:uri="http://purl.org/dc/elements/1.1/"/>
-    <ds:schemaRef ds:uri="http://purl.org/dc/terms/"/>
-    <ds:schemaRef ds:uri="http://schemas.microsoft.com/office/internal/2005/internalDocumentation"/>
   </ds:schemaRefs>
 </ds:datastoreItem>
 </file>
</xml_diff>

<commit_message>
updated .gitignore to exclude temp MS Office files
</commit_message>
<xml_diff>
--- a/Decoupling Workflow With App Controler/Decoupling Workflow From Forms.pptx
+++ b/Decoupling Workflow With App Controler/Decoupling Workflow From Forms.pptx
@@ -4191,7 +4191,6 @@
               <a:rPr lang="en-US" sz="2000" dirty="0" smtClean="0"/>
               <a:t>Tightly Coupled Presentation Logic: One Presenter Knows About Another</a:t>
             </a:r>
-            <a:endParaRPr lang="en-US" sz="2000" dirty="0" smtClean="0"/>
           </a:p>
         </p:txBody>
       </p:sp>
@@ -4226,7 +4225,6 @@
               <a:rPr lang="en-US" dirty="0" smtClean="0"/>
               <a:t>Simple Org Chart – v1</a:t>
             </a:r>
-            <a:endParaRPr lang="en-US" dirty="0" smtClean="0"/>
           </a:p>
         </p:txBody>
       </p:sp>
@@ -6164,16 +6162,7 @@
                 </a:solidFill>
                 <a:latin typeface="+mn-lt"/>
               </a:rPr>
-              <a:t>Orchestration</a:t>
-            </a:r>
-            <a:r>
-              <a:rPr lang="en-US" sz="1600" dirty="0" smtClean="0">
-                <a:solidFill>
-                  <a:schemeClr val="bg1"/>
-                </a:solidFill>
-                <a:latin typeface="+mn-lt"/>
-              </a:rPr>
-              <a:t> With An Application Controller And </a:t>
+              <a:t>Orchestration With An Application Controller And </a:t>
             </a:r>
             <a:r>
               <a:rPr lang="en-US" sz="1600" dirty="0" err="1" smtClean="0">
@@ -11904,6 +11893,21 @@
 </file>
 
 <file path=customXml/item1.xml><?xml version="1.0" encoding="utf-8"?>
+<p:properties xmlns:p="http://schemas.microsoft.com/office/2006/metadata/properties" xmlns:xsi="http://www.w3.org/2001/XMLSchema-instance">
+  <documentManagement/>
+</p:properties>
+</file>
+
+<file path=customXml/item2.xml><?xml version="1.0" encoding="utf-8"?>
+<?mso-contentType ?>
+<FormTemplates xmlns="http://schemas.microsoft.com/sharepoint/v3/contenttype/forms">
+  <Display>DocumentLibraryForm</Display>
+  <Edit>DocumentLibraryForm</Edit>
+  <New>DocumentLibraryForm</New>
+</FormTemplates>
+</file>
+
+<file path=customXml/item3.xml><?xml version="1.0" encoding="utf-8"?>
 <ct:contentTypeSchema xmlns:ct="http://schemas.microsoft.com/office/2006/metadata/contentType" xmlns:ma="http://schemas.microsoft.com/office/2006/metadata/properties/metaAttributes" ct:_="" ma:_="" ma:contentTypeName="Document" ma:contentTypeID="0x0101005857B3975182FB47B67FAAA67052062C" ma:contentTypeVersion="0" ma:contentTypeDescription="Create a new document." ma:contentTypeScope="" ma:versionID="a1781edd533abf786dc62ee7dded643a">
   <xsd:schema xmlns:xsd="http://www.w3.org/2001/XMLSchema" xmlns:p="http://schemas.microsoft.com/office/2006/metadata/properties" targetNamespace="http://schemas.microsoft.com/office/2006/metadata/properties" ma:root="true" ma:fieldsID="4aeb20c0e3442673af7ee10786458764">
     <xsd:element name="properties">
@@ -11952,32 +11956,10 @@
 </ct:contentTypeSchema>
 </file>
 
-<file path=customXml/item2.xml><?xml version="1.0" encoding="utf-8"?>
-<?mso-contentType ?>
-<FormTemplates xmlns="http://schemas.microsoft.com/sharepoint/v3/contenttype/forms">
-  <Display>DocumentLibraryForm</Display>
-  <Edit>DocumentLibraryForm</Edit>
-  <New>DocumentLibraryForm</New>
-</FormTemplates>
-</file>
-
-<file path=customXml/item3.xml><?xml version="1.0" encoding="utf-8"?>
-<p:properties xmlns:p="http://schemas.microsoft.com/office/2006/metadata/properties" xmlns:xsi="http://www.w3.org/2001/XMLSchema-instance">
-  <documentManagement/>
-</p:properties>
-</file>
-
 <file path=customXml/itemProps1.xml><?xml version="1.0" encoding="utf-8"?>
-<ds:datastoreItem xmlns:ds="http://schemas.openxmlformats.org/officeDocument/2006/customXml" ds:itemID="{D3EBC05E-93E3-47EC-A4AA-B305F2941009}">
+<ds:datastoreItem xmlns:ds="http://schemas.openxmlformats.org/officeDocument/2006/customXml" ds:itemID="{F8AADC7F-5DC4-46F2-A809-0679B041C012}">
   <ds:schemaRefs>
-    <ds:schemaRef ds:uri="http://schemas.microsoft.com/office/2006/metadata/contentType"/>
-    <ds:schemaRef ds:uri="http://schemas.microsoft.com/office/2006/metadata/properties/metaAttributes"/>
-    <ds:schemaRef ds:uri="http://www.w3.org/2001/XMLSchema"/>
     <ds:schemaRef ds:uri="http://schemas.microsoft.com/office/2006/metadata/properties"/>
-    <ds:schemaRef ds:uri="http://schemas.openxmlformats.org/package/2006/metadata/core-properties"/>
-    <ds:schemaRef ds:uri="http://purl.org/dc/elements/1.1/"/>
-    <ds:schemaRef ds:uri="http://purl.org/dc/terms/"/>
-    <ds:schemaRef ds:uri="http://schemas.microsoft.com/office/internal/2005/internalDocumentation"/>
   </ds:schemaRefs>
 </ds:datastoreItem>
 </file>
@@ -11991,9 +11973,16 @@
 </file>
 
 <file path=customXml/itemProps3.xml><?xml version="1.0" encoding="utf-8"?>
-<ds:datastoreItem xmlns:ds="http://schemas.openxmlformats.org/officeDocument/2006/customXml" ds:itemID="{F8AADC7F-5DC4-46F2-A809-0679B041C012}">
+<ds:datastoreItem xmlns:ds="http://schemas.openxmlformats.org/officeDocument/2006/customXml" ds:itemID="{D3EBC05E-93E3-47EC-A4AA-B305F2941009}">
   <ds:schemaRefs>
+    <ds:schemaRef ds:uri="http://schemas.microsoft.com/office/2006/metadata/contentType"/>
+    <ds:schemaRef ds:uri="http://schemas.microsoft.com/office/2006/metadata/properties/metaAttributes"/>
+    <ds:schemaRef ds:uri="http://www.w3.org/2001/XMLSchema"/>
     <ds:schemaRef ds:uri="http://schemas.microsoft.com/office/2006/metadata/properties"/>
+    <ds:schemaRef ds:uri="http://schemas.openxmlformats.org/package/2006/metadata/core-properties"/>
+    <ds:schemaRef ds:uri="http://purl.org/dc/elements/1.1/"/>
+    <ds:schemaRef ds:uri="http://purl.org/dc/terms/"/>
+    <ds:schemaRef ds:uri="http://schemas.microsoft.com/office/internal/2005/internalDocumentation"/>
   </ds:schemaRefs>
 </ds:datastoreItem>
 </file>
</xml_diff>

<commit_message>
more detail about bad coupling in v1 of sample software
</commit_message>
<xml_diff>
--- a/Decoupling Workflow With App Controler/Decoupling Workflow From Forms.pptx
+++ b/Decoupling Workflow With App Controler/Decoupling Workflow From Forms.pptx
@@ -5,10 +5,10 @@
     <p:sldMasterId id="2147483822" r:id="rId4"/>
   </p:sldMasterIdLst>
   <p:notesMasterIdLst>
-    <p:notesMasterId r:id="rId29"/>
+    <p:notesMasterId r:id="rId32"/>
   </p:notesMasterIdLst>
   <p:handoutMasterIdLst>
-    <p:handoutMasterId r:id="rId30"/>
+    <p:handoutMasterId r:id="rId33"/>
   </p:handoutMasterIdLst>
   <p:sldIdLst>
     <p:sldId id="256" r:id="rId5"/>
@@ -24,27 +24,30 @@
     <p:sldId id="280" r:id="rId15"/>
     <p:sldId id="281" r:id="rId16"/>
     <p:sldId id="286" r:id="rId17"/>
-    <p:sldId id="278" r:id="rId18"/>
+    <p:sldId id="296" r:id="rId18"/>
     <p:sldId id="279" r:id="rId19"/>
-    <p:sldId id="285" r:id="rId20"/>
-    <p:sldId id="276" r:id="rId21"/>
-    <p:sldId id="277" r:id="rId22"/>
-    <p:sldId id="284" r:id="rId23"/>
-    <p:sldId id="292" r:id="rId24"/>
-    <p:sldId id="293" r:id="rId25"/>
-    <p:sldId id="294" r:id="rId26"/>
-    <p:sldId id="259" r:id="rId27"/>
-    <p:sldId id="274" r:id="rId28"/>
+    <p:sldId id="278" r:id="rId20"/>
+    <p:sldId id="295" r:id="rId21"/>
+    <p:sldId id="297" r:id="rId22"/>
+    <p:sldId id="285" r:id="rId23"/>
+    <p:sldId id="276" r:id="rId24"/>
+    <p:sldId id="277" r:id="rId25"/>
+    <p:sldId id="284" r:id="rId26"/>
+    <p:sldId id="292" r:id="rId27"/>
+    <p:sldId id="293" r:id="rId28"/>
+    <p:sldId id="294" r:id="rId29"/>
+    <p:sldId id="259" r:id="rId30"/>
+    <p:sldId id="274" r:id="rId31"/>
   </p:sldIdLst>
   <p:sldSz cx="9144000" cy="6858000" type="screen4x3"/>
   <p:notesSz cx="7010400" cy="9296400"/>
   <p:embeddedFontLst>
     <p:embeddedFont>
       <p:font typeface="Calibri" pitchFamily="34" charset="0"/>
-      <p:regular r:id="rId31"/>
-      <p:bold r:id="rId32"/>
-      <p:italic r:id="rId33"/>
-      <p:boldItalic r:id="rId34"/>
+      <p:regular r:id="rId34"/>
+      <p:bold r:id="rId35"/>
+      <p:italic r:id="rId36"/>
+      <p:boldItalic r:id="rId37"/>
     </p:embeddedFont>
   </p:embeddedFontLst>
   <p:defaultTextStyle>
@@ -995,7 +998,7 @@
               <a:pPr>
                 <a:defRPr/>
               </a:pPr>
-              <a:t>15</a:t>
+              <a:t>14</a:t>
             </a:fld>
             <a:endParaRPr lang="en-US"/>
           </a:p>
@@ -1082,7 +1085,7 @@
               <a:pPr>
                 <a:defRPr/>
               </a:pPr>
-              <a:t>16</a:t>
+              <a:t>15</a:t>
             </a:fld>
             <a:endParaRPr lang="en-US"/>
           </a:p>
@@ -1169,7 +1172,7 @@
               <a:pPr>
                 <a:defRPr/>
               </a:pPr>
-              <a:t>18</a:t>
+              <a:t>17</a:t>
             </a:fld>
             <a:endParaRPr lang="en-US"/>
           </a:p>
@@ -1256,7 +1259,7 @@
               <a:pPr>
                 <a:defRPr/>
               </a:pPr>
-              <a:t>19</a:t>
+              <a:t>18</a:t>
             </a:fld>
             <a:endParaRPr lang="en-US"/>
           </a:p>
@@ -1343,7 +1346,7 @@
               <a:pPr>
                 <a:defRPr/>
               </a:pPr>
-              <a:t>21</a:t>
+              <a:t>19</a:t>
             </a:fld>
             <a:endParaRPr lang="en-US"/>
           </a:p>
@@ -1430,7 +1433,268 @@
               <a:pPr>
                 <a:defRPr/>
               </a:pPr>
+              <a:t>21</a:t>
+            </a:fld>
+            <a:endParaRPr lang="en-US"/>
+          </a:p>
+        </p:txBody>
+      </p:sp>
+    </p:spTree>
+  </p:cSld>
+  <p:clrMapOvr>
+    <a:masterClrMapping/>
+  </p:clrMapOvr>
+</p:notes>
+</file>
+
+<file path=ppt/notesSlides/notesSlide17.xml><?xml version="1.0" encoding="utf-8"?>
+<p:notes xmlns:a="http://schemas.openxmlformats.org/drawingml/2006/main" xmlns:r="http://schemas.openxmlformats.org/officeDocument/2006/relationships" xmlns:p="http://schemas.openxmlformats.org/presentationml/2006/main">
+  <p:cSld>
+    <p:spTree>
+      <p:nvGrpSpPr>
+        <p:cNvPr id="1" name=""/>
+        <p:cNvGrpSpPr/>
+        <p:nvPr/>
+      </p:nvGrpSpPr>
+      <p:grpSpPr>
+        <a:xfrm>
+          <a:off x="0" y="0"/>
+          <a:ext cx="0" cy="0"/>
+          <a:chOff x="0" y="0"/>
+          <a:chExt cx="0" cy="0"/>
+        </a:xfrm>
+      </p:grpSpPr>
+      <p:sp>
+        <p:nvSpPr>
+          <p:cNvPr id="2" name="Slide Image Placeholder 1"/>
+          <p:cNvSpPr>
+            <a:spLocks noGrp="1" noRot="1" noChangeAspect="1"/>
+          </p:cNvSpPr>
+          <p:nvPr>
+            <p:ph type="sldImg"/>
+          </p:nvPr>
+        </p:nvSpPr>
+        <p:spPr/>
+      </p:sp>
+      <p:sp>
+        <p:nvSpPr>
+          <p:cNvPr id="3" name="Notes Placeholder 2"/>
+          <p:cNvSpPr>
+            <a:spLocks noGrp="1"/>
+          </p:cNvSpPr>
+          <p:nvPr>
+            <p:ph type="body" idx="1"/>
+          </p:nvPr>
+        </p:nvSpPr>
+        <p:spPr/>
+        <p:txBody>
+          <a:bodyPr>
+            <a:normAutofit/>
+          </a:bodyPr>
+          <a:lstStyle/>
+          <a:p>
+            <a:endParaRPr lang="en-US" dirty="0"/>
+          </a:p>
+        </p:txBody>
+      </p:sp>
+      <p:sp>
+        <p:nvSpPr>
+          <p:cNvPr id="4" name="Slide Number Placeholder 3"/>
+          <p:cNvSpPr>
+            <a:spLocks noGrp="1"/>
+          </p:cNvSpPr>
+          <p:nvPr>
+            <p:ph type="sldNum" sz="quarter" idx="10"/>
+          </p:nvPr>
+        </p:nvSpPr>
+        <p:spPr/>
+        <p:txBody>
+          <a:bodyPr/>
+          <a:lstStyle/>
+          <a:p>
+            <a:pPr>
+              <a:defRPr/>
+            </a:pPr>
+            <a:fld id="{1931C8FD-CC35-423B-99F4-64D81D6A80AE}" type="slidenum">
+              <a:rPr lang="en-US" smtClean="0"/>
+              <a:pPr>
+                <a:defRPr/>
+              </a:pPr>
               <a:t>22</a:t>
+            </a:fld>
+            <a:endParaRPr lang="en-US"/>
+          </a:p>
+        </p:txBody>
+      </p:sp>
+    </p:spTree>
+  </p:cSld>
+  <p:clrMapOvr>
+    <a:masterClrMapping/>
+  </p:clrMapOvr>
+</p:notes>
+</file>
+
+<file path=ppt/notesSlides/notesSlide18.xml><?xml version="1.0" encoding="utf-8"?>
+<p:notes xmlns:a="http://schemas.openxmlformats.org/drawingml/2006/main" xmlns:r="http://schemas.openxmlformats.org/officeDocument/2006/relationships" xmlns:p="http://schemas.openxmlformats.org/presentationml/2006/main">
+  <p:cSld>
+    <p:spTree>
+      <p:nvGrpSpPr>
+        <p:cNvPr id="1" name=""/>
+        <p:cNvGrpSpPr/>
+        <p:nvPr/>
+      </p:nvGrpSpPr>
+      <p:grpSpPr>
+        <a:xfrm>
+          <a:off x="0" y="0"/>
+          <a:ext cx="0" cy="0"/>
+          <a:chOff x="0" y="0"/>
+          <a:chExt cx="0" cy="0"/>
+        </a:xfrm>
+      </p:grpSpPr>
+      <p:sp>
+        <p:nvSpPr>
+          <p:cNvPr id="2" name="Slide Image Placeholder 1"/>
+          <p:cNvSpPr>
+            <a:spLocks noGrp="1" noRot="1" noChangeAspect="1"/>
+          </p:cNvSpPr>
+          <p:nvPr>
+            <p:ph type="sldImg"/>
+          </p:nvPr>
+        </p:nvSpPr>
+        <p:spPr/>
+      </p:sp>
+      <p:sp>
+        <p:nvSpPr>
+          <p:cNvPr id="3" name="Notes Placeholder 2"/>
+          <p:cNvSpPr>
+            <a:spLocks noGrp="1"/>
+          </p:cNvSpPr>
+          <p:nvPr>
+            <p:ph type="body" idx="1"/>
+          </p:nvPr>
+        </p:nvSpPr>
+        <p:spPr/>
+        <p:txBody>
+          <a:bodyPr>
+            <a:normAutofit/>
+          </a:bodyPr>
+          <a:lstStyle/>
+          <a:p>
+            <a:endParaRPr lang="en-US" dirty="0"/>
+          </a:p>
+        </p:txBody>
+      </p:sp>
+      <p:sp>
+        <p:nvSpPr>
+          <p:cNvPr id="4" name="Slide Number Placeholder 3"/>
+          <p:cNvSpPr>
+            <a:spLocks noGrp="1"/>
+          </p:cNvSpPr>
+          <p:nvPr>
+            <p:ph type="sldNum" sz="quarter" idx="10"/>
+          </p:nvPr>
+        </p:nvSpPr>
+        <p:spPr/>
+        <p:txBody>
+          <a:bodyPr/>
+          <a:lstStyle/>
+          <a:p>
+            <a:pPr>
+              <a:defRPr/>
+            </a:pPr>
+            <a:fld id="{1931C8FD-CC35-423B-99F4-64D81D6A80AE}" type="slidenum">
+              <a:rPr lang="en-US" smtClean="0"/>
+              <a:pPr>
+                <a:defRPr/>
+              </a:pPr>
+              <a:t>24</a:t>
+            </a:fld>
+            <a:endParaRPr lang="en-US"/>
+          </a:p>
+        </p:txBody>
+      </p:sp>
+    </p:spTree>
+  </p:cSld>
+  <p:clrMapOvr>
+    <a:masterClrMapping/>
+  </p:clrMapOvr>
+</p:notes>
+</file>
+
+<file path=ppt/notesSlides/notesSlide19.xml><?xml version="1.0" encoding="utf-8"?>
+<p:notes xmlns:a="http://schemas.openxmlformats.org/drawingml/2006/main" xmlns:r="http://schemas.openxmlformats.org/officeDocument/2006/relationships" xmlns:p="http://schemas.openxmlformats.org/presentationml/2006/main">
+  <p:cSld>
+    <p:spTree>
+      <p:nvGrpSpPr>
+        <p:cNvPr id="1" name=""/>
+        <p:cNvGrpSpPr/>
+        <p:nvPr/>
+      </p:nvGrpSpPr>
+      <p:grpSpPr>
+        <a:xfrm>
+          <a:off x="0" y="0"/>
+          <a:ext cx="0" cy="0"/>
+          <a:chOff x="0" y="0"/>
+          <a:chExt cx="0" cy="0"/>
+        </a:xfrm>
+      </p:grpSpPr>
+      <p:sp>
+        <p:nvSpPr>
+          <p:cNvPr id="2" name="Slide Image Placeholder 1"/>
+          <p:cNvSpPr>
+            <a:spLocks noGrp="1" noRot="1" noChangeAspect="1"/>
+          </p:cNvSpPr>
+          <p:nvPr>
+            <p:ph type="sldImg"/>
+          </p:nvPr>
+        </p:nvSpPr>
+        <p:spPr/>
+      </p:sp>
+      <p:sp>
+        <p:nvSpPr>
+          <p:cNvPr id="3" name="Notes Placeholder 2"/>
+          <p:cNvSpPr>
+            <a:spLocks noGrp="1"/>
+          </p:cNvSpPr>
+          <p:nvPr>
+            <p:ph type="body" idx="1"/>
+          </p:nvPr>
+        </p:nvSpPr>
+        <p:spPr/>
+        <p:txBody>
+          <a:bodyPr>
+            <a:normAutofit/>
+          </a:bodyPr>
+          <a:lstStyle/>
+          <a:p>
+            <a:endParaRPr lang="en-US" dirty="0"/>
+          </a:p>
+        </p:txBody>
+      </p:sp>
+      <p:sp>
+        <p:nvSpPr>
+          <p:cNvPr id="4" name="Slide Number Placeholder 3"/>
+          <p:cNvSpPr>
+            <a:spLocks noGrp="1"/>
+          </p:cNvSpPr>
+          <p:nvPr>
+            <p:ph type="sldNum" sz="quarter" idx="10"/>
+          </p:nvPr>
+        </p:nvSpPr>
+        <p:spPr/>
+        <p:txBody>
+          <a:bodyPr/>
+          <a:lstStyle/>
+          <a:p>
+            <a:pPr>
+              <a:defRPr/>
+            </a:pPr>
+            <a:fld id="{1931C8FD-CC35-423B-99F4-64D81D6A80AE}" type="slidenum">
+              <a:rPr lang="en-US" smtClean="0"/>
+              <a:pPr>
+                <a:defRPr/>
+              </a:pPr>
+              <a:t>25</a:t>
             </a:fld>
             <a:endParaRPr lang="en-US"/>
           </a:p>
@@ -3947,8 +4211,29 @@
             </a:pPr>
             <a:r>
               <a:rPr lang="en-US" sz="2000" dirty="0" smtClean="0"/>
-              <a:t>Tightly Coupled Workflow: Form Knows About Form, Presenter, and More</a:t>
+              <a:t>Tightly Coupled Workflow: </a:t>
             </a:r>
+            <a:r>
+              <a:rPr lang="en-US" sz="2000" dirty="0" smtClean="0"/>
+              <a:t>Parent Form </a:t>
+            </a:r>
+            <a:r>
+              <a:rPr lang="en-US" sz="2000" dirty="0" smtClean="0"/>
+              <a:t>Knows About </a:t>
+            </a:r>
+            <a:r>
+              <a:rPr lang="en-US" sz="2000" dirty="0" smtClean="0"/>
+              <a:t>Children Forms, Presenters, </a:t>
+            </a:r>
+            <a:r>
+              <a:rPr lang="en-US" sz="2000" dirty="0" smtClean="0"/>
+              <a:t>and </a:t>
+            </a:r>
+            <a:r>
+              <a:rPr lang="en-US" sz="2000" dirty="0" smtClean="0"/>
+              <a:t>More!</a:t>
+            </a:r>
+            <a:endParaRPr lang="en-US" sz="2000" dirty="0" smtClean="0"/>
           </a:p>
         </p:txBody>
       </p:sp>
@@ -3994,7 +4279,7 @@
         </p:nvGrpSpPr>
         <p:grpSpPr>
           <a:xfrm>
-            <a:off x="904875" y="1819275"/>
+            <a:off x="904875" y="1971675"/>
             <a:ext cx="7334250" cy="4048125"/>
             <a:chOff x="685800" y="1819275"/>
             <a:chExt cx="7334250" cy="4048125"/>
@@ -4236,7 +4521,7 @@
         </p:nvGrpSpPr>
         <p:grpSpPr>
           <a:xfrm>
-            <a:off x="904875" y="1819275"/>
+            <a:off x="904875" y="1971675"/>
             <a:ext cx="8010525" cy="4048125"/>
             <a:chOff x="904875" y="1819275"/>
             <a:chExt cx="8010525" cy="4048125"/>
@@ -4619,6 +4904,957 @@
       </p:grpSpPr>
       <p:sp>
         <p:nvSpPr>
+          <p:cNvPr id="3075" name="Text Placeholder 2"/>
+          <p:cNvSpPr>
+            <a:spLocks noGrp="1"/>
+          </p:cNvSpPr>
+          <p:nvPr>
+            <p:ph type="body" sz="quarter" idx="10"/>
+          </p:nvPr>
+        </p:nvSpPr>
+        <p:spPr>
+          <a:xfrm>
+            <a:off x="685800" y="1066800"/>
+            <a:ext cx="8229600" cy="1219200"/>
+          </a:xfrm>
+        </p:spPr>
+        <p:txBody>
+          <a:bodyPr/>
+          <a:lstStyle/>
+          <a:p>
+            <a:pPr eaLnBrk="1" hangingPunct="1">
+              <a:buNone/>
+            </a:pPr>
+            <a:r>
+              <a:rPr lang="en-US" sz="2000" dirty="0" smtClean="0"/>
+              <a:t>The Real World: How Bad The Coupling Can Get</a:t>
+            </a:r>
+          </a:p>
+          <a:p>
+            <a:pPr eaLnBrk="1" hangingPunct="1">
+              <a:buNone/>
+            </a:pPr>
+            <a:endParaRPr lang="en-US" sz="2000" dirty="0" smtClean="0"/>
+          </a:p>
+        </p:txBody>
+      </p:sp>
+      <p:sp>
+        <p:nvSpPr>
+          <p:cNvPr id="3074" name="Title 1"/>
+          <p:cNvSpPr>
+            <a:spLocks noGrp="1"/>
+          </p:cNvSpPr>
+          <p:nvPr>
+            <p:ph type="title"/>
+          </p:nvPr>
+        </p:nvSpPr>
+        <p:spPr bwMode="auto">
+          <a:noFill/>
+          <a:ln>
+            <a:miter lim="800000"/>
+            <a:headEnd/>
+            <a:tailEnd/>
+          </a:ln>
+        </p:spPr>
+        <p:txBody>
+          <a:bodyPr vert="horz" wrap="square" lIns="91440" tIns="45720" rIns="91440" bIns="45720" numCol="1" anchor="t" anchorCtr="0" compatLnSpc="1">
+            <a:prstTxWarp prst="textNoShape">
+              <a:avLst/>
+            </a:prstTxWarp>
+          </a:bodyPr>
+          <a:lstStyle/>
+          <a:p>
+            <a:pPr eaLnBrk="1" hangingPunct="1"/>
+            <a:r>
+              <a:rPr lang="en-US" dirty="0" smtClean="0"/>
+              <a:t>Simple Org Chart – v1</a:t>
+            </a:r>
+            <a:endParaRPr lang="en-US" dirty="0" smtClean="0"/>
+          </a:p>
+        </p:txBody>
+      </p:sp>
+      <p:pic>
+        <p:nvPicPr>
+          <p:cNvPr id="1035" name="Picture 11" descr="C:\Users\derickb\AppData\Local\Microsoft\Windows\Temporary Internet Files\Content.IE5\AY104AXF\MPj04276040000[1].jpg"/>
+          <p:cNvPicPr>
+            <a:picLocks noChangeAspect="1" noChangeArrowheads="1"/>
+          </p:cNvPicPr>
+          <p:nvPr/>
+        </p:nvPicPr>
+        <p:blipFill>
+          <a:blip r:embed="rId3"/>
+          <a:srcRect/>
+          <a:stretch>
+            <a:fillRect/>
+          </a:stretch>
+        </p:blipFill>
+        <p:spPr bwMode="auto">
+          <a:xfrm>
+            <a:off x="4953000" y="2743200"/>
+            <a:ext cx="3429001" cy="3429000"/>
+          </a:xfrm>
+          <a:prstGeom prst="rect">
+            <a:avLst/>
+          </a:prstGeom>
+          <a:solidFill>
+            <a:schemeClr val="bg1">
+              <a:alpha val="50000"/>
+            </a:schemeClr>
+          </a:solidFill>
+        </p:spPr>
+      </p:pic>
+      <p:pic>
+        <p:nvPicPr>
+          <p:cNvPr id="1031" name="Picture 7"/>
+          <p:cNvPicPr>
+            <a:picLocks noChangeAspect="1" noChangeArrowheads="1"/>
+          </p:cNvPicPr>
+          <p:nvPr/>
+        </p:nvPicPr>
+        <p:blipFill>
+          <a:blip r:embed="rId4"/>
+          <a:srcRect/>
+          <a:stretch>
+            <a:fillRect/>
+          </a:stretch>
+        </p:blipFill>
+        <p:spPr bwMode="auto">
+          <a:xfrm>
+            <a:off x="2438400" y="1676400"/>
+            <a:ext cx="6091693" cy="1938338"/>
+          </a:xfrm>
+          <a:prstGeom prst="rect">
+            <a:avLst/>
+          </a:prstGeom>
+          <a:noFill/>
+          <a:ln w="9525">
+            <a:noFill/>
+            <a:miter lim="800000"/>
+            <a:headEnd/>
+            <a:tailEnd/>
+          </a:ln>
+          <a:effectLst/>
+        </p:spPr>
+      </p:pic>
+      <p:sp>
+        <p:nvSpPr>
+          <p:cNvPr id="15" name="Rounded Rectangle 14"/>
+          <p:cNvSpPr/>
+          <p:nvPr/>
+        </p:nvSpPr>
+        <p:spPr>
+          <a:xfrm>
+            <a:off x="762000" y="1752600"/>
+            <a:ext cx="1219200" cy="304800"/>
+          </a:xfrm>
+          <a:prstGeom prst="roundRect">
+            <a:avLst/>
+          </a:prstGeom>
+          <a:ln>
+            <a:noFill/>
+          </a:ln>
+          <a:effectLst>
+            <a:outerShdw blurRad="149987" dist="250190" dir="8460000" algn="ctr">
+              <a:srgbClr val="000000">
+                <a:alpha val="28000"/>
+              </a:srgbClr>
+            </a:outerShdw>
+          </a:effectLst>
+          <a:scene3d>
+            <a:camera prst="orthographicFront">
+              <a:rot lat="0" lon="0" rev="0"/>
+            </a:camera>
+            <a:lightRig rig="contrasting" dir="t">
+              <a:rot lat="0" lon="0" rev="1500000"/>
+            </a:lightRig>
+          </a:scene3d>
+          <a:sp3d prstMaterial="metal">
+            <a:bevelT w="88900" h="88900"/>
+          </a:sp3d>
+        </p:spPr>
+        <p:style>
+          <a:lnRef idx="2">
+            <a:schemeClr val="accent1">
+              <a:shade val="50000"/>
+            </a:schemeClr>
+          </a:lnRef>
+          <a:fillRef idx="1">
+            <a:schemeClr val="accent1"/>
+          </a:fillRef>
+          <a:effectRef idx="0">
+            <a:schemeClr val="accent1"/>
+          </a:effectRef>
+          <a:fontRef idx="minor">
+            <a:schemeClr val="lt1"/>
+          </a:fontRef>
+        </p:style>
+        <p:txBody>
+          <a:bodyPr rtlCol="0" anchor="ctr"/>
+          <a:lstStyle/>
+          <a:p>
+            <a:pPr algn="ctr"/>
+            <a:r>
+              <a:rPr lang="en-US" sz="1400" dirty="0" smtClean="0"/>
+              <a:t>1 Button</a:t>
+            </a:r>
+            <a:endParaRPr lang="en-US" sz="1400" dirty="0"/>
+          </a:p>
+        </p:txBody>
+      </p:sp>
+      <p:sp>
+        <p:nvSpPr>
+          <p:cNvPr id="16" name="TextBox 15"/>
+          <p:cNvSpPr txBox="1"/>
+          <p:nvPr/>
+        </p:nvSpPr>
+        <p:spPr>
+          <a:xfrm>
+            <a:off x="2023646" y="1676400"/>
+            <a:ext cx="338554" cy="461665"/>
+          </a:xfrm>
+          <a:prstGeom prst="rect">
+            <a:avLst/>
+          </a:prstGeom>
+          <a:noFill/>
+          <a:ln>
+            <a:noFill/>
+          </a:ln>
+          <a:effectLst>
+            <a:outerShdw blurRad="149987" dist="250190" dir="8460000" algn="ctr">
+              <a:srgbClr val="000000">
+                <a:alpha val="28000"/>
+              </a:srgbClr>
+            </a:outerShdw>
+          </a:effectLst>
+          <a:scene3d>
+            <a:camera prst="orthographicFront">
+              <a:rot lat="0" lon="0" rev="0"/>
+            </a:camera>
+            <a:lightRig rig="contrasting" dir="t">
+              <a:rot lat="0" lon="0" rev="1500000"/>
+            </a:lightRig>
+          </a:scene3d>
+          <a:sp3d prstMaterial="metal">
+            <a:bevelT w="88900" h="88900"/>
+          </a:sp3d>
+        </p:spPr>
+        <p:txBody>
+          <a:bodyPr wrap="none" rtlCol="0">
+            <a:spAutoFit/>
+          </a:bodyPr>
+          <a:lstStyle/>
+          <a:p>
+            <a:r>
+              <a:rPr lang="en-US" sz="2400" dirty="0" smtClean="0">
+                <a:ln>
+                  <a:solidFill>
+                    <a:schemeClr val="accent1">
+                      <a:lumMod val="75000"/>
+                    </a:schemeClr>
+                  </a:solidFill>
+                </a:ln>
+                <a:latin typeface="+mn-lt"/>
+              </a:rPr>
+              <a:t>=</a:t>
+            </a:r>
+            <a:endParaRPr lang="en-US" sz="2400" dirty="0" smtClean="0">
+              <a:ln>
+                <a:solidFill>
+                  <a:schemeClr val="accent1">
+                    <a:lumMod val="75000"/>
+                  </a:schemeClr>
+                </a:solidFill>
+              </a:ln>
+              <a:latin typeface="+mn-lt"/>
+            </a:endParaRPr>
+          </a:p>
+        </p:txBody>
+      </p:sp>
+      <p:grpSp>
+        <p:nvGrpSpPr>
+          <p:cNvPr id="32" name="Group 31"/>
+          <p:cNvGrpSpPr/>
+          <p:nvPr/>
+        </p:nvGrpSpPr>
+        <p:grpSpPr>
+          <a:xfrm>
+            <a:off x="838200" y="3886200"/>
+            <a:ext cx="2590800" cy="2243138"/>
+            <a:chOff x="685800" y="3886200"/>
+            <a:chExt cx="2590800" cy="2243138"/>
+          </a:xfrm>
+        </p:grpSpPr>
+        <p:grpSp>
+          <p:nvGrpSpPr>
+            <p:cNvPr id="20" name="Group 19"/>
+            <p:cNvGrpSpPr/>
+            <p:nvPr/>
+          </p:nvGrpSpPr>
+          <p:grpSpPr>
+            <a:xfrm>
+              <a:off x="685800" y="3886200"/>
+              <a:ext cx="2590800" cy="1023938"/>
+              <a:chOff x="914400" y="1828800"/>
+              <a:chExt cx="7768093" cy="1938338"/>
+            </a:xfrm>
+          </p:grpSpPr>
+          <p:pic>
+            <p:nvPicPr>
+              <p:cNvPr id="17" name="Picture 7"/>
+              <p:cNvPicPr>
+                <a:picLocks noChangeAspect="1" noChangeArrowheads="1"/>
+              </p:cNvPicPr>
+              <p:nvPr/>
+            </p:nvPicPr>
+            <p:blipFill>
+              <a:blip r:embed="rId4"/>
+              <a:srcRect/>
+              <a:stretch>
+                <a:fillRect/>
+              </a:stretch>
+            </p:blipFill>
+            <p:spPr bwMode="auto">
+              <a:xfrm>
+                <a:off x="2590800" y="1828800"/>
+                <a:ext cx="6091693" cy="1938338"/>
+              </a:xfrm>
+              <a:prstGeom prst="rect">
+                <a:avLst/>
+              </a:prstGeom>
+              <a:noFill/>
+              <a:ln w="9525">
+                <a:noFill/>
+                <a:miter lim="800000"/>
+                <a:headEnd/>
+                <a:tailEnd/>
+              </a:ln>
+              <a:effectLst/>
+            </p:spPr>
+          </p:pic>
+          <p:sp>
+            <p:nvSpPr>
+              <p:cNvPr id="18" name="Rounded Rectangle 17"/>
+              <p:cNvSpPr/>
+              <p:nvPr/>
+            </p:nvSpPr>
+            <p:spPr>
+              <a:xfrm>
+                <a:off x="914400" y="1905000"/>
+                <a:ext cx="1219200" cy="304800"/>
+              </a:xfrm>
+              <a:prstGeom prst="roundRect">
+                <a:avLst/>
+              </a:prstGeom>
+              <a:ln>
+                <a:noFill/>
+              </a:ln>
+              <a:effectLst>
+                <a:outerShdw blurRad="149987" dist="250190" dir="8460000" algn="ctr">
+                  <a:srgbClr val="000000">
+                    <a:alpha val="28000"/>
+                  </a:srgbClr>
+                </a:outerShdw>
+              </a:effectLst>
+              <a:scene3d>
+                <a:camera prst="orthographicFront">
+                  <a:rot lat="0" lon="0" rev="0"/>
+                </a:camera>
+                <a:lightRig rig="contrasting" dir="t">
+                  <a:rot lat="0" lon="0" rev="1500000"/>
+                </a:lightRig>
+              </a:scene3d>
+              <a:sp3d prstMaterial="metal">
+                <a:bevelT w="88900" h="88900"/>
+              </a:sp3d>
+            </p:spPr>
+            <p:style>
+              <a:lnRef idx="2">
+                <a:schemeClr val="accent1">
+                  <a:shade val="50000"/>
+                </a:schemeClr>
+              </a:lnRef>
+              <a:fillRef idx="1">
+                <a:schemeClr val="accent1"/>
+              </a:fillRef>
+              <a:effectRef idx="0">
+                <a:schemeClr val="accent1"/>
+              </a:effectRef>
+              <a:fontRef idx="minor">
+                <a:schemeClr val="lt1"/>
+              </a:fontRef>
+            </p:style>
+            <p:txBody>
+              <a:bodyPr rtlCol="0" anchor="ctr"/>
+              <a:lstStyle/>
+              <a:p>
+                <a:pPr algn="ctr"/>
+                <a:r>
+                  <a:rPr lang="en-US" sz="400" dirty="0" smtClean="0"/>
+                  <a:t>1 Button</a:t>
+                </a:r>
+                <a:endParaRPr lang="en-US" sz="400" dirty="0"/>
+              </a:p>
+            </p:txBody>
+          </p:sp>
+          <p:sp>
+            <p:nvSpPr>
+              <p:cNvPr id="19" name="TextBox 18"/>
+              <p:cNvSpPr txBox="1"/>
+              <p:nvPr/>
+            </p:nvSpPr>
+            <p:spPr>
+              <a:xfrm>
+                <a:off x="2056764" y="1828800"/>
+                <a:ext cx="688268" cy="378709"/>
+              </a:xfrm>
+              <a:prstGeom prst="rect">
+                <a:avLst/>
+              </a:prstGeom>
+              <a:noFill/>
+              <a:ln>
+                <a:noFill/>
+              </a:ln>
+              <a:effectLst>
+                <a:outerShdw blurRad="149987" dist="250190" dir="8460000" algn="ctr">
+                  <a:srgbClr val="000000">
+                    <a:alpha val="28000"/>
+                  </a:srgbClr>
+                </a:outerShdw>
+              </a:effectLst>
+              <a:scene3d>
+                <a:camera prst="orthographicFront">
+                  <a:rot lat="0" lon="0" rev="0"/>
+                </a:camera>
+                <a:lightRig rig="contrasting" dir="t">
+                  <a:rot lat="0" lon="0" rev="1500000"/>
+                </a:lightRig>
+              </a:scene3d>
+              <a:sp3d prstMaterial="metal">
+                <a:bevelT w="88900" h="88900"/>
+              </a:sp3d>
+            </p:spPr>
+            <p:txBody>
+              <a:bodyPr wrap="none" rtlCol="0">
+                <a:spAutoFit/>
+              </a:bodyPr>
+              <a:lstStyle/>
+              <a:p>
+                <a:r>
+                  <a:rPr lang="en-US" sz="700" dirty="0" smtClean="0">
+                    <a:ln>
+                      <a:solidFill>
+                        <a:schemeClr val="accent1">
+                          <a:lumMod val="75000"/>
+                        </a:schemeClr>
+                      </a:solidFill>
+                    </a:ln>
+                    <a:latin typeface="+mn-lt"/>
+                  </a:rPr>
+                  <a:t>=</a:t>
+                </a:r>
+                <a:endParaRPr lang="en-US" sz="700" dirty="0" smtClean="0">
+                  <a:ln>
+                    <a:solidFill>
+                      <a:schemeClr val="accent1">
+                        <a:lumMod val="75000"/>
+                      </a:schemeClr>
+                    </a:solidFill>
+                  </a:ln>
+                  <a:latin typeface="+mn-lt"/>
+                </a:endParaRPr>
+              </a:p>
+            </p:txBody>
+          </p:sp>
+        </p:grpSp>
+        <p:grpSp>
+          <p:nvGrpSpPr>
+            <p:cNvPr id="24" name="Group 23"/>
+            <p:cNvGrpSpPr/>
+            <p:nvPr/>
+          </p:nvGrpSpPr>
+          <p:grpSpPr>
+            <a:xfrm>
+              <a:off x="685800" y="4495800"/>
+              <a:ext cx="2590800" cy="1023938"/>
+              <a:chOff x="914400" y="1828800"/>
+              <a:chExt cx="7768093" cy="1938338"/>
+            </a:xfrm>
+          </p:grpSpPr>
+          <p:pic>
+            <p:nvPicPr>
+              <p:cNvPr id="25" name="Picture 7"/>
+              <p:cNvPicPr>
+                <a:picLocks noChangeAspect="1" noChangeArrowheads="1"/>
+              </p:cNvPicPr>
+              <p:nvPr/>
+            </p:nvPicPr>
+            <p:blipFill>
+              <a:blip r:embed="rId4"/>
+              <a:srcRect/>
+              <a:stretch>
+                <a:fillRect/>
+              </a:stretch>
+            </p:blipFill>
+            <p:spPr bwMode="auto">
+              <a:xfrm>
+                <a:off x="2590800" y="1828800"/>
+                <a:ext cx="6091693" cy="1938338"/>
+              </a:xfrm>
+              <a:prstGeom prst="rect">
+                <a:avLst/>
+              </a:prstGeom>
+              <a:noFill/>
+              <a:ln w="9525">
+                <a:noFill/>
+                <a:miter lim="800000"/>
+                <a:headEnd/>
+                <a:tailEnd/>
+              </a:ln>
+              <a:effectLst/>
+            </p:spPr>
+          </p:pic>
+          <p:sp>
+            <p:nvSpPr>
+              <p:cNvPr id="26" name="Rounded Rectangle 25"/>
+              <p:cNvSpPr/>
+              <p:nvPr/>
+            </p:nvSpPr>
+            <p:spPr>
+              <a:xfrm>
+                <a:off x="914400" y="1905000"/>
+                <a:ext cx="1219200" cy="304800"/>
+              </a:xfrm>
+              <a:prstGeom prst="roundRect">
+                <a:avLst/>
+              </a:prstGeom>
+              <a:ln>
+                <a:noFill/>
+              </a:ln>
+              <a:effectLst>
+                <a:outerShdw blurRad="149987" dist="250190" dir="8460000" algn="ctr">
+                  <a:srgbClr val="000000">
+                    <a:alpha val="28000"/>
+                  </a:srgbClr>
+                </a:outerShdw>
+              </a:effectLst>
+              <a:scene3d>
+                <a:camera prst="orthographicFront">
+                  <a:rot lat="0" lon="0" rev="0"/>
+                </a:camera>
+                <a:lightRig rig="contrasting" dir="t">
+                  <a:rot lat="0" lon="0" rev="1500000"/>
+                </a:lightRig>
+              </a:scene3d>
+              <a:sp3d prstMaterial="metal">
+                <a:bevelT w="88900" h="88900"/>
+              </a:sp3d>
+            </p:spPr>
+            <p:style>
+              <a:lnRef idx="2">
+                <a:schemeClr val="accent1">
+                  <a:shade val="50000"/>
+                </a:schemeClr>
+              </a:lnRef>
+              <a:fillRef idx="1">
+                <a:schemeClr val="accent1"/>
+              </a:fillRef>
+              <a:effectRef idx="0">
+                <a:schemeClr val="accent1"/>
+              </a:effectRef>
+              <a:fontRef idx="minor">
+                <a:schemeClr val="lt1"/>
+              </a:fontRef>
+            </p:style>
+            <p:txBody>
+              <a:bodyPr rtlCol="0" anchor="ctr"/>
+              <a:lstStyle/>
+              <a:p>
+                <a:pPr algn="ctr"/>
+                <a:r>
+                  <a:rPr lang="en-US" sz="400" dirty="0" smtClean="0"/>
+                  <a:t>1 Button</a:t>
+                </a:r>
+                <a:endParaRPr lang="en-US" sz="400" dirty="0"/>
+              </a:p>
+            </p:txBody>
+          </p:sp>
+          <p:sp>
+            <p:nvSpPr>
+              <p:cNvPr id="27" name="TextBox 26"/>
+              <p:cNvSpPr txBox="1"/>
+              <p:nvPr/>
+            </p:nvSpPr>
+            <p:spPr>
+              <a:xfrm>
+                <a:off x="2056764" y="1828800"/>
+                <a:ext cx="688268" cy="378709"/>
+              </a:xfrm>
+              <a:prstGeom prst="rect">
+                <a:avLst/>
+              </a:prstGeom>
+              <a:noFill/>
+              <a:ln>
+                <a:noFill/>
+              </a:ln>
+              <a:effectLst>
+                <a:outerShdw blurRad="149987" dist="250190" dir="8460000" algn="ctr">
+                  <a:srgbClr val="000000">
+                    <a:alpha val="28000"/>
+                  </a:srgbClr>
+                </a:outerShdw>
+              </a:effectLst>
+              <a:scene3d>
+                <a:camera prst="orthographicFront">
+                  <a:rot lat="0" lon="0" rev="0"/>
+                </a:camera>
+                <a:lightRig rig="contrasting" dir="t">
+                  <a:rot lat="0" lon="0" rev="1500000"/>
+                </a:lightRig>
+              </a:scene3d>
+              <a:sp3d prstMaterial="metal">
+                <a:bevelT w="88900" h="88900"/>
+              </a:sp3d>
+            </p:spPr>
+            <p:txBody>
+              <a:bodyPr wrap="none" rtlCol="0">
+                <a:spAutoFit/>
+              </a:bodyPr>
+              <a:lstStyle/>
+              <a:p>
+                <a:r>
+                  <a:rPr lang="en-US" sz="700" dirty="0" smtClean="0">
+                    <a:ln>
+                      <a:solidFill>
+                        <a:schemeClr val="accent1">
+                          <a:lumMod val="75000"/>
+                        </a:schemeClr>
+                      </a:solidFill>
+                    </a:ln>
+                    <a:latin typeface="+mn-lt"/>
+                  </a:rPr>
+                  <a:t>=</a:t>
+                </a:r>
+                <a:endParaRPr lang="en-US" sz="700" dirty="0" smtClean="0">
+                  <a:ln>
+                    <a:solidFill>
+                      <a:schemeClr val="accent1">
+                        <a:lumMod val="75000"/>
+                      </a:schemeClr>
+                    </a:solidFill>
+                  </a:ln>
+                  <a:latin typeface="+mn-lt"/>
+                </a:endParaRPr>
+              </a:p>
+            </p:txBody>
+          </p:sp>
+        </p:grpSp>
+        <p:grpSp>
+          <p:nvGrpSpPr>
+            <p:cNvPr id="28" name="Group 27"/>
+            <p:cNvGrpSpPr/>
+            <p:nvPr/>
+          </p:nvGrpSpPr>
+          <p:grpSpPr>
+            <a:xfrm>
+              <a:off x="685800" y="5105400"/>
+              <a:ext cx="2590800" cy="1023938"/>
+              <a:chOff x="914400" y="1828800"/>
+              <a:chExt cx="7768093" cy="1938338"/>
+            </a:xfrm>
+          </p:grpSpPr>
+          <p:pic>
+            <p:nvPicPr>
+              <p:cNvPr id="29" name="Picture 7"/>
+              <p:cNvPicPr>
+                <a:picLocks noChangeAspect="1" noChangeArrowheads="1"/>
+              </p:cNvPicPr>
+              <p:nvPr/>
+            </p:nvPicPr>
+            <p:blipFill>
+              <a:blip r:embed="rId4"/>
+              <a:srcRect/>
+              <a:stretch>
+                <a:fillRect/>
+              </a:stretch>
+            </p:blipFill>
+            <p:spPr bwMode="auto">
+              <a:xfrm>
+                <a:off x="2590800" y="1828800"/>
+                <a:ext cx="6091693" cy="1938338"/>
+              </a:xfrm>
+              <a:prstGeom prst="rect">
+                <a:avLst/>
+              </a:prstGeom>
+              <a:noFill/>
+              <a:ln w="9525">
+                <a:noFill/>
+                <a:miter lim="800000"/>
+                <a:headEnd/>
+                <a:tailEnd/>
+              </a:ln>
+              <a:effectLst/>
+            </p:spPr>
+          </p:pic>
+          <p:sp>
+            <p:nvSpPr>
+              <p:cNvPr id="30" name="Rounded Rectangle 29"/>
+              <p:cNvSpPr/>
+              <p:nvPr/>
+            </p:nvSpPr>
+            <p:spPr>
+              <a:xfrm>
+                <a:off x="914400" y="1905000"/>
+                <a:ext cx="1219200" cy="304800"/>
+              </a:xfrm>
+              <a:prstGeom prst="roundRect">
+                <a:avLst/>
+              </a:prstGeom>
+              <a:ln>
+                <a:noFill/>
+              </a:ln>
+              <a:effectLst>
+                <a:outerShdw blurRad="149987" dist="250190" dir="8460000" algn="ctr">
+                  <a:srgbClr val="000000">
+                    <a:alpha val="28000"/>
+                  </a:srgbClr>
+                </a:outerShdw>
+              </a:effectLst>
+              <a:scene3d>
+                <a:camera prst="orthographicFront">
+                  <a:rot lat="0" lon="0" rev="0"/>
+                </a:camera>
+                <a:lightRig rig="contrasting" dir="t">
+                  <a:rot lat="0" lon="0" rev="1500000"/>
+                </a:lightRig>
+              </a:scene3d>
+              <a:sp3d prstMaterial="metal">
+                <a:bevelT w="88900" h="88900"/>
+              </a:sp3d>
+            </p:spPr>
+            <p:style>
+              <a:lnRef idx="2">
+                <a:schemeClr val="accent1">
+                  <a:shade val="50000"/>
+                </a:schemeClr>
+              </a:lnRef>
+              <a:fillRef idx="1">
+                <a:schemeClr val="accent1"/>
+              </a:fillRef>
+              <a:effectRef idx="0">
+                <a:schemeClr val="accent1"/>
+              </a:effectRef>
+              <a:fontRef idx="minor">
+                <a:schemeClr val="lt1"/>
+              </a:fontRef>
+            </p:style>
+            <p:txBody>
+              <a:bodyPr rtlCol="0" anchor="ctr"/>
+              <a:lstStyle/>
+              <a:p>
+                <a:pPr algn="ctr"/>
+                <a:r>
+                  <a:rPr lang="en-US" sz="400" dirty="0" smtClean="0"/>
+                  <a:t>1 Button</a:t>
+                </a:r>
+                <a:endParaRPr lang="en-US" sz="400" dirty="0"/>
+              </a:p>
+            </p:txBody>
+          </p:sp>
+          <p:sp>
+            <p:nvSpPr>
+              <p:cNvPr id="31" name="TextBox 30"/>
+              <p:cNvSpPr txBox="1"/>
+              <p:nvPr/>
+            </p:nvSpPr>
+            <p:spPr>
+              <a:xfrm>
+                <a:off x="2056764" y="1828800"/>
+                <a:ext cx="688268" cy="378709"/>
+              </a:xfrm>
+              <a:prstGeom prst="rect">
+                <a:avLst/>
+              </a:prstGeom>
+              <a:noFill/>
+              <a:ln>
+                <a:noFill/>
+              </a:ln>
+              <a:effectLst>
+                <a:outerShdw blurRad="149987" dist="250190" dir="8460000" algn="ctr">
+                  <a:srgbClr val="000000">
+                    <a:alpha val="28000"/>
+                  </a:srgbClr>
+                </a:outerShdw>
+              </a:effectLst>
+              <a:scene3d>
+                <a:camera prst="orthographicFront">
+                  <a:rot lat="0" lon="0" rev="0"/>
+                </a:camera>
+                <a:lightRig rig="contrasting" dir="t">
+                  <a:rot lat="0" lon="0" rev="1500000"/>
+                </a:lightRig>
+              </a:scene3d>
+              <a:sp3d prstMaterial="metal">
+                <a:bevelT w="88900" h="88900"/>
+              </a:sp3d>
+            </p:spPr>
+            <p:txBody>
+              <a:bodyPr wrap="none" rtlCol="0">
+                <a:spAutoFit/>
+              </a:bodyPr>
+              <a:lstStyle/>
+              <a:p>
+                <a:r>
+                  <a:rPr lang="en-US" sz="700" dirty="0" smtClean="0">
+                    <a:ln>
+                      <a:solidFill>
+                        <a:schemeClr val="accent1">
+                          <a:lumMod val="75000"/>
+                        </a:schemeClr>
+                      </a:solidFill>
+                    </a:ln>
+                    <a:latin typeface="+mn-lt"/>
+                  </a:rPr>
+                  <a:t>=</a:t>
+                </a:r>
+                <a:endParaRPr lang="en-US" sz="700" dirty="0" smtClean="0">
+                  <a:ln>
+                    <a:solidFill>
+                      <a:schemeClr val="accent1">
+                        <a:lumMod val="75000"/>
+                      </a:schemeClr>
+                    </a:solidFill>
+                  </a:ln>
+                  <a:latin typeface="+mn-lt"/>
+                </a:endParaRPr>
+              </a:p>
+            </p:txBody>
+          </p:sp>
+        </p:grpSp>
+      </p:grpSp>
+    </p:spTree>
+  </p:cSld>
+  <p:clrMapOvr>
+    <a:masterClrMapping/>
+  </p:clrMapOvr>
+  <p:timing>
+    <p:tnLst>
+      <p:par>
+        <p:cTn id="1" dur="indefinite" restart="never" nodeType="tmRoot"/>
+      </p:par>
+    </p:tnLst>
+  </p:timing>
+</p:sld>
+</file>
+
+<file path=ppt/slides/slide15.xml><?xml version="1.0" encoding="utf-8"?>
+<p:sld xmlns:a="http://schemas.openxmlformats.org/drawingml/2006/main" xmlns:r="http://schemas.openxmlformats.org/officeDocument/2006/relationships" xmlns:p="http://schemas.openxmlformats.org/presentationml/2006/main">
+  <p:cSld>
+    <p:spTree>
+      <p:nvGrpSpPr>
+        <p:cNvPr id="1" name=""/>
+        <p:cNvGrpSpPr/>
+        <p:nvPr/>
+      </p:nvGrpSpPr>
+      <p:grpSpPr>
+        <a:xfrm>
+          <a:off x="0" y="0"/>
+          <a:ext cx="0" cy="0"/>
+          <a:chOff x="0" y="0"/>
+          <a:chExt cx="0" cy="0"/>
+        </a:xfrm>
+      </p:grpSpPr>
+      <p:sp>
+        <p:nvSpPr>
+          <p:cNvPr id="3075" name="Text Placeholder 2"/>
+          <p:cNvSpPr>
+            <a:spLocks noGrp="1"/>
+          </p:cNvSpPr>
+          <p:nvPr>
+            <p:ph type="body" sz="quarter" idx="10"/>
+          </p:nvPr>
+        </p:nvSpPr>
+        <p:spPr>
+          <a:xfrm>
+            <a:off x="685800" y="1066800"/>
+            <a:ext cx="8229600" cy="1219200"/>
+          </a:xfrm>
+        </p:spPr>
+        <p:txBody>
+          <a:bodyPr/>
+          <a:lstStyle/>
+          <a:p>
+            <a:pPr eaLnBrk="1" hangingPunct="1">
+              <a:buNone/>
+            </a:pPr>
+            <a:endParaRPr lang="en-US" sz="2000" dirty="0" smtClean="0"/>
+          </a:p>
+        </p:txBody>
+      </p:sp>
+      <p:sp>
+        <p:nvSpPr>
+          <p:cNvPr id="3074" name="Title 1"/>
+          <p:cNvSpPr>
+            <a:spLocks noGrp="1"/>
+          </p:cNvSpPr>
+          <p:nvPr>
+            <p:ph type="title"/>
+          </p:nvPr>
+        </p:nvSpPr>
+        <p:spPr bwMode="auto">
+          <a:noFill/>
+          <a:ln>
+            <a:miter lim="800000"/>
+            <a:headEnd/>
+            <a:tailEnd/>
+          </a:ln>
+        </p:spPr>
+        <p:txBody>
+          <a:bodyPr vert="horz" wrap="square" lIns="91440" tIns="45720" rIns="91440" bIns="45720" numCol="1" anchor="t" anchorCtr="0" compatLnSpc="1">
+            <a:prstTxWarp prst="textNoShape">
+              <a:avLst/>
+            </a:prstTxWarp>
+          </a:bodyPr>
+          <a:lstStyle/>
+          <a:p>
+            <a:pPr eaLnBrk="1" hangingPunct="1"/>
+            <a:endParaRPr lang="en-US" dirty="0" smtClean="0"/>
+          </a:p>
+        </p:txBody>
+      </p:sp>
+    </p:spTree>
+  </p:cSld>
+  <p:clrMapOvr>
+    <a:masterClrMapping/>
+  </p:clrMapOvr>
+  <p:timing>
+    <p:tnLst>
+      <p:par>
+        <p:cTn id="1" dur="indefinite" restart="never" nodeType="tmRoot"/>
+      </p:par>
+    </p:tnLst>
+  </p:timing>
+</p:sld>
+</file>
+
+<file path=ppt/slides/slide16.xml><?xml version="1.0" encoding="utf-8"?>
+<p:sld xmlns:a="http://schemas.openxmlformats.org/drawingml/2006/main" xmlns:r="http://schemas.openxmlformats.org/officeDocument/2006/relationships" xmlns:p="http://schemas.openxmlformats.org/presentationml/2006/main">
+  <p:cSld>
+    <p:spTree>
+      <p:nvGrpSpPr>
+        <p:cNvPr id="1" name=""/>
+        <p:cNvGrpSpPr/>
+        <p:nvPr/>
+      </p:nvGrpSpPr>
+      <p:grpSpPr>
+        <a:xfrm>
+          <a:off x="0" y="0"/>
+          <a:ext cx="0" cy="0"/>
+          <a:chOff x="0" y="0"/>
+          <a:chExt cx="0" cy="0"/>
+        </a:xfrm>
+      </p:grpSpPr>
+      <p:sp>
+        <p:nvSpPr>
           <p:cNvPr id="4" name="Rectangle 3"/>
           <p:cNvSpPr/>
           <p:nvPr/>
@@ -4937,186 +6173,6 @@
 </p:sld>
 </file>
 
-<file path=ppt/slides/slide15.xml><?xml version="1.0" encoding="utf-8"?>
-<p:sld xmlns:a="http://schemas.openxmlformats.org/drawingml/2006/main" xmlns:r="http://schemas.openxmlformats.org/officeDocument/2006/relationships" xmlns:p="http://schemas.openxmlformats.org/presentationml/2006/main">
-  <p:cSld>
-    <p:spTree>
-      <p:nvGrpSpPr>
-        <p:cNvPr id="1" name=""/>
-        <p:cNvGrpSpPr/>
-        <p:nvPr/>
-      </p:nvGrpSpPr>
-      <p:grpSpPr>
-        <a:xfrm>
-          <a:off x="0" y="0"/>
-          <a:ext cx="0" cy="0"/>
-          <a:chOff x="0" y="0"/>
-          <a:chExt cx="0" cy="0"/>
-        </a:xfrm>
-      </p:grpSpPr>
-      <p:sp>
-        <p:nvSpPr>
-          <p:cNvPr id="3075" name="Text Placeholder 2"/>
-          <p:cNvSpPr>
-            <a:spLocks noGrp="1"/>
-          </p:cNvSpPr>
-          <p:nvPr>
-            <p:ph type="body" sz="quarter" idx="10"/>
-          </p:nvPr>
-        </p:nvSpPr>
-        <p:spPr>
-          <a:xfrm>
-            <a:off x="685800" y="1066800"/>
-            <a:ext cx="8229600" cy="1219200"/>
-          </a:xfrm>
-        </p:spPr>
-        <p:txBody>
-          <a:bodyPr/>
-          <a:lstStyle/>
-          <a:p>
-            <a:pPr eaLnBrk="1" hangingPunct="1">
-              <a:buNone/>
-            </a:pPr>
-            <a:endParaRPr lang="en-US" sz="2000" dirty="0" smtClean="0"/>
-          </a:p>
-        </p:txBody>
-      </p:sp>
-      <p:sp>
-        <p:nvSpPr>
-          <p:cNvPr id="3074" name="Title 1"/>
-          <p:cNvSpPr>
-            <a:spLocks noGrp="1"/>
-          </p:cNvSpPr>
-          <p:nvPr>
-            <p:ph type="title"/>
-          </p:nvPr>
-        </p:nvSpPr>
-        <p:spPr bwMode="auto">
-          <a:noFill/>
-          <a:ln>
-            <a:miter lim="800000"/>
-            <a:headEnd/>
-            <a:tailEnd/>
-          </a:ln>
-        </p:spPr>
-        <p:txBody>
-          <a:bodyPr vert="horz" wrap="square" lIns="91440" tIns="45720" rIns="91440" bIns="45720" numCol="1" anchor="t" anchorCtr="0" compatLnSpc="1">
-            <a:prstTxWarp prst="textNoShape">
-              <a:avLst/>
-            </a:prstTxWarp>
-          </a:bodyPr>
-          <a:lstStyle/>
-          <a:p>
-            <a:pPr eaLnBrk="1" hangingPunct="1"/>
-            <a:endParaRPr lang="en-US" dirty="0" smtClean="0"/>
-          </a:p>
-        </p:txBody>
-      </p:sp>
-    </p:spTree>
-  </p:cSld>
-  <p:clrMapOvr>
-    <a:masterClrMapping/>
-  </p:clrMapOvr>
-  <p:timing>
-    <p:tnLst>
-      <p:par>
-        <p:cTn id="1" dur="indefinite" restart="never" nodeType="tmRoot"/>
-      </p:par>
-    </p:tnLst>
-  </p:timing>
-</p:sld>
-</file>
-
-<file path=ppt/slides/slide16.xml><?xml version="1.0" encoding="utf-8"?>
-<p:sld xmlns:a="http://schemas.openxmlformats.org/drawingml/2006/main" xmlns:r="http://schemas.openxmlformats.org/officeDocument/2006/relationships" xmlns:p="http://schemas.openxmlformats.org/presentationml/2006/main">
-  <p:cSld>
-    <p:spTree>
-      <p:nvGrpSpPr>
-        <p:cNvPr id="1" name=""/>
-        <p:cNvGrpSpPr/>
-        <p:nvPr/>
-      </p:nvGrpSpPr>
-      <p:grpSpPr>
-        <a:xfrm>
-          <a:off x="0" y="0"/>
-          <a:ext cx="0" cy="0"/>
-          <a:chOff x="0" y="0"/>
-          <a:chExt cx="0" cy="0"/>
-        </a:xfrm>
-      </p:grpSpPr>
-      <p:sp>
-        <p:nvSpPr>
-          <p:cNvPr id="3075" name="Text Placeholder 2"/>
-          <p:cNvSpPr>
-            <a:spLocks noGrp="1"/>
-          </p:cNvSpPr>
-          <p:nvPr>
-            <p:ph type="body" sz="quarter" idx="10"/>
-          </p:nvPr>
-        </p:nvSpPr>
-        <p:spPr>
-          <a:xfrm>
-            <a:off x="685800" y="1066800"/>
-            <a:ext cx="8229600" cy="1219200"/>
-          </a:xfrm>
-        </p:spPr>
-        <p:txBody>
-          <a:bodyPr/>
-          <a:lstStyle/>
-          <a:p>
-            <a:pPr eaLnBrk="1" hangingPunct="1">
-              <a:buNone/>
-            </a:pPr>
-            <a:endParaRPr lang="en-US" sz="2000" dirty="0" smtClean="0"/>
-          </a:p>
-        </p:txBody>
-      </p:sp>
-      <p:sp>
-        <p:nvSpPr>
-          <p:cNvPr id="3074" name="Title 1"/>
-          <p:cNvSpPr>
-            <a:spLocks noGrp="1"/>
-          </p:cNvSpPr>
-          <p:nvPr>
-            <p:ph type="title"/>
-          </p:nvPr>
-        </p:nvSpPr>
-        <p:spPr bwMode="auto">
-          <a:noFill/>
-          <a:ln>
-            <a:miter lim="800000"/>
-            <a:headEnd/>
-            <a:tailEnd/>
-          </a:ln>
-        </p:spPr>
-        <p:txBody>
-          <a:bodyPr vert="horz" wrap="square" lIns="91440" tIns="45720" rIns="91440" bIns="45720" numCol="1" anchor="t" anchorCtr="0" compatLnSpc="1">
-            <a:prstTxWarp prst="textNoShape">
-              <a:avLst/>
-            </a:prstTxWarp>
-          </a:bodyPr>
-          <a:lstStyle/>
-          <a:p>
-            <a:pPr eaLnBrk="1" hangingPunct="1"/>
-            <a:endParaRPr lang="en-US" dirty="0" smtClean="0"/>
-          </a:p>
-        </p:txBody>
-      </p:sp>
-    </p:spTree>
-  </p:cSld>
-  <p:clrMapOvr>
-    <a:masterClrMapping/>
-  </p:clrMapOvr>
-  <p:timing>
-    <p:tnLst>
-      <p:par>
-        <p:cTn id="1" dur="indefinite" restart="never" nodeType="tmRoot"/>
-      </p:par>
-    </p:tnLst>
-  </p:timing>
-</p:sld>
-</file>
-
 <file path=ppt/slides/slide17.xml><?xml version="1.0" encoding="utf-8"?>
 <p:sld xmlns:a="http://schemas.openxmlformats.org/drawingml/2006/main" xmlns:r="http://schemas.openxmlformats.org/officeDocument/2006/relationships" xmlns:p="http://schemas.openxmlformats.org/presentationml/2006/main">
   <p:cSld>
@@ -5136,300 +6192,59 @@
       </p:grpSpPr>
       <p:sp>
         <p:nvSpPr>
-          <p:cNvPr id="4" name="Rectangle 3"/>
-          <p:cNvSpPr/>
-          <p:nvPr/>
+          <p:cNvPr id="3075" name="Text Placeholder 2"/>
+          <p:cNvSpPr>
+            <a:spLocks noGrp="1"/>
+          </p:cNvSpPr>
+          <p:nvPr>
+            <p:ph type="body" sz="quarter" idx="10"/>
+          </p:nvPr>
         </p:nvSpPr>
         <p:spPr>
           <a:xfrm>
-            <a:off x="0" y="0"/>
-            <a:ext cx="9144000" cy="4648200"/>
+            <a:off x="685800" y="1066800"/>
+            <a:ext cx="8229600" cy="1219200"/>
           </a:xfrm>
-          <a:prstGeom prst="rect">
-            <a:avLst/>
-          </a:prstGeom>
-          <a:solidFill>
-            <a:srgbClr val="0069AA"/>
-          </a:solidFill>
+        </p:spPr>
+        <p:txBody>
+          <a:bodyPr/>
+          <a:lstStyle/>
+          <a:p>
+            <a:pPr eaLnBrk="1" hangingPunct="1">
+              <a:buNone/>
+            </a:pPr>
+            <a:endParaRPr lang="en-US" sz="2000" dirty="0" smtClean="0"/>
+          </a:p>
+        </p:txBody>
+      </p:sp>
+      <p:sp>
+        <p:nvSpPr>
+          <p:cNvPr id="3074" name="Title 1"/>
+          <p:cNvSpPr>
+            <a:spLocks noGrp="1"/>
+          </p:cNvSpPr>
+          <p:nvPr>
+            <p:ph type="title"/>
+          </p:nvPr>
+        </p:nvSpPr>
+        <p:spPr bwMode="auto">
+          <a:noFill/>
           <a:ln>
-            <a:noFill/>
-          </a:ln>
-        </p:spPr>
-        <p:style>
-          <a:lnRef idx="2">
-            <a:schemeClr val="accent1">
-              <a:shade val="50000"/>
-            </a:schemeClr>
-          </a:lnRef>
-          <a:fillRef idx="1">
-            <a:schemeClr val="accent1"/>
-          </a:fillRef>
-          <a:effectRef idx="0">
-            <a:schemeClr val="accent1"/>
-          </a:effectRef>
-          <a:fontRef idx="minor">
-            <a:schemeClr val="lt1"/>
-          </a:fontRef>
-        </p:style>
-        <p:txBody>
-          <a:bodyPr anchor="ctr"/>
-          <a:lstStyle/>
-          <a:p>
-            <a:pPr algn="ctr">
-              <a:defRPr/>
-            </a:pPr>
-            <a:endParaRPr lang="en-US"/>
-          </a:p>
-        </p:txBody>
-      </p:sp>
-      <p:pic>
-        <p:nvPicPr>
-          <p:cNvPr id="4099" name="Picture 4" descr="MAT logo 1 CMYK"/>
-          <p:cNvPicPr>
-            <a:picLocks noChangeAspect="1" noChangeArrowheads="1"/>
-          </p:cNvPicPr>
-          <p:nvPr/>
-        </p:nvPicPr>
-        <p:blipFill>
-          <a:blip r:embed="rId2">
-            <a:clrChange>
-              <a:clrFrom>
-                <a:srgbClr val="FDFDFD"/>
-              </a:clrFrom>
-              <a:clrTo>
-                <a:srgbClr val="FDFDFD">
-                  <a:alpha val="0"/>
-                </a:srgbClr>
-              </a:clrTo>
-            </a:clrChange>
-          </a:blip>
-          <a:srcRect/>
-          <a:stretch>
-            <a:fillRect/>
-          </a:stretch>
-        </p:blipFill>
-        <p:spPr bwMode="auto">
-          <a:xfrm>
-            <a:off x="2971800" y="4800600"/>
-            <a:ext cx="2819400" cy="1338263"/>
-          </a:xfrm>
-          <a:prstGeom prst="rect">
-            <a:avLst/>
-          </a:prstGeom>
-          <a:noFill/>
-          <a:ln w="9525">
-            <a:noFill/>
             <a:miter lim="800000"/>
             <a:headEnd/>
             <a:tailEnd/>
           </a:ln>
         </p:spPr>
-      </p:pic>
-      <p:sp>
-        <p:nvSpPr>
-          <p:cNvPr id="5" name="Rectangle 4"/>
-          <p:cNvSpPr/>
-          <p:nvPr/>
-        </p:nvSpPr>
-        <p:spPr>
-          <a:xfrm>
-            <a:off x="0" y="4724400"/>
-            <a:ext cx="9144000" cy="2133600"/>
-          </a:xfrm>
-          <a:prstGeom prst="rect">
-            <a:avLst/>
-          </a:prstGeom>
-          <a:solidFill>
-            <a:srgbClr val="E31937"/>
-          </a:solidFill>
-          <a:ln>
-            <a:noFill/>
-          </a:ln>
-        </p:spPr>
-        <p:style>
-          <a:lnRef idx="2">
-            <a:schemeClr val="accent1">
-              <a:shade val="50000"/>
-            </a:schemeClr>
-          </a:lnRef>
-          <a:fillRef idx="1">
-            <a:schemeClr val="accent1"/>
-          </a:fillRef>
-          <a:effectRef idx="0">
-            <a:schemeClr val="accent1"/>
-          </a:effectRef>
-          <a:fontRef idx="minor">
-            <a:schemeClr val="lt1"/>
-          </a:fontRef>
-        </p:style>
-        <p:txBody>
-          <a:bodyPr anchor="ctr"/>
-          <a:lstStyle/>
-          <a:p>
-            <a:pPr algn="ctr">
-              <a:defRPr/>
-            </a:pPr>
-            <a:endParaRPr lang="en-US"/>
-          </a:p>
-        </p:txBody>
-      </p:sp>
-      <p:sp>
-        <p:nvSpPr>
-          <p:cNvPr id="10" name="Rectangle 9"/>
-          <p:cNvSpPr/>
-          <p:nvPr/>
-        </p:nvSpPr>
-        <p:spPr bwMode="auto">
-          <a:xfrm>
-            <a:off x="228600" y="0"/>
-            <a:ext cx="104775" cy="2325688"/>
-          </a:xfrm>
-          <a:prstGeom prst="rect">
-            <a:avLst/>
-          </a:prstGeom>
-          <a:solidFill>
-            <a:srgbClr val="E31937"/>
-          </a:solidFill>
-          <a:ln>
-            <a:noFill/>
-          </a:ln>
-        </p:spPr>
-        <p:style>
-          <a:lnRef idx="2">
-            <a:schemeClr val="accent1">
-              <a:shade val="50000"/>
-            </a:schemeClr>
-          </a:lnRef>
-          <a:fillRef idx="1">
-            <a:schemeClr val="accent1"/>
-          </a:fillRef>
-          <a:effectRef idx="0">
-            <a:schemeClr val="accent1"/>
-          </a:effectRef>
-          <a:fontRef idx="minor">
-            <a:schemeClr val="lt1"/>
-          </a:fontRef>
-        </p:style>
-        <p:txBody>
-          <a:bodyPr anchor="ctr"/>
-          <a:lstStyle/>
-          <a:p>
-            <a:pPr algn="ctr">
-              <a:defRPr/>
-            </a:pPr>
-            <a:endParaRPr lang="en-US"/>
-          </a:p>
-        </p:txBody>
-      </p:sp>
-      <p:pic>
-        <p:nvPicPr>
-          <p:cNvPr id="4103" name="Picture 7" descr="MAT logo vertical_red.emf"/>
-          <p:cNvPicPr>
-            <a:picLocks noChangeAspect="1"/>
-          </p:cNvPicPr>
-          <p:nvPr/>
-        </p:nvPicPr>
-        <p:blipFill>
-          <a:blip r:embed="rId3"/>
-          <a:srcRect/>
-          <a:stretch>
-            <a:fillRect/>
-          </a:stretch>
-        </p:blipFill>
-        <p:spPr bwMode="auto">
-          <a:xfrm>
-            <a:off x="3600450" y="5334000"/>
-            <a:ext cx="1981200" cy="969963"/>
-          </a:xfrm>
-          <a:prstGeom prst="rect">
-            <a:avLst/>
-          </a:prstGeom>
-          <a:noFill/>
-          <a:ln w="9525">
-            <a:noFill/>
-            <a:miter lim="800000"/>
-            <a:headEnd/>
-            <a:tailEnd/>
-          </a:ln>
-        </p:spPr>
-      </p:pic>
-      <p:sp>
-        <p:nvSpPr>
-          <p:cNvPr id="9" name="TextBox 8"/>
-          <p:cNvSpPr txBox="1"/>
-          <p:nvPr/>
-        </p:nvSpPr>
-        <p:spPr>
-          <a:xfrm>
-            <a:off x="381000" y="1447800"/>
-            <a:ext cx="8610600" cy="646331"/>
-          </a:xfrm>
-          <a:prstGeom prst="rect">
-            <a:avLst/>
-          </a:prstGeom>
-          <a:noFill/>
-        </p:spPr>
-        <p:txBody>
-          <a:bodyPr>
-            <a:spAutoFit/>
+        <p:txBody>
+          <a:bodyPr vert="horz" wrap="square" lIns="91440" tIns="45720" rIns="91440" bIns="45720" numCol="1" anchor="t" anchorCtr="0" compatLnSpc="1">
+            <a:prstTxWarp prst="textNoShape">
+              <a:avLst/>
+            </a:prstTxWarp>
           </a:bodyPr>
           <a:lstStyle/>
           <a:p>
-            <a:pPr>
-              <a:defRPr/>
-            </a:pPr>
-            <a:r>
-              <a:rPr lang="en-US" sz="3600" spc="60" dirty="0" smtClean="0">
-                <a:solidFill>
-                  <a:schemeClr val="bg1"/>
-                </a:solidFill>
-                <a:latin typeface="Calibri" pitchFamily="34" charset="0"/>
-              </a:rPr>
-              <a:t>Simple Org Chart Version 3</a:t>
-            </a:r>
-            <a:endParaRPr lang="en-US" sz="3600" spc="60" dirty="0">
-              <a:solidFill>
-                <a:schemeClr val="bg1"/>
-              </a:solidFill>
-              <a:latin typeface="Calibri" pitchFamily="34" charset="0"/>
-            </a:endParaRPr>
-          </a:p>
-        </p:txBody>
-      </p:sp>
-      <p:sp>
-        <p:nvSpPr>
-          <p:cNvPr id="11" name="TextBox 10"/>
-          <p:cNvSpPr txBox="1"/>
-          <p:nvPr/>
-        </p:nvSpPr>
-        <p:spPr>
-          <a:xfrm>
-            <a:off x="381000" y="2057400"/>
-            <a:ext cx="7543800" cy="338554"/>
-          </a:xfrm>
-          <a:prstGeom prst="rect">
-            <a:avLst/>
-          </a:prstGeom>
-          <a:noFill/>
-        </p:spPr>
-        <p:txBody>
-          <a:bodyPr wrap="square">
-            <a:spAutoFit/>
-          </a:bodyPr>
-          <a:lstStyle/>
-          <a:p>
-            <a:pPr>
-              <a:defRPr/>
-            </a:pPr>
-            <a:r>
-              <a:rPr lang="en-US" sz="1600" dirty="0" smtClean="0">
-                <a:solidFill>
-                  <a:schemeClr val="bg1"/>
-                </a:solidFill>
-                <a:latin typeface="+mn-lt"/>
-              </a:rPr>
-              <a:t>Introducing An Event Aggregator</a:t>
-            </a:r>
+            <a:pPr eaLnBrk="1" hangingPunct="1"/>
+            <a:endParaRPr lang="en-US" dirty="0" smtClean="0"/>
           </a:p>
         </p:txBody>
       </p:sp>
@@ -5488,6 +6303,14 @@
             <a:pPr eaLnBrk="1" hangingPunct="1">
               <a:buNone/>
             </a:pPr>
+            <a:r>
+              <a:rPr lang="en-US" sz="2000" dirty="0" smtClean="0"/>
+              <a:t>Workflow Coupling With </a:t>
+            </a:r>
+            <a:r>
+              <a:rPr lang="en-US" sz="2000" dirty="0" err="1" smtClean="0"/>
+              <a:t>ICommand</a:t>
+            </a:r>
             <a:endParaRPr lang="en-US" sz="2000" dirty="0" smtClean="0"/>
           </a:p>
         </p:txBody>
@@ -5519,10 +6342,40 @@
           <a:lstStyle/>
           <a:p>
             <a:pPr eaLnBrk="1" hangingPunct="1"/>
+            <a:r>
+              <a:rPr lang="en-US" dirty="0" smtClean="0"/>
+              <a:t>Simple Org Chart – v2</a:t>
+            </a:r>
             <a:endParaRPr lang="en-US" dirty="0" smtClean="0"/>
           </a:p>
         </p:txBody>
       </p:sp>
+      <p:pic>
+        <p:nvPicPr>
+          <p:cNvPr id="4" name="Picture 6" descr="X:\Derick-GitHub\Presentation And Training Material\Decoupling Workflow With App Controler\doc\Real World Workflow Coupling.jpg"/>
+          <p:cNvPicPr>
+            <a:picLocks noChangeAspect="1" noChangeArrowheads="1"/>
+          </p:cNvPicPr>
+          <p:nvPr/>
+        </p:nvPicPr>
+        <p:blipFill>
+          <a:blip r:embed="rId3"/>
+          <a:srcRect/>
+          <a:stretch>
+            <a:fillRect/>
+          </a:stretch>
+        </p:blipFill>
+        <p:spPr bwMode="auto">
+          <a:xfrm>
+            <a:off x="838200" y="1575550"/>
+            <a:ext cx="5638799" cy="4901450"/>
+          </a:xfrm>
+          <a:prstGeom prst="rect">
+            <a:avLst/>
+          </a:prstGeom>
+          <a:noFill/>
+        </p:spPr>
+      </p:pic>
     </p:spTree>
   </p:cSld>
   <p:clrMapOvr>
@@ -6119,7 +6972,7 @@
                 </a:solidFill>
                 <a:latin typeface="Calibri" pitchFamily="34" charset="0"/>
               </a:rPr>
-              <a:t>Simple Org Chart – Final Version</a:t>
+              <a:t>Simple Org Chart Version 3</a:t>
             </a:r>
             <a:endParaRPr lang="en-US" sz="3600" spc="60" dirty="0">
               <a:solidFill>
@@ -6162,25 +7015,7 @@
                 </a:solidFill>
                 <a:latin typeface="+mn-lt"/>
               </a:rPr>
-              <a:t>Orchestration With An Application Controller And </a:t>
-            </a:r>
-            <a:r>
-              <a:rPr lang="en-US" sz="1600" dirty="0" err="1" smtClean="0">
-                <a:solidFill>
-                  <a:schemeClr val="bg1"/>
-                </a:solidFill>
-                <a:latin typeface="+mn-lt"/>
-              </a:rPr>
-              <a:t>IoC</a:t>
-            </a:r>
-            <a:r>
-              <a:rPr lang="en-US" sz="1600" dirty="0" smtClean="0">
-                <a:solidFill>
-                  <a:schemeClr val="bg1"/>
-                </a:solidFill>
-                <a:latin typeface="+mn-lt"/>
-              </a:rPr>
-              <a:t> Container</a:t>
+              <a:t>Introducing An Event Aggregator</a:t>
             </a:r>
           </a:p>
         </p:txBody>
@@ -6381,6 +7216,535 @@
 </file>
 
 <file path=ppt/slides/slide23.xml><?xml version="1.0" encoding="utf-8"?>
+<p:sld xmlns:a="http://schemas.openxmlformats.org/drawingml/2006/main" xmlns:r="http://schemas.openxmlformats.org/officeDocument/2006/relationships" xmlns:p="http://schemas.openxmlformats.org/presentationml/2006/main">
+  <p:cSld>
+    <p:spTree>
+      <p:nvGrpSpPr>
+        <p:cNvPr id="1" name=""/>
+        <p:cNvGrpSpPr/>
+        <p:nvPr/>
+      </p:nvGrpSpPr>
+      <p:grpSpPr>
+        <a:xfrm>
+          <a:off x="0" y="0"/>
+          <a:ext cx="0" cy="0"/>
+          <a:chOff x="0" y="0"/>
+          <a:chExt cx="0" cy="0"/>
+        </a:xfrm>
+      </p:grpSpPr>
+      <p:sp>
+        <p:nvSpPr>
+          <p:cNvPr id="4" name="Rectangle 3"/>
+          <p:cNvSpPr/>
+          <p:nvPr/>
+        </p:nvSpPr>
+        <p:spPr>
+          <a:xfrm>
+            <a:off x="0" y="0"/>
+            <a:ext cx="9144000" cy="4648200"/>
+          </a:xfrm>
+          <a:prstGeom prst="rect">
+            <a:avLst/>
+          </a:prstGeom>
+          <a:solidFill>
+            <a:srgbClr val="0069AA"/>
+          </a:solidFill>
+          <a:ln>
+            <a:noFill/>
+          </a:ln>
+        </p:spPr>
+        <p:style>
+          <a:lnRef idx="2">
+            <a:schemeClr val="accent1">
+              <a:shade val="50000"/>
+            </a:schemeClr>
+          </a:lnRef>
+          <a:fillRef idx="1">
+            <a:schemeClr val="accent1"/>
+          </a:fillRef>
+          <a:effectRef idx="0">
+            <a:schemeClr val="accent1"/>
+          </a:effectRef>
+          <a:fontRef idx="minor">
+            <a:schemeClr val="lt1"/>
+          </a:fontRef>
+        </p:style>
+        <p:txBody>
+          <a:bodyPr anchor="ctr"/>
+          <a:lstStyle/>
+          <a:p>
+            <a:pPr algn="ctr">
+              <a:defRPr/>
+            </a:pPr>
+            <a:endParaRPr lang="en-US"/>
+          </a:p>
+        </p:txBody>
+      </p:sp>
+      <p:pic>
+        <p:nvPicPr>
+          <p:cNvPr id="4099" name="Picture 4" descr="MAT logo 1 CMYK"/>
+          <p:cNvPicPr>
+            <a:picLocks noChangeAspect="1" noChangeArrowheads="1"/>
+          </p:cNvPicPr>
+          <p:nvPr/>
+        </p:nvPicPr>
+        <p:blipFill>
+          <a:blip r:embed="rId2">
+            <a:clrChange>
+              <a:clrFrom>
+                <a:srgbClr val="FDFDFD"/>
+              </a:clrFrom>
+              <a:clrTo>
+                <a:srgbClr val="FDFDFD">
+                  <a:alpha val="0"/>
+                </a:srgbClr>
+              </a:clrTo>
+            </a:clrChange>
+          </a:blip>
+          <a:srcRect/>
+          <a:stretch>
+            <a:fillRect/>
+          </a:stretch>
+        </p:blipFill>
+        <p:spPr bwMode="auto">
+          <a:xfrm>
+            <a:off x="2971800" y="4800600"/>
+            <a:ext cx="2819400" cy="1338263"/>
+          </a:xfrm>
+          <a:prstGeom prst="rect">
+            <a:avLst/>
+          </a:prstGeom>
+          <a:noFill/>
+          <a:ln w="9525">
+            <a:noFill/>
+            <a:miter lim="800000"/>
+            <a:headEnd/>
+            <a:tailEnd/>
+          </a:ln>
+        </p:spPr>
+      </p:pic>
+      <p:sp>
+        <p:nvSpPr>
+          <p:cNvPr id="5" name="Rectangle 4"/>
+          <p:cNvSpPr/>
+          <p:nvPr/>
+        </p:nvSpPr>
+        <p:spPr>
+          <a:xfrm>
+            <a:off x="0" y="4724400"/>
+            <a:ext cx="9144000" cy="2133600"/>
+          </a:xfrm>
+          <a:prstGeom prst="rect">
+            <a:avLst/>
+          </a:prstGeom>
+          <a:solidFill>
+            <a:srgbClr val="E31937"/>
+          </a:solidFill>
+          <a:ln>
+            <a:noFill/>
+          </a:ln>
+        </p:spPr>
+        <p:style>
+          <a:lnRef idx="2">
+            <a:schemeClr val="accent1">
+              <a:shade val="50000"/>
+            </a:schemeClr>
+          </a:lnRef>
+          <a:fillRef idx="1">
+            <a:schemeClr val="accent1"/>
+          </a:fillRef>
+          <a:effectRef idx="0">
+            <a:schemeClr val="accent1"/>
+          </a:effectRef>
+          <a:fontRef idx="minor">
+            <a:schemeClr val="lt1"/>
+          </a:fontRef>
+        </p:style>
+        <p:txBody>
+          <a:bodyPr anchor="ctr"/>
+          <a:lstStyle/>
+          <a:p>
+            <a:pPr algn="ctr">
+              <a:defRPr/>
+            </a:pPr>
+            <a:endParaRPr lang="en-US"/>
+          </a:p>
+        </p:txBody>
+      </p:sp>
+      <p:sp>
+        <p:nvSpPr>
+          <p:cNvPr id="10" name="Rectangle 9"/>
+          <p:cNvSpPr/>
+          <p:nvPr/>
+        </p:nvSpPr>
+        <p:spPr bwMode="auto">
+          <a:xfrm>
+            <a:off x="228600" y="0"/>
+            <a:ext cx="104775" cy="2325688"/>
+          </a:xfrm>
+          <a:prstGeom prst="rect">
+            <a:avLst/>
+          </a:prstGeom>
+          <a:solidFill>
+            <a:srgbClr val="E31937"/>
+          </a:solidFill>
+          <a:ln>
+            <a:noFill/>
+          </a:ln>
+        </p:spPr>
+        <p:style>
+          <a:lnRef idx="2">
+            <a:schemeClr val="accent1">
+              <a:shade val="50000"/>
+            </a:schemeClr>
+          </a:lnRef>
+          <a:fillRef idx="1">
+            <a:schemeClr val="accent1"/>
+          </a:fillRef>
+          <a:effectRef idx="0">
+            <a:schemeClr val="accent1"/>
+          </a:effectRef>
+          <a:fontRef idx="minor">
+            <a:schemeClr val="lt1"/>
+          </a:fontRef>
+        </p:style>
+        <p:txBody>
+          <a:bodyPr anchor="ctr"/>
+          <a:lstStyle/>
+          <a:p>
+            <a:pPr algn="ctr">
+              <a:defRPr/>
+            </a:pPr>
+            <a:endParaRPr lang="en-US"/>
+          </a:p>
+        </p:txBody>
+      </p:sp>
+      <p:pic>
+        <p:nvPicPr>
+          <p:cNvPr id="4103" name="Picture 7" descr="MAT logo vertical_red.emf"/>
+          <p:cNvPicPr>
+            <a:picLocks noChangeAspect="1"/>
+          </p:cNvPicPr>
+          <p:nvPr/>
+        </p:nvPicPr>
+        <p:blipFill>
+          <a:blip r:embed="rId3"/>
+          <a:srcRect/>
+          <a:stretch>
+            <a:fillRect/>
+          </a:stretch>
+        </p:blipFill>
+        <p:spPr bwMode="auto">
+          <a:xfrm>
+            <a:off x="3600450" y="5334000"/>
+            <a:ext cx="1981200" cy="969963"/>
+          </a:xfrm>
+          <a:prstGeom prst="rect">
+            <a:avLst/>
+          </a:prstGeom>
+          <a:noFill/>
+          <a:ln w="9525">
+            <a:noFill/>
+            <a:miter lim="800000"/>
+            <a:headEnd/>
+            <a:tailEnd/>
+          </a:ln>
+        </p:spPr>
+      </p:pic>
+      <p:sp>
+        <p:nvSpPr>
+          <p:cNvPr id="9" name="TextBox 8"/>
+          <p:cNvSpPr txBox="1"/>
+          <p:nvPr/>
+        </p:nvSpPr>
+        <p:spPr>
+          <a:xfrm>
+            <a:off x="381000" y="1447800"/>
+            <a:ext cx="8610600" cy="646331"/>
+          </a:xfrm>
+          <a:prstGeom prst="rect">
+            <a:avLst/>
+          </a:prstGeom>
+          <a:noFill/>
+        </p:spPr>
+        <p:txBody>
+          <a:bodyPr>
+            <a:spAutoFit/>
+          </a:bodyPr>
+          <a:lstStyle/>
+          <a:p>
+            <a:pPr>
+              <a:defRPr/>
+            </a:pPr>
+            <a:r>
+              <a:rPr lang="en-US" sz="3600" spc="60" dirty="0" smtClean="0">
+                <a:solidFill>
+                  <a:schemeClr val="bg1"/>
+                </a:solidFill>
+                <a:latin typeface="Calibri" pitchFamily="34" charset="0"/>
+              </a:rPr>
+              <a:t>Simple Org Chart – Final Version</a:t>
+            </a:r>
+            <a:endParaRPr lang="en-US" sz="3600" spc="60" dirty="0">
+              <a:solidFill>
+                <a:schemeClr val="bg1"/>
+              </a:solidFill>
+              <a:latin typeface="Calibri" pitchFamily="34" charset="0"/>
+            </a:endParaRPr>
+          </a:p>
+        </p:txBody>
+      </p:sp>
+      <p:sp>
+        <p:nvSpPr>
+          <p:cNvPr id="11" name="TextBox 10"/>
+          <p:cNvSpPr txBox="1"/>
+          <p:nvPr/>
+        </p:nvSpPr>
+        <p:spPr>
+          <a:xfrm>
+            <a:off x="381000" y="2057400"/>
+            <a:ext cx="7543800" cy="338554"/>
+          </a:xfrm>
+          <a:prstGeom prst="rect">
+            <a:avLst/>
+          </a:prstGeom>
+          <a:noFill/>
+        </p:spPr>
+        <p:txBody>
+          <a:bodyPr wrap="square">
+            <a:spAutoFit/>
+          </a:bodyPr>
+          <a:lstStyle/>
+          <a:p>
+            <a:pPr>
+              <a:defRPr/>
+            </a:pPr>
+            <a:r>
+              <a:rPr lang="en-US" sz="1600" dirty="0" smtClean="0">
+                <a:solidFill>
+                  <a:schemeClr val="bg1"/>
+                </a:solidFill>
+                <a:latin typeface="+mn-lt"/>
+              </a:rPr>
+              <a:t>Orchestration With An Application Controller And </a:t>
+            </a:r>
+            <a:r>
+              <a:rPr lang="en-US" sz="1600" dirty="0" err="1" smtClean="0">
+                <a:solidFill>
+                  <a:schemeClr val="bg1"/>
+                </a:solidFill>
+                <a:latin typeface="+mn-lt"/>
+              </a:rPr>
+              <a:t>IoC</a:t>
+            </a:r>
+            <a:r>
+              <a:rPr lang="en-US" sz="1600" dirty="0" smtClean="0">
+                <a:solidFill>
+                  <a:schemeClr val="bg1"/>
+                </a:solidFill>
+                <a:latin typeface="+mn-lt"/>
+              </a:rPr>
+              <a:t> Container</a:t>
+            </a:r>
+          </a:p>
+        </p:txBody>
+      </p:sp>
+    </p:spTree>
+  </p:cSld>
+  <p:clrMapOvr>
+    <a:masterClrMapping/>
+  </p:clrMapOvr>
+  <p:timing>
+    <p:tnLst>
+      <p:par>
+        <p:cTn id="1" dur="indefinite" restart="never" nodeType="tmRoot"/>
+      </p:par>
+    </p:tnLst>
+  </p:timing>
+</p:sld>
+</file>
+
+<file path=ppt/slides/slide24.xml><?xml version="1.0" encoding="utf-8"?>
+<p:sld xmlns:a="http://schemas.openxmlformats.org/drawingml/2006/main" xmlns:r="http://schemas.openxmlformats.org/officeDocument/2006/relationships" xmlns:p="http://schemas.openxmlformats.org/presentationml/2006/main">
+  <p:cSld>
+    <p:spTree>
+      <p:nvGrpSpPr>
+        <p:cNvPr id="1" name=""/>
+        <p:cNvGrpSpPr/>
+        <p:nvPr/>
+      </p:nvGrpSpPr>
+      <p:grpSpPr>
+        <a:xfrm>
+          <a:off x="0" y="0"/>
+          <a:ext cx="0" cy="0"/>
+          <a:chOff x="0" y="0"/>
+          <a:chExt cx="0" cy="0"/>
+        </a:xfrm>
+      </p:grpSpPr>
+      <p:sp>
+        <p:nvSpPr>
+          <p:cNvPr id="3075" name="Text Placeholder 2"/>
+          <p:cNvSpPr>
+            <a:spLocks noGrp="1"/>
+          </p:cNvSpPr>
+          <p:nvPr>
+            <p:ph type="body" sz="quarter" idx="10"/>
+          </p:nvPr>
+        </p:nvSpPr>
+        <p:spPr>
+          <a:xfrm>
+            <a:off x="685800" y="1066800"/>
+            <a:ext cx="8229600" cy="1219200"/>
+          </a:xfrm>
+        </p:spPr>
+        <p:txBody>
+          <a:bodyPr/>
+          <a:lstStyle/>
+          <a:p>
+            <a:pPr eaLnBrk="1" hangingPunct="1">
+              <a:buNone/>
+            </a:pPr>
+            <a:endParaRPr lang="en-US" sz="2000" dirty="0" smtClean="0"/>
+          </a:p>
+        </p:txBody>
+      </p:sp>
+      <p:sp>
+        <p:nvSpPr>
+          <p:cNvPr id="3074" name="Title 1"/>
+          <p:cNvSpPr>
+            <a:spLocks noGrp="1"/>
+          </p:cNvSpPr>
+          <p:nvPr>
+            <p:ph type="title"/>
+          </p:nvPr>
+        </p:nvSpPr>
+        <p:spPr bwMode="auto">
+          <a:noFill/>
+          <a:ln>
+            <a:miter lim="800000"/>
+            <a:headEnd/>
+            <a:tailEnd/>
+          </a:ln>
+        </p:spPr>
+        <p:txBody>
+          <a:bodyPr vert="horz" wrap="square" lIns="91440" tIns="45720" rIns="91440" bIns="45720" numCol="1" anchor="t" anchorCtr="0" compatLnSpc="1">
+            <a:prstTxWarp prst="textNoShape">
+              <a:avLst/>
+            </a:prstTxWarp>
+          </a:bodyPr>
+          <a:lstStyle/>
+          <a:p>
+            <a:pPr eaLnBrk="1" hangingPunct="1"/>
+            <a:endParaRPr lang="en-US" dirty="0" smtClean="0"/>
+          </a:p>
+        </p:txBody>
+      </p:sp>
+    </p:spTree>
+  </p:cSld>
+  <p:clrMapOvr>
+    <a:masterClrMapping/>
+  </p:clrMapOvr>
+  <p:timing>
+    <p:tnLst>
+      <p:par>
+        <p:cTn id="1" dur="indefinite" restart="never" nodeType="tmRoot"/>
+      </p:par>
+    </p:tnLst>
+  </p:timing>
+</p:sld>
+</file>
+
+<file path=ppt/slides/slide25.xml><?xml version="1.0" encoding="utf-8"?>
+<p:sld xmlns:a="http://schemas.openxmlformats.org/drawingml/2006/main" xmlns:r="http://schemas.openxmlformats.org/officeDocument/2006/relationships" xmlns:p="http://schemas.openxmlformats.org/presentationml/2006/main">
+  <p:cSld>
+    <p:spTree>
+      <p:nvGrpSpPr>
+        <p:cNvPr id="1" name=""/>
+        <p:cNvGrpSpPr/>
+        <p:nvPr/>
+      </p:nvGrpSpPr>
+      <p:grpSpPr>
+        <a:xfrm>
+          <a:off x="0" y="0"/>
+          <a:ext cx="0" cy="0"/>
+          <a:chOff x="0" y="0"/>
+          <a:chExt cx="0" cy="0"/>
+        </a:xfrm>
+      </p:grpSpPr>
+      <p:sp>
+        <p:nvSpPr>
+          <p:cNvPr id="3075" name="Text Placeholder 2"/>
+          <p:cNvSpPr>
+            <a:spLocks noGrp="1"/>
+          </p:cNvSpPr>
+          <p:nvPr>
+            <p:ph type="body" sz="quarter" idx="10"/>
+          </p:nvPr>
+        </p:nvSpPr>
+        <p:spPr>
+          <a:xfrm>
+            <a:off x="685800" y="1066800"/>
+            <a:ext cx="8229600" cy="1219200"/>
+          </a:xfrm>
+        </p:spPr>
+        <p:txBody>
+          <a:bodyPr/>
+          <a:lstStyle/>
+          <a:p>
+            <a:pPr eaLnBrk="1" hangingPunct="1">
+              <a:buNone/>
+            </a:pPr>
+            <a:endParaRPr lang="en-US" sz="2000" dirty="0" smtClean="0"/>
+          </a:p>
+        </p:txBody>
+      </p:sp>
+      <p:sp>
+        <p:nvSpPr>
+          <p:cNvPr id="3074" name="Title 1"/>
+          <p:cNvSpPr>
+            <a:spLocks noGrp="1"/>
+          </p:cNvSpPr>
+          <p:nvPr>
+            <p:ph type="title"/>
+          </p:nvPr>
+        </p:nvSpPr>
+        <p:spPr bwMode="auto">
+          <a:noFill/>
+          <a:ln>
+            <a:miter lim="800000"/>
+            <a:headEnd/>
+            <a:tailEnd/>
+          </a:ln>
+        </p:spPr>
+        <p:txBody>
+          <a:bodyPr vert="horz" wrap="square" lIns="91440" tIns="45720" rIns="91440" bIns="45720" numCol="1" anchor="t" anchorCtr="0" compatLnSpc="1">
+            <a:prstTxWarp prst="textNoShape">
+              <a:avLst/>
+            </a:prstTxWarp>
+          </a:bodyPr>
+          <a:lstStyle/>
+          <a:p>
+            <a:pPr eaLnBrk="1" hangingPunct="1"/>
+            <a:endParaRPr lang="en-US" dirty="0" smtClean="0"/>
+          </a:p>
+        </p:txBody>
+      </p:sp>
+    </p:spTree>
+  </p:cSld>
+  <p:clrMapOvr>
+    <a:masterClrMapping/>
+  </p:clrMapOvr>
+  <p:timing>
+    <p:tnLst>
+      <p:par>
+        <p:cTn id="1" dur="indefinite" restart="never" nodeType="tmRoot"/>
+      </p:par>
+    </p:tnLst>
+  </p:timing>
+</p:sld>
+</file>
+
+<file path=ppt/slides/slide26.xml><?xml version="1.0" encoding="utf-8"?>
 <p:sld xmlns:a="http://schemas.openxmlformats.org/drawingml/2006/main" xmlns:r="http://schemas.openxmlformats.org/officeDocument/2006/relationships" xmlns:p="http://schemas.openxmlformats.org/presentationml/2006/main">
   <p:cSld>
     <p:spTree>
@@ -6926,7 +8290,7 @@
 </p:sld>
 </file>
 
-<file path=ppt/slides/slide24.xml><?xml version="1.0" encoding="utf-8"?>
+<file path=ppt/slides/slide27.xml><?xml version="1.0" encoding="utf-8"?>
 <p:sld xmlns:a="http://schemas.openxmlformats.org/drawingml/2006/main" xmlns:r="http://schemas.openxmlformats.org/officeDocument/2006/relationships" xmlns:p="http://schemas.openxmlformats.org/presentationml/2006/main">
   <p:cSld>
     <p:spTree>

</xml_diff>

<commit_message>
adding command pattern info the presentation, for v2 of the code. need to get the command pattern code in place, so i can finish this portion of the slides.
</commit_message>
<xml_diff>
--- a/Decoupling Workflow With App Controler/Decoupling Workflow From Forms.pptx
+++ b/Decoupling Workflow With App Controler/Decoupling Workflow From Forms.pptx
@@ -5,10 +5,10 @@
     <p:sldMasterId id="2147483822" r:id="rId4"/>
   </p:sldMasterIdLst>
   <p:notesMasterIdLst>
-    <p:notesMasterId r:id="rId32"/>
+    <p:notesMasterId r:id="rId33"/>
   </p:notesMasterIdLst>
   <p:handoutMasterIdLst>
-    <p:handoutMasterId r:id="rId33"/>
+    <p:handoutMasterId r:id="rId34"/>
   </p:handoutMasterIdLst>
   <p:sldIdLst>
     <p:sldId id="256" r:id="rId5"/>
@@ -20,34 +20,35 @@
     <p:sldId id="283" r:id="rId11"/>
     <p:sldId id="291" r:id="rId12"/>
     <p:sldId id="282" r:id="rId13"/>
-    <p:sldId id="287" r:id="rId14"/>
-    <p:sldId id="280" r:id="rId15"/>
-    <p:sldId id="281" r:id="rId16"/>
-    <p:sldId id="286" r:id="rId17"/>
-    <p:sldId id="296" r:id="rId18"/>
-    <p:sldId id="279" r:id="rId19"/>
-    <p:sldId id="278" r:id="rId20"/>
-    <p:sldId id="295" r:id="rId21"/>
-    <p:sldId id="297" r:id="rId22"/>
-    <p:sldId id="285" r:id="rId23"/>
-    <p:sldId id="276" r:id="rId24"/>
-    <p:sldId id="277" r:id="rId25"/>
-    <p:sldId id="284" r:id="rId26"/>
-    <p:sldId id="292" r:id="rId27"/>
-    <p:sldId id="293" r:id="rId28"/>
-    <p:sldId id="294" r:id="rId29"/>
-    <p:sldId id="259" r:id="rId30"/>
-    <p:sldId id="274" r:id="rId31"/>
+    <p:sldId id="280" r:id="rId14"/>
+    <p:sldId id="281" r:id="rId15"/>
+    <p:sldId id="286" r:id="rId16"/>
+    <p:sldId id="296" r:id="rId17"/>
+    <p:sldId id="278" r:id="rId18"/>
+    <p:sldId id="295" r:id="rId19"/>
+    <p:sldId id="285" r:id="rId20"/>
+    <p:sldId id="299" r:id="rId21"/>
+    <p:sldId id="300" r:id="rId22"/>
+    <p:sldId id="298" r:id="rId23"/>
+    <p:sldId id="297" r:id="rId24"/>
+    <p:sldId id="276" r:id="rId25"/>
+    <p:sldId id="277" r:id="rId26"/>
+    <p:sldId id="284" r:id="rId27"/>
+    <p:sldId id="292" r:id="rId28"/>
+    <p:sldId id="293" r:id="rId29"/>
+    <p:sldId id="294" r:id="rId30"/>
+    <p:sldId id="259" r:id="rId31"/>
+    <p:sldId id="274" r:id="rId32"/>
   </p:sldIdLst>
   <p:sldSz cx="9144000" cy="6858000" type="screen4x3"/>
   <p:notesSz cx="7010400" cy="9296400"/>
   <p:embeddedFontLst>
     <p:embeddedFont>
       <p:font typeface="Calibri" pitchFamily="34" charset="0"/>
-      <p:regular r:id="rId34"/>
-      <p:bold r:id="rId35"/>
-      <p:italic r:id="rId36"/>
-      <p:boldItalic r:id="rId37"/>
+      <p:regular r:id="rId35"/>
+      <p:bold r:id="rId36"/>
+      <p:italic r:id="rId37"/>
+      <p:boldItalic r:id="rId38"/>
     </p:embeddedFont>
   </p:embeddedFontLst>
   <p:defaultTextStyle>
@@ -998,7 +999,7 @@
               <a:pPr>
                 <a:defRPr/>
               </a:pPr>
-              <a:t>14</a:t>
+              <a:t>15</a:t>
             </a:fld>
             <a:endParaRPr lang="en-US"/>
           </a:p>
@@ -1085,7 +1086,7 @@
               <a:pPr>
                 <a:defRPr/>
               </a:pPr>
-              <a:t>15</a:t>
+              <a:t>16</a:t>
             </a:fld>
             <a:endParaRPr lang="en-US"/>
           </a:p>
@@ -1433,7 +1434,7 @@
               <a:pPr>
                 <a:defRPr/>
               </a:pPr>
-              <a:t>21</a:t>
+              <a:t>20</a:t>
             </a:fld>
             <a:endParaRPr lang="en-US"/>
           </a:p>
@@ -1607,7 +1608,7 @@
               <a:pPr>
                 <a:defRPr/>
               </a:pPr>
-              <a:t>24</a:t>
+              <a:t>23</a:t>
             </a:fld>
             <a:endParaRPr lang="en-US"/>
           </a:p>
@@ -1795,6 +1796,93 @@
 </p:notes>
 </file>
 
+<file path=ppt/notesSlides/notesSlide20.xml><?xml version="1.0" encoding="utf-8"?>
+<p:notes xmlns:a="http://schemas.openxmlformats.org/drawingml/2006/main" xmlns:r="http://schemas.openxmlformats.org/officeDocument/2006/relationships" xmlns:p="http://schemas.openxmlformats.org/presentationml/2006/main">
+  <p:cSld>
+    <p:spTree>
+      <p:nvGrpSpPr>
+        <p:cNvPr id="1" name=""/>
+        <p:cNvGrpSpPr/>
+        <p:nvPr/>
+      </p:nvGrpSpPr>
+      <p:grpSpPr>
+        <a:xfrm>
+          <a:off x="0" y="0"/>
+          <a:ext cx="0" cy="0"/>
+          <a:chOff x="0" y="0"/>
+          <a:chExt cx="0" cy="0"/>
+        </a:xfrm>
+      </p:grpSpPr>
+      <p:sp>
+        <p:nvSpPr>
+          <p:cNvPr id="2" name="Slide Image Placeholder 1"/>
+          <p:cNvSpPr>
+            <a:spLocks noGrp="1" noRot="1" noChangeAspect="1"/>
+          </p:cNvSpPr>
+          <p:nvPr>
+            <p:ph type="sldImg"/>
+          </p:nvPr>
+        </p:nvSpPr>
+        <p:spPr/>
+      </p:sp>
+      <p:sp>
+        <p:nvSpPr>
+          <p:cNvPr id="3" name="Notes Placeholder 2"/>
+          <p:cNvSpPr>
+            <a:spLocks noGrp="1"/>
+          </p:cNvSpPr>
+          <p:nvPr>
+            <p:ph type="body" idx="1"/>
+          </p:nvPr>
+        </p:nvSpPr>
+        <p:spPr/>
+        <p:txBody>
+          <a:bodyPr>
+            <a:normAutofit/>
+          </a:bodyPr>
+          <a:lstStyle/>
+          <a:p>
+            <a:endParaRPr lang="en-US" dirty="0"/>
+          </a:p>
+        </p:txBody>
+      </p:sp>
+      <p:sp>
+        <p:nvSpPr>
+          <p:cNvPr id="4" name="Slide Number Placeholder 3"/>
+          <p:cNvSpPr>
+            <a:spLocks noGrp="1"/>
+          </p:cNvSpPr>
+          <p:nvPr>
+            <p:ph type="sldNum" sz="quarter" idx="10"/>
+          </p:nvPr>
+        </p:nvSpPr>
+        <p:spPr/>
+        <p:txBody>
+          <a:bodyPr/>
+          <a:lstStyle/>
+          <a:p>
+            <a:pPr>
+              <a:defRPr/>
+            </a:pPr>
+            <a:fld id="{1931C8FD-CC35-423B-99F4-64D81D6A80AE}" type="slidenum">
+              <a:rPr lang="en-US" smtClean="0"/>
+              <a:pPr>
+                <a:defRPr/>
+              </a:pPr>
+              <a:t>26</a:t>
+            </a:fld>
+            <a:endParaRPr lang="en-US"/>
+          </a:p>
+        </p:txBody>
+      </p:sp>
+    </p:spTree>
+  </p:cSld>
+  <p:clrMapOvr>
+    <a:masterClrMapping/>
+  </p:clrMapOvr>
+</p:notes>
+</file>
+
 <file path=ppt/notesSlides/notesSlide3.xml><?xml version="1.0" encoding="utf-8"?>
 <p:notes xmlns:a="http://schemas.openxmlformats.org/drawingml/2006/main" xmlns:r="http://schemas.openxmlformats.org/officeDocument/2006/relationships" xmlns:p="http://schemas.openxmlformats.org/presentationml/2006/main">
   <p:cSld>
@@ -2303,7 +2391,7 @@
               <a:pPr>
                 <a:defRPr/>
               </a:pPr>
-              <a:t>10</a:t>
+              <a:t>11</a:t>
             </a:fld>
             <a:endParaRPr lang="en-US"/>
           </a:p>
@@ -3761,96 +3849,6 @@
       </p:grpSpPr>
       <p:sp>
         <p:nvSpPr>
-          <p:cNvPr id="3075" name="Text Placeholder 2"/>
-          <p:cNvSpPr>
-            <a:spLocks noGrp="1"/>
-          </p:cNvSpPr>
-          <p:nvPr>
-            <p:ph type="body" sz="quarter" idx="10"/>
-          </p:nvPr>
-        </p:nvSpPr>
-        <p:spPr>
-          <a:xfrm>
-            <a:off x="685800" y="1066800"/>
-            <a:ext cx="8229600" cy="1219200"/>
-          </a:xfrm>
-        </p:spPr>
-        <p:txBody>
-          <a:bodyPr/>
-          <a:lstStyle/>
-          <a:p>
-            <a:pPr eaLnBrk="1" hangingPunct="1">
-              <a:buNone/>
-            </a:pPr>
-            <a:endParaRPr lang="en-US" sz="2000" dirty="0" smtClean="0"/>
-          </a:p>
-        </p:txBody>
-      </p:sp>
-      <p:sp>
-        <p:nvSpPr>
-          <p:cNvPr id="3074" name="Title 1"/>
-          <p:cNvSpPr>
-            <a:spLocks noGrp="1"/>
-          </p:cNvSpPr>
-          <p:nvPr>
-            <p:ph type="title"/>
-          </p:nvPr>
-        </p:nvSpPr>
-        <p:spPr bwMode="auto">
-          <a:noFill/>
-          <a:ln>
-            <a:miter lim="800000"/>
-            <a:headEnd/>
-            <a:tailEnd/>
-          </a:ln>
-        </p:spPr>
-        <p:txBody>
-          <a:bodyPr vert="horz" wrap="square" lIns="91440" tIns="45720" rIns="91440" bIns="45720" numCol="1" anchor="t" anchorCtr="0" compatLnSpc="1">
-            <a:prstTxWarp prst="textNoShape">
-              <a:avLst/>
-            </a:prstTxWarp>
-          </a:bodyPr>
-          <a:lstStyle/>
-          <a:p>
-            <a:pPr eaLnBrk="1" hangingPunct="1"/>
-            <a:endParaRPr lang="en-US" dirty="0" smtClean="0"/>
-          </a:p>
-        </p:txBody>
-      </p:sp>
-    </p:spTree>
-  </p:cSld>
-  <p:clrMapOvr>
-    <a:masterClrMapping/>
-  </p:clrMapOvr>
-  <p:timing>
-    <p:tnLst>
-      <p:par>
-        <p:cTn id="1" dur="indefinite" restart="never" nodeType="tmRoot"/>
-      </p:par>
-    </p:tnLst>
-  </p:timing>
-</p:sld>
-</file>
-
-<file path=ppt/slides/slide11.xml><?xml version="1.0" encoding="utf-8"?>
-<p:sld xmlns:a="http://schemas.openxmlformats.org/drawingml/2006/main" xmlns:r="http://schemas.openxmlformats.org/officeDocument/2006/relationships" xmlns:p="http://schemas.openxmlformats.org/presentationml/2006/main">
-  <p:cSld>
-    <p:spTree>
-      <p:nvGrpSpPr>
-        <p:cNvPr id="1" name=""/>
-        <p:cNvGrpSpPr/>
-        <p:nvPr/>
-      </p:nvGrpSpPr>
-      <p:grpSpPr>
-        <a:xfrm>
-          <a:off x="0" y="0"/>
-          <a:ext cx="0" cy="0"/>
-          <a:chOff x="0" y="0"/>
-          <a:chExt cx="0" cy="0"/>
-        </a:xfrm>
-      </p:grpSpPr>
-      <p:sp>
-        <p:nvSpPr>
           <p:cNvPr id="4" name="Rectangle 3"/>
           <p:cNvSpPr/>
           <p:nvPr/>
@@ -4169,7 +4167,7 @@
 </p:sld>
 </file>
 
-<file path=ppt/slides/slide12.xml><?xml version="1.0" encoding="utf-8"?>
+<file path=ppt/slides/slide11.xml><?xml version="1.0" encoding="utf-8"?>
 <p:sld xmlns:a="http://schemas.openxmlformats.org/drawingml/2006/main" xmlns:r="http://schemas.openxmlformats.org/officeDocument/2006/relationships" xmlns:p="http://schemas.openxmlformats.org/presentationml/2006/main">
   <p:cSld>
     <p:spTree>
@@ -4211,29 +4209,8 @@
             </a:pPr>
             <a:r>
               <a:rPr lang="en-US" sz="2000" dirty="0" smtClean="0"/>
-              <a:t>Tightly Coupled Workflow: </a:t>
+              <a:t>Tightly Coupled Workflow: Parent Form Knows About Children Forms, Presenters, and More!</a:t>
             </a:r>
-            <a:r>
-              <a:rPr lang="en-US" sz="2000" dirty="0" smtClean="0"/>
-              <a:t>Parent Form </a:t>
-            </a:r>
-            <a:r>
-              <a:rPr lang="en-US" sz="2000" dirty="0" smtClean="0"/>
-              <a:t>Knows About </a:t>
-            </a:r>
-            <a:r>
-              <a:rPr lang="en-US" sz="2000" dirty="0" smtClean="0"/>
-              <a:t>Children Forms, Presenters, </a:t>
-            </a:r>
-            <a:r>
-              <a:rPr lang="en-US" sz="2000" dirty="0" smtClean="0"/>
-              <a:t>and </a:t>
-            </a:r>
-            <a:r>
-              <a:rPr lang="en-US" sz="2000" dirty="0" smtClean="0"/>
-              <a:t>More!</a:t>
-            </a:r>
-            <a:endParaRPr lang="en-US" sz="2000" dirty="0" smtClean="0"/>
           </a:p>
         </p:txBody>
       </p:sp>
@@ -4432,7 +4409,7 @@
 </p:sld>
 </file>
 
-<file path=ppt/slides/slide13.xml><?xml version="1.0" encoding="utf-8"?>
+<file path=ppt/slides/slide12.xml><?xml version="1.0" encoding="utf-8"?>
 <p:sld xmlns:a="http://schemas.openxmlformats.org/drawingml/2006/main" xmlns:r="http://schemas.openxmlformats.org/officeDocument/2006/relationships" xmlns:p="http://schemas.openxmlformats.org/presentationml/2006/main">
   <p:cSld>
     <p:spTree>
@@ -4885,7 +4862,7 @@
 </p:sld>
 </file>
 
-<file path=ppt/slides/slide14.xml><?xml version="1.0" encoding="utf-8"?>
+<file path=ppt/slides/slide13.xml><?xml version="1.0" encoding="utf-8"?>
 <p:sld xmlns:a="http://schemas.openxmlformats.org/drawingml/2006/main" xmlns:r="http://schemas.openxmlformats.org/officeDocument/2006/relationships" xmlns:p="http://schemas.openxmlformats.org/presentationml/2006/main">
   <p:cSld>
     <p:spTree>
@@ -4969,7 +4946,6 @@
               <a:rPr lang="en-US" dirty="0" smtClean="0"/>
               <a:t>Simple Org Chart – v1</a:t>
             </a:r>
-            <a:endParaRPr lang="en-US" dirty="0" smtClean="0"/>
           </a:p>
         </p:txBody>
       </p:sp>
@@ -5157,16 +5133,6 @@
               </a:rPr>
               <a:t>=</a:t>
             </a:r>
-            <a:endParaRPr lang="en-US" sz="2400" dirty="0" smtClean="0">
-              <a:ln>
-                <a:solidFill>
-                  <a:schemeClr val="accent1">
-                    <a:lumMod val="75000"/>
-                  </a:schemeClr>
-                </a:solidFill>
-              </a:ln>
-              <a:latin typeface="+mn-lt"/>
-            </a:endParaRPr>
           </a:p>
         </p:txBody>
       </p:sp>
@@ -5352,16 +5318,6 @@
                   </a:rPr>
                   <a:t>=</a:t>
                 </a:r>
-                <a:endParaRPr lang="en-US" sz="700" dirty="0" smtClean="0">
-                  <a:ln>
-                    <a:solidFill>
-                      <a:schemeClr val="accent1">
-                        <a:lumMod val="75000"/>
-                      </a:schemeClr>
-                    </a:solidFill>
-                  </a:ln>
-                  <a:latin typeface="+mn-lt"/>
-                </a:endParaRPr>
               </a:p>
             </p:txBody>
           </p:sp>
@@ -5534,16 +5490,6 @@
                   </a:rPr>
                   <a:t>=</a:t>
                 </a:r>
-                <a:endParaRPr lang="en-US" sz="700" dirty="0" smtClean="0">
-                  <a:ln>
-                    <a:solidFill>
-                      <a:schemeClr val="accent1">
-                        <a:lumMod val="75000"/>
-                      </a:schemeClr>
-                    </a:solidFill>
-                  </a:ln>
-                  <a:latin typeface="+mn-lt"/>
-                </a:endParaRPr>
               </a:p>
             </p:txBody>
           </p:sp>
@@ -5716,16 +5662,6 @@
                   </a:rPr>
                   <a:t>=</a:t>
                 </a:r>
-                <a:endParaRPr lang="en-US" sz="700" dirty="0" smtClean="0">
-                  <a:ln>
-                    <a:solidFill>
-                      <a:schemeClr val="accent1">
-                        <a:lumMod val="75000"/>
-                      </a:schemeClr>
-                    </a:solidFill>
-                  </a:ln>
-                  <a:latin typeface="+mn-lt"/>
-                </a:endParaRPr>
               </a:p>
             </p:txBody>
           </p:sp>
@@ -5746,97 +5682,7 @@
 </p:sld>
 </file>
 
-<file path=ppt/slides/slide15.xml><?xml version="1.0" encoding="utf-8"?>
-<p:sld xmlns:a="http://schemas.openxmlformats.org/drawingml/2006/main" xmlns:r="http://schemas.openxmlformats.org/officeDocument/2006/relationships" xmlns:p="http://schemas.openxmlformats.org/presentationml/2006/main">
-  <p:cSld>
-    <p:spTree>
-      <p:nvGrpSpPr>
-        <p:cNvPr id="1" name=""/>
-        <p:cNvGrpSpPr/>
-        <p:nvPr/>
-      </p:nvGrpSpPr>
-      <p:grpSpPr>
-        <a:xfrm>
-          <a:off x="0" y="0"/>
-          <a:ext cx="0" cy="0"/>
-          <a:chOff x="0" y="0"/>
-          <a:chExt cx="0" cy="0"/>
-        </a:xfrm>
-      </p:grpSpPr>
-      <p:sp>
-        <p:nvSpPr>
-          <p:cNvPr id="3075" name="Text Placeholder 2"/>
-          <p:cNvSpPr>
-            <a:spLocks noGrp="1"/>
-          </p:cNvSpPr>
-          <p:nvPr>
-            <p:ph type="body" sz="quarter" idx="10"/>
-          </p:nvPr>
-        </p:nvSpPr>
-        <p:spPr>
-          <a:xfrm>
-            <a:off x="685800" y="1066800"/>
-            <a:ext cx="8229600" cy="1219200"/>
-          </a:xfrm>
-        </p:spPr>
-        <p:txBody>
-          <a:bodyPr/>
-          <a:lstStyle/>
-          <a:p>
-            <a:pPr eaLnBrk="1" hangingPunct="1">
-              <a:buNone/>
-            </a:pPr>
-            <a:endParaRPr lang="en-US" sz="2000" dirty="0" smtClean="0"/>
-          </a:p>
-        </p:txBody>
-      </p:sp>
-      <p:sp>
-        <p:nvSpPr>
-          <p:cNvPr id="3074" name="Title 1"/>
-          <p:cNvSpPr>
-            <a:spLocks noGrp="1"/>
-          </p:cNvSpPr>
-          <p:nvPr>
-            <p:ph type="title"/>
-          </p:nvPr>
-        </p:nvSpPr>
-        <p:spPr bwMode="auto">
-          <a:noFill/>
-          <a:ln>
-            <a:miter lim="800000"/>
-            <a:headEnd/>
-            <a:tailEnd/>
-          </a:ln>
-        </p:spPr>
-        <p:txBody>
-          <a:bodyPr vert="horz" wrap="square" lIns="91440" tIns="45720" rIns="91440" bIns="45720" numCol="1" anchor="t" anchorCtr="0" compatLnSpc="1">
-            <a:prstTxWarp prst="textNoShape">
-              <a:avLst/>
-            </a:prstTxWarp>
-          </a:bodyPr>
-          <a:lstStyle/>
-          <a:p>
-            <a:pPr eaLnBrk="1" hangingPunct="1"/>
-            <a:endParaRPr lang="en-US" dirty="0" smtClean="0"/>
-          </a:p>
-        </p:txBody>
-      </p:sp>
-    </p:spTree>
-  </p:cSld>
-  <p:clrMapOvr>
-    <a:masterClrMapping/>
-  </p:clrMapOvr>
-  <p:timing>
-    <p:tnLst>
-      <p:par>
-        <p:cTn id="1" dur="indefinite" restart="never" nodeType="tmRoot"/>
-      </p:par>
-    </p:tnLst>
-  </p:timing>
-</p:sld>
-</file>
-
-<file path=ppt/slides/slide16.xml><?xml version="1.0" encoding="utf-8"?>
+<file path=ppt/slides/slide14.xml><?xml version="1.0" encoding="utf-8"?>
 <p:sld xmlns:a="http://schemas.openxmlformats.org/drawingml/2006/main" xmlns:r="http://schemas.openxmlformats.org/officeDocument/2006/relationships" xmlns:p="http://schemas.openxmlformats.org/presentationml/2006/main">
   <p:cSld>
     <p:spTree>
@@ -6173,6 +6019,839 @@
 </p:sld>
 </file>
 
+<file path=ppt/slides/slide15.xml><?xml version="1.0" encoding="utf-8"?>
+<p:sld xmlns:a="http://schemas.openxmlformats.org/drawingml/2006/main" xmlns:r="http://schemas.openxmlformats.org/officeDocument/2006/relationships" xmlns:p="http://schemas.openxmlformats.org/presentationml/2006/main">
+  <p:cSld>
+    <p:spTree>
+      <p:nvGrpSpPr>
+        <p:cNvPr id="1" name=""/>
+        <p:cNvGrpSpPr/>
+        <p:nvPr/>
+      </p:nvGrpSpPr>
+      <p:grpSpPr>
+        <a:xfrm>
+          <a:off x="0" y="0"/>
+          <a:ext cx="0" cy="0"/>
+          <a:chOff x="0" y="0"/>
+          <a:chExt cx="0" cy="0"/>
+        </a:xfrm>
+      </p:grpSpPr>
+      <p:sp>
+        <p:nvSpPr>
+          <p:cNvPr id="3075" name="Text Placeholder 2"/>
+          <p:cNvSpPr>
+            <a:spLocks noGrp="1"/>
+          </p:cNvSpPr>
+          <p:nvPr>
+            <p:ph type="body" sz="quarter" idx="10"/>
+          </p:nvPr>
+        </p:nvSpPr>
+        <p:spPr>
+          <a:xfrm>
+            <a:off x="685800" y="1066800"/>
+            <a:ext cx="8229600" cy="1219200"/>
+          </a:xfrm>
+        </p:spPr>
+        <p:txBody>
+          <a:bodyPr/>
+          <a:lstStyle/>
+          <a:p>
+            <a:pPr eaLnBrk="1" hangingPunct="1">
+              <a:buNone/>
+            </a:pPr>
+            <a:r>
+              <a:rPr lang="en-US" sz="2000" dirty="0" smtClean="0"/>
+              <a:t>The command pattern is “used </a:t>
+            </a:r>
+            <a:r>
+              <a:rPr lang="en-US" sz="2000" dirty="0" smtClean="0"/>
+              <a:t>to represent and encapsulate all the information needed to call a method at a later time</a:t>
+            </a:r>
+            <a:r>
+              <a:rPr lang="en-US" sz="2000" dirty="0" smtClean="0"/>
+              <a:t>.”  - </a:t>
+            </a:r>
+            <a:r>
+              <a:rPr lang="en-US" sz="2000" dirty="0" smtClean="0">
+                <a:hlinkClick r:id="rId3"/>
+              </a:rPr>
+              <a:t>Wikipedia</a:t>
+            </a:r>
+            <a:r>
+              <a:rPr lang="en-US" sz="2000" dirty="0" smtClean="0"/>
+              <a:t> </a:t>
+            </a:r>
+            <a:endParaRPr lang="en-US" sz="2000" dirty="0" smtClean="0"/>
+          </a:p>
+        </p:txBody>
+      </p:sp>
+      <p:sp>
+        <p:nvSpPr>
+          <p:cNvPr id="3074" name="Title 1"/>
+          <p:cNvSpPr>
+            <a:spLocks noGrp="1"/>
+          </p:cNvSpPr>
+          <p:nvPr>
+            <p:ph type="title"/>
+          </p:nvPr>
+        </p:nvSpPr>
+        <p:spPr bwMode="auto">
+          <a:noFill/>
+          <a:ln>
+            <a:miter lim="800000"/>
+            <a:headEnd/>
+            <a:tailEnd/>
+          </a:ln>
+        </p:spPr>
+        <p:txBody>
+          <a:bodyPr vert="horz" wrap="square" lIns="91440" tIns="45720" rIns="91440" bIns="45720" numCol="1" anchor="t" anchorCtr="0" compatLnSpc="1">
+            <a:prstTxWarp prst="textNoShape">
+              <a:avLst/>
+            </a:prstTxWarp>
+          </a:bodyPr>
+          <a:lstStyle/>
+          <a:p>
+            <a:pPr eaLnBrk="1" hangingPunct="1"/>
+            <a:r>
+              <a:rPr lang="en-US" dirty="0" smtClean="0"/>
+              <a:t>The Command Pattern</a:t>
+            </a:r>
+            <a:endParaRPr lang="en-US" dirty="0" smtClean="0"/>
+          </a:p>
+        </p:txBody>
+      </p:sp>
+      <p:grpSp>
+        <p:nvGrpSpPr>
+          <p:cNvPr id="15" name="Group 14"/>
+          <p:cNvGrpSpPr/>
+          <p:nvPr/>
+        </p:nvGrpSpPr>
+        <p:grpSpPr>
+          <a:xfrm>
+            <a:off x="2743200" y="2590800"/>
+            <a:ext cx="3657600" cy="3048000"/>
+            <a:chOff x="2514600" y="2743200"/>
+            <a:chExt cx="3657600" cy="3048000"/>
+          </a:xfrm>
+        </p:grpSpPr>
+        <p:sp>
+          <p:nvSpPr>
+            <p:cNvPr id="6" name="Rectangle 5"/>
+            <p:cNvSpPr/>
+            <p:nvPr/>
+          </p:nvSpPr>
+          <p:spPr>
+            <a:xfrm>
+              <a:off x="2514600" y="4724400"/>
+              <a:ext cx="1447800" cy="1066800"/>
+            </a:xfrm>
+            <a:prstGeom prst="rect">
+              <a:avLst/>
+            </a:prstGeom>
+          </p:spPr>
+          <p:style>
+            <a:lnRef idx="2">
+              <a:schemeClr val="accent1">
+                <a:shade val="50000"/>
+              </a:schemeClr>
+            </a:lnRef>
+            <a:fillRef idx="1">
+              <a:schemeClr val="accent1"/>
+            </a:fillRef>
+            <a:effectRef idx="0">
+              <a:schemeClr val="accent1"/>
+            </a:effectRef>
+            <a:fontRef idx="minor">
+              <a:schemeClr val="lt1"/>
+            </a:fontRef>
+          </p:style>
+          <p:txBody>
+            <a:bodyPr rtlCol="0" anchor="ctr"/>
+            <a:lstStyle/>
+            <a:p>
+              <a:pPr algn="ctr"/>
+              <a:r>
+                <a:rPr lang="en-US" dirty="0" smtClean="0"/>
+                <a:t>Invoker</a:t>
+              </a:r>
+              <a:endParaRPr lang="en-US" dirty="0"/>
+            </a:p>
+          </p:txBody>
+        </p:sp>
+        <p:sp>
+          <p:nvSpPr>
+            <p:cNvPr id="8" name="Rectangle 7"/>
+            <p:cNvSpPr/>
+            <p:nvPr/>
+          </p:nvSpPr>
+          <p:spPr>
+            <a:xfrm>
+              <a:off x="2514600" y="2743200"/>
+              <a:ext cx="1447800" cy="1066800"/>
+            </a:xfrm>
+            <a:prstGeom prst="rect">
+              <a:avLst/>
+            </a:prstGeom>
+          </p:spPr>
+          <p:style>
+            <a:lnRef idx="2">
+              <a:schemeClr val="accent1">
+                <a:shade val="50000"/>
+              </a:schemeClr>
+            </a:lnRef>
+            <a:fillRef idx="1">
+              <a:schemeClr val="accent1"/>
+            </a:fillRef>
+            <a:effectRef idx="0">
+              <a:schemeClr val="accent1"/>
+            </a:effectRef>
+            <a:fontRef idx="minor">
+              <a:schemeClr val="lt1"/>
+            </a:fontRef>
+          </p:style>
+          <p:txBody>
+            <a:bodyPr rtlCol="0" anchor="ctr"/>
+            <a:lstStyle/>
+            <a:p>
+              <a:pPr algn="ctr"/>
+              <a:r>
+                <a:rPr lang="en-US" dirty="0" smtClean="0"/>
+                <a:t>Invoked</a:t>
+              </a:r>
+              <a:endParaRPr lang="en-US" dirty="0"/>
+            </a:p>
+          </p:txBody>
+        </p:sp>
+        <p:sp>
+          <p:nvSpPr>
+            <p:cNvPr id="10" name="Rectangle 9"/>
+            <p:cNvSpPr/>
+            <p:nvPr/>
+          </p:nvSpPr>
+          <p:spPr>
+            <a:xfrm>
+              <a:off x="4724400" y="3733800"/>
+              <a:ext cx="1447800" cy="1066800"/>
+            </a:xfrm>
+            <a:prstGeom prst="rect">
+              <a:avLst/>
+            </a:prstGeom>
+          </p:spPr>
+          <p:style>
+            <a:lnRef idx="2">
+              <a:schemeClr val="accent1">
+                <a:shade val="50000"/>
+              </a:schemeClr>
+            </a:lnRef>
+            <a:fillRef idx="1">
+              <a:schemeClr val="accent1"/>
+            </a:fillRef>
+            <a:effectRef idx="0">
+              <a:schemeClr val="accent1"/>
+            </a:effectRef>
+            <a:fontRef idx="minor">
+              <a:schemeClr val="lt1"/>
+            </a:fontRef>
+          </p:style>
+          <p:txBody>
+            <a:bodyPr rtlCol="0" anchor="ctr"/>
+            <a:lstStyle/>
+            <a:p>
+              <a:pPr algn="ctr"/>
+              <a:r>
+                <a:rPr lang="en-US" dirty="0" smtClean="0"/>
+                <a:t>Command</a:t>
+              </a:r>
+            </a:p>
+          </p:txBody>
+        </p:sp>
+        <p:sp>
+          <p:nvSpPr>
+            <p:cNvPr id="13" name="Arc 12"/>
+            <p:cNvSpPr/>
+            <p:nvPr/>
+          </p:nvSpPr>
+          <p:spPr>
+            <a:xfrm>
+              <a:off x="2514600" y="3200400"/>
+              <a:ext cx="2895600" cy="1066800"/>
+            </a:xfrm>
+            <a:prstGeom prst="arc">
+              <a:avLst/>
+            </a:prstGeom>
+            <a:ln w="38100">
+              <a:solidFill>
+                <a:schemeClr val="accent2"/>
+              </a:solidFill>
+              <a:tailEnd type="triangle"/>
+            </a:ln>
+          </p:spPr>
+          <p:style>
+            <a:lnRef idx="1">
+              <a:schemeClr val="accent1"/>
+            </a:lnRef>
+            <a:fillRef idx="0">
+              <a:schemeClr val="accent1"/>
+            </a:fillRef>
+            <a:effectRef idx="0">
+              <a:schemeClr val="accent1"/>
+            </a:effectRef>
+            <a:fontRef idx="minor">
+              <a:schemeClr val="tx1"/>
+            </a:fontRef>
+          </p:style>
+          <p:txBody>
+            <a:bodyPr rtlCol="0" anchor="ctr"/>
+            <a:lstStyle/>
+            <a:p>
+              <a:pPr algn="ctr"/>
+              <a:endParaRPr lang="en-US"/>
+            </a:p>
+          </p:txBody>
+        </p:sp>
+        <p:sp>
+          <p:nvSpPr>
+            <p:cNvPr id="14" name="Arc 13"/>
+            <p:cNvSpPr/>
+            <p:nvPr/>
+          </p:nvSpPr>
+          <p:spPr>
+            <a:xfrm rot="5400000">
+              <a:off x="3429000" y="3352800"/>
+              <a:ext cx="1066800" cy="2895600"/>
+            </a:xfrm>
+            <a:prstGeom prst="arc">
+              <a:avLst/>
+            </a:prstGeom>
+            <a:ln w="38100">
+              <a:solidFill>
+                <a:schemeClr val="accent2"/>
+              </a:solidFill>
+              <a:tailEnd type="triangle"/>
+            </a:ln>
+          </p:spPr>
+          <p:style>
+            <a:lnRef idx="1">
+              <a:schemeClr val="accent1"/>
+            </a:lnRef>
+            <a:fillRef idx="0">
+              <a:schemeClr val="accent1"/>
+            </a:fillRef>
+            <a:effectRef idx="0">
+              <a:schemeClr val="accent1"/>
+            </a:effectRef>
+            <a:fontRef idx="minor">
+              <a:schemeClr val="tx1"/>
+            </a:fontRef>
+          </p:style>
+          <p:txBody>
+            <a:bodyPr rtlCol="0" anchor="ctr"/>
+            <a:lstStyle/>
+            <a:p>
+              <a:pPr algn="ctr"/>
+              <a:endParaRPr lang="en-US"/>
+            </a:p>
+          </p:txBody>
+        </p:sp>
+      </p:grpSp>
+    </p:spTree>
+  </p:cSld>
+  <p:clrMapOvr>
+    <a:masterClrMapping/>
+  </p:clrMapOvr>
+  <p:timing>
+    <p:tnLst>
+      <p:par>
+        <p:cTn id="1" dur="indefinite" restart="never" nodeType="tmRoot"/>
+      </p:par>
+    </p:tnLst>
+  </p:timing>
+</p:sld>
+</file>
+
+<file path=ppt/slides/slide16.xml><?xml version="1.0" encoding="utf-8"?>
+<p:sld xmlns:a="http://schemas.openxmlformats.org/drawingml/2006/main" xmlns:r="http://schemas.openxmlformats.org/officeDocument/2006/relationships" xmlns:p="http://schemas.openxmlformats.org/presentationml/2006/main">
+  <p:cSld>
+    <p:spTree>
+      <p:nvGrpSpPr>
+        <p:cNvPr id="1" name=""/>
+        <p:cNvGrpSpPr/>
+        <p:nvPr/>
+      </p:nvGrpSpPr>
+      <p:grpSpPr>
+        <a:xfrm>
+          <a:off x="0" y="0"/>
+          <a:ext cx="0" cy="0"/>
+          <a:chOff x="0" y="0"/>
+          <a:chExt cx="0" cy="0"/>
+        </a:xfrm>
+      </p:grpSpPr>
+      <p:sp>
+        <p:nvSpPr>
+          <p:cNvPr id="3075" name="Text Placeholder 2"/>
+          <p:cNvSpPr>
+            <a:spLocks noGrp="1"/>
+          </p:cNvSpPr>
+          <p:nvPr>
+            <p:ph type="body" sz="quarter" idx="10"/>
+          </p:nvPr>
+        </p:nvSpPr>
+        <p:spPr>
+          <a:xfrm>
+            <a:off x="685800" y="1066800"/>
+            <a:ext cx="8229600" cy="1219200"/>
+          </a:xfrm>
+        </p:spPr>
+        <p:txBody>
+          <a:bodyPr/>
+          <a:lstStyle/>
+          <a:p>
+            <a:pPr eaLnBrk="1" hangingPunct="1">
+              <a:buNone/>
+            </a:pPr>
+            <a:r>
+              <a:rPr lang="en-US" sz="2000" dirty="0" smtClean="0"/>
+              <a:t>Different Command Implementations In .NET</a:t>
+            </a:r>
+            <a:endParaRPr lang="en-US" sz="2000" dirty="0" smtClean="0"/>
+          </a:p>
+        </p:txBody>
+      </p:sp>
+      <p:sp>
+        <p:nvSpPr>
+          <p:cNvPr id="3074" name="Title 1"/>
+          <p:cNvSpPr>
+            <a:spLocks noGrp="1"/>
+          </p:cNvSpPr>
+          <p:nvPr>
+            <p:ph type="title"/>
+          </p:nvPr>
+        </p:nvSpPr>
+        <p:spPr bwMode="auto">
+          <a:noFill/>
+          <a:ln>
+            <a:miter lim="800000"/>
+            <a:headEnd/>
+            <a:tailEnd/>
+          </a:ln>
+        </p:spPr>
+        <p:txBody>
+          <a:bodyPr vert="horz" wrap="square" lIns="91440" tIns="45720" rIns="91440" bIns="45720" numCol="1" anchor="t" anchorCtr="0" compatLnSpc="1">
+            <a:prstTxWarp prst="textNoShape">
+              <a:avLst/>
+            </a:prstTxWarp>
+          </a:bodyPr>
+          <a:lstStyle/>
+          <a:p>
+            <a:pPr eaLnBrk="1" hangingPunct="1"/>
+            <a:r>
+              <a:rPr lang="en-US" dirty="0" smtClean="0"/>
+              <a:t>The Command Pattern</a:t>
+            </a:r>
+            <a:endParaRPr lang="en-US" dirty="0" smtClean="0"/>
+          </a:p>
+        </p:txBody>
+      </p:sp>
+      <p:grpSp>
+        <p:nvGrpSpPr>
+          <p:cNvPr id="25" name="Group 24"/>
+          <p:cNvGrpSpPr/>
+          <p:nvPr/>
+        </p:nvGrpSpPr>
+        <p:grpSpPr>
+          <a:xfrm>
+            <a:off x="1219200" y="2209800"/>
+            <a:ext cx="6705600" cy="3352800"/>
+            <a:chOff x="990600" y="2590800"/>
+            <a:chExt cx="6705600" cy="3352800"/>
+          </a:xfrm>
+        </p:grpSpPr>
+        <p:sp>
+          <p:nvSpPr>
+            <p:cNvPr id="4" name="Rectangle 3"/>
+            <p:cNvSpPr/>
+            <p:nvPr/>
+          </p:nvSpPr>
+          <p:spPr>
+            <a:xfrm>
+              <a:off x="990600" y="2667000"/>
+              <a:ext cx="1524000" cy="1066800"/>
+            </a:xfrm>
+            <a:prstGeom prst="rect">
+              <a:avLst/>
+            </a:prstGeom>
+          </p:spPr>
+          <p:style>
+            <a:lnRef idx="2">
+              <a:schemeClr val="accent3">
+                <a:shade val="50000"/>
+              </a:schemeClr>
+            </a:lnRef>
+            <a:fillRef idx="1">
+              <a:schemeClr val="accent3"/>
+            </a:fillRef>
+            <a:effectRef idx="0">
+              <a:schemeClr val="accent3"/>
+            </a:effectRef>
+            <a:fontRef idx="minor">
+              <a:schemeClr val="lt1"/>
+            </a:fontRef>
+          </p:style>
+          <p:txBody>
+            <a:bodyPr rtlCol="0" anchor="ctr"/>
+            <a:lstStyle/>
+            <a:p>
+              <a:pPr algn="ctr"/>
+              <a:r>
+                <a:rPr lang="en-US" dirty="0" smtClean="0"/>
+                <a:t>Delegates</a:t>
+              </a:r>
+              <a:endParaRPr lang="en-US" dirty="0"/>
+            </a:p>
+          </p:txBody>
+        </p:sp>
+        <p:sp>
+          <p:nvSpPr>
+            <p:cNvPr id="5" name="Rectangle 4"/>
+            <p:cNvSpPr/>
+            <p:nvPr/>
+          </p:nvSpPr>
+          <p:spPr>
+            <a:xfrm>
+              <a:off x="6172200" y="2590800"/>
+              <a:ext cx="1524000" cy="1066800"/>
+            </a:xfrm>
+            <a:prstGeom prst="rect">
+              <a:avLst/>
+            </a:prstGeom>
+          </p:spPr>
+          <p:style>
+            <a:lnRef idx="2">
+              <a:schemeClr val="accent2">
+                <a:shade val="50000"/>
+              </a:schemeClr>
+            </a:lnRef>
+            <a:fillRef idx="1">
+              <a:schemeClr val="accent2"/>
+            </a:fillRef>
+            <a:effectRef idx="0">
+              <a:schemeClr val="accent2"/>
+            </a:effectRef>
+            <a:fontRef idx="minor">
+              <a:schemeClr val="lt1"/>
+            </a:fontRef>
+          </p:style>
+          <p:txBody>
+            <a:bodyPr rtlCol="0" anchor="ctr"/>
+            <a:lstStyle/>
+            <a:p>
+              <a:pPr algn="ctr"/>
+              <a:r>
+                <a:rPr lang="en-US" dirty="0" smtClean="0"/>
+                <a:t>Objects &amp; Interfaces</a:t>
+              </a:r>
+              <a:endParaRPr lang="en-US" dirty="0"/>
+            </a:p>
+          </p:txBody>
+        </p:sp>
+        <p:sp>
+          <p:nvSpPr>
+            <p:cNvPr id="6" name="Rectangle 5"/>
+            <p:cNvSpPr/>
+            <p:nvPr/>
+          </p:nvSpPr>
+          <p:spPr>
+            <a:xfrm>
+              <a:off x="990600" y="4876800"/>
+              <a:ext cx="1524000" cy="1066800"/>
+            </a:xfrm>
+            <a:prstGeom prst="rect">
+              <a:avLst/>
+            </a:prstGeom>
+          </p:spPr>
+          <p:style>
+            <a:lnRef idx="2">
+              <a:schemeClr val="accent3">
+                <a:shade val="50000"/>
+              </a:schemeClr>
+            </a:lnRef>
+            <a:fillRef idx="1">
+              <a:schemeClr val="accent3"/>
+            </a:fillRef>
+            <a:effectRef idx="0">
+              <a:schemeClr val="accent3"/>
+            </a:effectRef>
+            <a:fontRef idx="minor">
+              <a:schemeClr val="lt1"/>
+            </a:fontRef>
+          </p:style>
+          <p:txBody>
+            <a:bodyPr rtlCol="0" anchor="ctr"/>
+            <a:lstStyle/>
+            <a:p>
+              <a:pPr algn="ctr"/>
+              <a:r>
+                <a:rPr lang="en-US" dirty="0" smtClean="0"/>
+                <a:t>Lambda Expressions</a:t>
+              </a:r>
+              <a:endParaRPr lang="en-US" dirty="0"/>
+            </a:p>
+          </p:txBody>
+        </p:sp>
+        <p:sp>
+          <p:nvSpPr>
+            <p:cNvPr id="7" name="Rectangle 6"/>
+            <p:cNvSpPr/>
+            <p:nvPr/>
+          </p:nvSpPr>
+          <p:spPr>
+            <a:xfrm>
+              <a:off x="6172200" y="4876800"/>
+              <a:ext cx="1524000" cy="1066800"/>
+            </a:xfrm>
+            <a:prstGeom prst="rect">
+              <a:avLst/>
+            </a:prstGeom>
+          </p:spPr>
+          <p:style>
+            <a:lnRef idx="2">
+              <a:schemeClr val="accent3">
+                <a:shade val="50000"/>
+              </a:schemeClr>
+            </a:lnRef>
+            <a:fillRef idx="1">
+              <a:schemeClr val="accent3"/>
+            </a:fillRef>
+            <a:effectRef idx="0">
+              <a:schemeClr val="accent3"/>
+            </a:effectRef>
+            <a:fontRef idx="minor">
+              <a:schemeClr val="lt1"/>
+            </a:fontRef>
+          </p:style>
+          <p:txBody>
+            <a:bodyPr rtlCol="0" anchor="ctr"/>
+            <a:lstStyle/>
+            <a:p>
+              <a:pPr algn="ctr"/>
+              <a:r>
+                <a:rPr lang="en-US" dirty="0" smtClean="0"/>
+                <a:t>Anonymous Delegates</a:t>
+              </a:r>
+              <a:endParaRPr lang="en-US" dirty="0"/>
+            </a:p>
+          </p:txBody>
+        </p:sp>
+        <p:sp>
+          <p:nvSpPr>
+            <p:cNvPr id="8" name="Rectangle 7"/>
+            <p:cNvSpPr/>
+            <p:nvPr/>
+          </p:nvSpPr>
+          <p:spPr>
+            <a:xfrm>
+              <a:off x="3581400" y="3733800"/>
+              <a:ext cx="1524000" cy="1066800"/>
+            </a:xfrm>
+            <a:prstGeom prst="rect">
+              <a:avLst/>
+            </a:prstGeom>
+          </p:spPr>
+          <p:style>
+            <a:lnRef idx="2">
+              <a:schemeClr val="accent1">
+                <a:shade val="50000"/>
+              </a:schemeClr>
+            </a:lnRef>
+            <a:fillRef idx="1">
+              <a:schemeClr val="accent1"/>
+            </a:fillRef>
+            <a:effectRef idx="0">
+              <a:schemeClr val="accent1"/>
+            </a:effectRef>
+            <a:fontRef idx="minor">
+              <a:schemeClr val="lt1"/>
+            </a:fontRef>
+          </p:style>
+          <p:txBody>
+            <a:bodyPr rtlCol="0" anchor="ctr"/>
+            <a:lstStyle/>
+            <a:p>
+              <a:pPr algn="ctr"/>
+              <a:r>
+                <a:rPr lang="en-US" dirty="0" smtClean="0"/>
+                <a:t>Commands</a:t>
+              </a:r>
+            </a:p>
+          </p:txBody>
+        </p:sp>
+        <p:cxnSp>
+          <p:nvCxnSpPr>
+            <p:cNvPr id="11" name="Shape 10"/>
+            <p:cNvCxnSpPr>
+              <a:stCxn id="8" idx="1"/>
+              <a:endCxn id="4" idx="3"/>
+            </p:cNvCxnSpPr>
+            <p:nvPr/>
+          </p:nvCxnSpPr>
+          <p:spPr>
+            <a:xfrm rot="10800000">
+              <a:off x="2514600" y="3200400"/>
+              <a:ext cx="1066800" cy="1066800"/>
+            </a:xfrm>
+            <a:prstGeom prst="curvedConnector3">
+              <a:avLst>
+                <a:gd name="adj1" fmla="val 50000"/>
+              </a:avLst>
+            </a:prstGeom>
+            <a:ln w="38100">
+              <a:tailEnd type="triangle"/>
+            </a:ln>
+          </p:spPr>
+          <p:style>
+            <a:lnRef idx="1">
+              <a:schemeClr val="accent1"/>
+            </a:lnRef>
+            <a:fillRef idx="0">
+              <a:schemeClr val="accent1"/>
+            </a:fillRef>
+            <a:effectRef idx="0">
+              <a:schemeClr val="accent1"/>
+            </a:effectRef>
+            <a:fontRef idx="minor">
+              <a:schemeClr val="tx1"/>
+            </a:fontRef>
+          </p:style>
+        </p:cxnSp>
+        <p:cxnSp>
+          <p:nvCxnSpPr>
+            <p:cNvPr id="15" name="Shape 14"/>
+            <p:cNvCxnSpPr>
+              <a:stCxn id="8" idx="2"/>
+              <a:endCxn id="6" idx="3"/>
+            </p:cNvCxnSpPr>
+            <p:nvPr/>
+          </p:nvCxnSpPr>
+          <p:spPr>
+            <a:xfrm rot="5400000">
+              <a:off x="3124200" y="4191000"/>
+              <a:ext cx="609600" cy="1828800"/>
+            </a:xfrm>
+            <a:prstGeom prst="curvedConnector2">
+              <a:avLst/>
+            </a:prstGeom>
+            <a:ln w="38100">
+              <a:tailEnd type="triangle"/>
+            </a:ln>
+          </p:spPr>
+          <p:style>
+            <a:lnRef idx="1">
+              <a:schemeClr val="accent1"/>
+            </a:lnRef>
+            <a:fillRef idx="0">
+              <a:schemeClr val="accent1"/>
+            </a:fillRef>
+            <a:effectRef idx="0">
+              <a:schemeClr val="accent1"/>
+            </a:effectRef>
+            <a:fontRef idx="minor">
+              <a:schemeClr val="tx1"/>
+            </a:fontRef>
+          </p:style>
+        </p:cxnSp>
+        <p:cxnSp>
+          <p:nvCxnSpPr>
+            <p:cNvPr id="18" name="Shape 17"/>
+            <p:cNvCxnSpPr>
+              <a:stCxn id="8" idx="3"/>
+              <a:endCxn id="7" idx="1"/>
+            </p:cNvCxnSpPr>
+            <p:nvPr/>
+          </p:nvCxnSpPr>
+          <p:spPr>
+            <a:xfrm>
+              <a:off x="5105400" y="4267200"/>
+              <a:ext cx="1066800" cy="1143000"/>
+            </a:xfrm>
+            <a:prstGeom prst="curvedConnector3">
+              <a:avLst>
+                <a:gd name="adj1" fmla="val 50000"/>
+              </a:avLst>
+            </a:prstGeom>
+            <a:ln w="38100">
+              <a:tailEnd type="triangle"/>
+            </a:ln>
+          </p:spPr>
+          <p:style>
+            <a:lnRef idx="1">
+              <a:schemeClr val="accent1"/>
+            </a:lnRef>
+            <a:fillRef idx="0">
+              <a:schemeClr val="accent1"/>
+            </a:fillRef>
+            <a:effectRef idx="0">
+              <a:schemeClr val="accent1"/>
+            </a:effectRef>
+            <a:fontRef idx="minor">
+              <a:schemeClr val="tx1"/>
+            </a:fontRef>
+          </p:style>
+        </p:cxnSp>
+        <p:cxnSp>
+          <p:nvCxnSpPr>
+            <p:cNvPr id="22" name="Shape 21"/>
+            <p:cNvCxnSpPr>
+              <a:stCxn id="8" idx="0"/>
+              <a:endCxn id="5" idx="1"/>
+            </p:cNvCxnSpPr>
+            <p:nvPr/>
+          </p:nvCxnSpPr>
+          <p:spPr>
+            <a:xfrm rot="5400000" flipH="1" flipV="1">
+              <a:off x="4953000" y="2514600"/>
+              <a:ext cx="609600" cy="1828800"/>
+            </a:xfrm>
+            <a:prstGeom prst="curvedConnector2">
+              <a:avLst/>
+            </a:prstGeom>
+            <a:ln w="38100">
+              <a:solidFill>
+                <a:schemeClr val="accent2"/>
+              </a:solidFill>
+              <a:tailEnd type="triangle"/>
+            </a:ln>
+          </p:spPr>
+          <p:style>
+            <a:lnRef idx="1">
+              <a:schemeClr val="accent1"/>
+            </a:lnRef>
+            <a:fillRef idx="0">
+              <a:schemeClr val="accent1"/>
+            </a:fillRef>
+            <a:effectRef idx="0">
+              <a:schemeClr val="accent1"/>
+            </a:effectRef>
+            <a:fontRef idx="minor">
+              <a:schemeClr val="tx1"/>
+            </a:fontRef>
+          </p:style>
+        </p:cxnSp>
+      </p:grpSp>
+    </p:spTree>
+  </p:cSld>
+  <p:clrMapOvr>
+    <a:masterClrMapping/>
+  </p:clrMapOvr>
+  <p:timing>
+    <p:tnLst>
+      <p:par>
+        <p:cTn id="1" dur="indefinite" restart="never" nodeType="tmRoot"/>
+      </p:par>
+    </p:tnLst>
+  </p:timing>
+</p:sld>
+</file>
+
 <file path=ppt/slides/slide17.xml><?xml version="1.0" encoding="utf-8"?>
 <p:sld xmlns:a="http://schemas.openxmlformats.org/drawingml/2006/main" xmlns:r="http://schemas.openxmlformats.org/officeDocument/2006/relationships" xmlns:p="http://schemas.openxmlformats.org/presentationml/2006/main">
   <p:cSld>
@@ -6213,6 +6892,10 @@
             <a:pPr eaLnBrk="1" hangingPunct="1">
               <a:buNone/>
             </a:pPr>
+            <a:r>
+              <a:rPr lang="en-US" sz="2000" dirty="0" smtClean="0"/>
+              <a:t>Interfaces And Objects</a:t>
+            </a:r>
             <a:endParaRPr lang="en-US" sz="2000" dirty="0" smtClean="0"/>
           </a:p>
         </p:txBody>
@@ -6244,10 +6927,410 @@
           <a:lstStyle/>
           <a:p>
             <a:pPr eaLnBrk="1" hangingPunct="1"/>
+            <a:r>
+              <a:rPr lang="en-US" dirty="0" smtClean="0"/>
+              <a:t>The Command Pattern</a:t>
+            </a:r>
             <a:endParaRPr lang="en-US" dirty="0" smtClean="0"/>
           </a:p>
         </p:txBody>
       </p:sp>
+      <p:grpSp>
+        <p:nvGrpSpPr>
+          <p:cNvPr id="14" name="Group 13"/>
+          <p:cNvGrpSpPr/>
+          <p:nvPr/>
+        </p:nvGrpSpPr>
+        <p:grpSpPr>
+          <a:xfrm>
+            <a:off x="2006260" y="2064603"/>
+            <a:ext cx="4979081" cy="830997"/>
+            <a:chOff x="1955119" y="2209800"/>
+            <a:chExt cx="4979081" cy="830997"/>
+          </a:xfrm>
+        </p:grpSpPr>
+        <p:sp>
+          <p:nvSpPr>
+            <p:cNvPr id="4" name="TextBox 3"/>
+            <p:cNvSpPr txBox="1"/>
+            <p:nvPr/>
+          </p:nvSpPr>
+          <p:spPr>
+            <a:xfrm>
+              <a:off x="1955119" y="2209800"/>
+              <a:ext cx="2007281" cy="830997"/>
+            </a:xfrm>
+            <a:prstGeom prst="rect">
+              <a:avLst/>
+            </a:prstGeom>
+          </p:spPr>
+          <p:style>
+            <a:lnRef idx="2">
+              <a:schemeClr val="accent1">
+                <a:shade val="50000"/>
+              </a:schemeClr>
+            </a:lnRef>
+            <a:fillRef idx="1">
+              <a:schemeClr val="accent1"/>
+            </a:fillRef>
+            <a:effectRef idx="0">
+              <a:schemeClr val="accent1"/>
+            </a:effectRef>
+            <a:fontRef idx="minor">
+              <a:schemeClr val="lt1"/>
+            </a:fontRef>
+          </p:style>
+          <p:txBody>
+            <a:bodyPr wrap="none" rtlCol="0">
+              <a:spAutoFit/>
+            </a:bodyPr>
+            <a:lstStyle/>
+            <a:p>
+              <a:r>
+                <a:rPr lang="en-US" sz="2400" dirty="0" err="1" smtClean="0">
+                  <a:latin typeface="+mn-lt"/>
+                </a:rPr>
+                <a:t>ICommand</a:t>
+              </a:r>
+              <a:r>
+                <a:rPr lang="en-US" sz="2400" dirty="0" smtClean="0">
+                  <a:latin typeface="+mn-lt"/>
+                </a:rPr>
+                <a:t>&lt;T&gt;</a:t>
+              </a:r>
+            </a:p>
+            <a:p>
+              <a:r>
+                <a:rPr lang="en-US" sz="2400" dirty="0" smtClean="0"/>
+                <a:t>  .Execute(T)</a:t>
+              </a:r>
+              <a:endParaRPr lang="en-US" sz="2400" dirty="0" smtClean="0">
+                <a:latin typeface="+mn-lt"/>
+              </a:endParaRPr>
+            </a:p>
+          </p:txBody>
+        </p:sp>
+        <p:sp>
+          <p:nvSpPr>
+            <p:cNvPr id="5" name="TextBox 4"/>
+            <p:cNvSpPr txBox="1"/>
+            <p:nvPr/>
+          </p:nvSpPr>
+          <p:spPr>
+            <a:xfrm>
+              <a:off x="4290335" y="2395298"/>
+              <a:ext cx="2643865" cy="461665"/>
+            </a:xfrm>
+            <a:prstGeom prst="rect">
+              <a:avLst/>
+            </a:prstGeom>
+          </p:spPr>
+          <p:style>
+            <a:lnRef idx="2">
+              <a:schemeClr val="accent1">
+                <a:shade val="50000"/>
+              </a:schemeClr>
+            </a:lnRef>
+            <a:fillRef idx="1">
+              <a:schemeClr val="accent1"/>
+            </a:fillRef>
+            <a:effectRef idx="0">
+              <a:schemeClr val="accent1"/>
+            </a:effectRef>
+            <a:fontRef idx="minor">
+              <a:schemeClr val="lt1"/>
+            </a:fontRef>
+          </p:style>
+          <p:txBody>
+            <a:bodyPr wrap="none" rtlCol="0">
+              <a:spAutoFit/>
+            </a:bodyPr>
+            <a:lstStyle/>
+            <a:p>
+              <a:r>
+                <a:rPr lang="en-US" sz="2400" dirty="0" err="1" smtClean="0">
+                  <a:latin typeface="+mn-lt"/>
+                </a:rPr>
+                <a:t>CommandDataType</a:t>
+              </a:r>
+              <a:endParaRPr lang="en-US" sz="2400" dirty="0" smtClean="0">
+                <a:latin typeface="+mn-lt"/>
+              </a:endParaRPr>
+            </a:p>
+          </p:txBody>
+        </p:sp>
+        <p:sp>
+          <p:nvSpPr>
+            <p:cNvPr id="7" name="TextBox 6"/>
+            <p:cNvSpPr txBox="1"/>
+            <p:nvPr/>
+          </p:nvSpPr>
+          <p:spPr>
+            <a:xfrm>
+              <a:off x="3962400" y="2395298"/>
+              <a:ext cx="338554" cy="461665"/>
+            </a:xfrm>
+            <a:prstGeom prst="rect">
+              <a:avLst/>
+            </a:prstGeom>
+            <a:noFill/>
+          </p:spPr>
+          <p:txBody>
+            <a:bodyPr wrap="none" rtlCol="0">
+              <a:spAutoFit/>
+            </a:bodyPr>
+            <a:lstStyle/>
+            <a:p>
+              <a:r>
+                <a:rPr lang="en-US" sz="2400" dirty="0" smtClean="0">
+                  <a:latin typeface="+mn-lt"/>
+                </a:rPr>
+                <a:t>+</a:t>
+              </a:r>
+              <a:endParaRPr lang="en-US" sz="2400" dirty="0" smtClean="0">
+                <a:latin typeface="+mn-lt"/>
+              </a:endParaRPr>
+            </a:p>
+          </p:txBody>
+        </p:sp>
+      </p:grpSp>
+      <p:grpSp>
+        <p:nvGrpSpPr>
+          <p:cNvPr id="18" name="Group 17"/>
+          <p:cNvGrpSpPr/>
+          <p:nvPr/>
+        </p:nvGrpSpPr>
+        <p:grpSpPr>
+          <a:xfrm>
+            <a:off x="990600" y="3607475"/>
+            <a:ext cx="7010401" cy="2031325"/>
+            <a:chOff x="990600" y="3500735"/>
+            <a:chExt cx="7010401" cy="2031325"/>
+          </a:xfrm>
+        </p:grpSpPr>
+        <p:grpSp>
+          <p:nvGrpSpPr>
+            <p:cNvPr id="15" name="Group 14"/>
+            <p:cNvGrpSpPr/>
+            <p:nvPr/>
+          </p:nvGrpSpPr>
+          <p:grpSpPr>
+            <a:xfrm>
+              <a:off x="990600" y="3500735"/>
+              <a:ext cx="7010400" cy="466130"/>
+              <a:chOff x="990600" y="3500735"/>
+              <a:chExt cx="7010400" cy="466130"/>
+            </a:xfrm>
+          </p:grpSpPr>
+          <p:sp>
+            <p:nvSpPr>
+              <p:cNvPr id="6" name="TextBox 5"/>
+              <p:cNvSpPr txBox="1"/>
+              <p:nvPr/>
+            </p:nvSpPr>
+            <p:spPr>
+              <a:xfrm>
+                <a:off x="1352833" y="3500735"/>
+                <a:ext cx="6648167" cy="461665"/>
+              </a:xfrm>
+              <a:prstGeom prst="rect">
+                <a:avLst/>
+              </a:prstGeom>
+            </p:spPr>
+            <p:style>
+              <a:lnRef idx="2">
+                <a:schemeClr val="accent2">
+                  <a:shade val="50000"/>
+                </a:schemeClr>
+              </a:lnRef>
+              <a:fillRef idx="1">
+                <a:schemeClr val="accent2"/>
+              </a:fillRef>
+              <a:effectRef idx="0">
+                <a:schemeClr val="accent2"/>
+              </a:effectRef>
+              <a:fontRef idx="minor">
+                <a:schemeClr val="lt1"/>
+              </a:fontRef>
+            </p:style>
+            <p:txBody>
+              <a:bodyPr wrap="none" rtlCol="0">
+                <a:spAutoFit/>
+              </a:bodyPr>
+              <a:lstStyle/>
+              <a:p>
+                <a:r>
+                  <a:rPr lang="en-US" sz="2400" dirty="0" err="1" smtClean="0">
+                    <a:latin typeface="+mn-lt"/>
+                  </a:rPr>
+                  <a:t>CommandObject</a:t>
+                </a:r>
+                <a:r>
+                  <a:rPr lang="en-US" sz="2400" dirty="0" smtClean="0">
+                    <a:latin typeface="+mn-lt"/>
+                  </a:rPr>
+                  <a:t>:  </a:t>
+                </a:r>
+                <a:r>
+                  <a:rPr lang="en-US" sz="2400" dirty="0" err="1" smtClean="0">
+                    <a:latin typeface="+mn-lt"/>
+                  </a:rPr>
+                  <a:t>ICommand</a:t>
+                </a:r>
+                <a:r>
+                  <a:rPr lang="en-US" sz="2400" dirty="0" smtClean="0">
+                    <a:latin typeface="+mn-lt"/>
+                  </a:rPr>
+                  <a:t>&lt;</a:t>
+                </a:r>
+                <a:r>
+                  <a:rPr lang="en-US" sz="2400" dirty="0" err="1" smtClean="0">
+                    <a:latin typeface="+mn-lt"/>
+                  </a:rPr>
+                  <a:t>CommandDataType</a:t>
+                </a:r>
+                <a:r>
+                  <a:rPr lang="en-US" sz="2400" dirty="0" smtClean="0">
+                    <a:latin typeface="+mn-lt"/>
+                  </a:rPr>
+                  <a:t>&gt;</a:t>
+                </a:r>
+                <a:endParaRPr lang="en-US" sz="2400" dirty="0" smtClean="0">
+                  <a:latin typeface="+mn-lt"/>
+                </a:endParaRPr>
+              </a:p>
+            </p:txBody>
+          </p:sp>
+          <p:sp>
+            <p:nvSpPr>
+              <p:cNvPr id="13" name="TextBox 12"/>
+              <p:cNvSpPr txBox="1"/>
+              <p:nvPr/>
+            </p:nvSpPr>
+            <p:spPr>
+              <a:xfrm>
+                <a:off x="990600" y="3505200"/>
+                <a:ext cx="338554" cy="461665"/>
+              </a:xfrm>
+              <a:prstGeom prst="rect">
+                <a:avLst/>
+              </a:prstGeom>
+              <a:noFill/>
+            </p:spPr>
+            <p:txBody>
+              <a:bodyPr wrap="none" rtlCol="0">
+                <a:spAutoFit/>
+              </a:bodyPr>
+              <a:lstStyle/>
+              <a:p>
+                <a:r>
+                  <a:rPr lang="en-US" sz="2400" dirty="0" smtClean="0">
+                    <a:latin typeface="+mn-lt"/>
+                  </a:rPr>
+                  <a:t>=</a:t>
+                </a:r>
+                <a:endParaRPr lang="en-US" sz="2400" dirty="0" smtClean="0">
+                  <a:latin typeface="+mn-lt"/>
+                </a:endParaRPr>
+              </a:p>
+            </p:txBody>
+          </p:sp>
+        </p:grpSp>
+        <p:sp>
+          <p:nvSpPr>
+            <p:cNvPr id="17" name="TextBox 16"/>
+            <p:cNvSpPr txBox="1"/>
+            <p:nvPr/>
+          </p:nvSpPr>
+          <p:spPr>
+            <a:xfrm>
+              <a:off x="1355591" y="3962400"/>
+              <a:ext cx="6645410" cy="1569660"/>
+            </a:xfrm>
+            <a:prstGeom prst="rect">
+              <a:avLst/>
+            </a:prstGeom>
+          </p:spPr>
+          <p:style>
+            <a:lnRef idx="2">
+              <a:schemeClr val="accent2">
+                <a:shade val="50000"/>
+              </a:schemeClr>
+            </a:lnRef>
+            <a:fillRef idx="1">
+              <a:schemeClr val="accent2"/>
+            </a:fillRef>
+            <a:effectRef idx="0">
+              <a:schemeClr val="accent2"/>
+            </a:effectRef>
+            <a:fontRef idx="minor">
+              <a:schemeClr val="lt1"/>
+            </a:fontRef>
+          </p:style>
+          <p:txBody>
+            <a:bodyPr wrap="square" rtlCol="0">
+              <a:spAutoFit/>
+            </a:bodyPr>
+            <a:lstStyle/>
+            <a:p>
+              <a:r>
+                <a:rPr lang="en-US" sz="2400" dirty="0" smtClean="0">
+                  <a:latin typeface="+mn-lt"/>
+                </a:rPr>
+                <a:t>.Execute(</a:t>
+              </a:r>
+              <a:r>
+                <a:rPr lang="en-US" sz="2400" dirty="0" err="1" smtClean="0">
+                  <a:latin typeface="+mn-lt"/>
+                </a:rPr>
+                <a:t>CommandDataType</a:t>
+              </a:r>
+              <a:r>
+                <a:rPr lang="en-US" sz="2400" dirty="0" smtClean="0">
+                  <a:latin typeface="+mn-lt"/>
+                </a:rPr>
+                <a:t> </a:t>
+              </a:r>
+              <a:r>
+                <a:rPr lang="en-US" sz="2400" dirty="0" err="1" smtClean="0">
+                  <a:latin typeface="+mn-lt"/>
+                </a:rPr>
+                <a:t>param</a:t>
+              </a:r>
+              <a:r>
+                <a:rPr lang="en-US" sz="2400" dirty="0" smtClean="0">
+                  <a:latin typeface="+mn-lt"/>
+                </a:rPr>
+                <a:t>)</a:t>
+              </a:r>
+            </a:p>
+            <a:p>
+              <a:r>
+                <a:rPr lang="en-US" sz="2400" dirty="0" smtClean="0"/>
+                <a:t>{</a:t>
+              </a:r>
+            </a:p>
+            <a:p>
+              <a:r>
+                <a:rPr lang="en-US" sz="2400" dirty="0" smtClean="0"/>
+                <a:t> </a:t>
+              </a:r>
+              <a:r>
+                <a:rPr lang="en-US" sz="2400" dirty="0" smtClean="0"/>
+                <a:t>   //do something here</a:t>
+              </a:r>
+            </a:p>
+            <a:p>
+              <a:r>
+                <a:rPr lang="en-US" sz="2400" dirty="0" smtClean="0">
+                  <a:latin typeface="+mn-lt"/>
+                </a:rPr>
+                <a:t>}</a:t>
+              </a:r>
+            </a:p>
+          </p:txBody>
+        </p:sp>
+      </p:grpSp>
     </p:spTree>
   </p:cSld>
   <p:clrMapOvr>
@@ -6303,14 +7386,6 @@
             <a:pPr eaLnBrk="1" hangingPunct="1">
               <a:buNone/>
             </a:pPr>
-            <a:r>
-              <a:rPr lang="en-US" sz="2000" dirty="0" smtClean="0"/>
-              <a:t>Workflow Coupling With </a:t>
-            </a:r>
-            <a:r>
-              <a:rPr lang="en-US" sz="2000" dirty="0" err="1" smtClean="0"/>
-              <a:t>ICommand</a:t>
-            </a:r>
             <a:endParaRPr lang="en-US" sz="2000" dirty="0" smtClean="0"/>
           </a:p>
         </p:txBody>
@@ -6352,7 +7427,7 @@
       </p:sp>
       <p:pic>
         <p:nvPicPr>
-          <p:cNvPr id="4" name="Picture 6" descr="X:\Derick-GitHub\Presentation And Training Material\Decoupling Workflow With App Controler\doc\Real World Workflow Coupling.jpg"/>
+          <p:cNvPr id="5" name="Picture 2" descr="X:\Derick-GitHub\Presentation And Training Material\Decoupling Workflow With App Controler\doc\Org Chart View.png"/>
           <p:cNvPicPr>
             <a:picLocks noChangeAspect="1" noChangeArrowheads="1"/>
           </p:cNvPicPr>
@@ -6367,8 +7442,8 @@
         </p:blipFill>
         <p:spPr bwMode="auto">
           <a:xfrm>
-            <a:off x="838200" y="1575550"/>
-            <a:ext cx="5638799" cy="4901450"/>
+            <a:off x="904875" y="1971675"/>
+            <a:ext cx="4286251" cy="4048125"/>
           </a:xfrm>
           <a:prstGeom prst="rect">
             <a:avLst/>
@@ -6376,6 +7451,76 @@
           <a:noFill/>
         </p:spPr>
       </p:pic>
+      <p:cxnSp>
+        <p:nvCxnSpPr>
+          <p:cNvPr id="7" name="Straight Connector 6"/>
+          <p:cNvCxnSpPr/>
+          <p:nvPr/>
+        </p:nvCxnSpPr>
+        <p:spPr>
+          <a:xfrm rot="5400000" flipH="1" flipV="1">
+            <a:off x="1628775" y="3924300"/>
+            <a:ext cx="2286000" cy="838200"/>
+          </a:xfrm>
+          <a:prstGeom prst="line">
+            <a:avLst/>
+          </a:prstGeom>
+          <a:ln w="38100">
+            <a:solidFill>
+              <a:schemeClr val="accent2"/>
+            </a:solidFill>
+          </a:ln>
+        </p:spPr>
+        <p:style>
+          <a:lnRef idx="1">
+            <a:schemeClr val="accent1"/>
+          </a:lnRef>
+          <a:fillRef idx="0">
+            <a:schemeClr val="accent1"/>
+          </a:fillRef>
+          <a:effectRef idx="0">
+            <a:schemeClr val="accent1"/>
+          </a:effectRef>
+          <a:fontRef idx="minor">
+            <a:schemeClr val="tx1"/>
+          </a:fontRef>
+        </p:style>
+      </p:cxnSp>
+      <p:cxnSp>
+        <p:nvCxnSpPr>
+          <p:cNvPr id="8" name="Straight Connector 7"/>
+          <p:cNvCxnSpPr/>
+          <p:nvPr/>
+        </p:nvCxnSpPr>
+        <p:spPr>
+          <a:xfrm flipV="1">
+            <a:off x="2352675" y="5029200"/>
+            <a:ext cx="838200" cy="685800"/>
+          </a:xfrm>
+          <a:prstGeom prst="line">
+            <a:avLst/>
+          </a:prstGeom>
+          <a:ln w="38100">
+            <a:solidFill>
+              <a:schemeClr val="accent2"/>
+            </a:solidFill>
+          </a:ln>
+        </p:spPr>
+        <p:style>
+          <a:lnRef idx="1">
+            <a:schemeClr val="accent1"/>
+          </a:lnRef>
+          <a:fillRef idx="0">
+            <a:schemeClr val="accent1"/>
+          </a:fillRef>
+          <a:effectRef idx="0">
+            <a:schemeClr val="accent1"/>
+          </a:effectRef>
+          <a:fontRef idx="minor">
+            <a:schemeClr val="tx1"/>
+          </a:fontRef>
+        </p:style>
+      </p:cxnSp>
     </p:spTree>
   </p:cSld>
   <p:clrMapOvr>
@@ -6723,6 +7868,133 @@
       </p:grpSpPr>
       <p:sp>
         <p:nvSpPr>
+          <p:cNvPr id="3075" name="Text Placeholder 2"/>
+          <p:cNvSpPr>
+            <a:spLocks noGrp="1"/>
+          </p:cNvSpPr>
+          <p:nvPr>
+            <p:ph type="body" sz="quarter" idx="10"/>
+          </p:nvPr>
+        </p:nvSpPr>
+        <p:spPr>
+          <a:xfrm>
+            <a:off x="685800" y="1066800"/>
+            <a:ext cx="8229600" cy="1219200"/>
+          </a:xfrm>
+        </p:spPr>
+        <p:txBody>
+          <a:bodyPr/>
+          <a:lstStyle/>
+          <a:p>
+            <a:pPr eaLnBrk="1" hangingPunct="1">
+              <a:buNone/>
+            </a:pPr>
+            <a:r>
+              <a:rPr lang="en-US" sz="2000" dirty="0" smtClean="0"/>
+              <a:t>Workflow Coupling With </a:t>
+            </a:r>
+            <a:r>
+              <a:rPr lang="en-US" sz="2000" dirty="0" err="1" smtClean="0"/>
+              <a:t>ICommand</a:t>
+            </a:r>
+            <a:endParaRPr lang="en-US" sz="2000" dirty="0" smtClean="0"/>
+          </a:p>
+        </p:txBody>
+      </p:sp>
+      <p:sp>
+        <p:nvSpPr>
+          <p:cNvPr id="3074" name="Title 1"/>
+          <p:cNvSpPr>
+            <a:spLocks noGrp="1"/>
+          </p:cNvSpPr>
+          <p:nvPr>
+            <p:ph type="title"/>
+          </p:nvPr>
+        </p:nvSpPr>
+        <p:spPr bwMode="auto">
+          <a:noFill/>
+          <a:ln>
+            <a:miter lim="800000"/>
+            <a:headEnd/>
+            <a:tailEnd/>
+          </a:ln>
+        </p:spPr>
+        <p:txBody>
+          <a:bodyPr vert="horz" wrap="square" lIns="91440" tIns="45720" rIns="91440" bIns="45720" numCol="1" anchor="t" anchorCtr="0" compatLnSpc="1">
+            <a:prstTxWarp prst="textNoShape">
+              <a:avLst/>
+            </a:prstTxWarp>
+          </a:bodyPr>
+          <a:lstStyle/>
+          <a:p>
+            <a:pPr eaLnBrk="1" hangingPunct="1"/>
+            <a:r>
+              <a:rPr lang="en-US" dirty="0" smtClean="0"/>
+              <a:t>Simple Org Chart – v2</a:t>
+            </a:r>
+          </a:p>
+        </p:txBody>
+      </p:sp>
+      <p:pic>
+        <p:nvPicPr>
+          <p:cNvPr id="4" name="Picture 6" descr="X:\Derick-GitHub\Presentation And Training Material\Decoupling Workflow With App Controler\doc\Real World Workflow Coupling.jpg"/>
+          <p:cNvPicPr>
+            <a:picLocks noChangeAspect="1" noChangeArrowheads="1"/>
+          </p:cNvPicPr>
+          <p:nvPr/>
+        </p:nvPicPr>
+        <p:blipFill>
+          <a:blip r:embed="rId3"/>
+          <a:srcRect/>
+          <a:stretch>
+            <a:fillRect/>
+          </a:stretch>
+        </p:blipFill>
+        <p:spPr bwMode="auto">
+          <a:xfrm>
+            <a:off x="838200" y="1575550"/>
+            <a:ext cx="5638799" cy="4901450"/>
+          </a:xfrm>
+          <a:prstGeom prst="rect">
+            <a:avLst/>
+          </a:prstGeom>
+          <a:noFill/>
+        </p:spPr>
+      </p:pic>
+    </p:spTree>
+  </p:cSld>
+  <p:clrMapOvr>
+    <a:masterClrMapping/>
+  </p:clrMapOvr>
+  <p:timing>
+    <p:tnLst>
+      <p:par>
+        <p:cTn id="1" dur="indefinite" restart="never" nodeType="tmRoot"/>
+      </p:par>
+    </p:tnLst>
+  </p:timing>
+</p:sld>
+</file>
+
+<file path=ppt/slides/slide21.xml><?xml version="1.0" encoding="utf-8"?>
+<p:sld xmlns:a="http://schemas.openxmlformats.org/drawingml/2006/main" xmlns:r="http://schemas.openxmlformats.org/officeDocument/2006/relationships" xmlns:p="http://schemas.openxmlformats.org/presentationml/2006/main">
+  <p:cSld>
+    <p:spTree>
+      <p:nvGrpSpPr>
+        <p:cNvPr id="1" name=""/>
+        <p:cNvGrpSpPr/>
+        <p:nvPr/>
+      </p:nvGrpSpPr>
+      <p:grpSpPr>
+        <a:xfrm>
+          <a:off x="0" y="0"/>
+          <a:ext cx="0" cy="0"/>
+          <a:chOff x="0" y="0"/>
+          <a:chExt cx="0" cy="0"/>
+        </a:xfrm>
+      </p:grpSpPr>
+      <p:sp>
+        <p:nvSpPr>
           <p:cNvPr id="4" name="Rectangle 3"/>
           <p:cNvSpPr/>
           <p:nvPr/>
@@ -7035,96 +8307,6 @@
 </p:sld>
 </file>
 
-<file path=ppt/slides/slide21.xml><?xml version="1.0" encoding="utf-8"?>
-<p:sld xmlns:a="http://schemas.openxmlformats.org/drawingml/2006/main" xmlns:r="http://schemas.openxmlformats.org/officeDocument/2006/relationships" xmlns:p="http://schemas.openxmlformats.org/presentationml/2006/main">
-  <p:cSld>
-    <p:spTree>
-      <p:nvGrpSpPr>
-        <p:cNvPr id="1" name=""/>
-        <p:cNvGrpSpPr/>
-        <p:nvPr/>
-      </p:nvGrpSpPr>
-      <p:grpSpPr>
-        <a:xfrm>
-          <a:off x="0" y="0"/>
-          <a:ext cx="0" cy="0"/>
-          <a:chOff x="0" y="0"/>
-          <a:chExt cx="0" cy="0"/>
-        </a:xfrm>
-      </p:grpSpPr>
-      <p:sp>
-        <p:nvSpPr>
-          <p:cNvPr id="3075" name="Text Placeholder 2"/>
-          <p:cNvSpPr>
-            <a:spLocks noGrp="1"/>
-          </p:cNvSpPr>
-          <p:nvPr>
-            <p:ph type="body" sz="quarter" idx="10"/>
-          </p:nvPr>
-        </p:nvSpPr>
-        <p:spPr>
-          <a:xfrm>
-            <a:off x="685800" y="1066800"/>
-            <a:ext cx="8229600" cy="1219200"/>
-          </a:xfrm>
-        </p:spPr>
-        <p:txBody>
-          <a:bodyPr/>
-          <a:lstStyle/>
-          <a:p>
-            <a:pPr eaLnBrk="1" hangingPunct="1">
-              <a:buNone/>
-            </a:pPr>
-            <a:endParaRPr lang="en-US" sz="2000" dirty="0" smtClean="0"/>
-          </a:p>
-        </p:txBody>
-      </p:sp>
-      <p:sp>
-        <p:nvSpPr>
-          <p:cNvPr id="3074" name="Title 1"/>
-          <p:cNvSpPr>
-            <a:spLocks noGrp="1"/>
-          </p:cNvSpPr>
-          <p:nvPr>
-            <p:ph type="title"/>
-          </p:nvPr>
-        </p:nvSpPr>
-        <p:spPr bwMode="auto">
-          <a:noFill/>
-          <a:ln>
-            <a:miter lim="800000"/>
-            <a:headEnd/>
-            <a:tailEnd/>
-          </a:ln>
-        </p:spPr>
-        <p:txBody>
-          <a:bodyPr vert="horz" wrap="square" lIns="91440" tIns="45720" rIns="91440" bIns="45720" numCol="1" anchor="t" anchorCtr="0" compatLnSpc="1">
-            <a:prstTxWarp prst="textNoShape">
-              <a:avLst/>
-            </a:prstTxWarp>
-          </a:bodyPr>
-          <a:lstStyle/>
-          <a:p>
-            <a:pPr eaLnBrk="1" hangingPunct="1"/>
-            <a:endParaRPr lang="en-US" dirty="0" smtClean="0"/>
-          </a:p>
-        </p:txBody>
-      </p:sp>
-    </p:spTree>
-  </p:cSld>
-  <p:clrMapOvr>
-    <a:masterClrMapping/>
-  </p:clrMapOvr>
-  <p:timing>
-    <p:tnLst>
-      <p:par>
-        <p:cTn id="1" dur="indefinite" restart="never" nodeType="tmRoot"/>
-      </p:par>
-    </p:tnLst>
-  </p:timing>
-</p:sld>
-</file>
-
 <file path=ppt/slides/slide22.xml><?xml version="1.0" encoding="utf-8"?>
 <p:sld xmlns:a="http://schemas.openxmlformats.org/drawingml/2006/main" xmlns:r="http://schemas.openxmlformats.org/officeDocument/2006/relationships" xmlns:p="http://schemas.openxmlformats.org/presentationml/2006/main">
   <p:cSld>
@@ -7216,6 +8398,96 @@
 </file>
 
 <file path=ppt/slides/slide23.xml><?xml version="1.0" encoding="utf-8"?>
+<p:sld xmlns:a="http://schemas.openxmlformats.org/drawingml/2006/main" xmlns:r="http://schemas.openxmlformats.org/officeDocument/2006/relationships" xmlns:p="http://schemas.openxmlformats.org/presentationml/2006/main">
+  <p:cSld>
+    <p:spTree>
+      <p:nvGrpSpPr>
+        <p:cNvPr id="1" name=""/>
+        <p:cNvGrpSpPr/>
+        <p:nvPr/>
+      </p:nvGrpSpPr>
+      <p:grpSpPr>
+        <a:xfrm>
+          <a:off x="0" y="0"/>
+          <a:ext cx="0" cy="0"/>
+          <a:chOff x="0" y="0"/>
+          <a:chExt cx="0" cy="0"/>
+        </a:xfrm>
+      </p:grpSpPr>
+      <p:sp>
+        <p:nvSpPr>
+          <p:cNvPr id="3075" name="Text Placeholder 2"/>
+          <p:cNvSpPr>
+            <a:spLocks noGrp="1"/>
+          </p:cNvSpPr>
+          <p:nvPr>
+            <p:ph type="body" sz="quarter" idx="10"/>
+          </p:nvPr>
+        </p:nvSpPr>
+        <p:spPr>
+          <a:xfrm>
+            <a:off x="685800" y="1066800"/>
+            <a:ext cx="8229600" cy="1219200"/>
+          </a:xfrm>
+        </p:spPr>
+        <p:txBody>
+          <a:bodyPr/>
+          <a:lstStyle/>
+          <a:p>
+            <a:pPr eaLnBrk="1" hangingPunct="1">
+              <a:buNone/>
+            </a:pPr>
+            <a:endParaRPr lang="en-US" sz="2000" dirty="0" smtClean="0"/>
+          </a:p>
+        </p:txBody>
+      </p:sp>
+      <p:sp>
+        <p:nvSpPr>
+          <p:cNvPr id="3074" name="Title 1"/>
+          <p:cNvSpPr>
+            <a:spLocks noGrp="1"/>
+          </p:cNvSpPr>
+          <p:nvPr>
+            <p:ph type="title"/>
+          </p:nvPr>
+        </p:nvSpPr>
+        <p:spPr bwMode="auto">
+          <a:noFill/>
+          <a:ln>
+            <a:miter lim="800000"/>
+            <a:headEnd/>
+            <a:tailEnd/>
+          </a:ln>
+        </p:spPr>
+        <p:txBody>
+          <a:bodyPr vert="horz" wrap="square" lIns="91440" tIns="45720" rIns="91440" bIns="45720" numCol="1" anchor="t" anchorCtr="0" compatLnSpc="1">
+            <a:prstTxWarp prst="textNoShape">
+              <a:avLst/>
+            </a:prstTxWarp>
+          </a:bodyPr>
+          <a:lstStyle/>
+          <a:p>
+            <a:pPr eaLnBrk="1" hangingPunct="1"/>
+            <a:endParaRPr lang="en-US" dirty="0" smtClean="0"/>
+          </a:p>
+        </p:txBody>
+      </p:sp>
+    </p:spTree>
+  </p:cSld>
+  <p:clrMapOvr>
+    <a:masterClrMapping/>
+  </p:clrMapOvr>
+  <p:timing>
+    <p:tnLst>
+      <p:par>
+        <p:cTn id="1" dur="indefinite" restart="never" nodeType="tmRoot"/>
+      </p:par>
+    </p:tnLst>
+  </p:timing>
+</p:sld>
+</file>
+
+<file path=ppt/slides/slide24.xml><?xml version="1.0" encoding="utf-8"?>
 <p:sld xmlns:a="http://schemas.openxmlformats.org/drawingml/2006/main" xmlns:r="http://schemas.openxmlformats.org/officeDocument/2006/relationships" xmlns:p="http://schemas.openxmlformats.org/presentationml/2006/main">
   <p:cSld>
     <p:spTree>
@@ -7564,96 +8836,6 @@
 </p:sld>
 </file>
 
-<file path=ppt/slides/slide24.xml><?xml version="1.0" encoding="utf-8"?>
-<p:sld xmlns:a="http://schemas.openxmlformats.org/drawingml/2006/main" xmlns:r="http://schemas.openxmlformats.org/officeDocument/2006/relationships" xmlns:p="http://schemas.openxmlformats.org/presentationml/2006/main">
-  <p:cSld>
-    <p:spTree>
-      <p:nvGrpSpPr>
-        <p:cNvPr id="1" name=""/>
-        <p:cNvGrpSpPr/>
-        <p:nvPr/>
-      </p:nvGrpSpPr>
-      <p:grpSpPr>
-        <a:xfrm>
-          <a:off x="0" y="0"/>
-          <a:ext cx="0" cy="0"/>
-          <a:chOff x="0" y="0"/>
-          <a:chExt cx="0" cy="0"/>
-        </a:xfrm>
-      </p:grpSpPr>
-      <p:sp>
-        <p:nvSpPr>
-          <p:cNvPr id="3075" name="Text Placeholder 2"/>
-          <p:cNvSpPr>
-            <a:spLocks noGrp="1"/>
-          </p:cNvSpPr>
-          <p:nvPr>
-            <p:ph type="body" sz="quarter" idx="10"/>
-          </p:nvPr>
-        </p:nvSpPr>
-        <p:spPr>
-          <a:xfrm>
-            <a:off x="685800" y="1066800"/>
-            <a:ext cx="8229600" cy="1219200"/>
-          </a:xfrm>
-        </p:spPr>
-        <p:txBody>
-          <a:bodyPr/>
-          <a:lstStyle/>
-          <a:p>
-            <a:pPr eaLnBrk="1" hangingPunct="1">
-              <a:buNone/>
-            </a:pPr>
-            <a:endParaRPr lang="en-US" sz="2000" dirty="0" smtClean="0"/>
-          </a:p>
-        </p:txBody>
-      </p:sp>
-      <p:sp>
-        <p:nvSpPr>
-          <p:cNvPr id="3074" name="Title 1"/>
-          <p:cNvSpPr>
-            <a:spLocks noGrp="1"/>
-          </p:cNvSpPr>
-          <p:nvPr>
-            <p:ph type="title"/>
-          </p:nvPr>
-        </p:nvSpPr>
-        <p:spPr bwMode="auto">
-          <a:noFill/>
-          <a:ln>
-            <a:miter lim="800000"/>
-            <a:headEnd/>
-            <a:tailEnd/>
-          </a:ln>
-        </p:spPr>
-        <p:txBody>
-          <a:bodyPr vert="horz" wrap="square" lIns="91440" tIns="45720" rIns="91440" bIns="45720" numCol="1" anchor="t" anchorCtr="0" compatLnSpc="1">
-            <a:prstTxWarp prst="textNoShape">
-              <a:avLst/>
-            </a:prstTxWarp>
-          </a:bodyPr>
-          <a:lstStyle/>
-          <a:p>
-            <a:pPr eaLnBrk="1" hangingPunct="1"/>
-            <a:endParaRPr lang="en-US" dirty="0" smtClean="0"/>
-          </a:p>
-        </p:txBody>
-      </p:sp>
-    </p:spTree>
-  </p:cSld>
-  <p:clrMapOvr>
-    <a:masterClrMapping/>
-  </p:clrMapOvr>
-  <p:timing>
-    <p:tnLst>
-      <p:par>
-        <p:cTn id="1" dur="indefinite" restart="never" nodeType="tmRoot"/>
-      </p:par>
-    </p:tnLst>
-  </p:timing>
-</p:sld>
-</file>
-
 <file path=ppt/slides/slide25.xml><?xml version="1.0" encoding="utf-8"?>
 <p:sld xmlns:a="http://schemas.openxmlformats.org/drawingml/2006/main" xmlns:r="http://schemas.openxmlformats.org/officeDocument/2006/relationships" xmlns:p="http://schemas.openxmlformats.org/presentationml/2006/main">
   <p:cSld>
@@ -7745,6 +8927,96 @@
 </file>
 
 <file path=ppt/slides/slide26.xml><?xml version="1.0" encoding="utf-8"?>
+<p:sld xmlns:a="http://schemas.openxmlformats.org/drawingml/2006/main" xmlns:r="http://schemas.openxmlformats.org/officeDocument/2006/relationships" xmlns:p="http://schemas.openxmlformats.org/presentationml/2006/main">
+  <p:cSld>
+    <p:spTree>
+      <p:nvGrpSpPr>
+        <p:cNvPr id="1" name=""/>
+        <p:cNvGrpSpPr/>
+        <p:nvPr/>
+      </p:nvGrpSpPr>
+      <p:grpSpPr>
+        <a:xfrm>
+          <a:off x="0" y="0"/>
+          <a:ext cx="0" cy="0"/>
+          <a:chOff x="0" y="0"/>
+          <a:chExt cx="0" cy="0"/>
+        </a:xfrm>
+      </p:grpSpPr>
+      <p:sp>
+        <p:nvSpPr>
+          <p:cNvPr id="3075" name="Text Placeholder 2"/>
+          <p:cNvSpPr>
+            <a:spLocks noGrp="1"/>
+          </p:cNvSpPr>
+          <p:nvPr>
+            <p:ph type="body" sz="quarter" idx="10"/>
+          </p:nvPr>
+        </p:nvSpPr>
+        <p:spPr>
+          <a:xfrm>
+            <a:off x="685800" y="1066800"/>
+            <a:ext cx="8229600" cy="1219200"/>
+          </a:xfrm>
+        </p:spPr>
+        <p:txBody>
+          <a:bodyPr/>
+          <a:lstStyle/>
+          <a:p>
+            <a:pPr eaLnBrk="1" hangingPunct="1">
+              <a:buNone/>
+            </a:pPr>
+            <a:endParaRPr lang="en-US" sz="2000" dirty="0" smtClean="0"/>
+          </a:p>
+        </p:txBody>
+      </p:sp>
+      <p:sp>
+        <p:nvSpPr>
+          <p:cNvPr id="3074" name="Title 1"/>
+          <p:cNvSpPr>
+            <a:spLocks noGrp="1"/>
+          </p:cNvSpPr>
+          <p:nvPr>
+            <p:ph type="title"/>
+          </p:nvPr>
+        </p:nvSpPr>
+        <p:spPr bwMode="auto">
+          <a:noFill/>
+          <a:ln>
+            <a:miter lim="800000"/>
+            <a:headEnd/>
+            <a:tailEnd/>
+          </a:ln>
+        </p:spPr>
+        <p:txBody>
+          <a:bodyPr vert="horz" wrap="square" lIns="91440" tIns="45720" rIns="91440" bIns="45720" numCol="1" anchor="t" anchorCtr="0" compatLnSpc="1">
+            <a:prstTxWarp prst="textNoShape">
+              <a:avLst/>
+            </a:prstTxWarp>
+          </a:bodyPr>
+          <a:lstStyle/>
+          <a:p>
+            <a:pPr eaLnBrk="1" hangingPunct="1"/>
+            <a:endParaRPr lang="en-US" dirty="0" smtClean="0"/>
+          </a:p>
+        </p:txBody>
+      </p:sp>
+    </p:spTree>
+  </p:cSld>
+  <p:clrMapOvr>
+    <a:masterClrMapping/>
+  </p:clrMapOvr>
+  <p:timing>
+    <p:tnLst>
+      <p:par>
+        <p:cTn id="1" dur="indefinite" restart="never" nodeType="tmRoot"/>
+      </p:par>
+    </p:tnLst>
+  </p:timing>
+</p:sld>
+</file>
+
+<file path=ppt/slides/slide27.xml><?xml version="1.0" encoding="utf-8"?>
 <p:sld xmlns:a="http://schemas.openxmlformats.org/drawingml/2006/main" xmlns:r="http://schemas.openxmlformats.org/officeDocument/2006/relationships" xmlns:p="http://schemas.openxmlformats.org/presentationml/2006/main">
   <p:cSld>
     <p:spTree>
@@ -8290,7 +9562,7 @@
 </p:sld>
 </file>
 
-<file path=ppt/slides/slide27.xml><?xml version="1.0" encoding="utf-8"?>
+<file path=ppt/slides/slide28.xml><?xml version="1.0" encoding="utf-8"?>
 <p:sld xmlns:a="http://schemas.openxmlformats.org/drawingml/2006/main" xmlns:r="http://schemas.openxmlformats.org/officeDocument/2006/relationships" xmlns:p="http://schemas.openxmlformats.org/presentationml/2006/main">
   <p:cSld>
     <p:spTree>
@@ -13257,21 +14529,6 @@
 </file>
 
 <file path=customXml/item1.xml><?xml version="1.0" encoding="utf-8"?>
-<p:properties xmlns:p="http://schemas.microsoft.com/office/2006/metadata/properties" xmlns:xsi="http://www.w3.org/2001/XMLSchema-instance">
-  <documentManagement/>
-</p:properties>
-</file>
-
-<file path=customXml/item2.xml><?xml version="1.0" encoding="utf-8"?>
-<?mso-contentType ?>
-<FormTemplates xmlns="http://schemas.microsoft.com/sharepoint/v3/contenttype/forms">
-  <Display>DocumentLibraryForm</Display>
-  <Edit>DocumentLibraryForm</Edit>
-  <New>DocumentLibraryForm</New>
-</FormTemplates>
-</file>
-
-<file path=customXml/item3.xml><?xml version="1.0" encoding="utf-8"?>
 <ct:contentTypeSchema xmlns:ct="http://schemas.microsoft.com/office/2006/metadata/contentType" xmlns:ma="http://schemas.microsoft.com/office/2006/metadata/properties/metaAttributes" ct:_="" ma:_="" ma:contentTypeName="Document" ma:contentTypeID="0x0101005857B3975182FB47B67FAAA67052062C" ma:contentTypeVersion="0" ma:contentTypeDescription="Create a new document." ma:contentTypeScope="" ma:versionID="a1781edd533abf786dc62ee7dded643a">
   <xsd:schema xmlns:xsd="http://www.w3.org/2001/XMLSchema" xmlns:p="http://schemas.microsoft.com/office/2006/metadata/properties" targetNamespace="http://schemas.microsoft.com/office/2006/metadata/properties" ma:root="true" ma:fieldsID="4aeb20c0e3442673af7ee10786458764">
     <xsd:element name="properties">
@@ -13320,10 +14577,32 @@
 </ct:contentTypeSchema>
 </file>
 
+<file path=customXml/item2.xml><?xml version="1.0" encoding="utf-8"?>
+<?mso-contentType ?>
+<FormTemplates xmlns="http://schemas.microsoft.com/sharepoint/v3/contenttype/forms">
+  <Display>DocumentLibraryForm</Display>
+  <Edit>DocumentLibraryForm</Edit>
+  <New>DocumentLibraryForm</New>
+</FormTemplates>
+</file>
+
+<file path=customXml/item3.xml><?xml version="1.0" encoding="utf-8"?>
+<p:properties xmlns:p="http://schemas.microsoft.com/office/2006/metadata/properties" xmlns:xsi="http://www.w3.org/2001/XMLSchema-instance">
+  <documentManagement/>
+</p:properties>
+</file>
+
 <file path=customXml/itemProps1.xml><?xml version="1.0" encoding="utf-8"?>
-<ds:datastoreItem xmlns:ds="http://schemas.openxmlformats.org/officeDocument/2006/customXml" ds:itemID="{F8AADC7F-5DC4-46F2-A809-0679B041C012}">
+<ds:datastoreItem xmlns:ds="http://schemas.openxmlformats.org/officeDocument/2006/customXml" ds:itemID="{D3EBC05E-93E3-47EC-A4AA-B305F2941009}">
   <ds:schemaRefs>
+    <ds:schemaRef ds:uri="http://schemas.microsoft.com/office/2006/metadata/contentType"/>
+    <ds:schemaRef ds:uri="http://schemas.microsoft.com/office/2006/metadata/properties/metaAttributes"/>
+    <ds:schemaRef ds:uri="http://www.w3.org/2001/XMLSchema"/>
     <ds:schemaRef ds:uri="http://schemas.microsoft.com/office/2006/metadata/properties"/>
+    <ds:schemaRef ds:uri="http://schemas.openxmlformats.org/package/2006/metadata/core-properties"/>
+    <ds:schemaRef ds:uri="http://purl.org/dc/elements/1.1/"/>
+    <ds:schemaRef ds:uri="http://purl.org/dc/terms/"/>
+    <ds:schemaRef ds:uri="http://schemas.microsoft.com/office/internal/2005/internalDocumentation"/>
   </ds:schemaRefs>
 </ds:datastoreItem>
 </file>
@@ -13337,16 +14616,9 @@
 </file>
 
 <file path=customXml/itemProps3.xml><?xml version="1.0" encoding="utf-8"?>
-<ds:datastoreItem xmlns:ds="http://schemas.openxmlformats.org/officeDocument/2006/customXml" ds:itemID="{D3EBC05E-93E3-47EC-A4AA-B305F2941009}">
+<ds:datastoreItem xmlns:ds="http://schemas.openxmlformats.org/officeDocument/2006/customXml" ds:itemID="{F8AADC7F-5DC4-46F2-A809-0679B041C012}">
   <ds:schemaRefs>
-    <ds:schemaRef ds:uri="http://schemas.microsoft.com/office/2006/metadata/contentType"/>
-    <ds:schemaRef ds:uri="http://schemas.microsoft.com/office/2006/metadata/properties/metaAttributes"/>
-    <ds:schemaRef ds:uri="http://www.w3.org/2001/XMLSchema"/>
     <ds:schemaRef ds:uri="http://schemas.microsoft.com/office/2006/metadata/properties"/>
-    <ds:schemaRef ds:uri="http://schemas.openxmlformats.org/package/2006/metadata/core-properties"/>
-    <ds:schemaRef ds:uri="http://purl.org/dc/elements/1.1/"/>
-    <ds:schemaRef ds:uri="http://purl.org/dc/terms/"/>
-    <ds:schemaRef ds:uri="http://schemas.microsoft.com/office/internal/2005/internalDocumentation"/>
   </ds:schemaRefs>
 </ds:datastoreItem>
 </file>
</xml_diff>

<commit_message>
added copy of code for command pattern version, not yet modified
</commit_message>
<xml_diff>
--- a/Decoupling Workflow With App Controler/Decoupling Workflow From Forms.pptx
+++ b/Decoupling Workflow With App Controler/Decoupling Workflow From Forms.pptx
@@ -7386,6 +7386,10 @@
             <a:pPr eaLnBrk="1" hangingPunct="1">
               <a:buNone/>
             </a:pPr>
+            <a:r>
+              <a:rPr lang="en-US" sz="2000" dirty="0" smtClean="0"/>
+              <a:t>Decoupling The Add New Employee Workflow From The Main Form</a:t>
+            </a:r>
             <a:endParaRPr lang="en-US" sz="2000" dirty="0" smtClean="0"/>
           </a:p>
         </p:txBody>
@@ -7425,102 +7429,160 @@
           </a:p>
         </p:txBody>
       </p:sp>
-      <p:pic>
-        <p:nvPicPr>
-          <p:cNvPr id="5" name="Picture 2" descr="X:\Derick-GitHub\Presentation And Training Material\Decoupling Workflow With App Controler\doc\Org Chart View.png"/>
-          <p:cNvPicPr>
-            <a:picLocks noChangeAspect="1" noChangeArrowheads="1"/>
-          </p:cNvPicPr>
+      <p:grpSp>
+        <p:nvGrpSpPr>
+          <p:cNvPr id="11" name="Group 10"/>
+          <p:cNvGrpSpPr/>
           <p:nvPr/>
-        </p:nvPicPr>
-        <p:blipFill>
-          <a:blip r:embed="rId3"/>
-          <a:srcRect/>
-          <a:stretch>
-            <a:fillRect/>
-          </a:stretch>
-        </p:blipFill>
-        <p:spPr bwMode="auto">
+        </p:nvGrpSpPr>
+        <p:grpSpPr>
           <a:xfrm>
-            <a:off x="904875" y="1971675"/>
-            <a:ext cx="4286251" cy="4048125"/>
+            <a:off x="1976438" y="1971675"/>
+            <a:ext cx="5191125" cy="4048125"/>
+            <a:chOff x="904875" y="1971675"/>
+            <a:chExt cx="5191125" cy="4048125"/>
           </a:xfrm>
-          <a:prstGeom prst="rect">
-            <a:avLst/>
-          </a:prstGeom>
-          <a:noFill/>
-        </p:spPr>
-      </p:pic>
-      <p:cxnSp>
-        <p:nvCxnSpPr>
-          <p:cNvPr id="7" name="Straight Connector 6"/>
-          <p:cNvCxnSpPr/>
-          <p:nvPr/>
-        </p:nvCxnSpPr>
-        <p:spPr>
-          <a:xfrm rot="5400000" flipH="1" flipV="1">
-            <a:off x="1628775" y="3924300"/>
-            <a:ext cx="2286000" cy="838200"/>
-          </a:xfrm>
-          <a:prstGeom prst="line">
-            <a:avLst/>
-          </a:prstGeom>
-          <a:ln w="38100">
-            <a:solidFill>
+        </p:grpSpPr>
+        <p:pic>
+          <p:nvPicPr>
+            <p:cNvPr id="5" name="Picture 2" descr="X:\Derick-GitHub\Presentation And Training Material\Decoupling Workflow With App Controler\doc\Org Chart View.png"/>
+            <p:cNvPicPr>
+              <a:picLocks noChangeAspect="1" noChangeArrowheads="1"/>
+            </p:cNvPicPr>
+            <p:nvPr/>
+          </p:nvPicPr>
+          <p:blipFill>
+            <a:blip r:embed="rId3"/>
+            <a:srcRect/>
+            <a:stretch>
+              <a:fillRect/>
+            </a:stretch>
+          </p:blipFill>
+          <p:spPr bwMode="auto">
+            <a:xfrm>
+              <a:off x="904875" y="1971675"/>
+              <a:ext cx="4286251" cy="4048125"/>
+            </a:xfrm>
+            <a:prstGeom prst="rect">
+              <a:avLst/>
+            </a:prstGeom>
+            <a:noFill/>
+          </p:spPr>
+        </p:pic>
+        <p:cxnSp>
+          <p:nvCxnSpPr>
+            <p:cNvPr id="7" name="Straight Connector 6"/>
+            <p:cNvCxnSpPr/>
+            <p:nvPr/>
+          </p:nvCxnSpPr>
+          <p:spPr>
+            <a:xfrm rot="5400000" flipH="1" flipV="1">
+              <a:off x="2090737" y="4376738"/>
+              <a:ext cx="1371600" cy="847725"/>
+            </a:xfrm>
+            <a:prstGeom prst="line">
+              <a:avLst/>
+            </a:prstGeom>
+            <a:ln w="38100">
+              <a:solidFill>
+                <a:schemeClr val="accent2"/>
+              </a:solidFill>
+            </a:ln>
+          </p:spPr>
+          <p:style>
+            <a:lnRef idx="1">
+              <a:schemeClr val="accent1"/>
+            </a:lnRef>
+            <a:fillRef idx="0">
+              <a:schemeClr val="accent1"/>
+            </a:fillRef>
+            <a:effectRef idx="0">
+              <a:schemeClr val="accent1"/>
+            </a:effectRef>
+            <a:fontRef idx="minor">
+              <a:schemeClr val="tx1"/>
+            </a:fontRef>
+          </p:style>
+        </p:cxnSp>
+        <p:cxnSp>
+          <p:nvCxnSpPr>
+            <p:cNvPr id="8" name="Straight Connector 7"/>
+            <p:cNvCxnSpPr/>
+            <p:nvPr/>
+          </p:nvCxnSpPr>
+          <p:spPr>
+            <a:xfrm flipV="1">
+              <a:off x="2352675" y="5029200"/>
+              <a:ext cx="838200" cy="685800"/>
+            </a:xfrm>
+            <a:prstGeom prst="line">
+              <a:avLst/>
+            </a:prstGeom>
+            <a:ln w="38100">
+              <a:solidFill>
+                <a:schemeClr val="accent2"/>
+              </a:solidFill>
+            </a:ln>
+          </p:spPr>
+          <p:style>
+            <a:lnRef idx="1">
+              <a:schemeClr val="accent1"/>
+            </a:lnRef>
+            <a:fillRef idx="0">
+              <a:schemeClr val="accent1"/>
+            </a:fillRef>
+            <a:effectRef idx="0">
+              <a:schemeClr val="accent1"/>
+            </a:effectRef>
+            <a:fontRef idx="minor">
+              <a:schemeClr val="tx1"/>
+            </a:fontRef>
+          </p:style>
+        </p:cxnSp>
+        <p:sp>
+          <p:nvSpPr>
+            <p:cNvPr id="9" name="Rectangle 8"/>
+            <p:cNvSpPr/>
+            <p:nvPr/>
+          </p:nvSpPr>
+          <p:spPr>
+            <a:xfrm>
+              <a:off x="3200400" y="4114800"/>
+              <a:ext cx="2895600" cy="914400"/>
+            </a:xfrm>
+            <a:prstGeom prst="rect">
+              <a:avLst/>
+            </a:prstGeom>
+            <a:ln w="38100"/>
+          </p:spPr>
+          <p:style>
+            <a:lnRef idx="2">
               <a:schemeClr val="accent2"/>
-            </a:solidFill>
-          </a:ln>
-        </p:spPr>
-        <p:style>
-          <a:lnRef idx="1">
-            <a:schemeClr val="accent1"/>
-          </a:lnRef>
-          <a:fillRef idx="0">
-            <a:schemeClr val="accent1"/>
-          </a:fillRef>
-          <a:effectRef idx="0">
-            <a:schemeClr val="accent1"/>
-          </a:effectRef>
-          <a:fontRef idx="minor">
-            <a:schemeClr val="tx1"/>
-          </a:fontRef>
-        </p:style>
-      </p:cxnSp>
-      <p:cxnSp>
-        <p:nvCxnSpPr>
-          <p:cNvPr id="8" name="Straight Connector 7"/>
-          <p:cNvCxnSpPr/>
-          <p:nvPr/>
-        </p:nvCxnSpPr>
-        <p:spPr>
-          <a:xfrm flipV="1">
-            <a:off x="2352675" y="5029200"/>
-            <a:ext cx="838200" cy="685800"/>
-          </a:xfrm>
-          <a:prstGeom prst="line">
-            <a:avLst/>
-          </a:prstGeom>
-          <a:ln w="38100">
-            <a:solidFill>
+            </a:lnRef>
+            <a:fillRef idx="1">
+              <a:schemeClr val="lt1"/>
+            </a:fillRef>
+            <a:effectRef idx="0">
               <a:schemeClr val="accent2"/>
-            </a:solidFill>
-          </a:ln>
-        </p:spPr>
-        <p:style>
-          <a:lnRef idx="1">
-            <a:schemeClr val="accent1"/>
-          </a:lnRef>
-          <a:fillRef idx="0">
-            <a:schemeClr val="accent1"/>
-          </a:fillRef>
-          <a:effectRef idx="0">
-            <a:schemeClr val="accent1"/>
-          </a:effectRef>
-          <a:fontRef idx="minor">
-            <a:schemeClr val="tx1"/>
-          </a:fontRef>
-        </p:style>
-      </p:cxnSp>
+            </a:effectRef>
+            <a:fontRef idx="minor">
+              <a:schemeClr val="dk1"/>
+            </a:fontRef>
+          </p:style>
+          <p:txBody>
+            <a:bodyPr rtlCol="0" anchor="ctr"/>
+            <a:lstStyle/>
+            <a:p>
+              <a:pPr algn="ctr"/>
+              <a:r>
+                <a:rPr lang="en-US" dirty="0" smtClean="0"/>
+                <a:t>(Insert Command Interface And Object, Here)</a:t>
+              </a:r>
+              <a:endParaRPr lang="en-US" dirty="0"/>
+            </a:p>
+          </p:txBody>
+        </p:sp>
+      </p:grpSp>
     </p:spTree>
   </p:cSld>
   <p:clrMapOvr>

</xml_diff>

<commit_message>
adding 'workflow' version of code and outline of slides
</commit_message>
<xml_diff>
--- a/Decoupling Workflow With App Controler/Decoupling Workflow From Forms.pptx
+++ b/Decoupling Workflow With App Controler/Decoupling Workflow From Forms.pptx
@@ -5,10 +5,10 @@
     <p:sldMasterId id="2147483822" r:id="rId4"/>
   </p:sldMasterIdLst>
   <p:notesMasterIdLst>
-    <p:notesMasterId r:id="rId33"/>
+    <p:notesMasterId r:id="rId35"/>
   </p:notesMasterIdLst>
   <p:handoutMasterIdLst>
-    <p:handoutMasterId r:id="rId34"/>
+    <p:handoutMasterId r:id="rId36"/>
   </p:handoutMasterIdLst>
   <p:sldIdLst>
     <p:sldId id="256" r:id="rId5"/>
@@ -26,29 +26,31 @@
     <p:sldId id="296" r:id="rId17"/>
     <p:sldId id="278" r:id="rId18"/>
     <p:sldId id="295" r:id="rId19"/>
-    <p:sldId id="285" r:id="rId20"/>
-    <p:sldId id="299" r:id="rId21"/>
-    <p:sldId id="300" r:id="rId22"/>
-    <p:sldId id="298" r:id="rId23"/>
-    <p:sldId id="297" r:id="rId24"/>
-    <p:sldId id="276" r:id="rId25"/>
-    <p:sldId id="277" r:id="rId26"/>
-    <p:sldId id="284" r:id="rId27"/>
-    <p:sldId id="292" r:id="rId28"/>
-    <p:sldId id="293" r:id="rId29"/>
-    <p:sldId id="294" r:id="rId30"/>
-    <p:sldId id="259" r:id="rId31"/>
-    <p:sldId id="274" r:id="rId32"/>
+    <p:sldId id="301" r:id="rId20"/>
+    <p:sldId id="302" r:id="rId21"/>
+    <p:sldId id="285" r:id="rId22"/>
+    <p:sldId id="299" r:id="rId23"/>
+    <p:sldId id="300" r:id="rId24"/>
+    <p:sldId id="298" r:id="rId25"/>
+    <p:sldId id="297" r:id="rId26"/>
+    <p:sldId id="276" r:id="rId27"/>
+    <p:sldId id="277" r:id="rId28"/>
+    <p:sldId id="284" r:id="rId29"/>
+    <p:sldId id="292" r:id="rId30"/>
+    <p:sldId id="293" r:id="rId31"/>
+    <p:sldId id="294" r:id="rId32"/>
+    <p:sldId id="259" r:id="rId33"/>
+    <p:sldId id="274" r:id="rId34"/>
   </p:sldIdLst>
   <p:sldSz cx="9144000" cy="6858000" type="screen4x3"/>
   <p:notesSz cx="7010400" cy="9296400"/>
   <p:embeddedFontLst>
     <p:embeddedFont>
       <p:font typeface="Calibri" pitchFamily="34" charset="0"/>
-      <p:regular r:id="rId35"/>
-      <p:bold r:id="rId36"/>
-      <p:italic r:id="rId37"/>
-      <p:boldItalic r:id="rId38"/>
+      <p:regular r:id="rId37"/>
+      <p:bold r:id="rId38"/>
+      <p:italic r:id="rId39"/>
+      <p:boldItalic r:id="rId40"/>
     </p:embeddedFont>
   </p:embeddedFontLst>
   <p:defaultTextStyle>
@@ -270,7 +272,7 @@
               <a:pPr>
                 <a:defRPr/>
               </a:pPr>
-              <a:t>5/18/2009</a:t>
+              <a:t>5/20/2009</a:t>
             </a:fld>
             <a:endParaRPr lang="en-US"/>
           </a:p>
@@ -448,7 +450,7 @@
               <a:pPr>
                 <a:defRPr/>
               </a:pPr>
-              <a:t>5/18/2009</a:t>
+              <a:t>5/20/2009</a:t>
             </a:fld>
             <a:endParaRPr lang="en-US"/>
           </a:p>
@@ -1086,7 +1088,7 @@
               <a:pPr>
                 <a:defRPr/>
               </a:pPr>
-              <a:t>16</a:t>
+              <a:t>17</a:t>
             </a:fld>
             <a:endParaRPr lang="en-US"/>
           </a:p>
@@ -1173,7 +1175,7 @@
               <a:pPr>
                 <a:defRPr/>
               </a:pPr>
-              <a:t>17</a:t>
+              <a:t>18</a:t>
             </a:fld>
             <a:endParaRPr lang="en-US"/>
           </a:p>
@@ -1260,7 +1262,7 @@
               <a:pPr>
                 <a:defRPr/>
               </a:pPr>
-              <a:t>18</a:t>
+              <a:t>19</a:t>
             </a:fld>
             <a:endParaRPr lang="en-US"/>
           </a:p>
@@ -1347,7 +1349,7 @@
               <a:pPr>
                 <a:defRPr/>
               </a:pPr>
-              <a:t>19</a:t>
+              <a:t>20</a:t>
             </a:fld>
             <a:endParaRPr lang="en-US"/>
           </a:p>
@@ -1434,7 +1436,7 @@
               <a:pPr>
                 <a:defRPr/>
               </a:pPr>
-              <a:t>20</a:t>
+              <a:t>21</a:t>
             </a:fld>
             <a:endParaRPr lang="en-US"/>
           </a:p>
@@ -1608,7 +1610,7 @@
               <a:pPr>
                 <a:defRPr/>
               </a:pPr>
-              <a:t>23</a:t>
+              <a:t>24</a:t>
             </a:fld>
             <a:endParaRPr lang="en-US"/>
           </a:p>
@@ -1869,7 +1871,94 @@
               <a:pPr>
                 <a:defRPr/>
               </a:pPr>
-              <a:t>26</a:t>
+              <a:t>27</a:t>
+            </a:fld>
+            <a:endParaRPr lang="en-US"/>
+          </a:p>
+        </p:txBody>
+      </p:sp>
+    </p:spTree>
+  </p:cSld>
+  <p:clrMapOvr>
+    <a:masterClrMapping/>
+  </p:clrMapOvr>
+</p:notes>
+</file>
+
+<file path=ppt/notesSlides/notesSlide21.xml><?xml version="1.0" encoding="utf-8"?>
+<p:notes xmlns:a="http://schemas.openxmlformats.org/drawingml/2006/main" xmlns:r="http://schemas.openxmlformats.org/officeDocument/2006/relationships" xmlns:p="http://schemas.openxmlformats.org/presentationml/2006/main">
+  <p:cSld>
+    <p:spTree>
+      <p:nvGrpSpPr>
+        <p:cNvPr id="1" name=""/>
+        <p:cNvGrpSpPr/>
+        <p:nvPr/>
+      </p:nvGrpSpPr>
+      <p:grpSpPr>
+        <a:xfrm>
+          <a:off x="0" y="0"/>
+          <a:ext cx="0" cy="0"/>
+          <a:chOff x="0" y="0"/>
+          <a:chExt cx="0" cy="0"/>
+        </a:xfrm>
+      </p:grpSpPr>
+      <p:sp>
+        <p:nvSpPr>
+          <p:cNvPr id="2" name="Slide Image Placeholder 1"/>
+          <p:cNvSpPr>
+            <a:spLocks noGrp="1" noRot="1" noChangeAspect="1"/>
+          </p:cNvSpPr>
+          <p:nvPr>
+            <p:ph type="sldImg"/>
+          </p:nvPr>
+        </p:nvSpPr>
+        <p:spPr/>
+      </p:sp>
+      <p:sp>
+        <p:nvSpPr>
+          <p:cNvPr id="3" name="Notes Placeholder 2"/>
+          <p:cNvSpPr>
+            <a:spLocks noGrp="1"/>
+          </p:cNvSpPr>
+          <p:nvPr>
+            <p:ph type="body" idx="1"/>
+          </p:nvPr>
+        </p:nvSpPr>
+        <p:spPr/>
+        <p:txBody>
+          <a:bodyPr>
+            <a:normAutofit/>
+          </a:bodyPr>
+          <a:lstStyle/>
+          <a:p>
+            <a:endParaRPr lang="en-US" dirty="0"/>
+          </a:p>
+        </p:txBody>
+      </p:sp>
+      <p:sp>
+        <p:nvSpPr>
+          <p:cNvPr id="4" name="Slide Number Placeholder 3"/>
+          <p:cNvSpPr>
+            <a:spLocks noGrp="1"/>
+          </p:cNvSpPr>
+          <p:nvPr>
+            <p:ph type="sldNum" sz="quarter" idx="10"/>
+          </p:nvPr>
+        </p:nvSpPr>
+        <p:spPr/>
+        <p:txBody>
+          <a:bodyPr/>
+          <a:lstStyle/>
+          <a:p>
+            <a:pPr>
+              <a:defRPr/>
+            </a:pPr>
+            <a:fld id="{1931C8FD-CC35-423B-99F4-64D81D6A80AE}" type="slidenum">
+              <a:rPr lang="en-US" smtClean="0"/>
+              <a:pPr>
+                <a:defRPr/>
+              </a:pPr>
+              <a:t>28</a:t>
             </a:fld>
             <a:endParaRPr lang="en-US"/>
           </a:p>
@@ -5950,7 +6039,16 @@
                 </a:solidFill>
                 <a:latin typeface="Calibri" pitchFamily="34" charset="0"/>
               </a:rPr>
-              <a:t>Simple Org Chart Version 2</a:t>
+              <a:t>Simple Org Chart Version </a:t>
+            </a:r>
+            <a:r>
+              <a:rPr lang="en-US" sz="3600" spc="60" dirty="0" smtClean="0">
+                <a:solidFill>
+                  <a:schemeClr val="bg1"/>
+                </a:solidFill>
+                <a:latin typeface="Calibri" pitchFamily="34" charset="0"/>
+              </a:rPr>
+              <a:t>2</a:t>
             </a:r>
             <a:endParaRPr lang="en-US" sz="3600" spc="60" dirty="0">
               <a:solidFill>
@@ -5993,7 +6091,16 @@
                 </a:solidFill>
                 <a:latin typeface="+mn-lt"/>
               </a:rPr>
-              <a:t>Introducing The Command Pattern</a:t>
+              <a:t>Introducing </a:t>
+            </a:r>
+            <a:r>
+              <a:rPr lang="en-US" sz="1600" dirty="0" smtClean="0">
+                <a:solidFill>
+                  <a:schemeClr val="bg1"/>
+                </a:solidFill>
+                <a:latin typeface="+mn-lt"/>
+              </a:rPr>
+              <a:t>A Workflow Service</a:t>
             </a:r>
             <a:endParaRPr lang="en-US" sz="1600" dirty="0">
               <a:solidFill>
@@ -6059,17 +6166,449 @@
             <a:pPr eaLnBrk="1" hangingPunct="1">
               <a:buNone/>
             </a:pPr>
+            <a:endParaRPr lang="en-US" sz="2000" dirty="0" smtClean="0"/>
+          </a:p>
+        </p:txBody>
+      </p:sp>
+      <p:sp>
+        <p:nvSpPr>
+          <p:cNvPr id="3074" name="Title 1"/>
+          <p:cNvSpPr>
+            <a:spLocks noGrp="1"/>
+          </p:cNvSpPr>
+          <p:nvPr>
+            <p:ph type="title"/>
+          </p:nvPr>
+        </p:nvSpPr>
+        <p:spPr bwMode="auto">
+          <a:noFill/>
+          <a:ln>
+            <a:miter lim="800000"/>
+            <a:headEnd/>
+            <a:tailEnd/>
+          </a:ln>
+        </p:spPr>
+        <p:txBody>
+          <a:bodyPr vert="horz" wrap="square" lIns="91440" tIns="45720" rIns="91440" bIns="45720" numCol="1" anchor="t" anchorCtr="0" compatLnSpc="1">
+            <a:prstTxWarp prst="textNoShape">
+              <a:avLst/>
+            </a:prstTxWarp>
+          </a:bodyPr>
+          <a:lstStyle/>
+          <a:p>
+            <a:pPr eaLnBrk="1" hangingPunct="1"/>
+            <a:r>
+              <a:rPr lang="en-US" dirty="0" smtClean="0"/>
+              <a:t>Workflow Services</a:t>
+            </a:r>
+            <a:endParaRPr lang="en-US" dirty="0" smtClean="0"/>
+          </a:p>
+        </p:txBody>
+      </p:sp>
+    </p:spTree>
+  </p:cSld>
+  <p:clrMapOvr>
+    <a:masterClrMapping/>
+  </p:clrMapOvr>
+  <p:timing>
+    <p:tnLst>
+      <p:par>
+        <p:cTn id="1" dur="indefinite" restart="never" nodeType="tmRoot"/>
+      </p:par>
+    </p:tnLst>
+  </p:timing>
+</p:sld>
+</file>
+
+<file path=ppt/slides/slide16.xml><?xml version="1.0" encoding="utf-8"?>
+<p:sld xmlns:a="http://schemas.openxmlformats.org/drawingml/2006/main" xmlns:r="http://schemas.openxmlformats.org/officeDocument/2006/relationships" xmlns:p="http://schemas.openxmlformats.org/presentationml/2006/main">
+  <p:cSld>
+    <p:spTree>
+      <p:nvGrpSpPr>
+        <p:cNvPr id="1" name=""/>
+        <p:cNvGrpSpPr/>
+        <p:nvPr/>
+      </p:nvGrpSpPr>
+      <p:grpSpPr>
+        <a:xfrm>
+          <a:off x="0" y="0"/>
+          <a:ext cx="0" cy="0"/>
+          <a:chOff x="0" y="0"/>
+          <a:chExt cx="0" cy="0"/>
+        </a:xfrm>
+      </p:grpSpPr>
+      <p:sp>
+        <p:nvSpPr>
+          <p:cNvPr id="4" name="Rectangle 3"/>
+          <p:cNvSpPr/>
+          <p:nvPr/>
+        </p:nvSpPr>
+        <p:spPr>
+          <a:xfrm>
+            <a:off x="0" y="0"/>
+            <a:ext cx="9144000" cy="4648200"/>
+          </a:xfrm>
+          <a:prstGeom prst="rect">
+            <a:avLst/>
+          </a:prstGeom>
+          <a:solidFill>
+            <a:srgbClr val="0069AA"/>
+          </a:solidFill>
+          <a:ln>
+            <a:noFill/>
+          </a:ln>
+        </p:spPr>
+        <p:style>
+          <a:lnRef idx="2">
+            <a:schemeClr val="accent1">
+              <a:shade val="50000"/>
+            </a:schemeClr>
+          </a:lnRef>
+          <a:fillRef idx="1">
+            <a:schemeClr val="accent1"/>
+          </a:fillRef>
+          <a:effectRef idx="0">
+            <a:schemeClr val="accent1"/>
+          </a:effectRef>
+          <a:fontRef idx="minor">
+            <a:schemeClr val="lt1"/>
+          </a:fontRef>
+        </p:style>
+        <p:txBody>
+          <a:bodyPr anchor="ctr"/>
+          <a:lstStyle/>
+          <a:p>
+            <a:pPr algn="ctr">
+              <a:defRPr/>
+            </a:pPr>
+            <a:endParaRPr lang="en-US"/>
+          </a:p>
+        </p:txBody>
+      </p:sp>
+      <p:pic>
+        <p:nvPicPr>
+          <p:cNvPr id="4099" name="Picture 4" descr="MAT logo 1 CMYK"/>
+          <p:cNvPicPr>
+            <a:picLocks noChangeAspect="1" noChangeArrowheads="1"/>
+          </p:cNvPicPr>
+          <p:nvPr/>
+        </p:nvPicPr>
+        <p:blipFill>
+          <a:blip r:embed="rId2">
+            <a:clrChange>
+              <a:clrFrom>
+                <a:srgbClr val="FDFDFD"/>
+              </a:clrFrom>
+              <a:clrTo>
+                <a:srgbClr val="FDFDFD">
+                  <a:alpha val="0"/>
+                </a:srgbClr>
+              </a:clrTo>
+            </a:clrChange>
+          </a:blip>
+          <a:srcRect/>
+          <a:stretch>
+            <a:fillRect/>
+          </a:stretch>
+        </p:blipFill>
+        <p:spPr bwMode="auto">
+          <a:xfrm>
+            <a:off x="2971800" y="4800600"/>
+            <a:ext cx="2819400" cy="1338263"/>
+          </a:xfrm>
+          <a:prstGeom prst="rect">
+            <a:avLst/>
+          </a:prstGeom>
+          <a:noFill/>
+          <a:ln w="9525">
+            <a:noFill/>
+            <a:miter lim="800000"/>
+            <a:headEnd/>
+            <a:tailEnd/>
+          </a:ln>
+        </p:spPr>
+      </p:pic>
+      <p:sp>
+        <p:nvSpPr>
+          <p:cNvPr id="5" name="Rectangle 4"/>
+          <p:cNvSpPr/>
+          <p:nvPr/>
+        </p:nvSpPr>
+        <p:spPr>
+          <a:xfrm>
+            <a:off x="0" y="4724400"/>
+            <a:ext cx="9144000" cy="2133600"/>
+          </a:xfrm>
+          <a:prstGeom prst="rect">
+            <a:avLst/>
+          </a:prstGeom>
+          <a:solidFill>
+            <a:srgbClr val="E31937"/>
+          </a:solidFill>
+          <a:ln>
+            <a:noFill/>
+          </a:ln>
+        </p:spPr>
+        <p:style>
+          <a:lnRef idx="2">
+            <a:schemeClr val="accent1">
+              <a:shade val="50000"/>
+            </a:schemeClr>
+          </a:lnRef>
+          <a:fillRef idx="1">
+            <a:schemeClr val="accent1"/>
+          </a:fillRef>
+          <a:effectRef idx="0">
+            <a:schemeClr val="accent1"/>
+          </a:effectRef>
+          <a:fontRef idx="minor">
+            <a:schemeClr val="lt1"/>
+          </a:fontRef>
+        </p:style>
+        <p:txBody>
+          <a:bodyPr anchor="ctr"/>
+          <a:lstStyle/>
+          <a:p>
+            <a:pPr algn="ctr">
+              <a:defRPr/>
+            </a:pPr>
+            <a:endParaRPr lang="en-US"/>
+          </a:p>
+        </p:txBody>
+      </p:sp>
+      <p:sp>
+        <p:nvSpPr>
+          <p:cNvPr id="10" name="Rectangle 9"/>
+          <p:cNvSpPr/>
+          <p:nvPr/>
+        </p:nvSpPr>
+        <p:spPr bwMode="auto">
+          <a:xfrm>
+            <a:off x="228600" y="0"/>
+            <a:ext cx="104775" cy="2325688"/>
+          </a:xfrm>
+          <a:prstGeom prst="rect">
+            <a:avLst/>
+          </a:prstGeom>
+          <a:solidFill>
+            <a:srgbClr val="E31937"/>
+          </a:solidFill>
+          <a:ln>
+            <a:noFill/>
+          </a:ln>
+        </p:spPr>
+        <p:style>
+          <a:lnRef idx="2">
+            <a:schemeClr val="accent1">
+              <a:shade val="50000"/>
+            </a:schemeClr>
+          </a:lnRef>
+          <a:fillRef idx="1">
+            <a:schemeClr val="accent1"/>
+          </a:fillRef>
+          <a:effectRef idx="0">
+            <a:schemeClr val="accent1"/>
+          </a:effectRef>
+          <a:fontRef idx="minor">
+            <a:schemeClr val="lt1"/>
+          </a:fontRef>
+        </p:style>
+        <p:txBody>
+          <a:bodyPr anchor="ctr"/>
+          <a:lstStyle/>
+          <a:p>
+            <a:pPr algn="ctr">
+              <a:defRPr/>
+            </a:pPr>
+            <a:endParaRPr lang="en-US"/>
+          </a:p>
+        </p:txBody>
+      </p:sp>
+      <p:pic>
+        <p:nvPicPr>
+          <p:cNvPr id="4103" name="Picture 7" descr="MAT logo vertical_red.emf"/>
+          <p:cNvPicPr>
+            <a:picLocks noChangeAspect="1"/>
+          </p:cNvPicPr>
+          <p:nvPr/>
+        </p:nvPicPr>
+        <p:blipFill>
+          <a:blip r:embed="rId3"/>
+          <a:srcRect/>
+          <a:stretch>
+            <a:fillRect/>
+          </a:stretch>
+        </p:blipFill>
+        <p:spPr bwMode="auto">
+          <a:xfrm>
+            <a:off x="3600450" y="5334000"/>
+            <a:ext cx="1981200" cy="969963"/>
+          </a:xfrm>
+          <a:prstGeom prst="rect">
+            <a:avLst/>
+          </a:prstGeom>
+          <a:noFill/>
+          <a:ln w="9525">
+            <a:noFill/>
+            <a:miter lim="800000"/>
+            <a:headEnd/>
+            <a:tailEnd/>
+          </a:ln>
+        </p:spPr>
+      </p:pic>
+      <p:sp>
+        <p:nvSpPr>
+          <p:cNvPr id="9" name="TextBox 8"/>
+          <p:cNvSpPr txBox="1"/>
+          <p:nvPr/>
+        </p:nvSpPr>
+        <p:spPr>
+          <a:xfrm>
+            <a:off x="381000" y="1447800"/>
+            <a:ext cx="8610600" cy="646331"/>
+          </a:xfrm>
+          <a:prstGeom prst="rect">
+            <a:avLst/>
+          </a:prstGeom>
+          <a:noFill/>
+        </p:spPr>
+        <p:txBody>
+          <a:bodyPr>
+            <a:spAutoFit/>
+          </a:bodyPr>
+          <a:lstStyle/>
+          <a:p>
+            <a:pPr>
+              <a:defRPr/>
+            </a:pPr>
+            <a:r>
+              <a:rPr lang="en-US" sz="3600" spc="60" dirty="0" smtClean="0">
+                <a:solidFill>
+                  <a:schemeClr val="bg1"/>
+                </a:solidFill>
+                <a:latin typeface="Calibri" pitchFamily="34" charset="0"/>
+              </a:rPr>
+              <a:t>Simple Org Chart Version </a:t>
+            </a:r>
+            <a:r>
+              <a:rPr lang="en-US" sz="3600" spc="60" dirty="0" smtClean="0">
+                <a:solidFill>
+                  <a:schemeClr val="bg1"/>
+                </a:solidFill>
+                <a:latin typeface="Calibri" pitchFamily="34" charset="0"/>
+              </a:rPr>
+              <a:t>3</a:t>
+            </a:r>
+            <a:endParaRPr lang="en-US" sz="3600" spc="60" dirty="0">
+              <a:solidFill>
+                <a:schemeClr val="bg1"/>
+              </a:solidFill>
+              <a:latin typeface="Calibri" pitchFamily="34" charset="0"/>
+            </a:endParaRPr>
+          </a:p>
+        </p:txBody>
+      </p:sp>
+      <p:sp>
+        <p:nvSpPr>
+          <p:cNvPr id="11" name="TextBox 10"/>
+          <p:cNvSpPr txBox="1"/>
+          <p:nvPr/>
+        </p:nvSpPr>
+        <p:spPr>
+          <a:xfrm>
+            <a:off x="381000" y="2057400"/>
+            <a:ext cx="7543800" cy="338554"/>
+          </a:xfrm>
+          <a:prstGeom prst="rect">
+            <a:avLst/>
+          </a:prstGeom>
+          <a:noFill/>
+        </p:spPr>
+        <p:txBody>
+          <a:bodyPr wrap="square">
+            <a:spAutoFit/>
+          </a:bodyPr>
+          <a:lstStyle/>
+          <a:p>
+            <a:pPr>
+              <a:defRPr/>
+            </a:pPr>
+            <a:r>
+              <a:rPr lang="en-US" sz="1600" dirty="0" smtClean="0">
+                <a:solidFill>
+                  <a:schemeClr val="bg1"/>
+                </a:solidFill>
+                <a:latin typeface="+mn-lt"/>
+              </a:rPr>
+              <a:t>Introducing The Command Pattern</a:t>
+            </a:r>
+            <a:endParaRPr lang="en-US" sz="1600" dirty="0">
+              <a:solidFill>
+                <a:schemeClr val="bg1"/>
+              </a:solidFill>
+              <a:latin typeface="+mn-lt"/>
+            </a:endParaRPr>
+          </a:p>
+        </p:txBody>
+      </p:sp>
+    </p:spTree>
+  </p:cSld>
+  <p:clrMapOvr>
+    <a:masterClrMapping/>
+  </p:clrMapOvr>
+  <p:timing>
+    <p:tnLst>
+      <p:par>
+        <p:cTn id="1" dur="indefinite" restart="never" nodeType="tmRoot"/>
+      </p:par>
+    </p:tnLst>
+  </p:timing>
+</p:sld>
+</file>
+
+<file path=ppt/slides/slide17.xml><?xml version="1.0" encoding="utf-8"?>
+<p:sld xmlns:a="http://schemas.openxmlformats.org/drawingml/2006/main" xmlns:r="http://schemas.openxmlformats.org/officeDocument/2006/relationships" xmlns:p="http://schemas.openxmlformats.org/presentationml/2006/main">
+  <p:cSld>
+    <p:spTree>
+      <p:nvGrpSpPr>
+        <p:cNvPr id="1" name=""/>
+        <p:cNvGrpSpPr/>
+        <p:nvPr/>
+      </p:nvGrpSpPr>
+      <p:grpSpPr>
+        <a:xfrm>
+          <a:off x="0" y="0"/>
+          <a:ext cx="0" cy="0"/>
+          <a:chOff x="0" y="0"/>
+          <a:chExt cx="0" cy="0"/>
+        </a:xfrm>
+      </p:grpSpPr>
+      <p:sp>
+        <p:nvSpPr>
+          <p:cNvPr id="3075" name="Text Placeholder 2"/>
+          <p:cNvSpPr>
+            <a:spLocks noGrp="1"/>
+          </p:cNvSpPr>
+          <p:nvPr>
+            <p:ph type="body" sz="quarter" idx="10"/>
+          </p:nvPr>
+        </p:nvSpPr>
+        <p:spPr>
+          <a:xfrm>
+            <a:off x="685800" y="1066800"/>
+            <a:ext cx="8229600" cy="1219200"/>
+          </a:xfrm>
+        </p:spPr>
+        <p:txBody>
+          <a:bodyPr/>
+          <a:lstStyle/>
+          <a:p>
+            <a:pPr eaLnBrk="1" hangingPunct="1">
+              <a:buNone/>
+            </a:pPr>
             <a:r>
               <a:rPr lang="en-US" sz="2000" dirty="0" smtClean="0"/>
-              <a:t>The command pattern is “used </a:t>
-            </a:r>
-            <a:r>
-              <a:rPr lang="en-US" sz="2000" dirty="0" smtClean="0"/>
-              <a:t>to represent and encapsulate all the information needed to call a method at a later time</a:t>
-            </a:r>
-            <a:r>
-              <a:rPr lang="en-US" sz="2000" dirty="0" smtClean="0"/>
-              <a:t>.”  - </a:t>
+              <a:t>The command pattern is “used to represent and encapsulate all the information needed to call a method at a later time.”  - </a:t>
             </a:r>
             <a:r>
               <a:rPr lang="en-US" sz="2000" dirty="0" smtClean="0">
@@ -6081,7 +6620,6 @@
               <a:rPr lang="en-US" sz="2000" dirty="0" smtClean="0"/>
               <a:t> </a:t>
             </a:r>
-            <a:endParaRPr lang="en-US" sz="2000" dirty="0" smtClean="0"/>
           </a:p>
         </p:txBody>
       </p:sp>
@@ -6116,13 +6654,12 @@
               <a:rPr lang="en-US" dirty="0" smtClean="0"/>
               <a:t>The Command Pattern</a:t>
             </a:r>
-            <a:endParaRPr lang="en-US" dirty="0" smtClean="0"/>
           </a:p>
         </p:txBody>
       </p:sp>
       <p:grpSp>
         <p:nvGrpSpPr>
-          <p:cNvPr id="15" name="Group 14"/>
+          <p:cNvPr id="2" name="Group 14"/>
           <p:cNvGrpSpPr/>
           <p:nvPr/>
         </p:nvGrpSpPr>
@@ -6369,7 +6906,7 @@
 </p:sld>
 </file>
 
-<file path=ppt/slides/slide16.xml><?xml version="1.0" encoding="utf-8"?>
+<file path=ppt/slides/slide18.xml><?xml version="1.0" encoding="utf-8"?>
 <p:sld xmlns:a="http://schemas.openxmlformats.org/drawingml/2006/main" xmlns:r="http://schemas.openxmlformats.org/officeDocument/2006/relationships" xmlns:p="http://schemas.openxmlformats.org/presentationml/2006/main">
   <p:cSld>
     <p:spTree>
@@ -6413,7 +6950,6 @@
               <a:rPr lang="en-US" sz="2000" dirty="0" smtClean="0"/>
               <a:t>Different Command Implementations In .NET</a:t>
             </a:r>
-            <a:endParaRPr lang="en-US" sz="2000" dirty="0" smtClean="0"/>
           </a:p>
         </p:txBody>
       </p:sp>
@@ -6448,7 +6984,6 @@
               <a:rPr lang="en-US" dirty="0" smtClean="0"/>
               <a:t>The Command Pattern</a:t>
             </a:r>
-            <a:endParaRPr lang="en-US" dirty="0" smtClean="0"/>
           </a:p>
         </p:txBody>
       </p:sp>
@@ -6852,7 +7387,7 @@
 </p:sld>
 </file>
 
-<file path=ppt/slides/slide17.xml><?xml version="1.0" encoding="utf-8"?>
+<file path=ppt/slides/slide19.xml><?xml version="1.0" encoding="utf-8"?>
 <p:sld xmlns:a="http://schemas.openxmlformats.org/drawingml/2006/main" xmlns:r="http://schemas.openxmlformats.org/officeDocument/2006/relationships" xmlns:p="http://schemas.openxmlformats.org/presentationml/2006/main">
   <p:cSld>
     <p:spTree>
@@ -6896,7 +7431,6 @@
               <a:rPr lang="en-US" sz="2000" dirty="0" smtClean="0"/>
               <a:t>Interfaces And Objects</a:t>
             </a:r>
-            <a:endParaRPr lang="en-US" sz="2000" dirty="0" smtClean="0"/>
           </a:p>
         </p:txBody>
       </p:sp>
@@ -6931,7 +7465,6 @@
               <a:rPr lang="en-US" dirty="0" smtClean="0"/>
               <a:t>The Command Pattern</a:t>
             </a:r>
-            <a:endParaRPr lang="en-US" dirty="0" smtClean="0"/>
           </a:p>
         </p:txBody>
       </p:sp>
@@ -7087,9 +7620,6 @@
                 </a:rPr>
                 <a:t>+</a:t>
               </a:r>
-              <a:endParaRPr lang="en-US" sz="2400" dirty="0" smtClean="0">
-                <a:latin typeface="+mn-lt"/>
-              </a:endParaRPr>
             </a:p>
           </p:txBody>
         </p:sp>
@@ -7195,9 +7725,6 @@
                   </a:rPr>
                   <a:t>&gt;</a:t>
                 </a:r>
-                <a:endParaRPr lang="en-US" sz="2400" dirty="0" smtClean="0">
-                  <a:latin typeface="+mn-lt"/>
-                </a:endParaRPr>
               </a:p>
             </p:txBody>
           </p:sp>
@@ -7229,9 +7756,6 @@
                   </a:rPr>
                   <a:t>=</a:t>
                 </a:r>
-                <a:endParaRPr lang="en-US" sz="2400" dirty="0" smtClean="0">
-                  <a:latin typeface="+mn-lt"/>
-                </a:endParaRPr>
               </a:p>
             </p:txBody>
           </p:sp>
@@ -7313,11 +7837,7 @@
             <a:p>
               <a:r>
                 <a:rPr lang="en-US" sz="2400" dirty="0" smtClean="0"/>
-                <a:t> </a:t>
-              </a:r>
-              <a:r>
-                <a:rPr lang="en-US" sz="2400" dirty="0" smtClean="0"/>
-                <a:t>   //do something here</a:t>
+                <a:t>    //do something here</a:t>
               </a:r>
             </a:p>
             <a:p>
@@ -7346,7 +7866,7 @@
 </p:sld>
 </file>
 
-<file path=ppt/slides/slide18.xml><?xml version="1.0" encoding="utf-8"?>
+<file path=ppt/slides/slide2.xml><?xml version="1.0" encoding="utf-8"?>
 <p:sld xmlns:a="http://schemas.openxmlformats.org/drawingml/2006/main" xmlns:r="http://schemas.openxmlformats.org/officeDocument/2006/relationships" xmlns:p="http://schemas.openxmlformats.org/presentationml/2006/main">
   <p:cSld>
     <p:spTree>
@@ -7376,21 +7896,121 @@
         <p:spPr>
           <a:xfrm>
             <a:off x="685800" y="1066800"/>
-            <a:ext cx="8229600" cy="1219200"/>
+            <a:ext cx="8229600" cy="5334000"/>
           </a:xfrm>
         </p:spPr>
         <p:txBody>
           <a:bodyPr/>
           <a:lstStyle/>
+          <a:p>
+            <a:pPr eaLnBrk="1" hangingPunct="1">
+              <a:buNone/>
+            </a:pPr>
+            <a:endParaRPr lang="en-US" b="1" dirty="0" smtClean="0">
+              <a:solidFill>
+                <a:schemeClr val="accent1">
+                  <a:lumMod val="75000"/>
+                </a:schemeClr>
+              </a:solidFill>
+            </a:endParaRPr>
+          </a:p>
           <a:p>
             <a:pPr eaLnBrk="1" hangingPunct="1">
               <a:buNone/>
             </a:pPr>
             <a:r>
+              <a:rPr lang="en-US" b="1" dirty="0" smtClean="0">
+                <a:solidFill>
+                  <a:schemeClr val="accent1">
+                    <a:lumMod val="75000"/>
+                  </a:schemeClr>
+                </a:solidFill>
+              </a:rPr>
+              <a:t>Topics Covered</a:t>
+            </a:r>
+          </a:p>
+          <a:p>
+            <a:pPr eaLnBrk="1" hangingPunct="1"/>
+            <a:r>
               <a:rPr lang="en-US" sz="2000" dirty="0" smtClean="0"/>
-              <a:t>Decoupling The Add New Employee Workflow From The Main Form</a:t>
+              <a:t>Event Aggregator</a:t>
             </a:r>
+          </a:p>
+          <a:p>
+            <a:pPr eaLnBrk="1" hangingPunct="1"/>
+            <a:r>
+              <a:rPr lang="en-US" sz="2000" dirty="0" smtClean="0"/>
+              <a:t>Command Pattern</a:t>
+            </a:r>
+          </a:p>
+          <a:p>
+            <a:pPr eaLnBrk="1" hangingPunct="1"/>
+            <a:r>
+              <a:rPr lang="en-US" sz="2000" dirty="0" smtClean="0"/>
+              <a:t>Application Controller</a:t>
+            </a:r>
+          </a:p>
+          <a:p>
+            <a:pPr eaLnBrk="1" hangingPunct="1"/>
+            <a:r>
+              <a:rPr lang="en-US" sz="2000" dirty="0" smtClean="0"/>
+              <a:t>Wiring Together With </a:t>
+            </a:r>
+            <a:r>
+              <a:rPr lang="en-US" sz="2000" dirty="0" err="1" smtClean="0"/>
+              <a:t>IoC</a:t>
+            </a:r>
+            <a:r>
+              <a:rPr lang="en-US" sz="2000" dirty="0" smtClean="0"/>
+              <a:t> Container</a:t>
+            </a:r>
+          </a:p>
+          <a:p>
+            <a:pPr eaLnBrk="1" hangingPunct="1"/>
             <a:endParaRPr lang="en-US" sz="2000" dirty="0" smtClean="0"/>
+          </a:p>
+          <a:p>
+            <a:pPr eaLnBrk="1" hangingPunct="1">
+              <a:buNone/>
+            </a:pPr>
+            <a:r>
+              <a:rPr lang="en-US" b="1" dirty="0" smtClean="0">
+                <a:solidFill>
+                  <a:schemeClr val="accent1">
+                    <a:lumMod val="75000"/>
+                  </a:schemeClr>
+                </a:solidFill>
+              </a:rPr>
+              <a:t>Goals</a:t>
+            </a:r>
+          </a:p>
+          <a:p>
+            <a:pPr eaLnBrk="1" hangingPunct="1"/>
+            <a:r>
+              <a:rPr lang="en-US" sz="2000" dirty="0" smtClean="0"/>
+              <a:t>Object Oriented System</a:t>
+            </a:r>
+          </a:p>
+          <a:p>
+            <a:pPr eaLnBrk="1" hangingPunct="1"/>
+            <a:r>
+              <a:rPr lang="en-US" sz="2000" dirty="0" smtClean="0"/>
+              <a:t>Testability</a:t>
+            </a:r>
+          </a:p>
+          <a:p>
+            <a:pPr eaLnBrk="1" hangingPunct="1"/>
+            <a:r>
+              <a:rPr lang="en-US" sz="2000" dirty="0" smtClean="0"/>
+              <a:t>Flexibility</a:t>
+            </a:r>
+          </a:p>
+          <a:p>
+            <a:pPr eaLnBrk="1" hangingPunct="1"/>
+            <a:r>
+              <a:rPr lang="en-US" sz="2000" dirty="0" smtClean="0"/>
+              <a:t>Maintainability (Ease of Enhancement)</a:t>
+            </a:r>
           </a:p>
         </p:txBody>
       </p:sp>
@@ -7423,9 +8043,130 @@
             <a:pPr eaLnBrk="1" hangingPunct="1"/>
             <a:r>
               <a:rPr lang="en-US" dirty="0" smtClean="0"/>
+              <a:t>Topics Of This Presentation</a:t>
+            </a:r>
+          </a:p>
+        </p:txBody>
+      </p:sp>
+      <p:pic>
+        <p:nvPicPr>
+          <p:cNvPr id="1026" name="Picture 2" descr="C:\Users\derickb\AppData\Local\Microsoft\Windows\Temporary Internet Files\Content.IE5\AY104AXF\MPj04331790000[1].jpg"/>
+          <p:cNvPicPr>
+            <a:picLocks noChangeAspect="1" noChangeArrowheads="1"/>
+          </p:cNvPicPr>
+          <p:nvPr/>
+        </p:nvPicPr>
+        <p:blipFill>
+          <a:blip r:embed="rId3"/>
+          <a:srcRect/>
+          <a:stretch>
+            <a:fillRect/>
+          </a:stretch>
+        </p:blipFill>
+        <p:spPr bwMode="auto">
+          <a:xfrm>
+            <a:off x="5426075" y="990600"/>
+            <a:ext cx="3717925" cy="2790288"/>
+          </a:xfrm>
+          <a:prstGeom prst="rect">
+            <a:avLst/>
+          </a:prstGeom>
+          <a:noFill/>
+        </p:spPr>
+      </p:pic>
+    </p:spTree>
+  </p:cSld>
+  <p:clrMapOvr>
+    <a:masterClrMapping/>
+  </p:clrMapOvr>
+  <p:timing>
+    <p:tnLst>
+      <p:par>
+        <p:cTn id="1" dur="indefinite" restart="never" nodeType="tmRoot"/>
+      </p:par>
+    </p:tnLst>
+  </p:timing>
+</p:sld>
+</file>
+
+<file path=ppt/slides/slide20.xml><?xml version="1.0" encoding="utf-8"?>
+<p:sld xmlns:a="http://schemas.openxmlformats.org/drawingml/2006/main" xmlns:r="http://schemas.openxmlformats.org/officeDocument/2006/relationships" xmlns:p="http://schemas.openxmlformats.org/presentationml/2006/main">
+  <p:cSld>
+    <p:spTree>
+      <p:nvGrpSpPr>
+        <p:cNvPr id="1" name=""/>
+        <p:cNvGrpSpPr/>
+        <p:nvPr/>
+      </p:nvGrpSpPr>
+      <p:grpSpPr>
+        <a:xfrm>
+          <a:off x="0" y="0"/>
+          <a:ext cx="0" cy="0"/>
+          <a:chOff x="0" y="0"/>
+          <a:chExt cx="0" cy="0"/>
+        </a:xfrm>
+      </p:grpSpPr>
+      <p:sp>
+        <p:nvSpPr>
+          <p:cNvPr id="3075" name="Text Placeholder 2"/>
+          <p:cNvSpPr>
+            <a:spLocks noGrp="1"/>
+          </p:cNvSpPr>
+          <p:nvPr>
+            <p:ph type="body" sz="quarter" idx="10"/>
+          </p:nvPr>
+        </p:nvSpPr>
+        <p:spPr>
+          <a:xfrm>
+            <a:off x="685800" y="1066800"/>
+            <a:ext cx="8229600" cy="1219200"/>
+          </a:xfrm>
+        </p:spPr>
+        <p:txBody>
+          <a:bodyPr/>
+          <a:lstStyle/>
+          <a:p>
+            <a:pPr eaLnBrk="1" hangingPunct="1">
+              <a:buNone/>
+            </a:pPr>
+            <a:r>
+              <a:rPr lang="en-US" sz="2000" dirty="0" smtClean="0"/>
+              <a:t>Decoupling The Add New Employee Workflow From The Main Form</a:t>
+            </a:r>
+          </a:p>
+        </p:txBody>
+      </p:sp>
+      <p:sp>
+        <p:nvSpPr>
+          <p:cNvPr id="3074" name="Title 1"/>
+          <p:cNvSpPr>
+            <a:spLocks noGrp="1"/>
+          </p:cNvSpPr>
+          <p:nvPr>
+            <p:ph type="title"/>
+          </p:nvPr>
+        </p:nvSpPr>
+        <p:spPr bwMode="auto">
+          <a:noFill/>
+          <a:ln>
+            <a:miter lim="800000"/>
+            <a:headEnd/>
+            <a:tailEnd/>
+          </a:ln>
+        </p:spPr>
+        <p:txBody>
+          <a:bodyPr vert="horz" wrap="square" lIns="91440" tIns="45720" rIns="91440" bIns="45720" numCol="1" anchor="t" anchorCtr="0" compatLnSpc="1">
+            <a:prstTxWarp prst="textNoShape">
+              <a:avLst/>
+            </a:prstTxWarp>
+          </a:bodyPr>
+          <a:lstStyle/>
+          <a:p>
+            <a:pPr eaLnBrk="1" hangingPunct="1"/>
+            <a:r>
+              <a:rPr lang="en-US" dirty="0" smtClean="0"/>
               <a:t>Simple Org Chart – v2</a:t>
             </a:r>
-            <a:endParaRPr lang="en-US" dirty="0" smtClean="0"/>
           </a:p>
         </p:txBody>
       </p:sp>
@@ -7598,7 +8339,7 @@
 </p:sld>
 </file>
 
-<file path=ppt/slides/slide19.xml><?xml version="1.0" encoding="utf-8"?>
+<file path=ppt/slides/slide21.xml><?xml version="1.0" encoding="utf-8"?>
 <p:sld xmlns:a="http://schemas.openxmlformats.org/drawingml/2006/main" xmlns:r="http://schemas.openxmlformats.org/officeDocument/2006/relationships" xmlns:p="http://schemas.openxmlformats.org/presentationml/2006/main">
   <p:cSld>
     <p:spTree>
@@ -7688,230 +8429,7 @@
 </p:sld>
 </file>
 
-<file path=ppt/slides/slide2.xml><?xml version="1.0" encoding="utf-8"?>
-<p:sld xmlns:a="http://schemas.openxmlformats.org/drawingml/2006/main" xmlns:r="http://schemas.openxmlformats.org/officeDocument/2006/relationships" xmlns:p="http://schemas.openxmlformats.org/presentationml/2006/main">
-  <p:cSld>
-    <p:spTree>
-      <p:nvGrpSpPr>
-        <p:cNvPr id="1" name=""/>
-        <p:cNvGrpSpPr/>
-        <p:nvPr/>
-      </p:nvGrpSpPr>
-      <p:grpSpPr>
-        <a:xfrm>
-          <a:off x="0" y="0"/>
-          <a:ext cx="0" cy="0"/>
-          <a:chOff x="0" y="0"/>
-          <a:chExt cx="0" cy="0"/>
-        </a:xfrm>
-      </p:grpSpPr>
-      <p:sp>
-        <p:nvSpPr>
-          <p:cNvPr id="3075" name="Text Placeholder 2"/>
-          <p:cNvSpPr>
-            <a:spLocks noGrp="1"/>
-          </p:cNvSpPr>
-          <p:nvPr>
-            <p:ph type="body" sz="quarter" idx="10"/>
-          </p:nvPr>
-        </p:nvSpPr>
-        <p:spPr>
-          <a:xfrm>
-            <a:off x="685800" y="1066800"/>
-            <a:ext cx="8229600" cy="5334000"/>
-          </a:xfrm>
-        </p:spPr>
-        <p:txBody>
-          <a:bodyPr/>
-          <a:lstStyle/>
-          <a:p>
-            <a:pPr eaLnBrk="1" hangingPunct="1">
-              <a:buNone/>
-            </a:pPr>
-            <a:endParaRPr lang="en-US" b="1" dirty="0" smtClean="0">
-              <a:solidFill>
-                <a:schemeClr val="accent1">
-                  <a:lumMod val="75000"/>
-                </a:schemeClr>
-              </a:solidFill>
-            </a:endParaRPr>
-          </a:p>
-          <a:p>
-            <a:pPr eaLnBrk="1" hangingPunct="1">
-              <a:buNone/>
-            </a:pPr>
-            <a:r>
-              <a:rPr lang="en-US" b="1" dirty="0" smtClean="0">
-                <a:solidFill>
-                  <a:schemeClr val="accent1">
-                    <a:lumMod val="75000"/>
-                  </a:schemeClr>
-                </a:solidFill>
-              </a:rPr>
-              <a:t>Topics Covered</a:t>
-            </a:r>
-          </a:p>
-          <a:p>
-            <a:pPr eaLnBrk="1" hangingPunct="1"/>
-            <a:r>
-              <a:rPr lang="en-US" sz="2000" dirty="0" smtClean="0"/>
-              <a:t>Event Aggregator</a:t>
-            </a:r>
-          </a:p>
-          <a:p>
-            <a:pPr eaLnBrk="1" hangingPunct="1"/>
-            <a:r>
-              <a:rPr lang="en-US" sz="2000" dirty="0" smtClean="0"/>
-              <a:t>Command Pattern</a:t>
-            </a:r>
-          </a:p>
-          <a:p>
-            <a:pPr eaLnBrk="1" hangingPunct="1"/>
-            <a:r>
-              <a:rPr lang="en-US" sz="2000" dirty="0" smtClean="0"/>
-              <a:t>Application Controller</a:t>
-            </a:r>
-          </a:p>
-          <a:p>
-            <a:pPr eaLnBrk="1" hangingPunct="1"/>
-            <a:r>
-              <a:rPr lang="en-US" sz="2000" dirty="0" smtClean="0"/>
-              <a:t>Wiring Together With </a:t>
-            </a:r>
-            <a:r>
-              <a:rPr lang="en-US" sz="2000" dirty="0" err="1" smtClean="0"/>
-              <a:t>IoC</a:t>
-            </a:r>
-            <a:r>
-              <a:rPr lang="en-US" sz="2000" dirty="0" smtClean="0"/>
-              <a:t> Container</a:t>
-            </a:r>
-          </a:p>
-          <a:p>
-            <a:pPr eaLnBrk="1" hangingPunct="1"/>
-            <a:endParaRPr lang="en-US" sz="2000" dirty="0" smtClean="0"/>
-          </a:p>
-          <a:p>
-            <a:pPr eaLnBrk="1" hangingPunct="1">
-              <a:buNone/>
-            </a:pPr>
-            <a:r>
-              <a:rPr lang="en-US" b="1" dirty="0" smtClean="0">
-                <a:solidFill>
-                  <a:schemeClr val="accent1">
-                    <a:lumMod val="75000"/>
-                  </a:schemeClr>
-                </a:solidFill>
-              </a:rPr>
-              <a:t>Goals</a:t>
-            </a:r>
-          </a:p>
-          <a:p>
-            <a:pPr eaLnBrk="1" hangingPunct="1"/>
-            <a:r>
-              <a:rPr lang="en-US" sz="2000" dirty="0" smtClean="0"/>
-              <a:t>Object Oriented System</a:t>
-            </a:r>
-          </a:p>
-          <a:p>
-            <a:pPr eaLnBrk="1" hangingPunct="1"/>
-            <a:r>
-              <a:rPr lang="en-US" sz="2000" dirty="0" smtClean="0"/>
-              <a:t>Testability</a:t>
-            </a:r>
-          </a:p>
-          <a:p>
-            <a:pPr eaLnBrk="1" hangingPunct="1"/>
-            <a:r>
-              <a:rPr lang="en-US" sz="2000" dirty="0" smtClean="0"/>
-              <a:t>Flexibility</a:t>
-            </a:r>
-          </a:p>
-          <a:p>
-            <a:pPr eaLnBrk="1" hangingPunct="1"/>
-            <a:r>
-              <a:rPr lang="en-US" sz="2000" dirty="0" smtClean="0"/>
-              <a:t>Maintainability (Ease of Enhancement)</a:t>
-            </a:r>
-          </a:p>
-        </p:txBody>
-      </p:sp>
-      <p:sp>
-        <p:nvSpPr>
-          <p:cNvPr id="3074" name="Title 1"/>
-          <p:cNvSpPr>
-            <a:spLocks noGrp="1"/>
-          </p:cNvSpPr>
-          <p:nvPr>
-            <p:ph type="title"/>
-          </p:nvPr>
-        </p:nvSpPr>
-        <p:spPr bwMode="auto">
-          <a:noFill/>
-          <a:ln>
-            <a:miter lim="800000"/>
-            <a:headEnd/>
-            <a:tailEnd/>
-          </a:ln>
-        </p:spPr>
-        <p:txBody>
-          <a:bodyPr vert="horz" wrap="square" lIns="91440" tIns="45720" rIns="91440" bIns="45720" numCol="1" anchor="t" anchorCtr="0" compatLnSpc="1">
-            <a:prstTxWarp prst="textNoShape">
-              <a:avLst/>
-            </a:prstTxWarp>
-          </a:bodyPr>
-          <a:lstStyle/>
-          <a:p>
-            <a:pPr eaLnBrk="1" hangingPunct="1"/>
-            <a:r>
-              <a:rPr lang="en-US" dirty="0" smtClean="0"/>
-              <a:t>Topics Of This Presentation</a:t>
-            </a:r>
-          </a:p>
-        </p:txBody>
-      </p:sp>
-      <p:pic>
-        <p:nvPicPr>
-          <p:cNvPr id="1026" name="Picture 2" descr="C:\Users\derickb\AppData\Local\Microsoft\Windows\Temporary Internet Files\Content.IE5\AY104AXF\MPj04331790000[1].jpg"/>
-          <p:cNvPicPr>
-            <a:picLocks noChangeAspect="1" noChangeArrowheads="1"/>
-          </p:cNvPicPr>
-          <p:nvPr/>
-        </p:nvPicPr>
-        <p:blipFill>
-          <a:blip r:embed="rId3"/>
-          <a:srcRect/>
-          <a:stretch>
-            <a:fillRect/>
-          </a:stretch>
-        </p:blipFill>
-        <p:spPr bwMode="auto">
-          <a:xfrm>
-            <a:off x="5426075" y="990600"/>
-            <a:ext cx="3717925" cy="2790288"/>
-          </a:xfrm>
-          <a:prstGeom prst="rect">
-            <a:avLst/>
-          </a:prstGeom>
-          <a:noFill/>
-        </p:spPr>
-      </p:pic>
-    </p:spTree>
-  </p:cSld>
-  <p:clrMapOvr>
-    <a:masterClrMapping/>
-  </p:clrMapOvr>
-  <p:timing>
-    <p:tnLst>
-      <p:par>
-        <p:cTn id="1" dur="indefinite" restart="never" nodeType="tmRoot"/>
-      </p:par>
-    </p:tnLst>
-  </p:timing>
-</p:sld>
-</file>
-
-<file path=ppt/slides/slide20.xml><?xml version="1.0" encoding="utf-8"?>
+<file path=ppt/slides/slide22.xml><?xml version="1.0" encoding="utf-8"?>
 <p:sld xmlns:a="http://schemas.openxmlformats.org/drawingml/2006/main" xmlns:r="http://schemas.openxmlformats.org/officeDocument/2006/relationships" xmlns:p="http://schemas.openxmlformats.org/presentationml/2006/main">
   <p:cSld>
     <p:spTree>
@@ -8038,7 +8556,7 @@
 </p:sld>
 </file>
 
-<file path=ppt/slides/slide21.xml><?xml version="1.0" encoding="utf-8"?>
+<file path=ppt/slides/slide23.xml><?xml version="1.0" encoding="utf-8"?>
 <p:sld xmlns:a="http://schemas.openxmlformats.org/drawingml/2006/main" xmlns:r="http://schemas.openxmlformats.org/officeDocument/2006/relationships" xmlns:p="http://schemas.openxmlformats.org/presentationml/2006/main">
   <p:cSld>
     <p:spTree>
@@ -8369,7 +8887,7 @@
 </p:sld>
 </file>
 
-<file path=ppt/slides/slide22.xml><?xml version="1.0" encoding="utf-8"?>
+<file path=ppt/slides/slide24.xml><?xml version="1.0" encoding="utf-8"?>
 <p:sld xmlns:a="http://schemas.openxmlformats.org/drawingml/2006/main" xmlns:r="http://schemas.openxmlformats.org/officeDocument/2006/relationships" xmlns:p="http://schemas.openxmlformats.org/presentationml/2006/main">
   <p:cSld>
     <p:spTree>
@@ -8459,7 +8977,7 @@
 </p:sld>
 </file>
 
-<file path=ppt/slides/slide23.xml><?xml version="1.0" encoding="utf-8"?>
+<file path=ppt/slides/slide25.xml><?xml version="1.0" encoding="utf-8"?>
 <p:sld xmlns:a="http://schemas.openxmlformats.org/drawingml/2006/main" xmlns:r="http://schemas.openxmlformats.org/officeDocument/2006/relationships" xmlns:p="http://schemas.openxmlformats.org/presentationml/2006/main">
   <p:cSld>
     <p:spTree>
@@ -8549,7 +9067,7 @@
 </p:sld>
 </file>
 
-<file path=ppt/slides/slide24.xml><?xml version="1.0" encoding="utf-8"?>
+<file path=ppt/slides/slide26.xml><?xml version="1.0" encoding="utf-8"?>
 <p:sld xmlns:a="http://schemas.openxmlformats.org/drawingml/2006/main" xmlns:r="http://schemas.openxmlformats.org/officeDocument/2006/relationships" xmlns:p="http://schemas.openxmlformats.org/presentationml/2006/main">
   <p:cSld>
     <p:spTree>
@@ -8898,7 +9416,7 @@
 </p:sld>
 </file>
 
-<file path=ppt/slides/slide25.xml><?xml version="1.0" encoding="utf-8"?>
+<file path=ppt/slides/slide27.xml><?xml version="1.0" encoding="utf-8"?>
 <p:sld xmlns:a="http://schemas.openxmlformats.org/drawingml/2006/main" xmlns:r="http://schemas.openxmlformats.org/officeDocument/2006/relationships" xmlns:p="http://schemas.openxmlformats.org/presentationml/2006/main">
   <p:cSld>
     <p:spTree>
@@ -8988,7 +9506,7 @@
 </p:sld>
 </file>
 
-<file path=ppt/slides/slide26.xml><?xml version="1.0" encoding="utf-8"?>
+<file path=ppt/slides/slide28.xml><?xml version="1.0" encoding="utf-8"?>
 <p:sld xmlns:a="http://schemas.openxmlformats.org/drawingml/2006/main" xmlns:r="http://schemas.openxmlformats.org/officeDocument/2006/relationships" xmlns:p="http://schemas.openxmlformats.org/presentationml/2006/main">
   <p:cSld>
     <p:spTree>
@@ -9078,7 +9596,7 @@
 </p:sld>
 </file>
 
-<file path=ppt/slides/slide27.xml><?xml version="1.0" encoding="utf-8"?>
+<file path=ppt/slides/slide29.xml><?xml version="1.0" encoding="utf-8"?>
 <p:sld xmlns:a="http://schemas.openxmlformats.org/drawingml/2006/main" xmlns:r="http://schemas.openxmlformats.org/officeDocument/2006/relationships" xmlns:p="http://schemas.openxmlformats.org/presentationml/2006/main">
   <p:cSld>
     <p:spTree>
@@ -9624,7 +10142,152 @@
 </p:sld>
 </file>
 
-<file path=ppt/slides/slide28.xml><?xml version="1.0" encoding="utf-8"?>
+<file path=ppt/slides/slide3.xml><?xml version="1.0" encoding="utf-8"?>
+<p:sld xmlns:a="http://schemas.openxmlformats.org/drawingml/2006/main" xmlns:r="http://schemas.openxmlformats.org/officeDocument/2006/relationships" xmlns:p="http://schemas.openxmlformats.org/presentationml/2006/main">
+  <p:cSld>
+    <p:spTree>
+      <p:nvGrpSpPr>
+        <p:cNvPr id="1" name=""/>
+        <p:cNvGrpSpPr/>
+        <p:nvPr/>
+      </p:nvGrpSpPr>
+      <p:grpSpPr>
+        <a:xfrm>
+          <a:off x="0" y="0"/>
+          <a:ext cx="0" cy="0"/>
+          <a:chOff x="0" y="0"/>
+          <a:chExt cx="0" cy="0"/>
+        </a:xfrm>
+      </p:grpSpPr>
+      <p:sp>
+        <p:nvSpPr>
+          <p:cNvPr id="3075" name="Text Placeholder 2"/>
+          <p:cNvSpPr>
+            <a:spLocks noGrp="1"/>
+          </p:cNvSpPr>
+          <p:nvPr>
+            <p:ph type="body" sz="quarter" idx="10"/>
+          </p:nvPr>
+        </p:nvSpPr>
+        <p:spPr>
+          <a:xfrm>
+            <a:off x="685800" y="1066800"/>
+            <a:ext cx="8229600" cy="1219200"/>
+          </a:xfrm>
+        </p:spPr>
+        <p:txBody>
+          <a:bodyPr/>
+          <a:lstStyle/>
+          <a:p>
+            <a:pPr eaLnBrk="1" hangingPunct="1">
+              <a:buNone/>
+            </a:pPr>
+            <a:r>
+              <a:rPr lang="en-US" dirty="0" smtClean="0"/>
+              <a:t>Cohesion:</a:t>
+            </a:r>
+          </a:p>
+          <a:p>
+            <a:pPr lvl="1" eaLnBrk="1" hangingPunct="1">
+              <a:buNone/>
+            </a:pPr>
+            <a:r>
+              <a:rPr lang="en-US" sz="2000" dirty="0" smtClean="0"/>
+              <a:t>“A measure of how strongly-related and focused the various responsibilities of a software module are” - </a:t>
+            </a:r>
+            <a:r>
+              <a:rPr lang="en-US" sz="2000" dirty="0" smtClean="0">
+                <a:hlinkClick r:id="rId3"/>
+              </a:rPr>
+              <a:t>Wikipedia</a:t>
+            </a:r>
+            <a:endParaRPr lang="en-US" sz="2000" dirty="0" smtClean="0"/>
+          </a:p>
+        </p:txBody>
+      </p:sp>
+      <p:sp>
+        <p:nvSpPr>
+          <p:cNvPr id="3074" name="Title 1"/>
+          <p:cNvSpPr>
+            <a:spLocks noGrp="1"/>
+          </p:cNvSpPr>
+          <p:nvPr>
+            <p:ph type="title"/>
+          </p:nvPr>
+        </p:nvSpPr>
+        <p:spPr bwMode="auto">
+          <a:noFill/>
+          <a:ln>
+            <a:miter lim="800000"/>
+            <a:headEnd/>
+            <a:tailEnd/>
+          </a:ln>
+        </p:spPr>
+        <p:txBody>
+          <a:bodyPr vert="horz" wrap="square" lIns="91440" tIns="45720" rIns="91440" bIns="45720" numCol="1" anchor="t" anchorCtr="0" compatLnSpc="1">
+            <a:prstTxWarp prst="textNoShape">
+              <a:avLst/>
+            </a:prstTxWarp>
+          </a:bodyPr>
+          <a:lstStyle/>
+          <a:p>
+            <a:pPr eaLnBrk="1" hangingPunct="1"/>
+            <a:r>
+              <a:rPr lang="en-US" dirty="0" smtClean="0"/>
+              <a:t>Object Oriented Principles</a:t>
+            </a:r>
+          </a:p>
+        </p:txBody>
+      </p:sp>
+      <p:pic>
+        <p:nvPicPr>
+          <p:cNvPr id="1026" name="Picture 2"/>
+          <p:cNvPicPr>
+            <a:picLocks noChangeAspect="1" noChangeArrowheads="1"/>
+          </p:cNvPicPr>
+          <p:nvPr/>
+        </p:nvPicPr>
+        <p:blipFill>
+          <a:blip r:embed="rId4"/>
+          <a:srcRect/>
+          <a:stretch>
+            <a:fillRect/>
+          </a:stretch>
+        </p:blipFill>
+        <p:spPr bwMode="auto">
+          <a:xfrm>
+            <a:off x="2428875" y="2762250"/>
+            <a:ext cx="4286250" cy="3333750"/>
+          </a:xfrm>
+          <a:prstGeom prst="rect">
+            <a:avLst/>
+          </a:prstGeom>
+          <a:noFill/>
+          <a:ln w="9525">
+            <a:noFill/>
+            <a:miter lim="800000"/>
+            <a:headEnd/>
+            <a:tailEnd/>
+          </a:ln>
+          <a:effectLst/>
+        </p:spPr>
+      </p:pic>
+    </p:spTree>
+  </p:cSld>
+  <p:clrMapOvr>
+    <a:masterClrMapping/>
+  </p:clrMapOvr>
+  <p:timing>
+    <p:tnLst>
+      <p:par>
+        <p:cTn id="1" dur="indefinite" restart="never" nodeType="tmRoot"/>
+      </p:par>
+    </p:tnLst>
+  </p:timing>
+</p:sld>
+</file>
+
+<file path=ppt/slides/slide30.xml><?xml version="1.0" encoding="utf-8"?>
 <p:sld xmlns:a="http://schemas.openxmlformats.org/drawingml/2006/main" xmlns:r="http://schemas.openxmlformats.org/officeDocument/2006/relationships" xmlns:p="http://schemas.openxmlformats.org/presentationml/2006/main">
   <p:cSld>
     <p:spTree>
@@ -10454,151 +11117,6 @@
           </a:p>
         </p:txBody>
       </p:sp>
-    </p:spTree>
-  </p:cSld>
-  <p:clrMapOvr>
-    <a:masterClrMapping/>
-  </p:clrMapOvr>
-  <p:timing>
-    <p:tnLst>
-      <p:par>
-        <p:cTn id="1" dur="indefinite" restart="never" nodeType="tmRoot"/>
-      </p:par>
-    </p:tnLst>
-  </p:timing>
-</p:sld>
-</file>
-
-<file path=ppt/slides/slide3.xml><?xml version="1.0" encoding="utf-8"?>
-<p:sld xmlns:a="http://schemas.openxmlformats.org/drawingml/2006/main" xmlns:r="http://schemas.openxmlformats.org/officeDocument/2006/relationships" xmlns:p="http://schemas.openxmlformats.org/presentationml/2006/main">
-  <p:cSld>
-    <p:spTree>
-      <p:nvGrpSpPr>
-        <p:cNvPr id="1" name=""/>
-        <p:cNvGrpSpPr/>
-        <p:nvPr/>
-      </p:nvGrpSpPr>
-      <p:grpSpPr>
-        <a:xfrm>
-          <a:off x="0" y="0"/>
-          <a:ext cx="0" cy="0"/>
-          <a:chOff x="0" y="0"/>
-          <a:chExt cx="0" cy="0"/>
-        </a:xfrm>
-      </p:grpSpPr>
-      <p:sp>
-        <p:nvSpPr>
-          <p:cNvPr id="3075" name="Text Placeholder 2"/>
-          <p:cNvSpPr>
-            <a:spLocks noGrp="1"/>
-          </p:cNvSpPr>
-          <p:nvPr>
-            <p:ph type="body" sz="quarter" idx="10"/>
-          </p:nvPr>
-        </p:nvSpPr>
-        <p:spPr>
-          <a:xfrm>
-            <a:off x="685800" y="1066800"/>
-            <a:ext cx="8229600" cy="1219200"/>
-          </a:xfrm>
-        </p:spPr>
-        <p:txBody>
-          <a:bodyPr/>
-          <a:lstStyle/>
-          <a:p>
-            <a:pPr eaLnBrk="1" hangingPunct="1">
-              <a:buNone/>
-            </a:pPr>
-            <a:r>
-              <a:rPr lang="en-US" dirty="0" smtClean="0"/>
-              <a:t>Cohesion:</a:t>
-            </a:r>
-          </a:p>
-          <a:p>
-            <a:pPr lvl="1" eaLnBrk="1" hangingPunct="1">
-              <a:buNone/>
-            </a:pPr>
-            <a:r>
-              <a:rPr lang="en-US" sz="2000" dirty="0" smtClean="0"/>
-              <a:t>“A measure of how strongly-related and focused the various responsibilities of a software module are” - </a:t>
-            </a:r>
-            <a:r>
-              <a:rPr lang="en-US" sz="2000" dirty="0" smtClean="0">
-                <a:hlinkClick r:id="rId3"/>
-              </a:rPr>
-              <a:t>Wikipedia</a:t>
-            </a:r>
-            <a:endParaRPr lang="en-US" sz="2000" dirty="0" smtClean="0"/>
-          </a:p>
-        </p:txBody>
-      </p:sp>
-      <p:sp>
-        <p:nvSpPr>
-          <p:cNvPr id="3074" name="Title 1"/>
-          <p:cNvSpPr>
-            <a:spLocks noGrp="1"/>
-          </p:cNvSpPr>
-          <p:nvPr>
-            <p:ph type="title"/>
-          </p:nvPr>
-        </p:nvSpPr>
-        <p:spPr bwMode="auto">
-          <a:noFill/>
-          <a:ln>
-            <a:miter lim="800000"/>
-            <a:headEnd/>
-            <a:tailEnd/>
-          </a:ln>
-        </p:spPr>
-        <p:txBody>
-          <a:bodyPr vert="horz" wrap="square" lIns="91440" tIns="45720" rIns="91440" bIns="45720" numCol="1" anchor="t" anchorCtr="0" compatLnSpc="1">
-            <a:prstTxWarp prst="textNoShape">
-              <a:avLst/>
-            </a:prstTxWarp>
-          </a:bodyPr>
-          <a:lstStyle/>
-          <a:p>
-            <a:pPr eaLnBrk="1" hangingPunct="1"/>
-            <a:r>
-              <a:rPr lang="en-US" dirty="0" smtClean="0"/>
-              <a:t>Object Oriented Principles</a:t>
-            </a:r>
-          </a:p>
-        </p:txBody>
-      </p:sp>
-      <p:pic>
-        <p:nvPicPr>
-          <p:cNvPr id="1026" name="Picture 2"/>
-          <p:cNvPicPr>
-            <a:picLocks noChangeAspect="1" noChangeArrowheads="1"/>
-          </p:cNvPicPr>
-          <p:nvPr/>
-        </p:nvPicPr>
-        <p:blipFill>
-          <a:blip r:embed="rId4"/>
-          <a:srcRect/>
-          <a:stretch>
-            <a:fillRect/>
-          </a:stretch>
-        </p:blipFill>
-        <p:spPr bwMode="auto">
-          <a:xfrm>
-            <a:off x="2428875" y="2762250"/>
-            <a:ext cx="4286250" cy="3333750"/>
-          </a:xfrm>
-          <a:prstGeom prst="rect">
-            <a:avLst/>
-          </a:prstGeom>
-          <a:noFill/>
-          <a:ln w="9525">
-            <a:noFill/>
-            <a:miter lim="800000"/>
-            <a:headEnd/>
-            <a:tailEnd/>
-          </a:ln>
-          <a:effectLst/>
-        </p:spPr>
-      </p:pic>
     </p:spTree>
   </p:cSld>
   <p:clrMapOvr>
@@ -14591,6 +15109,21 @@
 </file>
 
 <file path=customXml/item1.xml><?xml version="1.0" encoding="utf-8"?>
+<p:properties xmlns:p="http://schemas.microsoft.com/office/2006/metadata/properties" xmlns:xsi="http://www.w3.org/2001/XMLSchema-instance">
+  <documentManagement/>
+</p:properties>
+</file>
+
+<file path=customXml/item2.xml><?xml version="1.0" encoding="utf-8"?>
+<?mso-contentType ?>
+<FormTemplates xmlns="http://schemas.microsoft.com/sharepoint/v3/contenttype/forms">
+  <Display>DocumentLibraryForm</Display>
+  <Edit>DocumentLibraryForm</Edit>
+  <New>DocumentLibraryForm</New>
+</FormTemplates>
+</file>
+
+<file path=customXml/item3.xml><?xml version="1.0" encoding="utf-8"?>
 <ct:contentTypeSchema xmlns:ct="http://schemas.microsoft.com/office/2006/metadata/contentType" xmlns:ma="http://schemas.microsoft.com/office/2006/metadata/properties/metaAttributes" ct:_="" ma:_="" ma:contentTypeName="Document" ma:contentTypeID="0x0101005857B3975182FB47B67FAAA67052062C" ma:contentTypeVersion="0" ma:contentTypeDescription="Create a new document." ma:contentTypeScope="" ma:versionID="a1781edd533abf786dc62ee7dded643a">
   <xsd:schema xmlns:xsd="http://www.w3.org/2001/XMLSchema" xmlns:p="http://schemas.microsoft.com/office/2006/metadata/properties" targetNamespace="http://schemas.microsoft.com/office/2006/metadata/properties" ma:root="true" ma:fieldsID="4aeb20c0e3442673af7ee10786458764">
     <xsd:element name="properties">
@@ -14639,32 +15172,10 @@
 </ct:contentTypeSchema>
 </file>
 
-<file path=customXml/item2.xml><?xml version="1.0" encoding="utf-8"?>
-<?mso-contentType ?>
-<FormTemplates xmlns="http://schemas.microsoft.com/sharepoint/v3/contenttype/forms">
-  <Display>DocumentLibraryForm</Display>
-  <Edit>DocumentLibraryForm</Edit>
-  <New>DocumentLibraryForm</New>
-</FormTemplates>
-</file>
-
-<file path=customXml/item3.xml><?xml version="1.0" encoding="utf-8"?>
-<p:properties xmlns:p="http://schemas.microsoft.com/office/2006/metadata/properties" xmlns:xsi="http://www.w3.org/2001/XMLSchema-instance">
-  <documentManagement/>
-</p:properties>
-</file>
-
 <file path=customXml/itemProps1.xml><?xml version="1.0" encoding="utf-8"?>
-<ds:datastoreItem xmlns:ds="http://schemas.openxmlformats.org/officeDocument/2006/customXml" ds:itemID="{D3EBC05E-93E3-47EC-A4AA-B305F2941009}">
+<ds:datastoreItem xmlns:ds="http://schemas.openxmlformats.org/officeDocument/2006/customXml" ds:itemID="{F8AADC7F-5DC4-46F2-A809-0679B041C012}">
   <ds:schemaRefs>
-    <ds:schemaRef ds:uri="http://schemas.microsoft.com/office/2006/metadata/contentType"/>
-    <ds:schemaRef ds:uri="http://schemas.microsoft.com/office/2006/metadata/properties/metaAttributes"/>
-    <ds:schemaRef ds:uri="http://www.w3.org/2001/XMLSchema"/>
     <ds:schemaRef ds:uri="http://schemas.microsoft.com/office/2006/metadata/properties"/>
-    <ds:schemaRef ds:uri="http://schemas.openxmlformats.org/package/2006/metadata/core-properties"/>
-    <ds:schemaRef ds:uri="http://purl.org/dc/elements/1.1/"/>
-    <ds:schemaRef ds:uri="http://purl.org/dc/terms/"/>
-    <ds:schemaRef ds:uri="http://schemas.microsoft.com/office/internal/2005/internalDocumentation"/>
   </ds:schemaRefs>
 </ds:datastoreItem>
 </file>
@@ -14678,9 +15189,16 @@
 </file>
 
 <file path=customXml/itemProps3.xml><?xml version="1.0" encoding="utf-8"?>
-<ds:datastoreItem xmlns:ds="http://schemas.openxmlformats.org/officeDocument/2006/customXml" ds:itemID="{F8AADC7F-5DC4-46F2-A809-0679B041C012}">
+<ds:datastoreItem xmlns:ds="http://schemas.openxmlformats.org/officeDocument/2006/customXml" ds:itemID="{D3EBC05E-93E3-47EC-A4AA-B305F2941009}">
   <ds:schemaRefs>
+    <ds:schemaRef ds:uri="http://schemas.microsoft.com/office/2006/metadata/contentType"/>
+    <ds:schemaRef ds:uri="http://schemas.microsoft.com/office/2006/metadata/properties/metaAttributes"/>
+    <ds:schemaRef ds:uri="http://www.w3.org/2001/XMLSchema"/>
     <ds:schemaRef ds:uri="http://schemas.microsoft.com/office/2006/metadata/properties"/>
+    <ds:schemaRef ds:uri="http://schemas.openxmlformats.org/package/2006/metadata/core-properties"/>
+    <ds:schemaRef ds:uri="http://purl.org/dc/elements/1.1/"/>
+    <ds:schemaRef ds:uri="http://purl.org/dc/terms/"/>
+    <ds:schemaRef ds:uri="http://schemas.microsoft.com/office/internal/2005/internalDocumentation"/>
   </ds:schemaRefs>
 </ds:datastoreItem>
 </file>
</xml_diff>

<commit_message>
continuing organization of slides and code. got the big picture layout done, i think
</commit_message>
<xml_diff>
--- a/Decoupling Workflow With App Controler/Decoupling Workflow From Forms.pptx
+++ b/Decoupling Workflow With App Controler/Decoupling Workflow From Forms.pptx
@@ -5,10 +5,10 @@
     <p:sldMasterId id="2147483822" r:id="rId4"/>
   </p:sldMasterIdLst>
   <p:notesMasterIdLst>
-    <p:notesMasterId r:id="rId35"/>
+    <p:notesMasterId r:id="rId36"/>
   </p:notesMasterIdLst>
   <p:handoutMasterIdLst>
-    <p:handoutMasterId r:id="rId36"/>
+    <p:handoutMasterId r:id="rId37"/>
   </p:handoutMasterIdLst>
   <p:sldIdLst>
     <p:sldId id="256" r:id="rId5"/>
@@ -23,34 +23,35 @@
     <p:sldId id="280" r:id="rId14"/>
     <p:sldId id="281" r:id="rId15"/>
     <p:sldId id="286" r:id="rId16"/>
-    <p:sldId id="296" r:id="rId17"/>
-    <p:sldId id="278" r:id="rId18"/>
-    <p:sldId id="295" r:id="rId19"/>
-    <p:sldId id="301" r:id="rId20"/>
-    <p:sldId id="302" r:id="rId21"/>
-    <p:sldId id="285" r:id="rId22"/>
-    <p:sldId id="299" r:id="rId23"/>
-    <p:sldId id="300" r:id="rId24"/>
-    <p:sldId id="298" r:id="rId25"/>
-    <p:sldId id="297" r:id="rId26"/>
-    <p:sldId id="276" r:id="rId27"/>
-    <p:sldId id="277" r:id="rId28"/>
-    <p:sldId id="284" r:id="rId29"/>
-    <p:sldId id="292" r:id="rId30"/>
-    <p:sldId id="293" r:id="rId31"/>
-    <p:sldId id="294" r:id="rId32"/>
-    <p:sldId id="259" r:id="rId33"/>
-    <p:sldId id="274" r:id="rId34"/>
+    <p:sldId id="303" r:id="rId17"/>
+    <p:sldId id="296" r:id="rId18"/>
+    <p:sldId id="278" r:id="rId19"/>
+    <p:sldId id="295" r:id="rId20"/>
+    <p:sldId id="301" r:id="rId21"/>
+    <p:sldId id="302" r:id="rId22"/>
+    <p:sldId id="285" r:id="rId23"/>
+    <p:sldId id="299" r:id="rId24"/>
+    <p:sldId id="300" r:id="rId25"/>
+    <p:sldId id="298" r:id="rId26"/>
+    <p:sldId id="297" r:id="rId27"/>
+    <p:sldId id="276" r:id="rId28"/>
+    <p:sldId id="277" r:id="rId29"/>
+    <p:sldId id="284" r:id="rId30"/>
+    <p:sldId id="292" r:id="rId31"/>
+    <p:sldId id="293" r:id="rId32"/>
+    <p:sldId id="294" r:id="rId33"/>
+    <p:sldId id="259" r:id="rId34"/>
+    <p:sldId id="274" r:id="rId35"/>
   </p:sldIdLst>
   <p:sldSz cx="9144000" cy="6858000" type="screen4x3"/>
   <p:notesSz cx="7010400" cy="9296400"/>
   <p:embeddedFontLst>
     <p:embeddedFont>
       <p:font typeface="Calibri" pitchFamily="34" charset="0"/>
-      <p:regular r:id="rId37"/>
-      <p:bold r:id="rId38"/>
-      <p:italic r:id="rId39"/>
-      <p:boldItalic r:id="rId40"/>
+      <p:regular r:id="rId38"/>
+      <p:bold r:id="rId39"/>
+      <p:italic r:id="rId40"/>
+      <p:boldItalic r:id="rId41"/>
     </p:embeddedFont>
   </p:embeddedFontLst>
   <p:defaultTextStyle>
@@ -1001,7 +1002,7 @@
               <a:pPr>
                 <a:defRPr/>
               </a:pPr>
-              <a:t>15</a:t>
+              <a:t>14</a:t>
             </a:fld>
             <a:endParaRPr lang="en-US"/>
           </a:p>
@@ -1088,7 +1089,7 @@
               <a:pPr>
                 <a:defRPr/>
               </a:pPr>
-              <a:t>17</a:t>
+              <a:t>16</a:t>
             </a:fld>
             <a:endParaRPr lang="en-US"/>
           </a:p>
@@ -1610,7 +1611,7 @@
               <a:pPr>
                 <a:defRPr/>
               </a:pPr>
-              <a:t>24</a:t>
+              <a:t>23</a:t>
             </a:fld>
             <a:endParaRPr lang="en-US"/>
           </a:p>
@@ -1871,7 +1872,7 @@
               <a:pPr>
                 <a:defRPr/>
               </a:pPr>
-              <a:t>27</a:t>
+              <a:t>26</a:t>
             </a:fld>
             <a:endParaRPr lang="en-US"/>
           </a:p>
@@ -1959,6 +1960,93 @@
                 <a:defRPr/>
               </a:pPr>
               <a:t>28</a:t>
+            </a:fld>
+            <a:endParaRPr lang="en-US"/>
+          </a:p>
+        </p:txBody>
+      </p:sp>
+    </p:spTree>
+  </p:cSld>
+  <p:clrMapOvr>
+    <a:masterClrMapping/>
+  </p:clrMapOvr>
+</p:notes>
+</file>
+
+<file path=ppt/notesSlides/notesSlide22.xml><?xml version="1.0" encoding="utf-8"?>
+<p:notes xmlns:a="http://schemas.openxmlformats.org/drawingml/2006/main" xmlns:r="http://schemas.openxmlformats.org/officeDocument/2006/relationships" xmlns:p="http://schemas.openxmlformats.org/presentationml/2006/main">
+  <p:cSld>
+    <p:spTree>
+      <p:nvGrpSpPr>
+        <p:cNvPr id="1" name=""/>
+        <p:cNvGrpSpPr/>
+        <p:nvPr/>
+      </p:nvGrpSpPr>
+      <p:grpSpPr>
+        <a:xfrm>
+          <a:off x="0" y="0"/>
+          <a:ext cx="0" cy="0"/>
+          <a:chOff x="0" y="0"/>
+          <a:chExt cx="0" cy="0"/>
+        </a:xfrm>
+      </p:grpSpPr>
+      <p:sp>
+        <p:nvSpPr>
+          <p:cNvPr id="2" name="Slide Image Placeholder 1"/>
+          <p:cNvSpPr>
+            <a:spLocks noGrp="1" noRot="1" noChangeAspect="1"/>
+          </p:cNvSpPr>
+          <p:nvPr>
+            <p:ph type="sldImg"/>
+          </p:nvPr>
+        </p:nvSpPr>
+        <p:spPr/>
+      </p:sp>
+      <p:sp>
+        <p:nvSpPr>
+          <p:cNvPr id="3" name="Notes Placeholder 2"/>
+          <p:cNvSpPr>
+            <a:spLocks noGrp="1"/>
+          </p:cNvSpPr>
+          <p:nvPr>
+            <p:ph type="body" idx="1"/>
+          </p:nvPr>
+        </p:nvSpPr>
+        <p:spPr/>
+        <p:txBody>
+          <a:bodyPr>
+            <a:normAutofit/>
+          </a:bodyPr>
+          <a:lstStyle/>
+          <a:p>
+            <a:endParaRPr lang="en-US" dirty="0"/>
+          </a:p>
+        </p:txBody>
+      </p:sp>
+      <p:sp>
+        <p:nvSpPr>
+          <p:cNvPr id="4" name="Slide Number Placeholder 3"/>
+          <p:cNvSpPr>
+            <a:spLocks noGrp="1"/>
+          </p:cNvSpPr>
+          <p:nvPr>
+            <p:ph type="sldNum" sz="quarter" idx="10"/>
+          </p:nvPr>
+        </p:nvSpPr>
+        <p:spPr/>
+        <p:txBody>
+          <a:bodyPr/>
+          <a:lstStyle/>
+          <a:p>
+            <a:pPr>
+              <a:defRPr/>
+            </a:pPr>
+            <a:fld id="{1931C8FD-CC35-423B-99F4-64D81D6A80AE}" type="slidenum">
+              <a:rPr lang="en-US" smtClean="0"/>
+              <a:pPr>
+                <a:defRPr/>
+              </a:pPr>
+              <a:t>29</a:t>
             </a:fld>
             <a:endParaRPr lang="en-US"/>
           </a:p>
@@ -4339,16 +4427,16 @@
       </p:sp>
       <p:grpSp>
         <p:nvGrpSpPr>
-          <p:cNvPr id="14" name="Group 13"/>
+          <p:cNvPr id="12" name="Group 11"/>
           <p:cNvGrpSpPr/>
           <p:nvPr/>
         </p:nvGrpSpPr>
         <p:grpSpPr>
           <a:xfrm>
-            <a:off x="904875" y="1971675"/>
-            <a:ext cx="7334250" cy="4048125"/>
-            <a:chOff x="685800" y="1819275"/>
-            <a:chExt cx="7334250" cy="4048125"/>
+            <a:off x="731957" y="1971675"/>
+            <a:ext cx="7680087" cy="4048125"/>
+            <a:chOff x="904875" y="1971675"/>
+            <a:chExt cx="7680087" cy="4048125"/>
           </a:xfrm>
         </p:grpSpPr>
         <p:pic>
@@ -4368,7 +4456,7 @@
           </p:blipFill>
           <p:spPr bwMode="auto">
             <a:xfrm>
-              <a:off x="685800" y="1819275"/>
+              <a:off x="904875" y="1971675"/>
               <a:ext cx="4286251" cy="4048125"/>
             </a:xfrm>
             <a:prstGeom prst="rect">
@@ -4377,9 +4465,79 @@
             <a:noFill/>
           </p:spPr>
         </p:pic>
+        <p:cxnSp>
+          <p:nvCxnSpPr>
+            <p:cNvPr id="8" name="Straight Connector 7"/>
+            <p:cNvCxnSpPr/>
+            <p:nvPr/>
+          </p:nvCxnSpPr>
+          <p:spPr>
+            <a:xfrm rot="5400000" flipH="1" flipV="1">
+              <a:off x="1628775" y="3924300"/>
+              <a:ext cx="2286000" cy="838200"/>
+            </a:xfrm>
+            <a:prstGeom prst="line">
+              <a:avLst/>
+            </a:prstGeom>
+            <a:ln w="38100">
+              <a:solidFill>
+                <a:schemeClr val="accent2"/>
+              </a:solidFill>
+            </a:ln>
+          </p:spPr>
+          <p:style>
+            <a:lnRef idx="1">
+              <a:schemeClr val="accent1"/>
+            </a:lnRef>
+            <a:fillRef idx="0">
+              <a:schemeClr val="accent1"/>
+            </a:fillRef>
+            <a:effectRef idx="0">
+              <a:schemeClr val="accent1"/>
+            </a:effectRef>
+            <a:fontRef idx="minor">
+              <a:schemeClr val="tx1"/>
+            </a:fontRef>
+          </p:style>
+        </p:cxnSp>
+        <p:cxnSp>
+          <p:nvCxnSpPr>
+            <p:cNvPr id="10" name="Straight Connector 9"/>
+            <p:cNvCxnSpPr/>
+            <p:nvPr/>
+          </p:nvCxnSpPr>
+          <p:spPr>
+            <a:xfrm rot="5400000" flipH="1" flipV="1">
+              <a:off x="2281237" y="4795838"/>
+              <a:ext cx="990600" cy="847725"/>
+            </a:xfrm>
+            <a:prstGeom prst="line">
+              <a:avLst/>
+            </a:prstGeom>
+            <a:ln w="38100">
+              <a:solidFill>
+                <a:schemeClr val="accent2"/>
+              </a:solidFill>
+            </a:ln>
+          </p:spPr>
+          <p:style>
+            <a:lnRef idx="1">
+              <a:schemeClr val="accent1"/>
+            </a:lnRef>
+            <a:fillRef idx="0">
+              <a:schemeClr val="accent1"/>
+            </a:fillRef>
+            <a:effectRef idx="0">
+              <a:schemeClr val="accent1"/>
+            </a:effectRef>
+            <a:fontRef idx="minor">
+              <a:schemeClr val="tx1"/>
+            </a:fontRef>
+          </p:style>
+        </p:cxnSp>
         <p:pic>
           <p:nvPicPr>
-            <p:cNvPr id="3" name="Picture 3"/>
+            <p:cNvPr id="1027" name="Picture 3"/>
             <p:cNvPicPr>
               <a:picLocks noChangeAspect="1" noChangeArrowheads="1"/>
             </p:cNvPicPr>
@@ -4394,8 +4552,8 @@
           </p:blipFill>
           <p:spPr bwMode="auto">
             <a:xfrm>
-              <a:off x="2971800" y="3048000"/>
-              <a:ext cx="5048250" cy="1838325"/>
+              <a:off x="3212862" y="3200400"/>
+              <a:ext cx="5372100" cy="1552575"/>
             </a:xfrm>
             <a:prstGeom prst="rect">
               <a:avLst/>
@@ -4412,76 +4570,6 @@
             <a:effectLst/>
           </p:spPr>
         </p:pic>
-        <p:cxnSp>
-          <p:nvCxnSpPr>
-            <p:cNvPr id="8" name="Straight Connector 7"/>
-            <p:cNvCxnSpPr/>
-            <p:nvPr/>
-          </p:nvCxnSpPr>
-          <p:spPr>
-            <a:xfrm rot="5400000" flipH="1" flipV="1">
-              <a:off x="1409700" y="3771900"/>
-              <a:ext cx="2286000" cy="838200"/>
-            </a:xfrm>
-            <a:prstGeom prst="line">
-              <a:avLst/>
-            </a:prstGeom>
-            <a:ln w="38100">
-              <a:solidFill>
-                <a:schemeClr val="accent2"/>
-              </a:solidFill>
-            </a:ln>
-          </p:spPr>
-          <p:style>
-            <a:lnRef idx="1">
-              <a:schemeClr val="accent1"/>
-            </a:lnRef>
-            <a:fillRef idx="0">
-              <a:schemeClr val="accent1"/>
-            </a:fillRef>
-            <a:effectRef idx="0">
-              <a:schemeClr val="accent1"/>
-            </a:effectRef>
-            <a:fontRef idx="minor">
-              <a:schemeClr val="tx1"/>
-            </a:fontRef>
-          </p:style>
-        </p:cxnSp>
-        <p:cxnSp>
-          <p:nvCxnSpPr>
-            <p:cNvPr id="10" name="Straight Connector 9"/>
-            <p:cNvCxnSpPr/>
-            <p:nvPr/>
-          </p:nvCxnSpPr>
-          <p:spPr>
-            <a:xfrm flipV="1">
-              <a:off x="2133600" y="4876800"/>
-              <a:ext cx="838200" cy="685800"/>
-            </a:xfrm>
-            <a:prstGeom prst="line">
-              <a:avLst/>
-            </a:prstGeom>
-            <a:ln w="38100">
-              <a:solidFill>
-                <a:schemeClr val="accent2"/>
-              </a:solidFill>
-            </a:ln>
-          </p:spPr>
-          <p:style>
-            <a:lnRef idx="1">
-              <a:schemeClr val="accent1"/>
-            </a:lnRef>
-            <a:fillRef idx="0">
-              <a:schemeClr val="accent1"/>
-            </a:fillRef>
-            <a:effectRef idx="0">
-              <a:schemeClr val="accent1"/>
-            </a:effectRef>
-            <a:fontRef idx="minor">
-              <a:schemeClr val="tx1"/>
-            </a:fontRef>
-          </p:style>
-        </p:cxnSp>
       </p:grpSp>
     </p:spTree>
   </p:cSld>
@@ -4952,6 +5040,381 @@
 </file>
 
 <file path=ppt/slides/slide13.xml><?xml version="1.0" encoding="utf-8"?>
+<p:sld xmlns:a="http://schemas.openxmlformats.org/drawingml/2006/main" xmlns:r="http://schemas.openxmlformats.org/officeDocument/2006/relationships" xmlns:p="http://schemas.openxmlformats.org/presentationml/2006/main">
+  <p:cSld>
+    <p:spTree>
+      <p:nvGrpSpPr>
+        <p:cNvPr id="1" name=""/>
+        <p:cNvGrpSpPr/>
+        <p:nvPr/>
+      </p:nvGrpSpPr>
+      <p:grpSpPr>
+        <a:xfrm>
+          <a:off x="0" y="0"/>
+          <a:ext cx="0" cy="0"/>
+          <a:chOff x="0" y="0"/>
+          <a:chExt cx="0" cy="0"/>
+        </a:xfrm>
+      </p:grpSpPr>
+      <p:sp>
+        <p:nvSpPr>
+          <p:cNvPr id="3075" name="Text Placeholder 2"/>
+          <p:cNvSpPr>
+            <a:spLocks noGrp="1"/>
+          </p:cNvSpPr>
+          <p:nvPr>
+            <p:ph type="body" sz="quarter" idx="10"/>
+          </p:nvPr>
+        </p:nvSpPr>
+        <p:spPr>
+          <a:xfrm>
+            <a:off x="685800" y="1066800"/>
+            <a:ext cx="8229600" cy="1219200"/>
+          </a:xfrm>
+        </p:spPr>
+        <p:txBody>
+          <a:bodyPr/>
+          <a:lstStyle/>
+          <a:p>
+            <a:pPr eaLnBrk="1" hangingPunct="1">
+              <a:buNone/>
+            </a:pPr>
+            <a:r>
+              <a:rPr lang="en-US" sz="2000" dirty="0" smtClean="0"/>
+              <a:t>Tightly Coupled </a:t>
+            </a:r>
+            <a:r>
+              <a:rPr lang="en-US" sz="2000" dirty="0" smtClean="0"/>
+              <a:t>Workflow </a:t>
+            </a:r>
+            <a:r>
+              <a:rPr lang="en-US" sz="2000" dirty="0" smtClean="0"/>
+              <a:t>Logic: One Presenter Knows About Another</a:t>
+            </a:r>
+          </a:p>
+        </p:txBody>
+      </p:sp>
+      <p:sp>
+        <p:nvSpPr>
+          <p:cNvPr id="3074" name="Title 1"/>
+          <p:cNvSpPr>
+            <a:spLocks noGrp="1"/>
+          </p:cNvSpPr>
+          <p:nvPr>
+            <p:ph type="title"/>
+          </p:nvPr>
+        </p:nvSpPr>
+        <p:spPr bwMode="auto">
+          <a:noFill/>
+          <a:ln>
+            <a:miter lim="800000"/>
+            <a:headEnd/>
+            <a:tailEnd/>
+          </a:ln>
+        </p:spPr>
+        <p:txBody>
+          <a:bodyPr vert="horz" wrap="square" lIns="91440" tIns="45720" rIns="91440" bIns="45720" numCol="1" anchor="t" anchorCtr="0" compatLnSpc="1">
+            <a:prstTxWarp prst="textNoShape">
+              <a:avLst/>
+            </a:prstTxWarp>
+          </a:bodyPr>
+          <a:lstStyle/>
+          <a:p>
+            <a:pPr eaLnBrk="1" hangingPunct="1"/>
+            <a:r>
+              <a:rPr lang="en-US" dirty="0" smtClean="0"/>
+              <a:t>Simple Org Chart – v1</a:t>
+            </a:r>
+          </a:p>
+        </p:txBody>
+      </p:sp>
+      <p:grpSp>
+        <p:nvGrpSpPr>
+          <p:cNvPr id="24" name="Group 23"/>
+          <p:cNvGrpSpPr/>
+          <p:nvPr/>
+        </p:nvGrpSpPr>
+        <p:grpSpPr>
+          <a:xfrm>
+            <a:off x="552450" y="1752600"/>
+            <a:ext cx="8039100" cy="4438650"/>
+            <a:chOff x="552450" y="1752600"/>
+            <a:chExt cx="8039100" cy="4438650"/>
+          </a:xfrm>
+        </p:grpSpPr>
+        <p:grpSp>
+          <p:nvGrpSpPr>
+            <p:cNvPr id="23" name="Group 22"/>
+            <p:cNvGrpSpPr/>
+            <p:nvPr/>
+          </p:nvGrpSpPr>
+          <p:grpSpPr>
+            <a:xfrm>
+              <a:off x="552450" y="1752600"/>
+              <a:ext cx="8039100" cy="4438650"/>
+              <a:chOff x="742950" y="1752600"/>
+              <a:chExt cx="8039100" cy="4438650"/>
+            </a:xfrm>
+          </p:grpSpPr>
+          <p:pic>
+            <p:nvPicPr>
+              <p:cNvPr id="15" name="Picture 14" descr="X:\Derick-GitHub\Presentation And Training Material\Decoupling Workflow With App Controler\doc\New Employee - Info.png"/>
+              <p:cNvPicPr>
+                <a:picLocks noChangeAspect="1" noChangeArrowheads="1"/>
+              </p:cNvPicPr>
+              <p:nvPr/>
+            </p:nvPicPr>
+            <p:blipFill>
+              <a:blip r:embed="rId3">
+                <a:lum bright="70000" contrast="-70000"/>
+              </a:blip>
+              <a:srcRect/>
+              <a:stretch>
+                <a:fillRect/>
+              </a:stretch>
+            </p:blipFill>
+            <p:spPr bwMode="auto">
+              <a:xfrm>
+                <a:off x="742950" y="1752600"/>
+                <a:ext cx="4286250" cy="2257425"/>
+              </a:xfrm>
+              <a:prstGeom prst="rect">
+                <a:avLst/>
+              </a:prstGeom>
+              <a:noFill/>
+            </p:spPr>
+          </p:pic>
+          <p:pic>
+            <p:nvPicPr>
+              <p:cNvPr id="18" name="Picture 17" descr="X:\Derick-GitHub\Presentation And Training Material\Decoupling Workflow With App Controler\doc\New Employee - Manager.png"/>
+              <p:cNvPicPr>
+                <a:picLocks noChangeAspect="1" noChangeArrowheads="1"/>
+              </p:cNvPicPr>
+              <p:nvPr/>
+            </p:nvPicPr>
+            <p:blipFill>
+              <a:blip r:embed="rId4">
+                <a:lum bright="70000" contrast="-70000"/>
+              </a:blip>
+              <a:srcRect/>
+              <a:stretch>
+                <a:fillRect/>
+              </a:stretch>
+            </p:blipFill>
+            <p:spPr bwMode="auto">
+              <a:xfrm>
+                <a:off x="4495800" y="4419600"/>
+                <a:ext cx="4286250" cy="1771650"/>
+              </a:xfrm>
+              <a:prstGeom prst="rect">
+                <a:avLst/>
+              </a:prstGeom>
+              <a:noFill/>
+            </p:spPr>
+          </p:pic>
+        </p:grpSp>
+        <p:pic>
+          <p:nvPicPr>
+            <p:cNvPr id="2050" name="Picture 2"/>
+            <p:cNvPicPr>
+              <a:picLocks noChangeAspect="1" noChangeArrowheads="1"/>
+            </p:cNvPicPr>
+            <p:nvPr/>
+          </p:nvPicPr>
+          <p:blipFill>
+            <a:blip r:embed="rId5"/>
+            <a:srcRect/>
+            <a:stretch>
+              <a:fillRect/>
+            </a:stretch>
+          </p:blipFill>
+          <p:spPr bwMode="auto">
+            <a:xfrm>
+              <a:off x="1252538" y="2667000"/>
+              <a:ext cx="6638925" cy="2638425"/>
+            </a:xfrm>
+            <a:prstGeom prst="rect">
+              <a:avLst/>
+            </a:prstGeom>
+            <a:noFill/>
+            <a:ln w="38100">
+              <a:solidFill>
+                <a:schemeClr val="tx1"/>
+              </a:solidFill>
+              <a:miter lim="800000"/>
+              <a:headEnd/>
+              <a:tailEnd/>
+            </a:ln>
+            <a:effectLst/>
+          </p:spPr>
+        </p:pic>
+        <p:sp>
+          <p:nvSpPr>
+            <p:cNvPr id="19" name="Rectangle 18"/>
+            <p:cNvSpPr/>
+            <p:nvPr/>
+          </p:nvSpPr>
+          <p:spPr>
+            <a:xfrm>
+              <a:off x="5181600" y="2667000"/>
+              <a:ext cx="2667000" cy="152400"/>
+            </a:xfrm>
+            <a:prstGeom prst="rect">
+              <a:avLst/>
+            </a:prstGeom>
+            <a:solidFill>
+              <a:srgbClr val="FFFF00">
+                <a:alpha val="10196"/>
+              </a:srgbClr>
+            </a:solidFill>
+            <a:ln>
+              <a:solidFill>
+                <a:srgbClr val="FFFF00"/>
+              </a:solidFill>
+            </a:ln>
+          </p:spPr>
+          <p:style>
+            <a:lnRef idx="2">
+              <a:schemeClr val="accent1">
+                <a:shade val="50000"/>
+              </a:schemeClr>
+            </a:lnRef>
+            <a:fillRef idx="1">
+              <a:schemeClr val="accent1"/>
+            </a:fillRef>
+            <a:effectRef idx="0">
+              <a:schemeClr val="accent1"/>
+            </a:effectRef>
+            <a:fontRef idx="minor">
+              <a:schemeClr val="lt1"/>
+            </a:fontRef>
+          </p:style>
+          <p:txBody>
+            <a:bodyPr rtlCol="0" anchor="ctr"/>
+            <a:lstStyle/>
+            <a:p>
+              <a:pPr algn="ctr"/>
+              <a:endParaRPr lang="en-US"/>
+            </a:p>
+          </p:txBody>
+        </p:sp>
+        <p:sp>
+          <p:nvSpPr>
+            <p:cNvPr id="20" name="Rectangle 19"/>
+            <p:cNvSpPr/>
+            <p:nvPr/>
+          </p:nvSpPr>
+          <p:spPr>
+            <a:xfrm>
+              <a:off x="1371600" y="3276600"/>
+              <a:ext cx="2743200" cy="152400"/>
+            </a:xfrm>
+            <a:prstGeom prst="rect">
+              <a:avLst/>
+            </a:prstGeom>
+            <a:solidFill>
+              <a:srgbClr val="FFFF00">
+                <a:alpha val="10196"/>
+              </a:srgbClr>
+            </a:solidFill>
+            <a:ln>
+              <a:solidFill>
+                <a:srgbClr val="FFFF00"/>
+              </a:solidFill>
+            </a:ln>
+          </p:spPr>
+          <p:style>
+            <a:lnRef idx="2">
+              <a:schemeClr val="accent1">
+                <a:shade val="50000"/>
+              </a:schemeClr>
+            </a:lnRef>
+            <a:fillRef idx="1">
+              <a:schemeClr val="accent1"/>
+            </a:fillRef>
+            <a:effectRef idx="0">
+              <a:schemeClr val="accent1"/>
+            </a:effectRef>
+            <a:fontRef idx="minor">
+              <a:schemeClr val="lt1"/>
+            </a:fontRef>
+          </p:style>
+          <p:txBody>
+            <a:bodyPr rtlCol="0" anchor="ctr"/>
+            <a:lstStyle/>
+            <a:p>
+              <a:pPr algn="ctr"/>
+              <a:endParaRPr lang="en-US"/>
+            </a:p>
+          </p:txBody>
+        </p:sp>
+        <p:sp>
+          <p:nvSpPr>
+            <p:cNvPr id="21" name="Rectangle 20"/>
+            <p:cNvSpPr/>
+            <p:nvPr/>
+          </p:nvSpPr>
+          <p:spPr>
+            <a:xfrm>
+              <a:off x="2819400" y="4648200"/>
+              <a:ext cx="2895600" cy="152400"/>
+            </a:xfrm>
+            <a:prstGeom prst="rect">
+              <a:avLst/>
+            </a:prstGeom>
+            <a:solidFill>
+              <a:srgbClr val="FFFF00">
+                <a:alpha val="10196"/>
+              </a:srgbClr>
+            </a:solidFill>
+            <a:ln>
+              <a:solidFill>
+                <a:srgbClr val="FFFF00"/>
+              </a:solidFill>
+            </a:ln>
+          </p:spPr>
+          <p:style>
+            <a:lnRef idx="2">
+              <a:schemeClr val="accent1">
+                <a:shade val="50000"/>
+              </a:schemeClr>
+            </a:lnRef>
+            <a:fillRef idx="1">
+              <a:schemeClr val="accent1"/>
+            </a:fillRef>
+            <a:effectRef idx="0">
+              <a:schemeClr val="accent1"/>
+            </a:effectRef>
+            <a:fontRef idx="minor">
+              <a:schemeClr val="lt1"/>
+            </a:fontRef>
+          </p:style>
+          <p:txBody>
+            <a:bodyPr rtlCol="0" anchor="ctr"/>
+            <a:lstStyle/>
+            <a:p>
+              <a:pPr algn="ctr"/>
+              <a:endParaRPr lang="en-US"/>
+            </a:p>
+          </p:txBody>
+        </p:sp>
+      </p:grpSp>
+    </p:spTree>
+  </p:cSld>
+  <p:clrMapOvr>
+    <a:masterClrMapping/>
+  </p:clrMapOvr>
+  <p:timing>
+    <p:tnLst>
+      <p:par>
+        <p:cTn id="1" dur="indefinite" restart="never" nodeType="tmRoot"/>
+      </p:par>
+    </p:tnLst>
+  </p:timing>
+</p:sld>
+</file>
+
+<file path=ppt/slides/slide14.xml><?xml version="1.0" encoding="utf-8"?>
 <p:sld xmlns:a="http://schemas.openxmlformats.org/drawingml/2006/main" xmlns:r="http://schemas.openxmlformats.org/officeDocument/2006/relationships" xmlns:p="http://schemas.openxmlformats.org/presentationml/2006/main">
   <p:cSld>
     <p:spTree>
@@ -5771,7 +6234,7 @@
 </p:sld>
 </file>
 
-<file path=ppt/slides/slide14.xml><?xml version="1.0" encoding="utf-8"?>
+<file path=ppt/slides/slide15.xml><?xml version="1.0" encoding="utf-8"?>
 <p:sld xmlns:a="http://schemas.openxmlformats.org/drawingml/2006/main" xmlns:r="http://schemas.openxmlformats.org/officeDocument/2006/relationships" xmlns:p="http://schemas.openxmlformats.org/presentationml/2006/main">
   <p:cSld>
     <p:spTree>
@@ -6126,7 +6589,7 @@
 </p:sld>
 </file>
 
-<file path=ppt/slides/slide15.xml><?xml version="1.0" encoding="utf-8"?>
+<file path=ppt/slides/slide16.xml><?xml version="1.0" encoding="utf-8"?>
 <p:sld xmlns:a="http://schemas.openxmlformats.org/drawingml/2006/main" xmlns:r="http://schemas.openxmlformats.org/officeDocument/2006/relationships" xmlns:p="http://schemas.openxmlformats.org/presentationml/2006/main">
   <p:cSld>
     <p:spTree>
@@ -6220,7 +6683,7 @@
 </p:sld>
 </file>
 
-<file path=ppt/slides/slide16.xml><?xml version="1.0" encoding="utf-8"?>
+<file path=ppt/slides/slide17.xml><?xml version="1.0" encoding="utf-8"?>
 <p:sld xmlns:a="http://schemas.openxmlformats.org/drawingml/2006/main" xmlns:r="http://schemas.openxmlformats.org/officeDocument/2006/relationships" xmlns:p="http://schemas.openxmlformats.org/presentationml/2006/main">
   <p:cSld>
     <p:spTree>
@@ -6566,7 +7029,7 @@
 </p:sld>
 </file>
 
-<file path=ppt/slides/slide17.xml><?xml version="1.0" encoding="utf-8"?>
+<file path=ppt/slides/slide18.xml><?xml version="1.0" encoding="utf-8"?>
 <p:sld xmlns:a="http://schemas.openxmlformats.org/drawingml/2006/main" xmlns:r="http://schemas.openxmlformats.org/officeDocument/2006/relationships" xmlns:p="http://schemas.openxmlformats.org/presentationml/2006/main">
   <p:cSld>
     <p:spTree>
@@ -6906,7 +7369,7 @@
 </p:sld>
 </file>
 
-<file path=ppt/slides/slide18.xml><?xml version="1.0" encoding="utf-8"?>
+<file path=ppt/slides/slide19.xml><?xml version="1.0" encoding="utf-8"?>
 <p:sld xmlns:a="http://schemas.openxmlformats.org/drawingml/2006/main" xmlns:r="http://schemas.openxmlformats.org/officeDocument/2006/relationships" xmlns:p="http://schemas.openxmlformats.org/presentationml/2006/main">
   <p:cSld>
     <p:spTree>
@@ -7387,7 +7850,230 @@
 </p:sld>
 </file>
 
-<file path=ppt/slides/slide19.xml><?xml version="1.0" encoding="utf-8"?>
+<file path=ppt/slides/slide2.xml><?xml version="1.0" encoding="utf-8"?>
+<p:sld xmlns:a="http://schemas.openxmlformats.org/drawingml/2006/main" xmlns:r="http://schemas.openxmlformats.org/officeDocument/2006/relationships" xmlns:p="http://schemas.openxmlformats.org/presentationml/2006/main">
+  <p:cSld>
+    <p:spTree>
+      <p:nvGrpSpPr>
+        <p:cNvPr id="1" name=""/>
+        <p:cNvGrpSpPr/>
+        <p:nvPr/>
+      </p:nvGrpSpPr>
+      <p:grpSpPr>
+        <a:xfrm>
+          <a:off x="0" y="0"/>
+          <a:ext cx="0" cy="0"/>
+          <a:chOff x="0" y="0"/>
+          <a:chExt cx="0" cy="0"/>
+        </a:xfrm>
+      </p:grpSpPr>
+      <p:sp>
+        <p:nvSpPr>
+          <p:cNvPr id="3075" name="Text Placeholder 2"/>
+          <p:cNvSpPr>
+            <a:spLocks noGrp="1"/>
+          </p:cNvSpPr>
+          <p:nvPr>
+            <p:ph type="body" sz="quarter" idx="10"/>
+          </p:nvPr>
+        </p:nvSpPr>
+        <p:spPr>
+          <a:xfrm>
+            <a:off x="685800" y="1066800"/>
+            <a:ext cx="8229600" cy="5334000"/>
+          </a:xfrm>
+        </p:spPr>
+        <p:txBody>
+          <a:bodyPr/>
+          <a:lstStyle/>
+          <a:p>
+            <a:pPr eaLnBrk="1" hangingPunct="1">
+              <a:buNone/>
+            </a:pPr>
+            <a:endParaRPr lang="en-US" b="1" dirty="0" smtClean="0">
+              <a:solidFill>
+                <a:schemeClr val="accent1">
+                  <a:lumMod val="75000"/>
+                </a:schemeClr>
+              </a:solidFill>
+            </a:endParaRPr>
+          </a:p>
+          <a:p>
+            <a:pPr eaLnBrk="1" hangingPunct="1">
+              <a:buNone/>
+            </a:pPr>
+            <a:r>
+              <a:rPr lang="en-US" b="1" dirty="0" smtClean="0">
+                <a:solidFill>
+                  <a:schemeClr val="accent1">
+                    <a:lumMod val="75000"/>
+                  </a:schemeClr>
+                </a:solidFill>
+              </a:rPr>
+              <a:t>Topics Covered</a:t>
+            </a:r>
+          </a:p>
+          <a:p>
+            <a:pPr eaLnBrk="1" hangingPunct="1"/>
+            <a:r>
+              <a:rPr lang="en-US" sz="2000" dirty="0" smtClean="0"/>
+              <a:t>Event Aggregator</a:t>
+            </a:r>
+          </a:p>
+          <a:p>
+            <a:pPr eaLnBrk="1" hangingPunct="1"/>
+            <a:r>
+              <a:rPr lang="en-US" sz="2000" dirty="0" smtClean="0"/>
+              <a:t>Command Pattern</a:t>
+            </a:r>
+          </a:p>
+          <a:p>
+            <a:pPr eaLnBrk="1" hangingPunct="1"/>
+            <a:r>
+              <a:rPr lang="en-US" sz="2000" dirty="0" smtClean="0"/>
+              <a:t>Application Controller</a:t>
+            </a:r>
+          </a:p>
+          <a:p>
+            <a:pPr eaLnBrk="1" hangingPunct="1"/>
+            <a:r>
+              <a:rPr lang="en-US" sz="2000" dirty="0" smtClean="0"/>
+              <a:t>Wiring Together With </a:t>
+            </a:r>
+            <a:r>
+              <a:rPr lang="en-US" sz="2000" dirty="0" err="1" smtClean="0"/>
+              <a:t>IoC</a:t>
+            </a:r>
+            <a:r>
+              <a:rPr lang="en-US" sz="2000" dirty="0" smtClean="0"/>
+              <a:t> Container</a:t>
+            </a:r>
+          </a:p>
+          <a:p>
+            <a:pPr eaLnBrk="1" hangingPunct="1"/>
+            <a:endParaRPr lang="en-US" sz="2000" dirty="0" smtClean="0"/>
+          </a:p>
+          <a:p>
+            <a:pPr eaLnBrk="1" hangingPunct="1">
+              <a:buNone/>
+            </a:pPr>
+            <a:r>
+              <a:rPr lang="en-US" b="1" dirty="0" smtClean="0">
+                <a:solidFill>
+                  <a:schemeClr val="accent1">
+                    <a:lumMod val="75000"/>
+                  </a:schemeClr>
+                </a:solidFill>
+              </a:rPr>
+              <a:t>Goals</a:t>
+            </a:r>
+          </a:p>
+          <a:p>
+            <a:pPr eaLnBrk="1" hangingPunct="1"/>
+            <a:r>
+              <a:rPr lang="en-US" sz="2000" dirty="0" smtClean="0"/>
+              <a:t>Object Oriented System</a:t>
+            </a:r>
+          </a:p>
+          <a:p>
+            <a:pPr eaLnBrk="1" hangingPunct="1"/>
+            <a:r>
+              <a:rPr lang="en-US" sz="2000" dirty="0" smtClean="0"/>
+              <a:t>Testability</a:t>
+            </a:r>
+          </a:p>
+          <a:p>
+            <a:pPr eaLnBrk="1" hangingPunct="1"/>
+            <a:r>
+              <a:rPr lang="en-US" sz="2000" dirty="0" smtClean="0"/>
+              <a:t>Flexibility</a:t>
+            </a:r>
+          </a:p>
+          <a:p>
+            <a:pPr eaLnBrk="1" hangingPunct="1"/>
+            <a:r>
+              <a:rPr lang="en-US" sz="2000" dirty="0" smtClean="0"/>
+              <a:t>Maintainability (Ease of Enhancement)</a:t>
+            </a:r>
+          </a:p>
+        </p:txBody>
+      </p:sp>
+      <p:sp>
+        <p:nvSpPr>
+          <p:cNvPr id="3074" name="Title 1"/>
+          <p:cNvSpPr>
+            <a:spLocks noGrp="1"/>
+          </p:cNvSpPr>
+          <p:nvPr>
+            <p:ph type="title"/>
+          </p:nvPr>
+        </p:nvSpPr>
+        <p:spPr bwMode="auto">
+          <a:noFill/>
+          <a:ln>
+            <a:miter lim="800000"/>
+            <a:headEnd/>
+            <a:tailEnd/>
+          </a:ln>
+        </p:spPr>
+        <p:txBody>
+          <a:bodyPr vert="horz" wrap="square" lIns="91440" tIns="45720" rIns="91440" bIns="45720" numCol="1" anchor="t" anchorCtr="0" compatLnSpc="1">
+            <a:prstTxWarp prst="textNoShape">
+              <a:avLst/>
+            </a:prstTxWarp>
+          </a:bodyPr>
+          <a:lstStyle/>
+          <a:p>
+            <a:pPr eaLnBrk="1" hangingPunct="1"/>
+            <a:r>
+              <a:rPr lang="en-US" dirty="0" smtClean="0"/>
+              <a:t>Topics Of This Presentation</a:t>
+            </a:r>
+          </a:p>
+        </p:txBody>
+      </p:sp>
+      <p:pic>
+        <p:nvPicPr>
+          <p:cNvPr id="1026" name="Picture 2" descr="C:\Users\derickb\AppData\Local\Microsoft\Windows\Temporary Internet Files\Content.IE5\AY104AXF\MPj04331790000[1].jpg"/>
+          <p:cNvPicPr>
+            <a:picLocks noChangeAspect="1" noChangeArrowheads="1"/>
+          </p:cNvPicPr>
+          <p:nvPr/>
+        </p:nvPicPr>
+        <p:blipFill>
+          <a:blip r:embed="rId3"/>
+          <a:srcRect/>
+          <a:stretch>
+            <a:fillRect/>
+          </a:stretch>
+        </p:blipFill>
+        <p:spPr bwMode="auto">
+          <a:xfrm>
+            <a:off x="5426075" y="990600"/>
+            <a:ext cx="3717925" cy="2790288"/>
+          </a:xfrm>
+          <a:prstGeom prst="rect">
+            <a:avLst/>
+          </a:prstGeom>
+          <a:noFill/>
+        </p:spPr>
+      </p:pic>
+    </p:spTree>
+  </p:cSld>
+  <p:clrMapOvr>
+    <a:masterClrMapping/>
+  </p:clrMapOvr>
+  <p:timing>
+    <p:tnLst>
+      <p:par>
+        <p:cTn id="1" dur="indefinite" restart="never" nodeType="tmRoot"/>
+      </p:par>
+    </p:tnLst>
+  </p:timing>
+</p:sld>
+</file>
+
+<file path=ppt/slides/slide20.xml><?xml version="1.0" encoding="utf-8"?>
 <p:sld xmlns:a="http://schemas.openxmlformats.org/drawingml/2006/main" xmlns:r="http://schemas.openxmlformats.org/officeDocument/2006/relationships" xmlns:p="http://schemas.openxmlformats.org/presentationml/2006/main">
   <p:cSld>
     <p:spTree>
@@ -7866,230 +8552,7 @@
 </p:sld>
 </file>
 
-<file path=ppt/slides/slide2.xml><?xml version="1.0" encoding="utf-8"?>
-<p:sld xmlns:a="http://schemas.openxmlformats.org/drawingml/2006/main" xmlns:r="http://schemas.openxmlformats.org/officeDocument/2006/relationships" xmlns:p="http://schemas.openxmlformats.org/presentationml/2006/main">
-  <p:cSld>
-    <p:spTree>
-      <p:nvGrpSpPr>
-        <p:cNvPr id="1" name=""/>
-        <p:cNvGrpSpPr/>
-        <p:nvPr/>
-      </p:nvGrpSpPr>
-      <p:grpSpPr>
-        <a:xfrm>
-          <a:off x="0" y="0"/>
-          <a:ext cx="0" cy="0"/>
-          <a:chOff x="0" y="0"/>
-          <a:chExt cx="0" cy="0"/>
-        </a:xfrm>
-      </p:grpSpPr>
-      <p:sp>
-        <p:nvSpPr>
-          <p:cNvPr id="3075" name="Text Placeholder 2"/>
-          <p:cNvSpPr>
-            <a:spLocks noGrp="1"/>
-          </p:cNvSpPr>
-          <p:nvPr>
-            <p:ph type="body" sz="quarter" idx="10"/>
-          </p:nvPr>
-        </p:nvSpPr>
-        <p:spPr>
-          <a:xfrm>
-            <a:off x="685800" y="1066800"/>
-            <a:ext cx="8229600" cy="5334000"/>
-          </a:xfrm>
-        </p:spPr>
-        <p:txBody>
-          <a:bodyPr/>
-          <a:lstStyle/>
-          <a:p>
-            <a:pPr eaLnBrk="1" hangingPunct="1">
-              <a:buNone/>
-            </a:pPr>
-            <a:endParaRPr lang="en-US" b="1" dirty="0" smtClean="0">
-              <a:solidFill>
-                <a:schemeClr val="accent1">
-                  <a:lumMod val="75000"/>
-                </a:schemeClr>
-              </a:solidFill>
-            </a:endParaRPr>
-          </a:p>
-          <a:p>
-            <a:pPr eaLnBrk="1" hangingPunct="1">
-              <a:buNone/>
-            </a:pPr>
-            <a:r>
-              <a:rPr lang="en-US" b="1" dirty="0" smtClean="0">
-                <a:solidFill>
-                  <a:schemeClr val="accent1">
-                    <a:lumMod val="75000"/>
-                  </a:schemeClr>
-                </a:solidFill>
-              </a:rPr>
-              <a:t>Topics Covered</a:t>
-            </a:r>
-          </a:p>
-          <a:p>
-            <a:pPr eaLnBrk="1" hangingPunct="1"/>
-            <a:r>
-              <a:rPr lang="en-US" sz="2000" dirty="0" smtClean="0"/>
-              <a:t>Event Aggregator</a:t>
-            </a:r>
-          </a:p>
-          <a:p>
-            <a:pPr eaLnBrk="1" hangingPunct="1"/>
-            <a:r>
-              <a:rPr lang="en-US" sz="2000" dirty="0" smtClean="0"/>
-              <a:t>Command Pattern</a:t>
-            </a:r>
-          </a:p>
-          <a:p>
-            <a:pPr eaLnBrk="1" hangingPunct="1"/>
-            <a:r>
-              <a:rPr lang="en-US" sz="2000" dirty="0" smtClean="0"/>
-              <a:t>Application Controller</a:t>
-            </a:r>
-          </a:p>
-          <a:p>
-            <a:pPr eaLnBrk="1" hangingPunct="1"/>
-            <a:r>
-              <a:rPr lang="en-US" sz="2000" dirty="0" smtClean="0"/>
-              <a:t>Wiring Together With </a:t>
-            </a:r>
-            <a:r>
-              <a:rPr lang="en-US" sz="2000" dirty="0" err="1" smtClean="0"/>
-              <a:t>IoC</a:t>
-            </a:r>
-            <a:r>
-              <a:rPr lang="en-US" sz="2000" dirty="0" smtClean="0"/>
-              <a:t> Container</a:t>
-            </a:r>
-          </a:p>
-          <a:p>
-            <a:pPr eaLnBrk="1" hangingPunct="1"/>
-            <a:endParaRPr lang="en-US" sz="2000" dirty="0" smtClean="0"/>
-          </a:p>
-          <a:p>
-            <a:pPr eaLnBrk="1" hangingPunct="1">
-              <a:buNone/>
-            </a:pPr>
-            <a:r>
-              <a:rPr lang="en-US" b="1" dirty="0" smtClean="0">
-                <a:solidFill>
-                  <a:schemeClr val="accent1">
-                    <a:lumMod val="75000"/>
-                  </a:schemeClr>
-                </a:solidFill>
-              </a:rPr>
-              <a:t>Goals</a:t>
-            </a:r>
-          </a:p>
-          <a:p>
-            <a:pPr eaLnBrk="1" hangingPunct="1"/>
-            <a:r>
-              <a:rPr lang="en-US" sz="2000" dirty="0" smtClean="0"/>
-              <a:t>Object Oriented System</a:t>
-            </a:r>
-          </a:p>
-          <a:p>
-            <a:pPr eaLnBrk="1" hangingPunct="1"/>
-            <a:r>
-              <a:rPr lang="en-US" sz="2000" dirty="0" smtClean="0"/>
-              <a:t>Testability</a:t>
-            </a:r>
-          </a:p>
-          <a:p>
-            <a:pPr eaLnBrk="1" hangingPunct="1"/>
-            <a:r>
-              <a:rPr lang="en-US" sz="2000" dirty="0" smtClean="0"/>
-              <a:t>Flexibility</a:t>
-            </a:r>
-          </a:p>
-          <a:p>
-            <a:pPr eaLnBrk="1" hangingPunct="1"/>
-            <a:r>
-              <a:rPr lang="en-US" sz="2000" dirty="0" smtClean="0"/>
-              <a:t>Maintainability (Ease of Enhancement)</a:t>
-            </a:r>
-          </a:p>
-        </p:txBody>
-      </p:sp>
-      <p:sp>
-        <p:nvSpPr>
-          <p:cNvPr id="3074" name="Title 1"/>
-          <p:cNvSpPr>
-            <a:spLocks noGrp="1"/>
-          </p:cNvSpPr>
-          <p:nvPr>
-            <p:ph type="title"/>
-          </p:nvPr>
-        </p:nvSpPr>
-        <p:spPr bwMode="auto">
-          <a:noFill/>
-          <a:ln>
-            <a:miter lim="800000"/>
-            <a:headEnd/>
-            <a:tailEnd/>
-          </a:ln>
-        </p:spPr>
-        <p:txBody>
-          <a:bodyPr vert="horz" wrap="square" lIns="91440" tIns="45720" rIns="91440" bIns="45720" numCol="1" anchor="t" anchorCtr="0" compatLnSpc="1">
-            <a:prstTxWarp prst="textNoShape">
-              <a:avLst/>
-            </a:prstTxWarp>
-          </a:bodyPr>
-          <a:lstStyle/>
-          <a:p>
-            <a:pPr eaLnBrk="1" hangingPunct="1"/>
-            <a:r>
-              <a:rPr lang="en-US" dirty="0" smtClean="0"/>
-              <a:t>Topics Of This Presentation</a:t>
-            </a:r>
-          </a:p>
-        </p:txBody>
-      </p:sp>
-      <p:pic>
-        <p:nvPicPr>
-          <p:cNvPr id="1026" name="Picture 2" descr="C:\Users\derickb\AppData\Local\Microsoft\Windows\Temporary Internet Files\Content.IE5\AY104AXF\MPj04331790000[1].jpg"/>
-          <p:cNvPicPr>
-            <a:picLocks noChangeAspect="1" noChangeArrowheads="1"/>
-          </p:cNvPicPr>
-          <p:nvPr/>
-        </p:nvPicPr>
-        <p:blipFill>
-          <a:blip r:embed="rId3"/>
-          <a:srcRect/>
-          <a:stretch>
-            <a:fillRect/>
-          </a:stretch>
-        </p:blipFill>
-        <p:spPr bwMode="auto">
-          <a:xfrm>
-            <a:off x="5426075" y="990600"/>
-            <a:ext cx="3717925" cy="2790288"/>
-          </a:xfrm>
-          <a:prstGeom prst="rect">
-            <a:avLst/>
-          </a:prstGeom>
-          <a:noFill/>
-        </p:spPr>
-      </p:pic>
-    </p:spTree>
-  </p:cSld>
-  <p:clrMapOvr>
-    <a:masterClrMapping/>
-  </p:clrMapOvr>
-  <p:timing>
-    <p:tnLst>
-      <p:par>
-        <p:cTn id="1" dur="indefinite" restart="never" nodeType="tmRoot"/>
-      </p:par>
-    </p:tnLst>
-  </p:timing>
-</p:sld>
-</file>
-
-<file path=ppt/slides/slide20.xml><?xml version="1.0" encoding="utf-8"?>
+<file path=ppt/slides/slide21.xml><?xml version="1.0" encoding="utf-8"?>
 <p:sld xmlns:a="http://schemas.openxmlformats.org/drawingml/2006/main" xmlns:r="http://schemas.openxmlformats.org/officeDocument/2006/relationships" xmlns:p="http://schemas.openxmlformats.org/presentationml/2006/main">
   <p:cSld>
     <p:spTree>
@@ -8339,7 +8802,7 @@
 </p:sld>
 </file>
 
-<file path=ppt/slides/slide21.xml><?xml version="1.0" encoding="utf-8"?>
+<file path=ppt/slides/slide22.xml><?xml version="1.0" encoding="utf-8"?>
 <p:sld xmlns:a="http://schemas.openxmlformats.org/drawingml/2006/main" xmlns:r="http://schemas.openxmlformats.org/officeDocument/2006/relationships" xmlns:p="http://schemas.openxmlformats.org/presentationml/2006/main">
   <p:cSld>
     <p:spTree>
@@ -8429,7 +8892,7 @@
 </p:sld>
 </file>
 
-<file path=ppt/slides/slide22.xml><?xml version="1.0" encoding="utf-8"?>
+<file path=ppt/slides/slide23.xml><?xml version="1.0" encoding="utf-8"?>
 <p:sld xmlns:a="http://schemas.openxmlformats.org/drawingml/2006/main" xmlns:r="http://schemas.openxmlformats.org/officeDocument/2006/relationships" xmlns:p="http://schemas.openxmlformats.org/presentationml/2006/main">
   <p:cSld>
     <p:spTree>
@@ -8556,7 +9019,7 @@
 </p:sld>
 </file>
 
-<file path=ppt/slides/slide23.xml><?xml version="1.0" encoding="utf-8"?>
+<file path=ppt/slides/slide24.xml><?xml version="1.0" encoding="utf-8"?>
 <p:sld xmlns:a="http://schemas.openxmlformats.org/drawingml/2006/main" xmlns:r="http://schemas.openxmlformats.org/officeDocument/2006/relationships" xmlns:p="http://schemas.openxmlformats.org/presentationml/2006/main">
   <p:cSld>
     <p:spTree>
@@ -8824,7 +9287,16 @@
                 </a:solidFill>
                 <a:latin typeface="Calibri" pitchFamily="34" charset="0"/>
               </a:rPr>
-              <a:t>Simple Org Chart Version 3</a:t>
+              <a:t>Simple Org Chart Version </a:t>
+            </a:r>
+            <a:r>
+              <a:rPr lang="en-US" sz="3600" spc="60" dirty="0" smtClean="0">
+                <a:solidFill>
+                  <a:schemeClr val="bg1"/>
+                </a:solidFill>
+                <a:latin typeface="Calibri" pitchFamily="34" charset="0"/>
+              </a:rPr>
+              <a:t>4</a:t>
             </a:r>
             <a:endParaRPr lang="en-US" sz="3600" spc="60" dirty="0">
               <a:solidFill>
@@ -8869,96 +9341,6 @@
               </a:rPr>
               <a:t>Introducing An Event Aggregator</a:t>
             </a:r>
-          </a:p>
-        </p:txBody>
-      </p:sp>
-    </p:spTree>
-  </p:cSld>
-  <p:clrMapOvr>
-    <a:masterClrMapping/>
-  </p:clrMapOvr>
-  <p:timing>
-    <p:tnLst>
-      <p:par>
-        <p:cTn id="1" dur="indefinite" restart="never" nodeType="tmRoot"/>
-      </p:par>
-    </p:tnLst>
-  </p:timing>
-</p:sld>
-</file>
-
-<file path=ppt/slides/slide24.xml><?xml version="1.0" encoding="utf-8"?>
-<p:sld xmlns:a="http://schemas.openxmlformats.org/drawingml/2006/main" xmlns:r="http://schemas.openxmlformats.org/officeDocument/2006/relationships" xmlns:p="http://schemas.openxmlformats.org/presentationml/2006/main">
-  <p:cSld>
-    <p:spTree>
-      <p:nvGrpSpPr>
-        <p:cNvPr id="1" name=""/>
-        <p:cNvGrpSpPr/>
-        <p:nvPr/>
-      </p:nvGrpSpPr>
-      <p:grpSpPr>
-        <a:xfrm>
-          <a:off x="0" y="0"/>
-          <a:ext cx="0" cy="0"/>
-          <a:chOff x="0" y="0"/>
-          <a:chExt cx="0" cy="0"/>
-        </a:xfrm>
-      </p:grpSpPr>
-      <p:sp>
-        <p:nvSpPr>
-          <p:cNvPr id="3075" name="Text Placeholder 2"/>
-          <p:cNvSpPr>
-            <a:spLocks noGrp="1"/>
-          </p:cNvSpPr>
-          <p:nvPr>
-            <p:ph type="body" sz="quarter" idx="10"/>
-          </p:nvPr>
-        </p:nvSpPr>
-        <p:spPr>
-          <a:xfrm>
-            <a:off x="685800" y="1066800"/>
-            <a:ext cx="8229600" cy="1219200"/>
-          </a:xfrm>
-        </p:spPr>
-        <p:txBody>
-          <a:bodyPr/>
-          <a:lstStyle/>
-          <a:p>
-            <a:pPr eaLnBrk="1" hangingPunct="1">
-              <a:buNone/>
-            </a:pPr>
-            <a:endParaRPr lang="en-US" sz="2000" dirty="0" smtClean="0"/>
-          </a:p>
-        </p:txBody>
-      </p:sp>
-      <p:sp>
-        <p:nvSpPr>
-          <p:cNvPr id="3074" name="Title 1"/>
-          <p:cNvSpPr>
-            <a:spLocks noGrp="1"/>
-          </p:cNvSpPr>
-          <p:nvPr>
-            <p:ph type="title"/>
-          </p:nvPr>
-        </p:nvSpPr>
-        <p:spPr bwMode="auto">
-          <a:noFill/>
-          <a:ln>
-            <a:miter lim="800000"/>
-            <a:headEnd/>
-            <a:tailEnd/>
-          </a:ln>
-        </p:spPr>
-        <p:txBody>
-          <a:bodyPr vert="horz" wrap="square" lIns="91440" tIns="45720" rIns="91440" bIns="45720" numCol="1" anchor="t" anchorCtr="0" compatLnSpc="1">
-            <a:prstTxWarp prst="textNoShape">
-              <a:avLst/>
-            </a:prstTxWarp>
-          </a:bodyPr>
-          <a:lstStyle/>
-          <a:p>
-            <a:pPr eaLnBrk="1" hangingPunct="1"/>
-            <a:endParaRPr lang="en-US" dirty="0" smtClean="0"/>
           </a:p>
         </p:txBody>
       </p:sp>
@@ -9068,6 +9450,96 @@
 </file>
 
 <file path=ppt/slides/slide26.xml><?xml version="1.0" encoding="utf-8"?>
+<p:sld xmlns:a="http://schemas.openxmlformats.org/drawingml/2006/main" xmlns:r="http://schemas.openxmlformats.org/officeDocument/2006/relationships" xmlns:p="http://schemas.openxmlformats.org/presentationml/2006/main">
+  <p:cSld>
+    <p:spTree>
+      <p:nvGrpSpPr>
+        <p:cNvPr id="1" name=""/>
+        <p:cNvGrpSpPr/>
+        <p:nvPr/>
+      </p:nvGrpSpPr>
+      <p:grpSpPr>
+        <a:xfrm>
+          <a:off x="0" y="0"/>
+          <a:ext cx="0" cy="0"/>
+          <a:chOff x="0" y="0"/>
+          <a:chExt cx="0" cy="0"/>
+        </a:xfrm>
+      </p:grpSpPr>
+      <p:sp>
+        <p:nvSpPr>
+          <p:cNvPr id="3075" name="Text Placeholder 2"/>
+          <p:cNvSpPr>
+            <a:spLocks noGrp="1"/>
+          </p:cNvSpPr>
+          <p:nvPr>
+            <p:ph type="body" sz="quarter" idx="10"/>
+          </p:nvPr>
+        </p:nvSpPr>
+        <p:spPr>
+          <a:xfrm>
+            <a:off x="685800" y="1066800"/>
+            <a:ext cx="8229600" cy="1219200"/>
+          </a:xfrm>
+        </p:spPr>
+        <p:txBody>
+          <a:bodyPr/>
+          <a:lstStyle/>
+          <a:p>
+            <a:pPr eaLnBrk="1" hangingPunct="1">
+              <a:buNone/>
+            </a:pPr>
+            <a:endParaRPr lang="en-US" sz="2000" dirty="0" smtClean="0"/>
+          </a:p>
+        </p:txBody>
+      </p:sp>
+      <p:sp>
+        <p:nvSpPr>
+          <p:cNvPr id="3074" name="Title 1"/>
+          <p:cNvSpPr>
+            <a:spLocks noGrp="1"/>
+          </p:cNvSpPr>
+          <p:nvPr>
+            <p:ph type="title"/>
+          </p:nvPr>
+        </p:nvSpPr>
+        <p:spPr bwMode="auto">
+          <a:noFill/>
+          <a:ln>
+            <a:miter lim="800000"/>
+            <a:headEnd/>
+            <a:tailEnd/>
+          </a:ln>
+        </p:spPr>
+        <p:txBody>
+          <a:bodyPr vert="horz" wrap="square" lIns="91440" tIns="45720" rIns="91440" bIns="45720" numCol="1" anchor="t" anchorCtr="0" compatLnSpc="1">
+            <a:prstTxWarp prst="textNoShape">
+              <a:avLst/>
+            </a:prstTxWarp>
+          </a:bodyPr>
+          <a:lstStyle/>
+          <a:p>
+            <a:pPr eaLnBrk="1" hangingPunct="1"/>
+            <a:endParaRPr lang="en-US" dirty="0" smtClean="0"/>
+          </a:p>
+        </p:txBody>
+      </p:sp>
+    </p:spTree>
+  </p:cSld>
+  <p:clrMapOvr>
+    <a:masterClrMapping/>
+  </p:clrMapOvr>
+  <p:timing>
+    <p:tnLst>
+      <p:par>
+        <p:cTn id="1" dur="indefinite" restart="never" nodeType="tmRoot"/>
+      </p:par>
+    </p:tnLst>
+  </p:timing>
+</p:sld>
+</file>
+
+<file path=ppt/slides/slide27.xml><?xml version="1.0" encoding="utf-8"?>
 <p:sld xmlns:a="http://schemas.openxmlformats.org/drawingml/2006/main" xmlns:r="http://schemas.openxmlformats.org/officeDocument/2006/relationships" xmlns:p="http://schemas.openxmlformats.org/presentationml/2006/main">
   <p:cSld>
     <p:spTree>
@@ -9416,96 +9888,6 @@
 </p:sld>
 </file>
 
-<file path=ppt/slides/slide27.xml><?xml version="1.0" encoding="utf-8"?>
-<p:sld xmlns:a="http://schemas.openxmlformats.org/drawingml/2006/main" xmlns:r="http://schemas.openxmlformats.org/officeDocument/2006/relationships" xmlns:p="http://schemas.openxmlformats.org/presentationml/2006/main">
-  <p:cSld>
-    <p:spTree>
-      <p:nvGrpSpPr>
-        <p:cNvPr id="1" name=""/>
-        <p:cNvGrpSpPr/>
-        <p:nvPr/>
-      </p:nvGrpSpPr>
-      <p:grpSpPr>
-        <a:xfrm>
-          <a:off x="0" y="0"/>
-          <a:ext cx="0" cy="0"/>
-          <a:chOff x="0" y="0"/>
-          <a:chExt cx="0" cy="0"/>
-        </a:xfrm>
-      </p:grpSpPr>
-      <p:sp>
-        <p:nvSpPr>
-          <p:cNvPr id="3075" name="Text Placeholder 2"/>
-          <p:cNvSpPr>
-            <a:spLocks noGrp="1"/>
-          </p:cNvSpPr>
-          <p:nvPr>
-            <p:ph type="body" sz="quarter" idx="10"/>
-          </p:nvPr>
-        </p:nvSpPr>
-        <p:spPr>
-          <a:xfrm>
-            <a:off x="685800" y="1066800"/>
-            <a:ext cx="8229600" cy="1219200"/>
-          </a:xfrm>
-        </p:spPr>
-        <p:txBody>
-          <a:bodyPr/>
-          <a:lstStyle/>
-          <a:p>
-            <a:pPr eaLnBrk="1" hangingPunct="1">
-              <a:buNone/>
-            </a:pPr>
-            <a:endParaRPr lang="en-US" sz="2000" dirty="0" smtClean="0"/>
-          </a:p>
-        </p:txBody>
-      </p:sp>
-      <p:sp>
-        <p:nvSpPr>
-          <p:cNvPr id="3074" name="Title 1"/>
-          <p:cNvSpPr>
-            <a:spLocks noGrp="1"/>
-          </p:cNvSpPr>
-          <p:nvPr>
-            <p:ph type="title"/>
-          </p:nvPr>
-        </p:nvSpPr>
-        <p:spPr bwMode="auto">
-          <a:noFill/>
-          <a:ln>
-            <a:miter lim="800000"/>
-            <a:headEnd/>
-            <a:tailEnd/>
-          </a:ln>
-        </p:spPr>
-        <p:txBody>
-          <a:bodyPr vert="horz" wrap="square" lIns="91440" tIns="45720" rIns="91440" bIns="45720" numCol="1" anchor="t" anchorCtr="0" compatLnSpc="1">
-            <a:prstTxWarp prst="textNoShape">
-              <a:avLst/>
-            </a:prstTxWarp>
-          </a:bodyPr>
-          <a:lstStyle/>
-          <a:p>
-            <a:pPr eaLnBrk="1" hangingPunct="1"/>
-            <a:endParaRPr lang="en-US" dirty="0" smtClean="0"/>
-          </a:p>
-        </p:txBody>
-      </p:sp>
-    </p:spTree>
-  </p:cSld>
-  <p:clrMapOvr>
-    <a:masterClrMapping/>
-  </p:clrMapOvr>
-  <p:timing>
-    <p:tnLst>
-      <p:par>
-        <p:cTn id="1" dur="indefinite" restart="never" nodeType="tmRoot"/>
-      </p:par>
-    </p:tnLst>
-  </p:timing>
-</p:sld>
-</file>
-
 <file path=ppt/slides/slide28.xml><?xml version="1.0" encoding="utf-8"?>
 <p:sld xmlns:a="http://schemas.openxmlformats.org/drawingml/2006/main" xmlns:r="http://schemas.openxmlformats.org/officeDocument/2006/relationships" xmlns:p="http://schemas.openxmlformats.org/presentationml/2006/main">
   <p:cSld>
@@ -9615,118 +9997,42 @@
       </p:grpSpPr>
       <p:sp>
         <p:nvSpPr>
-          <p:cNvPr id="6" name="Rectangle 5"/>
-          <p:cNvSpPr/>
-          <p:nvPr/>
+          <p:cNvPr id="3075" name="Text Placeholder 2"/>
+          <p:cNvSpPr>
+            <a:spLocks noGrp="1"/>
+          </p:cNvSpPr>
+          <p:nvPr>
+            <p:ph type="body" sz="quarter" idx="10"/>
+          </p:nvPr>
         </p:nvSpPr>
         <p:spPr>
           <a:xfrm>
-            <a:off x="0" y="0"/>
-            <a:ext cx="9144000" cy="4648200"/>
+            <a:off x="685800" y="1066800"/>
+            <a:ext cx="8229600" cy="1219200"/>
           </a:xfrm>
-          <a:prstGeom prst="rect">
-            <a:avLst/>
-          </a:prstGeom>
-          <a:solidFill>
-            <a:srgbClr val="0069AA"/>
-          </a:solidFill>
-          <a:ln>
-            <a:noFill/>
-          </a:ln>
         </p:spPr>
-        <p:style>
-          <a:lnRef idx="2">
-            <a:schemeClr val="accent1">
-              <a:shade val="50000"/>
-            </a:schemeClr>
-          </a:lnRef>
-          <a:fillRef idx="1">
-            <a:schemeClr val="accent1"/>
-          </a:fillRef>
-          <a:effectRef idx="0">
-            <a:schemeClr val="accent1"/>
-          </a:effectRef>
-          <a:fontRef idx="minor">
-            <a:schemeClr val="lt1"/>
-          </a:fontRef>
-        </p:style>
-        <p:txBody>
-          <a:bodyPr anchor="ctr"/>
+        <p:txBody>
+          <a:bodyPr/>
           <a:lstStyle/>
           <a:p>
-            <a:pPr algn="ctr">
-              <a:defRPr/>
+            <a:pPr eaLnBrk="1" hangingPunct="1">
+              <a:buNone/>
             </a:pPr>
-            <a:endParaRPr lang="en-US"/>
-          </a:p>
-        </p:txBody>
-      </p:sp>
-      <p:sp>
-        <p:nvSpPr>
-          <p:cNvPr id="8" name="Rectangle 7"/>
-          <p:cNvSpPr/>
-          <p:nvPr/>
-        </p:nvSpPr>
-        <p:spPr>
-          <a:xfrm>
-            <a:off x="228600" y="0"/>
-            <a:ext cx="104775" cy="3581400"/>
-          </a:xfrm>
-          <a:prstGeom prst="rect">
-            <a:avLst/>
-          </a:prstGeom>
-          <a:solidFill>
-            <a:srgbClr val="E31937"/>
-          </a:solidFill>
-          <a:ln>
-            <a:noFill/>
-          </a:ln>
-        </p:spPr>
-        <p:style>
-          <a:lnRef idx="2">
-            <a:schemeClr val="accent1">
-              <a:shade val="50000"/>
-            </a:schemeClr>
-          </a:lnRef>
-          <a:fillRef idx="1">
-            <a:schemeClr val="accent1"/>
-          </a:fillRef>
-          <a:effectRef idx="0">
-            <a:schemeClr val="accent1"/>
-          </a:effectRef>
-          <a:fontRef idx="minor">
-            <a:schemeClr val="lt1"/>
-          </a:fontRef>
-        </p:style>
-        <p:txBody>
-          <a:bodyPr anchor="ctr"/>
-          <a:lstStyle/>
-          <a:p>
-            <a:pPr algn="ctr">
-              <a:defRPr/>
-            </a:pPr>
-            <a:endParaRPr lang="en-US"/>
-          </a:p>
-        </p:txBody>
-      </p:sp>
-      <p:sp>
-        <p:nvSpPr>
-          <p:cNvPr id="5127" name="Rectangle 8"/>
+            <a:endParaRPr lang="en-US" sz="2000" dirty="0" smtClean="0"/>
+          </a:p>
+        </p:txBody>
+      </p:sp>
+      <p:sp>
+        <p:nvSpPr>
+          <p:cNvPr id="3074" name="Title 1"/>
           <p:cNvSpPr>
-            <a:spLocks noGrp="1" noChangeArrowheads="1"/>
+            <a:spLocks noGrp="1"/>
           </p:cNvSpPr>
           <p:nvPr>
-            <p:ph type="title" idx="4294967295"/>
+            <p:ph type="title"/>
           </p:nvPr>
         </p:nvSpPr>
         <p:spPr bwMode="auto">
-          <a:xfrm>
-            <a:off x="495300" y="200025"/>
-            <a:ext cx="8420100" cy="919163"/>
-          </a:xfrm>
-          <a:prstGeom prst="rect">
-            <a:avLst/>
-          </a:prstGeom>
           <a:noFill/>
           <a:ln>
             <a:miter lim="800000"/>
@@ -9735,398 +10041,18 @@
           </a:ln>
         </p:spPr>
         <p:txBody>
-          <a:bodyPr/>
-          <a:lstStyle/>
-          <a:p>
-            <a:pPr eaLnBrk="1" hangingPunct="1"/>
-            <a:r>
-              <a:rPr lang="en-US" dirty="0" smtClean="0">
-                <a:solidFill>
-                  <a:schemeClr val="bg1"/>
-                </a:solidFill>
-              </a:rPr>
-              <a:t>Additional Resources</a:t>
-            </a:r>
-          </a:p>
-        </p:txBody>
-      </p:sp>
-      <p:sp>
-        <p:nvSpPr>
-          <p:cNvPr id="5128" name="Rectangle 9"/>
-          <p:cNvSpPr>
-            <a:spLocks noGrp="1" noChangeArrowheads="1"/>
-          </p:cNvSpPr>
-          <p:nvPr>
-            <p:ph idx="4294967295"/>
-          </p:nvPr>
-        </p:nvSpPr>
-        <p:spPr>
-          <a:xfrm>
-            <a:off x="514350" y="1143000"/>
-            <a:ext cx="8229600" cy="3429000"/>
-          </a:xfrm>
-        </p:spPr>
-        <p:txBody>
-          <a:bodyPr/>
-          <a:lstStyle/>
-          <a:p>
-            <a:pPr eaLnBrk="1" hangingPunct="1">
-              <a:lnSpc>
-                <a:spcPct val="80000"/>
-              </a:lnSpc>
-              <a:buNone/>
-            </a:pPr>
-            <a:r>
-              <a:rPr lang="en-US" sz="2000" dirty="0" smtClean="0">
-                <a:solidFill>
-                  <a:schemeClr val="bg1"/>
-                </a:solidFill>
-              </a:rPr>
-              <a:t>Command Pattern</a:t>
-            </a:r>
-          </a:p>
-          <a:p>
-            <a:pPr eaLnBrk="1" hangingPunct="1">
-              <a:lnSpc>
-                <a:spcPct val="80000"/>
-              </a:lnSpc>
-              <a:buNone/>
-            </a:pPr>
-            <a:r>
-              <a:rPr lang="en-US" sz="2000" dirty="0" smtClean="0">
-                <a:solidFill>
-                  <a:schemeClr val="bg1"/>
-                </a:solidFill>
-              </a:rPr>
-              <a:t>	http://www.lostechies.com/blogs/derickbailey/archive/2008/11/19/ptom-command-and-conquer-your-ui-coupling-problems.aspx </a:t>
-            </a:r>
-            <a:br>
-              <a:rPr lang="en-US" sz="2000" dirty="0" smtClean="0">
-                <a:solidFill>
-                  <a:schemeClr val="bg1"/>
-                </a:solidFill>
-              </a:rPr>
-            </a:br>
-            <a:endParaRPr lang="en-US" sz="2000" dirty="0" smtClean="0">
-              <a:solidFill>
-                <a:schemeClr val="bg1"/>
-              </a:solidFill>
-            </a:endParaRPr>
-          </a:p>
-          <a:p>
-            <a:pPr eaLnBrk="1" hangingPunct="1">
-              <a:lnSpc>
-                <a:spcPct val="80000"/>
-              </a:lnSpc>
-              <a:buNone/>
-            </a:pPr>
-            <a:r>
-              <a:rPr lang="en-US" sz="2000" dirty="0" smtClean="0">
-                <a:solidFill>
-                  <a:schemeClr val="bg1"/>
-                </a:solidFill>
-              </a:rPr>
-              <a:t>Event Aggregator</a:t>
-            </a:r>
-            <a:br>
-              <a:rPr lang="en-US" sz="2000" dirty="0" smtClean="0">
-                <a:solidFill>
-                  <a:schemeClr val="bg1"/>
-                </a:solidFill>
-              </a:rPr>
-            </a:br>
-            <a:r>
-              <a:rPr lang="en-US" sz="2000" dirty="0" smtClean="0">
-                <a:solidFill>
-                  <a:schemeClr val="bg1"/>
-                </a:solidFill>
-              </a:rPr>
-              <a:t>http://www.martinfowler.com/eaaDev/EventAggregator.html</a:t>
-            </a:r>
-            <a:br>
-              <a:rPr lang="en-US" sz="2000" dirty="0" smtClean="0">
-                <a:solidFill>
-                  <a:schemeClr val="bg1"/>
-                </a:solidFill>
-              </a:rPr>
-            </a:br>
-            <a:endParaRPr lang="en-US" sz="2000" dirty="0" smtClean="0">
-              <a:solidFill>
-                <a:schemeClr val="bg1"/>
-              </a:solidFill>
-            </a:endParaRPr>
-          </a:p>
-          <a:p>
-            <a:pPr eaLnBrk="1" hangingPunct="1">
-              <a:lnSpc>
-                <a:spcPct val="80000"/>
-              </a:lnSpc>
-              <a:buNone/>
-            </a:pPr>
-            <a:r>
-              <a:rPr lang="en-US" sz="2000" dirty="0" err="1" smtClean="0">
-                <a:solidFill>
-                  <a:schemeClr val="bg1"/>
-                </a:solidFill>
-              </a:rPr>
-              <a:t>IoC</a:t>
-            </a:r>
-            <a:r>
-              <a:rPr lang="en-US" sz="2000" dirty="0" smtClean="0">
-                <a:solidFill>
-                  <a:schemeClr val="bg1"/>
-                </a:solidFill>
-              </a:rPr>
-              <a:t> Container (</a:t>
-            </a:r>
-            <a:r>
-              <a:rPr lang="en-US" sz="2000" dirty="0" err="1" smtClean="0">
-                <a:solidFill>
-                  <a:schemeClr val="bg1"/>
-                </a:solidFill>
-              </a:rPr>
-              <a:t>StructureMap</a:t>
-            </a:r>
-            <a:r>
-              <a:rPr lang="en-US" sz="2000" dirty="0" smtClean="0">
-                <a:solidFill>
-                  <a:schemeClr val="bg1"/>
-                </a:solidFill>
-              </a:rPr>
-              <a:t>)</a:t>
-            </a:r>
-          </a:p>
-          <a:p>
-            <a:pPr eaLnBrk="1" hangingPunct="1">
-              <a:lnSpc>
-                <a:spcPct val="80000"/>
-              </a:lnSpc>
-              <a:buNone/>
-            </a:pPr>
-            <a:r>
-              <a:rPr lang="en-US" sz="2000" dirty="0" smtClean="0">
-                <a:solidFill>
-                  <a:schemeClr val="bg1"/>
-                </a:solidFill>
-              </a:rPr>
-              <a:t>	http://structuremap.sourceforge.net</a:t>
-            </a:r>
-            <a:br>
-              <a:rPr lang="en-US" sz="2000" dirty="0" smtClean="0">
-                <a:solidFill>
-                  <a:schemeClr val="bg1"/>
-                </a:solidFill>
-              </a:rPr>
-            </a:br>
-            <a:endParaRPr lang="en-US" sz="2000" dirty="0" smtClean="0">
-              <a:solidFill>
-                <a:schemeClr val="bg1"/>
-              </a:solidFill>
-            </a:endParaRPr>
-          </a:p>
-          <a:p>
-            <a:pPr eaLnBrk="1" hangingPunct="1">
-              <a:lnSpc>
-                <a:spcPct val="80000"/>
-              </a:lnSpc>
-              <a:buNone/>
-            </a:pPr>
-            <a:r>
-              <a:rPr lang="en-US" sz="2000" dirty="0" smtClean="0">
-                <a:solidFill>
-                  <a:schemeClr val="bg1"/>
-                </a:solidFill>
-              </a:rPr>
-              <a:t>Application Controller</a:t>
-            </a:r>
-          </a:p>
-          <a:p>
-            <a:pPr eaLnBrk="1" hangingPunct="1">
-              <a:lnSpc>
-                <a:spcPct val="80000"/>
-              </a:lnSpc>
-              <a:buNone/>
-            </a:pPr>
-            <a:r>
-              <a:rPr lang="en-US" sz="2000" dirty="0" smtClean="0">
-                <a:solidFill>
-                  <a:schemeClr val="bg1"/>
-                </a:solidFill>
-              </a:rPr>
-              <a:t>	http://www.martinfowler.com/eaaCatalog/applicationController.html</a:t>
-            </a:r>
-            <a:br>
-              <a:rPr lang="en-US" sz="2000" dirty="0" smtClean="0">
-                <a:solidFill>
-                  <a:schemeClr val="bg1"/>
-                </a:solidFill>
-              </a:rPr>
-            </a:br>
-            <a:endParaRPr lang="en-US" sz="2000" dirty="0" smtClean="0">
-              <a:solidFill>
-                <a:schemeClr val="bg1"/>
-              </a:solidFill>
-            </a:endParaRPr>
-          </a:p>
-        </p:txBody>
-      </p:sp>
-      <p:sp>
-        <p:nvSpPr>
-          <p:cNvPr id="5129" name="Text Box 7"/>
-          <p:cNvSpPr txBox="1">
-            <a:spLocks noChangeArrowheads="1"/>
-          </p:cNvSpPr>
-          <p:nvPr/>
-        </p:nvSpPr>
-        <p:spPr bwMode="auto">
-          <a:xfrm>
-            <a:off x="5470525" y="1331913"/>
-            <a:ext cx="184150" cy="366712"/>
-          </a:xfrm>
-          <a:prstGeom prst="rect">
-            <a:avLst/>
-          </a:prstGeom>
-          <a:noFill/>
-          <a:ln w="9525">
-            <a:noFill/>
-            <a:miter lim="800000"/>
-            <a:headEnd/>
-            <a:tailEnd/>
-          </a:ln>
-        </p:spPr>
-        <p:txBody>
-          <a:bodyPr wrap="none">
-            <a:spAutoFit/>
+          <a:bodyPr vert="horz" wrap="square" lIns="91440" tIns="45720" rIns="91440" bIns="45720" numCol="1" anchor="t" anchorCtr="0" compatLnSpc="1">
+            <a:prstTxWarp prst="textNoShape">
+              <a:avLst/>
+            </a:prstTxWarp>
           </a:bodyPr>
           <a:lstStyle/>
           <a:p>
-            <a:endParaRPr lang="en-US"/>
-          </a:p>
-        </p:txBody>
-      </p:sp>
-      <p:pic>
-        <p:nvPicPr>
-          <p:cNvPr id="16" name="Picture 4" descr="MAT logo 1 CMYK"/>
-          <p:cNvPicPr>
-            <a:picLocks noChangeAspect="1" noChangeArrowheads="1"/>
-          </p:cNvPicPr>
-          <p:nvPr/>
-        </p:nvPicPr>
-        <p:blipFill>
-          <a:blip r:embed="rId2">
-            <a:clrChange>
-              <a:clrFrom>
-                <a:srgbClr val="FDFDFD"/>
-              </a:clrFrom>
-              <a:clrTo>
-                <a:srgbClr val="FDFDFD">
-                  <a:alpha val="0"/>
-                </a:srgbClr>
-              </a:clrTo>
-            </a:clrChange>
-          </a:blip>
-          <a:srcRect/>
-          <a:stretch>
-            <a:fillRect/>
-          </a:stretch>
-        </p:blipFill>
-        <p:spPr bwMode="auto">
-          <a:xfrm>
-            <a:off x="2971800" y="4800600"/>
-            <a:ext cx="2819400" cy="1338263"/>
-          </a:xfrm>
-          <a:prstGeom prst="rect">
-            <a:avLst/>
-          </a:prstGeom>
-          <a:noFill/>
-          <a:ln w="9525">
-            <a:noFill/>
-            <a:miter lim="800000"/>
-            <a:headEnd/>
-            <a:tailEnd/>
-          </a:ln>
-        </p:spPr>
-      </p:pic>
-      <p:sp>
-        <p:nvSpPr>
-          <p:cNvPr id="17" name="Rectangle 16"/>
-          <p:cNvSpPr/>
-          <p:nvPr/>
-        </p:nvSpPr>
-        <p:spPr>
-          <a:xfrm>
-            <a:off x="0" y="4724400"/>
-            <a:ext cx="9144000" cy="2133600"/>
-          </a:xfrm>
-          <a:prstGeom prst="rect">
-            <a:avLst/>
-          </a:prstGeom>
-          <a:solidFill>
-            <a:srgbClr val="E31937"/>
-          </a:solidFill>
-          <a:ln>
-            <a:noFill/>
-          </a:ln>
-        </p:spPr>
-        <p:style>
-          <a:lnRef idx="2">
-            <a:schemeClr val="accent1">
-              <a:shade val="50000"/>
-            </a:schemeClr>
-          </a:lnRef>
-          <a:fillRef idx="1">
-            <a:schemeClr val="accent1"/>
-          </a:fillRef>
-          <a:effectRef idx="0">
-            <a:schemeClr val="accent1"/>
-          </a:effectRef>
-          <a:fontRef idx="minor">
-            <a:schemeClr val="lt1"/>
-          </a:fontRef>
-        </p:style>
-        <p:txBody>
-          <a:bodyPr anchor="ctr"/>
-          <a:lstStyle/>
-          <a:p>
-            <a:pPr algn="ctr">
-              <a:defRPr/>
-            </a:pPr>
-            <a:endParaRPr lang="en-US"/>
-          </a:p>
-        </p:txBody>
-      </p:sp>
-      <p:pic>
-        <p:nvPicPr>
-          <p:cNvPr id="18" name="Picture 7" descr="MAT logo vertical_red.emf"/>
-          <p:cNvPicPr>
-            <a:picLocks noChangeAspect="1"/>
-          </p:cNvPicPr>
-          <p:nvPr/>
-        </p:nvPicPr>
-        <p:blipFill>
-          <a:blip r:embed="rId3"/>
-          <a:srcRect/>
-          <a:stretch>
-            <a:fillRect/>
-          </a:stretch>
-        </p:blipFill>
-        <p:spPr bwMode="auto">
-          <a:xfrm>
-            <a:off x="3600450" y="5334000"/>
-            <a:ext cx="1981200" cy="969963"/>
-          </a:xfrm>
-          <a:prstGeom prst="rect">
-            <a:avLst/>
-          </a:prstGeom>
-          <a:noFill/>
-          <a:ln w="9525">
-            <a:noFill/>
-            <a:miter lim="800000"/>
-            <a:headEnd/>
-            <a:tailEnd/>
-          </a:ln>
-        </p:spPr>
-      </p:pic>
+            <a:pPr eaLnBrk="1" hangingPunct="1"/>
+            <a:endParaRPr lang="en-US" dirty="0" smtClean="0"/>
+          </a:p>
+        </p:txBody>
+      </p:sp>
     </p:spTree>
   </p:cSld>
   <p:clrMapOvr>
@@ -10288,6 +10214,552 @@
 </file>
 
 <file path=ppt/slides/slide30.xml><?xml version="1.0" encoding="utf-8"?>
+<p:sld xmlns:a="http://schemas.openxmlformats.org/drawingml/2006/main" xmlns:r="http://schemas.openxmlformats.org/officeDocument/2006/relationships" xmlns:p="http://schemas.openxmlformats.org/presentationml/2006/main">
+  <p:cSld>
+    <p:spTree>
+      <p:nvGrpSpPr>
+        <p:cNvPr id="1" name=""/>
+        <p:cNvGrpSpPr/>
+        <p:nvPr/>
+      </p:nvGrpSpPr>
+      <p:grpSpPr>
+        <a:xfrm>
+          <a:off x="0" y="0"/>
+          <a:ext cx="0" cy="0"/>
+          <a:chOff x="0" y="0"/>
+          <a:chExt cx="0" cy="0"/>
+        </a:xfrm>
+      </p:grpSpPr>
+      <p:sp>
+        <p:nvSpPr>
+          <p:cNvPr id="6" name="Rectangle 5"/>
+          <p:cNvSpPr/>
+          <p:nvPr/>
+        </p:nvSpPr>
+        <p:spPr>
+          <a:xfrm>
+            <a:off x="0" y="0"/>
+            <a:ext cx="9144000" cy="4648200"/>
+          </a:xfrm>
+          <a:prstGeom prst="rect">
+            <a:avLst/>
+          </a:prstGeom>
+          <a:solidFill>
+            <a:srgbClr val="0069AA"/>
+          </a:solidFill>
+          <a:ln>
+            <a:noFill/>
+          </a:ln>
+        </p:spPr>
+        <p:style>
+          <a:lnRef idx="2">
+            <a:schemeClr val="accent1">
+              <a:shade val="50000"/>
+            </a:schemeClr>
+          </a:lnRef>
+          <a:fillRef idx="1">
+            <a:schemeClr val="accent1"/>
+          </a:fillRef>
+          <a:effectRef idx="0">
+            <a:schemeClr val="accent1"/>
+          </a:effectRef>
+          <a:fontRef idx="minor">
+            <a:schemeClr val="lt1"/>
+          </a:fontRef>
+        </p:style>
+        <p:txBody>
+          <a:bodyPr anchor="ctr"/>
+          <a:lstStyle/>
+          <a:p>
+            <a:pPr algn="ctr">
+              <a:defRPr/>
+            </a:pPr>
+            <a:endParaRPr lang="en-US"/>
+          </a:p>
+        </p:txBody>
+      </p:sp>
+      <p:sp>
+        <p:nvSpPr>
+          <p:cNvPr id="8" name="Rectangle 7"/>
+          <p:cNvSpPr/>
+          <p:nvPr/>
+        </p:nvSpPr>
+        <p:spPr>
+          <a:xfrm>
+            <a:off x="228600" y="0"/>
+            <a:ext cx="104775" cy="3581400"/>
+          </a:xfrm>
+          <a:prstGeom prst="rect">
+            <a:avLst/>
+          </a:prstGeom>
+          <a:solidFill>
+            <a:srgbClr val="E31937"/>
+          </a:solidFill>
+          <a:ln>
+            <a:noFill/>
+          </a:ln>
+        </p:spPr>
+        <p:style>
+          <a:lnRef idx="2">
+            <a:schemeClr val="accent1">
+              <a:shade val="50000"/>
+            </a:schemeClr>
+          </a:lnRef>
+          <a:fillRef idx="1">
+            <a:schemeClr val="accent1"/>
+          </a:fillRef>
+          <a:effectRef idx="0">
+            <a:schemeClr val="accent1"/>
+          </a:effectRef>
+          <a:fontRef idx="minor">
+            <a:schemeClr val="lt1"/>
+          </a:fontRef>
+        </p:style>
+        <p:txBody>
+          <a:bodyPr anchor="ctr"/>
+          <a:lstStyle/>
+          <a:p>
+            <a:pPr algn="ctr">
+              <a:defRPr/>
+            </a:pPr>
+            <a:endParaRPr lang="en-US"/>
+          </a:p>
+        </p:txBody>
+      </p:sp>
+      <p:sp>
+        <p:nvSpPr>
+          <p:cNvPr id="5127" name="Rectangle 8"/>
+          <p:cNvSpPr>
+            <a:spLocks noGrp="1" noChangeArrowheads="1"/>
+          </p:cNvSpPr>
+          <p:nvPr>
+            <p:ph type="title" idx="4294967295"/>
+          </p:nvPr>
+        </p:nvSpPr>
+        <p:spPr bwMode="auto">
+          <a:xfrm>
+            <a:off x="495300" y="200025"/>
+            <a:ext cx="8420100" cy="919163"/>
+          </a:xfrm>
+          <a:prstGeom prst="rect">
+            <a:avLst/>
+          </a:prstGeom>
+          <a:noFill/>
+          <a:ln>
+            <a:miter lim="800000"/>
+            <a:headEnd/>
+            <a:tailEnd/>
+          </a:ln>
+        </p:spPr>
+        <p:txBody>
+          <a:bodyPr/>
+          <a:lstStyle/>
+          <a:p>
+            <a:pPr eaLnBrk="1" hangingPunct="1"/>
+            <a:r>
+              <a:rPr lang="en-US" dirty="0" smtClean="0">
+                <a:solidFill>
+                  <a:schemeClr val="bg1"/>
+                </a:solidFill>
+              </a:rPr>
+              <a:t>Additional Resources</a:t>
+            </a:r>
+          </a:p>
+        </p:txBody>
+      </p:sp>
+      <p:sp>
+        <p:nvSpPr>
+          <p:cNvPr id="5128" name="Rectangle 9"/>
+          <p:cNvSpPr>
+            <a:spLocks noGrp="1" noChangeArrowheads="1"/>
+          </p:cNvSpPr>
+          <p:nvPr>
+            <p:ph idx="4294967295"/>
+          </p:nvPr>
+        </p:nvSpPr>
+        <p:spPr>
+          <a:xfrm>
+            <a:off x="514350" y="1143000"/>
+            <a:ext cx="8229600" cy="3429000"/>
+          </a:xfrm>
+        </p:spPr>
+        <p:txBody>
+          <a:bodyPr/>
+          <a:lstStyle/>
+          <a:p>
+            <a:pPr eaLnBrk="1" hangingPunct="1">
+              <a:lnSpc>
+                <a:spcPct val="80000"/>
+              </a:lnSpc>
+              <a:buNone/>
+            </a:pPr>
+            <a:r>
+              <a:rPr lang="en-US" sz="2000" dirty="0" smtClean="0">
+                <a:solidFill>
+                  <a:schemeClr val="bg1"/>
+                </a:solidFill>
+              </a:rPr>
+              <a:t>Command Pattern</a:t>
+            </a:r>
+          </a:p>
+          <a:p>
+            <a:pPr eaLnBrk="1" hangingPunct="1">
+              <a:lnSpc>
+                <a:spcPct val="80000"/>
+              </a:lnSpc>
+              <a:buNone/>
+            </a:pPr>
+            <a:r>
+              <a:rPr lang="en-US" sz="2000" dirty="0" smtClean="0">
+                <a:solidFill>
+                  <a:schemeClr val="bg1"/>
+                </a:solidFill>
+              </a:rPr>
+              <a:t>	http://www.lostechies.com/blogs/derickbailey/archive/2008/11/19/ptom-command-and-conquer-your-ui-coupling-problems.aspx </a:t>
+            </a:r>
+            <a:br>
+              <a:rPr lang="en-US" sz="2000" dirty="0" smtClean="0">
+                <a:solidFill>
+                  <a:schemeClr val="bg1"/>
+                </a:solidFill>
+              </a:rPr>
+            </a:br>
+            <a:endParaRPr lang="en-US" sz="2000" dirty="0" smtClean="0">
+              <a:solidFill>
+                <a:schemeClr val="bg1"/>
+              </a:solidFill>
+            </a:endParaRPr>
+          </a:p>
+          <a:p>
+            <a:pPr eaLnBrk="1" hangingPunct="1">
+              <a:lnSpc>
+                <a:spcPct val="80000"/>
+              </a:lnSpc>
+              <a:buNone/>
+            </a:pPr>
+            <a:r>
+              <a:rPr lang="en-US" sz="2000" dirty="0" smtClean="0">
+                <a:solidFill>
+                  <a:schemeClr val="bg1"/>
+                </a:solidFill>
+              </a:rPr>
+              <a:t>Event Aggregator</a:t>
+            </a:r>
+            <a:br>
+              <a:rPr lang="en-US" sz="2000" dirty="0" smtClean="0">
+                <a:solidFill>
+                  <a:schemeClr val="bg1"/>
+                </a:solidFill>
+              </a:rPr>
+            </a:br>
+            <a:r>
+              <a:rPr lang="en-US" sz="2000" dirty="0" smtClean="0">
+                <a:solidFill>
+                  <a:schemeClr val="bg1"/>
+                </a:solidFill>
+              </a:rPr>
+              <a:t>http://www.martinfowler.com/eaaDev/EventAggregator.html</a:t>
+            </a:r>
+            <a:br>
+              <a:rPr lang="en-US" sz="2000" dirty="0" smtClean="0">
+                <a:solidFill>
+                  <a:schemeClr val="bg1"/>
+                </a:solidFill>
+              </a:rPr>
+            </a:br>
+            <a:endParaRPr lang="en-US" sz="2000" dirty="0" smtClean="0">
+              <a:solidFill>
+                <a:schemeClr val="bg1"/>
+              </a:solidFill>
+            </a:endParaRPr>
+          </a:p>
+          <a:p>
+            <a:pPr eaLnBrk="1" hangingPunct="1">
+              <a:lnSpc>
+                <a:spcPct val="80000"/>
+              </a:lnSpc>
+              <a:buNone/>
+            </a:pPr>
+            <a:r>
+              <a:rPr lang="en-US" sz="2000" dirty="0" err="1" smtClean="0">
+                <a:solidFill>
+                  <a:schemeClr val="bg1"/>
+                </a:solidFill>
+              </a:rPr>
+              <a:t>IoC</a:t>
+            </a:r>
+            <a:r>
+              <a:rPr lang="en-US" sz="2000" dirty="0" smtClean="0">
+                <a:solidFill>
+                  <a:schemeClr val="bg1"/>
+                </a:solidFill>
+              </a:rPr>
+              <a:t> Container (</a:t>
+            </a:r>
+            <a:r>
+              <a:rPr lang="en-US" sz="2000" dirty="0" err="1" smtClean="0">
+                <a:solidFill>
+                  <a:schemeClr val="bg1"/>
+                </a:solidFill>
+              </a:rPr>
+              <a:t>StructureMap</a:t>
+            </a:r>
+            <a:r>
+              <a:rPr lang="en-US" sz="2000" dirty="0" smtClean="0">
+                <a:solidFill>
+                  <a:schemeClr val="bg1"/>
+                </a:solidFill>
+              </a:rPr>
+              <a:t>)</a:t>
+            </a:r>
+          </a:p>
+          <a:p>
+            <a:pPr eaLnBrk="1" hangingPunct="1">
+              <a:lnSpc>
+                <a:spcPct val="80000"/>
+              </a:lnSpc>
+              <a:buNone/>
+            </a:pPr>
+            <a:r>
+              <a:rPr lang="en-US" sz="2000" dirty="0" smtClean="0">
+                <a:solidFill>
+                  <a:schemeClr val="bg1"/>
+                </a:solidFill>
+              </a:rPr>
+              <a:t>	http://structuremap.sourceforge.net</a:t>
+            </a:r>
+            <a:br>
+              <a:rPr lang="en-US" sz="2000" dirty="0" smtClean="0">
+                <a:solidFill>
+                  <a:schemeClr val="bg1"/>
+                </a:solidFill>
+              </a:rPr>
+            </a:br>
+            <a:endParaRPr lang="en-US" sz="2000" dirty="0" smtClean="0">
+              <a:solidFill>
+                <a:schemeClr val="bg1"/>
+              </a:solidFill>
+            </a:endParaRPr>
+          </a:p>
+          <a:p>
+            <a:pPr eaLnBrk="1" hangingPunct="1">
+              <a:lnSpc>
+                <a:spcPct val="80000"/>
+              </a:lnSpc>
+              <a:buNone/>
+            </a:pPr>
+            <a:r>
+              <a:rPr lang="en-US" sz="2000" dirty="0" smtClean="0">
+                <a:solidFill>
+                  <a:schemeClr val="bg1"/>
+                </a:solidFill>
+              </a:rPr>
+              <a:t>Application Controller</a:t>
+            </a:r>
+          </a:p>
+          <a:p>
+            <a:pPr eaLnBrk="1" hangingPunct="1">
+              <a:lnSpc>
+                <a:spcPct val="80000"/>
+              </a:lnSpc>
+              <a:buNone/>
+            </a:pPr>
+            <a:r>
+              <a:rPr lang="en-US" sz="2000" dirty="0" smtClean="0">
+                <a:solidFill>
+                  <a:schemeClr val="bg1"/>
+                </a:solidFill>
+              </a:rPr>
+              <a:t>	http://www.martinfowler.com/eaaCatalog/applicationController.html</a:t>
+            </a:r>
+            <a:br>
+              <a:rPr lang="en-US" sz="2000" dirty="0" smtClean="0">
+                <a:solidFill>
+                  <a:schemeClr val="bg1"/>
+                </a:solidFill>
+              </a:rPr>
+            </a:br>
+            <a:endParaRPr lang="en-US" sz="2000" dirty="0" smtClean="0">
+              <a:solidFill>
+                <a:schemeClr val="bg1"/>
+              </a:solidFill>
+            </a:endParaRPr>
+          </a:p>
+        </p:txBody>
+      </p:sp>
+      <p:sp>
+        <p:nvSpPr>
+          <p:cNvPr id="5129" name="Text Box 7"/>
+          <p:cNvSpPr txBox="1">
+            <a:spLocks noChangeArrowheads="1"/>
+          </p:cNvSpPr>
+          <p:nvPr/>
+        </p:nvSpPr>
+        <p:spPr bwMode="auto">
+          <a:xfrm>
+            <a:off x="5470525" y="1331913"/>
+            <a:ext cx="184150" cy="366712"/>
+          </a:xfrm>
+          <a:prstGeom prst="rect">
+            <a:avLst/>
+          </a:prstGeom>
+          <a:noFill/>
+          <a:ln w="9525">
+            <a:noFill/>
+            <a:miter lim="800000"/>
+            <a:headEnd/>
+            <a:tailEnd/>
+          </a:ln>
+        </p:spPr>
+        <p:txBody>
+          <a:bodyPr wrap="none">
+            <a:spAutoFit/>
+          </a:bodyPr>
+          <a:lstStyle/>
+          <a:p>
+            <a:endParaRPr lang="en-US"/>
+          </a:p>
+        </p:txBody>
+      </p:sp>
+      <p:pic>
+        <p:nvPicPr>
+          <p:cNvPr id="16" name="Picture 4" descr="MAT logo 1 CMYK"/>
+          <p:cNvPicPr>
+            <a:picLocks noChangeAspect="1" noChangeArrowheads="1"/>
+          </p:cNvPicPr>
+          <p:nvPr/>
+        </p:nvPicPr>
+        <p:blipFill>
+          <a:blip r:embed="rId2">
+            <a:clrChange>
+              <a:clrFrom>
+                <a:srgbClr val="FDFDFD"/>
+              </a:clrFrom>
+              <a:clrTo>
+                <a:srgbClr val="FDFDFD">
+                  <a:alpha val="0"/>
+                </a:srgbClr>
+              </a:clrTo>
+            </a:clrChange>
+          </a:blip>
+          <a:srcRect/>
+          <a:stretch>
+            <a:fillRect/>
+          </a:stretch>
+        </p:blipFill>
+        <p:spPr bwMode="auto">
+          <a:xfrm>
+            <a:off x="2971800" y="4800600"/>
+            <a:ext cx="2819400" cy="1338263"/>
+          </a:xfrm>
+          <a:prstGeom prst="rect">
+            <a:avLst/>
+          </a:prstGeom>
+          <a:noFill/>
+          <a:ln w="9525">
+            <a:noFill/>
+            <a:miter lim="800000"/>
+            <a:headEnd/>
+            <a:tailEnd/>
+          </a:ln>
+        </p:spPr>
+      </p:pic>
+      <p:sp>
+        <p:nvSpPr>
+          <p:cNvPr id="17" name="Rectangle 16"/>
+          <p:cNvSpPr/>
+          <p:nvPr/>
+        </p:nvSpPr>
+        <p:spPr>
+          <a:xfrm>
+            <a:off x="0" y="4724400"/>
+            <a:ext cx="9144000" cy="2133600"/>
+          </a:xfrm>
+          <a:prstGeom prst="rect">
+            <a:avLst/>
+          </a:prstGeom>
+          <a:solidFill>
+            <a:srgbClr val="E31937"/>
+          </a:solidFill>
+          <a:ln>
+            <a:noFill/>
+          </a:ln>
+        </p:spPr>
+        <p:style>
+          <a:lnRef idx="2">
+            <a:schemeClr val="accent1">
+              <a:shade val="50000"/>
+            </a:schemeClr>
+          </a:lnRef>
+          <a:fillRef idx="1">
+            <a:schemeClr val="accent1"/>
+          </a:fillRef>
+          <a:effectRef idx="0">
+            <a:schemeClr val="accent1"/>
+          </a:effectRef>
+          <a:fontRef idx="minor">
+            <a:schemeClr val="lt1"/>
+          </a:fontRef>
+        </p:style>
+        <p:txBody>
+          <a:bodyPr anchor="ctr"/>
+          <a:lstStyle/>
+          <a:p>
+            <a:pPr algn="ctr">
+              <a:defRPr/>
+            </a:pPr>
+            <a:endParaRPr lang="en-US"/>
+          </a:p>
+        </p:txBody>
+      </p:sp>
+      <p:pic>
+        <p:nvPicPr>
+          <p:cNvPr id="18" name="Picture 7" descr="MAT logo vertical_red.emf"/>
+          <p:cNvPicPr>
+            <a:picLocks noChangeAspect="1"/>
+          </p:cNvPicPr>
+          <p:nvPr/>
+        </p:nvPicPr>
+        <p:blipFill>
+          <a:blip r:embed="rId3"/>
+          <a:srcRect/>
+          <a:stretch>
+            <a:fillRect/>
+          </a:stretch>
+        </p:blipFill>
+        <p:spPr bwMode="auto">
+          <a:xfrm>
+            <a:off x="3600450" y="5334000"/>
+            <a:ext cx="1981200" cy="969963"/>
+          </a:xfrm>
+          <a:prstGeom prst="rect">
+            <a:avLst/>
+          </a:prstGeom>
+          <a:noFill/>
+          <a:ln w="9525">
+            <a:noFill/>
+            <a:miter lim="800000"/>
+            <a:headEnd/>
+            <a:tailEnd/>
+          </a:ln>
+        </p:spPr>
+      </p:pic>
+    </p:spTree>
+  </p:cSld>
+  <p:clrMapOvr>
+    <a:masterClrMapping/>
+  </p:clrMapOvr>
+  <p:timing>
+    <p:tnLst>
+      <p:par>
+        <p:cTn id="1" dur="indefinite" restart="never" nodeType="tmRoot"/>
+      </p:par>
+    </p:tnLst>
+  </p:timing>
+</p:sld>
+</file>
+
+<file path=ppt/slides/slide31.xml><?xml version="1.0" encoding="utf-8"?>
 <p:sld xmlns:a="http://schemas.openxmlformats.org/drawingml/2006/main" xmlns:r="http://schemas.openxmlformats.org/officeDocument/2006/relationships" xmlns:p="http://schemas.openxmlformats.org/presentationml/2006/main">
   <p:cSld>
     <p:spTree>

</xml_diff>

<commit_message>
working on the 'real workd icommand' slide. added pic of screaming baby to illustrate the point
</commit_message>
<xml_diff>
--- a/Decoupling Workflow With App Controler/Decoupling Workflow From Forms.pptx
+++ b/Decoupling Workflow With App Controler/Decoupling Workflow From Forms.pptx
@@ -4791,41 +4791,6 @@
               </a:fontRef>
             </p:style>
           </p:cxnSp>
-          <p:pic>
-            <p:nvPicPr>
-              <p:cNvPr id="1026" name="Picture 2"/>
-              <p:cNvPicPr>
-                <a:picLocks noChangeAspect="1" noChangeArrowheads="1"/>
-              </p:cNvPicPr>
-              <p:nvPr/>
-            </p:nvPicPr>
-            <p:blipFill>
-              <a:blip r:embed="rId4"/>
-              <a:srcRect/>
-              <a:stretch>
-                <a:fillRect/>
-              </a:stretch>
-            </p:blipFill>
-            <p:spPr bwMode="auto">
-              <a:xfrm>
-                <a:off x="1282184" y="3276600"/>
-                <a:ext cx="7595116" cy="1676400"/>
-              </a:xfrm>
-              <a:prstGeom prst="rect">
-                <a:avLst/>
-              </a:prstGeom>
-              <a:noFill/>
-              <a:ln w="38100">
-                <a:solidFill>
-                  <a:schemeClr val="accent2"/>
-                </a:solidFill>
-                <a:miter lim="800000"/>
-                <a:headEnd/>
-                <a:tailEnd/>
-              </a:ln>
-              <a:effectLst/>
-            </p:spPr>
-          </p:pic>
           <p:sp>
             <p:nvSpPr>
               <p:cNvPr id="14" name="Rectangle 13"/>
@@ -4872,6 +4837,41 @@
               </a:p>
             </p:txBody>
           </p:sp>
+          <p:pic>
+            <p:nvPicPr>
+              <p:cNvPr id="1026" name="Picture 2"/>
+              <p:cNvPicPr>
+                <a:picLocks noChangeAspect="1" noChangeArrowheads="1"/>
+              </p:cNvPicPr>
+              <p:nvPr/>
+            </p:nvPicPr>
+            <p:blipFill>
+              <a:blip r:embed="rId4"/>
+              <a:srcRect/>
+              <a:stretch>
+                <a:fillRect/>
+              </a:stretch>
+            </p:blipFill>
+            <p:spPr bwMode="auto">
+              <a:xfrm>
+                <a:off x="1282184" y="3276600"/>
+                <a:ext cx="7595116" cy="1676400"/>
+              </a:xfrm>
+              <a:prstGeom prst="rect">
+                <a:avLst/>
+              </a:prstGeom>
+              <a:noFill/>
+              <a:ln w="38100">
+                <a:solidFill>
+                  <a:schemeClr val="accent2"/>
+                </a:solidFill>
+                <a:miter lim="800000"/>
+                <a:headEnd/>
+                <a:tailEnd/>
+              </a:ln>
+              <a:effectLst/>
+            </p:spPr>
+          </p:pic>
         </p:grpSp>
         <p:sp>
           <p:nvSpPr>
@@ -7867,171 +7867,6 @@
           <a:chExt cx="0" cy="0"/>
         </a:xfrm>
       </p:grpSpPr>
-      <p:sp>
-        <p:nvSpPr>
-          <p:cNvPr id="3075" name="Text Placeholder 2"/>
-          <p:cNvSpPr>
-            <a:spLocks noGrp="1"/>
-          </p:cNvSpPr>
-          <p:nvPr>
-            <p:ph type="body" sz="quarter" idx="10"/>
-          </p:nvPr>
-        </p:nvSpPr>
-        <p:spPr>
-          <a:xfrm>
-            <a:off x="685800" y="1066800"/>
-            <a:ext cx="8229600" cy="5334000"/>
-          </a:xfrm>
-        </p:spPr>
-        <p:txBody>
-          <a:bodyPr/>
-          <a:lstStyle/>
-          <a:p>
-            <a:pPr eaLnBrk="1" hangingPunct="1">
-              <a:buNone/>
-            </a:pPr>
-            <a:endParaRPr lang="en-US" b="1" dirty="0" smtClean="0">
-              <a:solidFill>
-                <a:schemeClr val="accent1">
-                  <a:lumMod val="75000"/>
-                </a:schemeClr>
-              </a:solidFill>
-            </a:endParaRPr>
-          </a:p>
-          <a:p>
-            <a:pPr eaLnBrk="1" hangingPunct="1">
-              <a:buNone/>
-            </a:pPr>
-            <a:r>
-              <a:rPr lang="en-US" b="1" dirty="0" smtClean="0">
-                <a:solidFill>
-                  <a:schemeClr val="accent1">
-                    <a:lumMod val="75000"/>
-                  </a:schemeClr>
-                </a:solidFill>
-              </a:rPr>
-              <a:t>Topics Covered</a:t>
-            </a:r>
-          </a:p>
-          <a:p>
-            <a:pPr eaLnBrk="1" hangingPunct="1"/>
-            <a:r>
-              <a:rPr lang="en-US" sz="2000" dirty="0" smtClean="0"/>
-              <a:t>Event Aggregator</a:t>
-            </a:r>
-          </a:p>
-          <a:p>
-            <a:pPr eaLnBrk="1" hangingPunct="1"/>
-            <a:r>
-              <a:rPr lang="en-US" sz="2000" dirty="0" smtClean="0"/>
-              <a:t>Command Pattern</a:t>
-            </a:r>
-          </a:p>
-          <a:p>
-            <a:pPr eaLnBrk="1" hangingPunct="1"/>
-            <a:r>
-              <a:rPr lang="en-US" sz="2000" dirty="0" smtClean="0"/>
-              <a:t>Application Controller</a:t>
-            </a:r>
-          </a:p>
-          <a:p>
-            <a:pPr eaLnBrk="1" hangingPunct="1"/>
-            <a:r>
-              <a:rPr lang="en-US" sz="2000" dirty="0" smtClean="0"/>
-              <a:t>Wiring Together With </a:t>
-            </a:r>
-            <a:r>
-              <a:rPr lang="en-US" sz="2000" dirty="0" err="1" smtClean="0"/>
-              <a:t>IoC</a:t>
-            </a:r>
-            <a:r>
-              <a:rPr lang="en-US" sz="2000" dirty="0" smtClean="0"/>
-              <a:t> Container</a:t>
-            </a:r>
-          </a:p>
-          <a:p>
-            <a:pPr eaLnBrk="1" hangingPunct="1"/>
-            <a:endParaRPr lang="en-US" sz="2000" dirty="0" smtClean="0"/>
-          </a:p>
-          <a:p>
-            <a:pPr eaLnBrk="1" hangingPunct="1">
-              <a:buNone/>
-            </a:pPr>
-            <a:r>
-              <a:rPr lang="en-US" b="1" dirty="0" smtClean="0">
-                <a:solidFill>
-                  <a:schemeClr val="accent1">
-                    <a:lumMod val="75000"/>
-                  </a:schemeClr>
-                </a:solidFill>
-              </a:rPr>
-              <a:t>Goals</a:t>
-            </a:r>
-          </a:p>
-          <a:p>
-            <a:pPr eaLnBrk="1" hangingPunct="1"/>
-            <a:r>
-              <a:rPr lang="en-US" sz="2000" dirty="0" smtClean="0"/>
-              <a:t>Object Oriented System</a:t>
-            </a:r>
-          </a:p>
-          <a:p>
-            <a:pPr eaLnBrk="1" hangingPunct="1"/>
-            <a:r>
-              <a:rPr lang="en-US" sz="2000" dirty="0" smtClean="0"/>
-              <a:t>Testability</a:t>
-            </a:r>
-          </a:p>
-          <a:p>
-            <a:pPr eaLnBrk="1" hangingPunct="1"/>
-            <a:r>
-              <a:rPr lang="en-US" sz="2000" dirty="0" smtClean="0"/>
-              <a:t>Flexibility</a:t>
-            </a:r>
-          </a:p>
-          <a:p>
-            <a:pPr eaLnBrk="1" hangingPunct="1"/>
-            <a:r>
-              <a:rPr lang="en-US" sz="2000" dirty="0" smtClean="0"/>
-              <a:t>Maintainability (Ease of Enhancement)</a:t>
-            </a:r>
-          </a:p>
-        </p:txBody>
-      </p:sp>
-      <p:sp>
-        <p:nvSpPr>
-          <p:cNvPr id="3074" name="Title 1"/>
-          <p:cNvSpPr>
-            <a:spLocks noGrp="1"/>
-          </p:cNvSpPr>
-          <p:nvPr>
-            <p:ph type="title"/>
-          </p:nvPr>
-        </p:nvSpPr>
-        <p:spPr bwMode="auto">
-          <a:noFill/>
-          <a:ln>
-            <a:miter lim="800000"/>
-            <a:headEnd/>
-            <a:tailEnd/>
-          </a:ln>
-        </p:spPr>
-        <p:txBody>
-          <a:bodyPr vert="horz" wrap="square" lIns="91440" tIns="45720" rIns="91440" bIns="45720" numCol="1" anchor="t" anchorCtr="0" compatLnSpc="1">
-            <a:prstTxWarp prst="textNoShape">
-              <a:avLst/>
-            </a:prstTxWarp>
-          </a:bodyPr>
-          <a:lstStyle/>
-          <a:p>
-            <a:pPr eaLnBrk="1" hangingPunct="1"/>
-            <a:r>
-              <a:rPr lang="en-US" dirty="0" smtClean="0"/>
-              <a:t>Topics Of This Presentation</a:t>
-            </a:r>
-          </a:p>
-        </p:txBody>
-      </p:sp>
       <p:pic>
         <p:nvPicPr>
           <p:cNvPr id="1026" name="Picture 2" descr="C:\Users\derickb\AppData\Local\Microsoft\Windows\Temporary Internet Files\Content.IE5\AY104AXF\MPj04331790000[1].jpg"/>
@@ -8058,6 +7893,198 @@
           <a:noFill/>
         </p:spPr>
       </p:pic>
+      <p:sp>
+        <p:nvSpPr>
+          <p:cNvPr id="3075" name="Text Placeholder 2"/>
+          <p:cNvSpPr>
+            <a:spLocks noGrp="1"/>
+          </p:cNvSpPr>
+          <p:nvPr>
+            <p:ph type="body" sz="quarter" idx="10"/>
+          </p:nvPr>
+        </p:nvSpPr>
+        <p:spPr>
+          <a:xfrm>
+            <a:off x="685800" y="1066800"/>
+            <a:ext cx="8229600" cy="5334000"/>
+          </a:xfrm>
+        </p:spPr>
+        <p:txBody>
+          <a:bodyPr/>
+          <a:lstStyle/>
+          <a:p>
+            <a:pPr eaLnBrk="1" hangingPunct="1">
+              <a:buNone/>
+            </a:pPr>
+            <a:endParaRPr lang="en-US" b="1" dirty="0" smtClean="0">
+              <a:solidFill>
+                <a:schemeClr val="accent1">
+                  <a:lumMod val="75000"/>
+                </a:schemeClr>
+              </a:solidFill>
+            </a:endParaRPr>
+          </a:p>
+          <a:p>
+            <a:pPr eaLnBrk="1" hangingPunct="1">
+              <a:buNone/>
+            </a:pPr>
+            <a:r>
+              <a:rPr lang="en-US" b="1" dirty="0" smtClean="0">
+                <a:solidFill>
+                  <a:schemeClr val="accent1">
+                    <a:lumMod val="75000"/>
+                  </a:schemeClr>
+                </a:solidFill>
+              </a:rPr>
+              <a:t>Topics Covered</a:t>
+            </a:r>
+          </a:p>
+          <a:p>
+            <a:pPr eaLnBrk="1" hangingPunct="1"/>
+            <a:r>
+              <a:rPr lang="en-US" sz="2000" dirty="0" smtClean="0"/>
+              <a:t>Workflow Services</a:t>
+            </a:r>
+          </a:p>
+          <a:p>
+            <a:pPr eaLnBrk="1" hangingPunct="1"/>
+            <a:r>
+              <a:rPr lang="en-US" sz="2000" dirty="0" smtClean="0"/>
+              <a:t>Command </a:t>
+            </a:r>
+            <a:r>
+              <a:rPr lang="en-US" sz="2000" dirty="0" smtClean="0"/>
+              <a:t>Pattern</a:t>
+            </a:r>
+          </a:p>
+          <a:p>
+            <a:pPr eaLnBrk="1" hangingPunct="1"/>
+            <a:r>
+              <a:rPr lang="en-US" sz="2000" dirty="0" smtClean="0"/>
+              <a:t>Event Aggregator</a:t>
+            </a:r>
+          </a:p>
+          <a:p>
+            <a:pPr eaLnBrk="1" hangingPunct="1"/>
+            <a:r>
+              <a:rPr lang="en-US" sz="2000" dirty="0" smtClean="0"/>
+              <a:t>Application </a:t>
+            </a:r>
+            <a:r>
+              <a:rPr lang="en-US" sz="2000" dirty="0" smtClean="0"/>
+              <a:t>Controller</a:t>
+            </a:r>
+          </a:p>
+          <a:p>
+            <a:pPr eaLnBrk="1" hangingPunct="1"/>
+            <a:r>
+              <a:rPr lang="en-US" sz="2000" dirty="0" smtClean="0"/>
+              <a:t>String It All Together </a:t>
+            </a:r>
+            <a:r>
+              <a:rPr lang="en-US" sz="2000" dirty="0" smtClean="0"/>
+              <a:t>With </a:t>
+            </a:r>
+            <a:r>
+              <a:rPr lang="en-US" sz="2000" dirty="0" smtClean="0"/>
+              <a:t>An </a:t>
+            </a:r>
+            <a:r>
+              <a:rPr lang="en-US" sz="2000" dirty="0" err="1" smtClean="0"/>
+              <a:t>IoC</a:t>
+            </a:r>
+            <a:r>
+              <a:rPr lang="en-US" sz="2000" dirty="0" smtClean="0"/>
+              <a:t> </a:t>
+            </a:r>
+            <a:r>
+              <a:rPr lang="en-US" sz="2000" dirty="0" smtClean="0"/>
+              <a:t>Container</a:t>
+            </a:r>
+          </a:p>
+          <a:p>
+            <a:pPr eaLnBrk="1" hangingPunct="1"/>
+            <a:endParaRPr lang="en-US" sz="2000" dirty="0" smtClean="0"/>
+          </a:p>
+          <a:p>
+            <a:pPr eaLnBrk="1" hangingPunct="1">
+              <a:buNone/>
+            </a:pPr>
+            <a:r>
+              <a:rPr lang="en-US" b="1" dirty="0" smtClean="0">
+                <a:solidFill>
+                  <a:schemeClr val="accent1">
+                    <a:lumMod val="75000"/>
+                  </a:schemeClr>
+                </a:solidFill>
+              </a:rPr>
+              <a:t>Goals</a:t>
+            </a:r>
+          </a:p>
+          <a:p>
+            <a:pPr eaLnBrk="1" hangingPunct="1"/>
+            <a:r>
+              <a:rPr lang="en-US" sz="2000" dirty="0" smtClean="0"/>
+              <a:t>Object Oriented System</a:t>
+            </a:r>
+          </a:p>
+          <a:p>
+            <a:pPr eaLnBrk="1" hangingPunct="1"/>
+            <a:r>
+              <a:rPr lang="en-US" sz="2000" dirty="0" smtClean="0"/>
+              <a:t>Testability</a:t>
+            </a:r>
+          </a:p>
+          <a:p>
+            <a:pPr eaLnBrk="1" hangingPunct="1"/>
+            <a:r>
+              <a:rPr lang="en-US" sz="2000" dirty="0" smtClean="0"/>
+              <a:t>Flexibility</a:t>
+            </a:r>
+          </a:p>
+          <a:p>
+            <a:pPr eaLnBrk="1" hangingPunct="1"/>
+            <a:r>
+              <a:rPr lang="en-US" sz="2000" dirty="0" smtClean="0"/>
+              <a:t>Maintainability (Ease of Enhancement)</a:t>
+            </a:r>
+          </a:p>
+        </p:txBody>
+      </p:sp>
+      <p:sp>
+        <p:nvSpPr>
+          <p:cNvPr id="3074" name="Title 1"/>
+          <p:cNvSpPr>
+            <a:spLocks noGrp="1"/>
+          </p:cNvSpPr>
+          <p:nvPr>
+            <p:ph type="title"/>
+          </p:nvPr>
+        </p:nvSpPr>
+        <p:spPr bwMode="auto">
+          <a:noFill/>
+          <a:ln>
+            <a:miter lim="800000"/>
+            <a:headEnd/>
+            <a:tailEnd/>
+          </a:ln>
+        </p:spPr>
+        <p:txBody>
+          <a:bodyPr vert="horz" wrap="square" lIns="91440" tIns="45720" rIns="91440" bIns="45720" numCol="1" anchor="t" anchorCtr="0" compatLnSpc="1">
+            <a:prstTxWarp prst="textNoShape">
+              <a:avLst/>
+            </a:prstTxWarp>
+          </a:bodyPr>
+          <a:lstStyle/>
+          <a:p>
+            <a:pPr eaLnBrk="1" hangingPunct="1"/>
+            <a:r>
+              <a:rPr lang="en-US" dirty="0" smtClean="0"/>
+              <a:t>Topics Of This Presentation</a:t>
+            </a:r>
+          </a:p>
+        </p:txBody>
+      </p:sp>
     </p:spTree>
   </p:cSld>
   <p:clrMapOvr>
@@ -8156,198 +8183,320 @@
       </p:sp>
       <p:grpSp>
         <p:nvGrpSpPr>
-          <p:cNvPr id="14" name="Group 13"/>
+          <p:cNvPr id="16" name="Group 15"/>
           <p:cNvGrpSpPr/>
           <p:nvPr/>
         </p:nvGrpSpPr>
         <p:grpSpPr>
           <a:xfrm>
-            <a:off x="2006260" y="2064603"/>
-            <a:ext cx="4979081" cy="830997"/>
-            <a:chOff x="1955119" y="2209800"/>
-            <a:chExt cx="4979081" cy="830997"/>
-          </a:xfrm>
-        </p:grpSpPr>
-        <p:sp>
-          <p:nvSpPr>
-            <p:cNvPr id="4" name="TextBox 3"/>
-            <p:cNvSpPr txBox="1"/>
-            <p:nvPr/>
-          </p:nvSpPr>
-          <p:spPr>
-            <a:xfrm>
-              <a:off x="1955119" y="2209800"/>
-              <a:ext cx="2007281" cy="830997"/>
-            </a:xfrm>
-            <a:prstGeom prst="rect">
-              <a:avLst/>
-            </a:prstGeom>
-          </p:spPr>
-          <p:style>
-            <a:lnRef idx="2">
-              <a:schemeClr val="accent1">
-                <a:shade val="50000"/>
-              </a:schemeClr>
-            </a:lnRef>
-            <a:fillRef idx="1">
-              <a:schemeClr val="accent1"/>
-            </a:fillRef>
-            <a:effectRef idx="0">
-              <a:schemeClr val="accent1"/>
-            </a:effectRef>
-            <a:fontRef idx="minor">
-              <a:schemeClr val="lt1"/>
-            </a:fontRef>
-          </p:style>
-          <p:txBody>
-            <a:bodyPr wrap="none" rtlCol="0">
-              <a:spAutoFit/>
-            </a:bodyPr>
-            <a:lstStyle/>
-            <a:p>
-              <a:r>
-                <a:rPr lang="en-US" sz="2400" dirty="0" err="1" smtClean="0">
-                  <a:latin typeface="+mn-lt"/>
-                </a:rPr>
-                <a:t>ICommand</a:t>
-              </a:r>
-              <a:r>
-                <a:rPr lang="en-US" sz="2400" dirty="0" smtClean="0">
-                  <a:latin typeface="+mn-lt"/>
-                </a:rPr>
-                <a:t>&lt;T&gt;</a:t>
-              </a:r>
-            </a:p>
-            <a:p>
-              <a:r>
-                <a:rPr lang="en-US" sz="2400" dirty="0" smtClean="0"/>
-                <a:t>  .Execute(T)</a:t>
-              </a:r>
-              <a:endParaRPr lang="en-US" sz="2400" dirty="0" smtClean="0">
-                <a:latin typeface="+mn-lt"/>
-              </a:endParaRPr>
-            </a:p>
-          </p:txBody>
-        </p:sp>
-        <p:sp>
-          <p:nvSpPr>
-            <p:cNvPr id="5" name="TextBox 4"/>
-            <p:cNvSpPr txBox="1"/>
-            <p:nvPr/>
-          </p:nvSpPr>
-          <p:spPr>
-            <a:xfrm>
-              <a:off x="4290335" y="2395298"/>
-              <a:ext cx="2643865" cy="461665"/>
-            </a:xfrm>
-            <a:prstGeom prst="rect">
-              <a:avLst/>
-            </a:prstGeom>
-          </p:spPr>
-          <p:style>
-            <a:lnRef idx="2">
-              <a:schemeClr val="accent1">
-                <a:shade val="50000"/>
-              </a:schemeClr>
-            </a:lnRef>
-            <a:fillRef idx="1">
-              <a:schemeClr val="accent1"/>
-            </a:fillRef>
-            <a:effectRef idx="0">
-              <a:schemeClr val="accent1"/>
-            </a:effectRef>
-            <a:fontRef idx="minor">
-              <a:schemeClr val="lt1"/>
-            </a:fontRef>
-          </p:style>
-          <p:txBody>
-            <a:bodyPr wrap="none" rtlCol="0">
-              <a:spAutoFit/>
-            </a:bodyPr>
-            <a:lstStyle/>
-            <a:p>
-              <a:r>
-                <a:rPr lang="en-US" sz="2400" dirty="0" err="1" smtClean="0">
-                  <a:latin typeface="+mn-lt"/>
-                </a:rPr>
-                <a:t>CommandDataType</a:t>
-              </a:r>
-              <a:endParaRPr lang="en-US" sz="2400" dirty="0" smtClean="0">
-                <a:latin typeface="+mn-lt"/>
-              </a:endParaRPr>
-            </a:p>
-          </p:txBody>
-        </p:sp>
-        <p:sp>
-          <p:nvSpPr>
-            <p:cNvPr id="7" name="TextBox 6"/>
-            <p:cNvSpPr txBox="1"/>
-            <p:nvPr/>
-          </p:nvSpPr>
-          <p:spPr>
-            <a:xfrm>
-              <a:off x="3962400" y="2395298"/>
-              <a:ext cx="338554" cy="461665"/>
-            </a:xfrm>
-            <a:prstGeom prst="rect">
-              <a:avLst/>
-            </a:prstGeom>
-            <a:noFill/>
-          </p:spPr>
-          <p:txBody>
-            <a:bodyPr wrap="none" rtlCol="0">
-              <a:spAutoFit/>
-            </a:bodyPr>
-            <a:lstStyle/>
-            <a:p>
-              <a:r>
-                <a:rPr lang="en-US" sz="2400" dirty="0" smtClean="0">
-                  <a:latin typeface="+mn-lt"/>
-                </a:rPr>
-                <a:t>+</a:t>
-              </a:r>
-            </a:p>
-          </p:txBody>
-        </p:sp>
-      </p:grpSp>
-      <p:grpSp>
-        <p:nvGrpSpPr>
-          <p:cNvPr id="18" name="Group 17"/>
-          <p:cNvGrpSpPr/>
-          <p:nvPr/>
-        </p:nvGrpSpPr>
-        <p:grpSpPr>
-          <a:xfrm>
-            <a:off x="990600" y="3607475"/>
-            <a:ext cx="7010401" cy="2031325"/>
-            <a:chOff x="990600" y="3500735"/>
-            <a:chExt cx="7010401" cy="2031325"/>
+            <a:off x="1347044" y="2052935"/>
+            <a:ext cx="6653956" cy="3585865"/>
+            <a:chOff x="1347044" y="2052935"/>
+            <a:chExt cx="6653956" cy="3585865"/>
           </a:xfrm>
         </p:grpSpPr>
         <p:grpSp>
           <p:nvGrpSpPr>
-            <p:cNvPr id="15" name="Group 14"/>
+            <p:cNvPr id="14" name="Group 13"/>
             <p:cNvGrpSpPr/>
             <p:nvPr/>
           </p:nvGrpSpPr>
           <p:grpSpPr>
             <a:xfrm>
-              <a:off x="990600" y="3500735"/>
-              <a:ext cx="7010400" cy="466130"/>
-              <a:chOff x="990600" y="3500735"/>
-              <a:chExt cx="7010400" cy="466130"/>
+              <a:off x="2006260" y="2052935"/>
+              <a:ext cx="4981005" cy="473333"/>
+              <a:chOff x="1955119" y="2198132"/>
+              <a:chExt cx="4981005" cy="473333"/>
             </a:xfrm>
           </p:grpSpPr>
           <p:sp>
             <p:nvSpPr>
-              <p:cNvPr id="6" name="TextBox 5"/>
+              <p:cNvPr id="4" name="TextBox 3"/>
               <p:cNvSpPr txBox="1"/>
               <p:nvPr/>
             </p:nvSpPr>
             <p:spPr>
               <a:xfrm>
-                <a:off x="1352833" y="3500735"/>
-                <a:ext cx="6648167" cy="461665"/>
+                <a:off x="1955119" y="2209800"/>
+                <a:ext cx="2007281" cy="461665"/>
+              </a:xfrm>
+              <a:prstGeom prst="rect">
+                <a:avLst/>
+              </a:prstGeom>
+            </p:spPr>
+            <p:style>
+              <a:lnRef idx="2">
+                <a:schemeClr val="accent1">
+                  <a:shade val="50000"/>
+                </a:schemeClr>
+              </a:lnRef>
+              <a:fillRef idx="1">
+                <a:schemeClr val="accent1"/>
+              </a:fillRef>
+              <a:effectRef idx="0">
+                <a:schemeClr val="accent1"/>
+              </a:effectRef>
+              <a:fontRef idx="minor">
+                <a:schemeClr val="lt1"/>
+              </a:fontRef>
+            </p:style>
+            <p:txBody>
+              <a:bodyPr wrap="none" rtlCol="0">
+                <a:spAutoFit/>
+              </a:bodyPr>
+              <a:lstStyle/>
+              <a:p>
+                <a:r>
+                  <a:rPr lang="en-US" sz="2400" dirty="0" err="1" smtClean="0">
+                    <a:latin typeface="+mn-lt"/>
+                  </a:rPr>
+                  <a:t>ICommand</a:t>
+                </a:r>
+                <a:r>
+                  <a:rPr lang="en-US" sz="2400" dirty="0" smtClean="0">
+                    <a:latin typeface="+mn-lt"/>
+                  </a:rPr>
+                  <a:t>&lt;T</a:t>
+                </a:r>
+                <a:r>
+                  <a:rPr lang="en-US" sz="2400" dirty="0" smtClean="0">
+                    <a:latin typeface="+mn-lt"/>
+                  </a:rPr>
+                  <a:t>&gt;</a:t>
+                </a:r>
+                <a:endParaRPr lang="en-US" sz="2400" dirty="0" smtClean="0">
+                  <a:latin typeface="+mn-lt"/>
+                </a:endParaRPr>
+              </a:p>
+            </p:txBody>
+          </p:sp>
+          <p:sp>
+            <p:nvSpPr>
+              <p:cNvPr id="5" name="TextBox 4"/>
+              <p:cNvSpPr txBox="1"/>
+              <p:nvPr/>
+            </p:nvSpPr>
+            <p:spPr>
+              <a:xfrm>
+                <a:off x="4292259" y="2202597"/>
+                <a:ext cx="2643865" cy="461665"/>
+              </a:xfrm>
+              <a:prstGeom prst="rect">
+                <a:avLst/>
+              </a:prstGeom>
+            </p:spPr>
+            <p:style>
+              <a:lnRef idx="2">
+                <a:schemeClr val="accent1">
+                  <a:shade val="50000"/>
+                </a:schemeClr>
+              </a:lnRef>
+              <a:fillRef idx="1">
+                <a:schemeClr val="accent1"/>
+              </a:fillRef>
+              <a:effectRef idx="0">
+                <a:schemeClr val="accent1"/>
+              </a:effectRef>
+              <a:fontRef idx="minor">
+                <a:schemeClr val="lt1"/>
+              </a:fontRef>
+            </p:style>
+            <p:txBody>
+              <a:bodyPr wrap="none" rtlCol="0">
+                <a:spAutoFit/>
+              </a:bodyPr>
+              <a:lstStyle/>
+              <a:p>
+                <a:r>
+                  <a:rPr lang="en-US" sz="2400" dirty="0" err="1" smtClean="0">
+                    <a:latin typeface="+mn-lt"/>
+                  </a:rPr>
+                  <a:t>CommandDataType</a:t>
+                </a:r>
+                <a:endParaRPr lang="en-US" sz="2400" dirty="0" smtClean="0">
+                  <a:latin typeface="+mn-lt"/>
+                </a:endParaRPr>
+              </a:p>
+            </p:txBody>
+          </p:sp>
+          <p:sp>
+            <p:nvSpPr>
+              <p:cNvPr id="7" name="TextBox 6"/>
+              <p:cNvSpPr txBox="1"/>
+              <p:nvPr/>
+            </p:nvSpPr>
+            <p:spPr>
+              <a:xfrm>
+                <a:off x="3962400" y="2198132"/>
+                <a:ext cx="338554" cy="461665"/>
+              </a:xfrm>
+              <a:prstGeom prst="rect">
+                <a:avLst/>
+              </a:prstGeom>
+              <a:noFill/>
+            </p:spPr>
+            <p:txBody>
+              <a:bodyPr wrap="none" rtlCol="0">
+                <a:spAutoFit/>
+              </a:bodyPr>
+              <a:lstStyle/>
+              <a:p>
+                <a:r>
+                  <a:rPr lang="en-US" sz="2400" dirty="0" smtClean="0">
+                    <a:latin typeface="+mn-lt"/>
+                  </a:rPr>
+                  <a:t>+</a:t>
+                </a:r>
+              </a:p>
+            </p:txBody>
+          </p:sp>
+        </p:grpSp>
+        <p:grpSp>
+          <p:nvGrpSpPr>
+            <p:cNvPr id="18" name="Group 17"/>
+            <p:cNvGrpSpPr/>
+            <p:nvPr/>
+          </p:nvGrpSpPr>
+          <p:grpSpPr>
+            <a:xfrm>
+              <a:off x="1347044" y="2895600"/>
+              <a:ext cx="6653956" cy="2743200"/>
+              <a:chOff x="1347044" y="2788860"/>
+              <a:chExt cx="6653956" cy="2743200"/>
+            </a:xfrm>
+          </p:grpSpPr>
+          <p:grpSp>
+            <p:nvGrpSpPr>
+              <p:cNvPr id="15" name="Group 14"/>
+              <p:cNvGrpSpPr/>
+              <p:nvPr/>
+            </p:nvGrpSpPr>
+            <p:grpSpPr>
+              <a:xfrm>
+                <a:off x="1352833" y="2788860"/>
+                <a:ext cx="6648167" cy="1173540"/>
+                <a:chOff x="1352833" y="2788860"/>
+                <a:chExt cx="6648167" cy="1173540"/>
+              </a:xfrm>
+            </p:grpSpPr>
+            <p:sp>
+              <p:nvSpPr>
+                <p:cNvPr id="6" name="TextBox 5"/>
+                <p:cNvSpPr txBox="1"/>
+                <p:nvPr/>
+              </p:nvSpPr>
+              <p:spPr>
+                <a:xfrm>
+                  <a:off x="1352833" y="3500735"/>
+                  <a:ext cx="6648167" cy="461665"/>
+                </a:xfrm>
+                <a:prstGeom prst="rect">
+                  <a:avLst/>
+                </a:prstGeom>
+              </p:spPr>
+              <p:style>
+                <a:lnRef idx="2">
+                  <a:schemeClr val="accent2">
+                    <a:shade val="50000"/>
+                  </a:schemeClr>
+                </a:lnRef>
+                <a:fillRef idx="1">
+                  <a:schemeClr val="accent2"/>
+                </a:fillRef>
+                <a:effectRef idx="0">
+                  <a:schemeClr val="accent2"/>
+                </a:effectRef>
+                <a:fontRef idx="minor">
+                  <a:schemeClr val="lt1"/>
+                </a:fontRef>
+              </p:style>
+              <p:txBody>
+                <a:bodyPr wrap="square" rtlCol="0">
+                  <a:spAutoFit/>
+                </a:bodyPr>
+                <a:lstStyle/>
+                <a:p>
+                  <a:r>
+                    <a:rPr lang="en-US" sz="2400" dirty="0" err="1" smtClean="0">
+                      <a:latin typeface="+mn-lt"/>
+                    </a:rPr>
+                    <a:t>CommandObject</a:t>
+                  </a:r>
+                  <a:r>
+                    <a:rPr lang="en-US" sz="2400" dirty="0" smtClean="0">
+                      <a:latin typeface="+mn-lt"/>
+                    </a:rPr>
+                    <a:t>:  </a:t>
+                  </a:r>
+                  <a:r>
+                    <a:rPr lang="en-US" sz="2400" dirty="0" err="1" smtClean="0">
+                      <a:latin typeface="+mn-lt"/>
+                    </a:rPr>
+                    <a:t>ICommand</a:t>
+                  </a:r>
+                  <a:r>
+                    <a:rPr lang="en-US" sz="2400" dirty="0" smtClean="0">
+                      <a:latin typeface="+mn-lt"/>
+                    </a:rPr>
+                    <a:t>&lt;</a:t>
+                  </a:r>
+                  <a:r>
+                    <a:rPr lang="en-US" sz="2400" dirty="0" err="1" smtClean="0">
+                      <a:latin typeface="+mn-lt"/>
+                    </a:rPr>
+                    <a:t>CommandDataType</a:t>
+                  </a:r>
+                  <a:r>
+                    <a:rPr lang="en-US" sz="2400" dirty="0" smtClean="0">
+                      <a:latin typeface="+mn-lt"/>
+                    </a:rPr>
+                    <a:t>&gt;</a:t>
+                  </a:r>
+                </a:p>
+              </p:txBody>
+            </p:sp>
+            <p:sp>
+              <p:nvSpPr>
+                <p:cNvPr id="13" name="TextBox 12"/>
+                <p:cNvSpPr txBox="1"/>
+                <p:nvPr/>
+              </p:nvSpPr>
+              <p:spPr>
+                <a:xfrm>
+                  <a:off x="4038600" y="2788860"/>
+                  <a:ext cx="338554" cy="461665"/>
+                </a:xfrm>
+                <a:prstGeom prst="rect">
+                  <a:avLst/>
+                </a:prstGeom>
+                <a:noFill/>
+              </p:spPr>
+              <p:txBody>
+                <a:bodyPr wrap="none" rtlCol="0">
+                  <a:spAutoFit/>
+                </a:bodyPr>
+                <a:lstStyle/>
+                <a:p>
+                  <a:r>
+                    <a:rPr lang="en-US" sz="2400" dirty="0" smtClean="0">
+                      <a:latin typeface="+mn-lt"/>
+                    </a:rPr>
+                    <a:t>=</a:t>
+                  </a:r>
+                </a:p>
+              </p:txBody>
+            </p:sp>
+          </p:grpSp>
+          <p:sp>
+            <p:nvSpPr>
+              <p:cNvPr id="17" name="TextBox 16"/>
+              <p:cNvSpPr txBox="1"/>
+              <p:nvPr/>
+            </p:nvSpPr>
+            <p:spPr>
+              <a:xfrm>
+                <a:off x="1347044" y="3962400"/>
+                <a:ext cx="6653956" cy="1569660"/>
               </a:xfrm>
               <a:prstGeom prst="rect">
                 <a:avLst/>
@@ -8370,34 +8519,16 @@
               </a:fontRef>
             </p:style>
             <p:txBody>
-              <a:bodyPr wrap="none" rtlCol="0">
+              <a:bodyPr wrap="square" rtlCol="0">
                 <a:spAutoFit/>
               </a:bodyPr>
               <a:lstStyle/>
               <a:p>
                 <a:r>
-                  <a:rPr lang="en-US" sz="2400" dirty="0" err="1" smtClean="0">
-                    <a:latin typeface="+mn-lt"/>
-                  </a:rPr>
-                  <a:t>CommandObject</a:t>
-                </a:r>
-                <a:r>
                   <a:rPr lang="en-US" sz="2400" dirty="0" smtClean="0">
                     <a:latin typeface="+mn-lt"/>
                   </a:rPr>
-                  <a:t>:  </a:t>
-                </a:r>
-                <a:r>
-                  <a:rPr lang="en-US" sz="2400" dirty="0" err="1" smtClean="0">
-                    <a:latin typeface="+mn-lt"/>
-                  </a:rPr>
-                  <a:t>ICommand</a:t>
-                </a:r>
-                <a:r>
-                  <a:rPr lang="en-US" sz="2400" dirty="0" smtClean="0">
-                    <a:latin typeface="+mn-lt"/>
-                  </a:rPr>
-                  <a:t>&lt;</a:t>
+                  <a:t>.Execute(</a:t>
                 </a:r>
                 <a:r>
                   <a:rPr lang="en-US" sz="2400" dirty="0" err="1" smtClean="0">
@@ -8409,133 +8540,44 @@
                   <a:rPr lang="en-US" sz="2400" dirty="0" smtClean="0">
                     <a:latin typeface="+mn-lt"/>
                   </a:rPr>
-                  <a:t>&gt;</a:t>
+                  <a:t> </a:t>
+                </a:r>
+                <a:r>
+                  <a:rPr lang="en-US" sz="2400" dirty="0" err="1" smtClean="0">
+                    <a:latin typeface="+mn-lt"/>
+                  </a:rPr>
+                  <a:t>param</a:t>
+                </a:r>
+                <a:r>
+                  <a:rPr lang="en-US" sz="2400" dirty="0" smtClean="0">
+                    <a:latin typeface="+mn-lt"/>
+                  </a:rPr>
+                  <a:t>)</a:t>
                 </a:r>
               </a:p>
-            </p:txBody>
-          </p:sp>
-          <p:sp>
-            <p:nvSpPr>
-              <p:cNvPr id="13" name="TextBox 12"/>
-              <p:cNvSpPr txBox="1"/>
-              <p:nvPr/>
-            </p:nvSpPr>
-            <p:spPr>
-              <a:xfrm>
-                <a:off x="990600" y="3505200"/>
-                <a:ext cx="338554" cy="461665"/>
-              </a:xfrm>
-              <a:prstGeom prst="rect">
-                <a:avLst/>
-              </a:prstGeom>
-              <a:noFill/>
-            </p:spPr>
-            <p:txBody>
-              <a:bodyPr wrap="none" rtlCol="0">
-                <a:spAutoFit/>
-              </a:bodyPr>
-              <a:lstStyle/>
+              <a:p>
+                <a:r>
+                  <a:rPr lang="en-US" sz="2400" dirty="0" smtClean="0"/>
+                  <a:t>{</a:t>
+                </a:r>
+              </a:p>
+              <a:p>
+                <a:r>
+                  <a:rPr lang="en-US" sz="2400" dirty="0" smtClean="0"/>
+                  <a:t>    //do something here</a:t>
+                </a:r>
+              </a:p>
               <a:p>
                 <a:r>
                   <a:rPr lang="en-US" sz="2400" dirty="0" smtClean="0">
                     <a:latin typeface="+mn-lt"/>
                   </a:rPr>
-                  <a:t>=</a:t>
+                  <a:t>}</a:t>
                 </a:r>
               </a:p>
             </p:txBody>
           </p:sp>
         </p:grpSp>
-        <p:sp>
-          <p:nvSpPr>
-            <p:cNvPr id="17" name="TextBox 16"/>
-            <p:cNvSpPr txBox="1"/>
-            <p:nvPr/>
-          </p:nvSpPr>
-          <p:spPr>
-            <a:xfrm>
-              <a:off x="1355591" y="3962400"/>
-              <a:ext cx="6645410" cy="1569660"/>
-            </a:xfrm>
-            <a:prstGeom prst="rect">
-              <a:avLst/>
-            </a:prstGeom>
-          </p:spPr>
-          <p:style>
-            <a:lnRef idx="2">
-              <a:schemeClr val="accent2">
-                <a:shade val="50000"/>
-              </a:schemeClr>
-            </a:lnRef>
-            <a:fillRef idx="1">
-              <a:schemeClr val="accent2"/>
-            </a:fillRef>
-            <a:effectRef idx="0">
-              <a:schemeClr val="accent2"/>
-            </a:effectRef>
-            <a:fontRef idx="minor">
-              <a:schemeClr val="lt1"/>
-            </a:fontRef>
-          </p:style>
-          <p:txBody>
-            <a:bodyPr wrap="square" rtlCol="0">
-              <a:spAutoFit/>
-            </a:bodyPr>
-            <a:lstStyle/>
-            <a:p>
-              <a:r>
-                <a:rPr lang="en-US" sz="2400" dirty="0" smtClean="0">
-                  <a:latin typeface="+mn-lt"/>
-                </a:rPr>
-                <a:t>.Execute(</a:t>
-              </a:r>
-              <a:r>
-                <a:rPr lang="en-US" sz="2400" dirty="0" err="1" smtClean="0">
-                  <a:latin typeface="+mn-lt"/>
-                </a:rPr>
-                <a:t>CommandDataType</a:t>
-              </a:r>
-              <a:r>
-                <a:rPr lang="en-US" sz="2400" dirty="0" smtClean="0">
-                  <a:latin typeface="+mn-lt"/>
-                </a:rPr>
-                <a:t> </a:t>
-              </a:r>
-              <a:r>
-                <a:rPr lang="en-US" sz="2400" dirty="0" err="1" smtClean="0">
-                  <a:latin typeface="+mn-lt"/>
-                </a:rPr>
-                <a:t>param</a:t>
-              </a:r>
-              <a:r>
-                <a:rPr lang="en-US" sz="2400" dirty="0" smtClean="0">
-                  <a:latin typeface="+mn-lt"/>
-                </a:rPr>
-                <a:t>)</a:t>
-              </a:r>
-            </a:p>
-            <a:p>
-              <a:r>
-                <a:rPr lang="en-US" sz="2400" dirty="0" smtClean="0"/>
-                <a:t>{</a:t>
-              </a:r>
-            </a:p>
-            <a:p>
-              <a:r>
-                <a:rPr lang="en-US" sz="2400" dirty="0" smtClean="0"/>
-                <a:t>    //do something here</a:t>
-              </a:r>
-            </a:p>
-            <a:p>
-              <a:r>
-                <a:rPr lang="en-US" sz="2400" dirty="0" smtClean="0">
-                  <a:latin typeface="+mn-lt"/>
-                </a:rPr>
-                <a:t>}</a:t>
-              </a:r>
-            </a:p>
-          </p:txBody>
-        </p:sp>
       </p:grpSp>
     </p:spTree>
   </p:cSld>
@@ -8934,11 +8976,15 @@
             </a:pPr>
             <a:r>
               <a:rPr lang="en-US" sz="2000" dirty="0" smtClean="0"/>
-              <a:t>Workflow Coupling With </a:t>
+              <a:t>The Real World: Coupling Within </a:t>
             </a:r>
             <a:r>
               <a:rPr lang="en-US" sz="2000" dirty="0" err="1" smtClean="0"/>
               <a:t>ICommand</a:t>
+            </a:r>
+            <a:r>
+              <a:rPr lang="en-US" sz="2000" dirty="0" smtClean="0"/>
+              <a:t> Can Still Be Scary</a:t>
             </a:r>
             <a:endParaRPr lang="en-US" sz="2000" dirty="0" smtClean="0"/>
           </a:p>
@@ -8997,6 +9043,32 @@
           <a:xfrm>
             <a:off x="838200" y="1575550"/>
             <a:ext cx="5638799" cy="4901450"/>
+          </a:xfrm>
+          <a:prstGeom prst="rect">
+            <a:avLst/>
+          </a:prstGeom>
+          <a:noFill/>
+        </p:spPr>
+      </p:pic>
+      <p:pic>
+        <p:nvPicPr>
+          <p:cNvPr id="2" name="Picture 2" descr="C:\Users\derickb\AppData\Local\Microsoft\Windows\Temporary Internet Files\Content.IE5\G2O7H1DK\MPj02622650000[1].jpg"/>
+          <p:cNvPicPr>
+            <a:picLocks noChangeAspect="1" noChangeArrowheads="1"/>
+          </p:cNvPicPr>
+          <p:nvPr/>
+        </p:nvPicPr>
+        <p:blipFill>
+          <a:blip r:embed="rId4"/>
+          <a:srcRect/>
+          <a:stretch>
+            <a:fillRect/>
+          </a:stretch>
+        </p:blipFill>
+        <p:spPr bwMode="auto">
+          <a:xfrm>
+            <a:off x="6629400" y="3657600"/>
+            <a:ext cx="1722702" cy="2590800"/>
           </a:xfrm>
           <a:prstGeom prst="rect">
             <a:avLst/>

</xml_diff>

<commit_message>
deleted a blank slide in the command pattern section
</commit_message>
<xml_diff>
--- a/Decoupling Workflow With App Controler/Decoupling Workflow From Forms.pptx
+++ b/Decoupling Workflow With App Controler/Decoupling Workflow From Forms.pptx
@@ -5,10 +5,10 @@
     <p:sldMasterId id="2147483822" r:id="rId4"/>
   </p:sldMasterIdLst>
   <p:notesMasterIdLst>
-    <p:notesMasterId r:id="rId36"/>
+    <p:notesMasterId r:id="rId35"/>
   </p:notesMasterIdLst>
   <p:handoutMasterIdLst>
-    <p:handoutMasterId r:id="rId37"/>
+    <p:handoutMasterId r:id="rId36"/>
   </p:handoutMasterIdLst>
   <p:sldIdLst>
     <p:sldId id="256" r:id="rId5"/>
@@ -32,26 +32,25 @@
     <p:sldId id="285" r:id="rId23"/>
     <p:sldId id="299" r:id="rId24"/>
     <p:sldId id="300" r:id="rId25"/>
-    <p:sldId id="298" r:id="rId26"/>
-    <p:sldId id="297" r:id="rId27"/>
-    <p:sldId id="276" r:id="rId28"/>
-    <p:sldId id="277" r:id="rId29"/>
-    <p:sldId id="284" r:id="rId30"/>
-    <p:sldId id="292" r:id="rId31"/>
-    <p:sldId id="293" r:id="rId32"/>
-    <p:sldId id="294" r:id="rId33"/>
-    <p:sldId id="259" r:id="rId34"/>
-    <p:sldId id="274" r:id="rId35"/>
+    <p:sldId id="297" r:id="rId26"/>
+    <p:sldId id="276" r:id="rId27"/>
+    <p:sldId id="277" r:id="rId28"/>
+    <p:sldId id="284" r:id="rId29"/>
+    <p:sldId id="292" r:id="rId30"/>
+    <p:sldId id="293" r:id="rId31"/>
+    <p:sldId id="294" r:id="rId32"/>
+    <p:sldId id="259" r:id="rId33"/>
+    <p:sldId id="274" r:id="rId34"/>
   </p:sldIdLst>
   <p:sldSz cx="9144000" cy="6858000" type="screen4x3"/>
   <p:notesSz cx="7010400" cy="9296400"/>
   <p:embeddedFontLst>
     <p:embeddedFont>
       <p:font typeface="Calibri" pitchFamily="34" charset="0"/>
-      <p:regular r:id="rId38"/>
-      <p:bold r:id="rId39"/>
-      <p:italic r:id="rId40"/>
-      <p:boldItalic r:id="rId41"/>
+      <p:regular r:id="rId37"/>
+      <p:bold r:id="rId38"/>
+      <p:italic r:id="rId39"/>
+      <p:boldItalic r:id="rId40"/>
     </p:embeddedFont>
   </p:embeddedFontLst>
   <p:defaultTextStyle>
@@ -1611,7 +1610,7 @@
               <a:pPr>
                 <a:defRPr/>
               </a:pPr>
-              <a:t>23</a:t>
+              <a:t>24</a:t>
             </a:fld>
             <a:endParaRPr lang="en-US"/>
           </a:p>
@@ -1872,7 +1871,7 @@
               <a:pPr>
                 <a:defRPr/>
               </a:pPr>
-              <a:t>26</a:t>
+              <a:t>27</a:t>
             </a:fld>
             <a:endParaRPr lang="en-US"/>
           </a:p>
@@ -1960,93 +1959,6 @@
                 <a:defRPr/>
               </a:pPr>
               <a:t>28</a:t>
-            </a:fld>
-            <a:endParaRPr lang="en-US"/>
-          </a:p>
-        </p:txBody>
-      </p:sp>
-    </p:spTree>
-  </p:cSld>
-  <p:clrMapOvr>
-    <a:masterClrMapping/>
-  </p:clrMapOvr>
-</p:notes>
-</file>
-
-<file path=ppt/notesSlides/notesSlide22.xml><?xml version="1.0" encoding="utf-8"?>
-<p:notes xmlns:a="http://schemas.openxmlformats.org/drawingml/2006/main" xmlns:r="http://schemas.openxmlformats.org/officeDocument/2006/relationships" xmlns:p="http://schemas.openxmlformats.org/presentationml/2006/main">
-  <p:cSld>
-    <p:spTree>
-      <p:nvGrpSpPr>
-        <p:cNvPr id="1" name=""/>
-        <p:cNvGrpSpPr/>
-        <p:nvPr/>
-      </p:nvGrpSpPr>
-      <p:grpSpPr>
-        <a:xfrm>
-          <a:off x="0" y="0"/>
-          <a:ext cx="0" cy="0"/>
-          <a:chOff x="0" y="0"/>
-          <a:chExt cx="0" cy="0"/>
-        </a:xfrm>
-      </p:grpSpPr>
-      <p:sp>
-        <p:nvSpPr>
-          <p:cNvPr id="2" name="Slide Image Placeholder 1"/>
-          <p:cNvSpPr>
-            <a:spLocks noGrp="1" noRot="1" noChangeAspect="1"/>
-          </p:cNvSpPr>
-          <p:nvPr>
-            <p:ph type="sldImg"/>
-          </p:nvPr>
-        </p:nvSpPr>
-        <p:spPr/>
-      </p:sp>
-      <p:sp>
-        <p:nvSpPr>
-          <p:cNvPr id="3" name="Notes Placeholder 2"/>
-          <p:cNvSpPr>
-            <a:spLocks noGrp="1"/>
-          </p:cNvSpPr>
-          <p:nvPr>
-            <p:ph type="body" idx="1"/>
-          </p:nvPr>
-        </p:nvSpPr>
-        <p:spPr/>
-        <p:txBody>
-          <a:bodyPr>
-            <a:normAutofit/>
-          </a:bodyPr>
-          <a:lstStyle/>
-          <a:p>
-            <a:endParaRPr lang="en-US" dirty="0"/>
-          </a:p>
-        </p:txBody>
-      </p:sp>
-      <p:sp>
-        <p:nvSpPr>
-          <p:cNvPr id="4" name="Slide Number Placeholder 3"/>
-          <p:cNvSpPr>
-            <a:spLocks noGrp="1"/>
-          </p:cNvSpPr>
-          <p:nvPr>
-            <p:ph type="sldNum" sz="quarter" idx="10"/>
-          </p:nvPr>
-        </p:nvSpPr>
-        <p:spPr/>
-        <p:txBody>
-          <a:bodyPr/>
-          <a:lstStyle/>
-          <a:p>
-            <a:pPr>
-              <a:defRPr/>
-            </a:pPr>
-            <a:fld id="{1931C8FD-CC35-423B-99F4-64D81D6A80AE}" type="slidenum">
-              <a:rPr lang="en-US" smtClean="0"/>
-              <a:pPr>
-                <a:defRPr/>
-              </a:pPr>
-              <a:t>29</a:t>
             </a:fld>
             <a:endParaRPr lang="en-US"/>
           </a:p>
@@ -8884,96 +8796,6 @@
             <a:pPr eaLnBrk="1" hangingPunct="1">
               <a:buNone/>
             </a:pPr>
-            <a:endParaRPr lang="en-US" sz="2000" dirty="0" smtClean="0"/>
-          </a:p>
-        </p:txBody>
-      </p:sp>
-      <p:sp>
-        <p:nvSpPr>
-          <p:cNvPr id="3074" name="Title 1"/>
-          <p:cNvSpPr>
-            <a:spLocks noGrp="1"/>
-          </p:cNvSpPr>
-          <p:nvPr>
-            <p:ph type="title"/>
-          </p:nvPr>
-        </p:nvSpPr>
-        <p:spPr bwMode="auto">
-          <a:noFill/>
-          <a:ln>
-            <a:miter lim="800000"/>
-            <a:headEnd/>
-            <a:tailEnd/>
-          </a:ln>
-        </p:spPr>
-        <p:txBody>
-          <a:bodyPr vert="horz" wrap="square" lIns="91440" tIns="45720" rIns="91440" bIns="45720" numCol="1" anchor="t" anchorCtr="0" compatLnSpc="1">
-            <a:prstTxWarp prst="textNoShape">
-              <a:avLst/>
-            </a:prstTxWarp>
-          </a:bodyPr>
-          <a:lstStyle/>
-          <a:p>
-            <a:pPr eaLnBrk="1" hangingPunct="1"/>
-            <a:endParaRPr lang="en-US" dirty="0" smtClean="0"/>
-          </a:p>
-        </p:txBody>
-      </p:sp>
-    </p:spTree>
-  </p:cSld>
-  <p:clrMapOvr>
-    <a:masterClrMapping/>
-  </p:clrMapOvr>
-  <p:timing>
-    <p:tnLst>
-      <p:par>
-        <p:cTn id="1" dur="indefinite" restart="never" nodeType="tmRoot"/>
-      </p:par>
-    </p:tnLst>
-  </p:timing>
-</p:sld>
-</file>
-
-<file path=ppt/slides/slide23.xml><?xml version="1.0" encoding="utf-8"?>
-<p:sld xmlns:a="http://schemas.openxmlformats.org/drawingml/2006/main" xmlns:r="http://schemas.openxmlformats.org/officeDocument/2006/relationships" xmlns:p="http://schemas.openxmlformats.org/presentationml/2006/main">
-  <p:cSld>
-    <p:spTree>
-      <p:nvGrpSpPr>
-        <p:cNvPr id="1" name=""/>
-        <p:cNvGrpSpPr/>
-        <p:nvPr/>
-      </p:nvGrpSpPr>
-      <p:grpSpPr>
-        <a:xfrm>
-          <a:off x="0" y="0"/>
-          <a:ext cx="0" cy="0"/>
-          <a:chOff x="0" y="0"/>
-          <a:chExt cx="0" cy="0"/>
-        </a:xfrm>
-      </p:grpSpPr>
-      <p:sp>
-        <p:nvSpPr>
-          <p:cNvPr id="3075" name="Text Placeholder 2"/>
-          <p:cNvSpPr>
-            <a:spLocks noGrp="1"/>
-          </p:cNvSpPr>
-          <p:nvPr>
-            <p:ph type="body" sz="quarter" idx="10"/>
-          </p:nvPr>
-        </p:nvSpPr>
-        <p:spPr>
-          <a:xfrm>
-            <a:off x="685800" y="1066800"/>
-            <a:ext cx="8229600" cy="1219200"/>
-          </a:xfrm>
-        </p:spPr>
-        <p:txBody>
-          <a:bodyPr/>
-          <a:lstStyle/>
-          <a:p>
-            <a:pPr eaLnBrk="1" hangingPunct="1">
-              <a:buNone/>
-            </a:pPr>
             <a:r>
               <a:rPr lang="en-US" sz="2000" dirty="0" smtClean="0"/>
               <a:t>The Real World: Coupling Within </a:t>
@@ -9091,7 +8913,7 @@
 </p:sld>
 </file>
 
-<file path=ppt/slides/slide24.xml><?xml version="1.0" encoding="utf-8"?>
+<file path=ppt/slides/slide23.xml><?xml version="1.0" encoding="utf-8"?>
 <p:sld xmlns:a="http://schemas.openxmlformats.org/drawingml/2006/main" xmlns:r="http://schemas.openxmlformats.org/officeDocument/2006/relationships" xmlns:p="http://schemas.openxmlformats.org/presentationml/2006/main">
   <p:cSld>
     <p:spTree>
@@ -9431,6 +9253,96 @@
 </p:sld>
 </file>
 
+<file path=ppt/slides/slide24.xml><?xml version="1.0" encoding="utf-8"?>
+<p:sld xmlns:a="http://schemas.openxmlformats.org/drawingml/2006/main" xmlns:r="http://schemas.openxmlformats.org/officeDocument/2006/relationships" xmlns:p="http://schemas.openxmlformats.org/presentationml/2006/main">
+  <p:cSld>
+    <p:spTree>
+      <p:nvGrpSpPr>
+        <p:cNvPr id="1" name=""/>
+        <p:cNvGrpSpPr/>
+        <p:nvPr/>
+      </p:nvGrpSpPr>
+      <p:grpSpPr>
+        <a:xfrm>
+          <a:off x="0" y="0"/>
+          <a:ext cx="0" cy="0"/>
+          <a:chOff x="0" y="0"/>
+          <a:chExt cx="0" cy="0"/>
+        </a:xfrm>
+      </p:grpSpPr>
+      <p:sp>
+        <p:nvSpPr>
+          <p:cNvPr id="3075" name="Text Placeholder 2"/>
+          <p:cNvSpPr>
+            <a:spLocks noGrp="1"/>
+          </p:cNvSpPr>
+          <p:nvPr>
+            <p:ph type="body" sz="quarter" idx="10"/>
+          </p:nvPr>
+        </p:nvSpPr>
+        <p:spPr>
+          <a:xfrm>
+            <a:off x="685800" y="1066800"/>
+            <a:ext cx="8229600" cy="1219200"/>
+          </a:xfrm>
+        </p:spPr>
+        <p:txBody>
+          <a:bodyPr/>
+          <a:lstStyle/>
+          <a:p>
+            <a:pPr eaLnBrk="1" hangingPunct="1">
+              <a:buNone/>
+            </a:pPr>
+            <a:endParaRPr lang="en-US" sz="2000" dirty="0" smtClean="0"/>
+          </a:p>
+        </p:txBody>
+      </p:sp>
+      <p:sp>
+        <p:nvSpPr>
+          <p:cNvPr id="3074" name="Title 1"/>
+          <p:cNvSpPr>
+            <a:spLocks noGrp="1"/>
+          </p:cNvSpPr>
+          <p:nvPr>
+            <p:ph type="title"/>
+          </p:nvPr>
+        </p:nvSpPr>
+        <p:spPr bwMode="auto">
+          <a:noFill/>
+          <a:ln>
+            <a:miter lim="800000"/>
+            <a:headEnd/>
+            <a:tailEnd/>
+          </a:ln>
+        </p:spPr>
+        <p:txBody>
+          <a:bodyPr vert="horz" wrap="square" lIns="91440" tIns="45720" rIns="91440" bIns="45720" numCol="1" anchor="t" anchorCtr="0" compatLnSpc="1">
+            <a:prstTxWarp prst="textNoShape">
+              <a:avLst/>
+            </a:prstTxWarp>
+          </a:bodyPr>
+          <a:lstStyle/>
+          <a:p>
+            <a:pPr eaLnBrk="1" hangingPunct="1"/>
+            <a:endParaRPr lang="en-US" dirty="0" smtClean="0"/>
+          </a:p>
+        </p:txBody>
+      </p:sp>
+    </p:spTree>
+  </p:cSld>
+  <p:clrMapOvr>
+    <a:masterClrMapping/>
+  </p:clrMapOvr>
+  <p:timing>
+    <p:tnLst>
+      <p:par>
+        <p:cTn id="1" dur="indefinite" restart="never" nodeType="tmRoot"/>
+      </p:par>
+    </p:tnLst>
+  </p:timing>
+</p:sld>
+</file>
+
 <file path=ppt/slides/slide25.xml><?xml version="1.0" encoding="utf-8"?>
 <p:sld xmlns:a="http://schemas.openxmlformats.org/drawingml/2006/main" xmlns:r="http://schemas.openxmlformats.org/officeDocument/2006/relationships" xmlns:p="http://schemas.openxmlformats.org/presentationml/2006/main">
   <p:cSld>
@@ -9522,96 +9434,6 @@
 </file>
 
 <file path=ppt/slides/slide26.xml><?xml version="1.0" encoding="utf-8"?>
-<p:sld xmlns:a="http://schemas.openxmlformats.org/drawingml/2006/main" xmlns:r="http://schemas.openxmlformats.org/officeDocument/2006/relationships" xmlns:p="http://schemas.openxmlformats.org/presentationml/2006/main">
-  <p:cSld>
-    <p:spTree>
-      <p:nvGrpSpPr>
-        <p:cNvPr id="1" name=""/>
-        <p:cNvGrpSpPr/>
-        <p:nvPr/>
-      </p:nvGrpSpPr>
-      <p:grpSpPr>
-        <a:xfrm>
-          <a:off x="0" y="0"/>
-          <a:ext cx="0" cy="0"/>
-          <a:chOff x="0" y="0"/>
-          <a:chExt cx="0" cy="0"/>
-        </a:xfrm>
-      </p:grpSpPr>
-      <p:sp>
-        <p:nvSpPr>
-          <p:cNvPr id="3075" name="Text Placeholder 2"/>
-          <p:cNvSpPr>
-            <a:spLocks noGrp="1"/>
-          </p:cNvSpPr>
-          <p:nvPr>
-            <p:ph type="body" sz="quarter" idx="10"/>
-          </p:nvPr>
-        </p:nvSpPr>
-        <p:spPr>
-          <a:xfrm>
-            <a:off x="685800" y="1066800"/>
-            <a:ext cx="8229600" cy="1219200"/>
-          </a:xfrm>
-        </p:spPr>
-        <p:txBody>
-          <a:bodyPr/>
-          <a:lstStyle/>
-          <a:p>
-            <a:pPr eaLnBrk="1" hangingPunct="1">
-              <a:buNone/>
-            </a:pPr>
-            <a:endParaRPr lang="en-US" sz="2000" dirty="0" smtClean="0"/>
-          </a:p>
-        </p:txBody>
-      </p:sp>
-      <p:sp>
-        <p:nvSpPr>
-          <p:cNvPr id="3074" name="Title 1"/>
-          <p:cNvSpPr>
-            <a:spLocks noGrp="1"/>
-          </p:cNvSpPr>
-          <p:nvPr>
-            <p:ph type="title"/>
-          </p:nvPr>
-        </p:nvSpPr>
-        <p:spPr bwMode="auto">
-          <a:noFill/>
-          <a:ln>
-            <a:miter lim="800000"/>
-            <a:headEnd/>
-            <a:tailEnd/>
-          </a:ln>
-        </p:spPr>
-        <p:txBody>
-          <a:bodyPr vert="horz" wrap="square" lIns="91440" tIns="45720" rIns="91440" bIns="45720" numCol="1" anchor="t" anchorCtr="0" compatLnSpc="1">
-            <a:prstTxWarp prst="textNoShape">
-              <a:avLst/>
-            </a:prstTxWarp>
-          </a:bodyPr>
-          <a:lstStyle/>
-          <a:p>
-            <a:pPr eaLnBrk="1" hangingPunct="1"/>
-            <a:endParaRPr lang="en-US" dirty="0" smtClean="0"/>
-          </a:p>
-        </p:txBody>
-      </p:sp>
-    </p:spTree>
-  </p:cSld>
-  <p:clrMapOvr>
-    <a:masterClrMapping/>
-  </p:clrMapOvr>
-  <p:timing>
-    <p:tnLst>
-      <p:par>
-        <p:cTn id="1" dur="indefinite" restart="never" nodeType="tmRoot"/>
-      </p:par>
-    </p:tnLst>
-  </p:timing>
-</p:sld>
-</file>
-
-<file path=ppt/slides/slide27.xml><?xml version="1.0" encoding="utf-8"?>
 <p:sld xmlns:a="http://schemas.openxmlformats.org/drawingml/2006/main" xmlns:r="http://schemas.openxmlformats.org/officeDocument/2006/relationships" xmlns:p="http://schemas.openxmlformats.org/presentationml/2006/main">
   <p:cSld>
     <p:spTree>
@@ -9960,6 +9782,96 @@
 </p:sld>
 </file>
 
+<file path=ppt/slides/slide27.xml><?xml version="1.0" encoding="utf-8"?>
+<p:sld xmlns:a="http://schemas.openxmlformats.org/drawingml/2006/main" xmlns:r="http://schemas.openxmlformats.org/officeDocument/2006/relationships" xmlns:p="http://schemas.openxmlformats.org/presentationml/2006/main">
+  <p:cSld>
+    <p:spTree>
+      <p:nvGrpSpPr>
+        <p:cNvPr id="1" name=""/>
+        <p:cNvGrpSpPr/>
+        <p:nvPr/>
+      </p:nvGrpSpPr>
+      <p:grpSpPr>
+        <a:xfrm>
+          <a:off x="0" y="0"/>
+          <a:ext cx="0" cy="0"/>
+          <a:chOff x="0" y="0"/>
+          <a:chExt cx="0" cy="0"/>
+        </a:xfrm>
+      </p:grpSpPr>
+      <p:sp>
+        <p:nvSpPr>
+          <p:cNvPr id="3075" name="Text Placeholder 2"/>
+          <p:cNvSpPr>
+            <a:spLocks noGrp="1"/>
+          </p:cNvSpPr>
+          <p:nvPr>
+            <p:ph type="body" sz="quarter" idx="10"/>
+          </p:nvPr>
+        </p:nvSpPr>
+        <p:spPr>
+          <a:xfrm>
+            <a:off x="685800" y="1066800"/>
+            <a:ext cx="8229600" cy="1219200"/>
+          </a:xfrm>
+        </p:spPr>
+        <p:txBody>
+          <a:bodyPr/>
+          <a:lstStyle/>
+          <a:p>
+            <a:pPr eaLnBrk="1" hangingPunct="1">
+              <a:buNone/>
+            </a:pPr>
+            <a:endParaRPr lang="en-US" sz="2000" dirty="0" smtClean="0"/>
+          </a:p>
+        </p:txBody>
+      </p:sp>
+      <p:sp>
+        <p:nvSpPr>
+          <p:cNvPr id="3074" name="Title 1"/>
+          <p:cNvSpPr>
+            <a:spLocks noGrp="1"/>
+          </p:cNvSpPr>
+          <p:nvPr>
+            <p:ph type="title"/>
+          </p:nvPr>
+        </p:nvSpPr>
+        <p:spPr bwMode="auto">
+          <a:noFill/>
+          <a:ln>
+            <a:miter lim="800000"/>
+            <a:headEnd/>
+            <a:tailEnd/>
+          </a:ln>
+        </p:spPr>
+        <p:txBody>
+          <a:bodyPr vert="horz" wrap="square" lIns="91440" tIns="45720" rIns="91440" bIns="45720" numCol="1" anchor="t" anchorCtr="0" compatLnSpc="1">
+            <a:prstTxWarp prst="textNoShape">
+              <a:avLst/>
+            </a:prstTxWarp>
+          </a:bodyPr>
+          <a:lstStyle/>
+          <a:p>
+            <a:pPr eaLnBrk="1" hangingPunct="1"/>
+            <a:endParaRPr lang="en-US" dirty="0" smtClean="0"/>
+          </a:p>
+        </p:txBody>
+      </p:sp>
+    </p:spTree>
+  </p:cSld>
+  <p:clrMapOvr>
+    <a:masterClrMapping/>
+  </p:clrMapOvr>
+  <p:timing>
+    <p:tnLst>
+      <p:par>
+        <p:cTn id="1" dur="indefinite" restart="never" nodeType="tmRoot"/>
+      </p:par>
+    </p:tnLst>
+  </p:timing>
+</p:sld>
+</file>
+
 <file path=ppt/slides/slide28.xml><?xml version="1.0" encoding="utf-8"?>
 <p:sld xmlns:a="http://schemas.openxmlformats.org/drawingml/2006/main" xmlns:r="http://schemas.openxmlformats.org/officeDocument/2006/relationships" xmlns:p="http://schemas.openxmlformats.org/presentationml/2006/main">
   <p:cSld>
@@ -10069,42 +9981,118 @@
       </p:grpSpPr>
       <p:sp>
         <p:nvSpPr>
-          <p:cNvPr id="3075" name="Text Placeholder 2"/>
+          <p:cNvPr id="6" name="Rectangle 5"/>
+          <p:cNvSpPr/>
+          <p:nvPr/>
+        </p:nvSpPr>
+        <p:spPr>
+          <a:xfrm>
+            <a:off x="0" y="0"/>
+            <a:ext cx="9144000" cy="4648200"/>
+          </a:xfrm>
+          <a:prstGeom prst="rect">
+            <a:avLst/>
+          </a:prstGeom>
+          <a:solidFill>
+            <a:srgbClr val="0069AA"/>
+          </a:solidFill>
+          <a:ln>
+            <a:noFill/>
+          </a:ln>
+        </p:spPr>
+        <p:style>
+          <a:lnRef idx="2">
+            <a:schemeClr val="accent1">
+              <a:shade val="50000"/>
+            </a:schemeClr>
+          </a:lnRef>
+          <a:fillRef idx="1">
+            <a:schemeClr val="accent1"/>
+          </a:fillRef>
+          <a:effectRef idx="0">
+            <a:schemeClr val="accent1"/>
+          </a:effectRef>
+          <a:fontRef idx="minor">
+            <a:schemeClr val="lt1"/>
+          </a:fontRef>
+        </p:style>
+        <p:txBody>
+          <a:bodyPr anchor="ctr"/>
+          <a:lstStyle/>
+          <a:p>
+            <a:pPr algn="ctr">
+              <a:defRPr/>
+            </a:pPr>
+            <a:endParaRPr lang="en-US"/>
+          </a:p>
+        </p:txBody>
+      </p:sp>
+      <p:sp>
+        <p:nvSpPr>
+          <p:cNvPr id="8" name="Rectangle 7"/>
+          <p:cNvSpPr/>
+          <p:nvPr/>
+        </p:nvSpPr>
+        <p:spPr>
+          <a:xfrm>
+            <a:off x="228600" y="0"/>
+            <a:ext cx="104775" cy="3581400"/>
+          </a:xfrm>
+          <a:prstGeom prst="rect">
+            <a:avLst/>
+          </a:prstGeom>
+          <a:solidFill>
+            <a:srgbClr val="E31937"/>
+          </a:solidFill>
+          <a:ln>
+            <a:noFill/>
+          </a:ln>
+        </p:spPr>
+        <p:style>
+          <a:lnRef idx="2">
+            <a:schemeClr val="accent1">
+              <a:shade val="50000"/>
+            </a:schemeClr>
+          </a:lnRef>
+          <a:fillRef idx="1">
+            <a:schemeClr val="accent1"/>
+          </a:fillRef>
+          <a:effectRef idx="0">
+            <a:schemeClr val="accent1"/>
+          </a:effectRef>
+          <a:fontRef idx="minor">
+            <a:schemeClr val="lt1"/>
+          </a:fontRef>
+        </p:style>
+        <p:txBody>
+          <a:bodyPr anchor="ctr"/>
+          <a:lstStyle/>
+          <a:p>
+            <a:pPr algn="ctr">
+              <a:defRPr/>
+            </a:pPr>
+            <a:endParaRPr lang="en-US"/>
+          </a:p>
+        </p:txBody>
+      </p:sp>
+      <p:sp>
+        <p:nvSpPr>
+          <p:cNvPr id="5127" name="Rectangle 8"/>
           <p:cNvSpPr>
-            <a:spLocks noGrp="1"/>
+            <a:spLocks noGrp="1" noChangeArrowheads="1"/>
           </p:cNvSpPr>
           <p:nvPr>
-            <p:ph type="body" sz="quarter" idx="10"/>
+            <p:ph type="title" idx="4294967295"/>
           </p:nvPr>
         </p:nvSpPr>
-        <p:spPr>
+        <p:spPr bwMode="auto">
           <a:xfrm>
-            <a:off x="685800" y="1066800"/>
-            <a:ext cx="8229600" cy="1219200"/>
+            <a:off x="495300" y="200025"/>
+            <a:ext cx="8420100" cy="919163"/>
           </a:xfrm>
-        </p:spPr>
-        <p:txBody>
-          <a:bodyPr/>
-          <a:lstStyle/>
-          <a:p>
-            <a:pPr eaLnBrk="1" hangingPunct="1">
-              <a:buNone/>
-            </a:pPr>
-            <a:endParaRPr lang="en-US" sz="2000" dirty="0" smtClean="0"/>
-          </a:p>
-        </p:txBody>
-      </p:sp>
-      <p:sp>
-        <p:nvSpPr>
-          <p:cNvPr id="3074" name="Title 1"/>
-          <p:cNvSpPr>
-            <a:spLocks noGrp="1"/>
-          </p:cNvSpPr>
-          <p:nvPr>
-            <p:ph type="title"/>
-          </p:nvPr>
-        </p:nvSpPr>
-        <p:spPr bwMode="auto">
+          <a:prstGeom prst="rect">
+            <a:avLst/>
+          </a:prstGeom>
           <a:noFill/>
           <a:ln>
             <a:miter lim="800000"/>
@@ -10113,18 +10101,398 @@
           </a:ln>
         </p:spPr>
         <p:txBody>
-          <a:bodyPr vert="horz" wrap="square" lIns="91440" tIns="45720" rIns="91440" bIns="45720" numCol="1" anchor="t" anchorCtr="0" compatLnSpc="1">
-            <a:prstTxWarp prst="textNoShape">
-              <a:avLst/>
-            </a:prstTxWarp>
+          <a:bodyPr/>
+          <a:lstStyle/>
+          <a:p>
+            <a:pPr eaLnBrk="1" hangingPunct="1"/>
+            <a:r>
+              <a:rPr lang="en-US" dirty="0" smtClean="0">
+                <a:solidFill>
+                  <a:schemeClr val="bg1"/>
+                </a:solidFill>
+              </a:rPr>
+              <a:t>Additional Resources</a:t>
+            </a:r>
+          </a:p>
+        </p:txBody>
+      </p:sp>
+      <p:sp>
+        <p:nvSpPr>
+          <p:cNvPr id="5128" name="Rectangle 9"/>
+          <p:cNvSpPr>
+            <a:spLocks noGrp="1" noChangeArrowheads="1"/>
+          </p:cNvSpPr>
+          <p:nvPr>
+            <p:ph idx="4294967295"/>
+          </p:nvPr>
+        </p:nvSpPr>
+        <p:spPr>
+          <a:xfrm>
+            <a:off x="514350" y="1143000"/>
+            <a:ext cx="8229600" cy="3429000"/>
+          </a:xfrm>
+        </p:spPr>
+        <p:txBody>
+          <a:bodyPr/>
+          <a:lstStyle/>
+          <a:p>
+            <a:pPr eaLnBrk="1" hangingPunct="1">
+              <a:lnSpc>
+                <a:spcPct val="80000"/>
+              </a:lnSpc>
+              <a:buNone/>
+            </a:pPr>
+            <a:r>
+              <a:rPr lang="en-US" sz="2000" dirty="0" smtClean="0">
+                <a:solidFill>
+                  <a:schemeClr val="bg1"/>
+                </a:solidFill>
+              </a:rPr>
+              <a:t>Command Pattern</a:t>
+            </a:r>
+          </a:p>
+          <a:p>
+            <a:pPr eaLnBrk="1" hangingPunct="1">
+              <a:lnSpc>
+                <a:spcPct val="80000"/>
+              </a:lnSpc>
+              <a:buNone/>
+            </a:pPr>
+            <a:r>
+              <a:rPr lang="en-US" sz="2000" dirty="0" smtClean="0">
+                <a:solidFill>
+                  <a:schemeClr val="bg1"/>
+                </a:solidFill>
+              </a:rPr>
+              <a:t>	http://www.lostechies.com/blogs/derickbailey/archive/2008/11/19/ptom-command-and-conquer-your-ui-coupling-problems.aspx </a:t>
+            </a:r>
+            <a:br>
+              <a:rPr lang="en-US" sz="2000" dirty="0" smtClean="0">
+                <a:solidFill>
+                  <a:schemeClr val="bg1"/>
+                </a:solidFill>
+              </a:rPr>
+            </a:br>
+            <a:endParaRPr lang="en-US" sz="2000" dirty="0" smtClean="0">
+              <a:solidFill>
+                <a:schemeClr val="bg1"/>
+              </a:solidFill>
+            </a:endParaRPr>
+          </a:p>
+          <a:p>
+            <a:pPr eaLnBrk="1" hangingPunct="1">
+              <a:lnSpc>
+                <a:spcPct val="80000"/>
+              </a:lnSpc>
+              <a:buNone/>
+            </a:pPr>
+            <a:r>
+              <a:rPr lang="en-US" sz="2000" dirty="0" smtClean="0">
+                <a:solidFill>
+                  <a:schemeClr val="bg1"/>
+                </a:solidFill>
+              </a:rPr>
+              <a:t>Event Aggregator</a:t>
+            </a:r>
+            <a:br>
+              <a:rPr lang="en-US" sz="2000" dirty="0" smtClean="0">
+                <a:solidFill>
+                  <a:schemeClr val="bg1"/>
+                </a:solidFill>
+              </a:rPr>
+            </a:br>
+            <a:r>
+              <a:rPr lang="en-US" sz="2000" dirty="0" smtClean="0">
+                <a:solidFill>
+                  <a:schemeClr val="bg1"/>
+                </a:solidFill>
+              </a:rPr>
+              <a:t>http://www.martinfowler.com/eaaDev/EventAggregator.html</a:t>
+            </a:r>
+            <a:br>
+              <a:rPr lang="en-US" sz="2000" dirty="0" smtClean="0">
+                <a:solidFill>
+                  <a:schemeClr val="bg1"/>
+                </a:solidFill>
+              </a:rPr>
+            </a:br>
+            <a:endParaRPr lang="en-US" sz="2000" dirty="0" smtClean="0">
+              <a:solidFill>
+                <a:schemeClr val="bg1"/>
+              </a:solidFill>
+            </a:endParaRPr>
+          </a:p>
+          <a:p>
+            <a:pPr eaLnBrk="1" hangingPunct="1">
+              <a:lnSpc>
+                <a:spcPct val="80000"/>
+              </a:lnSpc>
+              <a:buNone/>
+            </a:pPr>
+            <a:r>
+              <a:rPr lang="en-US" sz="2000" dirty="0" err="1" smtClean="0">
+                <a:solidFill>
+                  <a:schemeClr val="bg1"/>
+                </a:solidFill>
+              </a:rPr>
+              <a:t>IoC</a:t>
+            </a:r>
+            <a:r>
+              <a:rPr lang="en-US" sz="2000" dirty="0" smtClean="0">
+                <a:solidFill>
+                  <a:schemeClr val="bg1"/>
+                </a:solidFill>
+              </a:rPr>
+              <a:t> Container (</a:t>
+            </a:r>
+            <a:r>
+              <a:rPr lang="en-US" sz="2000" dirty="0" err="1" smtClean="0">
+                <a:solidFill>
+                  <a:schemeClr val="bg1"/>
+                </a:solidFill>
+              </a:rPr>
+              <a:t>StructureMap</a:t>
+            </a:r>
+            <a:r>
+              <a:rPr lang="en-US" sz="2000" dirty="0" smtClean="0">
+                <a:solidFill>
+                  <a:schemeClr val="bg1"/>
+                </a:solidFill>
+              </a:rPr>
+              <a:t>)</a:t>
+            </a:r>
+          </a:p>
+          <a:p>
+            <a:pPr eaLnBrk="1" hangingPunct="1">
+              <a:lnSpc>
+                <a:spcPct val="80000"/>
+              </a:lnSpc>
+              <a:buNone/>
+            </a:pPr>
+            <a:r>
+              <a:rPr lang="en-US" sz="2000" dirty="0" smtClean="0">
+                <a:solidFill>
+                  <a:schemeClr val="bg1"/>
+                </a:solidFill>
+              </a:rPr>
+              <a:t>	http://structuremap.sourceforge.net</a:t>
+            </a:r>
+            <a:br>
+              <a:rPr lang="en-US" sz="2000" dirty="0" smtClean="0">
+                <a:solidFill>
+                  <a:schemeClr val="bg1"/>
+                </a:solidFill>
+              </a:rPr>
+            </a:br>
+            <a:endParaRPr lang="en-US" sz="2000" dirty="0" smtClean="0">
+              <a:solidFill>
+                <a:schemeClr val="bg1"/>
+              </a:solidFill>
+            </a:endParaRPr>
+          </a:p>
+          <a:p>
+            <a:pPr eaLnBrk="1" hangingPunct="1">
+              <a:lnSpc>
+                <a:spcPct val="80000"/>
+              </a:lnSpc>
+              <a:buNone/>
+            </a:pPr>
+            <a:r>
+              <a:rPr lang="en-US" sz="2000" dirty="0" smtClean="0">
+                <a:solidFill>
+                  <a:schemeClr val="bg1"/>
+                </a:solidFill>
+              </a:rPr>
+              <a:t>Application Controller</a:t>
+            </a:r>
+          </a:p>
+          <a:p>
+            <a:pPr eaLnBrk="1" hangingPunct="1">
+              <a:lnSpc>
+                <a:spcPct val="80000"/>
+              </a:lnSpc>
+              <a:buNone/>
+            </a:pPr>
+            <a:r>
+              <a:rPr lang="en-US" sz="2000" dirty="0" smtClean="0">
+                <a:solidFill>
+                  <a:schemeClr val="bg1"/>
+                </a:solidFill>
+              </a:rPr>
+              <a:t>	http://www.martinfowler.com/eaaCatalog/applicationController.html</a:t>
+            </a:r>
+            <a:br>
+              <a:rPr lang="en-US" sz="2000" dirty="0" smtClean="0">
+                <a:solidFill>
+                  <a:schemeClr val="bg1"/>
+                </a:solidFill>
+              </a:rPr>
+            </a:br>
+            <a:endParaRPr lang="en-US" sz="2000" dirty="0" smtClean="0">
+              <a:solidFill>
+                <a:schemeClr val="bg1"/>
+              </a:solidFill>
+            </a:endParaRPr>
+          </a:p>
+        </p:txBody>
+      </p:sp>
+      <p:sp>
+        <p:nvSpPr>
+          <p:cNvPr id="5129" name="Text Box 7"/>
+          <p:cNvSpPr txBox="1">
+            <a:spLocks noChangeArrowheads="1"/>
+          </p:cNvSpPr>
+          <p:nvPr/>
+        </p:nvSpPr>
+        <p:spPr bwMode="auto">
+          <a:xfrm>
+            <a:off x="5470525" y="1331913"/>
+            <a:ext cx="184150" cy="366712"/>
+          </a:xfrm>
+          <a:prstGeom prst="rect">
+            <a:avLst/>
+          </a:prstGeom>
+          <a:noFill/>
+          <a:ln w="9525">
+            <a:noFill/>
+            <a:miter lim="800000"/>
+            <a:headEnd/>
+            <a:tailEnd/>
+          </a:ln>
+        </p:spPr>
+        <p:txBody>
+          <a:bodyPr wrap="none">
+            <a:spAutoFit/>
           </a:bodyPr>
           <a:lstStyle/>
           <a:p>
-            <a:pPr eaLnBrk="1" hangingPunct="1"/>
-            <a:endParaRPr lang="en-US" dirty="0" smtClean="0"/>
-          </a:p>
-        </p:txBody>
-      </p:sp>
+            <a:endParaRPr lang="en-US"/>
+          </a:p>
+        </p:txBody>
+      </p:sp>
+      <p:pic>
+        <p:nvPicPr>
+          <p:cNvPr id="16" name="Picture 4" descr="MAT logo 1 CMYK"/>
+          <p:cNvPicPr>
+            <a:picLocks noChangeAspect="1" noChangeArrowheads="1"/>
+          </p:cNvPicPr>
+          <p:nvPr/>
+        </p:nvPicPr>
+        <p:blipFill>
+          <a:blip r:embed="rId2">
+            <a:clrChange>
+              <a:clrFrom>
+                <a:srgbClr val="FDFDFD"/>
+              </a:clrFrom>
+              <a:clrTo>
+                <a:srgbClr val="FDFDFD">
+                  <a:alpha val="0"/>
+                </a:srgbClr>
+              </a:clrTo>
+            </a:clrChange>
+          </a:blip>
+          <a:srcRect/>
+          <a:stretch>
+            <a:fillRect/>
+          </a:stretch>
+        </p:blipFill>
+        <p:spPr bwMode="auto">
+          <a:xfrm>
+            <a:off x="2971800" y="4800600"/>
+            <a:ext cx="2819400" cy="1338263"/>
+          </a:xfrm>
+          <a:prstGeom prst="rect">
+            <a:avLst/>
+          </a:prstGeom>
+          <a:noFill/>
+          <a:ln w="9525">
+            <a:noFill/>
+            <a:miter lim="800000"/>
+            <a:headEnd/>
+            <a:tailEnd/>
+          </a:ln>
+        </p:spPr>
+      </p:pic>
+      <p:sp>
+        <p:nvSpPr>
+          <p:cNvPr id="17" name="Rectangle 16"/>
+          <p:cNvSpPr/>
+          <p:nvPr/>
+        </p:nvSpPr>
+        <p:spPr>
+          <a:xfrm>
+            <a:off x="0" y="4724400"/>
+            <a:ext cx="9144000" cy="2133600"/>
+          </a:xfrm>
+          <a:prstGeom prst="rect">
+            <a:avLst/>
+          </a:prstGeom>
+          <a:solidFill>
+            <a:srgbClr val="E31937"/>
+          </a:solidFill>
+          <a:ln>
+            <a:noFill/>
+          </a:ln>
+        </p:spPr>
+        <p:style>
+          <a:lnRef idx="2">
+            <a:schemeClr val="accent1">
+              <a:shade val="50000"/>
+            </a:schemeClr>
+          </a:lnRef>
+          <a:fillRef idx="1">
+            <a:schemeClr val="accent1"/>
+          </a:fillRef>
+          <a:effectRef idx="0">
+            <a:schemeClr val="accent1"/>
+          </a:effectRef>
+          <a:fontRef idx="minor">
+            <a:schemeClr val="lt1"/>
+          </a:fontRef>
+        </p:style>
+        <p:txBody>
+          <a:bodyPr anchor="ctr"/>
+          <a:lstStyle/>
+          <a:p>
+            <a:pPr algn="ctr">
+              <a:defRPr/>
+            </a:pPr>
+            <a:endParaRPr lang="en-US"/>
+          </a:p>
+        </p:txBody>
+      </p:sp>
+      <p:pic>
+        <p:nvPicPr>
+          <p:cNvPr id="18" name="Picture 7" descr="MAT logo vertical_red.emf"/>
+          <p:cNvPicPr>
+            <a:picLocks noChangeAspect="1"/>
+          </p:cNvPicPr>
+          <p:nvPr/>
+        </p:nvPicPr>
+        <p:blipFill>
+          <a:blip r:embed="rId3"/>
+          <a:srcRect/>
+          <a:stretch>
+            <a:fillRect/>
+          </a:stretch>
+        </p:blipFill>
+        <p:spPr bwMode="auto">
+          <a:xfrm>
+            <a:off x="3600450" y="5334000"/>
+            <a:ext cx="1981200" cy="969963"/>
+          </a:xfrm>
+          <a:prstGeom prst="rect">
+            <a:avLst/>
+          </a:prstGeom>
+          <a:noFill/>
+          <a:ln w="9525">
+            <a:noFill/>
+            <a:miter lim="800000"/>
+            <a:headEnd/>
+            <a:tailEnd/>
+          </a:ln>
+        </p:spPr>
+      </p:pic>
     </p:spTree>
   </p:cSld>
   <p:clrMapOvr>
@@ -10286,552 +10654,6 @@
 </file>
 
 <file path=ppt/slides/slide30.xml><?xml version="1.0" encoding="utf-8"?>
-<p:sld xmlns:a="http://schemas.openxmlformats.org/drawingml/2006/main" xmlns:r="http://schemas.openxmlformats.org/officeDocument/2006/relationships" xmlns:p="http://schemas.openxmlformats.org/presentationml/2006/main">
-  <p:cSld>
-    <p:spTree>
-      <p:nvGrpSpPr>
-        <p:cNvPr id="1" name=""/>
-        <p:cNvGrpSpPr/>
-        <p:nvPr/>
-      </p:nvGrpSpPr>
-      <p:grpSpPr>
-        <a:xfrm>
-          <a:off x="0" y="0"/>
-          <a:ext cx="0" cy="0"/>
-          <a:chOff x="0" y="0"/>
-          <a:chExt cx="0" cy="0"/>
-        </a:xfrm>
-      </p:grpSpPr>
-      <p:sp>
-        <p:nvSpPr>
-          <p:cNvPr id="6" name="Rectangle 5"/>
-          <p:cNvSpPr/>
-          <p:nvPr/>
-        </p:nvSpPr>
-        <p:spPr>
-          <a:xfrm>
-            <a:off x="0" y="0"/>
-            <a:ext cx="9144000" cy="4648200"/>
-          </a:xfrm>
-          <a:prstGeom prst="rect">
-            <a:avLst/>
-          </a:prstGeom>
-          <a:solidFill>
-            <a:srgbClr val="0069AA"/>
-          </a:solidFill>
-          <a:ln>
-            <a:noFill/>
-          </a:ln>
-        </p:spPr>
-        <p:style>
-          <a:lnRef idx="2">
-            <a:schemeClr val="accent1">
-              <a:shade val="50000"/>
-            </a:schemeClr>
-          </a:lnRef>
-          <a:fillRef idx="1">
-            <a:schemeClr val="accent1"/>
-          </a:fillRef>
-          <a:effectRef idx="0">
-            <a:schemeClr val="accent1"/>
-          </a:effectRef>
-          <a:fontRef idx="minor">
-            <a:schemeClr val="lt1"/>
-          </a:fontRef>
-        </p:style>
-        <p:txBody>
-          <a:bodyPr anchor="ctr"/>
-          <a:lstStyle/>
-          <a:p>
-            <a:pPr algn="ctr">
-              <a:defRPr/>
-            </a:pPr>
-            <a:endParaRPr lang="en-US"/>
-          </a:p>
-        </p:txBody>
-      </p:sp>
-      <p:sp>
-        <p:nvSpPr>
-          <p:cNvPr id="8" name="Rectangle 7"/>
-          <p:cNvSpPr/>
-          <p:nvPr/>
-        </p:nvSpPr>
-        <p:spPr>
-          <a:xfrm>
-            <a:off x="228600" y="0"/>
-            <a:ext cx="104775" cy="3581400"/>
-          </a:xfrm>
-          <a:prstGeom prst="rect">
-            <a:avLst/>
-          </a:prstGeom>
-          <a:solidFill>
-            <a:srgbClr val="E31937"/>
-          </a:solidFill>
-          <a:ln>
-            <a:noFill/>
-          </a:ln>
-        </p:spPr>
-        <p:style>
-          <a:lnRef idx="2">
-            <a:schemeClr val="accent1">
-              <a:shade val="50000"/>
-            </a:schemeClr>
-          </a:lnRef>
-          <a:fillRef idx="1">
-            <a:schemeClr val="accent1"/>
-          </a:fillRef>
-          <a:effectRef idx="0">
-            <a:schemeClr val="accent1"/>
-          </a:effectRef>
-          <a:fontRef idx="minor">
-            <a:schemeClr val="lt1"/>
-          </a:fontRef>
-        </p:style>
-        <p:txBody>
-          <a:bodyPr anchor="ctr"/>
-          <a:lstStyle/>
-          <a:p>
-            <a:pPr algn="ctr">
-              <a:defRPr/>
-            </a:pPr>
-            <a:endParaRPr lang="en-US"/>
-          </a:p>
-        </p:txBody>
-      </p:sp>
-      <p:sp>
-        <p:nvSpPr>
-          <p:cNvPr id="5127" name="Rectangle 8"/>
-          <p:cNvSpPr>
-            <a:spLocks noGrp="1" noChangeArrowheads="1"/>
-          </p:cNvSpPr>
-          <p:nvPr>
-            <p:ph type="title" idx="4294967295"/>
-          </p:nvPr>
-        </p:nvSpPr>
-        <p:spPr bwMode="auto">
-          <a:xfrm>
-            <a:off x="495300" y="200025"/>
-            <a:ext cx="8420100" cy="919163"/>
-          </a:xfrm>
-          <a:prstGeom prst="rect">
-            <a:avLst/>
-          </a:prstGeom>
-          <a:noFill/>
-          <a:ln>
-            <a:miter lim="800000"/>
-            <a:headEnd/>
-            <a:tailEnd/>
-          </a:ln>
-        </p:spPr>
-        <p:txBody>
-          <a:bodyPr/>
-          <a:lstStyle/>
-          <a:p>
-            <a:pPr eaLnBrk="1" hangingPunct="1"/>
-            <a:r>
-              <a:rPr lang="en-US" dirty="0" smtClean="0">
-                <a:solidFill>
-                  <a:schemeClr val="bg1"/>
-                </a:solidFill>
-              </a:rPr>
-              <a:t>Additional Resources</a:t>
-            </a:r>
-          </a:p>
-        </p:txBody>
-      </p:sp>
-      <p:sp>
-        <p:nvSpPr>
-          <p:cNvPr id="5128" name="Rectangle 9"/>
-          <p:cNvSpPr>
-            <a:spLocks noGrp="1" noChangeArrowheads="1"/>
-          </p:cNvSpPr>
-          <p:nvPr>
-            <p:ph idx="4294967295"/>
-          </p:nvPr>
-        </p:nvSpPr>
-        <p:spPr>
-          <a:xfrm>
-            <a:off x="514350" y="1143000"/>
-            <a:ext cx="8229600" cy="3429000"/>
-          </a:xfrm>
-        </p:spPr>
-        <p:txBody>
-          <a:bodyPr/>
-          <a:lstStyle/>
-          <a:p>
-            <a:pPr eaLnBrk="1" hangingPunct="1">
-              <a:lnSpc>
-                <a:spcPct val="80000"/>
-              </a:lnSpc>
-              <a:buNone/>
-            </a:pPr>
-            <a:r>
-              <a:rPr lang="en-US" sz="2000" dirty="0" smtClean="0">
-                <a:solidFill>
-                  <a:schemeClr val="bg1"/>
-                </a:solidFill>
-              </a:rPr>
-              <a:t>Command Pattern</a:t>
-            </a:r>
-          </a:p>
-          <a:p>
-            <a:pPr eaLnBrk="1" hangingPunct="1">
-              <a:lnSpc>
-                <a:spcPct val="80000"/>
-              </a:lnSpc>
-              <a:buNone/>
-            </a:pPr>
-            <a:r>
-              <a:rPr lang="en-US" sz="2000" dirty="0" smtClean="0">
-                <a:solidFill>
-                  <a:schemeClr val="bg1"/>
-                </a:solidFill>
-              </a:rPr>
-              <a:t>	http://www.lostechies.com/blogs/derickbailey/archive/2008/11/19/ptom-command-and-conquer-your-ui-coupling-problems.aspx </a:t>
-            </a:r>
-            <a:br>
-              <a:rPr lang="en-US" sz="2000" dirty="0" smtClean="0">
-                <a:solidFill>
-                  <a:schemeClr val="bg1"/>
-                </a:solidFill>
-              </a:rPr>
-            </a:br>
-            <a:endParaRPr lang="en-US" sz="2000" dirty="0" smtClean="0">
-              <a:solidFill>
-                <a:schemeClr val="bg1"/>
-              </a:solidFill>
-            </a:endParaRPr>
-          </a:p>
-          <a:p>
-            <a:pPr eaLnBrk="1" hangingPunct="1">
-              <a:lnSpc>
-                <a:spcPct val="80000"/>
-              </a:lnSpc>
-              <a:buNone/>
-            </a:pPr>
-            <a:r>
-              <a:rPr lang="en-US" sz="2000" dirty="0" smtClean="0">
-                <a:solidFill>
-                  <a:schemeClr val="bg1"/>
-                </a:solidFill>
-              </a:rPr>
-              <a:t>Event Aggregator</a:t>
-            </a:r>
-            <a:br>
-              <a:rPr lang="en-US" sz="2000" dirty="0" smtClean="0">
-                <a:solidFill>
-                  <a:schemeClr val="bg1"/>
-                </a:solidFill>
-              </a:rPr>
-            </a:br>
-            <a:r>
-              <a:rPr lang="en-US" sz="2000" dirty="0" smtClean="0">
-                <a:solidFill>
-                  <a:schemeClr val="bg1"/>
-                </a:solidFill>
-              </a:rPr>
-              <a:t>http://www.martinfowler.com/eaaDev/EventAggregator.html</a:t>
-            </a:r>
-            <a:br>
-              <a:rPr lang="en-US" sz="2000" dirty="0" smtClean="0">
-                <a:solidFill>
-                  <a:schemeClr val="bg1"/>
-                </a:solidFill>
-              </a:rPr>
-            </a:br>
-            <a:endParaRPr lang="en-US" sz="2000" dirty="0" smtClean="0">
-              <a:solidFill>
-                <a:schemeClr val="bg1"/>
-              </a:solidFill>
-            </a:endParaRPr>
-          </a:p>
-          <a:p>
-            <a:pPr eaLnBrk="1" hangingPunct="1">
-              <a:lnSpc>
-                <a:spcPct val="80000"/>
-              </a:lnSpc>
-              <a:buNone/>
-            </a:pPr>
-            <a:r>
-              <a:rPr lang="en-US" sz="2000" dirty="0" err="1" smtClean="0">
-                <a:solidFill>
-                  <a:schemeClr val="bg1"/>
-                </a:solidFill>
-              </a:rPr>
-              <a:t>IoC</a:t>
-            </a:r>
-            <a:r>
-              <a:rPr lang="en-US" sz="2000" dirty="0" smtClean="0">
-                <a:solidFill>
-                  <a:schemeClr val="bg1"/>
-                </a:solidFill>
-              </a:rPr>
-              <a:t> Container (</a:t>
-            </a:r>
-            <a:r>
-              <a:rPr lang="en-US" sz="2000" dirty="0" err="1" smtClean="0">
-                <a:solidFill>
-                  <a:schemeClr val="bg1"/>
-                </a:solidFill>
-              </a:rPr>
-              <a:t>StructureMap</a:t>
-            </a:r>
-            <a:r>
-              <a:rPr lang="en-US" sz="2000" dirty="0" smtClean="0">
-                <a:solidFill>
-                  <a:schemeClr val="bg1"/>
-                </a:solidFill>
-              </a:rPr>
-              <a:t>)</a:t>
-            </a:r>
-          </a:p>
-          <a:p>
-            <a:pPr eaLnBrk="1" hangingPunct="1">
-              <a:lnSpc>
-                <a:spcPct val="80000"/>
-              </a:lnSpc>
-              <a:buNone/>
-            </a:pPr>
-            <a:r>
-              <a:rPr lang="en-US" sz="2000" dirty="0" smtClean="0">
-                <a:solidFill>
-                  <a:schemeClr val="bg1"/>
-                </a:solidFill>
-              </a:rPr>
-              <a:t>	http://structuremap.sourceforge.net</a:t>
-            </a:r>
-            <a:br>
-              <a:rPr lang="en-US" sz="2000" dirty="0" smtClean="0">
-                <a:solidFill>
-                  <a:schemeClr val="bg1"/>
-                </a:solidFill>
-              </a:rPr>
-            </a:br>
-            <a:endParaRPr lang="en-US" sz="2000" dirty="0" smtClean="0">
-              <a:solidFill>
-                <a:schemeClr val="bg1"/>
-              </a:solidFill>
-            </a:endParaRPr>
-          </a:p>
-          <a:p>
-            <a:pPr eaLnBrk="1" hangingPunct="1">
-              <a:lnSpc>
-                <a:spcPct val="80000"/>
-              </a:lnSpc>
-              <a:buNone/>
-            </a:pPr>
-            <a:r>
-              <a:rPr lang="en-US" sz="2000" dirty="0" smtClean="0">
-                <a:solidFill>
-                  <a:schemeClr val="bg1"/>
-                </a:solidFill>
-              </a:rPr>
-              <a:t>Application Controller</a:t>
-            </a:r>
-          </a:p>
-          <a:p>
-            <a:pPr eaLnBrk="1" hangingPunct="1">
-              <a:lnSpc>
-                <a:spcPct val="80000"/>
-              </a:lnSpc>
-              <a:buNone/>
-            </a:pPr>
-            <a:r>
-              <a:rPr lang="en-US" sz="2000" dirty="0" smtClean="0">
-                <a:solidFill>
-                  <a:schemeClr val="bg1"/>
-                </a:solidFill>
-              </a:rPr>
-              <a:t>	http://www.martinfowler.com/eaaCatalog/applicationController.html</a:t>
-            </a:r>
-            <a:br>
-              <a:rPr lang="en-US" sz="2000" dirty="0" smtClean="0">
-                <a:solidFill>
-                  <a:schemeClr val="bg1"/>
-                </a:solidFill>
-              </a:rPr>
-            </a:br>
-            <a:endParaRPr lang="en-US" sz="2000" dirty="0" smtClean="0">
-              <a:solidFill>
-                <a:schemeClr val="bg1"/>
-              </a:solidFill>
-            </a:endParaRPr>
-          </a:p>
-        </p:txBody>
-      </p:sp>
-      <p:sp>
-        <p:nvSpPr>
-          <p:cNvPr id="5129" name="Text Box 7"/>
-          <p:cNvSpPr txBox="1">
-            <a:spLocks noChangeArrowheads="1"/>
-          </p:cNvSpPr>
-          <p:nvPr/>
-        </p:nvSpPr>
-        <p:spPr bwMode="auto">
-          <a:xfrm>
-            <a:off x="5470525" y="1331913"/>
-            <a:ext cx="184150" cy="366712"/>
-          </a:xfrm>
-          <a:prstGeom prst="rect">
-            <a:avLst/>
-          </a:prstGeom>
-          <a:noFill/>
-          <a:ln w="9525">
-            <a:noFill/>
-            <a:miter lim="800000"/>
-            <a:headEnd/>
-            <a:tailEnd/>
-          </a:ln>
-        </p:spPr>
-        <p:txBody>
-          <a:bodyPr wrap="none">
-            <a:spAutoFit/>
-          </a:bodyPr>
-          <a:lstStyle/>
-          <a:p>
-            <a:endParaRPr lang="en-US"/>
-          </a:p>
-        </p:txBody>
-      </p:sp>
-      <p:pic>
-        <p:nvPicPr>
-          <p:cNvPr id="16" name="Picture 4" descr="MAT logo 1 CMYK"/>
-          <p:cNvPicPr>
-            <a:picLocks noChangeAspect="1" noChangeArrowheads="1"/>
-          </p:cNvPicPr>
-          <p:nvPr/>
-        </p:nvPicPr>
-        <p:blipFill>
-          <a:blip r:embed="rId2">
-            <a:clrChange>
-              <a:clrFrom>
-                <a:srgbClr val="FDFDFD"/>
-              </a:clrFrom>
-              <a:clrTo>
-                <a:srgbClr val="FDFDFD">
-                  <a:alpha val="0"/>
-                </a:srgbClr>
-              </a:clrTo>
-            </a:clrChange>
-          </a:blip>
-          <a:srcRect/>
-          <a:stretch>
-            <a:fillRect/>
-          </a:stretch>
-        </p:blipFill>
-        <p:spPr bwMode="auto">
-          <a:xfrm>
-            <a:off x="2971800" y="4800600"/>
-            <a:ext cx="2819400" cy="1338263"/>
-          </a:xfrm>
-          <a:prstGeom prst="rect">
-            <a:avLst/>
-          </a:prstGeom>
-          <a:noFill/>
-          <a:ln w="9525">
-            <a:noFill/>
-            <a:miter lim="800000"/>
-            <a:headEnd/>
-            <a:tailEnd/>
-          </a:ln>
-        </p:spPr>
-      </p:pic>
-      <p:sp>
-        <p:nvSpPr>
-          <p:cNvPr id="17" name="Rectangle 16"/>
-          <p:cNvSpPr/>
-          <p:nvPr/>
-        </p:nvSpPr>
-        <p:spPr>
-          <a:xfrm>
-            <a:off x="0" y="4724400"/>
-            <a:ext cx="9144000" cy="2133600"/>
-          </a:xfrm>
-          <a:prstGeom prst="rect">
-            <a:avLst/>
-          </a:prstGeom>
-          <a:solidFill>
-            <a:srgbClr val="E31937"/>
-          </a:solidFill>
-          <a:ln>
-            <a:noFill/>
-          </a:ln>
-        </p:spPr>
-        <p:style>
-          <a:lnRef idx="2">
-            <a:schemeClr val="accent1">
-              <a:shade val="50000"/>
-            </a:schemeClr>
-          </a:lnRef>
-          <a:fillRef idx="1">
-            <a:schemeClr val="accent1"/>
-          </a:fillRef>
-          <a:effectRef idx="0">
-            <a:schemeClr val="accent1"/>
-          </a:effectRef>
-          <a:fontRef idx="minor">
-            <a:schemeClr val="lt1"/>
-          </a:fontRef>
-        </p:style>
-        <p:txBody>
-          <a:bodyPr anchor="ctr"/>
-          <a:lstStyle/>
-          <a:p>
-            <a:pPr algn="ctr">
-              <a:defRPr/>
-            </a:pPr>
-            <a:endParaRPr lang="en-US"/>
-          </a:p>
-        </p:txBody>
-      </p:sp>
-      <p:pic>
-        <p:nvPicPr>
-          <p:cNvPr id="18" name="Picture 7" descr="MAT logo vertical_red.emf"/>
-          <p:cNvPicPr>
-            <a:picLocks noChangeAspect="1"/>
-          </p:cNvPicPr>
-          <p:nvPr/>
-        </p:nvPicPr>
-        <p:blipFill>
-          <a:blip r:embed="rId3"/>
-          <a:srcRect/>
-          <a:stretch>
-            <a:fillRect/>
-          </a:stretch>
-        </p:blipFill>
-        <p:spPr bwMode="auto">
-          <a:xfrm>
-            <a:off x="3600450" y="5334000"/>
-            <a:ext cx="1981200" cy="969963"/>
-          </a:xfrm>
-          <a:prstGeom prst="rect">
-            <a:avLst/>
-          </a:prstGeom>
-          <a:noFill/>
-          <a:ln w="9525">
-            <a:noFill/>
-            <a:miter lim="800000"/>
-            <a:headEnd/>
-            <a:tailEnd/>
-          </a:ln>
-        </p:spPr>
-      </p:pic>
-    </p:spTree>
-  </p:cSld>
-  <p:clrMapOvr>
-    <a:masterClrMapping/>
-  </p:clrMapOvr>
-  <p:timing>
-    <p:tnLst>
-      <p:par>
-        <p:cTn id="1" dur="indefinite" restart="never" nodeType="tmRoot"/>
-      </p:par>
-    </p:tnLst>
-  </p:timing>
-</p:sld>
-</file>
-
-<file path=ppt/slides/slide31.xml><?xml version="1.0" encoding="utf-8"?>
 <p:sld xmlns:a="http://schemas.openxmlformats.org/drawingml/2006/main" xmlns:r="http://schemas.openxmlformats.org/officeDocument/2006/relationships" xmlns:p="http://schemas.openxmlformats.org/presentationml/2006/main">
   <p:cSld>
     <p:spTree>

</xml_diff>

<commit_message>
started event aggregator slides
</commit_message>
<xml_diff>
--- a/Decoupling Workflow With App Controler/Decoupling Workflow From Forms.pptx
+++ b/Decoupling Workflow With App Controler/Decoupling Workflow From Forms.pptx
@@ -9324,10 +9324,826 @@
           <a:lstStyle/>
           <a:p>
             <a:pPr eaLnBrk="1" hangingPunct="1"/>
+            <a:r>
+              <a:rPr lang="en-US" dirty="0" smtClean="0"/>
+              <a:t>Event Aggregator</a:t>
+            </a:r>
             <a:endParaRPr lang="en-US" dirty="0" smtClean="0"/>
           </a:p>
         </p:txBody>
       </p:sp>
+      <p:grpSp>
+        <p:nvGrpSpPr>
+          <p:cNvPr id="49" name="Group 48"/>
+          <p:cNvGrpSpPr/>
+          <p:nvPr/>
+        </p:nvGrpSpPr>
+        <p:grpSpPr>
+          <a:xfrm>
+            <a:off x="1981200" y="2743200"/>
+            <a:ext cx="5181600" cy="2971800"/>
+            <a:chOff x="1905000" y="2743200"/>
+            <a:chExt cx="5181600" cy="2971800"/>
+          </a:xfrm>
+        </p:grpSpPr>
+        <p:sp>
+          <p:nvSpPr>
+            <p:cNvPr id="5" name="Rectangle 4"/>
+            <p:cNvSpPr/>
+            <p:nvPr/>
+          </p:nvSpPr>
+          <p:spPr>
+            <a:xfrm>
+              <a:off x="2438400" y="2743200"/>
+              <a:ext cx="1219200" cy="533400"/>
+            </a:xfrm>
+            <a:prstGeom prst="rect">
+              <a:avLst/>
+            </a:prstGeom>
+          </p:spPr>
+          <p:style>
+            <a:lnRef idx="2">
+              <a:schemeClr val="accent2">
+                <a:shade val="50000"/>
+              </a:schemeClr>
+            </a:lnRef>
+            <a:fillRef idx="1">
+              <a:schemeClr val="accent2"/>
+            </a:fillRef>
+            <a:effectRef idx="0">
+              <a:schemeClr val="accent2"/>
+            </a:effectRef>
+            <a:fontRef idx="minor">
+              <a:schemeClr val="lt1"/>
+            </a:fontRef>
+          </p:style>
+          <p:txBody>
+            <a:bodyPr rtlCol="0" anchor="ctr"/>
+            <a:lstStyle/>
+            <a:p>
+              <a:pPr algn="ctr"/>
+              <a:r>
+                <a:rPr lang="en-US" dirty="0" smtClean="0"/>
+                <a:t>Event 1</a:t>
+              </a:r>
+              <a:endParaRPr lang="en-US" dirty="0"/>
+            </a:p>
+          </p:txBody>
+        </p:sp>
+        <p:sp>
+          <p:nvSpPr>
+            <p:cNvPr id="6" name="Rectangle 5"/>
+            <p:cNvSpPr/>
+            <p:nvPr/>
+          </p:nvSpPr>
+          <p:spPr>
+            <a:xfrm>
+              <a:off x="3886200" y="2743200"/>
+              <a:ext cx="1219200" cy="533400"/>
+            </a:xfrm>
+            <a:prstGeom prst="rect">
+              <a:avLst/>
+            </a:prstGeom>
+          </p:spPr>
+          <p:style>
+            <a:lnRef idx="2">
+              <a:schemeClr val="accent2">
+                <a:shade val="50000"/>
+              </a:schemeClr>
+            </a:lnRef>
+            <a:fillRef idx="1">
+              <a:schemeClr val="accent2"/>
+            </a:fillRef>
+            <a:effectRef idx="0">
+              <a:schemeClr val="accent2"/>
+            </a:effectRef>
+            <a:fontRef idx="minor">
+              <a:schemeClr val="lt1"/>
+            </a:fontRef>
+          </p:style>
+          <p:txBody>
+            <a:bodyPr rtlCol="0" anchor="ctr"/>
+            <a:lstStyle/>
+            <a:p>
+              <a:pPr algn="ctr"/>
+              <a:r>
+                <a:rPr lang="en-US" dirty="0" smtClean="0"/>
+                <a:t>Event 2</a:t>
+              </a:r>
+              <a:endParaRPr lang="en-US" dirty="0"/>
+            </a:p>
+          </p:txBody>
+        </p:sp>
+        <p:sp>
+          <p:nvSpPr>
+            <p:cNvPr id="7" name="Rectangle 6"/>
+            <p:cNvSpPr/>
+            <p:nvPr/>
+          </p:nvSpPr>
+          <p:spPr>
+            <a:xfrm>
+              <a:off x="5334000" y="2743200"/>
+              <a:ext cx="1219200" cy="533400"/>
+            </a:xfrm>
+            <a:prstGeom prst="rect">
+              <a:avLst/>
+            </a:prstGeom>
+          </p:spPr>
+          <p:style>
+            <a:lnRef idx="2">
+              <a:schemeClr val="accent2">
+                <a:shade val="50000"/>
+              </a:schemeClr>
+            </a:lnRef>
+            <a:fillRef idx="1">
+              <a:schemeClr val="accent2"/>
+            </a:fillRef>
+            <a:effectRef idx="0">
+              <a:schemeClr val="accent2"/>
+            </a:effectRef>
+            <a:fontRef idx="minor">
+              <a:schemeClr val="lt1"/>
+            </a:fontRef>
+          </p:style>
+          <p:txBody>
+            <a:bodyPr rtlCol="0" anchor="ctr"/>
+            <a:lstStyle/>
+            <a:p>
+              <a:pPr algn="ctr"/>
+              <a:r>
+                <a:rPr lang="en-US" dirty="0" smtClean="0"/>
+                <a:t>Event 3</a:t>
+              </a:r>
+              <a:endParaRPr lang="en-US" dirty="0"/>
+            </a:p>
+          </p:txBody>
+        </p:sp>
+        <p:sp>
+          <p:nvSpPr>
+            <p:cNvPr id="4" name="Rectangle 3"/>
+            <p:cNvSpPr/>
+            <p:nvPr/>
+          </p:nvSpPr>
+          <p:spPr>
+            <a:xfrm>
+              <a:off x="3886200" y="4419600"/>
+              <a:ext cx="1219200" cy="533400"/>
+            </a:xfrm>
+            <a:prstGeom prst="rect">
+              <a:avLst/>
+            </a:prstGeom>
+          </p:spPr>
+          <p:style>
+            <a:lnRef idx="2">
+              <a:schemeClr val="accent1">
+                <a:shade val="50000"/>
+              </a:schemeClr>
+            </a:lnRef>
+            <a:fillRef idx="1">
+              <a:schemeClr val="accent1"/>
+            </a:fillRef>
+            <a:effectRef idx="0">
+              <a:schemeClr val="accent1"/>
+            </a:effectRef>
+            <a:fontRef idx="minor">
+              <a:schemeClr val="lt1"/>
+            </a:fontRef>
+          </p:style>
+          <p:txBody>
+            <a:bodyPr rtlCol="0" anchor="ctr"/>
+            <a:lstStyle/>
+            <a:p>
+              <a:pPr algn="ctr"/>
+              <a:r>
+                <a:rPr lang="en-US" dirty="0" smtClean="0"/>
+                <a:t>Event</a:t>
+              </a:r>
+            </a:p>
+            <a:p>
+              <a:pPr algn="ctr"/>
+              <a:r>
+                <a:rPr lang="en-US" dirty="0" smtClean="0"/>
+                <a:t>Publisher</a:t>
+              </a:r>
+              <a:endParaRPr lang="en-US" dirty="0"/>
+            </a:p>
+          </p:txBody>
+        </p:sp>
+        <p:sp>
+          <p:nvSpPr>
+            <p:cNvPr id="9" name="Rectangle 8"/>
+            <p:cNvSpPr/>
+            <p:nvPr/>
+          </p:nvSpPr>
+          <p:spPr>
+            <a:xfrm>
+              <a:off x="1905000" y="3657600"/>
+              <a:ext cx="1219200" cy="533400"/>
+            </a:xfrm>
+            <a:prstGeom prst="rect">
+              <a:avLst/>
+            </a:prstGeom>
+          </p:spPr>
+          <p:style>
+            <a:lnRef idx="2">
+              <a:schemeClr val="accent1">
+                <a:shade val="50000"/>
+              </a:schemeClr>
+            </a:lnRef>
+            <a:fillRef idx="1">
+              <a:schemeClr val="accent1"/>
+            </a:fillRef>
+            <a:effectRef idx="0">
+              <a:schemeClr val="accent1"/>
+            </a:effectRef>
+            <a:fontRef idx="minor">
+              <a:schemeClr val="lt1"/>
+            </a:fontRef>
+          </p:style>
+          <p:txBody>
+            <a:bodyPr rtlCol="0" anchor="ctr"/>
+            <a:lstStyle/>
+            <a:p>
+              <a:pPr algn="ctr"/>
+              <a:r>
+                <a:rPr lang="en-US" dirty="0" smtClean="0"/>
+                <a:t>Event Raiser</a:t>
+              </a:r>
+              <a:endParaRPr lang="en-US" dirty="0"/>
+            </a:p>
+          </p:txBody>
+        </p:sp>
+        <p:sp>
+          <p:nvSpPr>
+            <p:cNvPr id="10" name="Rectangle 9"/>
+            <p:cNvSpPr/>
+            <p:nvPr/>
+          </p:nvSpPr>
+          <p:spPr>
+            <a:xfrm>
+              <a:off x="1905000" y="4419600"/>
+              <a:ext cx="1219200" cy="533400"/>
+            </a:xfrm>
+            <a:prstGeom prst="rect">
+              <a:avLst/>
+            </a:prstGeom>
+          </p:spPr>
+          <p:style>
+            <a:lnRef idx="2">
+              <a:schemeClr val="accent1">
+                <a:shade val="50000"/>
+              </a:schemeClr>
+            </a:lnRef>
+            <a:fillRef idx="1">
+              <a:schemeClr val="accent1"/>
+            </a:fillRef>
+            <a:effectRef idx="0">
+              <a:schemeClr val="accent1"/>
+            </a:effectRef>
+            <a:fontRef idx="minor">
+              <a:schemeClr val="lt1"/>
+            </a:fontRef>
+          </p:style>
+          <p:txBody>
+            <a:bodyPr rtlCol="0" anchor="ctr"/>
+            <a:lstStyle/>
+            <a:p>
+              <a:pPr algn="ctr"/>
+              <a:r>
+                <a:rPr lang="en-US" dirty="0" smtClean="0"/>
+                <a:t>Event Raiser</a:t>
+              </a:r>
+              <a:endParaRPr lang="en-US" dirty="0"/>
+            </a:p>
+          </p:txBody>
+        </p:sp>
+        <p:sp>
+          <p:nvSpPr>
+            <p:cNvPr id="11" name="Rectangle 10"/>
+            <p:cNvSpPr/>
+            <p:nvPr/>
+          </p:nvSpPr>
+          <p:spPr>
+            <a:xfrm>
+              <a:off x="1905000" y="5181600"/>
+              <a:ext cx="1219200" cy="533400"/>
+            </a:xfrm>
+            <a:prstGeom prst="rect">
+              <a:avLst/>
+            </a:prstGeom>
+          </p:spPr>
+          <p:style>
+            <a:lnRef idx="2">
+              <a:schemeClr val="accent1">
+                <a:shade val="50000"/>
+              </a:schemeClr>
+            </a:lnRef>
+            <a:fillRef idx="1">
+              <a:schemeClr val="accent1"/>
+            </a:fillRef>
+            <a:effectRef idx="0">
+              <a:schemeClr val="accent1"/>
+            </a:effectRef>
+            <a:fontRef idx="minor">
+              <a:schemeClr val="lt1"/>
+            </a:fontRef>
+          </p:style>
+          <p:txBody>
+            <a:bodyPr rtlCol="0" anchor="ctr"/>
+            <a:lstStyle/>
+            <a:p>
+              <a:pPr algn="ctr"/>
+              <a:r>
+                <a:rPr lang="en-US" dirty="0" smtClean="0"/>
+                <a:t>Event Raiser</a:t>
+              </a:r>
+              <a:endParaRPr lang="en-US" dirty="0"/>
+            </a:p>
+          </p:txBody>
+        </p:sp>
+        <p:cxnSp>
+          <p:nvCxnSpPr>
+            <p:cNvPr id="21" name="Curved Connector 20"/>
+            <p:cNvCxnSpPr>
+              <a:stCxn id="9" idx="3"/>
+              <a:endCxn id="4" idx="1"/>
+            </p:cNvCxnSpPr>
+            <p:nvPr/>
+          </p:nvCxnSpPr>
+          <p:spPr>
+            <a:xfrm>
+              <a:off x="3124200" y="3924300"/>
+              <a:ext cx="762000" cy="762000"/>
+            </a:xfrm>
+            <a:prstGeom prst="curvedConnector3">
+              <a:avLst>
+                <a:gd name="adj1" fmla="val 50000"/>
+              </a:avLst>
+            </a:prstGeom>
+            <a:ln w="38100">
+              <a:tailEnd type="arrow"/>
+            </a:ln>
+            <a:effectLst/>
+          </p:spPr>
+          <p:style>
+            <a:lnRef idx="2">
+              <a:schemeClr val="accent2"/>
+            </a:lnRef>
+            <a:fillRef idx="0">
+              <a:schemeClr val="accent2"/>
+            </a:fillRef>
+            <a:effectRef idx="1">
+              <a:schemeClr val="accent2"/>
+            </a:effectRef>
+            <a:fontRef idx="minor">
+              <a:schemeClr val="tx1"/>
+            </a:fontRef>
+          </p:style>
+        </p:cxnSp>
+        <p:cxnSp>
+          <p:nvCxnSpPr>
+            <p:cNvPr id="23" name="Curved Connector 22"/>
+            <p:cNvCxnSpPr>
+              <a:stCxn id="10" idx="3"/>
+              <a:endCxn id="4" idx="1"/>
+            </p:cNvCxnSpPr>
+            <p:nvPr/>
+          </p:nvCxnSpPr>
+          <p:spPr>
+            <a:xfrm>
+              <a:off x="3124200" y="4686300"/>
+              <a:ext cx="762000" cy="1588"/>
+            </a:xfrm>
+            <a:prstGeom prst="curvedConnector3">
+              <a:avLst>
+                <a:gd name="adj1" fmla="val 50000"/>
+              </a:avLst>
+            </a:prstGeom>
+            <a:ln w="38100">
+              <a:tailEnd type="arrow"/>
+            </a:ln>
+            <a:effectLst/>
+          </p:spPr>
+          <p:style>
+            <a:lnRef idx="2">
+              <a:schemeClr val="accent2"/>
+            </a:lnRef>
+            <a:fillRef idx="0">
+              <a:schemeClr val="accent2"/>
+            </a:fillRef>
+            <a:effectRef idx="1">
+              <a:schemeClr val="accent2"/>
+            </a:effectRef>
+            <a:fontRef idx="minor">
+              <a:schemeClr val="tx1"/>
+            </a:fontRef>
+          </p:style>
+        </p:cxnSp>
+        <p:cxnSp>
+          <p:nvCxnSpPr>
+            <p:cNvPr id="25" name="Curved Connector 24"/>
+            <p:cNvCxnSpPr>
+              <a:stCxn id="11" idx="3"/>
+              <a:endCxn id="4" idx="1"/>
+            </p:cNvCxnSpPr>
+            <p:nvPr/>
+          </p:nvCxnSpPr>
+          <p:spPr>
+            <a:xfrm flipV="1">
+              <a:off x="3124200" y="4686300"/>
+              <a:ext cx="762000" cy="762000"/>
+            </a:xfrm>
+            <a:prstGeom prst="curvedConnector3">
+              <a:avLst>
+                <a:gd name="adj1" fmla="val 50000"/>
+              </a:avLst>
+            </a:prstGeom>
+            <a:ln w="38100">
+              <a:tailEnd type="arrow"/>
+            </a:ln>
+            <a:effectLst/>
+          </p:spPr>
+          <p:style>
+            <a:lnRef idx="2">
+              <a:schemeClr val="accent2"/>
+            </a:lnRef>
+            <a:fillRef idx="0">
+              <a:schemeClr val="accent2"/>
+            </a:fillRef>
+            <a:effectRef idx="1">
+              <a:schemeClr val="accent2"/>
+            </a:effectRef>
+            <a:fontRef idx="minor">
+              <a:schemeClr val="tx1"/>
+            </a:fontRef>
+          </p:style>
+        </p:cxnSp>
+        <p:sp>
+          <p:nvSpPr>
+            <p:cNvPr id="26" name="Rectangle 25"/>
+            <p:cNvSpPr/>
+            <p:nvPr/>
+          </p:nvSpPr>
+          <p:spPr>
+            <a:xfrm>
+              <a:off x="5867400" y="3657600"/>
+              <a:ext cx="1219200" cy="533400"/>
+            </a:xfrm>
+            <a:prstGeom prst="rect">
+              <a:avLst/>
+            </a:prstGeom>
+          </p:spPr>
+          <p:style>
+            <a:lnRef idx="2">
+              <a:schemeClr val="accent3">
+                <a:shade val="50000"/>
+              </a:schemeClr>
+            </a:lnRef>
+            <a:fillRef idx="1">
+              <a:schemeClr val="accent3"/>
+            </a:fillRef>
+            <a:effectRef idx="0">
+              <a:schemeClr val="accent3"/>
+            </a:effectRef>
+            <a:fontRef idx="minor">
+              <a:schemeClr val="lt1"/>
+            </a:fontRef>
+          </p:style>
+          <p:txBody>
+            <a:bodyPr rtlCol="0" anchor="ctr"/>
+            <a:lstStyle/>
+            <a:p>
+              <a:pPr algn="ctr"/>
+              <a:r>
+                <a:rPr lang="en-US" dirty="0" smtClean="0"/>
+                <a:t>Event Listener</a:t>
+              </a:r>
+            </a:p>
+          </p:txBody>
+        </p:sp>
+        <p:sp>
+          <p:nvSpPr>
+            <p:cNvPr id="27" name="Rectangle 26"/>
+            <p:cNvSpPr/>
+            <p:nvPr/>
+          </p:nvSpPr>
+          <p:spPr>
+            <a:xfrm>
+              <a:off x="5867400" y="4419600"/>
+              <a:ext cx="1219200" cy="533400"/>
+            </a:xfrm>
+            <a:prstGeom prst="rect">
+              <a:avLst/>
+            </a:prstGeom>
+          </p:spPr>
+          <p:style>
+            <a:lnRef idx="2">
+              <a:schemeClr val="accent3">
+                <a:shade val="50000"/>
+              </a:schemeClr>
+            </a:lnRef>
+            <a:fillRef idx="1">
+              <a:schemeClr val="accent3"/>
+            </a:fillRef>
+            <a:effectRef idx="0">
+              <a:schemeClr val="accent3"/>
+            </a:effectRef>
+            <a:fontRef idx="minor">
+              <a:schemeClr val="lt1"/>
+            </a:fontRef>
+          </p:style>
+          <p:txBody>
+            <a:bodyPr rtlCol="0" anchor="ctr"/>
+            <a:lstStyle/>
+            <a:p>
+              <a:pPr algn="ctr"/>
+              <a:r>
+                <a:rPr lang="en-US" dirty="0" smtClean="0"/>
+                <a:t>Event Listener</a:t>
+              </a:r>
+              <a:endParaRPr lang="en-US" dirty="0"/>
+            </a:p>
+          </p:txBody>
+        </p:sp>
+        <p:sp>
+          <p:nvSpPr>
+            <p:cNvPr id="28" name="Rectangle 27"/>
+            <p:cNvSpPr/>
+            <p:nvPr/>
+          </p:nvSpPr>
+          <p:spPr>
+            <a:xfrm>
+              <a:off x="5867400" y="5181600"/>
+              <a:ext cx="1219200" cy="533400"/>
+            </a:xfrm>
+            <a:prstGeom prst="rect">
+              <a:avLst/>
+            </a:prstGeom>
+          </p:spPr>
+          <p:style>
+            <a:lnRef idx="2">
+              <a:schemeClr val="accent3">
+                <a:shade val="50000"/>
+              </a:schemeClr>
+            </a:lnRef>
+            <a:fillRef idx="1">
+              <a:schemeClr val="accent3"/>
+            </a:fillRef>
+            <a:effectRef idx="0">
+              <a:schemeClr val="accent3"/>
+            </a:effectRef>
+            <a:fontRef idx="minor">
+              <a:schemeClr val="lt1"/>
+            </a:fontRef>
+          </p:style>
+          <p:txBody>
+            <a:bodyPr rtlCol="0" anchor="ctr"/>
+            <a:lstStyle/>
+            <a:p>
+              <a:pPr algn="ctr"/>
+              <a:r>
+                <a:rPr lang="en-US" dirty="0" smtClean="0"/>
+                <a:t>Event Listener</a:t>
+              </a:r>
+              <a:endParaRPr lang="en-US" dirty="0"/>
+            </a:p>
+          </p:txBody>
+        </p:sp>
+        <p:cxnSp>
+          <p:nvCxnSpPr>
+            <p:cNvPr id="30" name="Curved Connector 29"/>
+            <p:cNvCxnSpPr>
+              <a:stCxn id="4" idx="3"/>
+              <a:endCxn id="26" idx="1"/>
+            </p:cNvCxnSpPr>
+            <p:nvPr/>
+          </p:nvCxnSpPr>
+          <p:spPr>
+            <a:xfrm flipV="1">
+              <a:off x="5105400" y="3924300"/>
+              <a:ext cx="762000" cy="762000"/>
+            </a:xfrm>
+            <a:prstGeom prst="curvedConnector3">
+              <a:avLst>
+                <a:gd name="adj1" fmla="val 50000"/>
+              </a:avLst>
+            </a:prstGeom>
+            <a:ln w="38100">
+              <a:tailEnd type="arrow"/>
+            </a:ln>
+            <a:effectLst/>
+          </p:spPr>
+          <p:style>
+            <a:lnRef idx="2">
+              <a:schemeClr val="accent2"/>
+            </a:lnRef>
+            <a:fillRef idx="0">
+              <a:schemeClr val="accent2"/>
+            </a:fillRef>
+            <a:effectRef idx="1">
+              <a:schemeClr val="accent2"/>
+            </a:effectRef>
+            <a:fontRef idx="minor">
+              <a:schemeClr val="tx1"/>
+            </a:fontRef>
+          </p:style>
+        </p:cxnSp>
+        <p:cxnSp>
+          <p:nvCxnSpPr>
+            <p:cNvPr id="32" name="Curved Connector 31"/>
+            <p:cNvCxnSpPr>
+              <a:stCxn id="4" idx="3"/>
+              <a:endCxn id="27" idx="1"/>
+            </p:cNvCxnSpPr>
+            <p:nvPr/>
+          </p:nvCxnSpPr>
+          <p:spPr>
+            <a:xfrm>
+              <a:off x="5105400" y="4686300"/>
+              <a:ext cx="762000" cy="1588"/>
+            </a:xfrm>
+            <a:prstGeom prst="curvedConnector3">
+              <a:avLst>
+                <a:gd name="adj1" fmla="val 50000"/>
+              </a:avLst>
+            </a:prstGeom>
+            <a:ln w="38100">
+              <a:tailEnd type="arrow"/>
+            </a:ln>
+            <a:effectLst/>
+          </p:spPr>
+          <p:style>
+            <a:lnRef idx="2">
+              <a:schemeClr val="accent2"/>
+            </a:lnRef>
+            <a:fillRef idx="0">
+              <a:schemeClr val="accent2"/>
+            </a:fillRef>
+            <a:effectRef idx="1">
+              <a:schemeClr val="accent2"/>
+            </a:effectRef>
+            <a:fontRef idx="minor">
+              <a:schemeClr val="tx1"/>
+            </a:fontRef>
+          </p:style>
+        </p:cxnSp>
+        <p:cxnSp>
+          <p:nvCxnSpPr>
+            <p:cNvPr id="34" name="Curved Connector 33"/>
+            <p:cNvCxnSpPr>
+              <a:stCxn id="4" idx="3"/>
+              <a:endCxn id="28" idx="1"/>
+            </p:cNvCxnSpPr>
+            <p:nvPr/>
+          </p:nvCxnSpPr>
+          <p:spPr>
+            <a:xfrm>
+              <a:off x="5105400" y="4686300"/>
+              <a:ext cx="762000" cy="762000"/>
+            </a:xfrm>
+            <a:prstGeom prst="curvedConnector3">
+              <a:avLst>
+                <a:gd name="adj1" fmla="val 50000"/>
+              </a:avLst>
+            </a:prstGeom>
+            <a:ln w="38100">
+              <a:tailEnd type="arrow"/>
+            </a:ln>
+            <a:effectLst/>
+          </p:spPr>
+          <p:style>
+            <a:lnRef idx="2">
+              <a:schemeClr val="accent2"/>
+            </a:lnRef>
+            <a:fillRef idx="0">
+              <a:schemeClr val="accent2"/>
+            </a:fillRef>
+            <a:effectRef idx="1">
+              <a:schemeClr val="accent2"/>
+            </a:effectRef>
+            <a:fontRef idx="minor">
+              <a:schemeClr val="tx1"/>
+            </a:fontRef>
+          </p:style>
+        </p:cxnSp>
+        <p:cxnSp>
+          <p:nvCxnSpPr>
+            <p:cNvPr id="38" name="Curved Connector 37"/>
+            <p:cNvCxnSpPr>
+              <a:stCxn id="5" idx="2"/>
+              <a:endCxn id="4" idx="0"/>
+            </p:cNvCxnSpPr>
+            <p:nvPr/>
+          </p:nvCxnSpPr>
+          <p:spPr>
+            <a:xfrm rot="16200000" flipH="1">
+              <a:off x="3200400" y="3124200"/>
+              <a:ext cx="1143000" cy="1447800"/>
+            </a:xfrm>
+            <a:prstGeom prst="curvedConnector3">
+              <a:avLst>
+                <a:gd name="adj1" fmla="val 50000"/>
+              </a:avLst>
+            </a:prstGeom>
+            <a:ln w="38100">
+              <a:tailEnd type="arrow"/>
+            </a:ln>
+            <a:effectLst/>
+          </p:spPr>
+          <p:style>
+            <a:lnRef idx="2">
+              <a:schemeClr val="accent2"/>
+            </a:lnRef>
+            <a:fillRef idx="0">
+              <a:schemeClr val="accent2"/>
+            </a:fillRef>
+            <a:effectRef idx="1">
+              <a:schemeClr val="accent2"/>
+            </a:effectRef>
+            <a:fontRef idx="minor">
+              <a:schemeClr val="tx1"/>
+            </a:fontRef>
+          </p:style>
+        </p:cxnSp>
+        <p:cxnSp>
+          <p:nvCxnSpPr>
+            <p:cNvPr id="40" name="Curved Connector 39"/>
+            <p:cNvCxnSpPr>
+              <a:stCxn id="6" idx="2"/>
+              <a:endCxn id="4" idx="0"/>
+            </p:cNvCxnSpPr>
+            <p:nvPr/>
+          </p:nvCxnSpPr>
+          <p:spPr>
+            <a:xfrm rot="5400000">
+              <a:off x="3924300" y="3848100"/>
+              <a:ext cx="1143000" cy="1588"/>
+            </a:xfrm>
+            <a:prstGeom prst="curvedConnector3">
+              <a:avLst>
+                <a:gd name="adj1" fmla="val 50000"/>
+              </a:avLst>
+            </a:prstGeom>
+            <a:ln w="38100">
+              <a:tailEnd type="arrow"/>
+            </a:ln>
+            <a:effectLst/>
+          </p:spPr>
+          <p:style>
+            <a:lnRef idx="2">
+              <a:schemeClr val="accent2"/>
+            </a:lnRef>
+            <a:fillRef idx="0">
+              <a:schemeClr val="accent2"/>
+            </a:fillRef>
+            <a:effectRef idx="1">
+              <a:schemeClr val="accent2"/>
+            </a:effectRef>
+            <a:fontRef idx="minor">
+              <a:schemeClr val="tx1"/>
+            </a:fontRef>
+          </p:style>
+        </p:cxnSp>
+        <p:cxnSp>
+          <p:nvCxnSpPr>
+            <p:cNvPr id="42" name="Curved Connector 41"/>
+            <p:cNvCxnSpPr>
+              <a:stCxn id="7" idx="2"/>
+              <a:endCxn id="4" idx="0"/>
+            </p:cNvCxnSpPr>
+            <p:nvPr/>
+          </p:nvCxnSpPr>
+          <p:spPr>
+            <a:xfrm rot="5400000">
+              <a:off x="4648200" y="3124200"/>
+              <a:ext cx="1143000" cy="1447800"/>
+            </a:xfrm>
+            <a:prstGeom prst="curvedConnector3">
+              <a:avLst>
+                <a:gd name="adj1" fmla="val 50000"/>
+              </a:avLst>
+            </a:prstGeom>
+            <a:ln w="38100">
+              <a:tailEnd type="arrow"/>
+            </a:ln>
+            <a:effectLst/>
+          </p:spPr>
+          <p:style>
+            <a:lnRef idx="2">
+              <a:schemeClr val="accent2"/>
+            </a:lnRef>
+            <a:fillRef idx="0">
+              <a:schemeClr val="accent2"/>
+            </a:fillRef>
+            <a:effectRef idx="1">
+              <a:schemeClr val="accent2"/>
+            </a:effectRef>
+            <a:fontRef idx="minor">
+              <a:schemeClr val="tx1"/>
+            </a:fontRef>
+          </p:style>
+        </p:cxnSp>
+      </p:grpSp>
     </p:spTree>
   </p:cSld>
   <p:clrMapOvr>

</xml_diff>

<commit_message>
working on workflow services slides
</commit_message>
<xml_diff>
--- a/Decoupling Workflow With App Controler/Decoupling Workflow From Forms.pptx
+++ b/Decoupling Workflow With App Controler/Decoupling Workflow From Forms.pptx
@@ -5,10 +5,10 @@
     <p:sldMasterId id="2147483822" r:id="rId4"/>
   </p:sldMasterIdLst>
   <p:notesMasterIdLst>
-    <p:notesMasterId r:id="rId35"/>
+    <p:notesMasterId r:id="rId36"/>
   </p:notesMasterIdLst>
   <p:handoutMasterIdLst>
-    <p:handoutMasterId r:id="rId36"/>
+    <p:handoutMasterId r:id="rId37"/>
   </p:handoutMasterIdLst>
   <p:sldIdLst>
     <p:sldId id="256" r:id="rId5"/>
@@ -21,36 +21,37 @@
     <p:sldId id="291" r:id="rId12"/>
     <p:sldId id="282" r:id="rId13"/>
     <p:sldId id="280" r:id="rId14"/>
-    <p:sldId id="281" r:id="rId15"/>
-    <p:sldId id="286" r:id="rId16"/>
+    <p:sldId id="286" r:id="rId15"/>
+    <p:sldId id="281" r:id="rId16"/>
     <p:sldId id="303" r:id="rId17"/>
     <p:sldId id="296" r:id="rId18"/>
     <p:sldId id="278" r:id="rId19"/>
-    <p:sldId id="295" r:id="rId20"/>
-    <p:sldId id="301" r:id="rId21"/>
-    <p:sldId id="302" r:id="rId22"/>
-    <p:sldId id="285" r:id="rId23"/>
-    <p:sldId id="299" r:id="rId24"/>
-    <p:sldId id="300" r:id="rId25"/>
-    <p:sldId id="297" r:id="rId26"/>
-    <p:sldId id="276" r:id="rId27"/>
-    <p:sldId id="277" r:id="rId28"/>
-    <p:sldId id="284" r:id="rId29"/>
-    <p:sldId id="292" r:id="rId30"/>
-    <p:sldId id="293" r:id="rId31"/>
-    <p:sldId id="294" r:id="rId32"/>
-    <p:sldId id="259" r:id="rId33"/>
-    <p:sldId id="274" r:id="rId34"/>
+    <p:sldId id="304" r:id="rId20"/>
+    <p:sldId id="295" r:id="rId21"/>
+    <p:sldId id="301" r:id="rId22"/>
+    <p:sldId id="302" r:id="rId23"/>
+    <p:sldId id="285" r:id="rId24"/>
+    <p:sldId id="299" r:id="rId25"/>
+    <p:sldId id="300" r:id="rId26"/>
+    <p:sldId id="297" r:id="rId27"/>
+    <p:sldId id="276" r:id="rId28"/>
+    <p:sldId id="277" r:id="rId29"/>
+    <p:sldId id="284" r:id="rId30"/>
+    <p:sldId id="292" r:id="rId31"/>
+    <p:sldId id="293" r:id="rId32"/>
+    <p:sldId id="294" r:id="rId33"/>
+    <p:sldId id="259" r:id="rId34"/>
+    <p:sldId id="274" r:id="rId35"/>
   </p:sldIdLst>
   <p:sldSz cx="9144000" cy="6858000" type="screen4x3"/>
   <p:notesSz cx="7010400" cy="9296400"/>
   <p:embeddedFontLst>
     <p:embeddedFont>
       <p:font typeface="Calibri" pitchFamily="34" charset="0"/>
-      <p:regular r:id="rId37"/>
-      <p:bold r:id="rId38"/>
-      <p:italic r:id="rId39"/>
-      <p:boldItalic r:id="rId40"/>
+      <p:regular r:id="rId38"/>
+      <p:bold r:id="rId39"/>
+      <p:italic r:id="rId40"/>
+      <p:boldItalic r:id="rId41"/>
     </p:embeddedFont>
   </p:embeddedFontLst>
   <p:defaultTextStyle>
@@ -1175,7 +1176,7 @@
               <a:pPr>
                 <a:defRPr/>
               </a:pPr>
-              <a:t>18</a:t>
+              <a:t>17</a:t>
             </a:fld>
             <a:endParaRPr lang="en-US"/>
           </a:p>
@@ -1610,7 +1611,7 @@
               <a:pPr>
                 <a:defRPr/>
               </a:pPr>
-              <a:t>24</a:t>
+              <a:t>23</a:t>
             </a:fld>
             <a:endParaRPr lang="en-US"/>
           </a:p>
@@ -1871,7 +1872,7 @@
               <a:pPr>
                 <a:defRPr/>
               </a:pPr>
-              <a:t>27</a:t>
+              <a:t>26</a:t>
             </a:fld>
             <a:endParaRPr lang="en-US"/>
           </a:p>
@@ -1959,6 +1960,93 @@
                 <a:defRPr/>
               </a:pPr>
               <a:t>28</a:t>
+            </a:fld>
+            <a:endParaRPr lang="en-US"/>
+          </a:p>
+        </p:txBody>
+      </p:sp>
+    </p:spTree>
+  </p:cSld>
+  <p:clrMapOvr>
+    <a:masterClrMapping/>
+  </p:clrMapOvr>
+</p:notes>
+</file>
+
+<file path=ppt/notesSlides/notesSlide22.xml><?xml version="1.0" encoding="utf-8"?>
+<p:notes xmlns:a="http://schemas.openxmlformats.org/drawingml/2006/main" xmlns:r="http://schemas.openxmlformats.org/officeDocument/2006/relationships" xmlns:p="http://schemas.openxmlformats.org/presentationml/2006/main">
+  <p:cSld>
+    <p:spTree>
+      <p:nvGrpSpPr>
+        <p:cNvPr id="1" name=""/>
+        <p:cNvGrpSpPr/>
+        <p:nvPr/>
+      </p:nvGrpSpPr>
+      <p:grpSpPr>
+        <a:xfrm>
+          <a:off x="0" y="0"/>
+          <a:ext cx="0" cy="0"/>
+          <a:chOff x="0" y="0"/>
+          <a:chExt cx="0" cy="0"/>
+        </a:xfrm>
+      </p:grpSpPr>
+      <p:sp>
+        <p:nvSpPr>
+          <p:cNvPr id="2" name="Slide Image Placeholder 1"/>
+          <p:cNvSpPr>
+            <a:spLocks noGrp="1" noRot="1" noChangeAspect="1"/>
+          </p:cNvSpPr>
+          <p:nvPr>
+            <p:ph type="sldImg"/>
+          </p:nvPr>
+        </p:nvSpPr>
+        <p:spPr/>
+      </p:sp>
+      <p:sp>
+        <p:nvSpPr>
+          <p:cNvPr id="3" name="Notes Placeholder 2"/>
+          <p:cNvSpPr>
+            <a:spLocks noGrp="1"/>
+          </p:cNvSpPr>
+          <p:nvPr>
+            <p:ph type="body" idx="1"/>
+          </p:nvPr>
+        </p:nvSpPr>
+        <p:spPr/>
+        <p:txBody>
+          <a:bodyPr>
+            <a:normAutofit/>
+          </a:bodyPr>
+          <a:lstStyle/>
+          <a:p>
+            <a:endParaRPr lang="en-US" dirty="0"/>
+          </a:p>
+        </p:txBody>
+      </p:sp>
+      <p:sp>
+        <p:nvSpPr>
+          <p:cNvPr id="4" name="Slide Number Placeholder 3"/>
+          <p:cNvSpPr>
+            <a:spLocks noGrp="1"/>
+          </p:cNvSpPr>
+          <p:nvPr>
+            <p:ph type="sldNum" sz="quarter" idx="10"/>
+          </p:nvPr>
+        </p:nvSpPr>
+        <p:spPr/>
+        <p:txBody>
+          <a:bodyPr/>
+          <a:lstStyle/>
+          <a:p>
+            <a:pPr>
+              <a:defRPr/>
+            </a:pPr>
+            <a:fld id="{1931C8FD-CC35-423B-99F4-64D81D6A80AE}" type="slidenum">
+              <a:rPr lang="en-US" smtClean="0"/>
+              <a:pPr>
+                <a:defRPr/>
+              </a:pPr>
+              <a:t>29</a:t>
             </a:fld>
             <a:endParaRPr lang="en-US"/>
           </a:p>
@@ -4298,248 +4386,6 @@
             </a:pPr>
             <a:r>
               <a:rPr lang="en-US" sz="2000" dirty="0" smtClean="0"/>
-              <a:t>Tightly Coupled Workflow: Parent Form Knows About Children Forms, Presenters, and More!</a:t>
-            </a:r>
-          </a:p>
-        </p:txBody>
-      </p:sp>
-      <p:sp>
-        <p:nvSpPr>
-          <p:cNvPr id="3074" name="Title 1"/>
-          <p:cNvSpPr>
-            <a:spLocks noGrp="1"/>
-          </p:cNvSpPr>
-          <p:nvPr>
-            <p:ph type="title"/>
-          </p:nvPr>
-        </p:nvSpPr>
-        <p:spPr bwMode="auto">
-          <a:noFill/>
-          <a:ln>
-            <a:miter lim="800000"/>
-            <a:headEnd/>
-            <a:tailEnd/>
-          </a:ln>
-        </p:spPr>
-        <p:txBody>
-          <a:bodyPr vert="horz" wrap="square" lIns="91440" tIns="45720" rIns="91440" bIns="45720" numCol="1" anchor="t" anchorCtr="0" compatLnSpc="1">
-            <a:prstTxWarp prst="textNoShape">
-              <a:avLst/>
-            </a:prstTxWarp>
-          </a:bodyPr>
-          <a:lstStyle/>
-          <a:p>
-            <a:pPr eaLnBrk="1" hangingPunct="1"/>
-            <a:r>
-              <a:rPr lang="en-US" dirty="0" smtClean="0"/>
-              <a:t>Simple Org Chart – v1</a:t>
-            </a:r>
-          </a:p>
-        </p:txBody>
-      </p:sp>
-      <p:grpSp>
-        <p:nvGrpSpPr>
-          <p:cNvPr id="12" name="Group 11"/>
-          <p:cNvGrpSpPr/>
-          <p:nvPr/>
-        </p:nvGrpSpPr>
-        <p:grpSpPr>
-          <a:xfrm>
-            <a:off x="731957" y="1971675"/>
-            <a:ext cx="7680087" cy="4048125"/>
-            <a:chOff x="904875" y="1971675"/>
-            <a:chExt cx="7680087" cy="4048125"/>
-          </a:xfrm>
-        </p:grpSpPr>
-        <p:pic>
-          <p:nvPicPr>
-            <p:cNvPr id="5" name="Picture 2" descr="X:\Derick-GitHub\Presentation And Training Material\Decoupling Workflow With App Controler\doc\Org Chart View.png"/>
-            <p:cNvPicPr>
-              <a:picLocks noChangeAspect="1" noChangeArrowheads="1"/>
-            </p:cNvPicPr>
-            <p:nvPr/>
-          </p:nvPicPr>
-          <p:blipFill>
-            <a:blip r:embed="rId3"/>
-            <a:srcRect/>
-            <a:stretch>
-              <a:fillRect/>
-            </a:stretch>
-          </p:blipFill>
-          <p:spPr bwMode="auto">
-            <a:xfrm>
-              <a:off x="904875" y="1971675"/>
-              <a:ext cx="4286251" cy="4048125"/>
-            </a:xfrm>
-            <a:prstGeom prst="rect">
-              <a:avLst/>
-            </a:prstGeom>
-            <a:noFill/>
-          </p:spPr>
-        </p:pic>
-        <p:cxnSp>
-          <p:nvCxnSpPr>
-            <p:cNvPr id="8" name="Straight Connector 7"/>
-            <p:cNvCxnSpPr/>
-            <p:nvPr/>
-          </p:nvCxnSpPr>
-          <p:spPr>
-            <a:xfrm rot="5400000" flipH="1" flipV="1">
-              <a:off x="1628775" y="3924300"/>
-              <a:ext cx="2286000" cy="838200"/>
-            </a:xfrm>
-            <a:prstGeom prst="line">
-              <a:avLst/>
-            </a:prstGeom>
-            <a:ln w="38100">
-              <a:solidFill>
-                <a:schemeClr val="accent2"/>
-              </a:solidFill>
-            </a:ln>
-          </p:spPr>
-          <p:style>
-            <a:lnRef idx="1">
-              <a:schemeClr val="accent1"/>
-            </a:lnRef>
-            <a:fillRef idx="0">
-              <a:schemeClr val="accent1"/>
-            </a:fillRef>
-            <a:effectRef idx="0">
-              <a:schemeClr val="accent1"/>
-            </a:effectRef>
-            <a:fontRef idx="minor">
-              <a:schemeClr val="tx1"/>
-            </a:fontRef>
-          </p:style>
-        </p:cxnSp>
-        <p:cxnSp>
-          <p:nvCxnSpPr>
-            <p:cNvPr id="10" name="Straight Connector 9"/>
-            <p:cNvCxnSpPr/>
-            <p:nvPr/>
-          </p:nvCxnSpPr>
-          <p:spPr>
-            <a:xfrm rot="5400000" flipH="1" flipV="1">
-              <a:off x="2281237" y="4795838"/>
-              <a:ext cx="990600" cy="847725"/>
-            </a:xfrm>
-            <a:prstGeom prst="line">
-              <a:avLst/>
-            </a:prstGeom>
-            <a:ln w="38100">
-              <a:solidFill>
-                <a:schemeClr val="accent2"/>
-              </a:solidFill>
-            </a:ln>
-          </p:spPr>
-          <p:style>
-            <a:lnRef idx="1">
-              <a:schemeClr val="accent1"/>
-            </a:lnRef>
-            <a:fillRef idx="0">
-              <a:schemeClr val="accent1"/>
-            </a:fillRef>
-            <a:effectRef idx="0">
-              <a:schemeClr val="accent1"/>
-            </a:effectRef>
-            <a:fontRef idx="minor">
-              <a:schemeClr val="tx1"/>
-            </a:fontRef>
-          </p:style>
-        </p:cxnSp>
-        <p:pic>
-          <p:nvPicPr>
-            <p:cNvPr id="1027" name="Picture 3"/>
-            <p:cNvPicPr>
-              <a:picLocks noChangeAspect="1" noChangeArrowheads="1"/>
-            </p:cNvPicPr>
-            <p:nvPr/>
-          </p:nvPicPr>
-          <p:blipFill>
-            <a:blip r:embed="rId4"/>
-            <a:srcRect/>
-            <a:stretch>
-              <a:fillRect/>
-            </a:stretch>
-          </p:blipFill>
-          <p:spPr bwMode="auto">
-            <a:xfrm>
-              <a:off x="3212862" y="3200400"/>
-              <a:ext cx="5372100" cy="1552575"/>
-            </a:xfrm>
-            <a:prstGeom prst="rect">
-              <a:avLst/>
-            </a:prstGeom>
-            <a:noFill/>
-            <a:ln w="38100">
-              <a:solidFill>
-                <a:schemeClr val="accent2"/>
-              </a:solidFill>
-              <a:miter lim="800000"/>
-              <a:headEnd/>
-              <a:tailEnd/>
-            </a:ln>
-            <a:effectLst/>
-          </p:spPr>
-        </p:pic>
-      </p:grpSp>
-    </p:spTree>
-  </p:cSld>
-  <p:clrMapOvr>
-    <a:masterClrMapping/>
-  </p:clrMapOvr>
-  <p:timing>
-    <p:tnLst>
-      <p:par>
-        <p:cTn id="1" dur="indefinite" restart="never" nodeType="tmRoot"/>
-      </p:par>
-    </p:tnLst>
-  </p:timing>
-</p:sld>
-</file>
-
-<file path=ppt/slides/slide12.xml><?xml version="1.0" encoding="utf-8"?>
-<p:sld xmlns:a="http://schemas.openxmlformats.org/drawingml/2006/main" xmlns:r="http://schemas.openxmlformats.org/officeDocument/2006/relationships" xmlns:p="http://schemas.openxmlformats.org/presentationml/2006/main">
-  <p:cSld>
-    <p:spTree>
-      <p:nvGrpSpPr>
-        <p:cNvPr id="1" name=""/>
-        <p:cNvGrpSpPr/>
-        <p:nvPr/>
-      </p:nvGrpSpPr>
-      <p:grpSpPr>
-        <a:xfrm>
-          <a:off x="0" y="0"/>
-          <a:ext cx="0" cy="0"/>
-          <a:chOff x="0" y="0"/>
-          <a:chExt cx="0" cy="0"/>
-        </a:xfrm>
-      </p:grpSpPr>
-      <p:sp>
-        <p:nvSpPr>
-          <p:cNvPr id="3075" name="Text Placeholder 2"/>
-          <p:cNvSpPr>
-            <a:spLocks noGrp="1"/>
-          </p:cNvSpPr>
-          <p:nvPr>
-            <p:ph type="body" sz="quarter" idx="10"/>
-          </p:nvPr>
-        </p:nvSpPr>
-        <p:spPr>
-          <a:xfrm>
-            <a:off x="685800" y="1066800"/>
-            <a:ext cx="8229600" cy="1219200"/>
-          </a:xfrm>
-        </p:spPr>
-        <p:txBody>
-          <a:bodyPr/>
-          <a:lstStyle/>
-          <a:p>
-            <a:pPr eaLnBrk="1" hangingPunct="1">
-              <a:buNone/>
-            </a:pPr>
-            <a:r>
-              <a:rPr lang="en-US" sz="2000" dirty="0" smtClean="0"/>
               <a:t>Tightly Coupled Presentation Logic: One Presenter Knows About Another</a:t>
             </a:r>
           </a:p>
@@ -4951,6 +4797,248 @@
 </p:sld>
 </file>
 
+<file path=ppt/slides/slide12.xml><?xml version="1.0" encoding="utf-8"?>
+<p:sld xmlns:a="http://schemas.openxmlformats.org/drawingml/2006/main" xmlns:r="http://schemas.openxmlformats.org/officeDocument/2006/relationships" xmlns:p="http://schemas.openxmlformats.org/presentationml/2006/main">
+  <p:cSld>
+    <p:spTree>
+      <p:nvGrpSpPr>
+        <p:cNvPr id="1" name=""/>
+        <p:cNvGrpSpPr/>
+        <p:nvPr/>
+      </p:nvGrpSpPr>
+      <p:grpSpPr>
+        <a:xfrm>
+          <a:off x="0" y="0"/>
+          <a:ext cx="0" cy="0"/>
+          <a:chOff x="0" y="0"/>
+          <a:chExt cx="0" cy="0"/>
+        </a:xfrm>
+      </p:grpSpPr>
+      <p:sp>
+        <p:nvSpPr>
+          <p:cNvPr id="3075" name="Text Placeholder 2"/>
+          <p:cNvSpPr>
+            <a:spLocks noGrp="1"/>
+          </p:cNvSpPr>
+          <p:nvPr>
+            <p:ph type="body" sz="quarter" idx="10"/>
+          </p:nvPr>
+        </p:nvSpPr>
+        <p:spPr>
+          <a:xfrm>
+            <a:off x="685800" y="1066800"/>
+            <a:ext cx="8229600" cy="1219200"/>
+          </a:xfrm>
+        </p:spPr>
+        <p:txBody>
+          <a:bodyPr/>
+          <a:lstStyle/>
+          <a:p>
+            <a:pPr eaLnBrk="1" hangingPunct="1">
+              <a:buNone/>
+            </a:pPr>
+            <a:r>
+              <a:rPr lang="en-US" sz="2000" dirty="0" smtClean="0"/>
+              <a:t>Tightly Coupled Workflow: Parent Form Knows About Children Forms, Presenters, and More!</a:t>
+            </a:r>
+          </a:p>
+        </p:txBody>
+      </p:sp>
+      <p:sp>
+        <p:nvSpPr>
+          <p:cNvPr id="3074" name="Title 1"/>
+          <p:cNvSpPr>
+            <a:spLocks noGrp="1"/>
+          </p:cNvSpPr>
+          <p:nvPr>
+            <p:ph type="title"/>
+          </p:nvPr>
+        </p:nvSpPr>
+        <p:spPr bwMode="auto">
+          <a:noFill/>
+          <a:ln>
+            <a:miter lim="800000"/>
+            <a:headEnd/>
+            <a:tailEnd/>
+          </a:ln>
+        </p:spPr>
+        <p:txBody>
+          <a:bodyPr vert="horz" wrap="square" lIns="91440" tIns="45720" rIns="91440" bIns="45720" numCol="1" anchor="t" anchorCtr="0" compatLnSpc="1">
+            <a:prstTxWarp prst="textNoShape">
+              <a:avLst/>
+            </a:prstTxWarp>
+          </a:bodyPr>
+          <a:lstStyle/>
+          <a:p>
+            <a:pPr eaLnBrk="1" hangingPunct="1"/>
+            <a:r>
+              <a:rPr lang="en-US" dirty="0" smtClean="0"/>
+              <a:t>Simple Org Chart – v1</a:t>
+            </a:r>
+          </a:p>
+        </p:txBody>
+      </p:sp>
+      <p:grpSp>
+        <p:nvGrpSpPr>
+          <p:cNvPr id="12" name="Group 11"/>
+          <p:cNvGrpSpPr/>
+          <p:nvPr/>
+        </p:nvGrpSpPr>
+        <p:grpSpPr>
+          <a:xfrm>
+            <a:off x="731957" y="1971675"/>
+            <a:ext cx="7680087" cy="4048125"/>
+            <a:chOff x="904875" y="1971675"/>
+            <a:chExt cx="7680087" cy="4048125"/>
+          </a:xfrm>
+        </p:grpSpPr>
+        <p:pic>
+          <p:nvPicPr>
+            <p:cNvPr id="5" name="Picture 2" descr="X:\Derick-GitHub\Presentation And Training Material\Decoupling Workflow With App Controler\doc\Org Chart View.png"/>
+            <p:cNvPicPr>
+              <a:picLocks noChangeAspect="1" noChangeArrowheads="1"/>
+            </p:cNvPicPr>
+            <p:nvPr/>
+          </p:nvPicPr>
+          <p:blipFill>
+            <a:blip r:embed="rId3"/>
+            <a:srcRect/>
+            <a:stretch>
+              <a:fillRect/>
+            </a:stretch>
+          </p:blipFill>
+          <p:spPr bwMode="auto">
+            <a:xfrm>
+              <a:off x="904875" y="1971675"/>
+              <a:ext cx="4286251" cy="4048125"/>
+            </a:xfrm>
+            <a:prstGeom prst="rect">
+              <a:avLst/>
+            </a:prstGeom>
+            <a:noFill/>
+          </p:spPr>
+        </p:pic>
+        <p:cxnSp>
+          <p:nvCxnSpPr>
+            <p:cNvPr id="8" name="Straight Connector 7"/>
+            <p:cNvCxnSpPr/>
+            <p:nvPr/>
+          </p:nvCxnSpPr>
+          <p:spPr>
+            <a:xfrm rot="5400000" flipH="1" flipV="1">
+              <a:off x="1628775" y="3924300"/>
+              <a:ext cx="2286000" cy="838200"/>
+            </a:xfrm>
+            <a:prstGeom prst="line">
+              <a:avLst/>
+            </a:prstGeom>
+            <a:ln w="38100">
+              <a:solidFill>
+                <a:schemeClr val="accent2"/>
+              </a:solidFill>
+            </a:ln>
+          </p:spPr>
+          <p:style>
+            <a:lnRef idx="1">
+              <a:schemeClr val="accent1"/>
+            </a:lnRef>
+            <a:fillRef idx="0">
+              <a:schemeClr val="accent1"/>
+            </a:fillRef>
+            <a:effectRef idx="0">
+              <a:schemeClr val="accent1"/>
+            </a:effectRef>
+            <a:fontRef idx="minor">
+              <a:schemeClr val="tx1"/>
+            </a:fontRef>
+          </p:style>
+        </p:cxnSp>
+        <p:cxnSp>
+          <p:nvCxnSpPr>
+            <p:cNvPr id="10" name="Straight Connector 9"/>
+            <p:cNvCxnSpPr/>
+            <p:nvPr/>
+          </p:nvCxnSpPr>
+          <p:spPr>
+            <a:xfrm rot="5400000" flipH="1" flipV="1">
+              <a:off x="2281237" y="4795838"/>
+              <a:ext cx="990600" cy="847725"/>
+            </a:xfrm>
+            <a:prstGeom prst="line">
+              <a:avLst/>
+            </a:prstGeom>
+            <a:ln w="38100">
+              <a:solidFill>
+                <a:schemeClr val="accent2"/>
+              </a:solidFill>
+            </a:ln>
+          </p:spPr>
+          <p:style>
+            <a:lnRef idx="1">
+              <a:schemeClr val="accent1"/>
+            </a:lnRef>
+            <a:fillRef idx="0">
+              <a:schemeClr val="accent1"/>
+            </a:fillRef>
+            <a:effectRef idx="0">
+              <a:schemeClr val="accent1"/>
+            </a:effectRef>
+            <a:fontRef idx="minor">
+              <a:schemeClr val="tx1"/>
+            </a:fontRef>
+          </p:style>
+        </p:cxnSp>
+        <p:pic>
+          <p:nvPicPr>
+            <p:cNvPr id="1027" name="Picture 3"/>
+            <p:cNvPicPr>
+              <a:picLocks noChangeAspect="1" noChangeArrowheads="1"/>
+            </p:cNvPicPr>
+            <p:nvPr/>
+          </p:nvPicPr>
+          <p:blipFill>
+            <a:blip r:embed="rId4"/>
+            <a:srcRect/>
+            <a:stretch>
+              <a:fillRect/>
+            </a:stretch>
+          </p:blipFill>
+          <p:spPr bwMode="auto">
+            <a:xfrm>
+              <a:off x="3212862" y="3200400"/>
+              <a:ext cx="5372100" cy="1552575"/>
+            </a:xfrm>
+            <a:prstGeom prst="rect">
+              <a:avLst/>
+            </a:prstGeom>
+            <a:noFill/>
+            <a:ln w="38100">
+              <a:solidFill>
+                <a:schemeClr val="accent2"/>
+              </a:solidFill>
+              <a:miter lim="800000"/>
+              <a:headEnd/>
+              <a:tailEnd/>
+            </a:ln>
+            <a:effectLst/>
+          </p:spPr>
+        </p:pic>
+      </p:grpSp>
+    </p:spTree>
+  </p:cSld>
+  <p:clrMapOvr>
+    <a:masterClrMapping/>
+  </p:clrMapOvr>
+  <p:timing>
+    <p:tnLst>
+      <p:par>
+        <p:cTn id="1" dur="indefinite" restart="never" nodeType="tmRoot"/>
+      </p:par>
+    </p:tnLst>
+  </p:timing>
+</p:sld>
+</file>
+
 <file path=ppt/slides/slide13.xml><?xml version="1.0" encoding="utf-8"?>
 <p:sld xmlns:a="http://schemas.openxmlformats.org/drawingml/2006/main" xmlns:r="http://schemas.openxmlformats.org/officeDocument/2006/relationships" xmlns:p="http://schemas.openxmlformats.org/presentationml/2006/main">
   <p:cSld>
@@ -5078,7 +5166,13 @@
             </p:nvPicPr>
             <p:blipFill>
               <a:blip r:embed="rId3">
-                <a:lum bright="70000" contrast="-70000"/>
+                <a:duotone>
+                  <a:schemeClr val="bg2">
+                    <a:shade val="45000"/>
+                    <a:satMod val="135000"/>
+                  </a:schemeClr>
+                  <a:prstClr val="white"/>
+                </a:duotone>
               </a:blip>
               <a:srcRect/>
               <a:stretch>
@@ -5106,7 +5200,13 @@
             </p:nvPicPr>
             <p:blipFill>
               <a:blip r:embed="rId4">
-                <a:lum bright="70000" contrast="-70000"/>
+                <a:duotone>
+                  <a:schemeClr val="bg2">
+                    <a:shade val="45000"/>
+                    <a:satMod val="135000"/>
+                  </a:schemeClr>
+                  <a:prstClr val="white"/>
+                </a:duotone>
               </a:blip>
               <a:srcRect/>
               <a:stretch>
@@ -6541,6 +6641,18 @@
             <a:pPr eaLnBrk="1" hangingPunct="1">
               <a:buNone/>
             </a:pPr>
+            <a:r>
+              <a:rPr lang="en-US" sz="2000" dirty="0" smtClean="0"/>
+              <a:t>Current Workflow: Add </a:t>
+            </a:r>
+            <a:r>
+              <a:rPr lang="en-US" sz="2000" dirty="0" smtClean="0"/>
+              <a:t>New </a:t>
+            </a:r>
+            <a:r>
+              <a:rPr lang="en-US" sz="2000" dirty="0" smtClean="0"/>
+              <a:t>Employee</a:t>
+            </a:r>
             <a:endParaRPr lang="en-US" sz="2000" dirty="0" smtClean="0"/>
           </a:p>
         </p:txBody>
@@ -6580,6 +6692,275 @@
           </a:p>
         </p:txBody>
       </p:sp>
+      <p:grpSp>
+        <p:nvGrpSpPr>
+          <p:cNvPr id="33" name="Group 32"/>
+          <p:cNvGrpSpPr/>
+          <p:nvPr/>
+        </p:nvGrpSpPr>
+        <p:grpSpPr>
+          <a:xfrm>
+            <a:off x="422730" y="1524000"/>
+            <a:ext cx="8298541" cy="4809000"/>
+            <a:chOff x="464459" y="1676400"/>
+            <a:chExt cx="8298541" cy="4809000"/>
+          </a:xfrm>
+        </p:grpSpPr>
+        <p:pic>
+          <p:nvPicPr>
+            <p:cNvPr id="18" name="Picture 2" descr="X:\Derick-GitHub\Presentation And Training Material\Decoupling Workflow With App Controler\doc\Org Chart View.png"/>
+            <p:cNvPicPr>
+              <a:picLocks noChangeAspect="1" noChangeArrowheads="1"/>
+            </p:cNvPicPr>
+            <p:nvPr/>
+          </p:nvPicPr>
+          <p:blipFill>
+            <a:blip r:embed="rId3"/>
+            <a:srcRect/>
+            <a:stretch>
+              <a:fillRect/>
+            </a:stretch>
+          </p:blipFill>
+          <p:spPr bwMode="auto">
+            <a:xfrm>
+              <a:off x="464459" y="1676400"/>
+              <a:ext cx="2583541" cy="2440010"/>
+            </a:xfrm>
+            <a:prstGeom prst="rect">
+              <a:avLst/>
+            </a:prstGeom>
+            <a:noFill/>
+          </p:spPr>
+        </p:pic>
+        <p:cxnSp>
+          <p:nvCxnSpPr>
+            <p:cNvPr id="24" name="Curved Connector 23"/>
+            <p:cNvCxnSpPr>
+              <a:stCxn id="18" idx="3"/>
+              <a:endCxn id="4" idx="1"/>
+            </p:cNvCxnSpPr>
+            <p:nvPr/>
+          </p:nvCxnSpPr>
+          <p:spPr>
+            <a:xfrm>
+              <a:off x="3048000" y="2896405"/>
+              <a:ext cx="762000" cy="1452463"/>
+            </a:xfrm>
+            <a:prstGeom prst="curvedConnector3">
+              <a:avLst>
+                <a:gd name="adj1" fmla="val 50000"/>
+              </a:avLst>
+            </a:prstGeom>
+            <a:ln w="38100">
+              <a:solidFill>
+                <a:schemeClr val="accent2"/>
+              </a:solidFill>
+              <a:tailEnd type="arrow"/>
+            </a:ln>
+          </p:spPr>
+          <p:style>
+            <a:lnRef idx="1">
+              <a:schemeClr val="accent1"/>
+            </a:lnRef>
+            <a:fillRef idx="0">
+              <a:schemeClr val="accent1"/>
+            </a:fillRef>
+            <a:effectRef idx="0">
+              <a:schemeClr val="accent1"/>
+            </a:effectRef>
+            <a:fontRef idx="minor">
+              <a:schemeClr val="tx1"/>
+            </a:fontRef>
+          </p:style>
+        </p:cxnSp>
+        <p:pic>
+          <p:nvPicPr>
+            <p:cNvPr id="21" name="Picture 3"/>
+            <p:cNvPicPr>
+              <a:picLocks noChangeAspect="1" noChangeArrowheads="1"/>
+            </p:cNvPicPr>
+            <p:nvPr/>
+          </p:nvPicPr>
+          <p:blipFill>
+            <a:blip r:embed="rId4"/>
+            <a:srcRect/>
+            <a:stretch>
+              <a:fillRect/>
+            </a:stretch>
+          </p:blipFill>
+          <p:spPr bwMode="auto">
+            <a:xfrm>
+              <a:off x="3200400" y="2615930"/>
+              <a:ext cx="2286000" cy="660670"/>
+            </a:xfrm>
+            <a:prstGeom prst="roundRect">
+              <a:avLst/>
+            </a:prstGeom>
+            <a:noFill/>
+            <a:ln w="38100">
+              <a:solidFill>
+                <a:schemeClr val="accent2"/>
+              </a:solidFill>
+              <a:miter lim="800000"/>
+              <a:headEnd/>
+              <a:tailEnd/>
+            </a:ln>
+            <a:effectLst/>
+          </p:spPr>
+        </p:pic>
+        <p:cxnSp>
+          <p:nvCxnSpPr>
+            <p:cNvPr id="26" name="Shape 25"/>
+            <p:cNvCxnSpPr>
+              <a:stCxn id="4" idx="2"/>
+              <a:endCxn id="5" idx="1"/>
+            </p:cNvCxnSpPr>
+            <p:nvPr/>
+          </p:nvCxnSpPr>
+          <p:spPr>
+            <a:xfrm rot="16200000" flipH="1">
+              <a:off x="5179481" y="4951489"/>
+              <a:ext cx="922268" cy="1077690"/>
+            </a:xfrm>
+            <a:prstGeom prst="curvedConnector2">
+              <a:avLst/>
+            </a:prstGeom>
+            <a:ln w="38100">
+              <a:solidFill>
+                <a:schemeClr val="accent2"/>
+              </a:solidFill>
+              <a:tailEnd type="arrow"/>
+            </a:ln>
+          </p:spPr>
+          <p:style>
+            <a:lnRef idx="1">
+              <a:schemeClr val="accent1"/>
+            </a:lnRef>
+            <a:fillRef idx="0">
+              <a:schemeClr val="accent1"/>
+            </a:fillRef>
+            <a:effectRef idx="0">
+              <a:schemeClr val="accent1"/>
+            </a:effectRef>
+            <a:fontRef idx="minor">
+              <a:schemeClr val="tx1"/>
+            </a:fontRef>
+          </p:style>
+        </p:cxnSp>
+        <p:pic>
+          <p:nvPicPr>
+            <p:cNvPr id="4" name="Picture 3" descr="X:\Derick-GitHub\Presentation And Training Material\Decoupling Workflow With App Controler\doc\New Employee - Info.png"/>
+            <p:cNvPicPr>
+              <a:picLocks noChangeAspect="1" noChangeArrowheads="1"/>
+            </p:cNvPicPr>
+            <p:nvPr/>
+          </p:nvPicPr>
+          <p:blipFill>
+            <a:blip r:embed="rId5"/>
+            <a:srcRect/>
+            <a:stretch>
+              <a:fillRect/>
+            </a:stretch>
+          </p:blipFill>
+          <p:spPr bwMode="auto">
+            <a:xfrm>
+              <a:off x="3810000" y="3668535"/>
+              <a:ext cx="2583540" cy="1360665"/>
+            </a:xfrm>
+            <a:prstGeom prst="rect">
+              <a:avLst/>
+            </a:prstGeom>
+            <a:noFill/>
+          </p:spPr>
+        </p:pic>
+        <p:pic>
+          <p:nvPicPr>
+            <p:cNvPr id="5" name="Picture 4" descr="X:\Derick-GitHub\Presentation And Training Material\Decoupling Workflow With App Controler\doc\New Employee - Manager.png"/>
+            <p:cNvPicPr>
+              <a:picLocks noChangeAspect="1" noChangeArrowheads="1"/>
+            </p:cNvPicPr>
+            <p:nvPr/>
+          </p:nvPicPr>
+          <p:blipFill>
+            <a:blip r:embed="rId6"/>
+            <a:srcRect/>
+            <a:stretch>
+              <a:fillRect/>
+            </a:stretch>
+          </p:blipFill>
+          <p:spPr bwMode="auto">
+            <a:xfrm>
+              <a:off x="6179460" y="5417536"/>
+              <a:ext cx="2583540" cy="1067864"/>
+            </a:xfrm>
+            <a:prstGeom prst="rect">
+              <a:avLst/>
+            </a:prstGeom>
+            <a:noFill/>
+          </p:spPr>
+        </p:pic>
+        <p:pic>
+          <p:nvPicPr>
+            <p:cNvPr id="10" name="Picture 2"/>
+            <p:cNvPicPr>
+              <a:picLocks noChangeAspect="1" noChangeArrowheads="1"/>
+            </p:cNvPicPr>
+            <p:nvPr/>
+          </p:nvPicPr>
+          <p:blipFill>
+            <a:blip r:embed="rId7"/>
+            <a:srcRect/>
+            <a:stretch>
+              <a:fillRect/>
+            </a:stretch>
+          </p:blipFill>
+          <p:spPr bwMode="auto">
+            <a:xfrm>
+              <a:off x="3410107" y="5486400"/>
+              <a:ext cx="2152493" cy="855439"/>
+            </a:xfrm>
+            <a:prstGeom prst="roundRect">
+              <a:avLst/>
+            </a:prstGeom>
+            <a:noFill/>
+            <a:ln w="38100">
+              <a:solidFill>
+                <a:schemeClr val="accent2"/>
+              </a:solidFill>
+              <a:miter lim="800000"/>
+              <a:headEnd/>
+              <a:tailEnd/>
+            </a:ln>
+            <a:effectLst/>
+          </p:spPr>
+        </p:pic>
+      </p:grpSp>
+      <p:pic>
+        <p:nvPicPr>
+          <p:cNvPr id="6147" name="Picture 3" descr="C:\Users\derickb\AppData\Local\Microsoft\Windows\Temporary Internet Files\Content.IE5\AY104AXF\MPj04265600000[1].jpg"/>
+          <p:cNvPicPr>
+            <a:picLocks noChangeAspect="1" noChangeArrowheads="1"/>
+          </p:cNvPicPr>
+          <p:nvPr/>
+        </p:nvPicPr>
+        <p:blipFill>
+          <a:blip r:embed="rId8"/>
+          <a:srcRect/>
+          <a:stretch>
+            <a:fillRect/>
+          </a:stretch>
+        </p:blipFill>
+        <p:spPr bwMode="auto">
+          <a:xfrm>
+            <a:off x="6934200" y="1143000"/>
+            <a:ext cx="2057400" cy="2057400"/>
+          </a:xfrm>
+          <a:prstGeom prst="roundRect">
+            <a:avLst/>
+          </a:prstGeom>
+          <a:noFill/>
+        </p:spPr>
+      </p:pic>
     </p:spTree>
   </p:cSld>
   <p:clrMapOvr>
@@ -6596,6 +6977,477 @@
 </file>
 
 <file path=ppt/slides/slide17.xml><?xml version="1.0" encoding="utf-8"?>
+<p:sld xmlns:a="http://schemas.openxmlformats.org/drawingml/2006/main" xmlns:r="http://schemas.openxmlformats.org/officeDocument/2006/relationships" xmlns:p="http://schemas.openxmlformats.org/presentationml/2006/main">
+  <p:cSld>
+    <p:spTree>
+      <p:nvGrpSpPr>
+        <p:cNvPr id="1" name=""/>
+        <p:cNvGrpSpPr/>
+        <p:nvPr/>
+      </p:nvGrpSpPr>
+      <p:grpSpPr>
+        <a:xfrm>
+          <a:off x="0" y="0"/>
+          <a:ext cx="0" cy="0"/>
+          <a:chOff x="0" y="0"/>
+          <a:chExt cx="0" cy="0"/>
+        </a:xfrm>
+      </p:grpSpPr>
+      <p:sp>
+        <p:nvSpPr>
+          <p:cNvPr id="3075" name="Text Placeholder 2"/>
+          <p:cNvSpPr>
+            <a:spLocks noGrp="1"/>
+          </p:cNvSpPr>
+          <p:nvPr>
+            <p:ph type="body" sz="quarter" idx="10"/>
+          </p:nvPr>
+        </p:nvSpPr>
+        <p:spPr>
+          <a:xfrm>
+            <a:off x="685800" y="1066800"/>
+            <a:ext cx="8229600" cy="1219200"/>
+          </a:xfrm>
+        </p:spPr>
+        <p:txBody>
+          <a:bodyPr/>
+          <a:lstStyle/>
+          <a:p>
+            <a:pPr eaLnBrk="1" hangingPunct="1">
+              <a:buNone/>
+            </a:pPr>
+            <a:r>
+              <a:rPr lang="en-US" sz="2000" dirty="0" smtClean="0"/>
+              <a:t>Decouple The Workflow Between Forms By Introducing A Service To Coordinate Them</a:t>
+            </a:r>
+            <a:endParaRPr lang="en-US" sz="2000" dirty="0" smtClean="0"/>
+          </a:p>
+        </p:txBody>
+      </p:sp>
+      <p:sp>
+        <p:nvSpPr>
+          <p:cNvPr id="3074" name="Title 1"/>
+          <p:cNvSpPr>
+            <a:spLocks noGrp="1"/>
+          </p:cNvSpPr>
+          <p:nvPr>
+            <p:ph type="title"/>
+          </p:nvPr>
+        </p:nvSpPr>
+        <p:spPr bwMode="auto">
+          <a:noFill/>
+          <a:ln>
+            <a:miter lim="800000"/>
+            <a:headEnd/>
+            <a:tailEnd/>
+          </a:ln>
+        </p:spPr>
+        <p:txBody>
+          <a:bodyPr vert="horz" wrap="square" lIns="91440" tIns="45720" rIns="91440" bIns="45720" numCol="1" anchor="t" anchorCtr="0" compatLnSpc="1">
+            <a:prstTxWarp prst="textNoShape">
+              <a:avLst/>
+            </a:prstTxWarp>
+          </a:bodyPr>
+          <a:lstStyle/>
+          <a:p>
+            <a:pPr eaLnBrk="1" hangingPunct="1"/>
+            <a:r>
+              <a:rPr lang="en-US" dirty="0" smtClean="0"/>
+              <a:t>Workflow Services</a:t>
+            </a:r>
+            <a:endParaRPr lang="en-US" dirty="0" smtClean="0"/>
+          </a:p>
+        </p:txBody>
+      </p:sp>
+      <p:grpSp>
+        <p:nvGrpSpPr>
+          <p:cNvPr id="140" name="Group 139"/>
+          <p:cNvGrpSpPr/>
+          <p:nvPr/>
+        </p:nvGrpSpPr>
+        <p:grpSpPr>
+          <a:xfrm>
+            <a:off x="674739" y="1828800"/>
+            <a:ext cx="7794523" cy="3886199"/>
+            <a:chOff x="674739" y="1828800"/>
+            <a:chExt cx="7794523" cy="3886199"/>
+          </a:xfrm>
+        </p:grpSpPr>
+        <p:sp>
+          <p:nvSpPr>
+            <p:cNvPr id="18" name="Rectangle 17"/>
+            <p:cNvSpPr/>
+            <p:nvPr/>
+          </p:nvSpPr>
+          <p:spPr>
+            <a:xfrm>
+              <a:off x="3417939" y="3657599"/>
+              <a:ext cx="1752600" cy="838200"/>
+            </a:xfrm>
+            <a:prstGeom prst="rect">
+              <a:avLst/>
+            </a:prstGeom>
+          </p:spPr>
+          <p:style>
+            <a:lnRef idx="2">
+              <a:schemeClr val="accent2">
+                <a:shade val="50000"/>
+              </a:schemeClr>
+            </a:lnRef>
+            <a:fillRef idx="1">
+              <a:schemeClr val="accent2"/>
+            </a:fillRef>
+            <a:effectRef idx="0">
+              <a:schemeClr val="accent2"/>
+            </a:effectRef>
+            <a:fontRef idx="minor">
+              <a:schemeClr val="lt1"/>
+            </a:fontRef>
+          </p:style>
+          <p:txBody>
+            <a:bodyPr rtlCol="0" anchor="ctr"/>
+            <a:lstStyle/>
+            <a:p>
+              <a:pPr algn="ctr"/>
+              <a:r>
+                <a:rPr lang="en-US" dirty="0" smtClean="0"/>
+                <a:t>Workflow</a:t>
+              </a:r>
+            </a:p>
+            <a:p>
+              <a:pPr algn="ctr"/>
+              <a:r>
+                <a:rPr lang="en-US" dirty="0" smtClean="0"/>
+                <a:t>Service</a:t>
+              </a:r>
+              <a:endParaRPr lang="en-US" dirty="0"/>
+            </a:p>
+          </p:txBody>
+        </p:sp>
+        <p:cxnSp>
+          <p:nvCxnSpPr>
+            <p:cNvPr id="25" name="Curved Connector 24"/>
+            <p:cNvCxnSpPr>
+              <a:stCxn id="18" idx="3"/>
+              <a:endCxn id="16" idx="1"/>
+            </p:cNvCxnSpPr>
+            <p:nvPr/>
+          </p:nvCxnSpPr>
+          <p:spPr>
+            <a:xfrm>
+              <a:off x="5170539" y="4076699"/>
+              <a:ext cx="1066800" cy="1166846"/>
+            </a:xfrm>
+            <a:prstGeom prst="curvedConnector3">
+              <a:avLst>
+                <a:gd name="adj1" fmla="val 50000"/>
+              </a:avLst>
+            </a:prstGeom>
+            <a:ln w="38100">
+              <a:solidFill>
+                <a:schemeClr val="accent2"/>
+              </a:solidFill>
+              <a:tailEnd type="arrow"/>
+            </a:ln>
+          </p:spPr>
+          <p:style>
+            <a:lnRef idx="1">
+              <a:schemeClr val="accent1"/>
+            </a:lnRef>
+            <a:fillRef idx="0">
+              <a:schemeClr val="accent1"/>
+            </a:fillRef>
+            <a:effectRef idx="0">
+              <a:schemeClr val="accent1"/>
+            </a:effectRef>
+            <a:fontRef idx="minor">
+              <a:schemeClr val="tx1"/>
+            </a:fontRef>
+          </p:style>
+        </p:cxnSp>
+        <p:pic>
+          <p:nvPicPr>
+            <p:cNvPr id="42" name="Picture 2" descr="X:\Derick-GitHub\Presentation And Training Material\Decoupling Workflow With App Controler\doc\Org Chart View.png"/>
+            <p:cNvPicPr>
+              <a:picLocks noChangeAspect="1" noChangeArrowheads="1"/>
+            </p:cNvPicPr>
+            <p:nvPr/>
+          </p:nvPicPr>
+          <p:blipFill>
+            <a:blip r:embed="rId3"/>
+            <a:srcRect/>
+            <a:stretch>
+              <a:fillRect/>
+            </a:stretch>
+          </p:blipFill>
+          <p:spPr bwMode="auto">
+            <a:xfrm>
+              <a:off x="674739" y="2997677"/>
+              <a:ext cx="2281230" cy="2154494"/>
+            </a:xfrm>
+            <a:prstGeom prst="rect">
+              <a:avLst/>
+            </a:prstGeom>
+            <a:noFill/>
+          </p:spPr>
+        </p:pic>
+        <p:cxnSp>
+          <p:nvCxnSpPr>
+            <p:cNvPr id="54" name="Shape 53"/>
+            <p:cNvCxnSpPr>
+              <a:stCxn id="18" idx="3"/>
+              <a:endCxn id="12" idx="1"/>
+            </p:cNvCxnSpPr>
+            <p:nvPr/>
+          </p:nvCxnSpPr>
+          <p:spPr>
+            <a:xfrm flipV="1">
+              <a:off x="5170539" y="2820025"/>
+              <a:ext cx="1066800" cy="1256674"/>
+            </a:xfrm>
+            <a:prstGeom prst="curvedConnector3">
+              <a:avLst>
+                <a:gd name="adj1" fmla="val 50000"/>
+              </a:avLst>
+            </a:prstGeom>
+            <a:ln w="38100">
+              <a:solidFill>
+                <a:schemeClr val="accent2"/>
+              </a:solidFill>
+              <a:tailEnd type="arrow"/>
+            </a:ln>
+          </p:spPr>
+          <p:style>
+            <a:lnRef idx="1">
+              <a:schemeClr val="accent1"/>
+            </a:lnRef>
+            <a:fillRef idx="0">
+              <a:schemeClr val="accent1"/>
+            </a:fillRef>
+            <a:effectRef idx="0">
+              <a:schemeClr val="accent1"/>
+            </a:effectRef>
+            <a:fontRef idx="minor">
+              <a:schemeClr val="tx1"/>
+            </a:fontRef>
+          </p:style>
+        </p:cxnSp>
+        <p:grpSp>
+          <p:nvGrpSpPr>
+            <p:cNvPr id="110" name="Group 109"/>
+            <p:cNvGrpSpPr/>
+            <p:nvPr/>
+          </p:nvGrpSpPr>
+          <p:grpSpPr>
+            <a:xfrm>
+              <a:off x="6237339" y="1828800"/>
+              <a:ext cx="2231922" cy="1591950"/>
+              <a:chOff x="1676400" y="4403429"/>
+              <a:chExt cx="2765322" cy="1929774"/>
+            </a:xfrm>
+          </p:grpSpPr>
+          <p:pic>
+            <p:nvPicPr>
+              <p:cNvPr id="12" name="Picture 11" descr="X:\Derick-GitHub\Presentation And Training Material\Decoupling Workflow With App Controler\doc\New Employee - Info.png"/>
+              <p:cNvPicPr>
+                <a:picLocks noChangeAspect="1" noChangeArrowheads="1"/>
+              </p:cNvPicPr>
+              <p:nvPr/>
+            </p:nvPicPr>
+            <p:blipFill>
+              <a:blip r:embed="rId4"/>
+              <a:srcRect/>
+              <a:stretch>
+                <a:fillRect/>
+              </a:stretch>
+            </p:blipFill>
+            <p:spPr bwMode="auto">
+              <a:xfrm>
+                <a:off x="1676400" y="4876800"/>
+                <a:ext cx="2765322" cy="1456403"/>
+              </a:xfrm>
+              <a:prstGeom prst="rect">
+                <a:avLst/>
+              </a:prstGeom>
+              <a:noFill/>
+            </p:spPr>
+          </p:pic>
+          <p:sp>
+            <p:nvSpPr>
+              <p:cNvPr id="100" name="TextBox 99"/>
+              <p:cNvSpPr txBox="1"/>
+              <p:nvPr/>
+            </p:nvSpPr>
+            <p:spPr>
+              <a:xfrm>
+                <a:off x="3375794" y="4403429"/>
+                <a:ext cx="979179" cy="461664"/>
+              </a:xfrm>
+              <a:prstGeom prst="rect">
+                <a:avLst/>
+              </a:prstGeom>
+              <a:noFill/>
+            </p:spPr>
+            <p:txBody>
+              <a:bodyPr wrap="none" rtlCol="0">
+                <a:spAutoFit/>
+              </a:bodyPr>
+              <a:lstStyle/>
+              <a:p>
+                <a:r>
+                  <a:rPr lang="en-US" sz="2400" b="1" dirty="0" smtClean="0">
+                    <a:solidFill>
+                      <a:schemeClr val="accent2"/>
+                    </a:solidFill>
+                    <a:latin typeface="+mn-lt"/>
+                  </a:rPr>
+                  <a:t>Step 1</a:t>
+                </a:r>
+                <a:endParaRPr lang="en-US" sz="2400" b="1" dirty="0" smtClean="0">
+                  <a:solidFill>
+                    <a:schemeClr val="accent2"/>
+                  </a:solidFill>
+                  <a:latin typeface="+mn-lt"/>
+                </a:endParaRPr>
+              </a:p>
+            </p:txBody>
+          </p:sp>
+        </p:grpSp>
+        <p:grpSp>
+          <p:nvGrpSpPr>
+            <p:cNvPr id="109" name="Group 108"/>
+            <p:cNvGrpSpPr/>
+            <p:nvPr/>
+          </p:nvGrpSpPr>
+          <p:grpSpPr>
+            <a:xfrm>
+              <a:off x="6237339" y="4385240"/>
+              <a:ext cx="2231923" cy="1329759"/>
+              <a:chOff x="6019800" y="4560258"/>
+              <a:chExt cx="2765323" cy="1611942"/>
+            </a:xfrm>
+          </p:grpSpPr>
+          <p:pic>
+            <p:nvPicPr>
+              <p:cNvPr id="16" name="Picture 15" descr="X:\Derick-GitHub\Presentation And Training Material\Decoupling Workflow With App Controler\doc\New Employee - Manager.png"/>
+              <p:cNvPicPr>
+                <a:picLocks noChangeAspect="1" noChangeArrowheads="1"/>
+              </p:cNvPicPr>
+              <p:nvPr/>
+            </p:nvPicPr>
+            <p:blipFill>
+              <a:blip r:embed="rId5"/>
+              <a:srcRect/>
+              <a:stretch>
+                <a:fillRect/>
+              </a:stretch>
+            </p:blipFill>
+            <p:spPr bwMode="auto">
+              <a:xfrm>
+                <a:off x="6019800" y="5029200"/>
+                <a:ext cx="2765323" cy="1143000"/>
+              </a:xfrm>
+              <a:prstGeom prst="rect">
+                <a:avLst/>
+              </a:prstGeom>
+              <a:noFill/>
+            </p:spPr>
+          </p:pic>
+          <p:sp>
+            <p:nvSpPr>
+              <p:cNvPr id="101" name="TextBox 100"/>
+              <p:cNvSpPr txBox="1"/>
+              <p:nvPr/>
+            </p:nvSpPr>
+            <p:spPr>
+              <a:xfrm>
+                <a:off x="7719194" y="4560258"/>
+                <a:ext cx="979179" cy="461664"/>
+              </a:xfrm>
+              <a:prstGeom prst="rect">
+                <a:avLst/>
+              </a:prstGeom>
+              <a:noFill/>
+            </p:spPr>
+            <p:txBody>
+              <a:bodyPr wrap="none" rtlCol="0">
+                <a:spAutoFit/>
+              </a:bodyPr>
+              <a:lstStyle/>
+              <a:p>
+                <a:r>
+                  <a:rPr lang="en-US" sz="2400" b="1" dirty="0" smtClean="0">
+                    <a:solidFill>
+                      <a:schemeClr val="accent2"/>
+                    </a:solidFill>
+                    <a:latin typeface="+mn-lt"/>
+                  </a:rPr>
+                  <a:t>Step 2</a:t>
+                </a:r>
+              </a:p>
+            </p:txBody>
+          </p:sp>
+        </p:grpSp>
+        <p:cxnSp>
+          <p:nvCxnSpPr>
+            <p:cNvPr id="20" name="Curved Connector 19"/>
+            <p:cNvCxnSpPr>
+              <a:stCxn id="42" idx="3"/>
+              <a:endCxn id="18" idx="1"/>
+            </p:cNvCxnSpPr>
+            <p:nvPr/>
+          </p:nvCxnSpPr>
+          <p:spPr>
+            <a:xfrm>
+              <a:off x="2955969" y="4074924"/>
+              <a:ext cx="461970" cy="1775"/>
+            </a:xfrm>
+            <a:prstGeom prst="curvedConnector3">
+              <a:avLst>
+                <a:gd name="adj1" fmla="val 50000"/>
+              </a:avLst>
+            </a:prstGeom>
+            <a:ln w="19050">
+              <a:solidFill>
+                <a:schemeClr val="bg1">
+                  <a:lumMod val="50000"/>
+                </a:schemeClr>
+              </a:solidFill>
+              <a:tailEnd type="arrow"/>
+            </a:ln>
+          </p:spPr>
+          <p:style>
+            <a:lnRef idx="1">
+              <a:schemeClr val="accent1"/>
+            </a:lnRef>
+            <a:fillRef idx="0">
+              <a:schemeClr val="accent1"/>
+            </a:fillRef>
+            <a:effectRef idx="0">
+              <a:schemeClr val="accent1"/>
+            </a:effectRef>
+            <a:fontRef idx="minor">
+              <a:schemeClr val="tx1"/>
+            </a:fontRef>
+          </p:style>
+        </p:cxnSp>
+      </p:grpSp>
+    </p:spTree>
+  </p:cSld>
+  <p:clrMapOvr>
+    <a:masterClrMapping/>
+  </p:clrMapOvr>
+  <p:timing>
+    <p:tnLst>
+      <p:par>
+        <p:cTn id="1" dur="indefinite" restart="never" nodeType="tmRoot"/>
+      </p:par>
+    </p:tnLst>
+  </p:timing>
+</p:sld>
+</file>
+
+<file path=ppt/slides/slide18.xml><?xml version="1.0" encoding="utf-8"?>
 <p:sld xmlns:a="http://schemas.openxmlformats.org/drawingml/2006/main" xmlns:r="http://schemas.openxmlformats.org/officeDocument/2006/relationships" xmlns:p="http://schemas.openxmlformats.org/presentationml/2006/main">
   <p:cSld>
     <p:spTree>
@@ -6941,7 +7793,7 @@
 </p:sld>
 </file>
 
-<file path=ppt/slides/slide18.xml><?xml version="1.0" encoding="utf-8"?>
+<file path=ppt/slides/slide19.xml><?xml version="1.0" encoding="utf-8"?>
 <p:sld xmlns:a="http://schemas.openxmlformats.org/drawingml/2006/main" xmlns:r="http://schemas.openxmlformats.org/officeDocument/2006/relationships" xmlns:p="http://schemas.openxmlformats.org/presentationml/2006/main">
   <p:cSld>
     <p:spTree>
@@ -7281,7 +8133,257 @@
 </p:sld>
 </file>
 
-<file path=ppt/slides/slide19.xml><?xml version="1.0" encoding="utf-8"?>
+<file path=ppt/slides/slide2.xml><?xml version="1.0" encoding="utf-8"?>
+<p:sld xmlns:a="http://schemas.openxmlformats.org/drawingml/2006/main" xmlns:r="http://schemas.openxmlformats.org/officeDocument/2006/relationships" xmlns:p="http://schemas.openxmlformats.org/presentationml/2006/main">
+  <p:cSld>
+    <p:spTree>
+      <p:nvGrpSpPr>
+        <p:cNvPr id="1" name=""/>
+        <p:cNvGrpSpPr/>
+        <p:nvPr/>
+      </p:nvGrpSpPr>
+      <p:grpSpPr>
+        <a:xfrm>
+          <a:off x="0" y="0"/>
+          <a:ext cx="0" cy="0"/>
+          <a:chOff x="0" y="0"/>
+          <a:chExt cx="0" cy="0"/>
+        </a:xfrm>
+      </p:grpSpPr>
+      <p:pic>
+        <p:nvPicPr>
+          <p:cNvPr id="1026" name="Picture 2" descr="C:\Users\derickb\AppData\Local\Microsoft\Windows\Temporary Internet Files\Content.IE5\AY104AXF\MPj04331790000[1].jpg"/>
+          <p:cNvPicPr>
+            <a:picLocks noChangeAspect="1" noChangeArrowheads="1"/>
+          </p:cNvPicPr>
+          <p:nvPr/>
+        </p:nvPicPr>
+        <p:blipFill>
+          <a:blip r:embed="rId3"/>
+          <a:srcRect/>
+          <a:stretch>
+            <a:fillRect/>
+          </a:stretch>
+        </p:blipFill>
+        <p:spPr bwMode="auto">
+          <a:xfrm>
+            <a:off x="5426075" y="990600"/>
+            <a:ext cx="3717925" cy="2790288"/>
+          </a:xfrm>
+          <a:prstGeom prst="rect">
+            <a:avLst/>
+          </a:prstGeom>
+          <a:noFill/>
+        </p:spPr>
+      </p:pic>
+      <p:sp>
+        <p:nvSpPr>
+          <p:cNvPr id="3075" name="Text Placeholder 2"/>
+          <p:cNvSpPr>
+            <a:spLocks noGrp="1"/>
+          </p:cNvSpPr>
+          <p:nvPr>
+            <p:ph type="body" sz="quarter" idx="10"/>
+          </p:nvPr>
+        </p:nvSpPr>
+        <p:spPr>
+          <a:xfrm>
+            <a:off x="685800" y="1066800"/>
+            <a:ext cx="8229600" cy="5334000"/>
+          </a:xfrm>
+        </p:spPr>
+        <p:txBody>
+          <a:bodyPr/>
+          <a:lstStyle/>
+          <a:p>
+            <a:pPr eaLnBrk="1" hangingPunct="1">
+              <a:buNone/>
+            </a:pPr>
+            <a:endParaRPr lang="en-US" b="1" dirty="0" smtClean="0">
+              <a:solidFill>
+                <a:schemeClr val="accent1">
+                  <a:lumMod val="75000"/>
+                </a:schemeClr>
+              </a:solidFill>
+            </a:endParaRPr>
+          </a:p>
+          <a:p>
+            <a:pPr eaLnBrk="1" hangingPunct="1">
+              <a:buNone/>
+            </a:pPr>
+            <a:r>
+              <a:rPr lang="en-US" b="1" dirty="0" smtClean="0">
+                <a:solidFill>
+                  <a:schemeClr val="accent1">
+                    <a:lumMod val="75000"/>
+                  </a:schemeClr>
+                </a:solidFill>
+              </a:rPr>
+              <a:t>Topics Covered</a:t>
+            </a:r>
+          </a:p>
+          <a:p>
+            <a:pPr eaLnBrk="1" hangingPunct="1"/>
+            <a:r>
+              <a:rPr lang="en-US" sz="2000" dirty="0" smtClean="0"/>
+              <a:t>Workflow Services</a:t>
+            </a:r>
+          </a:p>
+          <a:p>
+            <a:pPr eaLnBrk="1" hangingPunct="1"/>
+            <a:r>
+              <a:rPr lang="en-US" sz="2000" dirty="0" smtClean="0"/>
+              <a:t>Command </a:t>
+            </a:r>
+            <a:r>
+              <a:rPr lang="en-US" sz="2000" dirty="0" smtClean="0"/>
+              <a:t>Pattern</a:t>
+            </a:r>
+          </a:p>
+          <a:p>
+            <a:pPr eaLnBrk="1" hangingPunct="1"/>
+            <a:r>
+              <a:rPr lang="en-US" sz="2000" dirty="0" smtClean="0"/>
+              <a:t>Event Aggregator</a:t>
+            </a:r>
+          </a:p>
+          <a:p>
+            <a:pPr eaLnBrk="1" hangingPunct="1"/>
+            <a:r>
+              <a:rPr lang="en-US" sz="2000" dirty="0" smtClean="0"/>
+              <a:t>Application </a:t>
+            </a:r>
+            <a:r>
+              <a:rPr lang="en-US" sz="2000" dirty="0" smtClean="0"/>
+              <a:t>Controller</a:t>
+            </a:r>
+          </a:p>
+          <a:p>
+            <a:pPr eaLnBrk="1" hangingPunct="1"/>
+            <a:r>
+              <a:rPr lang="en-US" sz="2000" dirty="0" smtClean="0"/>
+              <a:t>String It All Together </a:t>
+            </a:r>
+            <a:r>
+              <a:rPr lang="en-US" sz="2000" dirty="0" smtClean="0"/>
+              <a:t>With </a:t>
+            </a:r>
+            <a:r>
+              <a:rPr lang="en-US" sz="2000" dirty="0" smtClean="0"/>
+              <a:t>An </a:t>
+            </a:r>
+            <a:r>
+              <a:rPr lang="en-US" sz="2000" dirty="0" err="1" smtClean="0"/>
+              <a:t>IoC</a:t>
+            </a:r>
+            <a:r>
+              <a:rPr lang="en-US" sz="2000" dirty="0" smtClean="0"/>
+              <a:t> </a:t>
+            </a:r>
+            <a:r>
+              <a:rPr lang="en-US" sz="2000" dirty="0" smtClean="0"/>
+              <a:t>Container</a:t>
+            </a:r>
+          </a:p>
+          <a:p>
+            <a:pPr eaLnBrk="1" hangingPunct="1"/>
+            <a:endParaRPr lang="en-US" sz="2000" dirty="0" smtClean="0"/>
+          </a:p>
+          <a:p>
+            <a:pPr eaLnBrk="1" hangingPunct="1">
+              <a:buNone/>
+            </a:pPr>
+            <a:r>
+              <a:rPr lang="en-US" b="1" dirty="0" smtClean="0">
+                <a:solidFill>
+                  <a:schemeClr val="accent1">
+                    <a:lumMod val="75000"/>
+                  </a:schemeClr>
+                </a:solidFill>
+              </a:rPr>
+              <a:t>Goals</a:t>
+            </a:r>
+          </a:p>
+          <a:p>
+            <a:pPr eaLnBrk="1" hangingPunct="1"/>
+            <a:r>
+              <a:rPr lang="en-US" sz="2000" dirty="0" smtClean="0"/>
+              <a:t>Object Oriented System</a:t>
+            </a:r>
+          </a:p>
+          <a:p>
+            <a:pPr eaLnBrk="1" hangingPunct="1"/>
+            <a:r>
+              <a:rPr lang="en-US" sz="2000" dirty="0" smtClean="0"/>
+              <a:t>Testability</a:t>
+            </a:r>
+          </a:p>
+          <a:p>
+            <a:pPr eaLnBrk="1" hangingPunct="1"/>
+            <a:r>
+              <a:rPr lang="en-US" sz="2000" dirty="0" smtClean="0"/>
+              <a:t>Flexibility</a:t>
+            </a:r>
+          </a:p>
+          <a:p>
+            <a:pPr eaLnBrk="1" hangingPunct="1"/>
+            <a:r>
+              <a:rPr lang="en-US" sz="2000" dirty="0" smtClean="0"/>
+              <a:t>Maintainability (Ease of Enhancement)</a:t>
+            </a:r>
+          </a:p>
+        </p:txBody>
+      </p:sp>
+      <p:sp>
+        <p:nvSpPr>
+          <p:cNvPr id="3074" name="Title 1"/>
+          <p:cNvSpPr>
+            <a:spLocks noGrp="1"/>
+          </p:cNvSpPr>
+          <p:nvPr>
+            <p:ph type="title"/>
+          </p:nvPr>
+        </p:nvSpPr>
+        <p:spPr bwMode="auto">
+          <a:noFill/>
+          <a:ln>
+            <a:miter lim="800000"/>
+            <a:headEnd/>
+            <a:tailEnd/>
+          </a:ln>
+        </p:spPr>
+        <p:txBody>
+          <a:bodyPr vert="horz" wrap="square" lIns="91440" tIns="45720" rIns="91440" bIns="45720" numCol="1" anchor="t" anchorCtr="0" compatLnSpc="1">
+            <a:prstTxWarp prst="textNoShape">
+              <a:avLst/>
+            </a:prstTxWarp>
+          </a:bodyPr>
+          <a:lstStyle/>
+          <a:p>
+            <a:pPr eaLnBrk="1" hangingPunct="1"/>
+            <a:r>
+              <a:rPr lang="en-US" dirty="0" smtClean="0"/>
+              <a:t>Topics Of This Presentation</a:t>
+            </a:r>
+          </a:p>
+        </p:txBody>
+      </p:sp>
+    </p:spTree>
+  </p:cSld>
+  <p:clrMapOvr>
+    <a:masterClrMapping/>
+  </p:clrMapOvr>
+  <p:timing>
+    <p:tnLst>
+      <p:par>
+        <p:cTn id="1" dur="indefinite" restart="never" nodeType="tmRoot"/>
+      </p:par>
+    </p:tnLst>
+  </p:timing>
+</p:sld>
+</file>
+
+<file path=ppt/slides/slide20.xml><?xml version="1.0" encoding="utf-8"?>
 <p:sld xmlns:a="http://schemas.openxmlformats.org/drawingml/2006/main" xmlns:r="http://schemas.openxmlformats.org/officeDocument/2006/relationships" xmlns:p="http://schemas.openxmlformats.org/presentationml/2006/main">
   <p:cSld>
     <p:spTree>
@@ -7762,257 +8864,7 @@
 </p:sld>
 </file>
 
-<file path=ppt/slides/slide2.xml><?xml version="1.0" encoding="utf-8"?>
-<p:sld xmlns:a="http://schemas.openxmlformats.org/drawingml/2006/main" xmlns:r="http://schemas.openxmlformats.org/officeDocument/2006/relationships" xmlns:p="http://schemas.openxmlformats.org/presentationml/2006/main">
-  <p:cSld>
-    <p:spTree>
-      <p:nvGrpSpPr>
-        <p:cNvPr id="1" name=""/>
-        <p:cNvGrpSpPr/>
-        <p:nvPr/>
-      </p:nvGrpSpPr>
-      <p:grpSpPr>
-        <a:xfrm>
-          <a:off x="0" y="0"/>
-          <a:ext cx="0" cy="0"/>
-          <a:chOff x="0" y="0"/>
-          <a:chExt cx="0" cy="0"/>
-        </a:xfrm>
-      </p:grpSpPr>
-      <p:pic>
-        <p:nvPicPr>
-          <p:cNvPr id="1026" name="Picture 2" descr="C:\Users\derickb\AppData\Local\Microsoft\Windows\Temporary Internet Files\Content.IE5\AY104AXF\MPj04331790000[1].jpg"/>
-          <p:cNvPicPr>
-            <a:picLocks noChangeAspect="1" noChangeArrowheads="1"/>
-          </p:cNvPicPr>
-          <p:nvPr/>
-        </p:nvPicPr>
-        <p:blipFill>
-          <a:blip r:embed="rId3"/>
-          <a:srcRect/>
-          <a:stretch>
-            <a:fillRect/>
-          </a:stretch>
-        </p:blipFill>
-        <p:spPr bwMode="auto">
-          <a:xfrm>
-            <a:off x="5426075" y="990600"/>
-            <a:ext cx="3717925" cy="2790288"/>
-          </a:xfrm>
-          <a:prstGeom prst="rect">
-            <a:avLst/>
-          </a:prstGeom>
-          <a:noFill/>
-        </p:spPr>
-      </p:pic>
-      <p:sp>
-        <p:nvSpPr>
-          <p:cNvPr id="3075" name="Text Placeholder 2"/>
-          <p:cNvSpPr>
-            <a:spLocks noGrp="1"/>
-          </p:cNvSpPr>
-          <p:nvPr>
-            <p:ph type="body" sz="quarter" idx="10"/>
-          </p:nvPr>
-        </p:nvSpPr>
-        <p:spPr>
-          <a:xfrm>
-            <a:off x="685800" y="1066800"/>
-            <a:ext cx="8229600" cy="5334000"/>
-          </a:xfrm>
-        </p:spPr>
-        <p:txBody>
-          <a:bodyPr/>
-          <a:lstStyle/>
-          <a:p>
-            <a:pPr eaLnBrk="1" hangingPunct="1">
-              <a:buNone/>
-            </a:pPr>
-            <a:endParaRPr lang="en-US" b="1" dirty="0" smtClean="0">
-              <a:solidFill>
-                <a:schemeClr val="accent1">
-                  <a:lumMod val="75000"/>
-                </a:schemeClr>
-              </a:solidFill>
-            </a:endParaRPr>
-          </a:p>
-          <a:p>
-            <a:pPr eaLnBrk="1" hangingPunct="1">
-              <a:buNone/>
-            </a:pPr>
-            <a:r>
-              <a:rPr lang="en-US" b="1" dirty="0" smtClean="0">
-                <a:solidFill>
-                  <a:schemeClr val="accent1">
-                    <a:lumMod val="75000"/>
-                  </a:schemeClr>
-                </a:solidFill>
-              </a:rPr>
-              <a:t>Topics Covered</a:t>
-            </a:r>
-          </a:p>
-          <a:p>
-            <a:pPr eaLnBrk="1" hangingPunct="1"/>
-            <a:r>
-              <a:rPr lang="en-US" sz="2000" dirty="0" smtClean="0"/>
-              <a:t>Workflow Services</a:t>
-            </a:r>
-          </a:p>
-          <a:p>
-            <a:pPr eaLnBrk="1" hangingPunct="1"/>
-            <a:r>
-              <a:rPr lang="en-US" sz="2000" dirty="0" smtClean="0"/>
-              <a:t>Command </a:t>
-            </a:r>
-            <a:r>
-              <a:rPr lang="en-US" sz="2000" dirty="0" smtClean="0"/>
-              <a:t>Pattern</a:t>
-            </a:r>
-          </a:p>
-          <a:p>
-            <a:pPr eaLnBrk="1" hangingPunct="1"/>
-            <a:r>
-              <a:rPr lang="en-US" sz="2000" dirty="0" smtClean="0"/>
-              <a:t>Event Aggregator</a:t>
-            </a:r>
-          </a:p>
-          <a:p>
-            <a:pPr eaLnBrk="1" hangingPunct="1"/>
-            <a:r>
-              <a:rPr lang="en-US" sz="2000" dirty="0" smtClean="0"/>
-              <a:t>Application </a:t>
-            </a:r>
-            <a:r>
-              <a:rPr lang="en-US" sz="2000" dirty="0" smtClean="0"/>
-              <a:t>Controller</a:t>
-            </a:r>
-          </a:p>
-          <a:p>
-            <a:pPr eaLnBrk="1" hangingPunct="1"/>
-            <a:r>
-              <a:rPr lang="en-US" sz="2000" dirty="0" smtClean="0"/>
-              <a:t>String It All Together </a:t>
-            </a:r>
-            <a:r>
-              <a:rPr lang="en-US" sz="2000" dirty="0" smtClean="0"/>
-              <a:t>With </a:t>
-            </a:r>
-            <a:r>
-              <a:rPr lang="en-US" sz="2000" dirty="0" smtClean="0"/>
-              <a:t>An </a:t>
-            </a:r>
-            <a:r>
-              <a:rPr lang="en-US" sz="2000" dirty="0" err="1" smtClean="0"/>
-              <a:t>IoC</a:t>
-            </a:r>
-            <a:r>
-              <a:rPr lang="en-US" sz="2000" dirty="0" smtClean="0"/>
-              <a:t> </a:t>
-            </a:r>
-            <a:r>
-              <a:rPr lang="en-US" sz="2000" dirty="0" smtClean="0"/>
-              <a:t>Container</a:t>
-            </a:r>
-          </a:p>
-          <a:p>
-            <a:pPr eaLnBrk="1" hangingPunct="1"/>
-            <a:endParaRPr lang="en-US" sz="2000" dirty="0" smtClean="0"/>
-          </a:p>
-          <a:p>
-            <a:pPr eaLnBrk="1" hangingPunct="1">
-              <a:buNone/>
-            </a:pPr>
-            <a:r>
-              <a:rPr lang="en-US" b="1" dirty="0" smtClean="0">
-                <a:solidFill>
-                  <a:schemeClr val="accent1">
-                    <a:lumMod val="75000"/>
-                  </a:schemeClr>
-                </a:solidFill>
-              </a:rPr>
-              <a:t>Goals</a:t>
-            </a:r>
-          </a:p>
-          <a:p>
-            <a:pPr eaLnBrk="1" hangingPunct="1"/>
-            <a:r>
-              <a:rPr lang="en-US" sz="2000" dirty="0" smtClean="0"/>
-              <a:t>Object Oriented System</a:t>
-            </a:r>
-          </a:p>
-          <a:p>
-            <a:pPr eaLnBrk="1" hangingPunct="1"/>
-            <a:r>
-              <a:rPr lang="en-US" sz="2000" dirty="0" smtClean="0"/>
-              <a:t>Testability</a:t>
-            </a:r>
-          </a:p>
-          <a:p>
-            <a:pPr eaLnBrk="1" hangingPunct="1"/>
-            <a:r>
-              <a:rPr lang="en-US" sz="2000" dirty="0" smtClean="0"/>
-              <a:t>Flexibility</a:t>
-            </a:r>
-          </a:p>
-          <a:p>
-            <a:pPr eaLnBrk="1" hangingPunct="1"/>
-            <a:r>
-              <a:rPr lang="en-US" sz="2000" dirty="0" smtClean="0"/>
-              <a:t>Maintainability (Ease of Enhancement)</a:t>
-            </a:r>
-          </a:p>
-        </p:txBody>
-      </p:sp>
-      <p:sp>
-        <p:nvSpPr>
-          <p:cNvPr id="3074" name="Title 1"/>
-          <p:cNvSpPr>
-            <a:spLocks noGrp="1"/>
-          </p:cNvSpPr>
-          <p:nvPr>
-            <p:ph type="title"/>
-          </p:nvPr>
-        </p:nvSpPr>
-        <p:spPr bwMode="auto">
-          <a:noFill/>
-          <a:ln>
-            <a:miter lim="800000"/>
-            <a:headEnd/>
-            <a:tailEnd/>
-          </a:ln>
-        </p:spPr>
-        <p:txBody>
-          <a:bodyPr vert="horz" wrap="square" lIns="91440" tIns="45720" rIns="91440" bIns="45720" numCol="1" anchor="t" anchorCtr="0" compatLnSpc="1">
-            <a:prstTxWarp prst="textNoShape">
-              <a:avLst/>
-            </a:prstTxWarp>
-          </a:bodyPr>
-          <a:lstStyle/>
-          <a:p>
-            <a:pPr eaLnBrk="1" hangingPunct="1"/>
-            <a:r>
-              <a:rPr lang="en-US" dirty="0" smtClean="0"/>
-              <a:t>Topics Of This Presentation</a:t>
-            </a:r>
-          </a:p>
-        </p:txBody>
-      </p:sp>
-    </p:spTree>
-  </p:cSld>
-  <p:clrMapOvr>
-    <a:masterClrMapping/>
-  </p:clrMapOvr>
-  <p:timing>
-    <p:tnLst>
-      <p:par>
-        <p:cTn id="1" dur="indefinite" restart="never" nodeType="tmRoot"/>
-      </p:par>
-    </p:tnLst>
-  </p:timing>
-</p:sld>
-</file>
-
-<file path=ppt/slides/slide20.xml><?xml version="1.0" encoding="utf-8"?>
+<file path=ppt/slides/slide21.xml><?xml version="1.0" encoding="utf-8"?>
 <p:sld xmlns:a="http://schemas.openxmlformats.org/drawingml/2006/main" xmlns:r="http://schemas.openxmlformats.org/officeDocument/2006/relationships" xmlns:p="http://schemas.openxmlformats.org/presentationml/2006/main">
   <p:cSld>
     <p:spTree>
@@ -8506,7 +9358,7 @@
 </p:sld>
 </file>
 
-<file path=ppt/slides/slide21.xml><?xml version="1.0" encoding="utf-8"?>
+<file path=ppt/slides/slide22.xml><?xml version="1.0" encoding="utf-8"?>
 <p:sld xmlns:a="http://schemas.openxmlformats.org/drawingml/2006/main" xmlns:r="http://schemas.openxmlformats.org/officeDocument/2006/relationships" xmlns:p="http://schemas.openxmlformats.org/presentationml/2006/main">
   <p:cSld>
     <p:spTree>
@@ -8756,7 +9608,7 @@
 </p:sld>
 </file>
 
-<file path=ppt/slides/slide22.xml><?xml version="1.0" encoding="utf-8"?>
+<file path=ppt/slides/slide23.xml><?xml version="1.0" encoding="utf-8"?>
 <p:sld xmlns:a="http://schemas.openxmlformats.org/drawingml/2006/main" xmlns:r="http://schemas.openxmlformats.org/officeDocument/2006/relationships" xmlns:p="http://schemas.openxmlformats.org/presentationml/2006/main">
   <p:cSld>
     <p:spTree>
@@ -8913,7 +9765,7 @@
 </p:sld>
 </file>
 
-<file path=ppt/slides/slide23.xml><?xml version="1.0" encoding="utf-8"?>
+<file path=ppt/slides/slide24.xml><?xml version="1.0" encoding="utf-8"?>
 <p:sld xmlns:a="http://schemas.openxmlformats.org/drawingml/2006/main" xmlns:r="http://schemas.openxmlformats.org/officeDocument/2006/relationships" xmlns:p="http://schemas.openxmlformats.org/presentationml/2006/main">
   <p:cSld>
     <p:spTree>
@@ -9253,7 +10105,7 @@
 </p:sld>
 </file>
 
-<file path=ppt/slides/slide24.xml><?xml version="1.0" encoding="utf-8"?>
+<file path=ppt/slides/slide25.xml><?xml version="1.0" encoding="utf-8"?>
 <p:sld xmlns:a="http://schemas.openxmlformats.org/drawingml/2006/main" xmlns:r="http://schemas.openxmlformats.org/officeDocument/2006/relationships" xmlns:p="http://schemas.openxmlformats.org/presentationml/2006/main">
   <p:cSld>
     <p:spTree>
@@ -9293,6 +10145,28 @@
             <a:pPr eaLnBrk="1" hangingPunct="1">
               <a:buNone/>
             </a:pPr>
+            <a:r>
+              <a:rPr lang="en-US" sz="2000" i="1" dirty="0" smtClean="0"/>
+              <a:t>“An </a:t>
+            </a:r>
+            <a:r>
+              <a:rPr lang="en-US" sz="2000" i="1" dirty="0" smtClean="0"/>
+              <a:t>Event Aggregator acts as a single source of events for many objects. It registers for all the events of the many objects allowing clients to register with just the aggregator</a:t>
+            </a:r>
+            <a:r>
+              <a:rPr lang="en-US" sz="2000" i="1" dirty="0" smtClean="0"/>
+              <a:t>.” </a:t>
+            </a:r>
+            <a:r>
+              <a:rPr lang="en-US" sz="2000" dirty="0" smtClean="0"/>
+              <a:t>– </a:t>
+            </a:r>
+            <a:r>
+              <a:rPr lang="en-US" sz="2000" dirty="0" smtClean="0">
+                <a:hlinkClick r:id="rId3"/>
+              </a:rPr>
+              <a:t>Martin Fowler</a:t>
+            </a:r>
             <a:endParaRPr lang="en-US" sz="2000" dirty="0" smtClean="0"/>
           </a:p>
         </p:txBody>
@@ -9340,7 +10214,7 @@
         </p:nvGrpSpPr>
         <p:grpSpPr>
           <a:xfrm>
-            <a:off x="1981200" y="2743200"/>
+            <a:off x="1981200" y="2667000"/>
             <a:ext cx="5181600" cy="2971800"/>
             <a:chOff x="1905000" y="2743200"/>
             <a:chExt cx="5181600" cy="2971800"/>
@@ -10159,7 +11033,7 @@
 </p:sld>
 </file>
 
-<file path=ppt/slides/slide25.xml><?xml version="1.0" encoding="utf-8"?>
+<file path=ppt/slides/slide26.xml><?xml version="1.0" encoding="utf-8"?>
 <p:sld xmlns:a="http://schemas.openxmlformats.org/drawingml/2006/main" xmlns:r="http://schemas.openxmlformats.org/officeDocument/2006/relationships" xmlns:p="http://schemas.openxmlformats.org/presentationml/2006/main">
   <p:cSld>
     <p:spTree>
@@ -10230,6 +11104,10 @@
           <a:lstStyle/>
           <a:p>
             <a:pPr eaLnBrk="1" hangingPunct="1"/>
+            <a:r>
+              <a:rPr lang="en-US" dirty="0" smtClean="0"/>
+              <a:t>Event Aggregator</a:t>
+            </a:r>
             <a:endParaRPr lang="en-US" dirty="0" smtClean="0"/>
           </a:p>
         </p:txBody>
@@ -10249,7 +11127,7 @@
 </p:sld>
 </file>
 
-<file path=ppt/slides/slide26.xml><?xml version="1.0" encoding="utf-8"?>
+<file path=ppt/slides/slide27.xml><?xml version="1.0" encoding="utf-8"?>
 <p:sld xmlns:a="http://schemas.openxmlformats.org/drawingml/2006/main" xmlns:r="http://schemas.openxmlformats.org/officeDocument/2006/relationships" xmlns:p="http://schemas.openxmlformats.org/presentationml/2006/main">
   <p:cSld>
     <p:spTree>
@@ -10598,96 +11476,6 @@
 </p:sld>
 </file>
 
-<file path=ppt/slides/slide27.xml><?xml version="1.0" encoding="utf-8"?>
-<p:sld xmlns:a="http://schemas.openxmlformats.org/drawingml/2006/main" xmlns:r="http://schemas.openxmlformats.org/officeDocument/2006/relationships" xmlns:p="http://schemas.openxmlformats.org/presentationml/2006/main">
-  <p:cSld>
-    <p:spTree>
-      <p:nvGrpSpPr>
-        <p:cNvPr id="1" name=""/>
-        <p:cNvGrpSpPr/>
-        <p:nvPr/>
-      </p:nvGrpSpPr>
-      <p:grpSpPr>
-        <a:xfrm>
-          <a:off x="0" y="0"/>
-          <a:ext cx="0" cy="0"/>
-          <a:chOff x="0" y="0"/>
-          <a:chExt cx="0" cy="0"/>
-        </a:xfrm>
-      </p:grpSpPr>
-      <p:sp>
-        <p:nvSpPr>
-          <p:cNvPr id="3075" name="Text Placeholder 2"/>
-          <p:cNvSpPr>
-            <a:spLocks noGrp="1"/>
-          </p:cNvSpPr>
-          <p:nvPr>
-            <p:ph type="body" sz="quarter" idx="10"/>
-          </p:nvPr>
-        </p:nvSpPr>
-        <p:spPr>
-          <a:xfrm>
-            <a:off x="685800" y="1066800"/>
-            <a:ext cx="8229600" cy="1219200"/>
-          </a:xfrm>
-        </p:spPr>
-        <p:txBody>
-          <a:bodyPr/>
-          <a:lstStyle/>
-          <a:p>
-            <a:pPr eaLnBrk="1" hangingPunct="1">
-              <a:buNone/>
-            </a:pPr>
-            <a:endParaRPr lang="en-US" sz="2000" dirty="0" smtClean="0"/>
-          </a:p>
-        </p:txBody>
-      </p:sp>
-      <p:sp>
-        <p:nvSpPr>
-          <p:cNvPr id="3074" name="Title 1"/>
-          <p:cNvSpPr>
-            <a:spLocks noGrp="1"/>
-          </p:cNvSpPr>
-          <p:nvPr>
-            <p:ph type="title"/>
-          </p:nvPr>
-        </p:nvSpPr>
-        <p:spPr bwMode="auto">
-          <a:noFill/>
-          <a:ln>
-            <a:miter lim="800000"/>
-            <a:headEnd/>
-            <a:tailEnd/>
-          </a:ln>
-        </p:spPr>
-        <p:txBody>
-          <a:bodyPr vert="horz" wrap="square" lIns="91440" tIns="45720" rIns="91440" bIns="45720" numCol="1" anchor="t" anchorCtr="0" compatLnSpc="1">
-            <a:prstTxWarp prst="textNoShape">
-              <a:avLst/>
-            </a:prstTxWarp>
-          </a:bodyPr>
-          <a:lstStyle/>
-          <a:p>
-            <a:pPr eaLnBrk="1" hangingPunct="1"/>
-            <a:endParaRPr lang="en-US" dirty="0" smtClean="0"/>
-          </a:p>
-        </p:txBody>
-      </p:sp>
-    </p:spTree>
-  </p:cSld>
-  <p:clrMapOvr>
-    <a:masterClrMapping/>
-  </p:clrMapOvr>
-  <p:timing>
-    <p:tnLst>
-      <p:par>
-        <p:cTn id="1" dur="indefinite" restart="never" nodeType="tmRoot"/>
-      </p:par>
-    </p:tnLst>
-  </p:timing>
-</p:sld>
-</file>
-
 <file path=ppt/slides/slide28.xml><?xml version="1.0" encoding="utf-8"?>
 <p:sld xmlns:a="http://schemas.openxmlformats.org/drawingml/2006/main" xmlns:r="http://schemas.openxmlformats.org/officeDocument/2006/relationships" xmlns:p="http://schemas.openxmlformats.org/presentationml/2006/main">
   <p:cSld>
@@ -10797,118 +11585,42 @@
       </p:grpSpPr>
       <p:sp>
         <p:nvSpPr>
-          <p:cNvPr id="6" name="Rectangle 5"/>
-          <p:cNvSpPr/>
-          <p:nvPr/>
+          <p:cNvPr id="3075" name="Text Placeholder 2"/>
+          <p:cNvSpPr>
+            <a:spLocks noGrp="1"/>
+          </p:cNvSpPr>
+          <p:nvPr>
+            <p:ph type="body" sz="quarter" idx="10"/>
+          </p:nvPr>
         </p:nvSpPr>
         <p:spPr>
           <a:xfrm>
-            <a:off x="0" y="0"/>
-            <a:ext cx="9144000" cy="4648200"/>
+            <a:off x="685800" y="1066800"/>
+            <a:ext cx="8229600" cy="1219200"/>
           </a:xfrm>
-          <a:prstGeom prst="rect">
-            <a:avLst/>
-          </a:prstGeom>
-          <a:solidFill>
-            <a:srgbClr val="0069AA"/>
-          </a:solidFill>
-          <a:ln>
-            <a:noFill/>
-          </a:ln>
         </p:spPr>
-        <p:style>
-          <a:lnRef idx="2">
-            <a:schemeClr val="accent1">
-              <a:shade val="50000"/>
-            </a:schemeClr>
-          </a:lnRef>
-          <a:fillRef idx="1">
-            <a:schemeClr val="accent1"/>
-          </a:fillRef>
-          <a:effectRef idx="0">
-            <a:schemeClr val="accent1"/>
-          </a:effectRef>
-          <a:fontRef idx="minor">
-            <a:schemeClr val="lt1"/>
-          </a:fontRef>
-        </p:style>
         <p:txBody>
-          <a:bodyPr anchor="ctr"/>
+          <a:bodyPr/>
           <a:lstStyle/>
           <a:p>
-            <a:pPr algn="ctr">
-              <a:defRPr/>
+            <a:pPr eaLnBrk="1" hangingPunct="1">
+              <a:buNone/>
             </a:pPr>
-            <a:endParaRPr lang="en-US"/>
+            <a:endParaRPr lang="en-US" sz="2000" dirty="0" smtClean="0"/>
           </a:p>
         </p:txBody>
       </p:sp>
       <p:sp>
         <p:nvSpPr>
-          <p:cNvPr id="8" name="Rectangle 7"/>
-          <p:cNvSpPr/>
-          <p:nvPr/>
-        </p:nvSpPr>
-        <p:spPr>
-          <a:xfrm>
-            <a:off x="228600" y="0"/>
-            <a:ext cx="104775" cy="3581400"/>
-          </a:xfrm>
-          <a:prstGeom prst="rect">
-            <a:avLst/>
-          </a:prstGeom>
-          <a:solidFill>
-            <a:srgbClr val="E31937"/>
-          </a:solidFill>
-          <a:ln>
-            <a:noFill/>
-          </a:ln>
-        </p:spPr>
-        <p:style>
-          <a:lnRef idx="2">
-            <a:schemeClr val="accent1">
-              <a:shade val="50000"/>
-            </a:schemeClr>
-          </a:lnRef>
-          <a:fillRef idx="1">
-            <a:schemeClr val="accent1"/>
-          </a:fillRef>
-          <a:effectRef idx="0">
-            <a:schemeClr val="accent1"/>
-          </a:effectRef>
-          <a:fontRef idx="minor">
-            <a:schemeClr val="lt1"/>
-          </a:fontRef>
-        </p:style>
-        <p:txBody>
-          <a:bodyPr anchor="ctr"/>
-          <a:lstStyle/>
-          <a:p>
-            <a:pPr algn="ctr">
-              <a:defRPr/>
-            </a:pPr>
-            <a:endParaRPr lang="en-US"/>
-          </a:p>
-        </p:txBody>
-      </p:sp>
-      <p:sp>
-        <p:nvSpPr>
-          <p:cNvPr id="5127" name="Rectangle 8"/>
+          <p:cNvPr id="3074" name="Title 1"/>
           <p:cNvSpPr>
-            <a:spLocks noGrp="1" noChangeArrowheads="1"/>
+            <a:spLocks noGrp="1"/>
           </p:cNvSpPr>
           <p:nvPr>
-            <p:ph type="title" idx="4294967295"/>
+            <p:ph type="title"/>
           </p:nvPr>
         </p:nvSpPr>
         <p:spPr bwMode="auto">
-          <a:xfrm>
-            <a:off x="495300" y="200025"/>
-            <a:ext cx="8420100" cy="919163"/>
-          </a:xfrm>
-          <a:prstGeom prst="rect">
-            <a:avLst/>
-          </a:prstGeom>
           <a:noFill/>
           <a:ln>
             <a:miter lim="800000"/>
@@ -10917,398 +11629,18 @@
           </a:ln>
         </p:spPr>
         <p:txBody>
-          <a:bodyPr/>
-          <a:lstStyle/>
-          <a:p>
-            <a:pPr eaLnBrk="1" hangingPunct="1"/>
-            <a:r>
-              <a:rPr lang="en-US" dirty="0" smtClean="0">
-                <a:solidFill>
-                  <a:schemeClr val="bg1"/>
-                </a:solidFill>
-              </a:rPr>
-              <a:t>Additional Resources</a:t>
-            </a:r>
-          </a:p>
-        </p:txBody>
-      </p:sp>
-      <p:sp>
-        <p:nvSpPr>
-          <p:cNvPr id="5128" name="Rectangle 9"/>
-          <p:cNvSpPr>
-            <a:spLocks noGrp="1" noChangeArrowheads="1"/>
-          </p:cNvSpPr>
-          <p:nvPr>
-            <p:ph idx="4294967295"/>
-          </p:nvPr>
-        </p:nvSpPr>
-        <p:spPr>
-          <a:xfrm>
-            <a:off x="514350" y="1143000"/>
-            <a:ext cx="8229600" cy="3429000"/>
-          </a:xfrm>
-        </p:spPr>
-        <p:txBody>
-          <a:bodyPr/>
-          <a:lstStyle/>
-          <a:p>
-            <a:pPr eaLnBrk="1" hangingPunct="1">
-              <a:lnSpc>
-                <a:spcPct val="80000"/>
-              </a:lnSpc>
-              <a:buNone/>
-            </a:pPr>
-            <a:r>
-              <a:rPr lang="en-US" sz="2000" dirty="0" smtClean="0">
-                <a:solidFill>
-                  <a:schemeClr val="bg1"/>
-                </a:solidFill>
-              </a:rPr>
-              <a:t>Command Pattern</a:t>
-            </a:r>
-          </a:p>
-          <a:p>
-            <a:pPr eaLnBrk="1" hangingPunct="1">
-              <a:lnSpc>
-                <a:spcPct val="80000"/>
-              </a:lnSpc>
-              <a:buNone/>
-            </a:pPr>
-            <a:r>
-              <a:rPr lang="en-US" sz="2000" dirty="0" smtClean="0">
-                <a:solidFill>
-                  <a:schemeClr val="bg1"/>
-                </a:solidFill>
-              </a:rPr>
-              <a:t>	http://www.lostechies.com/blogs/derickbailey/archive/2008/11/19/ptom-command-and-conquer-your-ui-coupling-problems.aspx </a:t>
-            </a:r>
-            <a:br>
-              <a:rPr lang="en-US" sz="2000" dirty="0" smtClean="0">
-                <a:solidFill>
-                  <a:schemeClr val="bg1"/>
-                </a:solidFill>
-              </a:rPr>
-            </a:br>
-            <a:endParaRPr lang="en-US" sz="2000" dirty="0" smtClean="0">
-              <a:solidFill>
-                <a:schemeClr val="bg1"/>
-              </a:solidFill>
-            </a:endParaRPr>
-          </a:p>
-          <a:p>
-            <a:pPr eaLnBrk="1" hangingPunct="1">
-              <a:lnSpc>
-                <a:spcPct val="80000"/>
-              </a:lnSpc>
-              <a:buNone/>
-            </a:pPr>
-            <a:r>
-              <a:rPr lang="en-US" sz="2000" dirty="0" smtClean="0">
-                <a:solidFill>
-                  <a:schemeClr val="bg1"/>
-                </a:solidFill>
-              </a:rPr>
-              <a:t>Event Aggregator</a:t>
-            </a:r>
-            <a:br>
-              <a:rPr lang="en-US" sz="2000" dirty="0" smtClean="0">
-                <a:solidFill>
-                  <a:schemeClr val="bg1"/>
-                </a:solidFill>
-              </a:rPr>
-            </a:br>
-            <a:r>
-              <a:rPr lang="en-US" sz="2000" dirty="0" smtClean="0">
-                <a:solidFill>
-                  <a:schemeClr val="bg1"/>
-                </a:solidFill>
-              </a:rPr>
-              <a:t>http://www.martinfowler.com/eaaDev/EventAggregator.html</a:t>
-            </a:r>
-            <a:br>
-              <a:rPr lang="en-US" sz="2000" dirty="0" smtClean="0">
-                <a:solidFill>
-                  <a:schemeClr val="bg1"/>
-                </a:solidFill>
-              </a:rPr>
-            </a:br>
-            <a:endParaRPr lang="en-US" sz="2000" dirty="0" smtClean="0">
-              <a:solidFill>
-                <a:schemeClr val="bg1"/>
-              </a:solidFill>
-            </a:endParaRPr>
-          </a:p>
-          <a:p>
-            <a:pPr eaLnBrk="1" hangingPunct="1">
-              <a:lnSpc>
-                <a:spcPct val="80000"/>
-              </a:lnSpc>
-              <a:buNone/>
-            </a:pPr>
-            <a:r>
-              <a:rPr lang="en-US" sz="2000" dirty="0" err="1" smtClean="0">
-                <a:solidFill>
-                  <a:schemeClr val="bg1"/>
-                </a:solidFill>
-              </a:rPr>
-              <a:t>IoC</a:t>
-            </a:r>
-            <a:r>
-              <a:rPr lang="en-US" sz="2000" dirty="0" smtClean="0">
-                <a:solidFill>
-                  <a:schemeClr val="bg1"/>
-                </a:solidFill>
-              </a:rPr>
-              <a:t> Container (</a:t>
-            </a:r>
-            <a:r>
-              <a:rPr lang="en-US" sz="2000" dirty="0" err="1" smtClean="0">
-                <a:solidFill>
-                  <a:schemeClr val="bg1"/>
-                </a:solidFill>
-              </a:rPr>
-              <a:t>StructureMap</a:t>
-            </a:r>
-            <a:r>
-              <a:rPr lang="en-US" sz="2000" dirty="0" smtClean="0">
-                <a:solidFill>
-                  <a:schemeClr val="bg1"/>
-                </a:solidFill>
-              </a:rPr>
-              <a:t>)</a:t>
-            </a:r>
-          </a:p>
-          <a:p>
-            <a:pPr eaLnBrk="1" hangingPunct="1">
-              <a:lnSpc>
-                <a:spcPct val="80000"/>
-              </a:lnSpc>
-              <a:buNone/>
-            </a:pPr>
-            <a:r>
-              <a:rPr lang="en-US" sz="2000" dirty="0" smtClean="0">
-                <a:solidFill>
-                  <a:schemeClr val="bg1"/>
-                </a:solidFill>
-              </a:rPr>
-              <a:t>	http://structuremap.sourceforge.net</a:t>
-            </a:r>
-            <a:br>
-              <a:rPr lang="en-US" sz="2000" dirty="0" smtClean="0">
-                <a:solidFill>
-                  <a:schemeClr val="bg1"/>
-                </a:solidFill>
-              </a:rPr>
-            </a:br>
-            <a:endParaRPr lang="en-US" sz="2000" dirty="0" smtClean="0">
-              <a:solidFill>
-                <a:schemeClr val="bg1"/>
-              </a:solidFill>
-            </a:endParaRPr>
-          </a:p>
-          <a:p>
-            <a:pPr eaLnBrk="1" hangingPunct="1">
-              <a:lnSpc>
-                <a:spcPct val="80000"/>
-              </a:lnSpc>
-              <a:buNone/>
-            </a:pPr>
-            <a:r>
-              <a:rPr lang="en-US" sz="2000" dirty="0" smtClean="0">
-                <a:solidFill>
-                  <a:schemeClr val="bg1"/>
-                </a:solidFill>
-              </a:rPr>
-              <a:t>Application Controller</a:t>
-            </a:r>
-          </a:p>
-          <a:p>
-            <a:pPr eaLnBrk="1" hangingPunct="1">
-              <a:lnSpc>
-                <a:spcPct val="80000"/>
-              </a:lnSpc>
-              <a:buNone/>
-            </a:pPr>
-            <a:r>
-              <a:rPr lang="en-US" sz="2000" dirty="0" smtClean="0">
-                <a:solidFill>
-                  <a:schemeClr val="bg1"/>
-                </a:solidFill>
-              </a:rPr>
-              <a:t>	http://www.martinfowler.com/eaaCatalog/applicationController.html</a:t>
-            </a:r>
-            <a:br>
-              <a:rPr lang="en-US" sz="2000" dirty="0" smtClean="0">
-                <a:solidFill>
-                  <a:schemeClr val="bg1"/>
-                </a:solidFill>
-              </a:rPr>
-            </a:br>
-            <a:endParaRPr lang="en-US" sz="2000" dirty="0" smtClean="0">
-              <a:solidFill>
-                <a:schemeClr val="bg1"/>
-              </a:solidFill>
-            </a:endParaRPr>
-          </a:p>
-        </p:txBody>
-      </p:sp>
-      <p:sp>
-        <p:nvSpPr>
-          <p:cNvPr id="5129" name="Text Box 7"/>
-          <p:cNvSpPr txBox="1">
-            <a:spLocks noChangeArrowheads="1"/>
-          </p:cNvSpPr>
-          <p:nvPr/>
-        </p:nvSpPr>
-        <p:spPr bwMode="auto">
-          <a:xfrm>
-            <a:off x="5470525" y="1331913"/>
-            <a:ext cx="184150" cy="366712"/>
-          </a:xfrm>
-          <a:prstGeom prst="rect">
-            <a:avLst/>
-          </a:prstGeom>
-          <a:noFill/>
-          <a:ln w="9525">
-            <a:noFill/>
-            <a:miter lim="800000"/>
-            <a:headEnd/>
-            <a:tailEnd/>
-          </a:ln>
-        </p:spPr>
-        <p:txBody>
-          <a:bodyPr wrap="none">
-            <a:spAutoFit/>
+          <a:bodyPr vert="horz" wrap="square" lIns="91440" tIns="45720" rIns="91440" bIns="45720" numCol="1" anchor="t" anchorCtr="0" compatLnSpc="1">
+            <a:prstTxWarp prst="textNoShape">
+              <a:avLst/>
+            </a:prstTxWarp>
           </a:bodyPr>
           <a:lstStyle/>
           <a:p>
-            <a:endParaRPr lang="en-US"/>
+            <a:pPr eaLnBrk="1" hangingPunct="1"/>
+            <a:endParaRPr lang="en-US" dirty="0" smtClean="0"/>
           </a:p>
         </p:txBody>
       </p:sp>
-      <p:pic>
-        <p:nvPicPr>
-          <p:cNvPr id="16" name="Picture 4" descr="MAT logo 1 CMYK"/>
-          <p:cNvPicPr>
-            <a:picLocks noChangeAspect="1" noChangeArrowheads="1"/>
-          </p:cNvPicPr>
-          <p:nvPr/>
-        </p:nvPicPr>
-        <p:blipFill>
-          <a:blip r:embed="rId2">
-            <a:clrChange>
-              <a:clrFrom>
-                <a:srgbClr val="FDFDFD"/>
-              </a:clrFrom>
-              <a:clrTo>
-                <a:srgbClr val="FDFDFD">
-                  <a:alpha val="0"/>
-                </a:srgbClr>
-              </a:clrTo>
-            </a:clrChange>
-          </a:blip>
-          <a:srcRect/>
-          <a:stretch>
-            <a:fillRect/>
-          </a:stretch>
-        </p:blipFill>
-        <p:spPr bwMode="auto">
-          <a:xfrm>
-            <a:off x="2971800" y="4800600"/>
-            <a:ext cx="2819400" cy="1338263"/>
-          </a:xfrm>
-          <a:prstGeom prst="rect">
-            <a:avLst/>
-          </a:prstGeom>
-          <a:noFill/>
-          <a:ln w="9525">
-            <a:noFill/>
-            <a:miter lim="800000"/>
-            <a:headEnd/>
-            <a:tailEnd/>
-          </a:ln>
-        </p:spPr>
-      </p:pic>
-      <p:sp>
-        <p:nvSpPr>
-          <p:cNvPr id="17" name="Rectangle 16"/>
-          <p:cNvSpPr/>
-          <p:nvPr/>
-        </p:nvSpPr>
-        <p:spPr>
-          <a:xfrm>
-            <a:off x="0" y="4724400"/>
-            <a:ext cx="9144000" cy="2133600"/>
-          </a:xfrm>
-          <a:prstGeom prst="rect">
-            <a:avLst/>
-          </a:prstGeom>
-          <a:solidFill>
-            <a:srgbClr val="E31937"/>
-          </a:solidFill>
-          <a:ln>
-            <a:noFill/>
-          </a:ln>
-        </p:spPr>
-        <p:style>
-          <a:lnRef idx="2">
-            <a:schemeClr val="accent1">
-              <a:shade val="50000"/>
-            </a:schemeClr>
-          </a:lnRef>
-          <a:fillRef idx="1">
-            <a:schemeClr val="accent1"/>
-          </a:fillRef>
-          <a:effectRef idx="0">
-            <a:schemeClr val="accent1"/>
-          </a:effectRef>
-          <a:fontRef idx="minor">
-            <a:schemeClr val="lt1"/>
-          </a:fontRef>
-        </p:style>
-        <p:txBody>
-          <a:bodyPr anchor="ctr"/>
-          <a:lstStyle/>
-          <a:p>
-            <a:pPr algn="ctr">
-              <a:defRPr/>
-            </a:pPr>
-            <a:endParaRPr lang="en-US"/>
-          </a:p>
-        </p:txBody>
-      </p:sp>
-      <p:pic>
-        <p:nvPicPr>
-          <p:cNvPr id="18" name="Picture 7" descr="MAT logo vertical_red.emf"/>
-          <p:cNvPicPr>
-            <a:picLocks noChangeAspect="1"/>
-          </p:cNvPicPr>
-          <p:nvPr/>
-        </p:nvPicPr>
-        <p:blipFill>
-          <a:blip r:embed="rId3"/>
-          <a:srcRect/>
-          <a:stretch>
-            <a:fillRect/>
-          </a:stretch>
-        </p:blipFill>
-        <p:spPr bwMode="auto">
-          <a:xfrm>
-            <a:off x="3600450" y="5334000"/>
-            <a:ext cx="1981200" cy="969963"/>
-          </a:xfrm>
-          <a:prstGeom prst="rect">
-            <a:avLst/>
-          </a:prstGeom>
-          <a:noFill/>
-          <a:ln w="9525">
-            <a:noFill/>
-            <a:miter lim="800000"/>
-            <a:headEnd/>
-            <a:tailEnd/>
-          </a:ln>
-        </p:spPr>
-      </p:pic>
     </p:spTree>
   </p:cSld>
   <p:clrMapOvr>
@@ -11536,6 +11868,557 @@
       </p:sp>
       <p:sp>
         <p:nvSpPr>
+          <p:cNvPr id="8" name="Rectangle 7"/>
+          <p:cNvSpPr/>
+          <p:nvPr/>
+        </p:nvSpPr>
+        <p:spPr>
+          <a:xfrm>
+            <a:off x="228600" y="0"/>
+            <a:ext cx="104775" cy="3581400"/>
+          </a:xfrm>
+          <a:prstGeom prst="rect">
+            <a:avLst/>
+          </a:prstGeom>
+          <a:solidFill>
+            <a:srgbClr val="E31937"/>
+          </a:solidFill>
+          <a:ln>
+            <a:noFill/>
+          </a:ln>
+        </p:spPr>
+        <p:style>
+          <a:lnRef idx="2">
+            <a:schemeClr val="accent1">
+              <a:shade val="50000"/>
+            </a:schemeClr>
+          </a:lnRef>
+          <a:fillRef idx="1">
+            <a:schemeClr val="accent1"/>
+          </a:fillRef>
+          <a:effectRef idx="0">
+            <a:schemeClr val="accent1"/>
+          </a:effectRef>
+          <a:fontRef idx="minor">
+            <a:schemeClr val="lt1"/>
+          </a:fontRef>
+        </p:style>
+        <p:txBody>
+          <a:bodyPr anchor="ctr"/>
+          <a:lstStyle/>
+          <a:p>
+            <a:pPr algn="ctr">
+              <a:defRPr/>
+            </a:pPr>
+            <a:endParaRPr lang="en-US"/>
+          </a:p>
+        </p:txBody>
+      </p:sp>
+      <p:sp>
+        <p:nvSpPr>
+          <p:cNvPr id="5127" name="Rectangle 8"/>
+          <p:cNvSpPr>
+            <a:spLocks noGrp="1" noChangeArrowheads="1"/>
+          </p:cNvSpPr>
+          <p:nvPr>
+            <p:ph type="title" idx="4294967295"/>
+          </p:nvPr>
+        </p:nvSpPr>
+        <p:spPr bwMode="auto">
+          <a:xfrm>
+            <a:off x="495300" y="200025"/>
+            <a:ext cx="8420100" cy="919163"/>
+          </a:xfrm>
+          <a:prstGeom prst="rect">
+            <a:avLst/>
+          </a:prstGeom>
+          <a:noFill/>
+          <a:ln>
+            <a:miter lim="800000"/>
+            <a:headEnd/>
+            <a:tailEnd/>
+          </a:ln>
+        </p:spPr>
+        <p:txBody>
+          <a:bodyPr/>
+          <a:lstStyle/>
+          <a:p>
+            <a:pPr eaLnBrk="1" hangingPunct="1"/>
+            <a:r>
+              <a:rPr lang="en-US" dirty="0" smtClean="0">
+                <a:solidFill>
+                  <a:schemeClr val="bg1"/>
+                </a:solidFill>
+              </a:rPr>
+              <a:t>Additional Resources</a:t>
+            </a:r>
+          </a:p>
+        </p:txBody>
+      </p:sp>
+      <p:sp>
+        <p:nvSpPr>
+          <p:cNvPr id="5128" name="Rectangle 9"/>
+          <p:cNvSpPr>
+            <a:spLocks noGrp="1" noChangeArrowheads="1"/>
+          </p:cNvSpPr>
+          <p:nvPr>
+            <p:ph idx="4294967295"/>
+          </p:nvPr>
+        </p:nvSpPr>
+        <p:spPr>
+          <a:xfrm>
+            <a:off x="514350" y="1143000"/>
+            <a:ext cx="8229600" cy="3429000"/>
+          </a:xfrm>
+        </p:spPr>
+        <p:txBody>
+          <a:bodyPr/>
+          <a:lstStyle/>
+          <a:p>
+            <a:pPr eaLnBrk="1" hangingPunct="1">
+              <a:lnSpc>
+                <a:spcPct val="80000"/>
+              </a:lnSpc>
+              <a:buNone/>
+            </a:pPr>
+            <a:r>
+              <a:rPr lang="en-US" sz="2000" dirty="0" smtClean="0">
+                <a:solidFill>
+                  <a:schemeClr val="bg1"/>
+                </a:solidFill>
+              </a:rPr>
+              <a:t>Command Pattern</a:t>
+            </a:r>
+          </a:p>
+          <a:p>
+            <a:pPr eaLnBrk="1" hangingPunct="1">
+              <a:lnSpc>
+                <a:spcPct val="80000"/>
+              </a:lnSpc>
+              <a:buNone/>
+            </a:pPr>
+            <a:r>
+              <a:rPr lang="en-US" sz="2000" dirty="0" smtClean="0">
+                <a:solidFill>
+                  <a:schemeClr val="bg1"/>
+                </a:solidFill>
+              </a:rPr>
+              <a:t>	http://www.lostechies.com/blogs/derickbailey/archive/2008/11/19/ptom-command-and-conquer-your-ui-coupling-problems.aspx </a:t>
+            </a:r>
+            <a:br>
+              <a:rPr lang="en-US" sz="2000" dirty="0" smtClean="0">
+                <a:solidFill>
+                  <a:schemeClr val="bg1"/>
+                </a:solidFill>
+              </a:rPr>
+            </a:br>
+            <a:endParaRPr lang="en-US" sz="2000" dirty="0" smtClean="0">
+              <a:solidFill>
+                <a:schemeClr val="bg1"/>
+              </a:solidFill>
+            </a:endParaRPr>
+          </a:p>
+          <a:p>
+            <a:pPr eaLnBrk="1" hangingPunct="1">
+              <a:lnSpc>
+                <a:spcPct val="80000"/>
+              </a:lnSpc>
+              <a:buNone/>
+            </a:pPr>
+            <a:r>
+              <a:rPr lang="en-US" sz="2000" dirty="0" smtClean="0">
+                <a:solidFill>
+                  <a:schemeClr val="bg1"/>
+                </a:solidFill>
+              </a:rPr>
+              <a:t>Event Aggregator</a:t>
+            </a:r>
+            <a:br>
+              <a:rPr lang="en-US" sz="2000" dirty="0" smtClean="0">
+                <a:solidFill>
+                  <a:schemeClr val="bg1"/>
+                </a:solidFill>
+              </a:rPr>
+            </a:br>
+            <a:r>
+              <a:rPr lang="en-US" sz="2000" dirty="0" smtClean="0">
+                <a:solidFill>
+                  <a:schemeClr val="bg1"/>
+                </a:solidFill>
+              </a:rPr>
+              <a:t>http://www.martinfowler.com/eaaDev/EventAggregator.html</a:t>
+            </a:r>
+            <a:br>
+              <a:rPr lang="en-US" sz="2000" dirty="0" smtClean="0">
+                <a:solidFill>
+                  <a:schemeClr val="bg1"/>
+                </a:solidFill>
+              </a:rPr>
+            </a:br>
+            <a:endParaRPr lang="en-US" sz="2000" dirty="0" smtClean="0">
+              <a:solidFill>
+                <a:schemeClr val="bg1"/>
+              </a:solidFill>
+            </a:endParaRPr>
+          </a:p>
+          <a:p>
+            <a:pPr eaLnBrk="1" hangingPunct="1">
+              <a:lnSpc>
+                <a:spcPct val="80000"/>
+              </a:lnSpc>
+              <a:buNone/>
+            </a:pPr>
+            <a:r>
+              <a:rPr lang="en-US" sz="2000" dirty="0" err="1" smtClean="0">
+                <a:solidFill>
+                  <a:schemeClr val="bg1"/>
+                </a:solidFill>
+              </a:rPr>
+              <a:t>StructureMap</a:t>
+            </a:r>
+            <a:r>
+              <a:rPr lang="en-US" sz="2000" dirty="0" smtClean="0">
+                <a:solidFill>
+                  <a:schemeClr val="bg1"/>
+                </a:solidFill>
+              </a:rPr>
+              <a:t> (</a:t>
+            </a:r>
+            <a:r>
+              <a:rPr lang="en-US" sz="2000" dirty="0" err="1" smtClean="0">
+                <a:solidFill>
+                  <a:schemeClr val="bg1"/>
+                </a:solidFill>
+              </a:rPr>
+              <a:t>IoC</a:t>
+            </a:r>
+            <a:r>
+              <a:rPr lang="en-US" sz="2000" dirty="0" smtClean="0">
+                <a:solidFill>
+                  <a:schemeClr val="bg1"/>
+                </a:solidFill>
+              </a:rPr>
+              <a:t> Container)</a:t>
+            </a:r>
+            <a:endParaRPr lang="en-US" sz="2000" dirty="0" smtClean="0">
+              <a:solidFill>
+                <a:schemeClr val="bg1"/>
+              </a:solidFill>
+            </a:endParaRPr>
+          </a:p>
+          <a:p>
+            <a:pPr eaLnBrk="1" hangingPunct="1">
+              <a:lnSpc>
+                <a:spcPct val="80000"/>
+              </a:lnSpc>
+              <a:buNone/>
+            </a:pPr>
+            <a:r>
+              <a:rPr lang="en-US" sz="2000" dirty="0" smtClean="0">
+                <a:solidFill>
+                  <a:schemeClr val="bg1"/>
+                </a:solidFill>
+              </a:rPr>
+              <a:t>	http://structuremap.sourceforge.net</a:t>
+            </a:r>
+            <a:br>
+              <a:rPr lang="en-US" sz="2000" dirty="0" smtClean="0">
+                <a:solidFill>
+                  <a:schemeClr val="bg1"/>
+                </a:solidFill>
+              </a:rPr>
+            </a:br>
+            <a:endParaRPr lang="en-US" sz="2000" dirty="0" smtClean="0">
+              <a:solidFill>
+                <a:schemeClr val="bg1"/>
+              </a:solidFill>
+            </a:endParaRPr>
+          </a:p>
+          <a:p>
+            <a:pPr eaLnBrk="1" hangingPunct="1">
+              <a:lnSpc>
+                <a:spcPct val="80000"/>
+              </a:lnSpc>
+              <a:buNone/>
+            </a:pPr>
+            <a:r>
+              <a:rPr lang="en-US" sz="2000" dirty="0" smtClean="0">
+                <a:solidFill>
+                  <a:schemeClr val="bg1"/>
+                </a:solidFill>
+              </a:rPr>
+              <a:t>Application Controller</a:t>
+            </a:r>
+          </a:p>
+          <a:p>
+            <a:pPr eaLnBrk="1" hangingPunct="1">
+              <a:lnSpc>
+                <a:spcPct val="80000"/>
+              </a:lnSpc>
+              <a:buNone/>
+            </a:pPr>
+            <a:r>
+              <a:rPr lang="en-US" sz="2000" dirty="0" smtClean="0">
+                <a:solidFill>
+                  <a:schemeClr val="bg1"/>
+                </a:solidFill>
+              </a:rPr>
+              <a:t>	http://www.martinfowler.com/eaaCatalog/applicationController.html</a:t>
+            </a:r>
+            <a:br>
+              <a:rPr lang="en-US" sz="2000" dirty="0" smtClean="0">
+                <a:solidFill>
+                  <a:schemeClr val="bg1"/>
+                </a:solidFill>
+              </a:rPr>
+            </a:br>
+            <a:endParaRPr lang="en-US" sz="2000" dirty="0" smtClean="0">
+              <a:solidFill>
+                <a:schemeClr val="bg1"/>
+              </a:solidFill>
+            </a:endParaRPr>
+          </a:p>
+        </p:txBody>
+      </p:sp>
+      <p:sp>
+        <p:nvSpPr>
+          <p:cNvPr id="5129" name="Text Box 7"/>
+          <p:cNvSpPr txBox="1">
+            <a:spLocks noChangeArrowheads="1"/>
+          </p:cNvSpPr>
+          <p:nvPr/>
+        </p:nvSpPr>
+        <p:spPr bwMode="auto">
+          <a:xfrm>
+            <a:off x="5470525" y="1331913"/>
+            <a:ext cx="184150" cy="366712"/>
+          </a:xfrm>
+          <a:prstGeom prst="rect">
+            <a:avLst/>
+          </a:prstGeom>
+          <a:noFill/>
+          <a:ln w="9525">
+            <a:noFill/>
+            <a:miter lim="800000"/>
+            <a:headEnd/>
+            <a:tailEnd/>
+          </a:ln>
+        </p:spPr>
+        <p:txBody>
+          <a:bodyPr wrap="none">
+            <a:spAutoFit/>
+          </a:bodyPr>
+          <a:lstStyle/>
+          <a:p>
+            <a:endParaRPr lang="en-US"/>
+          </a:p>
+        </p:txBody>
+      </p:sp>
+      <p:pic>
+        <p:nvPicPr>
+          <p:cNvPr id="16" name="Picture 4" descr="MAT logo 1 CMYK"/>
+          <p:cNvPicPr>
+            <a:picLocks noChangeAspect="1" noChangeArrowheads="1"/>
+          </p:cNvPicPr>
+          <p:nvPr/>
+        </p:nvPicPr>
+        <p:blipFill>
+          <a:blip r:embed="rId2">
+            <a:clrChange>
+              <a:clrFrom>
+                <a:srgbClr val="FDFDFD"/>
+              </a:clrFrom>
+              <a:clrTo>
+                <a:srgbClr val="FDFDFD">
+                  <a:alpha val="0"/>
+                </a:srgbClr>
+              </a:clrTo>
+            </a:clrChange>
+          </a:blip>
+          <a:srcRect/>
+          <a:stretch>
+            <a:fillRect/>
+          </a:stretch>
+        </p:blipFill>
+        <p:spPr bwMode="auto">
+          <a:xfrm>
+            <a:off x="2971800" y="4800600"/>
+            <a:ext cx="2819400" cy="1338263"/>
+          </a:xfrm>
+          <a:prstGeom prst="rect">
+            <a:avLst/>
+          </a:prstGeom>
+          <a:noFill/>
+          <a:ln w="9525">
+            <a:noFill/>
+            <a:miter lim="800000"/>
+            <a:headEnd/>
+            <a:tailEnd/>
+          </a:ln>
+        </p:spPr>
+      </p:pic>
+      <p:sp>
+        <p:nvSpPr>
+          <p:cNvPr id="17" name="Rectangle 16"/>
+          <p:cNvSpPr/>
+          <p:nvPr/>
+        </p:nvSpPr>
+        <p:spPr>
+          <a:xfrm>
+            <a:off x="0" y="4724400"/>
+            <a:ext cx="9144000" cy="2133600"/>
+          </a:xfrm>
+          <a:prstGeom prst="rect">
+            <a:avLst/>
+          </a:prstGeom>
+          <a:solidFill>
+            <a:srgbClr val="E31937"/>
+          </a:solidFill>
+          <a:ln>
+            <a:noFill/>
+          </a:ln>
+        </p:spPr>
+        <p:style>
+          <a:lnRef idx="2">
+            <a:schemeClr val="accent1">
+              <a:shade val="50000"/>
+            </a:schemeClr>
+          </a:lnRef>
+          <a:fillRef idx="1">
+            <a:schemeClr val="accent1"/>
+          </a:fillRef>
+          <a:effectRef idx="0">
+            <a:schemeClr val="accent1"/>
+          </a:effectRef>
+          <a:fontRef idx="minor">
+            <a:schemeClr val="lt1"/>
+          </a:fontRef>
+        </p:style>
+        <p:txBody>
+          <a:bodyPr anchor="ctr"/>
+          <a:lstStyle/>
+          <a:p>
+            <a:pPr algn="ctr">
+              <a:defRPr/>
+            </a:pPr>
+            <a:endParaRPr lang="en-US"/>
+          </a:p>
+        </p:txBody>
+      </p:sp>
+      <p:pic>
+        <p:nvPicPr>
+          <p:cNvPr id="18" name="Picture 7" descr="MAT logo vertical_red.emf"/>
+          <p:cNvPicPr>
+            <a:picLocks noChangeAspect="1"/>
+          </p:cNvPicPr>
+          <p:nvPr/>
+        </p:nvPicPr>
+        <p:blipFill>
+          <a:blip r:embed="rId3"/>
+          <a:srcRect/>
+          <a:stretch>
+            <a:fillRect/>
+          </a:stretch>
+        </p:blipFill>
+        <p:spPr bwMode="auto">
+          <a:xfrm>
+            <a:off x="3600450" y="5334000"/>
+            <a:ext cx="1981200" cy="969963"/>
+          </a:xfrm>
+          <a:prstGeom prst="rect">
+            <a:avLst/>
+          </a:prstGeom>
+          <a:noFill/>
+          <a:ln w="9525">
+            <a:noFill/>
+            <a:miter lim="800000"/>
+            <a:headEnd/>
+            <a:tailEnd/>
+          </a:ln>
+        </p:spPr>
+      </p:pic>
+    </p:spTree>
+  </p:cSld>
+  <p:clrMapOvr>
+    <a:masterClrMapping/>
+  </p:clrMapOvr>
+  <p:timing>
+    <p:tnLst>
+      <p:par>
+        <p:cTn id="1" dur="indefinite" restart="never" nodeType="tmRoot"/>
+      </p:par>
+    </p:tnLst>
+  </p:timing>
+</p:sld>
+</file>
+
+<file path=ppt/slides/slide31.xml><?xml version="1.0" encoding="utf-8"?>
+<p:sld xmlns:a="http://schemas.openxmlformats.org/drawingml/2006/main" xmlns:r="http://schemas.openxmlformats.org/officeDocument/2006/relationships" xmlns:p="http://schemas.openxmlformats.org/presentationml/2006/main">
+  <p:cSld>
+    <p:spTree>
+      <p:nvGrpSpPr>
+        <p:cNvPr id="1" name=""/>
+        <p:cNvGrpSpPr/>
+        <p:nvPr/>
+      </p:nvGrpSpPr>
+      <p:grpSpPr>
+        <a:xfrm>
+          <a:off x="0" y="0"/>
+          <a:ext cx="0" cy="0"/>
+          <a:chOff x="0" y="0"/>
+          <a:chExt cx="0" cy="0"/>
+        </a:xfrm>
+      </p:grpSpPr>
+      <p:sp>
+        <p:nvSpPr>
+          <p:cNvPr id="6" name="Rectangle 5"/>
+          <p:cNvSpPr/>
+          <p:nvPr/>
+        </p:nvSpPr>
+        <p:spPr>
+          <a:xfrm>
+            <a:off x="0" y="0"/>
+            <a:ext cx="9144000" cy="4648200"/>
+          </a:xfrm>
+          <a:prstGeom prst="rect">
+            <a:avLst/>
+          </a:prstGeom>
+          <a:solidFill>
+            <a:srgbClr val="0069AA"/>
+          </a:solidFill>
+          <a:ln>
+            <a:noFill/>
+          </a:ln>
+        </p:spPr>
+        <p:style>
+          <a:lnRef idx="2">
+            <a:schemeClr val="accent1">
+              <a:shade val="50000"/>
+            </a:schemeClr>
+          </a:lnRef>
+          <a:fillRef idx="1">
+            <a:schemeClr val="accent1"/>
+          </a:fillRef>
+          <a:effectRef idx="0">
+            <a:schemeClr val="accent1"/>
+          </a:effectRef>
+          <a:fontRef idx="minor">
+            <a:schemeClr val="lt1"/>
+          </a:fontRef>
+        </p:style>
+        <p:txBody>
+          <a:bodyPr anchor="ctr"/>
+          <a:lstStyle/>
+          <a:p>
+            <a:pPr algn="ctr">
+              <a:defRPr/>
+            </a:pPr>
+            <a:endParaRPr lang="en-US"/>
+          </a:p>
+        </p:txBody>
+      </p:sp>
+      <p:sp>
+        <p:nvSpPr>
           <p:cNvPr id="7" name="Rectangle 6"/>
           <p:cNvSpPr/>
           <p:nvPr/>
@@ -12427,15 +13310,11 @@
         </p:nvGrpSpPr>
         <p:grpSpPr>
           <a:xfrm>
-            <a:off x="1371600" y="2743200"/>
+            <a:off x="1371600" y="2667000"/>
             <a:ext cx="6400800" cy="3276600"/>
             <a:chOff x="609600" y="2667000"/>
             <a:chExt cx="6400800" cy="3276600"/>
           </a:xfrm>
-          <a:scene3d>
-            <a:camera prst="perspectiveAbove"/>
-            <a:lightRig rig="threePt" dir="t"/>
-          </a:scene3d>
         </p:grpSpPr>
         <p:grpSp>
           <p:nvGrpSpPr>
@@ -13318,15 +14197,11 @@
         </p:nvGrpSpPr>
         <p:grpSpPr>
           <a:xfrm>
-            <a:off x="1257300" y="2971800"/>
+            <a:off x="1257300" y="2895600"/>
             <a:ext cx="6629400" cy="2743200"/>
             <a:chOff x="609600" y="3124200"/>
             <a:chExt cx="6629400" cy="2743200"/>
           </a:xfrm>
-          <a:scene3d>
-            <a:camera prst="perspectiveAbove"/>
-            <a:lightRig rig="threePt" dir="t"/>
-          </a:scene3d>
         </p:grpSpPr>
         <p:sp>
           <p:nvSpPr>
@@ -15156,64 +16031,79 @@
           </a:p>
         </p:txBody>
       </p:sp>
-      <p:pic>
-        <p:nvPicPr>
-          <p:cNvPr id="7" name="Picture 3" descr="X:\Derick-GitHub\Presentation And Training Material\Decoupling Workflow With App Controler\doc\Org Chart View - Org Chart Panel.png"/>
-          <p:cNvPicPr>
-            <a:picLocks noChangeAspect="1" noChangeArrowheads="1"/>
-          </p:cNvPicPr>
+      <p:grpSp>
+        <p:nvGrpSpPr>
+          <p:cNvPr id="6" name="Group 5"/>
+          <p:cNvGrpSpPr/>
           <p:nvPr/>
-        </p:nvPicPr>
-        <p:blipFill>
-          <a:blip r:embed="rId3"/>
-          <a:srcRect/>
-          <a:stretch>
-            <a:fillRect/>
-          </a:stretch>
-        </p:blipFill>
-        <p:spPr bwMode="auto">
+        </p:nvGrpSpPr>
+        <p:grpSpPr>
           <a:xfrm>
-            <a:off x="1104899" y="1828800"/>
-            <a:ext cx="4286251" cy="4048125"/>
+            <a:off x="857250" y="1828800"/>
+            <a:ext cx="7429501" cy="4048125"/>
+            <a:chOff x="1104899" y="1828800"/>
+            <a:chExt cx="7429501" cy="4048125"/>
           </a:xfrm>
-          <a:prstGeom prst="rect">
-            <a:avLst/>
-          </a:prstGeom>
-          <a:noFill/>
-        </p:spPr>
-      </p:pic>
-      <p:pic>
-        <p:nvPicPr>
-          <p:cNvPr id="2050" name="Picture 2" descr="X:\Derick-GitHub\Presentation And Training Material\Decoupling Workflow With App Controler\doc\Org Chart View - Employee Info Panel.png"/>
-          <p:cNvPicPr>
-            <a:picLocks noChangeAspect="1" noChangeArrowheads="1"/>
-          </p:cNvPicPr>
-          <p:nvPr/>
-        </p:nvPicPr>
-        <p:blipFill>
-          <a:blip r:embed="rId4"/>
-          <a:srcRect/>
-          <a:stretch>
-            <a:fillRect/>
-          </a:stretch>
-        </p:blipFill>
-        <p:spPr bwMode="auto">
-          <a:xfrm>
-            <a:off x="4533899" y="4267200"/>
-            <a:ext cx="4000501" cy="952500"/>
-          </a:xfrm>
-          <a:prstGeom prst="rect">
-            <a:avLst/>
-          </a:prstGeom>
-          <a:ln w="38100">
-            <a:solidFill>
-              <a:schemeClr val="accent2"/>
-            </a:solidFill>
-            <a:prstDash val="sysDash"/>
-          </a:ln>
-          <a:effectLst/>
-        </p:spPr>
-      </p:pic>
+        </p:grpSpPr>
+        <p:pic>
+          <p:nvPicPr>
+            <p:cNvPr id="7" name="Picture 3" descr="X:\Derick-GitHub\Presentation And Training Material\Decoupling Workflow With App Controler\doc\Org Chart View - Org Chart Panel.png"/>
+            <p:cNvPicPr>
+              <a:picLocks noChangeAspect="1" noChangeArrowheads="1"/>
+            </p:cNvPicPr>
+            <p:nvPr/>
+          </p:nvPicPr>
+          <p:blipFill>
+            <a:blip r:embed="rId3"/>
+            <a:srcRect/>
+            <a:stretch>
+              <a:fillRect/>
+            </a:stretch>
+          </p:blipFill>
+          <p:spPr bwMode="auto">
+            <a:xfrm>
+              <a:off x="1104899" y="1828800"/>
+              <a:ext cx="4286251" cy="4048125"/>
+            </a:xfrm>
+            <a:prstGeom prst="rect">
+              <a:avLst/>
+            </a:prstGeom>
+            <a:noFill/>
+          </p:spPr>
+        </p:pic>
+        <p:pic>
+          <p:nvPicPr>
+            <p:cNvPr id="2050" name="Picture 2" descr="X:\Derick-GitHub\Presentation And Training Material\Decoupling Workflow With App Controler\doc\Org Chart View - Employee Info Panel.png"/>
+            <p:cNvPicPr>
+              <a:picLocks noChangeAspect="1" noChangeArrowheads="1"/>
+            </p:cNvPicPr>
+            <p:nvPr/>
+          </p:nvPicPr>
+          <p:blipFill>
+            <a:blip r:embed="rId4"/>
+            <a:srcRect/>
+            <a:stretch>
+              <a:fillRect/>
+            </a:stretch>
+          </p:blipFill>
+          <p:spPr bwMode="auto">
+            <a:xfrm>
+              <a:off x="4533899" y="4267200"/>
+              <a:ext cx="4000501" cy="952500"/>
+            </a:xfrm>
+            <a:prstGeom prst="rect">
+              <a:avLst/>
+            </a:prstGeom>
+            <a:ln w="38100">
+              <a:solidFill>
+                <a:schemeClr val="accent2"/>
+              </a:solidFill>
+              <a:prstDash val="sysDash"/>
+            </a:ln>
+            <a:effectLst/>
+          </p:spPr>
+        </p:pic>
+      </p:grpSp>
     </p:spTree>
   </p:cSld>
   <p:clrMapOvr>
@@ -15314,102 +16204,117 @@
           </a:p>
         </p:txBody>
       </p:sp>
-      <p:pic>
-        <p:nvPicPr>
-          <p:cNvPr id="4" name="Picture 3" descr="X:\Derick-GitHub\Presentation And Training Material\Decoupling Workflow With App Controler\doc\New Employee - Info.png"/>
-          <p:cNvPicPr>
-            <a:picLocks noChangeAspect="1" noChangeArrowheads="1"/>
-          </p:cNvPicPr>
+      <p:grpSp>
+        <p:nvGrpSpPr>
+          <p:cNvPr id="7" name="Group 6"/>
+          <p:cNvGrpSpPr/>
           <p:nvPr/>
-        </p:nvPicPr>
-        <p:blipFill>
-          <a:blip r:embed="rId3"/>
-          <a:srcRect/>
-          <a:stretch>
-            <a:fillRect/>
-          </a:stretch>
-        </p:blipFill>
-        <p:spPr bwMode="auto">
+        </p:nvGrpSpPr>
+        <p:grpSpPr>
           <a:xfrm>
-            <a:off x="742950" y="1752600"/>
-            <a:ext cx="4286250" cy="2257425"/>
+            <a:off x="552450" y="1752600"/>
+            <a:ext cx="8039100" cy="4438650"/>
+            <a:chOff x="742950" y="1752600"/>
+            <a:chExt cx="8039100" cy="4438650"/>
           </a:xfrm>
-          <a:prstGeom prst="rect">
-            <a:avLst/>
-          </a:prstGeom>
-          <a:noFill/>
-        </p:spPr>
-      </p:pic>
-      <p:pic>
-        <p:nvPicPr>
-          <p:cNvPr id="5" name="Picture 4" descr="X:\Derick-GitHub\Presentation And Training Material\Decoupling Workflow With App Controler\doc\New Employee - Manager.png"/>
-          <p:cNvPicPr>
-            <a:picLocks noChangeAspect="1" noChangeArrowheads="1"/>
-          </p:cNvPicPr>
-          <p:nvPr/>
-        </p:nvPicPr>
-        <p:blipFill>
-          <a:blip r:embed="rId4"/>
-          <a:srcRect/>
-          <a:stretch>
-            <a:fillRect/>
-          </a:stretch>
-        </p:blipFill>
-        <p:spPr bwMode="auto">
-          <a:xfrm>
-            <a:off x="4495800" y="4419600"/>
-            <a:ext cx="4286250" cy="1771650"/>
-          </a:xfrm>
-          <a:prstGeom prst="rect">
-            <a:avLst/>
-          </a:prstGeom>
-          <a:noFill/>
-        </p:spPr>
-      </p:pic>
-      <p:sp>
-        <p:nvSpPr>
-          <p:cNvPr id="6" name="Arc 5"/>
-          <p:cNvSpPr/>
-          <p:nvPr/>
-        </p:nvSpPr>
-        <p:spPr>
-          <a:xfrm>
-            <a:off x="3581400" y="3505200"/>
-            <a:ext cx="2209800" cy="2209800"/>
-          </a:xfrm>
-          <a:prstGeom prst="arc">
-            <a:avLst>
-              <a:gd name="adj1" fmla="val 16231089"/>
-              <a:gd name="adj2" fmla="val 0"/>
-            </a:avLst>
-          </a:prstGeom>
-          <a:ln>
-            <a:tailEnd type="triangle"/>
-          </a:ln>
-        </p:spPr>
-        <p:style>
-          <a:lnRef idx="3">
-            <a:schemeClr val="accent2"/>
-          </a:lnRef>
-          <a:fillRef idx="0">
-            <a:schemeClr val="accent2"/>
-          </a:fillRef>
-          <a:effectRef idx="2">
-            <a:schemeClr val="accent2"/>
-          </a:effectRef>
-          <a:fontRef idx="minor">
-            <a:schemeClr val="tx1"/>
-          </a:fontRef>
-        </p:style>
-        <p:txBody>
-          <a:bodyPr rtlCol="0" anchor="ctr"/>
-          <a:lstStyle/>
-          <a:p>
-            <a:pPr algn="ctr"/>
-            <a:endParaRPr lang="en-US"/>
-          </a:p>
-        </p:txBody>
-      </p:sp>
+        </p:grpSpPr>
+        <p:pic>
+          <p:nvPicPr>
+            <p:cNvPr id="4" name="Picture 3" descr="X:\Derick-GitHub\Presentation And Training Material\Decoupling Workflow With App Controler\doc\New Employee - Info.png"/>
+            <p:cNvPicPr>
+              <a:picLocks noChangeAspect="1" noChangeArrowheads="1"/>
+            </p:cNvPicPr>
+            <p:nvPr/>
+          </p:nvPicPr>
+          <p:blipFill>
+            <a:blip r:embed="rId3"/>
+            <a:srcRect/>
+            <a:stretch>
+              <a:fillRect/>
+            </a:stretch>
+          </p:blipFill>
+          <p:spPr bwMode="auto">
+            <a:xfrm>
+              <a:off x="742950" y="1752600"/>
+              <a:ext cx="4286250" cy="2257425"/>
+            </a:xfrm>
+            <a:prstGeom prst="rect">
+              <a:avLst/>
+            </a:prstGeom>
+            <a:noFill/>
+          </p:spPr>
+        </p:pic>
+        <p:pic>
+          <p:nvPicPr>
+            <p:cNvPr id="5" name="Picture 4" descr="X:\Derick-GitHub\Presentation And Training Material\Decoupling Workflow With App Controler\doc\New Employee - Manager.png"/>
+            <p:cNvPicPr>
+              <a:picLocks noChangeAspect="1" noChangeArrowheads="1"/>
+            </p:cNvPicPr>
+            <p:nvPr/>
+          </p:nvPicPr>
+          <p:blipFill>
+            <a:blip r:embed="rId4"/>
+            <a:srcRect/>
+            <a:stretch>
+              <a:fillRect/>
+            </a:stretch>
+          </p:blipFill>
+          <p:spPr bwMode="auto">
+            <a:xfrm>
+              <a:off x="4495800" y="4419600"/>
+              <a:ext cx="4286250" cy="1771650"/>
+            </a:xfrm>
+            <a:prstGeom prst="rect">
+              <a:avLst/>
+            </a:prstGeom>
+            <a:noFill/>
+          </p:spPr>
+        </p:pic>
+        <p:sp>
+          <p:nvSpPr>
+            <p:cNvPr id="6" name="Arc 5"/>
+            <p:cNvSpPr/>
+            <p:nvPr/>
+          </p:nvSpPr>
+          <p:spPr>
+            <a:xfrm>
+              <a:off x="3581400" y="3505200"/>
+              <a:ext cx="2209800" cy="2209800"/>
+            </a:xfrm>
+            <a:prstGeom prst="arc">
+              <a:avLst>
+                <a:gd name="adj1" fmla="val 16231089"/>
+                <a:gd name="adj2" fmla="val 0"/>
+              </a:avLst>
+            </a:prstGeom>
+            <a:ln>
+              <a:tailEnd type="triangle"/>
+            </a:ln>
+          </p:spPr>
+          <p:style>
+            <a:lnRef idx="3">
+              <a:schemeClr val="accent2"/>
+            </a:lnRef>
+            <a:fillRef idx="0">
+              <a:schemeClr val="accent2"/>
+            </a:fillRef>
+            <a:effectRef idx="2">
+              <a:schemeClr val="accent2"/>
+            </a:effectRef>
+            <a:fontRef idx="minor">
+              <a:schemeClr val="tx1"/>
+            </a:fontRef>
+          </p:style>
+          <p:txBody>
+            <a:bodyPr rtlCol="0" anchor="ctr"/>
+            <a:lstStyle/>
+            <a:p>
+              <a:pPr algn="ctr"/>
+              <a:endParaRPr lang="en-US"/>
+            </a:p>
+          </p:txBody>
+        </p:sp>
+      </p:grpSp>
     </p:spTree>
   </p:cSld>
   <p:clrMapOvr>

</xml_diff>

<commit_message>
minor formatting of text
</commit_message>
<xml_diff>
--- a/Decoupling Workflow With App Controler/Decoupling Workflow From Forms.pptx
+++ b/Decoupling Workflow With App Controler/Decoupling Workflow From Forms.pptx
@@ -10146,20 +10146,16 @@
               <a:buNone/>
             </a:pPr>
             <a:r>
-              <a:rPr lang="en-US" sz="2000" i="1" dirty="0" smtClean="0"/>
+              <a:rPr lang="en-US" sz="2000" dirty="0" smtClean="0"/>
               <a:t>“An </a:t>
             </a:r>
             <a:r>
-              <a:rPr lang="en-US" sz="2000" i="1" dirty="0" smtClean="0"/>
+              <a:rPr lang="en-US" sz="2000" dirty="0" smtClean="0"/>
               <a:t>Event Aggregator acts as a single source of events for many objects. It registers for all the events of the many objects allowing clients to register with just the aggregator</a:t>
             </a:r>
             <a:r>
-              <a:rPr lang="en-US" sz="2000" i="1" dirty="0" smtClean="0"/>
-              <a:t>.” </a:t>
-            </a:r>
-            <a:r>
               <a:rPr lang="en-US" sz="2000" dirty="0" smtClean="0"/>
-              <a:t>– </a:t>
+              <a:t>.” – </a:t>
             </a:r>
             <a:r>
               <a:rPr lang="en-US" sz="2000" dirty="0" smtClean="0">

</xml_diff>

<commit_message>
deleted an icommand slide. was too much detail in a slide. will show that incode.
</commit_message>
<xml_diff>
--- a/Decoupling Workflow With App Controler/Decoupling Workflow From Forms.pptx
+++ b/Decoupling Workflow With App Controler/Decoupling Workflow From Forms.pptx
@@ -5,10 +5,10 @@
     <p:sldMasterId id="2147483822" r:id="rId4"/>
   </p:sldMasterIdLst>
   <p:notesMasterIdLst>
-    <p:notesMasterId r:id="rId36"/>
+    <p:notesMasterId r:id="rId35"/>
   </p:notesMasterIdLst>
   <p:handoutMasterIdLst>
-    <p:handoutMasterId r:id="rId37"/>
+    <p:handoutMasterId r:id="rId36"/>
   </p:handoutMasterIdLst>
   <p:sldIdLst>
     <p:sldId id="256" r:id="rId5"/>
@@ -31,27 +31,26 @@
     <p:sldId id="301" r:id="rId22"/>
     <p:sldId id="302" r:id="rId23"/>
     <p:sldId id="285" r:id="rId24"/>
-    <p:sldId id="299" r:id="rId25"/>
-    <p:sldId id="300" r:id="rId26"/>
-    <p:sldId id="297" r:id="rId27"/>
-    <p:sldId id="276" r:id="rId28"/>
-    <p:sldId id="277" r:id="rId29"/>
-    <p:sldId id="284" r:id="rId30"/>
-    <p:sldId id="292" r:id="rId31"/>
-    <p:sldId id="293" r:id="rId32"/>
-    <p:sldId id="294" r:id="rId33"/>
-    <p:sldId id="259" r:id="rId34"/>
-    <p:sldId id="274" r:id="rId35"/>
+    <p:sldId id="300" r:id="rId25"/>
+    <p:sldId id="297" r:id="rId26"/>
+    <p:sldId id="276" r:id="rId27"/>
+    <p:sldId id="277" r:id="rId28"/>
+    <p:sldId id="284" r:id="rId29"/>
+    <p:sldId id="292" r:id="rId30"/>
+    <p:sldId id="293" r:id="rId31"/>
+    <p:sldId id="294" r:id="rId32"/>
+    <p:sldId id="259" r:id="rId33"/>
+    <p:sldId id="274" r:id="rId34"/>
   </p:sldIdLst>
   <p:sldSz cx="9144000" cy="6858000" type="screen4x3"/>
   <p:notesSz cx="7010400" cy="9296400"/>
   <p:embeddedFontLst>
     <p:embeddedFont>
       <p:font typeface="Calibri" pitchFamily="34" charset="0"/>
-      <p:regular r:id="rId38"/>
-      <p:bold r:id="rId39"/>
-      <p:italic r:id="rId40"/>
-      <p:boldItalic r:id="rId41"/>
+      <p:regular r:id="rId37"/>
+      <p:bold r:id="rId38"/>
+      <p:italic r:id="rId39"/>
+      <p:boldItalic r:id="rId40"/>
     </p:embeddedFont>
   </p:embeddedFontLst>
   <p:defaultTextStyle>
@@ -1611,7 +1610,7 @@
               <a:pPr>
                 <a:defRPr/>
               </a:pPr>
-              <a:t>23</a:t>
+              <a:t>24</a:t>
             </a:fld>
             <a:endParaRPr lang="en-US"/>
           </a:p>
@@ -1872,7 +1871,7 @@
               <a:pPr>
                 <a:defRPr/>
               </a:pPr>
-              <a:t>26</a:t>
+              <a:t>27</a:t>
             </a:fld>
             <a:endParaRPr lang="en-US"/>
           </a:p>
@@ -1960,93 +1959,6 @@
                 <a:defRPr/>
               </a:pPr>
               <a:t>28</a:t>
-            </a:fld>
-            <a:endParaRPr lang="en-US"/>
-          </a:p>
-        </p:txBody>
-      </p:sp>
-    </p:spTree>
-  </p:cSld>
-  <p:clrMapOvr>
-    <a:masterClrMapping/>
-  </p:clrMapOvr>
-</p:notes>
-</file>
-
-<file path=ppt/notesSlides/notesSlide22.xml><?xml version="1.0" encoding="utf-8"?>
-<p:notes xmlns:a="http://schemas.openxmlformats.org/drawingml/2006/main" xmlns:r="http://schemas.openxmlformats.org/officeDocument/2006/relationships" xmlns:p="http://schemas.openxmlformats.org/presentationml/2006/main">
-  <p:cSld>
-    <p:spTree>
-      <p:nvGrpSpPr>
-        <p:cNvPr id="1" name=""/>
-        <p:cNvGrpSpPr/>
-        <p:nvPr/>
-      </p:nvGrpSpPr>
-      <p:grpSpPr>
-        <a:xfrm>
-          <a:off x="0" y="0"/>
-          <a:ext cx="0" cy="0"/>
-          <a:chOff x="0" y="0"/>
-          <a:chExt cx="0" cy="0"/>
-        </a:xfrm>
-      </p:grpSpPr>
-      <p:sp>
-        <p:nvSpPr>
-          <p:cNvPr id="2" name="Slide Image Placeholder 1"/>
-          <p:cNvSpPr>
-            <a:spLocks noGrp="1" noRot="1" noChangeAspect="1"/>
-          </p:cNvSpPr>
-          <p:nvPr>
-            <p:ph type="sldImg"/>
-          </p:nvPr>
-        </p:nvSpPr>
-        <p:spPr/>
-      </p:sp>
-      <p:sp>
-        <p:nvSpPr>
-          <p:cNvPr id="3" name="Notes Placeholder 2"/>
-          <p:cNvSpPr>
-            <a:spLocks noGrp="1"/>
-          </p:cNvSpPr>
-          <p:nvPr>
-            <p:ph type="body" idx="1"/>
-          </p:nvPr>
-        </p:nvSpPr>
-        <p:spPr/>
-        <p:txBody>
-          <a:bodyPr>
-            <a:normAutofit/>
-          </a:bodyPr>
-          <a:lstStyle/>
-          <a:p>
-            <a:endParaRPr lang="en-US" dirty="0"/>
-          </a:p>
-        </p:txBody>
-      </p:sp>
-      <p:sp>
-        <p:nvSpPr>
-          <p:cNvPr id="4" name="Slide Number Placeholder 3"/>
-          <p:cNvSpPr>
-            <a:spLocks noGrp="1"/>
-          </p:cNvSpPr>
-          <p:nvPr>
-            <p:ph type="sldNum" sz="quarter" idx="10"/>
-          </p:nvPr>
-        </p:nvSpPr>
-        <p:spPr/>
-        <p:txBody>
-          <a:bodyPr/>
-          <a:lstStyle/>
-          <a:p>
-            <a:pPr>
-              <a:defRPr/>
-            </a:pPr>
-            <a:fld id="{1931C8FD-CC35-423B-99F4-64D81D6A80AE}" type="slidenum">
-              <a:rPr lang="en-US" smtClean="0"/>
-              <a:pPr>
-                <a:defRPr/>
-              </a:pPr>
-              <a:t>29</a:t>
             </a:fld>
             <a:endParaRPr lang="en-US"/>
           </a:p>
@@ -8906,500 +8818,6 @@
             </a:pPr>
             <a:r>
               <a:rPr lang="en-US" sz="2000" dirty="0" smtClean="0"/>
-              <a:t>Interfaces And Objects</a:t>
-            </a:r>
-          </a:p>
-        </p:txBody>
-      </p:sp>
-      <p:sp>
-        <p:nvSpPr>
-          <p:cNvPr id="3074" name="Title 1"/>
-          <p:cNvSpPr>
-            <a:spLocks noGrp="1"/>
-          </p:cNvSpPr>
-          <p:nvPr>
-            <p:ph type="title"/>
-          </p:nvPr>
-        </p:nvSpPr>
-        <p:spPr bwMode="auto">
-          <a:noFill/>
-          <a:ln>
-            <a:miter lim="800000"/>
-            <a:headEnd/>
-            <a:tailEnd/>
-          </a:ln>
-        </p:spPr>
-        <p:txBody>
-          <a:bodyPr vert="horz" wrap="square" lIns="91440" tIns="45720" rIns="91440" bIns="45720" numCol="1" anchor="t" anchorCtr="0" compatLnSpc="1">
-            <a:prstTxWarp prst="textNoShape">
-              <a:avLst/>
-            </a:prstTxWarp>
-          </a:bodyPr>
-          <a:lstStyle/>
-          <a:p>
-            <a:pPr eaLnBrk="1" hangingPunct="1"/>
-            <a:r>
-              <a:rPr lang="en-US" dirty="0" smtClean="0"/>
-              <a:t>The Command Pattern</a:t>
-            </a:r>
-          </a:p>
-        </p:txBody>
-      </p:sp>
-      <p:grpSp>
-        <p:nvGrpSpPr>
-          <p:cNvPr id="16" name="Group 15"/>
-          <p:cNvGrpSpPr/>
-          <p:nvPr/>
-        </p:nvGrpSpPr>
-        <p:grpSpPr>
-          <a:xfrm>
-            <a:off x="1347044" y="2052935"/>
-            <a:ext cx="6653956" cy="3585865"/>
-            <a:chOff x="1347044" y="2052935"/>
-            <a:chExt cx="6653956" cy="3585865"/>
-          </a:xfrm>
-        </p:grpSpPr>
-        <p:grpSp>
-          <p:nvGrpSpPr>
-            <p:cNvPr id="14" name="Group 13"/>
-            <p:cNvGrpSpPr/>
-            <p:nvPr/>
-          </p:nvGrpSpPr>
-          <p:grpSpPr>
-            <a:xfrm>
-              <a:off x="2006260" y="2052935"/>
-              <a:ext cx="4981005" cy="473333"/>
-              <a:chOff x="1955119" y="2198132"/>
-              <a:chExt cx="4981005" cy="473333"/>
-            </a:xfrm>
-          </p:grpSpPr>
-          <p:sp>
-            <p:nvSpPr>
-              <p:cNvPr id="4" name="TextBox 3"/>
-              <p:cNvSpPr txBox="1"/>
-              <p:nvPr/>
-            </p:nvSpPr>
-            <p:spPr>
-              <a:xfrm>
-                <a:off x="1955119" y="2209800"/>
-                <a:ext cx="2007281" cy="461665"/>
-              </a:xfrm>
-              <a:prstGeom prst="rect">
-                <a:avLst/>
-              </a:prstGeom>
-            </p:spPr>
-            <p:style>
-              <a:lnRef idx="2">
-                <a:schemeClr val="accent1">
-                  <a:shade val="50000"/>
-                </a:schemeClr>
-              </a:lnRef>
-              <a:fillRef idx="1">
-                <a:schemeClr val="accent1"/>
-              </a:fillRef>
-              <a:effectRef idx="0">
-                <a:schemeClr val="accent1"/>
-              </a:effectRef>
-              <a:fontRef idx="minor">
-                <a:schemeClr val="lt1"/>
-              </a:fontRef>
-            </p:style>
-            <p:txBody>
-              <a:bodyPr wrap="none" rtlCol="0">
-                <a:spAutoFit/>
-              </a:bodyPr>
-              <a:lstStyle/>
-              <a:p>
-                <a:r>
-                  <a:rPr lang="en-US" sz="2400" dirty="0" err="1" smtClean="0">
-                    <a:latin typeface="+mn-lt"/>
-                  </a:rPr>
-                  <a:t>ICommand</a:t>
-                </a:r>
-                <a:r>
-                  <a:rPr lang="en-US" sz="2400" dirty="0" smtClean="0">
-                    <a:latin typeface="+mn-lt"/>
-                  </a:rPr>
-                  <a:t>&lt;T</a:t>
-                </a:r>
-                <a:r>
-                  <a:rPr lang="en-US" sz="2400" dirty="0" smtClean="0">
-                    <a:latin typeface="+mn-lt"/>
-                  </a:rPr>
-                  <a:t>&gt;</a:t>
-                </a:r>
-                <a:endParaRPr lang="en-US" sz="2400" dirty="0" smtClean="0">
-                  <a:latin typeface="+mn-lt"/>
-                </a:endParaRPr>
-              </a:p>
-            </p:txBody>
-          </p:sp>
-          <p:sp>
-            <p:nvSpPr>
-              <p:cNvPr id="5" name="TextBox 4"/>
-              <p:cNvSpPr txBox="1"/>
-              <p:nvPr/>
-            </p:nvSpPr>
-            <p:spPr>
-              <a:xfrm>
-                <a:off x="4292259" y="2202597"/>
-                <a:ext cx="2643865" cy="461665"/>
-              </a:xfrm>
-              <a:prstGeom prst="rect">
-                <a:avLst/>
-              </a:prstGeom>
-            </p:spPr>
-            <p:style>
-              <a:lnRef idx="2">
-                <a:schemeClr val="accent1">
-                  <a:shade val="50000"/>
-                </a:schemeClr>
-              </a:lnRef>
-              <a:fillRef idx="1">
-                <a:schemeClr val="accent1"/>
-              </a:fillRef>
-              <a:effectRef idx="0">
-                <a:schemeClr val="accent1"/>
-              </a:effectRef>
-              <a:fontRef idx="minor">
-                <a:schemeClr val="lt1"/>
-              </a:fontRef>
-            </p:style>
-            <p:txBody>
-              <a:bodyPr wrap="none" rtlCol="0">
-                <a:spAutoFit/>
-              </a:bodyPr>
-              <a:lstStyle/>
-              <a:p>
-                <a:r>
-                  <a:rPr lang="en-US" sz="2400" dirty="0" err="1" smtClean="0">
-                    <a:latin typeface="+mn-lt"/>
-                  </a:rPr>
-                  <a:t>CommandDataType</a:t>
-                </a:r>
-                <a:endParaRPr lang="en-US" sz="2400" dirty="0" smtClean="0">
-                  <a:latin typeface="+mn-lt"/>
-                </a:endParaRPr>
-              </a:p>
-            </p:txBody>
-          </p:sp>
-          <p:sp>
-            <p:nvSpPr>
-              <p:cNvPr id="7" name="TextBox 6"/>
-              <p:cNvSpPr txBox="1"/>
-              <p:nvPr/>
-            </p:nvSpPr>
-            <p:spPr>
-              <a:xfrm>
-                <a:off x="3962400" y="2198132"/>
-                <a:ext cx="338554" cy="461665"/>
-              </a:xfrm>
-              <a:prstGeom prst="rect">
-                <a:avLst/>
-              </a:prstGeom>
-              <a:noFill/>
-            </p:spPr>
-            <p:txBody>
-              <a:bodyPr wrap="none" rtlCol="0">
-                <a:spAutoFit/>
-              </a:bodyPr>
-              <a:lstStyle/>
-              <a:p>
-                <a:r>
-                  <a:rPr lang="en-US" sz="2400" dirty="0" smtClean="0">
-                    <a:latin typeface="+mn-lt"/>
-                  </a:rPr>
-                  <a:t>+</a:t>
-                </a:r>
-              </a:p>
-            </p:txBody>
-          </p:sp>
-        </p:grpSp>
-        <p:grpSp>
-          <p:nvGrpSpPr>
-            <p:cNvPr id="18" name="Group 17"/>
-            <p:cNvGrpSpPr/>
-            <p:nvPr/>
-          </p:nvGrpSpPr>
-          <p:grpSpPr>
-            <a:xfrm>
-              <a:off x="1347044" y="2895600"/>
-              <a:ext cx="6653956" cy="2743200"/>
-              <a:chOff x="1347044" y="2788860"/>
-              <a:chExt cx="6653956" cy="2743200"/>
-            </a:xfrm>
-          </p:grpSpPr>
-          <p:grpSp>
-            <p:nvGrpSpPr>
-              <p:cNvPr id="15" name="Group 14"/>
-              <p:cNvGrpSpPr/>
-              <p:nvPr/>
-            </p:nvGrpSpPr>
-            <p:grpSpPr>
-              <a:xfrm>
-                <a:off x="1352833" y="2788860"/>
-                <a:ext cx="6648167" cy="1173540"/>
-                <a:chOff x="1352833" y="2788860"/>
-                <a:chExt cx="6648167" cy="1173540"/>
-              </a:xfrm>
-            </p:grpSpPr>
-            <p:sp>
-              <p:nvSpPr>
-                <p:cNvPr id="6" name="TextBox 5"/>
-                <p:cNvSpPr txBox="1"/>
-                <p:nvPr/>
-              </p:nvSpPr>
-              <p:spPr>
-                <a:xfrm>
-                  <a:off x="1352833" y="3500735"/>
-                  <a:ext cx="6648167" cy="461665"/>
-                </a:xfrm>
-                <a:prstGeom prst="rect">
-                  <a:avLst/>
-                </a:prstGeom>
-              </p:spPr>
-              <p:style>
-                <a:lnRef idx="2">
-                  <a:schemeClr val="accent2">
-                    <a:shade val="50000"/>
-                  </a:schemeClr>
-                </a:lnRef>
-                <a:fillRef idx="1">
-                  <a:schemeClr val="accent2"/>
-                </a:fillRef>
-                <a:effectRef idx="0">
-                  <a:schemeClr val="accent2"/>
-                </a:effectRef>
-                <a:fontRef idx="minor">
-                  <a:schemeClr val="lt1"/>
-                </a:fontRef>
-              </p:style>
-              <p:txBody>
-                <a:bodyPr wrap="square" rtlCol="0">
-                  <a:spAutoFit/>
-                </a:bodyPr>
-                <a:lstStyle/>
-                <a:p>
-                  <a:r>
-                    <a:rPr lang="en-US" sz="2400" dirty="0" err="1" smtClean="0">
-                      <a:latin typeface="+mn-lt"/>
-                    </a:rPr>
-                    <a:t>CommandObject</a:t>
-                  </a:r>
-                  <a:r>
-                    <a:rPr lang="en-US" sz="2400" dirty="0" smtClean="0">
-                      <a:latin typeface="+mn-lt"/>
-                    </a:rPr>
-                    <a:t>:  </a:t>
-                  </a:r>
-                  <a:r>
-                    <a:rPr lang="en-US" sz="2400" dirty="0" err="1" smtClean="0">
-                      <a:latin typeface="+mn-lt"/>
-                    </a:rPr>
-                    <a:t>ICommand</a:t>
-                  </a:r>
-                  <a:r>
-                    <a:rPr lang="en-US" sz="2400" dirty="0" smtClean="0">
-                      <a:latin typeface="+mn-lt"/>
-                    </a:rPr>
-                    <a:t>&lt;</a:t>
-                  </a:r>
-                  <a:r>
-                    <a:rPr lang="en-US" sz="2400" dirty="0" err="1" smtClean="0">
-                      <a:latin typeface="+mn-lt"/>
-                    </a:rPr>
-                    <a:t>CommandDataType</a:t>
-                  </a:r>
-                  <a:r>
-                    <a:rPr lang="en-US" sz="2400" dirty="0" smtClean="0">
-                      <a:latin typeface="+mn-lt"/>
-                    </a:rPr>
-                    <a:t>&gt;</a:t>
-                  </a:r>
-                </a:p>
-              </p:txBody>
-            </p:sp>
-            <p:sp>
-              <p:nvSpPr>
-                <p:cNvPr id="13" name="TextBox 12"/>
-                <p:cNvSpPr txBox="1"/>
-                <p:nvPr/>
-              </p:nvSpPr>
-              <p:spPr>
-                <a:xfrm>
-                  <a:off x="4038600" y="2788860"/>
-                  <a:ext cx="338554" cy="461665"/>
-                </a:xfrm>
-                <a:prstGeom prst="rect">
-                  <a:avLst/>
-                </a:prstGeom>
-                <a:noFill/>
-              </p:spPr>
-              <p:txBody>
-                <a:bodyPr wrap="none" rtlCol="0">
-                  <a:spAutoFit/>
-                </a:bodyPr>
-                <a:lstStyle/>
-                <a:p>
-                  <a:r>
-                    <a:rPr lang="en-US" sz="2400" dirty="0" smtClean="0">
-                      <a:latin typeface="+mn-lt"/>
-                    </a:rPr>
-                    <a:t>=</a:t>
-                  </a:r>
-                </a:p>
-              </p:txBody>
-            </p:sp>
-          </p:grpSp>
-          <p:sp>
-            <p:nvSpPr>
-              <p:cNvPr id="17" name="TextBox 16"/>
-              <p:cNvSpPr txBox="1"/>
-              <p:nvPr/>
-            </p:nvSpPr>
-            <p:spPr>
-              <a:xfrm>
-                <a:off x="1347044" y="3962400"/>
-                <a:ext cx="6653956" cy="1569660"/>
-              </a:xfrm>
-              <a:prstGeom prst="rect">
-                <a:avLst/>
-              </a:prstGeom>
-            </p:spPr>
-            <p:style>
-              <a:lnRef idx="2">
-                <a:schemeClr val="accent2">
-                  <a:shade val="50000"/>
-                </a:schemeClr>
-              </a:lnRef>
-              <a:fillRef idx="1">
-                <a:schemeClr val="accent2"/>
-              </a:fillRef>
-              <a:effectRef idx="0">
-                <a:schemeClr val="accent2"/>
-              </a:effectRef>
-              <a:fontRef idx="minor">
-                <a:schemeClr val="lt1"/>
-              </a:fontRef>
-            </p:style>
-            <p:txBody>
-              <a:bodyPr wrap="square" rtlCol="0">
-                <a:spAutoFit/>
-              </a:bodyPr>
-              <a:lstStyle/>
-              <a:p>
-                <a:r>
-                  <a:rPr lang="en-US" sz="2400" dirty="0" smtClean="0">
-                    <a:latin typeface="+mn-lt"/>
-                  </a:rPr>
-                  <a:t>.Execute(</a:t>
-                </a:r>
-                <a:r>
-                  <a:rPr lang="en-US" sz="2400" dirty="0" err="1" smtClean="0">
-                    <a:latin typeface="+mn-lt"/>
-                  </a:rPr>
-                  <a:t>CommandDataType</a:t>
-                </a:r>
-                <a:r>
-                  <a:rPr lang="en-US" sz="2400" dirty="0" smtClean="0">
-                    <a:latin typeface="+mn-lt"/>
-                  </a:rPr>
-                  <a:t> </a:t>
-                </a:r>
-                <a:r>
-                  <a:rPr lang="en-US" sz="2400" dirty="0" err="1" smtClean="0">
-                    <a:latin typeface="+mn-lt"/>
-                  </a:rPr>
-                  <a:t>param</a:t>
-                </a:r>
-                <a:r>
-                  <a:rPr lang="en-US" sz="2400" dirty="0" smtClean="0">
-                    <a:latin typeface="+mn-lt"/>
-                  </a:rPr>
-                  <a:t>)</a:t>
-                </a:r>
-              </a:p>
-              <a:p>
-                <a:r>
-                  <a:rPr lang="en-US" sz="2400" dirty="0" smtClean="0"/>
-                  <a:t>{</a:t>
-                </a:r>
-              </a:p>
-              <a:p>
-                <a:r>
-                  <a:rPr lang="en-US" sz="2400" dirty="0" smtClean="0"/>
-                  <a:t>    //do something here</a:t>
-                </a:r>
-              </a:p>
-              <a:p>
-                <a:r>
-                  <a:rPr lang="en-US" sz="2400" dirty="0" smtClean="0">
-                    <a:latin typeface="+mn-lt"/>
-                  </a:rPr>
-                  <a:t>}</a:t>
-                </a:r>
-              </a:p>
-            </p:txBody>
-          </p:sp>
-        </p:grpSp>
-      </p:grpSp>
-    </p:spTree>
-  </p:cSld>
-  <p:clrMapOvr>
-    <a:masterClrMapping/>
-  </p:clrMapOvr>
-  <p:timing>
-    <p:tnLst>
-      <p:par>
-        <p:cTn id="1" dur="indefinite" restart="never" nodeType="tmRoot"/>
-      </p:par>
-    </p:tnLst>
-  </p:timing>
-</p:sld>
-</file>
-
-<file path=ppt/slides/slide22.xml><?xml version="1.0" encoding="utf-8"?>
-<p:sld xmlns:a="http://schemas.openxmlformats.org/drawingml/2006/main" xmlns:r="http://schemas.openxmlformats.org/officeDocument/2006/relationships" xmlns:p="http://schemas.openxmlformats.org/presentationml/2006/main">
-  <p:cSld>
-    <p:spTree>
-      <p:nvGrpSpPr>
-        <p:cNvPr id="1" name=""/>
-        <p:cNvGrpSpPr/>
-        <p:nvPr/>
-      </p:nvGrpSpPr>
-      <p:grpSpPr>
-        <a:xfrm>
-          <a:off x="0" y="0"/>
-          <a:ext cx="0" cy="0"/>
-          <a:chOff x="0" y="0"/>
-          <a:chExt cx="0" cy="0"/>
-        </a:xfrm>
-      </p:grpSpPr>
-      <p:sp>
-        <p:nvSpPr>
-          <p:cNvPr id="3075" name="Text Placeholder 2"/>
-          <p:cNvSpPr>
-            <a:spLocks noGrp="1"/>
-          </p:cNvSpPr>
-          <p:nvPr>
-            <p:ph type="body" sz="quarter" idx="10"/>
-          </p:nvPr>
-        </p:nvSpPr>
-        <p:spPr>
-          <a:xfrm>
-            <a:off x="685800" y="1066800"/>
-            <a:ext cx="8229600" cy="1219200"/>
-          </a:xfrm>
-        </p:spPr>
-        <p:txBody>
-          <a:bodyPr/>
-          <a:lstStyle/>
-          <a:p>
-            <a:pPr eaLnBrk="1" hangingPunct="1">
-              <a:buNone/>
-            </a:pPr>
-            <a:r>
-              <a:rPr lang="en-US" sz="2000" dirty="0" smtClean="0"/>
               <a:t>Decoupling The Add New Employee Workflow From The Main Form</a:t>
             </a:r>
           </a:p>
@@ -9608,7 +9026,7 @@
 </p:sld>
 </file>
 
-<file path=ppt/slides/slide23.xml><?xml version="1.0" encoding="utf-8"?>
+<file path=ppt/slides/slide22.xml><?xml version="1.0" encoding="utf-8"?>
 <p:sld xmlns:a="http://schemas.openxmlformats.org/drawingml/2006/main" xmlns:r="http://schemas.openxmlformats.org/officeDocument/2006/relationships" xmlns:p="http://schemas.openxmlformats.org/presentationml/2006/main">
   <p:cSld>
     <p:spTree>
@@ -9765,7 +9183,7 @@
 </p:sld>
 </file>
 
-<file path=ppt/slides/slide24.xml><?xml version="1.0" encoding="utf-8"?>
+<file path=ppt/slides/slide23.xml><?xml version="1.0" encoding="utf-8"?>
 <p:sld xmlns:a="http://schemas.openxmlformats.org/drawingml/2006/main" xmlns:r="http://schemas.openxmlformats.org/officeDocument/2006/relationships" xmlns:p="http://schemas.openxmlformats.org/presentationml/2006/main">
   <p:cSld>
     <p:spTree>
@@ -10105,7 +9523,7 @@
 </p:sld>
 </file>
 
-<file path=ppt/slides/slide25.xml><?xml version="1.0" encoding="utf-8"?>
+<file path=ppt/slides/slide24.xml><?xml version="1.0" encoding="utf-8"?>
 <p:sld xmlns:a="http://schemas.openxmlformats.org/drawingml/2006/main" xmlns:r="http://schemas.openxmlformats.org/officeDocument/2006/relationships" xmlns:p="http://schemas.openxmlformats.org/presentationml/2006/main">
   <p:cSld>
     <p:spTree>
@@ -11029,7 +10447,7 @@
 </p:sld>
 </file>
 
-<file path=ppt/slides/slide26.xml><?xml version="1.0" encoding="utf-8"?>
+<file path=ppt/slides/slide25.xml><?xml version="1.0" encoding="utf-8"?>
 <p:sld xmlns:a="http://schemas.openxmlformats.org/drawingml/2006/main" xmlns:r="http://schemas.openxmlformats.org/officeDocument/2006/relationships" xmlns:p="http://schemas.openxmlformats.org/presentationml/2006/main">
   <p:cSld>
     <p:spTree>
@@ -11123,7 +10541,7 @@
 </p:sld>
 </file>
 
-<file path=ppt/slides/slide27.xml><?xml version="1.0" encoding="utf-8"?>
+<file path=ppt/slides/slide26.xml><?xml version="1.0" encoding="utf-8"?>
 <p:sld xmlns:a="http://schemas.openxmlformats.org/drawingml/2006/main" xmlns:r="http://schemas.openxmlformats.org/officeDocument/2006/relationships" xmlns:p="http://schemas.openxmlformats.org/presentationml/2006/main">
   <p:cSld>
     <p:spTree>
@@ -11472,6 +10890,96 @@
 </p:sld>
 </file>
 
+<file path=ppt/slides/slide27.xml><?xml version="1.0" encoding="utf-8"?>
+<p:sld xmlns:a="http://schemas.openxmlformats.org/drawingml/2006/main" xmlns:r="http://schemas.openxmlformats.org/officeDocument/2006/relationships" xmlns:p="http://schemas.openxmlformats.org/presentationml/2006/main">
+  <p:cSld>
+    <p:spTree>
+      <p:nvGrpSpPr>
+        <p:cNvPr id="1" name=""/>
+        <p:cNvGrpSpPr/>
+        <p:nvPr/>
+      </p:nvGrpSpPr>
+      <p:grpSpPr>
+        <a:xfrm>
+          <a:off x="0" y="0"/>
+          <a:ext cx="0" cy="0"/>
+          <a:chOff x="0" y="0"/>
+          <a:chExt cx="0" cy="0"/>
+        </a:xfrm>
+      </p:grpSpPr>
+      <p:sp>
+        <p:nvSpPr>
+          <p:cNvPr id="3075" name="Text Placeholder 2"/>
+          <p:cNvSpPr>
+            <a:spLocks noGrp="1"/>
+          </p:cNvSpPr>
+          <p:nvPr>
+            <p:ph type="body" sz="quarter" idx="10"/>
+          </p:nvPr>
+        </p:nvSpPr>
+        <p:spPr>
+          <a:xfrm>
+            <a:off x="685800" y="1066800"/>
+            <a:ext cx="8229600" cy="1219200"/>
+          </a:xfrm>
+        </p:spPr>
+        <p:txBody>
+          <a:bodyPr/>
+          <a:lstStyle/>
+          <a:p>
+            <a:pPr eaLnBrk="1" hangingPunct="1">
+              <a:buNone/>
+            </a:pPr>
+            <a:endParaRPr lang="en-US" sz="2000" dirty="0" smtClean="0"/>
+          </a:p>
+        </p:txBody>
+      </p:sp>
+      <p:sp>
+        <p:nvSpPr>
+          <p:cNvPr id="3074" name="Title 1"/>
+          <p:cNvSpPr>
+            <a:spLocks noGrp="1"/>
+          </p:cNvSpPr>
+          <p:nvPr>
+            <p:ph type="title"/>
+          </p:nvPr>
+        </p:nvSpPr>
+        <p:spPr bwMode="auto">
+          <a:noFill/>
+          <a:ln>
+            <a:miter lim="800000"/>
+            <a:headEnd/>
+            <a:tailEnd/>
+          </a:ln>
+        </p:spPr>
+        <p:txBody>
+          <a:bodyPr vert="horz" wrap="square" lIns="91440" tIns="45720" rIns="91440" bIns="45720" numCol="1" anchor="t" anchorCtr="0" compatLnSpc="1">
+            <a:prstTxWarp prst="textNoShape">
+              <a:avLst/>
+            </a:prstTxWarp>
+          </a:bodyPr>
+          <a:lstStyle/>
+          <a:p>
+            <a:pPr eaLnBrk="1" hangingPunct="1"/>
+            <a:endParaRPr lang="en-US" dirty="0" smtClean="0"/>
+          </a:p>
+        </p:txBody>
+      </p:sp>
+    </p:spTree>
+  </p:cSld>
+  <p:clrMapOvr>
+    <a:masterClrMapping/>
+  </p:clrMapOvr>
+  <p:timing>
+    <p:tnLst>
+      <p:par>
+        <p:cTn id="1" dur="indefinite" restart="never" nodeType="tmRoot"/>
+      </p:par>
+    </p:tnLst>
+  </p:timing>
+</p:sld>
+</file>
+
 <file path=ppt/slides/slide28.xml><?xml version="1.0" encoding="utf-8"?>
 <p:sld xmlns:a="http://schemas.openxmlformats.org/drawingml/2006/main" xmlns:r="http://schemas.openxmlformats.org/officeDocument/2006/relationships" xmlns:p="http://schemas.openxmlformats.org/presentationml/2006/main">
   <p:cSld>
@@ -11581,42 +11089,118 @@
       </p:grpSpPr>
       <p:sp>
         <p:nvSpPr>
-          <p:cNvPr id="3075" name="Text Placeholder 2"/>
+          <p:cNvPr id="6" name="Rectangle 5"/>
+          <p:cNvSpPr/>
+          <p:nvPr/>
+        </p:nvSpPr>
+        <p:spPr>
+          <a:xfrm>
+            <a:off x="0" y="0"/>
+            <a:ext cx="9144000" cy="4648200"/>
+          </a:xfrm>
+          <a:prstGeom prst="rect">
+            <a:avLst/>
+          </a:prstGeom>
+          <a:solidFill>
+            <a:srgbClr val="0069AA"/>
+          </a:solidFill>
+          <a:ln>
+            <a:noFill/>
+          </a:ln>
+        </p:spPr>
+        <p:style>
+          <a:lnRef idx="2">
+            <a:schemeClr val="accent1">
+              <a:shade val="50000"/>
+            </a:schemeClr>
+          </a:lnRef>
+          <a:fillRef idx="1">
+            <a:schemeClr val="accent1"/>
+          </a:fillRef>
+          <a:effectRef idx="0">
+            <a:schemeClr val="accent1"/>
+          </a:effectRef>
+          <a:fontRef idx="minor">
+            <a:schemeClr val="lt1"/>
+          </a:fontRef>
+        </p:style>
+        <p:txBody>
+          <a:bodyPr anchor="ctr"/>
+          <a:lstStyle/>
+          <a:p>
+            <a:pPr algn="ctr">
+              <a:defRPr/>
+            </a:pPr>
+            <a:endParaRPr lang="en-US"/>
+          </a:p>
+        </p:txBody>
+      </p:sp>
+      <p:sp>
+        <p:nvSpPr>
+          <p:cNvPr id="8" name="Rectangle 7"/>
+          <p:cNvSpPr/>
+          <p:nvPr/>
+        </p:nvSpPr>
+        <p:spPr>
+          <a:xfrm>
+            <a:off x="228600" y="0"/>
+            <a:ext cx="104775" cy="3581400"/>
+          </a:xfrm>
+          <a:prstGeom prst="rect">
+            <a:avLst/>
+          </a:prstGeom>
+          <a:solidFill>
+            <a:srgbClr val="E31937"/>
+          </a:solidFill>
+          <a:ln>
+            <a:noFill/>
+          </a:ln>
+        </p:spPr>
+        <p:style>
+          <a:lnRef idx="2">
+            <a:schemeClr val="accent1">
+              <a:shade val="50000"/>
+            </a:schemeClr>
+          </a:lnRef>
+          <a:fillRef idx="1">
+            <a:schemeClr val="accent1"/>
+          </a:fillRef>
+          <a:effectRef idx="0">
+            <a:schemeClr val="accent1"/>
+          </a:effectRef>
+          <a:fontRef idx="minor">
+            <a:schemeClr val="lt1"/>
+          </a:fontRef>
+        </p:style>
+        <p:txBody>
+          <a:bodyPr anchor="ctr"/>
+          <a:lstStyle/>
+          <a:p>
+            <a:pPr algn="ctr">
+              <a:defRPr/>
+            </a:pPr>
+            <a:endParaRPr lang="en-US"/>
+          </a:p>
+        </p:txBody>
+      </p:sp>
+      <p:sp>
+        <p:nvSpPr>
+          <p:cNvPr id="5127" name="Rectangle 8"/>
           <p:cNvSpPr>
-            <a:spLocks noGrp="1"/>
+            <a:spLocks noGrp="1" noChangeArrowheads="1"/>
           </p:cNvSpPr>
           <p:nvPr>
-            <p:ph type="body" sz="quarter" idx="10"/>
+            <p:ph type="title" idx="4294967295"/>
           </p:nvPr>
         </p:nvSpPr>
-        <p:spPr>
+        <p:spPr bwMode="auto">
           <a:xfrm>
-            <a:off x="685800" y="1066800"/>
-            <a:ext cx="8229600" cy="1219200"/>
+            <a:off x="495300" y="200025"/>
+            <a:ext cx="8420100" cy="919163"/>
           </a:xfrm>
-        </p:spPr>
-        <p:txBody>
-          <a:bodyPr/>
-          <a:lstStyle/>
-          <a:p>
-            <a:pPr eaLnBrk="1" hangingPunct="1">
-              <a:buNone/>
-            </a:pPr>
-            <a:endParaRPr lang="en-US" sz="2000" dirty="0" smtClean="0"/>
-          </a:p>
-        </p:txBody>
-      </p:sp>
-      <p:sp>
-        <p:nvSpPr>
-          <p:cNvPr id="3074" name="Title 1"/>
-          <p:cNvSpPr>
-            <a:spLocks noGrp="1"/>
-          </p:cNvSpPr>
-          <p:nvPr>
-            <p:ph type="title"/>
-          </p:nvPr>
-        </p:nvSpPr>
-        <p:spPr bwMode="auto">
+          <a:prstGeom prst="rect">
+            <a:avLst/>
+          </a:prstGeom>
           <a:noFill/>
           <a:ln>
             <a:miter lim="800000"/>
@@ -11625,18 +11209,403 @@
           </a:ln>
         </p:spPr>
         <p:txBody>
-          <a:bodyPr vert="horz" wrap="square" lIns="91440" tIns="45720" rIns="91440" bIns="45720" numCol="1" anchor="t" anchorCtr="0" compatLnSpc="1">
-            <a:prstTxWarp prst="textNoShape">
-              <a:avLst/>
-            </a:prstTxWarp>
+          <a:bodyPr/>
+          <a:lstStyle/>
+          <a:p>
+            <a:pPr eaLnBrk="1" hangingPunct="1"/>
+            <a:r>
+              <a:rPr lang="en-US" dirty="0" smtClean="0">
+                <a:solidFill>
+                  <a:schemeClr val="bg1"/>
+                </a:solidFill>
+              </a:rPr>
+              <a:t>Additional Resources</a:t>
+            </a:r>
+          </a:p>
+        </p:txBody>
+      </p:sp>
+      <p:sp>
+        <p:nvSpPr>
+          <p:cNvPr id="5128" name="Rectangle 9"/>
+          <p:cNvSpPr>
+            <a:spLocks noGrp="1" noChangeArrowheads="1"/>
+          </p:cNvSpPr>
+          <p:nvPr>
+            <p:ph idx="4294967295"/>
+          </p:nvPr>
+        </p:nvSpPr>
+        <p:spPr>
+          <a:xfrm>
+            <a:off x="514350" y="1143000"/>
+            <a:ext cx="8229600" cy="3429000"/>
+          </a:xfrm>
+        </p:spPr>
+        <p:txBody>
+          <a:bodyPr/>
+          <a:lstStyle/>
+          <a:p>
+            <a:pPr eaLnBrk="1" hangingPunct="1">
+              <a:lnSpc>
+                <a:spcPct val="80000"/>
+              </a:lnSpc>
+              <a:buNone/>
+            </a:pPr>
+            <a:r>
+              <a:rPr lang="en-US" sz="2000" dirty="0" smtClean="0">
+                <a:solidFill>
+                  <a:schemeClr val="bg1"/>
+                </a:solidFill>
+              </a:rPr>
+              <a:t>Command Pattern</a:t>
+            </a:r>
+          </a:p>
+          <a:p>
+            <a:pPr eaLnBrk="1" hangingPunct="1">
+              <a:lnSpc>
+                <a:spcPct val="80000"/>
+              </a:lnSpc>
+              <a:buNone/>
+            </a:pPr>
+            <a:r>
+              <a:rPr lang="en-US" sz="2000" dirty="0" smtClean="0">
+                <a:solidFill>
+                  <a:schemeClr val="bg1"/>
+                </a:solidFill>
+              </a:rPr>
+              <a:t>	http://www.lostechies.com/blogs/derickbailey/archive/2008/11/19/ptom-command-and-conquer-your-ui-coupling-problems.aspx </a:t>
+            </a:r>
+            <a:br>
+              <a:rPr lang="en-US" sz="2000" dirty="0" smtClean="0">
+                <a:solidFill>
+                  <a:schemeClr val="bg1"/>
+                </a:solidFill>
+              </a:rPr>
+            </a:br>
+            <a:endParaRPr lang="en-US" sz="2000" dirty="0" smtClean="0">
+              <a:solidFill>
+                <a:schemeClr val="bg1"/>
+              </a:solidFill>
+            </a:endParaRPr>
+          </a:p>
+          <a:p>
+            <a:pPr eaLnBrk="1" hangingPunct="1">
+              <a:lnSpc>
+                <a:spcPct val="80000"/>
+              </a:lnSpc>
+              <a:buNone/>
+            </a:pPr>
+            <a:r>
+              <a:rPr lang="en-US" sz="2000" dirty="0" smtClean="0">
+                <a:solidFill>
+                  <a:schemeClr val="bg1"/>
+                </a:solidFill>
+              </a:rPr>
+              <a:t>Event Aggregator</a:t>
+            </a:r>
+            <a:br>
+              <a:rPr lang="en-US" sz="2000" dirty="0" smtClean="0">
+                <a:solidFill>
+                  <a:schemeClr val="bg1"/>
+                </a:solidFill>
+              </a:rPr>
+            </a:br>
+            <a:r>
+              <a:rPr lang="en-US" sz="2000" dirty="0" smtClean="0">
+                <a:solidFill>
+                  <a:schemeClr val="bg1"/>
+                </a:solidFill>
+              </a:rPr>
+              <a:t>http://www.martinfowler.com/eaaDev/EventAggregator.html</a:t>
+            </a:r>
+            <a:br>
+              <a:rPr lang="en-US" sz="2000" dirty="0" smtClean="0">
+                <a:solidFill>
+                  <a:schemeClr val="bg1"/>
+                </a:solidFill>
+              </a:rPr>
+            </a:br>
+            <a:endParaRPr lang="en-US" sz="2000" dirty="0" smtClean="0">
+              <a:solidFill>
+                <a:schemeClr val="bg1"/>
+              </a:solidFill>
+            </a:endParaRPr>
+          </a:p>
+          <a:p>
+            <a:pPr eaLnBrk="1" hangingPunct="1">
+              <a:lnSpc>
+                <a:spcPct val="80000"/>
+              </a:lnSpc>
+              <a:buNone/>
+            </a:pPr>
+            <a:r>
+              <a:rPr lang="en-US" sz="2000" dirty="0" err="1" smtClean="0">
+                <a:solidFill>
+                  <a:schemeClr val="bg1"/>
+                </a:solidFill>
+              </a:rPr>
+              <a:t>StructureMap</a:t>
+            </a:r>
+            <a:r>
+              <a:rPr lang="en-US" sz="2000" dirty="0" smtClean="0">
+                <a:solidFill>
+                  <a:schemeClr val="bg1"/>
+                </a:solidFill>
+              </a:rPr>
+              <a:t> (</a:t>
+            </a:r>
+            <a:r>
+              <a:rPr lang="en-US" sz="2000" dirty="0" err="1" smtClean="0">
+                <a:solidFill>
+                  <a:schemeClr val="bg1"/>
+                </a:solidFill>
+              </a:rPr>
+              <a:t>IoC</a:t>
+            </a:r>
+            <a:r>
+              <a:rPr lang="en-US" sz="2000" dirty="0" smtClean="0">
+                <a:solidFill>
+                  <a:schemeClr val="bg1"/>
+                </a:solidFill>
+              </a:rPr>
+              <a:t> Container)</a:t>
+            </a:r>
+            <a:endParaRPr lang="en-US" sz="2000" dirty="0" smtClean="0">
+              <a:solidFill>
+                <a:schemeClr val="bg1"/>
+              </a:solidFill>
+            </a:endParaRPr>
+          </a:p>
+          <a:p>
+            <a:pPr eaLnBrk="1" hangingPunct="1">
+              <a:lnSpc>
+                <a:spcPct val="80000"/>
+              </a:lnSpc>
+              <a:buNone/>
+            </a:pPr>
+            <a:r>
+              <a:rPr lang="en-US" sz="2000" dirty="0" smtClean="0">
+                <a:solidFill>
+                  <a:schemeClr val="bg1"/>
+                </a:solidFill>
+              </a:rPr>
+              <a:t>	http://structuremap.sourceforge.net</a:t>
+            </a:r>
+            <a:br>
+              <a:rPr lang="en-US" sz="2000" dirty="0" smtClean="0">
+                <a:solidFill>
+                  <a:schemeClr val="bg1"/>
+                </a:solidFill>
+              </a:rPr>
+            </a:br>
+            <a:endParaRPr lang="en-US" sz="2000" dirty="0" smtClean="0">
+              <a:solidFill>
+                <a:schemeClr val="bg1"/>
+              </a:solidFill>
+            </a:endParaRPr>
+          </a:p>
+          <a:p>
+            <a:pPr eaLnBrk="1" hangingPunct="1">
+              <a:lnSpc>
+                <a:spcPct val="80000"/>
+              </a:lnSpc>
+              <a:buNone/>
+            </a:pPr>
+            <a:r>
+              <a:rPr lang="en-US" sz="2000" dirty="0" smtClean="0">
+                <a:solidFill>
+                  <a:schemeClr val="bg1"/>
+                </a:solidFill>
+              </a:rPr>
+              <a:t>Application Controller</a:t>
+            </a:r>
+          </a:p>
+          <a:p>
+            <a:pPr eaLnBrk="1" hangingPunct="1">
+              <a:lnSpc>
+                <a:spcPct val="80000"/>
+              </a:lnSpc>
+              <a:buNone/>
+            </a:pPr>
+            <a:r>
+              <a:rPr lang="en-US" sz="2000" dirty="0" smtClean="0">
+                <a:solidFill>
+                  <a:schemeClr val="bg1"/>
+                </a:solidFill>
+              </a:rPr>
+              <a:t>	http://www.martinfowler.com/eaaCatalog/applicationController.html</a:t>
+            </a:r>
+            <a:br>
+              <a:rPr lang="en-US" sz="2000" dirty="0" smtClean="0">
+                <a:solidFill>
+                  <a:schemeClr val="bg1"/>
+                </a:solidFill>
+              </a:rPr>
+            </a:br>
+            <a:endParaRPr lang="en-US" sz="2000" dirty="0" smtClean="0">
+              <a:solidFill>
+                <a:schemeClr val="bg1"/>
+              </a:solidFill>
+            </a:endParaRPr>
+          </a:p>
+        </p:txBody>
+      </p:sp>
+      <p:sp>
+        <p:nvSpPr>
+          <p:cNvPr id="5129" name="Text Box 7"/>
+          <p:cNvSpPr txBox="1">
+            <a:spLocks noChangeArrowheads="1"/>
+          </p:cNvSpPr>
+          <p:nvPr/>
+        </p:nvSpPr>
+        <p:spPr bwMode="auto">
+          <a:xfrm>
+            <a:off x="5470525" y="1331913"/>
+            <a:ext cx="184150" cy="366712"/>
+          </a:xfrm>
+          <a:prstGeom prst="rect">
+            <a:avLst/>
+          </a:prstGeom>
+          <a:noFill/>
+          <a:ln w="9525">
+            <a:noFill/>
+            <a:miter lim="800000"/>
+            <a:headEnd/>
+            <a:tailEnd/>
+          </a:ln>
+        </p:spPr>
+        <p:txBody>
+          <a:bodyPr wrap="none">
+            <a:spAutoFit/>
           </a:bodyPr>
           <a:lstStyle/>
           <a:p>
-            <a:pPr eaLnBrk="1" hangingPunct="1"/>
-            <a:endParaRPr lang="en-US" dirty="0" smtClean="0"/>
+            <a:endParaRPr lang="en-US"/>
           </a:p>
         </p:txBody>
       </p:sp>
+      <p:pic>
+        <p:nvPicPr>
+          <p:cNvPr id="16" name="Picture 4" descr="MAT logo 1 CMYK"/>
+          <p:cNvPicPr>
+            <a:picLocks noChangeAspect="1" noChangeArrowheads="1"/>
+          </p:cNvPicPr>
+          <p:nvPr/>
+        </p:nvPicPr>
+        <p:blipFill>
+          <a:blip r:embed="rId2">
+            <a:clrChange>
+              <a:clrFrom>
+                <a:srgbClr val="FDFDFD"/>
+              </a:clrFrom>
+              <a:clrTo>
+                <a:srgbClr val="FDFDFD">
+                  <a:alpha val="0"/>
+                </a:srgbClr>
+              </a:clrTo>
+            </a:clrChange>
+          </a:blip>
+          <a:srcRect/>
+          <a:stretch>
+            <a:fillRect/>
+          </a:stretch>
+        </p:blipFill>
+        <p:spPr bwMode="auto">
+          <a:xfrm>
+            <a:off x="2971800" y="4800600"/>
+            <a:ext cx="2819400" cy="1338263"/>
+          </a:xfrm>
+          <a:prstGeom prst="rect">
+            <a:avLst/>
+          </a:prstGeom>
+          <a:noFill/>
+          <a:ln w="9525">
+            <a:noFill/>
+            <a:miter lim="800000"/>
+            <a:headEnd/>
+            <a:tailEnd/>
+          </a:ln>
+        </p:spPr>
+      </p:pic>
+      <p:sp>
+        <p:nvSpPr>
+          <p:cNvPr id="17" name="Rectangle 16"/>
+          <p:cNvSpPr/>
+          <p:nvPr/>
+        </p:nvSpPr>
+        <p:spPr>
+          <a:xfrm>
+            <a:off x="0" y="4724400"/>
+            <a:ext cx="9144000" cy="2133600"/>
+          </a:xfrm>
+          <a:prstGeom prst="rect">
+            <a:avLst/>
+          </a:prstGeom>
+          <a:solidFill>
+            <a:srgbClr val="E31937"/>
+          </a:solidFill>
+          <a:ln>
+            <a:noFill/>
+          </a:ln>
+        </p:spPr>
+        <p:style>
+          <a:lnRef idx="2">
+            <a:schemeClr val="accent1">
+              <a:shade val="50000"/>
+            </a:schemeClr>
+          </a:lnRef>
+          <a:fillRef idx="1">
+            <a:schemeClr val="accent1"/>
+          </a:fillRef>
+          <a:effectRef idx="0">
+            <a:schemeClr val="accent1"/>
+          </a:effectRef>
+          <a:fontRef idx="minor">
+            <a:schemeClr val="lt1"/>
+          </a:fontRef>
+        </p:style>
+        <p:txBody>
+          <a:bodyPr anchor="ctr"/>
+          <a:lstStyle/>
+          <a:p>
+            <a:pPr algn="ctr">
+              <a:defRPr/>
+            </a:pPr>
+            <a:endParaRPr lang="en-US"/>
+          </a:p>
+        </p:txBody>
+      </p:sp>
+      <p:pic>
+        <p:nvPicPr>
+          <p:cNvPr id="18" name="Picture 7" descr="MAT logo vertical_red.emf"/>
+          <p:cNvPicPr>
+            <a:picLocks noChangeAspect="1"/>
+          </p:cNvPicPr>
+          <p:nvPr/>
+        </p:nvPicPr>
+        <p:blipFill>
+          <a:blip r:embed="rId3"/>
+          <a:srcRect/>
+          <a:stretch>
+            <a:fillRect/>
+          </a:stretch>
+        </p:blipFill>
+        <p:spPr bwMode="auto">
+          <a:xfrm>
+            <a:off x="3600450" y="5334000"/>
+            <a:ext cx="1981200" cy="969963"/>
+          </a:xfrm>
+          <a:prstGeom prst="rect">
+            <a:avLst/>
+          </a:prstGeom>
+          <a:noFill/>
+          <a:ln w="9525">
+            <a:noFill/>
+            <a:miter lim="800000"/>
+            <a:headEnd/>
+            <a:tailEnd/>
+          </a:ln>
+        </p:spPr>
+      </p:pic>
     </p:spTree>
   </p:cSld>
   <p:clrMapOvr>
@@ -11798,557 +11767,6 @@
 </file>
 
 <file path=ppt/slides/slide30.xml><?xml version="1.0" encoding="utf-8"?>
-<p:sld xmlns:a="http://schemas.openxmlformats.org/drawingml/2006/main" xmlns:r="http://schemas.openxmlformats.org/officeDocument/2006/relationships" xmlns:p="http://schemas.openxmlformats.org/presentationml/2006/main">
-  <p:cSld>
-    <p:spTree>
-      <p:nvGrpSpPr>
-        <p:cNvPr id="1" name=""/>
-        <p:cNvGrpSpPr/>
-        <p:nvPr/>
-      </p:nvGrpSpPr>
-      <p:grpSpPr>
-        <a:xfrm>
-          <a:off x="0" y="0"/>
-          <a:ext cx="0" cy="0"/>
-          <a:chOff x="0" y="0"/>
-          <a:chExt cx="0" cy="0"/>
-        </a:xfrm>
-      </p:grpSpPr>
-      <p:sp>
-        <p:nvSpPr>
-          <p:cNvPr id="6" name="Rectangle 5"/>
-          <p:cNvSpPr/>
-          <p:nvPr/>
-        </p:nvSpPr>
-        <p:spPr>
-          <a:xfrm>
-            <a:off x="0" y="0"/>
-            <a:ext cx="9144000" cy="4648200"/>
-          </a:xfrm>
-          <a:prstGeom prst="rect">
-            <a:avLst/>
-          </a:prstGeom>
-          <a:solidFill>
-            <a:srgbClr val="0069AA"/>
-          </a:solidFill>
-          <a:ln>
-            <a:noFill/>
-          </a:ln>
-        </p:spPr>
-        <p:style>
-          <a:lnRef idx="2">
-            <a:schemeClr val="accent1">
-              <a:shade val="50000"/>
-            </a:schemeClr>
-          </a:lnRef>
-          <a:fillRef idx="1">
-            <a:schemeClr val="accent1"/>
-          </a:fillRef>
-          <a:effectRef idx="0">
-            <a:schemeClr val="accent1"/>
-          </a:effectRef>
-          <a:fontRef idx="minor">
-            <a:schemeClr val="lt1"/>
-          </a:fontRef>
-        </p:style>
-        <p:txBody>
-          <a:bodyPr anchor="ctr"/>
-          <a:lstStyle/>
-          <a:p>
-            <a:pPr algn="ctr">
-              <a:defRPr/>
-            </a:pPr>
-            <a:endParaRPr lang="en-US"/>
-          </a:p>
-        </p:txBody>
-      </p:sp>
-      <p:sp>
-        <p:nvSpPr>
-          <p:cNvPr id="8" name="Rectangle 7"/>
-          <p:cNvSpPr/>
-          <p:nvPr/>
-        </p:nvSpPr>
-        <p:spPr>
-          <a:xfrm>
-            <a:off x="228600" y="0"/>
-            <a:ext cx="104775" cy="3581400"/>
-          </a:xfrm>
-          <a:prstGeom prst="rect">
-            <a:avLst/>
-          </a:prstGeom>
-          <a:solidFill>
-            <a:srgbClr val="E31937"/>
-          </a:solidFill>
-          <a:ln>
-            <a:noFill/>
-          </a:ln>
-        </p:spPr>
-        <p:style>
-          <a:lnRef idx="2">
-            <a:schemeClr val="accent1">
-              <a:shade val="50000"/>
-            </a:schemeClr>
-          </a:lnRef>
-          <a:fillRef idx="1">
-            <a:schemeClr val="accent1"/>
-          </a:fillRef>
-          <a:effectRef idx="0">
-            <a:schemeClr val="accent1"/>
-          </a:effectRef>
-          <a:fontRef idx="minor">
-            <a:schemeClr val="lt1"/>
-          </a:fontRef>
-        </p:style>
-        <p:txBody>
-          <a:bodyPr anchor="ctr"/>
-          <a:lstStyle/>
-          <a:p>
-            <a:pPr algn="ctr">
-              <a:defRPr/>
-            </a:pPr>
-            <a:endParaRPr lang="en-US"/>
-          </a:p>
-        </p:txBody>
-      </p:sp>
-      <p:sp>
-        <p:nvSpPr>
-          <p:cNvPr id="5127" name="Rectangle 8"/>
-          <p:cNvSpPr>
-            <a:spLocks noGrp="1" noChangeArrowheads="1"/>
-          </p:cNvSpPr>
-          <p:nvPr>
-            <p:ph type="title" idx="4294967295"/>
-          </p:nvPr>
-        </p:nvSpPr>
-        <p:spPr bwMode="auto">
-          <a:xfrm>
-            <a:off x="495300" y="200025"/>
-            <a:ext cx="8420100" cy="919163"/>
-          </a:xfrm>
-          <a:prstGeom prst="rect">
-            <a:avLst/>
-          </a:prstGeom>
-          <a:noFill/>
-          <a:ln>
-            <a:miter lim="800000"/>
-            <a:headEnd/>
-            <a:tailEnd/>
-          </a:ln>
-        </p:spPr>
-        <p:txBody>
-          <a:bodyPr/>
-          <a:lstStyle/>
-          <a:p>
-            <a:pPr eaLnBrk="1" hangingPunct="1"/>
-            <a:r>
-              <a:rPr lang="en-US" dirty="0" smtClean="0">
-                <a:solidFill>
-                  <a:schemeClr val="bg1"/>
-                </a:solidFill>
-              </a:rPr>
-              <a:t>Additional Resources</a:t>
-            </a:r>
-          </a:p>
-        </p:txBody>
-      </p:sp>
-      <p:sp>
-        <p:nvSpPr>
-          <p:cNvPr id="5128" name="Rectangle 9"/>
-          <p:cNvSpPr>
-            <a:spLocks noGrp="1" noChangeArrowheads="1"/>
-          </p:cNvSpPr>
-          <p:nvPr>
-            <p:ph idx="4294967295"/>
-          </p:nvPr>
-        </p:nvSpPr>
-        <p:spPr>
-          <a:xfrm>
-            <a:off x="514350" y="1143000"/>
-            <a:ext cx="8229600" cy="3429000"/>
-          </a:xfrm>
-        </p:spPr>
-        <p:txBody>
-          <a:bodyPr/>
-          <a:lstStyle/>
-          <a:p>
-            <a:pPr eaLnBrk="1" hangingPunct="1">
-              <a:lnSpc>
-                <a:spcPct val="80000"/>
-              </a:lnSpc>
-              <a:buNone/>
-            </a:pPr>
-            <a:r>
-              <a:rPr lang="en-US" sz="2000" dirty="0" smtClean="0">
-                <a:solidFill>
-                  <a:schemeClr val="bg1"/>
-                </a:solidFill>
-              </a:rPr>
-              <a:t>Command Pattern</a:t>
-            </a:r>
-          </a:p>
-          <a:p>
-            <a:pPr eaLnBrk="1" hangingPunct="1">
-              <a:lnSpc>
-                <a:spcPct val="80000"/>
-              </a:lnSpc>
-              <a:buNone/>
-            </a:pPr>
-            <a:r>
-              <a:rPr lang="en-US" sz="2000" dirty="0" smtClean="0">
-                <a:solidFill>
-                  <a:schemeClr val="bg1"/>
-                </a:solidFill>
-              </a:rPr>
-              <a:t>	http://www.lostechies.com/blogs/derickbailey/archive/2008/11/19/ptom-command-and-conquer-your-ui-coupling-problems.aspx </a:t>
-            </a:r>
-            <a:br>
-              <a:rPr lang="en-US" sz="2000" dirty="0" smtClean="0">
-                <a:solidFill>
-                  <a:schemeClr val="bg1"/>
-                </a:solidFill>
-              </a:rPr>
-            </a:br>
-            <a:endParaRPr lang="en-US" sz="2000" dirty="0" smtClean="0">
-              <a:solidFill>
-                <a:schemeClr val="bg1"/>
-              </a:solidFill>
-            </a:endParaRPr>
-          </a:p>
-          <a:p>
-            <a:pPr eaLnBrk="1" hangingPunct="1">
-              <a:lnSpc>
-                <a:spcPct val="80000"/>
-              </a:lnSpc>
-              <a:buNone/>
-            </a:pPr>
-            <a:r>
-              <a:rPr lang="en-US" sz="2000" dirty="0" smtClean="0">
-                <a:solidFill>
-                  <a:schemeClr val="bg1"/>
-                </a:solidFill>
-              </a:rPr>
-              <a:t>Event Aggregator</a:t>
-            </a:r>
-            <a:br>
-              <a:rPr lang="en-US" sz="2000" dirty="0" smtClean="0">
-                <a:solidFill>
-                  <a:schemeClr val="bg1"/>
-                </a:solidFill>
-              </a:rPr>
-            </a:br>
-            <a:r>
-              <a:rPr lang="en-US" sz="2000" dirty="0" smtClean="0">
-                <a:solidFill>
-                  <a:schemeClr val="bg1"/>
-                </a:solidFill>
-              </a:rPr>
-              <a:t>http://www.martinfowler.com/eaaDev/EventAggregator.html</a:t>
-            </a:r>
-            <a:br>
-              <a:rPr lang="en-US" sz="2000" dirty="0" smtClean="0">
-                <a:solidFill>
-                  <a:schemeClr val="bg1"/>
-                </a:solidFill>
-              </a:rPr>
-            </a:br>
-            <a:endParaRPr lang="en-US" sz="2000" dirty="0" smtClean="0">
-              <a:solidFill>
-                <a:schemeClr val="bg1"/>
-              </a:solidFill>
-            </a:endParaRPr>
-          </a:p>
-          <a:p>
-            <a:pPr eaLnBrk="1" hangingPunct="1">
-              <a:lnSpc>
-                <a:spcPct val="80000"/>
-              </a:lnSpc>
-              <a:buNone/>
-            </a:pPr>
-            <a:r>
-              <a:rPr lang="en-US" sz="2000" dirty="0" err="1" smtClean="0">
-                <a:solidFill>
-                  <a:schemeClr val="bg1"/>
-                </a:solidFill>
-              </a:rPr>
-              <a:t>StructureMap</a:t>
-            </a:r>
-            <a:r>
-              <a:rPr lang="en-US" sz="2000" dirty="0" smtClean="0">
-                <a:solidFill>
-                  <a:schemeClr val="bg1"/>
-                </a:solidFill>
-              </a:rPr>
-              <a:t> (</a:t>
-            </a:r>
-            <a:r>
-              <a:rPr lang="en-US" sz="2000" dirty="0" err="1" smtClean="0">
-                <a:solidFill>
-                  <a:schemeClr val="bg1"/>
-                </a:solidFill>
-              </a:rPr>
-              <a:t>IoC</a:t>
-            </a:r>
-            <a:r>
-              <a:rPr lang="en-US" sz="2000" dirty="0" smtClean="0">
-                <a:solidFill>
-                  <a:schemeClr val="bg1"/>
-                </a:solidFill>
-              </a:rPr>
-              <a:t> Container)</a:t>
-            </a:r>
-            <a:endParaRPr lang="en-US" sz="2000" dirty="0" smtClean="0">
-              <a:solidFill>
-                <a:schemeClr val="bg1"/>
-              </a:solidFill>
-            </a:endParaRPr>
-          </a:p>
-          <a:p>
-            <a:pPr eaLnBrk="1" hangingPunct="1">
-              <a:lnSpc>
-                <a:spcPct val="80000"/>
-              </a:lnSpc>
-              <a:buNone/>
-            </a:pPr>
-            <a:r>
-              <a:rPr lang="en-US" sz="2000" dirty="0" smtClean="0">
-                <a:solidFill>
-                  <a:schemeClr val="bg1"/>
-                </a:solidFill>
-              </a:rPr>
-              <a:t>	http://structuremap.sourceforge.net</a:t>
-            </a:r>
-            <a:br>
-              <a:rPr lang="en-US" sz="2000" dirty="0" smtClean="0">
-                <a:solidFill>
-                  <a:schemeClr val="bg1"/>
-                </a:solidFill>
-              </a:rPr>
-            </a:br>
-            <a:endParaRPr lang="en-US" sz="2000" dirty="0" smtClean="0">
-              <a:solidFill>
-                <a:schemeClr val="bg1"/>
-              </a:solidFill>
-            </a:endParaRPr>
-          </a:p>
-          <a:p>
-            <a:pPr eaLnBrk="1" hangingPunct="1">
-              <a:lnSpc>
-                <a:spcPct val="80000"/>
-              </a:lnSpc>
-              <a:buNone/>
-            </a:pPr>
-            <a:r>
-              <a:rPr lang="en-US" sz="2000" dirty="0" smtClean="0">
-                <a:solidFill>
-                  <a:schemeClr val="bg1"/>
-                </a:solidFill>
-              </a:rPr>
-              <a:t>Application Controller</a:t>
-            </a:r>
-          </a:p>
-          <a:p>
-            <a:pPr eaLnBrk="1" hangingPunct="1">
-              <a:lnSpc>
-                <a:spcPct val="80000"/>
-              </a:lnSpc>
-              <a:buNone/>
-            </a:pPr>
-            <a:r>
-              <a:rPr lang="en-US" sz="2000" dirty="0" smtClean="0">
-                <a:solidFill>
-                  <a:schemeClr val="bg1"/>
-                </a:solidFill>
-              </a:rPr>
-              <a:t>	http://www.martinfowler.com/eaaCatalog/applicationController.html</a:t>
-            </a:r>
-            <a:br>
-              <a:rPr lang="en-US" sz="2000" dirty="0" smtClean="0">
-                <a:solidFill>
-                  <a:schemeClr val="bg1"/>
-                </a:solidFill>
-              </a:rPr>
-            </a:br>
-            <a:endParaRPr lang="en-US" sz="2000" dirty="0" smtClean="0">
-              <a:solidFill>
-                <a:schemeClr val="bg1"/>
-              </a:solidFill>
-            </a:endParaRPr>
-          </a:p>
-        </p:txBody>
-      </p:sp>
-      <p:sp>
-        <p:nvSpPr>
-          <p:cNvPr id="5129" name="Text Box 7"/>
-          <p:cNvSpPr txBox="1">
-            <a:spLocks noChangeArrowheads="1"/>
-          </p:cNvSpPr>
-          <p:nvPr/>
-        </p:nvSpPr>
-        <p:spPr bwMode="auto">
-          <a:xfrm>
-            <a:off x="5470525" y="1331913"/>
-            <a:ext cx="184150" cy="366712"/>
-          </a:xfrm>
-          <a:prstGeom prst="rect">
-            <a:avLst/>
-          </a:prstGeom>
-          <a:noFill/>
-          <a:ln w="9525">
-            <a:noFill/>
-            <a:miter lim="800000"/>
-            <a:headEnd/>
-            <a:tailEnd/>
-          </a:ln>
-        </p:spPr>
-        <p:txBody>
-          <a:bodyPr wrap="none">
-            <a:spAutoFit/>
-          </a:bodyPr>
-          <a:lstStyle/>
-          <a:p>
-            <a:endParaRPr lang="en-US"/>
-          </a:p>
-        </p:txBody>
-      </p:sp>
-      <p:pic>
-        <p:nvPicPr>
-          <p:cNvPr id="16" name="Picture 4" descr="MAT logo 1 CMYK"/>
-          <p:cNvPicPr>
-            <a:picLocks noChangeAspect="1" noChangeArrowheads="1"/>
-          </p:cNvPicPr>
-          <p:nvPr/>
-        </p:nvPicPr>
-        <p:blipFill>
-          <a:blip r:embed="rId2">
-            <a:clrChange>
-              <a:clrFrom>
-                <a:srgbClr val="FDFDFD"/>
-              </a:clrFrom>
-              <a:clrTo>
-                <a:srgbClr val="FDFDFD">
-                  <a:alpha val="0"/>
-                </a:srgbClr>
-              </a:clrTo>
-            </a:clrChange>
-          </a:blip>
-          <a:srcRect/>
-          <a:stretch>
-            <a:fillRect/>
-          </a:stretch>
-        </p:blipFill>
-        <p:spPr bwMode="auto">
-          <a:xfrm>
-            <a:off x="2971800" y="4800600"/>
-            <a:ext cx="2819400" cy="1338263"/>
-          </a:xfrm>
-          <a:prstGeom prst="rect">
-            <a:avLst/>
-          </a:prstGeom>
-          <a:noFill/>
-          <a:ln w="9525">
-            <a:noFill/>
-            <a:miter lim="800000"/>
-            <a:headEnd/>
-            <a:tailEnd/>
-          </a:ln>
-        </p:spPr>
-      </p:pic>
-      <p:sp>
-        <p:nvSpPr>
-          <p:cNvPr id="17" name="Rectangle 16"/>
-          <p:cNvSpPr/>
-          <p:nvPr/>
-        </p:nvSpPr>
-        <p:spPr>
-          <a:xfrm>
-            <a:off x="0" y="4724400"/>
-            <a:ext cx="9144000" cy="2133600"/>
-          </a:xfrm>
-          <a:prstGeom prst="rect">
-            <a:avLst/>
-          </a:prstGeom>
-          <a:solidFill>
-            <a:srgbClr val="E31937"/>
-          </a:solidFill>
-          <a:ln>
-            <a:noFill/>
-          </a:ln>
-        </p:spPr>
-        <p:style>
-          <a:lnRef idx="2">
-            <a:schemeClr val="accent1">
-              <a:shade val="50000"/>
-            </a:schemeClr>
-          </a:lnRef>
-          <a:fillRef idx="1">
-            <a:schemeClr val="accent1"/>
-          </a:fillRef>
-          <a:effectRef idx="0">
-            <a:schemeClr val="accent1"/>
-          </a:effectRef>
-          <a:fontRef idx="minor">
-            <a:schemeClr val="lt1"/>
-          </a:fontRef>
-        </p:style>
-        <p:txBody>
-          <a:bodyPr anchor="ctr"/>
-          <a:lstStyle/>
-          <a:p>
-            <a:pPr algn="ctr">
-              <a:defRPr/>
-            </a:pPr>
-            <a:endParaRPr lang="en-US"/>
-          </a:p>
-        </p:txBody>
-      </p:sp>
-      <p:pic>
-        <p:nvPicPr>
-          <p:cNvPr id="18" name="Picture 7" descr="MAT logo vertical_red.emf"/>
-          <p:cNvPicPr>
-            <a:picLocks noChangeAspect="1"/>
-          </p:cNvPicPr>
-          <p:nvPr/>
-        </p:nvPicPr>
-        <p:blipFill>
-          <a:blip r:embed="rId3"/>
-          <a:srcRect/>
-          <a:stretch>
-            <a:fillRect/>
-          </a:stretch>
-        </p:blipFill>
-        <p:spPr bwMode="auto">
-          <a:xfrm>
-            <a:off x="3600450" y="5334000"/>
-            <a:ext cx="1981200" cy="969963"/>
-          </a:xfrm>
-          <a:prstGeom prst="rect">
-            <a:avLst/>
-          </a:prstGeom>
-          <a:noFill/>
-          <a:ln w="9525">
-            <a:noFill/>
-            <a:miter lim="800000"/>
-            <a:headEnd/>
-            <a:tailEnd/>
-          </a:ln>
-        </p:spPr>
-      </p:pic>
-    </p:spTree>
-  </p:cSld>
-  <p:clrMapOvr>
-    <a:masterClrMapping/>
-  </p:clrMapOvr>
-  <p:timing>
-    <p:tnLst>
-      <p:par>
-        <p:cTn id="1" dur="indefinite" restart="never" nodeType="tmRoot"/>
-      </p:par>
-    </p:tnLst>
-  </p:timing>
-</p:sld>
-</file>
-
-<file path=ppt/slides/slide31.xml><?xml version="1.0" encoding="utf-8"?>
 <p:sld xmlns:a="http://schemas.openxmlformats.org/drawingml/2006/main" xmlns:r="http://schemas.openxmlformats.org/officeDocument/2006/relationships" xmlns:p="http://schemas.openxmlformats.org/presentationml/2006/main">
   <p:cSld>
     <p:spTree>

</xml_diff>

<commit_message>
working on command pattern code and slides
</commit_message>
<xml_diff>
--- a/Decoupling Workflow With App Controler/Decoupling Workflow From Forms.pptx
+++ b/Decoupling Workflow With App Controler/Decoupling Workflow From Forms.pptx
@@ -5,10 +5,10 @@
     <p:sldMasterId id="2147483822" r:id="rId4"/>
   </p:sldMasterIdLst>
   <p:notesMasterIdLst>
-    <p:notesMasterId r:id="rId35"/>
+    <p:notesMasterId r:id="rId36"/>
   </p:notesMasterIdLst>
   <p:handoutMasterIdLst>
-    <p:handoutMasterId r:id="rId36"/>
+    <p:handoutMasterId r:id="rId37"/>
   </p:handoutMasterIdLst>
   <p:sldIdLst>
     <p:sldId id="256" r:id="rId5"/>
@@ -32,25 +32,26 @@
     <p:sldId id="302" r:id="rId23"/>
     <p:sldId id="285" r:id="rId24"/>
     <p:sldId id="300" r:id="rId25"/>
-    <p:sldId id="297" r:id="rId26"/>
-    <p:sldId id="276" r:id="rId27"/>
-    <p:sldId id="277" r:id="rId28"/>
-    <p:sldId id="284" r:id="rId29"/>
-    <p:sldId id="292" r:id="rId30"/>
-    <p:sldId id="293" r:id="rId31"/>
-    <p:sldId id="294" r:id="rId32"/>
-    <p:sldId id="259" r:id="rId33"/>
-    <p:sldId id="274" r:id="rId34"/>
+    <p:sldId id="305" r:id="rId26"/>
+    <p:sldId id="297" r:id="rId27"/>
+    <p:sldId id="276" r:id="rId28"/>
+    <p:sldId id="277" r:id="rId29"/>
+    <p:sldId id="284" r:id="rId30"/>
+    <p:sldId id="292" r:id="rId31"/>
+    <p:sldId id="293" r:id="rId32"/>
+    <p:sldId id="294" r:id="rId33"/>
+    <p:sldId id="259" r:id="rId34"/>
+    <p:sldId id="274" r:id="rId35"/>
   </p:sldIdLst>
   <p:sldSz cx="9144000" cy="6858000" type="screen4x3"/>
   <p:notesSz cx="7010400" cy="9296400"/>
   <p:embeddedFontLst>
     <p:embeddedFont>
       <p:font typeface="Calibri" pitchFamily="34" charset="0"/>
-      <p:regular r:id="rId37"/>
-      <p:bold r:id="rId38"/>
-      <p:italic r:id="rId39"/>
-      <p:boldItalic r:id="rId40"/>
+      <p:regular r:id="rId38"/>
+      <p:bold r:id="rId39"/>
+      <p:italic r:id="rId40"/>
+      <p:boldItalic r:id="rId41"/>
     </p:embeddedFont>
   </p:embeddedFontLst>
   <p:defaultTextStyle>
@@ -1610,7 +1611,7 @@
               <a:pPr>
                 <a:defRPr/>
               </a:pPr>
-              <a:t>24</a:t>
+              <a:t>23</a:t>
             </a:fld>
             <a:endParaRPr lang="en-US"/>
           </a:p>
@@ -1871,7 +1872,7 @@
               <a:pPr>
                 <a:defRPr/>
               </a:pPr>
-              <a:t>27</a:t>
+              <a:t>26</a:t>
             </a:fld>
             <a:endParaRPr lang="en-US"/>
           </a:p>
@@ -1959,6 +1960,93 @@
                 <a:defRPr/>
               </a:pPr>
               <a:t>28</a:t>
+            </a:fld>
+            <a:endParaRPr lang="en-US"/>
+          </a:p>
+        </p:txBody>
+      </p:sp>
+    </p:spTree>
+  </p:cSld>
+  <p:clrMapOvr>
+    <a:masterClrMapping/>
+  </p:clrMapOvr>
+</p:notes>
+</file>
+
+<file path=ppt/notesSlides/notesSlide22.xml><?xml version="1.0" encoding="utf-8"?>
+<p:notes xmlns:a="http://schemas.openxmlformats.org/drawingml/2006/main" xmlns:r="http://schemas.openxmlformats.org/officeDocument/2006/relationships" xmlns:p="http://schemas.openxmlformats.org/presentationml/2006/main">
+  <p:cSld>
+    <p:spTree>
+      <p:nvGrpSpPr>
+        <p:cNvPr id="1" name=""/>
+        <p:cNvGrpSpPr/>
+        <p:nvPr/>
+      </p:nvGrpSpPr>
+      <p:grpSpPr>
+        <a:xfrm>
+          <a:off x="0" y="0"/>
+          <a:ext cx="0" cy="0"/>
+          <a:chOff x="0" y="0"/>
+          <a:chExt cx="0" cy="0"/>
+        </a:xfrm>
+      </p:grpSpPr>
+      <p:sp>
+        <p:nvSpPr>
+          <p:cNvPr id="2" name="Slide Image Placeholder 1"/>
+          <p:cNvSpPr>
+            <a:spLocks noGrp="1" noRot="1" noChangeAspect="1"/>
+          </p:cNvSpPr>
+          <p:nvPr>
+            <p:ph type="sldImg"/>
+          </p:nvPr>
+        </p:nvSpPr>
+        <p:spPr/>
+      </p:sp>
+      <p:sp>
+        <p:nvSpPr>
+          <p:cNvPr id="3" name="Notes Placeholder 2"/>
+          <p:cNvSpPr>
+            <a:spLocks noGrp="1"/>
+          </p:cNvSpPr>
+          <p:nvPr>
+            <p:ph type="body" idx="1"/>
+          </p:nvPr>
+        </p:nvSpPr>
+        <p:spPr/>
+        <p:txBody>
+          <a:bodyPr>
+            <a:normAutofit/>
+          </a:bodyPr>
+          <a:lstStyle/>
+          <a:p>
+            <a:endParaRPr lang="en-US" dirty="0"/>
+          </a:p>
+        </p:txBody>
+      </p:sp>
+      <p:sp>
+        <p:nvSpPr>
+          <p:cNvPr id="4" name="Slide Number Placeholder 3"/>
+          <p:cNvSpPr>
+            <a:spLocks noGrp="1"/>
+          </p:cNvSpPr>
+          <p:nvPr>
+            <p:ph type="sldNum" sz="quarter" idx="10"/>
+          </p:nvPr>
+        </p:nvSpPr>
+        <p:spPr/>
+        <p:txBody>
+          <a:bodyPr/>
+          <a:lstStyle/>
+          <a:p>
+            <a:pPr>
+              <a:defRPr/>
+            </a:pPr>
+            <a:fld id="{1931C8FD-CC35-423B-99F4-64D81D6A80AE}" type="slidenum">
+              <a:rPr lang="en-US" smtClean="0"/>
+              <a:pPr>
+                <a:defRPr/>
+              </a:pPr>
+              <a:t>29</a:t>
             </a:fld>
             <a:endParaRPr lang="en-US"/>
           </a:p>
@@ -4993,15 +5081,7 @@
             </a:pPr>
             <a:r>
               <a:rPr lang="en-US" sz="2000" dirty="0" smtClean="0"/>
-              <a:t>Tightly Coupled </a:t>
-            </a:r>
-            <a:r>
-              <a:rPr lang="en-US" sz="2000" dirty="0" smtClean="0"/>
-              <a:t>Workflow </a:t>
-            </a:r>
-            <a:r>
-              <a:rPr lang="en-US" sz="2000" dirty="0" smtClean="0"/>
-              <a:t>Logic: One Presenter Knows About Another</a:t>
+              <a:t>Tightly Coupled Workflow Logic: One Presenter Knows About Another</a:t>
             </a:r>
           </a:p>
         </p:txBody>
@@ -6426,16 +6506,7 @@
                 </a:solidFill>
                 <a:latin typeface="Calibri" pitchFamily="34" charset="0"/>
               </a:rPr>
-              <a:t>Simple Org Chart Version </a:t>
-            </a:r>
-            <a:r>
-              <a:rPr lang="en-US" sz="3600" spc="60" dirty="0" smtClean="0">
-                <a:solidFill>
-                  <a:schemeClr val="bg1"/>
-                </a:solidFill>
-                <a:latin typeface="Calibri" pitchFamily="34" charset="0"/>
-              </a:rPr>
-              <a:t>2</a:t>
+              <a:t>Simple Org Chart Version 2</a:t>
             </a:r>
             <a:endParaRPr lang="en-US" sz="3600" spc="60" dirty="0">
               <a:solidFill>
@@ -6478,16 +6549,7 @@
                 </a:solidFill>
                 <a:latin typeface="+mn-lt"/>
               </a:rPr>
-              <a:t>Introducing </a:t>
-            </a:r>
-            <a:r>
-              <a:rPr lang="en-US" sz="1600" dirty="0" smtClean="0">
-                <a:solidFill>
-                  <a:schemeClr val="bg1"/>
-                </a:solidFill>
-                <a:latin typeface="+mn-lt"/>
-              </a:rPr>
-              <a:t>A Workflow Service</a:t>
+              <a:t>Introducing A Workflow Service</a:t>
             </a:r>
             <a:endParaRPr lang="en-US" sz="1600" dirty="0">
               <a:solidFill>
@@ -6555,17 +6617,8 @@
             </a:pPr>
             <a:r>
               <a:rPr lang="en-US" sz="2000" dirty="0" smtClean="0"/>
-              <a:t>Current Workflow: Add </a:t>
+              <a:t>Current Workflow: Add New Employee</a:t>
             </a:r>
-            <a:r>
-              <a:rPr lang="en-US" sz="2000" dirty="0" smtClean="0"/>
-              <a:t>New </a:t>
-            </a:r>
-            <a:r>
-              <a:rPr lang="en-US" sz="2000" dirty="0" smtClean="0"/>
-              <a:t>Employee</a:t>
-            </a:r>
-            <a:endParaRPr lang="en-US" sz="2000" dirty="0" smtClean="0"/>
           </a:p>
         </p:txBody>
       </p:sp>
@@ -6600,7 +6653,6 @@
               <a:rPr lang="en-US" dirty="0" smtClean="0"/>
               <a:t>Workflow Services</a:t>
             </a:r>
-            <a:endParaRPr lang="en-US" dirty="0" smtClean="0"/>
           </a:p>
         </p:txBody>
       </p:sp>
@@ -6932,7 +6984,6 @@
               <a:rPr lang="en-US" sz="2000" dirty="0" smtClean="0"/>
               <a:t>Decouple The Workflow Between Forms By Introducing A Service To Coordinate Them</a:t>
             </a:r>
-            <a:endParaRPr lang="en-US" sz="2000" dirty="0" smtClean="0"/>
           </a:p>
         </p:txBody>
       </p:sp>
@@ -6967,7 +7018,6 @@
               <a:rPr lang="en-US" dirty="0" smtClean="0"/>
               <a:t>Workflow Services</a:t>
             </a:r>
-            <a:endParaRPr lang="en-US" dirty="0" smtClean="0"/>
           </a:p>
         </p:txBody>
       </p:sp>
@@ -7215,12 +7265,6 @@
                   </a:rPr>
                   <a:t>Step 1</a:t>
                 </a:r>
-                <a:endParaRPr lang="en-US" sz="2400" b="1" dirty="0" smtClean="0">
-                  <a:solidFill>
-                    <a:schemeClr val="accent2"/>
-                  </a:solidFill>
-                  <a:latin typeface="+mn-lt"/>
-                </a:endParaRPr>
               </a:p>
             </p:txBody>
           </p:sp>
@@ -7627,16 +7671,7 @@
                 </a:solidFill>
                 <a:latin typeface="Calibri" pitchFamily="34" charset="0"/>
               </a:rPr>
-              <a:t>Simple Org Chart Version </a:t>
-            </a:r>
-            <a:r>
-              <a:rPr lang="en-US" sz="3600" spc="60" dirty="0" smtClean="0">
-                <a:solidFill>
-                  <a:schemeClr val="bg1"/>
-                </a:solidFill>
-                <a:latin typeface="Calibri" pitchFamily="34" charset="0"/>
-              </a:rPr>
-              <a:t>3</a:t>
+              <a:t>Simple Org Chart Version 3</a:t>
             </a:r>
             <a:endParaRPr lang="en-US" sz="3600" spc="60" dirty="0">
               <a:solidFill>
@@ -8145,11 +8180,7 @@
             <a:pPr eaLnBrk="1" hangingPunct="1"/>
             <a:r>
               <a:rPr lang="en-US" sz="2000" dirty="0" smtClean="0"/>
-              <a:t>Command </a:t>
-            </a:r>
-            <a:r>
-              <a:rPr lang="en-US" sz="2000" dirty="0" smtClean="0"/>
-              <a:t>Pattern</a:t>
+              <a:t>Command Pattern</a:t>
             </a:r>
           </a:p>
           <a:p>
@@ -8163,26 +8194,14 @@
             <a:pPr eaLnBrk="1" hangingPunct="1"/>
             <a:r>
               <a:rPr lang="en-US" sz="2000" dirty="0" smtClean="0"/>
-              <a:t>Application </a:t>
-            </a:r>
-            <a:r>
-              <a:rPr lang="en-US" sz="2000" dirty="0" smtClean="0"/>
-              <a:t>Controller</a:t>
+              <a:t>Application Controller</a:t>
             </a:r>
           </a:p>
           <a:p>
             <a:pPr eaLnBrk="1" hangingPunct="1"/>
             <a:r>
               <a:rPr lang="en-US" sz="2000" dirty="0" smtClean="0"/>
-              <a:t>String It All Together </a:t>
-            </a:r>
-            <a:r>
-              <a:rPr lang="en-US" sz="2000" dirty="0" smtClean="0"/>
-              <a:t>With </a:t>
-            </a:r>
-            <a:r>
-              <a:rPr lang="en-US" sz="2000" dirty="0" smtClean="0"/>
-              <a:t>An </a:t>
+              <a:t>String It All Together With An </a:t>
             </a:r>
             <a:r>
               <a:rPr lang="en-US" sz="2000" dirty="0" err="1" smtClean="0"/>
@@ -8190,11 +8209,7 @@
             </a:r>
             <a:r>
               <a:rPr lang="en-US" sz="2000" dirty="0" smtClean="0"/>
-              <a:t> </a:t>
-            </a:r>
-            <a:r>
-              <a:rPr lang="en-US" sz="2000" dirty="0" smtClean="0"/>
-              <a:t>Container</a:t>
+              <a:t> Container</a:t>
             </a:r>
           </a:p>
           <a:p>
@@ -9068,6 +9083,500 @@
             </a:pPr>
             <a:r>
               <a:rPr lang="en-US" sz="2000" dirty="0" smtClean="0"/>
+              <a:t>Add New Employee: </a:t>
+            </a:r>
+            <a:r>
+              <a:rPr lang="en-US" sz="2000" dirty="0" err="1" smtClean="0"/>
+              <a:t>ICommand</a:t>
+            </a:r>
+            <a:r>
+              <a:rPr lang="en-US" sz="2000" dirty="0" smtClean="0"/>
+              <a:t> In Action</a:t>
+            </a:r>
+            <a:endParaRPr lang="en-US" sz="2000" dirty="0" smtClean="0"/>
+          </a:p>
+        </p:txBody>
+      </p:sp>
+      <p:sp>
+        <p:nvSpPr>
+          <p:cNvPr id="3074" name="Title 1"/>
+          <p:cNvSpPr>
+            <a:spLocks noGrp="1"/>
+          </p:cNvSpPr>
+          <p:nvPr>
+            <p:ph type="title"/>
+          </p:nvPr>
+        </p:nvSpPr>
+        <p:spPr bwMode="auto">
+          <a:noFill/>
+          <a:ln>
+            <a:miter lim="800000"/>
+            <a:headEnd/>
+            <a:tailEnd/>
+          </a:ln>
+        </p:spPr>
+        <p:txBody>
+          <a:bodyPr vert="horz" wrap="square" lIns="91440" tIns="45720" rIns="91440" bIns="45720" numCol="1" anchor="t" anchorCtr="0" compatLnSpc="1">
+            <a:prstTxWarp prst="textNoShape">
+              <a:avLst/>
+            </a:prstTxWarp>
+          </a:bodyPr>
+          <a:lstStyle/>
+          <a:p>
+            <a:pPr eaLnBrk="1" hangingPunct="1"/>
+            <a:r>
+              <a:rPr lang="en-US" dirty="0" smtClean="0"/>
+              <a:t>Simple Org Chart – v2</a:t>
+            </a:r>
+          </a:p>
+        </p:txBody>
+      </p:sp>
+      <p:grpSp>
+        <p:nvGrpSpPr>
+          <p:cNvPr id="33" name="Group 32"/>
+          <p:cNvGrpSpPr/>
+          <p:nvPr/>
+        </p:nvGrpSpPr>
+        <p:grpSpPr>
+          <a:xfrm>
+            <a:off x="304800" y="1524000"/>
+            <a:ext cx="5953125" cy="2667000"/>
+            <a:chOff x="533400" y="1600200"/>
+            <a:chExt cx="5953125" cy="2667000"/>
+          </a:xfrm>
+        </p:grpSpPr>
+        <p:pic>
+          <p:nvPicPr>
+            <p:cNvPr id="5" name="Picture 2" descr="X:\Derick-GitHub\Presentation And Training Material\Decoupling Workflow With App Controler\doc\Org Chart View.png"/>
+            <p:cNvPicPr>
+              <a:picLocks noChangeAspect="1" noChangeArrowheads="1"/>
+            </p:cNvPicPr>
+            <p:nvPr/>
+          </p:nvPicPr>
+          <p:blipFill>
+            <a:blip r:embed="rId3"/>
+            <a:srcRect/>
+            <a:stretch>
+              <a:fillRect/>
+            </a:stretch>
+          </p:blipFill>
+          <p:spPr bwMode="auto">
+            <a:xfrm>
+              <a:off x="533400" y="1600200"/>
+              <a:ext cx="2823883" cy="2667000"/>
+            </a:xfrm>
+            <a:prstGeom prst="rect">
+              <a:avLst/>
+            </a:prstGeom>
+            <a:noFill/>
+          </p:spPr>
+        </p:pic>
+        <p:cxnSp>
+          <p:nvCxnSpPr>
+            <p:cNvPr id="7" name="Straight Connector 6"/>
+            <p:cNvCxnSpPr/>
+            <p:nvPr/>
+          </p:nvCxnSpPr>
+          <p:spPr>
+            <a:xfrm rot="5400000" flipH="1" flipV="1">
+              <a:off x="685800" y="2743200"/>
+              <a:ext cx="1143000" cy="1143000"/>
+            </a:xfrm>
+            <a:prstGeom prst="line">
+              <a:avLst/>
+            </a:prstGeom>
+            <a:ln w="38100">
+              <a:solidFill>
+                <a:schemeClr val="accent2"/>
+              </a:solidFill>
+            </a:ln>
+          </p:spPr>
+          <p:style>
+            <a:lnRef idx="1">
+              <a:schemeClr val="accent1"/>
+            </a:lnRef>
+            <a:fillRef idx="0">
+              <a:schemeClr val="accent1"/>
+            </a:fillRef>
+            <a:effectRef idx="0">
+              <a:schemeClr val="accent1"/>
+            </a:effectRef>
+            <a:fontRef idx="minor">
+              <a:schemeClr val="tx1"/>
+            </a:fontRef>
+          </p:style>
+        </p:cxnSp>
+        <p:cxnSp>
+          <p:nvCxnSpPr>
+            <p:cNvPr id="8" name="Straight Connector 7"/>
+            <p:cNvCxnSpPr/>
+            <p:nvPr/>
+          </p:nvCxnSpPr>
+          <p:spPr>
+            <a:xfrm flipV="1">
+              <a:off x="1524000" y="2743200"/>
+              <a:ext cx="4953000" cy="1143000"/>
+            </a:xfrm>
+            <a:prstGeom prst="line">
+              <a:avLst/>
+            </a:prstGeom>
+            <a:ln w="38100">
+              <a:solidFill>
+                <a:schemeClr val="accent2"/>
+              </a:solidFill>
+            </a:ln>
+          </p:spPr>
+          <p:style>
+            <a:lnRef idx="1">
+              <a:schemeClr val="accent1"/>
+            </a:lnRef>
+            <a:fillRef idx="0">
+              <a:schemeClr val="accent1"/>
+            </a:fillRef>
+            <a:effectRef idx="0">
+              <a:schemeClr val="accent1"/>
+            </a:effectRef>
+            <a:fontRef idx="minor">
+              <a:schemeClr val="tx1"/>
+            </a:fontRef>
+          </p:style>
+        </p:cxnSp>
+        <p:pic>
+          <p:nvPicPr>
+            <p:cNvPr id="1026" name="Picture 2"/>
+            <p:cNvPicPr>
+              <a:picLocks noChangeAspect="1" noChangeArrowheads="1"/>
+            </p:cNvPicPr>
+            <p:nvPr/>
+          </p:nvPicPr>
+          <p:blipFill>
+            <a:blip r:embed="rId4"/>
+            <a:srcRect/>
+            <a:stretch>
+              <a:fillRect/>
+            </a:stretch>
+          </p:blipFill>
+          <p:spPr bwMode="auto">
+            <a:xfrm>
+              <a:off x="1828800" y="2076450"/>
+              <a:ext cx="4657725" cy="666750"/>
+            </a:xfrm>
+            <a:prstGeom prst="rect">
+              <a:avLst/>
+            </a:prstGeom>
+            <a:noFill/>
+            <a:ln w="38100">
+              <a:solidFill>
+                <a:schemeClr val="accent2"/>
+              </a:solidFill>
+              <a:miter lim="800000"/>
+              <a:headEnd/>
+              <a:tailEnd/>
+            </a:ln>
+            <a:effectLst/>
+          </p:spPr>
+        </p:pic>
+      </p:grpSp>
+      <p:grpSp>
+        <p:nvGrpSpPr>
+          <p:cNvPr id="26" name="Group 25"/>
+          <p:cNvGrpSpPr/>
+          <p:nvPr/>
+        </p:nvGrpSpPr>
+        <p:grpSpPr>
+          <a:xfrm>
+            <a:off x="3429000" y="3657600"/>
+            <a:ext cx="5419725" cy="2790825"/>
+            <a:chOff x="3429000" y="1981200"/>
+            <a:chExt cx="5419725" cy="2790825"/>
+          </a:xfrm>
+        </p:grpSpPr>
+        <p:sp>
+          <p:nvSpPr>
+            <p:cNvPr id="20" name="Rectangle 19"/>
+            <p:cNvSpPr/>
+            <p:nvPr/>
+          </p:nvSpPr>
+          <p:spPr>
+            <a:xfrm>
+              <a:off x="3429000" y="1981200"/>
+              <a:ext cx="1981200" cy="609600"/>
+            </a:xfrm>
+            <a:prstGeom prst="rect">
+              <a:avLst/>
+            </a:prstGeom>
+          </p:spPr>
+          <p:style>
+            <a:lnRef idx="2">
+              <a:schemeClr val="accent2">
+                <a:shade val="50000"/>
+              </a:schemeClr>
+            </a:lnRef>
+            <a:fillRef idx="1">
+              <a:schemeClr val="accent2"/>
+            </a:fillRef>
+            <a:effectRef idx="0">
+              <a:schemeClr val="accent2"/>
+            </a:effectRef>
+            <a:fontRef idx="minor">
+              <a:schemeClr val="lt1"/>
+            </a:fontRef>
+          </p:style>
+          <p:txBody>
+            <a:bodyPr rtlCol="0" anchor="t" anchorCtr="0"/>
+            <a:lstStyle/>
+            <a:p>
+              <a:r>
+                <a:rPr lang="en-US" sz="1400" dirty="0" err="1" smtClean="0"/>
+                <a:t>OrgChartPresenter</a:t>
+              </a:r>
+              <a:endParaRPr lang="en-US" sz="1400" dirty="0"/>
+            </a:p>
+          </p:txBody>
+        </p:sp>
+        <p:pic>
+          <p:nvPicPr>
+            <p:cNvPr id="1029" name="Picture 5"/>
+            <p:cNvPicPr>
+              <a:picLocks noChangeAspect="1" noChangeArrowheads="1"/>
+            </p:cNvPicPr>
+            <p:nvPr/>
+          </p:nvPicPr>
+          <p:blipFill>
+            <a:blip r:embed="rId5"/>
+            <a:srcRect/>
+            <a:stretch>
+              <a:fillRect/>
+            </a:stretch>
+          </p:blipFill>
+          <p:spPr bwMode="auto">
+            <a:xfrm>
+              <a:off x="3733800" y="2286000"/>
+              <a:ext cx="5114925" cy="2486025"/>
+            </a:xfrm>
+            <a:prstGeom prst="rect">
+              <a:avLst/>
+            </a:prstGeom>
+            <a:noFill/>
+            <a:ln w="38100">
+              <a:solidFill>
+                <a:schemeClr val="accent2"/>
+              </a:solidFill>
+              <a:miter lim="800000"/>
+              <a:headEnd/>
+              <a:tailEnd/>
+            </a:ln>
+            <a:effectLst/>
+          </p:spPr>
+        </p:pic>
+        <p:sp>
+          <p:nvSpPr>
+            <p:cNvPr id="18" name="Rectangle 17"/>
+            <p:cNvSpPr/>
+            <p:nvPr/>
+          </p:nvSpPr>
+          <p:spPr>
+            <a:xfrm>
+              <a:off x="3886200" y="2590800"/>
+              <a:ext cx="3352800" cy="152400"/>
+            </a:xfrm>
+            <a:prstGeom prst="rect">
+              <a:avLst/>
+            </a:prstGeom>
+            <a:solidFill>
+              <a:srgbClr val="FFFF00">
+                <a:alpha val="10196"/>
+              </a:srgbClr>
+            </a:solidFill>
+            <a:ln>
+              <a:solidFill>
+                <a:srgbClr val="FFFF00"/>
+              </a:solidFill>
+            </a:ln>
+          </p:spPr>
+          <p:style>
+            <a:lnRef idx="2">
+              <a:schemeClr val="accent1">
+                <a:shade val="50000"/>
+              </a:schemeClr>
+            </a:lnRef>
+            <a:fillRef idx="1">
+              <a:schemeClr val="accent1"/>
+            </a:fillRef>
+            <a:effectRef idx="0">
+              <a:schemeClr val="accent1"/>
+            </a:effectRef>
+            <a:fontRef idx="minor">
+              <a:schemeClr val="lt1"/>
+            </a:fontRef>
+          </p:style>
+          <p:txBody>
+            <a:bodyPr rtlCol="0" anchor="ctr"/>
+            <a:lstStyle/>
+            <a:p>
+              <a:pPr algn="ctr"/>
+              <a:endParaRPr lang="en-US"/>
+            </a:p>
+          </p:txBody>
+        </p:sp>
+        <p:sp>
+          <p:nvSpPr>
+            <p:cNvPr id="19" name="Rectangle 18"/>
+            <p:cNvSpPr/>
+            <p:nvPr/>
+          </p:nvSpPr>
+          <p:spPr>
+            <a:xfrm>
+              <a:off x="3886200" y="3200400"/>
+              <a:ext cx="3124200" cy="152400"/>
+            </a:xfrm>
+            <a:prstGeom prst="rect">
+              <a:avLst/>
+            </a:prstGeom>
+            <a:solidFill>
+              <a:srgbClr val="FFFF00">
+                <a:alpha val="10196"/>
+              </a:srgbClr>
+            </a:solidFill>
+            <a:ln>
+              <a:solidFill>
+                <a:srgbClr val="FFFF00"/>
+              </a:solidFill>
+            </a:ln>
+          </p:spPr>
+          <p:style>
+            <a:lnRef idx="2">
+              <a:schemeClr val="accent1">
+                <a:shade val="50000"/>
+              </a:schemeClr>
+            </a:lnRef>
+            <a:fillRef idx="1">
+              <a:schemeClr val="accent1"/>
+            </a:fillRef>
+            <a:effectRef idx="0">
+              <a:schemeClr val="accent1"/>
+            </a:effectRef>
+            <a:fontRef idx="minor">
+              <a:schemeClr val="lt1"/>
+            </a:fontRef>
+          </p:style>
+          <p:txBody>
+            <a:bodyPr rtlCol="0" anchor="ctr"/>
+            <a:lstStyle/>
+            <a:p>
+              <a:pPr algn="ctr"/>
+              <a:endParaRPr lang="en-US"/>
+            </a:p>
+          </p:txBody>
+        </p:sp>
+        <p:sp>
+          <p:nvSpPr>
+            <p:cNvPr id="25" name="Rectangle 24"/>
+            <p:cNvSpPr/>
+            <p:nvPr/>
+          </p:nvSpPr>
+          <p:spPr>
+            <a:xfrm>
+              <a:off x="3886200" y="4267200"/>
+              <a:ext cx="3733800" cy="152400"/>
+            </a:xfrm>
+            <a:prstGeom prst="rect">
+              <a:avLst/>
+            </a:prstGeom>
+            <a:solidFill>
+              <a:srgbClr val="FFFF00">
+                <a:alpha val="10196"/>
+              </a:srgbClr>
+            </a:solidFill>
+            <a:ln>
+              <a:solidFill>
+                <a:srgbClr val="FFFF00"/>
+              </a:solidFill>
+            </a:ln>
+          </p:spPr>
+          <p:style>
+            <a:lnRef idx="2">
+              <a:schemeClr val="accent1">
+                <a:shade val="50000"/>
+              </a:schemeClr>
+            </a:lnRef>
+            <a:fillRef idx="1">
+              <a:schemeClr val="accent1"/>
+            </a:fillRef>
+            <a:effectRef idx="0">
+              <a:schemeClr val="accent1"/>
+            </a:effectRef>
+            <a:fontRef idx="minor">
+              <a:schemeClr val="lt1"/>
+            </a:fontRef>
+          </p:style>
+          <p:txBody>
+            <a:bodyPr rtlCol="0" anchor="ctr"/>
+            <a:lstStyle/>
+            <a:p>
+              <a:pPr algn="ctr"/>
+              <a:endParaRPr lang="en-US"/>
+            </a:p>
+          </p:txBody>
+        </p:sp>
+      </p:grpSp>
+    </p:spTree>
+  </p:cSld>
+  <p:clrMapOvr>
+    <a:masterClrMapping/>
+  </p:clrMapOvr>
+  <p:timing>
+    <p:tnLst>
+      <p:par>
+        <p:cTn id="1" dur="indefinite" restart="never" nodeType="tmRoot"/>
+      </p:par>
+    </p:tnLst>
+  </p:timing>
+</p:sld>
+</file>
+
+<file path=ppt/slides/slide23.xml><?xml version="1.0" encoding="utf-8"?>
+<p:sld xmlns:a="http://schemas.openxmlformats.org/drawingml/2006/main" xmlns:r="http://schemas.openxmlformats.org/officeDocument/2006/relationships" xmlns:p="http://schemas.openxmlformats.org/presentationml/2006/main">
+  <p:cSld>
+    <p:spTree>
+      <p:nvGrpSpPr>
+        <p:cNvPr id="1" name=""/>
+        <p:cNvGrpSpPr/>
+        <p:nvPr/>
+      </p:nvGrpSpPr>
+      <p:grpSpPr>
+        <a:xfrm>
+          <a:off x="0" y="0"/>
+          <a:ext cx="0" cy="0"/>
+          <a:chOff x="0" y="0"/>
+          <a:chExt cx="0" cy="0"/>
+        </a:xfrm>
+      </p:grpSpPr>
+      <p:sp>
+        <p:nvSpPr>
+          <p:cNvPr id="3075" name="Text Placeholder 2"/>
+          <p:cNvSpPr>
+            <a:spLocks noGrp="1"/>
+          </p:cNvSpPr>
+          <p:nvPr>
+            <p:ph type="body" sz="quarter" idx="10"/>
+          </p:nvPr>
+        </p:nvSpPr>
+        <p:spPr>
+          <a:xfrm>
+            <a:off x="685800" y="1066800"/>
+            <a:ext cx="8229600" cy="1219200"/>
+          </a:xfrm>
+        </p:spPr>
+        <p:txBody>
+          <a:bodyPr/>
+          <a:lstStyle/>
+          <a:p>
+            <a:pPr eaLnBrk="1" hangingPunct="1">
+              <a:buNone/>
+            </a:pPr>
+            <a:r>
+              <a:rPr lang="en-US" sz="2000" dirty="0" smtClean="0"/>
               <a:t>The Real World: Coupling Within </a:t>
             </a:r>
             <a:r>
@@ -9078,7 +9587,6 @@
               <a:rPr lang="en-US" sz="2000" dirty="0" smtClean="0"/>
               <a:t> Can Still Be Scary</a:t>
             </a:r>
-            <a:endParaRPr lang="en-US" sz="2000" dirty="0" smtClean="0"/>
           </a:p>
         </p:txBody>
       </p:sp>
@@ -9183,7 +9691,7 @@
 </p:sld>
 </file>
 
-<file path=ppt/slides/slide23.xml><?xml version="1.0" encoding="utf-8"?>
+<file path=ppt/slides/slide24.xml><?xml version="1.0" encoding="utf-8"?>
 <p:sld xmlns:a="http://schemas.openxmlformats.org/drawingml/2006/main" xmlns:r="http://schemas.openxmlformats.org/officeDocument/2006/relationships" xmlns:p="http://schemas.openxmlformats.org/presentationml/2006/main">
   <p:cSld>
     <p:spTree>
@@ -9451,16 +9959,7 @@
                 </a:solidFill>
                 <a:latin typeface="Calibri" pitchFamily="34" charset="0"/>
               </a:rPr>
-              <a:t>Simple Org Chart Version </a:t>
-            </a:r>
-            <a:r>
-              <a:rPr lang="en-US" sz="3600" spc="60" dirty="0" smtClean="0">
-                <a:solidFill>
-                  <a:schemeClr val="bg1"/>
-                </a:solidFill>
-                <a:latin typeface="Calibri" pitchFamily="34" charset="0"/>
-              </a:rPr>
-              <a:t>4</a:t>
+              <a:t>Simple Org Chart Version 4</a:t>
             </a:r>
             <a:endParaRPr lang="en-US" sz="3600" spc="60" dirty="0">
               <a:solidFill>
@@ -9523,7 +10022,7 @@
 </p:sld>
 </file>
 
-<file path=ppt/slides/slide24.xml><?xml version="1.0" encoding="utf-8"?>
+<file path=ppt/slides/slide25.xml><?xml version="1.0" encoding="utf-8"?>
 <p:sld xmlns:a="http://schemas.openxmlformats.org/drawingml/2006/main" xmlns:r="http://schemas.openxmlformats.org/officeDocument/2006/relationships" xmlns:p="http://schemas.openxmlformats.org/presentationml/2006/main">
   <p:cSld>
     <p:spTree>
@@ -9565,15 +10064,7 @@
             </a:pPr>
             <a:r>
               <a:rPr lang="en-US" sz="2000" dirty="0" smtClean="0"/>
-              <a:t>“An </a:t>
-            </a:r>
-            <a:r>
-              <a:rPr lang="en-US" sz="2000" dirty="0" smtClean="0"/>
-              <a:t>Event Aggregator acts as a single source of events for many objects. It registers for all the events of the many objects allowing clients to register with just the aggregator</a:t>
-            </a:r>
-            <a:r>
-              <a:rPr lang="en-US" sz="2000" dirty="0" smtClean="0"/>
-              <a:t>.” – </a:t>
+              <a:t>“An Event Aggregator acts as a single source of events for many objects. It registers for all the events of the many objects allowing clients to register with just the aggregator.” – </a:t>
             </a:r>
             <a:r>
               <a:rPr lang="en-US" sz="2000" dirty="0" smtClean="0">
@@ -9616,7 +10107,6 @@
               <a:rPr lang="en-US" dirty="0" smtClean="0"/>
               <a:t>Event Aggregator</a:t>
             </a:r>
-            <a:endParaRPr lang="en-US" dirty="0" smtClean="0"/>
           </a:p>
         </p:txBody>
       </p:sp>
@@ -10447,7 +10937,7 @@
 </p:sld>
 </file>
 
-<file path=ppt/slides/slide25.xml><?xml version="1.0" encoding="utf-8"?>
+<file path=ppt/slides/slide26.xml><?xml version="1.0" encoding="utf-8"?>
 <p:sld xmlns:a="http://schemas.openxmlformats.org/drawingml/2006/main" xmlns:r="http://schemas.openxmlformats.org/officeDocument/2006/relationships" xmlns:p="http://schemas.openxmlformats.org/presentationml/2006/main">
   <p:cSld>
     <p:spTree>
@@ -10522,7 +11012,6 @@
               <a:rPr lang="en-US" dirty="0" smtClean="0"/>
               <a:t>Event Aggregator</a:t>
             </a:r>
-            <a:endParaRPr lang="en-US" dirty="0" smtClean="0"/>
           </a:p>
         </p:txBody>
       </p:sp>
@@ -10541,7 +11030,7 @@
 </p:sld>
 </file>
 
-<file path=ppt/slides/slide26.xml><?xml version="1.0" encoding="utf-8"?>
+<file path=ppt/slides/slide27.xml><?xml version="1.0" encoding="utf-8"?>
 <p:sld xmlns:a="http://schemas.openxmlformats.org/drawingml/2006/main" xmlns:r="http://schemas.openxmlformats.org/officeDocument/2006/relationships" xmlns:p="http://schemas.openxmlformats.org/presentationml/2006/main">
   <p:cSld>
     <p:spTree>
@@ -10890,96 +11379,6 @@
 </p:sld>
 </file>
 
-<file path=ppt/slides/slide27.xml><?xml version="1.0" encoding="utf-8"?>
-<p:sld xmlns:a="http://schemas.openxmlformats.org/drawingml/2006/main" xmlns:r="http://schemas.openxmlformats.org/officeDocument/2006/relationships" xmlns:p="http://schemas.openxmlformats.org/presentationml/2006/main">
-  <p:cSld>
-    <p:spTree>
-      <p:nvGrpSpPr>
-        <p:cNvPr id="1" name=""/>
-        <p:cNvGrpSpPr/>
-        <p:nvPr/>
-      </p:nvGrpSpPr>
-      <p:grpSpPr>
-        <a:xfrm>
-          <a:off x="0" y="0"/>
-          <a:ext cx="0" cy="0"/>
-          <a:chOff x="0" y="0"/>
-          <a:chExt cx="0" cy="0"/>
-        </a:xfrm>
-      </p:grpSpPr>
-      <p:sp>
-        <p:nvSpPr>
-          <p:cNvPr id="3075" name="Text Placeholder 2"/>
-          <p:cNvSpPr>
-            <a:spLocks noGrp="1"/>
-          </p:cNvSpPr>
-          <p:nvPr>
-            <p:ph type="body" sz="quarter" idx="10"/>
-          </p:nvPr>
-        </p:nvSpPr>
-        <p:spPr>
-          <a:xfrm>
-            <a:off x="685800" y="1066800"/>
-            <a:ext cx="8229600" cy="1219200"/>
-          </a:xfrm>
-        </p:spPr>
-        <p:txBody>
-          <a:bodyPr/>
-          <a:lstStyle/>
-          <a:p>
-            <a:pPr eaLnBrk="1" hangingPunct="1">
-              <a:buNone/>
-            </a:pPr>
-            <a:endParaRPr lang="en-US" sz="2000" dirty="0" smtClean="0"/>
-          </a:p>
-        </p:txBody>
-      </p:sp>
-      <p:sp>
-        <p:nvSpPr>
-          <p:cNvPr id="3074" name="Title 1"/>
-          <p:cNvSpPr>
-            <a:spLocks noGrp="1"/>
-          </p:cNvSpPr>
-          <p:nvPr>
-            <p:ph type="title"/>
-          </p:nvPr>
-        </p:nvSpPr>
-        <p:spPr bwMode="auto">
-          <a:noFill/>
-          <a:ln>
-            <a:miter lim="800000"/>
-            <a:headEnd/>
-            <a:tailEnd/>
-          </a:ln>
-        </p:spPr>
-        <p:txBody>
-          <a:bodyPr vert="horz" wrap="square" lIns="91440" tIns="45720" rIns="91440" bIns="45720" numCol="1" anchor="t" anchorCtr="0" compatLnSpc="1">
-            <a:prstTxWarp prst="textNoShape">
-              <a:avLst/>
-            </a:prstTxWarp>
-          </a:bodyPr>
-          <a:lstStyle/>
-          <a:p>
-            <a:pPr eaLnBrk="1" hangingPunct="1"/>
-            <a:endParaRPr lang="en-US" dirty="0" smtClean="0"/>
-          </a:p>
-        </p:txBody>
-      </p:sp>
-    </p:spTree>
-  </p:cSld>
-  <p:clrMapOvr>
-    <a:masterClrMapping/>
-  </p:clrMapOvr>
-  <p:timing>
-    <p:tnLst>
-      <p:par>
-        <p:cTn id="1" dur="indefinite" restart="never" nodeType="tmRoot"/>
-      </p:par>
-    </p:tnLst>
-  </p:timing>
-</p:sld>
-</file>
-
 <file path=ppt/slides/slide28.xml><?xml version="1.0" encoding="utf-8"?>
 <p:sld xmlns:a="http://schemas.openxmlformats.org/drawingml/2006/main" xmlns:r="http://schemas.openxmlformats.org/officeDocument/2006/relationships" xmlns:p="http://schemas.openxmlformats.org/presentationml/2006/main">
   <p:cSld>
@@ -11089,118 +11488,42 @@
       </p:grpSpPr>
       <p:sp>
         <p:nvSpPr>
-          <p:cNvPr id="6" name="Rectangle 5"/>
-          <p:cNvSpPr/>
-          <p:nvPr/>
+          <p:cNvPr id="3075" name="Text Placeholder 2"/>
+          <p:cNvSpPr>
+            <a:spLocks noGrp="1"/>
+          </p:cNvSpPr>
+          <p:nvPr>
+            <p:ph type="body" sz="quarter" idx="10"/>
+          </p:nvPr>
         </p:nvSpPr>
         <p:spPr>
           <a:xfrm>
-            <a:off x="0" y="0"/>
-            <a:ext cx="9144000" cy="4648200"/>
+            <a:off x="685800" y="1066800"/>
+            <a:ext cx="8229600" cy="1219200"/>
           </a:xfrm>
-          <a:prstGeom prst="rect">
-            <a:avLst/>
-          </a:prstGeom>
-          <a:solidFill>
-            <a:srgbClr val="0069AA"/>
-          </a:solidFill>
-          <a:ln>
-            <a:noFill/>
-          </a:ln>
         </p:spPr>
-        <p:style>
-          <a:lnRef idx="2">
-            <a:schemeClr val="accent1">
-              <a:shade val="50000"/>
-            </a:schemeClr>
-          </a:lnRef>
-          <a:fillRef idx="1">
-            <a:schemeClr val="accent1"/>
-          </a:fillRef>
-          <a:effectRef idx="0">
-            <a:schemeClr val="accent1"/>
-          </a:effectRef>
-          <a:fontRef idx="minor">
-            <a:schemeClr val="lt1"/>
-          </a:fontRef>
-        </p:style>
         <p:txBody>
-          <a:bodyPr anchor="ctr"/>
+          <a:bodyPr/>
           <a:lstStyle/>
           <a:p>
-            <a:pPr algn="ctr">
-              <a:defRPr/>
+            <a:pPr eaLnBrk="1" hangingPunct="1">
+              <a:buNone/>
             </a:pPr>
-            <a:endParaRPr lang="en-US"/>
+            <a:endParaRPr lang="en-US" sz="2000" dirty="0" smtClean="0"/>
           </a:p>
         </p:txBody>
       </p:sp>
       <p:sp>
         <p:nvSpPr>
-          <p:cNvPr id="8" name="Rectangle 7"/>
-          <p:cNvSpPr/>
-          <p:nvPr/>
-        </p:nvSpPr>
-        <p:spPr>
-          <a:xfrm>
-            <a:off x="228600" y="0"/>
-            <a:ext cx="104775" cy="3581400"/>
-          </a:xfrm>
-          <a:prstGeom prst="rect">
-            <a:avLst/>
-          </a:prstGeom>
-          <a:solidFill>
-            <a:srgbClr val="E31937"/>
-          </a:solidFill>
-          <a:ln>
-            <a:noFill/>
-          </a:ln>
-        </p:spPr>
-        <p:style>
-          <a:lnRef idx="2">
-            <a:schemeClr val="accent1">
-              <a:shade val="50000"/>
-            </a:schemeClr>
-          </a:lnRef>
-          <a:fillRef idx="1">
-            <a:schemeClr val="accent1"/>
-          </a:fillRef>
-          <a:effectRef idx="0">
-            <a:schemeClr val="accent1"/>
-          </a:effectRef>
-          <a:fontRef idx="minor">
-            <a:schemeClr val="lt1"/>
-          </a:fontRef>
-        </p:style>
-        <p:txBody>
-          <a:bodyPr anchor="ctr"/>
-          <a:lstStyle/>
-          <a:p>
-            <a:pPr algn="ctr">
-              <a:defRPr/>
-            </a:pPr>
-            <a:endParaRPr lang="en-US"/>
-          </a:p>
-        </p:txBody>
-      </p:sp>
-      <p:sp>
-        <p:nvSpPr>
-          <p:cNvPr id="5127" name="Rectangle 8"/>
+          <p:cNvPr id="3074" name="Title 1"/>
           <p:cNvSpPr>
-            <a:spLocks noGrp="1" noChangeArrowheads="1"/>
+            <a:spLocks noGrp="1"/>
           </p:cNvSpPr>
           <p:nvPr>
-            <p:ph type="title" idx="4294967295"/>
+            <p:ph type="title"/>
           </p:nvPr>
         </p:nvSpPr>
         <p:spPr bwMode="auto">
-          <a:xfrm>
-            <a:off x="495300" y="200025"/>
-            <a:ext cx="8420100" cy="919163"/>
-          </a:xfrm>
-          <a:prstGeom prst="rect">
-            <a:avLst/>
-          </a:prstGeom>
           <a:noFill/>
           <a:ln>
             <a:miter lim="800000"/>
@@ -11209,403 +11532,18 @@
           </a:ln>
         </p:spPr>
         <p:txBody>
-          <a:bodyPr/>
-          <a:lstStyle/>
-          <a:p>
-            <a:pPr eaLnBrk="1" hangingPunct="1"/>
-            <a:r>
-              <a:rPr lang="en-US" dirty="0" smtClean="0">
-                <a:solidFill>
-                  <a:schemeClr val="bg1"/>
-                </a:solidFill>
-              </a:rPr>
-              <a:t>Additional Resources</a:t>
-            </a:r>
-          </a:p>
-        </p:txBody>
-      </p:sp>
-      <p:sp>
-        <p:nvSpPr>
-          <p:cNvPr id="5128" name="Rectangle 9"/>
-          <p:cNvSpPr>
-            <a:spLocks noGrp="1" noChangeArrowheads="1"/>
-          </p:cNvSpPr>
-          <p:nvPr>
-            <p:ph idx="4294967295"/>
-          </p:nvPr>
-        </p:nvSpPr>
-        <p:spPr>
-          <a:xfrm>
-            <a:off x="514350" y="1143000"/>
-            <a:ext cx="8229600" cy="3429000"/>
-          </a:xfrm>
-        </p:spPr>
-        <p:txBody>
-          <a:bodyPr/>
-          <a:lstStyle/>
-          <a:p>
-            <a:pPr eaLnBrk="1" hangingPunct="1">
-              <a:lnSpc>
-                <a:spcPct val="80000"/>
-              </a:lnSpc>
-              <a:buNone/>
-            </a:pPr>
-            <a:r>
-              <a:rPr lang="en-US" sz="2000" dirty="0" smtClean="0">
-                <a:solidFill>
-                  <a:schemeClr val="bg1"/>
-                </a:solidFill>
-              </a:rPr>
-              <a:t>Command Pattern</a:t>
-            </a:r>
-          </a:p>
-          <a:p>
-            <a:pPr eaLnBrk="1" hangingPunct="1">
-              <a:lnSpc>
-                <a:spcPct val="80000"/>
-              </a:lnSpc>
-              <a:buNone/>
-            </a:pPr>
-            <a:r>
-              <a:rPr lang="en-US" sz="2000" dirty="0" smtClean="0">
-                <a:solidFill>
-                  <a:schemeClr val="bg1"/>
-                </a:solidFill>
-              </a:rPr>
-              <a:t>	http://www.lostechies.com/blogs/derickbailey/archive/2008/11/19/ptom-command-and-conquer-your-ui-coupling-problems.aspx </a:t>
-            </a:r>
-            <a:br>
-              <a:rPr lang="en-US" sz="2000" dirty="0" smtClean="0">
-                <a:solidFill>
-                  <a:schemeClr val="bg1"/>
-                </a:solidFill>
-              </a:rPr>
-            </a:br>
-            <a:endParaRPr lang="en-US" sz="2000" dirty="0" smtClean="0">
-              <a:solidFill>
-                <a:schemeClr val="bg1"/>
-              </a:solidFill>
-            </a:endParaRPr>
-          </a:p>
-          <a:p>
-            <a:pPr eaLnBrk="1" hangingPunct="1">
-              <a:lnSpc>
-                <a:spcPct val="80000"/>
-              </a:lnSpc>
-              <a:buNone/>
-            </a:pPr>
-            <a:r>
-              <a:rPr lang="en-US" sz="2000" dirty="0" smtClean="0">
-                <a:solidFill>
-                  <a:schemeClr val="bg1"/>
-                </a:solidFill>
-              </a:rPr>
-              <a:t>Event Aggregator</a:t>
-            </a:r>
-            <a:br>
-              <a:rPr lang="en-US" sz="2000" dirty="0" smtClean="0">
-                <a:solidFill>
-                  <a:schemeClr val="bg1"/>
-                </a:solidFill>
-              </a:rPr>
-            </a:br>
-            <a:r>
-              <a:rPr lang="en-US" sz="2000" dirty="0" smtClean="0">
-                <a:solidFill>
-                  <a:schemeClr val="bg1"/>
-                </a:solidFill>
-              </a:rPr>
-              <a:t>http://www.martinfowler.com/eaaDev/EventAggregator.html</a:t>
-            </a:r>
-            <a:br>
-              <a:rPr lang="en-US" sz="2000" dirty="0" smtClean="0">
-                <a:solidFill>
-                  <a:schemeClr val="bg1"/>
-                </a:solidFill>
-              </a:rPr>
-            </a:br>
-            <a:endParaRPr lang="en-US" sz="2000" dirty="0" smtClean="0">
-              <a:solidFill>
-                <a:schemeClr val="bg1"/>
-              </a:solidFill>
-            </a:endParaRPr>
-          </a:p>
-          <a:p>
-            <a:pPr eaLnBrk="1" hangingPunct="1">
-              <a:lnSpc>
-                <a:spcPct val="80000"/>
-              </a:lnSpc>
-              <a:buNone/>
-            </a:pPr>
-            <a:r>
-              <a:rPr lang="en-US" sz="2000" dirty="0" err="1" smtClean="0">
-                <a:solidFill>
-                  <a:schemeClr val="bg1"/>
-                </a:solidFill>
-              </a:rPr>
-              <a:t>StructureMap</a:t>
-            </a:r>
-            <a:r>
-              <a:rPr lang="en-US" sz="2000" dirty="0" smtClean="0">
-                <a:solidFill>
-                  <a:schemeClr val="bg1"/>
-                </a:solidFill>
-              </a:rPr>
-              <a:t> (</a:t>
-            </a:r>
-            <a:r>
-              <a:rPr lang="en-US" sz="2000" dirty="0" err="1" smtClean="0">
-                <a:solidFill>
-                  <a:schemeClr val="bg1"/>
-                </a:solidFill>
-              </a:rPr>
-              <a:t>IoC</a:t>
-            </a:r>
-            <a:r>
-              <a:rPr lang="en-US" sz="2000" dirty="0" smtClean="0">
-                <a:solidFill>
-                  <a:schemeClr val="bg1"/>
-                </a:solidFill>
-              </a:rPr>
-              <a:t> Container)</a:t>
-            </a:r>
-            <a:endParaRPr lang="en-US" sz="2000" dirty="0" smtClean="0">
-              <a:solidFill>
-                <a:schemeClr val="bg1"/>
-              </a:solidFill>
-            </a:endParaRPr>
-          </a:p>
-          <a:p>
-            <a:pPr eaLnBrk="1" hangingPunct="1">
-              <a:lnSpc>
-                <a:spcPct val="80000"/>
-              </a:lnSpc>
-              <a:buNone/>
-            </a:pPr>
-            <a:r>
-              <a:rPr lang="en-US" sz="2000" dirty="0" smtClean="0">
-                <a:solidFill>
-                  <a:schemeClr val="bg1"/>
-                </a:solidFill>
-              </a:rPr>
-              <a:t>	http://structuremap.sourceforge.net</a:t>
-            </a:r>
-            <a:br>
-              <a:rPr lang="en-US" sz="2000" dirty="0" smtClean="0">
-                <a:solidFill>
-                  <a:schemeClr val="bg1"/>
-                </a:solidFill>
-              </a:rPr>
-            </a:br>
-            <a:endParaRPr lang="en-US" sz="2000" dirty="0" smtClean="0">
-              <a:solidFill>
-                <a:schemeClr val="bg1"/>
-              </a:solidFill>
-            </a:endParaRPr>
-          </a:p>
-          <a:p>
-            <a:pPr eaLnBrk="1" hangingPunct="1">
-              <a:lnSpc>
-                <a:spcPct val="80000"/>
-              </a:lnSpc>
-              <a:buNone/>
-            </a:pPr>
-            <a:r>
-              <a:rPr lang="en-US" sz="2000" dirty="0" smtClean="0">
-                <a:solidFill>
-                  <a:schemeClr val="bg1"/>
-                </a:solidFill>
-              </a:rPr>
-              <a:t>Application Controller</a:t>
-            </a:r>
-          </a:p>
-          <a:p>
-            <a:pPr eaLnBrk="1" hangingPunct="1">
-              <a:lnSpc>
-                <a:spcPct val="80000"/>
-              </a:lnSpc>
-              <a:buNone/>
-            </a:pPr>
-            <a:r>
-              <a:rPr lang="en-US" sz="2000" dirty="0" smtClean="0">
-                <a:solidFill>
-                  <a:schemeClr val="bg1"/>
-                </a:solidFill>
-              </a:rPr>
-              <a:t>	http://www.martinfowler.com/eaaCatalog/applicationController.html</a:t>
-            </a:r>
-            <a:br>
-              <a:rPr lang="en-US" sz="2000" dirty="0" smtClean="0">
-                <a:solidFill>
-                  <a:schemeClr val="bg1"/>
-                </a:solidFill>
-              </a:rPr>
-            </a:br>
-            <a:endParaRPr lang="en-US" sz="2000" dirty="0" smtClean="0">
-              <a:solidFill>
-                <a:schemeClr val="bg1"/>
-              </a:solidFill>
-            </a:endParaRPr>
-          </a:p>
-        </p:txBody>
-      </p:sp>
-      <p:sp>
-        <p:nvSpPr>
-          <p:cNvPr id="5129" name="Text Box 7"/>
-          <p:cNvSpPr txBox="1">
-            <a:spLocks noChangeArrowheads="1"/>
-          </p:cNvSpPr>
-          <p:nvPr/>
-        </p:nvSpPr>
-        <p:spPr bwMode="auto">
-          <a:xfrm>
-            <a:off x="5470525" y="1331913"/>
-            <a:ext cx="184150" cy="366712"/>
-          </a:xfrm>
-          <a:prstGeom prst="rect">
-            <a:avLst/>
-          </a:prstGeom>
-          <a:noFill/>
-          <a:ln w="9525">
-            <a:noFill/>
-            <a:miter lim="800000"/>
-            <a:headEnd/>
-            <a:tailEnd/>
-          </a:ln>
-        </p:spPr>
-        <p:txBody>
-          <a:bodyPr wrap="none">
-            <a:spAutoFit/>
+          <a:bodyPr vert="horz" wrap="square" lIns="91440" tIns="45720" rIns="91440" bIns="45720" numCol="1" anchor="t" anchorCtr="0" compatLnSpc="1">
+            <a:prstTxWarp prst="textNoShape">
+              <a:avLst/>
+            </a:prstTxWarp>
           </a:bodyPr>
           <a:lstStyle/>
           <a:p>
-            <a:endParaRPr lang="en-US"/>
+            <a:pPr eaLnBrk="1" hangingPunct="1"/>
+            <a:endParaRPr lang="en-US" dirty="0" smtClean="0"/>
           </a:p>
         </p:txBody>
       </p:sp>
-      <p:pic>
-        <p:nvPicPr>
-          <p:cNvPr id="16" name="Picture 4" descr="MAT logo 1 CMYK"/>
-          <p:cNvPicPr>
-            <a:picLocks noChangeAspect="1" noChangeArrowheads="1"/>
-          </p:cNvPicPr>
-          <p:nvPr/>
-        </p:nvPicPr>
-        <p:blipFill>
-          <a:blip r:embed="rId2">
-            <a:clrChange>
-              <a:clrFrom>
-                <a:srgbClr val="FDFDFD"/>
-              </a:clrFrom>
-              <a:clrTo>
-                <a:srgbClr val="FDFDFD">
-                  <a:alpha val="0"/>
-                </a:srgbClr>
-              </a:clrTo>
-            </a:clrChange>
-          </a:blip>
-          <a:srcRect/>
-          <a:stretch>
-            <a:fillRect/>
-          </a:stretch>
-        </p:blipFill>
-        <p:spPr bwMode="auto">
-          <a:xfrm>
-            <a:off x="2971800" y="4800600"/>
-            <a:ext cx="2819400" cy="1338263"/>
-          </a:xfrm>
-          <a:prstGeom prst="rect">
-            <a:avLst/>
-          </a:prstGeom>
-          <a:noFill/>
-          <a:ln w="9525">
-            <a:noFill/>
-            <a:miter lim="800000"/>
-            <a:headEnd/>
-            <a:tailEnd/>
-          </a:ln>
-        </p:spPr>
-      </p:pic>
-      <p:sp>
-        <p:nvSpPr>
-          <p:cNvPr id="17" name="Rectangle 16"/>
-          <p:cNvSpPr/>
-          <p:nvPr/>
-        </p:nvSpPr>
-        <p:spPr>
-          <a:xfrm>
-            <a:off x="0" y="4724400"/>
-            <a:ext cx="9144000" cy="2133600"/>
-          </a:xfrm>
-          <a:prstGeom prst="rect">
-            <a:avLst/>
-          </a:prstGeom>
-          <a:solidFill>
-            <a:srgbClr val="E31937"/>
-          </a:solidFill>
-          <a:ln>
-            <a:noFill/>
-          </a:ln>
-        </p:spPr>
-        <p:style>
-          <a:lnRef idx="2">
-            <a:schemeClr val="accent1">
-              <a:shade val="50000"/>
-            </a:schemeClr>
-          </a:lnRef>
-          <a:fillRef idx="1">
-            <a:schemeClr val="accent1"/>
-          </a:fillRef>
-          <a:effectRef idx="0">
-            <a:schemeClr val="accent1"/>
-          </a:effectRef>
-          <a:fontRef idx="minor">
-            <a:schemeClr val="lt1"/>
-          </a:fontRef>
-        </p:style>
-        <p:txBody>
-          <a:bodyPr anchor="ctr"/>
-          <a:lstStyle/>
-          <a:p>
-            <a:pPr algn="ctr">
-              <a:defRPr/>
-            </a:pPr>
-            <a:endParaRPr lang="en-US"/>
-          </a:p>
-        </p:txBody>
-      </p:sp>
-      <p:pic>
-        <p:nvPicPr>
-          <p:cNvPr id="18" name="Picture 7" descr="MAT logo vertical_red.emf"/>
-          <p:cNvPicPr>
-            <a:picLocks noChangeAspect="1"/>
-          </p:cNvPicPr>
-          <p:nvPr/>
-        </p:nvPicPr>
-        <p:blipFill>
-          <a:blip r:embed="rId3"/>
-          <a:srcRect/>
-          <a:stretch>
-            <a:fillRect/>
-          </a:stretch>
-        </p:blipFill>
-        <p:spPr bwMode="auto">
-          <a:xfrm>
-            <a:off x="3600450" y="5334000"/>
-            <a:ext cx="1981200" cy="969963"/>
-          </a:xfrm>
-          <a:prstGeom prst="rect">
-            <a:avLst/>
-          </a:prstGeom>
-          <a:noFill/>
-          <a:ln w="9525">
-            <a:noFill/>
-            <a:miter lim="800000"/>
-            <a:headEnd/>
-            <a:tailEnd/>
-          </a:ln>
-        </p:spPr>
-      </p:pic>
     </p:spTree>
   </p:cSld>
   <p:clrMapOvr>
@@ -11767,6 +11705,552 @@
 </file>
 
 <file path=ppt/slides/slide30.xml><?xml version="1.0" encoding="utf-8"?>
+<p:sld xmlns:a="http://schemas.openxmlformats.org/drawingml/2006/main" xmlns:r="http://schemas.openxmlformats.org/officeDocument/2006/relationships" xmlns:p="http://schemas.openxmlformats.org/presentationml/2006/main">
+  <p:cSld>
+    <p:spTree>
+      <p:nvGrpSpPr>
+        <p:cNvPr id="1" name=""/>
+        <p:cNvGrpSpPr/>
+        <p:nvPr/>
+      </p:nvGrpSpPr>
+      <p:grpSpPr>
+        <a:xfrm>
+          <a:off x="0" y="0"/>
+          <a:ext cx="0" cy="0"/>
+          <a:chOff x="0" y="0"/>
+          <a:chExt cx="0" cy="0"/>
+        </a:xfrm>
+      </p:grpSpPr>
+      <p:sp>
+        <p:nvSpPr>
+          <p:cNvPr id="6" name="Rectangle 5"/>
+          <p:cNvSpPr/>
+          <p:nvPr/>
+        </p:nvSpPr>
+        <p:spPr>
+          <a:xfrm>
+            <a:off x="0" y="0"/>
+            <a:ext cx="9144000" cy="4648200"/>
+          </a:xfrm>
+          <a:prstGeom prst="rect">
+            <a:avLst/>
+          </a:prstGeom>
+          <a:solidFill>
+            <a:srgbClr val="0069AA"/>
+          </a:solidFill>
+          <a:ln>
+            <a:noFill/>
+          </a:ln>
+        </p:spPr>
+        <p:style>
+          <a:lnRef idx="2">
+            <a:schemeClr val="accent1">
+              <a:shade val="50000"/>
+            </a:schemeClr>
+          </a:lnRef>
+          <a:fillRef idx="1">
+            <a:schemeClr val="accent1"/>
+          </a:fillRef>
+          <a:effectRef idx="0">
+            <a:schemeClr val="accent1"/>
+          </a:effectRef>
+          <a:fontRef idx="minor">
+            <a:schemeClr val="lt1"/>
+          </a:fontRef>
+        </p:style>
+        <p:txBody>
+          <a:bodyPr anchor="ctr"/>
+          <a:lstStyle/>
+          <a:p>
+            <a:pPr algn="ctr">
+              <a:defRPr/>
+            </a:pPr>
+            <a:endParaRPr lang="en-US"/>
+          </a:p>
+        </p:txBody>
+      </p:sp>
+      <p:sp>
+        <p:nvSpPr>
+          <p:cNvPr id="8" name="Rectangle 7"/>
+          <p:cNvSpPr/>
+          <p:nvPr/>
+        </p:nvSpPr>
+        <p:spPr>
+          <a:xfrm>
+            <a:off x="228600" y="0"/>
+            <a:ext cx="104775" cy="3581400"/>
+          </a:xfrm>
+          <a:prstGeom prst="rect">
+            <a:avLst/>
+          </a:prstGeom>
+          <a:solidFill>
+            <a:srgbClr val="E31937"/>
+          </a:solidFill>
+          <a:ln>
+            <a:noFill/>
+          </a:ln>
+        </p:spPr>
+        <p:style>
+          <a:lnRef idx="2">
+            <a:schemeClr val="accent1">
+              <a:shade val="50000"/>
+            </a:schemeClr>
+          </a:lnRef>
+          <a:fillRef idx="1">
+            <a:schemeClr val="accent1"/>
+          </a:fillRef>
+          <a:effectRef idx="0">
+            <a:schemeClr val="accent1"/>
+          </a:effectRef>
+          <a:fontRef idx="minor">
+            <a:schemeClr val="lt1"/>
+          </a:fontRef>
+        </p:style>
+        <p:txBody>
+          <a:bodyPr anchor="ctr"/>
+          <a:lstStyle/>
+          <a:p>
+            <a:pPr algn="ctr">
+              <a:defRPr/>
+            </a:pPr>
+            <a:endParaRPr lang="en-US"/>
+          </a:p>
+        </p:txBody>
+      </p:sp>
+      <p:sp>
+        <p:nvSpPr>
+          <p:cNvPr id="5127" name="Rectangle 8"/>
+          <p:cNvSpPr>
+            <a:spLocks noGrp="1" noChangeArrowheads="1"/>
+          </p:cNvSpPr>
+          <p:nvPr>
+            <p:ph type="title" idx="4294967295"/>
+          </p:nvPr>
+        </p:nvSpPr>
+        <p:spPr bwMode="auto">
+          <a:xfrm>
+            <a:off x="495300" y="200025"/>
+            <a:ext cx="8420100" cy="919163"/>
+          </a:xfrm>
+          <a:prstGeom prst="rect">
+            <a:avLst/>
+          </a:prstGeom>
+          <a:noFill/>
+          <a:ln>
+            <a:miter lim="800000"/>
+            <a:headEnd/>
+            <a:tailEnd/>
+          </a:ln>
+        </p:spPr>
+        <p:txBody>
+          <a:bodyPr/>
+          <a:lstStyle/>
+          <a:p>
+            <a:pPr eaLnBrk="1" hangingPunct="1"/>
+            <a:r>
+              <a:rPr lang="en-US" dirty="0" smtClean="0">
+                <a:solidFill>
+                  <a:schemeClr val="bg1"/>
+                </a:solidFill>
+              </a:rPr>
+              <a:t>Additional Resources</a:t>
+            </a:r>
+          </a:p>
+        </p:txBody>
+      </p:sp>
+      <p:sp>
+        <p:nvSpPr>
+          <p:cNvPr id="5128" name="Rectangle 9"/>
+          <p:cNvSpPr>
+            <a:spLocks noGrp="1" noChangeArrowheads="1"/>
+          </p:cNvSpPr>
+          <p:nvPr>
+            <p:ph idx="4294967295"/>
+          </p:nvPr>
+        </p:nvSpPr>
+        <p:spPr>
+          <a:xfrm>
+            <a:off x="514350" y="1143000"/>
+            <a:ext cx="8229600" cy="3429000"/>
+          </a:xfrm>
+        </p:spPr>
+        <p:txBody>
+          <a:bodyPr/>
+          <a:lstStyle/>
+          <a:p>
+            <a:pPr eaLnBrk="1" hangingPunct="1">
+              <a:lnSpc>
+                <a:spcPct val="80000"/>
+              </a:lnSpc>
+              <a:buNone/>
+            </a:pPr>
+            <a:r>
+              <a:rPr lang="en-US" sz="2000" dirty="0" smtClean="0">
+                <a:solidFill>
+                  <a:schemeClr val="bg1"/>
+                </a:solidFill>
+              </a:rPr>
+              <a:t>Command Pattern</a:t>
+            </a:r>
+          </a:p>
+          <a:p>
+            <a:pPr eaLnBrk="1" hangingPunct="1">
+              <a:lnSpc>
+                <a:spcPct val="80000"/>
+              </a:lnSpc>
+              <a:buNone/>
+            </a:pPr>
+            <a:r>
+              <a:rPr lang="en-US" sz="2000" dirty="0" smtClean="0">
+                <a:solidFill>
+                  <a:schemeClr val="bg1"/>
+                </a:solidFill>
+              </a:rPr>
+              <a:t>	http://www.lostechies.com/blogs/derickbailey/archive/2008/11/19/ptom-command-and-conquer-your-ui-coupling-problems.aspx </a:t>
+            </a:r>
+            <a:br>
+              <a:rPr lang="en-US" sz="2000" dirty="0" smtClean="0">
+                <a:solidFill>
+                  <a:schemeClr val="bg1"/>
+                </a:solidFill>
+              </a:rPr>
+            </a:br>
+            <a:endParaRPr lang="en-US" sz="2000" dirty="0" smtClean="0">
+              <a:solidFill>
+                <a:schemeClr val="bg1"/>
+              </a:solidFill>
+            </a:endParaRPr>
+          </a:p>
+          <a:p>
+            <a:pPr eaLnBrk="1" hangingPunct="1">
+              <a:lnSpc>
+                <a:spcPct val="80000"/>
+              </a:lnSpc>
+              <a:buNone/>
+            </a:pPr>
+            <a:r>
+              <a:rPr lang="en-US" sz="2000" dirty="0" smtClean="0">
+                <a:solidFill>
+                  <a:schemeClr val="bg1"/>
+                </a:solidFill>
+              </a:rPr>
+              <a:t>Event Aggregator</a:t>
+            </a:r>
+            <a:br>
+              <a:rPr lang="en-US" sz="2000" dirty="0" smtClean="0">
+                <a:solidFill>
+                  <a:schemeClr val="bg1"/>
+                </a:solidFill>
+              </a:rPr>
+            </a:br>
+            <a:r>
+              <a:rPr lang="en-US" sz="2000" dirty="0" smtClean="0">
+                <a:solidFill>
+                  <a:schemeClr val="bg1"/>
+                </a:solidFill>
+              </a:rPr>
+              <a:t>http://www.martinfowler.com/eaaDev/EventAggregator.html</a:t>
+            </a:r>
+            <a:br>
+              <a:rPr lang="en-US" sz="2000" dirty="0" smtClean="0">
+                <a:solidFill>
+                  <a:schemeClr val="bg1"/>
+                </a:solidFill>
+              </a:rPr>
+            </a:br>
+            <a:endParaRPr lang="en-US" sz="2000" dirty="0" smtClean="0">
+              <a:solidFill>
+                <a:schemeClr val="bg1"/>
+              </a:solidFill>
+            </a:endParaRPr>
+          </a:p>
+          <a:p>
+            <a:pPr eaLnBrk="1" hangingPunct="1">
+              <a:lnSpc>
+                <a:spcPct val="80000"/>
+              </a:lnSpc>
+              <a:buNone/>
+            </a:pPr>
+            <a:r>
+              <a:rPr lang="en-US" sz="2000" dirty="0" err="1" smtClean="0">
+                <a:solidFill>
+                  <a:schemeClr val="bg1"/>
+                </a:solidFill>
+              </a:rPr>
+              <a:t>StructureMap</a:t>
+            </a:r>
+            <a:r>
+              <a:rPr lang="en-US" sz="2000" dirty="0" smtClean="0">
+                <a:solidFill>
+                  <a:schemeClr val="bg1"/>
+                </a:solidFill>
+              </a:rPr>
+              <a:t> (</a:t>
+            </a:r>
+            <a:r>
+              <a:rPr lang="en-US" sz="2000" dirty="0" err="1" smtClean="0">
+                <a:solidFill>
+                  <a:schemeClr val="bg1"/>
+                </a:solidFill>
+              </a:rPr>
+              <a:t>IoC</a:t>
+            </a:r>
+            <a:r>
+              <a:rPr lang="en-US" sz="2000" dirty="0" smtClean="0">
+                <a:solidFill>
+                  <a:schemeClr val="bg1"/>
+                </a:solidFill>
+              </a:rPr>
+              <a:t> Container)</a:t>
+            </a:r>
+          </a:p>
+          <a:p>
+            <a:pPr eaLnBrk="1" hangingPunct="1">
+              <a:lnSpc>
+                <a:spcPct val="80000"/>
+              </a:lnSpc>
+              <a:buNone/>
+            </a:pPr>
+            <a:r>
+              <a:rPr lang="en-US" sz="2000" dirty="0" smtClean="0">
+                <a:solidFill>
+                  <a:schemeClr val="bg1"/>
+                </a:solidFill>
+              </a:rPr>
+              <a:t>	http://structuremap.sourceforge.net</a:t>
+            </a:r>
+            <a:br>
+              <a:rPr lang="en-US" sz="2000" dirty="0" smtClean="0">
+                <a:solidFill>
+                  <a:schemeClr val="bg1"/>
+                </a:solidFill>
+              </a:rPr>
+            </a:br>
+            <a:endParaRPr lang="en-US" sz="2000" dirty="0" smtClean="0">
+              <a:solidFill>
+                <a:schemeClr val="bg1"/>
+              </a:solidFill>
+            </a:endParaRPr>
+          </a:p>
+          <a:p>
+            <a:pPr eaLnBrk="1" hangingPunct="1">
+              <a:lnSpc>
+                <a:spcPct val="80000"/>
+              </a:lnSpc>
+              <a:buNone/>
+            </a:pPr>
+            <a:r>
+              <a:rPr lang="en-US" sz="2000" dirty="0" smtClean="0">
+                <a:solidFill>
+                  <a:schemeClr val="bg1"/>
+                </a:solidFill>
+              </a:rPr>
+              <a:t>Application Controller</a:t>
+            </a:r>
+          </a:p>
+          <a:p>
+            <a:pPr eaLnBrk="1" hangingPunct="1">
+              <a:lnSpc>
+                <a:spcPct val="80000"/>
+              </a:lnSpc>
+              <a:buNone/>
+            </a:pPr>
+            <a:r>
+              <a:rPr lang="en-US" sz="2000" dirty="0" smtClean="0">
+                <a:solidFill>
+                  <a:schemeClr val="bg1"/>
+                </a:solidFill>
+              </a:rPr>
+              <a:t>	http://www.martinfowler.com/eaaCatalog/applicationController.html</a:t>
+            </a:r>
+            <a:br>
+              <a:rPr lang="en-US" sz="2000" dirty="0" smtClean="0">
+                <a:solidFill>
+                  <a:schemeClr val="bg1"/>
+                </a:solidFill>
+              </a:rPr>
+            </a:br>
+            <a:endParaRPr lang="en-US" sz="2000" dirty="0" smtClean="0">
+              <a:solidFill>
+                <a:schemeClr val="bg1"/>
+              </a:solidFill>
+            </a:endParaRPr>
+          </a:p>
+        </p:txBody>
+      </p:sp>
+      <p:sp>
+        <p:nvSpPr>
+          <p:cNvPr id="5129" name="Text Box 7"/>
+          <p:cNvSpPr txBox="1">
+            <a:spLocks noChangeArrowheads="1"/>
+          </p:cNvSpPr>
+          <p:nvPr/>
+        </p:nvSpPr>
+        <p:spPr bwMode="auto">
+          <a:xfrm>
+            <a:off x="5470525" y="1331913"/>
+            <a:ext cx="184150" cy="366712"/>
+          </a:xfrm>
+          <a:prstGeom prst="rect">
+            <a:avLst/>
+          </a:prstGeom>
+          <a:noFill/>
+          <a:ln w="9525">
+            <a:noFill/>
+            <a:miter lim="800000"/>
+            <a:headEnd/>
+            <a:tailEnd/>
+          </a:ln>
+        </p:spPr>
+        <p:txBody>
+          <a:bodyPr wrap="none">
+            <a:spAutoFit/>
+          </a:bodyPr>
+          <a:lstStyle/>
+          <a:p>
+            <a:endParaRPr lang="en-US"/>
+          </a:p>
+        </p:txBody>
+      </p:sp>
+      <p:pic>
+        <p:nvPicPr>
+          <p:cNvPr id="16" name="Picture 4" descr="MAT logo 1 CMYK"/>
+          <p:cNvPicPr>
+            <a:picLocks noChangeAspect="1" noChangeArrowheads="1"/>
+          </p:cNvPicPr>
+          <p:nvPr/>
+        </p:nvPicPr>
+        <p:blipFill>
+          <a:blip r:embed="rId2">
+            <a:clrChange>
+              <a:clrFrom>
+                <a:srgbClr val="FDFDFD"/>
+              </a:clrFrom>
+              <a:clrTo>
+                <a:srgbClr val="FDFDFD">
+                  <a:alpha val="0"/>
+                </a:srgbClr>
+              </a:clrTo>
+            </a:clrChange>
+          </a:blip>
+          <a:srcRect/>
+          <a:stretch>
+            <a:fillRect/>
+          </a:stretch>
+        </p:blipFill>
+        <p:spPr bwMode="auto">
+          <a:xfrm>
+            <a:off x="2971800" y="4800600"/>
+            <a:ext cx="2819400" cy="1338263"/>
+          </a:xfrm>
+          <a:prstGeom prst="rect">
+            <a:avLst/>
+          </a:prstGeom>
+          <a:noFill/>
+          <a:ln w="9525">
+            <a:noFill/>
+            <a:miter lim="800000"/>
+            <a:headEnd/>
+            <a:tailEnd/>
+          </a:ln>
+        </p:spPr>
+      </p:pic>
+      <p:sp>
+        <p:nvSpPr>
+          <p:cNvPr id="17" name="Rectangle 16"/>
+          <p:cNvSpPr/>
+          <p:nvPr/>
+        </p:nvSpPr>
+        <p:spPr>
+          <a:xfrm>
+            <a:off x="0" y="4724400"/>
+            <a:ext cx="9144000" cy="2133600"/>
+          </a:xfrm>
+          <a:prstGeom prst="rect">
+            <a:avLst/>
+          </a:prstGeom>
+          <a:solidFill>
+            <a:srgbClr val="E31937"/>
+          </a:solidFill>
+          <a:ln>
+            <a:noFill/>
+          </a:ln>
+        </p:spPr>
+        <p:style>
+          <a:lnRef idx="2">
+            <a:schemeClr val="accent1">
+              <a:shade val="50000"/>
+            </a:schemeClr>
+          </a:lnRef>
+          <a:fillRef idx="1">
+            <a:schemeClr val="accent1"/>
+          </a:fillRef>
+          <a:effectRef idx="0">
+            <a:schemeClr val="accent1"/>
+          </a:effectRef>
+          <a:fontRef idx="minor">
+            <a:schemeClr val="lt1"/>
+          </a:fontRef>
+        </p:style>
+        <p:txBody>
+          <a:bodyPr anchor="ctr"/>
+          <a:lstStyle/>
+          <a:p>
+            <a:pPr algn="ctr">
+              <a:defRPr/>
+            </a:pPr>
+            <a:endParaRPr lang="en-US"/>
+          </a:p>
+        </p:txBody>
+      </p:sp>
+      <p:pic>
+        <p:nvPicPr>
+          <p:cNvPr id="18" name="Picture 7" descr="MAT logo vertical_red.emf"/>
+          <p:cNvPicPr>
+            <a:picLocks noChangeAspect="1"/>
+          </p:cNvPicPr>
+          <p:nvPr/>
+        </p:nvPicPr>
+        <p:blipFill>
+          <a:blip r:embed="rId3"/>
+          <a:srcRect/>
+          <a:stretch>
+            <a:fillRect/>
+          </a:stretch>
+        </p:blipFill>
+        <p:spPr bwMode="auto">
+          <a:xfrm>
+            <a:off x="3600450" y="5334000"/>
+            <a:ext cx="1981200" cy="969963"/>
+          </a:xfrm>
+          <a:prstGeom prst="rect">
+            <a:avLst/>
+          </a:prstGeom>
+          <a:noFill/>
+          <a:ln w="9525">
+            <a:noFill/>
+            <a:miter lim="800000"/>
+            <a:headEnd/>
+            <a:tailEnd/>
+          </a:ln>
+        </p:spPr>
+      </p:pic>
+    </p:spTree>
+  </p:cSld>
+  <p:clrMapOvr>
+    <a:masterClrMapping/>
+  </p:clrMapOvr>
+  <p:timing>
+    <p:tnLst>
+      <p:par>
+        <p:cTn id="1" dur="indefinite" restart="never" nodeType="tmRoot"/>
+      </p:par>
+    </p:tnLst>
+  </p:timing>
+</p:sld>
+</file>
+
+<file path=ppt/slides/slide31.xml><?xml version="1.0" encoding="utf-8"?>
 <p:sld xmlns:a="http://schemas.openxmlformats.org/drawingml/2006/main" xmlns:r="http://schemas.openxmlformats.org/officeDocument/2006/relationships" xmlns:p="http://schemas.openxmlformats.org/presentationml/2006/main">
   <p:cSld>
     <p:spTree>
@@ -16610,21 +17094,6 @@
 </file>
 
 <file path=customXml/item1.xml><?xml version="1.0" encoding="utf-8"?>
-<p:properties xmlns:p="http://schemas.microsoft.com/office/2006/metadata/properties" xmlns:xsi="http://www.w3.org/2001/XMLSchema-instance">
-  <documentManagement/>
-</p:properties>
-</file>
-
-<file path=customXml/item2.xml><?xml version="1.0" encoding="utf-8"?>
-<?mso-contentType ?>
-<FormTemplates xmlns="http://schemas.microsoft.com/sharepoint/v3/contenttype/forms">
-  <Display>DocumentLibraryForm</Display>
-  <Edit>DocumentLibraryForm</Edit>
-  <New>DocumentLibraryForm</New>
-</FormTemplates>
-</file>
-
-<file path=customXml/item3.xml><?xml version="1.0" encoding="utf-8"?>
 <ct:contentTypeSchema xmlns:ct="http://schemas.microsoft.com/office/2006/metadata/contentType" xmlns:ma="http://schemas.microsoft.com/office/2006/metadata/properties/metaAttributes" ct:_="" ma:_="" ma:contentTypeName="Document" ma:contentTypeID="0x0101005857B3975182FB47B67FAAA67052062C" ma:contentTypeVersion="0" ma:contentTypeDescription="Create a new document." ma:contentTypeScope="" ma:versionID="a1781edd533abf786dc62ee7dded643a">
   <xsd:schema xmlns:xsd="http://www.w3.org/2001/XMLSchema" xmlns:p="http://schemas.microsoft.com/office/2006/metadata/properties" targetNamespace="http://schemas.microsoft.com/office/2006/metadata/properties" ma:root="true" ma:fieldsID="4aeb20c0e3442673af7ee10786458764">
     <xsd:element name="properties">
@@ -16673,10 +17142,32 @@
 </ct:contentTypeSchema>
 </file>
 
+<file path=customXml/item2.xml><?xml version="1.0" encoding="utf-8"?>
+<?mso-contentType ?>
+<FormTemplates xmlns="http://schemas.microsoft.com/sharepoint/v3/contenttype/forms">
+  <Display>DocumentLibraryForm</Display>
+  <Edit>DocumentLibraryForm</Edit>
+  <New>DocumentLibraryForm</New>
+</FormTemplates>
+</file>
+
+<file path=customXml/item3.xml><?xml version="1.0" encoding="utf-8"?>
+<p:properties xmlns:p="http://schemas.microsoft.com/office/2006/metadata/properties" xmlns:xsi="http://www.w3.org/2001/XMLSchema-instance">
+  <documentManagement/>
+</p:properties>
+</file>
+
 <file path=customXml/itemProps1.xml><?xml version="1.0" encoding="utf-8"?>
-<ds:datastoreItem xmlns:ds="http://schemas.openxmlformats.org/officeDocument/2006/customXml" ds:itemID="{F8AADC7F-5DC4-46F2-A809-0679B041C012}">
+<ds:datastoreItem xmlns:ds="http://schemas.openxmlformats.org/officeDocument/2006/customXml" ds:itemID="{D3EBC05E-93E3-47EC-A4AA-B305F2941009}">
   <ds:schemaRefs>
+    <ds:schemaRef ds:uri="http://schemas.microsoft.com/office/2006/metadata/contentType"/>
+    <ds:schemaRef ds:uri="http://schemas.microsoft.com/office/2006/metadata/properties/metaAttributes"/>
+    <ds:schemaRef ds:uri="http://www.w3.org/2001/XMLSchema"/>
     <ds:schemaRef ds:uri="http://schemas.microsoft.com/office/2006/metadata/properties"/>
+    <ds:schemaRef ds:uri="http://schemas.openxmlformats.org/package/2006/metadata/core-properties"/>
+    <ds:schemaRef ds:uri="http://purl.org/dc/elements/1.1/"/>
+    <ds:schemaRef ds:uri="http://purl.org/dc/terms/"/>
+    <ds:schemaRef ds:uri="http://schemas.microsoft.com/office/internal/2005/internalDocumentation"/>
   </ds:schemaRefs>
 </ds:datastoreItem>
 </file>
@@ -16690,16 +17181,9 @@
 </file>
 
 <file path=customXml/itemProps3.xml><?xml version="1.0" encoding="utf-8"?>
-<ds:datastoreItem xmlns:ds="http://schemas.openxmlformats.org/officeDocument/2006/customXml" ds:itemID="{D3EBC05E-93E3-47EC-A4AA-B305F2941009}">
+<ds:datastoreItem xmlns:ds="http://schemas.openxmlformats.org/officeDocument/2006/customXml" ds:itemID="{F8AADC7F-5DC4-46F2-A809-0679B041C012}">
   <ds:schemaRefs>
-    <ds:schemaRef ds:uri="http://schemas.microsoft.com/office/2006/metadata/contentType"/>
-    <ds:schemaRef ds:uri="http://schemas.microsoft.com/office/2006/metadata/properties/metaAttributes"/>
-    <ds:schemaRef ds:uri="http://www.w3.org/2001/XMLSchema"/>
     <ds:schemaRef ds:uri="http://schemas.microsoft.com/office/2006/metadata/properties"/>
-    <ds:schemaRef ds:uri="http://schemas.openxmlformats.org/package/2006/metadata/core-properties"/>
-    <ds:schemaRef ds:uri="http://purl.org/dc/elements/1.1/"/>
-    <ds:schemaRef ds:uri="http://purl.org/dc/terms/"/>
-    <ds:schemaRef ds:uri="http://schemas.microsoft.com/office/internal/2005/internalDocumentation"/>
   </ds:schemaRefs>
 </ds:datastoreItem>
 </file>
</xml_diff>

<commit_message>
continued work on command pattern slides
</commit_message>
<xml_diff>
--- a/Decoupling Workflow With App Controler/Decoupling Workflow From Forms.pptx
+++ b/Decoupling Workflow With App Controler/Decoupling Workflow From Forms.pptx
@@ -5,10 +5,10 @@
     <p:sldMasterId id="2147483822" r:id="rId4"/>
   </p:sldMasterIdLst>
   <p:notesMasterIdLst>
-    <p:notesMasterId r:id="rId36"/>
+    <p:notesMasterId r:id="rId38"/>
   </p:notesMasterIdLst>
   <p:handoutMasterIdLst>
-    <p:handoutMasterId r:id="rId37"/>
+    <p:handoutMasterId r:id="rId39"/>
   </p:handoutMasterIdLst>
   <p:sldIdLst>
     <p:sldId id="256" r:id="rId5"/>
@@ -33,25 +33,27 @@
     <p:sldId id="285" r:id="rId24"/>
     <p:sldId id="300" r:id="rId25"/>
     <p:sldId id="305" r:id="rId26"/>
-    <p:sldId id="297" r:id="rId27"/>
-    <p:sldId id="276" r:id="rId28"/>
-    <p:sldId id="277" r:id="rId29"/>
-    <p:sldId id="284" r:id="rId30"/>
-    <p:sldId id="292" r:id="rId31"/>
-    <p:sldId id="293" r:id="rId32"/>
-    <p:sldId id="294" r:id="rId33"/>
-    <p:sldId id="259" r:id="rId34"/>
-    <p:sldId id="274" r:id="rId35"/>
+    <p:sldId id="306" r:id="rId27"/>
+    <p:sldId id="307" r:id="rId28"/>
+    <p:sldId id="297" r:id="rId29"/>
+    <p:sldId id="276" r:id="rId30"/>
+    <p:sldId id="277" r:id="rId31"/>
+    <p:sldId id="284" r:id="rId32"/>
+    <p:sldId id="292" r:id="rId33"/>
+    <p:sldId id="293" r:id="rId34"/>
+    <p:sldId id="294" r:id="rId35"/>
+    <p:sldId id="259" r:id="rId36"/>
+    <p:sldId id="274" r:id="rId37"/>
   </p:sldIdLst>
   <p:sldSz cx="9144000" cy="6858000" type="screen4x3"/>
   <p:notesSz cx="7010400" cy="9296400"/>
   <p:embeddedFontLst>
     <p:embeddedFont>
       <p:font typeface="Calibri" pitchFamily="34" charset="0"/>
-      <p:regular r:id="rId38"/>
-      <p:bold r:id="rId39"/>
-      <p:italic r:id="rId40"/>
-      <p:boldItalic r:id="rId41"/>
+      <p:regular r:id="rId40"/>
+      <p:bold r:id="rId41"/>
+      <p:italic r:id="rId42"/>
+      <p:boldItalic r:id="rId43"/>
     </p:embeddedFont>
   </p:embeddedFontLst>
   <p:defaultTextStyle>
@@ -1698,7 +1700,7 @@
               <a:pPr>
                 <a:defRPr/>
               </a:pPr>
-              <a:t>25</a:t>
+              <a:t>24</a:t>
             </a:fld>
             <a:endParaRPr lang="en-US"/>
           </a:p>
@@ -1872,7 +1874,7 @@
               <a:pPr>
                 <a:defRPr/>
               </a:pPr>
-              <a:t>26</a:t>
+              <a:t>25</a:t>
             </a:fld>
             <a:endParaRPr lang="en-US"/>
           </a:p>
@@ -1959,7 +1961,7 @@
               <a:pPr>
                 <a:defRPr/>
               </a:pPr>
-              <a:t>28</a:t>
+              <a:t>27</a:t>
             </a:fld>
             <a:endParaRPr lang="en-US"/>
           </a:p>
@@ -2046,7 +2048,181 @@
               <a:pPr>
                 <a:defRPr/>
               </a:pPr>
-              <a:t>29</a:t>
+              <a:t>28</a:t>
+            </a:fld>
+            <a:endParaRPr lang="en-US"/>
+          </a:p>
+        </p:txBody>
+      </p:sp>
+    </p:spTree>
+  </p:cSld>
+  <p:clrMapOvr>
+    <a:masterClrMapping/>
+  </p:clrMapOvr>
+</p:notes>
+</file>
+
+<file path=ppt/notesSlides/notesSlide23.xml><?xml version="1.0" encoding="utf-8"?>
+<p:notes xmlns:a="http://schemas.openxmlformats.org/drawingml/2006/main" xmlns:r="http://schemas.openxmlformats.org/officeDocument/2006/relationships" xmlns:p="http://schemas.openxmlformats.org/presentationml/2006/main">
+  <p:cSld>
+    <p:spTree>
+      <p:nvGrpSpPr>
+        <p:cNvPr id="1" name=""/>
+        <p:cNvGrpSpPr/>
+        <p:nvPr/>
+      </p:nvGrpSpPr>
+      <p:grpSpPr>
+        <a:xfrm>
+          <a:off x="0" y="0"/>
+          <a:ext cx="0" cy="0"/>
+          <a:chOff x="0" y="0"/>
+          <a:chExt cx="0" cy="0"/>
+        </a:xfrm>
+      </p:grpSpPr>
+      <p:sp>
+        <p:nvSpPr>
+          <p:cNvPr id="2" name="Slide Image Placeholder 1"/>
+          <p:cNvSpPr>
+            <a:spLocks noGrp="1" noRot="1" noChangeAspect="1"/>
+          </p:cNvSpPr>
+          <p:nvPr>
+            <p:ph type="sldImg"/>
+          </p:nvPr>
+        </p:nvSpPr>
+        <p:spPr/>
+      </p:sp>
+      <p:sp>
+        <p:nvSpPr>
+          <p:cNvPr id="3" name="Notes Placeholder 2"/>
+          <p:cNvSpPr>
+            <a:spLocks noGrp="1"/>
+          </p:cNvSpPr>
+          <p:nvPr>
+            <p:ph type="body" idx="1"/>
+          </p:nvPr>
+        </p:nvSpPr>
+        <p:spPr/>
+        <p:txBody>
+          <a:bodyPr>
+            <a:normAutofit/>
+          </a:bodyPr>
+          <a:lstStyle/>
+          <a:p>
+            <a:endParaRPr lang="en-US" dirty="0"/>
+          </a:p>
+        </p:txBody>
+      </p:sp>
+      <p:sp>
+        <p:nvSpPr>
+          <p:cNvPr id="4" name="Slide Number Placeholder 3"/>
+          <p:cNvSpPr>
+            <a:spLocks noGrp="1"/>
+          </p:cNvSpPr>
+          <p:nvPr>
+            <p:ph type="sldNum" sz="quarter" idx="10"/>
+          </p:nvPr>
+        </p:nvSpPr>
+        <p:spPr/>
+        <p:txBody>
+          <a:bodyPr/>
+          <a:lstStyle/>
+          <a:p>
+            <a:pPr>
+              <a:defRPr/>
+            </a:pPr>
+            <a:fld id="{1931C8FD-CC35-423B-99F4-64D81D6A80AE}" type="slidenum">
+              <a:rPr lang="en-US" smtClean="0"/>
+              <a:pPr>
+                <a:defRPr/>
+              </a:pPr>
+              <a:t>30</a:t>
+            </a:fld>
+            <a:endParaRPr lang="en-US"/>
+          </a:p>
+        </p:txBody>
+      </p:sp>
+    </p:spTree>
+  </p:cSld>
+  <p:clrMapOvr>
+    <a:masterClrMapping/>
+  </p:clrMapOvr>
+</p:notes>
+</file>
+
+<file path=ppt/notesSlides/notesSlide24.xml><?xml version="1.0" encoding="utf-8"?>
+<p:notes xmlns:a="http://schemas.openxmlformats.org/drawingml/2006/main" xmlns:r="http://schemas.openxmlformats.org/officeDocument/2006/relationships" xmlns:p="http://schemas.openxmlformats.org/presentationml/2006/main">
+  <p:cSld>
+    <p:spTree>
+      <p:nvGrpSpPr>
+        <p:cNvPr id="1" name=""/>
+        <p:cNvGrpSpPr/>
+        <p:nvPr/>
+      </p:nvGrpSpPr>
+      <p:grpSpPr>
+        <a:xfrm>
+          <a:off x="0" y="0"/>
+          <a:ext cx="0" cy="0"/>
+          <a:chOff x="0" y="0"/>
+          <a:chExt cx="0" cy="0"/>
+        </a:xfrm>
+      </p:grpSpPr>
+      <p:sp>
+        <p:nvSpPr>
+          <p:cNvPr id="2" name="Slide Image Placeholder 1"/>
+          <p:cNvSpPr>
+            <a:spLocks noGrp="1" noRot="1" noChangeAspect="1"/>
+          </p:cNvSpPr>
+          <p:nvPr>
+            <p:ph type="sldImg"/>
+          </p:nvPr>
+        </p:nvSpPr>
+        <p:spPr/>
+      </p:sp>
+      <p:sp>
+        <p:nvSpPr>
+          <p:cNvPr id="3" name="Notes Placeholder 2"/>
+          <p:cNvSpPr>
+            <a:spLocks noGrp="1"/>
+          </p:cNvSpPr>
+          <p:nvPr>
+            <p:ph type="body" idx="1"/>
+          </p:nvPr>
+        </p:nvSpPr>
+        <p:spPr/>
+        <p:txBody>
+          <a:bodyPr>
+            <a:normAutofit/>
+          </a:bodyPr>
+          <a:lstStyle/>
+          <a:p>
+            <a:endParaRPr lang="en-US" dirty="0"/>
+          </a:p>
+        </p:txBody>
+      </p:sp>
+      <p:sp>
+        <p:nvSpPr>
+          <p:cNvPr id="4" name="Slide Number Placeholder 3"/>
+          <p:cNvSpPr>
+            <a:spLocks noGrp="1"/>
+          </p:cNvSpPr>
+          <p:nvPr>
+            <p:ph type="sldNum" sz="quarter" idx="10"/>
+          </p:nvPr>
+        </p:nvSpPr>
+        <p:spPr/>
+        <p:txBody>
+          <a:bodyPr/>
+          <a:lstStyle/>
+          <a:p>
+            <a:pPr>
+              <a:defRPr/>
+            </a:pPr>
+            <a:fld id="{1931C8FD-CC35-423B-99F4-64D81D6A80AE}" type="slidenum">
+              <a:rPr lang="en-US" smtClean="0"/>
+              <a:pPr>
+                <a:defRPr/>
+              </a:pPr>
+              <a:t>31</a:t>
             </a:fld>
             <a:endParaRPr lang="en-US"/>
           </a:p>
@@ -9139,10 +9315,10 @@
         </p:nvGrpSpPr>
         <p:grpSpPr>
           <a:xfrm>
-            <a:off x="304800" y="1524000"/>
-            <a:ext cx="5953125" cy="2667000"/>
+            <a:off x="719138" y="1971675"/>
+            <a:ext cx="7705725" cy="4048125"/>
             <a:chOff x="533400" y="1600200"/>
-            <a:chExt cx="5953125" cy="2667000"/>
+            <a:chExt cx="7705725" cy="4048125"/>
           </a:xfrm>
         </p:grpSpPr>
         <p:pic>
@@ -9155,7 +9331,6 @@
           </p:nvPicPr>
           <p:blipFill>
             <a:blip r:embed="rId3"/>
-            <a:srcRect/>
             <a:stretch>
               <a:fillRect/>
             </a:stretch>
@@ -9163,12 +9338,15 @@
           <p:spPr bwMode="auto">
             <a:xfrm>
               <a:off x="533400" y="1600200"/>
-              <a:ext cx="2823883" cy="2667000"/>
+              <a:ext cx="4286250" cy="4048125"/>
             </a:xfrm>
             <a:prstGeom prst="rect">
               <a:avLst/>
             </a:prstGeom>
             <a:noFill/>
+            <a:ln>
+              <a:noFill/>
+            </a:ln>
           </p:spPr>
         </p:pic>
         <p:cxnSp>
@@ -9178,9 +9356,9 @@
             <p:nvPr/>
           </p:nvCxnSpPr>
           <p:spPr>
-            <a:xfrm rot="5400000" flipH="1" flipV="1">
-              <a:off x="685800" y="2743200"/>
-              <a:ext cx="1143000" cy="1143000"/>
+            <a:xfrm flipV="1">
+              <a:off x="1981200" y="3657600"/>
+              <a:ext cx="1600200" cy="1447800"/>
             </a:xfrm>
             <a:prstGeom prst="line">
               <a:avLst/>
@@ -9214,8 +9392,8 @@
           </p:nvCxnSpPr>
           <p:spPr>
             <a:xfrm flipV="1">
-              <a:off x="1524000" y="2743200"/>
-              <a:ext cx="4953000" cy="1143000"/>
+              <a:off x="1981200" y="4343400"/>
+              <a:ext cx="1600200" cy="990600"/>
             </a:xfrm>
             <a:prstGeom prst="line">
               <a:avLst/>
@@ -9258,7 +9436,7 @@
           </p:blipFill>
           <p:spPr bwMode="auto">
             <a:xfrm>
-              <a:off x="1828800" y="2076450"/>
+              <a:off x="3581400" y="3657600"/>
               <a:ext cx="4657725" cy="666750"/>
             </a:xfrm>
             <a:prstGeom prst="rect">
@@ -9277,15 +9455,120 @@
           </p:spPr>
         </p:pic>
       </p:grpSp>
+    </p:spTree>
+  </p:cSld>
+  <p:clrMapOvr>
+    <a:masterClrMapping/>
+  </p:clrMapOvr>
+  <p:timing>
+    <p:tnLst>
+      <p:par>
+        <p:cTn id="1" dur="indefinite" restart="never" nodeType="tmRoot"/>
+      </p:par>
+    </p:tnLst>
+  </p:timing>
+</p:sld>
+</file>
+
+<file path=ppt/slides/slide23.xml><?xml version="1.0" encoding="utf-8"?>
+<p:sld xmlns:a="http://schemas.openxmlformats.org/drawingml/2006/main" xmlns:r="http://schemas.openxmlformats.org/officeDocument/2006/relationships" xmlns:p="http://schemas.openxmlformats.org/presentationml/2006/main">
+  <p:cSld>
+    <p:spTree>
+      <p:nvGrpSpPr>
+        <p:cNvPr id="1" name=""/>
+        <p:cNvGrpSpPr/>
+        <p:nvPr/>
+      </p:nvGrpSpPr>
+      <p:grpSpPr>
+        <a:xfrm>
+          <a:off x="0" y="0"/>
+          <a:ext cx="0" cy="0"/>
+          <a:chOff x="0" y="0"/>
+          <a:chExt cx="0" cy="0"/>
+        </a:xfrm>
+      </p:grpSpPr>
+      <p:sp>
+        <p:nvSpPr>
+          <p:cNvPr id="3075" name="Text Placeholder 2"/>
+          <p:cNvSpPr>
+            <a:spLocks noGrp="1"/>
+          </p:cNvSpPr>
+          <p:nvPr>
+            <p:ph type="body" sz="quarter" idx="10"/>
+          </p:nvPr>
+        </p:nvSpPr>
+        <p:spPr>
+          <a:xfrm>
+            <a:off x="685800" y="1066800"/>
+            <a:ext cx="8229600" cy="1219200"/>
+          </a:xfrm>
+        </p:spPr>
+        <p:txBody>
+          <a:bodyPr/>
+          <a:lstStyle/>
+          <a:p>
+            <a:pPr eaLnBrk="1" hangingPunct="1">
+              <a:buNone/>
+            </a:pPr>
+            <a:r>
+              <a:rPr lang="en-US" sz="2000" dirty="0" smtClean="0"/>
+              <a:t>Add New Employee: </a:t>
+            </a:r>
+            <a:r>
+              <a:rPr lang="en-US" sz="2000" dirty="0" err="1" smtClean="0"/>
+              <a:t>ICommand</a:t>
+            </a:r>
+            <a:r>
+              <a:rPr lang="en-US" sz="2000" dirty="0" smtClean="0"/>
+              <a:t> In Action</a:t>
+            </a:r>
+            <a:endParaRPr lang="en-US" sz="2000" dirty="0" smtClean="0"/>
+          </a:p>
+        </p:txBody>
+      </p:sp>
+      <p:sp>
+        <p:nvSpPr>
+          <p:cNvPr id="3074" name="Title 1"/>
+          <p:cNvSpPr>
+            <a:spLocks noGrp="1"/>
+          </p:cNvSpPr>
+          <p:nvPr>
+            <p:ph type="title"/>
+          </p:nvPr>
+        </p:nvSpPr>
+        <p:spPr bwMode="auto">
+          <a:noFill/>
+          <a:ln>
+            <a:miter lim="800000"/>
+            <a:headEnd/>
+            <a:tailEnd/>
+          </a:ln>
+        </p:spPr>
+        <p:txBody>
+          <a:bodyPr vert="horz" wrap="square" lIns="91440" tIns="45720" rIns="91440" bIns="45720" numCol="1" anchor="t" anchorCtr="0" compatLnSpc="1">
+            <a:prstTxWarp prst="textNoShape">
+              <a:avLst/>
+            </a:prstTxWarp>
+          </a:bodyPr>
+          <a:lstStyle/>
+          <a:p>
+            <a:pPr eaLnBrk="1" hangingPunct="1"/>
+            <a:r>
+              <a:rPr lang="en-US" dirty="0" smtClean="0"/>
+              <a:t>Simple Org Chart – v2</a:t>
+            </a:r>
+          </a:p>
+        </p:txBody>
+      </p:sp>
       <p:grpSp>
         <p:nvGrpSpPr>
-          <p:cNvPr id="26" name="Group 25"/>
+          <p:cNvPr id="9" name="Group 8"/>
           <p:cNvGrpSpPr/>
           <p:nvPr/>
         </p:nvGrpSpPr>
         <p:grpSpPr>
           <a:xfrm>
-            <a:off x="3429000" y="3657600"/>
+            <a:off x="1862138" y="2314575"/>
             <a:ext cx="5419725" cy="2790825"/>
             <a:chOff x="3429000" y="1981200"/>
             <a:chExt cx="5419725" cy="2790825"/>
@@ -9293,7 +9576,7 @@
         </p:grpSpPr>
         <p:sp>
           <p:nvSpPr>
-            <p:cNvPr id="20" name="Rectangle 19"/>
+            <p:cNvPr id="10" name="Rectangle 9"/>
             <p:cNvSpPr/>
             <p:nvPr/>
           </p:nvSpPr>
@@ -9336,14 +9619,14 @@
         </p:sp>
         <p:pic>
           <p:nvPicPr>
-            <p:cNvPr id="1029" name="Picture 5"/>
+            <p:cNvPr id="11" name="Picture 5"/>
             <p:cNvPicPr>
               <a:picLocks noChangeAspect="1" noChangeArrowheads="1"/>
             </p:cNvPicPr>
             <p:nvPr/>
           </p:nvPicPr>
           <p:blipFill>
-            <a:blip r:embed="rId5"/>
+            <a:blip r:embed="rId3"/>
             <a:srcRect/>
             <a:stretch>
               <a:fillRect/>
@@ -9371,7 +9654,7 @@
         </p:pic>
         <p:sp>
           <p:nvSpPr>
-            <p:cNvPr id="18" name="Rectangle 17"/>
+            <p:cNvPr id="12" name="Rectangle 11"/>
             <p:cNvSpPr/>
             <p:nvPr/>
           </p:nvSpPr>
@@ -9421,7 +9704,7 @@
         </p:sp>
         <p:sp>
           <p:nvSpPr>
-            <p:cNvPr id="19" name="Rectangle 18"/>
+            <p:cNvPr id="13" name="Rectangle 12"/>
             <p:cNvSpPr/>
             <p:nvPr/>
           </p:nvSpPr>
@@ -9471,7 +9754,7 @@
         </p:sp>
         <p:sp>
           <p:nvSpPr>
-            <p:cNvPr id="25" name="Rectangle 24"/>
+            <p:cNvPr id="14" name="Rectangle 13"/>
             <p:cNvSpPr/>
             <p:nvPr/>
           </p:nvSpPr>
@@ -9535,7 +9818,206 @@
 </p:sld>
 </file>
 
-<file path=ppt/slides/slide23.xml><?xml version="1.0" encoding="utf-8"?>
+<file path=ppt/slides/slide24.xml><?xml version="1.0" encoding="utf-8"?>
+<p:sld xmlns:a="http://schemas.openxmlformats.org/drawingml/2006/main" xmlns:r="http://schemas.openxmlformats.org/officeDocument/2006/relationships" xmlns:p="http://schemas.openxmlformats.org/presentationml/2006/main">
+  <p:cSld>
+    <p:spTree>
+      <p:nvGrpSpPr>
+        <p:cNvPr id="1" name=""/>
+        <p:cNvGrpSpPr/>
+        <p:nvPr/>
+      </p:nvGrpSpPr>
+      <p:grpSpPr>
+        <a:xfrm>
+          <a:off x="0" y="0"/>
+          <a:ext cx="0" cy="0"/>
+          <a:chOff x="0" y="0"/>
+          <a:chExt cx="0" cy="0"/>
+        </a:xfrm>
+      </p:grpSpPr>
+      <p:sp>
+        <p:nvSpPr>
+          <p:cNvPr id="3075" name="Text Placeholder 2"/>
+          <p:cNvSpPr>
+            <a:spLocks noGrp="1"/>
+          </p:cNvSpPr>
+          <p:nvPr>
+            <p:ph type="body" sz="quarter" idx="10"/>
+          </p:nvPr>
+        </p:nvSpPr>
+        <p:spPr>
+          <a:xfrm>
+            <a:off x="685800" y="1066800"/>
+            <a:ext cx="8229600" cy="1219200"/>
+          </a:xfrm>
+        </p:spPr>
+        <p:txBody>
+          <a:bodyPr/>
+          <a:lstStyle/>
+          <a:p>
+            <a:pPr eaLnBrk="1" hangingPunct="1">
+              <a:buNone/>
+            </a:pPr>
+            <a:r>
+              <a:rPr lang="en-US" sz="2000" dirty="0" smtClean="0"/>
+              <a:t>Add New Employee: </a:t>
+            </a:r>
+            <a:r>
+              <a:rPr lang="en-US" sz="2000" dirty="0" err="1" smtClean="0"/>
+              <a:t>ICommand</a:t>
+            </a:r>
+            <a:r>
+              <a:rPr lang="en-US" sz="2000" dirty="0" smtClean="0"/>
+              <a:t> In Action</a:t>
+            </a:r>
+            <a:endParaRPr lang="en-US" sz="2000" dirty="0" smtClean="0"/>
+          </a:p>
+        </p:txBody>
+      </p:sp>
+      <p:sp>
+        <p:nvSpPr>
+          <p:cNvPr id="3074" name="Title 1"/>
+          <p:cNvSpPr>
+            <a:spLocks noGrp="1"/>
+          </p:cNvSpPr>
+          <p:nvPr>
+            <p:ph type="title"/>
+          </p:nvPr>
+        </p:nvSpPr>
+        <p:spPr bwMode="auto">
+          <a:noFill/>
+          <a:ln>
+            <a:miter lim="800000"/>
+            <a:headEnd/>
+            <a:tailEnd/>
+          </a:ln>
+        </p:spPr>
+        <p:txBody>
+          <a:bodyPr vert="horz" wrap="square" lIns="91440" tIns="45720" rIns="91440" bIns="45720" numCol="1" anchor="t" anchorCtr="0" compatLnSpc="1">
+            <a:prstTxWarp prst="textNoShape">
+              <a:avLst/>
+            </a:prstTxWarp>
+          </a:bodyPr>
+          <a:lstStyle/>
+          <a:p>
+            <a:pPr eaLnBrk="1" hangingPunct="1"/>
+            <a:r>
+              <a:rPr lang="en-US" dirty="0" smtClean="0"/>
+              <a:t>Simple Org Chart – v2</a:t>
+            </a:r>
+          </a:p>
+        </p:txBody>
+      </p:sp>
+      <p:grpSp>
+        <p:nvGrpSpPr>
+          <p:cNvPr id="15" name="Group 14"/>
+          <p:cNvGrpSpPr/>
+          <p:nvPr/>
+        </p:nvGrpSpPr>
+        <p:grpSpPr>
+          <a:xfrm>
+            <a:off x="2021681" y="2895600"/>
+            <a:ext cx="5100638" cy="2085975"/>
+            <a:chOff x="2819400" y="4619625"/>
+            <a:chExt cx="5100638" cy="2085975"/>
+          </a:xfrm>
+        </p:grpSpPr>
+        <p:sp>
+          <p:nvSpPr>
+            <p:cNvPr id="16" name="Rectangle 15"/>
+            <p:cNvSpPr/>
+            <p:nvPr/>
+          </p:nvSpPr>
+          <p:spPr>
+            <a:xfrm>
+              <a:off x="5791200" y="6096000"/>
+              <a:ext cx="2128838" cy="609600"/>
+            </a:xfrm>
+            <a:prstGeom prst="rect">
+              <a:avLst/>
+            </a:prstGeom>
+          </p:spPr>
+          <p:style>
+            <a:lnRef idx="2">
+              <a:schemeClr val="accent2">
+                <a:shade val="50000"/>
+              </a:schemeClr>
+            </a:lnRef>
+            <a:fillRef idx="1">
+              <a:schemeClr val="accent2"/>
+            </a:fillRef>
+            <a:effectRef idx="0">
+              <a:schemeClr val="accent2"/>
+            </a:effectRef>
+            <a:fontRef idx="minor">
+              <a:schemeClr val="lt1"/>
+            </a:fontRef>
+          </p:style>
+          <p:txBody>
+            <a:bodyPr rtlCol="0" anchor="b" anchorCtr="0"/>
+            <a:lstStyle/>
+            <a:p>
+              <a:pPr algn="r"/>
+              <a:r>
+                <a:rPr lang="en-US" sz="1400" dirty="0" err="1" smtClean="0"/>
+                <a:t>AddNewUserCommand</a:t>
+              </a:r>
+              <a:endParaRPr lang="en-US" sz="1400" dirty="0"/>
+            </a:p>
+          </p:txBody>
+        </p:sp>
+        <p:pic>
+          <p:nvPicPr>
+            <p:cNvPr id="17" name="Picture 3"/>
+            <p:cNvPicPr>
+              <a:picLocks noChangeAspect="1" noChangeArrowheads="1"/>
+            </p:cNvPicPr>
+            <p:nvPr/>
+          </p:nvPicPr>
+          <p:blipFill>
+            <a:blip r:embed="rId3"/>
+            <a:srcRect/>
+            <a:stretch>
+              <a:fillRect/>
+            </a:stretch>
+          </p:blipFill>
+          <p:spPr bwMode="auto">
+            <a:xfrm>
+              <a:off x="2819400" y="4619625"/>
+              <a:ext cx="4838700" cy="1781175"/>
+            </a:xfrm>
+            <a:prstGeom prst="rect">
+              <a:avLst/>
+            </a:prstGeom>
+            <a:noFill/>
+            <a:ln w="38100">
+              <a:solidFill>
+                <a:schemeClr val="accent2"/>
+              </a:solidFill>
+              <a:miter lim="800000"/>
+              <a:headEnd/>
+              <a:tailEnd/>
+            </a:ln>
+            <a:effectLst/>
+          </p:spPr>
+        </p:pic>
+      </p:grpSp>
+    </p:spTree>
+  </p:cSld>
+  <p:clrMapOvr>
+    <a:masterClrMapping/>
+  </p:clrMapOvr>
+  <p:timing>
+    <p:tnLst>
+      <p:par>
+        <p:cTn id="1" dur="indefinite" restart="never" nodeType="tmRoot"/>
+      </p:par>
+    </p:tnLst>
+  </p:timing>
+</p:sld>
+</file>
+
+<file path=ppt/slides/slide25.xml><?xml version="1.0" encoding="utf-8"?>
 <p:sld xmlns:a="http://schemas.openxmlformats.org/drawingml/2006/main" xmlns:r="http://schemas.openxmlformats.org/officeDocument/2006/relationships" xmlns:p="http://schemas.openxmlformats.org/presentationml/2006/main">
   <p:cSld>
     <p:spTree>
@@ -9691,7 +10173,7 @@
 </p:sld>
 </file>
 
-<file path=ppt/slides/slide24.xml><?xml version="1.0" encoding="utf-8"?>
+<file path=ppt/slides/slide26.xml><?xml version="1.0" encoding="utf-8"?>
 <p:sld xmlns:a="http://schemas.openxmlformats.org/drawingml/2006/main" xmlns:r="http://schemas.openxmlformats.org/officeDocument/2006/relationships" xmlns:p="http://schemas.openxmlformats.org/presentationml/2006/main">
   <p:cSld>
     <p:spTree>
@@ -10022,7 +10504,7 @@
 </p:sld>
 </file>
 
-<file path=ppt/slides/slide25.xml><?xml version="1.0" encoding="utf-8"?>
+<file path=ppt/slides/slide27.xml><?xml version="1.0" encoding="utf-8"?>
 <p:sld xmlns:a="http://schemas.openxmlformats.org/drawingml/2006/main" xmlns:r="http://schemas.openxmlformats.org/officeDocument/2006/relationships" xmlns:p="http://schemas.openxmlformats.org/presentationml/2006/main">
   <p:cSld>
     <p:spTree>
@@ -10937,7 +11419,7 @@
 </p:sld>
 </file>
 
-<file path=ppt/slides/slide26.xml><?xml version="1.0" encoding="utf-8"?>
+<file path=ppt/slides/slide28.xml><?xml version="1.0" encoding="utf-8"?>
 <p:sld xmlns:a="http://schemas.openxmlformats.org/drawingml/2006/main" xmlns:r="http://schemas.openxmlformats.org/officeDocument/2006/relationships" xmlns:p="http://schemas.openxmlformats.org/presentationml/2006/main">
   <p:cSld>
     <p:spTree>
@@ -11030,7 +11512,7 @@
 </p:sld>
 </file>
 
-<file path=ppt/slides/slide27.xml><?xml version="1.0" encoding="utf-8"?>
+<file path=ppt/slides/slide29.xml><?xml version="1.0" encoding="utf-8"?>
 <p:sld xmlns:a="http://schemas.openxmlformats.org/drawingml/2006/main" xmlns:r="http://schemas.openxmlformats.org/officeDocument/2006/relationships" xmlns:p="http://schemas.openxmlformats.org/presentationml/2006/main">
   <p:cSld>
     <p:spTree>
@@ -11361,186 +11843,6 @@
               </a:rPr>
               <a:t> Container</a:t>
             </a:r>
-          </a:p>
-        </p:txBody>
-      </p:sp>
-    </p:spTree>
-  </p:cSld>
-  <p:clrMapOvr>
-    <a:masterClrMapping/>
-  </p:clrMapOvr>
-  <p:timing>
-    <p:tnLst>
-      <p:par>
-        <p:cTn id="1" dur="indefinite" restart="never" nodeType="tmRoot"/>
-      </p:par>
-    </p:tnLst>
-  </p:timing>
-</p:sld>
-</file>
-
-<file path=ppt/slides/slide28.xml><?xml version="1.0" encoding="utf-8"?>
-<p:sld xmlns:a="http://schemas.openxmlformats.org/drawingml/2006/main" xmlns:r="http://schemas.openxmlformats.org/officeDocument/2006/relationships" xmlns:p="http://schemas.openxmlformats.org/presentationml/2006/main">
-  <p:cSld>
-    <p:spTree>
-      <p:nvGrpSpPr>
-        <p:cNvPr id="1" name=""/>
-        <p:cNvGrpSpPr/>
-        <p:nvPr/>
-      </p:nvGrpSpPr>
-      <p:grpSpPr>
-        <a:xfrm>
-          <a:off x="0" y="0"/>
-          <a:ext cx="0" cy="0"/>
-          <a:chOff x="0" y="0"/>
-          <a:chExt cx="0" cy="0"/>
-        </a:xfrm>
-      </p:grpSpPr>
-      <p:sp>
-        <p:nvSpPr>
-          <p:cNvPr id="3075" name="Text Placeholder 2"/>
-          <p:cNvSpPr>
-            <a:spLocks noGrp="1"/>
-          </p:cNvSpPr>
-          <p:nvPr>
-            <p:ph type="body" sz="quarter" idx="10"/>
-          </p:nvPr>
-        </p:nvSpPr>
-        <p:spPr>
-          <a:xfrm>
-            <a:off x="685800" y="1066800"/>
-            <a:ext cx="8229600" cy="1219200"/>
-          </a:xfrm>
-        </p:spPr>
-        <p:txBody>
-          <a:bodyPr/>
-          <a:lstStyle/>
-          <a:p>
-            <a:pPr eaLnBrk="1" hangingPunct="1">
-              <a:buNone/>
-            </a:pPr>
-            <a:endParaRPr lang="en-US" sz="2000" dirty="0" smtClean="0"/>
-          </a:p>
-        </p:txBody>
-      </p:sp>
-      <p:sp>
-        <p:nvSpPr>
-          <p:cNvPr id="3074" name="Title 1"/>
-          <p:cNvSpPr>
-            <a:spLocks noGrp="1"/>
-          </p:cNvSpPr>
-          <p:nvPr>
-            <p:ph type="title"/>
-          </p:nvPr>
-        </p:nvSpPr>
-        <p:spPr bwMode="auto">
-          <a:noFill/>
-          <a:ln>
-            <a:miter lim="800000"/>
-            <a:headEnd/>
-            <a:tailEnd/>
-          </a:ln>
-        </p:spPr>
-        <p:txBody>
-          <a:bodyPr vert="horz" wrap="square" lIns="91440" tIns="45720" rIns="91440" bIns="45720" numCol="1" anchor="t" anchorCtr="0" compatLnSpc="1">
-            <a:prstTxWarp prst="textNoShape">
-              <a:avLst/>
-            </a:prstTxWarp>
-          </a:bodyPr>
-          <a:lstStyle/>
-          <a:p>
-            <a:pPr eaLnBrk="1" hangingPunct="1"/>
-            <a:endParaRPr lang="en-US" dirty="0" smtClean="0"/>
-          </a:p>
-        </p:txBody>
-      </p:sp>
-    </p:spTree>
-  </p:cSld>
-  <p:clrMapOvr>
-    <a:masterClrMapping/>
-  </p:clrMapOvr>
-  <p:timing>
-    <p:tnLst>
-      <p:par>
-        <p:cTn id="1" dur="indefinite" restart="never" nodeType="tmRoot"/>
-      </p:par>
-    </p:tnLst>
-  </p:timing>
-</p:sld>
-</file>
-
-<file path=ppt/slides/slide29.xml><?xml version="1.0" encoding="utf-8"?>
-<p:sld xmlns:a="http://schemas.openxmlformats.org/drawingml/2006/main" xmlns:r="http://schemas.openxmlformats.org/officeDocument/2006/relationships" xmlns:p="http://schemas.openxmlformats.org/presentationml/2006/main">
-  <p:cSld>
-    <p:spTree>
-      <p:nvGrpSpPr>
-        <p:cNvPr id="1" name=""/>
-        <p:cNvGrpSpPr/>
-        <p:nvPr/>
-      </p:nvGrpSpPr>
-      <p:grpSpPr>
-        <a:xfrm>
-          <a:off x="0" y="0"/>
-          <a:ext cx="0" cy="0"/>
-          <a:chOff x="0" y="0"/>
-          <a:chExt cx="0" cy="0"/>
-        </a:xfrm>
-      </p:grpSpPr>
-      <p:sp>
-        <p:nvSpPr>
-          <p:cNvPr id="3075" name="Text Placeholder 2"/>
-          <p:cNvSpPr>
-            <a:spLocks noGrp="1"/>
-          </p:cNvSpPr>
-          <p:nvPr>
-            <p:ph type="body" sz="quarter" idx="10"/>
-          </p:nvPr>
-        </p:nvSpPr>
-        <p:spPr>
-          <a:xfrm>
-            <a:off x="685800" y="1066800"/>
-            <a:ext cx="8229600" cy="1219200"/>
-          </a:xfrm>
-        </p:spPr>
-        <p:txBody>
-          <a:bodyPr/>
-          <a:lstStyle/>
-          <a:p>
-            <a:pPr eaLnBrk="1" hangingPunct="1">
-              <a:buNone/>
-            </a:pPr>
-            <a:endParaRPr lang="en-US" sz="2000" dirty="0" smtClean="0"/>
-          </a:p>
-        </p:txBody>
-      </p:sp>
-      <p:sp>
-        <p:nvSpPr>
-          <p:cNvPr id="3074" name="Title 1"/>
-          <p:cNvSpPr>
-            <a:spLocks noGrp="1"/>
-          </p:cNvSpPr>
-          <p:nvPr>
-            <p:ph type="title"/>
-          </p:nvPr>
-        </p:nvSpPr>
-        <p:spPr bwMode="auto">
-          <a:noFill/>
-          <a:ln>
-            <a:miter lim="800000"/>
-            <a:headEnd/>
-            <a:tailEnd/>
-          </a:ln>
-        </p:spPr>
-        <p:txBody>
-          <a:bodyPr vert="horz" wrap="square" lIns="91440" tIns="45720" rIns="91440" bIns="45720" numCol="1" anchor="t" anchorCtr="0" compatLnSpc="1">
-            <a:prstTxWarp prst="textNoShape">
-              <a:avLst/>
-            </a:prstTxWarp>
-          </a:bodyPr>
-          <a:lstStyle/>
-          <a:p>
-            <a:pPr eaLnBrk="1" hangingPunct="1"/>
-            <a:endParaRPr lang="en-US" dirty="0" smtClean="0"/>
           </a:p>
         </p:txBody>
       </p:sp>
@@ -11723,6 +12025,186 @@
       </p:grpSpPr>
       <p:sp>
         <p:nvSpPr>
+          <p:cNvPr id="3075" name="Text Placeholder 2"/>
+          <p:cNvSpPr>
+            <a:spLocks noGrp="1"/>
+          </p:cNvSpPr>
+          <p:nvPr>
+            <p:ph type="body" sz="quarter" idx="10"/>
+          </p:nvPr>
+        </p:nvSpPr>
+        <p:spPr>
+          <a:xfrm>
+            <a:off x="685800" y="1066800"/>
+            <a:ext cx="8229600" cy="1219200"/>
+          </a:xfrm>
+        </p:spPr>
+        <p:txBody>
+          <a:bodyPr/>
+          <a:lstStyle/>
+          <a:p>
+            <a:pPr eaLnBrk="1" hangingPunct="1">
+              <a:buNone/>
+            </a:pPr>
+            <a:endParaRPr lang="en-US" sz="2000" dirty="0" smtClean="0"/>
+          </a:p>
+        </p:txBody>
+      </p:sp>
+      <p:sp>
+        <p:nvSpPr>
+          <p:cNvPr id="3074" name="Title 1"/>
+          <p:cNvSpPr>
+            <a:spLocks noGrp="1"/>
+          </p:cNvSpPr>
+          <p:nvPr>
+            <p:ph type="title"/>
+          </p:nvPr>
+        </p:nvSpPr>
+        <p:spPr bwMode="auto">
+          <a:noFill/>
+          <a:ln>
+            <a:miter lim="800000"/>
+            <a:headEnd/>
+            <a:tailEnd/>
+          </a:ln>
+        </p:spPr>
+        <p:txBody>
+          <a:bodyPr vert="horz" wrap="square" lIns="91440" tIns="45720" rIns="91440" bIns="45720" numCol="1" anchor="t" anchorCtr="0" compatLnSpc="1">
+            <a:prstTxWarp prst="textNoShape">
+              <a:avLst/>
+            </a:prstTxWarp>
+          </a:bodyPr>
+          <a:lstStyle/>
+          <a:p>
+            <a:pPr eaLnBrk="1" hangingPunct="1"/>
+            <a:endParaRPr lang="en-US" dirty="0" smtClean="0"/>
+          </a:p>
+        </p:txBody>
+      </p:sp>
+    </p:spTree>
+  </p:cSld>
+  <p:clrMapOvr>
+    <a:masterClrMapping/>
+  </p:clrMapOvr>
+  <p:timing>
+    <p:tnLst>
+      <p:par>
+        <p:cTn id="1" dur="indefinite" restart="never" nodeType="tmRoot"/>
+      </p:par>
+    </p:tnLst>
+  </p:timing>
+</p:sld>
+</file>
+
+<file path=ppt/slides/slide31.xml><?xml version="1.0" encoding="utf-8"?>
+<p:sld xmlns:a="http://schemas.openxmlformats.org/drawingml/2006/main" xmlns:r="http://schemas.openxmlformats.org/officeDocument/2006/relationships" xmlns:p="http://schemas.openxmlformats.org/presentationml/2006/main">
+  <p:cSld>
+    <p:spTree>
+      <p:nvGrpSpPr>
+        <p:cNvPr id="1" name=""/>
+        <p:cNvGrpSpPr/>
+        <p:nvPr/>
+      </p:nvGrpSpPr>
+      <p:grpSpPr>
+        <a:xfrm>
+          <a:off x="0" y="0"/>
+          <a:ext cx="0" cy="0"/>
+          <a:chOff x="0" y="0"/>
+          <a:chExt cx="0" cy="0"/>
+        </a:xfrm>
+      </p:grpSpPr>
+      <p:sp>
+        <p:nvSpPr>
+          <p:cNvPr id="3075" name="Text Placeholder 2"/>
+          <p:cNvSpPr>
+            <a:spLocks noGrp="1"/>
+          </p:cNvSpPr>
+          <p:nvPr>
+            <p:ph type="body" sz="quarter" idx="10"/>
+          </p:nvPr>
+        </p:nvSpPr>
+        <p:spPr>
+          <a:xfrm>
+            <a:off x="685800" y="1066800"/>
+            <a:ext cx="8229600" cy="1219200"/>
+          </a:xfrm>
+        </p:spPr>
+        <p:txBody>
+          <a:bodyPr/>
+          <a:lstStyle/>
+          <a:p>
+            <a:pPr eaLnBrk="1" hangingPunct="1">
+              <a:buNone/>
+            </a:pPr>
+            <a:endParaRPr lang="en-US" sz="2000" dirty="0" smtClean="0"/>
+          </a:p>
+        </p:txBody>
+      </p:sp>
+      <p:sp>
+        <p:nvSpPr>
+          <p:cNvPr id="3074" name="Title 1"/>
+          <p:cNvSpPr>
+            <a:spLocks noGrp="1"/>
+          </p:cNvSpPr>
+          <p:nvPr>
+            <p:ph type="title"/>
+          </p:nvPr>
+        </p:nvSpPr>
+        <p:spPr bwMode="auto">
+          <a:noFill/>
+          <a:ln>
+            <a:miter lim="800000"/>
+            <a:headEnd/>
+            <a:tailEnd/>
+          </a:ln>
+        </p:spPr>
+        <p:txBody>
+          <a:bodyPr vert="horz" wrap="square" lIns="91440" tIns="45720" rIns="91440" bIns="45720" numCol="1" anchor="t" anchorCtr="0" compatLnSpc="1">
+            <a:prstTxWarp prst="textNoShape">
+              <a:avLst/>
+            </a:prstTxWarp>
+          </a:bodyPr>
+          <a:lstStyle/>
+          <a:p>
+            <a:pPr eaLnBrk="1" hangingPunct="1"/>
+            <a:endParaRPr lang="en-US" dirty="0" smtClean="0"/>
+          </a:p>
+        </p:txBody>
+      </p:sp>
+    </p:spTree>
+  </p:cSld>
+  <p:clrMapOvr>
+    <a:masterClrMapping/>
+  </p:clrMapOvr>
+  <p:timing>
+    <p:tnLst>
+      <p:par>
+        <p:cTn id="1" dur="indefinite" restart="never" nodeType="tmRoot"/>
+      </p:par>
+    </p:tnLst>
+  </p:timing>
+</p:sld>
+</file>
+
+<file path=ppt/slides/slide32.xml><?xml version="1.0" encoding="utf-8"?>
+<p:sld xmlns:a="http://schemas.openxmlformats.org/drawingml/2006/main" xmlns:r="http://schemas.openxmlformats.org/officeDocument/2006/relationships" xmlns:p="http://schemas.openxmlformats.org/presentationml/2006/main">
+  <p:cSld>
+    <p:spTree>
+      <p:nvGrpSpPr>
+        <p:cNvPr id="1" name=""/>
+        <p:cNvGrpSpPr/>
+        <p:nvPr/>
+      </p:nvGrpSpPr>
+      <p:grpSpPr>
+        <a:xfrm>
+          <a:off x="0" y="0"/>
+          <a:ext cx="0" cy="0"/>
+          <a:chOff x="0" y="0"/>
+          <a:chExt cx="0" cy="0"/>
+        </a:xfrm>
+      </p:grpSpPr>
+      <p:sp>
+        <p:nvSpPr>
           <p:cNvPr id="6" name="Rectangle 5"/>
           <p:cNvSpPr/>
           <p:nvPr/>
@@ -12250,7 +12732,7 @@
 </p:sld>
 </file>
 
-<file path=ppt/slides/slide31.xml><?xml version="1.0" encoding="utf-8"?>
+<file path=ppt/slides/slide33.xml><?xml version="1.0" encoding="utf-8"?>
 <p:sld xmlns:a="http://schemas.openxmlformats.org/drawingml/2006/main" xmlns:r="http://schemas.openxmlformats.org/officeDocument/2006/relationships" xmlns:p="http://schemas.openxmlformats.org/presentationml/2006/main">
   <p:cSld>
     <p:spTree>

</xml_diff>

<commit_message>
event aggregator and app controller place holder slides
</commit_message>
<xml_diff>
--- a/Decoupling Workflow With App Controler/Decoupling Workflow From Forms.pptx
+++ b/Decoupling Workflow With App Controler/Decoupling Workflow From Forms.pptx
@@ -5,10 +5,10 @@
     <p:sldMasterId id="2147483822" r:id="rId4"/>
   </p:sldMasterIdLst>
   <p:notesMasterIdLst>
-    <p:notesMasterId r:id="rId38"/>
+    <p:notesMasterId r:id="rId39"/>
   </p:notesMasterIdLst>
   <p:handoutMasterIdLst>
-    <p:handoutMasterId r:id="rId39"/>
+    <p:handoutMasterId r:id="rId40"/>
   </p:handoutMasterIdLst>
   <p:sldIdLst>
     <p:sldId id="256" r:id="rId5"/>
@@ -39,21 +39,22 @@
     <p:sldId id="276" r:id="rId30"/>
     <p:sldId id="277" r:id="rId31"/>
     <p:sldId id="284" r:id="rId32"/>
-    <p:sldId id="292" r:id="rId33"/>
-    <p:sldId id="293" r:id="rId34"/>
-    <p:sldId id="294" r:id="rId35"/>
-    <p:sldId id="259" r:id="rId36"/>
-    <p:sldId id="274" r:id="rId37"/>
+    <p:sldId id="308" r:id="rId33"/>
+    <p:sldId id="292" r:id="rId34"/>
+    <p:sldId id="293" r:id="rId35"/>
+    <p:sldId id="294" r:id="rId36"/>
+    <p:sldId id="259" r:id="rId37"/>
+    <p:sldId id="274" r:id="rId38"/>
   </p:sldIdLst>
   <p:sldSz cx="9144000" cy="6858000" type="screen4x3"/>
   <p:notesSz cx="7010400" cy="9296400"/>
   <p:embeddedFontLst>
     <p:embeddedFont>
       <p:font typeface="Calibri" pitchFamily="34" charset="0"/>
-      <p:regular r:id="rId40"/>
-      <p:bold r:id="rId41"/>
-      <p:italic r:id="rId42"/>
-      <p:boldItalic r:id="rId43"/>
+      <p:regular r:id="rId41"/>
+      <p:bold r:id="rId42"/>
+      <p:italic r:id="rId43"/>
+      <p:boldItalic r:id="rId44"/>
     </p:embeddedFont>
   </p:embeddedFontLst>
   <p:defaultTextStyle>
@@ -2135,7 +2136,7 @@
               <a:pPr>
                 <a:defRPr/>
               </a:pPr>
-              <a:t>30</a:t>
+              <a:t>29</a:t>
             </a:fld>
             <a:endParaRPr lang="en-US"/>
           </a:p>
@@ -2223,6 +2224,93 @@
                 <a:defRPr/>
               </a:pPr>
               <a:t>31</a:t>
+            </a:fld>
+            <a:endParaRPr lang="en-US"/>
+          </a:p>
+        </p:txBody>
+      </p:sp>
+    </p:spTree>
+  </p:cSld>
+  <p:clrMapOvr>
+    <a:masterClrMapping/>
+  </p:clrMapOvr>
+</p:notes>
+</file>
+
+<file path=ppt/notesSlides/notesSlide25.xml><?xml version="1.0" encoding="utf-8"?>
+<p:notes xmlns:a="http://schemas.openxmlformats.org/drawingml/2006/main" xmlns:r="http://schemas.openxmlformats.org/officeDocument/2006/relationships" xmlns:p="http://schemas.openxmlformats.org/presentationml/2006/main">
+  <p:cSld>
+    <p:spTree>
+      <p:nvGrpSpPr>
+        <p:cNvPr id="1" name=""/>
+        <p:cNvGrpSpPr/>
+        <p:nvPr/>
+      </p:nvGrpSpPr>
+      <p:grpSpPr>
+        <a:xfrm>
+          <a:off x="0" y="0"/>
+          <a:ext cx="0" cy="0"/>
+          <a:chOff x="0" y="0"/>
+          <a:chExt cx="0" cy="0"/>
+        </a:xfrm>
+      </p:grpSpPr>
+      <p:sp>
+        <p:nvSpPr>
+          <p:cNvPr id="2" name="Slide Image Placeholder 1"/>
+          <p:cNvSpPr>
+            <a:spLocks noGrp="1" noRot="1" noChangeAspect="1"/>
+          </p:cNvSpPr>
+          <p:nvPr>
+            <p:ph type="sldImg"/>
+          </p:nvPr>
+        </p:nvSpPr>
+        <p:spPr/>
+      </p:sp>
+      <p:sp>
+        <p:nvSpPr>
+          <p:cNvPr id="3" name="Notes Placeholder 2"/>
+          <p:cNvSpPr>
+            <a:spLocks noGrp="1"/>
+          </p:cNvSpPr>
+          <p:nvPr>
+            <p:ph type="body" idx="1"/>
+          </p:nvPr>
+        </p:nvSpPr>
+        <p:spPr/>
+        <p:txBody>
+          <a:bodyPr>
+            <a:normAutofit/>
+          </a:bodyPr>
+          <a:lstStyle/>
+          <a:p>
+            <a:endParaRPr lang="en-US" dirty="0"/>
+          </a:p>
+        </p:txBody>
+      </p:sp>
+      <p:sp>
+        <p:nvSpPr>
+          <p:cNvPr id="4" name="Slide Number Placeholder 3"/>
+          <p:cNvSpPr>
+            <a:spLocks noGrp="1"/>
+          </p:cNvSpPr>
+          <p:nvPr>
+            <p:ph type="sldNum" sz="quarter" idx="10"/>
+          </p:nvPr>
+        </p:nvSpPr>
+        <p:spPr/>
+        <p:txBody>
+          <a:bodyPr/>
+          <a:lstStyle/>
+          <a:p>
+            <a:pPr>
+              <a:defRPr/>
+            </a:pPr>
+            <a:fld id="{1931C8FD-CC35-423B-99F4-64D81D6A80AE}" type="slidenum">
+              <a:rPr lang="en-US" smtClean="0"/>
+              <a:pPr>
+                <a:defRPr/>
+              </a:pPr>
+              <a:t>32</a:t>
             </a:fld>
             <a:endParaRPr lang="en-US"/>
           </a:p>
@@ -11531,317 +11619,61 @@
       </p:grpSpPr>
       <p:sp>
         <p:nvSpPr>
-          <p:cNvPr id="4" name="Rectangle 3"/>
-          <p:cNvSpPr/>
-          <p:nvPr/>
+          <p:cNvPr id="3075" name="Text Placeholder 2"/>
+          <p:cNvSpPr>
+            <a:spLocks noGrp="1"/>
+          </p:cNvSpPr>
+          <p:nvPr>
+            <p:ph type="body" sz="quarter" idx="10"/>
+          </p:nvPr>
         </p:nvSpPr>
         <p:spPr>
           <a:xfrm>
-            <a:off x="0" y="0"/>
-            <a:ext cx="9144000" cy="4648200"/>
+            <a:off x="685800" y="1066800"/>
+            <a:ext cx="8229600" cy="1219200"/>
           </a:xfrm>
-          <a:prstGeom prst="rect">
-            <a:avLst/>
-          </a:prstGeom>
-          <a:solidFill>
-            <a:srgbClr val="0069AA"/>
-          </a:solidFill>
+        </p:spPr>
+        <p:txBody>
+          <a:bodyPr/>
+          <a:lstStyle/>
+          <a:p>
+            <a:pPr eaLnBrk="1" hangingPunct="1">
+              <a:buNone/>
+            </a:pPr>
+            <a:endParaRPr lang="en-US" sz="2000" dirty="0" smtClean="0"/>
+          </a:p>
+        </p:txBody>
+      </p:sp>
+      <p:sp>
+        <p:nvSpPr>
+          <p:cNvPr id="3074" name="Title 1"/>
+          <p:cNvSpPr>
+            <a:spLocks noGrp="1"/>
+          </p:cNvSpPr>
+          <p:nvPr>
+            <p:ph type="title"/>
+          </p:nvPr>
+        </p:nvSpPr>
+        <p:spPr bwMode="auto">
+          <a:noFill/>
           <a:ln>
-            <a:noFill/>
-          </a:ln>
-        </p:spPr>
-        <p:style>
-          <a:lnRef idx="2">
-            <a:schemeClr val="accent1">
-              <a:shade val="50000"/>
-            </a:schemeClr>
-          </a:lnRef>
-          <a:fillRef idx="1">
-            <a:schemeClr val="accent1"/>
-          </a:fillRef>
-          <a:effectRef idx="0">
-            <a:schemeClr val="accent1"/>
-          </a:effectRef>
-          <a:fontRef idx="minor">
-            <a:schemeClr val="lt1"/>
-          </a:fontRef>
-        </p:style>
-        <p:txBody>
-          <a:bodyPr anchor="ctr"/>
-          <a:lstStyle/>
-          <a:p>
-            <a:pPr algn="ctr">
-              <a:defRPr/>
-            </a:pPr>
-            <a:endParaRPr lang="en-US"/>
-          </a:p>
-        </p:txBody>
-      </p:sp>
-      <p:pic>
-        <p:nvPicPr>
-          <p:cNvPr id="4099" name="Picture 4" descr="MAT logo 1 CMYK"/>
-          <p:cNvPicPr>
-            <a:picLocks noChangeAspect="1" noChangeArrowheads="1"/>
-          </p:cNvPicPr>
-          <p:nvPr/>
-        </p:nvPicPr>
-        <p:blipFill>
-          <a:blip r:embed="rId2">
-            <a:clrChange>
-              <a:clrFrom>
-                <a:srgbClr val="FDFDFD"/>
-              </a:clrFrom>
-              <a:clrTo>
-                <a:srgbClr val="FDFDFD">
-                  <a:alpha val="0"/>
-                </a:srgbClr>
-              </a:clrTo>
-            </a:clrChange>
-          </a:blip>
-          <a:srcRect/>
-          <a:stretch>
-            <a:fillRect/>
-          </a:stretch>
-        </p:blipFill>
-        <p:spPr bwMode="auto">
-          <a:xfrm>
-            <a:off x="2971800" y="4800600"/>
-            <a:ext cx="2819400" cy="1338263"/>
-          </a:xfrm>
-          <a:prstGeom prst="rect">
-            <a:avLst/>
-          </a:prstGeom>
-          <a:noFill/>
-          <a:ln w="9525">
-            <a:noFill/>
             <a:miter lim="800000"/>
             <a:headEnd/>
             <a:tailEnd/>
           </a:ln>
         </p:spPr>
-      </p:pic>
-      <p:sp>
-        <p:nvSpPr>
-          <p:cNvPr id="5" name="Rectangle 4"/>
-          <p:cNvSpPr/>
-          <p:nvPr/>
-        </p:nvSpPr>
-        <p:spPr>
-          <a:xfrm>
-            <a:off x="0" y="4724400"/>
-            <a:ext cx="9144000" cy="2133600"/>
-          </a:xfrm>
-          <a:prstGeom prst="rect">
-            <a:avLst/>
-          </a:prstGeom>
-          <a:solidFill>
-            <a:srgbClr val="E31937"/>
-          </a:solidFill>
-          <a:ln>
-            <a:noFill/>
-          </a:ln>
-        </p:spPr>
-        <p:style>
-          <a:lnRef idx="2">
-            <a:schemeClr val="accent1">
-              <a:shade val="50000"/>
-            </a:schemeClr>
-          </a:lnRef>
-          <a:fillRef idx="1">
-            <a:schemeClr val="accent1"/>
-          </a:fillRef>
-          <a:effectRef idx="0">
-            <a:schemeClr val="accent1"/>
-          </a:effectRef>
-          <a:fontRef idx="minor">
-            <a:schemeClr val="lt1"/>
-          </a:fontRef>
-        </p:style>
         <p:txBody>
-          <a:bodyPr anchor="ctr"/>
-          <a:lstStyle/>
-          <a:p>
-            <a:pPr algn="ctr">
-              <a:defRPr/>
-            </a:pPr>
-            <a:endParaRPr lang="en-US"/>
-          </a:p>
-        </p:txBody>
-      </p:sp>
-      <p:sp>
-        <p:nvSpPr>
-          <p:cNvPr id="10" name="Rectangle 9"/>
-          <p:cNvSpPr/>
-          <p:nvPr/>
-        </p:nvSpPr>
-        <p:spPr bwMode="auto">
-          <a:xfrm>
-            <a:off x="228600" y="0"/>
-            <a:ext cx="104775" cy="2325688"/>
-          </a:xfrm>
-          <a:prstGeom prst="rect">
-            <a:avLst/>
-          </a:prstGeom>
-          <a:solidFill>
-            <a:srgbClr val="E31937"/>
-          </a:solidFill>
-          <a:ln>
-            <a:noFill/>
-          </a:ln>
-        </p:spPr>
-        <p:style>
-          <a:lnRef idx="2">
-            <a:schemeClr val="accent1">
-              <a:shade val="50000"/>
-            </a:schemeClr>
-          </a:lnRef>
-          <a:fillRef idx="1">
-            <a:schemeClr val="accent1"/>
-          </a:fillRef>
-          <a:effectRef idx="0">
-            <a:schemeClr val="accent1"/>
-          </a:effectRef>
-          <a:fontRef idx="minor">
-            <a:schemeClr val="lt1"/>
-          </a:fontRef>
-        </p:style>
-        <p:txBody>
-          <a:bodyPr anchor="ctr"/>
-          <a:lstStyle/>
-          <a:p>
-            <a:pPr algn="ctr">
-              <a:defRPr/>
-            </a:pPr>
-            <a:endParaRPr lang="en-US"/>
-          </a:p>
-        </p:txBody>
-      </p:sp>
-      <p:pic>
-        <p:nvPicPr>
-          <p:cNvPr id="4103" name="Picture 7" descr="MAT logo vertical_red.emf"/>
-          <p:cNvPicPr>
-            <a:picLocks noChangeAspect="1"/>
-          </p:cNvPicPr>
-          <p:nvPr/>
-        </p:nvPicPr>
-        <p:blipFill>
-          <a:blip r:embed="rId3"/>
-          <a:srcRect/>
-          <a:stretch>
-            <a:fillRect/>
-          </a:stretch>
-        </p:blipFill>
-        <p:spPr bwMode="auto">
-          <a:xfrm>
-            <a:off x="3600450" y="5334000"/>
-            <a:ext cx="1981200" cy="969963"/>
-          </a:xfrm>
-          <a:prstGeom prst="rect">
-            <a:avLst/>
-          </a:prstGeom>
-          <a:noFill/>
-          <a:ln w="9525">
-            <a:noFill/>
-            <a:miter lim="800000"/>
-            <a:headEnd/>
-            <a:tailEnd/>
-          </a:ln>
-        </p:spPr>
-      </p:pic>
-      <p:sp>
-        <p:nvSpPr>
-          <p:cNvPr id="9" name="TextBox 8"/>
-          <p:cNvSpPr txBox="1"/>
-          <p:nvPr/>
-        </p:nvSpPr>
-        <p:spPr>
-          <a:xfrm>
-            <a:off x="381000" y="1447800"/>
-            <a:ext cx="8610600" cy="646331"/>
-          </a:xfrm>
-          <a:prstGeom prst="rect">
-            <a:avLst/>
-          </a:prstGeom>
-          <a:noFill/>
-        </p:spPr>
-        <p:txBody>
-          <a:bodyPr>
-            <a:spAutoFit/>
+          <a:bodyPr vert="horz" wrap="square" lIns="91440" tIns="45720" rIns="91440" bIns="45720" numCol="1" anchor="t" anchorCtr="0" compatLnSpc="1">
+            <a:prstTxWarp prst="textNoShape">
+              <a:avLst/>
+            </a:prstTxWarp>
           </a:bodyPr>
           <a:lstStyle/>
           <a:p>
-            <a:pPr>
-              <a:defRPr/>
-            </a:pPr>
+            <a:pPr eaLnBrk="1" hangingPunct="1"/>
             <a:r>
-              <a:rPr lang="en-US" sz="3600" spc="60" dirty="0" smtClean="0">
-                <a:solidFill>
-                  <a:schemeClr val="bg1"/>
-                </a:solidFill>
-                <a:latin typeface="Calibri" pitchFamily="34" charset="0"/>
-              </a:rPr>
-              <a:t>Simple Org Chart – Final Version</a:t>
-            </a:r>
-            <a:endParaRPr lang="en-US" sz="3600" spc="60" dirty="0">
-              <a:solidFill>
-                <a:schemeClr val="bg1"/>
-              </a:solidFill>
-              <a:latin typeface="Calibri" pitchFamily="34" charset="0"/>
-            </a:endParaRPr>
-          </a:p>
-        </p:txBody>
-      </p:sp>
-      <p:sp>
-        <p:nvSpPr>
-          <p:cNvPr id="11" name="TextBox 10"/>
-          <p:cNvSpPr txBox="1"/>
-          <p:nvPr/>
-        </p:nvSpPr>
-        <p:spPr>
-          <a:xfrm>
-            <a:off x="381000" y="2057400"/>
-            <a:ext cx="7543800" cy="338554"/>
-          </a:xfrm>
-          <a:prstGeom prst="rect">
-            <a:avLst/>
-          </a:prstGeom>
-          <a:noFill/>
-        </p:spPr>
-        <p:txBody>
-          <a:bodyPr wrap="square">
-            <a:spAutoFit/>
-          </a:bodyPr>
-          <a:lstStyle/>
-          <a:p>
-            <a:pPr>
-              <a:defRPr/>
-            </a:pPr>
-            <a:r>
-              <a:rPr lang="en-US" sz="1600" dirty="0" smtClean="0">
-                <a:solidFill>
-                  <a:schemeClr val="bg1"/>
-                </a:solidFill>
-                <a:latin typeface="+mn-lt"/>
-              </a:rPr>
-              <a:t>Orchestration With An Application Controller And </a:t>
-            </a:r>
-            <a:r>
-              <a:rPr lang="en-US" sz="1600" dirty="0" err="1" smtClean="0">
-                <a:solidFill>
-                  <a:schemeClr val="bg1"/>
-                </a:solidFill>
-                <a:latin typeface="+mn-lt"/>
-              </a:rPr>
-              <a:t>IoC</a:t>
-            </a:r>
-            <a:r>
-              <a:rPr lang="en-US" sz="1600" dirty="0" smtClean="0">
-                <a:solidFill>
-                  <a:schemeClr val="bg1"/>
-                </a:solidFill>
-                <a:latin typeface="+mn-lt"/>
-              </a:rPr>
-              <a:t> Container</a:t>
+              <a:rPr lang="en-US" dirty="0" smtClean="0"/>
+              <a:t>Event Aggregator</a:t>
             </a:r>
           </a:p>
         </p:txBody>
@@ -12025,59 +11857,318 @@
       </p:grpSpPr>
       <p:sp>
         <p:nvSpPr>
-          <p:cNvPr id="3075" name="Text Placeholder 2"/>
-          <p:cNvSpPr>
-            <a:spLocks noGrp="1"/>
-          </p:cNvSpPr>
-          <p:nvPr>
-            <p:ph type="body" sz="quarter" idx="10"/>
-          </p:nvPr>
+          <p:cNvPr id="4" name="Rectangle 3"/>
+          <p:cNvSpPr/>
+          <p:nvPr/>
         </p:nvSpPr>
         <p:spPr>
           <a:xfrm>
-            <a:off x="685800" y="1066800"/>
-            <a:ext cx="8229600" cy="1219200"/>
+            <a:off x="0" y="0"/>
+            <a:ext cx="9144000" cy="4648200"/>
           </a:xfrm>
+          <a:prstGeom prst="rect">
+            <a:avLst/>
+          </a:prstGeom>
+          <a:solidFill>
+            <a:srgbClr val="0069AA"/>
+          </a:solidFill>
+          <a:ln>
+            <a:noFill/>
+          </a:ln>
         </p:spPr>
+        <p:style>
+          <a:lnRef idx="2">
+            <a:schemeClr val="accent1">
+              <a:shade val="50000"/>
+            </a:schemeClr>
+          </a:lnRef>
+          <a:fillRef idx="1">
+            <a:schemeClr val="accent1"/>
+          </a:fillRef>
+          <a:effectRef idx="0">
+            <a:schemeClr val="accent1"/>
+          </a:effectRef>
+          <a:fontRef idx="minor">
+            <a:schemeClr val="lt1"/>
+          </a:fontRef>
+        </p:style>
         <p:txBody>
-          <a:bodyPr/>
+          <a:bodyPr anchor="ctr"/>
           <a:lstStyle/>
           <a:p>
-            <a:pPr eaLnBrk="1" hangingPunct="1">
-              <a:buNone/>
+            <a:pPr algn="ctr">
+              <a:defRPr/>
             </a:pPr>
-            <a:endParaRPr lang="en-US" sz="2000" dirty="0" smtClean="0"/>
+            <a:endParaRPr lang="en-US"/>
           </a:p>
         </p:txBody>
       </p:sp>
-      <p:sp>
-        <p:nvSpPr>
-          <p:cNvPr id="3074" name="Title 1"/>
-          <p:cNvSpPr>
-            <a:spLocks noGrp="1"/>
-          </p:cNvSpPr>
-          <p:nvPr>
-            <p:ph type="title"/>
-          </p:nvPr>
-        </p:nvSpPr>
+      <p:pic>
+        <p:nvPicPr>
+          <p:cNvPr id="4099" name="Picture 4" descr="MAT logo 1 CMYK"/>
+          <p:cNvPicPr>
+            <a:picLocks noChangeAspect="1" noChangeArrowheads="1"/>
+          </p:cNvPicPr>
+          <p:nvPr/>
+        </p:nvPicPr>
+        <p:blipFill>
+          <a:blip r:embed="rId2">
+            <a:clrChange>
+              <a:clrFrom>
+                <a:srgbClr val="FDFDFD"/>
+              </a:clrFrom>
+              <a:clrTo>
+                <a:srgbClr val="FDFDFD">
+                  <a:alpha val="0"/>
+                </a:srgbClr>
+              </a:clrTo>
+            </a:clrChange>
+          </a:blip>
+          <a:srcRect/>
+          <a:stretch>
+            <a:fillRect/>
+          </a:stretch>
+        </p:blipFill>
         <p:spPr bwMode="auto">
+          <a:xfrm>
+            <a:off x="2971800" y="4800600"/>
+            <a:ext cx="2819400" cy="1338263"/>
+          </a:xfrm>
+          <a:prstGeom prst="rect">
+            <a:avLst/>
+          </a:prstGeom>
           <a:noFill/>
-          <a:ln>
+          <a:ln w="9525">
+            <a:noFill/>
             <a:miter lim="800000"/>
             <a:headEnd/>
             <a:tailEnd/>
           </a:ln>
         </p:spPr>
+      </p:pic>
+      <p:sp>
+        <p:nvSpPr>
+          <p:cNvPr id="5" name="Rectangle 4"/>
+          <p:cNvSpPr/>
+          <p:nvPr/>
+        </p:nvSpPr>
+        <p:spPr>
+          <a:xfrm>
+            <a:off x="0" y="4724400"/>
+            <a:ext cx="9144000" cy="2133600"/>
+          </a:xfrm>
+          <a:prstGeom prst="rect">
+            <a:avLst/>
+          </a:prstGeom>
+          <a:solidFill>
+            <a:srgbClr val="E31937"/>
+          </a:solidFill>
+          <a:ln>
+            <a:noFill/>
+          </a:ln>
+        </p:spPr>
+        <p:style>
+          <a:lnRef idx="2">
+            <a:schemeClr val="accent1">
+              <a:shade val="50000"/>
+            </a:schemeClr>
+          </a:lnRef>
+          <a:fillRef idx="1">
+            <a:schemeClr val="accent1"/>
+          </a:fillRef>
+          <a:effectRef idx="0">
+            <a:schemeClr val="accent1"/>
+          </a:effectRef>
+          <a:fontRef idx="minor">
+            <a:schemeClr val="lt1"/>
+          </a:fontRef>
+        </p:style>
         <p:txBody>
-          <a:bodyPr vert="horz" wrap="square" lIns="91440" tIns="45720" rIns="91440" bIns="45720" numCol="1" anchor="t" anchorCtr="0" compatLnSpc="1">
-            <a:prstTxWarp prst="textNoShape">
-              <a:avLst/>
-            </a:prstTxWarp>
+          <a:bodyPr anchor="ctr"/>
+          <a:lstStyle/>
+          <a:p>
+            <a:pPr algn="ctr">
+              <a:defRPr/>
+            </a:pPr>
+            <a:endParaRPr lang="en-US"/>
+          </a:p>
+        </p:txBody>
+      </p:sp>
+      <p:sp>
+        <p:nvSpPr>
+          <p:cNvPr id="10" name="Rectangle 9"/>
+          <p:cNvSpPr/>
+          <p:nvPr/>
+        </p:nvSpPr>
+        <p:spPr bwMode="auto">
+          <a:xfrm>
+            <a:off x="228600" y="0"/>
+            <a:ext cx="104775" cy="2325688"/>
+          </a:xfrm>
+          <a:prstGeom prst="rect">
+            <a:avLst/>
+          </a:prstGeom>
+          <a:solidFill>
+            <a:srgbClr val="E31937"/>
+          </a:solidFill>
+          <a:ln>
+            <a:noFill/>
+          </a:ln>
+        </p:spPr>
+        <p:style>
+          <a:lnRef idx="2">
+            <a:schemeClr val="accent1">
+              <a:shade val="50000"/>
+            </a:schemeClr>
+          </a:lnRef>
+          <a:fillRef idx="1">
+            <a:schemeClr val="accent1"/>
+          </a:fillRef>
+          <a:effectRef idx="0">
+            <a:schemeClr val="accent1"/>
+          </a:effectRef>
+          <a:fontRef idx="minor">
+            <a:schemeClr val="lt1"/>
+          </a:fontRef>
+        </p:style>
+        <p:txBody>
+          <a:bodyPr anchor="ctr"/>
+          <a:lstStyle/>
+          <a:p>
+            <a:pPr algn="ctr">
+              <a:defRPr/>
+            </a:pPr>
+            <a:endParaRPr lang="en-US"/>
+          </a:p>
+        </p:txBody>
+      </p:sp>
+      <p:pic>
+        <p:nvPicPr>
+          <p:cNvPr id="4103" name="Picture 7" descr="MAT logo vertical_red.emf"/>
+          <p:cNvPicPr>
+            <a:picLocks noChangeAspect="1"/>
+          </p:cNvPicPr>
+          <p:nvPr/>
+        </p:nvPicPr>
+        <p:blipFill>
+          <a:blip r:embed="rId3"/>
+          <a:srcRect/>
+          <a:stretch>
+            <a:fillRect/>
+          </a:stretch>
+        </p:blipFill>
+        <p:spPr bwMode="auto">
+          <a:xfrm>
+            <a:off x="3600450" y="5334000"/>
+            <a:ext cx="1981200" cy="969963"/>
+          </a:xfrm>
+          <a:prstGeom prst="rect">
+            <a:avLst/>
+          </a:prstGeom>
+          <a:noFill/>
+          <a:ln w="9525">
+            <a:noFill/>
+            <a:miter lim="800000"/>
+            <a:headEnd/>
+            <a:tailEnd/>
+          </a:ln>
+        </p:spPr>
+      </p:pic>
+      <p:sp>
+        <p:nvSpPr>
+          <p:cNvPr id="9" name="TextBox 8"/>
+          <p:cNvSpPr txBox="1"/>
+          <p:nvPr/>
+        </p:nvSpPr>
+        <p:spPr>
+          <a:xfrm>
+            <a:off x="381000" y="1447800"/>
+            <a:ext cx="8610600" cy="646331"/>
+          </a:xfrm>
+          <a:prstGeom prst="rect">
+            <a:avLst/>
+          </a:prstGeom>
+          <a:noFill/>
+        </p:spPr>
+        <p:txBody>
+          <a:bodyPr>
+            <a:spAutoFit/>
           </a:bodyPr>
           <a:lstStyle/>
           <a:p>
-            <a:pPr eaLnBrk="1" hangingPunct="1"/>
-            <a:endParaRPr lang="en-US" dirty="0" smtClean="0"/>
+            <a:pPr>
+              <a:defRPr/>
+            </a:pPr>
+            <a:r>
+              <a:rPr lang="en-US" sz="3600" spc="60" dirty="0" smtClean="0">
+                <a:solidFill>
+                  <a:schemeClr val="bg1"/>
+                </a:solidFill>
+                <a:latin typeface="Calibri" pitchFamily="34" charset="0"/>
+              </a:rPr>
+              <a:t>Simple Org Chart – Final Version</a:t>
+            </a:r>
+            <a:endParaRPr lang="en-US" sz="3600" spc="60" dirty="0">
+              <a:solidFill>
+                <a:schemeClr val="bg1"/>
+              </a:solidFill>
+              <a:latin typeface="Calibri" pitchFamily="34" charset="0"/>
+            </a:endParaRPr>
+          </a:p>
+        </p:txBody>
+      </p:sp>
+      <p:sp>
+        <p:nvSpPr>
+          <p:cNvPr id="11" name="TextBox 10"/>
+          <p:cNvSpPr txBox="1"/>
+          <p:nvPr/>
+        </p:nvSpPr>
+        <p:spPr>
+          <a:xfrm>
+            <a:off x="381000" y="2057400"/>
+            <a:ext cx="7543800" cy="338554"/>
+          </a:xfrm>
+          <a:prstGeom prst="rect">
+            <a:avLst/>
+          </a:prstGeom>
+          <a:noFill/>
+        </p:spPr>
+        <p:txBody>
+          <a:bodyPr wrap="square">
+            <a:spAutoFit/>
+          </a:bodyPr>
+          <a:lstStyle/>
+          <a:p>
+            <a:pPr>
+              <a:defRPr/>
+            </a:pPr>
+            <a:r>
+              <a:rPr lang="en-US" sz="1600" dirty="0" smtClean="0">
+                <a:solidFill>
+                  <a:schemeClr val="bg1"/>
+                </a:solidFill>
+                <a:latin typeface="+mn-lt"/>
+              </a:rPr>
+              <a:t>Orchestration With An Application Controller And </a:t>
+            </a:r>
+            <a:r>
+              <a:rPr lang="en-US" sz="1600" dirty="0" err="1" smtClean="0">
+                <a:solidFill>
+                  <a:schemeClr val="bg1"/>
+                </a:solidFill>
+                <a:latin typeface="+mn-lt"/>
+              </a:rPr>
+              <a:t>IoC</a:t>
+            </a:r>
+            <a:r>
+              <a:rPr lang="en-US" sz="1600" dirty="0" smtClean="0">
+                <a:solidFill>
+                  <a:schemeClr val="bg1"/>
+                </a:solidFill>
+                <a:latin typeface="+mn-lt"/>
+              </a:rPr>
+              <a:t> Container</a:t>
+            </a:r>
           </a:p>
         </p:txBody>
       </p:sp>
@@ -12136,6 +12227,22 @@
             <a:pPr eaLnBrk="1" hangingPunct="1">
               <a:buNone/>
             </a:pPr>
+            <a:r>
+              <a:rPr lang="en-US" sz="2000" smtClean="0"/>
+              <a:t>“Some </a:t>
+            </a:r>
+            <a:r>
+              <a:rPr lang="en-US" sz="2000" smtClean="0"/>
+              <a:t>applications contain a significant amount of logic about the screens to use at different points, which may involve invoking certain screens at certain times in an </a:t>
+            </a:r>
+            <a:r>
+              <a:rPr lang="en-US" sz="2000" smtClean="0"/>
+              <a:t>application</a:t>
+            </a:r>
+            <a:r>
+              <a:rPr lang="en-US" sz="2000" smtClean="0"/>
+              <a:t>.” </a:t>
+            </a:r>
             <a:endParaRPr lang="en-US" sz="2000" dirty="0" smtClean="0"/>
           </a:p>
         </p:txBody>
@@ -12167,6 +12274,10 @@
           <a:lstStyle/>
           <a:p>
             <a:pPr eaLnBrk="1" hangingPunct="1"/>
+            <a:r>
+              <a:rPr lang="en-US" dirty="0" smtClean="0"/>
+              <a:t>Application Controller</a:t>
+            </a:r>
             <a:endParaRPr lang="en-US" dirty="0" smtClean="0"/>
           </a:p>
         </p:txBody>
@@ -12187,6 +12298,96 @@
 </file>
 
 <file path=ppt/slides/slide32.xml><?xml version="1.0" encoding="utf-8"?>
+<p:sld xmlns:a="http://schemas.openxmlformats.org/drawingml/2006/main" xmlns:r="http://schemas.openxmlformats.org/officeDocument/2006/relationships" xmlns:p="http://schemas.openxmlformats.org/presentationml/2006/main">
+  <p:cSld>
+    <p:spTree>
+      <p:nvGrpSpPr>
+        <p:cNvPr id="1" name=""/>
+        <p:cNvGrpSpPr/>
+        <p:nvPr/>
+      </p:nvGrpSpPr>
+      <p:grpSpPr>
+        <a:xfrm>
+          <a:off x="0" y="0"/>
+          <a:ext cx="0" cy="0"/>
+          <a:chOff x="0" y="0"/>
+          <a:chExt cx="0" cy="0"/>
+        </a:xfrm>
+      </p:grpSpPr>
+      <p:sp>
+        <p:nvSpPr>
+          <p:cNvPr id="3075" name="Text Placeholder 2"/>
+          <p:cNvSpPr>
+            <a:spLocks noGrp="1"/>
+          </p:cNvSpPr>
+          <p:nvPr>
+            <p:ph type="body" sz="quarter" idx="10"/>
+          </p:nvPr>
+        </p:nvSpPr>
+        <p:spPr>
+          <a:xfrm>
+            <a:off x="685800" y="1066800"/>
+            <a:ext cx="8229600" cy="1219200"/>
+          </a:xfrm>
+        </p:spPr>
+        <p:txBody>
+          <a:bodyPr/>
+          <a:lstStyle/>
+          <a:p>
+            <a:pPr eaLnBrk="1" hangingPunct="1">
+              <a:buNone/>
+            </a:pPr>
+            <a:endParaRPr lang="en-US" sz="2000" dirty="0" smtClean="0"/>
+          </a:p>
+        </p:txBody>
+      </p:sp>
+      <p:sp>
+        <p:nvSpPr>
+          <p:cNvPr id="3074" name="Title 1"/>
+          <p:cNvSpPr>
+            <a:spLocks noGrp="1"/>
+          </p:cNvSpPr>
+          <p:nvPr>
+            <p:ph type="title"/>
+          </p:nvPr>
+        </p:nvSpPr>
+        <p:spPr bwMode="auto">
+          <a:noFill/>
+          <a:ln>
+            <a:miter lim="800000"/>
+            <a:headEnd/>
+            <a:tailEnd/>
+          </a:ln>
+        </p:spPr>
+        <p:txBody>
+          <a:bodyPr vert="horz" wrap="square" lIns="91440" tIns="45720" rIns="91440" bIns="45720" numCol="1" anchor="t" anchorCtr="0" compatLnSpc="1">
+            <a:prstTxWarp prst="textNoShape">
+              <a:avLst/>
+            </a:prstTxWarp>
+          </a:bodyPr>
+          <a:lstStyle/>
+          <a:p>
+            <a:pPr eaLnBrk="1" hangingPunct="1"/>
+            <a:endParaRPr lang="en-US" dirty="0" smtClean="0"/>
+          </a:p>
+        </p:txBody>
+      </p:sp>
+    </p:spTree>
+  </p:cSld>
+  <p:clrMapOvr>
+    <a:masterClrMapping/>
+  </p:clrMapOvr>
+  <p:timing>
+    <p:tnLst>
+      <p:par>
+        <p:cTn id="1" dur="indefinite" restart="never" nodeType="tmRoot"/>
+      </p:par>
+    </p:tnLst>
+  </p:timing>
+</p:sld>
+</file>
+
+<file path=ppt/slides/slide33.xml><?xml version="1.0" encoding="utf-8"?>
 <p:sld xmlns:a="http://schemas.openxmlformats.org/drawingml/2006/main" xmlns:r="http://schemas.openxmlformats.org/officeDocument/2006/relationships" xmlns:p="http://schemas.openxmlformats.org/presentationml/2006/main">
   <p:cSld>
     <p:spTree>
@@ -12732,7 +12933,7 @@
 </p:sld>
 </file>
 
-<file path=ppt/slides/slide33.xml><?xml version="1.0" encoding="utf-8"?>
+<file path=ppt/slides/slide34.xml><?xml version="1.0" encoding="utf-8"?>
 <p:sld xmlns:a="http://schemas.openxmlformats.org/drawingml/2006/main" xmlns:r="http://schemas.openxmlformats.org/officeDocument/2006/relationships" xmlns:p="http://schemas.openxmlformats.org/presentationml/2006/main">
   <p:cSld>
     <p:spTree>

</xml_diff>

<commit_message>
worked on the event aggregator slides
</commit_message>
<xml_diff>
--- a/Decoupling Workflow With App Controler/Decoupling Workflow From Forms.pptx
+++ b/Decoupling Workflow With App Controler/Decoupling Workflow From Forms.pptx
@@ -276,7 +276,7 @@
               <a:pPr>
                 <a:defRPr/>
               </a:pPr>
-              <a:t>5/20/2009</a:t>
+              <a:t>5/23/2009</a:t>
             </a:fld>
             <a:endParaRPr lang="en-US"/>
           </a:p>
@@ -454,7 +454,7 @@
               <a:pPr>
                 <a:defRPr/>
               </a:pPr>
-              <a:t>5/20/2009</a:t>
+              <a:t>5/23/2009</a:t>
             </a:fld>
             <a:endParaRPr lang="en-US"/>
           </a:p>
@@ -9357,7 +9357,6 @@
               <a:rPr lang="en-US" sz="2000" dirty="0" smtClean="0"/>
               <a:t> In Action</a:t>
             </a:r>
-            <a:endParaRPr lang="en-US" sz="2000" dirty="0" smtClean="0"/>
           </a:p>
         </p:txBody>
       </p:sp>
@@ -9610,7 +9609,6 @@
               <a:rPr lang="en-US" sz="2000" dirty="0" smtClean="0"/>
               <a:t> In Action</a:t>
             </a:r>
-            <a:endParaRPr lang="en-US" sz="2000" dirty="0" smtClean="0"/>
           </a:p>
         </p:txBody>
       </p:sp>
@@ -9748,7 +9746,7 @@
           </p:nvSpPr>
           <p:spPr>
             <a:xfrm>
-              <a:off x="3886200" y="2590800"/>
+              <a:off x="3886200" y="2616817"/>
               <a:ext cx="3352800" cy="152400"/>
             </a:xfrm>
             <a:prstGeom prst="rect">
@@ -9958,7 +9956,6 @@
               <a:rPr lang="en-US" sz="2000" dirty="0" smtClean="0"/>
               <a:t> In Action</a:t>
             </a:r>
-            <a:endParaRPr lang="en-US" sz="2000" dirty="0" smtClean="0"/>
           </a:p>
         </p:txBody>
       </p:sp>
@@ -11547,6 +11544,10 @@
             <a:pPr eaLnBrk="1" hangingPunct="1">
               <a:buNone/>
             </a:pPr>
+            <a:r>
+              <a:rPr lang="en-US" sz="2000" dirty="0" smtClean="0"/>
+              <a:t>Publishing A Selected Employee</a:t>
+            </a:r>
             <a:endParaRPr lang="en-US" sz="2000" dirty="0" smtClean="0"/>
           </a:p>
         </p:txBody>
@@ -11585,6 +11586,356 @@
           </a:p>
         </p:txBody>
       </p:sp>
+      <p:grpSp>
+        <p:nvGrpSpPr>
+          <p:cNvPr id="28" name="Group 27"/>
+          <p:cNvGrpSpPr/>
+          <p:nvPr/>
+        </p:nvGrpSpPr>
+        <p:grpSpPr>
+          <a:xfrm>
+            <a:off x="266700" y="1828800"/>
+            <a:ext cx="8610600" cy="4048125"/>
+            <a:chOff x="228600" y="1828800"/>
+            <a:chExt cx="8610600" cy="4048125"/>
+          </a:xfrm>
+        </p:grpSpPr>
+        <p:grpSp>
+          <p:nvGrpSpPr>
+            <p:cNvPr id="5" name="Group 4"/>
+            <p:cNvGrpSpPr/>
+            <p:nvPr/>
+          </p:nvGrpSpPr>
+          <p:grpSpPr>
+            <a:xfrm>
+              <a:off x="857250" y="1828800"/>
+              <a:ext cx="7981950" cy="4048125"/>
+              <a:chOff x="1104899" y="1828800"/>
+              <a:chExt cx="7981950" cy="4048125"/>
+            </a:xfrm>
+          </p:grpSpPr>
+          <p:pic>
+            <p:nvPicPr>
+              <p:cNvPr id="6" name="Picture 3" descr="X:\Derick-GitHub\Presentation And Training Material\Decoupling Workflow With App Controler\doc\Org Chart View - Org Chart Panel.png"/>
+              <p:cNvPicPr>
+                <a:picLocks noChangeAspect="1" noChangeArrowheads="1"/>
+              </p:cNvPicPr>
+              <p:nvPr/>
+            </p:nvPicPr>
+            <p:blipFill>
+              <a:blip r:embed="rId3"/>
+              <a:srcRect/>
+              <a:stretch>
+                <a:fillRect/>
+              </a:stretch>
+            </p:blipFill>
+            <p:spPr bwMode="auto">
+              <a:xfrm>
+                <a:off x="1104899" y="1828800"/>
+                <a:ext cx="4286251" cy="4048125"/>
+              </a:xfrm>
+              <a:prstGeom prst="rect">
+                <a:avLst/>
+              </a:prstGeom>
+              <a:noFill/>
+            </p:spPr>
+          </p:pic>
+          <p:pic>
+            <p:nvPicPr>
+              <p:cNvPr id="7" name="Picture 2" descr="X:\Derick-GitHub\Presentation And Training Material\Decoupling Workflow With App Controler\doc\Org Chart View - Employee Info Panel.png"/>
+              <p:cNvPicPr>
+                <a:picLocks noChangeAspect="1" noChangeArrowheads="1"/>
+              </p:cNvPicPr>
+              <p:nvPr/>
+            </p:nvPicPr>
+            <p:blipFill>
+              <a:blip r:embed="rId4"/>
+              <a:srcRect/>
+              <a:stretch>
+                <a:fillRect/>
+              </a:stretch>
+            </p:blipFill>
+            <p:spPr bwMode="auto">
+              <a:xfrm>
+                <a:off x="5086348" y="4267200"/>
+                <a:ext cx="4000501" cy="952500"/>
+              </a:xfrm>
+              <a:prstGeom prst="rect">
+                <a:avLst/>
+              </a:prstGeom>
+              <a:ln w="38100">
+                <a:solidFill>
+                  <a:schemeClr val="bg1">
+                    <a:lumMod val="50000"/>
+                  </a:schemeClr>
+                </a:solidFill>
+                <a:prstDash val="sysDash"/>
+              </a:ln>
+              <a:effectLst/>
+            </p:spPr>
+          </p:pic>
+        </p:grpSp>
+        <p:sp>
+          <p:nvSpPr>
+            <p:cNvPr id="8" name="Rectangle 7"/>
+            <p:cNvSpPr/>
+            <p:nvPr/>
+          </p:nvSpPr>
+          <p:spPr>
+            <a:xfrm>
+              <a:off x="1322696" y="2286000"/>
+              <a:ext cx="734704" cy="179696"/>
+            </a:xfrm>
+            <a:prstGeom prst="rect">
+              <a:avLst/>
+            </a:prstGeom>
+            <a:solidFill>
+              <a:srgbClr val="FFFF00">
+                <a:alpha val="10196"/>
+              </a:srgbClr>
+            </a:solidFill>
+            <a:ln>
+              <a:solidFill>
+                <a:srgbClr val="FFFF00"/>
+              </a:solidFill>
+            </a:ln>
+          </p:spPr>
+          <p:style>
+            <a:lnRef idx="2">
+              <a:schemeClr val="accent1">
+                <a:shade val="50000"/>
+              </a:schemeClr>
+            </a:lnRef>
+            <a:fillRef idx="1">
+              <a:schemeClr val="accent1"/>
+            </a:fillRef>
+            <a:effectRef idx="0">
+              <a:schemeClr val="accent1"/>
+            </a:effectRef>
+            <a:fontRef idx="minor">
+              <a:schemeClr val="lt1"/>
+            </a:fontRef>
+          </p:style>
+          <p:txBody>
+            <a:bodyPr rtlCol="0" anchor="ctr"/>
+            <a:lstStyle/>
+            <a:p>
+              <a:pPr algn="ctr"/>
+              <a:endParaRPr lang="en-US"/>
+            </a:p>
+          </p:txBody>
+        </p:sp>
+        <p:cxnSp>
+          <p:nvCxnSpPr>
+            <p:cNvPr id="10" name="Straight Connector 9"/>
+            <p:cNvCxnSpPr/>
+            <p:nvPr/>
+          </p:nvCxnSpPr>
+          <p:spPr>
+            <a:xfrm>
+              <a:off x="2057400" y="2286000"/>
+              <a:ext cx="1066800" cy="76200"/>
+            </a:xfrm>
+            <a:prstGeom prst="line">
+              <a:avLst/>
+            </a:prstGeom>
+            <a:ln w="38100">
+              <a:solidFill>
+                <a:schemeClr val="accent2"/>
+              </a:solidFill>
+            </a:ln>
+          </p:spPr>
+          <p:style>
+            <a:lnRef idx="1">
+              <a:schemeClr val="accent1"/>
+            </a:lnRef>
+            <a:fillRef idx="0">
+              <a:schemeClr val="accent1"/>
+            </a:fillRef>
+            <a:effectRef idx="0">
+              <a:schemeClr val="accent1"/>
+            </a:effectRef>
+            <a:fontRef idx="minor">
+              <a:schemeClr val="tx1"/>
+            </a:fontRef>
+          </p:style>
+        </p:cxnSp>
+        <p:cxnSp>
+          <p:nvCxnSpPr>
+            <p:cNvPr id="12" name="Straight Connector 11"/>
+            <p:cNvCxnSpPr/>
+            <p:nvPr/>
+          </p:nvCxnSpPr>
+          <p:spPr>
+            <a:xfrm>
+              <a:off x="2057400" y="2514600"/>
+              <a:ext cx="1066800" cy="457200"/>
+            </a:xfrm>
+            <a:prstGeom prst="line">
+              <a:avLst/>
+            </a:prstGeom>
+            <a:ln w="38100">
+              <a:solidFill>
+                <a:schemeClr val="accent2"/>
+              </a:solidFill>
+            </a:ln>
+          </p:spPr>
+          <p:style>
+            <a:lnRef idx="1">
+              <a:schemeClr val="accent1"/>
+            </a:lnRef>
+            <a:fillRef idx="0">
+              <a:schemeClr val="accent1"/>
+            </a:fillRef>
+            <a:effectRef idx="0">
+              <a:schemeClr val="accent1"/>
+            </a:effectRef>
+            <a:fontRef idx="minor">
+              <a:schemeClr val="tx1"/>
+            </a:fontRef>
+          </p:style>
+        </p:cxnSp>
+        <p:cxnSp>
+          <p:nvCxnSpPr>
+            <p:cNvPr id="21" name="Straight Connector 20"/>
+            <p:cNvCxnSpPr/>
+            <p:nvPr/>
+          </p:nvCxnSpPr>
+          <p:spPr>
+            <a:xfrm rot="16200000" flipV="1">
+              <a:off x="4419600" y="3810000"/>
+              <a:ext cx="685800" cy="228600"/>
+            </a:xfrm>
+            <a:prstGeom prst="line">
+              <a:avLst/>
+            </a:prstGeom>
+            <a:ln w="38100">
+              <a:solidFill>
+                <a:schemeClr val="accent2"/>
+              </a:solidFill>
+            </a:ln>
+          </p:spPr>
+          <p:style>
+            <a:lnRef idx="1">
+              <a:schemeClr val="accent1"/>
+            </a:lnRef>
+            <a:fillRef idx="0">
+              <a:schemeClr val="accent1"/>
+            </a:fillRef>
+            <a:effectRef idx="0">
+              <a:schemeClr val="accent1"/>
+            </a:effectRef>
+            <a:fontRef idx="minor">
+              <a:schemeClr val="tx1"/>
+            </a:fontRef>
+          </p:style>
+        </p:cxnSp>
+        <p:cxnSp>
+          <p:nvCxnSpPr>
+            <p:cNvPr id="25" name="Straight Connector 24"/>
+            <p:cNvCxnSpPr/>
+            <p:nvPr/>
+          </p:nvCxnSpPr>
+          <p:spPr>
+            <a:xfrm rot="16200000" flipH="1">
+              <a:off x="4381500" y="4762500"/>
+              <a:ext cx="762000" cy="228600"/>
+            </a:xfrm>
+            <a:prstGeom prst="line">
+              <a:avLst/>
+            </a:prstGeom>
+            <a:ln w="38100">
+              <a:solidFill>
+                <a:schemeClr val="accent2"/>
+              </a:solidFill>
+            </a:ln>
+          </p:spPr>
+          <p:style>
+            <a:lnRef idx="1">
+              <a:schemeClr val="accent1"/>
+            </a:lnRef>
+            <a:fillRef idx="0">
+              <a:schemeClr val="accent1"/>
+            </a:fillRef>
+            <a:effectRef idx="0">
+              <a:schemeClr val="accent1"/>
+            </a:effectRef>
+            <a:fontRef idx="minor">
+              <a:schemeClr val="tx1"/>
+            </a:fontRef>
+          </p:style>
+        </p:cxnSp>
+        <p:pic>
+          <p:nvPicPr>
+            <p:cNvPr id="1028" name="Picture 4"/>
+            <p:cNvPicPr>
+              <a:picLocks noChangeAspect="1" noChangeArrowheads="1"/>
+            </p:cNvPicPr>
+            <p:nvPr/>
+          </p:nvPicPr>
+          <p:blipFill>
+            <a:blip r:embed="rId5"/>
+            <a:srcRect/>
+            <a:stretch>
+              <a:fillRect/>
+            </a:stretch>
+          </p:blipFill>
+          <p:spPr bwMode="auto">
+            <a:xfrm>
+              <a:off x="228600" y="3581400"/>
+              <a:ext cx="4438650" cy="952500"/>
+            </a:xfrm>
+            <a:prstGeom prst="rect">
+              <a:avLst/>
+            </a:prstGeom>
+            <a:noFill/>
+            <a:ln w="38100">
+              <a:solidFill>
+                <a:schemeClr val="accent2"/>
+              </a:solidFill>
+              <a:miter lim="800000"/>
+              <a:headEnd/>
+              <a:tailEnd/>
+            </a:ln>
+            <a:effectLst/>
+          </p:spPr>
+        </p:pic>
+        <p:pic>
+          <p:nvPicPr>
+            <p:cNvPr id="1027" name="Picture 3"/>
+            <p:cNvPicPr>
+              <a:picLocks noChangeAspect="1" noChangeArrowheads="1"/>
+            </p:cNvPicPr>
+            <p:nvPr/>
+          </p:nvPicPr>
+          <p:blipFill>
+            <a:blip r:embed="rId6"/>
+            <a:srcRect/>
+            <a:stretch>
+              <a:fillRect/>
+            </a:stretch>
+          </p:blipFill>
+          <p:spPr bwMode="auto">
+            <a:xfrm>
+              <a:off x="3124200" y="2352675"/>
+              <a:ext cx="4667250" cy="619125"/>
+            </a:xfrm>
+            <a:prstGeom prst="rect">
+              <a:avLst/>
+            </a:prstGeom>
+            <a:noFill/>
+            <a:ln w="38100">
+              <a:solidFill>
+                <a:schemeClr val="accent2"/>
+              </a:solidFill>
+              <a:miter lim="800000"/>
+              <a:headEnd/>
+              <a:tailEnd/>
+            </a:ln>
+            <a:effectLst/>
+          </p:spPr>
+        </p:pic>
+      </p:grpSp>
     </p:spTree>
   </p:cSld>
   <p:clrMapOvr>
@@ -11640,6 +11991,10 @@
             <a:pPr eaLnBrk="1" hangingPunct="1">
               <a:buNone/>
             </a:pPr>
+            <a:r>
+              <a:rPr lang="en-US" sz="2000" dirty="0" smtClean="0"/>
+              <a:t>Passing Dependencies Down The Tree</a:t>
+            </a:r>
             <a:endParaRPr lang="en-US" sz="2000" dirty="0" smtClean="0"/>
           </a:p>
         </p:txBody>
@@ -11673,11 +12028,999 @@
             <a:pPr eaLnBrk="1" hangingPunct="1"/>
             <a:r>
               <a:rPr lang="en-US" dirty="0" smtClean="0"/>
-              <a:t>Event Aggregator</a:t>
+              <a:t>Dependency Inversion Issues</a:t>
             </a:r>
+            <a:endParaRPr lang="en-US" dirty="0" smtClean="0"/>
           </a:p>
         </p:txBody>
       </p:sp>
+      <p:grpSp>
+        <p:nvGrpSpPr>
+          <p:cNvPr id="44" name="Group 43"/>
+          <p:cNvGrpSpPr/>
+          <p:nvPr/>
+        </p:nvGrpSpPr>
+        <p:grpSpPr>
+          <a:xfrm>
+            <a:off x="495300" y="1676400"/>
+            <a:ext cx="8153400" cy="4495800"/>
+            <a:chOff x="533400" y="1828800"/>
+            <a:chExt cx="8153400" cy="4495800"/>
+          </a:xfrm>
+        </p:grpSpPr>
+        <p:grpSp>
+          <p:nvGrpSpPr>
+            <p:cNvPr id="42" name="Group 41"/>
+            <p:cNvGrpSpPr/>
+            <p:nvPr/>
+          </p:nvGrpSpPr>
+          <p:grpSpPr>
+            <a:xfrm>
+              <a:off x="1219200" y="4038600"/>
+              <a:ext cx="6324600" cy="838200"/>
+              <a:chOff x="1676400" y="4038600"/>
+              <a:chExt cx="6324600" cy="838200"/>
+            </a:xfrm>
+          </p:grpSpPr>
+          <p:sp>
+            <p:nvSpPr>
+              <p:cNvPr id="5" name="Rectangle 4"/>
+              <p:cNvSpPr/>
+              <p:nvPr/>
+            </p:nvSpPr>
+            <p:spPr>
+              <a:xfrm>
+                <a:off x="1676400" y="4038600"/>
+                <a:ext cx="1524000" cy="533400"/>
+              </a:xfrm>
+              <a:prstGeom prst="rect">
+                <a:avLst/>
+              </a:prstGeom>
+            </p:spPr>
+            <p:style>
+              <a:lnRef idx="2">
+                <a:schemeClr val="accent1">
+                  <a:shade val="50000"/>
+                </a:schemeClr>
+              </a:lnRef>
+              <a:fillRef idx="1">
+                <a:schemeClr val="accent1"/>
+              </a:fillRef>
+              <a:effectRef idx="0">
+                <a:schemeClr val="accent1"/>
+              </a:effectRef>
+              <a:fontRef idx="minor">
+                <a:schemeClr val="lt1"/>
+              </a:fontRef>
+            </p:style>
+            <p:txBody>
+              <a:bodyPr rtlCol="0" anchor="ctr"/>
+              <a:lstStyle/>
+              <a:p>
+                <a:pPr algn="ctr"/>
+                <a:r>
+                  <a:rPr lang="en-US" sz="1200" dirty="0" smtClean="0"/>
+                  <a:t>Some Object</a:t>
+                </a:r>
+                <a:endParaRPr lang="en-US" sz="1200" dirty="0"/>
+              </a:p>
+            </p:txBody>
+          </p:sp>
+          <p:sp>
+            <p:nvSpPr>
+              <p:cNvPr id="8" name="Rectangle 7"/>
+              <p:cNvSpPr/>
+              <p:nvPr/>
+            </p:nvSpPr>
+            <p:spPr>
+              <a:xfrm>
+                <a:off x="3886200" y="4038600"/>
+                <a:ext cx="1524000" cy="533400"/>
+              </a:xfrm>
+              <a:prstGeom prst="rect">
+                <a:avLst/>
+              </a:prstGeom>
+            </p:spPr>
+            <p:style>
+              <a:lnRef idx="2">
+                <a:schemeClr val="accent1">
+                  <a:shade val="50000"/>
+                </a:schemeClr>
+              </a:lnRef>
+              <a:fillRef idx="1">
+                <a:schemeClr val="accent1"/>
+              </a:fillRef>
+              <a:effectRef idx="0">
+                <a:schemeClr val="accent1"/>
+              </a:effectRef>
+              <a:fontRef idx="minor">
+                <a:schemeClr val="lt1"/>
+              </a:fontRef>
+            </p:style>
+            <p:txBody>
+              <a:bodyPr rtlCol="0" anchor="ctr"/>
+              <a:lstStyle/>
+              <a:p>
+                <a:pPr algn="ctr"/>
+                <a:r>
+                  <a:rPr lang="en-US" sz="1200" dirty="0" smtClean="0"/>
+                  <a:t>One More Object</a:t>
+                </a:r>
+                <a:endParaRPr lang="en-US" sz="1200" dirty="0"/>
+              </a:p>
+            </p:txBody>
+          </p:sp>
+          <p:grpSp>
+            <p:nvGrpSpPr>
+              <p:cNvPr id="21" name="Group 20"/>
+              <p:cNvGrpSpPr/>
+              <p:nvPr/>
+            </p:nvGrpSpPr>
+            <p:grpSpPr>
+              <a:xfrm>
+                <a:off x="6096000" y="4038600"/>
+                <a:ext cx="1905000" cy="838200"/>
+                <a:chOff x="5029200" y="3657600"/>
+                <a:chExt cx="1905000" cy="838200"/>
+              </a:xfrm>
+            </p:grpSpPr>
+            <p:sp>
+              <p:nvSpPr>
+                <p:cNvPr id="9" name="Rectangle 8"/>
+                <p:cNvSpPr/>
+                <p:nvPr/>
+              </p:nvSpPr>
+              <p:spPr>
+                <a:xfrm>
+                  <a:off x="5410200" y="3962400"/>
+                  <a:ext cx="1524000" cy="533400"/>
+                </a:xfrm>
+                <a:prstGeom prst="rect">
+                  <a:avLst/>
+                </a:prstGeom>
+              </p:spPr>
+              <p:style>
+                <a:lnRef idx="2">
+                  <a:schemeClr val="accent2">
+                    <a:shade val="50000"/>
+                  </a:schemeClr>
+                </a:lnRef>
+                <a:fillRef idx="1">
+                  <a:schemeClr val="accent2"/>
+                </a:fillRef>
+                <a:effectRef idx="0">
+                  <a:schemeClr val="accent2"/>
+                </a:effectRef>
+                <a:fontRef idx="minor">
+                  <a:schemeClr val="lt1"/>
+                </a:fontRef>
+              </p:style>
+              <p:txBody>
+                <a:bodyPr rtlCol="0" anchor="b" anchorCtr="0"/>
+                <a:lstStyle/>
+                <a:p>
+                  <a:pPr algn="r"/>
+                  <a:r>
+                    <a:rPr lang="en-US" sz="1400" b="1" dirty="0" smtClean="0"/>
+                    <a:t>An</a:t>
+                  </a:r>
+                </a:p>
+                <a:p>
+                  <a:pPr algn="r"/>
+                  <a:r>
+                    <a:rPr lang="en-US" sz="1400" b="1" dirty="0" smtClean="0"/>
+                    <a:t>Event Handler</a:t>
+                  </a:r>
+                  <a:endParaRPr lang="en-US" sz="1400" b="1" dirty="0"/>
+                </a:p>
+              </p:txBody>
+            </p:sp>
+            <p:sp>
+              <p:nvSpPr>
+                <p:cNvPr id="14" name="Rectangle 13"/>
+                <p:cNvSpPr/>
+                <p:nvPr/>
+              </p:nvSpPr>
+              <p:spPr>
+                <a:xfrm>
+                  <a:off x="5029200" y="3657600"/>
+                  <a:ext cx="1524000" cy="533400"/>
+                </a:xfrm>
+                <a:prstGeom prst="rect">
+                  <a:avLst/>
+                </a:prstGeom>
+              </p:spPr>
+              <p:style>
+                <a:lnRef idx="2">
+                  <a:schemeClr val="accent1">
+                    <a:shade val="50000"/>
+                  </a:schemeClr>
+                </a:lnRef>
+                <a:fillRef idx="1">
+                  <a:schemeClr val="accent1"/>
+                </a:fillRef>
+                <a:effectRef idx="0">
+                  <a:schemeClr val="accent1"/>
+                </a:effectRef>
+                <a:fontRef idx="minor">
+                  <a:schemeClr val="lt1"/>
+                </a:fontRef>
+              </p:style>
+              <p:txBody>
+                <a:bodyPr rtlCol="0" anchor="ctr"/>
+                <a:lstStyle/>
+                <a:p>
+                  <a:pPr algn="ctr"/>
+                  <a:r>
+                    <a:rPr lang="en-US" sz="1200" dirty="0" smtClean="0"/>
+                    <a:t>This Object</a:t>
+                  </a:r>
+                  <a:endParaRPr lang="en-US" sz="1200" dirty="0"/>
+                </a:p>
+              </p:txBody>
+            </p:sp>
+          </p:grpSp>
+        </p:grpSp>
+        <p:grpSp>
+          <p:nvGrpSpPr>
+            <p:cNvPr id="23" name="Group 22"/>
+            <p:cNvGrpSpPr/>
+            <p:nvPr/>
+          </p:nvGrpSpPr>
+          <p:grpSpPr>
+            <a:xfrm>
+              <a:off x="533400" y="5486400"/>
+              <a:ext cx="8153400" cy="838200"/>
+              <a:chOff x="533400" y="5486400"/>
+              <a:chExt cx="8153400" cy="838200"/>
+            </a:xfrm>
+          </p:grpSpPr>
+          <p:grpSp>
+            <p:nvGrpSpPr>
+              <p:cNvPr id="17" name="Group 16"/>
+              <p:cNvGrpSpPr/>
+              <p:nvPr/>
+            </p:nvGrpSpPr>
+            <p:grpSpPr>
+              <a:xfrm>
+                <a:off x="6324600" y="5486400"/>
+                <a:ext cx="2362200" cy="838200"/>
+                <a:chOff x="5029200" y="4953000"/>
+                <a:chExt cx="2362200" cy="838200"/>
+              </a:xfrm>
+            </p:grpSpPr>
+            <p:sp>
+              <p:nvSpPr>
+                <p:cNvPr id="12" name="Rectangle 11"/>
+                <p:cNvSpPr/>
+                <p:nvPr/>
+              </p:nvSpPr>
+              <p:spPr>
+                <a:xfrm>
+                  <a:off x="5867400" y="5257800"/>
+                  <a:ext cx="1524000" cy="533400"/>
+                </a:xfrm>
+                <a:prstGeom prst="rect">
+                  <a:avLst/>
+                </a:prstGeom>
+              </p:spPr>
+              <p:style>
+                <a:lnRef idx="2">
+                  <a:schemeClr val="accent2">
+                    <a:shade val="50000"/>
+                  </a:schemeClr>
+                </a:lnRef>
+                <a:fillRef idx="1">
+                  <a:schemeClr val="accent2"/>
+                </a:fillRef>
+                <a:effectRef idx="0">
+                  <a:schemeClr val="accent2"/>
+                </a:effectRef>
+                <a:fontRef idx="minor">
+                  <a:schemeClr val="lt1"/>
+                </a:fontRef>
+              </p:style>
+              <p:txBody>
+                <a:bodyPr rtlCol="0" anchor="ctr"/>
+                <a:lstStyle/>
+                <a:p>
+                  <a:pPr algn="r"/>
+                  <a:r>
+                    <a:rPr lang="en-US" sz="1400" b="1" dirty="0" smtClean="0"/>
+                    <a:t>An Event Publishing Object</a:t>
+                  </a:r>
+                  <a:endParaRPr lang="en-US" sz="1400" b="1" dirty="0"/>
+                </a:p>
+              </p:txBody>
+            </p:sp>
+            <p:sp>
+              <p:nvSpPr>
+                <p:cNvPr id="7" name="Rectangle 6"/>
+                <p:cNvSpPr/>
+                <p:nvPr/>
+              </p:nvSpPr>
+              <p:spPr>
+                <a:xfrm>
+                  <a:off x="5029200" y="4953000"/>
+                  <a:ext cx="1524000" cy="533400"/>
+                </a:xfrm>
+                <a:prstGeom prst="rect">
+                  <a:avLst/>
+                </a:prstGeom>
+              </p:spPr>
+              <p:style>
+                <a:lnRef idx="2">
+                  <a:schemeClr val="accent1">
+                    <a:shade val="50000"/>
+                  </a:schemeClr>
+                </a:lnRef>
+                <a:fillRef idx="1">
+                  <a:schemeClr val="accent1"/>
+                </a:fillRef>
+                <a:effectRef idx="0">
+                  <a:schemeClr val="accent1"/>
+                </a:effectRef>
+                <a:fontRef idx="minor">
+                  <a:schemeClr val="lt1"/>
+                </a:fontRef>
+              </p:style>
+              <p:txBody>
+                <a:bodyPr rtlCol="0" anchor="ctr"/>
+                <a:lstStyle/>
+                <a:p>
+                  <a:pPr algn="ctr"/>
+                  <a:r>
+                    <a:rPr lang="en-US" sz="1200" dirty="0" smtClean="0"/>
+                    <a:t>Yet Another </a:t>
+                  </a:r>
+                  <a:r>
+                    <a:rPr lang="en-US" sz="1200" dirty="0" err="1" smtClean="0"/>
+                    <a:t>Obj</a:t>
+                  </a:r>
+                  <a:endParaRPr lang="en-US" sz="1200" dirty="0"/>
+                </a:p>
+              </p:txBody>
+            </p:sp>
+          </p:grpSp>
+          <p:grpSp>
+            <p:nvGrpSpPr>
+              <p:cNvPr id="19" name="Group 18"/>
+              <p:cNvGrpSpPr/>
+              <p:nvPr/>
+            </p:nvGrpSpPr>
+            <p:grpSpPr>
+              <a:xfrm>
+                <a:off x="533400" y="5486400"/>
+                <a:ext cx="2362200" cy="838200"/>
+                <a:chOff x="228600" y="4876800"/>
+                <a:chExt cx="2362200" cy="838200"/>
+              </a:xfrm>
+            </p:grpSpPr>
+            <p:sp>
+              <p:nvSpPr>
+                <p:cNvPr id="13" name="Rectangle 12"/>
+                <p:cNvSpPr/>
+                <p:nvPr/>
+              </p:nvSpPr>
+              <p:spPr>
+                <a:xfrm>
+                  <a:off x="1066800" y="5181600"/>
+                  <a:ext cx="1524000" cy="533400"/>
+                </a:xfrm>
+                <a:prstGeom prst="rect">
+                  <a:avLst/>
+                </a:prstGeom>
+              </p:spPr>
+              <p:style>
+                <a:lnRef idx="2">
+                  <a:schemeClr val="accent2">
+                    <a:shade val="50000"/>
+                  </a:schemeClr>
+                </a:lnRef>
+                <a:fillRef idx="1">
+                  <a:schemeClr val="accent2"/>
+                </a:fillRef>
+                <a:effectRef idx="0">
+                  <a:schemeClr val="accent2"/>
+                </a:effectRef>
+                <a:fontRef idx="minor">
+                  <a:schemeClr val="lt1"/>
+                </a:fontRef>
+              </p:style>
+              <p:txBody>
+                <a:bodyPr rtlCol="0" anchor="ctr"/>
+                <a:lstStyle/>
+                <a:p>
+                  <a:pPr algn="r"/>
+                  <a:r>
+                    <a:rPr lang="en-US" sz="1400" b="1" dirty="0" smtClean="0"/>
+                    <a:t>An Event Publishing Object</a:t>
+                  </a:r>
+                  <a:endParaRPr lang="en-US" sz="1400" b="1" dirty="0"/>
+                </a:p>
+              </p:txBody>
+            </p:sp>
+            <p:sp>
+              <p:nvSpPr>
+                <p:cNvPr id="16" name="Rectangle 15"/>
+                <p:cNvSpPr/>
+                <p:nvPr/>
+              </p:nvSpPr>
+              <p:spPr>
+                <a:xfrm>
+                  <a:off x="228600" y="4876800"/>
+                  <a:ext cx="1524000" cy="533400"/>
+                </a:xfrm>
+                <a:prstGeom prst="rect">
+                  <a:avLst/>
+                </a:prstGeom>
+              </p:spPr>
+              <p:style>
+                <a:lnRef idx="2">
+                  <a:schemeClr val="accent1">
+                    <a:shade val="50000"/>
+                  </a:schemeClr>
+                </a:lnRef>
+                <a:fillRef idx="1">
+                  <a:schemeClr val="accent1"/>
+                </a:fillRef>
+                <a:effectRef idx="0">
+                  <a:schemeClr val="accent1"/>
+                </a:effectRef>
+                <a:fontRef idx="minor">
+                  <a:schemeClr val="lt1"/>
+                </a:fontRef>
+              </p:style>
+              <p:txBody>
+                <a:bodyPr rtlCol="0" anchor="ctr"/>
+                <a:lstStyle/>
+                <a:p>
+                  <a:pPr algn="ctr"/>
+                  <a:r>
+                    <a:rPr lang="en-US" sz="1200" dirty="0" smtClean="0"/>
+                    <a:t>Whatever Object</a:t>
+                  </a:r>
+                  <a:endParaRPr lang="en-US" sz="1200" dirty="0"/>
+                </a:p>
+              </p:txBody>
+            </p:sp>
+          </p:grpSp>
+          <p:grpSp>
+            <p:nvGrpSpPr>
+              <p:cNvPr id="18" name="Group 17"/>
+              <p:cNvGrpSpPr/>
+              <p:nvPr/>
+            </p:nvGrpSpPr>
+            <p:grpSpPr>
+              <a:xfrm>
+                <a:off x="3429000" y="5486400"/>
+                <a:ext cx="2362200" cy="838200"/>
+                <a:chOff x="2133600" y="4953000"/>
+                <a:chExt cx="2362200" cy="838200"/>
+              </a:xfrm>
+            </p:grpSpPr>
+            <p:sp>
+              <p:nvSpPr>
+                <p:cNvPr id="11" name="Rectangle 10"/>
+                <p:cNvSpPr/>
+                <p:nvPr/>
+              </p:nvSpPr>
+              <p:spPr>
+                <a:xfrm>
+                  <a:off x="2971800" y="5257800"/>
+                  <a:ext cx="1524000" cy="533400"/>
+                </a:xfrm>
+                <a:prstGeom prst="rect">
+                  <a:avLst/>
+                </a:prstGeom>
+              </p:spPr>
+              <p:style>
+                <a:lnRef idx="2">
+                  <a:schemeClr val="accent2">
+                    <a:shade val="50000"/>
+                  </a:schemeClr>
+                </a:lnRef>
+                <a:fillRef idx="1">
+                  <a:schemeClr val="accent2"/>
+                </a:fillRef>
+                <a:effectRef idx="0">
+                  <a:schemeClr val="accent2"/>
+                </a:effectRef>
+                <a:fontRef idx="minor">
+                  <a:schemeClr val="lt1"/>
+                </a:fontRef>
+              </p:style>
+              <p:txBody>
+                <a:bodyPr rtlCol="0" anchor="ctr"/>
+                <a:lstStyle/>
+                <a:p>
+                  <a:pPr algn="r"/>
+                  <a:r>
+                    <a:rPr lang="en-US" sz="1400" b="1" dirty="0" smtClean="0"/>
+                    <a:t>An Event Publishing Object</a:t>
+                  </a:r>
+                  <a:endParaRPr lang="en-US" sz="1400" b="1" dirty="0"/>
+                </a:p>
+              </p:txBody>
+            </p:sp>
+            <p:sp>
+              <p:nvSpPr>
+                <p:cNvPr id="6" name="Rectangle 5"/>
+                <p:cNvSpPr/>
+                <p:nvPr/>
+              </p:nvSpPr>
+              <p:spPr>
+                <a:xfrm>
+                  <a:off x="2133600" y="4953000"/>
+                  <a:ext cx="1524000" cy="533400"/>
+                </a:xfrm>
+                <a:prstGeom prst="rect">
+                  <a:avLst/>
+                </a:prstGeom>
+              </p:spPr>
+              <p:style>
+                <a:lnRef idx="2">
+                  <a:schemeClr val="accent1">
+                    <a:shade val="50000"/>
+                  </a:schemeClr>
+                </a:lnRef>
+                <a:fillRef idx="1">
+                  <a:schemeClr val="accent1"/>
+                </a:fillRef>
+                <a:effectRef idx="0">
+                  <a:schemeClr val="accent1"/>
+                </a:effectRef>
+                <a:fontRef idx="minor">
+                  <a:schemeClr val="lt1"/>
+                </a:fontRef>
+              </p:style>
+              <p:txBody>
+                <a:bodyPr rtlCol="0" anchor="ctr"/>
+                <a:lstStyle/>
+                <a:p>
+                  <a:pPr algn="ctr"/>
+                  <a:r>
+                    <a:rPr lang="en-US" sz="1200" dirty="0" smtClean="0"/>
+                    <a:t>Another Object</a:t>
+                  </a:r>
+                  <a:endParaRPr lang="en-US" sz="1200" dirty="0"/>
+                </a:p>
+              </p:txBody>
+            </p:sp>
+          </p:grpSp>
+        </p:grpSp>
+        <p:grpSp>
+          <p:nvGrpSpPr>
+            <p:cNvPr id="43" name="Group 42"/>
+            <p:cNvGrpSpPr/>
+            <p:nvPr/>
+          </p:nvGrpSpPr>
+          <p:grpSpPr>
+            <a:xfrm>
+              <a:off x="3429000" y="1828800"/>
+              <a:ext cx="1905000" cy="1752600"/>
+              <a:chOff x="3886200" y="1905000"/>
+              <a:chExt cx="1905000" cy="1752600"/>
+            </a:xfrm>
+          </p:grpSpPr>
+          <p:sp>
+            <p:nvSpPr>
+              <p:cNvPr id="4" name="Rectangle 3"/>
+              <p:cNvSpPr/>
+              <p:nvPr/>
+            </p:nvSpPr>
+            <p:spPr>
+              <a:xfrm>
+                <a:off x="3886200" y="1905000"/>
+                <a:ext cx="1524000" cy="304800"/>
+              </a:xfrm>
+              <a:prstGeom prst="rect">
+                <a:avLst/>
+              </a:prstGeom>
+            </p:spPr>
+            <p:style>
+              <a:lnRef idx="2">
+                <a:schemeClr val="accent2">
+                  <a:shade val="50000"/>
+                </a:schemeClr>
+              </a:lnRef>
+              <a:fillRef idx="1">
+                <a:schemeClr val="accent2"/>
+              </a:fillRef>
+              <a:effectRef idx="0">
+                <a:schemeClr val="accent2"/>
+              </a:effectRef>
+              <a:fontRef idx="minor">
+                <a:schemeClr val="lt1"/>
+              </a:fontRef>
+            </p:style>
+            <p:txBody>
+              <a:bodyPr rtlCol="0" anchor="ctr"/>
+              <a:lstStyle/>
+              <a:p>
+                <a:pPr algn="ctr"/>
+                <a:r>
+                  <a:rPr lang="en-US" sz="1200" dirty="0" err="1" smtClean="0"/>
+                  <a:t>IEventPublisher</a:t>
+                </a:r>
+                <a:endParaRPr lang="en-US" sz="1200" dirty="0"/>
+              </a:p>
+            </p:txBody>
+          </p:sp>
+          <p:grpSp>
+            <p:nvGrpSpPr>
+              <p:cNvPr id="22" name="Group 21"/>
+              <p:cNvGrpSpPr/>
+              <p:nvPr/>
+            </p:nvGrpSpPr>
+            <p:grpSpPr>
+              <a:xfrm>
+                <a:off x="3886200" y="2819400"/>
+                <a:ext cx="1905000" cy="838200"/>
+                <a:chOff x="3505200" y="2971800"/>
+                <a:chExt cx="1905000" cy="838200"/>
+              </a:xfrm>
+            </p:grpSpPr>
+            <p:sp>
+              <p:nvSpPr>
+                <p:cNvPr id="20" name="Rectangle 19"/>
+                <p:cNvSpPr/>
+                <p:nvPr/>
+              </p:nvSpPr>
+              <p:spPr>
+                <a:xfrm>
+                  <a:off x="3886200" y="3276600"/>
+                  <a:ext cx="1524000" cy="533400"/>
+                </a:xfrm>
+                <a:prstGeom prst="rect">
+                  <a:avLst/>
+                </a:prstGeom>
+              </p:spPr>
+              <p:style>
+                <a:lnRef idx="2">
+                  <a:schemeClr val="accent2">
+                    <a:shade val="50000"/>
+                  </a:schemeClr>
+                </a:lnRef>
+                <a:fillRef idx="1">
+                  <a:schemeClr val="accent2"/>
+                </a:fillRef>
+                <a:effectRef idx="0">
+                  <a:schemeClr val="accent2"/>
+                </a:effectRef>
+                <a:fontRef idx="minor">
+                  <a:schemeClr val="lt1"/>
+                </a:fontRef>
+              </p:style>
+              <p:txBody>
+                <a:bodyPr rtlCol="0" anchor="b" anchorCtr="0"/>
+                <a:lstStyle/>
+                <a:p>
+                  <a:pPr algn="r"/>
+                  <a:r>
+                    <a:rPr lang="en-US" sz="1400" b="1" dirty="0" smtClean="0"/>
+                    <a:t>An</a:t>
+                  </a:r>
+                </a:p>
+                <a:p>
+                  <a:pPr algn="r"/>
+                  <a:r>
+                    <a:rPr lang="en-US" sz="1400" b="1" dirty="0" smtClean="0"/>
+                    <a:t>Event Handler</a:t>
+                  </a:r>
+                  <a:endParaRPr lang="en-US" sz="1400" b="1" dirty="0"/>
+                </a:p>
+              </p:txBody>
+            </p:sp>
+            <p:sp>
+              <p:nvSpPr>
+                <p:cNvPr id="15" name="Rectangle 14"/>
+                <p:cNvSpPr/>
+                <p:nvPr/>
+              </p:nvSpPr>
+              <p:spPr>
+                <a:xfrm>
+                  <a:off x="3505200" y="2971800"/>
+                  <a:ext cx="1524000" cy="533400"/>
+                </a:xfrm>
+                <a:prstGeom prst="rect">
+                  <a:avLst/>
+                </a:prstGeom>
+              </p:spPr>
+              <p:style>
+                <a:lnRef idx="2">
+                  <a:schemeClr val="accent1">
+                    <a:shade val="50000"/>
+                  </a:schemeClr>
+                </a:lnRef>
+                <a:fillRef idx="1">
+                  <a:schemeClr val="accent1"/>
+                </a:fillRef>
+                <a:effectRef idx="0">
+                  <a:schemeClr val="accent1"/>
+                </a:effectRef>
+                <a:fontRef idx="minor">
+                  <a:schemeClr val="lt1"/>
+                </a:fontRef>
+              </p:style>
+              <p:txBody>
+                <a:bodyPr rtlCol="0" anchor="ctr"/>
+                <a:lstStyle/>
+                <a:p>
+                  <a:pPr algn="ctr"/>
+                  <a:r>
+                    <a:rPr lang="en-US" sz="1200" dirty="0" smtClean="0"/>
+                    <a:t>That Object</a:t>
+                  </a:r>
+                  <a:endParaRPr lang="en-US" sz="1200" dirty="0"/>
+                </a:p>
+              </p:txBody>
+            </p:sp>
+          </p:grpSp>
+          <p:cxnSp>
+            <p:nvCxnSpPr>
+              <p:cNvPr id="28" name="Elbow Connector 27"/>
+              <p:cNvCxnSpPr>
+                <a:stCxn id="4" idx="2"/>
+                <a:endCxn id="15" idx="0"/>
+              </p:cNvCxnSpPr>
+              <p:nvPr/>
+            </p:nvCxnSpPr>
+            <p:spPr>
+              <a:xfrm rot="5400000">
+                <a:off x="4343400" y="2514600"/>
+                <a:ext cx="609600" cy="1588"/>
+              </a:xfrm>
+              <a:prstGeom prst="bentConnector3">
+                <a:avLst>
+                  <a:gd name="adj1" fmla="val 50000"/>
+                </a:avLst>
+              </a:prstGeom>
+              <a:ln>
+                <a:tailEnd type="arrow"/>
+              </a:ln>
+            </p:spPr>
+            <p:style>
+              <a:lnRef idx="2">
+                <a:schemeClr val="accent3"/>
+              </a:lnRef>
+              <a:fillRef idx="0">
+                <a:schemeClr val="accent3"/>
+              </a:fillRef>
+              <a:effectRef idx="1">
+                <a:schemeClr val="accent3"/>
+              </a:effectRef>
+              <a:fontRef idx="minor">
+                <a:schemeClr val="tx1"/>
+              </a:fontRef>
+            </p:style>
+          </p:cxnSp>
+        </p:grpSp>
+        <p:cxnSp>
+          <p:nvCxnSpPr>
+            <p:cNvPr id="30" name="Shape 29"/>
+            <p:cNvCxnSpPr>
+              <a:stCxn id="15" idx="1"/>
+              <a:endCxn id="5" idx="0"/>
+            </p:cNvCxnSpPr>
+            <p:nvPr/>
+          </p:nvCxnSpPr>
+          <p:spPr>
+            <a:xfrm rot="10800000" flipV="1">
+              <a:off x="1981200" y="3009900"/>
+              <a:ext cx="1447800" cy="1028700"/>
+            </a:xfrm>
+            <a:prstGeom prst="bentConnector2">
+              <a:avLst/>
+            </a:prstGeom>
+            <a:ln>
+              <a:tailEnd type="arrow"/>
+            </a:ln>
+          </p:spPr>
+          <p:style>
+            <a:lnRef idx="2">
+              <a:schemeClr val="accent3"/>
+            </a:lnRef>
+            <a:fillRef idx="0">
+              <a:schemeClr val="accent3"/>
+            </a:fillRef>
+            <a:effectRef idx="1">
+              <a:schemeClr val="accent3"/>
+            </a:effectRef>
+            <a:fontRef idx="minor">
+              <a:schemeClr val="tx1"/>
+            </a:fontRef>
+          </p:style>
+        </p:cxnSp>
+        <p:cxnSp>
+          <p:nvCxnSpPr>
+            <p:cNvPr id="33" name="Shape 32"/>
+            <p:cNvCxnSpPr>
+              <a:stCxn id="15" idx="3"/>
+              <a:endCxn id="14" idx="0"/>
+            </p:cNvCxnSpPr>
+            <p:nvPr/>
+          </p:nvCxnSpPr>
+          <p:spPr>
+            <a:xfrm>
+              <a:off x="4953000" y="3009900"/>
+              <a:ext cx="1447800" cy="1028700"/>
+            </a:xfrm>
+            <a:prstGeom prst="bentConnector2">
+              <a:avLst/>
+            </a:prstGeom>
+            <a:ln>
+              <a:tailEnd type="arrow"/>
+            </a:ln>
+          </p:spPr>
+          <p:style>
+            <a:lnRef idx="2">
+              <a:schemeClr val="accent3"/>
+            </a:lnRef>
+            <a:fillRef idx="0">
+              <a:schemeClr val="accent3"/>
+            </a:fillRef>
+            <a:effectRef idx="1">
+              <a:schemeClr val="accent3"/>
+            </a:effectRef>
+            <a:fontRef idx="minor">
+              <a:schemeClr val="tx1"/>
+            </a:fontRef>
+          </p:style>
+        </p:cxnSp>
+        <p:cxnSp>
+          <p:nvCxnSpPr>
+            <p:cNvPr id="35" name="Elbow Connector 34"/>
+            <p:cNvCxnSpPr>
+              <a:stCxn id="15" idx="2"/>
+              <a:endCxn id="8" idx="0"/>
+            </p:cNvCxnSpPr>
+            <p:nvPr/>
+          </p:nvCxnSpPr>
+          <p:spPr>
+            <a:xfrm rot="5400000">
+              <a:off x="3810000" y="3657600"/>
+              <a:ext cx="762000" cy="1588"/>
+            </a:xfrm>
+            <a:prstGeom prst="bentConnector3">
+              <a:avLst>
+                <a:gd name="adj1" fmla="val 50000"/>
+              </a:avLst>
+            </a:prstGeom>
+            <a:ln>
+              <a:tailEnd type="arrow"/>
+            </a:ln>
+          </p:spPr>
+          <p:style>
+            <a:lnRef idx="2">
+              <a:schemeClr val="accent3"/>
+            </a:lnRef>
+            <a:fillRef idx="0">
+              <a:schemeClr val="accent3"/>
+            </a:fillRef>
+            <a:effectRef idx="1">
+              <a:schemeClr val="accent3"/>
+            </a:effectRef>
+            <a:fontRef idx="minor">
+              <a:schemeClr val="tx1"/>
+            </a:fontRef>
+          </p:style>
+        </p:cxnSp>
+        <p:cxnSp>
+          <p:nvCxnSpPr>
+            <p:cNvPr id="37" name="Elbow Connector 36"/>
+            <p:cNvCxnSpPr>
+              <a:stCxn id="5" idx="2"/>
+              <a:endCxn id="16" idx="0"/>
+            </p:cNvCxnSpPr>
+            <p:nvPr/>
+          </p:nvCxnSpPr>
+          <p:spPr>
+            <a:xfrm rot="5400000">
+              <a:off x="1181100" y="4686300"/>
+              <a:ext cx="914400" cy="685800"/>
+            </a:xfrm>
+            <a:prstGeom prst="bentConnector3">
+              <a:avLst>
+                <a:gd name="adj1" fmla="val 50000"/>
+              </a:avLst>
+            </a:prstGeom>
+            <a:ln>
+              <a:tailEnd type="arrow"/>
+            </a:ln>
+          </p:spPr>
+          <p:style>
+            <a:lnRef idx="2">
+              <a:schemeClr val="accent3"/>
+            </a:lnRef>
+            <a:fillRef idx="0">
+              <a:schemeClr val="accent3"/>
+            </a:fillRef>
+            <a:effectRef idx="1">
+              <a:schemeClr val="accent3"/>
+            </a:effectRef>
+            <a:fontRef idx="minor">
+              <a:schemeClr val="tx1"/>
+            </a:fontRef>
+          </p:style>
+        </p:cxnSp>
+        <p:cxnSp>
+          <p:nvCxnSpPr>
+            <p:cNvPr id="39" name="Elbow Connector 38"/>
+            <p:cNvCxnSpPr>
+              <a:stCxn id="8" idx="2"/>
+              <a:endCxn id="6" idx="0"/>
+            </p:cNvCxnSpPr>
+            <p:nvPr/>
+          </p:nvCxnSpPr>
+          <p:spPr>
+            <a:xfrm rot="5400000">
+              <a:off x="3733800" y="5029200"/>
+              <a:ext cx="914400" cy="1588"/>
+            </a:xfrm>
+            <a:prstGeom prst="bentConnector3">
+              <a:avLst>
+                <a:gd name="adj1" fmla="val 50000"/>
+              </a:avLst>
+            </a:prstGeom>
+            <a:ln>
+              <a:tailEnd type="arrow"/>
+            </a:ln>
+          </p:spPr>
+          <p:style>
+            <a:lnRef idx="2">
+              <a:schemeClr val="accent3"/>
+            </a:lnRef>
+            <a:fillRef idx="0">
+              <a:schemeClr val="accent3"/>
+            </a:fillRef>
+            <a:effectRef idx="1">
+              <a:schemeClr val="accent3"/>
+            </a:effectRef>
+            <a:fontRef idx="minor">
+              <a:schemeClr val="tx1"/>
+            </a:fontRef>
+          </p:style>
+        </p:cxnSp>
+        <p:cxnSp>
+          <p:nvCxnSpPr>
+            <p:cNvPr id="41" name="Elbow Connector 40"/>
+            <p:cNvCxnSpPr>
+              <a:stCxn id="14" idx="2"/>
+              <a:endCxn id="7" idx="0"/>
+            </p:cNvCxnSpPr>
+            <p:nvPr/>
+          </p:nvCxnSpPr>
+          <p:spPr>
+            <a:xfrm rot="16200000" flipH="1">
+              <a:off x="6286500" y="4686300"/>
+              <a:ext cx="914400" cy="685800"/>
+            </a:xfrm>
+            <a:prstGeom prst="bentConnector3">
+              <a:avLst>
+                <a:gd name="adj1" fmla="val 50000"/>
+              </a:avLst>
+            </a:prstGeom>
+            <a:ln>
+              <a:tailEnd type="arrow"/>
+            </a:ln>
+          </p:spPr>
+          <p:style>
+            <a:lnRef idx="2">
+              <a:schemeClr val="accent3"/>
+            </a:lnRef>
+            <a:fillRef idx="0">
+              <a:schemeClr val="accent3"/>
+            </a:fillRef>
+            <a:effectRef idx="1">
+              <a:schemeClr val="accent3"/>
+            </a:effectRef>
+            <a:fontRef idx="minor">
+              <a:schemeClr val="tx1"/>
+            </a:fontRef>
+          </p:style>
+        </p:cxnSp>
+      </p:grpSp>
     </p:spTree>
   </p:cSld>
   <p:clrMapOvr>
@@ -12229,19 +13572,7 @@
             </a:pPr>
             <a:r>
               <a:rPr lang="en-US" sz="2000" smtClean="0"/>
-              <a:t>“Some </a:t>
-            </a:r>
-            <a:r>
-              <a:rPr lang="en-US" sz="2000" smtClean="0"/>
-              <a:t>applications contain a significant amount of logic about the screens to use at different points, which may involve invoking certain screens at certain times in an </a:t>
-            </a:r>
-            <a:r>
-              <a:rPr lang="en-US" sz="2000" smtClean="0"/>
-              <a:t>application</a:t>
-            </a:r>
-            <a:r>
-              <a:rPr lang="en-US" sz="2000" smtClean="0"/>
-              <a:t>.” </a:t>
+              <a:t>“Some applications contain a significant amount of logic about the screens to use at different points, which may involve invoking certain screens at certain times in an application.” </a:t>
             </a:r>
             <a:endParaRPr lang="en-US" sz="2000" dirty="0" smtClean="0"/>
           </a:p>
@@ -12278,7 +13609,6 @@
               <a:rPr lang="en-US" dirty="0" smtClean="0"/>
               <a:t>Application Controller</a:t>
             </a:r>
-            <a:endParaRPr lang="en-US" dirty="0" smtClean="0"/>
           </a:p>
         </p:txBody>
       </p:sp>
@@ -17777,6 +19107,21 @@
 </file>
 
 <file path=customXml/item1.xml><?xml version="1.0" encoding="utf-8"?>
+<p:properties xmlns:p="http://schemas.microsoft.com/office/2006/metadata/properties" xmlns:xsi="http://www.w3.org/2001/XMLSchema-instance">
+  <documentManagement/>
+</p:properties>
+</file>
+
+<file path=customXml/item2.xml><?xml version="1.0" encoding="utf-8"?>
+<?mso-contentType ?>
+<FormTemplates xmlns="http://schemas.microsoft.com/sharepoint/v3/contenttype/forms">
+  <Display>DocumentLibraryForm</Display>
+  <Edit>DocumentLibraryForm</Edit>
+  <New>DocumentLibraryForm</New>
+</FormTemplates>
+</file>
+
+<file path=customXml/item3.xml><?xml version="1.0" encoding="utf-8"?>
 <ct:contentTypeSchema xmlns:ct="http://schemas.microsoft.com/office/2006/metadata/contentType" xmlns:ma="http://schemas.microsoft.com/office/2006/metadata/properties/metaAttributes" ct:_="" ma:_="" ma:contentTypeName="Document" ma:contentTypeID="0x0101005857B3975182FB47B67FAAA67052062C" ma:contentTypeVersion="0" ma:contentTypeDescription="Create a new document." ma:contentTypeScope="" ma:versionID="a1781edd533abf786dc62ee7dded643a">
   <xsd:schema xmlns:xsd="http://www.w3.org/2001/XMLSchema" xmlns:p="http://schemas.microsoft.com/office/2006/metadata/properties" targetNamespace="http://schemas.microsoft.com/office/2006/metadata/properties" ma:root="true" ma:fieldsID="4aeb20c0e3442673af7ee10786458764">
     <xsd:element name="properties">
@@ -17825,32 +19170,10 @@
 </ct:contentTypeSchema>
 </file>
 
-<file path=customXml/item2.xml><?xml version="1.0" encoding="utf-8"?>
-<?mso-contentType ?>
-<FormTemplates xmlns="http://schemas.microsoft.com/sharepoint/v3/contenttype/forms">
-  <Display>DocumentLibraryForm</Display>
-  <Edit>DocumentLibraryForm</Edit>
-  <New>DocumentLibraryForm</New>
-</FormTemplates>
-</file>
-
-<file path=customXml/item3.xml><?xml version="1.0" encoding="utf-8"?>
-<p:properties xmlns:p="http://schemas.microsoft.com/office/2006/metadata/properties" xmlns:xsi="http://www.w3.org/2001/XMLSchema-instance">
-  <documentManagement/>
-</p:properties>
-</file>
-
 <file path=customXml/itemProps1.xml><?xml version="1.0" encoding="utf-8"?>
-<ds:datastoreItem xmlns:ds="http://schemas.openxmlformats.org/officeDocument/2006/customXml" ds:itemID="{D3EBC05E-93E3-47EC-A4AA-B305F2941009}">
+<ds:datastoreItem xmlns:ds="http://schemas.openxmlformats.org/officeDocument/2006/customXml" ds:itemID="{F8AADC7F-5DC4-46F2-A809-0679B041C012}">
   <ds:schemaRefs>
-    <ds:schemaRef ds:uri="http://schemas.microsoft.com/office/2006/metadata/contentType"/>
-    <ds:schemaRef ds:uri="http://schemas.microsoft.com/office/2006/metadata/properties/metaAttributes"/>
-    <ds:schemaRef ds:uri="http://www.w3.org/2001/XMLSchema"/>
     <ds:schemaRef ds:uri="http://schemas.microsoft.com/office/2006/metadata/properties"/>
-    <ds:schemaRef ds:uri="http://schemas.openxmlformats.org/package/2006/metadata/core-properties"/>
-    <ds:schemaRef ds:uri="http://purl.org/dc/elements/1.1/"/>
-    <ds:schemaRef ds:uri="http://purl.org/dc/terms/"/>
-    <ds:schemaRef ds:uri="http://schemas.microsoft.com/office/internal/2005/internalDocumentation"/>
   </ds:schemaRefs>
 </ds:datastoreItem>
 </file>
@@ -17864,9 +19187,16 @@
 </file>
 
 <file path=customXml/itemProps3.xml><?xml version="1.0" encoding="utf-8"?>
-<ds:datastoreItem xmlns:ds="http://schemas.openxmlformats.org/officeDocument/2006/customXml" ds:itemID="{F8AADC7F-5DC4-46F2-A809-0679B041C012}">
+<ds:datastoreItem xmlns:ds="http://schemas.openxmlformats.org/officeDocument/2006/customXml" ds:itemID="{D3EBC05E-93E3-47EC-A4AA-B305F2941009}">
   <ds:schemaRefs>
+    <ds:schemaRef ds:uri="http://schemas.microsoft.com/office/2006/metadata/contentType"/>
+    <ds:schemaRef ds:uri="http://schemas.microsoft.com/office/2006/metadata/properties/metaAttributes"/>
+    <ds:schemaRef ds:uri="http://www.w3.org/2001/XMLSchema"/>
     <ds:schemaRef ds:uri="http://schemas.microsoft.com/office/2006/metadata/properties"/>
+    <ds:schemaRef ds:uri="http://schemas.openxmlformats.org/package/2006/metadata/core-properties"/>
+    <ds:schemaRef ds:uri="http://purl.org/dc/elements/1.1/"/>
+    <ds:schemaRef ds:uri="http://purl.org/dc/terms/"/>
+    <ds:schemaRef ds:uri="http://schemas.microsoft.com/office/internal/2005/internalDocumentation"/>
   </ds:schemaRefs>
 </ds:datastoreItem>
 </file>
</xml_diff>

<commit_message>
working on command pattern and event aggregator slides
</commit_message>
<xml_diff>
--- a/Decoupling Workflow With App Controler/Decoupling Workflow From Forms.pptx
+++ b/Decoupling Workflow With App Controler/Decoupling Workflow From Forms.pptx
@@ -5,10 +5,10 @@
     <p:sldMasterId id="2147483822" r:id="rId4"/>
   </p:sldMasterIdLst>
   <p:notesMasterIdLst>
-    <p:notesMasterId r:id="rId39"/>
+    <p:notesMasterId r:id="rId38"/>
   </p:notesMasterIdLst>
   <p:handoutMasterIdLst>
-    <p:handoutMasterId r:id="rId40"/>
+    <p:handoutMasterId r:id="rId39"/>
   </p:handoutMasterIdLst>
   <p:sldIdLst>
     <p:sldId id="256" r:id="rId5"/>
@@ -33,28 +33,27 @@
     <p:sldId id="285" r:id="rId24"/>
     <p:sldId id="300" r:id="rId25"/>
     <p:sldId id="305" r:id="rId26"/>
-    <p:sldId id="306" r:id="rId27"/>
-    <p:sldId id="307" r:id="rId28"/>
-    <p:sldId id="297" r:id="rId29"/>
-    <p:sldId id="276" r:id="rId30"/>
-    <p:sldId id="277" r:id="rId31"/>
-    <p:sldId id="284" r:id="rId32"/>
-    <p:sldId id="308" r:id="rId33"/>
-    <p:sldId id="292" r:id="rId34"/>
-    <p:sldId id="293" r:id="rId35"/>
-    <p:sldId id="294" r:id="rId36"/>
-    <p:sldId id="259" r:id="rId37"/>
-    <p:sldId id="274" r:id="rId38"/>
+    <p:sldId id="307" r:id="rId27"/>
+    <p:sldId id="297" r:id="rId28"/>
+    <p:sldId id="276" r:id="rId29"/>
+    <p:sldId id="277" r:id="rId30"/>
+    <p:sldId id="284" r:id="rId31"/>
+    <p:sldId id="308" r:id="rId32"/>
+    <p:sldId id="292" r:id="rId33"/>
+    <p:sldId id="293" r:id="rId34"/>
+    <p:sldId id="294" r:id="rId35"/>
+    <p:sldId id="259" r:id="rId36"/>
+    <p:sldId id="274" r:id="rId37"/>
   </p:sldIdLst>
   <p:sldSz cx="9144000" cy="6858000" type="screen4x3"/>
   <p:notesSz cx="7010400" cy="9296400"/>
   <p:embeddedFontLst>
     <p:embeddedFont>
       <p:font typeface="Calibri" pitchFamily="34" charset="0"/>
-      <p:regular r:id="rId41"/>
-      <p:bold r:id="rId42"/>
-      <p:italic r:id="rId43"/>
-      <p:boldItalic r:id="rId44"/>
+      <p:regular r:id="rId40"/>
+      <p:bold r:id="rId41"/>
+      <p:italic r:id="rId42"/>
+      <p:boldItalic r:id="rId43"/>
     </p:embeddedFont>
   </p:embeddedFontLst>
   <p:defaultTextStyle>
@@ -1875,7 +1874,7 @@
               <a:pPr>
                 <a:defRPr/>
               </a:pPr>
-              <a:t>25</a:t>
+              <a:t>26</a:t>
             </a:fld>
             <a:endParaRPr lang="en-US"/>
           </a:p>
@@ -2136,7 +2135,7 @@
               <a:pPr>
                 <a:defRPr/>
               </a:pPr>
-              <a:t>29</a:t>
+              <a:t>30</a:t>
             </a:fld>
             <a:endParaRPr lang="en-US"/>
           </a:p>
@@ -2224,93 +2223,6 @@
                 <a:defRPr/>
               </a:pPr>
               <a:t>31</a:t>
-            </a:fld>
-            <a:endParaRPr lang="en-US"/>
-          </a:p>
-        </p:txBody>
-      </p:sp>
-    </p:spTree>
-  </p:cSld>
-  <p:clrMapOvr>
-    <a:masterClrMapping/>
-  </p:clrMapOvr>
-</p:notes>
-</file>
-
-<file path=ppt/notesSlides/notesSlide25.xml><?xml version="1.0" encoding="utf-8"?>
-<p:notes xmlns:a="http://schemas.openxmlformats.org/drawingml/2006/main" xmlns:r="http://schemas.openxmlformats.org/officeDocument/2006/relationships" xmlns:p="http://schemas.openxmlformats.org/presentationml/2006/main">
-  <p:cSld>
-    <p:spTree>
-      <p:nvGrpSpPr>
-        <p:cNvPr id="1" name=""/>
-        <p:cNvGrpSpPr/>
-        <p:nvPr/>
-      </p:nvGrpSpPr>
-      <p:grpSpPr>
-        <a:xfrm>
-          <a:off x="0" y="0"/>
-          <a:ext cx="0" cy="0"/>
-          <a:chOff x="0" y="0"/>
-          <a:chExt cx="0" cy="0"/>
-        </a:xfrm>
-      </p:grpSpPr>
-      <p:sp>
-        <p:nvSpPr>
-          <p:cNvPr id="2" name="Slide Image Placeholder 1"/>
-          <p:cNvSpPr>
-            <a:spLocks noGrp="1" noRot="1" noChangeAspect="1"/>
-          </p:cNvSpPr>
-          <p:nvPr>
-            <p:ph type="sldImg"/>
-          </p:nvPr>
-        </p:nvSpPr>
-        <p:spPr/>
-      </p:sp>
-      <p:sp>
-        <p:nvSpPr>
-          <p:cNvPr id="3" name="Notes Placeholder 2"/>
-          <p:cNvSpPr>
-            <a:spLocks noGrp="1"/>
-          </p:cNvSpPr>
-          <p:nvPr>
-            <p:ph type="body" idx="1"/>
-          </p:nvPr>
-        </p:nvSpPr>
-        <p:spPr/>
-        <p:txBody>
-          <a:bodyPr>
-            <a:normAutofit/>
-          </a:bodyPr>
-          <a:lstStyle/>
-          <a:p>
-            <a:endParaRPr lang="en-US" dirty="0"/>
-          </a:p>
-        </p:txBody>
-      </p:sp>
-      <p:sp>
-        <p:nvSpPr>
-          <p:cNvPr id="4" name="Slide Number Placeholder 3"/>
-          <p:cNvSpPr>
-            <a:spLocks noGrp="1"/>
-          </p:cNvSpPr>
-          <p:nvPr>
-            <p:ph type="sldNum" sz="quarter" idx="10"/>
-          </p:nvPr>
-        </p:nvSpPr>
-        <p:spPr/>
-        <p:txBody>
-          <a:bodyPr/>
-          <a:lstStyle/>
-          <a:p>
-            <a:pPr>
-              <a:defRPr/>
-            </a:pPr>
-            <a:fld id="{1931C8FD-CC35-423B-99F4-64D81D6A80AE}" type="slidenum">
-              <a:rPr lang="en-US" smtClean="0"/>
-              <a:pPr>
-                <a:defRPr/>
-              </a:pPr>
-              <a:t>32</a:t>
             </a:fld>
             <a:endParaRPr lang="en-US"/>
           </a:p>
@@ -9347,16 +9259,17 @@
             </a:pPr>
             <a:r>
               <a:rPr lang="en-US" sz="2000" dirty="0" smtClean="0"/>
-              <a:t>Add New Employee: </a:t>
+              <a:t>Add New </a:t>
+            </a:r>
+            <a:r>
+              <a:rPr lang="en-US" sz="2000" dirty="0" smtClean="0"/>
+              <a:t>Employee With </a:t>
             </a:r>
             <a:r>
               <a:rPr lang="en-US" sz="2000" dirty="0" err="1" smtClean="0"/>
               <a:t>ICommand</a:t>
             </a:r>
-            <a:r>
-              <a:rPr lang="en-US" sz="2000" dirty="0" smtClean="0"/>
-              <a:t> In Action</a:t>
-            </a:r>
+            <a:endParaRPr lang="en-US" sz="2000" dirty="0" smtClean="0"/>
           </a:p>
         </p:txBody>
       </p:sp>
@@ -9396,151 +9309,309 @@
       </p:sp>
       <p:grpSp>
         <p:nvGrpSpPr>
-          <p:cNvPr id="33" name="Group 32"/>
+          <p:cNvPr id="26" name="Group 25"/>
           <p:cNvGrpSpPr/>
           <p:nvPr/>
         </p:nvGrpSpPr>
         <p:grpSpPr>
           <a:xfrm>
-            <a:off x="719138" y="1971675"/>
-            <a:ext cx="7705725" cy="4048125"/>
+            <a:off x="647700" y="2514600"/>
+            <a:ext cx="7848600" cy="2971800"/>
             <a:chOff x="533400" y="1600200"/>
-            <a:chExt cx="7705725" cy="4048125"/>
+            <a:chExt cx="7848600" cy="2971800"/>
           </a:xfrm>
         </p:grpSpPr>
-        <p:pic>
-          <p:nvPicPr>
-            <p:cNvPr id="5" name="Picture 2" descr="X:\Derick-GitHub\Presentation And Training Material\Decoupling Workflow With App Controler\doc\Org Chart View.png"/>
-            <p:cNvPicPr>
-              <a:picLocks noChangeAspect="1" noChangeArrowheads="1"/>
-            </p:cNvPicPr>
+        <p:grpSp>
+          <p:nvGrpSpPr>
+            <p:cNvPr id="17" name="Group 16"/>
+            <p:cNvGrpSpPr/>
             <p:nvPr/>
-          </p:nvPicPr>
-          <p:blipFill>
-            <a:blip r:embed="rId3"/>
-            <a:stretch>
-              <a:fillRect/>
-            </a:stretch>
-          </p:blipFill>
-          <p:spPr bwMode="auto">
+          </p:nvGrpSpPr>
+          <p:grpSpPr>
             <a:xfrm>
               <a:off x="533400" y="1600200"/>
-              <a:ext cx="4286250" cy="4048125"/>
+              <a:ext cx="6181725" cy="2971800"/>
+              <a:chOff x="533400" y="1600200"/>
+              <a:chExt cx="6181725" cy="2971800"/>
             </a:xfrm>
-            <a:prstGeom prst="rect">
-              <a:avLst/>
-            </a:prstGeom>
-            <a:noFill/>
-            <a:ln>
+          </p:grpSpPr>
+          <p:pic>
+            <p:nvPicPr>
+              <p:cNvPr id="5" name="Picture 2" descr="X:\Derick-GitHub\Presentation And Training Material\Decoupling Workflow With App Controler\doc\Org Chart View.png"/>
+              <p:cNvPicPr>
+                <a:picLocks noChangeAspect="1" noChangeArrowheads="1"/>
+              </p:cNvPicPr>
+              <p:nvPr/>
+            </p:nvPicPr>
+            <p:blipFill>
+              <a:blip r:embed="rId3"/>
+              <a:stretch>
+                <a:fillRect/>
+              </a:stretch>
+            </p:blipFill>
+            <p:spPr bwMode="auto">
+              <a:xfrm>
+                <a:off x="533400" y="1600200"/>
+                <a:ext cx="3146612" cy="2971800"/>
+              </a:xfrm>
+              <a:prstGeom prst="rect">
+                <a:avLst/>
+              </a:prstGeom>
               <a:noFill/>
-            </a:ln>
-          </p:spPr>
-        </p:pic>
-        <p:cxnSp>
-          <p:nvCxnSpPr>
-            <p:cNvPr id="7" name="Straight Connector 6"/>
-            <p:cNvCxnSpPr/>
+              <a:ln>
+                <a:noFill/>
+              </a:ln>
+            </p:spPr>
+          </p:pic>
+          <p:cxnSp>
+            <p:nvCxnSpPr>
+              <p:cNvPr id="7" name="Straight Connector 6"/>
+              <p:cNvCxnSpPr/>
+              <p:nvPr/>
+            </p:nvCxnSpPr>
+            <p:spPr>
+              <a:xfrm rot="5400000" flipH="1" flipV="1">
+                <a:off x="1295400" y="3429000"/>
+                <a:ext cx="1066800" cy="457200"/>
+              </a:xfrm>
+              <a:prstGeom prst="line">
+                <a:avLst/>
+              </a:prstGeom>
+              <a:ln w="38100">
+                <a:solidFill>
+                  <a:schemeClr val="accent2"/>
+                </a:solidFill>
+              </a:ln>
+            </p:spPr>
+            <p:style>
+              <a:lnRef idx="1">
+                <a:schemeClr val="accent1"/>
+              </a:lnRef>
+              <a:fillRef idx="0">
+                <a:schemeClr val="accent1"/>
+              </a:fillRef>
+              <a:effectRef idx="0">
+                <a:schemeClr val="accent1"/>
+              </a:effectRef>
+              <a:fontRef idx="minor">
+                <a:schemeClr val="tx1"/>
+              </a:fontRef>
+            </p:style>
+          </p:cxnSp>
+          <p:cxnSp>
+            <p:nvCxnSpPr>
+              <p:cNvPr id="8" name="Straight Connector 7"/>
+              <p:cNvCxnSpPr/>
+              <p:nvPr/>
+            </p:nvCxnSpPr>
+            <p:spPr>
+              <a:xfrm rot="5400000" flipH="1" flipV="1">
+                <a:off x="1562100" y="3848100"/>
+                <a:ext cx="533400" cy="457200"/>
+              </a:xfrm>
+              <a:prstGeom prst="line">
+                <a:avLst/>
+              </a:prstGeom>
+              <a:ln w="38100">
+                <a:solidFill>
+                  <a:schemeClr val="accent2"/>
+                </a:solidFill>
+              </a:ln>
+            </p:spPr>
+            <p:style>
+              <a:lnRef idx="1">
+                <a:schemeClr val="accent1"/>
+              </a:lnRef>
+              <a:fillRef idx="0">
+                <a:schemeClr val="accent1"/>
+              </a:fillRef>
+              <a:effectRef idx="0">
+                <a:schemeClr val="accent1"/>
+              </a:effectRef>
+              <a:fontRef idx="minor">
+                <a:schemeClr val="tx1"/>
+              </a:fontRef>
+            </p:style>
+          </p:cxnSp>
+          <p:pic>
+            <p:nvPicPr>
+              <p:cNvPr id="1026" name="Picture 2"/>
+              <p:cNvPicPr>
+                <a:picLocks noChangeAspect="1" noChangeArrowheads="1"/>
+              </p:cNvPicPr>
+              <p:nvPr/>
+            </p:nvPicPr>
+            <p:blipFill>
+              <a:blip r:embed="rId4"/>
+              <a:srcRect/>
+              <a:stretch>
+                <a:fillRect/>
+              </a:stretch>
+            </p:blipFill>
+            <p:spPr bwMode="auto">
+              <a:xfrm>
+                <a:off x="2057400" y="3124200"/>
+                <a:ext cx="4657725" cy="666750"/>
+              </a:xfrm>
+              <a:prstGeom prst="rect">
+                <a:avLst/>
+              </a:prstGeom>
+              <a:noFill/>
+              <a:ln w="38100">
+                <a:solidFill>
+                  <a:schemeClr val="accent2"/>
+                </a:solidFill>
+                <a:miter lim="800000"/>
+                <a:headEnd/>
+                <a:tailEnd/>
+              </a:ln>
+              <a:effectLst/>
+            </p:spPr>
+          </p:pic>
+        </p:grpSp>
+        <p:grpSp>
+          <p:nvGrpSpPr>
+            <p:cNvPr id="16" name="Group 15"/>
+            <p:cNvGrpSpPr/>
             <p:nvPr/>
-          </p:nvCxnSpPr>
-          <p:spPr>
-            <a:xfrm flipV="1">
-              <a:off x="1981200" y="3657600"/>
-              <a:ext cx="1600200" cy="1447800"/>
+          </p:nvGrpSpPr>
+          <p:grpSpPr>
+            <a:xfrm>
+              <a:off x="4219575" y="1600200"/>
+              <a:ext cx="4162425" cy="1152525"/>
+              <a:chOff x="4267200" y="2590800"/>
+              <a:chExt cx="4162425" cy="1152525"/>
             </a:xfrm>
-            <a:prstGeom prst="line">
-              <a:avLst/>
-            </a:prstGeom>
-            <a:ln w="38100">
+          </p:grpSpPr>
+          <p:sp>
+            <p:nvSpPr>
+              <p:cNvPr id="14" name="Rectangle 13"/>
+              <p:cNvSpPr/>
+              <p:nvPr/>
+            </p:nvSpPr>
+            <p:spPr>
+              <a:xfrm>
+                <a:off x="4267200" y="2590800"/>
+                <a:ext cx="1981200" cy="609600"/>
+              </a:xfrm>
+              <a:prstGeom prst="rect">
+                <a:avLst/>
+              </a:prstGeom>
+            </p:spPr>
+            <p:style>
+              <a:lnRef idx="2">
+                <a:schemeClr val="accent2">
+                  <a:shade val="50000"/>
+                </a:schemeClr>
+              </a:lnRef>
+              <a:fillRef idx="1">
+                <a:schemeClr val="accent2"/>
+              </a:fillRef>
+              <a:effectRef idx="0">
+                <a:schemeClr val="accent2"/>
+              </a:effectRef>
+              <a:fontRef idx="minor">
+                <a:schemeClr val="lt1"/>
+              </a:fontRef>
+            </p:style>
+            <p:txBody>
+              <a:bodyPr rtlCol="0" anchor="t" anchorCtr="0"/>
+              <a:lstStyle/>
+              <a:p>
+                <a:r>
+                  <a:rPr lang="en-US" sz="1400" dirty="0" err="1" smtClean="0"/>
+                  <a:t>OrgChartPresenter</a:t>
+                </a:r>
+                <a:endParaRPr lang="en-US" sz="1400" dirty="0"/>
+              </a:p>
+            </p:txBody>
+          </p:sp>
+          <p:pic>
+            <p:nvPicPr>
+              <p:cNvPr id="2050" name="Picture 2"/>
+              <p:cNvPicPr>
+                <a:picLocks noChangeAspect="1" noChangeArrowheads="1"/>
+              </p:cNvPicPr>
+              <p:nvPr/>
+            </p:nvPicPr>
+            <p:blipFill>
+              <a:blip r:embed="rId5"/>
+              <a:srcRect/>
+              <a:stretch>
+                <a:fillRect/>
+              </a:stretch>
+            </p:blipFill>
+            <p:spPr bwMode="auto">
+              <a:xfrm>
+                <a:off x="4495800" y="2895600"/>
+                <a:ext cx="3933825" cy="847725"/>
+              </a:xfrm>
+              <a:prstGeom prst="rect">
+                <a:avLst/>
+              </a:prstGeom>
+              <a:noFill/>
+              <a:ln w="38100">
+                <a:solidFill>
+                  <a:schemeClr val="accent2"/>
+                </a:solidFill>
+                <a:miter lim="800000"/>
+                <a:headEnd/>
+                <a:tailEnd/>
+              </a:ln>
+              <a:effectLst/>
+            </p:spPr>
+          </p:pic>
+          <p:sp>
+            <p:nvSpPr>
+              <p:cNvPr id="15" name="Rectangle 14"/>
+              <p:cNvSpPr/>
+              <p:nvPr/>
+            </p:nvSpPr>
+            <p:spPr>
+              <a:xfrm>
+                <a:off x="4648200" y="3200400"/>
+                <a:ext cx="3733800" cy="228600"/>
+              </a:xfrm>
+              <a:prstGeom prst="rect">
+                <a:avLst/>
+              </a:prstGeom>
               <a:solidFill>
-                <a:schemeClr val="accent2"/>
+                <a:srgbClr val="FFFF00">
+                  <a:alpha val="10196"/>
+                </a:srgbClr>
               </a:solidFill>
-            </a:ln>
-          </p:spPr>
-          <p:style>
-            <a:lnRef idx="1">
-              <a:schemeClr val="accent1"/>
-            </a:lnRef>
-            <a:fillRef idx="0">
-              <a:schemeClr val="accent1"/>
-            </a:fillRef>
-            <a:effectRef idx="0">
-              <a:schemeClr val="accent1"/>
-            </a:effectRef>
-            <a:fontRef idx="minor">
-              <a:schemeClr val="tx1"/>
-            </a:fontRef>
-          </p:style>
-        </p:cxnSp>
-        <p:cxnSp>
-          <p:nvCxnSpPr>
-            <p:cNvPr id="8" name="Straight Connector 7"/>
-            <p:cNvCxnSpPr/>
-            <p:nvPr/>
-          </p:nvCxnSpPr>
-          <p:spPr>
-            <a:xfrm flipV="1">
-              <a:off x="1981200" y="4343400"/>
-              <a:ext cx="1600200" cy="990600"/>
-            </a:xfrm>
-            <a:prstGeom prst="line">
-              <a:avLst/>
-            </a:prstGeom>
-            <a:ln w="38100">
-              <a:solidFill>
-                <a:schemeClr val="accent2"/>
-              </a:solidFill>
-            </a:ln>
-          </p:spPr>
-          <p:style>
-            <a:lnRef idx="1">
-              <a:schemeClr val="accent1"/>
-            </a:lnRef>
-            <a:fillRef idx="0">
-              <a:schemeClr val="accent1"/>
-            </a:fillRef>
-            <a:effectRef idx="0">
-              <a:schemeClr val="accent1"/>
-            </a:effectRef>
-            <a:fontRef idx="minor">
-              <a:schemeClr val="tx1"/>
-            </a:fontRef>
-          </p:style>
-        </p:cxnSp>
-        <p:pic>
-          <p:nvPicPr>
-            <p:cNvPr id="1026" name="Picture 2"/>
-            <p:cNvPicPr>
-              <a:picLocks noChangeAspect="1" noChangeArrowheads="1"/>
-            </p:cNvPicPr>
-            <p:nvPr/>
-          </p:nvPicPr>
-          <p:blipFill>
-            <a:blip r:embed="rId4"/>
-            <a:srcRect/>
-            <a:stretch>
-              <a:fillRect/>
-            </a:stretch>
-          </p:blipFill>
-          <p:spPr bwMode="auto">
-            <a:xfrm>
-              <a:off x="3581400" y="3657600"/>
-              <a:ext cx="4657725" cy="666750"/>
-            </a:xfrm>
-            <a:prstGeom prst="rect">
-              <a:avLst/>
-            </a:prstGeom>
-            <a:noFill/>
-            <a:ln w="38100">
-              <a:solidFill>
-                <a:schemeClr val="accent2"/>
-              </a:solidFill>
-              <a:miter lim="800000"/>
-              <a:headEnd/>
-              <a:tailEnd/>
-            </a:ln>
-            <a:effectLst/>
-          </p:spPr>
-        </p:pic>
+              <a:ln>
+                <a:solidFill>
+                  <a:srgbClr val="FFFF00"/>
+                </a:solidFill>
+              </a:ln>
+            </p:spPr>
+            <p:style>
+              <a:lnRef idx="2">
+                <a:schemeClr val="accent1">
+                  <a:shade val="50000"/>
+                </a:schemeClr>
+              </a:lnRef>
+              <a:fillRef idx="1">
+                <a:schemeClr val="accent1"/>
+              </a:fillRef>
+              <a:effectRef idx="0">
+                <a:schemeClr val="accent1"/>
+              </a:effectRef>
+              <a:fontRef idx="minor">
+                <a:schemeClr val="lt1"/>
+              </a:fontRef>
+            </p:style>
+            <p:txBody>
+              <a:bodyPr rtlCol="0" anchor="ctr"/>
+              <a:lstStyle/>
+              <a:p>
+                <a:pPr algn="ctr"/>
+                <a:endParaRPr lang="en-US"/>
+              </a:p>
+            </p:txBody>
+          </p:sp>
+        </p:grpSp>
       </p:grpSp>
     </p:spTree>
   </p:cSld>
@@ -9599,16 +9670,13 @@
             </a:pPr>
             <a:r>
               <a:rPr lang="en-US" sz="2000" dirty="0" smtClean="0"/>
-              <a:t>Add New Employee: </a:t>
-            </a:r>
-            <a:r>
-              <a:rPr lang="en-US" sz="2000" dirty="0" err="1" smtClean="0"/>
-              <a:t>ICommand</a:t>
+              <a:t>Add New </a:t>
             </a:r>
             <a:r>
               <a:rPr lang="en-US" sz="2000" dirty="0" smtClean="0"/>
-              <a:t> In Action</a:t>
+              <a:t>Employee Command</a:t>
             </a:r>
+            <a:endParaRPr lang="en-US" sz="2000" dirty="0" smtClean="0"/>
           </a:p>
         </p:txBody>
       </p:sp>
@@ -9648,71 +9716,139 @@
       </p:sp>
       <p:grpSp>
         <p:nvGrpSpPr>
-          <p:cNvPr id="9" name="Group 8"/>
+          <p:cNvPr id="14" name="Group 13"/>
           <p:cNvGrpSpPr/>
           <p:nvPr/>
         </p:nvGrpSpPr>
         <p:grpSpPr>
           <a:xfrm>
-            <a:off x="1862138" y="2314575"/>
-            <a:ext cx="5419725" cy="2790825"/>
-            <a:chOff x="3429000" y="1981200"/>
-            <a:chExt cx="5419725" cy="2790825"/>
+            <a:off x="552450" y="2244650"/>
+            <a:ext cx="8039100" cy="3317950"/>
+            <a:chOff x="381000" y="2790825"/>
+            <a:chExt cx="8039100" cy="3317950"/>
           </a:xfrm>
         </p:grpSpPr>
-        <p:sp>
-          <p:nvSpPr>
-            <p:cNvPr id="10" name="Rectangle 9"/>
-            <p:cNvSpPr/>
+        <p:grpSp>
+          <p:nvGrpSpPr>
+            <p:cNvPr id="10" name="Group 9"/>
+            <p:cNvGrpSpPr/>
             <p:nvPr/>
-          </p:nvSpPr>
-          <p:spPr>
+          </p:nvGrpSpPr>
+          <p:grpSpPr>
             <a:xfrm>
-              <a:off x="3429000" y="1981200"/>
-              <a:ext cx="1981200" cy="609600"/>
+              <a:off x="381000" y="3048000"/>
+              <a:ext cx="5543550" cy="3060775"/>
+              <a:chOff x="742950" y="1752600"/>
+              <a:chExt cx="8039100" cy="4438650"/>
             </a:xfrm>
-            <a:prstGeom prst="rect">
-              <a:avLst/>
-            </a:prstGeom>
-          </p:spPr>
-          <p:style>
-            <a:lnRef idx="2">
-              <a:schemeClr val="accent2">
-                <a:shade val="50000"/>
-              </a:schemeClr>
-            </a:lnRef>
-            <a:fillRef idx="1">
-              <a:schemeClr val="accent2"/>
-            </a:fillRef>
-            <a:effectRef idx="0">
-              <a:schemeClr val="accent2"/>
-            </a:effectRef>
-            <a:fontRef idx="minor">
-              <a:schemeClr val="lt1"/>
-            </a:fontRef>
-          </p:style>
-          <p:txBody>
-            <a:bodyPr rtlCol="0" anchor="t" anchorCtr="0"/>
-            <a:lstStyle/>
-            <a:p>
-              <a:r>
-                <a:rPr lang="en-US" sz="1400" dirty="0" err="1" smtClean="0"/>
-                <a:t>OrgChartPresenter</a:t>
-              </a:r>
-              <a:endParaRPr lang="en-US" sz="1400" dirty="0"/>
-            </a:p>
-          </p:txBody>
-        </p:sp>
+          </p:grpSpPr>
+          <p:pic>
+            <p:nvPicPr>
+              <p:cNvPr id="11" name="Picture 10" descr="X:\Derick-GitHub\Presentation And Training Material\Decoupling Workflow With App Controler\doc\New Employee - Info.png"/>
+              <p:cNvPicPr>
+                <a:picLocks noChangeAspect="1" noChangeArrowheads="1"/>
+              </p:cNvPicPr>
+              <p:nvPr/>
+            </p:nvPicPr>
+            <p:blipFill>
+              <a:blip r:embed="rId3"/>
+              <a:srcRect/>
+              <a:stretch>
+                <a:fillRect/>
+              </a:stretch>
+            </p:blipFill>
+            <p:spPr bwMode="auto">
+              <a:xfrm>
+                <a:off x="742950" y="1752600"/>
+                <a:ext cx="4286250" cy="2257425"/>
+              </a:xfrm>
+              <a:prstGeom prst="rect">
+                <a:avLst/>
+              </a:prstGeom>
+              <a:noFill/>
+            </p:spPr>
+          </p:pic>
+          <p:pic>
+            <p:nvPicPr>
+              <p:cNvPr id="12" name="Picture 11" descr="X:\Derick-GitHub\Presentation And Training Material\Decoupling Workflow With App Controler\doc\New Employee - Manager.png"/>
+              <p:cNvPicPr>
+                <a:picLocks noChangeAspect="1" noChangeArrowheads="1"/>
+              </p:cNvPicPr>
+              <p:nvPr/>
+            </p:nvPicPr>
+            <p:blipFill>
+              <a:blip r:embed="rId4"/>
+              <a:srcRect/>
+              <a:stretch>
+                <a:fillRect/>
+              </a:stretch>
+            </p:blipFill>
+            <p:spPr bwMode="auto">
+              <a:xfrm>
+                <a:off x="4495800" y="4419600"/>
+                <a:ext cx="4286250" cy="1771650"/>
+              </a:xfrm>
+              <a:prstGeom prst="rect">
+                <a:avLst/>
+              </a:prstGeom>
+              <a:noFill/>
+            </p:spPr>
+          </p:pic>
+          <p:sp>
+            <p:nvSpPr>
+              <p:cNvPr id="13" name="Arc 12"/>
+              <p:cNvSpPr/>
+              <p:nvPr/>
+            </p:nvSpPr>
+            <p:spPr>
+              <a:xfrm>
+                <a:off x="3581400" y="3505200"/>
+                <a:ext cx="2209800" cy="2209800"/>
+              </a:xfrm>
+              <a:prstGeom prst="arc">
+                <a:avLst>
+                  <a:gd name="adj1" fmla="val 16231089"/>
+                  <a:gd name="adj2" fmla="val 0"/>
+                </a:avLst>
+              </a:prstGeom>
+              <a:ln>
+                <a:tailEnd type="triangle"/>
+              </a:ln>
+            </p:spPr>
+            <p:style>
+              <a:lnRef idx="3">
+                <a:schemeClr val="accent2"/>
+              </a:lnRef>
+              <a:fillRef idx="0">
+                <a:schemeClr val="accent2"/>
+              </a:fillRef>
+              <a:effectRef idx="2">
+                <a:schemeClr val="accent2"/>
+              </a:effectRef>
+              <a:fontRef idx="minor">
+                <a:schemeClr val="tx1"/>
+              </a:fontRef>
+            </p:style>
+            <p:txBody>
+              <a:bodyPr rtlCol="0" anchor="ctr"/>
+              <a:lstStyle/>
+              <a:p>
+                <a:pPr algn="ctr"/>
+                <a:endParaRPr lang="en-US"/>
+              </a:p>
+            </p:txBody>
+          </p:sp>
+        </p:grpSp>
         <p:pic>
           <p:nvPicPr>
-            <p:cNvPr id="11" name="Picture 5"/>
+            <p:cNvPr id="9" name="Picture 3"/>
             <p:cNvPicPr>
               <a:picLocks noChangeAspect="1" noChangeArrowheads="1"/>
             </p:cNvPicPr>
             <p:nvPr/>
           </p:nvPicPr>
           <p:blipFill>
-            <a:blip r:embed="rId3"/>
+            <a:blip r:embed="rId5"/>
             <a:srcRect/>
             <a:stretch>
               <a:fillRect/>
@@ -9720,8 +9856,8 @@
           </p:blipFill>
           <p:spPr bwMode="auto">
             <a:xfrm>
-              <a:off x="3733800" y="2286000"/>
-              <a:ext cx="5114925" cy="2486025"/>
+              <a:off x="3581400" y="2790825"/>
+              <a:ext cx="4838700" cy="1781175"/>
             </a:xfrm>
             <a:prstGeom prst="rect">
               <a:avLst/>
@@ -9738,156 +9874,6 @@
             <a:effectLst/>
           </p:spPr>
         </p:pic>
-        <p:sp>
-          <p:nvSpPr>
-            <p:cNvPr id="12" name="Rectangle 11"/>
-            <p:cNvSpPr/>
-            <p:nvPr/>
-          </p:nvSpPr>
-          <p:spPr>
-            <a:xfrm>
-              <a:off x="3886200" y="2616817"/>
-              <a:ext cx="3352800" cy="152400"/>
-            </a:xfrm>
-            <a:prstGeom prst="rect">
-              <a:avLst/>
-            </a:prstGeom>
-            <a:solidFill>
-              <a:srgbClr val="FFFF00">
-                <a:alpha val="10196"/>
-              </a:srgbClr>
-            </a:solidFill>
-            <a:ln>
-              <a:solidFill>
-                <a:srgbClr val="FFFF00"/>
-              </a:solidFill>
-            </a:ln>
-          </p:spPr>
-          <p:style>
-            <a:lnRef idx="2">
-              <a:schemeClr val="accent1">
-                <a:shade val="50000"/>
-              </a:schemeClr>
-            </a:lnRef>
-            <a:fillRef idx="1">
-              <a:schemeClr val="accent1"/>
-            </a:fillRef>
-            <a:effectRef idx="0">
-              <a:schemeClr val="accent1"/>
-            </a:effectRef>
-            <a:fontRef idx="minor">
-              <a:schemeClr val="lt1"/>
-            </a:fontRef>
-          </p:style>
-          <p:txBody>
-            <a:bodyPr rtlCol="0" anchor="ctr"/>
-            <a:lstStyle/>
-            <a:p>
-              <a:pPr algn="ctr"/>
-              <a:endParaRPr lang="en-US"/>
-            </a:p>
-          </p:txBody>
-        </p:sp>
-        <p:sp>
-          <p:nvSpPr>
-            <p:cNvPr id="13" name="Rectangle 12"/>
-            <p:cNvSpPr/>
-            <p:nvPr/>
-          </p:nvSpPr>
-          <p:spPr>
-            <a:xfrm>
-              <a:off x="3886200" y="3200400"/>
-              <a:ext cx="3124200" cy="152400"/>
-            </a:xfrm>
-            <a:prstGeom prst="rect">
-              <a:avLst/>
-            </a:prstGeom>
-            <a:solidFill>
-              <a:srgbClr val="FFFF00">
-                <a:alpha val="10196"/>
-              </a:srgbClr>
-            </a:solidFill>
-            <a:ln>
-              <a:solidFill>
-                <a:srgbClr val="FFFF00"/>
-              </a:solidFill>
-            </a:ln>
-          </p:spPr>
-          <p:style>
-            <a:lnRef idx="2">
-              <a:schemeClr val="accent1">
-                <a:shade val="50000"/>
-              </a:schemeClr>
-            </a:lnRef>
-            <a:fillRef idx="1">
-              <a:schemeClr val="accent1"/>
-            </a:fillRef>
-            <a:effectRef idx="0">
-              <a:schemeClr val="accent1"/>
-            </a:effectRef>
-            <a:fontRef idx="minor">
-              <a:schemeClr val="lt1"/>
-            </a:fontRef>
-          </p:style>
-          <p:txBody>
-            <a:bodyPr rtlCol="0" anchor="ctr"/>
-            <a:lstStyle/>
-            <a:p>
-              <a:pPr algn="ctr"/>
-              <a:endParaRPr lang="en-US"/>
-            </a:p>
-          </p:txBody>
-        </p:sp>
-        <p:sp>
-          <p:nvSpPr>
-            <p:cNvPr id="14" name="Rectangle 13"/>
-            <p:cNvSpPr/>
-            <p:nvPr/>
-          </p:nvSpPr>
-          <p:spPr>
-            <a:xfrm>
-              <a:off x="3886200" y="4267200"/>
-              <a:ext cx="3733800" cy="152400"/>
-            </a:xfrm>
-            <a:prstGeom prst="rect">
-              <a:avLst/>
-            </a:prstGeom>
-            <a:solidFill>
-              <a:srgbClr val="FFFF00">
-                <a:alpha val="10196"/>
-              </a:srgbClr>
-            </a:solidFill>
-            <a:ln>
-              <a:solidFill>
-                <a:srgbClr val="FFFF00"/>
-              </a:solidFill>
-            </a:ln>
-          </p:spPr>
-          <p:style>
-            <a:lnRef idx="2">
-              <a:schemeClr val="accent1">
-                <a:shade val="50000"/>
-              </a:schemeClr>
-            </a:lnRef>
-            <a:fillRef idx="1">
-              <a:schemeClr val="accent1"/>
-            </a:fillRef>
-            <a:effectRef idx="0">
-              <a:schemeClr val="accent1"/>
-            </a:effectRef>
-            <a:fontRef idx="minor">
-              <a:schemeClr val="lt1"/>
-            </a:fontRef>
-          </p:style>
-          <p:txBody>
-            <a:bodyPr rtlCol="0" anchor="ctr"/>
-            <a:lstStyle/>
-            <a:p>
-              <a:pPr algn="ctr"/>
-              <a:endParaRPr lang="en-US"/>
-            </a:p>
-          </p:txBody>
-        </p:sp>
       </p:grpSp>
     </p:spTree>
   </p:cSld>
@@ -9946,7 +9932,7 @@
             </a:pPr>
             <a:r>
               <a:rPr lang="en-US" sz="2000" dirty="0" smtClean="0"/>
-              <a:t>Add New Employee: </a:t>
+              <a:t>The Real World: Coupling Within </a:t>
             </a:r>
             <a:r>
               <a:rPr lang="en-US" sz="2000" dirty="0" err="1" smtClean="0"/>
@@ -9954,7 +9940,7 @@
             </a:r>
             <a:r>
               <a:rPr lang="en-US" sz="2000" dirty="0" smtClean="0"/>
-              <a:t> In Action</a:t>
+              <a:t> Can Still Be Scary</a:t>
             </a:r>
           </a:p>
         </p:txBody>
@@ -9988,206 +9974,9 @@
             <a:pPr eaLnBrk="1" hangingPunct="1"/>
             <a:r>
               <a:rPr lang="en-US" dirty="0" smtClean="0"/>
-              <a:t>Simple Org Chart – v2</a:t>
+              <a:t>Pulling Dependencies Up</a:t>
             </a:r>
-          </a:p>
-        </p:txBody>
-      </p:sp>
-      <p:grpSp>
-        <p:nvGrpSpPr>
-          <p:cNvPr id="15" name="Group 14"/>
-          <p:cNvGrpSpPr/>
-          <p:nvPr/>
-        </p:nvGrpSpPr>
-        <p:grpSpPr>
-          <a:xfrm>
-            <a:off x="2021681" y="2895600"/>
-            <a:ext cx="5100638" cy="2085975"/>
-            <a:chOff x="2819400" y="4619625"/>
-            <a:chExt cx="5100638" cy="2085975"/>
-          </a:xfrm>
-        </p:grpSpPr>
-        <p:sp>
-          <p:nvSpPr>
-            <p:cNvPr id="16" name="Rectangle 15"/>
-            <p:cNvSpPr/>
-            <p:nvPr/>
-          </p:nvSpPr>
-          <p:spPr>
-            <a:xfrm>
-              <a:off x="5791200" y="6096000"/>
-              <a:ext cx="2128838" cy="609600"/>
-            </a:xfrm>
-            <a:prstGeom prst="rect">
-              <a:avLst/>
-            </a:prstGeom>
-          </p:spPr>
-          <p:style>
-            <a:lnRef idx="2">
-              <a:schemeClr val="accent2">
-                <a:shade val="50000"/>
-              </a:schemeClr>
-            </a:lnRef>
-            <a:fillRef idx="1">
-              <a:schemeClr val="accent2"/>
-            </a:fillRef>
-            <a:effectRef idx="0">
-              <a:schemeClr val="accent2"/>
-            </a:effectRef>
-            <a:fontRef idx="minor">
-              <a:schemeClr val="lt1"/>
-            </a:fontRef>
-          </p:style>
-          <p:txBody>
-            <a:bodyPr rtlCol="0" anchor="b" anchorCtr="0"/>
-            <a:lstStyle/>
-            <a:p>
-              <a:pPr algn="r"/>
-              <a:r>
-                <a:rPr lang="en-US" sz="1400" dirty="0" err="1" smtClean="0"/>
-                <a:t>AddNewUserCommand</a:t>
-              </a:r>
-              <a:endParaRPr lang="en-US" sz="1400" dirty="0"/>
-            </a:p>
-          </p:txBody>
-        </p:sp>
-        <p:pic>
-          <p:nvPicPr>
-            <p:cNvPr id="17" name="Picture 3"/>
-            <p:cNvPicPr>
-              <a:picLocks noChangeAspect="1" noChangeArrowheads="1"/>
-            </p:cNvPicPr>
-            <p:nvPr/>
-          </p:nvPicPr>
-          <p:blipFill>
-            <a:blip r:embed="rId3"/>
-            <a:srcRect/>
-            <a:stretch>
-              <a:fillRect/>
-            </a:stretch>
-          </p:blipFill>
-          <p:spPr bwMode="auto">
-            <a:xfrm>
-              <a:off x="2819400" y="4619625"/>
-              <a:ext cx="4838700" cy="1781175"/>
-            </a:xfrm>
-            <a:prstGeom prst="rect">
-              <a:avLst/>
-            </a:prstGeom>
-            <a:noFill/>
-            <a:ln w="38100">
-              <a:solidFill>
-                <a:schemeClr val="accent2"/>
-              </a:solidFill>
-              <a:miter lim="800000"/>
-              <a:headEnd/>
-              <a:tailEnd/>
-            </a:ln>
-            <a:effectLst/>
-          </p:spPr>
-        </p:pic>
-      </p:grpSp>
-    </p:spTree>
-  </p:cSld>
-  <p:clrMapOvr>
-    <a:masterClrMapping/>
-  </p:clrMapOvr>
-  <p:timing>
-    <p:tnLst>
-      <p:par>
-        <p:cTn id="1" dur="indefinite" restart="never" nodeType="tmRoot"/>
-      </p:par>
-    </p:tnLst>
-  </p:timing>
-</p:sld>
-</file>
-
-<file path=ppt/slides/slide25.xml><?xml version="1.0" encoding="utf-8"?>
-<p:sld xmlns:a="http://schemas.openxmlformats.org/drawingml/2006/main" xmlns:r="http://schemas.openxmlformats.org/officeDocument/2006/relationships" xmlns:p="http://schemas.openxmlformats.org/presentationml/2006/main">
-  <p:cSld>
-    <p:spTree>
-      <p:nvGrpSpPr>
-        <p:cNvPr id="1" name=""/>
-        <p:cNvGrpSpPr/>
-        <p:nvPr/>
-      </p:nvGrpSpPr>
-      <p:grpSpPr>
-        <a:xfrm>
-          <a:off x="0" y="0"/>
-          <a:ext cx="0" cy="0"/>
-          <a:chOff x="0" y="0"/>
-          <a:chExt cx="0" cy="0"/>
-        </a:xfrm>
-      </p:grpSpPr>
-      <p:sp>
-        <p:nvSpPr>
-          <p:cNvPr id="3075" name="Text Placeholder 2"/>
-          <p:cNvSpPr>
-            <a:spLocks noGrp="1"/>
-          </p:cNvSpPr>
-          <p:nvPr>
-            <p:ph type="body" sz="quarter" idx="10"/>
-          </p:nvPr>
-        </p:nvSpPr>
-        <p:spPr>
-          <a:xfrm>
-            <a:off x="685800" y="1066800"/>
-            <a:ext cx="8229600" cy="1219200"/>
-          </a:xfrm>
-        </p:spPr>
-        <p:txBody>
-          <a:bodyPr/>
-          <a:lstStyle/>
-          <a:p>
-            <a:pPr eaLnBrk="1" hangingPunct="1">
-              <a:buNone/>
-            </a:pPr>
-            <a:r>
-              <a:rPr lang="en-US" sz="2000" dirty="0" smtClean="0"/>
-              <a:t>The Real World: Coupling Within </a:t>
-            </a:r>
-            <a:r>
-              <a:rPr lang="en-US" sz="2000" dirty="0" err="1" smtClean="0"/>
-              <a:t>ICommand</a:t>
-            </a:r>
-            <a:r>
-              <a:rPr lang="en-US" sz="2000" dirty="0" smtClean="0"/>
-              <a:t> Can Still Be Scary</a:t>
-            </a:r>
-          </a:p>
-        </p:txBody>
-      </p:sp>
-      <p:sp>
-        <p:nvSpPr>
-          <p:cNvPr id="3074" name="Title 1"/>
-          <p:cNvSpPr>
-            <a:spLocks noGrp="1"/>
-          </p:cNvSpPr>
-          <p:nvPr>
-            <p:ph type="title"/>
-          </p:nvPr>
-        </p:nvSpPr>
-        <p:spPr bwMode="auto">
-          <a:noFill/>
-          <a:ln>
-            <a:miter lim="800000"/>
-            <a:headEnd/>
-            <a:tailEnd/>
-          </a:ln>
-        </p:spPr>
-        <p:txBody>
-          <a:bodyPr vert="horz" wrap="square" lIns="91440" tIns="45720" rIns="91440" bIns="45720" numCol="1" anchor="t" anchorCtr="0" compatLnSpc="1">
-            <a:prstTxWarp prst="textNoShape">
-              <a:avLst/>
-            </a:prstTxWarp>
-          </a:bodyPr>
-          <a:lstStyle/>
-          <a:p>
-            <a:pPr eaLnBrk="1" hangingPunct="1"/>
-            <a:r>
-              <a:rPr lang="en-US" dirty="0" smtClean="0"/>
-              <a:t>Simple Org Chart – v2</a:t>
-            </a:r>
+            <a:endParaRPr lang="en-US" dirty="0" smtClean="0"/>
           </a:p>
         </p:txBody>
       </p:sp>
@@ -10258,7 +10047,7 @@
 </p:sld>
 </file>
 
-<file path=ppt/slides/slide26.xml><?xml version="1.0" encoding="utf-8"?>
+<file path=ppt/slides/slide25.xml><?xml version="1.0" encoding="utf-8"?>
 <p:sld xmlns:a="http://schemas.openxmlformats.org/drawingml/2006/main" xmlns:r="http://schemas.openxmlformats.org/officeDocument/2006/relationships" xmlns:p="http://schemas.openxmlformats.org/presentationml/2006/main">
   <p:cSld>
     <p:spTree>
@@ -10589,7 +10378,7 @@
 </p:sld>
 </file>
 
-<file path=ppt/slides/slide27.xml><?xml version="1.0" encoding="utf-8"?>
+<file path=ppt/slides/slide26.xml><?xml version="1.0" encoding="utf-8"?>
 <p:sld xmlns:a="http://schemas.openxmlformats.org/drawingml/2006/main" xmlns:r="http://schemas.openxmlformats.org/officeDocument/2006/relationships" xmlns:p="http://schemas.openxmlformats.org/presentationml/2006/main">
   <p:cSld>
     <p:spTree>
@@ -11504,7 +11293,7 @@
 </p:sld>
 </file>
 
-<file path=ppt/slides/slide28.xml><?xml version="1.0" encoding="utf-8"?>
+<file path=ppt/slides/slide27.xml><?xml version="1.0" encoding="utf-8"?>
 <p:sld xmlns:a="http://schemas.openxmlformats.org/drawingml/2006/main" xmlns:r="http://schemas.openxmlformats.org/officeDocument/2006/relationships" xmlns:p="http://schemas.openxmlformats.org/presentationml/2006/main">
   <p:cSld>
     <p:spTree>
@@ -11588,16 +11377,16 @@
       </p:sp>
       <p:grpSp>
         <p:nvGrpSpPr>
-          <p:cNvPr id="28" name="Group 27"/>
+          <p:cNvPr id="35" name="Group 34"/>
           <p:cNvGrpSpPr/>
           <p:nvPr/>
         </p:nvGrpSpPr>
         <p:grpSpPr>
           <a:xfrm>
-            <a:off x="266700" y="1828800"/>
-            <a:ext cx="8610600" cy="4048125"/>
-            <a:chOff x="228600" y="1828800"/>
-            <a:chExt cx="8610600" cy="4048125"/>
+            <a:off x="781050" y="1676400"/>
+            <a:ext cx="7581901" cy="4572000"/>
+            <a:chOff x="762000" y="1828800"/>
+            <a:chExt cx="7581901" cy="4572000"/>
           </a:xfrm>
         </p:grpSpPr>
         <p:grpSp>
@@ -11608,10 +11397,10 @@
           </p:nvGrpSpPr>
           <p:grpSpPr>
             <a:xfrm>
-              <a:off x="857250" y="1828800"/>
-              <a:ext cx="7981950" cy="4048125"/>
+              <a:off x="895350" y="1828800"/>
+              <a:ext cx="7448551" cy="4048125"/>
               <a:chOff x="1104899" y="1828800"/>
-              <a:chExt cx="7981950" cy="4048125"/>
+              <a:chExt cx="7448551" cy="4048125"/>
             </a:xfrm>
           </p:grpSpPr>
           <p:pic>
@@ -11657,7 +11446,7 @@
             </p:blipFill>
             <p:spPr bwMode="auto">
               <a:xfrm>
-                <a:off x="5086348" y="4267200"/>
+                <a:off x="4552949" y="4267200"/>
                 <a:ext cx="4000501" cy="952500"/>
               </a:xfrm>
               <a:prstGeom prst="rect">
@@ -11683,7 +11472,7 @@
           </p:nvSpPr>
           <p:spPr>
             <a:xfrm>
-              <a:off x="1322696" y="2286000"/>
+              <a:off x="1360796" y="2286000"/>
               <a:ext cx="734704" cy="179696"/>
             </a:xfrm>
             <a:prstGeom prst="rect">
@@ -11733,7 +11522,7 @@
           </p:nvCxnSpPr>
           <p:spPr>
             <a:xfrm>
-              <a:off x="2057400" y="2286000"/>
+              <a:off x="2095500" y="2286000"/>
               <a:ext cx="1066800" cy="76200"/>
             </a:xfrm>
             <a:prstGeom prst="line">
@@ -11768,7 +11557,7 @@
           </p:nvCxnSpPr>
           <p:spPr>
             <a:xfrm>
-              <a:off x="2057400" y="2514600"/>
+              <a:off x="2095500" y="2514600"/>
               <a:ext cx="1066800" cy="457200"/>
             </a:xfrm>
             <a:prstGeom prst="line">
@@ -11795,79 +11584,9 @@
             </a:fontRef>
           </p:style>
         </p:cxnSp>
-        <p:cxnSp>
-          <p:nvCxnSpPr>
-            <p:cNvPr id="21" name="Straight Connector 20"/>
-            <p:cNvCxnSpPr/>
-            <p:nvPr/>
-          </p:nvCxnSpPr>
-          <p:spPr>
-            <a:xfrm rot="16200000" flipV="1">
-              <a:off x="4419600" y="3810000"/>
-              <a:ext cx="685800" cy="228600"/>
-            </a:xfrm>
-            <a:prstGeom prst="line">
-              <a:avLst/>
-            </a:prstGeom>
-            <a:ln w="38100">
-              <a:solidFill>
-                <a:schemeClr val="accent2"/>
-              </a:solidFill>
-            </a:ln>
-          </p:spPr>
-          <p:style>
-            <a:lnRef idx="1">
-              <a:schemeClr val="accent1"/>
-            </a:lnRef>
-            <a:fillRef idx="0">
-              <a:schemeClr val="accent1"/>
-            </a:fillRef>
-            <a:effectRef idx="0">
-              <a:schemeClr val="accent1"/>
-            </a:effectRef>
-            <a:fontRef idx="minor">
-              <a:schemeClr val="tx1"/>
-            </a:fontRef>
-          </p:style>
-        </p:cxnSp>
-        <p:cxnSp>
-          <p:nvCxnSpPr>
-            <p:cNvPr id="25" name="Straight Connector 24"/>
-            <p:cNvCxnSpPr/>
-            <p:nvPr/>
-          </p:nvCxnSpPr>
-          <p:spPr>
-            <a:xfrm rot="16200000" flipH="1">
-              <a:off x="4381500" y="4762500"/>
-              <a:ext cx="762000" cy="228600"/>
-            </a:xfrm>
-            <a:prstGeom prst="line">
-              <a:avLst/>
-            </a:prstGeom>
-            <a:ln w="38100">
-              <a:solidFill>
-                <a:schemeClr val="accent2"/>
-              </a:solidFill>
-            </a:ln>
-          </p:spPr>
-          <p:style>
-            <a:lnRef idx="1">
-              <a:schemeClr val="accent1"/>
-            </a:lnRef>
-            <a:fillRef idx="0">
-              <a:schemeClr val="accent1"/>
-            </a:fillRef>
-            <a:effectRef idx="0">
-              <a:schemeClr val="accent1"/>
-            </a:effectRef>
-            <a:fontRef idx="minor">
-              <a:schemeClr val="tx1"/>
-            </a:fontRef>
-          </p:style>
-        </p:cxnSp>
         <p:pic>
           <p:nvPicPr>
-            <p:cNvPr id="1028" name="Picture 4"/>
+            <p:cNvPr id="1027" name="Picture 3"/>
             <p:cNvPicPr>
               <a:picLocks noChangeAspect="1" noChangeArrowheads="1"/>
             </p:cNvPicPr>
@@ -11882,42 +11601,7 @@
           </p:blipFill>
           <p:spPr bwMode="auto">
             <a:xfrm>
-              <a:off x="228600" y="3581400"/>
-              <a:ext cx="4438650" cy="952500"/>
-            </a:xfrm>
-            <a:prstGeom prst="rect">
-              <a:avLst/>
-            </a:prstGeom>
-            <a:noFill/>
-            <a:ln w="38100">
-              <a:solidFill>
-                <a:schemeClr val="accent2"/>
-              </a:solidFill>
-              <a:miter lim="800000"/>
-              <a:headEnd/>
-              <a:tailEnd/>
-            </a:ln>
-            <a:effectLst/>
-          </p:spPr>
-        </p:pic>
-        <p:pic>
-          <p:nvPicPr>
-            <p:cNvPr id="1027" name="Picture 3"/>
-            <p:cNvPicPr>
-              <a:picLocks noChangeAspect="1" noChangeArrowheads="1"/>
-            </p:cNvPicPr>
-            <p:nvPr/>
-          </p:nvPicPr>
-          <p:blipFill>
-            <a:blip r:embed="rId6"/>
-            <a:srcRect/>
-            <a:stretch>
-              <a:fillRect/>
-            </a:stretch>
-          </p:blipFill>
-          <p:spPr bwMode="auto">
-            <a:xfrm>
-              <a:off x="3124200" y="2352675"/>
+              <a:off x="3162300" y="2352675"/>
               <a:ext cx="4667250" cy="619125"/>
             </a:xfrm>
             <a:prstGeom prst="rect">
@@ -11935,6 +11619,138 @@
             <a:effectLst/>
           </p:spPr>
         </p:pic>
+        <p:cxnSp>
+          <p:nvCxnSpPr>
+            <p:cNvPr id="32" name="Shape 31"/>
+            <p:cNvCxnSpPr>
+              <a:stCxn id="1028" idx="3"/>
+              <a:endCxn id="7" idx="2"/>
+            </p:cNvCxnSpPr>
+            <p:nvPr/>
+          </p:nvCxnSpPr>
+          <p:spPr>
+            <a:xfrm flipV="1">
+              <a:off x="5505450" y="5219700"/>
+              <a:ext cx="838201" cy="704850"/>
+            </a:xfrm>
+            <a:prstGeom prst="curvedConnector2">
+              <a:avLst/>
+            </a:prstGeom>
+            <a:ln w="38100">
+              <a:solidFill>
+                <a:schemeClr val="accent2"/>
+              </a:solidFill>
+              <a:tailEnd type="arrow"/>
+            </a:ln>
+          </p:spPr>
+          <p:style>
+            <a:lnRef idx="1">
+              <a:schemeClr val="accent1"/>
+            </a:lnRef>
+            <a:fillRef idx="0">
+              <a:schemeClr val="accent1"/>
+            </a:fillRef>
+            <a:effectRef idx="0">
+              <a:schemeClr val="accent1"/>
+            </a:effectRef>
+            <a:fontRef idx="minor">
+              <a:schemeClr val="tx1"/>
+            </a:fontRef>
+          </p:style>
+        </p:cxnSp>
+        <p:grpSp>
+          <p:nvGrpSpPr>
+            <p:cNvPr id="34" name="Group 33"/>
+            <p:cNvGrpSpPr/>
+            <p:nvPr/>
+          </p:nvGrpSpPr>
+          <p:grpSpPr>
+            <a:xfrm>
+              <a:off x="762000" y="5143500"/>
+              <a:ext cx="4743450" cy="1257300"/>
+              <a:chOff x="1143000" y="5105400"/>
+              <a:chExt cx="4743450" cy="1257300"/>
+            </a:xfrm>
+          </p:grpSpPr>
+          <p:sp>
+            <p:nvSpPr>
+              <p:cNvPr id="33" name="Rectangle 32"/>
+              <p:cNvSpPr/>
+              <p:nvPr/>
+            </p:nvSpPr>
+            <p:spPr>
+              <a:xfrm>
+                <a:off x="1143000" y="5105400"/>
+                <a:ext cx="1981200" cy="609600"/>
+              </a:xfrm>
+              <a:prstGeom prst="rect">
+                <a:avLst/>
+              </a:prstGeom>
+            </p:spPr>
+            <p:style>
+              <a:lnRef idx="2">
+                <a:schemeClr val="accent2">
+                  <a:shade val="50000"/>
+                </a:schemeClr>
+              </a:lnRef>
+              <a:fillRef idx="1">
+                <a:schemeClr val="accent2"/>
+              </a:fillRef>
+              <a:effectRef idx="0">
+                <a:schemeClr val="accent2"/>
+              </a:effectRef>
+              <a:fontRef idx="minor">
+                <a:schemeClr val="lt1"/>
+              </a:fontRef>
+            </p:style>
+            <p:txBody>
+              <a:bodyPr rtlCol="0" anchor="t" anchorCtr="0"/>
+              <a:lstStyle/>
+              <a:p>
+                <a:r>
+                  <a:rPr lang="en-US" sz="1400" dirty="0" err="1" smtClean="0"/>
+                  <a:t>OrgChartPresenter</a:t>
+                </a:r>
+                <a:endParaRPr lang="en-US" sz="1400" dirty="0"/>
+              </a:p>
+            </p:txBody>
+          </p:sp>
+          <p:pic>
+            <p:nvPicPr>
+              <p:cNvPr id="1028" name="Picture 4"/>
+              <p:cNvPicPr>
+                <a:picLocks noChangeAspect="1" noChangeArrowheads="1"/>
+              </p:cNvPicPr>
+              <p:nvPr/>
+            </p:nvPicPr>
+            <p:blipFill>
+              <a:blip r:embed="rId6"/>
+              <a:srcRect/>
+              <a:stretch>
+                <a:fillRect/>
+              </a:stretch>
+            </p:blipFill>
+            <p:spPr bwMode="auto">
+              <a:xfrm>
+                <a:off x="1447800" y="5410200"/>
+                <a:ext cx="4438650" cy="952500"/>
+              </a:xfrm>
+              <a:prstGeom prst="rect">
+                <a:avLst/>
+              </a:prstGeom>
+              <a:noFill/>
+              <a:ln w="38100">
+                <a:solidFill>
+                  <a:schemeClr val="accent2"/>
+                </a:solidFill>
+                <a:miter lim="800000"/>
+                <a:headEnd/>
+                <a:tailEnd/>
+              </a:ln>
+              <a:effectLst/>
+            </p:spPr>
+          </p:pic>
+        </p:grpSp>
       </p:grpSp>
     </p:spTree>
   </p:cSld>
@@ -11951,7 +11767,7 @@
 </p:sld>
 </file>
 
-<file path=ppt/slides/slide29.xml><?xml version="1.0" encoding="utf-8"?>
+<file path=ppt/slides/slide28.xml><?xml version="1.0" encoding="utf-8"?>
 <p:sld xmlns:a="http://schemas.openxmlformats.org/drawingml/2006/main" xmlns:r="http://schemas.openxmlformats.org/officeDocument/2006/relationships" xmlns:p="http://schemas.openxmlformats.org/presentationml/2006/main">
   <p:cSld>
     <p:spTree>
@@ -12371,11 +12187,7 @@
                   <a:pPr algn="ctr"/>
                   <a:r>
                     <a:rPr lang="en-US" sz="1200" dirty="0" smtClean="0"/>
-                    <a:t>Yet Another </a:t>
-                  </a:r>
-                  <a:r>
-                    <a:rPr lang="en-US" sz="1200" dirty="0" err="1" smtClean="0"/>
-                    <a:t>Obj</a:t>
+                    <a:t>Yet Another Object</a:t>
                   </a:r>
                   <a:endParaRPr lang="en-US" sz="1200" dirty="0"/>
                 </a:p>
@@ -13036,6 +12848,355 @@
 </p:sld>
 </file>
 
+<file path=ppt/slides/slide29.xml><?xml version="1.0" encoding="utf-8"?>
+<p:sld xmlns:a="http://schemas.openxmlformats.org/drawingml/2006/main" xmlns:r="http://schemas.openxmlformats.org/officeDocument/2006/relationships" xmlns:p="http://schemas.openxmlformats.org/presentationml/2006/main">
+  <p:cSld>
+    <p:spTree>
+      <p:nvGrpSpPr>
+        <p:cNvPr id="1" name=""/>
+        <p:cNvGrpSpPr/>
+        <p:nvPr/>
+      </p:nvGrpSpPr>
+      <p:grpSpPr>
+        <a:xfrm>
+          <a:off x="0" y="0"/>
+          <a:ext cx="0" cy="0"/>
+          <a:chOff x="0" y="0"/>
+          <a:chExt cx="0" cy="0"/>
+        </a:xfrm>
+      </p:grpSpPr>
+      <p:sp>
+        <p:nvSpPr>
+          <p:cNvPr id="4" name="Rectangle 3"/>
+          <p:cNvSpPr/>
+          <p:nvPr/>
+        </p:nvSpPr>
+        <p:spPr>
+          <a:xfrm>
+            <a:off x="0" y="0"/>
+            <a:ext cx="9144000" cy="4648200"/>
+          </a:xfrm>
+          <a:prstGeom prst="rect">
+            <a:avLst/>
+          </a:prstGeom>
+          <a:solidFill>
+            <a:srgbClr val="0069AA"/>
+          </a:solidFill>
+          <a:ln>
+            <a:noFill/>
+          </a:ln>
+        </p:spPr>
+        <p:style>
+          <a:lnRef idx="2">
+            <a:schemeClr val="accent1">
+              <a:shade val="50000"/>
+            </a:schemeClr>
+          </a:lnRef>
+          <a:fillRef idx="1">
+            <a:schemeClr val="accent1"/>
+          </a:fillRef>
+          <a:effectRef idx="0">
+            <a:schemeClr val="accent1"/>
+          </a:effectRef>
+          <a:fontRef idx="minor">
+            <a:schemeClr val="lt1"/>
+          </a:fontRef>
+        </p:style>
+        <p:txBody>
+          <a:bodyPr anchor="ctr"/>
+          <a:lstStyle/>
+          <a:p>
+            <a:pPr algn="ctr">
+              <a:defRPr/>
+            </a:pPr>
+            <a:endParaRPr lang="en-US"/>
+          </a:p>
+        </p:txBody>
+      </p:sp>
+      <p:pic>
+        <p:nvPicPr>
+          <p:cNvPr id="4099" name="Picture 4" descr="MAT logo 1 CMYK"/>
+          <p:cNvPicPr>
+            <a:picLocks noChangeAspect="1" noChangeArrowheads="1"/>
+          </p:cNvPicPr>
+          <p:nvPr/>
+        </p:nvPicPr>
+        <p:blipFill>
+          <a:blip r:embed="rId2">
+            <a:clrChange>
+              <a:clrFrom>
+                <a:srgbClr val="FDFDFD"/>
+              </a:clrFrom>
+              <a:clrTo>
+                <a:srgbClr val="FDFDFD">
+                  <a:alpha val="0"/>
+                </a:srgbClr>
+              </a:clrTo>
+            </a:clrChange>
+          </a:blip>
+          <a:srcRect/>
+          <a:stretch>
+            <a:fillRect/>
+          </a:stretch>
+        </p:blipFill>
+        <p:spPr bwMode="auto">
+          <a:xfrm>
+            <a:off x="2971800" y="4800600"/>
+            <a:ext cx="2819400" cy="1338263"/>
+          </a:xfrm>
+          <a:prstGeom prst="rect">
+            <a:avLst/>
+          </a:prstGeom>
+          <a:noFill/>
+          <a:ln w="9525">
+            <a:noFill/>
+            <a:miter lim="800000"/>
+            <a:headEnd/>
+            <a:tailEnd/>
+          </a:ln>
+        </p:spPr>
+      </p:pic>
+      <p:sp>
+        <p:nvSpPr>
+          <p:cNvPr id="5" name="Rectangle 4"/>
+          <p:cNvSpPr/>
+          <p:nvPr/>
+        </p:nvSpPr>
+        <p:spPr>
+          <a:xfrm>
+            <a:off x="0" y="4724400"/>
+            <a:ext cx="9144000" cy="2133600"/>
+          </a:xfrm>
+          <a:prstGeom prst="rect">
+            <a:avLst/>
+          </a:prstGeom>
+          <a:solidFill>
+            <a:srgbClr val="E31937"/>
+          </a:solidFill>
+          <a:ln>
+            <a:noFill/>
+          </a:ln>
+        </p:spPr>
+        <p:style>
+          <a:lnRef idx="2">
+            <a:schemeClr val="accent1">
+              <a:shade val="50000"/>
+            </a:schemeClr>
+          </a:lnRef>
+          <a:fillRef idx="1">
+            <a:schemeClr val="accent1"/>
+          </a:fillRef>
+          <a:effectRef idx="0">
+            <a:schemeClr val="accent1"/>
+          </a:effectRef>
+          <a:fontRef idx="minor">
+            <a:schemeClr val="lt1"/>
+          </a:fontRef>
+        </p:style>
+        <p:txBody>
+          <a:bodyPr anchor="ctr"/>
+          <a:lstStyle/>
+          <a:p>
+            <a:pPr algn="ctr">
+              <a:defRPr/>
+            </a:pPr>
+            <a:endParaRPr lang="en-US"/>
+          </a:p>
+        </p:txBody>
+      </p:sp>
+      <p:sp>
+        <p:nvSpPr>
+          <p:cNvPr id="10" name="Rectangle 9"/>
+          <p:cNvSpPr/>
+          <p:nvPr/>
+        </p:nvSpPr>
+        <p:spPr bwMode="auto">
+          <a:xfrm>
+            <a:off x="228600" y="0"/>
+            <a:ext cx="104775" cy="2325688"/>
+          </a:xfrm>
+          <a:prstGeom prst="rect">
+            <a:avLst/>
+          </a:prstGeom>
+          <a:solidFill>
+            <a:srgbClr val="E31937"/>
+          </a:solidFill>
+          <a:ln>
+            <a:noFill/>
+          </a:ln>
+        </p:spPr>
+        <p:style>
+          <a:lnRef idx="2">
+            <a:schemeClr val="accent1">
+              <a:shade val="50000"/>
+            </a:schemeClr>
+          </a:lnRef>
+          <a:fillRef idx="1">
+            <a:schemeClr val="accent1"/>
+          </a:fillRef>
+          <a:effectRef idx="0">
+            <a:schemeClr val="accent1"/>
+          </a:effectRef>
+          <a:fontRef idx="minor">
+            <a:schemeClr val="lt1"/>
+          </a:fontRef>
+        </p:style>
+        <p:txBody>
+          <a:bodyPr anchor="ctr"/>
+          <a:lstStyle/>
+          <a:p>
+            <a:pPr algn="ctr">
+              <a:defRPr/>
+            </a:pPr>
+            <a:endParaRPr lang="en-US"/>
+          </a:p>
+        </p:txBody>
+      </p:sp>
+      <p:pic>
+        <p:nvPicPr>
+          <p:cNvPr id="4103" name="Picture 7" descr="MAT logo vertical_red.emf"/>
+          <p:cNvPicPr>
+            <a:picLocks noChangeAspect="1"/>
+          </p:cNvPicPr>
+          <p:nvPr/>
+        </p:nvPicPr>
+        <p:blipFill>
+          <a:blip r:embed="rId3"/>
+          <a:srcRect/>
+          <a:stretch>
+            <a:fillRect/>
+          </a:stretch>
+        </p:blipFill>
+        <p:spPr bwMode="auto">
+          <a:xfrm>
+            <a:off x="3600450" y="5334000"/>
+            <a:ext cx="1981200" cy="969963"/>
+          </a:xfrm>
+          <a:prstGeom prst="rect">
+            <a:avLst/>
+          </a:prstGeom>
+          <a:noFill/>
+          <a:ln w="9525">
+            <a:noFill/>
+            <a:miter lim="800000"/>
+            <a:headEnd/>
+            <a:tailEnd/>
+          </a:ln>
+        </p:spPr>
+      </p:pic>
+      <p:sp>
+        <p:nvSpPr>
+          <p:cNvPr id="9" name="TextBox 8"/>
+          <p:cNvSpPr txBox="1"/>
+          <p:nvPr/>
+        </p:nvSpPr>
+        <p:spPr>
+          <a:xfrm>
+            <a:off x="381000" y="1447800"/>
+            <a:ext cx="8610600" cy="646331"/>
+          </a:xfrm>
+          <a:prstGeom prst="rect">
+            <a:avLst/>
+          </a:prstGeom>
+          <a:noFill/>
+        </p:spPr>
+        <p:txBody>
+          <a:bodyPr>
+            <a:spAutoFit/>
+          </a:bodyPr>
+          <a:lstStyle/>
+          <a:p>
+            <a:pPr>
+              <a:defRPr/>
+            </a:pPr>
+            <a:r>
+              <a:rPr lang="en-US" sz="3600" spc="60" dirty="0" smtClean="0">
+                <a:solidFill>
+                  <a:schemeClr val="bg1"/>
+                </a:solidFill>
+                <a:latin typeface="Calibri" pitchFamily="34" charset="0"/>
+              </a:rPr>
+              <a:t>Simple Org Chart – Final Version</a:t>
+            </a:r>
+            <a:endParaRPr lang="en-US" sz="3600" spc="60" dirty="0">
+              <a:solidFill>
+                <a:schemeClr val="bg1"/>
+              </a:solidFill>
+              <a:latin typeface="Calibri" pitchFamily="34" charset="0"/>
+            </a:endParaRPr>
+          </a:p>
+        </p:txBody>
+      </p:sp>
+      <p:sp>
+        <p:nvSpPr>
+          <p:cNvPr id="11" name="TextBox 10"/>
+          <p:cNvSpPr txBox="1"/>
+          <p:nvPr/>
+        </p:nvSpPr>
+        <p:spPr>
+          <a:xfrm>
+            <a:off x="381000" y="2057400"/>
+            <a:ext cx="7543800" cy="338554"/>
+          </a:xfrm>
+          <a:prstGeom prst="rect">
+            <a:avLst/>
+          </a:prstGeom>
+          <a:noFill/>
+        </p:spPr>
+        <p:txBody>
+          <a:bodyPr wrap="square">
+            <a:spAutoFit/>
+          </a:bodyPr>
+          <a:lstStyle/>
+          <a:p>
+            <a:pPr>
+              <a:defRPr/>
+            </a:pPr>
+            <a:r>
+              <a:rPr lang="en-US" sz="1600" dirty="0" smtClean="0">
+                <a:solidFill>
+                  <a:schemeClr val="bg1"/>
+                </a:solidFill>
+                <a:latin typeface="+mn-lt"/>
+              </a:rPr>
+              <a:t>Orchestration With An Application Controller And </a:t>
+            </a:r>
+            <a:r>
+              <a:rPr lang="en-US" sz="1600" dirty="0" err="1" smtClean="0">
+                <a:solidFill>
+                  <a:schemeClr val="bg1"/>
+                </a:solidFill>
+                <a:latin typeface="+mn-lt"/>
+              </a:rPr>
+              <a:t>IoC</a:t>
+            </a:r>
+            <a:r>
+              <a:rPr lang="en-US" sz="1600" dirty="0" smtClean="0">
+                <a:solidFill>
+                  <a:schemeClr val="bg1"/>
+                </a:solidFill>
+                <a:latin typeface="+mn-lt"/>
+              </a:rPr>
+              <a:t> Container</a:t>
+            </a:r>
+          </a:p>
+        </p:txBody>
+      </p:sp>
+    </p:spTree>
+  </p:cSld>
+  <p:clrMapOvr>
+    <a:masterClrMapping/>
+  </p:clrMapOvr>
+  <p:timing>
+    <p:tnLst>
+      <p:par>
+        <p:cTn id="1" dur="indefinite" restart="never" nodeType="tmRoot"/>
+      </p:par>
+    </p:tnLst>
+  </p:timing>
+</p:sld>
+</file>
+
 <file path=ppt/slides/slide3.xml><?xml version="1.0" encoding="utf-8"?>
 <p:sld xmlns:a="http://schemas.openxmlformats.org/drawingml/2006/main" xmlns:r="http://schemas.openxmlformats.org/officeDocument/2006/relationships" xmlns:p="http://schemas.openxmlformats.org/presentationml/2006/main">
   <p:cSld>
@@ -13200,317 +13361,65 @@
       </p:grpSpPr>
       <p:sp>
         <p:nvSpPr>
-          <p:cNvPr id="4" name="Rectangle 3"/>
-          <p:cNvSpPr/>
-          <p:nvPr/>
+          <p:cNvPr id="3075" name="Text Placeholder 2"/>
+          <p:cNvSpPr>
+            <a:spLocks noGrp="1"/>
+          </p:cNvSpPr>
+          <p:nvPr>
+            <p:ph type="body" sz="quarter" idx="10"/>
+          </p:nvPr>
         </p:nvSpPr>
         <p:spPr>
           <a:xfrm>
-            <a:off x="0" y="0"/>
-            <a:ext cx="9144000" cy="4648200"/>
+            <a:off x="685800" y="1066800"/>
+            <a:ext cx="8229600" cy="1219200"/>
           </a:xfrm>
-          <a:prstGeom prst="rect">
-            <a:avLst/>
-          </a:prstGeom>
-          <a:solidFill>
-            <a:srgbClr val="0069AA"/>
-          </a:solidFill>
+        </p:spPr>
+        <p:txBody>
+          <a:bodyPr/>
+          <a:lstStyle/>
+          <a:p>
+            <a:pPr eaLnBrk="1" hangingPunct="1">
+              <a:buNone/>
+            </a:pPr>
+            <a:r>
+              <a:rPr lang="en-US" sz="2000" smtClean="0"/>
+              <a:t>“Some applications contain a significant amount of logic about the screens to use at different points, which may involve invoking certain screens at certain times in an application.” </a:t>
+            </a:r>
+            <a:endParaRPr lang="en-US" sz="2000" dirty="0" smtClean="0"/>
+          </a:p>
+        </p:txBody>
+      </p:sp>
+      <p:sp>
+        <p:nvSpPr>
+          <p:cNvPr id="3074" name="Title 1"/>
+          <p:cNvSpPr>
+            <a:spLocks noGrp="1"/>
+          </p:cNvSpPr>
+          <p:nvPr>
+            <p:ph type="title"/>
+          </p:nvPr>
+        </p:nvSpPr>
+        <p:spPr bwMode="auto">
+          <a:noFill/>
           <a:ln>
-            <a:noFill/>
-          </a:ln>
-        </p:spPr>
-        <p:style>
-          <a:lnRef idx="2">
-            <a:schemeClr val="accent1">
-              <a:shade val="50000"/>
-            </a:schemeClr>
-          </a:lnRef>
-          <a:fillRef idx="1">
-            <a:schemeClr val="accent1"/>
-          </a:fillRef>
-          <a:effectRef idx="0">
-            <a:schemeClr val="accent1"/>
-          </a:effectRef>
-          <a:fontRef idx="minor">
-            <a:schemeClr val="lt1"/>
-          </a:fontRef>
-        </p:style>
-        <p:txBody>
-          <a:bodyPr anchor="ctr"/>
-          <a:lstStyle/>
-          <a:p>
-            <a:pPr algn="ctr">
-              <a:defRPr/>
-            </a:pPr>
-            <a:endParaRPr lang="en-US"/>
-          </a:p>
-        </p:txBody>
-      </p:sp>
-      <p:pic>
-        <p:nvPicPr>
-          <p:cNvPr id="4099" name="Picture 4" descr="MAT logo 1 CMYK"/>
-          <p:cNvPicPr>
-            <a:picLocks noChangeAspect="1" noChangeArrowheads="1"/>
-          </p:cNvPicPr>
-          <p:nvPr/>
-        </p:nvPicPr>
-        <p:blipFill>
-          <a:blip r:embed="rId2">
-            <a:clrChange>
-              <a:clrFrom>
-                <a:srgbClr val="FDFDFD"/>
-              </a:clrFrom>
-              <a:clrTo>
-                <a:srgbClr val="FDFDFD">
-                  <a:alpha val="0"/>
-                </a:srgbClr>
-              </a:clrTo>
-            </a:clrChange>
-          </a:blip>
-          <a:srcRect/>
-          <a:stretch>
-            <a:fillRect/>
-          </a:stretch>
-        </p:blipFill>
-        <p:spPr bwMode="auto">
-          <a:xfrm>
-            <a:off x="2971800" y="4800600"/>
-            <a:ext cx="2819400" cy="1338263"/>
-          </a:xfrm>
-          <a:prstGeom prst="rect">
-            <a:avLst/>
-          </a:prstGeom>
-          <a:noFill/>
-          <a:ln w="9525">
-            <a:noFill/>
             <a:miter lim="800000"/>
             <a:headEnd/>
             <a:tailEnd/>
           </a:ln>
         </p:spPr>
-      </p:pic>
-      <p:sp>
-        <p:nvSpPr>
-          <p:cNvPr id="5" name="Rectangle 4"/>
-          <p:cNvSpPr/>
-          <p:nvPr/>
-        </p:nvSpPr>
-        <p:spPr>
-          <a:xfrm>
-            <a:off x="0" y="4724400"/>
-            <a:ext cx="9144000" cy="2133600"/>
-          </a:xfrm>
-          <a:prstGeom prst="rect">
-            <a:avLst/>
-          </a:prstGeom>
-          <a:solidFill>
-            <a:srgbClr val="E31937"/>
-          </a:solidFill>
-          <a:ln>
-            <a:noFill/>
-          </a:ln>
-        </p:spPr>
-        <p:style>
-          <a:lnRef idx="2">
-            <a:schemeClr val="accent1">
-              <a:shade val="50000"/>
-            </a:schemeClr>
-          </a:lnRef>
-          <a:fillRef idx="1">
-            <a:schemeClr val="accent1"/>
-          </a:fillRef>
-          <a:effectRef idx="0">
-            <a:schemeClr val="accent1"/>
-          </a:effectRef>
-          <a:fontRef idx="minor">
-            <a:schemeClr val="lt1"/>
-          </a:fontRef>
-        </p:style>
         <p:txBody>
-          <a:bodyPr anchor="ctr"/>
-          <a:lstStyle/>
-          <a:p>
-            <a:pPr algn="ctr">
-              <a:defRPr/>
-            </a:pPr>
-            <a:endParaRPr lang="en-US"/>
-          </a:p>
-        </p:txBody>
-      </p:sp>
-      <p:sp>
-        <p:nvSpPr>
-          <p:cNvPr id="10" name="Rectangle 9"/>
-          <p:cNvSpPr/>
-          <p:nvPr/>
-        </p:nvSpPr>
-        <p:spPr bwMode="auto">
-          <a:xfrm>
-            <a:off x="228600" y="0"/>
-            <a:ext cx="104775" cy="2325688"/>
-          </a:xfrm>
-          <a:prstGeom prst="rect">
-            <a:avLst/>
-          </a:prstGeom>
-          <a:solidFill>
-            <a:srgbClr val="E31937"/>
-          </a:solidFill>
-          <a:ln>
-            <a:noFill/>
-          </a:ln>
-        </p:spPr>
-        <p:style>
-          <a:lnRef idx="2">
-            <a:schemeClr val="accent1">
-              <a:shade val="50000"/>
-            </a:schemeClr>
-          </a:lnRef>
-          <a:fillRef idx="1">
-            <a:schemeClr val="accent1"/>
-          </a:fillRef>
-          <a:effectRef idx="0">
-            <a:schemeClr val="accent1"/>
-          </a:effectRef>
-          <a:fontRef idx="minor">
-            <a:schemeClr val="lt1"/>
-          </a:fontRef>
-        </p:style>
-        <p:txBody>
-          <a:bodyPr anchor="ctr"/>
-          <a:lstStyle/>
-          <a:p>
-            <a:pPr algn="ctr">
-              <a:defRPr/>
-            </a:pPr>
-            <a:endParaRPr lang="en-US"/>
-          </a:p>
-        </p:txBody>
-      </p:sp>
-      <p:pic>
-        <p:nvPicPr>
-          <p:cNvPr id="4103" name="Picture 7" descr="MAT logo vertical_red.emf"/>
-          <p:cNvPicPr>
-            <a:picLocks noChangeAspect="1"/>
-          </p:cNvPicPr>
-          <p:nvPr/>
-        </p:nvPicPr>
-        <p:blipFill>
-          <a:blip r:embed="rId3"/>
-          <a:srcRect/>
-          <a:stretch>
-            <a:fillRect/>
-          </a:stretch>
-        </p:blipFill>
-        <p:spPr bwMode="auto">
-          <a:xfrm>
-            <a:off x="3600450" y="5334000"/>
-            <a:ext cx="1981200" cy="969963"/>
-          </a:xfrm>
-          <a:prstGeom prst="rect">
-            <a:avLst/>
-          </a:prstGeom>
-          <a:noFill/>
-          <a:ln w="9525">
-            <a:noFill/>
-            <a:miter lim="800000"/>
-            <a:headEnd/>
-            <a:tailEnd/>
-          </a:ln>
-        </p:spPr>
-      </p:pic>
-      <p:sp>
-        <p:nvSpPr>
-          <p:cNvPr id="9" name="TextBox 8"/>
-          <p:cNvSpPr txBox="1"/>
-          <p:nvPr/>
-        </p:nvSpPr>
-        <p:spPr>
-          <a:xfrm>
-            <a:off x="381000" y="1447800"/>
-            <a:ext cx="8610600" cy="646331"/>
-          </a:xfrm>
-          <a:prstGeom prst="rect">
-            <a:avLst/>
-          </a:prstGeom>
-          <a:noFill/>
-        </p:spPr>
-        <p:txBody>
-          <a:bodyPr>
-            <a:spAutoFit/>
+          <a:bodyPr vert="horz" wrap="square" lIns="91440" tIns="45720" rIns="91440" bIns="45720" numCol="1" anchor="t" anchorCtr="0" compatLnSpc="1">
+            <a:prstTxWarp prst="textNoShape">
+              <a:avLst/>
+            </a:prstTxWarp>
           </a:bodyPr>
           <a:lstStyle/>
           <a:p>
-            <a:pPr>
-              <a:defRPr/>
-            </a:pPr>
+            <a:pPr eaLnBrk="1" hangingPunct="1"/>
             <a:r>
-              <a:rPr lang="en-US" sz="3600" spc="60" dirty="0" smtClean="0">
-                <a:solidFill>
-                  <a:schemeClr val="bg1"/>
-                </a:solidFill>
-                <a:latin typeface="Calibri" pitchFamily="34" charset="0"/>
-              </a:rPr>
-              <a:t>Simple Org Chart – Final Version</a:t>
-            </a:r>
-            <a:endParaRPr lang="en-US" sz="3600" spc="60" dirty="0">
-              <a:solidFill>
-                <a:schemeClr val="bg1"/>
-              </a:solidFill>
-              <a:latin typeface="Calibri" pitchFamily="34" charset="0"/>
-            </a:endParaRPr>
-          </a:p>
-        </p:txBody>
-      </p:sp>
-      <p:sp>
-        <p:nvSpPr>
-          <p:cNvPr id="11" name="TextBox 10"/>
-          <p:cNvSpPr txBox="1"/>
-          <p:nvPr/>
-        </p:nvSpPr>
-        <p:spPr>
-          <a:xfrm>
-            <a:off x="381000" y="2057400"/>
-            <a:ext cx="7543800" cy="338554"/>
-          </a:xfrm>
-          <a:prstGeom prst="rect">
-            <a:avLst/>
-          </a:prstGeom>
-          <a:noFill/>
-        </p:spPr>
-        <p:txBody>
-          <a:bodyPr wrap="square">
-            <a:spAutoFit/>
-          </a:bodyPr>
-          <a:lstStyle/>
-          <a:p>
-            <a:pPr>
-              <a:defRPr/>
-            </a:pPr>
-            <a:r>
-              <a:rPr lang="en-US" sz="1600" dirty="0" smtClean="0">
-                <a:solidFill>
-                  <a:schemeClr val="bg1"/>
-                </a:solidFill>
-                <a:latin typeface="+mn-lt"/>
-              </a:rPr>
-              <a:t>Orchestration With An Application Controller And </a:t>
-            </a:r>
-            <a:r>
-              <a:rPr lang="en-US" sz="1600" dirty="0" err="1" smtClean="0">
-                <a:solidFill>
-                  <a:schemeClr val="bg1"/>
-                </a:solidFill>
-                <a:latin typeface="+mn-lt"/>
-              </a:rPr>
-              <a:t>IoC</a:t>
-            </a:r>
-            <a:r>
-              <a:rPr lang="en-US" sz="1600" dirty="0" smtClean="0">
-                <a:solidFill>
-                  <a:schemeClr val="bg1"/>
-                </a:solidFill>
-                <a:latin typeface="+mn-lt"/>
-              </a:rPr>
-              <a:t> Container</a:t>
+              <a:rPr lang="en-US" dirty="0" smtClean="0"/>
+              <a:t>Application Controller</a:t>
             </a:r>
           </a:p>
         </p:txBody>
@@ -13570,10 +13479,6 @@
             <a:pPr eaLnBrk="1" hangingPunct="1">
               <a:buNone/>
             </a:pPr>
-            <a:r>
-              <a:rPr lang="en-US" sz="2000" smtClean="0"/>
-              <a:t>“Some applications contain a significant amount of logic about the screens to use at different points, which may involve invoking certain screens at certain times in an application.” </a:t>
-            </a:r>
             <a:endParaRPr lang="en-US" sz="2000" dirty="0" smtClean="0"/>
           </a:p>
         </p:txBody>
@@ -13605,10 +13510,7 @@
           <a:lstStyle/>
           <a:p>
             <a:pPr eaLnBrk="1" hangingPunct="1"/>
-            <a:r>
-              <a:rPr lang="en-US" dirty="0" smtClean="0"/>
-              <a:t>Application Controller</a:t>
-            </a:r>
+            <a:endParaRPr lang="en-US" dirty="0" smtClean="0"/>
           </a:p>
         </p:txBody>
       </p:sp>
@@ -13628,96 +13530,6 @@
 </file>
 
 <file path=ppt/slides/slide32.xml><?xml version="1.0" encoding="utf-8"?>
-<p:sld xmlns:a="http://schemas.openxmlformats.org/drawingml/2006/main" xmlns:r="http://schemas.openxmlformats.org/officeDocument/2006/relationships" xmlns:p="http://schemas.openxmlformats.org/presentationml/2006/main">
-  <p:cSld>
-    <p:spTree>
-      <p:nvGrpSpPr>
-        <p:cNvPr id="1" name=""/>
-        <p:cNvGrpSpPr/>
-        <p:nvPr/>
-      </p:nvGrpSpPr>
-      <p:grpSpPr>
-        <a:xfrm>
-          <a:off x="0" y="0"/>
-          <a:ext cx="0" cy="0"/>
-          <a:chOff x="0" y="0"/>
-          <a:chExt cx="0" cy="0"/>
-        </a:xfrm>
-      </p:grpSpPr>
-      <p:sp>
-        <p:nvSpPr>
-          <p:cNvPr id="3075" name="Text Placeholder 2"/>
-          <p:cNvSpPr>
-            <a:spLocks noGrp="1"/>
-          </p:cNvSpPr>
-          <p:nvPr>
-            <p:ph type="body" sz="quarter" idx="10"/>
-          </p:nvPr>
-        </p:nvSpPr>
-        <p:spPr>
-          <a:xfrm>
-            <a:off x="685800" y="1066800"/>
-            <a:ext cx="8229600" cy="1219200"/>
-          </a:xfrm>
-        </p:spPr>
-        <p:txBody>
-          <a:bodyPr/>
-          <a:lstStyle/>
-          <a:p>
-            <a:pPr eaLnBrk="1" hangingPunct="1">
-              <a:buNone/>
-            </a:pPr>
-            <a:endParaRPr lang="en-US" sz="2000" dirty="0" smtClean="0"/>
-          </a:p>
-        </p:txBody>
-      </p:sp>
-      <p:sp>
-        <p:nvSpPr>
-          <p:cNvPr id="3074" name="Title 1"/>
-          <p:cNvSpPr>
-            <a:spLocks noGrp="1"/>
-          </p:cNvSpPr>
-          <p:nvPr>
-            <p:ph type="title"/>
-          </p:nvPr>
-        </p:nvSpPr>
-        <p:spPr bwMode="auto">
-          <a:noFill/>
-          <a:ln>
-            <a:miter lim="800000"/>
-            <a:headEnd/>
-            <a:tailEnd/>
-          </a:ln>
-        </p:spPr>
-        <p:txBody>
-          <a:bodyPr vert="horz" wrap="square" lIns="91440" tIns="45720" rIns="91440" bIns="45720" numCol="1" anchor="t" anchorCtr="0" compatLnSpc="1">
-            <a:prstTxWarp prst="textNoShape">
-              <a:avLst/>
-            </a:prstTxWarp>
-          </a:bodyPr>
-          <a:lstStyle/>
-          <a:p>
-            <a:pPr eaLnBrk="1" hangingPunct="1"/>
-            <a:endParaRPr lang="en-US" dirty="0" smtClean="0"/>
-          </a:p>
-        </p:txBody>
-      </p:sp>
-    </p:spTree>
-  </p:cSld>
-  <p:clrMapOvr>
-    <a:masterClrMapping/>
-  </p:clrMapOvr>
-  <p:timing>
-    <p:tnLst>
-      <p:par>
-        <p:cTn id="1" dur="indefinite" restart="never" nodeType="tmRoot"/>
-      </p:par>
-    </p:tnLst>
-  </p:timing>
-</p:sld>
-</file>
-
-<file path=ppt/slides/slide33.xml><?xml version="1.0" encoding="utf-8"?>
 <p:sld xmlns:a="http://schemas.openxmlformats.org/drawingml/2006/main" xmlns:r="http://schemas.openxmlformats.org/officeDocument/2006/relationships" xmlns:p="http://schemas.openxmlformats.org/presentationml/2006/main">
   <p:cSld>
     <p:spTree>
@@ -14263,7 +14075,7 @@
 </p:sld>
 </file>
 
-<file path=ppt/slides/slide34.xml><?xml version="1.0" encoding="utf-8"?>
+<file path=ppt/slides/slide33.xml><?xml version="1.0" encoding="utf-8"?>
 <p:sld xmlns:a="http://schemas.openxmlformats.org/drawingml/2006/main" xmlns:r="http://schemas.openxmlformats.org/officeDocument/2006/relationships" xmlns:p="http://schemas.openxmlformats.org/presentationml/2006/main">
   <p:cSld>
     <p:spTree>

</xml_diff>

<commit_message>
working on ioc and app controller slides. i think the first version of the slides and sample code are now complete. i still need to review them all, as a whole, though.
</commit_message>
<xml_diff>
--- a/Decoupling Workflow With App Controler/Decoupling Workflow From Forms.pptx
+++ b/Decoupling Workflow With App Controler/Decoupling Workflow From Forms.pptx
@@ -40,8 +40,8 @@
     <p:sldId id="284" r:id="rId31"/>
     <p:sldId id="308" r:id="rId32"/>
     <p:sldId id="292" r:id="rId33"/>
-    <p:sldId id="293" r:id="rId34"/>
-    <p:sldId id="294" r:id="rId35"/>
+    <p:sldId id="294" r:id="rId34"/>
+    <p:sldId id="293" r:id="rId35"/>
     <p:sldId id="259" r:id="rId36"/>
     <p:sldId id="274" r:id="rId37"/>
   </p:sldIdLst>
@@ -4609,7 +4609,7 @@
         </p:nvGrpSpPr>
         <p:grpSpPr>
           <a:xfrm>
-            <a:off x="904875" y="1971675"/>
+            <a:off x="566738" y="1971675"/>
             <a:ext cx="8010525" cy="4048125"/>
             <a:chOff x="904875" y="1819275"/>
             <a:chExt cx="8010525" cy="4048125"/>
@@ -13383,8 +13383,30 @@
               <a:buNone/>
             </a:pPr>
             <a:r>
-              <a:rPr lang="en-US" sz="2000" smtClean="0"/>
-              <a:t>“Some applications contain a significant amount of logic about the screens to use at different points, which may involve invoking certain screens at certain times in an application.” </a:t>
+              <a:rPr lang="en-US" sz="2000" dirty="0" smtClean="0"/>
+              <a:t>“The </a:t>
+            </a:r>
+            <a:r>
+              <a:rPr lang="en-US" sz="2000" dirty="0" smtClean="0"/>
+              <a:t>basic idea of </a:t>
+            </a:r>
+            <a:r>
+              <a:rPr lang="en-US" sz="2000" dirty="0" smtClean="0"/>
+              <a:t>… </a:t>
+            </a:r>
+            <a:r>
+              <a:rPr lang="en-US" sz="2000" dirty="0" smtClean="0"/>
+              <a:t>Dependency Injection is to have a separate object, an assembler, that populates a field … with an appropriate implementation for the … </a:t>
+            </a:r>
+            <a:r>
+              <a:rPr lang="en-US" sz="2000" dirty="0" smtClean="0"/>
+              <a:t>interface” – </a:t>
+            </a:r>
+            <a:r>
+              <a:rPr lang="en-US" sz="2000" dirty="0" smtClean="0">
+                <a:hlinkClick r:id="rId3"/>
+              </a:rPr>
+              <a:t>Martin Fowler</a:t>
             </a:r>
             <a:endParaRPr lang="en-US" sz="2000" dirty="0" smtClean="0"/>
           </a:p>
@@ -13419,11 +13441,833 @@
             <a:pPr eaLnBrk="1" hangingPunct="1"/>
             <a:r>
               <a:rPr lang="en-US" dirty="0" smtClean="0"/>
-              <a:t>Application Controller</a:t>
+              <a:t>Dependency Injection</a:t>
             </a:r>
+            <a:endParaRPr lang="en-US" dirty="0" smtClean="0"/>
           </a:p>
         </p:txBody>
       </p:sp>
+      <p:grpSp>
+        <p:nvGrpSpPr>
+          <p:cNvPr id="5" name="Group 4"/>
+          <p:cNvGrpSpPr/>
+          <p:nvPr/>
+        </p:nvGrpSpPr>
+        <p:grpSpPr>
+          <a:xfrm>
+            <a:off x="304800" y="2819400"/>
+            <a:ext cx="2819400" cy="2133600"/>
+            <a:chOff x="2028511" y="1897464"/>
+            <a:chExt cx="5019152" cy="3798277"/>
+          </a:xfrm>
+        </p:grpSpPr>
+        <p:sp>
+          <p:nvSpPr>
+            <p:cNvPr id="6" name="Cloud 5"/>
+            <p:cNvSpPr/>
+            <p:nvPr/>
+          </p:nvSpPr>
+          <p:spPr>
+            <a:xfrm>
+              <a:off x="2028511" y="1897464"/>
+              <a:ext cx="5019152" cy="3798277"/>
+            </a:xfrm>
+            <a:prstGeom prst="cloud">
+              <a:avLst/>
+            </a:prstGeom>
+          </p:spPr>
+          <p:style>
+            <a:lnRef idx="2">
+              <a:schemeClr val="accent5"/>
+            </a:lnRef>
+            <a:fillRef idx="1">
+              <a:schemeClr val="lt1"/>
+            </a:fillRef>
+            <a:effectRef idx="0">
+              <a:schemeClr val="accent5"/>
+            </a:effectRef>
+            <a:fontRef idx="minor">
+              <a:schemeClr val="dk1"/>
+            </a:fontRef>
+          </p:style>
+          <p:txBody>
+            <a:bodyPr rtlCol="0" anchor="ctr"/>
+            <a:lstStyle/>
+            <a:p>
+              <a:pPr algn="ctr"/>
+              <a:endParaRPr lang="en-US" sz="1000"/>
+            </a:p>
+          </p:txBody>
+        </p:sp>
+        <p:grpSp>
+          <p:nvGrpSpPr>
+            <p:cNvPr id="7" name="Group 27"/>
+            <p:cNvGrpSpPr/>
+            <p:nvPr/>
+          </p:nvGrpSpPr>
+          <p:grpSpPr>
+            <a:xfrm>
+              <a:off x="2476500" y="2438400"/>
+              <a:ext cx="3771900" cy="2590800"/>
+              <a:chOff x="2476500" y="2590800"/>
+              <a:chExt cx="3771900" cy="2590800"/>
+            </a:xfrm>
+          </p:grpSpPr>
+          <p:sp>
+            <p:nvSpPr>
+              <p:cNvPr id="8" name="Rectangle 4"/>
+              <p:cNvSpPr/>
+              <p:nvPr/>
+            </p:nvSpPr>
+            <p:spPr>
+              <a:xfrm>
+                <a:off x="2476500" y="3962400"/>
+                <a:ext cx="1752600" cy="609600"/>
+              </a:xfrm>
+              <a:prstGeom prst="rect">
+                <a:avLst/>
+              </a:prstGeom>
+            </p:spPr>
+            <p:style>
+              <a:lnRef idx="2">
+                <a:schemeClr val="accent3">
+                  <a:shade val="50000"/>
+                </a:schemeClr>
+              </a:lnRef>
+              <a:fillRef idx="1">
+                <a:schemeClr val="accent3"/>
+              </a:fillRef>
+              <a:effectRef idx="0">
+                <a:schemeClr val="accent3"/>
+              </a:effectRef>
+              <a:fontRef idx="minor">
+                <a:schemeClr val="lt1"/>
+              </a:fontRef>
+            </p:style>
+            <p:txBody>
+              <a:bodyPr rtlCol="0" anchor="b" anchorCtr="0"/>
+              <a:lstStyle/>
+              <a:p>
+                <a:pPr algn="ctr"/>
+                <a:r>
+                  <a:rPr lang="en-US" sz="1000" dirty="0" err="1" smtClean="0"/>
+                  <a:t>IDoSomething</a:t>
+                </a:r>
+                <a:endParaRPr lang="en-US" sz="1000" dirty="0"/>
+              </a:p>
+            </p:txBody>
+          </p:sp>
+          <p:sp>
+            <p:nvSpPr>
+              <p:cNvPr id="9" name="Down Arrow Callout 5"/>
+              <p:cNvSpPr/>
+              <p:nvPr/>
+            </p:nvSpPr>
+            <p:spPr>
+              <a:xfrm>
+                <a:off x="2476500" y="3276600"/>
+                <a:ext cx="1752600" cy="1066800"/>
+              </a:xfrm>
+              <a:prstGeom prst="downArrowCallout">
+                <a:avLst/>
+              </a:prstGeom>
+            </p:spPr>
+            <p:style>
+              <a:lnRef idx="2">
+                <a:schemeClr val="accent1">
+                  <a:shade val="50000"/>
+                </a:schemeClr>
+              </a:lnRef>
+              <a:fillRef idx="1">
+                <a:schemeClr val="accent1"/>
+              </a:fillRef>
+              <a:effectRef idx="0">
+                <a:schemeClr val="accent1"/>
+              </a:effectRef>
+              <a:fontRef idx="minor">
+                <a:schemeClr val="lt1"/>
+              </a:fontRef>
+            </p:style>
+            <p:txBody>
+              <a:bodyPr rtlCol="0" anchor="ctr"/>
+              <a:lstStyle/>
+              <a:p>
+                <a:pPr algn="ctr"/>
+                <a:r>
+                  <a:rPr lang="en-US" sz="1000" dirty="0" err="1" smtClean="0"/>
+                  <a:t>ThatClass</a:t>
+                </a:r>
+                <a:endParaRPr lang="en-US" sz="1000" dirty="0"/>
+              </a:p>
+            </p:txBody>
+          </p:sp>
+          <p:sp>
+            <p:nvSpPr>
+              <p:cNvPr id="11" name="Rectangle 10"/>
+              <p:cNvSpPr/>
+              <p:nvPr/>
+            </p:nvSpPr>
+            <p:spPr>
+              <a:xfrm>
+                <a:off x="4495800" y="2590800"/>
+                <a:ext cx="1752600" cy="762000"/>
+              </a:xfrm>
+              <a:prstGeom prst="rect">
+                <a:avLst/>
+              </a:prstGeom>
+            </p:spPr>
+            <p:style>
+              <a:lnRef idx="2">
+                <a:schemeClr val="accent1">
+                  <a:shade val="50000"/>
+                </a:schemeClr>
+              </a:lnRef>
+              <a:fillRef idx="1">
+                <a:schemeClr val="accent1"/>
+              </a:fillRef>
+              <a:effectRef idx="0">
+                <a:schemeClr val="accent1"/>
+              </a:effectRef>
+              <a:fontRef idx="minor">
+                <a:schemeClr val="lt1"/>
+              </a:fontRef>
+            </p:style>
+            <p:txBody>
+              <a:bodyPr rtlCol="0" anchor="ctr"/>
+              <a:lstStyle/>
+              <a:p>
+                <a:pPr algn="ctr"/>
+                <a:r>
+                  <a:rPr lang="en-US" sz="1000" dirty="0" err="1" smtClean="0"/>
+                  <a:t>ThisClass</a:t>
+                </a:r>
+                <a:endParaRPr lang="en-US" sz="1000" dirty="0"/>
+              </a:p>
+            </p:txBody>
+          </p:sp>
+          <p:sp>
+            <p:nvSpPr>
+              <p:cNvPr id="13" name="Rectangle 12"/>
+              <p:cNvSpPr/>
+              <p:nvPr/>
+            </p:nvSpPr>
+            <p:spPr>
+              <a:xfrm>
+                <a:off x="4457700" y="4572000"/>
+                <a:ext cx="1752600" cy="609600"/>
+              </a:xfrm>
+              <a:prstGeom prst="rect">
+                <a:avLst/>
+              </a:prstGeom>
+            </p:spPr>
+            <p:style>
+              <a:lnRef idx="2">
+                <a:schemeClr val="accent3">
+                  <a:shade val="50000"/>
+                </a:schemeClr>
+              </a:lnRef>
+              <a:fillRef idx="1">
+                <a:schemeClr val="accent3"/>
+              </a:fillRef>
+              <a:effectRef idx="0">
+                <a:schemeClr val="accent3"/>
+              </a:effectRef>
+              <a:fontRef idx="minor">
+                <a:schemeClr val="lt1"/>
+              </a:fontRef>
+            </p:style>
+            <p:txBody>
+              <a:bodyPr rtlCol="0" anchor="b" anchorCtr="0"/>
+              <a:lstStyle/>
+              <a:p>
+                <a:pPr algn="ctr"/>
+                <a:r>
+                  <a:rPr lang="en-US" sz="1000" dirty="0" err="1" smtClean="0"/>
+                  <a:t>IWhatever</a:t>
+                </a:r>
+                <a:endParaRPr lang="en-US" sz="1000" dirty="0"/>
+              </a:p>
+            </p:txBody>
+          </p:sp>
+          <p:sp>
+            <p:nvSpPr>
+              <p:cNvPr id="14" name="Down Arrow Callout 13"/>
+              <p:cNvSpPr/>
+              <p:nvPr/>
+            </p:nvSpPr>
+            <p:spPr>
+              <a:xfrm>
+                <a:off x="4457700" y="3886200"/>
+                <a:ext cx="1752600" cy="1066800"/>
+              </a:xfrm>
+              <a:prstGeom prst="downArrowCallout">
+                <a:avLst/>
+              </a:prstGeom>
+            </p:spPr>
+            <p:style>
+              <a:lnRef idx="2">
+                <a:schemeClr val="accent1">
+                  <a:shade val="50000"/>
+                </a:schemeClr>
+              </a:lnRef>
+              <a:fillRef idx="1">
+                <a:schemeClr val="accent1"/>
+              </a:fillRef>
+              <a:effectRef idx="0">
+                <a:schemeClr val="accent1"/>
+              </a:effectRef>
+              <a:fontRef idx="minor">
+                <a:schemeClr val="lt1"/>
+              </a:fontRef>
+            </p:style>
+            <p:txBody>
+              <a:bodyPr rtlCol="0" anchor="ctr"/>
+              <a:lstStyle/>
+              <a:p>
+                <a:pPr algn="ctr"/>
+                <a:r>
+                  <a:rPr lang="en-US" sz="1000" dirty="0" err="1" smtClean="0"/>
+                  <a:t>AnotherClass</a:t>
+                </a:r>
+                <a:endParaRPr lang="en-US" sz="1000" dirty="0"/>
+              </a:p>
+            </p:txBody>
+          </p:sp>
+        </p:grpSp>
+      </p:grpSp>
+      <p:sp>
+        <p:nvSpPr>
+          <p:cNvPr id="15" name="Rectangle 14"/>
+          <p:cNvSpPr/>
+          <p:nvPr/>
+        </p:nvSpPr>
+        <p:spPr>
+          <a:xfrm>
+            <a:off x="3657600" y="3581400"/>
+            <a:ext cx="1828800" cy="609600"/>
+          </a:xfrm>
+          <a:prstGeom prst="rect">
+            <a:avLst/>
+          </a:prstGeom>
+        </p:spPr>
+        <p:style>
+          <a:lnRef idx="2">
+            <a:schemeClr val="accent1">
+              <a:shade val="50000"/>
+            </a:schemeClr>
+          </a:lnRef>
+          <a:fillRef idx="1">
+            <a:schemeClr val="accent1"/>
+          </a:fillRef>
+          <a:effectRef idx="0">
+            <a:schemeClr val="accent1"/>
+          </a:effectRef>
+          <a:fontRef idx="minor">
+            <a:schemeClr val="lt1"/>
+          </a:fontRef>
+        </p:style>
+        <p:txBody>
+          <a:bodyPr rtlCol="0" anchor="ctr"/>
+          <a:lstStyle/>
+          <a:p>
+            <a:pPr algn="ctr"/>
+            <a:r>
+              <a:rPr lang="en-US" dirty="0" err="1" smtClean="0"/>
+              <a:t>IoC</a:t>
+            </a:r>
+            <a:r>
+              <a:rPr lang="en-US" dirty="0" smtClean="0"/>
+              <a:t> Container</a:t>
+            </a:r>
+            <a:endParaRPr lang="en-US" dirty="0"/>
+          </a:p>
+        </p:txBody>
+      </p:sp>
+      <p:grpSp>
+        <p:nvGrpSpPr>
+          <p:cNvPr id="40" name="Group 39"/>
+          <p:cNvGrpSpPr/>
+          <p:nvPr/>
+        </p:nvGrpSpPr>
+        <p:grpSpPr>
+          <a:xfrm>
+            <a:off x="6108230" y="2848563"/>
+            <a:ext cx="2654770" cy="2104437"/>
+            <a:chOff x="5568715" y="2590800"/>
+            <a:chExt cx="2654770" cy="2104437"/>
+          </a:xfrm>
+        </p:grpSpPr>
+        <p:grpSp>
+          <p:nvGrpSpPr>
+            <p:cNvPr id="34" name="Group 33"/>
+            <p:cNvGrpSpPr/>
+            <p:nvPr/>
+          </p:nvGrpSpPr>
+          <p:grpSpPr>
+            <a:xfrm>
+              <a:off x="6400800" y="3429000"/>
+              <a:ext cx="984485" cy="727664"/>
+              <a:chOff x="5799902" y="3128433"/>
+              <a:chExt cx="984485" cy="727664"/>
+            </a:xfrm>
+          </p:grpSpPr>
+          <p:sp>
+            <p:nvSpPr>
+              <p:cNvPr id="29" name="Rectangle 4"/>
+              <p:cNvSpPr/>
+              <p:nvPr/>
+            </p:nvSpPr>
+            <p:spPr>
+              <a:xfrm>
+                <a:off x="5799902" y="3513667"/>
+                <a:ext cx="984485" cy="342430"/>
+              </a:xfrm>
+              <a:prstGeom prst="rect">
+                <a:avLst/>
+              </a:prstGeom>
+            </p:spPr>
+            <p:style>
+              <a:lnRef idx="2">
+                <a:schemeClr val="accent3">
+                  <a:shade val="50000"/>
+                </a:schemeClr>
+              </a:lnRef>
+              <a:fillRef idx="1">
+                <a:schemeClr val="accent3"/>
+              </a:fillRef>
+              <a:effectRef idx="0">
+                <a:schemeClr val="accent3"/>
+              </a:effectRef>
+              <a:fontRef idx="minor">
+                <a:schemeClr val="lt1"/>
+              </a:fontRef>
+            </p:style>
+            <p:txBody>
+              <a:bodyPr rtlCol="0" anchor="b" anchorCtr="0"/>
+              <a:lstStyle/>
+              <a:p>
+                <a:pPr algn="ctr"/>
+                <a:r>
+                  <a:rPr lang="en-US" sz="1000" dirty="0" err="1" smtClean="0"/>
+                  <a:t>IDoSomething</a:t>
+                </a:r>
+                <a:endParaRPr lang="en-US" sz="1000" dirty="0"/>
+              </a:p>
+            </p:txBody>
+          </p:sp>
+          <p:sp>
+            <p:nvSpPr>
+              <p:cNvPr id="30" name="Down Arrow Callout 5"/>
+              <p:cNvSpPr/>
+              <p:nvPr/>
+            </p:nvSpPr>
+            <p:spPr>
+              <a:xfrm>
+                <a:off x="5799902" y="3128433"/>
+                <a:ext cx="984485" cy="599252"/>
+              </a:xfrm>
+              <a:prstGeom prst="downArrowCallout">
+                <a:avLst/>
+              </a:prstGeom>
+            </p:spPr>
+            <p:style>
+              <a:lnRef idx="2">
+                <a:schemeClr val="accent1">
+                  <a:shade val="50000"/>
+                </a:schemeClr>
+              </a:lnRef>
+              <a:fillRef idx="1">
+                <a:schemeClr val="accent1"/>
+              </a:fillRef>
+              <a:effectRef idx="0">
+                <a:schemeClr val="accent1"/>
+              </a:effectRef>
+              <a:fontRef idx="minor">
+                <a:schemeClr val="lt1"/>
+              </a:fontRef>
+            </p:style>
+            <p:txBody>
+              <a:bodyPr rtlCol="0" anchor="ctr"/>
+              <a:lstStyle/>
+              <a:p>
+                <a:pPr algn="ctr"/>
+                <a:r>
+                  <a:rPr lang="en-US" sz="1000" dirty="0" err="1" smtClean="0"/>
+                  <a:t>ThatClass</a:t>
+                </a:r>
+                <a:endParaRPr lang="en-US" sz="1000" dirty="0"/>
+              </a:p>
+            </p:txBody>
+          </p:sp>
+        </p:grpSp>
+        <p:sp>
+          <p:nvSpPr>
+            <p:cNvPr id="31" name="Rectangle 30"/>
+            <p:cNvSpPr/>
+            <p:nvPr/>
+          </p:nvSpPr>
+          <p:spPr>
+            <a:xfrm>
+              <a:off x="7239000" y="4267200"/>
+              <a:ext cx="984485" cy="428037"/>
+            </a:xfrm>
+            <a:prstGeom prst="rect">
+              <a:avLst/>
+            </a:prstGeom>
+          </p:spPr>
+          <p:style>
+            <a:lnRef idx="2">
+              <a:schemeClr val="accent1">
+                <a:shade val="50000"/>
+              </a:schemeClr>
+            </a:lnRef>
+            <a:fillRef idx="1">
+              <a:schemeClr val="accent1"/>
+            </a:fillRef>
+            <a:effectRef idx="0">
+              <a:schemeClr val="accent1"/>
+            </a:effectRef>
+            <a:fontRef idx="minor">
+              <a:schemeClr val="lt1"/>
+            </a:fontRef>
+          </p:style>
+          <p:txBody>
+            <a:bodyPr rtlCol="0" anchor="ctr"/>
+            <a:lstStyle/>
+            <a:p>
+              <a:pPr algn="ctr"/>
+              <a:r>
+                <a:rPr lang="en-US" sz="1000" dirty="0" err="1" smtClean="0"/>
+                <a:t>ThisClass</a:t>
+              </a:r>
+              <a:endParaRPr lang="en-US" sz="1000" dirty="0"/>
+            </a:p>
+          </p:txBody>
+        </p:sp>
+        <p:grpSp>
+          <p:nvGrpSpPr>
+            <p:cNvPr id="35" name="Group 34"/>
+            <p:cNvGrpSpPr/>
+            <p:nvPr/>
+          </p:nvGrpSpPr>
+          <p:grpSpPr>
+            <a:xfrm>
+              <a:off x="5568715" y="2590800"/>
+              <a:ext cx="984485" cy="727663"/>
+              <a:chOff x="6912798" y="3470863"/>
+              <a:chExt cx="984485" cy="727663"/>
+            </a:xfrm>
+          </p:grpSpPr>
+          <p:sp>
+            <p:nvSpPr>
+              <p:cNvPr id="32" name="Rectangle 31"/>
+              <p:cNvSpPr/>
+              <p:nvPr/>
+            </p:nvSpPr>
+            <p:spPr>
+              <a:xfrm>
+                <a:off x="6912798" y="3856096"/>
+                <a:ext cx="984485" cy="342430"/>
+              </a:xfrm>
+              <a:prstGeom prst="rect">
+                <a:avLst/>
+              </a:prstGeom>
+            </p:spPr>
+            <p:style>
+              <a:lnRef idx="2">
+                <a:schemeClr val="accent3">
+                  <a:shade val="50000"/>
+                </a:schemeClr>
+              </a:lnRef>
+              <a:fillRef idx="1">
+                <a:schemeClr val="accent3"/>
+              </a:fillRef>
+              <a:effectRef idx="0">
+                <a:schemeClr val="accent3"/>
+              </a:effectRef>
+              <a:fontRef idx="minor">
+                <a:schemeClr val="lt1"/>
+              </a:fontRef>
+            </p:style>
+            <p:txBody>
+              <a:bodyPr rtlCol="0" anchor="b" anchorCtr="0"/>
+              <a:lstStyle/>
+              <a:p>
+                <a:pPr algn="ctr"/>
+                <a:r>
+                  <a:rPr lang="en-US" sz="1000" dirty="0" err="1" smtClean="0"/>
+                  <a:t>IWhatever</a:t>
+                </a:r>
+                <a:endParaRPr lang="en-US" sz="1000" dirty="0"/>
+              </a:p>
+            </p:txBody>
+          </p:sp>
+          <p:sp>
+            <p:nvSpPr>
+              <p:cNvPr id="33" name="Down Arrow Callout 32"/>
+              <p:cNvSpPr/>
+              <p:nvPr/>
+            </p:nvSpPr>
+            <p:spPr>
+              <a:xfrm>
+                <a:off x="6912798" y="3470863"/>
+                <a:ext cx="984485" cy="599252"/>
+              </a:xfrm>
+              <a:prstGeom prst="downArrowCallout">
+                <a:avLst/>
+              </a:prstGeom>
+            </p:spPr>
+            <p:style>
+              <a:lnRef idx="2">
+                <a:schemeClr val="accent1">
+                  <a:shade val="50000"/>
+                </a:schemeClr>
+              </a:lnRef>
+              <a:fillRef idx="1">
+                <a:schemeClr val="accent1"/>
+              </a:fillRef>
+              <a:effectRef idx="0">
+                <a:schemeClr val="accent1"/>
+              </a:effectRef>
+              <a:fontRef idx="minor">
+                <a:schemeClr val="lt1"/>
+              </a:fontRef>
+            </p:style>
+            <p:txBody>
+              <a:bodyPr rtlCol="0" anchor="ctr"/>
+              <a:lstStyle/>
+              <a:p>
+                <a:pPr algn="ctr"/>
+                <a:r>
+                  <a:rPr lang="en-US" sz="1000" dirty="0" err="1" smtClean="0"/>
+                  <a:t>AnotherClass</a:t>
+                </a:r>
+                <a:endParaRPr lang="en-US" sz="1000" dirty="0"/>
+              </a:p>
+            </p:txBody>
+          </p:sp>
+        </p:grpSp>
+        <p:cxnSp>
+          <p:nvCxnSpPr>
+            <p:cNvPr id="37" name="Shape 36"/>
+            <p:cNvCxnSpPr>
+              <a:stCxn id="32" idx="3"/>
+              <a:endCxn id="30" idx="0"/>
+            </p:cNvCxnSpPr>
+            <p:nvPr/>
+          </p:nvCxnSpPr>
+          <p:spPr>
+            <a:xfrm>
+              <a:off x="6553200" y="3147248"/>
+              <a:ext cx="339843" cy="281752"/>
+            </a:xfrm>
+            <a:prstGeom prst="bentConnector2">
+              <a:avLst/>
+            </a:prstGeom>
+            <a:ln w="38100">
+              <a:solidFill>
+                <a:schemeClr val="accent2"/>
+              </a:solidFill>
+              <a:tailEnd type="arrow"/>
+            </a:ln>
+          </p:spPr>
+          <p:style>
+            <a:lnRef idx="1">
+              <a:schemeClr val="accent1"/>
+            </a:lnRef>
+            <a:fillRef idx="0">
+              <a:schemeClr val="accent1"/>
+            </a:fillRef>
+            <a:effectRef idx="0">
+              <a:schemeClr val="accent1"/>
+            </a:effectRef>
+            <a:fontRef idx="minor">
+              <a:schemeClr val="tx1"/>
+            </a:fontRef>
+          </p:style>
+        </p:cxnSp>
+        <p:cxnSp>
+          <p:nvCxnSpPr>
+            <p:cNvPr id="39" name="Shape 38"/>
+            <p:cNvCxnSpPr>
+              <a:stCxn id="29" idx="3"/>
+              <a:endCxn id="31" idx="0"/>
+            </p:cNvCxnSpPr>
+            <p:nvPr/>
+          </p:nvCxnSpPr>
+          <p:spPr>
+            <a:xfrm>
+              <a:off x="7385285" y="3985449"/>
+              <a:ext cx="345958" cy="281751"/>
+            </a:xfrm>
+            <a:prstGeom prst="bentConnector2">
+              <a:avLst/>
+            </a:prstGeom>
+            <a:ln w="38100">
+              <a:solidFill>
+                <a:schemeClr val="accent2"/>
+              </a:solidFill>
+              <a:tailEnd type="arrow"/>
+            </a:ln>
+          </p:spPr>
+          <p:style>
+            <a:lnRef idx="1">
+              <a:schemeClr val="accent1"/>
+            </a:lnRef>
+            <a:fillRef idx="0">
+              <a:schemeClr val="accent1"/>
+            </a:fillRef>
+            <a:effectRef idx="0">
+              <a:schemeClr val="accent1"/>
+            </a:effectRef>
+            <a:fontRef idx="minor">
+              <a:schemeClr val="tx1"/>
+            </a:fontRef>
+          </p:style>
+        </p:cxnSp>
+      </p:grpSp>
+      <p:sp>
+        <p:nvSpPr>
+          <p:cNvPr id="42" name="Right Brace 41"/>
+          <p:cNvSpPr/>
+          <p:nvPr/>
+        </p:nvSpPr>
+        <p:spPr>
+          <a:xfrm flipH="1">
+            <a:off x="5562600" y="2895600"/>
+            <a:ext cx="457200" cy="1981200"/>
+          </a:xfrm>
+          <a:prstGeom prst="rightBrace">
+            <a:avLst>
+              <a:gd name="adj1" fmla="val 8333"/>
+              <a:gd name="adj2" fmla="val 50000"/>
+            </a:avLst>
+          </a:prstGeom>
+          <a:ln w="38100">
+            <a:solidFill>
+              <a:schemeClr val="accent2"/>
+            </a:solidFill>
+            <a:headEnd type="arrow"/>
+            <a:tailEnd type="arrow"/>
+          </a:ln>
+        </p:spPr>
+        <p:style>
+          <a:lnRef idx="1">
+            <a:schemeClr val="accent1"/>
+          </a:lnRef>
+          <a:fillRef idx="0">
+            <a:schemeClr val="accent1"/>
+          </a:fillRef>
+          <a:effectRef idx="0">
+            <a:schemeClr val="accent1"/>
+          </a:effectRef>
+          <a:fontRef idx="minor">
+            <a:schemeClr val="tx1"/>
+          </a:fontRef>
+        </p:style>
+        <p:txBody>
+          <a:bodyPr rtlCol="0" anchor="ctr"/>
+          <a:lstStyle/>
+          <a:p>
+            <a:pPr algn="ctr"/>
+            <a:endParaRPr lang="en-US"/>
+          </a:p>
+        </p:txBody>
+      </p:sp>
+      <p:grpSp>
+        <p:nvGrpSpPr>
+          <p:cNvPr id="45" name="Group 44"/>
+          <p:cNvGrpSpPr/>
+          <p:nvPr/>
+        </p:nvGrpSpPr>
+        <p:grpSpPr>
+          <a:xfrm>
+            <a:off x="3048000" y="2895600"/>
+            <a:ext cx="533400" cy="1981200"/>
+            <a:chOff x="3124200" y="2895600"/>
+            <a:chExt cx="533400" cy="1981200"/>
+          </a:xfrm>
+        </p:grpSpPr>
+        <p:sp>
+          <p:nvSpPr>
+            <p:cNvPr id="41" name="Right Brace 40"/>
+            <p:cNvSpPr/>
+            <p:nvPr/>
+          </p:nvSpPr>
+          <p:spPr>
+            <a:xfrm>
+              <a:off x="3124200" y="2895600"/>
+              <a:ext cx="457200" cy="1981200"/>
+            </a:xfrm>
+            <a:prstGeom prst="rightBrace">
+              <a:avLst/>
+            </a:prstGeom>
+            <a:ln w="38100">
+              <a:solidFill>
+                <a:schemeClr val="accent2"/>
+              </a:solidFill>
+            </a:ln>
+          </p:spPr>
+          <p:style>
+            <a:lnRef idx="1">
+              <a:schemeClr val="accent1"/>
+            </a:lnRef>
+            <a:fillRef idx="0">
+              <a:schemeClr val="accent1"/>
+            </a:fillRef>
+            <a:effectRef idx="0">
+              <a:schemeClr val="accent1"/>
+            </a:effectRef>
+            <a:fontRef idx="minor">
+              <a:schemeClr val="tx1"/>
+            </a:fontRef>
+          </p:style>
+          <p:txBody>
+            <a:bodyPr rtlCol="0" anchor="ctr"/>
+            <a:lstStyle/>
+            <a:p>
+              <a:pPr algn="ctr"/>
+              <a:endParaRPr lang="en-US"/>
+            </a:p>
+          </p:txBody>
+        </p:sp>
+        <p:cxnSp>
+          <p:nvCxnSpPr>
+            <p:cNvPr id="44" name="Straight Arrow Connector 43"/>
+            <p:cNvCxnSpPr/>
+            <p:nvPr/>
+          </p:nvCxnSpPr>
+          <p:spPr>
+            <a:xfrm>
+              <a:off x="3505200" y="3886200"/>
+              <a:ext cx="152400" cy="1588"/>
+            </a:xfrm>
+            <a:prstGeom prst="straightConnector1">
+              <a:avLst/>
+            </a:prstGeom>
+            <a:ln w="38100">
+              <a:solidFill>
+                <a:schemeClr val="accent2"/>
+              </a:solidFill>
+              <a:tailEnd type="arrow"/>
+            </a:ln>
+          </p:spPr>
+          <p:style>
+            <a:lnRef idx="1">
+              <a:schemeClr val="accent1"/>
+            </a:lnRef>
+            <a:fillRef idx="0">
+              <a:schemeClr val="accent1"/>
+            </a:fillRef>
+            <a:effectRef idx="0">
+              <a:schemeClr val="accent1"/>
+            </a:effectRef>
+            <a:fontRef idx="minor">
+              <a:schemeClr val="tx1"/>
+            </a:fontRef>
+          </p:style>
+        </p:cxnSp>
+      </p:grpSp>
     </p:spTree>
   </p:cSld>
   <p:clrMapOvr>
@@ -13458,6 +14302,142 @@
       </p:grpSpPr>
       <p:sp>
         <p:nvSpPr>
+          <p:cNvPr id="39" name="Rectangle 38"/>
+          <p:cNvSpPr/>
+          <p:nvPr/>
+        </p:nvSpPr>
+        <p:spPr>
+          <a:xfrm>
+            <a:off x="685800" y="4343400"/>
+            <a:ext cx="7772400" cy="1143000"/>
+          </a:xfrm>
+          <a:prstGeom prst="rect">
+            <a:avLst/>
+          </a:prstGeom>
+        </p:spPr>
+        <p:style>
+          <a:lnRef idx="2">
+            <a:schemeClr val="accent2">
+              <a:shade val="50000"/>
+            </a:schemeClr>
+          </a:lnRef>
+          <a:fillRef idx="1">
+            <a:schemeClr val="accent2"/>
+          </a:fillRef>
+          <a:effectRef idx="0">
+            <a:schemeClr val="accent2"/>
+          </a:effectRef>
+          <a:fontRef idx="minor">
+            <a:schemeClr val="lt1"/>
+          </a:fontRef>
+        </p:style>
+        <p:txBody>
+          <a:bodyPr rtlCol="0" anchor="ctr" anchorCtr="0"/>
+          <a:lstStyle/>
+          <a:p>
+            <a:pPr algn="ctr"/>
+            <a:r>
+              <a:rPr lang="en-US" dirty="0" smtClean="0"/>
+              <a:t>Application Controller</a:t>
+            </a:r>
+            <a:endParaRPr lang="en-US" dirty="0"/>
+          </a:p>
+        </p:txBody>
+      </p:sp>
+      <p:sp>
+        <p:nvSpPr>
+          <p:cNvPr id="57" name="Rectangle 56"/>
+          <p:cNvSpPr/>
+          <p:nvPr/>
+        </p:nvSpPr>
+        <p:spPr>
+          <a:xfrm>
+            <a:off x="762000" y="4343400"/>
+            <a:ext cx="3733800" cy="381000"/>
+          </a:xfrm>
+          <a:prstGeom prst="rect">
+            <a:avLst/>
+          </a:prstGeom>
+        </p:spPr>
+        <p:style>
+          <a:lnRef idx="2">
+            <a:schemeClr val="accent2">
+              <a:shade val="50000"/>
+            </a:schemeClr>
+          </a:lnRef>
+          <a:fillRef idx="1">
+            <a:schemeClr val="accent2"/>
+          </a:fillRef>
+          <a:effectRef idx="0">
+            <a:schemeClr val="accent2"/>
+          </a:effectRef>
+          <a:fontRef idx="minor">
+            <a:schemeClr val="lt1"/>
+          </a:fontRef>
+        </p:style>
+        <p:txBody>
+          <a:bodyPr rtlCol="0" anchor="ctr"/>
+          <a:lstStyle/>
+          <a:p>
+            <a:pPr algn="ctr"/>
+            <a:r>
+              <a:rPr lang="en-US" sz="1200" dirty="0" smtClean="0"/>
+              <a:t>Event Aggregator</a:t>
+            </a:r>
+            <a:endParaRPr lang="en-US" sz="1200" dirty="0"/>
+          </a:p>
+        </p:txBody>
+      </p:sp>
+      <p:sp>
+        <p:nvSpPr>
+          <p:cNvPr id="58" name="Rectangle 57"/>
+          <p:cNvSpPr/>
+          <p:nvPr/>
+        </p:nvSpPr>
+        <p:spPr>
+          <a:xfrm>
+            <a:off x="4648200" y="4343400"/>
+            <a:ext cx="3733800" cy="381000"/>
+          </a:xfrm>
+          <a:prstGeom prst="rect">
+            <a:avLst/>
+          </a:prstGeom>
+        </p:spPr>
+        <p:style>
+          <a:lnRef idx="2">
+            <a:schemeClr val="accent2">
+              <a:shade val="50000"/>
+            </a:schemeClr>
+          </a:lnRef>
+          <a:fillRef idx="1">
+            <a:schemeClr val="accent2"/>
+          </a:fillRef>
+          <a:effectRef idx="0">
+            <a:schemeClr val="accent2"/>
+          </a:effectRef>
+          <a:fontRef idx="minor">
+            <a:schemeClr val="lt1"/>
+          </a:fontRef>
+        </p:style>
+        <p:txBody>
+          <a:bodyPr rtlCol="0" anchor="ctr"/>
+          <a:lstStyle/>
+          <a:p>
+            <a:pPr algn="ctr"/>
+            <a:r>
+              <a:rPr lang="en-US" sz="1200" dirty="0" err="1" smtClean="0"/>
+              <a:t>ICommand</a:t>
+            </a:r>
+            <a:r>
+              <a:rPr lang="en-US" sz="1200" dirty="0" smtClean="0"/>
+              <a:t>&lt;T&gt;</a:t>
+            </a:r>
+            <a:endParaRPr lang="en-US" sz="1200" dirty="0"/>
+          </a:p>
+        </p:txBody>
+      </p:sp>
+      <p:sp>
+        <p:nvSpPr>
           <p:cNvPr id="3075" name="Text Placeholder 2"/>
           <p:cNvSpPr>
             <a:spLocks noGrp="1"/>
@@ -13479,7 +14459,10 @@
             <a:pPr eaLnBrk="1" hangingPunct="1">
               <a:buNone/>
             </a:pPr>
-            <a:endParaRPr lang="en-US" sz="2000" dirty="0" smtClean="0"/>
+            <a:r>
+              <a:rPr lang="en-US" sz="2000" dirty="0" smtClean="0"/>
+              <a:t>“Some applications contain a significant amount of logic about the screens to use at different points, which may involve invoking certain screens at certain times in an application.” </a:t>
+            </a:r>
           </a:p>
         </p:txBody>
       </p:sp>
@@ -13510,7 +14493,1116 @@
           <a:lstStyle/>
           <a:p>
             <a:pPr eaLnBrk="1" hangingPunct="1"/>
-            <a:endParaRPr lang="en-US" dirty="0" smtClean="0"/>
+            <a:r>
+              <a:rPr lang="en-US" dirty="0" smtClean="0"/>
+              <a:t>Application Controller</a:t>
+            </a:r>
+          </a:p>
+        </p:txBody>
+      </p:sp>
+      <p:grpSp>
+        <p:nvGrpSpPr>
+          <p:cNvPr id="25" name="Group 24"/>
+          <p:cNvGrpSpPr/>
+          <p:nvPr/>
+        </p:nvGrpSpPr>
+        <p:grpSpPr>
+          <a:xfrm>
+            <a:off x="762000" y="2438400"/>
+            <a:ext cx="3733800" cy="1524000"/>
+            <a:chOff x="762000" y="3048000"/>
+            <a:chExt cx="3733800" cy="1524000"/>
+          </a:xfrm>
+        </p:grpSpPr>
+        <p:grpSp>
+          <p:nvGrpSpPr>
+            <p:cNvPr id="7" name="Group 6"/>
+            <p:cNvGrpSpPr/>
+            <p:nvPr/>
+          </p:nvGrpSpPr>
+          <p:grpSpPr>
+            <a:xfrm>
+              <a:off x="762000" y="3048000"/>
+              <a:ext cx="1828800" cy="762000"/>
+              <a:chOff x="762000" y="3048000"/>
+              <a:chExt cx="1828800" cy="762000"/>
+            </a:xfrm>
+          </p:grpSpPr>
+          <p:sp>
+            <p:nvSpPr>
+              <p:cNvPr id="4" name="Rectangle 3"/>
+              <p:cNvSpPr/>
+              <p:nvPr/>
+            </p:nvSpPr>
+            <p:spPr>
+              <a:xfrm>
+                <a:off x="762000" y="3048000"/>
+                <a:ext cx="914400" cy="381000"/>
+              </a:xfrm>
+              <a:prstGeom prst="rect">
+                <a:avLst/>
+              </a:prstGeom>
+            </p:spPr>
+            <p:style>
+              <a:lnRef idx="2">
+                <a:schemeClr val="accent1">
+                  <a:shade val="50000"/>
+                </a:schemeClr>
+              </a:lnRef>
+              <a:fillRef idx="1">
+                <a:schemeClr val="accent1"/>
+              </a:fillRef>
+              <a:effectRef idx="0">
+                <a:schemeClr val="accent1"/>
+              </a:effectRef>
+              <a:fontRef idx="minor">
+                <a:schemeClr val="lt1"/>
+              </a:fontRef>
+            </p:style>
+            <p:txBody>
+              <a:bodyPr rtlCol="0" anchor="ctr"/>
+              <a:lstStyle/>
+              <a:p>
+                <a:pPr algn="ctr"/>
+                <a:r>
+                  <a:rPr lang="en-US" sz="1200" dirty="0" smtClean="0"/>
+                  <a:t>Model</a:t>
+                </a:r>
+                <a:endParaRPr lang="en-US" sz="1200" dirty="0"/>
+              </a:p>
+            </p:txBody>
+          </p:sp>
+          <p:sp>
+            <p:nvSpPr>
+              <p:cNvPr id="5" name="Rectangle 4"/>
+              <p:cNvSpPr/>
+              <p:nvPr/>
+            </p:nvSpPr>
+            <p:spPr>
+              <a:xfrm>
+                <a:off x="1676400" y="3048000"/>
+                <a:ext cx="914400" cy="381000"/>
+              </a:xfrm>
+              <a:prstGeom prst="rect">
+                <a:avLst/>
+              </a:prstGeom>
+            </p:spPr>
+            <p:style>
+              <a:lnRef idx="2">
+                <a:schemeClr val="accent1">
+                  <a:shade val="50000"/>
+                </a:schemeClr>
+              </a:lnRef>
+              <a:fillRef idx="1">
+                <a:schemeClr val="accent1"/>
+              </a:fillRef>
+              <a:effectRef idx="0">
+                <a:schemeClr val="accent1"/>
+              </a:effectRef>
+              <a:fontRef idx="minor">
+                <a:schemeClr val="lt1"/>
+              </a:fontRef>
+            </p:style>
+            <p:txBody>
+              <a:bodyPr rtlCol="0" anchor="ctr"/>
+              <a:lstStyle/>
+              <a:p>
+                <a:pPr algn="ctr"/>
+                <a:r>
+                  <a:rPr lang="en-US" sz="1200" dirty="0" smtClean="0"/>
+                  <a:t>View</a:t>
+                </a:r>
+              </a:p>
+            </p:txBody>
+          </p:sp>
+          <p:sp>
+            <p:nvSpPr>
+              <p:cNvPr id="6" name="Rectangle 5"/>
+              <p:cNvSpPr/>
+              <p:nvPr/>
+            </p:nvSpPr>
+            <p:spPr>
+              <a:xfrm>
+                <a:off x="762000" y="3429000"/>
+                <a:ext cx="1828800" cy="381000"/>
+              </a:xfrm>
+              <a:prstGeom prst="rect">
+                <a:avLst/>
+              </a:prstGeom>
+            </p:spPr>
+            <p:style>
+              <a:lnRef idx="2">
+                <a:schemeClr val="accent1">
+                  <a:shade val="50000"/>
+                </a:schemeClr>
+              </a:lnRef>
+              <a:fillRef idx="1">
+                <a:schemeClr val="accent1"/>
+              </a:fillRef>
+              <a:effectRef idx="0">
+                <a:schemeClr val="accent1"/>
+              </a:effectRef>
+              <a:fontRef idx="minor">
+                <a:schemeClr val="lt1"/>
+              </a:fontRef>
+            </p:style>
+            <p:txBody>
+              <a:bodyPr rtlCol="0" anchor="ctr"/>
+              <a:lstStyle/>
+              <a:p>
+                <a:pPr algn="ctr"/>
+                <a:r>
+                  <a:rPr lang="en-US" sz="1200" dirty="0" smtClean="0"/>
+                  <a:t>Presenter</a:t>
+                </a:r>
+                <a:endParaRPr lang="en-US" sz="1200" dirty="0"/>
+              </a:p>
+            </p:txBody>
+          </p:sp>
+        </p:grpSp>
+        <p:grpSp>
+          <p:nvGrpSpPr>
+            <p:cNvPr id="8" name="Group 7"/>
+            <p:cNvGrpSpPr/>
+            <p:nvPr/>
+          </p:nvGrpSpPr>
+          <p:grpSpPr>
+            <a:xfrm>
+              <a:off x="2667000" y="3048000"/>
+              <a:ext cx="1828800" cy="762000"/>
+              <a:chOff x="762000" y="3048000"/>
+              <a:chExt cx="1828800" cy="762000"/>
+            </a:xfrm>
+          </p:grpSpPr>
+          <p:sp>
+            <p:nvSpPr>
+              <p:cNvPr id="9" name="Rectangle 8"/>
+              <p:cNvSpPr/>
+              <p:nvPr/>
+            </p:nvSpPr>
+            <p:spPr>
+              <a:xfrm>
+                <a:off x="762000" y="3048000"/>
+                <a:ext cx="914400" cy="381000"/>
+              </a:xfrm>
+              <a:prstGeom prst="rect">
+                <a:avLst/>
+              </a:prstGeom>
+            </p:spPr>
+            <p:style>
+              <a:lnRef idx="2">
+                <a:schemeClr val="accent1">
+                  <a:shade val="50000"/>
+                </a:schemeClr>
+              </a:lnRef>
+              <a:fillRef idx="1">
+                <a:schemeClr val="accent1"/>
+              </a:fillRef>
+              <a:effectRef idx="0">
+                <a:schemeClr val="accent1"/>
+              </a:effectRef>
+              <a:fontRef idx="minor">
+                <a:schemeClr val="lt1"/>
+              </a:fontRef>
+            </p:style>
+            <p:txBody>
+              <a:bodyPr rtlCol="0" anchor="ctr"/>
+              <a:lstStyle/>
+              <a:p>
+                <a:pPr algn="ctr"/>
+                <a:r>
+                  <a:rPr lang="en-US" sz="1200" dirty="0" smtClean="0"/>
+                  <a:t>Model</a:t>
+                </a:r>
+                <a:endParaRPr lang="en-US" sz="1200" dirty="0"/>
+              </a:p>
+            </p:txBody>
+          </p:sp>
+          <p:sp>
+            <p:nvSpPr>
+              <p:cNvPr id="10" name="Rectangle 9"/>
+              <p:cNvSpPr/>
+              <p:nvPr/>
+            </p:nvSpPr>
+            <p:spPr>
+              <a:xfrm>
+                <a:off x="1676400" y="3048000"/>
+                <a:ext cx="914400" cy="381000"/>
+              </a:xfrm>
+              <a:prstGeom prst="rect">
+                <a:avLst/>
+              </a:prstGeom>
+            </p:spPr>
+            <p:style>
+              <a:lnRef idx="2">
+                <a:schemeClr val="accent1">
+                  <a:shade val="50000"/>
+                </a:schemeClr>
+              </a:lnRef>
+              <a:fillRef idx="1">
+                <a:schemeClr val="accent1"/>
+              </a:fillRef>
+              <a:effectRef idx="0">
+                <a:schemeClr val="accent1"/>
+              </a:effectRef>
+              <a:fontRef idx="minor">
+                <a:schemeClr val="lt1"/>
+              </a:fontRef>
+            </p:style>
+            <p:txBody>
+              <a:bodyPr rtlCol="0" anchor="ctr"/>
+              <a:lstStyle/>
+              <a:p>
+                <a:pPr algn="ctr"/>
+                <a:r>
+                  <a:rPr lang="en-US" sz="1200" dirty="0" smtClean="0"/>
+                  <a:t>View</a:t>
+                </a:r>
+              </a:p>
+            </p:txBody>
+          </p:sp>
+          <p:sp>
+            <p:nvSpPr>
+              <p:cNvPr id="11" name="Rectangle 10"/>
+              <p:cNvSpPr/>
+              <p:nvPr/>
+            </p:nvSpPr>
+            <p:spPr>
+              <a:xfrm>
+                <a:off x="762000" y="3429000"/>
+                <a:ext cx="1828800" cy="381000"/>
+              </a:xfrm>
+              <a:prstGeom prst="rect">
+                <a:avLst/>
+              </a:prstGeom>
+            </p:spPr>
+            <p:style>
+              <a:lnRef idx="2">
+                <a:schemeClr val="accent1">
+                  <a:shade val="50000"/>
+                </a:schemeClr>
+              </a:lnRef>
+              <a:fillRef idx="1">
+                <a:schemeClr val="accent1"/>
+              </a:fillRef>
+              <a:effectRef idx="0">
+                <a:schemeClr val="accent1"/>
+              </a:effectRef>
+              <a:fontRef idx="minor">
+                <a:schemeClr val="lt1"/>
+              </a:fontRef>
+            </p:style>
+            <p:txBody>
+              <a:bodyPr rtlCol="0" anchor="ctr"/>
+              <a:lstStyle/>
+              <a:p>
+                <a:pPr algn="ctr"/>
+                <a:r>
+                  <a:rPr lang="en-US" sz="1200" dirty="0" smtClean="0"/>
+                  <a:t>Presenter</a:t>
+                </a:r>
+                <a:endParaRPr lang="en-US" sz="1200" dirty="0"/>
+              </a:p>
+            </p:txBody>
+          </p:sp>
+        </p:grpSp>
+        <p:sp>
+          <p:nvSpPr>
+            <p:cNvPr id="16" name="Rectangle 15"/>
+            <p:cNvSpPr/>
+            <p:nvPr/>
+          </p:nvSpPr>
+          <p:spPr>
+            <a:xfrm>
+              <a:off x="762000" y="4191000"/>
+              <a:ext cx="3733800" cy="381000"/>
+            </a:xfrm>
+            <a:prstGeom prst="rect">
+              <a:avLst/>
+            </a:prstGeom>
+          </p:spPr>
+          <p:style>
+            <a:lnRef idx="2">
+              <a:schemeClr val="accent1">
+                <a:shade val="50000"/>
+              </a:schemeClr>
+            </a:lnRef>
+            <a:fillRef idx="1">
+              <a:schemeClr val="accent1"/>
+            </a:fillRef>
+            <a:effectRef idx="0">
+              <a:schemeClr val="accent1"/>
+            </a:effectRef>
+            <a:fontRef idx="minor">
+              <a:schemeClr val="lt1"/>
+            </a:fontRef>
+          </p:style>
+          <p:txBody>
+            <a:bodyPr rtlCol="0" anchor="ctr"/>
+            <a:lstStyle/>
+            <a:p>
+              <a:pPr algn="ctr"/>
+              <a:r>
+                <a:rPr lang="en-US" sz="1200" dirty="0" smtClean="0"/>
+                <a:t>Workflow Service</a:t>
+              </a:r>
+              <a:endParaRPr lang="en-US" sz="1200" dirty="0"/>
+            </a:p>
+          </p:txBody>
+        </p:sp>
+        <p:cxnSp>
+          <p:nvCxnSpPr>
+            <p:cNvPr id="20" name="Straight Arrow Connector 19"/>
+            <p:cNvCxnSpPr>
+              <a:stCxn id="6" idx="2"/>
+            </p:cNvCxnSpPr>
+            <p:nvPr/>
+          </p:nvCxnSpPr>
+          <p:spPr>
+            <a:xfrm rot="5400000">
+              <a:off x="1485900" y="4000500"/>
+              <a:ext cx="381000" cy="1588"/>
+            </a:xfrm>
+            <a:prstGeom prst="straightConnector1">
+              <a:avLst/>
+            </a:prstGeom>
+            <a:ln w="38100">
+              <a:tailEnd type="arrow"/>
+            </a:ln>
+          </p:spPr>
+          <p:style>
+            <a:lnRef idx="1">
+              <a:schemeClr val="accent1"/>
+            </a:lnRef>
+            <a:fillRef idx="0">
+              <a:schemeClr val="accent1"/>
+            </a:fillRef>
+            <a:effectRef idx="0">
+              <a:schemeClr val="accent1"/>
+            </a:effectRef>
+            <a:fontRef idx="minor">
+              <a:schemeClr val="tx1"/>
+            </a:fontRef>
+          </p:style>
+        </p:cxnSp>
+        <p:cxnSp>
+          <p:nvCxnSpPr>
+            <p:cNvPr id="23" name="Straight Arrow Connector 22"/>
+            <p:cNvCxnSpPr>
+              <a:stCxn id="11" idx="2"/>
+            </p:cNvCxnSpPr>
+            <p:nvPr/>
+          </p:nvCxnSpPr>
+          <p:spPr>
+            <a:xfrm rot="5400000">
+              <a:off x="3390900" y="4000500"/>
+              <a:ext cx="381000" cy="1588"/>
+            </a:xfrm>
+            <a:prstGeom prst="straightConnector1">
+              <a:avLst/>
+            </a:prstGeom>
+            <a:ln w="38100">
+              <a:tailEnd type="arrow"/>
+            </a:ln>
+          </p:spPr>
+          <p:style>
+            <a:lnRef idx="1">
+              <a:schemeClr val="accent1"/>
+            </a:lnRef>
+            <a:fillRef idx="0">
+              <a:schemeClr val="accent1"/>
+            </a:fillRef>
+            <a:effectRef idx="0">
+              <a:schemeClr val="accent1"/>
+            </a:effectRef>
+            <a:fontRef idx="minor">
+              <a:schemeClr val="tx1"/>
+            </a:fontRef>
+          </p:style>
+        </p:cxnSp>
+      </p:grpSp>
+      <p:grpSp>
+        <p:nvGrpSpPr>
+          <p:cNvPr id="26" name="Group 25"/>
+          <p:cNvGrpSpPr/>
+          <p:nvPr/>
+        </p:nvGrpSpPr>
+        <p:grpSpPr>
+          <a:xfrm>
+            <a:off x="4648200" y="2438400"/>
+            <a:ext cx="3733800" cy="1524000"/>
+            <a:chOff x="762000" y="3048000"/>
+            <a:chExt cx="3733800" cy="1524000"/>
+          </a:xfrm>
+        </p:grpSpPr>
+        <p:grpSp>
+          <p:nvGrpSpPr>
+            <p:cNvPr id="27" name="Group 6"/>
+            <p:cNvGrpSpPr/>
+            <p:nvPr/>
+          </p:nvGrpSpPr>
+          <p:grpSpPr>
+            <a:xfrm>
+              <a:off x="762000" y="3048000"/>
+              <a:ext cx="1828800" cy="762000"/>
+              <a:chOff x="762000" y="3048000"/>
+              <a:chExt cx="1828800" cy="762000"/>
+            </a:xfrm>
+          </p:grpSpPr>
+          <p:sp>
+            <p:nvSpPr>
+              <p:cNvPr id="35" name="Rectangle 3"/>
+              <p:cNvSpPr/>
+              <p:nvPr/>
+            </p:nvSpPr>
+            <p:spPr>
+              <a:xfrm>
+                <a:off x="762000" y="3048000"/>
+                <a:ext cx="914400" cy="381000"/>
+              </a:xfrm>
+              <a:prstGeom prst="rect">
+                <a:avLst/>
+              </a:prstGeom>
+            </p:spPr>
+            <p:style>
+              <a:lnRef idx="2">
+                <a:schemeClr val="accent1">
+                  <a:shade val="50000"/>
+                </a:schemeClr>
+              </a:lnRef>
+              <a:fillRef idx="1">
+                <a:schemeClr val="accent1"/>
+              </a:fillRef>
+              <a:effectRef idx="0">
+                <a:schemeClr val="accent1"/>
+              </a:effectRef>
+              <a:fontRef idx="minor">
+                <a:schemeClr val="lt1"/>
+              </a:fontRef>
+            </p:style>
+            <p:txBody>
+              <a:bodyPr rtlCol="0" anchor="ctr"/>
+              <a:lstStyle/>
+              <a:p>
+                <a:pPr algn="ctr"/>
+                <a:r>
+                  <a:rPr lang="en-US" sz="1200" dirty="0" smtClean="0"/>
+                  <a:t>Model</a:t>
+                </a:r>
+                <a:endParaRPr lang="en-US" sz="1200" dirty="0"/>
+              </a:p>
+            </p:txBody>
+          </p:sp>
+          <p:sp>
+            <p:nvSpPr>
+              <p:cNvPr id="36" name="Rectangle 35"/>
+              <p:cNvSpPr/>
+              <p:nvPr/>
+            </p:nvSpPr>
+            <p:spPr>
+              <a:xfrm>
+                <a:off x="1676400" y="3048000"/>
+                <a:ext cx="914400" cy="381000"/>
+              </a:xfrm>
+              <a:prstGeom prst="rect">
+                <a:avLst/>
+              </a:prstGeom>
+            </p:spPr>
+            <p:style>
+              <a:lnRef idx="2">
+                <a:schemeClr val="accent1">
+                  <a:shade val="50000"/>
+                </a:schemeClr>
+              </a:lnRef>
+              <a:fillRef idx="1">
+                <a:schemeClr val="accent1"/>
+              </a:fillRef>
+              <a:effectRef idx="0">
+                <a:schemeClr val="accent1"/>
+              </a:effectRef>
+              <a:fontRef idx="minor">
+                <a:schemeClr val="lt1"/>
+              </a:fontRef>
+            </p:style>
+            <p:txBody>
+              <a:bodyPr rtlCol="0" anchor="ctr"/>
+              <a:lstStyle/>
+              <a:p>
+                <a:pPr algn="ctr"/>
+                <a:r>
+                  <a:rPr lang="en-US" sz="1200" dirty="0" smtClean="0"/>
+                  <a:t>View</a:t>
+                </a:r>
+              </a:p>
+            </p:txBody>
+          </p:sp>
+          <p:sp>
+            <p:nvSpPr>
+              <p:cNvPr id="37" name="Rectangle 36"/>
+              <p:cNvSpPr/>
+              <p:nvPr/>
+            </p:nvSpPr>
+            <p:spPr>
+              <a:xfrm>
+                <a:off x="762000" y="3429000"/>
+                <a:ext cx="1828800" cy="381000"/>
+              </a:xfrm>
+              <a:prstGeom prst="rect">
+                <a:avLst/>
+              </a:prstGeom>
+            </p:spPr>
+            <p:style>
+              <a:lnRef idx="2">
+                <a:schemeClr val="accent1">
+                  <a:shade val="50000"/>
+                </a:schemeClr>
+              </a:lnRef>
+              <a:fillRef idx="1">
+                <a:schemeClr val="accent1"/>
+              </a:fillRef>
+              <a:effectRef idx="0">
+                <a:schemeClr val="accent1"/>
+              </a:effectRef>
+              <a:fontRef idx="minor">
+                <a:schemeClr val="lt1"/>
+              </a:fontRef>
+            </p:style>
+            <p:txBody>
+              <a:bodyPr rtlCol="0" anchor="ctr"/>
+              <a:lstStyle/>
+              <a:p>
+                <a:pPr algn="ctr"/>
+                <a:r>
+                  <a:rPr lang="en-US" sz="1200" dirty="0" smtClean="0"/>
+                  <a:t>Presenter</a:t>
+                </a:r>
+                <a:endParaRPr lang="en-US" sz="1200" dirty="0"/>
+              </a:p>
+            </p:txBody>
+          </p:sp>
+        </p:grpSp>
+        <p:grpSp>
+          <p:nvGrpSpPr>
+            <p:cNvPr id="28" name="Group 7"/>
+            <p:cNvGrpSpPr/>
+            <p:nvPr/>
+          </p:nvGrpSpPr>
+          <p:grpSpPr>
+            <a:xfrm>
+              <a:off x="2667000" y="3048000"/>
+              <a:ext cx="1828800" cy="762000"/>
+              <a:chOff x="762000" y="3048000"/>
+              <a:chExt cx="1828800" cy="762000"/>
+            </a:xfrm>
+          </p:grpSpPr>
+          <p:sp>
+            <p:nvSpPr>
+              <p:cNvPr id="32" name="Rectangle 31"/>
+              <p:cNvSpPr/>
+              <p:nvPr/>
+            </p:nvSpPr>
+            <p:spPr>
+              <a:xfrm>
+                <a:off x="762000" y="3048000"/>
+                <a:ext cx="914400" cy="381000"/>
+              </a:xfrm>
+              <a:prstGeom prst="rect">
+                <a:avLst/>
+              </a:prstGeom>
+            </p:spPr>
+            <p:style>
+              <a:lnRef idx="2">
+                <a:schemeClr val="accent1">
+                  <a:shade val="50000"/>
+                </a:schemeClr>
+              </a:lnRef>
+              <a:fillRef idx="1">
+                <a:schemeClr val="accent1"/>
+              </a:fillRef>
+              <a:effectRef idx="0">
+                <a:schemeClr val="accent1"/>
+              </a:effectRef>
+              <a:fontRef idx="minor">
+                <a:schemeClr val="lt1"/>
+              </a:fontRef>
+            </p:style>
+            <p:txBody>
+              <a:bodyPr rtlCol="0" anchor="ctr"/>
+              <a:lstStyle/>
+              <a:p>
+                <a:pPr algn="ctr"/>
+                <a:r>
+                  <a:rPr lang="en-US" sz="1200" dirty="0" smtClean="0"/>
+                  <a:t>Model</a:t>
+                </a:r>
+                <a:endParaRPr lang="en-US" sz="1200" dirty="0"/>
+              </a:p>
+            </p:txBody>
+          </p:sp>
+          <p:sp>
+            <p:nvSpPr>
+              <p:cNvPr id="33" name="Rectangle 32"/>
+              <p:cNvSpPr/>
+              <p:nvPr/>
+            </p:nvSpPr>
+            <p:spPr>
+              <a:xfrm>
+                <a:off x="1676400" y="3048000"/>
+                <a:ext cx="914400" cy="381000"/>
+              </a:xfrm>
+              <a:prstGeom prst="rect">
+                <a:avLst/>
+              </a:prstGeom>
+            </p:spPr>
+            <p:style>
+              <a:lnRef idx="2">
+                <a:schemeClr val="accent1">
+                  <a:shade val="50000"/>
+                </a:schemeClr>
+              </a:lnRef>
+              <a:fillRef idx="1">
+                <a:schemeClr val="accent1"/>
+              </a:fillRef>
+              <a:effectRef idx="0">
+                <a:schemeClr val="accent1"/>
+              </a:effectRef>
+              <a:fontRef idx="minor">
+                <a:schemeClr val="lt1"/>
+              </a:fontRef>
+            </p:style>
+            <p:txBody>
+              <a:bodyPr rtlCol="0" anchor="ctr"/>
+              <a:lstStyle/>
+              <a:p>
+                <a:pPr algn="ctr"/>
+                <a:r>
+                  <a:rPr lang="en-US" sz="1200" dirty="0" smtClean="0"/>
+                  <a:t>View</a:t>
+                </a:r>
+              </a:p>
+            </p:txBody>
+          </p:sp>
+          <p:sp>
+            <p:nvSpPr>
+              <p:cNvPr id="34" name="Rectangle 33"/>
+              <p:cNvSpPr/>
+              <p:nvPr/>
+            </p:nvSpPr>
+            <p:spPr>
+              <a:xfrm>
+                <a:off x="762000" y="3429000"/>
+                <a:ext cx="1828800" cy="381000"/>
+              </a:xfrm>
+              <a:prstGeom prst="rect">
+                <a:avLst/>
+              </a:prstGeom>
+            </p:spPr>
+            <p:style>
+              <a:lnRef idx="2">
+                <a:schemeClr val="accent1">
+                  <a:shade val="50000"/>
+                </a:schemeClr>
+              </a:lnRef>
+              <a:fillRef idx="1">
+                <a:schemeClr val="accent1"/>
+              </a:fillRef>
+              <a:effectRef idx="0">
+                <a:schemeClr val="accent1"/>
+              </a:effectRef>
+              <a:fontRef idx="minor">
+                <a:schemeClr val="lt1"/>
+              </a:fontRef>
+            </p:style>
+            <p:txBody>
+              <a:bodyPr rtlCol="0" anchor="ctr"/>
+              <a:lstStyle/>
+              <a:p>
+                <a:pPr algn="ctr"/>
+                <a:r>
+                  <a:rPr lang="en-US" sz="1200" dirty="0" smtClean="0"/>
+                  <a:t>Presenter</a:t>
+                </a:r>
+                <a:endParaRPr lang="en-US" sz="1200" dirty="0"/>
+              </a:p>
+            </p:txBody>
+          </p:sp>
+        </p:grpSp>
+        <p:sp>
+          <p:nvSpPr>
+            <p:cNvPr id="29" name="Rectangle 28"/>
+            <p:cNvSpPr/>
+            <p:nvPr/>
+          </p:nvSpPr>
+          <p:spPr>
+            <a:xfrm>
+              <a:off x="762000" y="4191000"/>
+              <a:ext cx="3733800" cy="381000"/>
+            </a:xfrm>
+            <a:prstGeom prst="rect">
+              <a:avLst/>
+            </a:prstGeom>
+          </p:spPr>
+          <p:style>
+            <a:lnRef idx="2">
+              <a:schemeClr val="accent1">
+                <a:shade val="50000"/>
+              </a:schemeClr>
+            </a:lnRef>
+            <a:fillRef idx="1">
+              <a:schemeClr val="accent1"/>
+            </a:fillRef>
+            <a:effectRef idx="0">
+              <a:schemeClr val="accent1"/>
+            </a:effectRef>
+            <a:fontRef idx="minor">
+              <a:schemeClr val="lt1"/>
+            </a:fontRef>
+          </p:style>
+          <p:txBody>
+            <a:bodyPr rtlCol="0" anchor="ctr"/>
+            <a:lstStyle/>
+            <a:p>
+              <a:pPr algn="ctr"/>
+              <a:r>
+                <a:rPr lang="en-US" sz="1200" dirty="0" smtClean="0"/>
+                <a:t>Workflow Service</a:t>
+              </a:r>
+              <a:endParaRPr lang="en-US" sz="1200" dirty="0"/>
+            </a:p>
+          </p:txBody>
+        </p:sp>
+        <p:cxnSp>
+          <p:nvCxnSpPr>
+            <p:cNvPr id="30" name="Straight Arrow Connector 29"/>
+            <p:cNvCxnSpPr>
+              <a:stCxn id="37" idx="2"/>
+            </p:cNvCxnSpPr>
+            <p:nvPr/>
+          </p:nvCxnSpPr>
+          <p:spPr>
+            <a:xfrm rot="5400000">
+              <a:off x="1485900" y="4000500"/>
+              <a:ext cx="381000" cy="1588"/>
+            </a:xfrm>
+            <a:prstGeom prst="straightConnector1">
+              <a:avLst/>
+            </a:prstGeom>
+            <a:ln w="38100">
+              <a:tailEnd type="arrow"/>
+            </a:ln>
+          </p:spPr>
+          <p:style>
+            <a:lnRef idx="1">
+              <a:schemeClr val="accent1"/>
+            </a:lnRef>
+            <a:fillRef idx="0">
+              <a:schemeClr val="accent1"/>
+            </a:fillRef>
+            <a:effectRef idx="0">
+              <a:schemeClr val="accent1"/>
+            </a:effectRef>
+            <a:fontRef idx="minor">
+              <a:schemeClr val="tx1"/>
+            </a:fontRef>
+          </p:style>
+        </p:cxnSp>
+        <p:cxnSp>
+          <p:nvCxnSpPr>
+            <p:cNvPr id="31" name="Straight Arrow Connector 30"/>
+            <p:cNvCxnSpPr>
+              <a:stCxn id="34" idx="2"/>
+            </p:cNvCxnSpPr>
+            <p:nvPr/>
+          </p:nvCxnSpPr>
+          <p:spPr>
+            <a:xfrm rot="5400000">
+              <a:off x="3390900" y="4000500"/>
+              <a:ext cx="381000" cy="1588"/>
+            </a:xfrm>
+            <a:prstGeom prst="straightConnector1">
+              <a:avLst/>
+            </a:prstGeom>
+            <a:ln w="38100">
+              <a:tailEnd type="arrow"/>
+            </a:ln>
+          </p:spPr>
+          <p:style>
+            <a:lnRef idx="1">
+              <a:schemeClr val="accent1"/>
+            </a:lnRef>
+            <a:fillRef idx="0">
+              <a:schemeClr val="accent1"/>
+            </a:fillRef>
+            <a:effectRef idx="0">
+              <a:schemeClr val="accent1"/>
+            </a:effectRef>
+            <a:fontRef idx="minor">
+              <a:schemeClr val="tx1"/>
+            </a:fontRef>
+          </p:style>
+        </p:cxnSp>
+      </p:grpSp>
+      <p:cxnSp>
+        <p:nvCxnSpPr>
+          <p:cNvPr id="40" name="Straight Arrow Connector 39"/>
+          <p:cNvCxnSpPr/>
+          <p:nvPr/>
+        </p:nvCxnSpPr>
+        <p:spPr>
+          <a:xfrm rot="5400000">
+            <a:off x="723105" y="3771106"/>
+            <a:ext cx="1143000" cy="1588"/>
+          </a:xfrm>
+          <a:prstGeom prst="straightConnector1">
+            <a:avLst/>
+          </a:prstGeom>
+          <a:ln w="38100">
+            <a:solidFill>
+              <a:schemeClr val="accent2"/>
+            </a:solidFill>
+            <a:tailEnd type="arrow"/>
+          </a:ln>
+        </p:spPr>
+        <p:style>
+          <a:lnRef idx="1">
+            <a:schemeClr val="accent1"/>
+          </a:lnRef>
+          <a:fillRef idx="0">
+            <a:schemeClr val="accent1"/>
+          </a:fillRef>
+          <a:effectRef idx="0">
+            <a:schemeClr val="accent1"/>
+          </a:effectRef>
+          <a:fontRef idx="minor">
+            <a:schemeClr val="tx1"/>
+          </a:fontRef>
+        </p:style>
+      </p:cxnSp>
+      <p:cxnSp>
+        <p:nvCxnSpPr>
+          <p:cNvPr id="44" name="Straight Arrow Connector 43"/>
+          <p:cNvCxnSpPr/>
+          <p:nvPr/>
+        </p:nvCxnSpPr>
+        <p:spPr>
+          <a:xfrm rot="5400000">
+            <a:off x="3390105" y="3771106"/>
+            <a:ext cx="1143000" cy="1588"/>
+          </a:xfrm>
+          <a:prstGeom prst="straightConnector1">
+            <a:avLst/>
+          </a:prstGeom>
+          <a:ln w="38100">
+            <a:solidFill>
+              <a:schemeClr val="accent2"/>
+            </a:solidFill>
+            <a:tailEnd type="arrow"/>
+          </a:ln>
+        </p:spPr>
+        <p:style>
+          <a:lnRef idx="1">
+            <a:schemeClr val="accent1"/>
+          </a:lnRef>
+          <a:fillRef idx="0">
+            <a:schemeClr val="accent1"/>
+          </a:fillRef>
+          <a:effectRef idx="0">
+            <a:schemeClr val="accent1"/>
+          </a:effectRef>
+          <a:fontRef idx="minor">
+            <a:schemeClr val="tx1"/>
+          </a:fontRef>
+        </p:style>
+      </p:cxnSp>
+      <p:cxnSp>
+        <p:nvCxnSpPr>
+          <p:cNvPr id="45" name="Straight Arrow Connector 44"/>
+          <p:cNvCxnSpPr/>
+          <p:nvPr/>
+        </p:nvCxnSpPr>
+        <p:spPr>
+          <a:xfrm rot="5400000">
+            <a:off x="4610893" y="3771106"/>
+            <a:ext cx="1143000" cy="1588"/>
+          </a:xfrm>
+          <a:prstGeom prst="straightConnector1">
+            <a:avLst/>
+          </a:prstGeom>
+          <a:ln w="38100">
+            <a:solidFill>
+              <a:schemeClr val="accent2"/>
+            </a:solidFill>
+            <a:tailEnd type="arrow"/>
+          </a:ln>
+        </p:spPr>
+        <p:style>
+          <a:lnRef idx="1">
+            <a:schemeClr val="accent1"/>
+          </a:lnRef>
+          <a:fillRef idx="0">
+            <a:schemeClr val="accent1"/>
+          </a:fillRef>
+          <a:effectRef idx="0">
+            <a:schemeClr val="accent1"/>
+          </a:effectRef>
+          <a:fontRef idx="minor">
+            <a:schemeClr val="tx1"/>
+          </a:fontRef>
+        </p:style>
+      </p:cxnSp>
+      <p:cxnSp>
+        <p:nvCxnSpPr>
+          <p:cNvPr id="46" name="Straight Arrow Connector 45"/>
+          <p:cNvCxnSpPr/>
+          <p:nvPr/>
+        </p:nvCxnSpPr>
+        <p:spPr>
+          <a:xfrm rot="5400000">
+            <a:off x="7277894" y="3771106"/>
+            <a:ext cx="1143000" cy="1588"/>
+          </a:xfrm>
+          <a:prstGeom prst="straightConnector1">
+            <a:avLst/>
+          </a:prstGeom>
+          <a:ln w="38100">
+            <a:solidFill>
+              <a:schemeClr val="accent2"/>
+            </a:solidFill>
+            <a:tailEnd type="arrow"/>
+          </a:ln>
+        </p:spPr>
+        <p:style>
+          <a:lnRef idx="1">
+            <a:schemeClr val="accent1"/>
+          </a:lnRef>
+          <a:fillRef idx="0">
+            <a:schemeClr val="accent1"/>
+          </a:fillRef>
+          <a:effectRef idx="0">
+            <a:schemeClr val="accent1"/>
+          </a:effectRef>
+          <a:fontRef idx="minor">
+            <a:schemeClr val="tx1"/>
+          </a:fontRef>
+        </p:style>
+      </p:cxnSp>
+      <p:cxnSp>
+        <p:nvCxnSpPr>
+          <p:cNvPr id="47" name="Straight Arrow Connector 46"/>
+          <p:cNvCxnSpPr/>
+          <p:nvPr/>
+        </p:nvCxnSpPr>
+        <p:spPr>
+          <a:xfrm rot="5400000">
+            <a:off x="2476500" y="4152900"/>
+            <a:ext cx="380206" cy="794"/>
+          </a:xfrm>
+          <a:prstGeom prst="straightConnector1">
+            <a:avLst/>
+          </a:prstGeom>
+          <a:ln w="38100">
+            <a:solidFill>
+              <a:schemeClr val="accent2"/>
+            </a:solidFill>
+            <a:tailEnd type="arrow"/>
+          </a:ln>
+        </p:spPr>
+        <p:style>
+          <a:lnRef idx="1">
+            <a:schemeClr val="accent1"/>
+          </a:lnRef>
+          <a:fillRef idx="0">
+            <a:schemeClr val="accent1"/>
+          </a:fillRef>
+          <a:effectRef idx="0">
+            <a:schemeClr val="accent1"/>
+          </a:effectRef>
+          <a:fontRef idx="minor">
+            <a:schemeClr val="tx1"/>
+          </a:fontRef>
+        </p:style>
+      </p:cxnSp>
+      <p:cxnSp>
+        <p:nvCxnSpPr>
+          <p:cNvPr id="54" name="Straight Arrow Connector 53"/>
+          <p:cNvCxnSpPr/>
+          <p:nvPr/>
+        </p:nvCxnSpPr>
+        <p:spPr>
+          <a:xfrm rot="5400000">
+            <a:off x="6362700" y="4152900"/>
+            <a:ext cx="380206" cy="794"/>
+          </a:xfrm>
+          <a:prstGeom prst="straightConnector1">
+            <a:avLst/>
+          </a:prstGeom>
+          <a:ln w="38100">
+            <a:solidFill>
+              <a:schemeClr val="accent2"/>
+            </a:solidFill>
+            <a:tailEnd type="arrow"/>
+          </a:ln>
+        </p:spPr>
+        <p:style>
+          <a:lnRef idx="1">
+            <a:schemeClr val="accent1"/>
+          </a:lnRef>
+          <a:fillRef idx="0">
+            <a:schemeClr val="accent1"/>
+          </a:fillRef>
+          <a:effectRef idx="0">
+            <a:schemeClr val="accent1"/>
+          </a:effectRef>
+          <a:fontRef idx="minor">
+            <a:schemeClr val="tx1"/>
+          </a:fontRef>
+        </p:style>
+      </p:cxnSp>
+      <p:sp>
+        <p:nvSpPr>
+          <p:cNvPr id="59" name="Rectangle 58"/>
+          <p:cNvSpPr/>
+          <p:nvPr/>
+        </p:nvSpPr>
+        <p:spPr>
+          <a:xfrm>
+            <a:off x="762000" y="5105400"/>
+            <a:ext cx="7620000" cy="381000"/>
+          </a:xfrm>
+          <a:prstGeom prst="rect">
+            <a:avLst/>
+          </a:prstGeom>
+        </p:spPr>
+        <p:style>
+          <a:lnRef idx="2">
+            <a:schemeClr val="accent2">
+              <a:shade val="50000"/>
+            </a:schemeClr>
+          </a:lnRef>
+          <a:fillRef idx="1">
+            <a:schemeClr val="accent2"/>
+          </a:fillRef>
+          <a:effectRef idx="0">
+            <a:schemeClr val="accent2"/>
+          </a:effectRef>
+          <a:fontRef idx="minor">
+            <a:schemeClr val="lt1"/>
+          </a:fontRef>
+        </p:style>
+        <p:txBody>
+          <a:bodyPr rtlCol="0" anchor="ctr"/>
+          <a:lstStyle/>
+          <a:p>
+            <a:pPr algn="ctr"/>
+            <a:r>
+              <a:rPr lang="en-US" sz="1200" dirty="0" err="1" smtClean="0"/>
+              <a:t>IoC</a:t>
+            </a:r>
+            <a:r>
+              <a:rPr lang="en-US" sz="1200" dirty="0" smtClean="0"/>
+              <a:t> Container</a:t>
+            </a:r>
+            <a:endParaRPr lang="en-US" sz="1200" dirty="0"/>
           </a:p>
         </p:txBody>
       </p:sp>

</xml_diff>

<commit_message>
deleted 'topics covered' slide
</commit_message>
<xml_diff>
--- a/Decoupling Workflow With App Controler/Decoupling Workflow From Forms.pptx
+++ b/Decoupling Workflow With App Controler/Decoupling Workflow From Forms.pptx
@@ -5,55 +5,54 @@
     <p:sldMasterId id="2147483822" r:id="rId4"/>
   </p:sldMasterIdLst>
   <p:notesMasterIdLst>
-    <p:notesMasterId r:id="rId38"/>
+    <p:notesMasterId r:id="rId37"/>
   </p:notesMasterIdLst>
   <p:handoutMasterIdLst>
-    <p:handoutMasterId r:id="rId39"/>
+    <p:handoutMasterId r:id="rId38"/>
   </p:handoutMasterIdLst>
   <p:sldIdLst>
     <p:sldId id="256" r:id="rId5"/>
-    <p:sldId id="257" r:id="rId6"/>
-    <p:sldId id="288" r:id="rId7"/>
-    <p:sldId id="290" r:id="rId8"/>
-    <p:sldId id="289" r:id="rId9"/>
-    <p:sldId id="258" r:id="rId10"/>
-    <p:sldId id="283" r:id="rId11"/>
-    <p:sldId id="291" r:id="rId12"/>
-    <p:sldId id="282" r:id="rId13"/>
-    <p:sldId id="280" r:id="rId14"/>
-    <p:sldId id="286" r:id="rId15"/>
-    <p:sldId id="281" r:id="rId16"/>
-    <p:sldId id="303" r:id="rId17"/>
-    <p:sldId id="296" r:id="rId18"/>
-    <p:sldId id="278" r:id="rId19"/>
-    <p:sldId id="304" r:id="rId20"/>
-    <p:sldId id="295" r:id="rId21"/>
-    <p:sldId id="301" r:id="rId22"/>
-    <p:sldId id="302" r:id="rId23"/>
-    <p:sldId id="285" r:id="rId24"/>
-    <p:sldId id="300" r:id="rId25"/>
-    <p:sldId id="305" r:id="rId26"/>
-    <p:sldId id="307" r:id="rId27"/>
-    <p:sldId id="297" r:id="rId28"/>
-    <p:sldId id="276" r:id="rId29"/>
-    <p:sldId id="277" r:id="rId30"/>
-    <p:sldId id="284" r:id="rId31"/>
-    <p:sldId id="308" r:id="rId32"/>
-    <p:sldId id="292" r:id="rId33"/>
-    <p:sldId id="294" r:id="rId34"/>
-    <p:sldId id="293" r:id="rId35"/>
-    <p:sldId id="259" r:id="rId36"/>
-    <p:sldId id="274" r:id="rId37"/>
+    <p:sldId id="288" r:id="rId6"/>
+    <p:sldId id="290" r:id="rId7"/>
+    <p:sldId id="289" r:id="rId8"/>
+    <p:sldId id="258" r:id="rId9"/>
+    <p:sldId id="283" r:id="rId10"/>
+    <p:sldId id="291" r:id="rId11"/>
+    <p:sldId id="282" r:id="rId12"/>
+    <p:sldId id="280" r:id="rId13"/>
+    <p:sldId id="286" r:id="rId14"/>
+    <p:sldId id="281" r:id="rId15"/>
+    <p:sldId id="303" r:id="rId16"/>
+    <p:sldId id="296" r:id="rId17"/>
+    <p:sldId id="278" r:id="rId18"/>
+    <p:sldId id="304" r:id="rId19"/>
+    <p:sldId id="295" r:id="rId20"/>
+    <p:sldId id="301" r:id="rId21"/>
+    <p:sldId id="302" r:id="rId22"/>
+    <p:sldId id="285" r:id="rId23"/>
+    <p:sldId id="300" r:id="rId24"/>
+    <p:sldId id="305" r:id="rId25"/>
+    <p:sldId id="307" r:id="rId26"/>
+    <p:sldId id="297" r:id="rId27"/>
+    <p:sldId id="276" r:id="rId28"/>
+    <p:sldId id="277" r:id="rId29"/>
+    <p:sldId id="284" r:id="rId30"/>
+    <p:sldId id="308" r:id="rId31"/>
+    <p:sldId id="292" r:id="rId32"/>
+    <p:sldId id="294" r:id="rId33"/>
+    <p:sldId id="293" r:id="rId34"/>
+    <p:sldId id="259" r:id="rId35"/>
+    <p:sldId id="274" r:id="rId36"/>
   </p:sldIdLst>
   <p:sldSz cx="9144000" cy="6858000" type="screen4x3"/>
   <p:notesSz cx="7010400" cy="9296400"/>
   <p:embeddedFontLst>
     <p:embeddedFont>
       <p:font typeface="Calibri" pitchFamily="34" charset="0"/>
-      <p:regular r:id="rId40"/>
-      <p:bold r:id="rId41"/>
-      <p:italic r:id="rId42"/>
-      <p:boldItalic r:id="rId43"/>
+      <p:regular r:id="rId39"/>
+      <p:bold r:id="rId40"/>
+      <p:italic r:id="rId41"/>
+      <p:boldItalic r:id="rId42"/>
     </p:embeddedFont>
   </p:embeddedFontLst>
   <p:defaultTextStyle>
@@ -1004,7 +1003,7 @@
               <a:pPr>
                 <a:defRPr/>
               </a:pPr>
-              <a:t>14</a:t>
+              <a:t>15</a:t>
             </a:fld>
             <a:endParaRPr lang="en-US"/>
           </a:p>
@@ -1178,7 +1177,7 @@
               <a:pPr>
                 <a:defRPr/>
               </a:pPr>
-              <a:t>17</a:t>
+              <a:t>18</a:t>
             </a:fld>
             <a:endParaRPr lang="en-US"/>
           </a:p>
@@ -1700,7 +1699,7 @@
               <a:pPr>
                 <a:defRPr/>
               </a:pPr>
-              <a:t>24</a:t>
+              <a:t>25</a:t>
             </a:fld>
             <a:endParaRPr lang="en-US"/>
           </a:p>
@@ -2048,7 +2047,7 @@
               <a:pPr>
                 <a:defRPr/>
               </a:pPr>
-              <a:t>28</a:t>
+              <a:t>29</a:t>
             </a:fld>
             <a:endParaRPr lang="en-US"/>
           </a:p>
@@ -2136,93 +2135,6 @@
                 <a:defRPr/>
               </a:pPr>
               <a:t>30</a:t>
-            </a:fld>
-            <a:endParaRPr lang="en-US"/>
-          </a:p>
-        </p:txBody>
-      </p:sp>
-    </p:spTree>
-  </p:cSld>
-  <p:clrMapOvr>
-    <a:masterClrMapping/>
-  </p:clrMapOvr>
-</p:notes>
-</file>
-
-<file path=ppt/notesSlides/notesSlide24.xml><?xml version="1.0" encoding="utf-8"?>
-<p:notes xmlns:a="http://schemas.openxmlformats.org/drawingml/2006/main" xmlns:r="http://schemas.openxmlformats.org/officeDocument/2006/relationships" xmlns:p="http://schemas.openxmlformats.org/presentationml/2006/main">
-  <p:cSld>
-    <p:spTree>
-      <p:nvGrpSpPr>
-        <p:cNvPr id="1" name=""/>
-        <p:cNvGrpSpPr/>
-        <p:nvPr/>
-      </p:nvGrpSpPr>
-      <p:grpSpPr>
-        <a:xfrm>
-          <a:off x="0" y="0"/>
-          <a:ext cx="0" cy="0"/>
-          <a:chOff x="0" y="0"/>
-          <a:chExt cx="0" cy="0"/>
-        </a:xfrm>
-      </p:grpSpPr>
-      <p:sp>
-        <p:nvSpPr>
-          <p:cNvPr id="2" name="Slide Image Placeholder 1"/>
-          <p:cNvSpPr>
-            <a:spLocks noGrp="1" noRot="1" noChangeAspect="1"/>
-          </p:cNvSpPr>
-          <p:nvPr>
-            <p:ph type="sldImg"/>
-          </p:nvPr>
-        </p:nvSpPr>
-        <p:spPr/>
-      </p:sp>
-      <p:sp>
-        <p:nvSpPr>
-          <p:cNvPr id="3" name="Notes Placeholder 2"/>
-          <p:cNvSpPr>
-            <a:spLocks noGrp="1"/>
-          </p:cNvSpPr>
-          <p:nvPr>
-            <p:ph type="body" idx="1"/>
-          </p:nvPr>
-        </p:nvSpPr>
-        <p:spPr/>
-        <p:txBody>
-          <a:bodyPr>
-            <a:normAutofit/>
-          </a:bodyPr>
-          <a:lstStyle/>
-          <a:p>
-            <a:endParaRPr lang="en-US" dirty="0"/>
-          </a:p>
-        </p:txBody>
-      </p:sp>
-      <p:sp>
-        <p:nvSpPr>
-          <p:cNvPr id="4" name="Slide Number Placeholder 3"/>
-          <p:cNvSpPr>
-            <a:spLocks noGrp="1"/>
-          </p:cNvSpPr>
-          <p:nvPr>
-            <p:ph type="sldNum" sz="quarter" idx="10"/>
-          </p:nvPr>
-        </p:nvSpPr>
-        <p:spPr/>
-        <p:txBody>
-          <a:bodyPr/>
-          <a:lstStyle/>
-          <a:p>
-            <a:pPr>
-              <a:defRPr/>
-            </a:pPr>
-            <a:fld id="{1931C8FD-CC35-423B-99F4-64D81D6A80AE}" type="slidenum">
-              <a:rPr lang="en-US" smtClean="0"/>
-              <a:pPr>
-                <a:defRPr/>
-              </a:pPr>
-              <a:t>31</a:t>
             </a:fld>
             <a:endParaRPr lang="en-US"/>
           </a:p>
@@ -2396,7 +2308,7 @@
               <a:pPr>
                 <a:defRPr/>
               </a:pPr>
-              <a:t>5</a:t>
+              <a:t>6</a:t>
             </a:fld>
             <a:endParaRPr lang="en-US"/>
           </a:p>
@@ -2657,7 +2569,7 @@
               <a:pPr>
                 <a:defRPr/>
               </a:pPr>
-              <a:t>9</a:t>
+              <a:t>10</a:t>
             </a:fld>
             <a:endParaRPr lang="en-US"/>
           </a:p>
@@ -4202,343 +4114,6 @@
       </p:grpSpPr>
       <p:sp>
         <p:nvSpPr>
-          <p:cNvPr id="4" name="Rectangle 3"/>
-          <p:cNvSpPr/>
-          <p:nvPr/>
-        </p:nvSpPr>
-        <p:spPr>
-          <a:xfrm>
-            <a:off x="0" y="0"/>
-            <a:ext cx="9144000" cy="4648200"/>
-          </a:xfrm>
-          <a:prstGeom prst="rect">
-            <a:avLst/>
-          </a:prstGeom>
-          <a:solidFill>
-            <a:srgbClr val="0069AA"/>
-          </a:solidFill>
-          <a:ln>
-            <a:noFill/>
-          </a:ln>
-        </p:spPr>
-        <p:style>
-          <a:lnRef idx="2">
-            <a:schemeClr val="accent1">
-              <a:shade val="50000"/>
-            </a:schemeClr>
-          </a:lnRef>
-          <a:fillRef idx="1">
-            <a:schemeClr val="accent1"/>
-          </a:fillRef>
-          <a:effectRef idx="0">
-            <a:schemeClr val="accent1"/>
-          </a:effectRef>
-          <a:fontRef idx="minor">
-            <a:schemeClr val="lt1"/>
-          </a:fontRef>
-        </p:style>
-        <p:txBody>
-          <a:bodyPr anchor="ctr"/>
-          <a:lstStyle/>
-          <a:p>
-            <a:pPr algn="ctr">
-              <a:defRPr/>
-            </a:pPr>
-            <a:endParaRPr lang="en-US"/>
-          </a:p>
-        </p:txBody>
-      </p:sp>
-      <p:pic>
-        <p:nvPicPr>
-          <p:cNvPr id="4099" name="Picture 4" descr="MAT logo 1 CMYK"/>
-          <p:cNvPicPr>
-            <a:picLocks noChangeAspect="1" noChangeArrowheads="1"/>
-          </p:cNvPicPr>
-          <p:nvPr/>
-        </p:nvPicPr>
-        <p:blipFill>
-          <a:blip r:embed="rId2">
-            <a:clrChange>
-              <a:clrFrom>
-                <a:srgbClr val="FDFDFD"/>
-              </a:clrFrom>
-              <a:clrTo>
-                <a:srgbClr val="FDFDFD">
-                  <a:alpha val="0"/>
-                </a:srgbClr>
-              </a:clrTo>
-            </a:clrChange>
-          </a:blip>
-          <a:srcRect/>
-          <a:stretch>
-            <a:fillRect/>
-          </a:stretch>
-        </p:blipFill>
-        <p:spPr bwMode="auto">
-          <a:xfrm>
-            <a:off x="2971800" y="4800600"/>
-            <a:ext cx="2819400" cy="1338263"/>
-          </a:xfrm>
-          <a:prstGeom prst="rect">
-            <a:avLst/>
-          </a:prstGeom>
-          <a:noFill/>
-          <a:ln w="9525">
-            <a:noFill/>
-            <a:miter lim="800000"/>
-            <a:headEnd/>
-            <a:tailEnd/>
-          </a:ln>
-        </p:spPr>
-      </p:pic>
-      <p:sp>
-        <p:nvSpPr>
-          <p:cNvPr id="5" name="Rectangle 4"/>
-          <p:cNvSpPr/>
-          <p:nvPr/>
-        </p:nvSpPr>
-        <p:spPr>
-          <a:xfrm>
-            <a:off x="0" y="4724400"/>
-            <a:ext cx="9144000" cy="2133600"/>
-          </a:xfrm>
-          <a:prstGeom prst="rect">
-            <a:avLst/>
-          </a:prstGeom>
-          <a:solidFill>
-            <a:srgbClr val="E31937"/>
-          </a:solidFill>
-          <a:ln>
-            <a:noFill/>
-          </a:ln>
-        </p:spPr>
-        <p:style>
-          <a:lnRef idx="2">
-            <a:schemeClr val="accent1">
-              <a:shade val="50000"/>
-            </a:schemeClr>
-          </a:lnRef>
-          <a:fillRef idx="1">
-            <a:schemeClr val="accent1"/>
-          </a:fillRef>
-          <a:effectRef idx="0">
-            <a:schemeClr val="accent1"/>
-          </a:effectRef>
-          <a:fontRef idx="minor">
-            <a:schemeClr val="lt1"/>
-          </a:fontRef>
-        </p:style>
-        <p:txBody>
-          <a:bodyPr anchor="ctr"/>
-          <a:lstStyle/>
-          <a:p>
-            <a:pPr algn="ctr">
-              <a:defRPr/>
-            </a:pPr>
-            <a:endParaRPr lang="en-US"/>
-          </a:p>
-        </p:txBody>
-      </p:sp>
-      <p:sp>
-        <p:nvSpPr>
-          <p:cNvPr id="10" name="Rectangle 9"/>
-          <p:cNvSpPr/>
-          <p:nvPr/>
-        </p:nvSpPr>
-        <p:spPr bwMode="auto">
-          <a:xfrm>
-            <a:off x="228600" y="0"/>
-            <a:ext cx="104775" cy="2325688"/>
-          </a:xfrm>
-          <a:prstGeom prst="rect">
-            <a:avLst/>
-          </a:prstGeom>
-          <a:solidFill>
-            <a:srgbClr val="E31937"/>
-          </a:solidFill>
-          <a:ln>
-            <a:noFill/>
-          </a:ln>
-        </p:spPr>
-        <p:style>
-          <a:lnRef idx="2">
-            <a:schemeClr val="accent1">
-              <a:shade val="50000"/>
-            </a:schemeClr>
-          </a:lnRef>
-          <a:fillRef idx="1">
-            <a:schemeClr val="accent1"/>
-          </a:fillRef>
-          <a:effectRef idx="0">
-            <a:schemeClr val="accent1"/>
-          </a:effectRef>
-          <a:fontRef idx="minor">
-            <a:schemeClr val="lt1"/>
-          </a:fontRef>
-        </p:style>
-        <p:txBody>
-          <a:bodyPr anchor="ctr"/>
-          <a:lstStyle/>
-          <a:p>
-            <a:pPr algn="ctr">
-              <a:defRPr/>
-            </a:pPr>
-            <a:endParaRPr lang="en-US"/>
-          </a:p>
-        </p:txBody>
-      </p:sp>
-      <p:pic>
-        <p:nvPicPr>
-          <p:cNvPr id="4103" name="Picture 7" descr="MAT logo vertical_red.emf"/>
-          <p:cNvPicPr>
-            <a:picLocks noChangeAspect="1"/>
-          </p:cNvPicPr>
-          <p:nvPr/>
-        </p:nvPicPr>
-        <p:blipFill>
-          <a:blip r:embed="rId3"/>
-          <a:srcRect/>
-          <a:stretch>
-            <a:fillRect/>
-          </a:stretch>
-        </p:blipFill>
-        <p:spPr bwMode="auto">
-          <a:xfrm>
-            <a:off x="3600450" y="5334000"/>
-            <a:ext cx="1981200" cy="969963"/>
-          </a:xfrm>
-          <a:prstGeom prst="rect">
-            <a:avLst/>
-          </a:prstGeom>
-          <a:noFill/>
-          <a:ln w="9525">
-            <a:noFill/>
-            <a:miter lim="800000"/>
-            <a:headEnd/>
-            <a:tailEnd/>
-          </a:ln>
-        </p:spPr>
-      </p:pic>
-      <p:sp>
-        <p:nvSpPr>
-          <p:cNvPr id="9" name="TextBox 8"/>
-          <p:cNvSpPr txBox="1"/>
-          <p:nvPr/>
-        </p:nvSpPr>
-        <p:spPr>
-          <a:xfrm>
-            <a:off x="381000" y="1447800"/>
-            <a:ext cx="8610600" cy="646331"/>
-          </a:xfrm>
-          <a:prstGeom prst="rect">
-            <a:avLst/>
-          </a:prstGeom>
-          <a:noFill/>
-        </p:spPr>
-        <p:txBody>
-          <a:bodyPr>
-            <a:spAutoFit/>
-          </a:bodyPr>
-          <a:lstStyle/>
-          <a:p>
-            <a:pPr>
-              <a:defRPr/>
-            </a:pPr>
-            <a:r>
-              <a:rPr lang="en-US" sz="3600" spc="60" dirty="0" smtClean="0">
-                <a:solidFill>
-                  <a:schemeClr val="bg1"/>
-                </a:solidFill>
-                <a:latin typeface="Calibri" pitchFamily="34" charset="0"/>
-              </a:rPr>
-              <a:t>Simple Org Chart: Version 1</a:t>
-            </a:r>
-            <a:endParaRPr lang="en-US" sz="3600" spc="60" dirty="0">
-              <a:solidFill>
-                <a:schemeClr val="bg1"/>
-              </a:solidFill>
-              <a:latin typeface="Calibri" pitchFamily="34" charset="0"/>
-            </a:endParaRPr>
-          </a:p>
-        </p:txBody>
-      </p:sp>
-      <p:sp>
-        <p:nvSpPr>
-          <p:cNvPr id="11" name="TextBox 10"/>
-          <p:cNvSpPr txBox="1"/>
-          <p:nvPr/>
-        </p:nvSpPr>
-        <p:spPr>
-          <a:xfrm>
-            <a:off x="381000" y="2057400"/>
-            <a:ext cx="7543800" cy="338554"/>
-          </a:xfrm>
-          <a:prstGeom prst="rect">
-            <a:avLst/>
-          </a:prstGeom>
-          <a:noFill/>
-        </p:spPr>
-        <p:txBody>
-          <a:bodyPr wrap="square">
-            <a:spAutoFit/>
-          </a:bodyPr>
-          <a:lstStyle/>
-          <a:p>
-            <a:pPr>
-              <a:defRPr/>
-            </a:pPr>
-            <a:r>
-              <a:rPr lang="en-US" sz="1600" dirty="0" smtClean="0">
-                <a:solidFill>
-                  <a:schemeClr val="bg1"/>
-                </a:solidFill>
-                <a:latin typeface="+mn-lt"/>
-              </a:rPr>
-              <a:t>Tightly coupled forms: It works, but it doesn’t modify easily.</a:t>
-            </a:r>
-            <a:endParaRPr lang="en-US" sz="1600" dirty="0">
-              <a:solidFill>
-                <a:schemeClr val="bg1"/>
-              </a:solidFill>
-              <a:latin typeface="+mn-lt"/>
-            </a:endParaRPr>
-          </a:p>
-        </p:txBody>
-      </p:sp>
-    </p:spTree>
-  </p:cSld>
-  <p:clrMapOvr>
-    <a:masterClrMapping/>
-  </p:clrMapOvr>
-  <p:timing>
-    <p:tnLst>
-      <p:par>
-        <p:cTn id="1" dur="indefinite" restart="never" nodeType="tmRoot"/>
-      </p:par>
-    </p:tnLst>
-  </p:timing>
-</p:sld>
-</file>
-
-<file path=ppt/slides/slide11.xml><?xml version="1.0" encoding="utf-8"?>
-<p:sld xmlns:a="http://schemas.openxmlformats.org/drawingml/2006/main" xmlns:r="http://schemas.openxmlformats.org/officeDocument/2006/relationships" xmlns:p="http://schemas.openxmlformats.org/presentationml/2006/main">
-  <p:cSld>
-    <p:spTree>
-      <p:nvGrpSpPr>
-        <p:cNvPr id="1" name=""/>
-        <p:cNvGrpSpPr/>
-        <p:nvPr/>
-      </p:nvGrpSpPr>
-      <p:grpSpPr>
-        <a:xfrm>
-          <a:off x="0" y="0"/>
-          <a:ext cx="0" cy="0"/>
-          <a:chOff x="0" y="0"/>
-          <a:chExt cx="0" cy="0"/>
-        </a:xfrm>
-      </p:grpSpPr>
-      <p:sp>
-        <p:nvSpPr>
           <p:cNvPr id="3075" name="Text Placeholder 2"/>
           <p:cNvSpPr>
             <a:spLocks noGrp="1"/>
@@ -4973,7 +4548,7 @@
 </p:sld>
 </file>
 
-<file path=ppt/slides/slide12.xml><?xml version="1.0" encoding="utf-8"?>
+<file path=ppt/slides/slide11.xml><?xml version="1.0" encoding="utf-8"?>
 <p:sld xmlns:a="http://schemas.openxmlformats.org/drawingml/2006/main" xmlns:r="http://schemas.openxmlformats.org/officeDocument/2006/relationships" xmlns:p="http://schemas.openxmlformats.org/presentationml/2006/main">
   <p:cSld>
     <p:spTree>
@@ -5215,7 +4790,7 @@
 </p:sld>
 </file>
 
-<file path=ppt/slides/slide13.xml><?xml version="1.0" encoding="utf-8"?>
+<file path=ppt/slides/slide12.xml><?xml version="1.0" encoding="utf-8"?>
 <p:sld xmlns:a="http://schemas.openxmlformats.org/drawingml/2006/main" xmlns:r="http://schemas.openxmlformats.org/officeDocument/2006/relationships" xmlns:p="http://schemas.openxmlformats.org/presentationml/2006/main">
   <p:cSld>
     <p:spTree>
@@ -5594,7 +5169,7 @@
 </p:sld>
 </file>
 
-<file path=ppt/slides/slide14.xml><?xml version="1.0" encoding="utf-8"?>
+<file path=ppt/slides/slide13.xml><?xml version="1.0" encoding="utf-8"?>
 <p:sld xmlns:a="http://schemas.openxmlformats.org/drawingml/2006/main" xmlns:r="http://schemas.openxmlformats.org/officeDocument/2006/relationships" xmlns:p="http://schemas.openxmlformats.org/presentationml/2006/main">
   <p:cSld>
     <p:spTree>
@@ -6414,7 +5989,7 @@
 </p:sld>
 </file>
 
-<file path=ppt/slides/slide15.xml><?xml version="1.0" encoding="utf-8"?>
+<file path=ppt/slides/slide14.xml><?xml version="1.0" encoding="utf-8"?>
 <p:sld xmlns:a="http://schemas.openxmlformats.org/drawingml/2006/main" xmlns:r="http://schemas.openxmlformats.org/officeDocument/2006/relationships" xmlns:p="http://schemas.openxmlformats.org/presentationml/2006/main">
   <p:cSld>
     <p:spTree>
@@ -6751,7 +6326,7 @@
 </p:sld>
 </file>
 
-<file path=ppt/slides/slide16.xml><?xml version="1.0" encoding="utf-8"?>
+<file path=ppt/slides/slide15.xml><?xml version="1.0" encoding="utf-8"?>
 <p:sld xmlns:a="http://schemas.openxmlformats.org/drawingml/2006/main" xmlns:r="http://schemas.openxmlformats.org/officeDocument/2006/relationships" xmlns:p="http://schemas.openxmlformats.org/presentationml/2006/main">
   <p:cSld>
     <p:spTree>
@@ -7116,7 +6691,7 @@
 </p:sld>
 </file>
 
-<file path=ppt/slides/slide17.xml><?xml version="1.0" encoding="utf-8"?>
+<file path=ppt/slides/slide16.xml><?xml version="1.0" encoding="utf-8"?>
 <p:sld xmlns:a="http://schemas.openxmlformats.org/drawingml/2006/main" xmlns:r="http://schemas.openxmlformats.org/officeDocument/2006/relationships" xmlns:p="http://schemas.openxmlformats.org/presentationml/2006/main">
   <p:cSld>
     <p:spTree>
@@ -7579,7 +7154,7 @@
 </p:sld>
 </file>
 
-<file path=ppt/slides/slide18.xml><?xml version="1.0" encoding="utf-8"?>
+<file path=ppt/slides/slide17.xml><?xml version="1.0" encoding="utf-8"?>
 <p:sld xmlns:a="http://schemas.openxmlformats.org/drawingml/2006/main" xmlns:r="http://schemas.openxmlformats.org/officeDocument/2006/relationships" xmlns:p="http://schemas.openxmlformats.org/presentationml/2006/main">
   <p:cSld>
     <p:spTree>
@@ -7916,7 +7491,7 @@
 </p:sld>
 </file>
 
-<file path=ppt/slides/slide19.xml><?xml version="1.0" encoding="utf-8"?>
+<file path=ppt/slides/slide18.xml><?xml version="1.0" encoding="utf-8"?>
 <p:sld xmlns:a="http://schemas.openxmlformats.org/drawingml/2006/main" xmlns:r="http://schemas.openxmlformats.org/officeDocument/2006/relationships" xmlns:p="http://schemas.openxmlformats.org/presentationml/2006/main">
   <p:cSld>
     <p:spTree>
@@ -8256,237 +7831,7 @@
 </p:sld>
 </file>
 
-<file path=ppt/slides/slide2.xml><?xml version="1.0" encoding="utf-8"?>
-<p:sld xmlns:a="http://schemas.openxmlformats.org/drawingml/2006/main" xmlns:r="http://schemas.openxmlformats.org/officeDocument/2006/relationships" xmlns:p="http://schemas.openxmlformats.org/presentationml/2006/main">
-  <p:cSld>
-    <p:spTree>
-      <p:nvGrpSpPr>
-        <p:cNvPr id="1" name=""/>
-        <p:cNvGrpSpPr/>
-        <p:nvPr/>
-      </p:nvGrpSpPr>
-      <p:grpSpPr>
-        <a:xfrm>
-          <a:off x="0" y="0"/>
-          <a:ext cx="0" cy="0"/>
-          <a:chOff x="0" y="0"/>
-          <a:chExt cx="0" cy="0"/>
-        </a:xfrm>
-      </p:grpSpPr>
-      <p:pic>
-        <p:nvPicPr>
-          <p:cNvPr id="1026" name="Picture 2" descr="C:\Users\derickb\AppData\Local\Microsoft\Windows\Temporary Internet Files\Content.IE5\AY104AXF\MPj04331790000[1].jpg"/>
-          <p:cNvPicPr>
-            <a:picLocks noChangeAspect="1" noChangeArrowheads="1"/>
-          </p:cNvPicPr>
-          <p:nvPr/>
-        </p:nvPicPr>
-        <p:blipFill>
-          <a:blip r:embed="rId3"/>
-          <a:srcRect/>
-          <a:stretch>
-            <a:fillRect/>
-          </a:stretch>
-        </p:blipFill>
-        <p:spPr bwMode="auto">
-          <a:xfrm>
-            <a:off x="5426075" y="990600"/>
-            <a:ext cx="3717925" cy="2790288"/>
-          </a:xfrm>
-          <a:prstGeom prst="rect">
-            <a:avLst/>
-          </a:prstGeom>
-          <a:noFill/>
-        </p:spPr>
-      </p:pic>
-      <p:sp>
-        <p:nvSpPr>
-          <p:cNvPr id="3075" name="Text Placeholder 2"/>
-          <p:cNvSpPr>
-            <a:spLocks noGrp="1"/>
-          </p:cNvSpPr>
-          <p:nvPr>
-            <p:ph type="body" sz="quarter" idx="10"/>
-          </p:nvPr>
-        </p:nvSpPr>
-        <p:spPr>
-          <a:xfrm>
-            <a:off x="685800" y="1066800"/>
-            <a:ext cx="8229600" cy="5334000"/>
-          </a:xfrm>
-        </p:spPr>
-        <p:txBody>
-          <a:bodyPr/>
-          <a:lstStyle/>
-          <a:p>
-            <a:pPr eaLnBrk="1" hangingPunct="1">
-              <a:buNone/>
-            </a:pPr>
-            <a:endParaRPr lang="en-US" b="1" dirty="0" smtClean="0">
-              <a:solidFill>
-                <a:schemeClr val="accent1">
-                  <a:lumMod val="75000"/>
-                </a:schemeClr>
-              </a:solidFill>
-            </a:endParaRPr>
-          </a:p>
-          <a:p>
-            <a:pPr eaLnBrk="1" hangingPunct="1">
-              <a:buNone/>
-            </a:pPr>
-            <a:r>
-              <a:rPr lang="en-US" b="1" dirty="0" smtClean="0">
-                <a:solidFill>
-                  <a:schemeClr val="accent1">
-                    <a:lumMod val="75000"/>
-                  </a:schemeClr>
-                </a:solidFill>
-              </a:rPr>
-              <a:t>Topics Covered</a:t>
-            </a:r>
-          </a:p>
-          <a:p>
-            <a:pPr eaLnBrk="1" hangingPunct="1"/>
-            <a:r>
-              <a:rPr lang="en-US" sz="2000" dirty="0" smtClean="0"/>
-              <a:t>Workflow Services</a:t>
-            </a:r>
-          </a:p>
-          <a:p>
-            <a:pPr eaLnBrk="1" hangingPunct="1"/>
-            <a:r>
-              <a:rPr lang="en-US" sz="2000" dirty="0" smtClean="0"/>
-              <a:t>Command Pattern</a:t>
-            </a:r>
-          </a:p>
-          <a:p>
-            <a:pPr eaLnBrk="1" hangingPunct="1"/>
-            <a:r>
-              <a:rPr lang="en-US" sz="2000" dirty="0" smtClean="0"/>
-              <a:t>Event Aggregator</a:t>
-            </a:r>
-          </a:p>
-          <a:p>
-            <a:pPr eaLnBrk="1" hangingPunct="1"/>
-            <a:r>
-              <a:rPr lang="en-US" sz="2000" dirty="0" smtClean="0"/>
-              <a:t>Application Controller</a:t>
-            </a:r>
-          </a:p>
-          <a:p>
-            <a:pPr eaLnBrk="1" hangingPunct="1"/>
-            <a:r>
-              <a:rPr lang="en-US" sz="2000" dirty="0" smtClean="0"/>
-              <a:t>String It All Together With An </a:t>
-            </a:r>
-            <a:r>
-              <a:rPr lang="en-US" sz="2000" dirty="0" err="1" smtClean="0"/>
-              <a:t>IoC</a:t>
-            </a:r>
-            <a:r>
-              <a:rPr lang="en-US" sz="2000" dirty="0" smtClean="0"/>
-              <a:t> Container</a:t>
-            </a:r>
-          </a:p>
-          <a:p>
-            <a:pPr eaLnBrk="1" hangingPunct="1"/>
-            <a:endParaRPr lang="en-US" sz="2000" dirty="0" smtClean="0"/>
-          </a:p>
-          <a:p>
-            <a:pPr eaLnBrk="1" hangingPunct="1">
-              <a:buNone/>
-            </a:pPr>
-            <a:r>
-              <a:rPr lang="en-US" b="1" dirty="0" smtClean="0">
-                <a:solidFill>
-                  <a:schemeClr val="accent1">
-                    <a:lumMod val="75000"/>
-                  </a:schemeClr>
-                </a:solidFill>
-              </a:rPr>
-              <a:t>Goals</a:t>
-            </a:r>
-          </a:p>
-          <a:p>
-            <a:pPr eaLnBrk="1" hangingPunct="1"/>
-            <a:r>
-              <a:rPr lang="en-US" sz="2000" dirty="0" smtClean="0"/>
-              <a:t>Object Oriented System</a:t>
-            </a:r>
-          </a:p>
-          <a:p>
-            <a:pPr eaLnBrk="1" hangingPunct="1"/>
-            <a:r>
-              <a:rPr lang="en-US" sz="2000" dirty="0" smtClean="0"/>
-              <a:t>Testability</a:t>
-            </a:r>
-          </a:p>
-          <a:p>
-            <a:pPr eaLnBrk="1" hangingPunct="1"/>
-            <a:r>
-              <a:rPr lang="en-US" sz="2000" dirty="0" smtClean="0"/>
-              <a:t>Flexibility</a:t>
-            </a:r>
-          </a:p>
-          <a:p>
-            <a:pPr eaLnBrk="1" hangingPunct="1"/>
-            <a:r>
-              <a:rPr lang="en-US" sz="2000" dirty="0" smtClean="0"/>
-              <a:t>Maintainability (Ease of Enhancement)</a:t>
-            </a:r>
-          </a:p>
-        </p:txBody>
-      </p:sp>
-      <p:sp>
-        <p:nvSpPr>
-          <p:cNvPr id="3074" name="Title 1"/>
-          <p:cNvSpPr>
-            <a:spLocks noGrp="1"/>
-          </p:cNvSpPr>
-          <p:nvPr>
-            <p:ph type="title"/>
-          </p:nvPr>
-        </p:nvSpPr>
-        <p:spPr bwMode="auto">
-          <a:noFill/>
-          <a:ln>
-            <a:miter lim="800000"/>
-            <a:headEnd/>
-            <a:tailEnd/>
-          </a:ln>
-        </p:spPr>
-        <p:txBody>
-          <a:bodyPr vert="horz" wrap="square" lIns="91440" tIns="45720" rIns="91440" bIns="45720" numCol="1" anchor="t" anchorCtr="0" compatLnSpc="1">
-            <a:prstTxWarp prst="textNoShape">
-              <a:avLst/>
-            </a:prstTxWarp>
-          </a:bodyPr>
-          <a:lstStyle/>
-          <a:p>
-            <a:pPr eaLnBrk="1" hangingPunct="1"/>
-            <a:r>
-              <a:rPr lang="en-US" dirty="0" smtClean="0"/>
-              <a:t>Topics Of This Presentation</a:t>
-            </a:r>
-          </a:p>
-        </p:txBody>
-      </p:sp>
-    </p:spTree>
-  </p:cSld>
-  <p:clrMapOvr>
-    <a:masterClrMapping/>
-  </p:clrMapOvr>
-  <p:timing>
-    <p:tnLst>
-      <p:par>
-        <p:cTn id="1" dur="indefinite" restart="never" nodeType="tmRoot"/>
-      </p:par>
-    </p:tnLst>
-  </p:timing>
-</p:sld>
-</file>
-
-<file path=ppt/slides/slide20.xml><?xml version="1.0" encoding="utf-8"?>
+<file path=ppt/slides/slide19.xml><?xml version="1.0" encoding="utf-8"?>
 <p:sld xmlns:a="http://schemas.openxmlformats.org/drawingml/2006/main" xmlns:r="http://schemas.openxmlformats.org/officeDocument/2006/relationships" xmlns:p="http://schemas.openxmlformats.org/presentationml/2006/main">
   <p:cSld>
     <p:spTree>
@@ -8967,7 +8312,152 @@
 </p:sld>
 </file>
 
-<file path=ppt/slides/slide21.xml><?xml version="1.0" encoding="utf-8"?>
+<file path=ppt/slides/slide2.xml><?xml version="1.0" encoding="utf-8"?>
+<p:sld xmlns:a="http://schemas.openxmlformats.org/drawingml/2006/main" xmlns:r="http://schemas.openxmlformats.org/officeDocument/2006/relationships" xmlns:p="http://schemas.openxmlformats.org/presentationml/2006/main">
+  <p:cSld>
+    <p:spTree>
+      <p:nvGrpSpPr>
+        <p:cNvPr id="1" name=""/>
+        <p:cNvGrpSpPr/>
+        <p:nvPr/>
+      </p:nvGrpSpPr>
+      <p:grpSpPr>
+        <a:xfrm>
+          <a:off x="0" y="0"/>
+          <a:ext cx="0" cy="0"/>
+          <a:chOff x="0" y="0"/>
+          <a:chExt cx="0" cy="0"/>
+        </a:xfrm>
+      </p:grpSpPr>
+      <p:sp>
+        <p:nvSpPr>
+          <p:cNvPr id="3075" name="Text Placeholder 2"/>
+          <p:cNvSpPr>
+            <a:spLocks noGrp="1"/>
+          </p:cNvSpPr>
+          <p:nvPr>
+            <p:ph type="body" sz="quarter" idx="10"/>
+          </p:nvPr>
+        </p:nvSpPr>
+        <p:spPr>
+          <a:xfrm>
+            <a:off x="685800" y="1066800"/>
+            <a:ext cx="8229600" cy="1219200"/>
+          </a:xfrm>
+        </p:spPr>
+        <p:txBody>
+          <a:bodyPr/>
+          <a:lstStyle/>
+          <a:p>
+            <a:pPr eaLnBrk="1" hangingPunct="1">
+              <a:buNone/>
+            </a:pPr>
+            <a:r>
+              <a:rPr lang="en-US" dirty="0" smtClean="0"/>
+              <a:t>Cohesion:</a:t>
+            </a:r>
+          </a:p>
+          <a:p>
+            <a:pPr lvl="1" eaLnBrk="1" hangingPunct="1">
+              <a:buNone/>
+            </a:pPr>
+            <a:r>
+              <a:rPr lang="en-US" sz="2000" dirty="0" smtClean="0"/>
+              <a:t>“A measure of how strongly-related and focused the various responsibilities of a software module are” - </a:t>
+            </a:r>
+            <a:r>
+              <a:rPr lang="en-US" sz="2000" dirty="0" smtClean="0">
+                <a:hlinkClick r:id="rId3"/>
+              </a:rPr>
+              <a:t>Wikipedia</a:t>
+            </a:r>
+            <a:endParaRPr lang="en-US" sz="2000" dirty="0" smtClean="0"/>
+          </a:p>
+        </p:txBody>
+      </p:sp>
+      <p:sp>
+        <p:nvSpPr>
+          <p:cNvPr id="3074" name="Title 1"/>
+          <p:cNvSpPr>
+            <a:spLocks noGrp="1"/>
+          </p:cNvSpPr>
+          <p:nvPr>
+            <p:ph type="title"/>
+          </p:nvPr>
+        </p:nvSpPr>
+        <p:spPr bwMode="auto">
+          <a:noFill/>
+          <a:ln>
+            <a:miter lim="800000"/>
+            <a:headEnd/>
+            <a:tailEnd/>
+          </a:ln>
+        </p:spPr>
+        <p:txBody>
+          <a:bodyPr vert="horz" wrap="square" lIns="91440" tIns="45720" rIns="91440" bIns="45720" numCol="1" anchor="t" anchorCtr="0" compatLnSpc="1">
+            <a:prstTxWarp prst="textNoShape">
+              <a:avLst/>
+            </a:prstTxWarp>
+          </a:bodyPr>
+          <a:lstStyle/>
+          <a:p>
+            <a:pPr eaLnBrk="1" hangingPunct="1"/>
+            <a:r>
+              <a:rPr lang="en-US" dirty="0" smtClean="0"/>
+              <a:t>Object Oriented Principles</a:t>
+            </a:r>
+          </a:p>
+        </p:txBody>
+      </p:sp>
+      <p:pic>
+        <p:nvPicPr>
+          <p:cNvPr id="1026" name="Picture 2"/>
+          <p:cNvPicPr>
+            <a:picLocks noChangeAspect="1" noChangeArrowheads="1"/>
+          </p:cNvPicPr>
+          <p:nvPr/>
+        </p:nvPicPr>
+        <p:blipFill>
+          <a:blip r:embed="rId4"/>
+          <a:srcRect/>
+          <a:stretch>
+            <a:fillRect/>
+          </a:stretch>
+        </p:blipFill>
+        <p:spPr bwMode="auto">
+          <a:xfrm>
+            <a:off x="2428875" y="2762250"/>
+            <a:ext cx="4286250" cy="3333750"/>
+          </a:xfrm>
+          <a:prstGeom prst="rect">
+            <a:avLst/>
+          </a:prstGeom>
+          <a:noFill/>
+          <a:ln w="9525">
+            <a:noFill/>
+            <a:miter lim="800000"/>
+            <a:headEnd/>
+            <a:tailEnd/>
+          </a:ln>
+          <a:effectLst/>
+        </p:spPr>
+      </p:pic>
+    </p:spTree>
+  </p:cSld>
+  <p:clrMapOvr>
+    <a:masterClrMapping/>
+  </p:clrMapOvr>
+  <p:timing>
+    <p:tnLst>
+      <p:par>
+        <p:cTn id="1" dur="indefinite" restart="never" nodeType="tmRoot"/>
+      </p:par>
+    </p:tnLst>
+  </p:timing>
+</p:sld>
+</file>
+
+<file path=ppt/slides/slide20.xml><?xml version="1.0" encoding="utf-8"?>
 <p:sld xmlns:a="http://schemas.openxmlformats.org/drawingml/2006/main" xmlns:r="http://schemas.openxmlformats.org/officeDocument/2006/relationships" xmlns:p="http://schemas.openxmlformats.org/presentationml/2006/main">
   <p:cSld>
     <p:spTree>
@@ -9217,7 +8707,7 @@
 </p:sld>
 </file>
 
-<file path=ppt/slides/slide22.xml><?xml version="1.0" encoding="utf-8"?>
+<file path=ppt/slides/slide21.xml><?xml version="1.0" encoding="utf-8"?>
 <p:sld xmlns:a="http://schemas.openxmlformats.org/drawingml/2006/main" xmlns:r="http://schemas.openxmlformats.org/officeDocument/2006/relationships" xmlns:p="http://schemas.openxmlformats.org/presentationml/2006/main">
   <p:cSld>
     <p:spTree>
@@ -9628,7 +9118,7 @@
 </p:sld>
 </file>
 
-<file path=ppt/slides/slide23.xml><?xml version="1.0" encoding="utf-8"?>
+<file path=ppt/slides/slide22.xml><?xml version="1.0" encoding="utf-8"?>
 <p:sld xmlns:a="http://schemas.openxmlformats.org/drawingml/2006/main" xmlns:r="http://schemas.openxmlformats.org/officeDocument/2006/relationships" xmlns:p="http://schemas.openxmlformats.org/presentationml/2006/main">
   <p:cSld>
     <p:spTree>
@@ -9890,7 +9380,7 @@
 </p:sld>
 </file>
 
-<file path=ppt/slides/slide24.xml><?xml version="1.0" encoding="utf-8"?>
+<file path=ppt/slides/slide23.xml><?xml version="1.0" encoding="utf-8"?>
 <p:sld xmlns:a="http://schemas.openxmlformats.org/drawingml/2006/main" xmlns:r="http://schemas.openxmlformats.org/officeDocument/2006/relationships" xmlns:p="http://schemas.openxmlformats.org/presentationml/2006/main">
   <p:cSld>
     <p:spTree>
@@ -10047,7 +9537,7 @@
 </p:sld>
 </file>
 
-<file path=ppt/slides/slide25.xml><?xml version="1.0" encoding="utf-8"?>
+<file path=ppt/slides/slide24.xml><?xml version="1.0" encoding="utf-8"?>
 <p:sld xmlns:a="http://schemas.openxmlformats.org/drawingml/2006/main" xmlns:r="http://schemas.openxmlformats.org/officeDocument/2006/relationships" xmlns:p="http://schemas.openxmlformats.org/presentationml/2006/main">
   <p:cSld>
     <p:spTree>
@@ -10378,7 +9868,7 @@
 </p:sld>
 </file>
 
-<file path=ppt/slides/slide26.xml><?xml version="1.0" encoding="utf-8"?>
+<file path=ppt/slides/slide25.xml><?xml version="1.0" encoding="utf-8"?>
 <p:sld xmlns:a="http://schemas.openxmlformats.org/drawingml/2006/main" xmlns:r="http://schemas.openxmlformats.org/officeDocument/2006/relationships" xmlns:p="http://schemas.openxmlformats.org/presentationml/2006/main">
   <p:cSld>
     <p:spTree>
@@ -11293,7 +10783,7 @@
 </p:sld>
 </file>
 
-<file path=ppt/slides/slide27.xml><?xml version="1.0" encoding="utf-8"?>
+<file path=ppt/slides/slide26.xml><?xml version="1.0" encoding="utf-8"?>
 <p:sld xmlns:a="http://schemas.openxmlformats.org/drawingml/2006/main" xmlns:r="http://schemas.openxmlformats.org/officeDocument/2006/relationships" xmlns:p="http://schemas.openxmlformats.org/presentationml/2006/main">
   <p:cSld>
     <p:spTree>
@@ -11767,7 +11257,7 @@
 </p:sld>
 </file>
 
-<file path=ppt/slides/slide28.xml><?xml version="1.0" encoding="utf-8"?>
+<file path=ppt/slides/slide27.xml><?xml version="1.0" encoding="utf-8"?>
 <p:sld xmlns:a="http://schemas.openxmlformats.org/drawingml/2006/main" xmlns:r="http://schemas.openxmlformats.org/officeDocument/2006/relationships" xmlns:p="http://schemas.openxmlformats.org/presentationml/2006/main">
   <p:cSld>
     <p:spTree>
@@ -12848,7 +12338,7 @@
 </p:sld>
 </file>
 
-<file path=ppt/slides/slide29.xml><?xml version="1.0" encoding="utf-8"?>
+<file path=ppt/slides/slide28.xml><?xml version="1.0" encoding="utf-8"?>
 <p:sld xmlns:a="http://schemas.openxmlformats.org/drawingml/2006/main" xmlns:r="http://schemas.openxmlformats.org/officeDocument/2006/relationships" xmlns:p="http://schemas.openxmlformats.org/presentationml/2006/main">
   <p:cSld>
     <p:spTree>
@@ -13197,152 +12687,7 @@
 </p:sld>
 </file>
 
-<file path=ppt/slides/slide3.xml><?xml version="1.0" encoding="utf-8"?>
-<p:sld xmlns:a="http://schemas.openxmlformats.org/drawingml/2006/main" xmlns:r="http://schemas.openxmlformats.org/officeDocument/2006/relationships" xmlns:p="http://schemas.openxmlformats.org/presentationml/2006/main">
-  <p:cSld>
-    <p:spTree>
-      <p:nvGrpSpPr>
-        <p:cNvPr id="1" name=""/>
-        <p:cNvGrpSpPr/>
-        <p:nvPr/>
-      </p:nvGrpSpPr>
-      <p:grpSpPr>
-        <a:xfrm>
-          <a:off x="0" y="0"/>
-          <a:ext cx="0" cy="0"/>
-          <a:chOff x="0" y="0"/>
-          <a:chExt cx="0" cy="0"/>
-        </a:xfrm>
-      </p:grpSpPr>
-      <p:sp>
-        <p:nvSpPr>
-          <p:cNvPr id="3075" name="Text Placeholder 2"/>
-          <p:cNvSpPr>
-            <a:spLocks noGrp="1"/>
-          </p:cNvSpPr>
-          <p:nvPr>
-            <p:ph type="body" sz="quarter" idx="10"/>
-          </p:nvPr>
-        </p:nvSpPr>
-        <p:spPr>
-          <a:xfrm>
-            <a:off x="685800" y="1066800"/>
-            <a:ext cx="8229600" cy="1219200"/>
-          </a:xfrm>
-        </p:spPr>
-        <p:txBody>
-          <a:bodyPr/>
-          <a:lstStyle/>
-          <a:p>
-            <a:pPr eaLnBrk="1" hangingPunct="1">
-              <a:buNone/>
-            </a:pPr>
-            <a:r>
-              <a:rPr lang="en-US" dirty="0" smtClean="0"/>
-              <a:t>Cohesion:</a:t>
-            </a:r>
-          </a:p>
-          <a:p>
-            <a:pPr lvl="1" eaLnBrk="1" hangingPunct="1">
-              <a:buNone/>
-            </a:pPr>
-            <a:r>
-              <a:rPr lang="en-US" sz="2000" dirty="0" smtClean="0"/>
-              <a:t>“A measure of how strongly-related and focused the various responsibilities of a software module are” - </a:t>
-            </a:r>
-            <a:r>
-              <a:rPr lang="en-US" sz="2000" dirty="0" smtClean="0">
-                <a:hlinkClick r:id="rId3"/>
-              </a:rPr>
-              <a:t>Wikipedia</a:t>
-            </a:r>
-            <a:endParaRPr lang="en-US" sz="2000" dirty="0" smtClean="0"/>
-          </a:p>
-        </p:txBody>
-      </p:sp>
-      <p:sp>
-        <p:nvSpPr>
-          <p:cNvPr id="3074" name="Title 1"/>
-          <p:cNvSpPr>
-            <a:spLocks noGrp="1"/>
-          </p:cNvSpPr>
-          <p:nvPr>
-            <p:ph type="title"/>
-          </p:nvPr>
-        </p:nvSpPr>
-        <p:spPr bwMode="auto">
-          <a:noFill/>
-          <a:ln>
-            <a:miter lim="800000"/>
-            <a:headEnd/>
-            <a:tailEnd/>
-          </a:ln>
-        </p:spPr>
-        <p:txBody>
-          <a:bodyPr vert="horz" wrap="square" lIns="91440" tIns="45720" rIns="91440" bIns="45720" numCol="1" anchor="t" anchorCtr="0" compatLnSpc="1">
-            <a:prstTxWarp prst="textNoShape">
-              <a:avLst/>
-            </a:prstTxWarp>
-          </a:bodyPr>
-          <a:lstStyle/>
-          <a:p>
-            <a:pPr eaLnBrk="1" hangingPunct="1"/>
-            <a:r>
-              <a:rPr lang="en-US" dirty="0" smtClean="0"/>
-              <a:t>Object Oriented Principles</a:t>
-            </a:r>
-          </a:p>
-        </p:txBody>
-      </p:sp>
-      <p:pic>
-        <p:nvPicPr>
-          <p:cNvPr id="1026" name="Picture 2"/>
-          <p:cNvPicPr>
-            <a:picLocks noChangeAspect="1" noChangeArrowheads="1"/>
-          </p:cNvPicPr>
-          <p:nvPr/>
-        </p:nvPicPr>
-        <p:blipFill>
-          <a:blip r:embed="rId4"/>
-          <a:srcRect/>
-          <a:stretch>
-            <a:fillRect/>
-          </a:stretch>
-        </p:blipFill>
-        <p:spPr bwMode="auto">
-          <a:xfrm>
-            <a:off x="2428875" y="2762250"/>
-            <a:ext cx="4286250" cy="3333750"/>
-          </a:xfrm>
-          <a:prstGeom prst="rect">
-            <a:avLst/>
-          </a:prstGeom>
-          <a:noFill/>
-          <a:ln w="9525">
-            <a:noFill/>
-            <a:miter lim="800000"/>
-            <a:headEnd/>
-            <a:tailEnd/>
-          </a:ln>
-          <a:effectLst/>
-        </p:spPr>
-      </p:pic>
-    </p:spTree>
-  </p:cSld>
-  <p:clrMapOvr>
-    <a:masterClrMapping/>
-  </p:clrMapOvr>
-  <p:timing>
-    <p:tnLst>
-      <p:par>
-        <p:cTn id="1" dur="indefinite" restart="never" nodeType="tmRoot"/>
-      </p:par>
-    </p:tnLst>
-  </p:timing>
-</p:sld>
-</file>
-
-<file path=ppt/slides/slide30.xml><?xml version="1.0" encoding="utf-8"?>
+<file path=ppt/slides/slide29.xml><?xml version="1.0" encoding="utf-8"?>
 <p:sld xmlns:a="http://schemas.openxmlformats.org/drawingml/2006/main" xmlns:r="http://schemas.openxmlformats.org/officeDocument/2006/relationships" xmlns:p="http://schemas.openxmlformats.org/presentationml/2006/main">
   <p:cSld>
     <p:spTree>
@@ -14283,7 +13628,903 @@
 </p:sld>
 </file>
 
-<file path=ppt/slides/slide31.xml><?xml version="1.0" encoding="utf-8"?>
+<file path=ppt/slides/slide3.xml><?xml version="1.0" encoding="utf-8"?>
+<p:sld xmlns:a="http://schemas.openxmlformats.org/drawingml/2006/main" xmlns:r="http://schemas.openxmlformats.org/officeDocument/2006/relationships" xmlns:p="http://schemas.openxmlformats.org/presentationml/2006/main">
+  <p:cSld>
+    <p:spTree>
+      <p:nvGrpSpPr>
+        <p:cNvPr id="1" name=""/>
+        <p:cNvGrpSpPr/>
+        <p:nvPr/>
+      </p:nvGrpSpPr>
+      <p:grpSpPr>
+        <a:xfrm>
+          <a:off x="0" y="0"/>
+          <a:ext cx="0" cy="0"/>
+          <a:chOff x="0" y="0"/>
+          <a:chExt cx="0" cy="0"/>
+        </a:xfrm>
+      </p:grpSpPr>
+      <p:sp>
+        <p:nvSpPr>
+          <p:cNvPr id="3075" name="Text Placeholder 2"/>
+          <p:cNvSpPr>
+            <a:spLocks noGrp="1"/>
+          </p:cNvSpPr>
+          <p:nvPr>
+            <p:ph type="body" sz="quarter" idx="10"/>
+          </p:nvPr>
+        </p:nvSpPr>
+        <p:spPr>
+          <a:xfrm>
+            <a:off x="685800" y="1066800"/>
+            <a:ext cx="8229600" cy="1219200"/>
+          </a:xfrm>
+        </p:spPr>
+        <p:txBody>
+          <a:bodyPr/>
+          <a:lstStyle/>
+          <a:p>
+            <a:pPr eaLnBrk="1" hangingPunct="1">
+              <a:buNone/>
+            </a:pPr>
+            <a:r>
+              <a:rPr lang="en-US" dirty="0" smtClean="0"/>
+              <a:t>Encapsulation:</a:t>
+            </a:r>
+          </a:p>
+          <a:p>
+            <a:pPr lvl="1" eaLnBrk="1" hangingPunct="1">
+              <a:buNone/>
+            </a:pPr>
+            <a:r>
+              <a:rPr lang="en-US" sz="2000" dirty="0" smtClean="0"/>
+              <a:t>“The hiding of </a:t>
+            </a:r>
+            <a:r>
+              <a:rPr lang="en-US" sz="2000" i="1" dirty="0" smtClean="0"/>
+              <a:t>design decisions</a:t>
+            </a:r>
+            <a:r>
+              <a:rPr lang="en-US" sz="2000" dirty="0" smtClean="0"/>
+              <a:t> in a computer program that are most likely to change” - </a:t>
+            </a:r>
+            <a:r>
+              <a:rPr lang="en-US" sz="2000" dirty="0" smtClean="0">
+                <a:hlinkClick r:id="rId3"/>
+              </a:rPr>
+              <a:t>Wikipedia</a:t>
+            </a:r>
+            <a:endParaRPr lang="en-US" sz="2000" dirty="0" smtClean="0"/>
+          </a:p>
+        </p:txBody>
+      </p:sp>
+      <p:sp>
+        <p:nvSpPr>
+          <p:cNvPr id="3074" name="Title 1"/>
+          <p:cNvSpPr>
+            <a:spLocks noGrp="1"/>
+          </p:cNvSpPr>
+          <p:nvPr>
+            <p:ph type="title"/>
+          </p:nvPr>
+        </p:nvSpPr>
+        <p:spPr bwMode="auto">
+          <a:noFill/>
+          <a:ln>
+            <a:miter lim="800000"/>
+            <a:headEnd/>
+            <a:tailEnd/>
+          </a:ln>
+        </p:spPr>
+        <p:txBody>
+          <a:bodyPr vert="horz" wrap="square" lIns="91440" tIns="45720" rIns="91440" bIns="45720" numCol="1" anchor="t" anchorCtr="0" compatLnSpc="1">
+            <a:prstTxWarp prst="textNoShape">
+              <a:avLst/>
+            </a:prstTxWarp>
+          </a:bodyPr>
+          <a:lstStyle/>
+          <a:p>
+            <a:pPr eaLnBrk="1" hangingPunct="1"/>
+            <a:r>
+              <a:rPr lang="en-US" dirty="0" smtClean="0"/>
+              <a:t>Object Oriented Principles</a:t>
+            </a:r>
+          </a:p>
+        </p:txBody>
+      </p:sp>
+      <p:grpSp>
+        <p:nvGrpSpPr>
+          <p:cNvPr id="2" name="Group 52"/>
+          <p:cNvGrpSpPr/>
+          <p:nvPr/>
+        </p:nvGrpSpPr>
+        <p:grpSpPr>
+          <a:xfrm>
+            <a:off x="1371600" y="2667000"/>
+            <a:ext cx="6400800" cy="3276600"/>
+            <a:chOff x="609600" y="2667000"/>
+            <a:chExt cx="6400800" cy="3276600"/>
+          </a:xfrm>
+        </p:grpSpPr>
+        <p:grpSp>
+          <p:nvGrpSpPr>
+            <p:cNvPr id="3" name="Group 23"/>
+            <p:cNvGrpSpPr/>
+            <p:nvPr/>
+          </p:nvGrpSpPr>
+          <p:grpSpPr>
+            <a:xfrm>
+              <a:off x="2514600" y="3886200"/>
+              <a:ext cx="2514600" cy="2057400"/>
+              <a:chOff x="3429000" y="3352800"/>
+              <a:chExt cx="2514600" cy="2057400"/>
+            </a:xfrm>
+          </p:grpSpPr>
+          <p:grpSp>
+            <p:nvGrpSpPr>
+              <p:cNvPr id="9" name="Group 22"/>
+              <p:cNvGrpSpPr/>
+              <p:nvPr/>
+            </p:nvGrpSpPr>
+            <p:grpSpPr>
+              <a:xfrm>
+                <a:off x="3429000" y="3352800"/>
+                <a:ext cx="2514600" cy="2057400"/>
+                <a:chOff x="3429000" y="3352800"/>
+                <a:chExt cx="2514600" cy="2057400"/>
+              </a:xfrm>
+            </p:grpSpPr>
+            <p:grpSp>
+              <p:nvGrpSpPr>
+                <p:cNvPr id="10" name="Group 9"/>
+                <p:cNvGrpSpPr/>
+                <p:nvPr/>
+              </p:nvGrpSpPr>
+              <p:grpSpPr>
+                <a:xfrm>
+                  <a:off x="3429000" y="3352800"/>
+                  <a:ext cx="2514600" cy="2057400"/>
+                  <a:chOff x="2286000" y="3505200"/>
+                  <a:chExt cx="2514600" cy="2057400"/>
+                </a:xfrm>
+              </p:grpSpPr>
+              <p:sp>
+                <p:nvSpPr>
+                  <p:cNvPr id="4" name="Frame 3"/>
+                  <p:cNvSpPr/>
+                  <p:nvPr/>
+                </p:nvSpPr>
+                <p:spPr>
+                  <a:xfrm>
+                    <a:off x="2286000" y="3505200"/>
+                    <a:ext cx="2514600" cy="2057400"/>
+                  </a:xfrm>
+                  <a:prstGeom prst="frame">
+                    <a:avLst/>
+                  </a:prstGeom>
+                </p:spPr>
+                <p:style>
+                  <a:lnRef idx="1">
+                    <a:schemeClr val="accent2"/>
+                  </a:lnRef>
+                  <a:fillRef idx="3">
+                    <a:schemeClr val="accent2"/>
+                  </a:fillRef>
+                  <a:effectRef idx="2">
+                    <a:schemeClr val="accent2"/>
+                  </a:effectRef>
+                  <a:fontRef idx="minor">
+                    <a:schemeClr val="lt1"/>
+                  </a:fontRef>
+                </p:style>
+                <p:txBody>
+                  <a:bodyPr rtlCol="0" anchor="ctr"/>
+                  <a:lstStyle/>
+                  <a:p>
+                    <a:pPr algn="ctr"/>
+                    <a:endParaRPr lang="en-US">
+                      <a:solidFill>
+                        <a:schemeClr val="tx1"/>
+                      </a:solidFill>
+                    </a:endParaRPr>
+                  </a:p>
+                </p:txBody>
+              </p:sp>
+              <p:sp>
+                <p:nvSpPr>
+                  <p:cNvPr id="5" name="Rectangle 4"/>
+                  <p:cNvSpPr/>
+                  <p:nvPr/>
+                </p:nvSpPr>
+                <p:spPr>
+                  <a:xfrm>
+                    <a:off x="2743200" y="3962400"/>
+                    <a:ext cx="685800" cy="457200"/>
+                  </a:xfrm>
+                  <a:prstGeom prst="rect">
+                    <a:avLst/>
+                  </a:prstGeom>
+                </p:spPr>
+                <p:style>
+                  <a:lnRef idx="2">
+                    <a:schemeClr val="dk1">
+                      <a:shade val="50000"/>
+                    </a:schemeClr>
+                  </a:lnRef>
+                  <a:fillRef idx="1">
+                    <a:schemeClr val="dk1"/>
+                  </a:fillRef>
+                  <a:effectRef idx="0">
+                    <a:schemeClr val="dk1"/>
+                  </a:effectRef>
+                  <a:fontRef idx="minor">
+                    <a:schemeClr val="lt1"/>
+                  </a:fontRef>
+                </p:style>
+                <p:txBody>
+                  <a:bodyPr rtlCol="0" anchor="ctr"/>
+                  <a:lstStyle/>
+                  <a:p>
+                    <a:pPr algn="ctr"/>
+                    <a:endParaRPr lang="en-US"/>
+                  </a:p>
+                </p:txBody>
+              </p:sp>
+              <p:sp>
+                <p:nvSpPr>
+                  <p:cNvPr id="6" name="Rectangle 5"/>
+                  <p:cNvSpPr/>
+                  <p:nvPr/>
+                </p:nvSpPr>
+                <p:spPr>
+                  <a:xfrm>
+                    <a:off x="3657600" y="3962400"/>
+                    <a:ext cx="685800" cy="457200"/>
+                  </a:xfrm>
+                  <a:prstGeom prst="rect">
+                    <a:avLst/>
+                  </a:prstGeom>
+                </p:spPr>
+                <p:style>
+                  <a:lnRef idx="2">
+                    <a:schemeClr val="dk1">
+                      <a:shade val="50000"/>
+                    </a:schemeClr>
+                  </a:lnRef>
+                  <a:fillRef idx="1">
+                    <a:schemeClr val="dk1"/>
+                  </a:fillRef>
+                  <a:effectRef idx="0">
+                    <a:schemeClr val="dk1"/>
+                  </a:effectRef>
+                  <a:fontRef idx="minor">
+                    <a:schemeClr val="lt1"/>
+                  </a:fontRef>
+                </p:style>
+                <p:txBody>
+                  <a:bodyPr rtlCol="0" anchor="ctr"/>
+                  <a:lstStyle/>
+                  <a:p>
+                    <a:pPr algn="ctr"/>
+                    <a:endParaRPr lang="en-US"/>
+                  </a:p>
+                </p:txBody>
+              </p:sp>
+              <p:sp>
+                <p:nvSpPr>
+                  <p:cNvPr id="7" name="Rectangle 6"/>
+                  <p:cNvSpPr/>
+                  <p:nvPr/>
+                </p:nvSpPr>
+                <p:spPr>
+                  <a:xfrm>
+                    <a:off x="2743200" y="4648200"/>
+                    <a:ext cx="685800" cy="457200"/>
+                  </a:xfrm>
+                  <a:prstGeom prst="rect">
+                    <a:avLst/>
+                  </a:prstGeom>
+                </p:spPr>
+                <p:style>
+                  <a:lnRef idx="2">
+                    <a:schemeClr val="dk1">
+                      <a:shade val="50000"/>
+                    </a:schemeClr>
+                  </a:lnRef>
+                  <a:fillRef idx="1">
+                    <a:schemeClr val="dk1"/>
+                  </a:fillRef>
+                  <a:effectRef idx="0">
+                    <a:schemeClr val="dk1"/>
+                  </a:effectRef>
+                  <a:fontRef idx="minor">
+                    <a:schemeClr val="lt1"/>
+                  </a:fontRef>
+                </p:style>
+                <p:txBody>
+                  <a:bodyPr rtlCol="0" anchor="ctr"/>
+                  <a:lstStyle/>
+                  <a:p>
+                    <a:pPr algn="ctr"/>
+                    <a:endParaRPr lang="en-US"/>
+                  </a:p>
+                </p:txBody>
+              </p:sp>
+              <p:sp>
+                <p:nvSpPr>
+                  <p:cNvPr id="8" name="Rectangle 7"/>
+                  <p:cNvSpPr/>
+                  <p:nvPr/>
+                </p:nvSpPr>
+                <p:spPr>
+                  <a:xfrm>
+                    <a:off x="3657600" y="4648200"/>
+                    <a:ext cx="685800" cy="457200"/>
+                  </a:xfrm>
+                  <a:prstGeom prst="rect">
+                    <a:avLst/>
+                  </a:prstGeom>
+                </p:spPr>
+                <p:style>
+                  <a:lnRef idx="2">
+                    <a:schemeClr val="dk1">
+                      <a:shade val="50000"/>
+                    </a:schemeClr>
+                  </a:lnRef>
+                  <a:fillRef idx="1">
+                    <a:schemeClr val="dk1"/>
+                  </a:fillRef>
+                  <a:effectRef idx="0">
+                    <a:schemeClr val="dk1"/>
+                  </a:effectRef>
+                  <a:fontRef idx="minor">
+                    <a:schemeClr val="lt1"/>
+                  </a:fontRef>
+                </p:style>
+                <p:txBody>
+                  <a:bodyPr rtlCol="0" anchor="ctr"/>
+                  <a:lstStyle/>
+                  <a:p>
+                    <a:pPr algn="ctr"/>
+                    <a:endParaRPr lang="en-US"/>
+                  </a:p>
+                </p:txBody>
+              </p:sp>
+            </p:grpSp>
+            <p:cxnSp>
+              <p:nvCxnSpPr>
+                <p:cNvPr id="15" name="Straight Arrow Connector 14"/>
+                <p:cNvCxnSpPr>
+                  <a:stCxn id="5" idx="3"/>
+                  <a:endCxn id="6" idx="1"/>
+                </p:cNvCxnSpPr>
+                <p:nvPr/>
+              </p:nvCxnSpPr>
+              <p:spPr>
+                <a:xfrm>
+                  <a:off x="4572000" y="4038600"/>
+                  <a:ext cx="228600" cy="1588"/>
+                </a:xfrm>
+                <a:prstGeom prst="straightConnector1">
+                  <a:avLst/>
+                </a:prstGeom>
+                <a:ln>
+                  <a:tailEnd type="arrow"/>
+                </a:ln>
+              </p:spPr>
+              <p:style>
+                <a:lnRef idx="1">
+                  <a:schemeClr val="dk1"/>
+                </a:lnRef>
+                <a:fillRef idx="0">
+                  <a:schemeClr val="dk1"/>
+                </a:fillRef>
+                <a:effectRef idx="0">
+                  <a:schemeClr val="dk1"/>
+                </a:effectRef>
+                <a:fontRef idx="minor">
+                  <a:schemeClr val="tx1"/>
+                </a:fontRef>
+              </p:style>
+            </p:cxnSp>
+            <p:cxnSp>
+              <p:nvCxnSpPr>
+                <p:cNvPr id="17" name="Straight Arrow Connector 16"/>
+                <p:cNvCxnSpPr>
+                  <a:stCxn id="5" idx="2"/>
+                  <a:endCxn id="7" idx="0"/>
+                </p:cNvCxnSpPr>
+                <p:nvPr/>
+              </p:nvCxnSpPr>
+              <p:spPr>
+                <a:xfrm rot="5400000">
+                  <a:off x="4114800" y="4381500"/>
+                  <a:ext cx="228600" cy="1588"/>
+                </a:xfrm>
+                <a:prstGeom prst="straightConnector1">
+                  <a:avLst/>
+                </a:prstGeom>
+                <a:ln>
+                  <a:tailEnd type="arrow"/>
+                </a:ln>
+              </p:spPr>
+              <p:style>
+                <a:lnRef idx="1">
+                  <a:schemeClr val="dk1"/>
+                </a:lnRef>
+                <a:fillRef idx="0">
+                  <a:schemeClr val="dk1"/>
+                </a:fillRef>
+                <a:effectRef idx="0">
+                  <a:schemeClr val="dk1"/>
+                </a:effectRef>
+                <a:fontRef idx="minor">
+                  <a:schemeClr val="tx1"/>
+                </a:fontRef>
+              </p:style>
+            </p:cxnSp>
+            <p:cxnSp>
+              <p:nvCxnSpPr>
+                <p:cNvPr id="19" name="Straight Arrow Connector 18"/>
+                <p:cNvCxnSpPr>
+                  <a:stCxn id="7" idx="3"/>
+                  <a:endCxn id="8" idx="1"/>
+                </p:cNvCxnSpPr>
+                <p:nvPr/>
+              </p:nvCxnSpPr>
+              <p:spPr>
+                <a:xfrm>
+                  <a:off x="4572000" y="4724400"/>
+                  <a:ext cx="228600" cy="1588"/>
+                </a:xfrm>
+                <a:prstGeom prst="straightConnector1">
+                  <a:avLst/>
+                </a:prstGeom>
+                <a:ln>
+                  <a:tailEnd type="arrow"/>
+                </a:ln>
+              </p:spPr>
+              <p:style>
+                <a:lnRef idx="1">
+                  <a:schemeClr val="dk1"/>
+                </a:lnRef>
+                <a:fillRef idx="0">
+                  <a:schemeClr val="dk1"/>
+                </a:fillRef>
+                <a:effectRef idx="0">
+                  <a:schemeClr val="dk1"/>
+                </a:effectRef>
+                <a:fontRef idx="minor">
+                  <a:schemeClr val="tx1"/>
+                </a:fontRef>
+              </p:style>
+            </p:cxnSp>
+            <p:cxnSp>
+              <p:nvCxnSpPr>
+                <p:cNvPr id="21" name="Straight Arrow Connector 20"/>
+                <p:cNvCxnSpPr/>
+                <p:nvPr/>
+              </p:nvCxnSpPr>
+              <p:spPr>
+                <a:xfrm rot="16200000" flipV="1">
+                  <a:off x="4572000" y="4267200"/>
+                  <a:ext cx="228600" cy="228600"/>
+                </a:xfrm>
+                <a:prstGeom prst="straightConnector1">
+                  <a:avLst/>
+                </a:prstGeom>
+                <a:ln>
+                  <a:tailEnd type="arrow"/>
+                </a:ln>
+              </p:spPr>
+              <p:style>
+                <a:lnRef idx="1">
+                  <a:schemeClr val="dk1"/>
+                </a:lnRef>
+                <a:fillRef idx="0">
+                  <a:schemeClr val="dk1"/>
+                </a:fillRef>
+                <a:effectRef idx="0">
+                  <a:schemeClr val="dk1"/>
+                </a:effectRef>
+                <a:fontRef idx="minor">
+                  <a:schemeClr val="tx1"/>
+                </a:fontRef>
+              </p:style>
+            </p:cxnSp>
+          </p:grpSp>
+          <p:sp>
+            <p:nvSpPr>
+              <p:cNvPr id="12" name="TextBox 11"/>
+              <p:cNvSpPr txBox="1"/>
+              <p:nvPr/>
+            </p:nvSpPr>
+            <p:spPr>
+              <a:xfrm>
+                <a:off x="3733800" y="3657600"/>
+                <a:ext cx="1905000" cy="1446550"/>
+              </a:xfrm>
+              <a:prstGeom prst="rect">
+                <a:avLst/>
+              </a:prstGeom>
+              <a:gradFill>
+                <a:gsLst>
+                  <a:gs pos="100000">
+                    <a:schemeClr val="accent1">
+                      <a:tint val="50000"/>
+                      <a:satMod val="300000"/>
+                      <a:alpha val="50000"/>
+                    </a:schemeClr>
+                  </a:gs>
+                  <a:gs pos="35000">
+                    <a:schemeClr val="accent1">
+                      <a:tint val="37000"/>
+                      <a:satMod val="300000"/>
+                    </a:schemeClr>
+                  </a:gs>
+                  <a:gs pos="100000">
+                    <a:schemeClr val="accent1">
+                      <a:tint val="15000"/>
+                      <a:satMod val="350000"/>
+                    </a:schemeClr>
+                  </a:gs>
+                </a:gsLst>
+              </a:gradFill>
+            </p:spPr>
+            <p:style>
+              <a:lnRef idx="1">
+                <a:schemeClr val="accent1"/>
+              </a:lnRef>
+              <a:fillRef idx="2">
+                <a:schemeClr val="accent1"/>
+              </a:fillRef>
+              <a:effectRef idx="1">
+                <a:schemeClr val="accent1"/>
+              </a:effectRef>
+              <a:fontRef idx="minor">
+                <a:schemeClr val="dk1"/>
+              </a:fontRef>
+            </p:style>
+            <p:txBody>
+              <a:bodyPr wrap="square" rtlCol="0">
+                <a:spAutoFit/>
+              </a:bodyPr>
+              <a:lstStyle/>
+              <a:p>
+                <a:pPr algn="ctr"/>
+                <a:r>
+                  <a:rPr lang="en-US" sz="8800" dirty="0" smtClean="0">
+                    <a:solidFill>
+                      <a:schemeClr val="accent2"/>
+                    </a:solidFill>
+                    <a:latin typeface="Arial" pitchFamily="34" charset="0"/>
+                    <a:cs typeface="Arial" pitchFamily="34" charset="0"/>
+                  </a:rPr>
+                  <a:t>?</a:t>
+                </a:r>
+              </a:p>
+            </p:txBody>
+          </p:sp>
+        </p:grpSp>
+        <p:sp>
+          <p:nvSpPr>
+            <p:cNvPr id="25" name="Rectangle 24"/>
+            <p:cNvSpPr/>
+            <p:nvPr/>
+          </p:nvSpPr>
+          <p:spPr>
+            <a:xfrm>
+              <a:off x="609600" y="3886200"/>
+              <a:ext cx="1447800" cy="762000"/>
+            </a:xfrm>
+            <a:prstGeom prst="rect">
+              <a:avLst/>
+            </a:prstGeom>
+          </p:spPr>
+          <p:style>
+            <a:lnRef idx="1">
+              <a:schemeClr val="accent1"/>
+            </a:lnRef>
+            <a:fillRef idx="3">
+              <a:schemeClr val="accent1"/>
+            </a:fillRef>
+            <a:effectRef idx="2">
+              <a:schemeClr val="accent1"/>
+            </a:effectRef>
+            <a:fontRef idx="minor">
+              <a:schemeClr val="lt1"/>
+            </a:fontRef>
+          </p:style>
+          <p:txBody>
+            <a:bodyPr rtlCol="0" anchor="ctr"/>
+            <a:lstStyle/>
+            <a:p>
+              <a:pPr algn="ctr"/>
+              <a:endParaRPr lang="en-US"/>
+            </a:p>
+          </p:txBody>
+        </p:sp>
+        <p:sp>
+          <p:nvSpPr>
+            <p:cNvPr id="26" name="Rectangle 25"/>
+            <p:cNvSpPr/>
+            <p:nvPr/>
+          </p:nvSpPr>
+          <p:spPr>
+            <a:xfrm>
+              <a:off x="5562600" y="3886200"/>
+              <a:ext cx="1447800" cy="762000"/>
+            </a:xfrm>
+            <a:prstGeom prst="rect">
+              <a:avLst/>
+            </a:prstGeom>
+          </p:spPr>
+          <p:style>
+            <a:lnRef idx="1">
+              <a:schemeClr val="accent1"/>
+            </a:lnRef>
+            <a:fillRef idx="3">
+              <a:schemeClr val="accent1"/>
+            </a:fillRef>
+            <a:effectRef idx="2">
+              <a:schemeClr val="accent1"/>
+            </a:effectRef>
+            <a:fontRef idx="minor">
+              <a:schemeClr val="lt1"/>
+            </a:fontRef>
+          </p:style>
+          <p:txBody>
+            <a:bodyPr rtlCol="0" anchor="ctr"/>
+            <a:lstStyle/>
+            <a:p>
+              <a:pPr algn="ctr"/>
+              <a:endParaRPr lang="en-US"/>
+            </a:p>
+          </p:txBody>
+        </p:sp>
+        <p:sp>
+          <p:nvSpPr>
+            <p:cNvPr id="27" name="Rectangle 26"/>
+            <p:cNvSpPr/>
+            <p:nvPr/>
+          </p:nvSpPr>
+          <p:spPr>
+            <a:xfrm>
+              <a:off x="3962400" y="2667000"/>
+              <a:ext cx="1447800" cy="762000"/>
+            </a:xfrm>
+            <a:prstGeom prst="rect">
+              <a:avLst/>
+            </a:prstGeom>
+          </p:spPr>
+          <p:style>
+            <a:lnRef idx="1">
+              <a:schemeClr val="accent1"/>
+            </a:lnRef>
+            <a:fillRef idx="3">
+              <a:schemeClr val="accent1"/>
+            </a:fillRef>
+            <a:effectRef idx="2">
+              <a:schemeClr val="accent1"/>
+            </a:effectRef>
+            <a:fontRef idx="minor">
+              <a:schemeClr val="lt1"/>
+            </a:fontRef>
+          </p:style>
+          <p:txBody>
+            <a:bodyPr rtlCol="0" anchor="ctr"/>
+            <a:lstStyle/>
+            <a:p>
+              <a:pPr algn="ctr"/>
+              <a:endParaRPr lang="en-US"/>
+            </a:p>
+          </p:txBody>
+        </p:sp>
+        <p:sp>
+          <p:nvSpPr>
+            <p:cNvPr id="28" name="Rectangle 27"/>
+            <p:cNvSpPr/>
+            <p:nvPr/>
+          </p:nvSpPr>
+          <p:spPr>
+            <a:xfrm>
+              <a:off x="2133600" y="2667000"/>
+              <a:ext cx="1447800" cy="762000"/>
+            </a:xfrm>
+            <a:prstGeom prst="rect">
+              <a:avLst/>
+            </a:prstGeom>
+          </p:spPr>
+          <p:style>
+            <a:lnRef idx="1">
+              <a:schemeClr val="accent1"/>
+            </a:lnRef>
+            <a:fillRef idx="3">
+              <a:schemeClr val="accent1"/>
+            </a:fillRef>
+            <a:effectRef idx="2">
+              <a:schemeClr val="accent1"/>
+            </a:effectRef>
+            <a:fontRef idx="minor">
+              <a:schemeClr val="lt1"/>
+            </a:fontRef>
+          </p:style>
+          <p:txBody>
+            <a:bodyPr rtlCol="0" anchor="ctr"/>
+            <a:lstStyle/>
+            <a:p>
+              <a:pPr algn="ctr"/>
+              <a:endParaRPr lang="en-US"/>
+            </a:p>
+          </p:txBody>
+        </p:sp>
+        <p:cxnSp>
+          <p:nvCxnSpPr>
+            <p:cNvPr id="37" name="Elbow Connector 36"/>
+            <p:cNvCxnSpPr>
+              <a:stCxn id="27" idx="2"/>
+            </p:cNvCxnSpPr>
+            <p:nvPr/>
+          </p:nvCxnSpPr>
+          <p:spPr>
+            <a:xfrm rot="5400000">
+              <a:off x="4000500" y="3200400"/>
+              <a:ext cx="457200" cy="914400"/>
+            </a:xfrm>
+            <a:prstGeom prst="bentConnector3">
+              <a:avLst>
+                <a:gd name="adj1" fmla="val 50000"/>
+              </a:avLst>
+            </a:prstGeom>
+            <a:ln>
+              <a:tailEnd type="arrow"/>
+            </a:ln>
+          </p:spPr>
+          <p:style>
+            <a:lnRef idx="1">
+              <a:schemeClr val="accent1"/>
+            </a:lnRef>
+            <a:fillRef idx="0">
+              <a:schemeClr val="accent1"/>
+            </a:fillRef>
+            <a:effectRef idx="0">
+              <a:schemeClr val="accent1"/>
+            </a:effectRef>
+            <a:fontRef idx="minor">
+              <a:schemeClr val="tx1"/>
+            </a:fontRef>
+          </p:style>
+        </p:cxnSp>
+        <p:cxnSp>
+          <p:nvCxnSpPr>
+            <p:cNvPr id="39" name="Shape 38"/>
+            <p:cNvCxnSpPr>
+              <a:stCxn id="28" idx="2"/>
+            </p:cNvCxnSpPr>
+            <p:nvPr/>
+          </p:nvCxnSpPr>
+          <p:spPr>
+            <a:xfrm rot="16200000" flipH="1">
+              <a:off x="3086100" y="3200400"/>
+              <a:ext cx="457200" cy="914400"/>
+            </a:xfrm>
+            <a:prstGeom prst="bentConnector3">
+              <a:avLst>
+                <a:gd name="adj1" fmla="val 50000"/>
+              </a:avLst>
+            </a:prstGeom>
+            <a:ln>
+              <a:tailEnd type="arrow"/>
+            </a:ln>
+          </p:spPr>
+          <p:style>
+            <a:lnRef idx="1">
+              <a:schemeClr val="accent1"/>
+            </a:lnRef>
+            <a:fillRef idx="0">
+              <a:schemeClr val="accent1"/>
+            </a:fillRef>
+            <a:effectRef idx="0">
+              <a:schemeClr val="accent1"/>
+            </a:effectRef>
+            <a:fontRef idx="minor">
+              <a:schemeClr val="tx1"/>
+            </a:fontRef>
+          </p:style>
+        </p:cxnSp>
+        <p:cxnSp>
+          <p:nvCxnSpPr>
+            <p:cNvPr id="47" name="Elbow Connector 46"/>
+            <p:cNvCxnSpPr>
+              <a:stCxn id="25" idx="3"/>
+            </p:cNvCxnSpPr>
+            <p:nvPr/>
+          </p:nvCxnSpPr>
+          <p:spPr>
+            <a:xfrm>
+              <a:off x="2057400" y="4267200"/>
+              <a:ext cx="457200" cy="571500"/>
+            </a:xfrm>
+            <a:prstGeom prst="bentConnector3">
+              <a:avLst>
+                <a:gd name="adj1" fmla="val 50000"/>
+              </a:avLst>
+            </a:prstGeom>
+            <a:ln>
+              <a:tailEnd type="arrow"/>
+            </a:ln>
+          </p:spPr>
+          <p:style>
+            <a:lnRef idx="1">
+              <a:schemeClr val="accent1"/>
+            </a:lnRef>
+            <a:fillRef idx="0">
+              <a:schemeClr val="accent1"/>
+            </a:fillRef>
+            <a:effectRef idx="0">
+              <a:schemeClr val="accent1"/>
+            </a:effectRef>
+            <a:fontRef idx="minor">
+              <a:schemeClr val="tx1"/>
+            </a:fontRef>
+          </p:style>
+        </p:cxnSp>
+        <p:cxnSp>
+          <p:nvCxnSpPr>
+            <p:cNvPr id="49" name="Elbow Connector 48"/>
+            <p:cNvCxnSpPr>
+              <a:stCxn id="26" idx="1"/>
+              <a:endCxn id="4" idx="3"/>
+            </p:cNvCxnSpPr>
+            <p:nvPr/>
+          </p:nvCxnSpPr>
+          <p:spPr>
+            <a:xfrm rot="10800000" flipV="1">
+              <a:off x="5029200" y="4267200"/>
+              <a:ext cx="533400" cy="647700"/>
+            </a:xfrm>
+            <a:prstGeom prst="bentConnector3">
+              <a:avLst>
+                <a:gd name="adj1" fmla="val 50000"/>
+              </a:avLst>
+            </a:prstGeom>
+            <a:ln>
+              <a:tailEnd type="arrow"/>
+            </a:ln>
+          </p:spPr>
+          <p:style>
+            <a:lnRef idx="1">
+              <a:schemeClr val="accent1"/>
+            </a:lnRef>
+            <a:fillRef idx="0">
+              <a:schemeClr val="accent1"/>
+            </a:fillRef>
+            <a:effectRef idx="0">
+              <a:schemeClr val="accent1"/>
+            </a:effectRef>
+            <a:fontRef idx="minor">
+              <a:schemeClr val="tx1"/>
+            </a:fontRef>
+          </p:style>
+        </p:cxnSp>
+      </p:grpSp>
+    </p:spTree>
+  </p:cSld>
+  <p:clrMapOvr>
+    <a:masterClrMapping/>
+  </p:clrMapOvr>
+  <p:timing>
+    <p:tnLst>
+      <p:par>
+        <p:cTn id="1" dur="indefinite" restart="never" nodeType="tmRoot"/>
+      </p:par>
+    </p:tnLst>
+  </p:timing>
+</p:sld>
+</file>
+
+<file path=ppt/slides/slide30.xml><?xml version="1.0" encoding="utf-8"?>
 <p:sld xmlns:a="http://schemas.openxmlformats.org/drawingml/2006/main" xmlns:r="http://schemas.openxmlformats.org/officeDocument/2006/relationships" xmlns:p="http://schemas.openxmlformats.org/presentationml/2006/main">
   <p:cSld>
     <p:spTree>
@@ -15621,7 +15862,7 @@
 </p:sld>
 </file>
 
-<file path=ppt/slides/slide32.xml><?xml version="1.0" encoding="utf-8"?>
+<file path=ppt/slides/slide31.xml><?xml version="1.0" encoding="utf-8"?>
 <p:sld xmlns:a="http://schemas.openxmlformats.org/drawingml/2006/main" xmlns:r="http://schemas.openxmlformats.org/officeDocument/2006/relationships" xmlns:p="http://schemas.openxmlformats.org/presentationml/2006/main">
   <p:cSld>
     <p:spTree>
@@ -16167,7 +16408,7 @@
 </p:sld>
 </file>
 
-<file path=ppt/slides/slide33.xml><?xml version="1.0" encoding="utf-8"?>
+<file path=ppt/slides/slide32.xml><?xml version="1.0" encoding="utf-8"?>
 <p:sld xmlns:a="http://schemas.openxmlformats.org/drawingml/2006/main" xmlns:r="http://schemas.openxmlformats.org/officeDocument/2006/relationships" xmlns:p="http://schemas.openxmlformats.org/presentationml/2006/main">
   <p:cSld>
     <p:spTree>
@@ -17042,902 +17283,6 @@
         <p:spPr>
           <a:xfrm>
             <a:off x="685800" y="1066800"/>
-            <a:ext cx="8229600" cy="1219200"/>
-          </a:xfrm>
-        </p:spPr>
-        <p:txBody>
-          <a:bodyPr/>
-          <a:lstStyle/>
-          <a:p>
-            <a:pPr eaLnBrk="1" hangingPunct="1">
-              <a:buNone/>
-            </a:pPr>
-            <a:r>
-              <a:rPr lang="en-US" dirty="0" smtClean="0"/>
-              <a:t>Encapsulation:</a:t>
-            </a:r>
-          </a:p>
-          <a:p>
-            <a:pPr lvl="1" eaLnBrk="1" hangingPunct="1">
-              <a:buNone/>
-            </a:pPr>
-            <a:r>
-              <a:rPr lang="en-US" sz="2000" dirty="0" smtClean="0"/>
-              <a:t>“The hiding of </a:t>
-            </a:r>
-            <a:r>
-              <a:rPr lang="en-US" sz="2000" i="1" dirty="0" smtClean="0"/>
-              <a:t>design decisions</a:t>
-            </a:r>
-            <a:r>
-              <a:rPr lang="en-US" sz="2000" dirty="0" smtClean="0"/>
-              <a:t> in a computer program that are most likely to change” - </a:t>
-            </a:r>
-            <a:r>
-              <a:rPr lang="en-US" sz="2000" dirty="0" smtClean="0">
-                <a:hlinkClick r:id="rId3"/>
-              </a:rPr>
-              <a:t>Wikipedia</a:t>
-            </a:r>
-            <a:endParaRPr lang="en-US" sz="2000" dirty="0" smtClean="0"/>
-          </a:p>
-        </p:txBody>
-      </p:sp>
-      <p:sp>
-        <p:nvSpPr>
-          <p:cNvPr id="3074" name="Title 1"/>
-          <p:cNvSpPr>
-            <a:spLocks noGrp="1"/>
-          </p:cNvSpPr>
-          <p:nvPr>
-            <p:ph type="title"/>
-          </p:nvPr>
-        </p:nvSpPr>
-        <p:spPr bwMode="auto">
-          <a:noFill/>
-          <a:ln>
-            <a:miter lim="800000"/>
-            <a:headEnd/>
-            <a:tailEnd/>
-          </a:ln>
-        </p:spPr>
-        <p:txBody>
-          <a:bodyPr vert="horz" wrap="square" lIns="91440" tIns="45720" rIns="91440" bIns="45720" numCol="1" anchor="t" anchorCtr="0" compatLnSpc="1">
-            <a:prstTxWarp prst="textNoShape">
-              <a:avLst/>
-            </a:prstTxWarp>
-          </a:bodyPr>
-          <a:lstStyle/>
-          <a:p>
-            <a:pPr eaLnBrk="1" hangingPunct="1"/>
-            <a:r>
-              <a:rPr lang="en-US" dirty="0" smtClean="0"/>
-              <a:t>Object Oriented Principles</a:t>
-            </a:r>
-          </a:p>
-        </p:txBody>
-      </p:sp>
-      <p:grpSp>
-        <p:nvGrpSpPr>
-          <p:cNvPr id="2" name="Group 52"/>
-          <p:cNvGrpSpPr/>
-          <p:nvPr/>
-        </p:nvGrpSpPr>
-        <p:grpSpPr>
-          <a:xfrm>
-            <a:off x="1371600" y="2667000"/>
-            <a:ext cx="6400800" cy="3276600"/>
-            <a:chOff x="609600" y="2667000"/>
-            <a:chExt cx="6400800" cy="3276600"/>
-          </a:xfrm>
-        </p:grpSpPr>
-        <p:grpSp>
-          <p:nvGrpSpPr>
-            <p:cNvPr id="3" name="Group 23"/>
-            <p:cNvGrpSpPr/>
-            <p:nvPr/>
-          </p:nvGrpSpPr>
-          <p:grpSpPr>
-            <a:xfrm>
-              <a:off x="2514600" y="3886200"/>
-              <a:ext cx="2514600" cy="2057400"/>
-              <a:chOff x="3429000" y="3352800"/>
-              <a:chExt cx="2514600" cy="2057400"/>
-            </a:xfrm>
-          </p:grpSpPr>
-          <p:grpSp>
-            <p:nvGrpSpPr>
-              <p:cNvPr id="9" name="Group 22"/>
-              <p:cNvGrpSpPr/>
-              <p:nvPr/>
-            </p:nvGrpSpPr>
-            <p:grpSpPr>
-              <a:xfrm>
-                <a:off x="3429000" y="3352800"/>
-                <a:ext cx="2514600" cy="2057400"/>
-                <a:chOff x="3429000" y="3352800"/>
-                <a:chExt cx="2514600" cy="2057400"/>
-              </a:xfrm>
-            </p:grpSpPr>
-            <p:grpSp>
-              <p:nvGrpSpPr>
-                <p:cNvPr id="10" name="Group 9"/>
-                <p:cNvGrpSpPr/>
-                <p:nvPr/>
-              </p:nvGrpSpPr>
-              <p:grpSpPr>
-                <a:xfrm>
-                  <a:off x="3429000" y="3352800"/>
-                  <a:ext cx="2514600" cy="2057400"/>
-                  <a:chOff x="2286000" y="3505200"/>
-                  <a:chExt cx="2514600" cy="2057400"/>
-                </a:xfrm>
-              </p:grpSpPr>
-              <p:sp>
-                <p:nvSpPr>
-                  <p:cNvPr id="4" name="Frame 3"/>
-                  <p:cNvSpPr/>
-                  <p:nvPr/>
-                </p:nvSpPr>
-                <p:spPr>
-                  <a:xfrm>
-                    <a:off x="2286000" y="3505200"/>
-                    <a:ext cx="2514600" cy="2057400"/>
-                  </a:xfrm>
-                  <a:prstGeom prst="frame">
-                    <a:avLst/>
-                  </a:prstGeom>
-                </p:spPr>
-                <p:style>
-                  <a:lnRef idx="1">
-                    <a:schemeClr val="accent2"/>
-                  </a:lnRef>
-                  <a:fillRef idx="3">
-                    <a:schemeClr val="accent2"/>
-                  </a:fillRef>
-                  <a:effectRef idx="2">
-                    <a:schemeClr val="accent2"/>
-                  </a:effectRef>
-                  <a:fontRef idx="minor">
-                    <a:schemeClr val="lt1"/>
-                  </a:fontRef>
-                </p:style>
-                <p:txBody>
-                  <a:bodyPr rtlCol="0" anchor="ctr"/>
-                  <a:lstStyle/>
-                  <a:p>
-                    <a:pPr algn="ctr"/>
-                    <a:endParaRPr lang="en-US">
-                      <a:solidFill>
-                        <a:schemeClr val="tx1"/>
-                      </a:solidFill>
-                    </a:endParaRPr>
-                  </a:p>
-                </p:txBody>
-              </p:sp>
-              <p:sp>
-                <p:nvSpPr>
-                  <p:cNvPr id="5" name="Rectangle 4"/>
-                  <p:cNvSpPr/>
-                  <p:nvPr/>
-                </p:nvSpPr>
-                <p:spPr>
-                  <a:xfrm>
-                    <a:off x="2743200" y="3962400"/>
-                    <a:ext cx="685800" cy="457200"/>
-                  </a:xfrm>
-                  <a:prstGeom prst="rect">
-                    <a:avLst/>
-                  </a:prstGeom>
-                </p:spPr>
-                <p:style>
-                  <a:lnRef idx="2">
-                    <a:schemeClr val="dk1">
-                      <a:shade val="50000"/>
-                    </a:schemeClr>
-                  </a:lnRef>
-                  <a:fillRef idx="1">
-                    <a:schemeClr val="dk1"/>
-                  </a:fillRef>
-                  <a:effectRef idx="0">
-                    <a:schemeClr val="dk1"/>
-                  </a:effectRef>
-                  <a:fontRef idx="minor">
-                    <a:schemeClr val="lt1"/>
-                  </a:fontRef>
-                </p:style>
-                <p:txBody>
-                  <a:bodyPr rtlCol="0" anchor="ctr"/>
-                  <a:lstStyle/>
-                  <a:p>
-                    <a:pPr algn="ctr"/>
-                    <a:endParaRPr lang="en-US"/>
-                  </a:p>
-                </p:txBody>
-              </p:sp>
-              <p:sp>
-                <p:nvSpPr>
-                  <p:cNvPr id="6" name="Rectangle 5"/>
-                  <p:cNvSpPr/>
-                  <p:nvPr/>
-                </p:nvSpPr>
-                <p:spPr>
-                  <a:xfrm>
-                    <a:off x="3657600" y="3962400"/>
-                    <a:ext cx="685800" cy="457200"/>
-                  </a:xfrm>
-                  <a:prstGeom prst="rect">
-                    <a:avLst/>
-                  </a:prstGeom>
-                </p:spPr>
-                <p:style>
-                  <a:lnRef idx="2">
-                    <a:schemeClr val="dk1">
-                      <a:shade val="50000"/>
-                    </a:schemeClr>
-                  </a:lnRef>
-                  <a:fillRef idx="1">
-                    <a:schemeClr val="dk1"/>
-                  </a:fillRef>
-                  <a:effectRef idx="0">
-                    <a:schemeClr val="dk1"/>
-                  </a:effectRef>
-                  <a:fontRef idx="minor">
-                    <a:schemeClr val="lt1"/>
-                  </a:fontRef>
-                </p:style>
-                <p:txBody>
-                  <a:bodyPr rtlCol="0" anchor="ctr"/>
-                  <a:lstStyle/>
-                  <a:p>
-                    <a:pPr algn="ctr"/>
-                    <a:endParaRPr lang="en-US"/>
-                  </a:p>
-                </p:txBody>
-              </p:sp>
-              <p:sp>
-                <p:nvSpPr>
-                  <p:cNvPr id="7" name="Rectangle 6"/>
-                  <p:cNvSpPr/>
-                  <p:nvPr/>
-                </p:nvSpPr>
-                <p:spPr>
-                  <a:xfrm>
-                    <a:off x="2743200" y="4648200"/>
-                    <a:ext cx="685800" cy="457200"/>
-                  </a:xfrm>
-                  <a:prstGeom prst="rect">
-                    <a:avLst/>
-                  </a:prstGeom>
-                </p:spPr>
-                <p:style>
-                  <a:lnRef idx="2">
-                    <a:schemeClr val="dk1">
-                      <a:shade val="50000"/>
-                    </a:schemeClr>
-                  </a:lnRef>
-                  <a:fillRef idx="1">
-                    <a:schemeClr val="dk1"/>
-                  </a:fillRef>
-                  <a:effectRef idx="0">
-                    <a:schemeClr val="dk1"/>
-                  </a:effectRef>
-                  <a:fontRef idx="minor">
-                    <a:schemeClr val="lt1"/>
-                  </a:fontRef>
-                </p:style>
-                <p:txBody>
-                  <a:bodyPr rtlCol="0" anchor="ctr"/>
-                  <a:lstStyle/>
-                  <a:p>
-                    <a:pPr algn="ctr"/>
-                    <a:endParaRPr lang="en-US"/>
-                  </a:p>
-                </p:txBody>
-              </p:sp>
-              <p:sp>
-                <p:nvSpPr>
-                  <p:cNvPr id="8" name="Rectangle 7"/>
-                  <p:cNvSpPr/>
-                  <p:nvPr/>
-                </p:nvSpPr>
-                <p:spPr>
-                  <a:xfrm>
-                    <a:off x="3657600" y="4648200"/>
-                    <a:ext cx="685800" cy="457200"/>
-                  </a:xfrm>
-                  <a:prstGeom prst="rect">
-                    <a:avLst/>
-                  </a:prstGeom>
-                </p:spPr>
-                <p:style>
-                  <a:lnRef idx="2">
-                    <a:schemeClr val="dk1">
-                      <a:shade val="50000"/>
-                    </a:schemeClr>
-                  </a:lnRef>
-                  <a:fillRef idx="1">
-                    <a:schemeClr val="dk1"/>
-                  </a:fillRef>
-                  <a:effectRef idx="0">
-                    <a:schemeClr val="dk1"/>
-                  </a:effectRef>
-                  <a:fontRef idx="minor">
-                    <a:schemeClr val="lt1"/>
-                  </a:fontRef>
-                </p:style>
-                <p:txBody>
-                  <a:bodyPr rtlCol="0" anchor="ctr"/>
-                  <a:lstStyle/>
-                  <a:p>
-                    <a:pPr algn="ctr"/>
-                    <a:endParaRPr lang="en-US"/>
-                  </a:p>
-                </p:txBody>
-              </p:sp>
-            </p:grpSp>
-            <p:cxnSp>
-              <p:nvCxnSpPr>
-                <p:cNvPr id="15" name="Straight Arrow Connector 14"/>
-                <p:cNvCxnSpPr>
-                  <a:stCxn id="5" idx="3"/>
-                  <a:endCxn id="6" idx="1"/>
-                </p:cNvCxnSpPr>
-                <p:nvPr/>
-              </p:nvCxnSpPr>
-              <p:spPr>
-                <a:xfrm>
-                  <a:off x="4572000" y="4038600"/>
-                  <a:ext cx="228600" cy="1588"/>
-                </a:xfrm>
-                <a:prstGeom prst="straightConnector1">
-                  <a:avLst/>
-                </a:prstGeom>
-                <a:ln>
-                  <a:tailEnd type="arrow"/>
-                </a:ln>
-              </p:spPr>
-              <p:style>
-                <a:lnRef idx="1">
-                  <a:schemeClr val="dk1"/>
-                </a:lnRef>
-                <a:fillRef idx="0">
-                  <a:schemeClr val="dk1"/>
-                </a:fillRef>
-                <a:effectRef idx="0">
-                  <a:schemeClr val="dk1"/>
-                </a:effectRef>
-                <a:fontRef idx="minor">
-                  <a:schemeClr val="tx1"/>
-                </a:fontRef>
-              </p:style>
-            </p:cxnSp>
-            <p:cxnSp>
-              <p:nvCxnSpPr>
-                <p:cNvPr id="17" name="Straight Arrow Connector 16"/>
-                <p:cNvCxnSpPr>
-                  <a:stCxn id="5" idx="2"/>
-                  <a:endCxn id="7" idx="0"/>
-                </p:cNvCxnSpPr>
-                <p:nvPr/>
-              </p:nvCxnSpPr>
-              <p:spPr>
-                <a:xfrm rot="5400000">
-                  <a:off x="4114800" y="4381500"/>
-                  <a:ext cx="228600" cy="1588"/>
-                </a:xfrm>
-                <a:prstGeom prst="straightConnector1">
-                  <a:avLst/>
-                </a:prstGeom>
-                <a:ln>
-                  <a:tailEnd type="arrow"/>
-                </a:ln>
-              </p:spPr>
-              <p:style>
-                <a:lnRef idx="1">
-                  <a:schemeClr val="dk1"/>
-                </a:lnRef>
-                <a:fillRef idx="0">
-                  <a:schemeClr val="dk1"/>
-                </a:fillRef>
-                <a:effectRef idx="0">
-                  <a:schemeClr val="dk1"/>
-                </a:effectRef>
-                <a:fontRef idx="minor">
-                  <a:schemeClr val="tx1"/>
-                </a:fontRef>
-              </p:style>
-            </p:cxnSp>
-            <p:cxnSp>
-              <p:nvCxnSpPr>
-                <p:cNvPr id="19" name="Straight Arrow Connector 18"/>
-                <p:cNvCxnSpPr>
-                  <a:stCxn id="7" idx="3"/>
-                  <a:endCxn id="8" idx="1"/>
-                </p:cNvCxnSpPr>
-                <p:nvPr/>
-              </p:nvCxnSpPr>
-              <p:spPr>
-                <a:xfrm>
-                  <a:off x="4572000" y="4724400"/>
-                  <a:ext cx="228600" cy="1588"/>
-                </a:xfrm>
-                <a:prstGeom prst="straightConnector1">
-                  <a:avLst/>
-                </a:prstGeom>
-                <a:ln>
-                  <a:tailEnd type="arrow"/>
-                </a:ln>
-              </p:spPr>
-              <p:style>
-                <a:lnRef idx="1">
-                  <a:schemeClr val="dk1"/>
-                </a:lnRef>
-                <a:fillRef idx="0">
-                  <a:schemeClr val="dk1"/>
-                </a:fillRef>
-                <a:effectRef idx="0">
-                  <a:schemeClr val="dk1"/>
-                </a:effectRef>
-                <a:fontRef idx="minor">
-                  <a:schemeClr val="tx1"/>
-                </a:fontRef>
-              </p:style>
-            </p:cxnSp>
-            <p:cxnSp>
-              <p:nvCxnSpPr>
-                <p:cNvPr id="21" name="Straight Arrow Connector 20"/>
-                <p:cNvCxnSpPr/>
-                <p:nvPr/>
-              </p:nvCxnSpPr>
-              <p:spPr>
-                <a:xfrm rot="16200000" flipV="1">
-                  <a:off x="4572000" y="4267200"/>
-                  <a:ext cx="228600" cy="228600"/>
-                </a:xfrm>
-                <a:prstGeom prst="straightConnector1">
-                  <a:avLst/>
-                </a:prstGeom>
-                <a:ln>
-                  <a:tailEnd type="arrow"/>
-                </a:ln>
-              </p:spPr>
-              <p:style>
-                <a:lnRef idx="1">
-                  <a:schemeClr val="dk1"/>
-                </a:lnRef>
-                <a:fillRef idx="0">
-                  <a:schemeClr val="dk1"/>
-                </a:fillRef>
-                <a:effectRef idx="0">
-                  <a:schemeClr val="dk1"/>
-                </a:effectRef>
-                <a:fontRef idx="minor">
-                  <a:schemeClr val="tx1"/>
-                </a:fontRef>
-              </p:style>
-            </p:cxnSp>
-          </p:grpSp>
-          <p:sp>
-            <p:nvSpPr>
-              <p:cNvPr id="12" name="TextBox 11"/>
-              <p:cNvSpPr txBox="1"/>
-              <p:nvPr/>
-            </p:nvSpPr>
-            <p:spPr>
-              <a:xfrm>
-                <a:off x="3733800" y="3657600"/>
-                <a:ext cx="1905000" cy="1446550"/>
-              </a:xfrm>
-              <a:prstGeom prst="rect">
-                <a:avLst/>
-              </a:prstGeom>
-              <a:gradFill>
-                <a:gsLst>
-                  <a:gs pos="100000">
-                    <a:schemeClr val="accent1">
-                      <a:tint val="50000"/>
-                      <a:satMod val="300000"/>
-                      <a:alpha val="50000"/>
-                    </a:schemeClr>
-                  </a:gs>
-                  <a:gs pos="35000">
-                    <a:schemeClr val="accent1">
-                      <a:tint val="37000"/>
-                      <a:satMod val="300000"/>
-                    </a:schemeClr>
-                  </a:gs>
-                  <a:gs pos="100000">
-                    <a:schemeClr val="accent1">
-                      <a:tint val="15000"/>
-                      <a:satMod val="350000"/>
-                    </a:schemeClr>
-                  </a:gs>
-                </a:gsLst>
-              </a:gradFill>
-            </p:spPr>
-            <p:style>
-              <a:lnRef idx="1">
-                <a:schemeClr val="accent1"/>
-              </a:lnRef>
-              <a:fillRef idx="2">
-                <a:schemeClr val="accent1"/>
-              </a:fillRef>
-              <a:effectRef idx="1">
-                <a:schemeClr val="accent1"/>
-              </a:effectRef>
-              <a:fontRef idx="minor">
-                <a:schemeClr val="dk1"/>
-              </a:fontRef>
-            </p:style>
-            <p:txBody>
-              <a:bodyPr wrap="square" rtlCol="0">
-                <a:spAutoFit/>
-              </a:bodyPr>
-              <a:lstStyle/>
-              <a:p>
-                <a:pPr algn="ctr"/>
-                <a:r>
-                  <a:rPr lang="en-US" sz="8800" dirty="0" smtClean="0">
-                    <a:solidFill>
-                      <a:schemeClr val="accent2"/>
-                    </a:solidFill>
-                    <a:latin typeface="Arial" pitchFamily="34" charset="0"/>
-                    <a:cs typeface="Arial" pitchFamily="34" charset="0"/>
-                  </a:rPr>
-                  <a:t>?</a:t>
-                </a:r>
-              </a:p>
-            </p:txBody>
-          </p:sp>
-        </p:grpSp>
-        <p:sp>
-          <p:nvSpPr>
-            <p:cNvPr id="25" name="Rectangle 24"/>
-            <p:cNvSpPr/>
-            <p:nvPr/>
-          </p:nvSpPr>
-          <p:spPr>
-            <a:xfrm>
-              <a:off x="609600" y="3886200"/>
-              <a:ext cx="1447800" cy="762000"/>
-            </a:xfrm>
-            <a:prstGeom prst="rect">
-              <a:avLst/>
-            </a:prstGeom>
-          </p:spPr>
-          <p:style>
-            <a:lnRef idx="1">
-              <a:schemeClr val="accent1"/>
-            </a:lnRef>
-            <a:fillRef idx="3">
-              <a:schemeClr val="accent1"/>
-            </a:fillRef>
-            <a:effectRef idx="2">
-              <a:schemeClr val="accent1"/>
-            </a:effectRef>
-            <a:fontRef idx="minor">
-              <a:schemeClr val="lt1"/>
-            </a:fontRef>
-          </p:style>
-          <p:txBody>
-            <a:bodyPr rtlCol="0" anchor="ctr"/>
-            <a:lstStyle/>
-            <a:p>
-              <a:pPr algn="ctr"/>
-              <a:endParaRPr lang="en-US"/>
-            </a:p>
-          </p:txBody>
-        </p:sp>
-        <p:sp>
-          <p:nvSpPr>
-            <p:cNvPr id="26" name="Rectangle 25"/>
-            <p:cNvSpPr/>
-            <p:nvPr/>
-          </p:nvSpPr>
-          <p:spPr>
-            <a:xfrm>
-              <a:off x="5562600" y="3886200"/>
-              <a:ext cx="1447800" cy="762000"/>
-            </a:xfrm>
-            <a:prstGeom prst="rect">
-              <a:avLst/>
-            </a:prstGeom>
-          </p:spPr>
-          <p:style>
-            <a:lnRef idx="1">
-              <a:schemeClr val="accent1"/>
-            </a:lnRef>
-            <a:fillRef idx="3">
-              <a:schemeClr val="accent1"/>
-            </a:fillRef>
-            <a:effectRef idx="2">
-              <a:schemeClr val="accent1"/>
-            </a:effectRef>
-            <a:fontRef idx="minor">
-              <a:schemeClr val="lt1"/>
-            </a:fontRef>
-          </p:style>
-          <p:txBody>
-            <a:bodyPr rtlCol="0" anchor="ctr"/>
-            <a:lstStyle/>
-            <a:p>
-              <a:pPr algn="ctr"/>
-              <a:endParaRPr lang="en-US"/>
-            </a:p>
-          </p:txBody>
-        </p:sp>
-        <p:sp>
-          <p:nvSpPr>
-            <p:cNvPr id="27" name="Rectangle 26"/>
-            <p:cNvSpPr/>
-            <p:nvPr/>
-          </p:nvSpPr>
-          <p:spPr>
-            <a:xfrm>
-              <a:off x="3962400" y="2667000"/>
-              <a:ext cx="1447800" cy="762000"/>
-            </a:xfrm>
-            <a:prstGeom prst="rect">
-              <a:avLst/>
-            </a:prstGeom>
-          </p:spPr>
-          <p:style>
-            <a:lnRef idx="1">
-              <a:schemeClr val="accent1"/>
-            </a:lnRef>
-            <a:fillRef idx="3">
-              <a:schemeClr val="accent1"/>
-            </a:fillRef>
-            <a:effectRef idx="2">
-              <a:schemeClr val="accent1"/>
-            </a:effectRef>
-            <a:fontRef idx="minor">
-              <a:schemeClr val="lt1"/>
-            </a:fontRef>
-          </p:style>
-          <p:txBody>
-            <a:bodyPr rtlCol="0" anchor="ctr"/>
-            <a:lstStyle/>
-            <a:p>
-              <a:pPr algn="ctr"/>
-              <a:endParaRPr lang="en-US"/>
-            </a:p>
-          </p:txBody>
-        </p:sp>
-        <p:sp>
-          <p:nvSpPr>
-            <p:cNvPr id="28" name="Rectangle 27"/>
-            <p:cNvSpPr/>
-            <p:nvPr/>
-          </p:nvSpPr>
-          <p:spPr>
-            <a:xfrm>
-              <a:off x="2133600" y="2667000"/>
-              <a:ext cx="1447800" cy="762000"/>
-            </a:xfrm>
-            <a:prstGeom prst="rect">
-              <a:avLst/>
-            </a:prstGeom>
-          </p:spPr>
-          <p:style>
-            <a:lnRef idx="1">
-              <a:schemeClr val="accent1"/>
-            </a:lnRef>
-            <a:fillRef idx="3">
-              <a:schemeClr val="accent1"/>
-            </a:fillRef>
-            <a:effectRef idx="2">
-              <a:schemeClr val="accent1"/>
-            </a:effectRef>
-            <a:fontRef idx="minor">
-              <a:schemeClr val="lt1"/>
-            </a:fontRef>
-          </p:style>
-          <p:txBody>
-            <a:bodyPr rtlCol="0" anchor="ctr"/>
-            <a:lstStyle/>
-            <a:p>
-              <a:pPr algn="ctr"/>
-              <a:endParaRPr lang="en-US"/>
-            </a:p>
-          </p:txBody>
-        </p:sp>
-        <p:cxnSp>
-          <p:nvCxnSpPr>
-            <p:cNvPr id="37" name="Elbow Connector 36"/>
-            <p:cNvCxnSpPr>
-              <a:stCxn id="27" idx="2"/>
-            </p:cNvCxnSpPr>
-            <p:nvPr/>
-          </p:nvCxnSpPr>
-          <p:spPr>
-            <a:xfrm rot="5400000">
-              <a:off x="4000500" y="3200400"/>
-              <a:ext cx="457200" cy="914400"/>
-            </a:xfrm>
-            <a:prstGeom prst="bentConnector3">
-              <a:avLst>
-                <a:gd name="adj1" fmla="val 50000"/>
-              </a:avLst>
-            </a:prstGeom>
-            <a:ln>
-              <a:tailEnd type="arrow"/>
-            </a:ln>
-          </p:spPr>
-          <p:style>
-            <a:lnRef idx="1">
-              <a:schemeClr val="accent1"/>
-            </a:lnRef>
-            <a:fillRef idx="0">
-              <a:schemeClr val="accent1"/>
-            </a:fillRef>
-            <a:effectRef idx="0">
-              <a:schemeClr val="accent1"/>
-            </a:effectRef>
-            <a:fontRef idx="minor">
-              <a:schemeClr val="tx1"/>
-            </a:fontRef>
-          </p:style>
-        </p:cxnSp>
-        <p:cxnSp>
-          <p:nvCxnSpPr>
-            <p:cNvPr id="39" name="Shape 38"/>
-            <p:cNvCxnSpPr>
-              <a:stCxn id="28" idx="2"/>
-            </p:cNvCxnSpPr>
-            <p:nvPr/>
-          </p:nvCxnSpPr>
-          <p:spPr>
-            <a:xfrm rot="16200000" flipH="1">
-              <a:off x="3086100" y="3200400"/>
-              <a:ext cx="457200" cy="914400"/>
-            </a:xfrm>
-            <a:prstGeom prst="bentConnector3">
-              <a:avLst>
-                <a:gd name="adj1" fmla="val 50000"/>
-              </a:avLst>
-            </a:prstGeom>
-            <a:ln>
-              <a:tailEnd type="arrow"/>
-            </a:ln>
-          </p:spPr>
-          <p:style>
-            <a:lnRef idx="1">
-              <a:schemeClr val="accent1"/>
-            </a:lnRef>
-            <a:fillRef idx="0">
-              <a:schemeClr val="accent1"/>
-            </a:fillRef>
-            <a:effectRef idx="0">
-              <a:schemeClr val="accent1"/>
-            </a:effectRef>
-            <a:fontRef idx="minor">
-              <a:schemeClr val="tx1"/>
-            </a:fontRef>
-          </p:style>
-        </p:cxnSp>
-        <p:cxnSp>
-          <p:nvCxnSpPr>
-            <p:cNvPr id="47" name="Elbow Connector 46"/>
-            <p:cNvCxnSpPr>
-              <a:stCxn id="25" idx="3"/>
-            </p:cNvCxnSpPr>
-            <p:nvPr/>
-          </p:nvCxnSpPr>
-          <p:spPr>
-            <a:xfrm>
-              <a:off x="2057400" y="4267200"/>
-              <a:ext cx="457200" cy="571500"/>
-            </a:xfrm>
-            <a:prstGeom prst="bentConnector3">
-              <a:avLst>
-                <a:gd name="adj1" fmla="val 50000"/>
-              </a:avLst>
-            </a:prstGeom>
-            <a:ln>
-              <a:tailEnd type="arrow"/>
-            </a:ln>
-          </p:spPr>
-          <p:style>
-            <a:lnRef idx="1">
-              <a:schemeClr val="accent1"/>
-            </a:lnRef>
-            <a:fillRef idx="0">
-              <a:schemeClr val="accent1"/>
-            </a:fillRef>
-            <a:effectRef idx="0">
-              <a:schemeClr val="accent1"/>
-            </a:effectRef>
-            <a:fontRef idx="minor">
-              <a:schemeClr val="tx1"/>
-            </a:fontRef>
-          </p:style>
-        </p:cxnSp>
-        <p:cxnSp>
-          <p:nvCxnSpPr>
-            <p:cNvPr id="49" name="Elbow Connector 48"/>
-            <p:cNvCxnSpPr>
-              <a:stCxn id="26" idx="1"/>
-              <a:endCxn id="4" idx="3"/>
-            </p:cNvCxnSpPr>
-            <p:nvPr/>
-          </p:nvCxnSpPr>
-          <p:spPr>
-            <a:xfrm rot="10800000" flipV="1">
-              <a:off x="5029200" y="4267200"/>
-              <a:ext cx="533400" cy="647700"/>
-            </a:xfrm>
-            <a:prstGeom prst="bentConnector3">
-              <a:avLst>
-                <a:gd name="adj1" fmla="val 50000"/>
-              </a:avLst>
-            </a:prstGeom>
-            <a:ln>
-              <a:tailEnd type="arrow"/>
-            </a:ln>
-          </p:spPr>
-          <p:style>
-            <a:lnRef idx="1">
-              <a:schemeClr val="accent1"/>
-            </a:lnRef>
-            <a:fillRef idx="0">
-              <a:schemeClr val="accent1"/>
-            </a:fillRef>
-            <a:effectRef idx="0">
-              <a:schemeClr val="accent1"/>
-            </a:effectRef>
-            <a:fontRef idx="minor">
-              <a:schemeClr val="tx1"/>
-            </a:fontRef>
-          </p:style>
-        </p:cxnSp>
-      </p:grpSp>
-    </p:spTree>
-  </p:cSld>
-  <p:clrMapOvr>
-    <a:masterClrMapping/>
-  </p:clrMapOvr>
-  <p:timing>
-    <p:tnLst>
-      <p:par>
-        <p:cTn id="1" dur="indefinite" restart="never" nodeType="tmRoot"/>
-      </p:par>
-    </p:tnLst>
-  </p:timing>
-</p:sld>
-</file>
-
-<file path=ppt/slides/slide5.xml><?xml version="1.0" encoding="utf-8"?>
-<p:sld xmlns:a="http://schemas.openxmlformats.org/drawingml/2006/main" xmlns:r="http://schemas.openxmlformats.org/officeDocument/2006/relationships" xmlns:p="http://schemas.openxmlformats.org/presentationml/2006/main">
-  <p:cSld>
-    <p:spTree>
-      <p:nvGrpSpPr>
-        <p:cNvPr id="1" name=""/>
-        <p:cNvGrpSpPr/>
-        <p:nvPr/>
-      </p:nvGrpSpPr>
-      <p:grpSpPr>
-        <a:xfrm>
-          <a:off x="0" y="0"/>
-          <a:ext cx="0" cy="0"/>
-          <a:chOff x="0" y="0"/>
-          <a:chExt cx="0" cy="0"/>
-        </a:xfrm>
-      </p:grpSpPr>
-      <p:sp>
-        <p:nvSpPr>
-          <p:cNvPr id="3075" name="Text Placeholder 2"/>
-          <p:cNvSpPr>
-            <a:spLocks noGrp="1"/>
-          </p:cNvSpPr>
-          <p:nvPr>
-            <p:ph type="body" sz="quarter" idx="10"/>
-          </p:nvPr>
-        </p:nvSpPr>
-        <p:spPr>
-          <a:xfrm>
-            <a:off x="685800" y="1066800"/>
             <a:ext cx="8229600" cy="1295400"/>
           </a:xfrm>
         </p:spPr>
@@ -19306,7 +18651,7 @@
 </p:sld>
 </file>
 
-<file path=ppt/slides/slide6.xml><?xml version="1.0" encoding="utf-8"?>
+<file path=ppt/slides/slide5.xml><?xml version="1.0" encoding="utf-8"?>
 <p:sld xmlns:a="http://schemas.openxmlformats.org/drawingml/2006/main" xmlns:r="http://schemas.openxmlformats.org/officeDocument/2006/relationships" xmlns:p="http://schemas.openxmlformats.org/presentationml/2006/main">
   <p:cSld>
     <p:spTree>
@@ -19643,7 +18988,7 @@
 </p:sld>
 </file>
 
-<file path=ppt/slides/slide7.xml><?xml version="1.0" encoding="utf-8"?>
+<file path=ppt/slides/slide6.xml><?xml version="1.0" encoding="utf-8"?>
 <p:sld xmlns:a="http://schemas.openxmlformats.org/drawingml/2006/main" xmlns:r="http://schemas.openxmlformats.org/officeDocument/2006/relationships" xmlns:p="http://schemas.openxmlformats.org/presentationml/2006/main">
   <p:cSld>
     <p:spTree>
@@ -19765,7 +19110,7 @@
 </p:sld>
 </file>
 
-<file path=ppt/slides/slide8.xml><?xml version="1.0" encoding="utf-8"?>
+<file path=ppt/slides/slide7.xml><?xml version="1.0" encoding="utf-8"?>
 <p:sld xmlns:a="http://schemas.openxmlformats.org/drawingml/2006/main" xmlns:r="http://schemas.openxmlformats.org/officeDocument/2006/relationships" xmlns:p="http://schemas.openxmlformats.org/presentationml/2006/main">
   <p:cSld>
     <p:spTree>
@@ -19934,7 +19279,7 @@
 </p:sld>
 </file>
 
-<file path=ppt/slides/slide9.xml><?xml version="1.0" encoding="utf-8"?>
+<file path=ppt/slides/slide8.xml><?xml version="1.0" encoding="utf-8"?>
 <p:sld xmlns:a="http://schemas.openxmlformats.org/drawingml/2006/main" xmlns:r="http://schemas.openxmlformats.org/officeDocument/2006/relationships" xmlns:p="http://schemas.openxmlformats.org/presentationml/2006/main">
   <p:cSld>
     <p:spTree>
@@ -20130,6 +19475,343 @@
           </p:txBody>
         </p:sp>
       </p:grpSp>
+    </p:spTree>
+  </p:cSld>
+  <p:clrMapOvr>
+    <a:masterClrMapping/>
+  </p:clrMapOvr>
+  <p:timing>
+    <p:tnLst>
+      <p:par>
+        <p:cTn id="1" dur="indefinite" restart="never" nodeType="tmRoot"/>
+      </p:par>
+    </p:tnLst>
+  </p:timing>
+</p:sld>
+</file>
+
+<file path=ppt/slides/slide9.xml><?xml version="1.0" encoding="utf-8"?>
+<p:sld xmlns:a="http://schemas.openxmlformats.org/drawingml/2006/main" xmlns:r="http://schemas.openxmlformats.org/officeDocument/2006/relationships" xmlns:p="http://schemas.openxmlformats.org/presentationml/2006/main">
+  <p:cSld>
+    <p:spTree>
+      <p:nvGrpSpPr>
+        <p:cNvPr id="1" name=""/>
+        <p:cNvGrpSpPr/>
+        <p:nvPr/>
+      </p:nvGrpSpPr>
+      <p:grpSpPr>
+        <a:xfrm>
+          <a:off x="0" y="0"/>
+          <a:ext cx="0" cy="0"/>
+          <a:chOff x="0" y="0"/>
+          <a:chExt cx="0" cy="0"/>
+        </a:xfrm>
+      </p:grpSpPr>
+      <p:sp>
+        <p:nvSpPr>
+          <p:cNvPr id="4" name="Rectangle 3"/>
+          <p:cNvSpPr/>
+          <p:nvPr/>
+        </p:nvSpPr>
+        <p:spPr>
+          <a:xfrm>
+            <a:off x="0" y="0"/>
+            <a:ext cx="9144000" cy="4648200"/>
+          </a:xfrm>
+          <a:prstGeom prst="rect">
+            <a:avLst/>
+          </a:prstGeom>
+          <a:solidFill>
+            <a:srgbClr val="0069AA"/>
+          </a:solidFill>
+          <a:ln>
+            <a:noFill/>
+          </a:ln>
+        </p:spPr>
+        <p:style>
+          <a:lnRef idx="2">
+            <a:schemeClr val="accent1">
+              <a:shade val="50000"/>
+            </a:schemeClr>
+          </a:lnRef>
+          <a:fillRef idx="1">
+            <a:schemeClr val="accent1"/>
+          </a:fillRef>
+          <a:effectRef idx="0">
+            <a:schemeClr val="accent1"/>
+          </a:effectRef>
+          <a:fontRef idx="minor">
+            <a:schemeClr val="lt1"/>
+          </a:fontRef>
+        </p:style>
+        <p:txBody>
+          <a:bodyPr anchor="ctr"/>
+          <a:lstStyle/>
+          <a:p>
+            <a:pPr algn="ctr">
+              <a:defRPr/>
+            </a:pPr>
+            <a:endParaRPr lang="en-US"/>
+          </a:p>
+        </p:txBody>
+      </p:sp>
+      <p:pic>
+        <p:nvPicPr>
+          <p:cNvPr id="4099" name="Picture 4" descr="MAT logo 1 CMYK"/>
+          <p:cNvPicPr>
+            <a:picLocks noChangeAspect="1" noChangeArrowheads="1"/>
+          </p:cNvPicPr>
+          <p:nvPr/>
+        </p:nvPicPr>
+        <p:blipFill>
+          <a:blip r:embed="rId2">
+            <a:clrChange>
+              <a:clrFrom>
+                <a:srgbClr val="FDFDFD"/>
+              </a:clrFrom>
+              <a:clrTo>
+                <a:srgbClr val="FDFDFD">
+                  <a:alpha val="0"/>
+                </a:srgbClr>
+              </a:clrTo>
+            </a:clrChange>
+          </a:blip>
+          <a:srcRect/>
+          <a:stretch>
+            <a:fillRect/>
+          </a:stretch>
+        </p:blipFill>
+        <p:spPr bwMode="auto">
+          <a:xfrm>
+            <a:off x="2971800" y="4800600"/>
+            <a:ext cx="2819400" cy="1338263"/>
+          </a:xfrm>
+          <a:prstGeom prst="rect">
+            <a:avLst/>
+          </a:prstGeom>
+          <a:noFill/>
+          <a:ln w="9525">
+            <a:noFill/>
+            <a:miter lim="800000"/>
+            <a:headEnd/>
+            <a:tailEnd/>
+          </a:ln>
+        </p:spPr>
+      </p:pic>
+      <p:sp>
+        <p:nvSpPr>
+          <p:cNvPr id="5" name="Rectangle 4"/>
+          <p:cNvSpPr/>
+          <p:nvPr/>
+        </p:nvSpPr>
+        <p:spPr>
+          <a:xfrm>
+            <a:off x="0" y="4724400"/>
+            <a:ext cx="9144000" cy="2133600"/>
+          </a:xfrm>
+          <a:prstGeom prst="rect">
+            <a:avLst/>
+          </a:prstGeom>
+          <a:solidFill>
+            <a:srgbClr val="E31937"/>
+          </a:solidFill>
+          <a:ln>
+            <a:noFill/>
+          </a:ln>
+        </p:spPr>
+        <p:style>
+          <a:lnRef idx="2">
+            <a:schemeClr val="accent1">
+              <a:shade val="50000"/>
+            </a:schemeClr>
+          </a:lnRef>
+          <a:fillRef idx="1">
+            <a:schemeClr val="accent1"/>
+          </a:fillRef>
+          <a:effectRef idx="0">
+            <a:schemeClr val="accent1"/>
+          </a:effectRef>
+          <a:fontRef idx="minor">
+            <a:schemeClr val="lt1"/>
+          </a:fontRef>
+        </p:style>
+        <p:txBody>
+          <a:bodyPr anchor="ctr"/>
+          <a:lstStyle/>
+          <a:p>
+            <a:pPr algn="ctr">
+              <a:defRPr/>
+            </a:pPr>
+            <a:endParaRPr lang="en-US"/>
+          </a:p>
+        </p:txBody>
+      </p:sp>
+      <p:sp>
+        <p:nvSpPr>
+          <p:cNvPr id="10" name="Rectangle 9"/>
+          <p:cNvSpPr/>
+          <p:nvPr/>
+        </p:nvSpPr>
+        <p:spPr bwMode="auto">
+          <a:xfrm>
+            <a:off x="228600" y="0"/>
+            <a:ext cx="104775" cy="2325688"/>
+          </a:xfrm>
+          <a:prstGeom prst="rect">
+            <a:avLst/>
+          </a:prstGeom>
+          <a:solidFill>
+            <a:srgbClr val="E31937"/>
+          </a:solidFill>
+          <a:ln>
+            <a:noFill/>
+          </a:ln>
+        </p:spPr>
+        <p:style>
+          <a:lnRef idx="2">
+            <a:schemeClr val="accent1">
+              <a:shade val="50000"/>
+            </a:schemeClr>
+          </a:lnRef>
+          <a:fillRef idx="1">
+            <a:schemeClr val="accent1"/>
+          </a:fillRef>
+          <a:effectRef idx="0">
+            <a:schemeClr val="accent1"/>
+          </a:effectRef>
+          <a:fontRef idx="minor">
+            <a:schemeClr val="lt1"/>
+          </a:fontRef>
+        </p:style>
+        <p:txBody>
+          <a:bodyPr anchor="ctr"/>
+          <a:lstStyle/>
+          <a:p>
+            <a:pPr algn="ctr">
+              <a:defRPr/>
+            </a:pPr>
+            <a:endParaRPr lang="en-US"/>
+          </a:p>
+        </p:txBody>
+      </p:sp>
+      <p:pic>
+        <p:nvPicPr>
+          <p:cNvPr id="4103" name="Picture 7" descr="MAT logo vertical_red.emf"/>
+          <p:cNvPicPr>
+            <a:picLocks noChangeAspect="1"/>
+          </p:cNvPicPr>
+          <p:nvPr/>
+        </p:nvPicPr>
+        <p:blipFill>
+          <a:blip r:embed="rId3"/>
+          <a:srcRect/>
+          <a:stretch>
+            <a:fillRect/>
+          </a:stretch>
+        </p:blipFill>
+        <p:spPr bwMode="auto">
+          <a:xfrm>
+            <a:off x="3600450" y="5334000"/>
+            <a:ext cx="1981200" cy="969963"/>
+          </a:xfrm>
+          <a:prstGeom prst="rect">
+            <a:avLst/>
+          </a:prstGeom>
+          <a:noFill/>
+          <a:ln w="9525">
+            <a:noFill/>
+            <a:miter lim="800000"/>
+            <a:headEnd/>
+            <a:tailEnd/>
+          </a:ln>
+        </p:spPr>
+      </p:pic>
+      <p:sp>
+        <p:nvSpPr>
+          <p:cNvPr id="9" name="TextBox 8"/>
+          <p:cNvSpPr txBox="1"/>
+          <p:nvPr/>
+        </p:nvSpPr>
+        <p:spPr>
+          <a:xfrm>
+            <a:off x="381000" y="1447800"/>
+            <a:ext cx="8610600" cy="646331"/>
+          </a:xfrm>
+          <a:prstGeom prst="rect">
+            <a:avLst/>
+          </a:prstGeom>
+          <a:noFill/>
+        </p:spPr>
+        <p:txBody>
+          <a:bodyPr>
+            <a:spAutoFit/>
+          </a:bodyPr>
+          <a:lstStyle/>
+          <a:p>
+            <a:pPr>
+              <a:defRPr/>
+            </a:pPr>
+            <a:r>
+              <a:rPr lang="en-US" sz="3600" spc="60" dirty="0" smtClean="0">
+                <a:solidFill>
+                  <a:schemeClr val="bg1"/>
+                </a:solidFill>
+                <a:latin typeface="Calibri" pitchFamily="34" charset="0"/>
+              </a:rPr>
+              <a:t>Simple Org Chart: Version 1</a:t>
+            </a:r>
+            <a:endParaRPr lang="en-US" sz="3600" spc="60" dirty="0">
+              <a:solidFill>
+                <a:schemeClr val="bg1"/>
+              </a:solidFill>
+              <a:latin typeface="Calibri" pitchFamily="34" charset="0"/>
+            </a:endParaRPr>
+          </a:p>
+        </p:txBody>
+      </p:sp>
+      <p:sp>
+        <p:nvSpPr>
+          <p:cNvPr id="11" name="TextBox 10"/>
+          <p:cNvSpPr txBox="1"/>
+          <p:nvPr/>
+        </p:nvSpPr>
+        <p:spPr>
+          <a:xfrm>
+            <a:off x="381000" y="2057400"/>
+            <a:ext cx="7543800" cy="338554"/>
+          </a:xfrm>
+          <a:prstGeom prst="rect">
+            <a:avLst/>
+          </a:prstGeom>
+          <a:noFill/>
+        </p:spPr>
+        <p:txBody>
+          <a:bodyPr wrap="square">
+            <a:spAutoFit/>
+          </a:bodyPr>
+          <a:lstStyle/>
+          <a:p>
+            <a:pPr>
+              <a:defRPr/>
+            </a:pPr>
+            <a:r>
+              <a:rPr lang="en-US" sz="1600" dirty="0" smtClean="0">
+                <a:solidFill>
+                  <a:schemeClr val="bg1"/>
+                </a:solidFill>
+                <a:latin typeface="+mn-lt"/>
+              </a:rPr>
+              <a:t>Tightly coupled forms: It works, but it doesn’t modify easily.</a:t>
+            </a:r>
+            <a:endParaRPr lang="en-US" sz="1600" dirty="0">
+              <a:solidFill>
+                <a:schemeClr val="bg1"/>
+              </a:solidFill>
+              <a:latin typeface="+mn-lt"/>
+            </a:endParaRPr>
+          </a:p>
+        </p:txBody>
+      </p:sp>
     </p:spTree>
   </p:cSld>
   <p:clrMapOvr>

</xml_diff>

<commit_message>
working on slides for both presentations
</commit_message>
<xml_diff>
--- a/Decoupling Workflow With App Controler/Decoupling Workflow From Forms.pptx
+++ b/Decoupling Workflow With App Controler/Decoupling Workflow From Forms.pptx
@@ -274,7 +274,7 @@
               <a:pPr>
                 <a:defRPr/>
               </a:pPr>
-              <a:t>5/23/2009</a:t>
+              <a:t>5/28/2009</a:t>
             </a:fld>
             <a:endParaRPr lang="en-US"/>
           </a:p>
@@ -452,7 +452,7 @@
               <a:pPr>
                 <a:defRPr/>
               </a:pPr>
-              <a:t>5/23/2009</a:t>
+              <a:t>5/28/2009</a:t>
             </a:fld>
             <a:endParaRPr lang="en-US"/>
           </a:p>
@@ -8749,11 +8749,7 @@
             </a:pPr>
             <a:r>
               <a:rPr lang="en-US" sz="2000" dirty="0" smtClean="0"/>
-              <a:t>Add New </a:t>
-            </a:r>
-            <a:r>
-              <a:rPr lang="en-US" sz="2000" dirty="0" smtClean="0"/>
-              <a:t>Employee With </a:t>
+              <a:t>Add New Employee With </a:t>
             </a:r>
             <a:r>
               <a:rPr lang="en-US" sz="2000" dirty="0" err="1" smtClean="0"/>
@@ -9160,13 +9156,8 @@
             </a:pPr>
             <a:r>
               <a:rPr lang="en-US" sz="2000" dirty="0" smtClean="0"/>
-              <a:t>Add New </a:t>
+              <a:t>Add New Employee Command</a:t>
             </a:r>
-            <a:r>
-              <a:rPr lang="en-US" sz="2000" dirty="0" smtClean="0"/>
-              <a:t>Employee Command</a:t>
-            </a:r>
-            <a:endParaRPr lang="en-US" sz="2000" dirty="0" smtClean="0"/>
           </a:p>
         </p:txBody>
       </p:sp>
@@ -9466,7 +9457,6 @@
               <a:rPr lang="en-US" dirty="0" smtClean="0"/>
               <a:t>Pulling Dependencies Up</a:t>
             </a:r>
-            <a:endParaRPr lang="en-US" dirty="0" smtClean="0"/>
           </a:p>
         </p:txBody>
       </p:sp>
@@ -10827,7 +10817,6 @@
               <a:rPr lang="en-US" sz="2000" dirty="0" smtClean="0"/>
               <a:t>Publishing A Selected Employee</a:t>
             </a:r>
-            <a:endParaRPr lang="en-US" sz="2000" dirty="0" smtClean="0"/>
           </a:p>
         </p:txBody>
       </p:sp>
@@ -11301,7 +11290,6 @@
               <a:rPr lang="en-US" sz="2000" dirty="0" smtClean="0"/>
               <a:t>Passing Dependencies Down The Tree</a:t>
             </a:r>
-            <a:endParaRPr lang="en-US" sz="2000" dirty="0" smtClean="0"/>
           </a:p>
         </p:txBody>
       </p:sp>
@@ -11336,7 +11324,6 @@
               <a:rPr lang="en-US" dirty="0" smtClean="0"/>
               <a:t>Dependency Inversion Issues</a:t>
             </a:r>
-            <a:endParaRPr lang="en-US" dirty="0" smtClean="0"/>
           </a:p>
         </p:txBody>
       </p:sp>
@@ -12729,23 +12716,7 @@
             </a:pPr>
             <a:r>
               <a:rPr lang="en-US" sz="2000" dirty="0" smtClean="0"/>
-              <a:t>“The </a:t>
-            </a:r>
-            <a:r>
-              <a:rPr lang="en-US" sz="2000" dirty="0" smtClean="0"/>
-              <a:t>basic idea of </a:t>
-            </a:r>
-            <a:r>
-              <a:rPr lang="en-US" sz="2000" dirty="0" smtClean="0"/>
-              <a:t>… </a:t>
-            </a:r>
-            <a:r>
-              <a:rPr lang="en-US" sz="2000" dirty="0" smtClean="0"/>
-              <a:t>Dependency Injection is to have a separate object, an assembler, that populates a field … with an appropriate implementation for the … </a:t>
-            </a:r>
-            <a:r>
-              <a:rPr lang="en-US" sz="2000" dirty="0" smtClean="0"/>
-              <a:t>interface” – </a:t>
+              <a:t>“The basic idea of … Dependency Injection is to have a separate object, an assembler, that populates a field … with an appropriate implementation for the … interface” – </a:t>
             </a:r>
             <a:r>
               <a:rPr lang="en-US" sz="2000" dirty="0" smtClean="0">
@@ -12788,7 +12759,6 @@
               <a:rPr lang="en-US" dirty="0" smtClean="0"/>
               <a:t>Dependency Injection</a:t>
             </a:r>
-            <a:endParaRPr lang="en-US" dirty="0" smtClean="0"/>
           </a:p>
         </p:txBody>
       </p:sp>
@@ -20693,21 +20663,6 @@
 </file>
 
 <file path=customXml/item1.xml><?xml version="1.0" encoding="utf-8"?>
-<p:properties xmlns:p="http://schemas.microsoft.com/office/2006/metadata/properties" xmlns:xsi="http://www.w3.org/2001/XMLSchema-instance">
-  <documentManagement/>
-</p:properties>
-</file>
-
-<file path=customXml/item2.xml><?xml version="1.0" encoding="utf-8"?>
-<?mso-contentType ?>
-<FormTemplates xmlns="http://schemas.microsoft.com/sharepoint/v3/contenttype/forms">
-  <Display>DocumentLibraryForm</Display>
-  <Edit>DocumentLibraryForm</Edit>
-  <New>DocumentLibraryForm</New>
-</FormTemplates>
-</file>
-
-<file path=customXml/item3.xml><?xml version="1.0" encoding="utf-8"?>
 <ct:contentTypeSchema xmlns:ct="http://schemas.microsoft.com/office/2006/metadata/contentType" xmlns:ma="http://schemas.microsoft.com/office/2006/metadata/properties/metaAttributes" ct:_="" ma:_="" ma:contentTypeName="Document" ma:contentTypeID="0x0101005857B3975182FB47B67FAAA67052062C" ma:contentTypeVersion="0" ma:contentTypeDescription="Create a new document." ma:contentTypeScope="" ma:versionID="a1781edd533abf786dc62ee7dded643a">
   <xsd:schema xmlns:xsd="http://www.w3.org/2001/XMLSchema" xmlns:p="http://schemas.microsoft.com/office/2006/metadata/properties" targetNamespace="http://schemas.microsoft.com/office/2006/metadata/properties" ma:root="true" ma:fieldsID="4aeb20c0e3442673af7ee10786458764">
     <xsd:element name="properties">
@@ -20756,10 +20711,32 @@
 </ct:contentTypeSchema>
 </file>
 
+<file path=customXml/item2.xml><?xml version="1.0" encoding="utf-8"?>
+<?mso-contentType ?>
+<FormTemplates xmlns="http://schemas.microsoft.com/sharepoint/v3/contenttype/forms">
+  <Display>DocumentLibraryForm</Display>
+  <Edit>DocumentLibraryForm</Edit>
+  <New>DocumentLibraryForm</New>
+</FormTemplates>
+</file>
+
+<file path=customXml/item3.xml><?xml version="1.0" encoding="utf-8"?>
+<p:properties xmlns:p="http://schemas.microsoft.com/office/2006/metadata/properties" xmlns:xsi="http://www.w3.org/2001/XMLSchema-instance">
+  <documentManagement/>
+</p:properties>
+</file>
+
 <file path=customXml/itemProps1.xml><?xml version="1.0" encoding="utf-8"?>
-<ds:datastoreItem xmlns:ds="http://schemas.openxmlformats.org/officeDocument/2006/customXml" ds:itemID="{F8AADC7F-5DC4-46F2-A809-0679B041C012}">
+<ds:datastoreItem xmlns:ds="http://schemas.openxmlformats.org/officeDocument/2006/customXml" ds:itemID="{D3EBC05E-93E3-47EC-A4AA-B305F2941009}">
   <ds:schemaRefs>
+    <ds:schemaRef ds:uri="http://schemas.microsoft.com/office/2006/metadata/contentType"/>
+    <ds:schemaRef ds:uri="http://schemas.microsoft.com/office/2006/metadata/properties/metaAttributes"/>
+    <ds:schemaRef ds:uri="http://www.w3.org/2001/XMLSchema"/>
     <ds:schemaRef ds:uri="http://schemas.microsoft.com/office/2006/metadata/properties"/>
+    <ds:schemaRef ds:uri="http://schemas.openxmlformats.org/package/2006/metadata/core-properties"/>
+    <ds:schemaRef ds:uri="http://purl.org/dc/elements/1.1/"/>
+    <ds:schemaRef ds:uri="http://purl.org/dc/terms/"/>
+    <ds:schemaRef ds:uri="http://schemas.microsoft.com/office/internal/2005/internalDocumentation"/>
   </ds:schemaRefs>
 </ds:datastoreItem>
 </file>
@@ -20773,16 +20750,9 @@
 </file>
 
 <file path=customXml/itemProps3.xml><?xml version="1.0" encoding="utf-8"?>
-<ds:datastoreItem xmlns:ds="http://schemas.openxmlformats.org/officeDocument/2006/customXml" ds:itemID="{D3EBC05E-93E3-47EC-A4AA-B305F2941009}">
+<ds:datastoreItem xmlns:ds="http://schemas.openxmlformats.org/officeDocument/2006/customXml" ds:itemID="{F8AADC7F-5DC4-46F2-A809-0679B041C012}">
   <ds:schemaRefs>
-    <ds:schemaRef ds:uri="http://schemas.microsoft.com/office/2006/metadata/contentType"/>
-    <ds:schemaRef ds:uri="http://schemas.microsoft.com/office/2006/metadata/properties/metaAttributes"/>
-    <ds:schemaRef ds:uri="http://www.w3.org/2001/XMLSchema"/>
     <ds:schemaRef ds:uri="http://schemas.microsoft.com/office/2006/metadata/properties"/>
-    <ds:schemaRef ds:uri="http://schemas.openxmlformats.org/package/2006/metadata/core-properties"/>
-    <ds:schemaRef ds:uri="http://purl.org/dc/elements/1.1/"/>
-    <ds:schemaRef ds:uri="http://purl.org/dc/terms/"/>
-    <ds:schemaRef ds:uri="http://schemas.microsoft.com/office/internal/2005/internalDocumentation"/>
   </ds:schemaRefs>
 </ds:datastoreItem>
 </file>
</xml_diff>

<commit_message>
deleting extraneous slides, and a few erroneous ones
</commit_message>
<xml_diff>
--- a/Decoupling Workflow With App Controler/Decoupling Workflow From Forms.pptx
+++ b/Decoupling Workflow With App Controler/Decoupling Workflow From Forms.pptx
@@ -5,10 +5,10 @@
     <p:sldMasterId id="2147483822" r:id="rId4"/>
   </p:sldMasterIdLst>
   <p:notesMasterIdLst>
-    <p:notesMasterId r:id="rId37"/>
+    <p:notesMasterId r:id="rId35"/>
   </p:notesMasterIdLst>
   <p:handoutMasterIdLst>
-    <p:handoutMasterId r:id="rId38"/>
+    <p:handoutMasterId r:id="rId36"/>
   </p:handoutMasterIdLst>
   <p:sldIdLst>
     <p:sldId id="256" r:id="rId5"/>
@@ -31,28 +31,26 @@
     <p:sldId id="302" r:id="rId22"/>
     <p:sldId id="285" r:id="rId23"/>
     <p:sldId id="300" r:id="rId24"/>
-    <p:sldId id="305" r:id="rId25"/>
-    <p:sldId id="307" r:id="rId26"/>
-    <p:sldId id="297" r:id="rId27"/>
-    <p:sldId id="276" r:id="rId28"/>
-    <p:sldId id="277" r:id="rId29"/>
-    <p:sldId id="284" r:id="rId30"/>
-    <p:sldId id="308" r:id="rId31"/>
-    <p:sldId id="292" r:id="rId32"/>
-    <p:sldId id="294" r:id="rId33"/>
-    <p:sldId id="293" r:id="rId34"/>
-    <p:sldId id="259" r:id="rId35"/>
-    <p:sldId id="274" r:id="rId36"/>
+    <p:sldId id="297" r:id="rId25"/>
+    <p:sldId id="276" r:id="rId26"/>
+    <p:sldId id="277" r:id="rId27"/>
+    <p:sldId id="284" r:id="rId28"/>
+    <p:sldId id="308" r:id="rId29"/>
+    <p:sldId id="292" r:id="rId30"/>
+    <p:sldId id="294" r:id="rId31"/>
+    <p:sldId id="293" r:id="rId32"/>
+    <p:sldId id="259" r:id="rId33"/>
+    <p:sldId id="274" r:id="rId34"/>
   </p:sldIdLst>
   <p:sldSz cx="9144000" cy="6858000" type="screen4x3"/>
   <p:notesSz cx="7010400" cy="9296400"/>
   <p:embeddedFontLst>
     <p:embeddedFont>
       <p:font typeface="Calibri" pitchFamily="34" charset="0"/>
-      <p:regular r:id="rId39"/>
-      <p:bold r:id="rId40"/>
-      <p:italic r:id="rId41"/>
-      <p:boldItalic r:id="rId42"/>
+      <p:regular r:id="rId37"/>
+      <p:bold r:id="rId38"/>
+      <p:italic r:id="rId39"/>
+      <p:boldItalic r:id="rId40"/>
     </p:embeddedFont>
   </p:embeddedFontLst>
   <p:defaultTextStyle>
@@ -274,7 +272,7 @@
               <a:pPr>
                 <a:defRPr/>
               </a:pPr>
-              <a:t>5/28/2009</a:t>
+              <a:t>5/29/2009</a:t>
             </a:fld>
             <a:endParaRPr lang="en-US"/>
           </a:p>
@@ -452,7 +450,7 @@
               <a:pPr>
                 <a:defRPr/>
               </a:pPr>
-              <a:t>5/28/2009</a:t>
+              <a:t>5/29/2009</a:t>
             </a:fld>
             <a:endParaRPr lang="en-US"/>
           </a:p>
@@ -1525,7 +1523,7 @@
               <a:pPr>
                 <a:defRPr/>
               </a:pPr>
-              <a:t>22</a:t>
+              <a:t>23</a:t>
             </a:fld>
             <a:endParaRPr lang="en-US"/>
           </a:p>
@@ -1612,7 +1610,7 @@
               <a:pPr>
                 <a:defRPr/>
               </a:pPr>
-              <a:t>23</a:t>
+              <a:t>24</a:t>
             </a:fld>
             <a:endParaRPr lang="en-US"/>
           </a:p>
@@ -1873,7 +1871,7 @@
               <a:pPr>
                 <a:defRPr/>
               </a:pPr>
-              <a:t>26</a:t>
+              <a:t>27</a:t>
             </a:fld>
             <a:endParaRPr lang="en-US"/>
           </a:p>
@@ -1960,181 +1958,7 @@
               <a:pPr>
                 <a:defRPr/>
               </a:pPr>
-              <a:t>27</a:t>
-            </a:fld>
-            <a:endParaRPr lang="en-US"/>
-          </a:p>
-        </p:txBody>
-      </p:sp>
-    </p:spTree>
-  </p:cSld>
-  <p:clrMapOvr>
-    <a:masterClrMapping/>
-  </p:clrMapOvr>
-</p:notes>
-</file>
-
-<file path=ppt/notesSlides/notesSlide22.xml><?xml version="1.0" encoding="utf-8"?>
-<p:notes xmlns:a="http://schemas.openxmlformats.org/drawingml/2006/main" xmlns:r="http://schemas.openxmlformats.org/officeDocument/2006/relationships" xmlns:p="http://schemas.openxmlformats.org/presentationml/2006/main">
-  <p:cSld>
-    <p:spTree>
-      <p:nvGrpSpPr>
-        <p:cNvPr id="1" name=""/>
-        <p:cNvGrpSpPr/>
-        <p:nvPr/>
-      </p:nvGrpSpPr>
-      <p:grpSpPr>
-        <a:xfrm>
-          <a:off x="0" y="0"/>
-          <a:ext cx="0" cy="0"/>
-          <a:chOff x="0" y="0"/>
-          <a:chExt cx="0" cy="0"/>
-        </a:xfrm>
-      </p:grpSpPr>
-      <p:sp>
-        <p:nvSpPr>
-          <p:cNvPr id="2" name="Slide Image Placeholder 1"/>
-          <p:cNvSpPr>
-            <a:spLocks noGrp="1" noRot="1" noChangeAspect="1"/>
-          </p:cNvSpPr>
-          <p:nvPr>
-            <p:ph type="sldImg"/>
-          </p:nvPr>
-        </p:nvSpPr>
-        <p:spPr/>
-      </p:sp>
-      <p:sp>
-        <p:nvSpPr>
-          <p:cNvPr id="3" name="Notes Placeholder 2"/>
-          <p:cNvSpPr>
-            <a:spLocks noGrp="1"/>
-          </p:cNvSpPr>
-          <p:nvPr>
-            <p:ph type="body" idx="1"/>
-          </p:nvPr>
-        </p:nvSpPr>
-        <p:spPr/>
-        <p:txBody>
-          <a:bodyPr>
-            <a:normAutofit/>
-          </a:bodyPr>
-          <a:lstStyle/>
-          <a:p>
-            <a:endParaRPr lang="en-US" dirty="0"/>
-          </a:p>
-        </p:txBody>
-      </p:sp>
-      <p:sp>
-        <p:nvSpPr>
-          <p:cNvPr id="4" name="Slide Number Placeholder 3"/>
-          <p:cNvSpPr>
-            <a:spLocks noGrp="1"/>
-          </p:cNvSpPr>
-          <p:nvPr>
-            <p:ph type="sldNum" sz="quarter" idx="10"/>
-          </p:nvPr>
-        </p:nvSpPr>
-        <p:spPr/>
-        <p:txBody>
-          <a:bodyPr/>
-          <a:lstStyle/>
-          <a:p>
-            <a:pPr>
-              <a:defRPr/>
-            </a:pPr>
-            <a:fld id="{1931C8FD-CC35-423B-99F4-64D81D6A80AE}" type="slidenum">
-              <a:rPr lang="en-US" smtClean="0"/>
-              <a:pPr>
-                <a:defRPr/>
-              </a:pPr>
-              <a:t>29</a:t>
-            </a:fld>
-            <a:endParaRPr lang="en-US"/>
-          </a:p>
-        </p:txBody>
-      </p:sp>
-    </p:spTree>
-  </p:cSld>
-  <p:clrMapOvr>
-    <a:masterClrMapping/>
-  </p:clrMapOvr>
-</p:notes>
-</file>
-
-<file path=ppt/notesSlides/notesSlide23.xml><?xml version="1.0" encoding="utf-8"?>
-<p:notes xmlns:a="http://schemas.openxmlformats.org/drawingml/2006/main" xmlns:r="http://schemas.openxmlformats.org/officeDocument/2006/relationships" xmlns:p="http://schemas.openxmlformats.org/presentationml/2006/main">
-  <p:cSld>
-    <p:spTree>
-      <p:nvGrpSpPr>
-        <p:cNvPr id="1" name=""/>
-        <p:cNvGrpSpPr/>
-        <p:nvPr/>
-      </p:nvGrpSpPr>
-      <p:grpSpPr>
-        <a:xfrm>
-          <a:off x="0" y="0"/>
-          <a:ext cx="0" cy="0"/>
-          <a:chOff x="0" y="0"/>
-          <a:chExt cx="0" cy="0"/>
-        </a:xfrm>
-      </p:grpSpPr>
-      <p:sp>
-        <p:nvSpPr>
-          <p:cNvPr id="2" name="Slide Image Placeholder 1"/>
-          <p:cNvSpPr>
-            <a:spLocks noGrp="1" noRot="1" noChangeAspect="1"/>
-          </p:cNvSpPr>
-          <p:nvPr>
-            <p:ph type="sldImg"/>
-          </p:nvPr>
-        </p:nvSpPr>
-        <p:spPr/>
-      </p:sp>
-      <p:sp>
-        <p:nvSpPr>
-          <p:cNvPr id="3" name="Notes Placeholder 2"/>
-          <p:cNvSpPr>
-            <a:spLocks noGrp="1"/>
-          </p:cNvSpPr>
-          <p:nvPr>
-            <p:ph type="body" idx="1"/>
-          </p:nvPr>
-        </p:nvSpPr>
-        <p:spPr/>
-        <p:txBody>
-          <a:bodyPr>
-            <a:normAutofit/>
-          </a:bodyPr>
-          <a:lstStyle/>
-          <a:p>
-            <a:endParaRPr lang="en-US" dirty="0"/>
-          </a:p>
-        </p:txBody>
-      </p:sp>
-      <p:sp>
-        <p:nvSpPr>
-          <p:cNvPr id="4" name="Slide Number Placeholder 3"/>
-          <p:cNvSpPr>
-            <a:spLocks noGrp="1"/>
-          </p:cNvSpPr>
-          <p:nvPr>
-            <p:ph type="sldNum" sz="quarter" idx="10"/>
-          </p:nvPr>
-        </p:nvSpPr>
-        <p:spPr/>
-        <p:txBody>
-          <a:bodyPr/>
-          <a:lstStyle/>
-          <a:p>
-            <a:pPr>
-              <a:defRPr/>
-            </a:pPr>
-            <a:fld id="{1931C8FD-CC35-423B-99F4-64D81D6A80AE}" type="slidenum">
-              <a:rPr lang="en-US" smtClean="0"/>
-              <a:pPr>
-                <a:defRPr/>
-              </a:pPr>
-              <a:t>30</a:t>
+              <a:t>28</a:t>
             </a:fld>
             <a:endParaRPr lang="en-US"/>
           </a:p>
@@ -8749,670 +8573,6 @@
             </a:pPr>
             <a:r>
               <a:rPr lang="en-US" sz="2000" dirty="0" smtClean="0"/>
-              <a:t>Add New Employee With </a:t>
-            </a:r>
-            <a:r>
-              <a:rPr lang="en-US" sz="2000" dirty="0" err="1" smtClean="0"/>
-              <a:t>ICommand</a:t>
-            </a:r>
-            <a:endParaRPr lang="en-US" sz="2000" dirty="0" smtClean="0"/>
-          </a:p>
-        </p:txBody>
-      </p:sp>
-      <p:sp>
-        <p:nvSpPr>
-          <p:cNvPr id="3074" name="Title 1"/>
-          <p:cNvSpPr>
-            <a:spLocks noGrp="1"/>
-          </p:cNvSpPr>
-          <p:nvPr>
-            <p:ph type="title"/>
-          </p:nvPr>
-        </p:nvSpPr>
-        <p:spPr bwMode="auto">
-          <a:noFill/>
-          <a:ln>
-            <a:miter lim="800000"/>
-            <a:headEnd/>
-            <a:tailEnd/>
-          </a:ln>
-        </p:spPr>
-        <p:txBody>
-          <a:bodyPr vert="horz" wrap="square" lIns="91440" tIns="45720" rIns="91440" bIns="45720" numCol="1" anchor="t" anchorCtr="0" compatLnSpc="1">
-            <a:prstTxWarp prst="textNoShape">
-              <a:avLst/>
-            </a:prstTxWarp>
-          </a:bodyPr>
-          <a:lstStyle/>
-          <a:p>
-            <a:pPr eaLnBrk="1" hangingPunct="1"/>
-            <a:r>
-              <a:rPr lang="en-US" dirty="0" smtClean="0"/>
-              <a:t>Simple Org Chart – v2</a:t>
-            </a:r>
-          </a:p>
-        </p:txBody>
-      </p:sp>
-      <p:grpSp>
-        <p:nvGrpSpPr>
-          <p:cNvPr id="26" name="Group 25"/>
-          <p:cNvGrpSpPr/>
-          <p:nvPr/>
-        </p:nvGrpSpPr>
-        <p:grpSpPr>
-          <a:xfrm>
-            <a:off x="647700" y="2514600"/>
-            <a:ext cx="7848600" cy="2971800"/>
-            <a:chOff x="533400" y="1600200"/>
-            <a:chExt cx="7848600" cy="2971800"/>
-          </a:xfrm>
-        </p:grpSpPr>
-        <p:grpSp>
-          <p:nvGrpSpPr>
-            <p:cNvPr id="17" name="Group 16"/>
-            <p:cNvGrpSpPr/>
-            <p:nvPr/>
-          </p:nvGrpSpPr>
-          <p:grpSpPr>
-            <a:xfrm>
-              <a:off x="533400" y="1600200"/>
-              <a:ext cx="6181725" cy="2971800"/>
-              <a:chOff x="533400" y="1600200"/>
-              <a:chExt cx="6181725" cy="2971800"/>
-            </a:xfrm>
-          </p:grpSpPr>
-          <p:pic>
-            <p:nvPicPr>
-              <p:cNvPr id="5" name="Picture 2" descr="X:\Derick-GitHub\Presentation And Training Material\Decoupling Workflow With App Controler\doc\Org Chart View.png"/>
-              <p:cNvPicPr>
-                <a:picLocks noChangeAspect="1" noChangeArrowheads="1"/>
-              </p:cNvPicPr>
-              <p:nvPr/>
-            </p:nvPicPr>
-            <p:blipFill>
-              <a:blip r:embed="rId3"/>
-              <a:stretch>
-                <a:fillRect/>
-              </a:stretch>
-            </p:blipFill>
-            <p:spPr bwMode="auto">
-              <a:xfrm>
-                <a:off x="533400" y="1600200"/>
-                <a:ext cx="3146612" cy="2971800"/>
-              </a:xfrm>
-              <a:prstGeom prst="rect">
-                <a:avLst/>
-              </a:prstGeom>
-              <a:noFill/>
-              <a:ln>
-                <a:noFill/>
-              </a:ln>
-            </p:spPr>
-          </p:pic>
-          <p:cxnSp>
-            <p:nvCxnSpPr>
-              <p:cNvPr id="7" name="Straight Connector 6"/>
-              <p:cNvCxnSpPr/>
-              <p:nvPr/>
-            </p:nvCxnSpPr>
-            <p:spPr>
-              <a:xfrm rot="5400000" flipH="1" flipV="1">
-                <a:off x="1295400" y="3429000"/>
-                <a:ext cx="1066800" cy="457200"/>
-              </a:xfrm>
-              <a:prstGeom prst="line">
-                <a:avLst/>
-              </a:prstGeom>
-              <a:ln w="38100">
-                <a:solidFill>
-                  <a:schemeClr val="accent2"/>
-                </a:solidFill>
-              </a:ln>
-            </p:spPr>
-            <p:style>
-              <a:lnRef idx="1">
-                <a:schemeClr val="accent1"/>
-              </a:lnRef>
-              <a:fillRef idx="0">
-                <a:schemeClr val="accent1"/>
-              </a:fillRef>
-              <a:effectRef idx="0">
-                <a:schemeClr val="accent1"/>
-              </a:effectRef>
-              <a:fontRef idx="minor">
-                <a:schemeClr val="tx1"/>
-              </a:fontRef>
-            </p:style>
-          </p:cxnSp>
-          <p:cxnSp>
-            <p:nvCxnSpPr>
-              <p:cNvPr id="8" name="Straight Connector 7"/>
-              <p:cNvCxnSpPr/>
-              <p:nvPr/>
-            </p:nvCxnSpPr>
-            <p:spPr>
-              <a:xfrm rot="5400000" flipH="1" flipV="1">
-                <a:off x="1562100" y="3848100"/>
-                <a:ext cx="533400" cy="457200"/>
-              </a:xfrm>
-              <a:prstGeom prst="line">
-                <a:avLst/>
-              </a:prstGeom>
-              <a:ln w="38100">
-                <a:solidFill>
-                  <a:schemeClr val="accent2"/>
-                </a:solidFill>
-              </a:ln>
-            </p:spPr>
-            <p:style>
-              <a:lnRef idx="1">
-                <a:schemeClr val="accent1"/>
-              </a:lnRef>
-              <a:fillRef idx="0">
-                <a:schemeClr val="accent1"/>
-              </a:fillRef>
-              <a:effectRef idx="0">
-                <a:schemeClr val="accent1"/>
-              </a:effectRef>
-              <a:fontRef idx="minor">
-                <a:schemeClr val="tx1"/>
-              </a:fontRef>
-            </p:style>
-          </p:cxnSp>
-          <p:pic>
-            <p:nvPicPr>
-              <p:cNvPr id="1026" name="Picture 2"/>
-              <p:cNvPicPr>
-                <a:picLocks noChangeAspect="1" noChangeArrowheads="1"/>
-              </p:cNvPicPr>
-              <p:nvPr/>
-            </p:nvPicPr>
-            <p:blipFill>
-              <a:blip r:embed="rId4"/>
-              <a:srcRect/>
-              <a:stretch>
-                <a:fillRect/>
-              </a:stretch>
-            </p:blipFill>
-            <p:spPr bwMode="auto">
-              <a:xfrm>
-                <a:off x="2057400" y="3124200"/>
-                <a:ext cx="4657725" cy="666750"/>
-              </a:xfrm>
-              <a:prstGeom prst="rect">
-                <a:avLst/>
-              </a:prstGeom>
-              <a:noFill/>
-              <a:ln w="38100">
-                <a:solidFill>
-                  <a:schemeClr val="accent2"/>
-                </a:solidFill>
-                <a:miter lim="800000"/>
-                <a:headEnd/>
-                <a:tailEnd/>
-              </a:ln>
-              <a:effectLst/>
-            </p:spPr>
-          </p:pic>
-        </p:grpSp>
-        <p:grpSp>
-          <p:nvGrpSpPr>
-            <p:cNvPr id="16" name="Group 15"/>
-            <p:cNvGrpSpPr/>
-            <p:nvPr/>
-          </p:nvGrpSpPr>
-          <p:grpSpPr>
-            <a:xfrm>
-              <a:off x="4219575" y="1600200"/>
-              <a:ext cx="4162425" cy="1152525"/>
-              <a:chOff x="4267200" y="2590800"/>
-              <a:chExt cx="4162425" cy="1152525"/>
-            </a:xfrm>
-          </p:grpSpPr>
-          <p:sp>
-            <p:nvSpPr>
-              <p:cNvPr id="14" name="Rectangle 13"/>
-              <p:cNvSpPr/>
-              <p:nvPr/>
-            </p:nvSpPr>
-            <p:spPr>
-              <a:xfrm>
-                <a:off x="4267200" y="2590800"/>
-                <a:ext cx="1981200" cy="609600"/>
-              </a:xfrm>
-              <a:prstGeom prst="rect">
-                <a:avLst/>
-              </a:prstGeom>
-            </p:spPr>
-            <p:style>
-              <a:lnRef idx="2">
-                <a:schemeClr val="accent2">
-                  <a:shade val="50000"/>
-                </a:schemeClr>
-              </a:lnRef>
-              <a:fillRef idx="1">
-                <a:schemeClr val="accent2"/>
-              </a:fillRef>
-              <a:effectRef idx="0">
-                <a:schemeClr val="accent2"/>
-              </a:effectRef>
-              <a:fontRef idx="minor">
-                <a:schemeClr val="lt1"/>
-              </a:fontRef>
-            </p:style>
-            <p:txBody>
-              <a:bodyPr rtlCol="0" anchor="t" anchorCtr="0"/>
-              <a:lstStyle/>
-              <a:p>
-                <a:r>
-                  <a:rPr lang="en-US" sz="1400" dirty="0" err="1" smtClean="0"/>
-                  <a:t>OrgChartPresenter</a:t>
-                </a:r>
-                <a:endParaRPr lang="en-US" sz="1400" dirty="0"/>
-              </a:p>
-            </p:txBody>
-          </p:sp>
-          <p:pic>
-            <p:nvPicPr>
-              <p:cNvPr id="2050" name="Picture 2"/>
-              <p:cNvPicPr>
-                <a:picLocks noChangeAspect="1" noChangeArrowheads="1"/>
-              </p:cNvPicPr>
-              <p:nvPr/>
-            </p:nvPicPr>
-            <p:blipFill>
-              <a:blip r:embed="rId5"/>
-              <a:srcRect/>
-              <a:stretch>
-                <a:fillRect/>
-              </a:stretch>
-            </p:blipFill>
-            <p:spPr bwMode="auto">
-              <a:xfrm>
-                <a:off x="4495800" y="2895600"/>
-                <a:ext cx="3933825" cy="847725"/>
-              </a:xfrm>
-              <a:prstGeom prst="rect">
-                <a:avLst/>
-              </a:prstGeom>
-              <a:noFill/>
-              <a:ln w="38100">
-                <a:solidFill>
-                  <a:schemeClr val="accent2"/>
-                </a:solidFill>
-                <a:miter lim="800000"/>
-                <a:headEnd/>
-                <a:tailEnd/>
-              </a:ln>
-              <a:effectLst/>
-            </p:spPr>
-          </p:pic>
-          <p:sp>
-            <p:nvSpPr>
-              <p:cNvPr id="15" name="Rectangle 14"/>
-              <p:cNvSpPr/>
-              <p:nvPr/>
-            </p:nvSpPr>
-            <p:spPr>
-              <a:xfrm>
-                <a:off x="4648200" y="3200400"/>
-                <a:ext cx="3733800" cy="228600"/>
-              </a:xfrm>
-              <a:prstGeom prst="rect">
-                <a:avLst/>
-              </a:prstGeom>
-              <a:solidFill>
-                <a:srgbClr val="FFFF00">
-                  <a:alpha val="10196"/>
-                </a:srgbClr>
-              </a:solidFill>
-              <a:ln>
-                <a:solidFill>
-                  <a:srgbClr val="FFFF00"/>
-                </a:solidFill>
-              </a:ln>
-            </p:spPr>
-            <p:style>
-              <a:lnRef idx="2">
-                <a:schemeClr val="accent1">
-                  <a:shade val="50000"/>
-                </a:schemeClr>
-              </a:lnRef>
-              <a:fillRef idx="1">
-                <a:schemeClr val="accent1"/>
-              </a:fillRef>
-              <a:effectRef idx="0">
-                <a:schemeClr val="accent1"/>
-              </a:effectRef>
-              <a:fontRef idx="minor">
-                <a:schemeClr val="lt1"/>
-              </a:fontRef>
-            </p:style>
-            <p:txBody>
-              <a:bodyPr rtlCol="0" anchor="ctr"/>
-              <a:lstStyle/>
-              <a:p>
-                <a:pPr algn="ctr"/>
-                <a:endParaRPr lang="en-US"/>
-              </a:p>
-            </p:txBody>
-          </p:sp>
-        </p:grpSp>
-      </p:grpSp>
-    </p:spTree>
-  </p:cSld>
-  <p:clrMapOvr>
-    <a:masterClrMapping/>
-  </p:clrMapOvr>
-  <p:timing>
-    <p:tnLst>
-      <p:par>
-        <p:cTn id="1" dur="indefinite" restart="never" nodeType="tmRoot"/>
-      </p:par>
-    </p:tnLst>
-  </p:timing>
-</p:sld>
-</file>
-
-<file path=ppt/slides/slide22.xml><?xml version="1.0" encoding="utf-8"?>
-<p:sld xmlns:a="http://schemas.openxmlformats.org/drawingml/2006/main" xmlns:r="http://schemas.openxmlformats.org/officeDocument/2006/relationships" xmlns:p="http://schemas.openxmlformats.org/presentationml/2006/main">
-  <p:cSld>
-    <p:spTree>
-      <p:nvGrpSpPr>
-        <p:cNvPr id="1" name=""/>
-        <p:cNvGrpSpPr/>
-        <p:nvPr/>
-      </p:nvGrpSpPr>
-      <p:grpSpPr>
-        <a:xfrm>
-          <a:off x="0" y="0"/>
-          <a:ext cx="0" cy="0"/>
-          <a:chOff x="0" y="0"/>
-          <a:chExt cx="0" cy="0"/>
-        </a:xfrm>
-      </p:grpSpPr>
-      <p:sp>
-        <p:nvSpPr>
-          <p:cNvPr id="3075" name="Text Placeholder 2"/>
-          <p:cNvSpPr>
-            <a:spLocks noGrp="1"/>
-          </p:cNvSpPr>
-          <p:nvPr>
-            <p:ph type="body" sz="quarter" idx="10"/>
-          </p:nvPr>
-        </p:nvSpPr>
-        <p:spPr>
-          <a:xfrm>
-            <a:off x="685800" y="1066800"/>
-            <a:ext cx="8229600" cy="1219200"/>
-          </a:xfrm>
-        </p:spPr>
-        <p:txBody>
-          <a:bodyPr/>
-          <a:lstStyle/>
-          <a:p>
-            <a:pPr eaLnBrk="1" hangingPunct="1">
-              <a:buNone/>
-            </a:pPr>
-            <a:r>
-              <a:rPr lang="en-US" sz="2000" dirty="0" smtClean="0"/>
-              <a:t>Add New Employee Command</a:t>
-            </a:r>
-          </a:p>
-        </p:txBody>
-      </p:sp>
-      <p:sp>
-        <p:nvSpPr>
-          <p:cNvPr id="3074" name="Title 1"/>
-          <p:cNvSpPr>
-            <a:spLocks noGrp="1"/>
-          </p:cNvSpPr>
-          <p:nvPr>
-            <p:ph type="title"/>
-          </p:nvPr>
-        </p:nvSpPr>
-        <p:spPr bwMode="auto">
-          <a:noFill/>
-          <a:ln>
-            <a:miter lim="800000"/>
-            <a:headEnd/>
-            <a:tailEnd/>
-          </a:ln>
-        </p:spPr>
-        <p:txBody>
-          <a:bodyPr vert="horz" wrap="square" lIns="91440" tIns="45720" rIns="91440" bIns="45720" numCol="1" anchor="t" anchorCtr="0" compatLnSpc="1">
-            <a:prstTxWarp prst="textNoShape">
-              <a:avLst/>
-            </a:prstTxWarp>
-          </a:bodyPr>
-          <a:lstStyle/>
-          <a:p>
-            <a:pPr eaLnBrk="1" hangingPunct="1"/>
-            <a:r>
-              <a:rPr lang="en-US" dirty="0" smtClean="0"/>
-              <a:t>Simple Org Chart – v2</a:t>
-            </a:r>
-          </a:p>
-        </p:txBody>
-      </p:sp>
-      <p:grpSp>
-        <p:nvGrpSpPr>
-          <p:cNvPr id="14" name="Group 13"/>
-          <p:cNvGrpSpPr/>
-          <p:nvPr/>
-        </p:nvGrpSpPr>
-        <p:grpSpPr>
-          <a:xfrm>
-            <a:off x="552450" y="2244650"/>
-            <a:ext cx="8039100" cy="3317950"/>
-            <a:chOff x="381000" y="2790825"/>
-            <a:chExt cx="8039100" cy="3317950"/>
-          </a:xfrm>
-        </p:grpSpPr>
-        <p:grpSp>
-          <p:nvGrpSpPr>
-            <p:cNvPr id="10" name="Group 9"/>
-            <p:cNvGrpSpPr/>
-            <p:nvPr/>
-          </p:nvGrpSpPr>
-          <p:grpSpPr>
-            <a:xfrm>
-              <a:off x="381000" y="3048000"/>
-              <a:ext cx="5543550" cy="3060775"/>
-              <a:chOff x="742950" y="1752600"/>
-              <a:chExt cx="8039100" cy="4438650"/>
-            </a:xfrm>
-          </p:grpSpPr>
-          <p:pic>
-            <p:nvPicPr>
-              <p:cNvPr id="11" name="Picture 10" descr="X:\Derick-GitHub\Presentation And Training Material\Decoupling Workflow With App Controler\doc\New Employee - Info.png"/>
-              <p:cNvPicPr>
-                <a:picLocks noChangeAspect="1" noChangeArrowheads="1"/>
-              </p:cNvPicPr>
-              <p:nvPr/>
-            </p:nvPicPr>
-            <p:blipFill>
-              <a:blip r:embed="rId3"/>
-              <a:srcRect/>
-              <a:stretch>
-                <a:fillRect/>
-              </a:stretch>
-            </p:blipFill>
-            <p:spPr bwMode="auto">
-              <a:xfrm>
-                <a:off x="742950" y="1752600"/>
-                <a:ext cx="4286250" cy="2257425"/>
-              </a:xfrm>
-              <a:prstGeom prst="rect">
-                <a:avLst/>
-              </a:prstGeom>
-              <a:noFill/>
-            </p:spPr>
-          </p:pic>
-          <p:pic>
-            <p:nvPicPr>
-              <p:cNvPr id="12" name="Picture 11" descr="X:\Derick-GitHub\Presentation And Training Material\Decoupling Workflow With App Controler\doc\New Employee - Manager.png"/>
-              <p:cNvPicPr>
-                <a:picLocks noChangeAspect="1" noChangeArrowheads="1"/>
-              </p:cNvPicPr>
-              <p:nvPr/>
-            </p:nvPicPr>
-            <p:blipFill>
-              <a:blip r:embed="rId4"/>
-              <a:srcRect/>
-              <a:stretch>
-                <a:fillRect/>
-              </a:stretch>
-            </p:blipFill>
-            <p:spPr bwMode="auto">
-              <a:xfrm>
-                <a:off x="4495800" y="4419600"/>
-                <a:ext cx="4286250" cy="1771650"/>
-              </a:xfrm>
-              <a:prstGeom prst="rect">
-                <a:avLst/>
-              </a:prstGeom>
-              <a:noFill/>
-            </p:spPr>
-          </p:pic>
-          <p:sp>
-            <p:nvSpPr>
-              <p:cNvPr id="13" name="Arc 12"/>
-              <p:cNvSpPr/>
-              <p:nvPr/>
-            </p:nvSpPr>
-            <p:spPr>
-              <a:xfrm>
-                <a:off x="3581400" y="3505200"/>
-                <a:ext cx="2209800" cy="2209800"/>
-              </a:xfrm>
-              <a:prstGeom prst="arc">
-                <a:avLst>
-                  <a:gd name="adj1" fmla="val 16231089"/>
-                  <a:gd name="adj2" fmla="val 0"/>
-                </a:avLst>
-              </a:prstGeom>
-              <a:ln>
-                <a:tailEnd type="triangle"/>
-              </a:ln>
-            </p:spPr>
-            <p:style>
-              <a:lnRef idx="3">
-                <a:schemeClr val="accent2"/>
-              </a:lnRef>
-              <a:fillRef idx="0">
-                <a:schemeClr val="accent2"/>
-              </a:fillRef>
-              <a:effectRef idx="2">
-                <a:schemeClr val="accent2"/>
-              </a:effectRef>
-              <a:fontRef idx="minor">
-                <a:schemeClr val="tx1"/>
-              </a:fontRef>
-            </p:style>
-            <p:txBody>
-              <a:bodyPr rtlCol="0" anchor="ctr"/>
-              <a:lstStyle/>
-              <a:p>
-                <a:pPr algn="ctr"/>
-                <a:endParaRPr lang="en-US"/>
-              </a:p>
-            </p:txBody>
-          </p:sp>
-        </p:grpSp>
-        <p:pic>
-          <p:nvPicPr>
-            <p:cNvPr id="9" name="Picture 3"/>
-            <p:cNvPicPr>
-              <a:picLocks noChangeAspect="1" noChangeArrowheads="1"/>
-            </p:cNvPicPr>
-            <p:nvPr/>
-          </p:nvPicPr>
-          <p:blipFill>
-            <a:blip r:embed="rId5"/>
-            <a:srcRect/>
-            <a:stretch>
-              <a:fillRect/>
-            </a:stretch>
-          </p:blipFill>
-          <p:spPr bwMode="auto">
-            <a:xfrm>
-              <a:off x="3581400" y="2790825"/>
-              <a:ext cx="4838700" cy="1781175"/>
-            </a:xfrm>
-            <a:prstGeom prst="rect">
-              <a:avLst/>
-            </a:prstGeom>
-            <a:noFill/>
-            <a:ln w="38100">
-              <a:solidFill>
-                <a:schemeClr val="accent2"/>
-              </a:solidFill>
-              <a:miter lim="800000"/>
-              <a:headEnd/>
-              <a:tailEnd/>
-            </a:ln>
-            <a:effectLst/>
-          </p:spPr>
-        </p:pic>
-      </p:grpSp>
-    </p:spTree>
-  </p:cSld>
-  <p:clrMapOvr>
-    <a:masterClrMapping/>
-  </p:clrMapOvr>
-  <p:timing>
-    <p:tnLst>
-      <p:par>
-        <p:cTn id="1" dur="indefinite" restart="never" nodeType="tmRoot"/>
-      </p:par>
-    </p:tnLst>
-  </p:timing>
-</p:sld>
-</file>
-
-<file path=ppt/slides/slide23.xml><?xml version="1.0" encoding="utf-8"?>
-<p:sld xmlns:a="http://schemas.openxmlformats.org/drawingml/2006/main" xmlns:r="http://schemas.openxmlformats.org/officeDocument/2006/relationships" xmlns:p="http://schemas.openxmlformats.org/presentationml/2006/main">
-  <p:cSld>
-    <p:spTree>
-      <p:nvGrpSpPr>
-        <p:cNvPr id="1" name=""/>
-        <p:cNvGrpSpPr/>
-        <p:nvPr/>
-      </p:nvGrpSpPr>
-      <p:grpSpPr>
-        <a:xfrm>
-          <a:off x="0" y="0"/>
-          <a:ext cx="0" cy="0"/>
-          <a:chOff x="0" y="0"/>
-          <a:chExt cx="0" cy="0"/>
-        </a:xfrm>
-      </p:grpSpPr>
-      <p:sp>
-        <p:nvSpPr>
-          <p:cNvPr id="3075" name="Text Placeholder 2"/>
-          <p:cNvSpPr>
-            <a:spLocks noGrp="1"/>
-          </p:cNvSpPr>
-          <p:nvPr>
-            <p:ph type="body" sz="quarter" idx="10"/>
-          </p:nvPr>
-        </p:nvSpPr>
-        <p:spPr>
-          <a:xfrm>
-            <a:off x="685800" y="1066800"/>
-            <a:ext cx="8229600" cy="1219200"/>
-          </a:xfrm>
-        </p:spPr>
-        <p:txBody>
-          <a:bodyPr/>
-          <a:lstStyle/>
-          <a:p>
-            <a:pPr eaLnBrk="1" hangingPunct="1">
-              <a:buNone/>
-            </a:pPr>
-            <a:r>
-              <a:rPr lang="en-US" sz="2000" dirty="0" smtClean="0"/>
               <a:t>The Real World: Coupling Within </a:t>
             </a:r>
             <a:r>
@@ -9527,7 +8687,7 @@
 </p:sld>
 </file>
 
-<file path=ppt/slides/slide24.xml><?xml version="1.0" encoding="utf-8"?>
+<file path=ppt/slides/slide22.xml><?xml version="1.0" encoding="utf-8"?>
 <p:sld xmlns:a="http://schemas.openxmlformats.org/drawingml/2006/main" xmlns:r="http://schemas.openxmlformats.org/officeDocument/2006/relationships" xmlns:p="http://schemas.openxmlformats.org/presentationml/2006/main">
   <p:cSld>
     <p:spTree>
@@ -9858,7 +9018,7 @@
 </p:sld>
 </file>
 
-<file path=ppt/slides/slide25.xml><?xml version="1.0" encoding="utf-8"?>
+<file path=ppt/slides/slide23.xml><?xml version="1.0" encoding="utf-8"?>
 <p:sld xmlns:a="http://schemas.openxmlformats.org/drawingml/2006/main" xmlns:r="http://schemas.openxmlformats.org/officeDocument/2006/relationships" xmlns:p="http://schemas.openxmlformats.org/presentationml/2006/main">
   <p:cSld>
     <p:spTree>
@@ -10773,7 +9933,7 @@
 </p:sld>
 </file>
 
-<file path=ppt/slides/slide26.xml><?xml version="1.0" encoding="utf-8"?>
+<file path=ppt/slides/slide24.xml><?xml version="1.0" encoding="utf-8"?>
 <p:sld xmlns:a="http://schemas.openxmlformats.org/drawingml/2006/main" xmlns:r="http://schemas.openxmlformats.org/officeDocument/2006/relationships" xmlns:p="http://schemas.openxmlformats.org/presentationml/2006/main">
   <p:cSld>
     <p:spTree>
@@ -11246,7 +10406,7 @@
 </p:sld>
 </file>
 
-<file path=ppt/slides/slide27.xml><?xml version="1.0" encoding="utf-8"?>
+<file path=ppt/slides/slide25.xml><?xml version="1.0" encoding="utf-8"?>
 <p:sld xmlns:a="http://schemas.openxmlformats.org/drawingml/2006/main" xmlns:r="http://schemas.openxmlformats.org/officeDocument/2006/relationships" xmlns:p="http://schemas.openxmlformats.org/presentationml/2006/main">
   <p:cSld>
     <p:spTree>
@@ -11263,6 +10423,32 @@
           <a:chExt cx="0" cy="0"/>
         </a:xfrm>
       </p:grpSpPr>
+      <p:pic>
+        <p:nvPicPr>
+          <p:cNvPr id="1026" name="Picture 2" descr="C:\Users\derickb\AppData\Local\Microsoft\Windows\Temporary Internet Files\Content.IE5\AY104AXF\MPj04101270000[1].jpg"/>
+          <p:cNvPicPr>
+            <a:picLocks noChangeAspect="1" noChangeArrowheads="1"/>
+          </p:cNvPicPr>
+          <p:nvPr/>
+        </p:nvPicPr>
+        <p:blipFill>
+          <a:blip r:embed="rId3"/>
+          <a:srcRect/>
+          <a:stretch>
+            <a:fillRect/>
+          </a:stretch>
+        </p:blipFill>
+        <p:spPr bwMode="auto">
+          <a:xfrm>
+            <a:off x="6458173" y="976952"/>
+            <a:ext cx="2685827" cy="4038600"/>
+          </a:xfrm>
+          <a:prstGeom prst="roundRect">
+            <a:avLst/>
+          </a:prstGeom>
+          <a:noFill/>
+        </p:spPr>
+      </p:pic>
       <p:sp>
         <p:nvSpPr>
           <p:cNvPr id="3075" name="Text Placeholder 2"/>
@@ -12325,7 +11511,7 @@
 </p:sld>
 </file>
 
-<file path=ppt/slides/slide28.xml><?xml version="1.0" encoding="utf-8"?>
+<file path=ppt/slides/slide26.xml><?xml version="1.0" encoding="utf-8"?>
 <p:sld xmlns:a="http://schemas.openxmlformats.org/drawingml/2006/main" xmlns:r="http://schemas.openxmlformats.org/officeDocument/2006/relationships" xmlns:p="http://schemas.openxmlformats.org/presentationml/2006/main">
   <p:cSld>
     <p:spTree>
@@ -12674,7 +11860,7 @@
 </p:sld>
 </file>
 
-<file path=ppt/slides/slide29.xml><?xml version="1.0" encoding="utf-8"?>
+<file path=ppt/slides/slide27.xml><?xml version="1.0" encoding="utf-8"?>
 <p:sld xmlns:a="http://schemas.openxmlformats.org/drawingml/2006/main" xmlns:r="http://schemas.openxmlformats.org/officeDocument/2006/relationships" xmlns:p="http://schemas.openxmlformats.org/presentationml/2006/main">
   <p:cSld>
     <p:spTree>
@@ -13583,6 +12769,1890 @@
           </p:style>
         </p:cxnSp>
       </p:grpSp>
+    </p:spTree>
+  </p:cSld>
+  <p:clrMapOvr>
+    <a:masterClrMapping/>
+  </p:clrMapOvr>
+  <p:timing>
+    <p:tnLst>
+      <p:par>
+        <p:cTn id="1" dur="indefinite" restart="never" nodeType="tmRoot"/>
+      </p:par>
+    </p:tnLst>
+  </p:timing>
+</p:sld>
+</file>
+
+<file path=ppt/slides/slide28.xml><?xml version="1.0" encoding="utf-8"?>
+<p:sld xmlns:a="http://schemas.openxmlformats.org/drawingml/2006/main" xmlns:r="http://schemas.openxmlformats.org/officeDocument/2006/relationships" xmlns:p="http://schemas.openxmlformats.org/presentationml/2006/main">
+  <p:cSld>
+    <p:spTree>
+      <p:nvGrpSpPr>
+        <p:cNvPr id="1" name=""/>
+        <p:cNvGrpSpPr/>
+        <p:nvPr/>
+      </p:nvGrpSpPr>
+      <p:grpSpPr>
+        <a:xfrm>
+          <a:off x="0" y="0"/>
+          <a:ext cx="0" cy="0"/>
+          <a:chOff x="0" y="0"/>
+          <a:chExt cx="0" cy="0"/>
+        </a:xfrm>
+      </p:grpSpPr>
+      <p:sp>
+        <p:nvSpPr>
+          <p:cNvPr id="39" name="Rectangle 38"/>
+          <p:cNvSpPr/>
+          <p:nvPr/>
+        </p:nvSpPr>
+        <p:spPr>
+          <a:xfrm>
+            <a:off x="685800" y="4343400"/>
+            <a:ext cx="7772400" cy="1143000"/>
+          </a:xfrm>
+          <a:prstGeom prst="rect">
+            <a:avLst/>
+          </a:prstGeom>
+        </p:spPr>
+        <p:style>
+          <a:lnRef idx="2">
+            <a:schemeClr val="accent2">
+              <a:shade val="50000"/>
+            </a:schemeClr>
+          </a:lnRef>
+          <a:fillRef idx="1">
+            <a:schemeClr val="accent2"/>
+          </a:fillRef>
+          <a:effectRef idx="0">
+            <a:schemeClr val="accent2"/>
+          </a:effectRef>
+          <a:fontRef idx="minor">
+            <a:schemeClr val="lt1"/>
+          </a:fontRef>
+        </p:style>
+        <p:txBody>
+          <a:bodyPr rtlCol="0" anchor="ctr" anchorCtr="0"/>
+          <a:lstStyle/>
+          <a:p>
+            <a:pPr algn="ctr"/>
+            <a:r>
+              <a:rPr lang="en-US" dirty="0" smtClean="0"/>
+              <a:t>Application Controller</a:t>
+            </a:r>
+            <a:endParaRPr lang="en-US" dirty="0"/>
+          </a:p>
+        </p:txBody>
+      </p:sp>
+      <p:sp>
+        <p:nvSpPr>
+          <p:cNvPr id="57" name="Rectangle 56"/>
+          <p:cNvSpPr/>
+          <p:nvPr/>
+        </p:nvSpPr>
+        <p:spPr>
+          <a:xfrm>
+            <a:off x="762000" y="4343400"/>
+            <a:ext cx="3733800" cy="381000"/>
+          </a:xfrm>
+          <a:prstGeom prst="rect">
+            <a:avLst/>
+          </a:prstGeom>
+        </p:spPr>
+        <p:style>
+          <a:lnRef idx="2">
+            <a:schemeClr val="accent2">
+              <a:shade val="50000"/>
+            </a:schemeClr>
+          </a:lnRef>
+          <a:fillRef idx="1">
+            <a:schemeClr val="accent2"/>
+          </a:fillRef>
+          <a:effectRef idx="0">
+            <a:schemeClr val="accent2"/>
+          </a:effectRef>
+          <a:fontRef idx="minor">
+            <a:schemeClr val="lt1"/>
+          </a:fontRef>
+        </p:style>
+        <p:txBody>
+          <a:bodyPr rtlCol="0" anchor="ctr"/>
+          <a:lstStyle/>
+          <a:p>
+            <a:pPr algn="ctr"/>
+            <a:r>
+              <a:rPr lang="en-US" sz="1200" dirty="0" smtClean="0"/>
+              <a:t>Event Aggregator</a:t>
+            </a:r>
+            <a:endParaRPr lang="en-US" sz="1200" dirty="0"/>
+          </a:p>
+        </p:txBody>
+      </p:sp>
+      <p:sp>
+        <p:nvSpPr>
+          <p:cNvPr id="58" name="Rectangle 57"/>
+          <p:cNvSpPr/>
+          <p:nvPr/>
+        </p:nvSpPr>
+        <p:spPr>
+          <a:xfrm>
+            <a:off x="4648200" y="4343400"/>
+            <a:ext cx="3733800" cy="381000"/>
+          </a:xfrm>
+          <a:prstGeom prst="rect">
+            <a:avLst/>
+          </a:prstGeom>
+        </p:spPr>
+        <p:style>
+          <a:lnRef idx="2">
+            <a:schemeClr val="accent2">
+              <a:shade val="50000"/>
+            </a:schemeClr>
+          </a:lnRef>
+          <a:fillRef idx="1">
+            <a:schemeClr val="accent2"/>
+          </a:fillRef>
+          <a:effectRef idx="0">
+            <a:schemeClr val="accent2"/>
+          </a:effectRef>
+          <a:fontRef idx="minor">
+            <a:schemeClr val="lt1"/>
+          </a:fontRef>
+        </p:style>
+        <p:txBody>
+          <a:bodyPr rtlCol="0" anchor="ctr"/>
+          <a:lstStyle/>
+          <a:p>
+            <a:pPr algn="ctr"/>
+            <a:r>
+              <a:rPr lang="en-US" sz="1200" dirty="0" err="1" smtClean="0"/>
+              <a:t>ICommand</a:t>
+            </a:r>
+            <a:r>
+              <a:rPr lang="en-US" sz="1200" dirty="0" smtClean="0"/>
+              <a:t>&lt;T&gt;</a:t>
+            </a:r>
+            <a:endParaRPr lang="en-US" sz="1200" dirty="0"/>
+          </a:p>
+        </p:txBody>
+      </p:sp>
+      <p:sp>
+        <p:nvSpPr>
+          <p:cNvPr id="3075" name="Text Placeholder 2"/>
+          <p:cNvSpPr>
+            <a:spLocks noGrp="1"/>
+          </p:cNvSpPr>
+          <p:nvPr>
+            <p:ph type="body" sz="quarter" idx="10"/>
+          </p:nvPr>
+        </p:nvSpPr>
+        <p:spPr>
+          <a:xfrm>
+            <a:off x="685800" y="1066800"/>
+            <a:ext cx="8229600" cy="1219200"/>
+          </a:xfrm>
+        </p:spPr>
+        <p:txBody>
+          <a:bodyPr/>
+          <a:lstStyle/>
+          <a:p>
+            <a:pPr eaLnBrk="1" hangingPunct="1">
+              <a:buNone/>
+            </a:pPr>
+            <a:r>
+              <a:rPr lang="en-US" sz="2000" dirty="0" smtClean="0"/>
+              <a:t>“Some applications contain a significant amount of logic about the screens to use at different points, which may involve invoking certain screens at certain times in an application.” </a:t>
+            </a:r>
+          </a:p>
+        </p:txBody>
+      </p:sp>
+      <p:sp>
+        <p:nvSpPr>
+          <p:cNvPr id="3074" name="Title 1"/>
+          <p:cNvSpPr>
+            <a:spLocks noGrp="1"/>
+          </p:cNvSpPr>
+          <p:nvPr>
+            <p:ph type="title"/>
+          </p:nvPr>
+        </p:nvSpPr>
+        <p:spPr bwMode="auto">
+          <a:noFill/>
+          <a:ln>
+            <a:miter lim="800000"/>
+            <a:headEnd/>
+            <a:tailEnd/>
+          </a:ln>
+        </p:spPr>
+        <p:txBody>
+          <a:bodyPr vert="horz" wrap="square" lIns="91440" tIns="45720" rIns="91440" bIns="45720" numCol="1" anchor="t" anchorCtr="0" compatLnSpc="1">
+            <a:prstTxWarp prst="textNoShape">
+              <a:avLst/>
+            </a:prstTxWarp>
+          </a:bodyPr>
+          <a:lstStyle/>
+          <a:p>
+            <a:pPr eaLnBrk="1" hangingPunct="1"/>
+            <a:r>
+              <a:rPr lang="en-US" dirty="0" smtClean="0"/>
+              <a:t>Application Controller</a:t>
+            </a:r>
+          </a:p>
+        </p:txBody>
+      </p:sp>
+      <p:grpSp>
+        <p:nvGrpSpPr>
+          <p:cNvPr id="25" name="Group 24"/>
+          <p:cNvGrpSpPr/>
+          <p:nvPr/>
+        </p:nvGrpSpPr>
+        <p:grpSpPr>
+          <a:xfrm>
+            <a:off x="762000" y="2438400"/>
+            <a:ext cx="3733800" cy="1524000"/>
+            <a:chOff x="762000" y="3048000"/>
+            <a:chExt cx="3733800" cy="1524000"/>
+          </a:xfrm>
+        </p:grpSpPr>
+        <p:grpSp>
+          <p:nvGrpSpPr>
+            <p:cNvPr id="7" name="Group 6"/>
+            <p:cNvGrpSpPr/>
+            <p:nvPr/>
+          </p:nvGrpSpPr>
+          <p:grpSpPr>
+            <a:xfrm>
+              <a:off x="762000" y="3048000"/>
+              <a:ext cx="1828800" cy="762000"/>
+              <a:chOff x="762000" y="3048000"/>
+              <a:chExt cx="1828800" cy="762000"/>
+            </a:xfrm>
+          </p:grpSpPr>
+          <p:sp>
+            <p:nvSpPr>
+              <p:cNvPr id="4" name="Rectangle 3"/>
+              <p:cNvSpPr/>
+              <p:nvPr/>
+            </p:nvSpPr>
+            <p:spPr>
+              <a:xfrm>
+                <a:off x="762000" y="3048000"/>
+                <a:ext cx="914400" cy="381000"/>
+              </a:xfrm>
+              <a:prstGeom prst="rect">
+                <a:avLst/>
+              </a:prstGeom>
+            </p:spPr>
+            <p:style>
+              <a:lnRef idx="2">
+                <a:schemeClr val="accent1">
+                  <a:shade val="50000"/>
+                </a:schemeClr>
+              </a:lnRef>
+              <a:fillRef idx="1">
+                <a:schemeClr val="accent1"/>
+              </a:fillRef>
+              <a:effectRef idx="0">
+                <a:schemeClr val="accent1"/>
+              </a:effectRef>
+              <a:fontRef idx="minor">
+                <a:schemeClr val="lt1"/>
+              </a:fontRef>
+            </p:style>
+            <p:txBody>
+              <a:bodyPr rtlCol="0" anchor="ctr"/>
+              <a:lstStyle/>
+              <a:p>
+                <a:pPr algn="ctr"/>
+                <a:r>
+                  <a:rPr lang="en-US" sz="1200" dirty="0" smtClean="0"/>
+                  <a:t>Model</a:t>
+                </a:r>
+                <a:endParaRPr lang="en-US" sz="1200" dirty="0"/>
+              </a:p>
+            </p:txBody>
+          </p:sp>
+          <p:sp>
+            <p:nvSpPr>
+              <p:cNvPr id="5" name="Rectangle 4"/>
+              <p:cNvSpPr/>
+              <p:nvPr/>
+            </p:nvSpPr>
+            <p:spPr>
+              <a:xfrm>
+                <a:off x="1676400" y="3048000"/>
+                <a:ext cx="914400" cy="381000"/>
+              </a:xfrm>
+              <a:prstGeom prst="rect">
+                <a:avLst/>
+              </a:prstGeom>
+            </p:spPr>
+            <p:style>
+              <a:lnRef idx="2">
+                <a:schemeClr val="accent1">
+                  <a:shade val="50000"/>
+                </a:schemeClr>
+              </a:lnRef>
+              <a:fillRef idx="1">
+                <a:schemeClr val="accent1"/>
+              </a:fillRef>
+              <a:effectRef idx="0">
+                <a:schemeClr val="accent1"/>
+              </a:effectRef>
+              <a:fontRef idx="minor">
+                <a:schemeClr val="lt1"/>
+              </a:fontRef>
+            </p:style>
+            <p:txBody>
+              <a:bodyPr rtlCol="0" anchor="ctr"/>
+              <a:lstStyle/>
+              <a:p>
+                <a:pPr algn="ctr"/>
+                <a:r>
+                  <a:rPr lang="en-US" sz="1200" dirty="0" smtClean="0"/>
+                  <a:t>View</a:t>
+                </a:r>
+              </a:p>
+            </p:txBody>
+          </p:sp>
+          <p:sp>
+            <p:nvSpPr>
+              <p:cNvPr id="6" name="Rectangle 5"/>
+              <p:cNvSpPr/>
+              <p:nvPr/>
+            </p:nvSpPr>
+            <p:spPr>
+              <a:xfrm>
+                <a:off x="762000" y="3429000"/>
+                <a:ext cx="1828800" cy="381000"/>
+              </a:xfrm>
+              <a:prstGeom prst="rect">
+                <a:avLst/>
+              </a:prstGeom>
+            </p:spPr>
+            <p:style>
+              <a:lnRef idx="2">
+                <a:schemeClr val="accent1">
+                  <a:shade val="50000"/>
+                </a:schemeClr>
+              </a:lnRef>
+              <a:fillRef idx="1">
+                <a:schemeClr val="accent1"/>
+              </a:fillRef>
+              <a:effectRef idx="0">
+                <a:schemeClr val="accent1"/>
+              </a:effectRef>
+              <a:fontRef idx="minor">
+                <a:schemeClr val="lt1"/>
+              </a:fontRef>
+            </p:style>
+            <p:txBody>
+              <a:bodyPr rtlCol="0" anchor="ctr"/>
+              <a:lstStyle/>
+              <a:p>
+                <a:pPr algn="ctr"/>
+                <a:r>
+                  <a:rPr lang="en-US" sz="1200" dirty="0" smtClean="0"/>
+                  <a:t>Presenter</a:t>
+                </a:r>
+                <a:endParaRPr lang="en-US" sz="1200" dirty="0"/>
+              </a:p>
+            </p:txBody>
+          </p:sp>
+        </p:grpSp>
+        <p:grpSp>
+          <p:nvGrpSpPr>
+            <p:cNvPr id="8" name="Group 7"/>
+            <p:cNvGrpSpPr/>
+            <p:nvPr/>
+          </p:nvGrpSpPr>
+          <p:grpSpPr>
+            <a:xfrm>
+              <a:off x="2667000" y="3048000"/>
+              <a:ext cx="1828800" cy="762000"/>
+              <a:chOff x="762000" y="3048000"/>
+              <a:chExt cx="1828800" cy="762000"/>
+            </a:xfrm>
+          </p:grpSpPr>
+          <p:sp>
+            <p:nvSpPr>
+              <p:cNvPr id="9" name="Rectangle 8"/>
+              <p:cNvSpPr/>
+              <p:nvPr/>
+            </p:nvSpPr>
+            <p:spPr>
+              <a:xfrm>
+                <a:off x="762000" y="3048000"/>
+                <a:ext cx="914400" cy="381000"/>
+              </a:xfrm>
+              <a:prstGeom prst="rect">
+                <a:avLst/>
+              </a:prstGeom>
+            </p:spPr>
+            <p:style>
+              <a:lnRef idx="2">
+                <a:schemeClr val="accent1">
+                  <a:shade val="50000"/>
+                </a:schemeClr>
+              </a:lnRef>
+              <a:fillRef idx="1">
+                <a:schemeClr val="accent1"/>
+              </a:fillRef>
+              <a:effectRef idx="0">
+                <a:schemeClr val="accent1"/>
+              </a:effectRef>
+              <a:fontRef idx="minor">
+                <a:schemeClr val="lt1"/>
+              </a:fontRef>
+            </p:style>
+            <p:txBody>
+              <a:bodyPr rtlCol="0" anchor="ctr"/>
+              <a:lstStyle/>
+              <a:p>
+                <a:pPr algn="ctr"/>
+                <a:r>
+                  <a:rPr lang="en-US" sz="1200" dirty="0" smtClean="0"/>
+                  <a:t>Model</a:t>
+                </a:r>
+                <a:endParaRPr lang="en-US" sz="1200" dirty="0"/>
+              </a:p>
+            </p:txBody>
+          </p:sp>
+          <p:sp>
+            <p:nvSpPr>
+              <p:cNvPr id="10" name="Rectangle 9"/>
+              <p:cNvSpPr/>
+              <p:nvPr/>
+            </p:nvSpPr>
+            <p:spPr>
+              <a:xfrm>
+                <a:off x="1676400" y="3048000"/>
+                <a:ext cx="914400" cy="381000"/>
+              </a:xfrm>
+              <a:prstGeom prst="rect">
+                <a:avLst/>
+              </a:prstGeom>
+            </p:spPr>
+            <p:style>
+              <a:lnRef idx="2">
+                <a:schemeClr val="accent1">
+                  <a:shade val="50000"/>
+                </a:schemeClr>
+              </a:lnRef>
+              <a:fillRef idx="1">
+                <a:schemeClr val="accent1"/>
+              </a:fillRef>
+              <a:effectRef idx="0">
+                <a:schemeClr val="accent1"/>
+              </a:effectRef>
+              <a:fontRef idx="minor">
+                <a:schemeClr val="lt1"/>
+              </a:fontRef>
+            </p:style>
+            <p:txBody>
+              <a:bodyPr rtlCol="0" anchor="ctr"/>
+              <a:lstStyle/>
+              <a:p>
+                <a:pPr algn="ctr"/>
+                <a:r>
+                  <a:rPr lang="en-US" sz="1200" dirty="0" smtClean="0"/>
+                  <a:t>View</a:t>
+                </a:r>
+              </a:p>
+            </p:txBody>
+          </p:sp>
+          <p:sp>
+            <p:nvSpPr>
+              <p:cNvPr id="11" name="Rectangle 10"/>
+              <p:cNvSpPr/>
+              <p:nvPr/>
+            </p:nvSpPr>
+            <p:spPr>
+              <a:xfrm>
+                <a:off x="762000" y="3429000"/>
+                <a:ext cx="1828800" cy="381000"/>
+              </a:xfrm>
+              <a:prstGeom prst="rect">
+                <a:avLst/>
+              </a:prstGeom>
+            </p:spPr>
+            <p:style>
+              <a:lnRef idx="2">
+                <a:schemeClr val="accent1">
+                  <a:shade val="50000"/>
+                </a:schemeClr>
+              </a:lnRef>
+              <a:fillRef idx="1">
+                <a:schemeClr val="accent1"/>
+              </a:fillRef>
+              <a:effectRef idx="0">
+                <a:schemeClr val="accent1"/>
+              </a:effectRef>
+              <a:fontRef idx="minor">
+                <a:schemeClr val="lt1"/>
+              </a:fontRef>
+            </p:style>
+            <p:txBody>
+              <a:bodyPr rtlCol="0" anchor="ctr"/>
+              <a:lstStyle/>
+              <a:p>
+                <a:pPr algn="ctr"/>
+                <a:r>
+                  <a:rPr lang="en-US" sz="1200" dirty="0" smtClean="0"/>
+                  <a:t>Presenter</a:t>
+                </a:r>
+                <a:endParaRPr lang="en-US" sz="1200" dirty="0"/>
+              </a:p>
+            </p:txBody>
+          </p:sp>
+        </p:grpSp>
+        <p:sp>
+          <p:nvSpPr>
+            <p:cNvPr id="16" name="Rectangle 15"/>
+            <p:cNvSpPr/>
+            <p:nvPr/>
+          </p:nvSpPr>
+          <p:spPr>
+            <a:xfrm>
+              <a:off x="762000" y="4191000"/>
+              <a:ext cx="3733800" cy="381000"/>
+            </a:xfrm>
+            <a:prstGeom prst="rect">
+              <a:avLst/>
+            </a:prstGeom>
+          </p:spPr>
+          <p:style>
+            <a:lnRef idx="2">
+              <a:schemeClr val="accent1">
+                <a:shade val="50000"/>
+              </a:schemeClr>
+            </a:lnRef>
+            <a:fillRef idx="1">
+              <a:schemeClr val="accent1"/>
+            </a:fillRef>
+            <a:effectRef idx="0">
+              <a:schemeClr val="accent1"/>
+            </a:effectRef>
+            <a:fontRef idx="minor">
+              <a:schemeClr val="lt1"/>
+            </a:fontRef>
+          </p:style>
+          <p:txBody>
+            <a:bodyPr rtlCol="0" anchor="ctr"/>
+            <a:lstStyle/>
+            <a:p>
+              <a:pPr algn="ctr"/>
+              <a:r>
+                <a:rPr lang="en-US" sz="1200" dirty="0" smtClean="0"/>
+                <a:t>Workflow Service</a:t>
+              </a:r>
+              <a:endParaRPr lang="en-US" sz="1200" dirty="0"/>
+            </a:p>
+          </p:txBody>
+        </p:sp>
+        <p:cxnSp>
+          <p:nvCxnSpPr>
+            <p:cNvPr id="20" name="Straight Arrow Connector 19"/>
+            <p:cNvCxnSpPr>
+              <a:stCxn id="6" idx="2"/>
+            </p:cNvCxnSpPr>
+            <p:nvPr/>
+          </p:nvCxnSpPr>
+          <p:spPr>
+            <a:xfrm rot="5400000">
+              <a:off x="1485900" y="4000500"/>
+              <a:ext cx="381000" cy="1588"/>
+            </a:xfrm>
+            <a:prstGeom prst="straightConnector1">
+              <a:avLst/>
+            </a:prstGeom>
+            <a:ln w="38100">
+              <a:tailEnd type="arrow"/>
+            </a:ln>
+          </p:spPr>
+          <p:style>
+            <a:lnRef idx="1">
+              <a:schemeClr val="accent1"/>
+            </a:lnRef>
+            <a:fillRef idx="0">
+              <a:schemeClr val="accent1"/>
+            </a:fillRef>
+            <a:effectRef idx="0">
+              <a:schemeClr val="accent1"/>
+            </a:effectRef>
+            <a:fontRef idx="minor">
+              <a:schemeClr val="tx1"/>
+            </a:fontRef>
+          </p:style>
+        </p:cxnSp>
+        <p:cxnSp>
+          <p:nvCxnSpPr>
+            <p:cNvPr id="23" name="Straight Arrow Connector 22"/>
+            <p:cNvCxnSpPr>
+              <a:stCxn id="11" idx="2"/>
+            </p:cNvCxnSpPr>
+            <p:nvPr/>
+          </p:nvCxnSpPr>
+          <p:spPr>
+            <a:xfrm rot="5400000">
+              <a:off x="3390900" y="4000500"/>
+              <a:ext cx="381000" cy="1588"/>
+            </a:xfrm>
+            <a:prstGeom prst="straightConnector1">
+              <a:avLst/>
+            </a:prstGeom>
+            <a:ln w="38100">
+              <a:tailEnd type="arrow"/>
+            </a:ln>
+          </p:spPr>
+          <p:style>
+            <a:lnRef idx="1">
+              <a:schemeClr val="accent1"/>
+            </a:lnRef>
+            <a:fillRef idx="0">
+              <a:schemeClr val="accent1"/>
+            </a:fillRef>
+            <a:effectRef idx="0">
+              <a:schemeClr val="accent1"/>
+            </a:effectRef>
+            <a:fontRef idx="minor">
+              <a:schemeClr val="tx1"/>
+            </a:fontRef>
+          </p:style>
+        </p:cxnSp>
+      </p:grpSp>
+      <p:grpSp>
+        <p:nvGrpSpPr>
+          <p:cNvPr id="26" name="Group 25"/>
+          <p:cNvGrpSpPr/>
+          <p:nvPr/>
+        </p:nvGrpSpPr>
+        <p:grpSpPr>
+          <a:xfrm>
+            <a:off x="4648200" y="2438400"/>
+            <a:ext cx="3733800" cy="1524000"/>
+            <a:chOff x="762000" y="3048000"/>
+            <a:chExt cx="3733800" cy="1524000"/>
+          </a:xfrm>
+        </p:grpSpPr>
+        <p:grpSp>
+          <p:nvGrpSpPr>
+            <p:cNvPr id="27" name="Group 6"/>
+            <p:cNvGrpSpPr/>
+            <p:nvPr/>
+          </p:nvGrpSpPr>
+          <p:grpSpPr>
+            <a:xfrm>
+              <a:off x="762000" y="3048000"/>
+              <a:ext cx="1828800" cy="762000"/>
+              <a:chOff x="762000" y="3048000"/>
+              <a:chExt cx="1828800" cy="762000"/>
+            </a:xfrm>
+          </p:grpSpPr>
+          <p:sp>
+            <p:nvSpPr>
+              <p:cNvPr id="35" name="Rectangle 3"/>
+              <p:cNvSpPr/>
+              <p:nvPr/>
+            </p:nvSpPr>
+            <p:spPr>
+              <a:xfrm>
+                <a:off x="762000" y="3048000"/>
+                <a:ext cx="914400" cy="381000"/>
+              </a:xfrm>
+              <a:prstGeom prst="rect">
+                <a:avLst/>
+              </a:prstGeom>
+            </p:spPr>
+            <p:style>
+              <a:lnRef idx="2">
+                <a:schemeClr val="accent1">
+                  <a:shade val="50000"/>
+                </a:schemeClr>
+              </a:lnRef>
+              <a:fillRef idx="1">
+                <a:schemeClr val="accent1"/>
+              </a:fillRef>
+              <a:effectRef idx="0">
+                <a:schemeClr val="accent1"/>
+              </a:effectRef>
+              <a:fontRef idx="minor">
+                <a:schemeClr val="lt1"/>
+              </a:fontRef>
+            </p:style>
+            <p:txBody>
+              <a:bodyPr rtlCol="0" anchor="ctr"/>
+              <a:lstStyle/>
+              <a:p>
+                <a:pPr algn="ctr"/>
+                <a:r>
+                  <a:rPr lang="en-US" sz="1200" dirty="0" smtClean="0"/>
+                  <a:t>Model</a:t>
+                </a:r>
+                <a:endParaRPr lang="en-US" sz="1200" dirty="0"/>
+              </a:p>
+            </p:txBody>
+          </p:sp>
+          <p:sp>
+            <p:nvSpPr>
+              <p:cNvPr id="36" name="Rectangle 35"/>
+              <p:cNvSpPr/>
+              <p:nvPr/>
+            </p:nvSpPr>
+            <p:spPr>
+              <a:xfrm>
+                <a:off x="1676400" y="3048000"/>
+                <a:ext cx="914400" cy="381000"/>
+              </a:xfrm>
+              <a:prstGeom prst="rect">
+                <a:avLst/>
+              </a:prstGeom>
+            </p:spPr>
+            <p:style>
+              <a:lnRef idx="2">
+                <a:schemeClr val="accent1">
+                  <a:shade val="50000"/>
+                </a:schemeClr>
+              </a:lnRef>
+              <a:fillRef idx="1">
+                <a:schemeClr val="accent1"/>
+              </a:fillRef>
+              <a:effectRef idx="0">
+                <a:schemeClr val="accent1"/>
+              </a:effectRef>
+              <a:fontRef idx="minor">
+                <a:schemeClr val="lt1"/>
+              </a:fontRef>
+            </p:style>
+            <p:txBody>
+              <a:bodyPr rtlCol="0" anchor="ctr"/>
+              <a:lstStyle/>
+              <a:p>
+                <a:pPr algn="ctr"/>
+                <a:r>
+                  <a:rPr lang="en-US" sz="1200" dirty="0" smtClean="0"/>
+                  <a:t>View</a:t>
+                </a:r>
+              </a:p>
+            </p:txBody>
+          </p:sp>
+          <p:sp>
+            <p:nvSpPr>
+              <p:cNvPr id="37" name="Rectangle 36"/>
+              <p:cNvSpPr/>
+              <p:nvPr/>
+            </p:nvSpPr>
+            <p:spPr>
+              <a:xfrm>
+                <a:off x="762000" y="3429000"/>
+                <a:ext cx="1828800" cy="381000"/>
+              </a:xfrm>
+              <a:prstGeom prst="rect">
+                <a:avLst/>
+              </a:prstGeom>
+            </p:spPr>
+            <p:style>
+              <a:lnRef idx="2">
+                <a:schemeClr val="accent1">
+                  <a:shade val="50000"/>
+                </a:schemeClr>
+              </a:lnRef>
+              <a:fillRef idx="1">
+                <a:schemeClr val="accent1"/>
+              </a:fillRef>
+              <a:effectRef idx="0">
+                <a:schemeClr val="accent1"/>
+              </a:effectRef>
+              <a:fontRef idx="minor">
+                <a:schemeClr val="lt1"/>
+              </a:fontRef>
+            </p:style>
+            <p:txBody>
+              <a:bodyPr rtlCol="0" anchor="ctr"/>
+              <a:lstStyle/>
+              <a:p>
+                <a:pPr algn="ctr"/>
+                <a:r>
+                  <a:rPr lang="en-US" sz="1200" dirty="0" smtClean="0"/>
+                  <a:t>Presenter</a:t>
+                </a:r>
+                <a:endParaRPr lang="en-US" sz="1200" dirty="0"/>
+              </a:p>
+            </p:txBody>
+          </p:sp>
+        </p:grpSp>
+        <p:grpSp>
+          <p:nvGrpSpPr>
+            <p:cNvPr id="28" name="Group 7"/>
+            <p:cNvGrpSpPr/>
+            <p:nvPr/>
+          </p:nvGrpSpPr>
+          <p:grpSpPr>
+            <a:xfrm>
+              <a:off x="2667000" y="3048000"/>
+              <a:ext cx="1828800" cy="762000"/>
+              <a:chOff x="762000" y="3048000"/>
+              <a:chExt cx="1828800" cy="762000"/>
+            </a:xfrm>
+          </p:grpSpPr>
+          <p:sp>
+            <p:nvSpPr>
+              <p:cNvPr id="32" name="Rectangle 31"/>
+              <p:cNvSpPr/>
+              <p:nvPr/>
+            </p:nvSpPr>
+            <p:spPr>
+              <a:xfrm>
+                <a:off x="762000" y="3048000"/>
+                <a:ext cx="914400" cy="381000"/>
+              </a:xfrm>
+              <a:prstGeom prst="rect">
+                <a:avLst/>
+              </a:prstGeom>
+            </p:spPr>
+            <p:style>
+              <a:lnRef idx="2">
+                <a:schemeClr val="accent1">
+                  <a:shade val="50000"/>
+                </a:schemeClr>
+              </a:lnRef>
+              <a:fillRef idx="1">
+                <a:schemeClr val="accent1"/>
+              </a:fillRef>
+              <a:effectRef idx="0">
+                <a:schemeClr val="accent1"/>
+              </a:effectRef>
+              <a:fontRef idx="minor">
+                <a:schemeClr val="lt1"/>
+              </a:fontRef>
+            </p:style>
+            <p:txBody>
+              <a:bodyPr rtlCol="0" anchor="ctr"/>
+              <a:lstStyle/>
+              <a:p>
+                <a:pPr algn="ctr"/>
+                <a:r>
+                  <a:rPr lang="en-US" sz="1200" dirty="0" smtClean="0"/>
+                  <a:t>Model</a:t>
+                </a:r>
+                <a:endParaRPr lang="en-US" sz="1200" dirty="0"/>
+              </a:p>
+            </p:txBody>
+          </p:sp>
+          <p:sp>
+            <p:nvSpPr>
+              <p:cNvPr id="33" name="Rectangle 32"/>
+              <p:cNvSpPr/>
+              <p:nvPr/>
+            </p:nvSpPr>
+            <p:spPr>
+              <a:xfrm>
+                <a:off x="1676400" y="3048000"/>
+                <a:ext cx="914400" cy="381000"/>
+              </a:xfrm>
+              <a:prstGeom prst="rect">
+                <a:avLst/>
+              </a:prstGeom>
+            </p:spPr>
+            <p:style>
+              <a:lnRef idx="2">
+                <a:schemeClr val="accent1">
+                  <a:shade val="50000"/>
+                </a:schemeClr>
+              </a:lnRef>
+              <a:fillRef idx="1">
+                <a:schemeClr val="accent1"/>
+              </a:fillRef>
+              <a:effectRef idx="0">
+                <a:schemeClr val="accent1"/>
+              </a:effectRef>
+              <a:fontRef idx="minor">
+                <a:schemeClr val="lt1"/>
+              </a:fontRef>
+            </p:style>
+            <p:txBody>
+              <a:bodyPr rtlCol="0" anchor="ctr"/>
+              <a:lstStyle/>
+              <a:p>
+                <a:pPr algn="ctr"/>
+                <a:r>
+                  <a:rPr lang="en-US" sz="1200" dirty="0" smtClean="0"/>
+                  <a:t>View</a:t>
+                </a:r>
+              </a:p>
+            </p:txBody>
+          </p:sp>
+          <p:sp>
+            <p:nvSpPr>
+              <p:cNvPr id="34" name="Rectangle 33"/>
+              <p:cNvSpPr/>
+              <p:nvPr/>
+            </p:nvSpPr>
+            <p:spPr>
+              <a:xfrm>
+                <a:off x="762000" y="3429000"/>
+                <a:ext cx="1828800" cy="381000"/>
+              </a:xfrm>
+              <a:prstGeom prst="rect">
+                <a:avLst/>
+              </a:prstGeom>
+            </p:spPr>
+            <p:style>
+              <a:lnRef idx="2">
+                <a:schemeClr val="accent1">
+                  <a:shade val="50000"/>
+                </a:schemeClr>
+              </a:lnRef>
+              <a:fillRef idx="1">
+                <a:schemeClr val="accent1"/>
+              </a:fillRef>
+              <a:effectRef idx="0">
+                <a:schemeClr val="accent1"/>
+              </a:effectRef>
+              <a:fontRef idx="minor">
+                <a:schemeClr val="lt1"/>
+              </a:fontRef>
+            </p:style>
+            <p:txBody>
+              <a:bodyPr rtlCol="0" anchor="ctr"/>
+              <a:lstStyle/>
+              <a:p>
+                <a:pPr algn="ctr"/>
+                <a:r>
+                  <a:rPr lang="en-US" sz="1200" dirty="0" smtClean="0"/>
+                  <a:t>Presenter</a:t>
+                </a:r>
+                <a:endParaRPr lang="en-US" sz="1200" dirty="0"/>
+              </a:p>
+            </p:txBody>
+          </p:sp>
+        </p:grpSp>
+        <p:sp>
+          <p:nvSpPr>
+            <p:cNvPr id="29" name="Rectangle 28"/>
+            <p:cNvSpPr/>
+            <p:nvPr/>
+          </p:nvSpPr>
+          <p:spPr>
+            <a:xfrm>
+              <a:off x="762000" y="4191000"/>
+              <a:ext cx="3733800" cy="381000"/>
+            </a:xfrm>
+            <a:prstGeom prst="rect">
+              <a:avLst/>
+            </a:prstGeom>
+          </p:spPr>
+          <p:style>
+            <a:lnRef idx="2">
+              <a:schemeClr val="accent1">
+                <a:shade val="50000"/>
+              </a:schemeClr>
+            </a:lnRef>
+            <a:fillRef idx="1">
+              <a:schemeClr val="accent1"/>
+            </a:fillRef>
+            <a:effectRef idx="0">
+              <a:schemeClr val="accent1"/>
+            </a:effectRef>
+            <a:fontRef idx="minor">
+              <a:schemeClr val="lt1"/>
+            </a:fontRef>
+          </p:style>
+          <p:txBody>
+            <a:bodyPr rtlCol="0" anchor="ctr"/>
+            <a:lstStyle/>
+            <a:p>
+              <a:pPr algn="ctr"/>
+              <a:r>
+                <a:rPr lang="en-US" sz="1200" dirty="0" smtClean="0"/>
+                <a:t>Workflow Service</a:t>
+              </a:r>
+              <a:endParaRPr lang="en-US" sz="1200" dirty="0"/>
+            </a:p>
+          </p:txBody>
+        </p:sp>
+        <p:cxnSp>
+          <p:nvCxnSpPr>
+            <p:cNvPr id="30" name="Straight Arrow Connector 29"/>
+            <p:cNvCxnSpPr>
+              <a:stCxn id="37" idx="2"/>
+            </p:cNvCxnSpPr>
+            <p:nvPr/>
+          </p:nvCxnSpPr>
+          <p:spPr>
+            <a:xfrm rot="5400000">
+              <a:off x="1485900" y="4000500"/>
+              <a:ext cx="381000" cy="1588"/>
+            </a:xfrm>
+            <a:prstGeom prst="straightConnector1">
+              <a:avLst/>
+            </a:prstGeom>
+            <a:ln w="38100">
+              <a:tailEnd type="arrow"/>
+            </a:ln>
+          </p:spPr>
+          <p:style>
+            <a:lnRef idx="1">
+              <a:schemeClr val="accent1"/>
+            </a:lnRef>
+            <a:fillRef idx="0">
+              <a:schemeClr val="accent1"/>
+            </a:fillRef>
+            <a:effectRef idx="0">
+              <a:schemeClr val="accent1"/>
+            </a:effectRef>
+            <a:fontRef idx="minor">
+              <a:schemeClr val="tx1"/>
+            </a:fontRef>
+          </p:style>
+        </p:cxnSp>
+        <p:cxnSp>
+          <p:nvCxnSpPr>
+            <p:cNvPr id="31" name="Straight Arrow Connector 30"/>
+            <p:cNvCxnSpPr>
+              <a:stCxn id="34" idx="2"/>
+            </p:cNvCxnSpPr>
+            <p:nvPr/>
+          </p:nvCxnSpPr>
+          <p:spPr>
+            <a:xfrm rot="5400000">
+              <a:off x="3390900" y="4000500"/>
+              <a:ext cx="381000" cy="1588"/>
+            </a:xfrm>
+            <a:prstGeom prst="straightConnector1">
+              <a:avLst/>
+            </a:prstGeom>
+            <a:ln w="38100">
+              <a:tailEnd type="arrow"/>
+            </a:ln>
+          </p:spPr>
+          <p:style>
+            <a:lnRef idx="1">
+              <a:schemeClr val="accent1"/>
+            </a:lnRef>
+            <a:fillRef idx="0">
+              <a:schemeClr val="accent1"/>
+            </a:fillRef>
+            <a:effectRef idx="0">
+              <a:schemeClr val="accent1"/>
+            </a:effectRef>
+            <a:fontRef idx="minor">
+              <a:schemeClr val="tx1"/>
+            </a:fontRef>
+          </p:style>
+        </p:cxnSp>
+      </p:grpSp>
+      <p:cxnSp>
+        <p:nvCxnSpPr>
+          <p:cNvPr id="40" name="Straight Arrow Connector 39"/>
+          <p:cNvCxnSpPr/>
+          <p:nvPr/>
+        </p:nvCxnSpPr>
+        <p:spPr>
+          <a:xfrm rot="5400000">
+            <a:off x="723105" y="3771106"/>
+            <a:ext cx="1143000" cy="1588"/>
+          </a:xfrm>
+          <a:prstGeom prst="straightConnector1">
+            <a:avLst/>
+          </a:prstGeom>
+          <a:ln w="38100">
+            <a:solidFill>
+              <a:schemeClr val="accent2"/>
+            </a:solidFill>
+            <a:tailEnd type="arrow"/>
+          </a:ln>
+        </p:spPr>
+        <p:style>
+          <a:lnRef idx="1">
+            <a:schemeClr val="accent1"/>
+          </a:lnRef>
+          <a:fillRef idx="0">
+            <a:schemeClr val="accent1"/>
+          </a:fillRef>
+          <a:effectRef idx="0">
+            <a:schemeClr val="accent1"/>
+          </a:effectRef>
+          <a:fontRef idx="minor">
+            <a:schemeClr val="tx1"/>
+          </a:fontRef>
+        </p:style>
+      </p:cxnSp>
+      <p:cxnSp>
+        <p:nvCxnSpPr>
+          <p:cNvPr id="44" name="Straight Arrow Connector 43"/>
+          <p:cNvCxnSpPr/>
+          <p:nvPr/>
+        </p:nvCxnSpPr>
+        <p:spPr>
+          <a:xfrm rot="5400000">
+            <a:off x="3390105" y="3771106"/>
+            <a:ext cx="1143000" cy="1588"/>
+          </a:xfrm>
+          <a:prstGeom prst="straightConnector1">
+            <a:avLst/>
+          </a:prstGeom>
+          <a:ln w="38100">
+            <a:solidFill>
+              <a:schemeClr val="accent2"/>
+            </a:solidFill>
+            <a:tailEnd type="arrow"/>
+          </a:ln>
+        </p:spPr>
+        <p:style>
+          <a:lnRef idx="1">
+            <a:schemeClr val="accent1"/>
+          </a:lnRef>
+          <a:fillRef idx="0">
+            <a:schemeClr val="accent1"/>
+          </a:fillRef>
+          <a:effectRef idx="0">
+            <a:schemeClr val="accent1"/>
+          </a:effectRef>
+          <a:fontRef idx="minor">
+            <a:schemeClr val="tx1"/>
+          </a:fontRef>
+        </p:style>
+      </p:cxnSp>
+      <p:cxnSp>
+        <p:nvCxnSpPr>
+          <p:cNvPr id="45" name="Straight Arrow Connector 44"/>
+          <p:cNvCxnSpPr/>
+          <p:nvPr/>
+        </p:nvCxnSpPr>
+        <p:spPr>
+          <a:xfrm rot="5400000">
+            <a:off x="4610893" y="3771106"/>
+            <a:ext cx="1143000" cy="1588"/>
+          </a:xfrm>
+          <a:prstGeom prst="straightConnector1">
+            <a:avLst/>
+          </a:prstGeom>
+          <a:ln w="38100">
+            <a:solidFill>
+              <a:schemeClr val="accent2"/>
+            </a:solidFill>
+            <a:tailEnd type="arrow"/>
+          </a:ln>
+        </p:spPr>
+        <p:style>
+          <a:lnRef idx="1">
+            <a:schemeClr val="accent1"/>
+          </a:lnRef>
+          <a:fillRef idx="0">
+            <a:schemeClr val="accent1"/>
+          </a:fillRef>
+          <a:effectRef idx="0">
+            <a:schemeClr val="accent1"/>
+          </a:effectRef>
+          <a:fontRef idx="minor">
+            <a:schemeClr val="tx1"/>
+          </a:fontRef>
+        </p:style>
+      </p:cxnSp>
+      <p:cxnSp>
+        <p:nvCxnSpPr>
+          <p:cNvPr id="46" name="Straight Arrow Connector 45"/>
+          <p:cNvCxnSpPr/>
+          <p:nvPr/>
+        </p:nvCxnSpPr>
+        <p:spPr>
+          <a:xfrm rot="5400000">
+            <a:off x="7277894" y="3771106"/>
+            <a:ext cx="1143000" cy="1588"/>
+          </a:xfrm>
+          <a:prstGeom prst="straightConnector1">
+            <a:avLst/>
+          </a:prstGeom>
+          <a:ln w="38100">
+            <a:solidFill>
+              <a:schemeClr val="accent2"/>
+            </a:solidFill>
+            <a:tailEnd type="arrow"/>
+          </a:ln>
+        </p:spPr>
+        <p:style>
+          <a:lnRef idx="1">
+            <a:schemeClr val="accent1"/>
+          </a:lnRef>
+          <a:fillRef idx="0">
+            <a:schemeClr val="accent1"/>
+          </a:fillRef>
+          <a:effectRef idx="0">
+            <a:schemeClr val="accent1"/>
+          </a:effectRef>
+          <a:fontRef idx="minor">
+            <a:schemeClr val="tx1"/>
+          </a:fontRef>
+        </p:style>
+      </p:cxnSp>
+      <p:cxnSp>
+        <p:nvCxnSpPr>
+          <p:cNvPr id="47" name="Straight Arrow Connector 46"/>
+          <p:cNvCxnSpPr/>
+          <p:nvPr/>
+        </p:nvCxnSpPr>
+        <p:spPr>
+          <a:xfrm rot="5400000">
+            <a:off x="2476500" y="4152900"/>
+            <a:ext cx="380206" cy="794"/>
+          </a:xfrm>
+          <a:prstGeom prst="straightConnector1">
+            <a:avLst/>
+          </a:prstGeom>
+          <a:ln w="38100">
+            <a:solidFill>
+              <a:schemeClr val="accent2"/>
+            </a:solidFill>
+            <a:tailEnd type="arrow"/>
+          </a:ln>
+        </p:spPr>
+        <p:style>
+          <a:lnRef idx="1">
+            <a:schemeClr val="accent1"/>
+          </a:lnRef>
+          <a:fillRef idx="0">
+            <a:schemeClr val="accent1"/>
+          </a:fillRef>
+          <a:effectRef idx="0">
+            <a:schemeClr val="accent1"/>
+          </a:effectRef>
+          <a:fontRef idx="minor">
+            <a:schemeClr val="tx1"/>
+          </a:fontRef>
+        </p:style>
+      </p:cxnSp>
+      <p:cxnSp>
+        <p:nvCxnSpPr>
+          <p:cNvPr id="54" name="Straight Arrow Connector 53"/>
+          <p:cNvCxnSpPr/>
+          <p:nvPr/>
+        </p:nvCxnSpPr>
+        <p:spPr>
+          <a:xfrm rot="5400000">
+            <a:off x="6362700" y="4152900"/>
+            <a:ext cx="380206" cy="794"/>
+          </a:xfrm>
+          <a:prstGeom prst="straightConnector1">
+            <a:avLst/>
+          </a:prstGeom>
+          <a:ln w="38100">
+            <a:solidFill>
+              <a:schemeClr val="accent2"/>
+            </a:solidFill>
+            <a:tailEnd type="arrow"/>
+          </a:ln>
+        </p:spPr>
+        <p:style>
+          <a:lnRef idx="1">
+            <a:schemeClr val="accent1"/>
+          </a:lnRef>
+          <a:fillRef idx="0">
+            <a:schemeClr val="accent1"/>
+          </a:fillRef>
+          <a:effectRef idx="0">
+            <a:schemeClr val="accent1"/>
+          </a:effectRef>
+          <a:fontRef idx="minor">
+            <a:schemeClr val="tx1"/>
+          </a:fontRef>
+        </p:style>
+      </p:cxnSp>
+      <p:sp>
+        <p:nvSpPr>
+          <p:cNvPr id="59" name="Rectangle 58"/>
+          <p:cNvSpPr/>
+          <p:nvPr/>
+        </p:nvSpPr>
+        <p:spPr>
+          <a:xfrm>
+            <a:off x="762000" y="5105400"/>
+            <a:ext cx="7620000" cy="381000"/>
+          </a:xfrm>
+          <a:prstGeom prst="rect">
+            <a:avLst/>
+          </a:prstGeom>
+        </p:spPr>
+        <p:style>
+          <a:lnRef idx="2">
+            <a:schemeClr val="accent2">
+              <a:shade val="50000"/>
+            </a:schemeClr>
+          </a:lnRef>
+          <a:fillRef idx="1">
+            <a:schemeClr val="accent2"/>
+          </a:fillRef>
+          <a:effectRef idx="0">
+            <a:schemeClr val="accent2"/>
+          </a:effectRef>
+          <a:fontRef idx="minor">
+            <a:schemeClr val="lt1"/>
+          </a:fontRef>
+        </p:style>
+        <p:txBody>
+          <a:bodyPr rtlCol="0" anchor="ctr"/>
+          <a:lstStyle/>
+          <a:p>
+            <a:pPr algn="ctr"/>
+            <a:r>
+              <a:rPr lang="en-US" sz="1200" dirty="0" err="1" smtClean="0"/>
+              <a:t>IoC</a:t>
+            </a:r>
+            <a:r>
+              <a:rPr lang="en-US" sz="1200" dirty="0" smtClean="0"/>
+              <a:t> Container</a:t>
+            </a:r>
+            <a:endParaRPr lang="en-US" sz="1200" dirty="0"/>
+          </a:p>
+        </p:txBody>
+      </p:sp>
+    </p:spTree>
+  </p:cSld>
+  <p:clrMapOvr>
+    <a:masterClrMapping/>
+  </p:clrMapOvr>
+  <p:timing>
+    <p:tnLst>
+      <p:par>
+        <p:cTn id="1" dur="indefinite" restart="never" nodeType="tmRoot"/>
+      </p:par>
+    </p:tnLst>
+  </p:timing>
+</p:sld>
+</file>
+
+<file path=ppt/slides/slide29.xml><?xml version="1.0" encoding="utf-8"?>
+<p:sld xmlns:a="http://schemas.openxmlformats.org/drawingml/2006/main" xmlns:r="http://schemas.openxmlformats.org/officeDocument/2006/relationships" xmlns:p="http://schemas.openxmlformats.org/presentationml/2006/main">
+  <p:cSld>
+    <p:spTree>
+      <p:nvGrpSpPr>
+        <p:cNvPr id="1" name=""/>
+        <p:cNvGrpSpPr/>
+        <p:nvPr/>
+      </p:nvGrpSpPr>
+      <p:grpSpPr>
+        <a:xfrm>
+          <a:off x="0" y="0"/>
+          <a:ext cx="0" cy="0"/>
+          <a:chOff x="0" y="0"/>
+          <a:chExt cx="0" cy="0"/>
+        </a:xfrm>
+      </p:grpSpPr>
+      <p:sp>
+        <p:nvSpPr>
+          <p:cNvPr id="6" name="Rectangle 5"/>
+          <p:cNvSpPr/>
+          <p:nvPr/>
+        </p:nvSpPr>
+        <p:spPr>
+          <a:xfrm>
+            <a:off x="0" y="0"/>
+            <a:ext cx="9144000" cy="4648200"/>
+          </a:xfrm>
+          <a:prstGeom prst="rect">
+            <a:avLst/>
+          </a:prstGeom>
+          <a:solidFill>
+            <a:srgbClr val="0069AA"/>
+          </a:solidFill>
+          <a:ln>
+            <a:noFill/>
+          </a:ln>
+        </p:spPr>
+        <p:style>
+          <a:lnRef idx="2">
+            <a:schemeClr val="accent1">
+              <a:shade val="50000"/>
+            </a:schemeClr>
+          </a:lnRef>
+          <a:fillRef idx="1">
+            <a:schemeClr val="accent1"/>
+          </a:fillRef>
+          <a:effectRef idx="0">
+            <a:schemeClr val="accent1"/>
+          </a:effectRef>
+          <a:fontRef idx="minor">
+            <a:schemeClr val="lt1"/>
+          </a:fontRef>
+        </p:style>
+        <p:txBody>
+          <a:bodyPr anchor="ctr"/>
+          <a:lstStyle/>
+          <a:p>
+            <a:pPr algn="ctr">
+              <a:defRPr/>
+            </a:pPr>
+            <a:endParaRPr lang="en-US"/>
+          </a:p>
+        </p:txBody>
+      </p:sp>
+      <p:sp>
+        <p:nvSpPr>
+          <p:cNvPr id="8" name="Rectangle 7"/>
+          <p:cNvSpPr/>
+          <p:nvPr/>
+        </p:nvSpPr>
+        <p:spPr>
+          <a:xfrm>
+            <a:off x="228600" y="0"/>
+            <a:ext cx="104775" cy="3581400"/>
+          </a:xfrm>
+          <a:prstGeom prst="rect">
+            <a:avLst/>
+          </a:prstGeom>
+          <a:solidFill>
+            <a:srgbClr val="E31937"/>
+          </a:solidFill>
+          <a:ln>
+            <a:noFill/>
+          </a:ln>
+        </p:spPr>
+        <p:style>
+          <a:lnRef idx="2">
+            <a:schemeClr val="accent1">
+              <a:shade val="50000"/>
+            </a:schemeClr>
+          </a:lnRef>
+          <a:fillRef idx="1">
+            <a:schemeClr val="accent1"/>
+          </a:fillRef>
+          <a:effectRef idx="0">
+            <a:schemeClr val="accent1"/>
+          </a:effectRef>
+          <a:fontRef idx="minor">
+            <a:schemeClr val="lt1"/>
+          </a:fontRef>
+        </p:style>
+        <p:txBody>
+          <a:bodyPr anchor="ctr"/>
+          <a:lstStyle/>
+          <a:p>
+            <a:pPr algn="ctr">
+              <a:defRPr/>
+            </a:pPr>
+            <a:endParaRPr lang="en-US"/>
+          </a:p>
+        </p:txBody>
+      </p:sp>
+      <p:sp>
+        <p:nvSpPr>
+          <p:cNvPr id="5127" name="Rectangle 8"/>
+          <p:cNvSpPr>
+            <a:spLocks noGrp="1" noChangeArrowheads="1"/>
+          </p:cNvSpPr>
+          <p:nvPr>
+            <p:ph type="title" idx="4294967295"/>
+          </p:nvPr>
+        </p:nvSpPr>
+        <p:spPr bwMode="auto">
+          <a:xfrm>
+            <a:off x="495300" y="200025"/>
+            <a:ext cx="8420100" cy="919163"/>
+          </a:xfrm>
+          <a:prstGeom prst="rect">
+            <a:avLst/>
+          </a:prstGeom>
+          <a:noFill/>
+          <a:ln>
+            <a:miter lim="800000"/>
+            <a:headEnd/>
+            <a:tailEnd/>
+          </a:ln>
+        </p:spPr>
+        <p:txBody>
+          <a:bodyPr/>
+          <a:lstStyle/>
+          <a:p>
+            <a:pPr eaLnBrk="1" hangingPunct="1"/>
+            <a:r>
+              <a:rPr lang="en-US" dirty="0" smtClean="0">
+                <a:solidFill>
+                  <a:schemeClr val="bg1"/>
+                </a:solidFill>
+              </a:rPr>
+              <a:t>Additional Resources</a:t>
+            </a:r>
+          </a:p>
+        </p:txBody>
+      </p:sp>
+      <p:sp>
+        <p:nvSpPr>
+          <p:cNvPr id="5128" name="Rectangle 9"/>
+          <p:cNvSpPr>
+            <a:spLocks noGrp="1" noChangeArrowheads="1"/>
+          </p:cNvSpPr>
+          <p:nvPr>
+            <p:ph idx="4294967295"/>
+          </p:nvPr>
+        </p:nvSpPr>
+        <p:spPr>
+          <a:xfrm>
+            <a:off x="514350" y="1143000"/>
+            <a:ext cx="8229600" cy="3429000"/>
+          </a:xfrm>
+        </p:spPr>
+        <p:txBody>
+          <a:bodyPr/>
+          <a:lstStyle/>
+          <a:p>
+            <a:pPr eaLnBrk="1" hangingPunct="1">
+              <a:lnSpc>
+                <a:spcPct val="80000"/>
+              </a:lnSpc>
+              <a:buNone/>
+            </a:pPr>
+            <a:r>
+              <a:rPr lang="en-US" sz="2000" dirty="0" smtClean="0">
+                <a:solidFill>
+                  <a:schemeClr val="bg1"/>
+                </a:solidFill>
+              </a:rPr>
+              <a:t>Command Pattern</a:t>
+            </a:r>
+          </a:p>
+          <a:p>
+            <a:pPr eaLnBrk="1" hangingPunct="1">
+              <a:lnSpc>
+                <a:spcPct val="80000"/>
+              </a:lnSpc>
+              <a:buNone/>
+            </a:pPr>
+            <a:r>
+              <a:rPr lang="en-US" sz="2000" dirty="0" smtClean="0">
+                <a:solidFill>
+                  <a:schemeClr val="bg1"/>
+                </a:solidFill>
+              </a:rPr>
+              <a:t>	http://www.lostechies.com/blogs/derickbailey/archive/2008/11/19/ptom-command-and-conquer-your-ui-coupling-problems.aspx </a:t>
+            </a:r>
+            <a:br>
+              <a:rPr lang="en-US" sz="2000" dirty="0" smtClean="0">
+                <a:solidFill>
+                  <a:schemeClr val="bg1"/>
+                </a:solidFill>
+              </a:rPr>
+            </a:br>
+            <a:endParaRPr lang="en-US" sz="2000" dirty="0" smtClean="0">
+              <a:solidFill>
+                <a:schemeClr val="bg1"/>
+              </a:solidFill>
+            </a:endParaRPr>
+          </a:p>
+          <a:p>
+            <a:pPr eaLnBrk="1" hangingPunct="1">
+              <a:lnSpc>
+                <a:spcPct val="80000"/>
+              </a:lnSpc>
+              <a:buNone/>
+            </a:pPr>
+            <a:r>
+              <a:rPr lang="en-US" sz="2000" dirty="0" smtClean="0">
+                <a:solidFill>
+                  <a:schemeClr val="bg1"/>
+                </a:solidFill>
+              </a:rPr>
+              <a:t>Event Aggregator</a:t>
+            </a:r>
+            <a:br>
+              <a:rPr lang="en-US" sz="2000" dirty="0" smtClean="0">
+                <a:solidFill>
+                  <a:schemeClr val="bg1"/>
+                </a:solidFill>
+              </a:rPr>
+            </a:br>
+            <a:r>
+              <a:rPr lang="en-US" sz="2000" dirty="0" smtClean="0">
+                <a:solidFill>
+                  <a:schemeClr val="bg1"/>
+                </a:solidFill>
+              </a:rPr>
+              <a:t>http://www.martinfowler.com/eaaDev/EventAggregator.html</a:t>
+            </a:r>
+            <a:br>
+              <a:rPr lang="en-US" sz="2000" dirty="0" smtClean="0">
+                <a:solidFill>
+                  <a:schemeClr val="bg1"/>
+                </a:solidFill>
+              </a:rPr>
+            </a:br>
+            <a:endParaRPr lang="en-US" sz="2000" dirty="0" smtClean="0">
+              <a:solidFill>
+                <a:schemeClr val="bg1"/>
+              </a:solidFill>
+            </a:endParaRPr>
+          </a:p>
+          <a:p>
+            <a:pPr eaLnBrk="1" hangingPunct="1">
+              <a:lnSpc>
+                <a:spcPct val="80000"/>
+              </a:lnSpc>
+              <a:buNone/>
+            </a:pPr>
+            <a:r>
+              <a:rPr lang="en-US" sz="2000" dirty="0" err="1" smtClean="0">
+                <a:solidFill>
+                  <a:schemeClr val="bg1"/>
+                </a:solidFill>
+              </a:rPr>
+              <a:t>StructureMap</a:t>
+            </a:r>
+            <a:r>
+              <a:rPr lang="en-US" sz="2000" dirty="0" smtClean="0">
+                <a:solidFill>
+                  <a:schemeClr val="bg1"/>
+                </a:solidFill>
+              </a:rPr>
+              <a:t> (</a:t>
+            </a:r>
+            <a:r>
+              <a:rPr lang="en-US" sz="2000" dirty="0" err="1" smtClean="0">
+                <a:solidFill>
+                  <a:schemeClr val="bg1"/>
+                </a:solidFill>
+              </a:rPr>
+              <a:t>IoC</a:t>
+            </a:r>
+            <a:r>
+              <a:rPr lang="en-US" sz="2000" dirty="0" smtClean="0">
+                <a:solidFill>
+                  <a:schemeClr val="bg1"/>
+                </a:solidFill>
+              </a:rPr>
+              <a:t> Container)</a:t>
+            </a:r>
+          </a:p>
+          <a:p>
+            <a:pPr eaLnBrk="1" hangingPunct="1">
+              <a:lnSpc>
+                <a:spcPct val="80000"/>
+              </a:lnSpc>
+              <a:buNone/>
+            </a:pPr>
+            <a:r>
+              <a:rPr lang="en-US" sz="2000" dirty="0" smtClean="0">
+                <a:solidFill>
+                  <a:schemeClr val="bg1"/>
+                </a:solidFill>
+              </a:rPr>
+              <a:t>	http://structuremap.sourceforge.net</a:t>
+            </a:r>
+            <a:br>
+              <a:rPr lang="en-US" sz="2000" dirty="0" smtClean="0">
+                <a:solidFill>
+                  <a:schemeClr val="bg1"/>
+                </a:solidFill>
+              </a:rPr>
+            </a:br>
+            <a:endParaRPr lang="en-US" sz="2000" dirty="0" smtClean="0">
+              <a:solidFill>
+                <a:schemeClr val="bg1"/>
+              </a:solidFill>
+            </a:endParaRPr>
+          </a:p>
+          <a:p>
+            <a:pPr eaLnBrk="1" hangingPunct="1">
+              <a:lnSpc>
+                <a:spcPct val="80000"/>
+              </a:lnSpc>
+              <a:buNone/>
+            </a:pPr>
+            <a:r>
+              <a:rPr lang="en-US" sz="2000" dirty="0" smtClean="0">
+                <a:solidFill>
+                  <a:schemeClr val="bg1"/>
+                </a:solidFill>
+              </a:rPr>
+              <a:t>Application Controller</a:t>
+            </a:r>
+          </a:p>
+          <a:p>
+            <a:pPr eaLnBrk="1" hangingPunct="1">
+              <a:lnSpc>
+                <a:spcPct val="80000"/>
+              </a:lnSpc>
+              <a:buNone/>
+            </a:pPr>
+            <a:r>
+              <a:rPr lang="en-US" sz="2000" dirty="0" smtClean="0">
+                <a:solidFill>
+                  <a:schemeClr val="bg1"/>
+                </a:solidFill>
+              </a:rPr>
+              <a:t>	http://www.martinfowler.com/eaaCatalog/applicationController.html</a:t>
+            </a:r>
+            <a:br>
+              <a:rPr lang="en-US" sz="2000" dirty="0" smtClean="0">
+                <a:solidFill>
+                  <a:schemeClr val="bg1"/>
+                </a:solidFill>
+              </a:rPr>
+            </a:br>
+            <a:endParaRPr lang="en-US" sz="2000" dirty="0" smtClean="0">
+              <a:solidFill>
+                <a:schemeClr val="bg1"/>
+              </a:solidFill>
+            </a:endParaRPr>
+          </a:p>
+        </p:txBody>
+      </p:sp>
+      <p:sp>
+        <p:nvSpPr>
+          <p:cNvPr id="5129" name="Text Box 7"/>
+          <p:cNvSpPr txBox="1">
+            <a:spLocks noChangeArrowheads="1"/>
+          </p:cNvSpPr>
+          <p:nvPr/>
+        </p:nvSpPr>
+        <p:spPr bwMode="auto">
+          <a:xfrm>
+            <a:off x="5470525" y="1331913"/>
+            <a:ext cx="184150" cy="366712"/>
+          </a:xfrm>
+          <a:prstGeom prst="rect">
+            <a:avLst/>
+          </a:prstGeom>
+          <a:noFill/>
+          <a:ln w="9525">
+            <a:noFill/>
+            <a:miter lim="800000"/>
+            <a:headEnd/>
+            <a:tailEnd/>
+          </a:ln>
+        </p:spPr>
+        <p:txBody>
+          <a:bodyPr wrap="none">
+            <a:spAutoFit/>
+          </a:bodyPr>
+          <a:lstStyle/>
+          <a:p>
+            <a:endParaRPr lang="en-US"/>
+          </a:p>
+        </p:txBody>
+      </p:sp>
+      <p:pic>
+        <p:nvPicPr>
+          <p:cNvPr id="16" name="Picture 4" descr="MAT logo 1 CMYK"/>
+          <p:cNvPicPr>
+            <a:picLocks noChangeAspect="1" noChangeArrowheads="1"/>
+          </p:cNvPicPr>
+          <p:nvPr/>
+        </p:nvPicPr>
+        <p:blipFill>
+          <a:blip r:embed="rId2">
+            <a:clrChange>
+              <a:clrFrom>
+                <a:srgbClr val="FDFDFD"/>
+              </a:clrFrom>
+              <a:clrTo>
+                <a:srgbClr val="FDFDFD">
+                  <a:alpha val="0"/>
+                </a:srgbClr>
+              </a:clrTo>
+            </a:clrChange>
+          </a:blip>
+          <a:srcRect/>
+          <a:stretch>
+            <a:fillRect/>
+          </a:stretch>
+        </p:blipFill>
+        <p:spPr bwMode="auto">
+          <a:xfrm>
+            <a:off x="2971800" y="4800600"/>
+            <a:ext cx="2819400" cy="1338263"/>
+          </a:xfrm>
+          <a:prstGeom prst="rect">
+            <a:avLst/>
+          </a:prstGeom>
+          <a:noFill/>
+          <a:ln w="9525">
+            <a:noFill/>
+            <a:miter lim="800000"/>
+            <a:headEnd/>
+            <a:tailEnd/>
+          </a:ln>
+        </p:spPr>
+      </p:pic>
+      <p:sp>
+        <p:nvSpPr>
+          <p:cNvPr id="17" name="Rectangle 16"/>
+          <p:cNvSpPr/>
+          <p:nvPr/>
+        </p:nvSpPr>
+        <p:spPr>
+          <a:xfrm>
+            <a:off x="0" y="4724400"/>
+            <a:ext cx="9144000" cy="2133600"/>
+          </a:xfrm>
+          <a:prstGeom prst="rect">
+            <a:avLst/>
+          </a:prstGeom>
+          <a:solidFill>
+            <a:srgbClr val="E31937"/>
+          </a:solidFill>
+          <a:ln>
+            <a:noFill/>
+          </a:ln>
+        </p:spPr>
+        <p:style>
+          <a:lnRef idx="2">
+            <a:schemeClr val="accent1">
+              <a:shade val="50000"/>
+            </a:schemeClr>
+          </a:lnRef>
+          <a:fillRef idx="1">
+            <a:schemeClr val="accent1"/>
+          </a:fillRef>
+          <a:effectRef idx="0">
+            <a:schemeClr val="accent1"/>
+          </a:effectRef>
+          <a:fontRef idx="minor">
+            <a:schemeClr val="lt1"/>
+          </a:fontRef>
+        </p:style>
+        <p:txBody>
+          <a:bodyPr anchor="ctr"/>
+          <a:lstStyle/>
+          <a:p>
+            <a:pPr algn="ctr">
+              <a:defRPr/>
+            </a:pPr>
+            <a:endParaRPr lang="en-US"/>
+          </a:p>
+        </p:txBody>
+      </p:sp>
+      <p:pic>
+        <p:nvPicPr>
+          <p:cNvPr id="18" name="Picture 7" descr="MAT logo vertical_red.emf"/>
+          <p:cNvPicPr>
+            <a:picLocks noChangeAspect="1"/>
+          </p:cNvPicPr>
+          <p:nvPr/>
+        </p:nvPicPr>
+        <p:blipFill>
+          <a:blip r:embed="rId3"/>
+          <a:srcRect/>
+          <a:stretch>
+            <a:fillRect/>
+          </a:stretch>
+        </p:blipFill>
+        <p:spPr bwMode="auto">
+          <a:xfrm>
+            <a:off x="3600450" y="5334000"/>
+            <a:ext cx="1981200" cy="969963"/>
+          </a:xfrm>
+          <a:prstGeom prst="rect">
+            <a:avLst/>
+          </a:prstGeom>
+          <a:noFill/>
+          <a:ln w="9525">
+            <a:noFill/>
+            <a:miter lim="800000"/>
+            <a:headEnd/>
+            <a:tailEnd/>
+          </a:ln>
+        </p:spPr>
+      </p:pic>
     </p:spTree>
   </p:cSld>
   <p:clrMapOvr>
@@ -14495,1890 +15565,6 @@
 </file>
 
 <file path=ppt/slides/slide30.xml><?xml version="1.0" encoding="utf-8"?>
-<p:sld xmlns:a="http://schemas.openxmlformats.org/drawingml/2006/main" xmlns:r="http://schemas.openxmlformats.org/officeDocument/2006/relationships" xmlns:p="http://schemas.openxmlformats.org/presentationml/2006/main">
-  <p:cSld>
-    <p:spTree>
-      <p:nvGrpSpPr>
-        <p:cNvPr id="1" name=""/>
-        <p:cNvGrpSpPr/>
-        <p:nvPr/>
-      </p:nvGrpSpPr>
-      <p:grpSpPr>
-        <a:xfrm>
-          <a:off x="0" y="0"/>
-          <a:ext cx="0" cy="0"/>
-          <a:chOff x="0" y="0"/>
-          <a:chExt cx="0" cy="0"/>
-        </a:xfrm>
-      </p:grpSpPr>
-      <p:sp>
-        <p:nvSpPr>
-          <p:cNvPr id="39" name="Rectangle 38"/>
-          <p:cNvSpPr/>
-          <p:nvPr/>
-        </p:nvSpPr>
-        <p:spPr>
-          <a:xfrm>
-            <a:off x="685800" y="4343400"/>
-            <a:ext cx="7772400" cy="1143000"/>
-          </a:xfrm>
-          <a:prstGeom prst="rect">
-            <a:avLst/>
-          </a:prstGeom>
-        </p:spPr>
-        <p:style>
-          <a:lnRef idx="2">
-            <a:schemeClr val="accent2">
-              <a:shade val="50000"/>
-            </a:schemeClr>
-          </a:lnRef>
-          <a:fillRef idx="1">
-            <a:schemeClr val="accent2"/>
-          </a:fillRef>
-          <a:effectRef idx="0">
-            <a:schemeClr val="accent2"/>
-          </a:effectRef>
-          <a:fontRef idx="minor">
-            <a:schemeClr val="lt1"/>
-          </a:fontRef>
-        </p:style>
-        <p:txBody>
-          <a:bodyPr rtlCol="0" anchor="ctr" anchorCtr="0"/>
-          <a:lstStyle/>
-          <a:p>
-            <a:pPr algn="ctr"/>
-            <a:r>
-              <a:rPr lang="en-US" dirty="0" smtClean="0"/>
-              <a:t>Application Controller</a:t>
-            </a:r>
-            <a:endParaRPr lang="en-US" dirty="0"/>
-          </a:p>
-        </p:txBody>
-      </p:sp>
-      <p:sp>
-        <p:nvSpPr>
-          <p:cNvPr id="57" name="Rectangle 56"/>
-          <p:cNvSpPr/>
-          <p:nvPr/>
-        </p:nvSpPr>
-        <p:spPr>
-          <a:xfrm>
-            <a:off x="762000" y="4343400"/>
-            <a:ext cx="3733800" cy="381000"/>
-          </a:xfrm>
-          <a:prstGeom prst="rect">
-            <a:avLst/>
-          </a:prstGeom>
-        </p:spPr>
-        <p:style>
-          <a:lnRef idx="2">
-            <a:schemeClr val="accent2">
-              <a:shade val="50000"/>
-            </a:schemeClr>
-          </a:lnRef>
-          <a:fillRef idx="1">
-            <a:schemeClr val="accent2"/>
-          </a:fillRef>
-          <a:effectRef idx="0">
-            <a:schemeClr val="accent2"/>
-          </a:effectRef>
-          <a:fontRef idx="minor">
-            <a:schemeClr val="lt1"/>
-          </a:fontRef>
-        </p:style>
-        <p:txBody>
-          <a:bodyPr rtlCol="0" anchor="ctr"/>
-          <a:lstStyle/>
-          <a:p>
-            <a:pPr algn="ctr"/>
-            <a:r>
-              <a:rPr lang="en-US" sz="1200" dirty="0" smtClean="0"/>
-              <a:t>Event Aggregator</a:t>
-            </a:r>
-            <a:endParaRPr lang="en-US" sz="1200" dirty="0"/>
-          </a:p>
-        </p:txBody>
-      </p:sp>
-      <p:sp>
-        <p:nvSpPr>
-          <p:cNvPr id="58" name="Rectangle 57"/>
-          <p:cNvSpPr/>
-          <p:nvPr/>
-        </p:nvSpPr>
-        <p:spPr>
-          <a:xfrm>
-            <a:off x="4648200" y="4343400"/>
-            <a:ext cx="3733800" cy="381000"/>
-          </a:xfrm>
-          <a:prstGeom prst="rect">
-            <a:avLst/>
-          </a:prstGeom>
-        </p:spPr>
-        <p:style>
-          <a:lnRef idx="2">
-            <a:schemeClr val="accent2">
-              <a:shade val="50000"/>
-            </a:schemeClr>
-          </a:lnRef>
-          <a:fillRef idx="1">
-            <a:schemeClr val="accent2"/>
-          </a:fillRef>
-          <a:effectRef idx="0">
-            <a:schemeClr val="accent2"/>
-          </a:effectRef>
-          <a:fontRef idx="minor">
-            <a:schemeClr val="lt1"/>
-          </a:fontRef>
-        </p:style>
-        <p:txBody>
-          <a:bodyPr rtlCol="0" anchor="ctr"/>
-          <a:lstStyle/>
-          <a:p>
-            <a:pPr algn="ctr"/>
-            <a:r>
-              <a:rPr lang="en-US" sz="1200" dirty="0" err="1" smtClean="0"/>
-              <a:t>ICommand</a:t>
-            </a:r>
-            <a:r>
-              <a:rPr lang="en-US" sz="1200" dirty="0" smtClean="0"/>
-              <a:t>&lt;T&gt;</a:t>
-            </a:r>
-            <a:endParaRPr lang="en-US" sz="1200" dirty="0"/>
-          </a:p>
-        </p:txBody>
-      </p:sp>
-      <p:sp>
-        <p:nvSpPr>
-          <p:cNvPr id="3075" name="Text Placeholder 2"/>
-          <p:cNvSpPr>
-            <a:spLocks noGrp="1"/>
-          </p:cNvSpPr>
-          <p:nvPr>
-            <p:ph type="body" sz="quarter" idx="10"/>
-          </p:nvPr>
-        </p:nvSpPr>
-        <p:spPr>
-          <a:xfrm>
-            <a:off x="685800" y="1066800"/>
-            <a:ext cx="8229600" cy="1219200"/>
-          </a:xfrm>
-        </p:spPr>
-        <p:txBody>
-          <a:bodyPr/>
-          <a:lstStyle/>
-          <a:p>
-            <a:pPr eaLnBrk="1" hangingPunct="1">
-              <a:buNone/>
-            </a:pPr>
-            <a:r>
-              <a:rPr lang="en-US" sz="2000" dirty="0" smtClean="0"/>
-              <a:t>“Some applications contain a significant amount of logic about the screens to use at different points, which may involve invoking certain screens at certain times in an application.” </a:t>
-            </a:r>
-          </a:p>
-        </p:txBody>
-      </p:sp>
-      <p:sp>
-        <p:nvSpPr>
-          <p:cNvPr id="3074" name="Title 1"/>
-          <p:cNvSpPr>
-            <a:spLocks noGrp="1"/>
-          </p:cNvSpPr>
-          <p:nvPr>
-            <p:ph type="title"/>
-          </p:nvPr>
-        </p:nvSpPr>
-        <p:spPr bwMode="auto">
-          <a:noFill/>
-          <a:ln>
-            <a:miter lim="800000"/>
-            <a:headEnd/>
-            <a:tailEnd/>
-          </a:ln>
-        </p:spPr>
-        <p:txBody>
-          <a:bodyPr vert="horz" wrap="square" lIns="91440" tIns="45720" rIns="91440" bIns="45720" numCol="1" anchor="t" anchorCtr="0" compatLnSpc="1">
-            <a:prstTxWarp prst="textNoShape">
-              <a:avLst/>
-            </a:prstTxWarp>
-          </a:bodyPr>
-          <a:lstStyle/>
-          <a:p>
-            <a:pPr eaLnBrk="1" hangingPunct="1"/>
-            <a:r>
-              <a:rPr lang="en-US" dirty="0" smtClean="0"/>
-              <a:t>Application Controller</a:t>
-            </a:r>
-          </a:p>
-        </p:txBody>
-      </p:sp>
-      <p:grpSp>
-        <p:nvGrpSpPr>
-          <p:cNvPr id="25" name="Group 24"/>
-          <p:cNvGrpSpPr/>
-          <p:nvPr/>
-        </p:nvGrpSpPr>
-        <p:grpSpPr>
-          <a:xfrm>
-            <a:off x="762000" y="2438400"/>
-            <a:ext cx="3733800" cy="1524000"/>
-            <a:chOff x="762000" y="3048000"/>
-            <a:chExt cx="3733800" cy="1524000"/>
-          </a:xfrm>
-        </p:grpSpPr>
-        <p:grpSp>
-          <p:nvGrpSpPr>
-            <p:cNvPr id="7" name="Group 6"/>
-            <p:cNvGrpSpPr/>
-            <p:nvPr/>
-          </p:nvGrpSpPr>
-          <p:grpSpPr>
-            <a:xfrm>
-              <a:off x="762000" y="3048000"/>
-              <a:ext cx="1828800" cy="762000"/>
-              <a:chOff x="762000" y="3048000"/>
-              <a:chExt cx="1828800" cy="762000"/>
-            </a:xfrm>
-          </p:grpSpPr>
-          <p:sp>
-            <p:nvSpPr>
-              <p:cNvPr id="4" name="Rectangle 3"/>
-              <p:cNvSpPr/>
-              <p:nvPr/>
-            </p:nvSpPr>
-            <p:spPr>
-              <a:xfrm>
-                <a:off x="762000" y="3048000"/>
-                <a:ext cx="914400" cy="381000"/>
-              </a:xfrm>
-              <a:prstGeom prst="rect">
-                <a:avLst/>
-              </a:prstGeom>
-            </p:spPr>
-            <p:style>
-              <a:lnRef idx="2">
-                <a:schemeClr val="accent1">
-                  <a:shade val="50000"/>
-                </a:schemeClr>
-              </a:lnRef>
-              <a:fillRef idx="1">
-                <a:schemeClr val="accent1"/>
-              </a:fillRef>
-              <a:effectRef idx="0">
-                <a:schemeClr val="accent1"/>
-              </a:effectRef>
-              <a:fontRef idx="minor">
-                <a:schemeClr val="lt1"/>
-              </a:fontRef>
-            </p:style>
-            <p:txBody>
-              <a:bodyPr rtlCol="0" anchor="ctr"/>
-              <a:lstStyle/>
-              <a:p>
-                <a:pPr algn="ctr"/>
-                <a:r>
-                  <a:rPr lang="en-US" sz="1200" dirty="0" smtClean="0"/>
-                  <a:t>Model</a:t>
-                </a:r>
-                <a:endParaRPr lang="en-US" sz="1200" dirty="0"/>
-              </a:p>
-            </p:txBody>
-          </p:sp>
-          <p:sp>
-            <p:nvSpPr>
-              <p:cNvPr id="5" name="Rectangle 4"/>
-              <p:cNvSpPr/>
-              <p:nvPr/>
-            </p:nvSpPr>
-            <p:spPr>
-              <a:xfrm>
-                <a:off x="1676400" y="3048000"/>
-                <a:ext cx="914400" cy="381000"/>
-              </a:xfrm>
-              <a:prstGeom prst="rect">
-                <a:avLst/>
-              </a:prstGeom>
-            </p:spPr>
-            <p:style>
-              <a:lnRef idx="2">
-                <a:schemeClr val="accent1">
-                  <a:shade val="50000"/>
-                </a:schemeClr>
-              </a:lnRef>
-              <a:fillRef idx="1">
-                <a:schemeClr val="accent1"/>
-              </a:fillRef>
-              <a:effectRef idx="0">
-                <a:schemeClr val="accent1"/>
-              </a:effectRef>
-              <a:fontRef idx="minor">
-                <a:schemeClr val="lt1"/>
-              </a:fontRef>
-            </p:style>
-            <p:txBody>
-              <a:bodyPr rtlCol="0" anchor="ctr"/>
-              <a:lstStyle/>
-              <a:p>
-                <a:pPr algn="ctr"/>
-                <a:r>
-                  <a:rPr lang="en-US" sz="1200" dirty="0" smtClean="0"/>
-                  <a:t>View</a:t>
-                </a:r>
-              </a:p>
-            </p:txBody>
-          </p:sp>
-          <p:sp>
-            <p:nvSpPr>
-              <p:cNvPr id="6" name="Rectangle 5"/>
-              <p:cNvSpPr/>
-              <p:nvPr/>
-            </p:nvSpPr>
-            <p:spPr>
-              <a:xfrm>
-                <a:off x="762000" y="3429000"/>
-                <a:ext cx="1828800" cy="381000"/>
-              </a:xfrm>
-              <a:prstGeom prst="rect">
-                <a:avLst/>
-              </a:prstGeom>
-            </p:spPr>
-            <p:style>
-              <a:lnRef idx="2">
-                <a:schemeClr val="accent1">
-                  <a:shade val="50000"/>
-                </a:schemeClr>
-              </a:lnRef>
-              <a:fillRef idx="1">
-                <a:schemeClr val="accent1"/>
-              </a:fillRef>
-              <a:effectRef idx="0">
-                <a:schemeClr val="accent1"/>
-              </a:effectRef>
-              <a:fontRef idx="minor">
-                <a:schemeClr val="lt1"/>
-              </a:fontRef>
-            </p:style>
-            <p:txBody>
-              <a:bodyPr rtlCol="0" anchor="ctr"/>
-              <a:lstStyle/>
-              <a:p>
-                <a:pPr algn="ctr"/>
-                <a:r>
-                  <a:rPr lang="en-US" sz="1200" dirty="0" smtClean="0"/>
-                  <a:t>Presenter</a:t>
-                </a:r>
-                <a:endParaRPr lang="en-US" sz="1200" dirty="0"/>
-              </a:p>
-            </p:txBody>
-          </p:sp>
-        </p:grpSp>
-        <p:grpSp>
-          <p:nvGrpSpPr>
-            <p:cNvPr id="8" name="Group 7"/>
-            <p:cNvGrpSpPr/>
-            <p:nvPr/>
-          </p:nvGrpSpPr>
-          <p:grpSpPr>
-            <a:xfrm>
-              <a:off x="2667000" y="3048000"/>
-              <a:ext cx="1828800" cy="762000"/>
-              <a:chOff x="762000" y="3048000"/>
-              <a:chExt cx="1828800" cy="762000"/>
-            </a:xfrm>
-          </p:grpSpPr>
-          <p:sp>
-            <p:nvSpPr>
-              <p:cNvPr id="9" name="Rectangle 8"/>
-              <p:cNvSpPr/>
-              <p:nvPr/>
-            </p:nvSpPr>
-            <p:spPr>
-              <a:xfrm>
-                <a:off x="762000" y="3048000"/>
-                <a:ext cx="914400" cy="381000"/>
-              </a:xfrm>
-              <a:prstGeom prst="rect">
-                <a:avLst/>
-              </a:prstGeom>
-            </p:spPr>
-            <p:style>
-              <a:lnRef idx="2">
-                <a:schemeClr val="accent1">
-                  <a:shade val="50000"/>
-                </a:schemeClr>
-              </a:lnRef>
-              <a:fillRef idx="1">
-                <a:schemeClr val="accent1"/>
-              </a:fillRef>
-              <a:effectRef idx="0">
-                <a:schemeClr val="accent1"/>
-              </a:effectRef>
-              <a:fontRef idx="minor">
-                <a:schemeClr val="lt1"/>
-              </a:fontRef>
-            </p:style>
-            <p:txBody>
-              <a:bodyPr rtlCol="0" anchor="ctr"/>
-              <a:lstStyle/>
-              <a:p>
-                <a:pPr algn="ctr"/>
-                <a:r>
-                  <a:rPr lang="en-US" sz="1200" dirty="0" smtClean="0"/>
-                  <a:t>Model</a:t>
-                </a:r>
-                <a:endParaRPr lang="en-US" sz="1200" dirty="0"/>
-              </a:p>
-            </p:txBody>
-          </p:sp>
-          <p:sp>
-            <p:nvSpPr>
-              <p:cNvPr id="10" name="Rectangle 9"/>
-              <p:cNvSpPr/>
-              <p:nvPr/>
-            </p:nvSpPr>
-            <p:spPr>
-              <a:xfrm>
-                <a:off x="1676400" y="3048000"/>
-                <a:ext cx="914400" cy="381000"/>
-              </a:xfrm>
-              <a:prstGeom prst="rect">
-                <a:avLst/>
-              </a:prstGeom>
-            </p:spPr>
-            <p:style>
-              <a:lnRef idx="2">
-                <a:schemeClr val="accent1">
-                  <a:shade val="50000"/>
-                </a:schemeClr>
-              </a:lnRef>
-              <a:fillRef idx="1">
-                <a:schemeClr val="accent1"/>
-              </a:fillRef>
-              <a:effectRef idx="0">
-                <a:schemeClr val="accent1"/>
-              </a:effectRef>
-              <a:fontRef idx="minor">
-                <a:schemeClr val="lt1"/>
-              </a:fontRef>
-            </p:style>
-            <p:txBody>
-              <a:bodyPr rtlCol="0" anchor="ctr"/>
-              <a:lstStyle/>
-              <a:p>
-                <a:pPr algn="ctr"/>
-                <a:r>
-                  <a:rPr lang="en-US" sz="1200" dirty="0" smtClean="0"/>
-                  <a:t>View</a:t>
-                </a:r>
-              </a:p>
-            </p:txBody>
-          </p:sp>
-          <p:sp>
-            <p:nvSpPr>
-              <p:cNvPr id="11" name="Rectangle 10"/>
-              <p:cNvSpPr/>
-              <p:nvPr/>
-            </p:nvSpPr>
-            <p:spPr>
-              <a:xfrm>
-                <a:off x="762000" y="3429000"/>
-                <a:ext cx="1828800" cy="381000"/>
-              </a:xfrm>
-              <a:prstGeom prst="rect">
-                <a:avLst/>
-              </a:prstGeom>
-            </p:spPr>
-            <p:style>
-              <a:lnRef idx="2">
-                <a:schemeClr val="accent1">
-                  <a:shade val="50000"/>
-                </a:schemeClr>
-              </a:lnRef>
-              <a:fillRef idx="1">
-                <a:schemeClr val="accent1"/>
-              </a:fillRef>
-              <a:effectRef idx="0">
-                <a:schemeClr val="accent1"/>
-              </a:effectRef>
-              <a:fontRef idx="minor">
-                <a:schemeClr val="lt1"/>
-              </a:fontRef>
-            </p:style>
-            <p:txBody>
-              <a:bodyPr rtlCol="0" anchor="ctr"/>
-              <a:lstStyle/>
-              <a:p>
-                <a:pPr algn="ctr"/>
-                <a:r>
-                  <a:rPr lang="en-US" sz="1200" dirty="0" smtClean="0"/>
-                  <a:t>Presenter</a:t>
-                </a:r>
-                <a:endParaRPr lang="en-US" sz="1200" dirty="0"/>
-              </a:p>
-            </p:txBody>
-          </p:sp>
-        </p:grpSp>
-        <p:sp>
-          <p:nvSpPr>
-            <p:cNvPr id="16" name="Rectangle 15"/>
-            <p:cNvSpPr/>
-            <p:nvPr/>
-          </p:nvSpPr>
-          <p:spPr>
-            <a:xfrm>
-              <a:off x="762000" y="4191000"/>
-              <a:ext cx="3733800" cy="381000"/>
-            </a:xfrm>
-            <a:prstGeom prst="rect">
-              <a:avLst/>
-            </a:prstGeom>
-          </p:spPr>
-          <p:style>
-            <a:lnRef idx="2">
-              <a:schemeClr val="accent1">
-                <a:shade val="50000"/>
-              </a:schemeClr>
-            </a:lnRef>
-            <a:fillRef idx="1">
-              <a:schemeClr val="accent1"/>
-            </a:fillRef>
-            <a:effectRef idx="0">
-              <a:schemeClr val="accent1"/>
-            </a:effectRef>
-            <a:fontRef idx="minor">
-              <a:schemeClr val="lt1"/>
-            </a:fontRef>
-          </p:style>
-          <p:txBody>
-            <a:bodyPr rtlCol="0" anchor="ctr"/>
-            <a:lstStyle/>
-            <a:p>
-              <a:pPr algn="ctr"/>
-              <a:r>
-                <a:rPr lang="en-US" sz="1200" dirty="0" smtClean="0"/>
-                <a:t>Workflow Service</a:t>
-              </a:r>
-              <a:endParaRPr lang="en-US" sz="1200" dirty="0"/>
-            </a:p>
-          </p:txBody>
-        </p:sp>
-        <p:cxnSp>
-          <p:nvCxnSpPr>
-            <p:cNvPr id="20" name="Straight Arrow Connector 19"/>
-            <p:cNvCxnSpPr>
-              <a:stCxn id="6" idx="2"/>
-            </p:cNvCxnSpPr>
-            <p:nvPr/>
-          </p:nvCxnSpPr>
-          <p:spPr>
-            <a:xfrm rot="5400000">
-              <a:off x="1485900" y="4000500"/>
-              <a:ext cx="381000" cy="1588"/>
-            </a:xfrm>
-            <a:prstGeom prst="straightConnector1">
-              <a:avLst/>
-            </a:prstGeom>
-            <a:ln w="38100">
-              <a:tailEnd type="arrow"/>
-            </a:ln>
-          </p:spPr>
-          <p:style>
-            <a:lnRef idx="1">
-              <a:schemeClr val="accent1"/>
-            </a:lnRef>
-            <a:fillRef idx="0">
-              <a:schemeClr val="accent1"/>
-            </a:fillRef>
-            <a:effectRef idx="0">
-              <a:schemeClr val="accent1"/>
-            </a:effectRef>
-            <a:fontRef idx="minor">
-              <a:schemeClr val="tx1"/>
-            </a:fontRef>
-          </p:style>
-        </p:cxnSp>
-        <p:cxnSp>
-          <p:nvCxnSpPr>
-            <p:cNvPr id="23" name="Straight Arrow Connector 22"/>
-            <p:cNvCxnSpPr>
-              <a:stCxn id="11" idx="2"/>
-            </p:cNvCxnSpPr>
-            <p:nvPr/>
-          </p:nvCxnSpPr>
-          <p:spPr>
-            <a:xfrm rot="5400000">
-              <a:off x="3390900" y="4000500"/>
-              <a:ext cx="381000" cy="1588"/>
-            </a:xfrm>
-            <a:prstGeom prst="straightConnector1">
-              <a:avLst/>
-            </a:prstGeom>
-            <a:ln w="38100">
-              <a:tailEnd type="arrow"/>
-            </a:ln>
-          </p:spPr>
-          <p:style>
-            <a:lnRef idx="1">
-              <a:schemeClr val="accent1"/>
-            </a:lnRef>
-            <a:fillRef idx="0">
-              <a:schemeClr val="accent1"/>
-            </a:fillRef>
-            <a:effectRef idx="0">
-              <a:schemeClr val="accent1"/>
-            </a:effectRef>
-            <a:fontRef idx="minor">
-              <a:schemeClr val="tx1"/>
-            </a:fontRef>
-          </p:style>
-        </p:cxnSp>
-      </p:grpSp>
-      <p:grpSp>
-        <p:nvGrpSpPr>
-          <p:cNvPr id="26" name="Group 25"/>
-          <p:cNvGrpSpPr/>
-          <p:nvPr/>
-        </p:nvGrpSpPr>
-        <p:grpSpPr>
-          <a:xfrm>
-            <a:off x="4648200" y="2438400"/>
-            <a:ext cx="3733800" cy="1524000"/>
-            <a:chOff x="762000" y="3048000"/>
-            <a:chExt cx="3733800" cy="1524000"/>
-          </a:xfrm>
-        </p:grpSpPr>
-        <p:grpSp>
-          <p:nvGrpSpPr>
-            <p:cNvPr id="27" name="Group 6"/>
-            <p:cNvGrpSpPr/>
-            <p:nvPr/>
-          </p:nvGrpSpPr>
-          <p:grpSpPr>
-            <a:xfrm>
-              <a:off x="762000" y="3048000"/>
-              <a:ext cx="1828800" cy="762000"/>
-              <a:chOff x="762000" y="3048000"/>
-              <a:chExt cx="1828800" cy="762000"/>
-            </a:xfrm>
-          </p:grpSpPr>
-          <p:sp>
-            <p:nvSpPr>
-              <p:cNvPr id="35" name="Rectangle 3"/>
-              <p:cNvSpPr/>
-              <p:nvPr/>
-            </p:nvSpPr>
-            <p:spPr>
-              <a:xfrm>
-                <a:off x="762000" y="3048000"/>
-                <a:ext cx="914400" cy="381000"/>
-              </a:xfrm>
-              <a:prstGeom prst="rect">
-                <a:avLst/>
-              </a:prstGeom>
-            </p:spPr>
-            <p:style>
-              <a:lnRef idx="2">
-                <a:schemeClr val="accent1">
-                  <a:shade val="50000"/>
-                </a:schemeClr>
-              </a:lnRef>
-              <a:fillRef idx="1">
-                <a:schemeClr val="accent1"/>
-              </a:fillRef>
-              <a:effectRef idx="0">
-                <a:schemeClr val="accent1"/>
-              </a:effectRef>
-              <a:fontRef idx="minor">
-                <a:schemeClr val="lt1"/>
-              </a:fontRef>
-            </p:style>
-            <p:txBody>
-              <a:bodyPr rtlCol="0" anchor="ctr"/>
-              <a:lstStyle/>
-              <a:p>
-                <a:pPr algn="ctr"/>
-                <a:r>
-                  <a:rPr lang="en-US" sz="1200" dirty="0" smtClean="0"/>
-                  <a:t>Model</a:t>
-                </a:r>
-                <a:endParaRPr lang="en-US" sz="1200" dirty="0"/>
-              </a:p>
-            </p:txBody>
-          </p:sp>
-          <p:sp>
-            <p:nvSpPr>
-              <p:cNvPr id="36" name="Rectangle 35"/>
-              <p:cNvSpPr/>
-              <p:nvPr/>
-            </p:nvSpPr>
-            <p:spPr>
-              <a:xfrm>
-                <a:off x="1676400" y="3048000"/>
-                <a:ext cx="914400" cy="381000"/>
-              </a:xfrm>
-              <a:prstGeom prst="rect">
-                <a:avLst/>
-              </a:prstGeom>
-            </p:spPr>
-            <p:style>
-              <a:lnRef idx="2">
-                <a:schemeClr val="accent1">
-                  <a:shade val="50000"/>
-                </a:schemeClr>
-              </a:lnRef>
-              <a:fillRef idx="1">
-                <a:schemeClr val="accent1"/>
-              </a:fillRef>
-              <a:effectRef idx="0">
-                <a:schemeClr val="accent1"/>
-              </a:effectRef>
-              <a:fontRef idx="minor">
-                <a:schemeClr val="lt1"/>
-              </a:fontRef>
-            </p:style>
-            <p:txBody>
-              <a:bodyPr rtlCol="0" anchor="ctr"/>
-              <a:lstStyle/>
-              <a:p>
-                <a:pPr algn="ctr"/>
-                <a:r>
-                  <a:rPr lang="en-US" sz="1200" dirty="0" smtClean="0"/>
-                  <a:t>View</a:t>
-                </a:r>
-              </a:p>
-            </p:txBody>
-          </p:sp>
-          <p:sp>
-            <p:nvSpPr>
-              <p:cNvPr id="37" name="Rectangle 36"/>
-              <p:cNvSpPr/>
-              <p:nvPr/>
-            </p:nvSpPr>
-            <p:spPr>
-              <a:xfrm>
-                <a:off x="762000" y="3429000"/>
-                <a:ext cx="1828800" cy="381000"/>
-              </a:xfrm>
-              <a:prstGeom prst="rect">
-                <a:avLst/>
-              </a:prstGeom>
-            </p:spPr>
-            <p:style>
-              <a:lnRef idx="2">
-                <a:schemeClr val="accent1">
-                  <a:shade val="50000"/>
-                </a:schemeClr>
-              </a:lnRef>
-              <a:fillRef idx="1">
-                <a:schemeClr val="accent1"/>
-              </a:fillRef>
-              <a:effectRef idx="0">
-                <a:schemeClr val="accent1"/>
-              </a:effectRef>
-              <a:fontRef idx="minor">
-                <a:schemeClr val="lt1"/>
-              </a:fontRef>
-            </p:style>
-            <p:txBody>
-              <a:bodyPr rtlCol="0" anchor="ctr"/>
-              <a:lstStyle/>
-              <a:p>
-                <a:pPr algn="ctr"/>
-                <a:r>
-                  <a:rPr lang="en-US" sz="1200" dirty="0" smtClean="0"/>
-                  <a:t>Presenter</a:t>
-                </a:r>
-                <a:endParaRPr lang="en-US" sz="1200" dirty="0"/>
-              </a:p>
-            </p:txBody>
-          </p:sp>
-        </p:grpSp>
-        <p:grpSp>
-          <p:nvGrpSpPr>
-            <p:cNvPr id="28" name="Group 7"/>
-            <p:cNvGrpSpPr/>
-            <p:nvPr/>
-          </p:nvGrpSpPr>
-          <p:grpSpPr>
-            <a:xfrm>
-              <a:off x="2667000" y="3048000"/>
-              <a:ext cx="1828800" cy="762000"/>
-              <a:chOff x="762000" y="3048000"/>
-              <a:chExt cx="1828800" cy="762000"/>
-            </a:xfrm>
-          </p:grpSpPr>
-          <p:sp>
-            <p:nvSpPr>
-              <p:cNvPr id="32" name="Rectangle 31"/>
-              <p:cNvSpPr/>
-              <p:nvPr/>
-            </p:nvSpPr>
-            <p:spPr>
-              <a:xfrm>
-                <a:off x="762000" y="3048000"/>
-                <a:ext cx="914400" cy="381000"/>
-              </a:xfrm>
-              <a:prstGeom prst="rect">
-                <a:avLst/>
-              </a:prstGeom>
-            </p:spPr>
-            <p:style>
-              <a:lnRef idx="2">
-                <a:schemeClr val="accent1">
-                  <a:shade val="50000"/>
-                </a:schemeClr>
-              </a:lnRef>
-              <a:fillRef idx="1">
-                <a:schemeClr val="accent1"/>
-              </a:fillRef>
-              <a:effectRef idx="0">
-                <a:schemeClr val="accent1"/>
-              </a:effectRef>
-              <a:fontRef idx="minor">
-                <a:schemeClr val="lt1"/>
-              </a:fontRef>
-            </p:style>
-            <p:txBody>
-              <a:bodyPr rtlCol="0" anchor="ctr"/>
-              <a:lstStyle/>
-              <a:p>
-                <a:pPr algn="ctr"/>
-                <a:r>
-                  <a:rPr lang="en-US" sz="1200" dirty="0" smtClean="0"/>
-                  <a:t>Model</a:t>
-                </a:r>
-                <a:endParaRPr lang="en-US" sz="1200" dirty="0"/>
-              </a:p>
-            </p:txBody>
-          </p:sp>
-          <p:sp>
-            <p:nvSpPr>
-              <p:cNvPr id="33" name="Rectangle 32"/>
-              <p:cNvSpPr/>
-              <p:nvPr/>
-            </p:nvSpPr>
-            <p:spPr>
-              <a:xfrm>
-                <a:off x="1676400" y="3048000"/>
-                <a:ext cx="914400" cy="381000"/>
-              </a:xfrm>
-              <a:prstGeom prst="rect">
-                <a:avLst/>
-              </a:prstGeom>
-            </p:spPr>
-            <p:style>
-              <a:lnRef idx="2">
-                <a:schemeClr val="accent1">
-                  <a:shade val="50000"/>
-                </a:schemeClr>
-              </a:lnRef>
-              <a:fillRef idx="1">
-                <a:schemeClr val="accent1"/>
-              </a:fillRef>
-              <a:effectRef idx="0">
-                <a:schemeClr val="accent1"/>
-              </a:effectRef>
-              <a:fontRef idx="minor">
-                <a:schemeClr val="lt1"/>
-              </a:fontRef>
-            </p:style>
-            <p:txBody>
-              <a:bodyPr rtlCol="0" anchor="ctr"/>
-              <a:lstStyle/>
-              <a:p>
-                <a:pPr algn="ctr"/>
-                <a:r>
-                  <a:rPr lang="en-US" sz="1200" dirty="0" smtClean="0"/>
-                  <a:t>View</a:t>
-                </a:r>
-              </a:p>
-            </p:txBody>
-          </p:sp>
-          <p:sp>
-            <p:nvSpPr>
-              <p:cNvPr id="34" name="Rectangle 33"/>
-              <p:cNvSpPr/>
-              <p:nvPr/>
-            </p:nvSpPr>
-            <p:spPr>
-              <a:xfrm>
-                <a:off x="762000" y="3429000"/>
-                <a:ext cx="1828800" cy="381000"/>
-              </a:xfrm>
-              <a:prstGeom prst="rect">
-                <a:avLst/>
-              </a:prstGeom>
-            </p:spPr>
-            <p:style>
-              <a:lnRef idx="2">
-                <a:schemeClr val="accent1">
-                  <a:shade val="50000"/>
-                </a:schemeClr>
-              </a:lnRef>
-              <a:fillRef idx="1">
-                <a:schemeClr val="accent1"/>
-              </a:fillRef>
-              <a:effectRef idx="0">
-                <a:schemeClr val="accent1"/>
-              </a:effectRef>
-              <a:fontRef idx="minor">
-                <a:schemeClr val="lt1"/>
-              </a:fontRef>
-            </p:style>
-            <p:txBody>
-              <a:bodyPr rtlCol="0" anchor="ctr"/>
-              <a:lstStyle/>
-              <a:p>
-                <a:pPr algn="ctr"/>
-                <a:r>
-                  <a:rPr lang="en-US" sz="1200" dirty="0" smtClean="0"/>
-                  <a:t>Presenter</a:t>
-                </a:r>
-                <a:endParaRPr lang="en-US" sz="1200" dirty="0"/>
-              </a:p>
-            </p:txBody>
-          </p:sp>
-        </p:grpSp>
-        <p:sp>
-          <p:nvSpPr>
-            <p:cNvPr id="29" name="Rectangle 28"/>
-            <p:cNvSpPr/>
-            <p:nvPr/>
-          </p:nvSpPr>
-          <p:spPr>
-            <a:xfrm>
-              <a:off x="762000" y="4191000"/>
-              <a:ext cx="3733800" cy="381000"/>
-            </a:xfrm>
-            <a:prstGeom prst="rect">
-              <a:avLst/>
-            </a:prstGeom>
-          </p:spPr>
-          <p:style>
-            <a:lnRef idx="2">
-              <a:schemeClr val="accent1">
-                <a:shade val="50000"/>
-              </a:schemeClr>
-            </a:lnRef>
-            <a:fillRef idx="1">
-              <a:schemeClr val="accent1"/>
-            </a:fillRef>
-            <a:effectRef idx="0">
-              <a:schemeClr val="accent1"/>
-            </a:effectRef>
-            <a:fontRef idx="minor">
-              <a:schemeClr val="lt1"/>
-            </a:fontRef>
-          </p:style>
-          <p:txBody>
-            <a:bodyPr rtlCol="0" anchor="ctr"/>
-            <a:lstStyle/>
-            <a:p>
-              <a:pPr algn="ctr"/>
-              <a:r>
-                <a:rPr lang="en-US" sz="1200" dirty="0" smtClean="0"/>
-                <a:t>Workflow Service</a:t>
-              </a:r>
-              <a:endParaRPr lang="en-US" sz="1200" dirty="0"/>
-            </a:p>
-          </p:txBody>
-        </p:sp>
-        <p:cxnSp>
-          <p:nvCxnSpPr>
-            <p:cNvPr id="30" name="Straight Arrow Connector 29"/>
-            <p:cNvCxnSpPr>
-              <a:stCxn id="37" idx="2"/>
-            </p:cNvCxnSpPr>
-            <p:nvPr/>
-          </p:nvCxnSpPr>
-          <p:spPr>
-            <a:xfrm rot="5400000">
-              <a:off x="1485900" y="4000500"/>
-              <a:ext cx="381000" cy="1588"/>
-            </a:xfrm>
-            <a:prstGeom prst="straightConnector1">
-              <a:avLst/>
-            </a:prstGeom>
-            <a:ln w="38100">
-              <a:tailEnd type="arrow"/>
-            </a:ln>
-          </p:spPr>
-          <p:style>
-            <a:lnRef idx="1">
-              <a:schemeClr val="accent1"/>
-            </a:lnRef>
-            <a:fillRef idx="0">
-              <a:schemeClr val="accent1"/>
-            </a:fillRef>
-            <a:effectRef idx="0">
-              <a:schemeClr val="accent1"/>
-            </a:effectRef>
-            <a:fontRef idx="minor">
-              <a:schemeClr val="tx1"/>
-            </a:fontRef>
-          </p:style>
-        </p:cxnSp>
-        <p:cxnSp>
-          <p:nvCxnSpPr>
-            <p:cNvPr id="31" name="Straight Arrow Connector 30"/>
-            <p:cNvCxnSpPr>
-              <a:stCxn id="34" idx="2"/>
-            </p:cNvCxnSpPr>
-            <p:nvPr/>
-          </p:nvCxnSpPr>
-          <p:spPr>
-            <a:xfrm rot="5400000">
-              <a:off x="3390900" y="4000500"/>
-              <a:ext cx="381000" cy="1588"/>
-            </a:xfrm>
-            <a:prstGeom prst="straightConnector1">
-              <a:avLst/>
-            </a:prstGeom>
-            <a:ln w="38100">
-              <a:tailEnd type="arrow"/>
-            </a:ln>
-          </p:spPr>
-          <p:style>
-            <a:lnRef idx="1">
-              <a:schemeClr val="accent1"/>
-            </a:lnRef>
-            <a:fillRef idx="0">
-              <a:schemeClr val="accent1"/>
-            </a:fillRef>
-            <a:effectRef idx="0">
-              <a:schemeClr val="accent1"/>
-            </a:effectRef>
-            <a:fontRef idx="minor">
-              <a:schemeClr val="tx1"/>
-            </a:fontRef>
-          </p:style>
-        </p:cxnSp>
-      </p:grpSp>
-      <p:cxnSp>
-        <p:nvCxnSpPr>
-          <p:cNvPr id="40" name="Straight Arrow Connector 39"/>
-          <p:cNvCxnSpPr/>
-          <p:nvPr/>
-        </p:nvCxnSpPr>
-        <p:spPr>
-          <a:xfrm rot="5400000">
-            <a:off x="723105" y="3771106"/>
-            <a:ext cx="1143000" cy="1588"/>
-          </a:xfrm>
-          <a:prstGeom prst="straightConnector1">
-            <a:avLst/>
-          </a:prstGeom>
-          <a:ln w="38100">
-            <a:solidFill>
-              <a:schemeClr val="accent2"/>
-            </a:solidFill>
-            <a:tailEnd type="arrow"/>
-          </a:ln>
-        </p:spPr>
-        <p:style>
-          <a:lnRef idx="1">
-            <a:schemeClr val="accent1"/>
-          </a:lnRef>
-          <a:fillRef idx="0">
-            <a:schemeClr val="accent1"/>
-          </a:fillRef>
-          <a:effectRef idx="0">
-            <a:schemeClr val="accent1"/>
-          </a:effectRef>
-          <a:fontRef idx="minor">
-            <a:schemeClr val="tx1"/>
-          </a:fontRef>
-        </p:style>
-      </p:cxnSp>
-      <p:cxnSp>
-        <p:nvCxnSpPr>
-          <p:cNvPr id="44" name="Straight Arrow Connector 43"/>
-          <p:cNvCxnSpPr/>
-          <p:nvPr/>
-        </p:nvCxnSpPr>
-        <p:spPr>
-          <a:xfrm rot="5400000">
-            <a:off x="3390105" y="3771106"/>
-            <a:ext cx="1143000" cy="1588"/>
-          </a:xfrm>
-          <a:prstGeom prst="straightConnector1">
-            <a:avLst/>
-          </a:prstGeom>
-          <a:ln w="38100">
-            <a:solidFill>
-              <a:schemeClr val="accent2"/>
-            </a:solidFill>
-            <a:tailEnd type="arrow"/>
-          </a:ln>
-        </p:spPr>
-        <p:style>
-          <a:lnRef idx="1">
-            <a:schemeClr val="accent1"/>
-          </a:lnRef>
-          <a:fillRef idx="0">
-            <a:schemeClr val="accent1"/>
-          </a:fillRef>
-          <a:effectRef idx="0">
-            <a:schemeClr val="accent1"/>
-          </a:effectRef>
-          <a:fontRef idx="minor">
-            <a:schemeClr val="tx1"/>
-          </a:fontRef>
-        </p:style>
-      </p:cxnSp>
-      <p:cxnSp>
-        <p:nvCxnSpPr>
-          <p:cNvPr id="45" name="Straight Arrow Connector 44"/>
-          <p:cNvCxnSpPr/>
-          <p:nvPr/>
-        </p:nvCxnSpPr>
-        <p:spPr>
-          <a:xfrm rot="5400000">
-            <a:off x="4610893" y="3771106"/>
-            <a:ext cx="1143000" cy="1588"/>
-          </a:xfrm>
-          <a:prstGeom prst="straightConnector1">
-            <a:avLst/>
-          </a:prstGeom>
-          <a:ln w="38100">
-            <a:solidFill>
-              <a:schemeClr val="accent2"/>
-            </a:solidFill>
-            <a:tailEnd type="arrow"/>
-          </a:ln>
-        </p:spPr>
-        <p:style>
-          <a:lnRef idx="1">
-            <a:schemeClr val="accent1"/>
-          </a:lnRef>
-          <a:fillRef idx="0">
-            <a:schemeClr val="accent1"/>
-          </a:fillRef>
-          <a:effectRef idx="0">
-            <a:schemeClr val="accent1"/>
-          </a:effectRef>
-          <a:fontRef idx="minor">
-            <a:schemeClr val="tx1"/>
-          </a:fontRef>
-        </p:style>
-      </p:cxnSp>
-      <p:cxnSp>
-        <p:nvCxnSpPr>
-          <p:cNvPr id="46" name="Straight Arrow Connector 45"/>
-          <p:cNvCxnSpPr/>
-          <p:nvPr/>
-        </p:nvCxnSpPr>
-        <p:spPr>
-          <a:xfrm rot="5400000">
-            <a:off x="7277894" y="3771106"/>
-            <a:ext cx="1143000" cy="1588"/>
-          </a:xfrm>
-          <a:prstGeom prst="straightConnector1">
-            <a:avLst/>
-          </a:prstGeom>
-          <a:ln w="38100">
-            <a:solidFill>
-              <a:schemeClr val="accent2"/>
-            </a:solidFill>
-            <a:tailEnd type="arrow"/>
-          </a:ln>
-        </p:spPr>
-        <p:style>
-          <a:lnRef idx="1">
-            <a:schemeClr val="accent1"/>
-          </a:lnRef>
-          <a:fillRef idx="0">
-            <a:schemeClr val="accent1"/>
-          </a:fillRef>
-          <a:effectRef idx="0">
-            <a:schemeClr val="accent1"/>
-          </a:effectRef>
-          <a:fontRef idx="minor">
-            <a:schemeClr val="tx1"/>
-          </a:fontRef>
-        </p:style>
-      </p:cxnSp>
-      <p:cxnSp>
-        <p:nvCxnSpPr>
-          <p:cNvPr id="47" name="Straight Arrow Connector 46"/>
-          <p:cNvCxnSpPr/>
-          <p:nvPr/>
-        </p:nvCxnSpPr>
-        <p:spPr>
-          <a:xfrm rot="5400000">
-            <a:off x="2476500" y="4152900"/>
-            <a:ext cx="380206" cy="794"/>
-          </a:xfrm>
-          <a:prstGeom prst="straightConnector1">
-            <a:avLst/>
-          </a:prstGeom>
-          <a:ln w="38100">
-            <a:solidFill>
-              <a:schemeClr val="accent2"/>
-            </a:solidFill>
-            <a:tailEnd type="arrow"/>
-          </a:ln>
-        </p:spPr>
-        <p:style>
-          <a:lnRef idx="1">
-            <a:schemeClr val="accent1"/>
-          </a:lnRef>
-          <a:fillRef idx="0">
-            <a:schemeClr val="accent1"/>
-          </a:fillRef>
-          <a:effectRef idx="0">
-            <a:schemeClr val="accent1"/>
-          </a:effectRef>
-          <a:fontRef idx="minor">
-            <a:schemeClr val="tx1"/>
-          </a:fontRef>
-        </p:style>
-      </p:cxnSp>
-      <p:cxnSp>
-        <p:nvCxnSpPr>
-          <p:cNvPr id="54" name="Straight Arrow Connector 53"/>
-          <p:cNvCxnSpPr/>
-          <p:nvPr/>
-        </p:nvCxnSpPr>
-        <p:spPr>
-          <a:xfrm rot="5400000">
-            <a:off x="6362700" y="4152900"/>
-            <a:ext cx="380206" cy="794"/>
-          </a:xfrm>
-          <a:prstGeom prst="straightConnector1">
-            <a:avLst/>
-          </a:prstGeom>
-          <a:ln w="38100">
-            <a:solidFill>
-              <a:schemeClr val="accent2"/>
-            </a:solidFill>
-            <a:tailEnd type="arrow"/>
-          </a:ln>
-        </p:spPr>
-        <p:style>
-          <a:lnRef idx="1">
-            <a:schemeClr val="accent1"/>
-          </a:lnRef>
-          <a:fillRef idx="0">
-            <a:schemeClr val="accent1"/>
-          </a:fillRef>
-          <a:effectRef idx="0">
-            <a:schemeClr val="accent1"/>
-          </a:effectRef>
-          <a:fontRef idx="minor">
-            <a:schemeClr val="tx1"/>
-          </a:fontRef>
-        </p:style>
-      </p:cxnSp>
-      <p:sp>
-        <p:nvSpPr>
-          <p:cNvPr id="59" name="Rectangle 58"/>
-          <p:cNvSpPr/>
-          <p:nvPr/>
-        </p:nvSpPr>
-        <p:spPr>
-          <a:xfrm>
-            <a:off x="762000" y="5105400"/>
-            <a:ext cx="7620000" cy="381000"/>
-          </a:xfrm>
-          <a:prstGeom prst="rect">
-            <a:avLst/>
-          </a:prstGeom>
-        </p:spPr>
-        <p:style>
-          <a:lnRef idx="2">
-            <a:schemeClr val="accent2">
-              <a:shade val="50000"/>
-            </a:schemeClr>
-          </a:lnRef>
-          <a:fillRef idx="1">
-            <a:schemeClr val="accent2"/>
-          </a:fillRef>
-          <a:effectRef idx="0">
-            <a:schemeClr val="accent2"/>
-          </a:effectRef>
-          <a:fontRef idx="minor">
-            <a:schemeClr val="lt1"/>
-          </a:fontRef>
-        </p:style>
-        <p:txBody>
-          <a:bodyPr rtlCol="0" anchor="ctr"/>
-          <a:lstStyle/>
-          <a:p>
-            <a:pPr algn="ctr"/>
-            <a:r>
-              <a:rPr lang="en-US" sz="1200" dirty="0" err="1" smtClean="0"/>
-              <a:t>IoC</a:t>
-            </a:r>
-            <a:r>
-              <a:rPr lang="en-US" sz="1200" dirty="0" smtClean="0"/>
-              <a:t> Container</a:t>
-            </a:r>
-            <a:endParaRPr lang="en-US" sz="1200" dirty="0"/>
-          </a:p>
-        </p:txBody>
-      </p:sp>
-    </p:spTree>
-  </p:cSld>
-  <p:clrMapOvr>
-    <a:masterClrMapping/>
-  </p:clrMapOvr>
-  <p:timing>
-    <p:tnLst>
-      <p:par>
-        <p:cTn id="1" dur="indefinite" restart="never" nodeType="tmRoot"/>
-      </p:par>
-    </p:tnLst>
-  </p:timing>
-</p:sld>
-</file>
-
-<file path=ppt/slides/slide31.xml><?xml version="1.0" encoding="utf-8"?>
-<p:sld xmlns:a="http://schemas.openxmlformats.org/drawingml/2006/main" xmlns:r="http://schemas.openxmlformats.org/officeDocument/2006/relationships" xmlns:p="http://schemas.openxmlformats.org/presentationml/2006/main">
-  <p:cSld>
-    <p:spTree>
-      <p:nvGrpSpPr>
-        <p:cNvPr id="1" name=""/>
-        <p:cNvGrpSpPr/>
-        <p:nvPr/>
-      </p:nvGrpSpPr>
-      <p:grpSpPr>
-        <a:xfrm>
-          <a:off x="0" y="0"/>
-          <a:ext cx="0" cy="0"/>
-          <a:chOff x="0" y="0"/>
-          <a:chExt cx="0" cy="0"/>
-        </a:xfrm>
-      </p:grpSpPr>
-      <p:sp>
-        <p:nvSpPr>
-          <p:cNvPr id="6" name="Rectangle 5"/>
-          <p:cNvSpPr/>
-          <p:nvPr/>
-        </p:nvSpPr>
-        <p:spPr>
-          <a:xfrm>
-            <a:off x="0" y="0"/>
-            <a:ext cx="9144000" cy="4648200"/>
-          </a:xfrm>
-          <a:prstGeom prst="rect">
-            <a:avLst/>
-          </a:prstGeom>
-          <a:solidFill>
-            <a:srgbClr val="0069AA"/>
-          </a:solidFill>
-          <a:ln>
-            <a:noFill/>
-          </a:ln>
-        </p:spPr>
-        <p:style>
-          <a:lnRef idx="2">
-            <a:schemeClr val="accent1">
-              <a:shade val="50000"/>
-            </a:schemeClr>
-          </a:lnRef>
-          <a:fillRef idx="1">
-            <a:schemeClr val="accent1"/>
-          </a:fillRef>
-          <a:effectRef idx="0">
-            <a:schemeClr val="accent1"/>
-          </a:effectRef>
-          <a:fontRef idx="minor">
-            <a:schemeClr val="lt1"/>
-          </a:fontRef>
-        </p:style>
-        <p:txBody>
-          <a:bodyPr anchor="ctr"/>
-          <a:lstStyle/>
-          <a:p>
-            <a:pPr algn="ctr">
-              <a:defRPr/>
-            </a:pPr>
-            <a:endParaRPr lang="en-US"/>
-          </a:p>
-        </p:txBody>
-      </p:sp>
-      <p:sp>
-        <p:nvSpPr>
-          <p:cNvPr id="8" name="Rectangle 7"/>
-          <p:cNvSpPr/>
-          <p:nvPr/>
-        </p:nvSpPr>
-        <p:spPr>
-          <a:xfrm>
-            <a:off x="228600" y="0"/>
-            <a:ext cx="104775" cy="3581400"/>
-          </a:xfrm>
-          <a:prstGeom prst="rect">
-            <a:avLst/>
-          </a:prstGeom>
-          <a:solidFill>
-            <a:srgbClr val="E31937"/>
-          </a:solidFill>
-          <a:ln>
-            <a:noFill/>
-          </a:ln>
-        </p:spPr>
-        <p:style>
-          <a:lnRef idx="2">
-            <a:schemeClr val="accent1">
-              <a:shade val="50000"/>
-            </a:schemeClr>
-          </a:lnRef>
-          <a:fillRef idx="1">
-            <a:schemeClr val="accent1"/>
-          </a:fillRef>
-          <a:effectRef idx="0">
-            <a:schemeClr val="accent1"/>
-          </a:effectRef>
-          <a:fontRef idx="minor">
-            <a:schemeClr val="lt1"/>
-          </a:fontRef>
-        </p:style>
-        <p:txBody>
-          <a:bodyPr anchor="ctr"/>
-          <a:lstStyle/>
-          <a:p>
-            <a:pPr algn="ctr">
-              <a:defRPr/>
-            </a:pPr>
-            <a:endParaRPr lang="en-US"/>
-          </a:p>
-        </p:txBody>
-      </p:sp>
-      <p:sp>
-        <p:nvSpPr>
-          <p:cNvPr id="5127" name="Rectangle 8"/>
-          <p:cNvSpPr>
-            <a:spLocks noGrp="1" noChangeArrowheads="1"/>
-          </p:cNvSpPr>
-          <p:nvPr>
-            <p:ph type="title" idx="4294967295"/>
-          </p:nvPr>
-        </p:nvSpPr>
-        <p:spPr bwMode="auto">
-          <a:xfrm>
-            <a:off x="495300" y="200025"/>
-            <a:ext cx="8420100" cy="919163"/>
-          </a:xfrm>
-          <a:prstGeom prst="rect">
-            <a:avLst/>
-          </a:prstGeom>
-          <a:noFill/>
-          <a:ln>
-            <a:miter lim="800000"/>
-            <a:headEnd/>
-            <a:tailEnd/>
-          </a:ln>
-        </p:spPr>
-        <p:txBody>
-          <a:bodyPr/>
-          <a:lstStyle/>
-          <a:p>
-            <a:pPr eaLnBrk="1" hangingPunct="1"/>
-            <a:r>
-              <a:rPr lang="en-US" dirty="0" smtClean="0">
-                <a:solidFill>
-                  <a:schemeClr val="bg1"/>
-                </a:solidFill>
-              </a:rPr>
-              <a:t>Additional Resources</a:t>
-            </a:r>
-          </a:p>
-        </p:txBody>
-      </p:sp>
-      <p:sp>
-        <p:nvSpPr>
-          <p:cNvPr id="5128" name="Rectangle 9"/>
-          <p:cNvSpPr>
-            <a:spLocks noGrp="1" noChangeArrowheads="1"/>
-          </p:cNvSpPr>
-          <p:nvPr>
-            <p:ph idx="4294967295"/>
-          </p:nvPr>
-        </p:nvSpPr>
-        <p:spPr>
-          <a:xfrm>
-            <a:off x="514350" y="1143000"/>
-            <a:ext cx="8229600" cy="3429000"/>
-          </a:xfrm>
-        </p:spPr>
-        <p:txBody>
-          <a:bodyPr/>
-          <a:lstStyle/>
-          <a:p>
-            <a:pPr eaLnBrk="1" hangingPunct="1">
-              <a:lnSpc>
-                <a:spcPct val="80000"/>
-              </a:lnSpc>
-              <a:buNone/>
-            </a:pPr>
-            <a:r>
-              <a:rPr lang="en-US" sz="2000" dirty="0" smtClean="0">
-                <a:solidFill>
-                  <a:schemeClr val="bg1"/>
-                </a:solidFill>
-              </a:rPr>
-              <a:t>Command Pattern</a:t>
-            </a:r>
-          </a:p>
-          <a:p>
-            <a:pPr eaLnBrk="1" hangingPunct="1">
-              <a:lnSpc>
-                <a:spcPct val="80000"/>
-              </a:lnSpc>
-              <a:buNone/>
-            </a:pPr>
-            <a:r>
-              <a:rPr lang="en-US" sz="2000" dirty="0" smtClean="0">
-                <a:solidFill>
-                  <a:schemeClr val="bg1"/>
-                </a:solidFill>
-              </a:rPr>
-              <a:t>	http://www.lostechies.com/blogs/derickbailey/archive/2008/11/19/ptom-command-and-conquer-your-ui-coupling-problems.aspx </a:t>
-            </a:r>
-            <a:br>
-              <a:rPr lang="en-US" sz="2000" dirty="0" smtClean="0">
-                <a:solidFill>
-                  <a:schemeClr val="bg1"/>
-                </a:solidFill>
-              </a:rPr>
-            </a:br>
-            <a:endParaRPr lang="en-US" sz="2000" dirty="0" smtClean="0">
-              <a:solidFill>
-                <a:schemeClr val="bg1"/>
-              </a:solidFill>
-            </a:endParaRPr>
-          </a:p>
-          <a:p>
-            <a:pPr eaLnBrk="1" hangingPunct="1">
-              <a:lnSpc>
-                <a:spcPct val="80000"/>
-              </a:lnSpc>
-              <a:buNone/>
-            </a:pPr>
-            <a:r>
-              <a:rPr lang="en-US" sz="2000" dirty="0" smtClean="0">
-                <a:solidFill>
-                  <a:schemeClr val="bg1"/>
-                </a:solidFill>
-              </a:rPr>
-              <a:t>Event Aggregator</a:t>
-            </a:r>
-            <a:br>
-              <a:rPr lang="en-US" sz="2000" dirty="0" smtClean="0">
-                <a:solidFill>
-                  <a:schemeClr val="bg1"/>
-                </a:solidFill>
-              </a:rPr>
-            </a:br>
-            <a:r>
-              <a:rPr lang="en-US" sz="2000" dirty="0" smtClean="0">
-                <a:solidFill>
-                  <a:schemeClr val="bg1"/>
-                </a:solidFill>
-              </a:rPr>
-              <a:t>http://www.martinfowler.com/eaaDev/EventAggregator.html</a:t>
-            </a:r>
-            <a:br>
-              <a:rPr lang="en-US" sz="2000" dirty="0" smtClean="0">
-                <a:solidFill>
-                  <a:schemeClr val="bg1"/>
-                </a:solidFill>
-              </a:rPr>
-            </a:br>
-            <a:endParaRPr lang="en-US" sz="2000" dirty="0" smtClean="0">
-              <a:solidFill>
-                <a:schemeClr val="bg1"/>
-              </a:solidFill>
-            </a:endParaRPr>
-          </a:p>
-          <a:p>
-            <a:pPr eaLnBrk="1" hangingPunct="1">
-              <a:lnSpc>
-                <a:spcPct val="80000"/>
-              </a:lnSpc>
-              <a:buNone/>
-            </a:pPr>
-            <a:r>
-              <a:rPr lang="en-US" sz="2000" dirty="0" err="1" smtClean="0">
-                <a:solidFill>
-                  <a:schemeClr val="bg1"/>
-                </a:solidFill>
-              </a:rPr>
-              <a:t>StructureMap</a:t>
-            </a:r>
-            <a:r>
-              <a:rPr lang="en-US" sz="2000" dirty="0" smtClean="0">
-                <a:solidFill>
-                  <a:schemeClr val="bg1"/>
-                </a:solidFill>
-              </a:rPr>
-              <a:t> (</a:t>
-            </a:r>
-            <a:r>
-              <a:rPr lang="en-US" sz="2000" dirty="0" err="1" smtClean="0">
-                <a:solidFill>
-                  <a:schemeClr val="bg1"/>
-                </a:solidFill>
-              </a:rPr>
-              <a:t>IoC</a:t>
-            </a:r>
-            <a:r>
-              <a:rPr lang="en-US" sz="2000" dirty="0" smtClean="0">
-                <a:solidFill>
-                  <a:schemeClr val="bg1"/>
-                </a:solidFill>
-              </a:rPr>
-              <a:t> Container)</a:t>
-            </a:r>
-          </a:p>
-          <a:p>
-            <a:pPr eaLnBrk="1" hangingPunct="1">
-              <a:lnSpc>
-                <a:spcPct val="80000"/>
-              </a:lnSpc>
-              <a:buNone/>
-            </a:pPr>
-            <a:r>
-              <a:rPr lang="en-US" sz="2000" dirty="0" smtClean="0">
-                <a:solidFill>
-                  <a:schemeClr val="bg1"/>
-                </a:solidFill>
-              </a:rPr>
-              <a:t>	http://structuremap.sourceforge.net</a:t>
-            </a:r>
-            <a:br>
-              <a:rPr lang="en-US" sz="2000" dirty="0" smtClean="0">
-                <a:solidFill>
-                  <a:schemeClr val="bg1"/>
-                </a:solidFill>
-              </a:rPr>
-            </a:br>
-            <a:endParaRPr lang="en-US" sz="2000" dirty="0" smtClean="0">
-              <a:solidFill>
-                <a:schemeClr val="bg1"/>
-              </a:solidFill>
-            </a:endParaRPr>
-          </a:p>
-          <a:p>
-            <a:pPr eaLnBrk="1" hangingPunct="1">
-              <a:lnSpc>
-                <a:spcPct val="80000"/>
-              </a:lnSpc>
-              <a:buNone/>
-            </a:pPr>
-            <a:r>
-              <a:rPr lang="en-US" sz="2000" dirty="0" smtClean="0">
-                <a:solidFill>
-                  <a:schemeClr val="bg1"/>
-                </a:solidFill>
-              </a:rPr>
-              <a:t>Application Controller</a:t>
-            </a:r>
-          </a:p>
-          <a:p>
-            <a:pPr eaLnBrk="1" hangingPunct="1">
-              <a:lnSpc>
-                <a:spcPct val="80000"/>
-              </a:lnSpc>
-              <a:buNone/>
-            </a:pPr>
-            <a:r>
-              <a:rPr lang="en-US" sz="2000" dirty="0" smtClean="0">
-                <a:solidFill>
-                  <a:schemeClr val="bg1"/>
-                </a:solidFill>
-              </a:rPr>
-              <a:t>	http://www.martinfowler.com/eaaCatalog/applicationController.html</a:t>
-            </a:r>
-            <a:br>
-              <a:rPr lang="en-US" sz="2000" dirty="0" smtClean="0">
-                <a:solidFill>
-                  <a:schemeClr val="bg1"/>
-                </a:solidFill>
-              </a:rPr>
-            </a:br>
-            <a:endParaRPr lang="en-US" sz="2000" dirty="0" smtClean="0">
-              <a:solidFill>
-                <a:schemeClr val="bg1"/>
-              </a:solidFill>
-            </a:endParaRPr>
-          </a:p>
-        </p:txBody>
-      </p:sp>
-      <p:sp>
-        <p:nvSpPr>
-          <p:cNvPr id="5129" name="Text Box 7"/>
-          <p:cNvSpPr txBox="1">
-            <a:spLocks noChangeArrowheads="1"/>
-          </p:cNvSpPr>
-          <p:nvPr/>
-        </p:nvSpPr>
-        <p:spPr bwMode="auto">
-          <a:xfrm>
-            <a:off x="5470525" y="1331913"/>
-            <a:ext cx="184150" cy="366712"/>
-          </a:xfrm>
-          <a:prstGeom prst="rect">
-            <a:avLst/>
-          </a:prstGeom>
-          <a:noFill/>
-          <a:ln w="9525">
-            <a:noFill/>
-            <a:miter lim="800000"/>
-            <a:headEnd/>
-            <a:tailEnd/>
-          </a:ln>
-        </p:spPr>
-        <p:txBody>
-          <a:bodyPr wrap="none">
-            <a:spAutoFit/>
-          </a:bodyPr>
-          <a:lstStyle/>
-          <a:p>
-            <a:endParaRPr lang="en-US"/>
-          </a:p>
-        </p:txBody>
-      </p:sp>
-      <p:pic>
-        <p:nvPicPr>
-          <p:cNvPr id="16" name="Picture 4" descr="MAT logo 1 CMYK"/>
-          <p:cNvPicPr>
-            <a:picLocks noChangeAspect="1" noChangeArrowheads="1"/>
-          </p:cNvPicPr>
-          <p:nvPr/>
-        </p:nvPicPr>
-        <p:blipFill>
-          <a:blip r:embed="rId2">
-            <a:clrChange>
-              <a:clrFrom>
-                <a:srgbClr val="FDFDFD"/>
-              </a:clrFrom>
-              <a:clrTo>
-                <a:srgbClr val="FDFDFD">
-                  <a:alpha val="0"/>
-                </a:srgbClr>
-              </a:clrTo>
-            </a:clrChange>
-          </a:blip>
-          <a:srcRect/>
-          <a:stretch>
-            <a:fillRect/>
-          </a:stretch>
-        </p:blipFill>
-        <p:spPr bwMode="auto">
-          <a:xfrm>
-            <a:off x="2971800" y="4800600"/>
-            <a:ext cx="2819400" cy="1338263"/>
-          </a:xfrm>
-          <a:prstGeom prst="rect">
-            <a:avLst/>
-          </a:prstGeom>
-          <a:noFill/>
-          <a:ln w="9525">
-            <a:noFill/>
-            <a:miter lim="800000"/>
-            <a:headEnd/>
-            <a:tailEnd/>
-          </a:ln>
-        </p:spPr>
-      </p:pic>
-      <p:sp>
-        <p:nvSpPr>
-          <p:cNvPr id="17" name="Rectangle 16"/>
-          <p:cNvSpPr/>
-          <p:nvPr/>
-        </p:nvSpPr>
-        <p:spPr>
-          <a:xfrm>
-            <a:off x="0" y="4724400"/>
-            <a:ext cx="9144000" cy="2133600"/>
-          </a:xfrm>
-          <a:prstGeom prst="rect">
-            <a:avLst/>
-          </a:prstGeom>
-          <a:solidFill>
-            <a:srgbClr val="E31937"/>
-          </a:solidFill>
-          <a:ln>
-            <a:noFill/>
-          </a:ln>
-        </p:spPr>
-        <p:style>
-          <a:lnRef idx="2">
-            <a:schemeClr val="accent1">
-              <a:shade val="50000"/>
-            </a:schemeClr>
-          </a:lnRef>
-          <a:fillRef idx="1">
-            <a:schemeClr val="accent1"/>
-          </a:fillRef>
-          <a:effectRef idx="0">
-            <a:schemeClr val="accent1"/>
-          </a:effectRef>
-          <a:fontRef idx="minor">
-            <a:schemeClr val="lt1"/>
-          </a:fontRef>
-        </p:style>
-        <p:txBody>
-          <a:bodyPr anchor="ctr"/>
-          <a:lstStyle/>
-          <a:p>
-            <a:pPr algn="ctr">
-              <a:defRPr/>
-            </a:pPr>
-            <a:endParaRPr lang="en-US"/>
-          </a:p>
-        </p:txBody>
-      </p:sp>
-      <p:pic>
-        <p:nvPicPr>
-          <p:cNvPr id="18" name="Picture 7" descr="MAT logo vertical_red.emf"/>
-          <p:cNvPicPr>
-            <a:picLocks noChangeAspect="1"/>
-          </p:cNvPicPr>
-          <p:nvPr/>
-        </p:nvPicPr>
-        <p:blipFill>
-          <a:blip r:embed="rId3"/>
-          <a:srcRect/>
-          <a:stretch>
-            <a:fillRect/>
-          </a:stretch>
-        </p:blipFill>
-        <p:spPr bwMode="auto">
-          <a:xfrm>
-            <a:off x="3600450" y="5334000"/>
-            <a:ext cx="1981200" cy="969963"/>
-          </a:xfrm>
-          <a:prstGeom prst="rect">
-            <a:avLst/>
-          </a:prstGeom>
-          <a:noFill/>
-          <a:ln w="9525">
-            <a:noFill/>
-            <a:miter lim="800000"/>
-            <a:headEnd/>
-            <a:tailEnd/>
-          </a:ln>
-        </p:spPr>
-      </p:pic>
-    </p:spTree>
-  </p:cSld>
-  <p:clrMapOvr>
-    <a:masterClrMapping/>
-  </p:clrMapOvr>
-  <p:timing>
-    <p:tnLst>
-      <p:par>
-        <p:cTn id="1" dur="indefinite" restart="never" nodeType="tmRoot"/>
-      </p:par>
-    </p:tnLst>
-  </p:timing>
-</p:sld>
-</file>
-
-<file path=ppt/slides/slide32.xml><?xml version="1.0" encoding="utf-8"?>
 <p:sld xmlns:a="http://schemas.openxmlformats.org/drawingml/2006/main" xmlns:r="http://schemas.openxmlformats.org/officeDocument/2006/relationships" xmlns:p="http://schemas.openxmlformats.org/presentationml/2006/main">
   <p:cSld>
     <p:spTree>
@@ -20663,6 +19849,21 @@
 </file>
 
 <file path=customXml/item1.xml><?xml version="1.0" encoding="utf-8"?>
+<p:properties xmlns:p="http://schemas.microsoft.com/office/2006/metadata/properties" xmlns:xsi="http://www.w3.org/2001/XMLSchema-instance">
+  <documentManagement/>
+</p:properties>
+</file>
+
+<file path=customXml/item2.xml><?xml version="1.0" encoding="utf-8"?>
+<?mso-contentType ?>
+<FormTemplates xmlns="http://schemas.microsoft.com/sharepoint/v3/contenttype/forms">
+  <Display>DocumentLibraryForm</Display>
+  <Edit>DocumentLibraryForm</Edit>
+  <New>DocumentLibraryForm</New>
+</FormTemplates>
+</file>
+
+<file path=customXml/item3.xml><?xml version="1.0" encoding="utf-8"?>
 <ct:contentTypeSchema xmlns:ct="http://schemas.microsoft.com/office/2006/metadata/contentType" xmlns:ma="http://schemas.microsoft.com/office/2006/metadata/properties/metaAttributes" ct:_="" ma:_="" ma:contentTypeName="Document" ma:contentTypeID="0x0101005857B3975182FB47B67FAAA67052062C" ma:contentTypeVersion="0" ma:contentTypeDescription="Create a new document." ma:contentTypeScope="" ma:versionID="a1781edd533abf786dc62ee7dded643a">
   <xsd:schema xmlns:xsd="http://www.w3.org/2001/XMLSchema" xmlns:p="http://schemas.microsoft.com/office/2006/metadata/properties" targetNamespace="http://schemas.microsoft.com/office/2006/metadata/properties" ma:root="true" ma:fieldsID="4aeb20c0e3442673af7ee10786458764">
     <xsd:element name="properties">
@@ -20711,32 +19912,10 @@
 </ct:contentTypeSchema>
 </file>
 
-<file path=customXml/item2.xml><?xml version="1.0" encoding="utf-8"?>
-<?mso-contentType ?>
-<FormTemplates xmlns="http://schemas.microsoft.com/sharepoint/v3/contenttype/forms">
-  <Display>DocumentLibraryForm</Display>
-  <Edit>DocumentLibraryForm</Edit>
-  <New>DocumentLibraryForm</New>
-</FormTemplates>
-</file>
-
-<file path=customXml/item3.xml><?xml version="1.0" encoding="utf-8"?>
-<p:properties xmlns:p="http://schemas.microsoft.com/office/2006/metadata/properties" xmlns:xsi="http://www.w3.org/2001/XMLSchema-instance">
-  <documentManagement/>
-</p:properties>
-</file>
-
 <file path=customXml/itemProps1.xml><?xml version="1.0" encoding="utf-8"?>
-<ds:datastoreItem xmlns:ds="http://schemas.openxmlformats.org/officeDocument/2006/customXml" ds:itemID="{D3EBC05E-93E3-47EC-A4AA-B305F2941009}">
+<ds:datastoreItem xmlns:ds="http://schemas.openxmlformats.org/officeDocument/2006/customXml" ds:itemID="{F8AADC7F-5DC4-46F2-A809-0679B041C012}">
   <ds:schemaRefs>
-    <ds:schemaRef ds:uri="http://schemas.microsoft.com/office/2006/metadata/contentType"/>
-    <ds:schemaRef ds:uri="http://schemas.microsoft.com/office/2006/metadata/properties/metaAttributes"/>
-    <ds:schemaRef ds:uri="http://www.w3.org/2001/XMLSchema"/>
     <ds:schemaRef ds:uri="http://schemas.microsoft.com/office/2006/metadata/properties"/>
-    <ds:schemaRef ds:uri="http://schemas.openxmlformats.org/package/2006/metadata/core-properties"/>
-    <ds:schemaRef ds:uri="http://purl.org/dc/elements/1.1/"/>
-    <ds:schemaRef ds:uri="http://purl.org/dc/terms/"/>
-    <ds:schemaRef ds:uri="http://schemas.microsoft.com/office/internal/2005/internalDocumentation"/>
   </ds:schemaRefs>
 </ds:datastoreItem>
 </file>
@@ -20750,9 +19929,16 @@
 </file>
 
 <file path=customXml/itemProps3.xml><?xml version="1.0" encoding="utf-8"?>
-<ds:datastoreItem xmlns:ds="http://schemas.openxmlformats.org/officeDocument/2006/customXml" ds:itemID="{F8AADC7F-5DC4-46F2-A809-0679B041C012}">
+<ds:datastoreItem xmlns:ds="http://schemas.openxmlformats.org/officeDocument/2006/customXml" ds:itemID="{D3EBC05E-93E3-47EC-A4AA-B305F2941009}">
   <ds:schemaRefs>
+    <ds:schemaRef ds:uri="http://schemas.microsoft.com/office/2006/metadata/contentType"/>
+    <ds:schemaRef ds:uri="http://schemas.microsoft.com/office/2006/metadata/properties/metaAttributes"/>
+    <ds:schemaRef ds:uri="http://www.w3.org/2001/XMLSchema"/>
     <ds:schemaRef ds:uri="http://schemas.microsoft.com/office/2006/metadata/properties"/>
+    <ds:schemaRef ds:uri="http://schemas.openxmlformats.org/package/2006/metadata/core-properties"/>
+    <ds:schemaRef ds:uri="http://purl.org/dc/elements/1.1/"/>
+    <ds:schemaRef ds:uri="http://purl.org/dc/terms/"/>
+    <ds:schemaRef ds:uri="http://schemas.microsoft.com/office/internal/2005/internalDocumentation"/>
   </ds:schemaRefs>
 </ds:datastoreItem>
 </file>
</xml_diff>